<commit_message>
Update VSIF for MD Update documents for VSIF
</commit_message>
<xml_diff>
--- a/docs/MAmidiMEmo/Manual.pptx
+++ b/docs/MAmidiMEmo/Manual.pptx
@@ -4,6 +4,9 @@
   <p:sldMasterIdLst>
     <p:sldMasterId id="2147483678" r:id="rId1"/>
   </p:sldMasterIdLst>
+  <p:notesMasterIdLst>
+    <p:notesMasterId r:id="rId18"/>
+  </p:notesMasterIdLst>
   <p:sldIdLst>
     <p:sldId id="256" r:id="rId2"/>
     <p:sldId id="262" r:id="rId3"/>
@@ -18,7 +21,9 @@
     <p:sldId id="271" r:id="rId12"/>
     <p:sldId id="270" r:id="rId13"/>
     <p:sldId id="269" r:id="rId14"/>
-    <p:sldId id="264" r:id="rId15"/>
+    <p:sldId id="272" r:id="rId15"/>
+    <p:sldId id="273" r:id="rId16"/>
+    <p:sldId id="264" r:id="rId17"/>
   </p:sldIdLst>
   <p:sldSz cx="12192000" cy="6858000"/>
   <p:notesSz cx="6858000" cy="9144000"/>
@@ -125,6 +130,555 @@
 </p:presentation>
 </file>
 
+<file path=ppt/notesMasters/notesMaster1.xml><?xml version="1.0" encoding="utf-8"?>
+<p:notesMaster xmlns:a="http://schemas.openxmlformats.org/drawingml/2006/main" xmlns:r="http://schemas.openxmlformats.org/officeDocument/2006/relationships" xmlns:p="http://schemas.openxmlformats.org/presentationml/2006/main">
+  <p:cSld>
+    <p:bg>
+      <p:bgRef idx="1001">
+        <a:schemeClr val="bg1"/>
+      </p:bgRef>
+    </p:bg>
+    <p:spTree>
+      <p:nvGrpSpPr>
+        <p:cNvPr id="1" name=""/>
+        <p:cNvGrpSpPr/>
+        <p:nvPr/>
+      </p:nvGrpSpPr>
+      <p:grpSpPr>
+        <a:xfrm>
+          <a:off x="0" y="0"/>
+          <a:ext cx="0" cy="0"/>
+          <a:chOff x="0" y="0"/>
+          <a:chExt cx="0" cy="0"/>
+        </a:xfrm>
+      </p:grpSpPr>
+      <p:sp>
+        <p:nvSpPr>
+          <p:cNvPr id="2" name="ヘッダー プレースホルダー 1"/>
+          <p:cNvSpPr>
+            <a:spLocks noGrp="1"/>
+          </p:cNvSpPr>
+          <p:nvPr>
+            <p:ph type="hdr" sz="quarter"/>
+          </p:nvPr>
+        </p:nvSpPr>
+        <p:spPr>
+          <a:xfrm>
+            <a:off x="0" y="0"/>
+            <a:ext cx="2971800" cy="458788"/>
+          </a:xfrm>
+          <a:prstGeom prst="rect">
+            <a:avLst/>
+          </a:prstGeom>
+        </p:spPr>
+        <p:txBody>
+          <a:bodyPr vert="horz" lIns="91440" tIns="45720" rIns="91440" bIns="45720" rtlCol="0"/>
+          <a:lstStyle>
+            <a:lvl1pPr algn="l">
+              <a:defRPr sz="1200"/>
+            </a:lvl1pPr>
+          </a:lstStyle>
+          <a:p>
+            <a:endParaRPr kumimoji="1" lang="ja-JP" altLang="en-US"/>
+          </a:p>
+        </p:txBody>
+      </p:sp>
+      <p:sp>
+        <p:nvSpPr>
+          <p:cNvPr id="3" name="日付プレースホルダー 2"/>
+          <p:cNvSpPr>
+            <a:spLocks noGrp="1"/>
+          </p:cNvSpPr>
+          <p:nvPr>
+            <p:ph type="dt" idx="1"/>
+          </p:nvPr>
+        </p:nvSpPr>
+        <p:spPr>
+          <a:xfrm>
+            <a:off x="3884613" y="0"/>
+            <a:ext cx="2971800" cy="458788"/>
+          </a:xfrm>
+          <a:prstGeom prst="rect">
+            <a:avLst/>
+          </a:prstGeom>
+        </p:spPr>
+        <p:txBody>
+          <a:bodyPr vert="horz" lIns="91440" tIns="45720" rIns="91440" bIns="45720" rtlCol="0"/>
+          <a:lstStyle>
+            <a:lvl1pPr algn="r">
+              <a:defRPr sz="1200"/>
+            </a:lvl1pPr>
+          </a:lstStyle>
+          <a:p>
+            <a:fld id="{581C28D8-13B6-41C3-9F5F-0284C569C6F1}" type="datetimeFigureOut">
+              <a:rPr kumimoji="1" lang="ja-JP" altLang="en-US" smtClean="0"/>
+              <a:t>2021/5/15</a:t>
+            </a:fld>
+            <a:endParaRPr kumimoji="1" lang="ja-JP" altLang="en-US"/>
+          </a:p>
+        </p:txBody>
+      </p:sp>
+      <p:sp>
+        <p:nvSpPr>
+          <p:cNvPr id="4" name="スライド イメージ プレースホルダー 3"/>
+          <p:cNvSpPr>
+            <a:spLocks noGrp="1" noRot="1" noChangeAspect="1"/>
+          </p:cNvSpPr>
+          <p:nvPr>
+            <p:ph type="sldImg" idx="2"/>
+          </p:nvPr>
+        </p:nvSpPr>
+        <p:spPr>
+          <a:xfrm>
+            <a:off x="685800" y="1143000"/>
+            <a:ext cx="5486400" cy="3086100"/>
+          </a:xfrm>
+          <a:prstGeom prst="rect">
+            <a:avLst/>
+          </a:prstGeom>
+          <a:noFill/>
+          <a:ln w="12700">
+            <a:solidFill>
+              <a:prstClr val="black"/>
+            </a:solidFill>
+          </a:ln>
+        </p:spPr>
+        <p:txBody>
+          <a:bodyPr vert="horz" lIns="91440" tIns="45720" rIns="91440" bIns="45720" rtlCol="0" anchor="ctr"/>
+          <a:lstStyle/>
+          <a:p>
+            <a:endParaRPr lang="ja-JP" altLang="en-US"/>
+          </a:p>
+        </p:txBody>
+      </p:sp>
+      <p:sp>
+        <p:nvSpPr>
+          <p:cNvPr id="5" name="ノート プレースホルダー 4"/>
+          <p:cNvSpPr>
+            <a:spLocks noGrp="1"/>
+          </p:cNvSpPr>
+          <p:nvPr>
+            <p:ph type="body" sz="quarter" idx="3"/>
+          </p:nvPr>
+        </p:nvSpPr>
+        <p:spPr>
+          <a:xfrm>
+            <a:off x="685800" y="4400550"/>
+            <a:ext cx="5486400" cy="3600450"/>
+          </a:xfrm>
+          <a:prstGeom prst="rect">
+            <a:avLst/>
+          </a:prstGeom>
+        </p:spPr>
+        <p:txBody>
+          <a:bodyPr vert="horz" lIns="91440" tIns="45720" rIns="91440" bIns="45720" rtlCol="0"/>
+          <a:lstStyle/>
+          <a:p>
+            <a:pPr lvl="0"/>
+            <a:r>
+              <a:rPr kumimoji="1" lang="ja-JP" altLang="en-US"/>
+              <a:t>マスター テキストの書式設定</a:t>
+            </a:r>
+          </a:p>
+          <a:p>
+            <a:pPr lvl="1"/>
+            <a:r>
+              <a:rPr kumimoji="1" lang="ja-JP" altLang="en-US"/>
+              <a:t>第 </a:t>
+            </a:r>
+            <a:r>
+              <a:rPr kumimoji="1" lang="en-US" altLang="ja-JP"/>
+              <a:t>2 </a:t>
+            </a:r>
+            <a:r>
+              <a:rPr kumimoji="1" lang="ja-JP" altLang="en-US"/>
+              <a:t>レベル</a:t>
+            </a:r>
+          </a:p>
+          <a:p>
+            <a:pPr lvl="2"/>
+            <a:r>
+              <a:rPr kumimoji="1" lang="ja-JP" altLang="en-US"/>
+              <a:t>第 </a:t>
+            </a:r>
+            <a:r>
+              <a:rPr kumimoji="1" lang="en-US" altLang="ja-JP"/>
+              <a:t>3 </a:t>
+            </a:r>
+            <a:r>
+              <a:rPr kumimoji="1" lang="ja-JP" altLang="en-US"/>
+              <a:t>レベル</a:t>
+            </a:r>
+          </a:p>
+          <a:p>
+            <a:pPr lvl="3"/>
+            <a:r>
+              <a:rPr kumimoji="1" lang="ja-JP" altLang="en-US"/>
+              <a:t>第 </a:t>
+            </a:r>
+            <a:r>
+              <a:rPr kumimoji="1" lang="en-US" altLang="ja-JP"/>
+              <a:t>4 </a:t>
+            </a:r>
+            <a:r>
+              <a:rPr kumimoji="1" lang="ja-JP" altLang="en-US"/>
+              <a:t>レベル</a:t>
+            </a:r>
+          </a:p>
+          <a:p>
+            <a:pPr lvl="4"/>
+            <a:r>
+              <a:rPr kumimoji="1" lang="ja-JP" altLang="en-US"/>
+              <a:t>第 </a:t>
+            </a:r>
+            <a:r>
+              <a:rPr kumimoji="1" lang="en-US" altLang="ja-JP"/>
+              <a:t>5 </a:t>
+            </a:r>
+            <a:r>
+              <a:rPr kumimoji="1" lang="ja-JP" altLang="en-US"/>
+              <a:t>レベル</a:t>
+            </a:r>
+          </a:p>
+        </p:txBody>
+      </p:sp>
+      <p:sp>
+        <p:nvSpPr>
+          <p:cNvPr id="6" name="フッター プレースホルダー 5"/>
+          <p:cNvSpPr>
+            <a:spLocks noGrp="1"/>
+          </p:cNvSpPr>
+          <p:nvPr>
+            <p:ph type="ftr" sz="quarter" idx="4"/>
+          </p:nvPr>
+        </p:nvSpPr>
+        <p:spPr>
+          <a:xfrm>
+            <a:off x="0" y="8685213"/>
+            <a:ext cx="2971800" cy="458787"/>
+          </a:xfrm>
+          <a:prstGeom prst="rect">
+            <a:avLst/>
+          </a:prstGeom>
+        </p:spPr>
+        <p:txBody>
+          <a:bodyPr vert="horz" lIns="91440" tIns="45720" rIns="91440" bIns="45720" rtlCol="0" anchor="b"/>
+          <a:lstStyle>
+            <a:lvl1pPr algn="l">
+              <a:defRPr sz="1200"/>
+            </a:lvl1pPr>
+          </a:lstStyle>
+          <a:p>
+            <a:endParaRPr kumimoji="1" lang="ja-JP" altLang="en-US"/>
+          </a:p>
+        </p:txBody>
+      </p:sp>
+      <p:sp>
+        <p:nvSpPr>
+          <p:cNvPr id="7" name="スライド番号プレースホルダー 6"/>
+          <p:cNvSpPr>
+            <a:spLocks noGrp="1"/>
+          </p:cNvSpPr>
+          <p:nvPr>
+            <p:ph type="sldNum" sz="quarter" idx="5"/>
+          </p:nvPr>
+        </p:nvSpPr>
+        <p:spPr>
+          <a:xfrm>
+            <a:off x="3884613" y="8685213"/>
+            <a:ext cx="2971800" cy="458787"/>
+          </a:xfrm>
+          <a:prstGeom prst="rect">
+            <a:avLst/>
+          </a:prstGeom>
+        </p:spPr>
+        <p:txBody>
+          <a:bodyPr vert="horz" lIns="91440" tIns="45720" rIns="91440" bIns="45720" rtlCol="0" anchor="b"/>
+          <a:lstStyle>
+            <a:lvl1pPr algn="r">
+              <a:defRPr sz="1200"/>
+            </a:lvl1pPr>
+          </a:lstStyle>
+          <a:p>
+            <a:fld id="{E8D2F5C4-CB40-44D3-9C89-5ECCD9AB4B5C}" type="slidenum">
+              <a:rPr kumimoji="1" lang="ja-JP" altLang="en-US" smtClean="0"/>
+              <a:t>‹#›</a:t>
+            </a:fld>
+            <a:endParaRPr kumimoji="1" lang="ja-JP" altLang="en-US"/>
+          </a:p>
+        </p:txBody>
+      </p:sp>
+    </p:spTree>
+    <p:extLst>
+      <p:ext uri="{BB962C8B-B14F-4D97-AF65-F5344CB8AC3E}">
+        <p14:creationId xmlns:p14="http://schemas.microsoft.com/office/powerpoint/2010/main" val="3638096207"/>
+      </p:ext>
+    </p:extLst>
+  </p:cSld>
+  <p:clrMap bg1="lt1" tx1="dk1" bg2="lt2" tx2="dk2" accent1="accent1" accent2="accent2" accent3="accent3" accent4="accent4" accent5="accent5" accent6="accent6" hlink="hlink" folHlink="folHlink"/>
+  <p:notesStyle>
+    <a:lvl1pPr marL="0" algn="l" defTabSz="914400" rtl="0" eaLnBrk="1" latinLnBrk="0" hangingPunct="1">
+      <a:defRPr kumimoji="1" sz="1200" kern="1200">
+        <a:solidFill>
+          <a:schemeClr val="tx1"/>
+        </a:solidFill>
+        <a:latin typeface="+mn-lt"/>
+        <a:ea typeface="+mn-ea"/>
+        <a:cs typeface="+mn-cs"/>
+      </a:defRPr>
+    </a:lvl1pPr>
+    <a:lvl2pPr marL="457200" algn="l" defTabSz="914400" rtl="0" eaLnBrk="1" latinLnBrk="0" hangingPunct="1">
+      <a:defRPr kumimoji="1" sz="1200" kern="1200">
+        <a:solidFill>
+          <a:schemeClr val="tx1"/>
+        </a:solidFill>
+        <a:latin typeface="+mn-lt"/>
+        <a:ea typeface="+mn-ea"/>
+        <a:cs typeface="+mn-cs"/>
+      </a:defRPr>
+    </a:lvl2pPr>
+    <a:lvl3pPr marL="914400" algn="l" defTabSz="914400" rtl="0" eaLnBrk="1" latinLnBrk="0" hangingPunct="1">
+      <a:defRPr kumimoji="1" sz="1200" kern="1200">
+        <a:solidFill>
+          <a:schemeClr val="tx1"/>
+        </a:solidFill>
+        <a:latin typeface="+mn-lt"/>
+        <a:ea typeface="+mn-ea"/>
+        <a:cs typeface="+mn-cs"/>
+      </a:defRPr>
+    </a:lvl3pPr>
+    <a:lvl4pPr marL="1371600" algn="l" defTabSz="914400" rtl="0" eaLnBrk="1" latinLnBrk="0" hangingPunct="1">
+      <a:defRPr kumimoji="1" sz="1200" kern="1200">
+        <a:solidFill>
+          <a:schemeClr val="tx1"/>
+        </a:solidFill>
+        <a:latin typeface="+mn-lt"/>
+        <a:ea typeface="+mn-ea"/>
+        <a:cs typeface="+mn-cs"/>
+      </a:defRPr>
+    </a:lvl4pPr>
+    <a:lvl5pPr marL="1828800" algn="l" defTabSz="914400" rtl="0" eaLnBrk="1" latinLnBrk="0" hangingPunct="1">
+      <a:defRPr kumimoji="1" sz="1200" kern="1200">
+        <a:solidFill>
+          <a:schemeClr val="tx1"/>
+        </a:solidFill>
+        <a:latin typeface="+mn-lt"/>
+        <a:ea typeface="+mn-ea"/>
+        <a:cs typeface="+mn-cs"/>
+      </a:defRPr>
+    </a:lvl5pPr>
+    <a:lvl6pPr marL="2286000" algn="l" defTabSz="914400" rtl="0" eaLnBrk="1" latinLnBrk="0" hangingPunct="1">
+      <a:defRPr kumimoji="1" sz="1200" kern="1200">
+        <a:solidFill>
+          <a:schemeClr val="tx1"/>
+        </a:solidFill>
+        <a:latin typeface="+mn-lt"/>
+        <a:ea typeface="+mn-ea"/>
+        <a:cs typeface="+mn-cs"/>
+      </a:defRPr>
+    </a:lvl6pPr>
+    <a:lvl7pPr marL="2743200" algn="l" defTabSz="914400" rtl="0" eaLnBrk="1" latinLnBrk="0" hangingPunct="1">
+      <a:defRPr kumimoji="1" sz="1200" kern="1200">
+        <a:solidFill>
+          <a:schemeClr val="tx1"/>
+        </a:solidFill>
+        <a:latin typeface="+mn-lt"/>
+        <a:ea typeface="+mn-ea"/>
+        <a:cs typeface="+mn-cs"/>
+      </a:defRPr>
+    </a:lvl7pPr>
+    <a:lvl8pPr marL="3200400" algn="l" defTabSz="914400" rtl="0" eaLnBrk="1" latinLnBrk="0" hangingPunct="1">
+      <a:defRPr kumimoji="1" sz="1200" kern="1200">
+        <a:solidFill>
+          <a:schemeClr val="tx1"/>
+        </a:solidFill>
+        <a:latin typeface="+mn-lt"/>
+        <a:ea typeface="+mn-ea"/>
+        <a:cs typeface="+mn-cs"/>
+      </a:defRPr>
+    </a:lvl8pPr>
+    <a:lvl9pPr marL="3657600" algn="l" defTabSz="914400" rtl="0" eaLnBrk="1" latinLnBrk="0" hangingPunct="1">
+      <a:defRPr kumimoji="1" sz="1200" kern="1200">
+        <a:solidFill>
+          <a:schemeClr val="tx1"/>
+        </a:solidFill>
+        <a:latin typeface="+mn-lt"/>
+        <a:ea typeface="+mn-ea"/>
+        <a:cs typeface="+mn-cs"/>
+      </a:defRPr>
+    </a:lvl9pPr>
+  </p:notesStyle>
+</p:notesMaster>
+</file>
+
+<file path=ppt/notesSlides/notesSlide1.xml><?xml version="1.0" encoding="utf-8"?>
+<p:notes xmlns:a="http://schemas.openxmlformats.org/drawingml/2006/main" xmlns:r="http://schemas.openxmlformats.org/officeDocument/2006/relationships" xmlns:p="http://schemas.openxmlformats.org/presentationml/2006/main">
+  <p:cSld>
+    <p:spTree>
+      <p:nvGrpSpPr>
+        <p:cNvPr id="1" name=""/>
+        <p:cNvGrpSpPr/>
+        <p:nvPr/>
+      </p:nvGrpSpPr>
+      <p:grpSpPr>
+        <a:xfrm>
+          <a:off x="0" y="0"/>
+          <a:ext cx="0" cy="0"/>
+          <a:chOff x="0" y="0"/>
+          <a:chExt cx="0" cy="0"/>
+        </a:xfrm>
+      </p:grpSpPr>
+      <p:sp>
+        <p:nvSpPr>
+          <p:cNvPr id="2" name="スライド イメージ プレースホルダー 1"/>
+          <p:cNvSpPr>
+            <a:spLocks noGrp="1" noRot="1" noChangeAspect="1"/>
+          </p:cNvSpPr>
+          <p:nvPr>
+            <p:ph type="sldImg"/>
+          </p:nvPr>
+        </p:nvSpPr>
+        <p:spPr/>
+      </p:sp>
+      <p:sp>
+        <p:nvSpPr>
+          <p:cNvPr id="3" name="ノート プレースホルダー 2"/>
+          <p:cNvSpPr>
+            <a:spLocks noGrp="1"/>
+          </p:cNvSpPr>
+          <p:nvPr>
+            <p:ph type="body" idx="1"/>
+          </p:nvPr>
+        </p:nvSpPr>
+        <p:spPr/>
+        <p:txBody>
+          <a:bodyPr/>
+          <a:lstStyle/>
+          <a:p>
+            <a:endParaRPr kumimoji="1" lang="ja-JP" altLang="en-US" dirty="0"/>
+          </a:p>
+        </p:txBody>
+      </p:sp>
+      <p:sp>
+        <p:nvSpPr>
+          <p:cNvPr id="4" name="スライド番号プレースホルダー 3"/>
+          <p:cNvSpPr>
+            <a:spLocks noGrp="1"/>
+          </p:cNvSpPr>
+          <p:nvPr>
+            <p:ph type="sldNum" sz="quarter" idx="5"/>
+          </p:nvPr>
+        </p:nvSpPr>
+        <p:spPr/>
+        <p:txBody>
+          <a:bodyPr/>
+          <a:lstStyle/>
+          <a:p>
+            <a:fld id="{E8D2F5C4-CB40-44D3-9C89-5ECCD9AB4B5C}" type="slidenum">
+              <a:rPr kumimoji="1" lang="ja-JP" altLang="en-US" smtClean="0"/>
+              <a:t>14</a:t>
+            </a:fld>
+            <a:endParaRPr kumimoji="1" lang="ja-JP" altLang="en-US"/>
+          </a:p>
+        </p:txBody>
+      </p:sp>
+    </p:spTree>
+    <p:extLst>
+      <p:ext uri="{BB962C8B-B14F-4D97-AF65-F5344CB8AC3E}">
+        <p14:creationId xmlns:p14="http://schemas.microsoft.com/office/powerpoint/2010/main" val="1481615169"/>
+      </p:ext>
+    </p:extLst>
+  </p:cSld>
+  <p:clrMapOvr>
+    <a:masterClrMapping/>
+  </p:clrMapOvr>
+</p:notes>
+</file>
+
+<file path=ppt/notesSlides/notesSlide2.xml><?xml version="1.0" encoding="utf-8"?>
+<p:notes xmlns:a="http://schemas.openxmlformats.org/drawingml/2006/main" xmlns:r="http://schemas.openxmlformats.org/officeDocument/2006/relationships" xmlns:p="http://schemas.openxmlformats.org/presentationml/2006/main">
+  <p:cSld>
+    <p:spTree>
+      <p:nvGrpSpPr>
+        <p:cNvPr id="1" name=""/>
+        <p:cNvGrpSpPr/>
+        <p:nvPr/>
+      </p:nvGrpSpPr>
+      <p:grpSpPr>
+        <a:xfrm>
+          <a:off x="0" y="0"/>
+          <a:ext cx="0" cy="0"/>
+          <a:chOff x="0" y="0"/>
+          <a:chExt cx="0" cy="0"/>
+        </a:xfrm>
+      </p:grpSpPr>
+      <p:sp>
+        <p:nvSpPr>
+          <p:cNvPr id="2" name="スライド イメージ プレースホルダー 1"/>
+          <p:cNvSpPr>
+            <a:spLocks noGrp="1" noRot="1" noChangeAspect="1"/>
+          </p:cNvSpPr>
+          <p:nvPr>
+            <p:ph type="sldImg"/>
+          </p:nvPr>
+        </p:nvSpPr>
+        <p:spPr/>
+      </p:sp>
+      <p:sp>
+        <p:nvSpPr>
+          <p:cNvPr id="3" name="ノート プレースホルダー 2"/>
+          <p:cNvSpPr>
+            <a:spLocks noGrp="1"/>
+          </p:cNvSpPr>
+          <p:nvPr>
+            <p:ph type="body" idx="1"/>
+          </p:nvPr>
+        </p:nvSpPr>
+        <p:spPr/>
+        <p:txBody>
+          <a:bodyPr/>
+          <a:lstStyle/>
+          <a:p>
+            <a:endParaRPr kumimoji="1" lang="ja-JP" altLang="en-US" dirty="0"/>
+          </a:p>
+        </p:txBody>
+      </p:sp>
+      <p:sp>
+        <p:nvSpPr>
+          <p:cNvPr id="4" name="スライド番号プレースホルダー 3"/>
+          <p:cNvSpPr>
+            <a:spLocks noGrp="1"/>
+          </p:cNvSpPr>
+          <p:nvPr>
+            <p:ph type="sldNum" sz="quarter" idx="5"/>
+          </p:nvPr>
+        </p:nvSpPr>
+        <p:spPr/>
+        <p:txBody>
+          <a:bodyPr/>
+          <a:lstStyle/>
+          <a:p>
+            <a:fld id="{E8D2F5C4-CB40-44D3-9C89-5ECCD9AB4B5C}" type="slidenum">
+              <a:rPr kumimoji="1" lang="ja-JP" altLang="en-US" smtClean="0"/>
+              <a:t>15</a:t>
+            </a:fld>
+            <a:endParaRPr kumimoji="1" lang="ja-JP" altLang="en-US"/>
+          </a:p>
+        </p:txBody>
+      </p:sp>
+    </p:spTree>
+    <p:extLst>
+      <p:ext uri="{BB962C8B-B14F-4D97-AF65-F5344CB8AC3E}">
+        <p14:creationId xmlns:p14="http://schemas.microsoft.com/office/powerpoint/2010/main" val="901084948"/>
+      </p:ext>
+    </p:extLst>
+  </p:cSld>
+  <p:clrMapOvr>
+    <a:masterClrMapping/>
+  </p:clrMapOvr>
+</p:notes>
+</file>
+
 <file path=ppt/slideLayouts/slideLayout1.xml><?xml version="1.0" encoding="utf-8"?>
 <p:sldLayout xmlns:a="http://schemas.openxmlformats.org/drawingml/2006/main" xmlns:r="http://schemas.openxmlformats.org/officeDocument/2006/relationships" xmlns:p="http://schemas.openxmlformats.org/presentationml/2006/main" type="title" preserve="1">
   <p:cSld name="タイトル スライド">
@@ -313,7 +867,7 @@
           <a:p>
             <a:fld id="{A1764889-C429-4FBA-9A30-FFA1EB721FBC}" type="datetimeFigureOut">
               <a:rPr kumimoji="1" lang="ja-JP" altLang="en-US" smtClean="0"/>
-              <a:t>2021/3/11</a:t>
+              <a:t>2021/5/15</a:t>
             </a:fld>
             <a:endParaRPr kumimoji="1" lang="ja-JP" altLang="en-US"/>
           </a:p>
@@ -651,7 +1205,7 @@
           <a:p>
             <a:fld id="{A1764889-C429-4FBA-9A30-FFA1EB721FBC}" type="datetimeFigureOut">
               <a:rPr kumimoji="1" lang="ja-JP" altLang="en-US" smtClean="0"/>
-              <a:t>2021/3/11</a:t>
+              <a:t>2021/5/15</a:t>
             </a:fld>
             <a:endParaRPr kumimoji="1" lang="ja-JP" altLang="en-US"/>
           </a:p>
@@ -1052,7 +1606,7 @@
           <a:p>
             <a:fld id="{A1764889-C429-4FBA-9A30-FFA1EB721FBC}" type="datetimeFigureOut">
               <a:rPr kumimoji="1" lang="ja-JP" altLang="en-US" smtClean="0"/>
-              <a:t>2021/3/11</a:t>
+              <a:t>2021/5/15</a:t>
             </a:fld>
             <a:endParaRPr kumimoji="1" lang="ja-JP" altLang="en-US"/>
           </a:p>
@@ -1388,7 +1942,7 @@
           <a:p>
             <a:fld id="{A1764889-C429-4FBA-9A30-FFA1EB721FBC}" type="datetimeFigureOut">
               <a:rPr kumimoji="1" lang="ja-JP" altLang="en-US" smtClean="0"/>
-              <a:t>2021/3/11</a:t>
+              <a:t>2021/5/15</a:t>
             </a:fld>
             <a:endParaRPr kumimoji="1" lang="ja-JP" altLang="en-US"/>
           </a:p>
@@ -1708,7 +2262,7 @@
           <a:p>
             <a:fld id="{A1764889-C429-4FBA-9A30-FFA1EB721FBC}" type="datetimeFigureOut">
               <a:rPr kumimoji="1" lang="ja-JP" altLang="en-US" smtClean="0"/>
-              <a:t>2021/3/11</a:t>
+              <a:t>2021/5/15</a:t>
             </a:fld>
             <a:endParaRPr kumimoji="1" lang="ja-JP" altLang="en-US"/>
           </a:p>
@@ -2104,7 +2658,7 @@
           <a:p>
             <a:fld id="{A1764889-C429-4FBA-9A30-FFA1EB721FBC}" type="datetimeFigureOut">
               <a:rPr kumimoji="1" lang="ja-JP" altLang="en-US" smtClean="0"/>
-              <a:t>2021/3/11</a:t>
+              <a:t>2021/5/15</a:t>
             </a:fld>
             <a:endParaRPr kumimoji="1" lang="ja-JP" altLang="en-US"/>
           </a:p>
@@ -2393,7 +2947,7 @@
           <a:p>
             <a:fld id="{A1764889-C429-4FBA-9A30-FFA1EB721FBC}" type="datetimeFigureOut">
               <a:rPr kumimoji="1" lang="ja-JP" altLang="en-US" smtClean="0"/>
-              <a:t>2021/3/11</a:t>
+              <a:t>2021/5/15</a:t>
             </a:fld>
             <a:endParaRPr kumimoji="1" lang="ja-JP" altLang="en-US"/>
           </a:p>
@@ -2687,7 +3241,7 @@
           <a:p>
             <a:fld id="{A1764889-C429-4FBA-9A30-FFA1EB721FBC}" type="datetimeFigureOut">
               <a:rPr kumimoji="1" lang="ja-JP" altLang="en-US" smtClean="0"/>
-              <a:t>2021/3/11</a:t>
+              <a:t>2021/5/15</a:t>
             </a:fld>
             <a:endParaRPr kumimoji="1" lang="ja-JP" altLang="en-US"/>
           </a:p>
@@ -2981,7 +3535,7 @@
           <a:p>
             <a:fld id="{A1764889-C429-4FBA-9A30-FFA1EB721FBC}" type="datetimeFigureOut">
               <a:rPr kumimoji="1" lang="ja-JP" altLang="en-US" smtClean="0"/>
-              <a:t>2021/3/11</a:t>
+              <a:t>2021/5/15</a:t>
             </a:fld>
             <a:endParaRPr kumimoji="1" lang="ja-JP" altLang="en-US"/>
           </a:p>
@@ -3310,7 +3864,7 @@
           <a:p>
             <a:fld id="{A1764889-C429-4FBA-9A30-FFA1EB721FBC}" type="datetimeFigureOut">
               <a:rPr kumimoji="1" lang="ja-JP" altLang="en-US" smtClean="0"/>
-              <a:t>2021/3/11</a:t>
+              <a:t>2021/5/15</a:t>
             </a:fld>
             <a:endParaRPr kumimoji="1" lang="ja-JP" altLang="en-US"/>
           </a:p>
@@ -3697,7 +4251,7 @@
           <a:p>
             <a:fld id="{A1764889-C429-4FBA-9A30-FFA1EB721FBC}" type="datetimeFigureOut">
               <a:rPr kumimoji="1" lang="ja-JP" altLang="en-US" smtClean="0"/>
-              <a:t>2021/3/11</a:t>
+              <a:t>2021/5/15</a:t>
             </a:fld>
             <a:endParaRPr kumimoji="1" lang="ja-JP" altLang="en-US"/>
           </a:p>
@@ -4218,7 +4772,7 @@
           <a:p>
             <a:fld id="{A1764889-C429-4FBA-9A30-FFA1EB721FBC}" type="datetimeFigureOut">
               <a:rPr kumimoji="1" lang="ja-JP" altLang="en-US" smtClean="0"/>
-              <a:t>2021/3/11</a:t>
+              <a:t>2021/5/15</a:t>
             </a:fld>
             <a:endParaRPr kumimoji="1" lang="ja-JP" altLang="en-US"/>
           </a:p>
@@ -4423,7 +4977,7 @@
           <a:p>
             <a:fld id="{A1764889-C429-4FBA-9A30-FFA1EB721FBC}" type="datetimeFigureOut">
               <a:rPr kumimoji="1" lang="ja-JP" altLang="en-US" smtClean="0"/>
-              <a:t>2021/3/11</a:t>
+              <a:t>2021/5/15</a:t>
             </a:fld>
             <a:endParaRPr kumimoji="1" lang="ja-JP" altLang="en-US"/>
           </a:p>
@@ -4600,7 +5154,7 @@
           <a:p>
             <a:fld id="{A1764889-C429-4FBA-9A30-FFA1EB721FBC}" type="datetimeFigureOut">
               <a:rPr kumimoji="1" lang="ja-JP" altLang="en-US" smtClean="0"/>
-              <a:t>2021/3/11</a:t>
+              <a:t>2021/5/15</a:t>
             </a:fld>
             <a:endParaRPr kumimoji="1" lang="ja-JP" altLang="en-US"/>
           </a:p>
@@ -4965,7 +5519,7 @@
           <a:p>
             <a:fld id="{A1764889-C429-4FBA-9A30-FFA1EB721FBC}" type="datetimeFigureOut">
               <a:rPr kumimoji="1" lang="ja-JP" altLang="en-US" smtClean="0"/>
-              <a:t>2021/3/11</a:t>
+              <a:t>2021/5/15</a:t>
             </a:fld>
             <a:endParaRPr kumimoji="1" lang="ja-JP" altLang="en-US"/>
           </a:p>
@@ -5310,7 +5864,7 @@
           <a:p>
             <a:fld id="{A1764889-C429-4FBA-9A30-FFA1EB721FBC}" type="datetimeFigureOut">
               <a:rPr kumimoji="1" lang="ja-JP" altLang="en-US" smtClean="0"/>
-              <a:t>2021/3/11</a:t>
+              <a:t>2021/5/15</a:t>
             </a:fld>
             <a:endParaRPr kumimoji="1" lang="ja-JP" altLang="en-US"/>
           </a:p>
@@ -7459,7 +8013,7 @@
           <a:p>
             <a:fld id="{A1764889-C429-4FBA-9A30-FFA1EB721FBC}" type="datetimeFigureOut">
               <a:rPr kumimoji="1" lang="ja-JP" altLang="en-US" smtClean="0"/>
-              <a:t>2021/3/11</a:t>
+              <a:t>2021/5/15</a:t>
             </a:fld>
             <a:endParaRPr kumimoji="1" lang="ja-JP" altLang="en-US"/>
           </a:p>
@@ -9930,6 +10484,1089 @@
           <p:cNvPr id="2" name="タイトル 1">
             <a:extLst>
               <a:ext uri="{FF2B5EF4-FFF2-40B4-BE49-F238E27FC236}">
+                <a16:creationId xmlns:a16="http://schemas.microsoft.com/office/drawing/2014/main" id="{DF515C61-C958-43BC-BAFF-3C6346E55E36}"/>
+              </a:ext>
+            </a:extLst>
+          </p:cNvPr>
+          <p:cNvSpPr>
+            <a:spLocks noGrp="1"/>
+          </p:cNvSpPr>
+          <p:nvPr>
+            <p:ph type="title"/>
+          </p:nvPr>
+        </p:nvSpPr>
+        <p:spPr/>
+        <p:txBody>
+          <a:bodyPr/>
+          <a:lstStyle/>
+          <a:p>
+            <a:r>
+              <a:rPr kumimoji="1" lang="en-US" altLang="ja-JP" dirty="0"/>
+              <a:t>VGM Sound Interface(VSIF) – (1)</a:t>
+            </a:r>
+            <a:endParaRPr kumimoji="1" lang="ja-JP" altLang="en-US" dirty="0"/>
+          </a:p>
+        </p:txBody>
+      </p:sp>
+      <p:sp>
+        <p:nvSpPr>
+          <p:cNvPr id="3" name="コンテンツ プレースホルダー 2">
+            <a:extLst>
+              <a:ext uri="{FF2B5EF4-FFF2-40B4-BE49-F238E27FC236}">
+                <a16:creationId xmlns:a16="http://schemas.microsoft.com/office/drawing/2014/main" id="{CD745FAA-4C55-4719-9696-912443FC8E21}"/>
+              </a:ext>
+            </a:extLst>
+          </p:cNvPr>
+          <p:cNvSpPr>
+            <a:spLocks noGrp="1"/>
+          </p:cNvSpPr>
+          <p:nvPr>
+            <p:ph idx="1"/>
+          </p:nvPr>
+        </p:nvSpPr>
+        <p:spPr>
+          <a:xfrm>
+            <a:off x="2589212" y="2133600"/>
+            <a:ext cx="9602788" cy="3777622"/>
+          </a:xfrm>
+        </p:spPr>
+        <p:txBody>
+          <a:bodyPr/>
+          <a:lstStyle/>
+          <a:p>
+            <a:r>
+              <a:rPr kumimoji="1" lang="en-US" altLang="ja-JP" dirty="0" err="1"/>
+              <a:t>MAmidiMEmo</a:t>
+            </a:r>
+            <a:r>
+              <a:rPr kumimoji="1" lang="en-US" altLang="ja-JP" dirty="0"/>
+              <a:t> can drive real machine chips.</a:t>
+            </a:r>
+            <a:br>
+              <a:rPr kumimoji="1" lang="en-US" altLang="ja-JP" dirty="0"/>
+            </a:br>
+            <a:r>
+              <a:rPr kumimoji="1" lang="en-US" altLang="ja-JP" dirty="0"/>
+              <a:t>Currently SMS(2, </a:t>
+            </a:r>
+            <a:r>
+              <a:rPr kumimoji="1" lang="en-US" altLang="ja-JP" i="1" dirty="0" err="1"/>
+              <a:t>MkⅢ</a:t>
+            </a:r>
+            <a:r>
+              <a:rPr kumimoji="1" lang="en-US" altLang="ja-JP" dirty="0"/>
+              <a:t>) for SN76496/OPLL and Genesis(MD) for SN76496/OPNA2.</a:t>
+            </a:r>
+          </a:p>
+          <a:p>
+            <a:r>
+              <a:rPr lang="en-US" altLang="ja-JP" dirty="0"/>
+              <a:t>How to</a:t>
+            </a:r>
+          </a:p>
+          <a:p>
+            <a:pPr marL="800100" lvl="1" indent="-342900">
+              <a:buFont typeface="+mj-lt"/>
+              <a:buAutoNum type="arabicPeriod"/>
+            </a:pPr>
+            <a:r>
+              <a:rPr lang="en-US" altLang="ja-JP" dirty="0"/>
+              <a:t>Buy the following parts.</a:t>
+            </a:r>
+          </a:p>
+          <a:p>
+            <a:pPr lvl="2"/>
+            <a:r>
+              <a:rPr kumimoji="1" lang="en-US" altLang="ja-JP" dirty="0"/>
+              <a:t>1x UART (FT232 and so on) dongle.</a:t>
+            </a:r>
+          </a:p>
+          <a:p>
+            <a:pPr lvl="2"/>
+            <a:r>
+              <a:rPr lang="en-US" altLang="ja-JP" dirty="0"/>
+              <a:t>1x D-SUB 9 pin connector (Female) and cable</a:t>
+            </a:r>
+          </a:p>
+          <a:p>
+            <a:pPr marL="800100" lvl="1" indent="-342900">
+              <a:buFont typeface="+mj-lt"/>
+              <a:buAutoNum type="arabicPeriod"/>
+            </a:pPr>
+            <a:r>
+              <a:rPr lang="en-US" altLang="ja-JP" dirty="0"/>
+              <a:t>Solder like the following.</a:t>
+            </a:r>
+          </a:p>
+          <a:p>
+            <a:endParaRPr kumimoji="1" lang="en-US" altLang="ja-JP" dirty="0"/>
+          </a:p>
+          <a:p>
+            <a:pPr lvl="1"/>
+            <a:endParaRPr kumimoji="1" lang="en-US" altLang="ja-JP" dirty="0"/>
+          </a:p>
+          <a:p>
+            <a:pPr lvl="1"/>
+            <a:endParaRPr kumimoji="1" lang="ja-JP" altLang="en-US" dirty="0"/>
+          </a:p>
+        </p:txBody>
+      </p:sp>
+      <p:grpSp>
+        <p:nvGrpSpPr>
+          <p:cNvPr id="14" name="グループ化 13">
+            <a:extLst>
+              <a:ext uri="{FF2B5EF4-FFF2-40B4-BE49-F238E27FC236}">
+                <a16:creationId xmlns:a16="http://schemas.microsoft.com/office/drawing/2014/main" id="{65F69EC0-07F2-4F12-A990-D976407F18FA}"/>
+              </a:ext>
+            </a:extLst>
+          </p:cNvPr>
+          <p:cNvGrpSpPr/>
+          <p:nvPr/>
+        </p:nvGrpSpPr>
+        <p:grpSpPr>
+          <a:xfrm>
+            <a:off x="7838509" y="4752044"/>
+            <a:ext cx="2659093" cy="2043975"/>
+            <a:chOff x="8285813" y="5095875"/>
+            <a:chExt cx="2211789" cy="1700144"/>
+          </a:xfrm>
+        </p:grpSpPr>
+        <p:pic>
+          <p:nvPicPr>
+            <p:cNvPr id="1026" name="Picture 2">
+              <a:extLst>
+                <a:ext uri="{FF2B5EF4-FFF2-40B4-BE49-F238E27FC236}">
+                  <a16:creationId xmlns:a16="http://schemas.microsoft.com/office/drawing/2014/main" id="{38ED3953-4909-4809-9702-181604DE98BA}"/>
+                </a:ext>
+              </a:extLst>
+            </p:cNvPr>
+            <p:cNvPicPr>
+              <a:picLocks noChangeAspect="1" noChangeArrowheads="1"/>
+            </p:cNvPicPr>
+            <p:nvPr/>
+          </p:nvPicPr>
+          <p:blipFill rotWithShape="1">
+            <a:blip r:embed="rId3">
+              <a:extLst>
+                <a:ext uri="{28A0092B-C50C-407E-A947-70E740481C1C}">
+                  <a14:useLocalDpi xmlns:a14="http://schemas.microsoft.com/office/drawing/2010/main" val="0"/>
+                </a:ext>
+              </a:extLst>
+            </a:blip>
+            <a:srcRect t="25408" b="38518"/>
+            <a:stretch/>
+          </p:blipFill>
+          <p:spPr bwMode="auto">
+            <a:xfrm>
+              <a:off x="8285813" y="5095875"/>
+              <a:ext cx="2211789" cy="815348"/>
+            </a:xfrm>
+            <a:prstGeom prst="rect">
+              <a:avLst/>
+            </a:prstGeom>
+            <a:noFill/>
+            <a:extLst>
+              <a:ext uri="{909E8E84-426E-40DD-AFC4-6F175D3DCCD1}">
+                <a14:hiddenFill xmlns:a14="http://schemas.microsoft.com/office/drawing/2010/main">
+                  <a:solidFill>
+                    <a:srgbClr val="FFFFFF"/>
+                  </a:solidFill>
+                </a14:hiddenFill>
+              </a:ext>
+            </a:extLst>
+          </p:spPr>
+        </p:pic>
+        <p:pic>
+          <p:nvPicPr>
+            <p:cNvPr id="11" name="Picture 2">
+              <a:extLst>
+                <a:ext uri="{FF2B5EF4-FFF2-40B4-BE49-F238E27FC236}">
+                  <a16:creationId xmlns:a16="http://schemas.microsoft.com/office/drawing/2014/main" id="{10A285EC-23D2-4F62-84A9-24AA31774A67}"/>
+                </a:ext>
+              </a:extLst>
+            </p:cNvPr>
+            <p:cNvPicPr>
+              <a:picLocks noChangeAspect="1" noChangeArrowheads="1"/>
+            </p:cNvPicPr>
+            <p:nvPr/>
+          </p:nvPicPr>
+          <p:blipFill rotWithShape="1">
+            <a:blip r:embed="rId3">
+              <a:extLst>
+                <a:ext uri="{28A0092B-C50C-407E-A947-70E740481C1C}">
+                  <a14:useLocalDpi xmlns:a14="http://schemas.microsoft.com/office/drawing/2010/main" val="0"/>
+                </a:ext>
+              </a:extLst>
+            </a:blip>
+            <a:srcRect t="25407" r="34715" b="-628"/>
+            <a:stretch/>
+          </p:blipFill>
+          <p:spPr bwMode="auto">
+            <a:xfrm>
+              <a:off x="8285813" y="5095875"/>
+              <a:ext cx="1443975" cy="1700144"/>
+            </a:xfrm>
+            <a:prstGeom prst="rect">
+              <a:avLst/>
+            </a:prstGeom>
+            <a:noFill/>
+            <a:extLst>
+              <a:ext uri="{909E8E84-426E-40DD-AFC4-6F175D3DCCD1}">
+                <a14:hiddenFill xmlns:a14="http://schemas.microsoft.com/office/drawing/2010/main">
+                  <a:solidFill>
+                    <a:srgbClr val="FFFFFF"/>
+                  </a:solidFill>
+                </a14:hiddenFill>
+              </a:ext>
+            </a:extLst>
+          </p:spPr>
+        </p:pic>
+      </p:grpSp>
+      <p:pic>
+        <p:nvPicPr>
+          <p:cNvPr id="5" name="図 4">
+            <a:extLst>
+              <a:ext uri="{FF2B5EF4-FFF2-40B4-BE49-F238E27FC236}">
+                <a16:creationId xmlns:a16="http://schemas.microsoft.com/office/drawing/2014/main" id="{D2FD8FB6-1BC7-45A0-8613-21371F348CA9}"/>
+              </a:ext>
+            </a:extLst>
+          </p:cNvPr>
+          <p:cNvPicPr>
+            <a:picLocks noChangeAspect="1"/>
+          </p:cNvPicPr>
+          <p:nvPr/>
+        </p:nvPicPr>
+        <p:blipFill rotWithShape="1">
+          <a:blip r:embed="rId4">
+            <a:extLst>
+              <a:ext uri="{28A0092B-C50C-407E-A947-70E740481C1C}">
+                <a14:useLocalDpi xmlns:a14="http://schemas.microsoft.com/office/drawing/2010/main" val="0"/>
+              </a:ext>
+            </a:extLst>
+          </a:blip>
+          <a:srcRect l="27693" t="10341" r="5170" b="18677"/>
+          <a:stretch/>
+        </p:blipFill>
+        <p:spPr>
+          <a:xfrm>
+            <a:off x="5194716" y="4953209"/>
+            <a:ext cx="2215637" cy="1558151"/>
+          </a:xfrm>
+          <a:prstGeom prst="rect">
+            <a:avLst/>
+          </a:prstGeom>
+        </p:spPr>
+      </p:pic>
+      <p:pic>
+        <p:nvPicPr>
+          <p:cNvPr id="7" name="図 6">
+            <a:extLst>
+              <a:ext uri="{FF2B5EF4-FFF2-40B4-BE49-F238E27FC236}">
+                <a16:creationId xmlns:a16="http://schemas.microsoft.com/office/drawing/2014/main" id="{8FFB032C-FC1D-4EB5-A7E3-EF3F17954AA6}"/>
+              </a:ext>
+            </a:extLst>
+          </p:cNvPr>
+          <p:cNvPicPr>
+            <a:picLocks noChangeAspect="1"/>
+          </p:cNvPicPr>
+          <p:nvPr/>
+        </p:nvPicPr>
+        <p:blipFill rotWithShape="1">
+          <a:blip r:embed="rId5">
+            <a:extLst>
+              <a:ext uri="{28A0092B-C50C-407E-A947-70E740481C1C}">
+                <a14:useLocalDpi xmlns:a14="http://schemas.microsoft.com/office/drawing/2010/main" val="0"/>
+              </a:ext>
+            </a:extLst>
+          </a:blip>
+          <a:srcRect l="37972" t="58582" r="47913" b="23255"/>
+          <a:stretch/>
+        </p:blipFill>
+        <p:spPr>
+          <a:xfrm>
+            <a:off x="3017368" y="4953209"/>
+            <a:ext cx="2152590" cy="1558151"/>
+          </a:xfrm>
+          <a:prstGeom prst="rect">
+            <a:avLst/>
+          </a:prstGeom>
+        </p:spPr>
+      </p:pic>
+      <p:sp>
+        <p:nvSpPr>
+          <p:cNvPr id="16" name="フリーフォーム: 図形 15">
+            <a:extLst>
+              <a:ext uri="{FF2B5EF4-FFF2-40B4-BE49-F238E27FC236}">
+                <a16:creationId xmlns:a16="http://schemas.microsoft.com/office/drawing/2014/main" id="{C9F54795-9AD5-44F7-A43B-5CCD0F97FE1C}"/>
+              </a:ext>
+            </a:extLst>
+          </p:cNvPr>
+          <p:cNvSpPr/>
+          <p:nvPr/>
+        </p:nvSpPr>
+        <p:spPr>
+          <a:xfrm>
+            <a:off x="5948363" y="5058738"/>
+            <a:ext cx="2386012" cy="694362"/>
+          </a:xfrm>
+          <a:custGeom>
+            <a:avLst/>
+            <a:gdLst>
+              <a:gd name="connsiteX0" fmla="*/ 0 w 2386012"/>
+              <a:gd name="connsiteY0" fmla="*/ 694362 h 694362"/>
+              <a:gd name="connsiteX1" fmla="*/ 1557337 w 2386012"/>
+              <a:gd name="connsiteY1" fmla="*/ 60950 h 694362"/>
+              <a:gd name="connsiteX2" fmla="*/ 2386012 w 2386012"/>
+              <a:gd name="connsiteY2" fmla="*/ 60950 h 694362"/>
+            </a:gdLst>
+            <a:ahLst/>
+            <a:cxnLst>
+              <a:cxn ang="0">
+                <a:pos x="connsiteX0" y="connsiteY0"/>
+              </a:cxn>
+              <a:cxn ang="0">
+                <a:pos x="connsiteX1" y="connsiteY1"/>
+              </a:cxn>
+              <a:cxn ang="0">
+                <a:pos x="connsiteX2" y="connsiteY2"/>
+              </a:cxn>
+            </a:cxnLst>
+            <a:rect l="l" t="t" r="r" b="b"/>
+            <a:pathLst>
+              <a:path w="2386012" h="694362">
+                <a:moveTo>
+                  <a:pt x="0" y="694362"/>
+                </a:moveTo>
+                <a:cubicBezTo>
+                  <a:pt x="579834" y="430440"/>
+                  <a:pt x="1159668" y="166519"/>
+                  <a:pt x="1557337" y="60950"/>
+                </a:cubicBezTo>
+                <a:cubicBezTo>
+                  <a:pt x="1955006" y="-44619"/>
+                  <a:pt x="2170509" y="8165"/>
+                  <a:pt x="2386012" y="60950"/>
+                </a:cubicBezTo>
+              </a:path>
+            </a:pathLst>
+          </a:custGeom>
+          <a:noFill/>
+        </p:spPr>
+        <p:style>
+          <a:lnRef idx="2">
+            <a:schemeClr val="accent1">
+              <a:shade val="50000"/>
+            </a:schemeClr>
+          </a:lnRef>
+          <a:fillRef idx="1">
+            <a:schemeClr val="accent1"/>
+          </a:fillRef>
+          <a:effectRef idx="0">
+            <a:schemeClr val="accent1"/>
+          </a:effectRef>
+          <a:fontRef idx="minor">
+            <a:schemeClr val="lt1"/>
+          </a:fontRef>
+        </p:style>
+        <p:txBody>
+          <a:bodyPr rtlCol="0" anchor="ctr"/>
+          <a:lstStyle/>
+          <a:p>
+            <a:pPr algn="ctr"/>
+            <a:endParaRPr kumimoji="1" lang="ja-JP" altLang="en-US"/>
+          </a:p>
+        </p:txBody>
+      </p:sp>
+      <p:sp>
+        <p:nvSpPr>
+          <p:cNvPr id="17" name="フリーフォーム: 図形 16">
+            <a:extLst>
+              <a:ext uri="{FF2B5EF4-FFF2-40B4-BE49-F238E27FC236}">
+                <a16:creationId xmlns:a16="http://schemas.microsoft.com/office/drawing/2014/main" id="{55AE2816-1C97-47CB-8A9B-31B487F4B35C}"/>
+              </a:ext>
+            </a:extLst>
+          </p:cNvPr>
+          <p:cNvSpPr/>
+          <p:nvPr/>
+        </p:nvSpPr>
+        <p:spPr>
+          <a:xfrm>
+            <a:off x="4081463" y="5006229"/>
+            <a:ext cx="4286250" cy="737346"/>
+          </a:xfrm>
+          <a:custGeom>
+            <a:avLst/>
+            <a:gdLst>
+              <a:gd name="connsiteX0" fmla="*/ 0 w 4286250"/>
+              <a:gd name="connsiteY0" fmla="*/ 737346 h 737346"/>
+              <a:gd name="connsiteX1" fmla="*/ 2938462 w 4286250"/>
+              <a:gd name="connsiteY1" fmla="*/ 46784 h 737346"/>
+              <a:gd name="connsiteX2" fmla="*/ 4286250 w 4286250"/>
+              <a:gd name="connsiteY2" fmla="*/ 118221 h 737346"/>
+            </a:gdLst>
+            <a:ahLst/>
+            <a:cxnLst>
+              <a:cxn ang="0">
+                <a:pos x="connsiteX0" y="connsiteY0"/>
+              </a:cxn>
+              <a:cxn ang="0">
+                <a:pos x="connsiteX1" y="connsiteY1"/>
+              </a:cxn>
+              <a:cxn ang="0">
+                <a:pos x="connsiteX2" y="connsiteY2"/>
+              </a:cxn>
+            </a:cxnLst>
+            <a:rect l="l" t="t" r="r" b="b"/>
+            <a:pathLst>
+              <a:path w="4286250" h="737346">
+                <a:moveTo>
+                  <a:pt x="0" y="737346"/>
+                </a:moveTo>
+                <a:cubicBezTo>
+                  <a:pt x="1112043" y="443659"/>
+                  <a:pt x="2224087" y="149972"/>
+                  <a:pt x="2938462" y="46784"/>
+                </a:cubicBezTo>
+                <a:cubicBezTo>
+                  <a:pt x="3652837" y="-56404"/>
+                  <a:pt x="3969543" y="30908"/>
+                  <a:pt x="4286250" y="118221"/>
+                </a:cubicBezTo>
+              </a:path>
+            </a:pathLst>
+          </a:custGeom>
+          <a:noFill/>
+        </p:spPr>
+        <p:style>
+          <a:lnRef idx="2">
+            <a:schemeClr val="accent1">
+              <a:shade val="50000"/>
+            </a:schemeClr>
+          </a:lnRef>
+          <a:fillRef idx="1">
+            <a:schemeClr val="accent1"/>
+          </a:fillRef>
+          <a:effectRef idx="0">
+            <a:schemeClr val="accent1"/>
+          </a:effectRef>
+          <a:fontRef idx="minor">
+            <a:schemeClr val="lt1"/>
+          </a:fontRef>
+        </p:style>
+        <p:txBody>
+          <a:bodyPr rtlCol="0" anchor="ctr"/>
+          <a:lstStyle/>
+          <a:p>
+            <a:pPr algn="ctr"/>
+            <a:endParaRPr kumimoji="1" lang="ja-JP" altLang="en-US"/>
+          </a:p>
+        </p:txBody>
+      </p:sp>
+      <p:sp>
+        <p:nvSpPr>
+          <p:cNvPr id="18" name="フリーフォーム: 図形 17">
+            <a:extLst>
+              <a:ext uri="{FF2B5EF4-FFF2-40B4-BE49-F238E27FC236}">
+                <a16:creationId xmlns:a16="http://schemas.microsoft.com/office/drawing/2014/main" id="{894A75B9-B2DC-40FF-BFC6-5C9708286A42}"/>
+              </a:ext>
+            </a:extLst>
+          </p:cNvPr>
+          <p:cNvSpPr/>
+          <p:nvPr/>
+        </p:nvSpPr>
+        <p:spPr>
+          <a:xfrm>
+            <a:off x="6115050" y="4721077"/>
+            <a:ext cx="2243138" cy="1103461"/>
+          </a:xfrm>
+          <a:custGeom>
+            <a:avLst/>
+            <a:gdLst>
+              <a:gd name="connsiteX0" fmla="*/ 0 w 2243138"/>
+              <a:gd name="connsiteY0" fmla="*/ 1103461 h 1103461"/>
+              <a:gd name="connsiteX1" fmla="*/ 1609725 w 2243138"/>
+              <a:gd name="connsiteY1" fmla="*/ 41423 h 1103461"/>
+              <a:gd name="connsiteX2" fmla="*/ 2243138 w 2243138"/>
+              <a:gd name="connsiteY2" fmla="*/ 317648 h 1103461"/>
+            </a:gdLst>
+            <a:ahLst/>
+            <a:cxnLst>
+              <a:cxn ang="0">
+                <a:pos x="connsiteX0" y="connsiteY0"/>
+              </a:cxn>
+              <a:cxn ang="0">
+                <a:pos x="connsiteX1" y="connsiteY1"/>
+              </a:cxn>
+              <a:cxn ang="0">
+                <a:pos x="connsiteX2" y="connsiteY2"/>
+              </a:cxn>
+            </a:cxnLst>
+            <a:rect l="l" t="t" r="r" b="b"/>
+            <a:pathLst>
+              <a:path w="2243138" h="1103461">
+                <a:moveTo>
+                  <a:pt x="0" y="1103461"/>
+                </a:moveTo>
+                <a:cubicBezTo>
+                  <a:pt x="617934" y="637926"/>
+                  <a:pt x="1235869" y="172392"/>
+                  <a:pt x="1609725" y="41423"/>
+                </a:cubicBezTo>
+                <a:cubicBezTo>
+                  <a:pt x="1983581" y="-89546"/>
+                  <a:pt x="2113359" y="114051"/>
+                  <a:pt x="2243138" y="317648"/>
+                </a:cubicBezTo>
+              </a:path>
+            </a:pathLst>
+          </a:custGeom>
+          <a:ln w="34925" cmpd="dbl">
+            <a:solidFill>
+              <a:schemeClr val="bg1">
+                <a:lumMod val="50000"/>
+              </a:schemeClr>
+            </a:solidFill>
+          </a:ln>
+        </p:spPr>
+        <p:style>
+          <a:lnRef idx="1">
+            <a:schemeClr val="dk1"/>
+          </a:lnRef>
+          <a:fillRef idx="0">
+            <a:schemeClr val="dk1"/>
+          </a:fillRef>
+          <a:effectRef idx="0">
+            <a:schemeClr val="dk1"/>
+          </a:effectRef>
+          <a:fontRef idx="minor">
+            <a:schemeClr val="tx1"/>
+          </a:fontRef>
+        </p:style>
+        <p:txBody>
+          <a:bodyPr rtlCol="0" anchor="ctr"/>
+          <a:lstStyle/>
+          <a:p>
+            <a:pPr algn="ctr"/>
+            <a:endParaRPr kumimoji="1" lang="ja-JP" altLang="en-US"/>
+          </a:p>
+        </p:txBody>
+      </p:sp>
+      <p:sp>
+        <p:nvSpPr>
+          <p:cNvPr id="19" name="フリーフォーム: 図形 18">
+            <a:extLst>
+              <a:ext uri="{FF2B5EF4-FFF2-40B4-BE49-F238E27FC236}">
+                <a16:creationId xmlns:a16="http://schemas.microsoft.com/office/drawing/2014/main" id="{3F77D31B-5561-40CB-B0C1-77AF79EBD174}"/>
+              </a:ext>
+            </a:extLst>
+          </p:cNvPr>
+          <p:cNvSpPr/>
+          <p:nvPr/>
+        </p:nvSpPr>
+        <p:spPr>
+          <a:xfrm>
+            <a:off x="4152900" y="4730558"/>
+            <a:ext cx="4224338" cy="1113030"/>
+          </a:xfrm>
+          <a:custGeom>
+            <a:avLst/>
+            <a:gdLst>
+              <a:gd name="connsiteX0" fmla="*/ 0 w 4224338"/>
+              <a:gd name="connsiteY0" fmla="*/ 1113030 h 1113030"/>
+              <a:gd name="connsiteX1" fmla="*/ 3162300 w 4224338"/>
+              <a:gd name="connsiteY1" fmla="*/ 41467 h 1113030"/>
+              <a:gd name="connsiteX2" fmla="*/ 4224338 w 4224338"/>
+              <a:gd name="connsiteY2" fmla="*/ 322455 h 1113030"/>
+            </a:gdLst>
+            <a:ahLst/>
+            <a:cxnLst>
+              <a:cxn ang="0">
+                <a:pos x="connsiteX0" y="connsiteY0"/>
+              </a:cxn>
+              <a:cxn ang="0">
+                <a:pos x="connsiteX1" y="connsiteY1"/>
+              </a:cxn>
+              <a:cxn ang="0">
+                <a:pos x="connsiteX2" y="connsiteY2"/>
+              </a:cxn>
+            </a:cxnLst>
+            <a:rect l="l" t="t" r="r" b="b"/>
+            <a:pathLst>
+              <a:path w="4224338" h="1113030">
+                <a:moveTo>
+                  <a:pt x="0" y="1113030"/>
+                </a:moveTo>
+                <a:cubicBezTo>
+                  <a:pt x="1229122" y="643129"/>
+                  <a:pt x="2458244" y="173229"/>
+                  <a:pt x="3162300" y="41467"/>
+                </a:cubicBezTo>
+                <a:cubicBezTo>
+                  <a:pt x="3866356" y="-90295"/>
+                  <a:pt x="4045347" y="116080"/>
+                  <a:pt x="4224338" y="322455"/>
+                </a:cubicBezTo>
+              </a:path>
+            </a:pathLst>
+          </a:custGeom>
+          <a:ln w="34925" cmpd="dbl">
+            <a:solidFill>
+              <a:schemeClr val="bg1">
+                <a:lumMod val="50000"/>
+              </a:schemeClr>
+            </a:solidFill>
+          </a:ln>
+        </p:spPr>
+        <p:style>
+          <a:lnRef idx="1">
+            <a:schemeClr val="dk1"/>
+          </a:lnRef>
+          <a:fillRef idx="0">
+            <a:schemeClr val="dk1"/>
+          </a:fillRef>
+          <a:effectRef idx="0">
+            <a:schemeClr val="dk1"/>
+          </a:effectRef>
+          <a:fontRef idx="minor">
+            <a:schemeClr val="tx1"/>
+          </a:fontRef>
+        </p:style>
+        <p:txBody>
+          <a:bodyPr rtlCol="0" anchor="ctr"/>
+          <a:lstStyle/>
+          <a:p>
+            <a:pPr algn="ctr"/>
+            <a:endParaRPr kumimoji="1" lang="ja-JP" altLang="en-US"/>
+          </a:p>
+        </p:txBody>
+      </p:sp>
+      <p:sp>
+        <p:nvSpPr>
+          <p:cNvPr id="22" name="テキスト ボックス 21">
+            <a:extLst>
+              <a:ext uri="{FF2B5EF4-FFF2-40B4-BE49-F238E27FC236}">
+                <a16:creationId xmlns:a16="http://schemas.microsoft.com/office/drawing/2014/main" id="{2F649AD2-15CF-4963-976D-482AD5644D94}"/>
+              </a:ext>
+            </a:extLst>
+          </p:cNvPr>
+          <p:cNvSpPr txBox="1"/>
+          <p:nvPr/>
+        </p:nvSpPr>
+        <p:spPr>
+          <a:xfrm>
+            <a:off x="3300108" y="4684693"/>
+            <a:ext cx="1486767" cy="307777"/>
+          </a:xfrm>
+          <a:prstGeom prst="rect">
+            <a:avLst/>
+          </a:prstGeom>
+          <a:noFill/>
+        </p:spPr>
+        <p:txBody>
+          <a:bodyPr wrap="square">
+            <a:spAutoFit/>
+          </a:bodyPr>
+          <a:lstStyle/>
+          <a:p>
+            <a:r>
+              <a:rPr lang="en-US" altLang="ja-JP" sz="1400" dirty="0"/>
+              <a:t>SMS/2 or </a:t>
+            </a:r>
+            <a:r>
+              <a:rPr lang="en-US" altLang="ja-JP" sz="1400" i="1" dirty="0" err="1"/>
+              <a:t>MkⅢ</a:t>
+            </a:r>
+            <a:endParaRPr lang="en-US" altLang="ja-JP" sz="1400" i="1" dirty="0"/>
+          </a:p>
+        </p:txBody>
+      </p:sp>
+      <p:sp>
+        <p:nvSpPr>
+          <p:cNvPr id="23" name="テキスト ボックス 22">
+            <a:extLst>
+              <a:ext uri="{FF2B5EF4-FFF2-40B4-BE49-F238E27FC236}">
+                <a16:creationId xmlns:a16="http://schemas.microsoft.com/office/drawing/2014/main" id="{8AB3B45F-5847-4257-97E5-E74FEE7EC93F}"/>
+              </a:ext>
+            </a:extLst>
+          </p:cNvPr>
+          <p:cNvSpPr txBox="1"/>
+          <p:nvPr/>
+        </p:nvSpPr>
+        <p:spPr>
+          <a:xfrm>
+            <a:off x="5609722" y="4643865"/>
+            <a:ext cx="1257098" cy="307777"/>
+          </a:xfrm>
+          <a:prstGeom prst="rect">
+            <a:avLst/>
+          </a:prstGeom>
+          <a:noFill/>
+        </p:spPr>
+        <p:txBody>
+          <a:bodyPr wrap="square">
+            <a:spAutoFit/>
+          </a:bodyPr>
+          <a:lstStyle/>
+          <a:p>
+            <a:r>
+              <a:rPr lang="en-US" altLang="ja-JP" sz="1400" dirty="0"/>
+              <a:t>Genesis/MD</a:t>
+            </a:r>
+            <a:endParaRPr lang="en-US" altLang="ja-JP" sz="1400" i="1" dirty="0"/>
+          </a:p>
+        </p:txBody>
+      </p:sp>
+      <p:sp>
+        <p:nvSpPr>
+          <p:cNvPr id="24" name="テキスト ボックス 23">
+            <a:extLst>
+              <a:ext uri="{FF2B5EF4-FFF2-40B4-BE49-F238E27FC236}">
+                <a16:creationId xmlns:a16="http://schemas.microsoft.com/office/drawing/2014/main" id="{31569F60-B612-4231-809A-EFE4B8286856}"/>
+              </a:ext>
+            </a:extLst>
+          </p:cNvPr>
+          <p:cNvSpPr txBox="1"/>
+          <p:nvPr/>
+        </p:nvSpPr>
+        <p:spPr>
+          <a:xfrm>
+            <a:off x="3129146" y="6482150"/>
+            <a:ext cx="1929033" cy="307777"/>
+          </a:xfrm>
+          <a:prstGeom prst="rect">
+            <a:avLst/>
+          </a:prstGeom>
+          <a:noFill/>
+        </p:spPr>
+        <p:txBody>
+          <a:bodyPr wrap="square">
+            <a:spAutoFit/>
+          </a:bodyPr>
+          <a:lstStyle/>
+          <a:p>
+            <a:r>
+              <a:rPr lang="en-US" altLang="ja-JP" sz="1400" dirty="0"/>
+              <a:t>Pin3 - TX, Pin8 - GND</a:t>
+            </a:r>
+          </a:p>
+        </p:txBody>
+      </p:sp>
+      <p:sp>
+        <p:nvSpPr>
+          <p:cNvPr id="25" name="テキスト ボックス 24">
+            <a:extLst>
+              <a:ext uri="{FF2B5EF4-FFF2-40B4-BE49-F238E27FC236}">
+                <a16:creationId xmlns:a16="http://schemas.microsoft.com/office/drawing/2014/main" id="{3B31730C-AA65-4B85-A02D-35060D158B37}"/>
+              </a:ext>
+            </a:extLst>
+          </p:cNvPr>
+          <p:cNvSpPr txBox="1"/>
+          <p:nvPr/>
+        </p:nvSpPr>
+        <p:spPr>
+          <a:xfrm>
+            <a:off x="5338017" y="6482150"/>
+            <a:ext cx="1929034" cy="307777"/>
+          </a:xfrm>
+          <a:prstGeom prst="rect">
+            <a:avLst/>
+          </a:prstGeom>
+          <a:noFill/>
+        </p:spPr>
+        <p:txBody>
+          <a:bodyPr wrap="square">
+            <a:spAutoFit/>
+          </a:bodyPr>
+          <a:lstStyle/>
+          <a:p>
+            <a:r>
+              <a:rPr lang="en-US" altLang="ja-JP" sz="1400" dirty="0"/>
+              <a:t>Pin1 - TX, Pin8 - GND</a:t>
+            </a:r>
+          </a:p>
+        </p:txBody>
+      </p:sp>
+      <p:sp>
+        <p:nvSpPr>
+          <p:cNvPr id="27" name="テキスト ボックス 26">
+            <a:extLst>
+              <a:ext uri="{FF2B5EF4-FFF2-40B4-BE49-F238E27FC236}">
+                <a16:creationId xmlns:a16="http://schemas.microsoft.com/office/drawing/2014/main" id="{0DC80F62-61CC-494D-9703-3987DA145C58}"/>
+              </a:ext>
+            </a:extLst>
+          </p:cNvPr>
+          <p:cNvSpPr txBox="1"/>
+          <p:nvPr/>
+        </p:nvSpPr>
+        <p:spPr>
+          <a:xfrm>
+            <a:off x="8325021" y="4340455"/>
+            <a:ext cx="2172581" cy="369332"/>
+          </a:xfrm>
+          <a:prstGeom prst="rect">
+            <a:avLst/>
+          </a:prstGeom>
+          <a:noFill/>
+        </p:spPr>
+        <p:txBody>
+          <a:bodyPr wrap="square">
+            <a:spAutoFit/>
+          </a:bodyPr>
+          <a:lstStyle/>
+          <a:p>
+            <a:r>
+              <a:rPr kumimoji="1" lang="en-US" altLang="ja-JP" dirty="0"/>
+              <a:t>Any UART dongle</a:t>
+            </a:r>
+            <a:endParaRPr lang="ja-JP" altLang="en-US" dirty="0"/>
+          </a:p>
+        </p:txBody>
+      </p:sp>
+    </p:spTree>
+    <p:extLst>
+      <p:ext uri="{BB962C8B-B14F-4D97-AF65-F5344CB8AC3E}">
+        <p14:creationId xmlns:p14="http://schemas.microsoft.com/office/powerpoint/2010/main" val="107282534"/>
+      </p:ext>
+    </p:extLst>
+  </p:cSld>
+  <p:clrMapOvr>
+    <a:masterClrMapping/>
+  </p:clrMapOvr>
+</p:sld>
+</file>
+
+<file path=ppt/slides/slide15.xml><?xml version="1.0" encoding="utf-8"?>
+<p:sld xmlns:a="http://schemas.openxmlformats.org/drawingml/2006/main" xmlns:r="http://schemas.openxmlformats.org/officeDocument/2006/relationships" xmlns:p="http://schemas.openxmlformats.org/presentationml/2006/main">
+  <p:cSld>
+    <p:spTree>
+      <p:nvGrpSpPr>
+        <p:cNvPr id="1" name=""/>
+        <p:cNvGrpSpPr/>
+        <p:nvPr/>
+      </p:nvGrpSpPr>
+      <p:grpSpPr>
+        <a:xfrm>
+          <a:off x="0" y="0"/>
+          <a:ext cx="0" cy="0"/>
+          <a:chOff x="0" y="0"/>
+          <a:chExt cx="0" cy="0"/>
+        </a:xfrm>
+      </p:grpSpPr>
+      <p:sp>
+        <p:nvSpPr>
+          <p:cNvPr id="2" name="タイトル 1">
+            <a:extLst>
+              <a:ext uri="{FF2B5EF4-FFF2-40B4-BE49-F238E27FC236}">
+                <a16:creationId xmlns:a16="http://schemas.microsoft.com/office/drawing/2014/main" id="{DF515C61-C958-43BC-BAFF-3C6346E55E36}"/>
+              </a:ext>
+            </a:extLst>
+          </p:cNvPr>
+          <p:cNvSpPr>
+            <a:spLocks noGrp="1"/>
+          </p:cNvSpPr>
+          <p:nvPr>
+            <p:ph type="title"/>
+          </p:nvPr>
+        </p:nvSpPr>
+        <p:spPr/>
+        <p:txBody>
+          <a:bodyPr/>
+          <a:lstStyle/>
+          <a:p>
+            <a:r>
+              <a:rPr kumimoji="1" lang="en-US" altLang="ja-JP" dirty="0"/>
+              <a:t>VGM Sound Interface(VSIF) – (2)</a:t>
+            </a:r>
+            <a:endParaRPr kumimoji="1" lang="ja-JP" altLang="en-US" dirty="0"/>
+          </a:p>
+        </p:txBody>
+      </p:sp>
+      <p:sp>
+        <p:nvSpPr>
+          <p:cNvPr id="3" name="コンテンツ プレースホルダー 2">
+            <a:extLst>
+              <a:ext uri="{FF2B5EF4-FFF2-40B4-BE49-F238E27FC236}">
+                <a16:creationId xmlns:a16="http://schemas.microsoft.com/office/drawing/2014/main" id="{CD745FAA-4C55-4719-9696-912443FC8E21}"/>
+              </a:ext>
+            </a:extLst>
+          </p:cNvPr>
+          <p:cNvSpPr>
+            <a:spLocks noGrp="1"/>
+          </p:cNvSpPr>
+          <p:nvPr>
+            <p:ph idx="1"/>
+          </p:nvPr>
+        </p:nvSpPr>
+        <p:spPr>
+          <a:xfrm>
+            <a:off x="2589212" y="2133600"/>
+            <a:ext cx="9602788" cy="3777622"/>
+          </a:xfrm>
+        </p:spPr>
+        <p:txBody>
+          <a:bodyPr/>
+          <a:lstStyle/>
+          <a:p>
+            <a:pPr>
+              <a:buFont typeface="+mj-lt"/>
+              <a:buAutoNum type="arabicPeriod" startAt="3"/>
+            </a:pPr>
+            <a:r>
+              <a:rPr kumimoji="1" lang="en-US" altLang="ja-JP" dirty="0"/>
+              <a:t>Set the </a:t>
+            </a:r>
+            <a:r>
+              <a:rPr kumimoji="1" lang="en-US" altLang="ja-JP" dirty="0" err="1"/>
+              <a:t>COMPort</a:t>
+            </a:r>
+            <a:r>
+              <a:rPr kumimoji="1" lang="en-US" altLang="ja-JP" dirty="0"/>
+              <a:t> name and select “VSIF SMS”  or “VSIF Genesis”.</a:t>
+            </a:r>
+          </a:p>
+          <a:p>
+            <a:pPr>
+              <a:buFont typeface="+mj-lt"/>
+              <a:buAutoNum type="arabicPeriod" startAt="3"/>
+            </a:pPr>
+            <a:endParaRPr lang="en-US" altLang="ja-JP" dirty="0"/>
+          </a:p>
+          <a:p>
+            <a:pPr>
+              <a:buFont typeface="+mj-lt"/>
+              <a:buAutoNum type="arabicPeriod" startAt="3"/>
+            </a:pPr>
+            <a:endParaRPr kumimoji="1" lang="en-US" altLang="ja-JP" dirty="0"/>
+          </a:p>
+          <a:p>
+            <a:pPr>
+              <a:buFont typeface="+mj-lt"/>
+              <a:buAutoNum type="arabicPeriod" startAt="3"/>
+            </a:pPr>
+            <a:endParaRPr lang="en-US" altLang="ja-JP" dirty="0"/>
+          </a:p>
+          <a:p>
+            <a:pPr>
+              <a:buFont typeface="+mj-lt"/>
+              <a:buAutoNum type="arabicPeriod" startAt="3"/>
+            </a:pPr>
+            <a:endParaRPr kumimoji="1" lang="en-US" altLang="ja-JP" dirty="0"/>
+          </a:p>
+          <a:p>
+            <a:pPr>
+              <a:buFont typeface="+mj-lt"/>
+              <a:buAutoNum type="arabicPeriod" startAt="3"/>
+            </a:pPr>
+            <a:r>
+              <a:rPr lang="en-US" altLang="ja-JP" dirty="0"/>
+              <a:t>Done!</a:t>
+            </a:r>
+          </a:p>
+          <a:p>
+            <a:pPr>
+              <a:buFont typeface="+mj-lt"/>
+              <a:buAutoNum type="arabicPeriod" startAt="3"/>
+            </a:pPr>
+            <a:r>
+              <a:rPr kumimoji="1" lang="en-US" altLang="ja-JP" dirty="0"/>
+              <a:t>I</a:t>
+            </a:r>
+            <a:r>
+              <a:rPr lang="en-US" altLang="ja-JP" dirty="0"/>
+              <a:t>f you can not sound sounds, make sure soldering</a:t>
+            </a:r>
+            <a:r>
+              <a:rPr lang="ja-JP" altLang="en-US" dirty="0"/>
+              <a:t> </a:t>
+            </a:r>
+            <a:r>
+              <a:rPr lang="en-US" altLang="ja-JP" dirty="0"/>
+              <a:t>and </a:t>
+            </a:r>
+            <a:r>
+              <a:rPr lang="en-US" altLang="ja-JP" dirty="0" err="1"/>
+              <a:t>COMPort</a:t>
+            </a:r>
+            <a:r>
+              <a:rPr lang="en-US" altLang="ja-JP"/>
+              <a:t> name.</a:t>
+            </a:r>
+            <a:br>
+              <a:rPr lang="en-US" altLang="ja-JP"/>
+            </a:br>
+            <a:r>
+              <a:rPr lang="en-US" altLang="ja-JP" dirty="0"/>
+              <a:t>Or, please contact me.</a:t>
+            </a:r>
+            <a:endParaRPr kumimoji="1" lang="ja-JP" altLang="en-US" dirty="0"/>
+          </a:p>
+        </p:txBody>
+      </p:sp>
+      <p:pic>
+        <p:nvPicPr>
+          <p:cNvPr id="6" name="図 5">
+            <a:extLst>
+              <a:ext uri="{FF2B5EF4-FFF2-40B4-BE49-F238E27FC236}">
+                <a16:creationId xmlns:a16="http://schemas.microsoft.com/office/drawing/2014/main" id="{A2E081AD-DB5B-41BB-9A52-55D69078DEAF}"/>
+              </a:ext>
+            </a:extLst>
+          </p:cNvPr>
+          <p:cNvPicPr>
+            <a:picLocks noChangeAspect="1"/>
+          </p:cNvPicPr>
+          <p:nvPr/>
+        </p:nvPicPr>
+        <p:blipFill>
+          <a:blip r:embed="rId3"/>
+          <a:stretch>
+            <a:fillRect/>
+          </a:stretch>
+        </p:blipFill>
+        <p:spPr>
+          <a:xfrm>
+            <a:off x="3728707" y="2797273"/>
+            <a:ext cx="4734586" cy="1105054"/>
+          </a:xfrm>
+          <a:prstGeom prst="rect">
+            <a:avLst/>
+          </a:prstGeom>
+        </p:spPr>
+      </p:pic>
+    </p:spTree>
+    <p:extLst>
+      <p:ext uri="{BB962C8B-B14F-4D97-AF65-F5344CB8AC3E}">
+        <p14:creationId xmlns:p14="http://schemas.microsoft.com/office/powerpoint/2010/main" val="1500572103"/>
+      </p:ext>
+    </p:extLst>
+  </p:cSld>
+  <p:clrMapOvr>
+    <a:masterClrMapping/>
+  </p:clrMapOvr>
+</p:sld>
+</file>
+
+<file path=ppt/slides/slide16.xml><?xml version="1.0" encoding="utf-8"?>
+<p:sld xmlns:a="http://schemas.openxmlformats.org/drawingml/2006/main" xmlns:r="http://schemas.openxmlformats.org/officeDocument/2006/relationships" xmlns:p="http://schemas.openxmlformats.org/presentationml/2006/main">
+  <p:cSld>
+    <p:spTree>
+      <p:nvGrpSpPr>
+        <p:cNvPr id="1" name=""/>
+        <p:cNvGrpSpPr/>
+        <p:nvPr/>
+      </p:nvGrpSpPr>
+      <p:grpSpPr>
+        <a:xfrm>
+          <a:off x="0" y="0"/>
+          <a:ext cx="0" cy="0"/>
+          <a:chOff x="0" y="0"/>
+          <a:chExt cx="0" cy="0"/>
+        </a:xfrm>
+      </p:grpSpPr>
+      <p:sp>
+        <p:nvSpPr>
+          <p:cNvPr id="2" name="タイトル 1">
+            <a:extLst>
+              <a:ext uri="{FF2B5EF4-FFF2-40B4-BE49-F238E27FC236}">
                 <a16:creationId xmlns:a16="http://schemas.microsoft.com/office/drawing/2014/main" id="{EF2D61BD-EF14-496D-BA79-EAE1C4548936}"/>
               </a:ext>
             </a:extLst>
@@ -10120,30 +11757,56 @@
           <a:p>
             <a:pPr lvl="2"/>
             <a:r>
+              <a:rPr lang="en-US" altLang="ja-JP" b="1" dirty="0"/>
+              <a:t>.NET Framework 4.7 or later </a:t>
+            </a:r>
+            <a:r>
               <a:rPr lang="en-US" altLang="ja-JP" dirty="0"/>
-              <a:t>.NET Framework 4.7 or later installed on your PC.</a:t>
+              <a:t>installed on your PC.</a:t>
             </a:r>
           </a:p>
           <a:p>
             <a:pPr lvl="2"/>
             <a:r>
+              <a:rPr lang="en-US" altLang="ja-JP" b="1" dirty="0"/>
+              <a:t>VC++ 2012 Runtime </a:t>
+            </a:r>
+            <a:r>
               <a:rPr lang="en-US" altLang="ja-JP" dirty="0"/>
-              <a:t>VC++ 2012 Runtime installed on your PC.</a:t>
+              <a:t>installed on your PC.</a:t>
             </a:r>
           </a:p>
           <a:p>
             <a:pPr lvl="2"/>
             <a:r>
-              <a:rPr lang="en-US" altLang="ja-JP" dirty="0"/>
-              <a:t>Execute "DelZoneID.ps1“ to remove “</a:t>
-            </a:r>
-            <a:r>
-              <a:rPr lang="en-US" altLang="ja-JP" dirty="0" err="1"/>
+              <a:rPr lang="en-US" altLang="ja-JP" dirty="0">
+                <a:solidFill>
+                  <a:schemeClr val="bg1">
+                    <a:lumMod val="65000"/>
+                  </a:schemeClr>
+                </a:solidFill>
+              </a:rPr>
+              <a:t>(Execute "DelZoneID.ps1“ to remove “</a:t>
+            </a:r>
+            <a:r>
+              <a:rPr lang="en-US" altLang="ja-JP" dirty="0" err="1">
+                <a:solidFill>
+                  <a:schemeClr val="bg1">
+                    <a:lumMod val="65000"/>
+                  </a:schemeClr>
+                </a:solidFill>
+              </a:rPr>
               <a:t>Zone.Identifier</a:t>
             </a:r>
             <a:r>
-              <a:rPr lang="en-US" altLang="ja-JP" dirty="0"/>
-              <a:t>” flag.</a:t>
+              <a:rPr lang="en-US" altLang="ja-JP" dirty="0">
+                <a:solidFill>
+                  <a:schemeClr val="bg1">
+                    <a:lumMod val="65000"/>
+                  </a:schemeClr>
+                </a:solidFill>
+              </a:rPr>
+              <a:t>” flag.)</a:t>
             </a:r>
           </a:p>
           <a:p>
@@ -15182,4 +16845,299 @@
     </a:ext>
   </a:extLst>
 </a:theme>
+</file>
+
+<file path=ppt/theme/theme2.xml><?xml version="1.0" encoding="utf-8"?>
+<a:theme xmlns:a="http://schemas.openxmlformats.org/drawingml/2006/main" name="Office テーマ">
+  <a:themeElements>
+    <a:clrScheme name="Office">
+      <a:dk1>
+        <a:sysClr val="windowText" lastClr="000000"/>
+      </a:dk1>
+      <a:lt1>
+        <a:sysClr val="window" lastClr="FFFFFF"/>
+      </a:lt1>
+      <a:dk2>
+        <a:srgbClr val="44546A"/>
+      </a:dk2>
+      <a:lt2>
+        <a:srgbClr val="E7E6E6"/>
+      </a:lt2>
+      <a:accent1>
+        <a:srgbClr val="4472C4"/>
+      </a:accent1>
+      <a:accent2>
+        <a:srgbClr val="ED7D31"/>
+      </a:accent2>
+      <a:accent3>
+        <a:srgbClr val="A5A5A5"/>
+      </a:accent3>
+      <a:accent4>
+        <a:srgbClr val="FFC000"/>
+      </a:accent4>
+      <a:accent5>
+        <a:srgbClr val="5B9BD5"/>
+      </a:accent5>
+      <a:accent6>
+        <a:srgbClr val="70AD47"/>
+      </a:accent6>
+      <a:hlink>
+        <a:srgbClr val="0563C1"/>
+      </a:hlink>
+      <a:folHlink>
+        <a:srgbClr val="954F72"/>
+      </a:folHlink>
+    </a:clrScheme>
+    <a:fontScheme name="Office">
+      <a:majorFont>
+        <a:latin typeface="游ゴシック Light" panose="020F0302020204030204"/>
+        <a:ea typeface=""/>
+        <a:cs typeface=""/>
+        <a:font script="Jpan" typeface="游ゴシック Light"/>
+        <a:font script="Hang" typeface="맑은 고딕"/>
+        <a:font script="Hans" typeface="等线 Light"/>
+        <a:font script="Hant" typeface="新細明體"/>
+        <a:font script="Arab" typeface="Times New Roman"/>
+        <a:font script="Hebr" typeface="Times New Roman"/>
+        <a:font script="Thai" typeface="Angsana New"/>
+        <a:font script="Ethi" typeface="Nyala"/>
+        <a:font script="Beng" typeface="Vrinda"/>
+        <a:font script="Gujr" typeface="Shruti"/>
+        <a:font script="Khmr" typeface="MoolBoran"/>
+        <a:font script="Knda" typeface="Tunga"/>
+        <a:font script="Guru" typeface="Raavi"/>
+        <a:font script="Cans" typeface="Euphemia"/>
+        <a:font script="Cher" typeface="Plantagenet Cherokee"/>
+        <a:font script="Yiii" typeface="Microsoft Yi Baiti"/>
+        <a:font script="Tibt" typeface="Microsoft Himalaya"/>
+        <a:font script="Thaa" typeface="MV Boli"/>
+        <a:font script="Deva" typeface="Mangal"/>
+        <a:font script="Telu" typeface="Gautami"/>
+        <a:font script="Taml" typeface="Latha"/>
+        <a:font script="Syrc" typeface="Estrangelo Edessa"/>
+        <a:font script="Orya" typeface="Kalinga"/>
+        <a:font script="Mlym" typeface="Kartika"/>
+        <a:font script="Laoo" typeface="DokChampa"/>
+        <a:font script="Sinh" typeface="Iskoola Pota"/>
+        <a:font script="Mong" typeface="Mongolian Baiti"/>
+        <a:font script="Viet" typeface="Times New Roman"/>
+        <a:font script="Uigh" typeface="Microsoft Uighur"/>
+        <a:font script="Geor" typeface="Sylfaen"/>
+        <a:font script="Armn" typeface="Arial"/>
+        <a:font script="Bugi" typeface="Leelawadee UI"/>
+        <a:font script="Bopo" typeface="Microsoft JhengHei"/>
+        <a:font script="Java" typeface="Javanese Text"/>
+        <a:font script="Lisu" typeface="Segoe UI"/>
+        <a:font script="Mymr" typeface="Myanmar Text"/>
+        <a:font script="Nkoo" typeface="Ebrima"/>
+        <a:font script="Olck" typeface="Nirmala UI"/>
+        <a:font script="Osma" typeface="Ebrima"/>
+        <a:font script="Phag" typeface="Phagspa"/>
+        <a:font script="Syrn" typeface="Estrangelo Edessa"/>
+        <a:font script="Syrj" typeface="Estrangelo Edessa"/>
+        <a:font script="Syre" typeface="Estrangelo Edessa"/>
+        <a:font script="Sora" typeface="Nirmala UI"/>
+        <a:font script="Tale" typeface="Microsoft Tai Le"/>
+        <a:font script="Talu" typeface="Microsoft New Tai Lue"/>
+        <a:font script="Tfng" typeface="Ebrima"/>
+      </a:majorFont>
+      <a:minorFont>
+        <a:latin typeface="游ゴシック" panose="020F0502020204030204"/>
+        <a:ea typeface=""/>
+        <a:cs typeface=""/>
+        <a:font script="Jpan" typeface="游ゴシック"/>
+        <a:font script="Hang" typeface="맑은 고딕"/>
+        <a:font script="Hans" typeface="等线"/>
+        <a:font script="Hant" typeface="新細明體"/>
+        <a:font script="Arab" typeface="Arial"/>
+        <a:font script="Hebr" typeface="Arial"/>
+        <a:font script="Thai" typeface="Cordia New"/>
+        <a:font script="Ethi" typeface="Nyala"/>
+        <a:font script="Beng" typeface="Vrinda"/>
+        <a:font script="Gujr" typeface="Shruti"/>
+        <a:font script="Khmr" typeface="DaunPenh"/>
+        <a:font script="Knda" typeface="Tunga"/>
+        <a:font script="Guru" typeface="Raavi"/>
+        <a:font script="Cans" typeface="Euphemia"/>
+        <a:font script="Cher" typeface="Plantagenet Cherokee"/>
+        <a:font script="Yiii" typeface="Microsoft Yi Baiti"/>
+        <a:font script="Tibt" typeface="Microsoft Himalaya"/>
+        <a:font script="Thaa" typeface="MV Boli"/>
+        <a:font script="Deva" typeface="Mangal"/>
+        <a:font script="Telu" typeface="Gautami"/>
+        <a:font script="Taml" typeface="Latha"/>
+        <a:font script="Syrc" typeface="Estrangelo Edessa"/>
+        <a:font script="Orya" typeface="Kalinga"/>
+        <a:font script="Mlym" typeface="Kartika"/>
+        <a:font script="Laoo" typeface="DokChampa"/>
+        <a:font script="Sinh" typeface="Iskoola Pota"/>
+        <a:font script="Mong" typeface="Mongolian Baiti"/>
+        <a:font script="Viet" typeface="Arial"/>
+        <a:font script="Uigh" typeface="Microsoft Uighur"/>
+        <a:font script="Geor" typeface="Sylfaen"/>
+        <a:font script="Armn" typeface="Arial"/>
+        <a:font script="Bugi" typeface="Leelawadee UI"/>
+        <a:font script="Bopo" typeface="Microsoft JhengHei"/>
+        <a:font script="Java" typeface="Javanese Text"/>
+        <a:font script="Lisu" typeface="Segoe UI"/>
+        <a:font script="Mymr" typeface="Myanmar Text"/>
+        <a:font script="Nkoo" typeface="Ebrima"/>
+        <a:font script="Olck" typeface="Nirmala UI"/>
+        <a:font script="Osma" typeface="Ebrima"/>
+        <a:font script="Phag" typeface="Phagspa"/>
+        <a:font script="Syrn" typeface="Estrangelo Edessa"/>
+        <a:font script="Syrj" typeface="Estrangelo Edessa"/>
+        <a:font script="Syre" typeface="Estrangelo Edessa"/>
+        <a:font script="Sora" typeface="Nirmala UI"/>
+        <a:font script="Tale" typeface="Microsoft Tai Le"/>
+        <a:font script="Talu" typeface="Microsoft New Tai Lue"/>
+        <a:font script="Tfng" typeface="Ebrima"/>
+      </a:minorFont>
+    </a:fontScheme>
+    <a:fmtScheme name="Office">
+      <a:fillStyleLst>
+        <a:solidFill>
+          <a:schemeClr val="phClr"/>
+        </a:solidFill>
+        <a:gradFill rotWithShape="1">
+          <a:gsLst>
+            <a:gs pos="0">
+              <a:schemeClr val="phClr">
+                <a:lumMod val="110000"/>
+                <a:satMod val="105000"/>
+                <a:tint val="67000"/>
+              </a:schemeClr>
+            </a:gs>
+            <a:gs pos="50000">
+              <a:schemeClr val="phClr">
+                <a:lumMod val="105000"/>
+                <a:satMod val="103000"/>
+                <a:tint val="73000"/>
+              </a:schemeClr>
+            </a:gs>
+            <a:gs pos="100000">
+              <a:schemeClr val="phClr">
+                <a:lumMod val="105000"/>
+                <a:satMod val="109000"/>
+                <a:tint val="81000"/>
+              </a:schemeClr>
+            </a:gs>
+          </a:gsLst>
+          <a:lin ang="5400000" scaled="0"/>
+        </a:gradFill>
+        <a:gradFill rotWithShape="1">
+          <a:gsLst>
+            <a:gs pos="0">
+              <a:schemeClr val="phClr">
+                <a:satMod val="103000"/>
+                <a:lumMod val="102000"/>
+                <a:tint val="94000"/>
+              </a:schemeClr>
+            </a:gs>
+            <a:gs pos="50000">
+              <a:schemeClr val="phClr">
+                <a:satMod val="110000"/>
+                <a:lumMod val="100000"/>
+                <a:shade val="100000"/>
+              </a:schemeClr>
+            </a:gs>
+            <a:gs pos="100000">
+              <a:schemeClr val="phClr">
+                <a:lumMod val="99000"/>
+                <a:satMod val="120000"/>
+                <a:shade val="78000"/>
+              </a:schemeClr>
+            </a:gs>
+          </a:gsLst>
+          <a:lin ang="5400000" scaled="0"/>
+        </a:gradFill>
+      </a:fillStyleLst>
+      <a:lnStyleLst>
+        <a:ln w="6350" cap="flat" cmpd="sng" algn="ctr">
+          <a:solidFill>
+            <a:schemeClr val="phClr"/>
+          </a:solidFill>
+          <a:prstDash val="solid"/>
+          <a:miter lim="800000"/>
+        </a:ln>
+        <a:ln w="12700" cap="flat" cmpd="sng" algn="ctr">
+          <a:solidFill>
+            <a:schemeClr val="phClr"/>
+          </a:solidFill>
+          <a:prstDash val="solid"/>
+          <a:miter lim="800000"/>
+        </a:ln>
+        <a:ln w="19050" cap="flat" cmpd="sng" algn="ctr">
+          <a:solidFill>
+            <a:schemeClr val="phClr"/>
+          </a:solidFill>
+          <a:prstDash val="solid"/>
+          <a:miter lim="800000"/>
+        </a:ln>
+      </a:lnStyleLst>
+      <a:effectStyleLst>
+        <a:effectStyle>
+          <a:effectLst/>
+        </a:effectStyle>
+        <a:effectStyle>
+          <a:effectLst/>
+        </a:effectStyle>
+        <a:effectStyle>
+          <a:effectLst>
+            <a:outerShdw blurRad="57150" dist="19050" dir="5400000" algn="ctr" rotWithShape="0">
+              <a:srgbClr val="000000">
+                <a:alpha val="63000"/>
+              </a:srgbClr>
+            </a:outerShdw>
+          </a:effectLst>
+        </a:effectStyle>
+      </a:effectStyleLst>
+      <a:bgFillStyleLst>
+        <a:solidFill>
+          <a:schemeClr val="phClr"/>
+        </a:solidFill>
+        <a:solidFill>
+          <a:schemeClr val="phClr">
+            <a:tint val="95000"/>
+            <a:satMod val="170000"/>
+          </a:schemeClr>
+        </a:solidFill>
+        <a:gradFill rotWithShape="1">
+          <a:gsLst>
+            <a:gs pos="0">
+              <a:schemeClr val="phClr">
+                <a:tint val="93000"/>
+                <a:satMod val="150000"/>
+                <a:shade val="98000"/>
+                <a:lumMod val="102000"/>
+              </a:schemeClr>
+            </a:gs>
+            <a:gs pos="50000">
+              <a:schemeClr val="phClr">
+                <a:tint val="98000"/>
+                <a:satMod val="130000"/>
+                <a:shade val="90000"/>
+                <a:lumMod val="103000"/>
+              </a:schemeClr>
+            </a:gs>
+            <a:gs pos="100000">
+              <a:schemeClr val="phClr">
+                <a:shade val="63000"/>
+                <a:satMod val="120000"/>
+              </a:schemeClr>
+            </a:gs>
+          </a:gsLst>
+          <a:lin ang="5400000" scaled="0"/>
+        </a:gradFill>
+      </a:bgFillStyleLst>
+    </a:fmtScheme>
+  </a:themeElements>
+  <a:objectDefaults/>
+  <a:extraClrSchemeLst/>
+  <a:extLst>
+    <a:ext uri="{05A4C25C-085E-4340-85A3-A5531E510DB2}">
+      <thm15:themeFamily xmlns:thm15="http://schemas.microsoft.com/office/thememl/2012/main" name="Office Theme" id="{62F939B6-93AF-4DB8-9C6B-D6C7DFDC589F}" vid="{4A3C46E8-61CC-4603-A589-7422A47A8E4A}"/>
+    </a:ext>
+  </a:extLst>
+</a:theme>
 </file>
</xml_diff>

<commit_message>
Added VGMPlayerUpdated VSIF engine and added VSIF VGMPlayer.
</commit_message>
<xml_diff>
--- a/docs/MAmidiMEmo/Manual.pptx
+++ b/docs/MAmidiMEmo/Manual.pptx
@@ -212,7 +212,7 @@
           <a:p>
             <a:fld id="{581C28D8-13B6-41C3-9F5F-0284C569C6F1}" type="datetimeFigureOut">
               <a:rPr kumimoji="1" lang="ja-JP" altLang="en-US" smtClean="0"/>
-              <a:t>2021/5/15</a:t>
+              <a:t>2021/5/18</a:t>
             </a:fld>
             <a:endParaRPr kumimoji="1" lang="ja-JP" altLang="en-US"/>
           </a:p>
@@ -867,7 +867,7 @@
           <a:p>
             <a:fld id="{A1764889-C429-4FBA-9A30-FFA1EB721FBC}" type="datetimeFigureOut">
               <a:rPr kumimoji="1" lang="ja-JP" altLang="en-US" smtClean="0"/>
-              <a:t>2021/5/15</a:t>
+              <a:t>2021/5/18</a:t>
             </a:fld>
             <a:endParaRPr kumimoji="1" lang="ja-JP" altLang="en-US"/>
           </a:p>
@@ -1205,7 +1205,7 @@
           <a:p>
             <a:fld id="{A1764889-C429-4FBA-9A30-FFA1EB721FBC}" type="datetimeFigureOut">
               <a:rPr kumimoji="1" lang="ja-JP" altLang="en-US" smtClean="0"/>
-              <a:t>2021/5/15</a:t>
+              <a:t>2021/5/18</a:t>
             </a:fld>
             <a:endParaRPr kumimoji="1" lang="ja-JP" altLang="en-US"/>
           </a:p>
@@ -1606,7 +1606,7 @@
           <a:p>
             <a:fld id="{A1764889-C429-4FBA-9A30-FFA1EB721FBC}" type="datetimeFigureOut">
               <a:rPr kumimoji="1" lang="ja-JP" altLang="en-US" smtClean="0"/>
-              <a:t>2021/5/15</a:t>
+              <a:t>2021/5/18</a:t>
             </a:fld>
             <a:endParaRPr kumimoji="1" lang="ja-JP" altLang="en-US"/>
           </a:p>
@@ -1942,7 +1942,7 @@
           <a:p>
             <a:fld id="{A1764889-C429-4FBA-9A30-FFA1EB721FBC}" type="datetimeFigureOut">
               <a:rPr kumimoji="1" lang="ja-JP" altLang="en-US" smtClean="0"/>
-              <a:t>2021/5/15</a:t>
+              <a:t>2021/5/18</a:t>
             </a:fld>
             <a:endParaRPr kumimoji="1" lang="ja-JP" altLang="en-US"/>
           </a:p>
@@ -2262,7 +2262,7 @@
           <a:p>
             <a:fld id="{A1764889-C429-4FBA-9A30-FFA1EB721FBC}" type="datetimeFigureOut">
               <a:rPr kumimoji="1" lang="ja-JP" altLang="en-US" smtClean="0"/>
-              <a:t>2021/5/15</a:t>
+              <a:t>2021/5/18</a:t>
             </a:fld>
             <a:endParaRPr kumimoji="1" lang="ja-JP" altLang="en-US"/>
           </a:p>
@@ -2658,7 +2658,7 @@
           <a:p>
             <a:fld id="{A1764889-C429-4FBA-9A30-FFA1EB721FBC}" type="datetimeFigureOut">
               <a:rPr kumimoji="1" lang="ja-JP" altLang="en-US" smtClean="0"/>
-              <a:t>2021/5/15</a:t>
+              <a:t>2021/5/18</a:t>
             </a:fld>
             <a:endParaRPr kumimoji="1" lang="ja-JP" altLang="en-US"/>
           </a:p>
@@ -2947,7 +2947,7 @@
           <a:p>
             <a:fld id="{A1764889-C429-4FBA-9A30-FFA1EB721FBC}" type="datetimeFigureOut">
               <a:rPr kumimoji="1" lang="ja-JP" altLang="en-US" smtClean="0"/>
-              <a:t>2021/5/15</a:t>
+              <a:t>2021/5/18</a:t>
             </a:fld>
             <a:endParaRPr kumimoji="1" lang="ja-JP" altLang="en-US"/>
           </a:p>
@@ -3241,7 +3241,7 @@
           <a:p>
             <a:fld id="{A1764889-C429-4FBA-9A30-FFA1EB721FBC}" type="datetimeFigureOut">
               <a:rPr kumimoji="1" lang="ja-JP" altLang="en-US" smtClean="0"/>
-              <a:t>2021/5/15</a:t>
+              <a:t>2021/5/18</a:t>
             </a:fld>
             <a:endParaRPr kumimoji="1" lang="ja-JP" altLang="en-US"/>
           </a:p>
@@ -3535,7 +3535,7 @@
           <a:p>
             <a:fld id="{A1764889-C429-4FBA-9A30-FFA1EB721FBC}" type="datetimeFigureOut">
               <a:rPr kumimoji="1" lang="ja-JP" altLang="en-US" smtClean="0"/>
-              <a:t>2021/5/15</a:t>
+              <a:t>2021/5/18</a:t>
             </a:fld>
             <a:endParaRPr kumimoji="1" lang="ja-JP" altLang="en-US"/>
           </a:p>
@@ -3864,7 +3864,7 @@
           <a:p>
             <a:fld id="{A1764889-C429-4FBA-9A30-FFA1EB721FBC}" type="datetimeFigureOut">
               <a:rPr kumimoji="1" lang="ja-JP" altLang="en-US" smtClean="0"/>
-              <a:t>2021/5/15</a:t>
+              <a:t>2021/5/18</a:t>
             </a:fld>
             <a:endParaRPr kumimoji="1" lang="ja-JP" altLang="en-US"/>
           </a:p>
@@ -4251,7 +4251,7 @@
           <a:p>
             <a:fld id="{A1764889-C429-4FBA-9A30-FFA1EB721FBC}" type="datetimeFigureOut">
               <a:rPr kumimoji="1" lang="ja-JP" altLang="en-US" smtClean="0"/>
-              <a:t>2021/5/15</a:t>
+              <a:t>2021/5/18</a:t>
             </a:fld>
             <a:endParaRPr kumimoji="1" lang="ja-JP" altLang="en-US"/>
           </a:p>
@@ -4772,7 +4772,7 @@
           <a:p>
             <a:fld id="{A1764889-C429-4FBA-9A30-FFA1EB721FBC}" type="datetimeFigureOut">
               <a:rPr kumimoji="1" lang="ja-JP" altLang="en-US" smtClean="0"/>
-              <a:t>2021/5/15</a:t>
+              <a:t>2021/5/18</a:t>
             </a:fld>
             <a:endParaRPr kumimoji="1" lang="ja-JP" altLang="en-US"/>
           </a:p>
@@ -4977,7 +4977,7 @@
           <a:p>
             <a:fld id="{A1764889-C429-4FBA-9A30-FFA1EB721FBC}" type="datetimeFigureOut">
               <a:rPr kumimoji="1" lang="ja-JP" altLang="en-US" smtClean="0"/>
-              <a:t>2021/5/15</a:t>
+              <a:t>2021/5/18</a:t>
             </a:fld>
             <a:endParaRPr kumimoji="1" lang="ja-JP" altLang="en-US"/>
           </a:p>
@@ -5154,7 +5154,7 @@
           <a:p>
             <a:fld id="{A1764889-C429-4FBA-9A30-FFA1EB721FBC}" type="datetimeFigureOut">
               <a:rPr kumimoji="1" lang="ja-JP" altLang="en-US" smtClean="0"/>
-              <a:t>2021/5/15</a:t>
+              <a:t>2021/5/18</a:t>
             </a:fld>
             <a:endParaRPr kumimoji="1" lang="ja-JP" altLang="en-US"/>
           </a:p>
@@ -5519,7 +5519,7 @@
           <a:p>
             <a:fld id="{A1764889-C429-4FBA-9A30-FFA1EB721FBC}" type="datetimeFigureOut">
               <a:rPr kumimoji="1" lang="ja-JP" altLang="en-US" smtClean="0"/>
-              <a:t>2021/5/15</a:t>
+              <a:t>2021/5/18</a:t>
             </a:fld>
             <a:endParaRPr kumimoji="1" lang="ja-JP" altLang="en-US"/>
           </a:p>
@@ -5864,7 +5864,7 @@
           <a:p>
             <a:fld id="{A1764889-C429-4FBA-9A30-FFA1EB721FBC}" type="datetimeFigureOut">
               <a:rPr kumimoji="1" lang="ja-JP" altLang="en-US" smtClean="0"/>
-              <a:t>2021/5/15</a:t>
+              <a:t>2021/5/18</a:t>
             </a:fld>
             <a:endParaRPr kumimoji="1" lang="ja-JP" altLang="en-US"/>
           </a:p>
@@ -8013,7 +8013,7 @@
           <a:p>
             <a:fld id="{A1764889-C429-4FBA-9A30-FFA1EB721FBC}" type="datetimeFigureOut">
               <a:rPr kumimoji="1" lang="ja-JP" altLang="en-US" smtClean="0"/>
-              <a:t>2021/5/15</a:t>
+              <a:t>2021/5/18</a:t>
             </a:fld>
             <a:endParaRPr kumimoji="1" lang="ja-JP" altLang="en-US"/>
           </a:p>
@@ -10540,14 +10540,7 @@
             </a:r>
             <a:r>
               <a:rPr kumimoji="1" lang="en-US" altLang="ja-JP" dirty="0"/>
-              <a:t> can drive real machine chips.</a:t>
-            </a:r>
-            <a:br>
-              <a:rPr kumimoji="1" lang="en-US" altLang="ja-JP" dirty="0"/>
-            </a:br>
-            <a:r>
-              <a:rPr kumimoji="1" lang="en-US" altLang="ja-JP" dirty="0"/>
-              <a:t>Currently SMS(2, </a:t>
+              <a:t> can drive real machine chips. Currently supports NTSC SMS(2, </a:t>
             </a:r>
             <a:r>
               <a:rPr kumimoji="1" lang="en-US" altLang="ja-JP" i="1" dirty="0" err="1"/>
@@ -10555,7 +10548,7 @@
             </a:r>
             <a:r>
               <a:rPr kumimoji="1" lang="en-US" altLang="ja-JP" dirty="0"/>
-              <a:t>) for SN76496/OPLL and Genesis(MD) for SN76496/OPNA2.</a:t>
+              <a:t>) for SN76496/OPLL and NTSC Genesis(MD) for SN76496/OPNA2.</a:t>
             </a:r>
           </a:p>
           <a:p>
@@ -10578,18 +10571,23 @@
             <a:pPr lvl="2"/>
             <a:r>
               <a:rPr kumimoji="1" lang="en-US" altLang="ja-JP" dirty="0"/>
-              <a:t>1x UART (FT232 and so on) dongle and 1x </a:t>
+              <a:t>1x UART (FT232 and so on) dongle ( Note: Supports 163,840bps, 115,200bps)</a:t>
+            </a:r>
+            <a:endParaRPr lang="en-US" altLang="ja-JP" dirty="0"/>
+          </a:p>
+          <a:p>
+            <a:pPr lvl="2"/>
+            <a:r>
+              <a:rPr lang="en-US" altLang="ja-JP" dirty="0"/>
+              <a:t>1x FLASH Cart for SMS or Genesis</a:t>
+            </a:r>
+            <a:r>
+              <a:rPr kumimoji="1" lang="en-US" altLang="ja-JP" dirty="0"/>
+              <a:t> and 1x </a:t>
             </a:r>
             <a:r>
               <a:rPr lang="en-US" altLang="ja-JP" dirty="0"/>
               <a:t>D-SUB 9 pin connector (Female) and cable</a:t>
-            </a:r>
-          </a:p>
-          <a:p>
-            <a:pPr lvl="2"/>
-            <a:r>
-              <a:rPr lang="en-US" altLang="ja-JP" dirty="0"/>
-              <a:t>FLASH Cart for SMS or Genesis</a:t>
             </a:r>
           </a:p>
           <a:p>
@@ -11321,6 +11319,54 @@
             <a:r>
               <a:rPr kumimoji="1" lang="en-US" altLang="ja-JP" dirty="0"/>
               <a:t>Any UART dongle</a:t>
+            </a:r>
+            <a:endParaRPr lang="ja-JP" altLang="en-US" dirty="0"/>
+          </a:p>
+        </p:txBody>
+      </p:sp>
+      <p:sp>
+        <p:nvSpPr>
+          <p:cNvPr id="20" name="テキスト ボックス 19">
+            <a:extLst>
+              <a:ext uri="{FF2B5EF4-FFF2-40B4-BE49-F238E27FC236}">
+                <a16:creationId xmlns:a16="http://schemas.microsoft.com/office/drawing/2014/main" id="{CF363B7C-BC25-4B66-A99C-6247E6121B21}"/>
+              </a:ext>
+            </a:extLst>
+          </p:cNvPr>
+          <p:cNvSpPr txBox="1"/>
+          <p:nvPr/>
+        </p:nvSpPr>
+        <p:spPr>
+          <a:xfrm>
+            <a:off x="10145966" y="5374902"/>
+            <a:ext cx="1552759" cy="923330"/>
+          </a:xfrm>
+          <a:prstGeom prst="rect">
+            <a:avLst/>
+          </a:prstGeom>
+          <a:noFill/>
+        </p:spPr>
+        <p:txBody>
+          <a:bodyPr wrap="square">
+            <a:spAutoFit/>
+          </a:bodyPr>
+          <a:lstStyle/>
+          <a:p>
+            <a:r>
+              <a:rPr kumimoji="1" lang="en-US" altLang="ja-JP" dirty="0"/>
+              <a:t>*Supports</a:t>
+            </a:r>
+          </a:p>
+          <a:p>
+            <a:r>
+              <a:rPr kumimoji="1" lang="en-US" altLang="ja-JP" dirty="0"/>
+              <a:t> 163,840bps</a:t>
+            </a:r>
+          </a:p>
+          <a:p>
+            <a:r>
+              <a:rPr kumimoji="1" lang="en-US" altLang="ja-JP" dirty="0"/>
+              <a:t> 115,200bps</a:t>
             </a:r>
             <a:endParaRPr lang="ja-JP" altLang="en-US" dirty="0"/>
           </a:p>

</xml_diff>

<commit_message>
Supported 115200bps for VSIF for Genesis UART mode.
</commit_message>
<xml_diff>
--- a/docs/MAmidiMEmo/Manual.pptx
+++ b/docs/MAmidiMEmo/Manual.pptx
@@ -214,7 +214,7 @@
           <a:p>
             <a:fld id="{581C28D8-13B6-41C3-9F5F-0284C569C6F1}" type="datetimeFigureOut">
               <a:rPr kumimoji="1" lang="ja-JP" altLang="en-US" smtClean="0"/>
-              <a:t>2021/6/10</a:t>
+              <a:t>2021/6/12</a:t>
             </a:fld>
             <a:endParaRPr kumimoji="1" lang="ja-JP" altLang="en-US"/>
           </a:p>
@@ -953,7 +953,7 @@
           <a:p>
             <a:fld id="{B8625E62-B904-4691-B75E-EC1C32885285}" type="datetime1">
               <a:rPr kumimoji="1" lang="ja-JP" altLang="en-US" smtClean="0"/>
-              <a:t>2021/6/10</a:t>
+              <a:t>2021/6/12</a:t>
             </a:fld>
             <a:endParaRPr kumimoji="1" lang="ja-JP" altLang="en-US"/>
           </a:p>
@@ -1291,7 +1291,7 @@
           <a:p>
             <a:fld id="{A4C87007-2A40-4EFC-90A3-258EFA3C1001}" type="datetime1">
               <a:rPr kumimoji="1" lang="ja-JP" altLang="en-US" smtClean="0"/>
-              <a:t>2021/6/10</a:t>
+              <a:t>2021/6/12</a:t>
             </a:fld>
             <a:endParaRPr kumimoji="1" lang="ja-JP" altLang="en-US"/>
           </a:p>
@@ -1692,7 +1692,7 @@
           <a:p>
             <a:fld id="{0FE0D7FF-9203-4AA3-90FD-622674A14F90}" type="datetime1">
               <a:rPr kumimoji="1" lang="ja-JP" altLang="en-US" smtClean="0"/>
-              <a:t>2021/6/10</a:t>
+              <a:t>2021/6/12</a:t>
             </a:fld>
             <a:endParaRPr kumimoji="1" lang="ja-JP" altLang="en-US"/>
           </a:p>
@@ -2028,7 +2028,7 @@
           <a:p>
             <a:fld id="{D2D6E4D3-BEDB-4F35-876B-5B9AA41BFB5B}" type="datetime1">
               <a:rPr kumimoji="1" lang="ja-JP" altLang="en-US" smtClean="0"/>
-              <a:t>2021/6/10</a:t>
+              <a:t>2021/6/12</a:t>
             </a:fld>
             <a:endParaRPr kumimoji="1" lang="ja-JP" altLang="en-US"/>
           </a:p>
@@ -2348,7 +2348,7 @@
           <a:p>
             <a:fld id="{2ACD896E-FC14-4F25-BC47-18ABAEA9E1FE}" type="datetime1">
               <a:rPr kumimoji="1" lang="ja-JP" altLang="en-US" smtClean="0"/>
-              <a:t>2021/6/10</a:t>
+              <a:t>2021/6/12</a:t>
             </a:fld>
             <a:endParaRPr kumimoji="1" lang="ja-JP" altLang="en-US"/>
           </a:p>
@@ -2744,7 +2744,7 @@
           <a:p>
             <a:fld id="{54FC701B-2185-4987-B8E2-5507664B65F4}" type="datetime1">
               <a:rPr kumimoji="1" lang="ja-JP" altLang="en-US" smtClean="0"/>
-              <a:t>2021/6/10</a:t>
+              <a:t>2021/6/12</a:t>
             </a:fld>
             <a:endParaRPr kumimoji="1" lang="ja-JP" altLang="en-US"/>
           </a:p>
@@ -3033,7 +3033,7 @@
           <a:p>
             <a:fld id="{3FB4CDED-9617-418F-B546-D66B9BB6C35E}" type="datetime1">
               <a:rPr kumimoji="1" lang="ja-JP" altLang="en-US" smtClean="0"/>
-              <a:t>2021/6/10</a:t>
+              <a:t>2021/6/12</a:t>
             </a:fld>
             <a:endParaRPr kumimoji="1" lang="ja-JP" altLang="en-US"/>
           </a:p>
@@ -3327,7 +3327,7 @@
           <a:p>
             <a:fld id="{F5635D40-962A-46D7-8037-3F2900B5EB4D}" type="datetime1">
               <a:rPr kumimoji="1" lang="ja-JP" altLang="en-US" smtClean="0"/>
-              <a:t>2021/6/10</a:t>
+              <a:t>2021/6/12</a:t>
             </a:fld>
             <a:endParaRPr kumimoji="1" lang="ja-JP" altLang="en-US"/>
           </a:p>
@@ -3621,7 +3621,7 @@
           <a:p>
             <a:fld id="{741DA9A2-8356-4FFD-B66A-E38811049858}" type="datetime1">
               <a:rPr kumimoji="1" lang="ja-JP" altLang="en-US" smtClean="0"/>
-              <a:t>2021/6/10</a:t>
+              <a:t>2021/6/12</a:t>
             </a:fld>
             <a:endParaRPr kumimoji="1" lang="ja-JP" altLang="en-US"/>
           </a:p>
@@ -3950,7 +3950,7 @@
           <a:p>
             <a:fld id="{9DDE8989-88B8-4869-97D9-547531F13E13}" type="datetime1">
               <a:rPr kumimoji="1" lang="ja-JP" altLang="en-US" smtClean="0"/>
-              <a:t>2021/6/10</a:t>
+              <a:t>2021/6/12</a:t>
             </a:fld>
             <a:endParaRPr kumimoji="1" lang="ja-JP" altLang="en-US"/>
           </a:p>
@@ -4337,7 +4337,7 @@
           <a:p>
             <a:fld id="{81EC4031-B949-4300-AB3E-1551426E8631}" type="datetime1">
               <a:rPr kumimoji="1" lang="ja-JP" altLang="en-US" smtClean="0"/>
-              <a:t>2021/6/10</a:t>
+              <a:t>2021/6/12</a:t>
             </a:fld>
             <a:endParaRPr kumimoji="1" lang="ja-JP" altLang="en-US"/>
           </a:p>
@@ -4858,7 +4858,7 @@
           <a:p>
             <a:fld id="{F39E755E-A59D-4634-B604-E9BB568B1156}" type="datetime1">
               <a:rPr kumimoji="1" lang="ja-JP" altLang="en-US" smtClean="0"/>
-              <a:t>2021/6/10</a:t>
+              <a:t>2021/6/12</a:t>
             </a:fld>
             <a:endParaRPr kumimoji="1" lang="ja-JP" altLang="en-US"/>
           </a:p>
@@ -5063,7 +5063,7 @@
           <a:p>
             <a:fld id="{61DA38B3-7601-4256-ABFE-386B92B0EDB5}" type="datetime1">
               <a:rPr kumimoji="1" lang="ja-JP" altLang="en-US" smtClean="0"/>
-              <a:t>2021/6/10</a:t>
+              <a:t>2021/6/12</a:t>
             </a:fld>
             <a:endParaRPr kumimoji="1" lang="ja-JP" altLang="en-US"/>
           </a:p>
@@ -5240,7 +5240,7 @@
           <a:p>
             <a:fld id="{5A28ED6D-8A94-4DBA-8EF2-284D1A467CE8}" type="datetime1">
               <a:rPr kumimoji="1" lang="ja-JP" altLang="en-US" smtClean="0"/>
-              <a:t>2021/6/10</a:t>
+              <a:t>2021/6/12</a:t>
             </a:fld>
             <a:endParaRPr kumimoji="1" lang="ja-JP" altLang="en-US"/>
           </a:p>
@@ -5605,7 +5605,7 @@
           <a:p>
             <a:fld id="{B27B0317-28AF-43C5-8944-AADFA89E0149}" type="datetime1">
               <a:rPr kumimoji="1" lang="ja-JP" altLang="en-US" smtClean="0"/>
-              <a:t>2021/6/10</a:t>
+              <a:t>2021/6/12</a:t>
             </a:fld>
             <a:endParaRPr kumimoji="1" lang="ja-JP" altLang="en-US"/>
           </a:p>
@@ -5950,7 +5950,7 @@
           <a:p>
             <a:fld id="{A78D023C-C4FA-4CE8-B5BE-6798898EE377}" type="datetime1">
               <a:rPr kumimoji="1" lang="ja-JP" altLang="en-US" smtClean="0"/>
-              <a:t>2021/6/10</a:t>
+              <a:t>2021/6/12</a:t>
             </a:fld>
             <a:endParaRPr kumimoji="1" lang="ja-JP" altLang="en-US"/>
           </a:p>
@@ -8099,7 +8099,7 @@
           <a:p>
             <a:fld id="{99567159-F4A8-4352-915B-DDBEFEF4A4D6}" type="datetime1">
               <a:rPr kumimoji="1" lang="ja-JP" altLang="en-US" smtClean="0"/>
-              <a:t>2021/6/10</a:t>
+              <a:t>2021/6/12</a:t>
             </a:fld>
             <a:endParaRPr kumimoji="1" lang="ja-JP" altLang="en-US"/>
           </a:p>
@@ -10786,11 +10786,7 @@
             </a:r>
             <a:r>
               <a:rPr kumimoji="1" lang="en-US" altLang="ja-JP" sz="1100" dirty="0"/>
-              <a:t>(Note: FT232R and so on. But </a:t>
-            </a:r>
-            <a:r>
-              <a:rPr lang="en-US" altLang="ja-JP" sz="1100" dirty="0"/>
-              <a:t>CH340, CP2102 may not?</a:t>
+              <a:t>(Note: FT232R and so on.</a:t>
             </a:r>
             <a:r>
               <a:rPr kumimoji="1" lang="en-US" altLang="ja-JP" sz="1400" dirty="0"/>
@@ -10810,7 +10806,19 @@
                   <a:srgbClr val="FF0000"/>
                 </a:solidFill>
               </a:rPr>
-              <a:t>upport 163,840bps, 115,200bps</a:t>
+              <a:t>upport 163,840bps(</a:t>
+            </a:r>
+            <a:r>
+              <a:rPr lang="en-US" altLang="ja-JP" sz="1100" dirty="0"/>
+              <a:t>CH340 and CP2102 may not work)</a:t>
+            </a:r>
+            <a:r>
+              <a:rPr kumimoji="1" lang="en-US" altLang="ja-JP" sz="1100" dirty="0">
+                <a:solidFill>
+                  <a:srgbClr val="FF0000"/>
+                </a:solidFill>
+              </a:rPr>
+              <a:t>, 115,200bps</a:t>
             </a:r>
             <a:r>
               <a:rPr kumimoji="1" lang="en-US" altLang="ja-JP" sz="1100" dirty="0"/>
@@ -11233,70 +11241,6 @@
       </p:sp>
       <p:sp>
         <p:nvSpPr>
-          <p:cNvPr id="20" name="テキスト ボックス 19">
-            <a:extLst>
-              <a:ext uri="{FF2B5EF4-FFF2-40B4-BE49-F238E27FC236}">
-                <a16:creationId xmlns:a16="http://schemas.microsoft.com/office/drawing/2014/main" id="{CF363B7C-BC25-4B66-A99C-6247E6121B21}"/>
-              </a:ext>
-            </a:extLst>
-          </p:cNvPr>
-          <p:cNvSpPr txBox="1"/>
-          <p:nvPr/>
-        </p:nvSpPr>
-        <p:spPr>
-          <a:xfrm>
-            <a:off x="10020952" y="5455476"/>
-            <a:ext cx="1891913" cy="830997"/>
-          </a:xfrm>
-          <a:prstGeom prst="rect">
-            <a:avLst/>
-          </a:prstGeom>
-          <a:noFill/>
-        </p:spPr>
-        <p:txBody>
-          <a:bodyPr wrap="square">
-            <a:spAutoFit/>
-          </a:bodyPr>
-          <a:lstStyle/>
-          <a:p>
-            <a:r>
-              <a:rPr kumimoji="1" lang="en-US" altLang="ja-JP" sz="1600" dirty="0">
-                <a:solidFill>
-                  <a:srgbClr val="FF0000"/>
-                </a:solidFill>
-              </a:rPr>
-              <a:t>*Need to support</a:t>
-            </a:r>
-          </a:p>
-          <a:p>
-            <a:r>
-              <a:rPr kumimoji="1" lang="en-US" altLang="ja-JP" sz="1600" dirty="0">
-                <a:solidFill>
-                  <a:srgbClr val="FF0000"/>
-                </a:solidFill>
-              </a:rPr>
-              <a:t> 163,840bps</a:t>
-            </a:r>
-          </a:p>
-          <a:p>
-            <a:r>
-              <a:rPr kumimoji="1" lang="en-US" altLang="ja-JP" sz="1600" dirty="0">
-                <a:solidFill>
-                  <a:srgbClr val="FF0000"/>
-                </a:solidFill>
-              </a:rPr>
-              <a:t> 115,200bps</a:t>
-            </a:r>
-            <a:endParaRPr lang="ja-JP" altLang="en-US" sz="1600" dirty="0">
-              <a:solidFill>
-                <a:srgbClr val="FF0000"/>
-              </a:solidFill>
-            </a:endParaRPr>
-          </a:p>
-        </p:txBody>
-      </p:sp>
-      <p:sp>
-        <p:nvSpPr>
           <p:cNvPr id="4" name="スライド番号プレースホルダー 3">
             <a:extLst>
               <a:ext uri="{FF2B5EF4-FFF2-40B4-BE49-F238E27FC236}">
@@ -11370,7 +11314,7 @@
         </p:blipFill>
         <p:spPr>
           <a:xfrm>
-            <a:off x="11158179" y="4114846"/>
+            <a:off x="7625443" y="5488674"/>
             <a:ext cx="879700" cy="879700"/>
           </a:xfrm>
           <a:prstGeom prst="rect">
@@ -11562,6 +11506,70 @@
           </a:fontRef>
         </p:style>
       </p:cxnSp>
+      <p:sp>
+        <p:nvSpPr>
+          <p:cNvPr id="29" name="テキスト ボックス 28">
+            <a:extLst>
+              <a:ext uri="{FF2B5EF4-FFF2-40B4-BE49-F238E27FC236}">
+                <a16:creationId xmlns:a16="http://schemas.microsoft.com/office/drawing/2014/main" id="{F44C0E9D-4F25-4931-B478-BDD044D1A1F9}"/>
+              </a:ext>
+            </a:extLst>
+          </p:cNvPr>
+          <p:cNvSpPr txBox="1"/>
+          <p:nvPr/>
+        </p:nvSpPr>
+        <p:spPr>
+          <a:xfrm>
+            <a:off x="9529809" y="5884180"/>
+            <a:ext cx="2662191" cy="830997"/>
+          </a:xfrm>
+          <a:prstGeom prst="rect">
+            <a:avLst/>
+          </a:prstGeom>
+          <a:noFill/>
+        </p:spPr>
+        <p:txBody>
+          <a:bodyPr wrap="square">
+            <a:spAutoFit/>
+          </a:bodyPr>
+          <a:lstStyle/>
+          <a:p>
+            <a:r>
+              <a:rPr kumimoji="1" lang="en-US" altLang="ja-JP" sz="1600" dirty="0">
+                <a:solidFill>
+                  <a:srgbClr val="FF0000"/>
+                </a:solidFill>
+              </a:rPr>
+              <a:t>*Need to support</a:t>
+            </a:r>
+          </a:p>
+          <a:p>
+            <a:r>
+              <a:rPr kumimoji="1" lang="en-US" altLang="ja-JP" sz="1600" dirty="0">
+                <a:solidFill>
+                  <a:srgbClr val="FF0000"/>
+                </a:solidFill>
+              </a:rPr>
+              <a:t> 163,840bps for MD</a:t>
+            </a:r>
+          </a:p>
+          <a:p>
+            <a:r>
+              <a:rPr kumimoji="1" lang="en-US" altLang="ja-JP" sz="1600" dirty="0">
+                <a:solidFill>
+                  <a:srgbClr val="FF0000"/>
+                </a:solidFill>
+              </a:rPr>
+              <a:t> 115,200bps for MD, SMS</a:t>
+            </a:r>
+            <a:endParaRPr lang="ja-JP" altLang="en-US" sz="1600" dirty="0">
+              <a:solidFill>
+                <a:srgbClr val="FF0000"/>
+              </a:solidFill>
+            </a:endParaRPr>
+          </a:p>
+        </p:txBody>
+      </p:sp>
     </p:spTree>
     <p:extLst>
       <p:ext uri="{BB962C8B-B14F-4D97-AF65-F5344CB8AC3E}">
@@ -13076,8 +13084,8 @@
         </p:blipFill>
         <p:spPr>
           <a:xfrm>
-            <a:off x="11158179" y="4114846"/>
-            <a:ext cx="879700" cy="879700"/>
+            <a:off x="7797604" y="6080329"/>
+            <a:ext cx="752144" cy="752144"/>
           </a:xfrm>
           <a:prstGeom prst="rect">
             <a:avLst/>

</xml_diff>

<commit_message>
Implemented PCM play cmd 0x9x of VGM file. Implemented "Force Dump" for STOP button of VGMPlayer.exe
</commit_message>
<xml_diff>
--- a/docs/MAmidiMEmo/Manual.pptx
+++ b/docs/MAmidiMEmo/Manual.pptx
@@ -214,7 +214,7 @@
           <a:p>
             <a:fld id="{581C28D8-13B6-41C3-9F5F-0284C569C6F1}" type="datetimeFigureOut">
               <a:rPr kumimoji="1" lang="ja-JP" altLang="en-US" smtClean="0"/>
-              <a:t>2021/6/12</a:t>
+              <a:t>2021/6/13</a:t>
             </a:fld>
             <a:endParaRPr kumimoji="1" lang="ja-JP" altLang="en-US"/>
           </a:p>
@@ -953,7 +953,7 @@
           <a:p>
             <a:fld id="{B8625E62-B904-4691-B75E-EC1C32885285}" type="datetime1">
               <a:rPr kumimoji="1" lang="ja-JP" altLang="en-US" smtClean="0"/>
-              <a:t>2021/6/12</a:t>
+              <a:t>2021/6/13</a:t>
             </a:fld>
             <a:endParaRPr kumimoji="1" lang="ja-JP" altLang="en-US"/>
           </a:p>
@@ -1291,7 +1291,7 @@
           <a:p>
             <a:fld id="{A4C87007-2A40-4EFC-90A3-258EFA3C1001}" type="datetime1">
               <a:rPr kumimoji="1" lang="ja-JP" altLang="en-US" smtClean="0"/>
-              <a:t>2021/6/12</a:t>
+              <a:t>2021/6/13</a:t>
             </a:fld>
             <a:endParaRPr kumimoji="1" lang="ja-JP" altLang="en-US"/>
           </a:p>
@@ -1692,7 +1692,7 @@
           <a:p>
             <a:fld id="{0FE0D7FF-9203-4AA3-90FD-622674A14F90}" type="datetime1">
               <a:rPr kumimoji="1" lang="ja-JP" altLang="en-US" smtClean="0"/>
-              <a:t>2021/6/12</a:t>
+              <a:t>2021/6/13</a:t>
             </a:fld>
             <a:endParaRPr kumimoji="1" lang="ja-JP" altLang="en-US"/>
           </a:p>
@@ -2028,7 +2028,7 @@
           <a:p>
             <a:fld id="{D2D6E4D3-BEDB-4F35-876B-5B9AA41BFB5B}" type="datetime1">
               <a:rPr kumimoji="1" lang="ja-JP" altLang="en-US" smtClean="0"/>
-              <a:t>2021/6/12</a:t>
+              <a:t>2021/6/13</a:t>
             </a:fld>
             <a:endParaRPr kumimoji="1" lang="ja-JP" altLang="en-US"/>
           </a:p>
@@ -2348,7 +2348,7 @@
           <a:p>
             <a:fld id="{2ACD896E-FC14-4F25-BC47-18ABAEA9E1FE}" type="datetime1">
               <a:rPr kumimoji="1" lang="ja-JP" altLang="en-US" smtClean="0"/>
-              <a:t>2021/6/12</a:t>
+              <a:t>2021/6/13</a:t>
             </a:fld>
             <a:endParaRPr kumimoji="1" lang="ja-JP" altLang="en-US"/>
           </a:p>
@@ -2744,7 +2744,7 @@
           <a:p>
             <a:fld id="{54FC701B-2185-4987-B8E2-5507664B65F4}" type="datetime1">
               <a:rPr kumimoji="1" lang="ja-JP" altLang="en-US" smtClean="0"/>
-              <a:t>2021/6/12</a:t>
+              <a:t>2021/6/13</a:t>
             </a:fld>
             <a:endParaRPr kumimoji="1" lang="ja-JP" altLang="en-US"/>
           </a:p>
@@ -3033,7 +3033,7 @@
           <a:p>
             <a:fld id="{3FB4CDED-9617-418F-B546-D66B9BB6C35E}" type="datetime1">
               <a:rPr kumimoji="1" lang="ja-JP" altLang="en-US" smtClean="0"/>
-              <a:t>2021/6/12</a:t>
+              <a:t>2021/6/13</a:t>
             </a:fld>
             <a:endParaRPr kumimoji="1" lang="ja-JP" altLang="en-US"/>
           </a:p>
@@ -3327,7 +3327,7 @@
           <a:p>
             <a:fld id="{F5635D40-962A-46D7-8037-3F2900B5EB4D}" type="datetime1">
               <a:rPr kumimoji="1" lang="ja-JP" altLang="en-US" smtClean="0"/>
-              <a:t>2021/6/12</a:t>
+              <a:t>2021/6/13</a:t>
             </a:fld>
             <a:endParaRPr kumimoji="1" lang="ja-JP" altLang="en-US"/>
           </a:p>
@@ -3621,7 +3621,7 @@
           <a:p>
             <a:fld id="{741DA9A2-8356-4FFD-B66A-E38811049858}" type="datetime1">
               <a:rPr kumimoji="1" lang="ja-JP" altLang="en-US" smtClean="0"/>
-              <a:t>2021/6/12</a:t>
+              <a:t>2021/6/13</a:t>
             </a:fld>
             <a:endParaRPr kumimoji="1" lang="ja-JP" altLang="en-US"/>
           </a:p>
@@ -3950,7 +3950,7 @@
           <a:p>
             <a:fld id="{9DDE8989-88B8-4869-97D9-547531F13E13}" type="datetime1">
               <a:rPr kumimoji="1" lang="ja-JP" altLang="en-US" smtClean="0"/>
-              <a:t>2021/6/12</a:t>
+              <a:t>2021/6/13</a:t>
             </a:fld>
             <a:endParaRPr kumimoji="1" lang="ja-JP" altLang="en-US"/>
           </a:p>
@@ -4337,7 +4337,7 @@
           <a:p>
             <a:fld id="{81EC4031-B949-4300-AB3E-1551426E8631}" type="datetime1">
               <a:rPr kumimoji="1" lang="ja-JP" altLang="en-US" smtClean="0"/>
-              <a:t>2021/6/12</a:t>
+              <a:t>2021/6/13</a:t>
             </a:fld>
             <a:endParaRPr kumimoji="1" lang="ja-JP" altLang="en-US"/>
           </a:p>
@@ -4858,7 +4858,7 @@
           <a:p>
             <a:fld id="{F39E755E-A59D-4634-B604-E9BB568B1156}" type="datetime1">
               <a:rPr kumimoji="1" lang="ja-JP" altLang="en-US" smtClean="0"/>
-              <a:t>2021/6/12</a:t>
+              <a:t>2021/6/13</a:t>
             </a:fld>
             <a:endParaRPr kumimoji="1" lang="ja-JP" altLang="en-US"/>
           </a:p>
@@ -5063,7 +5063,7 @@
           <a:p>
             <a:fld id="{61DA38B3-7601-4256-ABFE-386B92B0EDB5}" type="datetime1">
               <a:rPr kumimoji="1" lang="ja-JP" altLang="en-US" smtClean="0"/>
-              <a:t>2021/6/12</a:t>
+              <a:t>2021/6/13</a:t>
             </a:fld>
             <a:endParaRPr kumimoji="1" lang="ja-JP" altLang="en-US"/>
           </a:p>
@@ -5240,7 +5240,7 @@
           <a:p>
             <a:fld id="{5A28ED6D-8A94-4DBA-8EF2-284D1A467CE8}" type="datetime1">
               <a:rPr kumimoji="1" lang="ja-JP" altLang="en-US" smtClean="0"/>
-              <a:t>2021/6/12</a:t>
+              <a:t>2021/6/13</a:t>
             </a:fld>
             <a:endParaRPr kumimoji="1" lang="ja-JP" altLang="en-US"/>
           </a:p>
@@ -5605,7 +5605,7 @@
           <a:p>
             <a:fld id="{B27B0317-28AF-43C5-8944-AADFA89E0149}" type="datetime1">
               <a:rPr kumimoji="1" lang="ja-JP" altLang="en-US" smtClean="0"/>
-              <a:t>2021/6/12</a:t>
+              <a:t>2021/6/13</a:t>
             </a:fld>
             <a:endParaRPr kumimoji="1" lang="ja-JP" altLang="en-US"/>
           </a:p>
@@ -5950,7 +5950,7 @@
           <a:p>
             <a:fld id="{A78D023C-C4FA-4CE8-B5BE-6798898EE377}" type="datetime1">
               <a:rPr kumimoji="1" lang="ja-JP" altLang="en-US" smtClean="0"/>
-              <a:t>2021/6/12</a:t>
+              <a:t>2021/6/13</a:t>
             </a:fld>
             <a:endParaRPr kumimoji="1" lang="ja-JP" altLang="en-US"/>
           </a:p>
@@ -8099,7 +8099,7 @@
           <a:p>
             <a:fld id="{99567159-F4A8-4352-915B-DDBEFEF4A4D6}" type="datetime1">
               <a:rPr kumimoji="1" lang="ja-JP" altLang="en-US" smtClean="0"/>
-              <a:t>2021/6/12</a:t>
+              <a:t>2021/6/13</a:t>
             </a:fld>
             <a:endParaRPr kumimoji="1" lang="ja-JP" altLang="en-US"/>
           </a:p>
@@ -12270,11 +12270,11 @@
         <p:spPr>
           <a:xfrm>
             <a:off x="5234586" y="5792453"/>
-            <a:ext cx="2784104" cy="96949"/>
+            <a:ext cx="2674662" cy="118769"/>
           </a:xfrm>
           <a:prstGeom prst="bentConnector3">
             <a:avLst>
-              <a:gd name="adj1" fmla="val -121"/>
+              <a:gd name="adj1" fmla="val -213"/>
             </a:avLst>
           </a:prstGeom>
           <a:ln>
@@ -12610,8 +12610,8 @@
         </p:nvSpPr>
         <p:spPr>
           <a:xfrm>
-            <a:off x="7935909" y="5796431"/>
-            <a:ext cx="485830" cy="369332"/>
+            <a:off x="7862740" y="5786906"/>
+            <a:ext cx="485830" cy="415498"/>
           </a:xfrm>
           <a:prstGeom prst="rect">
             <a:avLst/>
@@ -12625,7 +12625,7 @@
           <a:lstStyle/>
           <a:p>
             <a:r>
-              <a:rPr kumimoji="1" lang="en-US" altLang="ja-JP" sz="600" b="1" dirty="0">
+              <a:rPr kumimoji="1" lang="en-US" altLang="ja-JP" sz="700" b="1" dirty="0">
                 <a:solidFill>
                   <a:srgbClr val="0070C0"/>
                 </a:solidFill>
@@ -12635,7 +12635,7 @@
           </a:p>
           <a:p>
             <a:r>
-              <a:rPr kumimoji="1" lang="en-US" altLang="ja-JP" sz="600" b="1" dirty="0">
+              <a:rPr kumimoji="1" lang="en-US" altLang="ja-JP" sz="700" b="1" dirty="0">
                 <a:solidFill>
                   <a:srgbClr val="0070C0"/>
                 </a:solidFill>
@@ -12645,14 +12645,14 @@
           </a:p>
           <a:p>
             <a:r>
-              <a:rPr kumimoji="1" lang="en-US" altLang="ja-JP" sz="600" b="1" dirty="0">
+              <a:rPr kumimoji="1" lang="en-US" altLang="ja-JP" sz="700" b="1" dirty="0">
                 <a:solidFill>
                   <a:srgbClr val="0070C0"/>
                 </a:solidFill>
               </a:rPr>
               <a:t>DCD</a:t>
             </a:r>
-            <a:endParaRPr lang="ja-JP" altLang="en-US" sz="600" b="1" dirty="0">
+            <a:endParaRPr lang="ja-JP" altLang="en-US" sz="700" b="1" dirty="0">
               <a:solidFill>
                 <a:srgbClr val="0070C0"/>
               </a:solidFill>
@@ -12677,11 +12677,11 @@
         <p:spPr>
           <a:xfrm>
             <a:off x="5350669" y="5796431"/>
-            <a:ext cx="2668021" cy="276563"/>
+            <a:ext cx="2558579" cy="291637"/>
           </a:xfrm>
           <a:prstGeom prst="bentConnector3">
             <a:avLst>
-              <a:gd name="adj1" fmla="val -70"/>
+              <a:gd name="adj1" fmla="val 115"/>
             </a:avLst>
           </a:prstGeom>
           <a:ln>
@@ -12858,11 +12858,11 @@
         <p:spPr>
           <a:xfrm>
             <a:off x="5589505" y="5804183"/>
-            <a:ext cx="2432512" cy="178883"/>
+            <a:ext cx="2319743" cy="184662"/>
           </a:xfrm>
           <a:prstGeom prst="bentConnector3">
             <a:avLst>
-              <a:gd name="adj1" fmla="val -219"/>
+              <a:gd name="adj1" fmla="val 50000"/>
             </a:avLst>
           </a:prstGeom>
           <a:ln>

</xml_diff>

<commit_message>
3.7.3.0 Supported VSIF for NES.
</commit_message>
<xml_diff>
--- a/docs/MAmidiMEmo/Manual.pptx
+++ b/docs/MAmidiMEmo/Manual.pptx
@@ -5,7 +5,7 @@
     <p:sldMasterId id="2147483678" r:id="rId1"/>
   </p:sldMasterIdLst>
   <p:notesMasterIdLst>
-    <p:notesMasterId r:id="rId20"/>
+    <p:notesMasterId r:id="rId21"/>
   </p:notesMasterIdLst>
   <p:sldIdLst>
     <p:sldId id="256" r:id="rId2"/>
@@ -22,10 +22,11 @@
     <p:sldId id="270" r:id="rId13"/>
     <p:sldId id="269" r:id="rId14"/>
     <p:sldId id="272" r:id="rId15"/>
-    <p:sldId id="273" r:id="rId16"/>
-    <p:sldId id="274" r:id="rId17"/>
-    <p:sldId id="275" r:id="rId18"/>
-    <p:sldId id="264" r:id="rId19"/>
+    <p:sldId id="274" r:id="rId16"/>
+    <p:sldId id="277" r:id="rId17"/>
+    <p:sldId id="273" r:id="rId18"/>
+    <p:sldId id="275" r:id="rId19"/>
+    <p:sldId id="264" r:id="rId20"/>
   </p:sldIdLst>
   <p:sldSz cx="12192000" cy="6858000"/>
   <p:notesSz cx="6858000" cy="9144000"/>
@@ -214,7 +215,7 @@
           <a:p>
             <a:fld id="{581C28D8-13B6-41C3-9F5F-0284C569C6F1}" type="datetimeFigureOut">
               <a:rPr kumimoji="1" lang="ja-JP" altLang="en-US" smtClean="0"/>
-              <a:t>2021/6/13</a:t>
+              <a:t>2021/6/19</a:t>
             </a:fld>
             <a:endParaRPr kumimoji="1" lang="ja-JP" altLang="en-US"/>
           </a:p>
@@ -671,7 +672,7 @@
     </p:spTree>
     <p:extLst>
       <p:ext uri="{BB962C8B-B14F-4D97-AF65-F5344CB8AC3E}">
-        <p14:creationId xmlns:p14="http://schemas.microsoft.com/office/powerpoint/2010/main" val="901084948"/>
+        <p14:creationId xmlns:p14="http://schemas.microsoft.com/office/powerpoint/2010/main" val="4059164338"/>
       </p:ext>
     </p:extLst>
   </p:cSld>
@@ -755,7 +756,91 @@
     </p:spTree>
     <p:extLst>
       <p:ext uri="{BB962C8B-B14F-4D97-AF65-F5344CB8AC3E}">
-        <p14:creationId xmlns:p14="http://schemas.microsoft.com/office/powerpoint/2010/main" val="4059164338"/>
+        <p14:creationId xmlns:p14="http://schemas.microsoft.com/office/powerpoint/2010/main" val="2562290748"/>
+      </p:ext>
+    </p:extLst>
+  </p:cSld>
+  <p:clrMapOvr>
+    <a:masterClrMapping/>
+  </p:clrMapOvr>
+</p:notes>
+</file>
+
+<file path=ppt/notesSlides/notesSlide4.xml><?xml version="1.0" encoding="utf-8"?>
+<p:notes xmlns:a="http://schemas.openxmlformats.org/drawingml/2006/main" xmlns:r="http://schemas.openxmlformats.org/officeDocument/2006/relationships" xmlns:p="http://schemas.openxmlformats.org/presentationml/2006/main">
+  <p:cSld>
+    <p:spTree>
+      <p:nvGrpSpPr>
+        <p:cNvPr id="1" name=""/>
+        <p:cNvGrpSpPr/>
+        <p:nvPr/>
+      </p:nvGrpSpPr>
+      <p:grpSpPr>
+        <a:xfrm>
+          <a:off x="0" y="0"/>
+          <a:ext cx="0" cy="0"/>
+          <a:chOff x="0" y="0"/>
+          <a:chExt cx="0" cy="0"/>
+        </a:xfrm>
+      </p:grpSpPr>
+      <p:sp>
+        <p:nvSpPr>
+          <p:cNvPr id="2" name="スライド イメージ プレースホルダー 1"/>
+          <p:cNvSpPr>
+            <a:spLocks noGrp="1" noRot="1" noChangeAspect="1"/>
+          </p:cNvSpPr>
+          <p:nvPr>
+            <p:ph type="sldImg"/>
+          </p:nvPr>
+        </p:nvSpPr>
+        <p:spPr/>
+      </p:sp>
+      <p:sp>
+        <p:nvSpPr>
+          <p:cNvPr id="3" name="ノート プレースホルダー 2"/>
+          <p:cNvSpPr>
+            <a:spLocks noGrp="1"/>
+          </p:cNvSpPr>
+          <p:nvPr>
+            <p:ph type="body" idx="1"/>
+          </p:nvPr>
+        </p:nvSpPr>
+        <p:spPr/>
+        <p:txBody>
+          <a:bodyPr/>
+          <a:lstStyle/>
+          <a:p>
+            <a:endParaRPr kumimoji="1" lang="ja-JP" altLang="en-US" dirty="0"/>
+          </a:p>
+        </p:txBody>
+      </p:sp>
+      <p:sp>
+        <p:nvSpPr>
+          <p:cNvPr id="4" name="スライド番号プレースホルダー 3"/>
+          <p:cNvSpPr>
+            <a:spLocks noGrp="1"/>
+          </p:cNvSpPr>
+          <p:nvPr>
+            <p:ph type="sldNum" sz="quarter" idx="5"/>
+          </p:nvPr>
+        </p:nvSpPr>
+        <p:spPr/>
+        <p:txBody>
+          <a:bodyPr/>
+          <a:lstStyle/>
+          <a:p>
+            <a:fld id="{E8D2F5C4-CB40-44D3-9C89-5ECCD9AB4B5C}" type="slidenum">
+              <a:rPr kumimoji="1" lang="ja-JP" altLang="en-US" smtClean="0"/>
+              <a:t>17</a:t>
+            </a:fld>
+            <a:endParaRPr kumimoji="1" lang="ja-JP" altLang="en-US"/>
+          </a:p>
+        </p:txBody>
+      </p:sp>
+    </p:spTree>
+    <p:extLst>
+      <p:ext uri="{BB962C8B-B14F-4D97-AF65-F5344CB8AC3E}">
+        <p14:creationId xmlns:p14="http://schemas.microsoft.com/office/powerpoint/2010/main" val="901084948"/>
       </p:ext>
     </p:extLst>
   </p:cSld>
@@ -953,7 +1038,7 @@
           <a:p>
             <a:fld id="{B8625E62-B904-4691-B75E-EC1C32885285}" type="datetime1">
               <a:rPr kumimoji="1" lang="ja-JP" altLang="en-US" smtClean="0"/>
-              <a:t>2021/6/13</a:t>
+              <a:t>2021/6/19</a:t>
             </a:fld>
             <a:endParaRPr kumimoji="1" lang="ja-JP" altLang="en-US"/>
           </a:p>
@@ -1291,7 +1376,7 @@
           <a:p>
             <a:fld id="{A4C87007-2A40-4EFC-90A3-258EFA3C1001}" type="datetime1">
               <a:rPr kumimoji="1" lang="ja-JP" altLang="en-US" smtClean="0"/>
-              <a:t>2021/6/13</a:t>
+              <a:t>2021/6/19</a:t>
             </a:fld>
             <a:endParaRPr kumimoji="1" lang="ja-JP" altLang="en-US"/>
           </a:p>
@@ -1692,7 +1777,7 @@
           <a:p>
             <a:fld id="{0FE0D7FF-9203-4AA3-90FD-622674A14F90}" type="datetime1">
               <a:rPr kumimoji="1" lang="ja-JP" altLang="en-US" smtClean="0"/>
-              <a:t>2021/6/13</a:t>
+              <a:t>2021/6/19</a:t>
             </a:fld>
             <a:endParaRPr kumimoji="1" lang="ja-JP" altLang="en-US"/>
           </a:p>
@@ -2028,7 +2113,7 @@
           <a:p>
             <a:fld id="{D2D6E4D3-BEDB-4F35-876B-5B9AA41BFB5B}" type="datetime1">
               <a:rPr kumimoji="1" lang="ja-JP" altLang="en-US" smtClean="0"/>
-              <a:t>2021/6/13</a:t>
+              <a:t>2021/6/19</a:t>
             </a:fld>
             <a:endParaRPr kumimoji="1" lang="ja-JP" altLang="en-US"/>
           </a:p>
@@ -2348,7 +2433,7 @@
           <a:p>
             <a:fld id="{2ACD896E-FC14-4F25-BC47-18ABAEA9E1FE}" type="datetime1">
               <a:rPr kumimoji="1" lang="ja-JP" altLang="en-US" smtClean="0"/>
-              <a:t>2021/6/13</a:t>
+              <a:t>2021/6/19</a:t>
             </a:fld>
             <a:endParaRPr kumimoji="1" lang="ja-JP" altLang="en-US"/>
           </a:p>
@@ -2744,7 +2829,7 @@
           <a:p>
             <a:fld id="{54FC701B-2185-4987-B8E2-5507664B65F4}" type="datetime1">
               <a:rPr kumimoji="1" lang="ja-JP" altLang="en-US" smtClean="0"/>
-              <a:t>2021/6/13</a:t>
+              <a:t>2021/6/19</a:t>
             </a:fld>
             <a:endParaRPr kumimoji="1" lang="ja-JP" altLang="en-US"/>
           </a:p>
@@ -3033,7 +3118,7 @@
           <a:p>
             <a:fld id="{3FB4CDED-9617-418F-B546-D66B9BB6C35E}" type="datetime1">
               <a:rPr kumimoji="1" lang="ja-JP" altLang="en-US" smtClean="0"/>
-              <a:t>2021/6/13</a:t>
+              <a:t>2021/6/19</a:t>
             </a:fld>
             <a:endParaRPr kumimoji="1" lang="ja-JP" altLang="en-US"/>
           </a:p>
@@ -3327,7 +3412,7 @@
           <a:p>
             <a:fld id="{F5635D40-962A-46D7-8037-3F2900B5EB4D}" type="datetime1">
               <a:rPr kumimoji="1" lang="ja-JP" altLang="en-US" smtClean="0"/>
-              <a:t>2021/6/13</a:t>
+              <a:t>2021/6/19</a:t>
             </a:fld>
             <a:endParaRPr kumimoji="1" lang="ja-JP" altLang="en-US"/>
           </a:p>
@@ -3621,7 +3706,7 @@
           <a:p>
             <a:fld id="{741DA9A2-8356-4FFD-B66A-E38811049858}" type="datetime1">
               <a:rPr kumimoji="1" lang="ja-JP" altLang="en-US" smtClean="0"/>
-              <a:t>2021/6/13</a:t>
+              <a:t>2021/6/19</a:t>
             </a:fld>
             <a:endParaRPr kumimoji="1" lang="ja-JP" altLang="en-US"/>
           </a:p>
@@ -3950,7 +4035,7 @@
           <a:p>
             <a:fld id="{9DDE8989-88B8-4869-97D9-547531F13E13}" type="datetime1">
               <a:rPr kumimoji="1" lang="ja-JP" altLang="en-US" smtClean="0"/>
-              <a:t>2021/6/13</a:t>
+              <a:t>2021/6/19</a:t>
             </a:fld>
             <a:endParaRPr kumimoji="1" lang="ja-JP" altLang="en-US"/>
           </a:p>
@@ -4337,7 +4422,7 @@
           <a:p>
             <a:fld id="{81EC4031-B949-4300-AB3E-1551426E8631}" type="datetime1">
               <a:rPr kumimoji="1" lang="ja-JP" altLang="en-US" smtClean="0"/>
-              <a:t>2021/6/13</a:t>
+              <a:t>2021/6/19</a:t>
             </a:fld>
             <a:endParaRPr kumimoji="1" lang="ja-JP" altLang="en-US"/>
           </a:p>
@@ -4858,7 +4943,7 @@
           <a:p>
             <a:fld id="{F39E755E-A59D-4634-B604-E9BB568B1156}" type="datetime1">
               <a:rPr kumimoji="1" lang="ja-JP" altLang="en-US" smtClean="0"/>
-              <a:t>2021/6/13</a:t>
+              <a:t>2021/6/19</a:t>
             </a:fld>
             <a:endParaRPr kumimoji="1" lang="ja-JP" altLang="en-US"/>
           </a:p>
@@ -5063,7 +5148,7 @@
           <a:p>
             <a:fld id="{61DA38B3-7601-4256-ABFE-386B92B0EDB5}" type="datetime1">
               <a:rPr kumimoji="1" lang="ja-JP" altLang="en-US" smtClean="0"/>
-              <a:t>2021/6/13</a:t>
+              <a:t>2021/6/19</a:t>
             </a:fld>
             <a:endParaRPr kumimoji="1" lang="ja-JP" altLang="en-US"/>
           </a:p>
@@ -5240,7 +5325,7 @@
           <a:p>
             <a:fld id="{5A28ED6D-8A94-4DBA-8EF2-284D1A467CE8}" type="datetime1">
               <a:rPr kumimoji="1" lang="ja-JP" altLang="en-US" smtClean="0"/>
-              <a:t>2021/6/13</a:t>
+              <a:t>2021/6/19</a:t>
             </a:fld>
             <a:endParaRPr kumimoji="1" lang="ja-JP" altLang="en-US"/>
           </a:p>
@@ -5605,7 +5690,7 @@
           <a:p>
             <a:fld id="{B27B0317-28AF-43C5-8944-AADFA89E0149}" type="datetime1">
               <a:rPr kumimoji="1" lang="ja-JP" altLang="en-US" smtClean="0"/>
-              <a:t>2021/6/13</a:t>
+              <a:t>2021/6/19</a:t>
             </a:fld>
             <a:endParaRPr kumimoji="1" lang="ja-JP" altLang="en-US"/>
           </a:p>
@@ -5950,7 +6035,7 @@
           <a:p>
             <a:fld id="{A78D023C-C4FA-4CE8-B5BE-6798898EE377}" type="datetime1">
               <a:rPr kumimoji="1" lang="ja-JP" altLang="en-US" smtClean="0"/>
-              <a:t>2021/6/13</a:t>
+              <a:t>2021/6/19</a:t>
             </a:fld>
             <a:endParaRPr kumimoji="1" lang="ja-JP" altLang="en-US"/>
           </a:p>
@@ -8099,7 +8184,7 @@
           <a:p>
             <a:fld id="{99567159-F4A8-4352-915B-DDBEFEF4A4D6}" type="datetime1">
               <a:rPr kumimoji="1" lang="ja-JP" altLang="en-US" smtClean="0"/>
-              <a:t>2021/6/13</a:t>
+              <a:t>2021/6/19</a:t>
             </a:fld>
             <a:endParaRPr kumimoji="1" lang="ja-JP" altLang="en-US"/>
           </a:p>
@@ -10705,7 +10790,14 @@
           <a:p>
             <a:r>
               <a:rPr kumimoji="1" lang="en-US" altLang="ja-JP" dirty="0"/>
-              <a:t>VGM Sound Interface(VSIF) – (1)</a:t>
+              <a:t>VGM Sound Interface(VSIF - UART)</a:t>
+            </a:r>
+            <a:br>
+              <a:rPr kumimoji="1" lang="en-US" altLang="ja-JP" dirty="0"/>
+            </a:br>
+            <a:r>
+              <a:rPr kumimoji="1" lang="en-US" altLang="ja-JP" dirty="0"/>
+              <a:t>for Genesis/SMS</a:t>
             </a:r>
             <a:endParaRPr kumimoji="1" lang="ja-JP" altLang="en-US" dirty="0"/>
           </a:p>
@@ -10743,6 +10835,14 @@
             </a:r>
             <a:r>
               <a:rPr kumimoji="1" lang="en-US" altLang="ja-JP" dirty="0"/>
+              <a:t> and </a:t>
+            </a:r>
+            <a:r>
+              <a:rPr kumimoji="1" lang="en-US" altLang="ja-JP" dirty="0" err="1"/>
+              <a:t>VGMPlayer</a:t>
+            </a:r>
+            <a:r>
+              <a:rPr kumimoji="1" lang="en-US" altLang="ja-JP" dirty="0"/>
               <a:t> can drive real machine chips. Currently supports NTSC SMS(2, </a:t>
             </a:r>
             <a:r>
@@ -10769,9 +10869,13 @@
               <a:rPr lang="en-US" altLang="ja-JP" dirty="0"/>
               <a:t>Buy the following parts.</a:t>
             </a:r>
-          </a:p>
-          <a:p>
-            <a:pPr lvl="2"/>
+            <a:br>
+              <a:rPr lang="en-US" altLang="ja-JP" dirty="0"/>
+            </a:br>
+            <a:r>
+              <a:rPr lang="ja-JP" altLang="en-US" dirty="0"/>
+              <a:t>・</a:t>
+            </a:r>
             <a:r>
               <a:rPr kumimoji="1" lang="en-US" altLang="ja-JP" dirty="0"/>
               <a:t>1x </a:t>
@@ -10791,6 +10895,10 @@
             <a:r>
               <a:rPr kumimoji="1" lang="en-US" altLang="ja-JP" sz="1400" dirty="0"/>
               <a:t> </a:t>
+            </a:r>
+            <a:r>
+              <a:rPr lang="en-US" altLang="ja-JP" sz="1100" dirty="0"/>
+              <a:t>CH340 and CP2102 </a:t>
             </a:r>
             <a:r>
               <a:rPr lang="en-US" altLang="ja-JP" sz="1100" dirty="0">
@@ -10798,7 +10906,7 @@
                   <a:srgbClr val="FF0000"/>
                 </a:solidFill>
               </a:rPr>
-              <a:t>Need to s</a:t>
+              <a:t>may not work </a:t>
             </a:r>
             <a:r>
               <a:rPr kumimoji="1" lang="en-US" altLang="ja-JP" sz="1100" dirty="0">
@@ -10806,28 +10914,27 @@
                   <a:srgbClr val="FF0000"/>
                 </a:solidFill>
               </a:rPr>
-              <a:t>upport 163,840bps(</a:t>
-            </a:r>
-            <a:r>
-              <a:rPr lang="en-US" altLang="ja-JP" sz="1100" dirty="0"/>
-              <a:t>CH340 and CP2102 may not work)</a:t>
+              <a:t>163,840bps</a:t>
             </a:r>
             <a:r>
               <a:rPr kumimoji="1" lang="en-US" altLang="ja-JP" sz="1100" dirty="0">
                 <a:solidFill>
-                  <a:srgbClr val="FF0000"/>
+                  <a:schemeClr val="tx1"/>
                 </a:solidFill>
               </a:rPr>
-              <a:t>, 115,200bps</a:t>
+              <a:t>, only 115,200bps.</a:t>
             </a:r>
             <a:r>
               <a:rPr kumimoji="1" lang="en-US" altLang="ja-JP" sz="1100" dirty="0"/>
-              <a:t>.)</a:t>
-            </a:r>
-            <a:endParaRPr lang="en-US" altLang="ja-JP" dirty="0"/>
-          </a:p>
-          <a:p>
-            <a:pPr lvl="2"/>
+              <a:t>)</a:t>
+            </a:r>
+            <a:br>
+              <a:rPr kumimoji="1" lang="en-US" altLang="ja-JP" sz="1100" dirty="0"/>
+            </a:br>
+            <a:r>
+              <a:rPr kumimoji="1" lang="ja-JP" altLang="en-US" sz="1100" dirty="0"/>
+              <a:t>・</a:t>
+            </a:r>
             <a:r>
               <a:rPr lang="en-US" altLang="ja-JP" dirty="0"/>
               <a:t>1x </a:t>
@@ -11009,7 +11116,7 @@
               </a:ext>
             </a:extLst>
           </a:blip>
-          <a:srcRect l="27693" t="10341" r="5170" b="18677"/>
+          <a:srcRect/>
           <a:stretch/>
         </p:blipFill>
         <p:spPr>
@@ -11044,7 +11151,7 @@
               </a:ext>
             </a:extLst>
           </a:blip>
-          <a:srcRect l="37972" t="58582" r="47913" b="23255"/>
+          <a:srcRect/>
           <a:stretch/>
         </p:blipFill>
         <p:spPr>
@@ -11623,7 +11730,26 @@
           <a:p>
             <a:r>
               <a:rPr kumimoji="1" lang="en-US" altLang="ja-JP" dirty="0"/>
-              <a:t>VGM Sound Interface(VSIF) – (2)</a:t>
+              <a:t>VGM Sound Interface(VSIF</a:t>
+            </a:r>
+            <a:r>
+              <a:rPr lang="ja-JP" altLang="en-US" dirty="0"/>
+              <a:t> </a:t>
+            </a:r>
+            <a:r>
+              <a:rPr lang="en-US" altLang="ja-JP" dirty="0"/>
+              <a:t>- FTDI</a:t>
+            </a:r>
+            <a:r>
+              <a:rPr kumimoji="1" lang="en-US" altLang="ja-JP" dirty="0"/>
+              <a:t>)</a:t>
+            </a:r>
+            <a:br>
+              <a:rPr kumimoji="1" lang="en-US" altLang="ja-JP" dirty="0"/>
+            </a:br>
+            <a:r>
+              <a:rPr kumimoji="1" lang="en-US" altLang="ja-JP" dirty="0"/>
+              <a:t>for Genesis</a:t>
             </a:r>
             <a:endParaRPr kumimoji="1" lang="ja-JP" altLang="en-US" dirty="0"/>
           </a:p>
@@ -11652,357 +11778,24 @@
           </a:xfrm>
         </p:spPr>
         <p:txBody>
-          <a:bodyPr>
-            <a:normAutofit/>
-          </a:bodyPr>
-          <a:lstStyle/>
-          <a:p>
-            <a:pPr>
-              <a:buFont typeface="+mj-lt"/>
-              <a:buAutoNum type="arabicPeriod" startAt="3"/>
-            </a:pPr>
+          <a:bodyPr/>
+          <a:lstStyle/>
+          <a:p>
+            <a:r>
+              <a:rPr kumimoji="1" lang="en-US" altLang="ja-JP" dirty="0" err="1"/>
+              <a:t>MAmidiMEmo</a:t>
+            </a:r>
             <a:r>
               <a:rPr kumimoji="1" lang="en-US" altLang="ja-JP" dirty="0"/>
-              <a:t>Burn </a:t>
+              <a:t> and </a:t>
             </a:r>
             <a:r>
               <a:rPr kumimoji="1" lang="en-US" altLang="ja-JP" dirty="0" err="1"/>
-              <a:t>VGMPlay_md.bin</a:t>
+              <a:t>VGMPlayer</a:t>
             </a:r>
             <a:r>
               <a:rPr kumimoji="1" lang="en-US" altLang="ja-JP" dirty="0"/>
-              <a:t>(for Genesis) or </a:t>
-            </a:r>
-            <a:r>
-              <a:rPr kumimoji="1" lang="en-US" altLang="ja-JP" dirty="0" err="1"/>
-              <a:t>VGMPlay_sms.sms</a:t>
-            </a:r>
-            <a:r>
-              <a:rPr kumimoji="1" lang="en-US" altLang="ja-JP" dirty="0"/>
-              <a:t>(for SMS) to your FLASH Cart</a:t>
-            </a:r>
-          </a:p>
-          <a:p>
-            <a:pPr>
-              <a:buFont typeface="+mj-lt"/>
-              <a:buAutoNum type="arabicPeriod" startAt="3"/>
-            </a:pPr>
-            <a:r>
-              <a:rPr kumimoji="1" lang="en-US" altLang="ja-JP" dirty="0"/>
-              <a:t>Set the </a:t>
-            </a:r>
-            <a:r>
-              <a:rPr kumimoji="1" lang="en-US" altLang="ja-JP" dirty="0" err="1"/>
-              <a:t>COMPort</a:t>
-            </a:r>
-            <a:r>
-              <a:rPr kumimoji="1" lang="en-US" altLang="ja-JP" dirty="0"/>
-              <a:t> name and select “VSIF SMS”  or “VSIF Genesis”.</a:t>
-            </a:r>
-          </a:p>
-          <a:p>
-            <a:pPr>
-              <a:buFont typeface="+mj-lt"/>
-              <a:buAutoNum type="arabicPeriod" startAt="3"/>
-            </a:pPr>
-            <a:endParaRPr lang="en-US" altLang="ja-JP" dirty="0"/>
-          </a:p>
-          <a:p>
-            <a:pPr>
-              <a:buFont typeface="+mj-lt"/>
-              <a:buAutoNum type="arabicPeriod" startAt="3"/>
-            </a:pPr>
-            <a:endParaRPr kumimoji="1" lang="en-US" altLang="ja-JP" dirty="0"/>
-          </a:p>
-          <a:p>
-            <a:pPr>
-              <a:buFont typeface="+mj-lt"/>
-              <a:buAutoNum type="arabicPeriod" startAt="3"/>
-            </a:pPr>
-            <a:endParaRPr lang="en-US" altLang="ja-JP" dirty="0"/>
-          </a:p>
-          <a:p>
-            <a:pPr>
-              <a:buFont typeface="+mj-lt"/>
-              <a:buAutoNum type="arabicPeriod" startAt="3"/>
-            </a:pPr>
-            <a:endParaRPr kumimoji="1" lang="en-US" altLang="ja-JP" dirty="0"/>
-          </a:p>
-          <a:p>
-            <a:pPr>
-              <a:buFont typeface="+mj-lt"/>
-              <a:buAutoNum type="arabicPeriod" startAt="3"/>
-            </a:pPr>
-            <a:r>
-              <a:rPr lang="en-US" altLang="ja-JP" dirty="0"/>
-              <a:t>Done!</a:t>
-            </a:r>
-          </a:p>
-          <a:p>
-            <a:pPr>
-              <a:buFont typeface="+mj-lt"/>
-              <a:buAutoNum type="arabicPeriod" startAt="3"/>
-            </a:pPr>
-            <a:r>
-              <a:rPr kumimoji="1" lang="en-US" altLang="ja-JP" dirty="0"/>
-              <a:t>I</a:t>
-            </a:r>
-            <a:r>
-              <a:rPr lang="en-US" altLang="ja-JP" dirty="0"/>
-              <a:t>f you can not sound sounds, make sure soldering</a:t>
-            </a:r>
-            <a:r>
-              <a:rPr lang="ja-JP" altLang="en-US" dirty="0"/>
-              <a:t> </a:t>
-            </a:r>
-            <a:r>
-              <a:rPr lang="en-US" altLang="ja-JP" dirty="0"/>
-              <a:t>and </a:t>
-            </a:r>
-            <a:r>
-              <a:rPr lang="en-US" altLang="ja-JP" dirty="0" err="1"/>
-              <a:t>COMPort</a:t>
-            </a:r>
-            <a:r>
-              <a:rPr lang="en-US" altLang="ja-JP" dirty="0"/>
-              <a:t> name.</a:t>
-            </a:r>
-            <a:br>
-              <a:rPr lang="en-US" altLang="ja-JP" dirty="0"/>
-            </a:br>
-            <a:r>
-              <a:rPr lang="en-US" altLang="ja-JP" dirty="0"/>
-              <a:t>Or, please contact me.</a:t>
-            </a:r>
-            <a:endParaRPr kumimoji="1" lang="ja-JP" altLang="en-US" dirty="0"/>
-          </a:p>
-        </p:txBody>
-      </p:sp>
-      <p:pic>
-        <p:nvPicPr>
-          <p:cNvPr id="6" name="図 5">
-            <a:extLst>
-              <a:ext uri="{FF2B5EF4-FFF2-40B4-BE49-F238E27FC236}">
-                <a16:creationId xmlns:a16="http://schemas.microsoft.com/office/drawing/2014/main" id="{A2E081AD-DB5B-41BB-9A52-55D69078DEAF}"/>
-              </a:ext>
-            </a:extLst>
-          </p:cNvPr>
-          <p:cNvPicPr>
-            <a:picLocks noChangeAspect="1"/>
-          </p:cNvPicPr>
-          <p:nvPr/>
-        </p:nvPicPr>
-        <p:blipFill>
-          <a:blip r:embed="rId3"/>
-          <a:stretch>
-            <a:fillRect/>
-          </a:stretch>
-        </p:blipFill>
-        <p:spPr>
-          <a:xfrm>
-            <a:off x="3728707" y="3430800"/>
-            <a:ext cx="4734586" cy="1105054"/>
-          </a:xfrm>
-          <a:prstGeom prst="rect">
-            <a:avLst/>
-          </a:prstGeom>
-        </p:spPr>
-      </p:pic>
-      <p:sp>
-        <p:nvSpPr>
-          <p:cNvPr id="4" name="スライド番号プレースホルダー 3">
-            <a:extLst>
-              <a:ext uri="{FF2B5EF4-FFF2-40B4-BE49-F238E27FC236}">
-                <a16:creationId xmlns:a16="http://schemas.microsoft.com/office/drawing/2014/main" id="{455F9055-FE97-49E6-B05C-BBC13F55BB4C}"/>
-              </a:ext>
-            </a:extLst>
-          </p:cNvPr>
-          <p:cNvSpPr>
-            <a:spLocks noGrp="1"/>
-          </p:cNvSpPr>
-          <p:nvPr>
-            <p:ph type="sldNum" sz="quarter" idx="12"/>
-          </p:nvPr>
-        </p:nvSpPr>
-        <p:spPr/>
-        <p:txBody>
-          <a:bodyPr/>
-          <a:lstStyle/>
-          <a:p>
-            <a:fld id="{E27E2812-4560-4165-A7C7-9C013F955547}" type="slidenum">
-              <a:rPr kumimoji="1" lang="ja-JP" altLang="en-US" smtClean="0"/>
-              <a:t>15</a:t>
-            </a:fld>
-            <a:endParaRPr kumimoji="1" lang="ja-JP" altLang="en-US"/>
-          </a:p>
-        </p:txBody>
-      </p:sp>
-      <p:sp>
-        <p:nvSpPr>
-          <p:cNvPr id="7" name="テキスト ボックス 6">
-            <a:extLst>
-              <a:ext uri="{FF2B5EF4-FFF2-40B4-BE49-F238E27FC236}">
-                <a16:creationId xmlns:a16="http://schemas.microsoft.com/office/drawing/2014/main" id="{79481DCC-C69C-4094-8F11-85281F2345A8}"/>
-              </a:ext>
-            </a:extLst>
-          </p:cNvPr>
-          <p:cNvSpPr txBox="1"/>
-          <p:nvPr/>
-        </p:nvSpPr>
-        <p:spPr>
-          <a:xfrm>
-            <a:off x="3045229" y="5952574"/>
-            <a:ext cx="6101542" cy="584775"/>
-          </a:xfrm>
-          <a:prstGeom prst="rect">
-            <a:avLst/>
-          </a:prstGeom>
-          <a:noFill/>
-        </p:spPr>
-        <p:txBody>
-          <a:bodyPr wrap="square">
-            <a:spAutoFit/>
-          </a:bodyPr>
-          <a:lstStyle/>
-          <a:p>
-            <a:r>
-              <a:rPr lang="en-US" altLang="ja-JP" sz="1600" dirty="0">
-                <a:solidFill>
-                  <a:srgbClr val="FF0000"/>
-                </a:solidFill>
-              </a:rPr>
-              <a:t>*Some UART dongles may not work properly.</a:t>
-            </a:r>
-            <a:br>
-              <a:rPr lang="en-US" altLang="ja-JP" sz="1600" dirty="0">
-                <a:solidFill>
-                  <a:srgbClr val="FF0000"/>
-                </a:solidFill>
-              </a:rPr>
-            </a:br>
-            <a:r>
-              <a:rPr lang="en-US" altLang="ja-JP" sz="1600" dirty="0">
-                <a:solidFill>
-                  <a:srgbClr val="FF0000"/>
-                </a:solidFill>
-              </a:rPr>
-              <a:t>*Compatible consoles may not work properly.</a:t>
-            </a:r>
-            <a:endParaRPr kumimoji="1" lang="ja-JP" altLang="en-US" sz="1600" dirty="0">
-              <a:solidFill>
-                <a:srgbClr val="FF0000"/>
-              </a:solidFill>
-            </a:endParaRPr>
-          </a:p>
-        </p:txBody>
-      </p:sp>
-    </p:spTree>
-    <p:extLst>
-      <p:ext uri="{BB962C8B-B14F-4D97-AF65-F5344CB8AC3E}">
-        <p14:creationId xmlns:p14="http://schemas.microsoft.com/office/powerpoint/2010/main" val="1500572103"/>
-      </p:ext>
-    </p:extLst>
-  </p:cSld>
-  <p:clrMapOvr>
-    <a:masterClrMapping/>
-  </p:clrMapOvr>
-</p:sld>
-</file>
-
-<file path=ppt/slides/slide16.xml><?xml version="1.0" encoding="utf-8"?>
-<p:sld xmlns:a="http://schemas.openxmlformats.org/drawingml/2006/main" xmlns:r="http://schemas.openxmlformats.org/officeDocument/2006/relationships" xmlns:p="http://schemas.openxmlformats.org/presentationml/2006/main">
-  <p:cSld>
-    <p:spTree>
-      <p:nvGrpSpPr>
-        <p:cNvPr id="1" name=""/>
-        <p:cNvGrpSpPr/>
-        <p:nvPr/>
-      </p:nvGrpSpPr>
-      <p:grpSpPr>
-        <a:xfrm>
-          <a:off x="0" y="0"/>
-          <a:ext cx="0" cy="0"/>
-          <a:chOff x="0" y="0"/>
-          <a:chExt cx="0" cy="0"/>
-        </a:xfrm>
-      </p:grpSpPr>
-      <p:sp>
-        <p:nvSpPr>
-          <p:cNvPr id="2" name="タイトル 1">
-            <a:extLst>
-              <a:ext uri="{FF2B5EF4-FFF2-40B4-BE49-F238E27FC236}">
-                <a16:creationId xmlns:a16="http://schemas.microsoft.com/office/drawing/2014/main" id="{DF515C61-C958-43BC-BAFF-3C6346E55E36}"/>
-              </a:ext>
-            </a:extLst>
-          </p:cNvPr>
-          <p:cNvSpPr>
-            <a:spLocks noGrp="1"/>
-          </p:cNvSpPr>
-          <p:nvPr>
-            <p:ph type="title"/>
-          </p:nvPr>
-        </p:nvSpPr>
-        <p:spPr/>
-        <p:txBody>
-          <a:bodyPr/>
-          <a:lstStyle/>
-          <a:p>
-            <a:r>
-              <a:rPr kumimoji="1" lang="en-US" altLang="ja-JP" dirty="0"/>
-              <a:t>VGM Sound Interface(VSIF</a:t>
-            </a:r>
-            <a:r>
-              <a:rPr lang="ja-JP" altLang="en-US" dirty="0"/>
-              <a:t> </a:t>
-            </a:r>
-            <a:r>
-              <a:rPr lang="en-US" altLang="ja-JP" dirty="0"/>
-              <a:t>FTDI</a:t>
-            </a:r>
-            <a:r>
-              <a:rPr kumimoji="1" lang="en-US" altLang="ja-JP" dirty="0"/>
-              <a:t>)</a:t>
-            </a:r>
-            <a:br>
-              <a:rPr kumimoji="1" lang="en-US" altLang="ja-JP" dirty="0"/>
-            </a:br>
-            <a:r>
-              <a:rPr kumimoji="1" lang="en-US" altLang="ja-JP" dirty="0"/>
-              <a:t>for VGM Player</a:t>
-            </a:r>
-            <a:endParaRPr kumimoji="1" lang="ja-JP" altLang="en-US" dirty="0"/>
-          </a:p>
-        </p:txBody>
-      </p:sp>
-      <p:sp>
-        <p:nvSpPr>
-          <p:cNvPr id="3" name="コンテンツ プレースホルダー 2">
-            <a:extLst>
-              <a:ext uri="{FF2B5EF4-FFF2-40B4-BE49-F238E27FC236}">
-                <a16:creationId xmlns:a16="http://schemas.microsoft.com/office/drawing/2014/main" id="{CD745FAA-4C55-4719-9696-912443FC8E21}"/>
-              </a:ext>
-            </a:extLst>
-          </p:cNvPr>
-          <p:cNvSpPr>
-            <a:spLocks noGrp="1"/>
-          </p:cNvSpPr>
-          <p:nvPr>
-            <p:ph idx="1"/>
-          </p:nvPr>
-        </p:nvSpPr>
-        <p:spPr>
-          <a:xfrm>
-            <a:off x="2589212" y="2133600"/>
-            <a:ext cx="9602788" cy="3777622"/>
-          </a:xfrm>
-        </p:spPr>
-        <p:txBody>
-          <a:bodyPr/>
-          <a:lstStyle/>
-          <a:p>
-            <a:r>
-              <a:rPr kumimoji="1" lang="en-US" altLang="ja-JP" dirty="0"/>
-              <a:t>VGM Player can drive real machine chips more faster if you use FTDI2xx(232R, 232H and so on). Currently supports NTSC Genesis(MD) for SN76489, OPN2.</a:t>
+              <a:t> can drive real machine chips more faster if you use FTDI2xx(232R, 232H and so on). Currently supports NTSC Genesis(MD) for SN76489, OPN2.</a:t>
             </a:r>
           </a:p>
           <a:p>
@@ -12022,7 +11815,13 @@
             </a:r>
           </a:p>
           <a:p>
-            <a:pPr lvl="2"/>
+            <a:pPr marL="914400" lvl="2" indent="0">
+              <a:buNone/>
+            </a:pPr>
+            <a:r>
+              <a:rPr kumimoji="1" lang="ja-JP" altLang="en-US" dirty="0"/>
+              <a:t>・</a:t>
+            </a:r>
             <a:r>
               <a:rPr kumimoji="1" lang="en-US" altLang="ja-JP" dirty="0"/>
               <a:t>1x </a:t>
@@ -12055,10 +11854,29 @@
               </a:rPr>
               <a:t> (FT232R and so on. Need to support 5V.)</a:t>
             </a:r>
-            <a:endParaRPr lang="en-US" altLang="ja-JP" dirty="0"/>
-          </a:p>
-          <a:p>
-            <a:pPr lvl="2"/>
+            <a:br>
+              <a:rPr kumimoji="1" lang="en-US" altLang="ja-JP" sz="1100" b="0" i="0" u="none" strike="noStrike" kern="1200" cap="none" spc="0" normalizeH="0" baseline="0" noProof="0" dirty="0">
+                <a:ln>
+                  <a:noFill/>
+                </a:ln>
+                <a:solidFill>
+                  <a:prstClr val="black">
+                    <a:lumMod val="75000"/>
+                    <a:lumOff val="25000"/>
+                  </a:prstClr>
+                </a:solidFill>
+                <a:effectLst/>
+                <a:uLnTx/>
+                <a:uFillTx/>
+                <a:latin typeface="Century Gothic" panose="020B0502020202020204"/>
+                <a:ea typeface="メイリオ" panose="020B0604030504040204" pitchFamily="50" charset="-128"/>
+                <a:cs typeface="+mn-cs"/>
+              </a:rPr>
+            </a:br>
+            <a:r>
+              <a:rPr kumimoji="1" lang="ja-JP" altLang="en-US" dirty="0"/>
+              <a:t>・</a:t>
+            </a:r>
             <a:r>
               <a:rPr lang="en-US" altLang="ja-JP" dirty="0"/>
               <a:t>1x </a:t>
@@ -12240,7 +12058,7 @@
               </a:ext>
             </a:extLst>
           </a:blip>
-          <a:srcRect l="27693" t="29424" r="5170" b="35993"/>
+          <a:srcRect/>
           <a:stretch/>
         </p:blipFill>
         <p:spPr>
@@ -13032,7 +12850,7 @@
           <a:p>
             <a:fld id="{E27E2812-4560-4165-A7C7-9C013F955547}" type="slidenum">
               <a:rPr kumimoji="1" lang="ja-JP" altLang="en-US" smtClean="0"/>
-              <a:t>16</a:t>
+              <a:t>15</a:t>
             </a:fld>
             <a:endParaRPr kumimoji="1" lang="ja-JP" altLang="en-US"/>
           </a:p>
@@ -13096,6 +12914,1049 @@
     <p:extLst>
       <p:ext uri="{BB962C8B-B14F-4D97-AF65-F5344CB8AC3E}">
         <p14:creationId xmlns:p14="http://schemas.microsoft.com/office/powerpoint/2010/main" val="584483520"/>
+      </p:ext>
+    </p:extLst>
+  </p:cSld>
+  <p:clrMapOvr>
+    <a:masterClrMapping/>
+  </p:clrMapOvr>
+</p:sld>
+</file>
+
+<file path=ppt/slides/slide16.xml><?xml version="1.0" encoding="utf-8"?>
+<p:sld xmlns:a="http://schemas.openxmlformats.org/drawingml/2006/main" xmlns:r="http://schemas.openxmlformats.org/officeDocument/2006/relationships" xmlns:p="http://schemas.openxmlformats.org/presentationml/2006/main">
+  <p:cSld>
+    <p:spTree>
+      <p:nvGrpSpPr>
+        <p:cNvPr id="1" name=""/>
+        <p:cNvGrpSpPr/>
+        <p:nvPr/>
+      </p:nvGrpSpPr>
+      <p:grpSpPr>
+        <a:xfrm>
+          <a:off x="0" y="0"/>
+          <a:ext cx="0" cy="0"/>
+          <a:chOff x="0" y="0"/>
+          <a:chExt cx="0" cy="0"/>
+        </a:xfrm>
+      </p:grpSpPr>
+      <p:sp>
+        <p:nvSpPr>
+          <p:cNvPr id="2" name="タイトル 1">
+            <a:extLst>
+              <a:ext uri="{FF2B5EF4-FFF2-40B4-BE49-F238E27FC236}">
+                <a16:creationId xmlns:a16="http://schemas.microsoft.com/office/drawing/2014/main" id="{DF515C61-C958-43BC-BAFF-3C6346E55E36}"/>
+              </a:ext>
+            </a:extLst>
+          </p:cNvPr>
+          <p:cNvSpPr>
+            <a:spLocks noGrp="1"/>
+          </p:cNvSpPr>
+          <p:nvPr>
+            <p:ph type="title"/>
+          </p:nvPr>
+        </p:nvSpPr>
+        <p:spPr/>
+        <p:txBody>
+          <a:bodyPr/>
+          <a:lstStyle/>
+          <a:p>
+            <a:r>
+              <a:rPr kumimoji="1" lang="en-US" altLang="ja-JP" dirty="0"/>
+              <a:t>VGM Sound Interface(VSIF</a:t>
+            </a:r>
+            <a:r>
+              <a:rPr lang="ja-JP" altLang="en-US" dirty="0"/>
+              <a:t> </a:t>
+            </a:r>
+            <a:r>
+              <a:rPr lang="en-US" altLang="ja-JP" dirty="0"/>
+              <a:t>- FTDI</a:t>
+            </a:r>
+            <a:r>
+              <a:rPr kumimoji="1" lang="en-US" altLang="ja-JP" dirty="0"/>
+              <a:t>)</a:t>
+            </a:r>
+            <a:br>
+              <a:rPr kumimoji="1" lang="en-US" altLang="ja-JP" dirty="0"/>
+            </a:br>
+            <a:r>
+              <a:rPr kumimoji="1" lang="en-US" altLang="ja-JP" dirty="0"/>
+              <a:t>for </a:t>
+            </a:r>
+            <a:r>
+              <a:rPr kumimoji="1" lang="en-US" altLang="ja-JP" dirty="0" err="1"/>
+              <a:t>Famicom</a:t>
+            </a:r>
+            <a:endParaRPr kumimoji="1" lang="ja-JP" altLang="en-US" dirty="0"/>
+          </a:p>
+        </p:txBody>
+      </p:sp>
+      <p:sp>
+        <p:nvSpPr>
+          <p:cNvPr id="3" name="コンテンツ プレースホルダー 2">
+            <a:extLst>
+              <a:ext uri="{FF2B5EF4-FFF2-40B4-BE49-F238E27FC236}">
+                <a16:creationId xmlns:a16="http://schemas.microsoft.com/office/drawing/2014/main" id="{CD745FAA-4C55-4719-9696-912443FC8E21}"/>
+              </a:ext>
+            </a:extLst>
+          </p:cNvPr>
+          <p:cNvSpPr>
+            <a:spLocks noGrp="1"/>
+          </p:cNvSpPr>
+          <p:nvPr>
+            <p:ph idx="1"/>
+          </p:nvPr>
+        </p:nvSpPr>
+        <p:spPr>
+          <a:xfrm>
+            <a:off x="2589212" y="2133600"/>
+            <a:ext cx="9602788" cy="3777622"/>
+          </a:xfrm>
+        </p:spPr>
+        <p:txBody>
+          <a:bodyPr/>
+          <a:lstStyle/>
+          <a:p>
+            <a:r>
+              <a:rPr kumimoji="1" lang="en-US" altLang="ja-JP" dirty="0" err="1"/>
+              <a:t>MAmidiMEmo</a:t>
+            </a:r>
+            <a:r>
+              <a:rPr kumimoji="1" lang="en-US" altLang="ja-JP" dirty="0"/>
+              <a:t> can drive real machine chips more faster if you use FTDI2xx(232R, 232H and so on). Currently supports NTSC </a:t>
+            </a:r>
+            <a:r>
+              <a:rPr kumimoji="1" lang="en-US" altLang="ja-JP" dirty="0" err="1"/>
+              <a:t>Famicom</a:t>
+            </a:r>
+            <a:r>
+              <a:rPr kumimoji="1" lang="en-US" altLang="ja-JP" dirty="0"/>
+              <a:t> (Square/Tri/Noise </a:t>
+            </a:r>
+            <a:r>
+              <a:rPr kumimoji="1" lang="en-US" altLang="ja-JP" dirty="0" err="1"/>
+              <a:t>ch</a:t>
+            </a:r>
+            <a:r>
+              <a:rPr kumimoji="1" lang="en-US" altLang="ja-JP" dirty="0"/>
+              <a:t> only).</a:t>
+            </a:r>
+          </a:p>
+          <a:p>
+            <a:r>
+              <a:rPr lang="en-US" altLang="ja-JP" dirty="0"/>
+              <a:t>How to</a:t>
+            </a:r>
+          </a:p>
+          <a:p>
+            <a:pPr marL="800100" lvl="1" indent="-342900">
+              <a:buFont typeface="+mj-lt"/>
+              <a:buAutoNum type="arabicPeriod"/>
+            </a:pPr>
+            <a:r>
+              <a:rPr lang="en-US" altLang="ja-JP" dirty="0"/>
+              <a:t>Buy the following parts.</a:t>
+            </a:r>
+          </a:p>
+          <a:p>
+            <a:pPr marL="914400" lvl="2" indent="0">
+              <a:buNone/>
+            </a:pPr>
+            <a:r>
+              <a:rPr kumimoji="1" lang="ja-JP" altLang="en-US" dirty="0"/>
+              <a:t>・</a:t>
+            </a:r>
+            <a:r>
+              <a:rPr kumimoji="1" lang="en-US" altLang="ja-JP" dirty="0"/>
+              <a:t>1x </a:t>
+            </a:r>
+            <a:r>
+              <a:rPr lang="en-US" altLang="ja-JP" u="sng" dirty="0"/>
+              <a:t>FTDI2XX </a:t>
+            </a:r>
+            <a:r>
+              <a:rPr kumimoji="1" lang="en-US" altLang="ja-JP" u="sng" dirty="0"/>
+              <a:t>dongle</a:t>
+            </a:r>
+            <a:r>
+              <a:rPr kumimoji="1" lang="en-US" altLang="ja-JP" sz="1100" b="0" i="0" u="none" strike="noStrike" kern="1200" cap="none" spc="0" normalizeH="0" baseline="0" noProof="0" dirty="0">
+                <a:ln>
+                  <a:noFill/>
+                </a:ln>
+                <a:solidFill>
+                  <a:prstClr val="black">
+                    <a:lumMod val="75000"/>
+                    <a:lumOff val="25000"/>
+                  </a:prstClr>
+                </a:solidFill>
+                <a:effectLst/>
+                <a:uLnTx/>
+                <a:uFillTx/>
+                <a:latin typeface="Century Gothic" panose="020B0502020202020204"/>
+                <a:ea typeface="メイリオ" panose="020B0604030504040204" pitchFamily="50" charset="-128"/>
+                <a:cs typeface="+mn-cs"/>
+              </a:rPr>
+              <a:t> (FT232R and so on. Need to support 5V.)</a:t>
+            </a:r>
+            <a:br>
+              <a:rPr kumimoji="1" lang="en-US" altLang="ja-JP" sz="1100" b="0" i="0" u="none" strike="noStrike" kern="1200" cap="none" spc="0" normalizeH="0" baseline="0" noProof="0" dirty="0">
+                <a:ln>
+                  <a:noFill/>
+                </a:ln>
+                <a:solidFill>
+                  <a:prstClr val="black">
+                    <a:lumMod val="75000"/>
+                    <a:lumOff val="25000"/>
+                  </a:prstClr>
+                </a:solidFill>
+                <a:effectLst/>
+                <a:uLnTx/>
+                <a:uFillTx/>
+                <a:latin typeface="Century Gothic" panose="020B0502020202020204"/>
+                <a:ea typeface="メイリオ" panose="020B0604030504040204" pitchFamily="50" charset="-128"/>
+                <a:cs typeface="+mn-cs"/>
+              </a:rPr>
+            </a:br>
+            <a:r>
+              <a:rPr kumimoji="1" lang="ja-JP" altLang="en-US" dirty="0"/>
+              <a:t>・</a:t>
+            </a:r>
+            <a:r>
+              <a:rPr lang="en-US" altLang="ja-JP" dirty="0"/>
+              <a:t>1x </a:t>
+            </a:r>
+            <a:r>
+              <a:rPr lang="en-US" altLang="ja-JP" u="sng" dirty="0"/>
+              <a:t>FLASH Cart for </a:t>
+            </a:r>
+            <a:r>
+              <a:rPr lang="en-US" altLang="ja-JP" u="sng" dirty="0" err="1"/>
+              <a:t>Famicom</a:t>
+            </a:r>
+            <a:r>
+              <a:rPr kumimoji="1" lang="en-US" altLang="ja-JP" dirty="0"/>
+              <a:t> and 1x </a:t>
+            </a:r>
+            <a:r>
+              <a:rPr lang="en-US" altLang="ja-JP" u="sng" dirty="0"/>
+              <a:t>D-SUB 15 pin female connector</a:t>
+            </a:r>
+            <a:r>
+              <a:rPr lang="en-US" altLang="ja-JP" b="1" u="sng" dirty="0"/>
+              <a:t> for FC</a:t>
+            </a:r>
+            <a:r>
+              <a:rPr lang="en-US" altLang="ja-JP" dirty="0"/>
+              <a:t> and </a:t>
+            </a:r>
+            <a:r>
+              <a:rPr lang="en-US" altLang="ja-JP" u="sng" dirty="0"/>
+              <a:t>DuPont wires</a:t>
+            </a:r>
+          </a:p>
+          <a:p>
+            <a:pPr marL="800100" lvl="1" indent="-342900">
+              <a:buFont typeface="+mj-lt"/>
+              <a:buAutoNum type="arabicPeriod"/>
+            </a:pPr>
+            <a:r>
+              <a:rPr lang="en-US" altLang="ja-JP" dirty="0"/>
+              <a:t>Solder like the following.</a:t>
+            </a:r>
+          </a:p>
+          <a:p>
+            <a:endParaRPr kumimoji="1" lang="en-US" altLang="ja-JP" dirty="0"/>
+          </a:p>
+          <a:p>
+            <a:pPr lvl="1"/>
+            <a:endParaRPr kumimoji="1" lang="en-US" altLang="ja-JP" dirty="0"/>
+          </a:p>
+          <a:p>
+            <a:pPr lvl="1"/>
+            <a:endParaRPr kumimoji="1" lang="ja-JP" altLang="en-US" dirty="0"/>
+          </a:p>
+        </p:txBody>
+      </p:sp>
+      <p:pic>
+        <p:nvPicPr>
+          <p:cNvPr id="30" name="図 29">
+            <a:extLst>
+              <a:ext uri="{FF2B5EF4-FFF2-40B4-BE49-F238E27FC236}">
+                <a16:creationId xmlns:a16="http://schemas.microsoft.com/office/drawing/2014/main" id="{E8655B84-9D0E-4CCA-A5F8-380720F5ECA5}"/>
+              </a:ext>
+            </a:extLst>
+          </p:cNvPr>
+          <p:cNvPicPr>
+            <a:picLocks noChangeAspect="1"/>
+          </p:cNvPicPr>
+          <p:nvPr/>
+        </p:nvPicPr>
+        <p:blipFill rotWithShape="1">
+          <a:blip r:embed="rId3">
+            <a:extLst>
+              <a:ext uri="{28A0092B-C50C-407E-A947-70E740481C1C}">
+                <a14:useLocalDpi xmlns:a14="http://schemas.microsoft.com/office/drawing/2010/main" val="0"/>
+              </a:ext>
+            </a:extLst>
+          </a:blip>
+          <a:srcRect t="-5290"/>
+          <a:stretch/>
+        </p:blipFill>
+        <p:spPr>
+          <a:xfrm>
+            <a:off x="3982174" y="4951642"/>
+            <a:ext cx="2892336" cy="1543849"/>
+          </a:xfrm>
+          <a:prstGeom prst="rect">
+            <a:avLst/>
+          </a:prstGeom>
+        </p:spPr>
+      </p:pic>
+      <p:grpSp>
+        <p:nvGrpSpPr>
+          <p:cNvPr id="14" name="グループ化 13">
+            <a:extLst>
+              <a:ext uri="{FF2B5EF4-FFF2-40B4-BE49-F238E27FC236}">
+                <a16:creationId xmlns:a16="http://schemas.microsoft.com/office/drawing/2014/main" id="{65F69EC0-07F2-4F12-A990-D976407F18FA}"/>
+              </a:ext>
+            </a:extLst>
+          </p:cNvPr>
+          <p:cNvGrpSpPr/>
+          <p:nvPr/>
+        </p:nvGrpSpPr>
+        <p:grpSpPr>
+          <a:xfrm>
+            <a:off x="7838509" y="4752044"/>
+            <a:ext cx="2659093" cy="2043975"/>
+            <a:chOff x="8285813" y="5095875"/>
+            <a:chExt cx="2211789" cy="1700144"/>
+          </a:xfrm>
+        </p:grpSpPr>
+        <p:pic>
+          <p:nvPicPr>
+            <p:cNvPr id="1026" name="Picture 2">
+              <a:extLst>
+                <a:ext uri="{FF2B5EF4-FFF2-40B4-BE49-F238E27FC236}">
+                  <a16:creationId xmlns:a16="http://schemas.microsoft.com/office/drawing/2014/main" id="{38ED3953-4909-4809-9702-181604DE98BA}"/>
+                </a:ext>
+              </a:extLst>
+            </p:cNvPr>
+            <p:cNvPicPr>
+              <a:picLocks noChangeAspect="1" noChangeArrowheads="1"/>
+            </p:cNvPicPr>
+            <p:nvPr/>
+          </p:nvPicPr>
+          <p:blipFill rotWithShape="1">
+            <a:blip r:embed="rId4">
+              <a:extLst>
+                <a:ext uri="{28A0092B-C50C-407E-A947-70E740481C1C}">
+                  <a14:useLocalDpi xmlns:a14="http://schemas.microsoft.com/office/drawing/2010/main" val="0"/>
+                </a:ext>
+              </a:extLst>
+            </a:blip>
+            <a:srcRect t="25408" b="38518"/>
+            <a:stretch/>
+          </p:blipFill>
+          <p:spPr bwMode="auto">
+            <a:xfrm>
+              <a:off x="8285813" y="5095875"/>
+              <a:ext cx="2211789" cy="815348"/>
+            </a:xfrm>
+            <a:prstGeom prst="rect">
+              <a:avLst/>
+            </a:prstGeom>
+            <a:noFill/>
+            <a:extLst>
+              <a:ext uri="{909E8E84-426E-40DD-AFC4-6F175D3DCCD1}">
+                <a14:hiddenFill xmlns:a14="http://schemas.microsoft.com/office/drawing/2010/main">
+                  <a:solidFill>
+                    <a:srgbClr val="FFFFFF"/>
+                  </a:solidFill>
+                </a14:hiddenFill>
+              </a:ext>
+            </a:extLst>
+          </p:spPr>
+        </p:pic>
+        <p:pic>
+          <p:nvPicPr>
+            <p:cNvPr id="11" name="Picture 2">
+              <a:extLst>
+                <a:ext uri="{FF2B5EF4-FFF2-40B4-BE49-F238E27FC236}">
+                  <a16:creationId xmlns:a16="http://schemas.microsoft.com/office/drawing/2014/main" id="{10A285EC-23D2-4F62-84A9-24AA31774A67}"/>
+                </a:ext>
+              </a:extLst>
+            </p:cNvPr>
+            <p:cNvPicPr>
+              <a:picLocks noChangeAspect="1" noChangeArrowheads="1"/>
+            </p:cNvPicPr>
+            <p:nvPr/>
+          </p:nvPicPr>
+          <p:blipFill rotWithShape="1">
+            <a:blip r:embed="rId4">
+              <a:extLst>
+                <a:ext uri="{28A0092B-C50C-407E-A947-70E740481C1C}">
+                  <a14:useLocalDpi xmlns:a14="http://schemas.microsoft.com/office/drawing/2010/main" val="0"/>
+                </a:ext>
+              </a:extLst>
+            </a:blip>
+            <a:srcRect t="25407" r="34715" b="-628"/>
+            <a:stretch/>
+          </p:blipFill>
+          <p:spPr bwMode="auto">
+            <a:xfrm>
+              <a:off x="8285813" y="5095875"/>
+              <a:ext cx="1443975" cy="1700144"/>
+            </a:xfrm>
+            <a:prstGeom prst="rect">
+              <a:avLst/>
+            </a:prstGeom>
+            <a:noFill/>
+            <a:extLst>
+              <a:ext uri="{909E8E84-426E-40DD-AFC4-6F175D3DCCD1}">
+                <a14:hiddenFill xmlns:a14="http://schemas.microsoft.com/office/drawing/2010/main">
+                  <a:solidFill>
+                    <a:srgbClr val="FFFFFF"/>
+                  </a:solidFill>
+                </a14:hiddenFill>
+              </a:ext>
+            </a:extLst>
+          </p:spPr>
+        </p:pic>
+      </p:grpSp>
+      <p:cxnSp>
+        <p:nvCxnSpPr>
+          <p:cNvPr id="43" name="コネクタ: カギ線 42">
+            <a:extLst>
+              <a:ext uri="{FF2B5EF4-FFF2-40B4-BE49-F238E27FC236}">
+                <a16:creationId xmlns:a16="http://schemas.microsoft.com/office/drawing/2014/main" id="{B558DB2F-F6F4-411D-90BA-64C83F873044}"/>
+              </a:ext>
+            </a:extLst>
+          </p:cNvPr>
+          <p:cNvCxnSpPr>
+            <a:cxnSpLocks/>
+          </p:cNvCxnSpPr>
+          <p:nvPr/>
+        </p:nvCxnSpPr>
+        <p:spPr>
+          <a:xfrm>
+            <a:off x="5567802" y="5762459"/>
+            <a:ext cx="2357438" cy="238232"/>
+          </a:xfrm>
+          <a:prstGeom prst="bentConnector3">
+            <a:avLst>
+              <a:gd name="adj1" fmla="val 707"/>
+            </a:avLst>
+          </a:prstGeom>
+          <a:ln>
+            <a:tailEnd type="triangle"/>
+          </a:ln>
+        </p:spPr>
+        <p:style>
+          <a:lnRef idx="3">
+            <a:schemeClr val="accent2"/>
+          </a:lnRef>
+          <a:fillRef idx="0">
+            <a:schemeClr val="accent2"/>
+          </a:fillRef>
+          <a:effectRef idx="2">
+            <a:schemeClr val="accent2"/>
+          </a:effectRef>
+          <a:fontRef idx="minor">
+            <a:schemeClr val="tx1"/>
+          </a:fontRef>
+        </p:style>
+      </p:cxnSp>
+      <p:sp>
+        <p:nvSpPr>
+          <p:cNvPr id="23" name="テキスト ボックス 22">
+            <a:extLst>
+              <a:ext uri="{FF2B5EF4-FFF2-40B4-BE49-F238E27FC236}">
+                <a16:creationId xmlns:a16="http://schemas.microsoft.com/office/drawing/2014/main" id="{8AB3B45F-5847-4257-97E5-E74FEE7EC93F}"/>
+              </a:ext>
+            </a:extLst>
+          </p:cNvPr>
+          <p:cNvSpPr txBox="1"/>
+          <p:nvPr/>
+        </p:nvSpPr>
+        <p:spPr>
+          <a:xfrm>
+            <a:off x="4995360" y="4643865"/>
+            <a:ext cx="1257098" cy="307777"/>
+          </a:xfrm>
+          <a:prstGeom prst="rect">
+            <a:avLst/>
+          </a:prstGeom>
+          <a:noFill/>
+        </p:spPr>
+        <p:txBody>
+          <a:bodyPr wrap="square">
+            <a:spAutoFit/>
+          </a:bodyPr>
+          <a:lstStyle/>
+          <a:p>
+            <a:r>
+              <a:rPr lang="en-US" altLang="ja-JP" sz="1400" dirty="0" err="1"/>
+              <a:t>Famicom</a:t>
+            </a:r>
+            <a:endParaRPr lang="en-US" altLang="ja-JP" sz="1400" i="1" dirty="0"/>
+          </a:p>
+        </p:txBody>
+      </p:sp>
+      <p:sp>
+        <p:nvSpPr>
+          <p:cNvPr id="27" name="テキスト ボックス 26">
+            <a:extLst>
+              <a:ext uri="{FF2B5EF4-FFF2-40B4-BE49-F238E27FC236}">
+                <a16:creationId xmlns:a16="http://schemas.microsoft.com/office/drawing/2014/main" id="{0DC80F62-61CC-494D-9703-3987DA145C58}"/>
+              </a:ext>
+            </a:extLst>
+          </p:cNvPr>
+          <p:cNvSpPr txBox="1"/>
+          <p:nvPr/>
+        </p:nvSpPr>
+        <p:spPr>
+          <a:xfrm>
+            <a:off x="8325021" y="4340455"/>
+            <a:ext cx="2538510" cy="369332"/>
+          </a:xfrm>
+          <a:prstGeom prst="rect">
+            <a:avLst/>
+          </a:prstGeom>
+          <a:noFill/>
+        </p:spPr>
+        <p:txBody>
+          <a:bodyPr wrap="square">
+            <a:spAutoFit/>
+          </a:bodyPr>
+          <a:lstStyle/>
+          <a:p>
+            <a:r>
+              <a:rPr kumimoji="1" lang="en-US" altLang="ja-JP" dirty="0"/>
+              <a:t>Any </a:t>
+            </a:r>
+            <a:r>
+              <a:rPr lang="en-US" altLang="ja-JP" dirty="0"/>
+              <a:t>FTDI2XX </a:t>
+            </a:r>
+            <a:r>
+              <a:rPr kumimoji="1" lang="en-US" altLang="ja-JP" dirty="0"/>
+              <a:t> dongle</a:t>
+            </a:r>
+            <a:endParaRPr lang="ja-JP" altLang="en-US" dirty="0"/>
+          </a:p>
+        </p:txBody>
+      </p:sp>
+      <p:cxnSp>
+        <p:nvCxnSpPr>
+          <p:cNvPr id="6" name="コネクタ: カギ線 5">
+            <a:extLst>
+              <a:ext uri="{FF2B5EF4-FFF2-40B4-BE49-F238E27FC236}">
+                <a16:creationId xmlns:a16="http://schemas.microsoft.com/office/drawing/2014/main" id="{D6780EF1-45A8-4F9A-A35C-EC334491EA20}"/>
+              </a:ext>
+            </a:extLst>
+          </p:cNvPr>
+          <p:cNvCxnSpPr>
+            <a:cxnSpLocks/>
+          </p:cNvCxnSpPr>
+          <p:nvPr/>
+        </p:nvCxnSpPr>
+        <p:spPr>
+          <a:xfrm flipV="1">
+            <a:off x="5772150" y="5108038"/>
+            <a:ext cx="2140969" cy="530553"/>
+          </a:xfrm>
+          <a:prstGeom prst="bentConnector3">
+            <a:avLst>
+              <a:gd name="adj1" fmla="val 172"/>
+            </a:avLst>
+          </a:prstGeom>
+          <a:ln>
+            <a:tailEnd type="triangle"/>
+          </a:ln>
+        </p:spPr>
+        <p:style>
+          <a:lnRef idx="3">
+            <a:schemeClr val="accent1"/>
+          </a:lnRef>
+          <a:fillRef idx="0">
+            <a:schemeClr val="accent1"/>
+          </a:fillRef>
+          <a:effectRef idx="2">
+            <a:schemeClr val="accent1"/>
+          </a:effectRef>
+          <a:fontRef idx="minor">
+            <a:schemeClr val="tx1"/>
+          </a:fontRef>
+        </p:style>
+      </p:cxnSp>
+      <p:cxnSp>
+        <p:nvCxnSpPr>
+          <p:cNvPr id="28" name="コネクタ: カギ線 27">
+            <a:extLst>
+              <a:ext uri="{FF2B5EF4-FFF2-40B4-BE49-F238E27FC236}">
+                <a16:creationId xmlns:a16="http://schemas.microsoft.com/office/drawing/2014/main" id="{ECD35D9C-0590-4FE0-9345-4D16684A3D69}"/>
+              </a:ext>
+            </a:extLst>
+          </p:cNvPr>
+          <p:cNvCxnSpPr>
+            <a:cxnSpLocks/>
+          </p:cNvCxnSpPr>
+          <p:nvPr/>
+        </p:nvCxnSpPr>
+        <p:spPr>
+          <a:xfrm flipV="1">
+            <a:off x="5641406" y="5191126"/>
+            <a:ext cx="2271713" cy="406883"/>
+          </a:xfrm>
+          <a:prstGeom prst="bentConnector3">
+            <a:avLst>
+              <a:gd name="adj1" fmla="val 314"/>
+            </a:avLst>
+          </a:prstGeom>
+          <a:ln>
+            <a:tailEnd type="triangle"/>
+          </a:ln>
+        </p:spPr>
+        <p:style>
+          <a:lnRef idx="3">
+            <a:schemeClr val="accent1"/>
+          </a:lnRef>
+          <a:fillRef idx="0">
+            <a:schemeClr val="accent1"/>
+          </a:fillRef>
+          <a:effectRef idx="2">
+            <a:schemeClr val="accent1"/>
+          </a:effectRef>
+          <a:fontRef idx="minor">
+            <a:schemeClr val="tx1"/>
+          </a:fontRef>
+        </p:style>
+      </p:cxnSp>
+      <p:cxnSp>
+        <p:nvCxnSpPr>
+          <p:cNvPr id="29" name="コネクタ: カギ線 28">
+            <a:extLst>
+              <a:ext uri="{FF2B5EF4-FFF2-40B4-BE49-F238E27FC236}">
+                <a16:creationId xmlns:a16="http://schemas.microsoft.com/office/drawing/2014/main" id="{7FC669E4-ACA1-45B6-98A6-E189DDF7CB20}"/>
+              </a:ext>
+            </a:extLst>
+          </p:cNvPr>
+          <p:cNvCxnSpPr>
+            <a:cxnSpLocks/>
+          </p:cNvCxnSpPr>
+          <p:nvPr/>
+        </p:nvCxnSpPr>
+        <p:spPr>
+          <a:xfrm flipV="1">
+            <a:off x="5505450" y="5272807"/>
+            <a:ext cx="2407669" cy="300016"/>
+          </a:xfrm>
+          <a:prstGeom prst="bentConnector3">
+            <a:avLst>
+              <a:gd name="adj1" fmla="val 351"/>
+            </a:avLst>
+          </a:prstGeom>
+          <a:ln>
+            <a:tailEnd type="triangle"/>
+          </a:ln>
+        </p:spPr>
+        <p:style>
+          <a:lnRef idx="3">
+            <a:schemeClr val="accent1"/>
+          </a:lnRef>
+          <a:fillRef idx="0">
+            <a:schemeClr val="accent1"/>
+          </a:fillRef>
+          <a:effectRef idx="2">
+            <a:schemeClr val="accent1"/>
+          </a:effectRef>
+          <a:fontRef idx="minor">
+            <a:schemeClr val="tx1"/>
+          </a:fontRef>
+        </p:style>
+      </p:cxnSp>
+      <p:cxnSp>
+        <p:nvCxnSpPr>
+          <p:cNvPr id="35" name="コネクタ: カギ線 34">
+            <a:extLst>
+              <a:ext uri="{FF2B5EF4-FFF2-40B4-BE49-F238E27FC236}">
+                <a16:creationId xmlns:a16="http://schemas.microsoft.com/office/drawing/2014/main" id="{A163A346-7AF2-46B6-871D-48F4A857B741}"/>
+              </a:ext>
+            </a:extLst>
+          </p:cNvPr>
+          <p:cNvCxnSpPr>
+            <a:cxnSpLocks/>
+          </p:cNvCxnSpPr>
+          <p:nvPr/>
+        </p:nvCxnSpPr>
+        <p:spPr>
+          <a:xfrm flipV="1">
+            <a:off x="5404563" y="5341143"/>
+            <a:ext cx="2504685" cy="201697"/>
+          </a:xfrm>
+          <a:prstGeom prst="bentConnector3">
+            <a:avLst>
+              <a:gd name="adj1" fmla="val -198"/>
+            </a:avLst>
+          </a:prstGeom>
+          <a:ln>
+            <a:tailEnd type="triangle"/>
+          </a:ln>
+        </p:spPr>
+        <p:style>
+          <a:lnRef idx="3">
+            <a:schemeClr val="accent1"/>
+          </a:lnRef>
+          <a:fillRef idx="0">
+            <a:schemeClr val="accent1"/>
+          </a:fillRef>
+          <a:effectRef idx="2">
+            <a:schemeClr val="accent1"/>
+          </a:effectRef>
+          <a:fontRef idx="minor">
+            <a:schemeClr val="tx1"/>
+          </a:fontRef>
+        </p:style>
+      </p:cxnSp>
+      <p:cxnSp>
+        <p:nvCxnSpPr>
+          <p:cNvPr id="40" name="コネクタ: カギ線 39">
+            <a:extLst>
+              <a:ext uri="{FF2B5EF4-FFF2-40B4-BE49-F238E27FC236}">
+                <a16:creationId xmlns:a16="http://schemas.microsoft.com/office/drawing/2014/main" id="{3B48CAA6-B742-40C5-BB4D-0C3B0B82BCC4}"/>
+              </a:ext>
+            </a:extLst>
+          </p:cNvPr>
+          <p:cNvCxnSpPr>
+            <a:cxnSpLocks/>
+          </p:cNvCxnSpPr>
+          <p:nvPr/>
+        </p:nvCxnSpPr>
+        <p:spPr>
+          <a:xfrm flipV="1">
+            <a:off x="4995360" y="5029202"/>
+            <a:ext cx="2919915" cy="440282"/>
+          </a:xfrm>
+          <a:prstGeom prst="bentConnector3">
+            <a:avLst>
+              <a:gd name="adj1" fmla="val 416"/>
+            </a:avLst>
+          </a:prstGeom>
+          <a:ln>
+            <a:solidFill>
+              <a:schemeClr val="bg1">
+                <a:lumMod val="50000"/>
+              </a:schemeClr>
+            </a:solidFill>
+            <a:tailEnd type="triangle"/>
+          </a:ln>
+        </p:spPr>
+        <p:style>
+          <a:lnRef idx="3">
+            <a:schemeClr val="dk1"/>
+          </a:lnRef>
+          <a:fillRef idx="0">
+            <a:schemeClr val="dk1"/>
+          </a:fillRef>
+          <a:effectRef idx="2">
+            <a:schemeClr val="dk1"/>
+          </a:effectRef>
+          <a:fontRef idx="minor">
+            <a:schemeClr val="tx1"/>
+          </a:fontRef>
+        </p:style>
+      </p:cxnSp>
+      <p:sp>
+        <p:nvSpPr>
+          <p:cNvPr id="49" name="テキスト ボックス 48">
+            <a:extLst>
+              <a:ext uri="{FF2B5EF4-FFF2-40B4-BE49-F238E27FC236}">
+                <a16:creationId xmlns:a16="http://schemas.microsoft.com/office/drawing/2014/main" id="{849A3F92-C977-45B7-A4F0-119EE9E460DC}"/>
+              </a:ext>
+            </a:extLst>
+          </p:cNvPr>
+          <p:cNvSpPr txBox="1"/>
+          <p:nvPr/>
+        </p:nvSpPr>
+        <p:spPr>
+          <a:xfrm>
+            <a:off x="7880507" y="5890984"/>
+            <a:ext cx="485830" cy="200055"/>
+          </a:xfrm>
+          <a:prstGeom prst="rect">
+            <a:avLst/>
+          </a:prstGeom>
+          <a:noFill/>
+        </p:spPr>
+        <p:txBody>
+          <a:bodyPr wrap="square">
+            <a:spAutoFit/>
+          </a:bodyPr>
+          <a:lstStyle/>
+          <a:p>
+            <a:r>
+              <a:rPr kumimoji="1" lang="en-US" altLang="ja-JP" sz="700" b="1" dirty="0">
+                <a:solidFill>
+                  <a:srgbClr val="0070C0"/>
+                </a:solidFill>
+              </a:rPr>
+              <a:t>DTR</a:t>
+            </a:r>
+          </a:p>
+        </p:txBody>
+      </p:sp>
+      <p:cxnSp>
+        <p:nvCxnSpPr>
+          <p:cNvPr id="73" name="コネクタ: カギ線 72">
+            <a:extLst>
+              <a:ext uri="{FF2B5EF4-FFF2-40B4-BE49-F238E27FC236}">
+                <a16:creationId xmlns:a16="http://schemas.microsoft.com/office/drawing/2014/main" id="{233B3B99-A2CF-4E26-9083-7BCCDF146450}"/>
+              </a:ext>
+            </a:extLst>
+          </p:cNvPr>
+          <p:cNvCxnSpPr>
+            <a:cxnSpLocks/>
+          </p:cNvCxnSpPr>
+          <p:nvPr/>
+        </p:nvCxnSpPr>
+        <p:spPr>
+          <a:xfrm rot="10800000" flipV="1">
+            <a:off x="8173677" y="5610224"/>
+            <a:ext cx="895755" cy="380635"/>
+          </a:xfrm>
+          <a:prstGeom prst="bentConnector3">
+            <a:avLst>
+              <a:gd name="adj1" fmla="val 50000"/>
+            </a:avLst>
+          </a:prstGeom>
+          <a:ln>
+            <a:tailEnd type="triangle"/>
+          </a:ln>
+        </p:spPr>
+        <p:style>
+          <a:lnRef idx="3">
+            <a:schemeClr val="accent2"/>
+          </a:lnRef>
+          <a:fillRef idx="0">
+            <a:schemeClr val="accent2"/>
+          </a:fillRef>
+          <a:effectRef idx="2">
+            <a:schemeClr val="accent2"/>
+          </a:effectRef>
+          <a:fontRef idx="minor">
+            <a:schemeClr val="tx1"/>
+          </a:fontRef>
+        </p:style>
+      </p:cxnSp>
+      <p:cxnSp>
+        <p:nvCxnSpPr>
+          <p:cNvPr id="65" name="直線コネクタ 64">
+            <a:extLst>
+              <a:ext uri="{FF2B5EF4-FFF2-40B4-BE49-F238E27FC236}">
+                <a16:creationId xmlns:a16="http://schemas.microsoft.com/office/drawing/2014/main" id="{381AA494-82D4-469C-A4B2-B74438AC6A95}"/>
+              </a:ext>
+            </a:extLst>
+          </p:cNvPr>
+          <p:cNvCxnSpPr/>
+          <p:nvPr/>
+        </p:nvCxnSpPr>
+        <p:spPr>
+          <a:xfrm>
+            <a:off x="9069431" y="5413023"/>
+            <a:ext cx="0" cy="203865"/>
+          </a:xfrm>
+          <a:prstGeom prst="line">
+            <a:avLst/>
+          </a:prstGeom>
+        </p:spPr>
+        <p:style>
+          <a:lnRef idx="3">
+            <a:schemeClr val="accent2"/>
+          </a:lnRef>
+          <a:fillRef idx="0">
+            <a:schemeClr val="accent2"/>
+          </a:fillRef>
+          <a:effectRef idx="2">
+            <a:schemeClr val="accent2"/>
+          </a:effectRef>
+          <a:fontRef idx="minor">
+            <a:schemeClr val="tx1"/>
+          </a:fontRef>
+        </p:style>
+      </p:cxnSp>
+      <p:sp>
+        <p:nvSpPr>
+          <p:cNvPr id="4" name="スライド番号プレースホルダー 3">
+            <a:extLst>
+              <a:ext uri="{FF2B5EF4-FFF2-40B4-BE49-F238E27FC236}">
+                <a16:creationId xmlns:a16="http://schemas.microsoft.com/office/drawing/2014/main" id="{BF95FE20-D6A5-4D5C-AC74-533156036244}"/>
+              </a:ext>
+            </a:extLst>
+          </p:cNvPr>
+          <p:cNvSpPr>
+            <a:spLocks noGrp="1"/>
+          </p:cNvSpPr>
+          <p:nvPr>
+            <p:ph type="sldNum" sz="quarter" idx="12"/>
+          </p:nvPr>
+        </p:nvSpPr>
+        <p:spPr/>
+        <p:txBody>
+          <a:bodyPr/>
+          <a:lstStyle/>
+          <a:p>
+            <a:fld id="{E27E2812-4560-4165-A7C7-9C013F955547}" type="slidenum">
+              <a:rPr kumimoji="1" lang="ja-JP" altLang="en-US" smtClean="0"/>
+              <a:t>16</a:t>
+            </a:fld>
+            <a:endParaRPr kumimoji="1" lang="ja-JP" altLang="en-US"/>
+          </a:p>
+        </p:txBody>
+      </p:sp>
+      <p:pic>
+        <p:nvPicPr>
+          <p:cNvPr id="26" name="図 25">
+            <a:extLst>
+              <a:ext uri="{FF2B5EF4-FFF2-40B4-BE49-F238E27FC236}">
+                <a16:creationId xmlns:a16="http://schemas.microsoft.com/office/drawing/2014/main" id="{6B22E47E-A278-4B93-BBED-4448024C894E}"/>
+              </a:ext>
+            </a:extLst>
+          </p:cNvPr>
+          <p:cNvPicPr>
+            <a:picLocks noChangeAspect="1"/>
+          </p:cNvPicPr>
+          <p:nvPr/>
+        </p:nvPicPr>
+        <p:blipFill>
+          <a:blip r:embed="rId5">
+            <a:extLst>
+              <a:ext uri="{BEBA8EAE-BF5A-486C-A8C5-ECC9F3942E4B}">
+                <a14:imgProps xmlns:a14="http://schemas.microsoft.com/office/drawing/2010/main">
+                  <a14:imgLayer r:embed="rId6">
+                    <a14:imgEffect>
+                      <a14:backgroundRemoval t="9942" b="89474" l="7310" r="92690">
+                        <a14:foregroundMark x1="75146" y1="29240" x2="40643" y2="53216"/>
+                        <a14:foregroundMark x1="27778" y1="55263" x2="47076" y2="66374"/>
+                        <a14:foregroundMark x1="38304" y1="46491" x2="42690" y2="59942"/>
+                        <a14:foregroundMark x1="25439" y1="57018" x2="21930" y2="69591"/>
+                        <a14:foregroundMark x1="7310" y1="67836" x2="12865" y2="73684"/>
+                        <a14:foregroundMark x1="24561" y1="76316" x2="33626" y2="84211"/>
+                        <a14:foregroundMark x1="20468" y1="79240" x2="29825" y2="86257"/>
+                        <a14:foregroundMark x1="92690" y1="31579" x2="82164" y2="30994"/>
+                      </a14:backgroundRemoval>
+                    </a14:imgEffect>
+                  </a14:imgLayer>
+                </a14:imgProps>
+              </a:ext>
+              <a:ext uri="{28A0092B-C50C-407E-A947-70E740481C1C}">
+                <a14:useLocalDpi xmlns:a14="http://schemas.microsoft.com/office/drawing/2010/main" val="0"/>
+              </a:ext>
+            </a:extLst>
+          </a:blip>
+          <a:stretch>
+            <a:fillRect/>
+          </a:stretch>
+        </p:blipFill>
+        <p:spPr>
+          <a:xfrm>
+            <a:off x="7797604" y="6080329"/>
+            <a:ext cx="752144" cy="752144"/>
+          </a:xfrm>
+          <a:prstGeom prst="rect">
+            <a:avLst/>
+          </a:prstGeom>
+        </p:spPr>
+      </p:pic>
+      <p:cxnSp>
+        <p:nvCxnSpPr>
+          <p:cNvPr id="21" name="コネクタ: カギ線 20">
+            <a:extLst>
+              <a:ext uri="{FF2B5EF4-FFF2-40B4-BE49-F238E27FC236}">
+                <a16:creationId xmlns:a16="http://schemas.microsoft.com/office/drawing/2014/main" id="{05AA11AF-3C7A-4BDB-91AA-1287232AAC21}"/>
+              </a:ext>
+            </a:extLst>
+          </p:cNvPr>
+          <p:cNvCxnSpPr>
+            <a:cxnSpLocks/>
+          </p:cNvCxnSpPr>
+          <p:nvPr/>
+        </p:nvCxnSpPr>
+        <p:spPr>
+          <a:xfrm rot="10800000">
+            <a:off x="3763826" y="5275375"/>
+            <a:ext cx="1365396" cy="226884"/>
+          </a:xfrm>
+          <a:prstGeom prst="bentConnector3">
+            <a:avLst>
+              <a:gd name="adj1" fmla="val -925"/>
+            </a:avLst>
+          </a:prstGeom>
+          <a:ln>
+            <a:tailEnd type="triangle"/>
+          </a:ln>
+        </p:spPr>
+        <p:style>
+          <a:lnRef idx="3">
+            <a:schemeClr val="accent1"/>
+          </a:lnRef>
+          <a:fillRef idx="0">
+            <a:schemeClr val="accent1"/>
+          </a:fillRef>
+          <a:effectRef idx="2">
+            <a:schemeClr val="accent1"/>
+          </a:effectRef>
+          <a:fontRef idx="minor">
+            <a:schemeClr val="tx1"/>
+          </a:fontRef>
+        </p:style>
+      </p:cxnSp>
+      <p:sp>
+        <p:nvSpPr>
+          <p:cNvPr id="24" name="テキスト ボックス 23">
+            <a:extLst>
+              <a:ext uri="{FF2B5EF4-FFF2-40B4-BE49-F238E27FC236}">
+                <a16:creationId xmlns:a16="http://schemas.microsoft.com/office/drawing/2014/main" id="{1EFF7056-CBDA-4D0A-94E0-0C8578A81973}"/>
+              </a:ext>
+            </a:extLst>
+          </p:cNvPr>
+          <p:cNvSpPr txBox="1"/>
+          <p:nvPr/>
+        </p:nvSpPr>
+        <p:spPr>
+          <a:xfrm>
+            <a:off x="2940760" y="5115371"/>
+            <a:ext cx="1257098" cy="523220"/>
+          </a:xfrm>
+          <a:prstGeom prst="rect">
+            <a:avLst/>
+          </a:prstGeom>
+          <a:noFill/>
+        </p:spPr>
+        <p:txBody>
+          <a:bodyPr wrap="square">
+            <a:spAutoFit/>
+          </a:bodyPr>
+          <a:lstStyle/>
+          <a:p>
+            <a:r>
+              <a:rPr lang="en-US" altLang="ja-JP" sz="1400" dirty="0"/>
+              <a:t>Audio</a:t>
+            </a:r>
+          </a:p>
+          <a:p>
+            <a:r>
+              <a:rPr lang="en-US" altLang="ja-JP" sz="1400" dirty="0"/>
+              <a:t>(Optional)</a:t>
+            </a:r>
+            <a:endParaRPr lang="en-US" altLang="ja-JP" sz="1400" i="1" dirty="0"/>
+          </a:p>
+        </p:txBody>
+      </p:sp>
+    </p:spTree>
+    <p:extLst>
+      <p:ext uri="{BB962C8B-B14F-4D97-AF65-F5344CB8AC3E}">
+        <p14:creationId xmlns:p14="http://schemas.microsoft.com/office/powerpoint/2010/main" val="3656985902"/>
       </p:ext>
     </p:extLst>
   </p:cSld>
@@ -13127,7 +13988,7 @@
           <p:cNvPr id="2" name="タイトル 1">
             <a:extLst>
               <a:ext uri="{FF2B5EF4-FFF2-40B4-BE49-F238E27FC236}">
-                <a16:creationId xmlns:a16="http://schemas.microsoft.com/office/drawing/2014/main" id="{45F6BDA5-EAAF-47BF-BA28-5541807FE9EF}"/>
+                <a16:creationId xmlns:a16="http://schemas.microsoft.com/office/drawing/2014/main" id="{DF515C61-C958-43BC-BAFF-3C6346E55E36}"/>
               </a:ext>
             </a:extLst>
           </p:cNvPr>
@@ -13144,23 +14005,221 @@
           <a:lstStyle/>
           <a:p>
             <a:r>
+              <a:rPr kumimoji="1" lang="en-US" altLang="ja-JP" dirty="0"/>
+              <a:t>VGM Sound Interface(VSIF)</a:t>
+            </a:r>
+            <a:br>
+              <a:rPr kumimoji="1" lang="en-US" altLang="ja-JP" dirty="0"/>
+            </a:br>
+            <a:r>
+              <a:rPr kumimoji="1" lang="en-US" altLang="ja-JP" dirty="0"/>
+              <a:t>Settings</a:t>
+            </a:r>
+            <a:endParaRPr kumimoji="1" lang="ja-JP" altLang="en-US" dirty="0"/>
+          </a:p>
+        </p:txBody>
+      </p:sp>
+      <p:sp>
+        <p:nvSpPr>
+          <p:cNvPr id="3" name="コンテンツ プレースホルダー 2">
+            <a:extLst>
+              <a:ext uri="{FF2B5EF4-FFF2-40B4-BE49-F238E27FC236}">
+                <a16:creationId xmlns:a16="http://schemas.microsoft.com/office/drawing/2014/main" id="{CD745FAA-4C55-4719-9696-912443FC8E21}"/>
+              </a:ext>
+            </a:extLst>
+          </p:cNvPr>
+          <p:cNvSpPr>
+            <a:spLocks noGrp="1"/>
+          </p:cNvSpPr>
+          <p:nvPr>
+            <p:ph idx="1"/>
+          </p:nvPr>
+        </p:nvSpPr>
+        <p:spPr>
+          <a:xfrm>
+            <a:off x="2589212" y="2133600"/>
+            <a:ext cx="9602788" cy="3777622"/>
+          </a:xfrm>
+        </p:spPr>
+        <p:txBody>
+          <a:bodyPr>
+            <a:normAutofit/>
+          </a:bodyPr>
+          <a:lstStyle/>
+          <a:p>
+            <a:pPr>
+              <a:buFont typeface="+mj-lt"/>
+              <a:buAutoNum type="arabicPeriod" startAt="3"/>
+            </a:pPr>
+            <a:r>
+              <a:rPr kumimoji="1" lang="en-US" altLang="ja-JP" dirty="0"/>
+              <a:t>Burn </a:t>
+            </a:r>
+            <a:r>
               <a:rPr kumimoji="1" lang="en-US" altLang="ja-JP" dirty="0" err="1"/>
-              <a:t>VGMP</a:t>
+              <a:t>VGMPlay_md.bin</a:t>
+            </a:r>
+            <a:r>
+              <a:rPr kumimoji="1" lang="en-US" altLang="ja-JP" dirty="0"/>
+              <a:t>(for Genesis) or </a:t>
+            </a:r>
+            <a:r>
+              <a:rPr kumimoji="1" lang="en-US" altLang="ja-JP" dirty="0" err="1"/>
+              <a:t>VGMPlay_sms.sms</a:t>
+            </a:r>
+            <a:r>
+              <a:rPr kumimoji="1" lang="en-US" altLang="ja-JP" dirty="0"/>
+              <a:t>(for SMS) or </a:t>
+            </a:r>
+            <a:r>
+              <a:rPr kumimoji="1" lang="en-US" altLang="ja-JP" dirty="0" err="1"/>
+              <a:t>VGMPlay_nes.nes</a:t>
+            </a:r>
+            <a:r>
+              <a:rPr kumimoji="1" lang="en-US" altLang="ja-JP" dirty="0"/>
+              <a:t> (for </a:t>
+            </a:r>
+            <a:r>
+              <a:rPr kumimoji="1" lang="en-US" altLang="ja-JP" dirty="0" err="1"/>
+              <a:t>Famicom</a:t>
+            </a:r>
+            <a:r>
+              <a:rPr kumimoji="1" lang="en-US" altLang="ja-JP" dirty="0"/>
+              <a:t>) to your FLASH Cart</a:t>
+            </a:r>
+          </a:p>
+          <a:p>
+            <a:pPr>
+              <a:buFont typeface="+mj-lt"/>
+              <a:buAutoNum type="arabicPeriod" startAt="3"/>
+            </a:pPr>
+            <a:r>
+              <a:rPr kumimoji="1" lang="en-US" altLang="ja-JP" dirty="0"/>
+              <a:t>Set the </a:t>
+            </a:r>
+            <a:r>
+              <a:rPr kumimoji="1" lang="en-US" altLang="ja-JP" dirty="0" err="1"/>
+              <a:t>COMPort</a:t>
+            </a:r>
+            <a:r>
+              <a:rPr kumimoji="1" lang="en-US" altLang="ja-JP" dirty="0"/>
+              <a:t> name and select “VSIF ***” you wish.</a:t>
+            </a:r>
+          </a:p>
+          <a:p>
+            <a:pPr>
+              <a:buFont typeface="+mj-lt"/>
+              <a:buAutoNum type="arabicPeriod" startAt="3"/>
+            </a:pPr>
+            <a:endParaRPr lang="en-US" altLang="ja-JP" dirty="0"/>
+          </a:p>
+          <a:p>
+            <a:pPr>
+              <a:buFont typeface="+mj-lt"/>
+              <a:buAutoNum type="arabicPeriod" startAt="3"/>
+            </a:pPr>
+            <a:endParaRPr kumimoji="1" lang="en-US" altLang="ja-JP" dirty="0"/>
+          </a:p>
+          <a:p>
+            <a:pPr>
+              <a:buFont typeface="+mj-lt"/>
+              <a:buAutoNum type="arabicPeriod" startAt="3"/>
+            </a:pPr>
+            <a:endParaRPr lang="en-US" altLang="ja-JP" dirty="0"/>
+          </a:p>
+          <a:p>
+            <a:pPr>
+              <a:buFont typeface="+mj-lt"/>
+              <a:buAutoNum type="arabicPeriod" startAt="3"/>
+            </a:pPr>
+            <a:endParaRPr kumimoji="1" lang="en-US" altLang="ja-JP" dirty="0"/>
+          </a:p>
+          <a:p>
+            <a:pPr>
+              <a:buFont typeface="+mj-lt"/>
+              <a:buAutoNum type="arabicPeriod" startAt="3"/>
+            </a:pPr>
+            <a:r>
+              <a:rPr lang="en-US" altLang="ja-JP" dirty="0"/>
+              <a:t>Done!</a:t>
+            </a:r>
+          </a:p>
+          <a:p>
+            <a:pPr>
+              <a:buFont typeface="+mj-lt"/>
+              <a:buAutoNum type="arabicPeriod" startAt="3"/>
+            </a:pPr>
+            <a:r>
+              <a:rPr kumimoji="1" lang="en-US" altLang="ja-JP" dirty="0"/>
+              <a:t>I</a:t>
+            </a:r>
+            <a:r>
+              <a:rPr lang="en-US" altLang="ja-JP" dirty="0"/>
+              <a:t>f you can not sound sounds, make sure soldering</a:t>
+            </a:r>
+            <a:r>
+              <a:rPr lang="ja-JP" altLang="en-US" dirty="0"/>
+              <a:t> </a:t>
+            </a:r>
+            <a:r>
+              <a:rPr lang="en-US" altLang="ja-JP" dirty="0"/>
+              <a:t>and </a:t>
             </a:r>
             <a:r>
               <a:rPr lang="en-US" altLang="ja-JP" dirty="0" err="1"/>
-              <a:t>layer</a:t>
+              <a:t>COMPort</a:t>
+            </a:r>
+            <a:r>
+              <a:rPr lang="en-US" altLang="ja-JP" dirty="0"/>
+              <a:t> name.</a:t>
+            </a:r>
+            <a:br>
+              <a:rPr lang="en-US" altLang="ja-JP" dirty="0"/>
+            </a:br>
+            <a:r>
+              <a:rPr lang="en-US" altLang="ja-JP" dirty="0"/>
+              <a:t>Or, please contact me.</a:t>
             </a:r>
             <a:endParaRPr kumimoji="1" lang="ja-JP" altLang="en-US" dirty="0"/>
           </a:p>
         </p:txBody>
       </p:sp>
+      <p:pic>
+        <p:nvPicPr>
+          <p:cNvPr id="6" name="図 5">
+            <a:extLst>
+              <a:ext uri="{FF2B5EF4-FFF2-40B4-BE49-F238E27FC236}">
+                <a16:creationId xmlns:a16="http://schemas.microsoft.com/office/drawing/2014/main" id="{A2E081AD-DB5B-41BB-9A52-55D69078DEAF}"/>
+              </a:ext>
+            </a:extLst>
+          </p:cNvPr>
+          <p:cNvPicPr>
+            <a:picLocks noChangeAspect="1"/>
+          </p:cNvPicPr>
+          <p:nvPr/>
+        </p:nvPicPr>
+        <p:blipFill>
+          <a:blip r:embed="rId3"/>
+          <a:stretch>
+            <a:fillRect/>
+          </a:stretch>
+        </p:blipFill>
+        <p:spPr>
+          <a:xfrm>
+            <a:off x="3728707" y="3430800"/>
+            <a:ext cx="4734586" cy="1105054"/>
+          </a:xfrm>
+          <a:prstGeom prst="rect">
+            <a:avLst/>
+          </a:prstGeom>
+        </p:spPr>
+      </p:pic>
       <p:sp>
         <p:nvSpPr>
           <p:cNvPr id="4" name="スライド番号プレースホルダー 3">
             <a:extLst>
               <a:ext uri="{FF2B5EF4-FFF2-40B4-BE49-F238E27FC236}">
-                <a16:creationId xmlns:a16="http://schemas.microsoft.com/office/drawing/2014/main" id="{F3E89AAB-4727-42E3-A2B2-F5E25345DCC6}"/>
+                <a16:creationId xmlns:a16="http://schemas.microsoft.com/office/drawing/2014/main" id="{455F9055-FE97-49E6-B05C-BBC13F55BB4C}"/>
               </a:ext>
             </a:extLst>
           </p:cNvPr>
@@ -13184,394 +14243,69 @@
           </a:p>
         </p:txBody>
       </p:sp>
-      <p:pic>
-        <p:nvPicPr>
-          <p:cNvPr id="8" name="図 7">
-            <a:extLst>
-              <a:ext uri="{FF2B5EF4-FFF2-40B4-BE49-F238E27FC236}">
-                <a16:creationId xmlns:a16="http://schemas.microsoft.com/office/drawing/2014/main" id="{0EDBB92D-1466-4E68-9949-79578CDDF792}"/>
-              </a:ext>
-            </a:extLst>
-          </p:cNvPr>
-          <p:cNvPicPr>
-            <a:picLocks noChangeAspect="1"/>
-          </p:cNvPicPr>
+      <p:sp>
+        <p:nvSpPr>
+          <p:cNvPr id="7" name="テキスト ボックス 6">
+            <a:extLst>
+              <a:ext uri="{FF2B5EF4-FFF2-40B4-BE49-F238E27FC236}">
+                <a16:creationId xmlns:a16="http://schemas.microsoft.com/office/drawing/2014/main" id="{79481DCC-C69C-4094-8F11-85281F2345A8}"/>
+              </a:ext>
+            </a:extLst>
+          </p:cNvPr>
+          <p:cNvSpPr txBox="1"/>
           <p:nvPr/>
-        </p:nvPicPr>
-        <p:blipFill>
-          <a:blip r:embed="rId2"/>
-          <a:stretch>
-            <a:fillRect/>
-          </a:stretch>
-        </p:blipFill>
+        </p:nvSpPr>
         <p:spPr>
           <a:xfrm>
-            <a:off x="3931301" y="2601704"/>
-            <a:ext cx="5553693" cy="3852435"/>
+            <a:off x="3045229" y="5952574"/>
+            <a:ext cx="6101542" cy="584775"/>
           </a:xfrm>
           <a:prstGeom prst="rect">
             <a:avLst/>
           </a:prstGeom>
-        </p:spPr>
-      </p:pic>
-      <p:sp>
-        <p:nvSpPr>
-          <p:cNvPr id="9" name="吹き出し: 四角形 8">
-            <a:extLst>
-              <a:ext uri="{FF2B5EF4-FFF2-40B4-BE49-F238E27FC236}">
-                <a16:creationId xmlns:a16="http://schemas.microsoft.com/office/drawing/2014/main" id="{3390D222-80C8-496D-BD12-26C7BE6A7BCC}"/>
-              </a:ext>
-            </a:extLst>
-          </p:cNvPr>
-          <p:cNvSpPr/>
-          <p:nvPr/>
-        </p:nvSpPr>
-        <p:spPr>
-          <a:xfrm>
-            <a:off x="531812" y="1592922"/>
-            <a:ext cx="2944468" cy="1836078"/>
-          </a:xfrm>
-          <a:prstGeom prst="wedgeRectCallout">
-            <a:avLst>
-              <a:gd name="adj1" fmla="val 81916"/>
-              <a:gd name="adj2" fmla="val 48112"/>
-            </a:avLst>
-          </a:prstGeom>
-        </p:spPr>
-        <p:style>
-          <a:lnRef idx="0">
-            <a:schemeClr val="accent2"/>
-          </a:lnRef>
-          <a:fillRef idx="3">
-            <a:schemeClr val="accent2"/>
-          </a:fillRef>
-          <a:effectRef idx="3">
-            <a:schemeClr val="accent2"/>
-          </a:effectRef>
-          <a:fontRef idx="minor">
-            <a:schemeClr val="lt1"/>
-          </a:fontRef>
-        </p:style>
-        <p:txBody>
-          <a:bodyPr rtlCol="0" anchor="ctr"/>
-          <a:lstStyle/>
-          <a:p>
-            <a:pPr marL="342900" indent="-342900" algn="ctr">
-              <a:buAutoNum type="arabicParenR"/>
-            </a:pPr>
-            <a:r>
-              <a:rPr kumimoji="1" lang="en-US" altLang="ja-JP" dirty="0"/>
-              <a:t>Select interface type</a:t>
-            </a:r>
-          </a:p>
-          <a:p>
-            <a:endParaRPr kumimoji="1" lang="en-US" altLang="ja-JP" dirty="0"/>
-          </a:p>
-          <a:p>
-            <a:r>
-              <a:rPr kumimoji="1" lang="en-US" altLang="ja-JP" sz="1600" dirty="0">
+          <a:noFill/>
+        </p:spPr>
+        <p:txBody>
+          <a:bodyPr wrap="square">
+            <a:spAutoFit/>
+          </a:bodyPr>
+          <a:lstStyle/>
+          <a:p>
+            <a:r>
+              <a:rPr lang="en-US" altLang="ja-JP" sz="1600" dirty="0">
                 <a:solidFill>
-                  <a:srgbClr val="7030A0"/>
+                  <a:srgbClr val="FF0000"/>
                 </a:solidFill>
               </a:rPr>
-              <a:t>NOTE: Bandwidth of UART is narrow. So you can not play heavy track data properly.</a:t>
-            </a:r>
-          </a:p>
-        </p:txBody>
-      </p:sp>
-      <p:sp>
-        <p:nvSpPr>
-          <p:cNvPr id="11" name="吹き出し: 四角形 10">
-            <a:extLst>
-              <a:ext uri="{FF2B5EF4-FFF2-40B4-BE49-F238E27FC236}">
-                <a16:creationId xmlns:a16="http://schemas.microsoft.com/office/drawing/2014/main" id="{71DA82F0-2C5D-4269-BA50-9C67E6C586D5}"/>
-              </a:ext>
-            </a:extLst>
-          </p:cNvPr>
-          <p:cNvSpPr/>
-          <p:nvPr/>
-        </p:nvSpPr>
-        <p:spPr>
-          <a:xfrm>
-            <a:off x="9484993" y="1722500"/>
-            <a:ext cx="2530257" cy="2069571"/>
-          </a:xfrm>
-          <a:prstGeom prst="wedgeRectCallout">
-            <a:avLst>
-              <a:gd name="adj1" fmla="val -64160"/>
-              <a:gd name="adj2" fmla="val 33291"/>
-            </a:avLst>
-          </a:prstGeom>
-        </p:spPr>
-        <p:style>
-          <a:lnRef idx="0">
-            <a:schemeClr val="accent2"/>
-          </a:lnRef>
-          <a:fillRef idx="3">
-            <a:schemeClr val="accent2"/>
-          </a:fillRef>
-          <a:effectRef idx="3">
-            <a:schemeClr val="accent2"/>
-          </a:effectRef>
-          <a:fontRef idx="minor">
-            <a:schemeClr val="lt1"/>
-          </a:fontRef>
-        </p:style>
-        <p:txBody>
-          <a:bodyPr rtlCol="0" anchor="ctr"/>
-          <a:lstStyle/>
-          <a:p>
-            <a:r>
-              <a:rPr kumimoji="1" lang="en-US" altLang="ja-JP" dirty="0"/>
-              <a:t>3) Check to connect</a:t>
-            </a:r>
-          </a:p>
-          <a:p>
-            <a:endParaRPr kumimoji="1" lang="en-US" altLang="ja-JP" dirty="0"/>
-          </a:p>
-          <a:p>
-            <a:r>
-              <a:rPr kumimoji="1" lang="en-US" altLang="ja-JP" sz="1600" dirty="0">
+              <a:t>*Some UART dongles may not work properly.</a:t>
+            </a:r>
+            <a:br>
+              <a:rPr lang="en-US" altLang="ja-JP" sz="1600" dirty="0">
                 <a:solidFill>
-                  <a:srgbClr val="7030A0"/>
+                  <a:srgbClr val="FF0000"/>
                 </a:solidFill>
               </a:rPr>
-              <a:t>NOTE: If you re-connect to </a:t>
-            </a:r>
-            <a:r>
-              <a:rPr kumimoji="1" lang="en-US" altLang="ja-JP" sz="1600" dirty="0" err="1">
+            </a:br>
+            <a:r>
+              <a:rPr lang="en-US" altLang="ja-JP" sz="1600" dirty="0">
                 <a:solidFill>
-                  <a:srgbClr val="7030A0"/>
+                  <a:srgbClr val="FF0000"/>
                 </a:solidFill>
               </a:rPr>
-              <a:t>FTDIxxx</a:t>
-            </a:r>
-            <a:r>
-              <a:rPr kumimoji="1" lang="en-US" altLang="ja-JP" sz="1600" dirty="0">
-                <a:solidFill>
-                  <a:srgbClr val="7030A0"/>
-                </a:solidFill>
-              </a:rPr>
-              <a:t> mode, please reset Gen/MD.</a:t>
-            </a:r>
-          </a:p>
-        </p:txBody>
-      </p:sp>
-      <p:sp>
-        <p:nvSpPr>
-          <p:cNvPr id="13" name="吹き出し: 四角形 12">
-            <a:extLst>
-              <a:ext uri="{FF2B5EF4-FFF2-40B4-BE49-F238E27FC236}">
-                <a16:creationId xmlns:a16="http://schemas.microsoft.com/office/drawing/2014/main" id="{16DF548C-0B2A-4170-8307-64B38459E04A}"/>
-              </a:ext>
-            </a:extLst>
-          </p:cNvPr>
-          <p:cNvSpPr/>
-          <p:nvPr/>
-        </p:nvSpPr>
-        <p:spPr>
-          <a:xfrm>
-            <a:off x="531812" y="3630707"/>
-            <a:ext cx="3104071" cy="3110752"/>
-          </a:xfrm>
-          <a:prstGeom prst="wedgeRectCallout">
-            <a:avLst>
-              <a:gd name="adj1" fmla="val 71531"/>
-              <a:gd name="adj2" fmla="val -35404"/>
-            </a:avLst>
-          </a:prstGeom>
-        </p:spPr>
-        <p:style>
-          <a:lnRef idx="0">
-            <a:schemeClr val="accent2"/>
-          </a:lnRef>
-          <a:fillRef idx="3">
-            <a:schemeClr val="accent2"/>
-          </a:fillRef>
-          <a:effectRef idx="3">
-            <a:schemeClr val="accent2"/>
-          </a:effectRef>
-          <a:fontRef idx="minor">
-            <a:schemeClr val="lt1"/>
-          </a:fontRef>
-        </p:style>
-        <p:txBody>
-          <a:bodyPr rtlCol="0" anchor="ctr"/>
-          <a:lstStyle/>
-          <a:p>
-            <a:r>
-              <a:rPr kumimoji="1" lang="en-US" altLang="ja-JP" dirty="0"/>
-              <a:t>5) Adjust CLK speed for </a:t>
-            </a:r>
-            <a:r>
-              <a:rPr kumimoji="1" lang="en-US" altLang="ja-JP" dirty="0" err="1"/>
-              <a:t>FTDIxxx</a:t>
-            </a:r>
-            <a:r>
-              <a:rPr kumimoji="1" lang="en-US" altLang="ja-JP" dirty="0"/>
-              <a:t> mode for each environment</a:t>
-            </a:r>
-            <a:r>
-              <a:rPr kumimoji="1" lang="ja-JP" altLang="en-US" dirty="0"/>
-              <a:t> </a:t>
-            </a:r>
-            <a:r>
-              <a:rPr kumimoji="1" lang="en-US" altLang="ja-JP" sz="1600" dirty="0"/>
-              <a:t>(</a:t>
-            </a:r>
-            <a:r>
-              <a:rPr kumimoji="1" lang="en-US" altLang="ja-JP" sz="1600" dirty="0">
-                <a:solidFill>
-                  <a:srgbClr val="7030A0"/>
-                </a:solidFill>
-              </a:rPr>
-              <a:t>7</a:t>
-            </a:r>
-            <a:r>
-              <a:rPr kumimoji="1" lang="ja-JP" altLang="en-US" sz="1600" dirty="0">
-                <a:solidFill>
-                  <a:srgbClr val="7030A0"/>
-                </a:solidFill>
-              </a:rPr>
-              <a:t>～</a:t>
-            </a:r>
-            <a:r>
-              <a:rPr kumimoji="1" lang="en-US" altLang="ja-JP" sz="1600" dirty="0">
-                <a:solidFill>
-                  <a:srgbClr val="7030A0"/>
-                </a:solidFill>
-              </a:rPr>
-              <a:t>8% is best for normal machine</a:t>
-            </a:r>
-            <a:r>
-              <a:rPr kumimoji="1" lang="en-US" altLang="ja-JP" sz="1600" dirty="0"/>
-              <a:t>)</a:t>
-            </a:r>
-            <a:endParaRPr kumimoji="1" lang="en-US" altLang="ja-JP" dirty="0"/>
-          </a:p>
-          <a:p>
-            <a:endParaRPr kumimoji="1" lang="en-US" altLang="ja-JP" dirty="0"/>
-          </a:p>
-          <a:p>
-            <a:r>
-              <a:rPr kumimoji="1" lang="en-US" altLang="ja-JP" dirty="0"/>
-              <a:t>6) Adjust buffer size for each files. </a:t>
-            </a:r>
-            <a:r>
-              <a:rPr kumimoji="1" lang="en-US" altLang="ja-JP" sz="1600" dirty="0"/>
-              <a:t>(</a:t>
-            </a:r>
-            <a:r>
-              <a:rPr kumimoji="1" lang="en-US" altLang="ja-JP" sz="1600" dirty="0">
-                <a:solidFill>
-                  <a:srgbClr val="7030A0"/>
-                </a:solidFill>
-              </a:rPr>
-              <a:t>0 is max accuracy but so heavy.</a:t>
-            </a:r>
-            <a:r>
-              <a:rPr kumimoji="1" lang="en-US" altLang="ja-JP" sz="1600" dirty="0"/>
-              <a:t>)</a:t>
-            </a:r>
-          </a:p>
-        </p:txBody>
-      </p:sp>
-      <p:sp>
-        <p:nvSpPr>
-          <p:cNvPr id="15" name="吹き出し: 四角形 14">
-            <a:extLst>
-              <a:ext uri="{FF2B5EF4-FFF2-40B4-BE49-F238E27FC236}">
-                <a16:creationId xmlns:a16="http://schemas.microsoft.com/office/drawing/2014/main" id="{20B039CE-04C3-4F84-B670-7752FAE57578}"/>
-              </a:ext>
-            </a:extLst>
-          </p:cNvPr>
-          <p:cNvSpPr/>
-          <p:nvPr/>
-        </p:nvSpPr>
-        <p:spPr>
-          <a:xfrm>
-            <a:off x="5068293" y="1672955"/>
-            <a:ext cx="2944468" cy="1160795"/>
-          </a:xfrm>
-          <a:prstGeom prst="wedgeRectCallout">
-            <a:avLst>
-              <a:gd name="adj1" fmla="val 38834"/>
-              <a:gd name="adj2" fmla="val 80562"/>
-            </a:avLst>
-          </a:prstGeom>
-        </p:spPr>
-        <p:style>
-          <a:lnRef idx="0">
-            <a:schemeClr val="accent2"/>
-          </a:lnRef>
-          <a:fillRef idx="3">
-            <a:schemeClr val="accent2"/>
-          </a:fillRef>
-          <a:effectRef idx="3">
-            <a:schemeClr val="accent2"/>
-          </a:effectRef>
-          <a:fontRef idx="minor">
-            <a:schemeClr val="lt1"/>
-          </a:fontRef>
-        </p:style>
-        <p:txBody>
-          <a:bodyPr rtlCol="0" anchor="ctr"/>
-          <a:lstStyle/>
-          <a:p>
-            <a:r>
-              <a:rPr kumimoji="1" lang="en-US" altLang="ja-JP" dirty="0"/>
-              <a:t>2) Select interface ID</a:t>
-            </a:r>
-          </a:p>
-          <a:p>
-            <a:endParaRPr kumimoji="1" lang="en-US" altLang="ja-JP" dirty="0"/>
-          </a:p>
-          <a:p>
-            <a:r>
-              <a:rPr kumimoji="1" lang="en-US" altLang="ja-JP" sz="1600" dirty="0"/>
-              <a:t>for UART: </a:t>
-            </a:r>
-            <a:r>
-              <a:rPr kumimoji="1" lang="en-US" altLang="ja-JP" sz="1600" dirty="0" err="1">
-                <a:solidFill>
-                  <a:srgbClr val="7030A0"/>
-                </a:solidFill>
-              </a:rPr>
-              <a:t>COMPort</a:t>
-            </a:r>
-            <a:r>
-              <a:rPr kumimoji="1" lang="en-US" altLang="ja-JP" sz="1600" dirty="0">
-                <a:solidFill>
-                  <a:srgbClr val="7030A0"/>
-                </a:solidFill>
-              </a:rPr>
-              <a:t>#</a:t>
-            </a:r>
-            <a:r>
-              <a:rPr kumimoji="1" lang="en-US" altLang="ja-JP" sz="1600" dirty="0"/>
-              <a:t> </a:t>
-            </a:r>
-          </a:p>
-          <a:p>
-            <a:r>
-              <a:rPr kumimoji="1" lang="en-US" altLang="ja-JP" sz="1600" dirty="0"/>
-              <a:t>for FTDI2xxx: </a:t>
-            </a:r>
-            <a:r>
-              <a:rPr kumimoji="1" lang="en-US" altLang="ja-JP" sz="1600" dirty="0">
-                <a:solidFill>
-                  <a:srgbClr val="7030A0"/>
-                </a:solidFill>
-              </a:rPr>
-              <a:t>FDTI ID#</a:t>
-            </a:r>
+              <a:t>*Compatible consoles may not work properly.</a:t>
+            </a:r>
+            <a:endParaRPr kumimoji="1" lang="ja-JP" altLang="en-US" sz="1600" dirty="0">
+              <a:solidFill>
+                <a:srgbClr val="FF0000"/>
+              </a:solidFill>
+            </a:endParaRPr>
           </a:p>
         </p:txBody>
       </p:sp>
     </p:spTree>
     <p:extLst>
       <p:ext uri="{BB962C8B-B14F-4D97-AF65-F5344CB8AC3E}">
-        <p14:creationId xmlns:p14="http://schemas.microsoft.com/office/powerpoint/2010/main" val="247279145"/>
+        <p14:creationId xmlns:p14="http://schemas.microsoft.com/office/powerpoint/2010/main" val="1500572103"/>
       </p:ext>
     </p:extLst>
   </p:cSld>
@@ -13603,6 +14337,482 @@
           <p:cNvPr id="2" name="タイトル 1">
             <a:extLst>
               <a:ext uri="{FF2B5EF4-FFF2-40B4-BE49-F238E27FC236}">
+                <a16:creationId xmlns:a16="http://schemas.microsoft.com/office/drawing/2014/main" id="{45F6BDA5-EAAF-47BF-BA28-5541807FE9EF}"/>
+              </a:ext>
+            </a:extLst>
+          </p:cNvPr>
+          <p:cNvSpPr>
+            <a:spLocks noGrp="1"/>
+          </p:cNvSpPr>
+          <p:nvPr>
+            <p:ph type="title"/>
+          </p:nvPr>
+        </p:nvSpPr>
+        <p:spPr/>
+        <p:txBody>
+          <a:bodyPr/>
+          <a:lstStyle/>
+          <a:p>
+            <a:r>
+              <a:rPr kumimoji="1" lang="en-US" altLang="ja-JP" dirty="0" err="1"/>
+              <a:t>VGMP</a:t>
+            </a:r>
+            <a:r>
+              <a:rPr lang="en-US" altLang="ja-JP" dirty="0" err="1"/>
+              <a:t>layer</a:t>
+            </a:r>
+            <a:endParaRPr kumimoji="1" lang="ja-JP" altLang="en-US" dirty="0"/>
+          </a:p>
+        </p:txBody>
+      </p:sp>
+      <p:sp>
+        <p:nvSpPr>
+          <p:cNvPr id="4" name="スライド番号プレースホルダー 3">
+            <a:extLst>
+              <a:ext uri="{FF2B5EF4-FFF2-40B4-BE49-F238E27FC236}">
+                <a16:creationId xmlns:a16="http://schemas.microsoft.com/office/drawing/2014/main" id="{F3E89AAB-4727-42E3-A2B2-F5E25345DCC6}"/>
+              </a:ext>
+            </a:extLst>
+          </p:cNvPr>
+          <p:cNvSpPr>
+            <a:spLocks noGrp="1"/>
+          </p:cNvSpPr>
+          <p:nvPr>
+            <p:ph type="sldNum" sz="quarter" idx="12"/>
+          </p:nvPr>
+        </p:nvSpPr>
+        <p:spPr/>
+        <p:txBody>
+          <a:bodyPr/>
+          <a:lstStyle/>
+          <a:p>
+            <a:fld id="{E27E2812-4560-4165-A7C7-9C013F955547}" type="slidenum">
+              <a:rPr kumimoji="1" lang="ja-JP" altLang="en-US" smtClean="0"/>
+              <a:t>18</a:t>
+            </a:fld>
+            <a:endParaRPr kumimoji="1" lang="ja-JP" altLang="en-US"/>
+          </a:p>
+        </p:txBody>
+      </p:sp>
+      <p:pic>
+        <p:nvPicPr>
+          <p:cNvPr id="8" name="図 7">
+            <a:extLst>
+              <a:ext uri="{FF2B5EF4-FFF2-40B4-BE49-F238E27FC236}">
+                <a16:creationId xmlns:a16="http://schemas.microsoft.com/office/drawing/2014/main" id="{0EDBB92D-1466-4E68-9949-79578CDDF792}"/>
+              </a:ext>
+            </a:extLst>
+          </p:cNvPr>
+          <p:cNvPicPr>
+            <a:picLocks noChangeAspect="1"/>
+          </p:cNvPicPr>
+          <p:nvPr/>
+        </p:nvPicPr>
+        <p:blipFill>
+          <a:blip r:embed="rId2"/>
+          <a:stretch>
+            <a:fillRect/>
+          </a:stretch>
+        </p:blipFill>
+        <p:spPr>
+          <a:xfrm>
+            <a:off x="3931301" y="2601704"/>
+            <a:ext cx="5553693" cy="3852435"/>
+          </a:xfrm>
+          <a:prstGeom prst="rect">
+            <a:avLst/>
+          </a:prstGeom>
+        </p:spPr>
+      </p:pic>
+      <p:sp>
+        <p:nvSpPr>
+          <p:cNvPr id="9" name="吹き出し: 四角形 8">
+            <a:extLst>
+              <a:ext uri="{FF2B5EF4-FFF2-40B4-BE49-F238E27FC236}">
+                <a16:creationId xmlns:a16="http://schemas.microsoft.com/office/drawing/2014/main" id="{3390D222-80C8-496D-BD12-26C7BE6A7BCC}"/>
+              </a:ext>
+            </a:extLst>
+          </p:cNvPr>
+          <p:cNvSpPr/>
+          <p:nvPr/>
+        </p:nvSpPr>
+        <p:spPr>
+          <a:xfrm>
+            <a:off x="531812" y="1592922"/>
+            <a:ext cx="2944468" cy="1836078"/>
+          </a:xfrm>
+          <a:prstGeom prst="wedgeRectCallout">
+            <a:avLst>
+              <a:gd name="adj1" fmla="val 81916"/>
+              <a:gd name="adj2" fmla="val 48112"/>
+            </a:avLst>
+          </a:prstGeom>
+        </p:spPr>
+        <p:style>
+          <a:lnRef idx="0">
+            <a:schemeClr val="accent2"/>
+          </a:lnRef>
+          <a:fillRef idx="3">
+            <a:schemeClr val="accent2"/>
+          </a:fillRef>
+          <a:effectRef idx="3">
+            <a:schemeClr val="accent2"/>
+          </a:effectRef>
+          <a:fontRef idx="minor">
+            <a:schemeClr val="lt1"/>
+          </a:fontRef>
+        </p:style>
+        <p:txBody>
+          <a:bodyPr rtlCol="0" anchor="ctr"/>
+          <a:lstStyle/>
+          <a:p>
+            <a:pPr marL="342900" indent="-342900" algn="ctr">
+              <a:buAutoNum type="arabicParenR"/>
+            </a:pPr>
+            <a:r>
+              <a:rPr kumimoji="1" lang="en-US" altLang="ja-JP" dirty="0"/>
+              <a:t>Select interface type</a:t>
+            </a:r>
+          </a:p>
+          <a:p>
+            <a:endParaRPr kumimoji="1" lang="en-US" altLang="ja-JP" dirty="0"/>
+          </a:p>
+          <a:p>
+            <a:r>
+              <a:rPr kumimoji="1" lang="en-US" altLang="ja-JP" sz="1600" dirty="0">
+                <a:solidFill>
+                  <a:srgbClr val="7030A0"/>
+                </a:solidFill>
+              </a:rPr>
+              <a:t>NOTE: Bandwidth of UART is narrow. So you can not play heavy track data properly.</a:t>
+            </a:r>
+          </a:p>
+        </p:txBody>
+      </p:sp>
+      <p:sp>
+        <p:nvSpPr>
+          <p:cNvPr id="11" name="吹き出し: 四角形 10">
+            <a:extLst>
+              <a:ext uri="{FF2B5EF4-FFF2-40B4-BE49-F238E27FC236}">
+                <a16:creationId xmlns:a16="http://schemas.microsoft.com/office/drawing/2014/main" id="{71DA82F0-2C5D-4269-BA50-9C67E6C586D5}"/>
+              </a:ext>
+            </a:extLst>
+          </p:cNvPr>
+          <p:cNvSpPr/>
+          <p:nvPr/>
+        </p:nvSpPr>
+        <p:spPr>
+          <a:xfrm>
+            <a:off x="9484993" y="1722500"/>
+            <a:ext cx="2530257" cy="2069571"/>
+          </a:xfrm>
+          <a:prstGeom prst="wedgeRectCallout">
+            <a:avLst>
+              <a:gd name="adj1" fmla="val -64160"/>
+              <a:gd name="adj2" fmla="val 33291"/>
+            </a:avLst>
+          </a:prstGeom>
+        </p:spPr>
+        <p:style>
+          <a:lnRef idx="0">
+            <a:schemeClr val="accent2"/>
+          </a:lnRef>
+          <a:fillRef idx="3">
+            <a:schemeClr val="accent2"/>
+          </a:fillRef>
+          <a:effectRef idx="3">
+            <a:schemeClr val="accent2"/>
+          </a:effectRef>
+          <a:fontRef idx="minor">
+            <a:schemeClr val="lt1"/>
+          </a:fontRef>
+        </p:style>
+        <p:txBody>
+          <a:bodyPr rtlCol="0" anchor="ctr"/>
+          <a:lstStyle/>
+          <a:p>
+            <a:r>
+              <a:rPr kumimoji="1" lang="en-US" altLang="ja-JP" dirty="0"/>
+              <a:t>3) Check to connect</a:t>
+            </a:r>
+          </a:p>
+          <a:p>
+            <a:endParaRPr kumimoji="1" lang="en-US" altLang="ja-JP" dirty="0"/>
+          </a:p>
+          <a:p>
+            <a:r>
+              <a:rPr kumimoji="1" lang="en-US" altLang="ja-JP" sz="1600" dirty="0">
+                <a:solidFill>
+                  <a:srgbClr val="7030A0"/>
+                </a:solidFill>
+              </a:rPr>
+              <a:t>NOTE: If you re-connect to </a:t>
+            </a:r>
+            <a:r>
+              <a:rPr kumimoji="1" lang="en-US" altLang="ja-JP" sz="1600" dirty="0" err="1">
+                <a:solidFill>
+                  <a:srgbClr val="7030A0"/>
+                </a:solidFill>
+              </a:rPr>
+              <a:t>FTDIxxx</a:t>
+            </a:r>
+            <a:r>
+              <a:rPr kumimoji="1" lang="en-US" altLang="ja-JP" sz="1600" dirty="0">
+                <a:solidFill>
+                  <a:srgbClr val="7030A0"/>
+                </a:solidFill>
+              </a:rPr>
+              <a:t> mode, please reset Gen/MD.</a:t>
+            </a:r>
+          </a:p>
+        </p:txBody>
+      </p:sp>
+      <p:sp>
+        <p:nvSpPr>
+          <p:cNvPr id="13" name="吹き出し: 四角形 12">
+            <a:extLst>
+              <a:ext uri="{FF2B5EF4-FFF2-40B4-BE49-F238E27FC236}">
+                <a16:creationId xmlns:a16="http://schemas.microsoft.com/office/drawing/2014/main" id="{16DF548C-0B2A-4170-8307-64B38459E04A}"/>
+              </a:ext>
+            </a:extLst>
+          </p:cNvPr>
+          <p:cNvSpPr/>
+          <p:nvPr/>
+        </p:nvSpPr>
+        <p:spPr>
+          <a:xfrm>
+            <a:off x="531812" y="3630707"/>
+            <a:ext cx="3104071" cy="3110752"/>
+          </a:xfrm>
+          <a:prstGeom prst="wedgeRectCallout">
+            <a:avLst>
+              <a:gd name="adj1" fmla="val 71531"/>
+              <a:gd name="adj2" fmla="val -35404"/>
+            </a:avLst>
+          </a:prstGeom>
+        </p:spPr>
+        <p:style>
+          <a:lnRef idx="0">
+            <a:schemeClr val="accent2"/>
+          </a:lnRef>
+          <a:fillRef idx="3">
+            <a:schemeClr val="accent2"/>
+          </a:fillRef>
+          <a:effectRef idx="3">
+            <a:schemeClr val="accent2"/>
+          </a:effectRef>
+          <a:fontRef idx="minor">
+            <a:schemeClr val="lt1"/>
+          </a:fontRef>
+        </p:style>
+        <p:txBody>
+          <a:bodyPr rtlCol="0" anchor="ctr"/>
+          <a:lstStyle/>
+          <a:p>
+            <a:r>
+              <a:rPr kumimoji="1" lang="en-US" altLang="ja-JP" dirty="0"/>
+              <a:t>5) Adjust CLK speed for </a:t>
+            </a:r>
+            <a:r>
+              <a:rPr kumimoji="1" lang="en-US" altLang="ja-JP" dirty="0" err="1"/>
+              <a:t>FTDIxxx</a:t>
+            </a:r>
+            <a:r>
+              <a:rPr kumimoji="1" lang="en-US" altLang="ja-JP" dirty="0"/>
+              <a:t> mode for each environment</a:t>
+            </a:r>
+            <a:r>
+              <a:rPr kumimoji="1" lang="ja-JP" altLang="en-US" dirty="0"/>
+              <a:t> </a:t>
+            </a:r>
+            <a:r>
+              <a:rPr kumimoji="1" lang="en-US" altLang="ja-JP" sz="1600" dirty="0"/>
+              <a:t>(</a:t>
+            </a:r>
+            <a:r>
+              <a:rPr kumimoji="1" lang="en-US" altLang="ja-JP" sz="1600" dirty="0">
+                <a:solidFill>
+                  <a:srgbClr val="7030A0"/>
+                </a:solidFill>
+              </a:rPr>
+              <a:t>7</a:t>
+            </a:r>
+            <a:r>
+              <a:rPr kumimoji="1" lang="ja-JP" altLang="en-US" sz="1600" dirty="0">
+                <a:solidFill>
+                  <a:srgbClr val="7030A0"/>
+                </a:solidFill>
+              </a:rPr>
+              <a:t>～</a:t>
+            </a:r>
+            <a:r>
+              <a:rPr kumimoji="1" lang="en-US" altLang="ja-JP" sz="1600" dirty="0">
+                <a:solidFill>
+                  <a:srgbClr val="7030A0"/>
+                </a:solidFill>
+              </a:rPr>
+              <a:t>8% is best for normal machine</a:t>
+            </a:r>
+            <a:r>
+              <a:rPr kumimoji="1" lang="en-US" altLang="ja-JP" sz="1600" dirty="0"/>
+              <a:t>)</a:t>
+            </a:r>
+            <a:endParaRPr kumimoji="1" lang="en-US" altLang="ja-JP" dirty="0"/>
+          </a:p>
+          <a:p>
+            <a:endParaRPr kumimoji="1" lang="en-US" altLang="ja-JP" dirty="0"/>
+          </a:p>
+          <a:p>
+            <a:r>
+              <a:rPr kumimoji="1" lang="en-US" altLang="ja-JP" dirty="0"/>
+              <a:t>6) Adjust buffer size for each files. </a:t>
+            </a:r>
+            <a:r>
+              <a:rPr kumimoji="1" lang="en-US" altLang="ja-JP" sz="1600" dirty="0"/>
+              <a:t>(</a:t>
+            </a:r>
+            <a:r>
+              <a:rPr kumimoji="1" lang="en-US" altLang="ja-JP" sz="1600" dirty="0">
+                <a:solidFill>
+                  <a:srgbClr val="7030A0"/>
+                </a:solidFill>
+              </a:rPr>
+              <a:t>0 is max accuracy but so heavy.</a:t>
+            </a:r>
+            <a:r>
+              <a:rPr kumimoji="1" lang="en-US" altLang="ja-JP" sz="1600" dirty="0"/>
+              <a:t>)</a:t>
+            </a:r>
+          </a:p>
+        </p:txBody>
+      </p:sp>
+      <p:sp>
+        <p:nvSpPr>
+          <p:cNvPr id="15" name="吹き出し: 四角形 14">
+            <a:extLst>
+              <a:ext uri="{FF2B5EF4-FFF2-40B4-BE49-F238E27FC236}">
+                <a16:creationId xmlns:a16="http://schemas.microsoft.com/office/drawing/2014/main" id="{20B039CE-04C3-4F84-B670-7752FAE57578}"/>
+              </a:ext>
+            </a:extLst>
+          </p:cNvPr>
+          <p:cNvSpPr/>
+          <p:nvPr/>
+        </p:nvSpPr>
+        <p:spPr>
+          <a:xfrm>
+            <a:off x="5068293" y="1672955"/>
+            <a:ext cx="2944468" cy="1160795"/>
+          </a:xfrm>
+          <a:prstGeom prst="wedgeRectCallout">
+            <a:avLst>
+              <a:gd name="adj1" fmla="val 38834"/>
+              <a:gd name="adj2" fmla="val 80562"/>
+            </a:avLst>
+          </a:prstGeom>
+        </p:spPr>
+        <p:style>
+          <a:lnRef idx="0">
+            <a:schemeClr val="accent2"/>
+          </a:lnRef>
+          <a:fillRef idx="3">
+            <a:schemeClr val="accent2"/>
+          </a:fillRef>
+          <a:effectRef idx="3">
+            <a:schemeClr val="accent2"/>
+          </a:effectRef>
+          <a:fontRef idx="minor">
+            <a:schemeClr val="lt1"/>
+          </a:fontRef>
+        </p:style>
+        <p:txBody>
+          <a:bodyPr rtlCol="0" anchor="ctr"/>
+          <a:lstStyle/>
+          <a:p>
+            <a:r>
+              <a:rPr kumimoji="1" lang="en-US" altLang="ja-JP" dirty="0"/>
+              <a:t>2) Select interface ID</a:t>
+            </a:r>
+          </a:p>
+          <a:p>
+            <a:endParaRPr kumimoji="1" lang="en-US" altLang="ja-JP" dirty="0"/>
+          </a:p>
+          <a:p>
+            <a:r>
+              <a:rPr kumimoji="1" lang="en-US" altLang="ja-JP" sz="1600" dirty="0"/>
+              <a:t>for UART: </a:t>
+            </a:r>
+            <a:r>
+              <a:rPr kumimoji="1" lang="en-US" altLang="ja-JP" sz="1600" dirty="0" err="1">
+                <a:solidFill>
+                  <a:srgbClr val="7030A0"/>
+                </a:solidFill>
+              </a:rPr>
+              <a:t>COMPort</a:t>
+            </a:r>
+            <a:r>
+              <a:rPr kumimoji="1" lang="en-US" altLang="ja-JP" sz="1600" dirty="0">
+                <a:solidFill>
+                  <a:srgbClr val="7030A0"/>
+                </a:solidFill>
+              </a:rPr>
+              <a:t>#</a:t>
+            </a:r>
+            <a:r>
+              <a:rPr kumimoji="1" lang="en-US" altLang="ja-JP" sz="1600" dirty="0"/>
+              <a:t> </a:t>
+            </a:r>
+          </a:p>
+          <a:p>
+            <a:r>
+              <a:rPr kumimoji="1" lang="en-US" altLang="ja-JP" sz="1600" dirty="0"/>
+              <a:t>for FTDI2xxx: </a:t>
+            </a:r>
+            <a:r>
+              <a:rPr kumimoji="1" lang="en-US" altLang="ja-JP" sz="1600" dirty="0">
+                <a:solidFill>
+                  <a:srgbClr val="7030A0"/>
+                </a:solidFill>
+              </a:rPr>
+              <a:t>FDTI ID#</a:t>
+            </a:r>
+          </a:p>
+        </p:txBody>
+      </p:sp>
+    </p:spTree>
+    <p:extLst>
+      <p:ext uri="{BB962C8B-B14F-4D97-AF65-F5344CB8AC3E}">
+        <p14:creationId xmlns:p14="http://schemas.microsoft.com/office/powerpoint/2010/main" val="247279145"/>
+      </p:ext>
+    </p:extLst>
+  </p:cSld>
+  <p:clrMapOvr>
+    <a:masterClrMapping/>
+  </p:clrMapOvr>
+</p:sld>
+</file>
+
+<file path=ppt/slides/slide19.xml><?xml version="1.0" encoding="utf-8"?>
+<p:sld xmlns:a="http://schemas.openxmlformats.org/drawingml/2006/main" xmlns:r="http://schemas.openxmlformats.org/officeDocument/2006/relationships" xmlns:p="http://schemas.openxmlformats.org/presentationml/2006/main">
+  <p:cSld>
+    <p:spTree>
+      <p:nvGrpSpPr>
+        <p:cNvPr id="1" name=""/>
+        <p:cNvGrpSpPr/>
+        <p:nvPr/>
+      </p:nvGrpSpPr>
+      <p:grpSpPr>
+        <a:xfrm>
+          <a:off x="0" y="0"/>
+          <a:ext cx="0" cy="0"/>
+          <a:chOff x="0" y="0"/>
+          <a:chExt cx="0" cy="0"/>
+        </a:xfrm>
+      </p:grpSpPr>
+      <p:sp>
+        <p:nvSpPr>
+          <p:cNvPr id="2" name="タイトル 1">
+            <a:extLst>
+              <a:ext uri="{FF2B5EF4-FFF2-40B4-BE49-F238E27FC236}">
                 <a16:creationId xmlns:a16="http://schemas.microsoft.com/office/drawing/2014/main" id="{EF2D61BD-EF14-496D-BA79-EAE1C4548936}"/>
               </a:ext>
             </a:extLst>
@@ -13729,7 +14939,7 @@
           <a:p>
             <a:fld id="{E27E2812-4560-4165-A7C7-9C013F955547}" type="slidenum">
               <a:rPr kumimoji="1" lang="ja-JP" altLang="en-US" smtClean="0"/>
-              <a:t>18</a:t>
+              <a:t>19</a:t>
             </a:fld>
             <a:endParaRPr kumimoji="1" lang="ja-JP" altLang="en-US"/>
           </a:p>

</xml_diff>

<commit_message>
v3.7.3.2 Fixed SoundFont loader for SPC700. Loader could not load 2nd and lator samples.
</commit_message>
<xml_diff>
--- a/docs/MAmidiMEmo/Manual.pptx
+++ b/docs/MAmidiMEmo/Manual.pptx
@@ -215,7 +215,7 @@
           <a:p>
             <a:fld id="{581C28D8-13B6-41C3-9F5F-0284C569C6F1}" type="datetimeFigureOut">
               <a:rPr kumimoji="1" lang="ja-JP" altLang="en-US" smtClean="0"/>
-              <a:t>2021/6/20</a:t>
+              <a:t>2021/6/26</a:t>
             </a:fld>
             <a:endParaRPr kumimoji="1" lang="ja-JP" altLang="en-US"/>
           </a:p>
@@ -1038,7 +1038,7 @@
           <a:p>
             <a:fld id="{B8625E62-B904-4691-B75E-EC1C32885285}" type="datetime1">
               <a:rPr kumimoji="1" lang="ja-JP" altLang="en-US" smtClean="0"/>
-              <a:t>2021/6/20</a:t>
+              <a:t>2021/6/26</a:t>
             </a:fld>
             <a:endParaRPr kumimoji="1" lang="ja-JP" altLang="en-US"/>
           </a:p>
@@ -1376,7 +1376,7 @@
           <a:p>
             <a:fld id="{A4C87007-2A40-4EFC-90A3-258EFA3C1001}" type="datetime1">
               <a:rPr kumimoji="1" lang="ja-JP" altLang="en-US" smtClean="0"/>
-              <a:t>2021/6/20</a:t>
+              <a:t>2021/6/26</a:t>
             </a:fld>
             <a:endParaRPr kumimoji="1" lang="ja-JP" altLang="en-US"/>
           </a:p>
@@ -1777,7 +1777,7 @@
           <a:p>
             <a:fld id="{0FE0D7FF-9203-4AA3-90FD-622674A14F90}" type="datetime1">
               <a:rPr kumimoji="1" lang="ja-JP" altLang="en-US" smtClean="0"/>
-              <a:t>2021/6/20</a:t>
+              <a:t>2021/6/26</a:t>
             </a:fld>
             <a:endParaRPr kumimoji="1" lang="ja-JP" altLang="en-US"/>
           </a:p>
@@ -2113,7 +2113,7 @@
           <a:p>
             <a:fld id="{D2D6E4D3-BEDB-4F35-876B-5B9AA41BFB5B}" type="datetime1">
               <a:rPr kumimoji="1" lang="ja-JP" altLang="en-US" smtClean="0"/>
-              <a:t>2021/6/20</a:t>
+              <a:t>2021/6/26</a:t>
             </a:fld>
             <a:endParaRPr kumimoji="1" lang="ja-JP" altLang="en-US"/>
           </a:p>
@@ -2433,7 +2433,7 @@
           <a:p>
             <a:fld id="{2ACD896E-FC14-4F25-BC47-18ABAEA9E1FE}" type="datetime1">
               <a:rPr kumimoji="1" lang="ja-JP" altLang="en-US" smtClean="0"/>
-              <a:t>2021/6/20</a:t>
+              <a:t>2021/6/26</a:t>
             </a:fld>
             <a:endParaRPr kumimoji="1" lang="ja-JP" altLang="en-US"/>
           </a:p>
@@ -2829,7 +2829,7 @@
           <a:p>
             <a:fld id="{54FC701B-2185-4987-B8E2-5507664B65F4}" type="datetime1">
               <a:rPr kumimoji="1" lang="ja-JP" altLang="en-US" smtClean="0"/>
-              <a:t>2021/6/20</a:t>
+              <a:t>2021/6/26</a:t>
             </a:fld>
             <a:endParaRPr kumimoji="1" lang="ja-JP" altLang="en-US"/>
           </a:p>
@@ -3118,7 +3118,7 @@
           <a:p>
             <a:fld id="{3FB4CDED-9617-418F-B546-D66B9BB6C35E}" type="datetime1">
               <a:rPr kumimoji="1" lang="ja-JP" altLang="en-US" smtClean="0"/>
-              <a:t>2021/6/20</a:t>
+              <a:t>2021/6/26</a:t>
             </a:fld>
             <a:endParaRPr kumimoji="1" lang="ja-JP" altLang="en-US"/>
           </a:p>
@@ -3412,7 +3412,7 @@
           <a:p>
             <a:fld id="{F5635D40-962A-46D7-8037-3F2900B5EB4D}" type="datetime1">
               <a:rPr kumimoji="1" lang="ja-JP" altLang="en-US" smtClean="0"/>
-              <a:t>2021/6/20</a:t>
+              <a:t>2021/6/26</a:t>
             </a:fld>
             <a:endParaRPr kumimoji="1" lang="ja-JP" altLang="en-US"/>
           </a:p>
@@ -3706,7 +3706,7 @@
           <a:p>
             <a:fld id="{741DA9A2-8356-4FFD-B66A-E38811049858}" type="datetime1">
               <a:rPr kumimoji="1" lang="ja-JP" altLang="en-US" smtClean="0"/>
-              <a:t>2021/6/20</a:t>
+              <a:t>2021/6/26</a:t>
             </a:fld>
             <a:endParaRPr kumimoji="1" lang="ja-JP" altLang="en-US"/>
           </a:p>
@@ -4035,7 +4035,7 @@
           <a:p>
             <a:fld id="{9DDE8989-88B8-4869-97D9-547531F13E13}" type="datetime1">
               <a:rPr kumimoji="1" lang="ja-JP" altLang="en-US" smtClean="0"/>
-              <a:t>2021/6/20</a:t>
+              <a:t>2021/6/26</a:t>
             </a:fld>
             <a:endParaRPr kumimoji="1" lang="ja-JP" altLang="en-US"/>
           </a:p>
@@ -4422,7 +4422,7 @@
           <a:p>
             <a:fld id="{81EC4031-B949-4300-AB3E-1551426E8631}" type="datetime1">
               <a:rPr kumimoji="1" lang="ja-JP" altLang="en-US" smtClean="0"/>
-              <a:t>2021/6/20</a:t>
+              <a:t>2021/6/26</a:t>
             </a:fld>
             <a:endParaRPr kumimoji="1" lang="ja-JP" altLang="en-US"/>
           </a:p>
@@ -4943,7 +4943,7 @@
           <a:p>
             <a:fld id="{F39E755E-A59D-4634-B604-E9BB568B1156}" type="datetime1">
               <a:rPr kumimoji="1" lang="ja-JP" altLang="en-US" smtClean="0"/>
-              <a:t>2021/6/20</a:t>
+              <a:t>2021/6/26</a:t>
             </a:fld>
             <a:endParaRPr kumimoji="1" lang="ja-JP" altLang="en-US"/>
           </a:p>
@@ -5148,7 +5148,7 @@
           <a:p>
             <a:fld id="{61DA38B3-7601-4256-ABFE-386B92B0EDB5}" type="datetime1">
               <a:rPr kumimoji="1" lang="ja-JP" altLang="en-US" smtClean="0"/>
-              <a:t>2021/6/20</a:t>
+              <a:t>2021/6/26</a:t>
             </a:fld>
             <a:endParaRPr kumimoji="1" lang="ja-JP" altLang="en-US"/>
           </a:p>
@@ -5325,7 +5325,7 @@
           <a:p>
             <a:fld id="{5A28ED6D-8A94-4DBA-8EF2-284D1A467CE8}" type="datetime1">
               <a:rPr kumimoji="1" lang="ja-JP" altLang="en-US" smtClean="0"/>
-              <a:t>2021/6/20</a:t>
+              <a:t>2021/6/26</a:t>
             </a:fld>
             <a:endParaRPr kumimoji="1" lang="ja-JP" altLang="en-US"/>
           </a:p>
@@ -5690,7 +5690,7 @@
           <a:p>
             <a:fld id="{B27B0317-28AF-43C5-8944-AADFA89E0149}" type="datetime1">
               <a:rPr kumimoji="1" lang="ja-JP" altLang="en-US" smtClean="0"/>
-              <a:t>2021/6/20</a:t>
+              <a:t>2021/6/26</a:t>
             </a:fld>
             <a:endParaRPr kumimoji="1" lang="ja-JP" altLang="en-US"/>
           </a:p>
@@ -6035,7 +6035,7 @@
           <a:p>
             <a:fld id="{A78D023C-C4FA-4CE8-B5BE-6798898EE377}" type="datetime1">
               <a:rPr kumimoji="1" lang="ja-JP" altLang="en-US" smtClean="0"/>
-              <a:t>2021/6/20</a:t>
+              <a:t>2021/6/26</a:t>
             </a:fld>
             <a:endParaRPr kumimoji="1" lang="ja-JP" altLang="en-US"/>
           </a:p>
@@ -8184,7 +8184,7 @@
           <a:p>
             <a:fld id="{99567159-F4A8-4352-915B-DDBEFEF4A4D6}" type="datetime1">
               <a:rPr kumimoji="1" lang="ja-JP" altLang="en-US" smtClean="0"/>
-              <a:t>2021/6/20</a:t>
+              <a:t>2021/6/26</a:t>
             </a:fld>
             <a:endParaRPr kumimoji="1" lang="ja-JP" altLang="en-US"/>
           </a:p>
@@ -11111,6 +11111,15 @@
         <p:blipFill rotWithShape="1">
           <a:blip r:embed="rId4">
             <a:extLst>
+              <a:ext uri="{BEBA8EAE-BF5A-486C-A8C5-ECC9F3942E4B}">
+                <a14:imgProps xmlns:a14="http://schemas.microsoft.com/office/drawing/2010/main">
+                  <a14:imgLayer r:embed="rId5">
+                    <a14:imgEffect>
+                      <a14:brightnessContrast bright="40000" contrast="-40000"/>
+                    </a14:imgEffect>
+                  </a14:imgLayer>
+                </a14:imgProps>
+              </a:ext>
               <a:ext uri="{28A0092B-C50C-407E-A947-70E740481C1C}">
                 <a14:useLocalDpi xmlns:a14="http://schemas.microsoft.com/office/drawing/2010/main" val="0"/>
               </a:ext>
@@ -11144,7 +11153,7 @@
           <p:nvPr/>
         </p:nvPicPr>
         <p:blipFill rotWithShape="1">
-          <a:blip r:embed="rId5">
+          <a:blip r:embed="rId6">
             <a:extLst>
               <a:ext uri="{28A0092B-C50C-407E-A947-70E740481C1C}">
                 <a14:useLocalDpi xmlns:a14="http://schemas.microsoft.com/office/drawing/2010/main" val="0"/>
@@ -11178,7 +11187,7 @@
         </p:nvSpPr>
         <p:spPr>
           <a:xfrm>
-            <a:off x="3300108" y="4684693"/>
+            <a:off x="3300108" y="6550223"/>
             <a:ext cx="1486767" cy="307777"/>
           </a:xfrm>
           <a:prstGeom prst="rect">
@@ -11218,7 +11227,7 @@
         </p:nvSpPr>
         <p:spPr>
           <a:xfrm>
-            <a:off x="5609722" y="4643865"/>
+            <a:off x="5609722" y="6550223"/>
             <a:ext cx="1257098" cy="307777"/>
           </a:xfrm>
           <a:prstGeom prst="rect">
@@ -11242,10 +11251,10 @@
       </p:sp>
       <p:sp>
         <p:nvSpPr>
-          <p:cNvPr id="24" name="テキスト ボックス 23">
+          <p:cNvPr id="27" name="テキスト ボックス 26">
             <a:extLst>
               <a:ext uri="{FF2B5EF4-FFF2-40B4-BE49-F238E27FC236}">
-                <a16:creationId xmlns:a16="http://schemas.microsoft.com/office/drawing/2014/main" id="{31569F60-B612-4231-809A-EFE4B8286856}"/>
+                <a16:creationId xmlns:a16="http://schemas.microsoft.com/office/drawing/2014/main" id="{0DC80F62-61CC-494D-9703-3987DA145C58}"/>
               </a:ext>
             </a:extLst>
           </p:cNvPr>
@@ -11254,77 +11263,7 @@
         </p:nvSpPr>
         <p:spPr>
           <a:xfrm>
-            <a:off x="3129146" y="6482150"/>
-            <a:ext cx="1929033" cy="307777"/>
-          </a:xfrm>
-          <a:prstGeom prst="rect">
-            <a:avLst/>
-          </a:prstGeom>
-          <a:noFill/>
-        </p:spPr>
-        <p:txBody>
-          <a:bodyPr wrap="square">
-            <a:spAutoFit/>
-          </a:bodyPr>
-          <a:lstStyle/>
-          <a:p>
-            <a:r>
-              <a:rPr lang="en-US" altLang="ja-JP" sz="1400" dirty="0"/>
-              <a:t>Pin3 - TX, Pin8 - GND</a:t>
-            </a:r>
-          </a:p>
-        </p:txBody>
-      </p:sp>
-      <p:sp>
-        <p:nvSpPr>
-          <p:cNvPr id="25" name="テキスト ボックス 24">
-            <a:extLst>
-              <a:ext uri="{FF2B5EF4-FFF2-40B4-BE49-F238E27FC236}">
-                <a16:creationId xmlns:a16="http://schemas.microsoft.com/office/drawing/2014/main" id="{3B31730C-AA65-4B85-A02D-35060D158B37}"/>
-              </a:ext>
-            </a:extLst>
-          </p:cNvPr>
-          <p:cNvSpPr txBox="1"/>
-          <p:nvPr/>
-        </p:nvSpPr>
-        <p:spPr>
-          <a:xfrm>
-            <a:off x="5338017" y="6482150"/>
-            <a:ext cx="1929034" cy="307777"/>
-          </a:xfrm>
-          <a:prstGeom prst="rect">
-            <a:avLst/>
-          </a:prstGeom>
-          <a:noFill/>
-        </p:spPr>
-        <p:txBody>
-          <a:bodyPr wrap="square">
-            <a:spAutoFit/>
-          </a:bodyPr>
-          <a:lstStyle/>
-          <a:p>
-            <a:r>
-              <a:rPr lang="en-US" altLang="ja-JP" sz="1400" dirty="0"/>
-              <a:t>Pin1 - TX, Pin8 - GND</a:t>
-            </a:r>
-          </a:p>
-        </p:txBody>
-      </p:sp>
-      <p:sp>
-        <p:nvSpPr>
-          <p:cNvPr id="27" name="テキスト ボックス 26">
-            <a:extLst>
-              <a:ext uri="{FF2B5EF4-FFF2-40B4-BE49-F238E27FC236}">
-                <a16:creationId xmlns:a16="http://schemas.microsoft.com/office/drawing/2014/main" id="{0DC80F62-61CC-494D-9703-3987DA145C58}"/>
-              </a:ext>
-            </a:extLst>
-          </p:cNvPr>
-          <p:cNvSpPr txBox="1"/>
-          <p:nvPr/>
-        </p:nvSpPr>
-        <p:spPr>
-          <a:xfrm>
-            <a:off x="8325021" y="4340455"/>
+            <a:off x="9548667" y="5642688"/>
             <a:ext cx="2172581" cy="369332"/>
           </a:xfrm>
           <a:prstGeom prst="rect">
@@ -11390,11 +11329,11 @@
           <p:nvPr/>
         </p:nvPicPr>
         <p:blipFill>
-          <a:blip r:embed="rId6">
+          <a:blip r:embed="rId7">
             <a:extLst>
               <a:ext uri="{BEBA8EAE-BF5A-486C-A8C5-ECC9F3942E4B}">
                 <a14:imgProps xmlns:a14="http://schemas.microsoft.com/office/drawing/2010/main">
-                  <a14:imgLayer r:embed="rId7">
+                  <a14:imgLayer r:embed="rId8">
                     <a14:imgEffect>
                       <a14:backgroundRemoval t="9942" b="89474" l="7310" r="92690">
                         <a14:foregroundMark x1="75146" y1="29240" x2="40643" y2="53216"/>
@@ -11421,7 +11360,7 @@
         </p:blipFill>
         <p:spPr>
           <a:xfrm>
-            <a:off x="7625443" y="5488674"/>
+            <a:off x="7463731" y="5328154"/>
             <a:ext cx="879700" cy="879700"/>
           </a:xfrm>
           <a:prstGeom prst="rect">
@@ -11457,9 +11396,7 @@
           </a:prstGeom>
           <a:ln>
             <a:solidFill>
-              <a:schemeClr val="bg1">
-                <a:lumMod val="50000"/>
-              </a:schemeClr>
+              <a:srgbClr val="0045D0"/>
             </a:solidFill>
             <a:tailEnd type="triangle"/>
           </a:ln>
@@ -11505,9 +11442,7 @@
           </a:prstGeom>
           <a:ln>
             <a:solidFill>
-              <a:schemeClr val="bg1">
-                <a:lumMod val="50000"/>
-              </a:schemeClr>
+              <a:srgbClr val="0045D0"/>
             </a:solidFill>
             <a:tailEnd type="triangle"/>
           </a:ln>
@@ -11543,7 +11478,7 @@
         </p:nvCxnSpPr>
         <p:spPr>
           <a:xfrm flipV="1">
-            <a:off x="4095751" y="5111589"/>
+            <a:off x="4095751" y="5117685"/>
             <a:ext cx="3819524" cy="632788"/>
           </a:xfrm>
           <a:prstGeom prst="bentConnector3">
@@ -11552,6 +11487,11 @@
             </a:avLst>
           </a:prstGeom>
           <a:ln>
+            <a:solidFill>
+              <a:schemeClr val="bg1">
+                <a:lumMod val="65000"/>
+              </a:schemeClr>
+            </a:solidFill>
             <a:tailEnd type="triangle"/>
           </a:ln>
         </p:spPr>
@@ -11586,7 +11526,7 @@
         </p:nvCxnSpPr>
         <p:spPr>
           <a:xfrm flipV="1">
-            <a:off x="5965032" y="5111589"/>
+            <a:off x="5965032" y="5099397"/>
             <a:ext cx="1950243" cy="641511"/>
           </a:xfrm>
           <a:prstGeom prst="bentConnector3">
@@ -11595,6 +11535,9 @@
             </a:avLst>
           </a:prstGeom>
           <a:ln>
+            <a:solidFill>
+              <a:srgbClr val="FF0000"/>
+            </a:solidFill>
             <a:tailEnd type="triangle"/>
           </a:ln>
         </p:spPr>
@@ -11627,7 +11570,7 @@
         </p:nvSpPr>
         <p:spPr>
           <a:xfrm>
-            <a:off x="9529809" y="5884180"/>
+            <a:off x="9529809" y="5977900"/>
             <a:ext cx="2662191" cy="830997"/>
           </a:xfrm>
           <a:prstGeom prst="rect">
@@ -12053,6 +11996,15 @@
         <p:blipFill rotWithShape="1">
           <a:blip r:embed="rId4">
             <a:extLst>
+              <a:ext uri="{BEBA8EAE-BF5A-486C-A8C5-ECC9F3942E4B}">
+                <a14:imgProps xmlns:a14="http://schemas.microsoft.com/office/drawing/2010/main">
+                  <a14:imgLayer r:embed="rId5">
+                    <a14:imgEffect>
+                      <a14:brightnessContrast bright="40000" contrast="-40000"/>
+                    </a14:imgEffect>
+                  </a14:imgLayer>
+                </a14:imgProps>
+              </a:ext>
               <a:ext uri="{28A0092B-C50C-407E-A947-70E740481C1C}">
                 <a14:useLocalDpi xmlns:a14="http://schemas.microsoft.com/office/drawing/2010/main" val="0"/>
               </a:ext>
@@ -12096,6 +12048,9 @@
             </a:avLst>
           </a:prstGeom>
           <a:ln>
+            <a:solidFill>
+              <a:srgbClr val="92D050"/>
+            </a:solidFill>
             <a:tailEnd type="triangle"/>
           </a:ln>
         </p:spPr>
@@ -12128,7 +12083,7 @@
         </p:nvSpPr>
         <p:spPr>
           <a:xfrm>
-            <a:off x="4995360" y="4643865"/>
+            <a:off x="4995360" y="6413339"/>
             <a:ext cx="1257098" cy="307777"/>
           </a:xfrm>
           <a:prstGeom prst="rect">
@@ -12164,7 +12119,7 @@
         </p:nvSpPr>
         <p:spPr>
           <a:xfrm>
-            <a:off x="8325021" y="4340455"/>
+            <a:off x="9653490" y="5741255"/>
             <a:ext cx="2538510" cy="369332"/>
           </a:xfrm>
           <a:prstGeom prst="rect">
@@ -12219,6 +12174,9 @@
             </a:avLst>
           </a:prstGeom>
           <a:ln>
+            <a:solidFill>
+              <a:srgbClr val="FF0000"/>
+            </a:solidFill>
             <a:tailEnd type="triangle"/>
           </a:ln>
         </p:spPr>
@@ -12262,6 +12220,12 @@
             </a:avLst>
           </a:prstGeom>
           <a:ln>
+            <a:solidFill>
+              <a:schemeClr val="tx1">
+                <a:lumMod val="75000"/>
+                <a:lumOff val="25000"/>
+              </a:schemeClr>
+            </a:solidFill>
             <a:tailEnd type="triangle"/>
           </a:ln>
         </p:spPr>
@@ -12305,6 +12269,11 @@
             </a:avLst>
           </a:prstGeom>
           <a:ln>
+            <a:solidFill>
+              <a:schemeClr val="bg1">
+                <a:lumMod val="65000"/>
+              </a:schemeClr>
+            </a:solidFill>
             <a:tailEnd type="triangle"/>
           </a:ln>
         </p:spPr>
@@ -12348,6 +12317,12 @@
             </a:avLst>
           </a:prstGeom>
           <a:ln>
+            <a:solidFill>
+              <a:schemeClr val="accent1">
+                <a:lumMod val="60000"/>
+                <a:lumOff val="40000"/>
+              </a:schemeClr>
+            </a:solidFill>
             <a:tailEnd type="triangle"/>
           </a:ln>
         </p:spPr>
@@ -12392,9 +12367,7 @@
           </a:prstGeom>
           <a:ln>
             <a:solidFill>
-              <a:schemeClr val="bg1">
-                <a:lumMod val="50000"/>
-              </a:schemeClr>
+              <a:srgbClr val="0045D0"/>
             </a:solidFill>
             <a:tailEnd type="triangle"/>
           </a:ln>
@@ -12504,7 +12477,10 @@
           </a:prstGeom>
           <a:ln>
             <a:solidFill>
-              <a:srgbClr val="0070C0"/>
+              <a:schemeClr val="accent3">
+                <a:lumMod val="40000"/>
+                <a:lumOff val="60000"/>
+              </a:schemeClr>
             </a:solidFill>
             <a:tailEnd type="triangle"/>
           </a:ln>
@@ -12549,6 +12525,9 @@
             </a:avLst>
           </a:prstGeom>
           <a:ln>
+            <a:solidFill>
+              <a:srgbClr val="92D050"/>
+            </a:solidFill>
             <a:tailEnd type="triangle"/>
           </a:ln>
         </p:spPr>
@@ -12593,7 +12572,7 @@
           </a:prstGeom>
           <a:ln>
             <a:solidFill>
-              <a:srgbClr val="00B050"/>
+              <a:srgbClr val="FFC000"/>
             </a:solidFill>
             <a:tailEnd type="triangle"/>
           </a:ln>
@@ -12639,7 +12618,10 @@
           </a:prstGeom>
           <a:ln>
             <a:solidFill>
-              <a:srgbClr val="0070C0"/>
+              <a:schemeClr val="accent3">
+                <a:lumMod val="40000"/>
+                <a:lumOff val="60000"/>
+              </a:schemeClr>
             </a:solidFill>
             <a:tailEnd type="triangle"/>
           </a:ln>
@@ -12685,7 +12667,7 @@
           </a:prstGeom>
           <a:ln>
             <a:solidFill>
-              <a:srgbClr val="00B050"/>
+              <a:srgbClr val="FFC000"/>
             </a:solidFill>
             <a:tailEnd type="triangle"/>
           </a:ln>
@@ -12765,7 +12747,7 @@
           </a:prstGeom>
           <a:ln>
             <a:solidFill>
-              <a:srgbClr val="00B050"/>
+              <a:srgbClr val="FFC000"/>
             </a:solidFill>
           </a:ln>
         </p:spPr>
@@ -12808,7 +12790,10 @@
           </a:prstGeom>
           <a:ln>
             <a:solidFill>
-              <a:srgbClr val="0070C0"/>
+              <a:schemeClr val="accent3">
+                <a:lumMod val="40000"/>
+                <a:lumOff val="60000"/>
+              </a:schemeClr>
             </a:solidFill>
           </a:ln>
         </p:spPr>
@@ -12871,11 +12856,11 @@
           <p:nvPr/>
         </p:nvPicPr>
         <p:blipFill>
-          <a:blip r:embed="rId5">
+          <a:blip r:embed="rId6">
             <a:extLst>
               <a:ext uri="{BEBA8EAE-BF5A-486C-A8C5-ECC9F3942E4B}">
                 <a14:imgProps xmlns:a14="http://schemas.microsoft.com/office/drawing/2010/main">
-                  <a14:imgLayer r:embed="rId6">
+                  <a14:imgLayer r:embed="rId7">
                     <a14:imgEffect>
                       <a14:backgroundRemoval t="9942" b="89474" l="7310" r="92690">
                         <a14:foregroundMark x1="75146" y1="29240" x2="40643" y2="53216"/>
@@ -12902,8 +12887,8 @@
         </p:blipFill>
         <p:spPr>
           <a:xfrm>
-            <a:off x="7797604" y="6080329"/>
-            <a:ext cx="752144" cy="752144"/>
+            <a:off x="7730352" y="5314704"/>
+            <a:ext cx="574698" cy="574698"/>
           </a:xfrm>
           <a:prstGeom prst="rect">
             <a:avLst/>
@@ -13031,16 +13016,20 @@
               <a:t>Famicom</a:t>
             </a:r>
             <a:r>
+              <a:rPr lang="en-US" altLang="ja-JP" dirty="0"/>
+              <a:t> and</a:t>
+            </a:r>
+            <a:r>
               <a:rPr kumimoji="1" lang="en-US" altLang="ja-JP" dirty="0"/>
-              <a:t> (Square/Tri/Noise </a:t>
-            </a:r>
-            <a:r>
-              <a:rPr kumimoji="1" lang="en-US" altLang="ja-JP" dirty="0" err="1"/>
-              <a:t>ch</a:t>
+              <a:t> RP2A03</a:t>
+            </a:r>
+            <a:r>
+              <a:rPr kumimoji="1" lang="en-US" altLang="ja-JP" sz="1200" dirty="0"/>
+              <a:t>(No DAC)</a:t>
             </a:r>
             <a:r>
               <a:rPr kumimoji="1" lang="en-US" altLang="ja-JP" dirty="0"/>
-              <a:t> only).</a:t>
+              <a:t>/FDS/VRC6.</a:t>
             </a:r>
           </a:p>
           <a:p>
@@ -13205,7 +13194,7 @@
         </p:blipFill>
         <p:spPr>
           <a:xfrm>
-            <a:off x="3982174" y="4951642"/>
+            <a:off x="3982174" y="5016834"/>
             <a:ext cx="2892336" cy="1543849"/>
           </a:xfrm>
           <a:prstGeom prst="rect">
@@ -13227,8 +13216,8 @@
         </p:nvGrpSpPr>
         <p:grpSpPr>
           <a:xfrm>
-            <a:off x="7838509" y="4752044"/>
-            <a:ext cx="2659093" cy="2043975"/>
+            <a:off x="7838509" y="4817237"/>
+            <a:ext cx="2659093" cy="2040764"/>
             <a:chOff x="8285813" y="5095875"/>
             <a:chExt cx="2211789" cy="1700144"/>
           </a:xfrm>
@@ -13340,7 +13329,7 @@
         </p:nvCxnSpPr>
         <p:spPr>
           <a:xfrm>
-            <a:off x="5567802" y="5762459"/>
+            <a:off x="5567802" y="5827651"/>
             <a:ext cx="2357438" cy="238232"/>
           </a:xfrm>
           <a:prstGeom prst="bentConnector3">
@@ -13349,6 +13338,9 @@
             </a:avLst>
           </a:prstGeom>
           <a:ln>
+            <a:solidFill>
+              <a:srgbClr val="92D050"/>
+            </a:solidFill>
             <a:tailEnd type="triangle"/>
           </a:ln>
         </p:spPr>
@@ -13381,7 +13373,7 @@
         </p:nvSpPr>
         <p:spPr>
           <a:xfrm>
-            <a:off x="4995360" y="4643865"/>
+            <a:off x="4995360" y="6501613"/>
             <a:ext cx="1257098" cy="307777"/>
           </a:xfrm>
           <a:prstGeom prst="rect">
@@ -13417,7 +13409,7 @@
         </p:nvSpPr>
         <p:spPr>
           <a:xfrm>
-            <a:off x="8325021" y="4340455"/>
+            <a:off x="9602788" y="5837619"/>
             <a:ext cx="2538510" cy="369332"/>
           </a:xfrm>
           <a:prstGeom prst="rect">
@@ -13463,7 +13455,7 @@
         </p:nvCxnSpPr>
         <p:spPr>
           <a:xfrm flipV="1">
-            <a:off x="5772150" y="5108038"/>
+            <a:off x="5772150" y="5173230"/>
             <a:ext cx="2140969" cy="530553"/>
           </a:xfrm>
           <a:prstGeom prst="bentConnector3">
@@ -13472,6 +13464,9 @@
             </a:avLst>
           </a:prstGeom>
           <a:ln>
+            <a:solidFill>
+              <a:srgbClr val="FF0000"/>
+            </a:solidFill>
             <a:tailEnd type="triangle"/>
           </a:ln>
         </p:spPr>
@@ -13506,7 +13501,7 @@
         </p:nvCxnSpPr>
         <p:spPr>
           <a:xfrm flipV="1">
-            <a:off x="5641406" y="5191126"/>
+            <a:off x="5641406" y="5256318"/>
             <a:ext cx="2271713" cy="406883"/>
           </a:xfrm>
           <a:prstGeom prst="bentConnector3">
@@ -13515,6 +13510,12 @@
             </a:avLst>
           </a:prstGeom>
           <a:ln>
+            <a:solidFill>
+              <a:schemeClr val="tx1">
+                <a:lumMod val="85000"/>
+                <a:lumOff val="15000"/>
+              </a:schemeClr>
+            </a:solidFill>
             <a:tailEnd type="triangle"/>
           </a:ln>
         </p:spPr>
@@ -13549,7 +13550,7 @@
         </p:nvCxnSpPr>
         <p:spPr>
           <a:xfrm flipV="1">
-            <a:off x="5505450" y="5272807"/>
+            <a:off x="5505450" y="5337999"/>
             <a:ext cx="2407669" cy="300016"/>
           </a:xfrm>
           <a:prstGeom prst="bentConnector3">
@@ -13558,6 +13559,11 @@
             </a:avLst>
           </a:prstGeom>
           <a:ln>
+            <a:solidFill>
+              <a:schemeClr val="bg1">
+                <a:lumMod val="50000"/>
+              </a:schemeClr>
+            </a:solidFill>
             <a:tailEnd type="triangle"/>
           </a:ln>
         </p:spPr>
@@ -13592,7 +13598,7 @@
         </p:nvCxnSpPr>
         <p:spPr>
           <a:xfrm flipV="1">
-            <a:off x="5404563" y="5341143"/>
+            <a:off x="5404563" y="5406335"/>
             <a:ext cx="2504685" cy="201697"/>
           </a:xfrm>
           <a:prstGeom prst="bentConnector3">
@@ -13601,6 +13607,9 @@
             </a:avLst>
           </a:prstGeom>
           <a:ln>
+            <a:solidFill>
+              <a:schemeClr val="accent2"/>
+            </a:solidFill>
             <a:tailEnd type="triangle"/>
           </a:ln>
         </p:spPr>
@@ -13635,7 +13644,7 @@
         </p:nvCxnSpPr>
         <p:spPr>
           <a:xfrm flipV="1">
-            <a:off x="4995360" y="5029202"/>
+            <a:off x="4995360" y="5094394"/>
             <a:ext cx="2919915" cy="440282"/>
           </a:xfrm>
           <a:prstGeom prst="bentConnector3">
@@ -13645,9 +13654,7 @@
           </a:prstGeom>
           <a:ln>
             <a:solidFill>
-              <a:schemeClr val="bg1">
-                <a:lumMod val="50000"/>
-              </a:schemeClr>
+              <a:srgbClr val="0045D0"/>
             </a:solidFill>
             <a:tailEnd type="triangle"/>
           </a:ln>
@@ -13681,7 +13688,7 @@
         </p:nvSpPr>
         <p:spPr>
           <a:xfrm>
-            <a:off x="7880507" y="5890984"/>
+            <a:off x="7880507" y="5956176"/>
             <a:ext cx="485830" cy="200055"/>
           </a:xfrm>
           <a:prstGeom prst="rect">
@@ -13722,7 +13729,7 @@
         </p:nvCxnSpPr>
         <p:spPr>
           <a:xfrm rot="10800000" flipV="1">
-            <a:off x="8173677" y="5610224"/>
+            <a:off x="8173677" y="5675416"/>
             <a:ext cx="895755" cy="380635"/>
           </a:xfrm>
           <a:prstGeom prst="bentConnector3">
@@ -13731,6 +13738,9 @@
             </a:avLst>
           </a:prstGeom>
           <a:ln>
+            <a:solidFill>
+              <a:srgbClr val="92D050"/>
+            </a:solidFill>
             <a:tailEnd type="triangle"/>
           </a:ln>
         </p:spPr>
@@ -13763,12 +13773,17 @@
         </p:nvCxnSpPr>
         <p:spPr>
           <a:xfrm>
-            <a:off x="9069431" y="5413023"/>
+            <a:off x="9069431" y="5478215"/>
             <a:ext cx="0" cy="203865"/>
           </a:xfrm>
           <a:prstGeom prst="line">
             <a:avLst/>
           </a:prstGeom>
+          <a:ln>
+            <a:solidFill>
+              <a:srgbClr val="92D050"/>
+            </a:solidFill>
+          </a:ln>
         </p:spPr>
         <p:style>
           <a:lnRef idx="3">
@@ -13860,8 +13875,8 @@
         </p:blipFill>
         <p:spPr>
           <a:xfrm>
-            <a:off x="7797604" y="6080329"/>
-            <a:ext cx="752144" cy="752144"/>
+            <a:off x="7753997" y="5390471"/>
+            <a:ext cx="632790" cy="632790"/>
           </a:xfrm>
           <a:prstGeom prst="rect">
             <a:avLst/>
@@ -13884,7 +13899,7 @@
         </p:nvCxnSpPr>
         <p:spPr>
           <a:xfrm rot="10800000">
-            <a:off x="3763826" y="5275375"/>
+            <a:off x="3763826" y="5340567"/>
             <a:ext cx="1365396" cy="226884"/>
           </a:xfrm>
           <a:prstGeom prst="bentConnector3">
@@ -13893,6 +13908,11 @@
             </a:avLst>
           </a:prstGeom>
           <a:ln>
+            <a:solidFill>
+              <a:schemeClr val="bg1">
+                <a:lumMod val="50000"/>
+              </a:schemeClr>
+            </a:solidFill>
             <a:tailEnd type="triangle"/>
           </a:ln>
         </p:spPr>
@@ -13925,7 +13945,7 @@
         </p:nvSpPr>
         <p:spPr>
           <a:xfrm>
-            <a:off x="2940760" y="5115371"/>
+            <a:off x="2940760" y="5180563"/>
             <a:ext cx="1257098" cy="523220"/>
           </a:xfrm>
           <a:prstGeom prst="rect">
@@ -14043,7 +14063,7 @@
         </p:spPr>
         <p:txBody>
           <a:bodyPr>
-            <a:normAutofit/>
+            <a:normAutofit fontScale="92500" lnSpcReduction="10000"/>
           </a:bodyPr>
           <a:lstStyle/>
           <a:p>
@@ -14069,23 +14089,7 @@
             </a:r>
             <a:r>
               <a:rPr kumimoji="1" lang="en-US" altLang="ja-JP" dirty="0"/>
-              <a:t>(for SMS) or </a:t>
-            </a:r>
-            <a:r>
-              <a:rPr kumimoji="1" lang="en-US" altLang="ja-JP" dirty="0" err="1"/>
-              <a:t>VGMPlay_nes</a:t>
-            </a:r>
-            <a:r>
-              <a:rPr kumimoji="1" lang="en-US" altLang="ja-JP" dirty="0"/>
-              <a:t>*.</a:t>
-            </a:r>
-            <a:r>
-              <a:rPr kumimoji="1" lang="en-US" altLang="ja-JP" dirty="0" err="1"/>
-              <a:t>nes</a:t>
-            </a:r>
-            <a:r>
-              <a:rPr kumimoji="1" lang="en-US" altLang="ja-JP" dirty="0"/>
-              <a:t> (for </a:t>
+              <a:t>(for SMS) or VGMPlay_nes*.* (for </a:t>
             </a:r>
             <a:r>
               <a:rPr kumimoji="1" lang="en-US" altLang="ja-JP" dirty="0" err="1"/>
@@ -14093,7 +14097,36 @@
             </a:r>
             <a:r>
               <a:rPr kumimoji="1" lang="en-US" altLang="ja-JP" dirty="0"/>
-              <a:t>) to your FLASH Cart</a:t>
+              <a:t>) to your FLASH Cart.</a:t>
+            </a:r>
+          </a:p>
+          <a:p>
+            <a:pPr marL="457200" lvl="1" indent="0">
+              <a:buNone/>
+            </a:pPr>
+            <a:r>
+              <a:rPr lang="en-US" altLang="ja-JP" sz="1300" dirty="0"/>
+              <a:t>*VGMPlay_nes_vrc6/</a:t>
+            </a:r>
+            <a:r>
+              <a:rPr kumimoji="1" lang="en-US" altLang="ja-JP" sz="1300" dirty="0" err="1"/>
+              <a:t>fds</a:t>
+            </a:r>
+            <a:r>
+              <a:rPr kumimoji="1" lang="en-US" altLang="ja-JP" sz="1300" dirty="0"/>
+              <a:t> ROM does not show any screen but same </a:t>
+            </a:r>
+            <a:r>
+              <a:rPr lang="en-US" altLang="ja-JP" sz="1300" dirty="0"/>
+              <a:t>UI with </a:t>
+            </a:r>
+            <a:r>
+              <a:rPr kumimoji="1" lang="en-US" altLang="ja-JP" sz="1300" dirty="0" err="1"/>
+              <a:t>VGMPlay_nes.nes</a:t>
+            </a:r>
+            <a:r>
+              <a:rPr kumimoji="1" lang="en-US" altLang="ja-JP" sz="1300" dirty="0"/>
+              <a:t> UI</a:t>
             </a:r>
           </a:p>
           <a:p>

</xml_diff>

<commit_message>
Added ArpMethod property for FxSettings. Supported 64bit version of the SCCI.
</commit_message>
<xml_diff>
--- a/docs/MAmidiMEmo/Manual.pptx
+++ b/docs/MAmidiMEmo/Manual.pptx
@@ -5,7 +5,7 @@
     <p:sldMasterId id="2147483678" r:id="rId1"/>
   </p:sldMasterIdLst>
   <p:notesMasterIdLst>
-    <p:notesMasterId r:id="rId21"/>
+    <p:notesMasterId r:id="rId22"/>
   </p:notesMasterIdLst>
   <p:sldIdLst>
     <p:sldId id="256" r:id="rId2"/>
@@ -25,8 +25,9 @@
     <p:sldId id="274" r:id="rId16"/>
     <p:sldId id="277" r:id="rId17"/>
     <p:sldId id="273" r:id="rId18"/>
-    <p:sldId id="275" r:id="rId19"/>
-    <p:sldId id="264" r:id="rId20"/>
+    <p:sldId id="278" r:id="rId19"/>
+    <p:sldId id="275" r:id="rId20"/>
+    <p:sldId id="264" r:id="rId21"/>
   </p:sldIdLst>
   <p:sldSz cx="12192000" cy="6858000"/>
   <p:notesSz cx="6858000" cy="9144000"/>
@@ -215,7 +216,7 @@
           <a:p>
             <a:fld id="{581C28D8-13B6-41C3-9F5F-0284C569C6F1}" type="datetimeFigureOut">
               <a:rPr kumimoji="1" lang="ja-JP" altLang="en-US" smtClean="0"/>
-              <a:t>2021/6/26</a:t>
+              <a:t>2021/7/1</a:t>
             </a:fld>
             <a:endParaRPr kumimoji="1" lang="ja-JP" altLang="en-US"/>
           </a:p>
@@ -850,6 +851,90 @@
 </p:notes>
 </file>
 
+<file path=ppt/notesSlides/notesSlide5.xml><?xml version="1.0" encoding="utf-8"?>
+<p:notes xmlns:a="http://schemas.openxmlformats.org/drawingml/2006/main" xmlns:r="http://schemas.openxmlformats.org/officeDocument/2006/relationships" xmlns:p="http://schemas.openxmlformats.org/presentationml/2006/main">
+  <p:cSld>
+    <p:spTree>
+      <p:nvGrpSpPr>
+        <p:cNvPr id="1" name=""/>
+        <p:cNvGrpSpPr/>
+        <p:nvPr/>
+      </p:nvGrpSpPr>
+      <p:grpSpPr>
+        <a:xfrm>
+          <a:off x="0" y="0"/>
+          <a:ext cx="0" cy="0"/>
+          <a:chOff x="0" y="0"/>
+          <a:chExt cx="0" cy="0"/>
+        </a:xfrm>
+      </p:grpSpPr>
+      <p:sp>
+        <p:nvSpPr>
+          <p:cNvPr id="2" name="スライド イメージ プレースホルダー 1"/>
+          <p:cNvSpPr>
+            <a:spLocks noGrp="1" noRot="1" noChangeAspect="1"/>
+          </p:cNvSpPr>
+          <p:nvPr>
+            <p:ph type="sldImg"/>
+          </p:nvPr>
+        </p:nvSpPr>
+        <p:spPr/>
+      </p:sp>
+      <p:sp>
+        <p:nvSpPr>
+          <p:cNvPr id="3" name="ノート プレースホルダー 2"/>
+          <p:cNvSpPr>
+            <a:spLocks noGrp="1"/>
+          </p:cNvSpPr>
+          <p:nvPr>
+            <p:ph type="body" idx="1"/>
+          </p:nvPr>
+        </p:nvSpPr>
+        <p:spPr/>
+        <p:txBody>
+          <a:bodyPr/>
+          <a:lstStyle/>
+          <a:p>
+            <a:endParaRPr kumimoji="1" lang="ja-JP" altLang="en-US" dirty="0"/>
+          </a:p>
+        </p:txBody>
+      </p:sp>
+      <p:sp>
+        <p:nvSpPr>
+          <p:cNvPr id="4" name="スライド番号プレースホルダー 3"/>
+          <p:cNvSpPr>
+            <a:spLocks noGrp="1"/>
+          </p:cNvSpPr>
+          <p:nvPr>
+            <p:ph type="sldNum" sz="quarter" idx="5"/>
+          </p:nvPr>
+        </p:nvSpPr>
+        <p:spPr/>
+        <p:txBody>
+          <a:bodyPr/>
+          <a:lstStyle/>
+          <a:p>
+            <a:fld id="{E8D2F5C4-CB40-44D3-9C89-5ECCD9AB4B5C}" type="slidenum">
+              <a:rPr kumimoji="1" lang="ja-JP" altLang="en-US" smtClean="0"/>
+              <a:t>18</a:t>
+            </a:fld>
+            <a:endParaRPr kumimoji="1" lang="ja-JP" altLang="en-US"/>
+          </a:p>
+        </p:txBody>
+      </p:sp>
+    </p:spTree>
+    <p:extLst>
+      <p:ext uri="{BB962C8B-B14F-4D97-AF65-F5344CB8AC3E}">
+        <p14:creationId xmlns:p14="http://schemas.microsoft.com/office/powerpoint/2010/main" val="4133215805"/>
+      </p:ext>
+    </p:extLst>
+  </p:cSld>
+  <p:clrMapOvr>
+    <a:masterClrMapping/>
+  </p:clrMapOvr>
+</p:notes>
+</file>
+
 <file path=ppt/slideLayouts/slideLayout1.xml><?xml version="1.0" encoding="utf-8"?>
 <p:sldLayout xmlns:a="http://schemas.openxmlformats.org/drawingml/2006/main" xmlns:r="http://schemas.openxmlformats.org/officeDocument/2006/relationships" xmlns:p="http://schemas.openxmlformats.org/presentationml/2006/main" type="title" preserve="1">
   <p:cSld name="タイトル スライド">
@@ -1038,7 +1123,7 @@
           <a:p>
             <a:fld id="{B8625E62-B904-4691-B75E-EC1C32885285}" type="datetime1">
               <a:rPr kumimoji="1" lang="ja-JP" altLang="en-US" smtClean="0"/>
-              <a:t>2021/6/26</a:t>
+              <a:t>2021/7/1</a:t>
             </a:fld>
             <a:endParaRPr kumimoji="1" lang="ja-JP" altLang="en-US"/>
           </a:p>
@@ -1376,7 +1461,7 @@
           <a:p>
             <a:fld id="{A4C87007-2A40-4EFC-90A3-258EFA3C1001}" type="datetime1">
               <a:rPr kumimoji="1" lang="ja-JP" altLang="en-US" smtClean="0"/>
-              <a:t>2021/6/26</a:t>
+              <a:t>2021/7/1</a:t>
             </a:fld>
             <a:endParaRPr kumimoji="1" lang="ja-JP" altLang="en-US"/>
           </a:p>
@@ -1777,7 +1862,7 @@
           <a:p>
             <a:fld id="{0FE0D7FF-9203-4AA3-90FD-622674A14F90}" type="datetime1">
               <a:rPr kumimoji="1" lang="ja-JP" altLang="en-US" smtClean="0"/>
-              <a:t>2021/6/26</a:t>
+              <a:t>2021/7/1</a:t>
             </a:fld>
             <a:endParaRPr kumimoji="1" lang="ja-JP" altLang="en-US"/>
           </a:p>
@@ -2113,7 +2198,7 @@
           <a:p>
             <a:fld id="{D2D6E4D3-BEDB-4F35-876B-5B9AA41BFB5B}" type="datetime1">
               <a:rPr kumimoji="1" lang="ja-JP" altLang="en-US" smtClean="0"/>
-              <a:t>2021/6/26</a:t>
+              <a:t>2021/7/1</a:t>
             </a:fld>
             <a:endParaRPr kumimoji="1" lang="ja-JP" altLang="en-US"/>
           </a:p>
@@ -2433,7 +2518,7 @@
           <a:p>
             <a:fld id="{2ACD896E-FC14-4F25-BC47-18ABAEA9E1FE}" type="datetime1">
               <a:rPr kumimoji="1" lang="ja-JP" altLang="en-US" smtClean="0"/>
-              <a:t>2021/6/26</a:t>
+              <a:t>2021/7/1</a:t>
             </a:fld>
             <a:endParaRPr kumimoji="1" lang="ja-JP" altLang="en-US"/>
           </a:p>
@@ -2829,7 +2914,7 @@
           <a:p>
             <a:fld id="{54FC701B-2185-4987-B8E2-5507664B65F4}" type="datetime1">
               <a:rPr kumimoji="1" lang="ja-JP" altLang="en-US" smtClean="0"/>
-              <a:t>2021/6/26</a:t>
+              <a:t>2021/7/1</a:t>
             </a:fld>
             <a:endParaRPr kumimoji="1" lang="ja-JP" altLang="en-US"/>
           </a:p>
@@ -3118,7 +3203,7 @@
           <a:p>
             <a:fld id="{3FB4CDED-9617-418F-B546-D66B9BB6C35E}" type="datetime1">
               <a:rPr kumimoji="1" lang="ja-JP" altLang="en-US" smtClean="0"/>
-              <a:t>2021/6/26</a:t>
+              <a:t>2021/7/1</a:t>
             </a:fld>
             <a:endParaRPr kumimoji="1" lang="ja-JP" altLang="en-US"/>
           </a:p>
@@ -3412,7 +3497,7 @@
           <a:p>
             <a:fld id="{F5635D40-962A-46D7-8037-3F2900B5EB4D}" type="datetime1">
               <a:rPr kumimoji="1" lang="ja-JP" altLang="en-US" smtClean="0"/>
-              <a:t>2021/6/26</a:t>
+              <a:t>2021/7/1</a:t>
             </a:fld>
             <a:endParaRPr kumimoji="1" lang="ja-JP" altLang="en-US"/>
           </a:p>
@@ -3706,7 +3791,7 @@
           <a:p>
             <a:fld id="{741DA9A2-8356-4FFD-B66A-E38811049858}" type="datetime1">
               <a:rPr kumimoji="1" lang="ja-JP" altLang="en-US" smtClean="0"/>
-              <a:t>2021/6/26</a:t>
+              <a:t>2021/7/1</a:t>
             </a:fld>
             <a:endParaRPr kumimoji="1" lang="ja-JP" altLang="en-US"/>
           </a:p>
@@ -4035,7 +4120,7 @@
           <a:p>
             <a:fld id="{9DDE8989-88B8-4869-97D9-547531F13E13}" type="datetime1">
               <a:rPr kumimoji="1" lang="ja-JP" altLang="en-US" smtClean="0"/>
-              <a:t>2021/6/26</a:t>
+              <a:t>2021/7/1</a:t>
             </a:fld>
             <a:endParaRPr kumimoji="1" lang="ja-JP" altLang="en-US"/>
           </a:p>
@@ -4422,7 +4507,7 @@
           <a:p>
             <a:fld id="{81EC4031-B949-4300-AB3E-1551426E8631}" type="datetime1">
               <a:rPr kumimoji="1" lang="ja-JP" altLang="en-US" smtClean="0"/>
-              <a:t>2021/6/26</a:t>
+              <a:t>2021/7/1</a:t>
             </a:fld>
             <a:endParaRPr kumimoji="1" lang="ja-JP" altLang="en-US"/>
           </a:p>
@@ -4943,7 +5028,7 @@
           <a:p>
             <a:fld id="{F39E755E-A59D-4634-B604-E9BB568B1156}" type="datetime1">
               <a:rPr kumimoji="1" lang="ja-JP" altLang="en-US" smtClean="0"/>
-              <a:t>2021/6/26</a:t>
+              <a:t>2021/7/1</a:t>
             </a:fld>
             <a:endParaRPr kumimoji="1" lang="ja-JP" altLang="en-US"/>
           </a:p>
@@ -5148,7 +5233,7 @@
           <a:p>
             <a:fld id="{61DA38B3-7601-4256-ABFE-386B92B0EDB5}" type="datetime1">
               <a:rPr kumimoji="1" lang="ja-JP" altLang="en-US" smtClean="0"/>
-              <a:t>2021/6/26</a:t>
+              <a:t>2021/7/1</a:t>
             </a:fld>
             <a:endParaRPr kumimoji="1" lang="ja-JP" altLang="en-US"/>
           </a:p>
@@ -5325,7 +5410,7 @@
           <a:p>
             <a:fld id="{5A28ED6D-8A94-4DBA-8EF2-284D1A467CE8}" type="datetime1">
               <a:rPr kumimoji="1" lang="ja-JP" altLang="en-US" smtClean="0"/>
-              <a:t>2021/6/26</a:t>
+              <a:t>2021/7/1</a:t>
             </a:fld>
             <a:endParaRPr kumimoji="1" lang="ja-JP" altLang="en-US"/>
           </a:p>
@@ -5690,7 +5775,7 @@
           <a:p>
             <a:fld id="{B27B0317-28AF-43C5-8944-AADFA89E0149}" type="datetime1">
               <a:rPr kumimoji="1" lang="ja-JP" altLang="en-US" smtClean="0"/>
-              <a:t>2021/6/26</a:t>
+              <a:t>2021/7/1</a:t>
             </a:fld>
             <a:endParaRPr kumimoji="1" lang="ja-JP" altLang="en-US"/>
           </a:p>
@@ -6035,7 +6120,7 @@
           <a:p>
             <a:fld id="{A78D023C-C4FA-4CE8-B5BE-6798898EE377}" type="datetime1">
               <a:rPr kumimoji="1" lang="ja-JP" altLang="en-US" smtClean="0"/>
-              <a:t>2021/6/26</a:t>
+              <a:t>2021/7/1</a:t>
             </a:fld>
             <a:endParaRPr kumimoji="1" lang="ja-JP" altLang="en-US"/>
           </a:p>
@@ -8184,7 +8269,7 @@
           <a:p>
             <a:fld id="{99567159-F4A8-4352-915B-DDBEFEF4A4D6}" type="datetime1">
               <a:rPr kumimoji="1" lang="ja-JP" altLang="en-US" smtClean="0"/>
-              <a:t>2021/6/26</a:t>
+              <a:t>2021/7/1</a:t>
             </a:fld>
             <a:endParaRPr kumimoji="1" lang="ja-JP" altLang="en-US"/>
           </a:p>
@@ -14058,12 +14143,12 @@
         <p:spPr>
           <a:xfrm>
             <a:off x="2589212" y="2133600"/>
-            <a:ext cx="9602788" cy="3777622"/>
+            <a:ext cx="9602788" cy="4627808"/>
           </a:xfrm>
         </p:spPr>
         <p:txBody>
           <a:bodyPr>
-            <a:normAutofit fontScale="92500" lnSpcReduction="10000"/>
+            <a:normAutofit fontScale="92500" lnSpcReduction="20000"/>
           </a:bodyPr>
           <a:lstStyle/>
           <a:p>
@@ -14114,7 +14199,7 @@
             </a:r>
             <a:r>
               <a:rPr kumimoji="1" lang="en-US" altLang="ja-JP" sz="1300" dirty="0"/>
-              <a:t> ROM does not show any screen but same </a:t>
+              <a:t>/mmc5 ROM does not show any screen but same </a:t>
             </a:r>
             <a:r>
               <a:rPr lang="en-US" altLang="ja-JP" sz="1300" dirty="0"/>
@@ -14190,7 +14275,7 @@
             </a:pPr>
             <a:r>
               <a:rPr lang="en-US" altLang="ja-JP" dirty="0"/>
-              <a:t>Done!</a:t>
+              <a:t>Reset your console and push [Panic!] button</a:t>
             </a:r>
           </a:p>
           <a:p>
@@ -14199,6 +14284,34 @@
               <a:buAutoNum type="arabicPeriod" startAt="3"/>
             </a:pPr>
             <a:r>
+              <a:rPr lang="en-US" altLang="ja-JP" dirty="0"/>
+              <a:t>(</a:t>
+            </a:r>
+            <a:r>
+              <a:rPr lang="en-US" altLang="ja-JP" dirty="0" err="1"/>
+              <a:t>Famicom</a:t>
+            </a:r>
+            <a:r>
+              <a:rPr lang="en-US" altLang="ja-JP" dirty="0"/>
+              <a:t> only)Re-send DPCM data.</a:t>
+            </a:r>
+          </a:p>
+          <a:p>
+            <a:pPr>
+              <a:buFont typeface="+mj-lt"/>
+              <a:buAutoNum type="arabicPeriod" startAt="3"/>
+            </a:pPr>
+            <a:r>
+              <a:rPr lang="en-US" altLang="ja-JP" dirty="0"/>
+              <a:t>Done! </a:t>
+            </a:r>
+          </a:p>
+          <a:p>
+            <a:pPr>
+              <a:buFont typeface="+mj-lt"/>
+              <a:buAutoNum type="arabicPeriod" startAt="3"/>
+            </a:pPr>
+            <a:r>
               <a:rPr kumimoji="1" lang="en-US" altLang="ja-JP" dirty="0"/>
               <a:t>I</a:t>
             </a:r>
@@ -14228,6 +14341,35 @@
             <a:r>
               <a:rPr lang="en-US" altLang="ja-JP" dirty="0"/>
               <a:t>Or, please contact me.</a:t>
+            </a:r>
+            <a:br>
+              <a:rPr lang="en-US" altLang="ja-JP" dirty="0"/>
+            </a:br>
+            <a:br>
+              <a:rPr lang="en-US" altLang="ja-JP" dirty="0"/>
+            </a:br>
+            <a:r>
+              <a:rPr lang="en-US" altLang="ja-JP" sz="1800" dirty="0">
+                <a:solidFill>
+                  <a:srgbClr val="FF0000"/>
+                </a:solidFill>
+              </a:rPr>
+              <a:t>*Some UART dongles may not work properly.</a:t>
+            </a:r>
+            <a:br>
+              <a:rPr lang="en-US" altLang="ja-JP" sz="1800" dirty="0">
+                <a:solidFill>
+                  <a:srgbClr val="FF0000"/>
+                </a:solidFill>
+              </a:rPr>
+            </a:br>
+            <a:r>
+              <a:rPr lang="en-US" altLang="ja-JP" sz="1800" dirty="0">
+                <a:solidFill>
+                  <a:srgbClr val="FF0000"/>
+                </a:solidFill>
+              </a:rPr>
+              <a:t>*Compatible consoles may not work properly.</a:t>
             </a:r>
             <a:endParaRPr kumimoji="1" lang="ja-JP" altLang="en-US" dirty="0"/>
           </a:p>
@@ -14289,65 +14431,6 @@
               <a:t>17</a:t>
             </a:fld>
             <a:endParaRPr kumimoji="1" lang="ja-JP" altLang="en-US"/>
-          </a:p>
-        </p:txBody>
-      </p:sp>
-      <p:sp>
-        <p:nvSpPr>
-          <p:cNvPr id="7" name="テキスト ボックス 6">
-            <a:extLst>
-              <a:ext uri="{FF2B5EF4-FFF2-40B4-BE49-F238E27FC236}">
-                <a16:creationId xmlns:a16="http://schemas.microsoft.com/office/drawing/2014/main" id="{79481DCC-C69C-4094-8F11-85281F2345A8}"/>
-              </a:ext>
-            </a:extLst>
-          </p:cNvPr>
-          <p:cNvSpPr txBox="1"/>
-          <p:nvPr/>
-        </p:nvSpPr>
-        <p:spPr>
-          <a:xfrm>
-            <a:off x="3045229" y="5952574"/>
-            <a:ext cx="6101542" cy="584775"/>
-          </a:xfrm>
-          <a:prstGeom prst="rect">
-            <a:avLst/>
-          </a:prstGeom>
-          <a:noFill/>
-        </p:spPr>
-        <p:txBody>
-          <a:bodyPr wrap="square">
-            <a:spAutoFit/>
-          </a:bodyPr>
-          <a:lstStyle/>
-          <a:p>
-            <a:r>
-              <a:rPr lang="en-US" altLang="ja-JP" sz="1600" dirty="0">
-                <a:solidFill>
-                  <a:srgbClr val="FF0000"/>
-                </a:solidFill>
-              </a:rPr>
-              <a:t>*Some UART dongles may not work properly.</a:t>
-            </a:r>
-            <a:br>
-              <a:rPr lang="en-US" altLang="ja-JP" sz="1600" dirty="0">
-                <a:solidFill>
-                  <a:srgbClr val="FF0000"/>
-                </a:solidFill>
-              </a:rPr>
-            </a:br>
-            <a:r>
-              <a:rPr lang="en-US" altLang="ja-JP" sz="1600" dirty="0">
-                <a:solidFill>
-                  <a:srgbClr val="FF0000"/>
-                </a:solidFill>
-              </a:rPr>
-              <a:t>*Compatible consoles may not work properly.</a:t>
-            </a:r>
-            <a:endParaRPr kumimoji="1" lang="ja-JP" altLang="en-US" sz="1600" dirty="0">
-              <a:solidFill>
-                <a:srgbClr val="FF0000"/>
-              </a:solidFill>
-            </a:endParaRPr>
           </a:p>
         </p:txBody>
       </p:sp>
@@ -14386,7 +14469,7 @@
           <p:cNvPr id="2" name="タイトル 1">
             <a:extLst>
               <a:ext uri="{FF2B5EF4-FFF2-40B4-BE49-F238E27FC236}">
-                <a16:creationId xmlns:a16="http://schemas.microsoft.com/office/drawing/2014/main" id="{45F6BDA5-EAAF-47BF-BA28-5541807FE9EF}"/>
+                <a16:creationId xmlns:a16="http://schemas.microsoft.com/office/drawing/2014/main" id="{DF515C61-C958-43BC-BAFF-3C6346E55E36}"/>
               </a:ext>
             </a:extLst>
           </p:cNvPr>
@@ -14403,12 +14486,23 @@
           <a:lstStyle/>
           <a:p>
             <a:r>
+              <a:rPr kumimoji="1" lang="en-US" altLang="ja-JP" dirty="0"/>
+              <a:t>VGM Sound Interface(VSIF)</a:t>
+            </a:r>
+            <a:br>
+              <a:rPr kumimoji="1" lang="en-US" altLang="ja-JP" dirty="0"/>
+            </a:br>
+            <a:r>
+              <a:rPr kumimoji="1" lang="en-US" altLang="ja-JP" dirty="0"/>
+              <a:t>for </a:t>
+            </a:r>
+            <a:r>
               <a:rPr kumimoji="1" lang="en-US" altLang="ja-JP" dirty="0" err="1"/>
-              <a:t>VGMP</a:t>
-            </a:r>
-            <a:r>
-              <a:rPr lang="en-US" altLang="ja-JP" dirty="0" err="1"/>
-              <a:t>layer</a:t>
+              <a:t>Famicom</a:t>
+            </a:r>
+            <a:r>
+              <a:rPr kumimoji="1" lang="en-US" altLang="ja-JP" dirty="0"/>
+              <a:t> spec</a:t>
             </a:r>
             <a:endParaRPr kumimoji="1" lang="ja-JP" altLang="en-US" dirty="0"/>
           </a:p>
@@ -14419,7 +14513,7 @@
           <p:cNvPr id="4" name="スライド番号プレースホルダー 3">
             <a:extLst>
               <a:ext uri="{FF2B5EF4-FFF2-40B4-BE49-F238E27FC236}">
-                <a16:creationId xmlns:a16="http://schemas.microsoft.com/office/drawing/2014/main" id="{F3E89AAB-4727-42E3-A2B2-F5E25345DCC6}"/>
+                <a16:creationId xmlns:a16="http://schemas.microsoft.com/office/drawing/2014/main" id="{455F9055-FE97-49E6-B05C-BBC13F55BB4C}"/>
               </a:ext>
             </a:extLst>
           </p:cNvPr>
@@ -14443,394 +14537,1366 @@
           </a:p>
         </p:txBody>
       </p:sp>
-      <p:pic>
-        <p:nvPicPr>
-          <p:cNvPr id="8" name="図 7">
+      <p:graphicFrame>
+        <p:nvGraphicFramePr>
+          <p:cNvPr id="9" name="表 9">
             <a:extLst>
               <a:ext uri="{FF2B5EF4-FFF2-40B4-BE49-F238E27FC236}">
-                <a16:creationId xmlns:a16="http://schemas.microsoft.com/office/drawing/2014/main" id="{0EDBB92D-1466-4E68-9949-79578CDDF792}"/>
+                <a16:creationId xmlns:a16="http://schemas.microsoft.com/office/drawing/2014/main" id="{D6033DBE-4C7E-4D9C-9F26-C2F7E9BC58D6}"/>
               </a:ext>
             </a:extLst>
           </p:cNvPr>
-          <p:cNvPicPr>
-            <a:picLocks noChangeAspect="1"/>
-          </p:cNvPicPr>
+          <p:cNvGraphicFramePr>
+            <a:graphicFrameLocks noGrp="1"/>
+          </p:cNvGraphicFramePr>
+          <p:nvPr>
+            <p:extLst>
+              <p:ext uri="{D42A27DB-BD31-4B8C-83A1-F6EECF244321}">
+                <p14:modId xmlns:p14="http://schemas.microsoft.com/office/powerpoint/2010/main" val="3009695579"/>
+              </p:ext>
+            </p:extLst>
+          </p:nvPr>
+        </p:nvGraphicFramePr>
+        <p:xfrm>
+          <a:off x="2212302" y="2194297"/>
+          <a:ext cx="9835885" cy="3235960"/>
+        </p:xfrm>
+        <a:graphic>
+          <a:graphicData uri="http://schemas.openxmlformats.org/drawingml/2006/table">
+            <a:tbl>
+              <a:tblPr firstRow="1" bandRow="1">
+                <a:tableStyleId>{5C22544A-7EE6-4342-B048-85BDC9FD1C3A}</a:tableStyleId>
+              </a:tblPr>
+              <a:tblGrid>
+                <a:gridCol w="1967177">
+                  <a:extLst>
+                    <a:ext uri="{9D8B030D-6E8A-4147-A177-3AD203B41FA5}">
+                      <a16:colId xmlns:a16="http://schemas.microsoft.com/office/drawing/2014/main" val="4242914750"/>
+                    </a:ext>
+                  </a:extLst>
+                </a:gridCol>
+                <a:gridCol w="1967177">
+                  <a:extLst>
+                    <a:ext uri="{9D8B030D-6E8A-4147-A177-3AD203B41FA5}">
+                      <a16:colId xmlns:a16="http://schemas.microsoft.com/office/drawing/2014/main" val="1550408137"/>
+                    </a:ext>
+                  </a:extLst>
+                </a:gridCol>
+                <a:gridCol w="1967177">
+                  <a:extLst>
+                    <a:ext uri="{9D8B030D-6E8A-4147-A177-3AD203B41FA5}">
+                      <a16:colId xmlns:a16="http://schemas.microsoft.com/office/drawing/2014/main" val="688472835"/>
+                    </a:ext>
+                  </a:extLst>
+                </a:gridCol>
+                <a:gridCol w="1967177">
+                  <a:extLst>
+                    <a:ext uri="{9D8B030D-6E8A-4147-A177-3AD203B41FA5}">
+                      <a16:colId xmlns:a16="http://schemas.microsoft.com/office/drawing/2014/main" val="2229651630"/>
+                    </a:ext>
+                  </a:extLst>
+                </a:gridCol>
+                <a:gridCol w="1967177">
+                  <a:extLst>
+                    <a:ext uri="{9D8B030D-6E8A-4147-A177-3AD203B41FA5}">
+                      <a16:colId xmlns:a16="http://schemas.microsoft.com/office/drawing/2014/main" val="2044249754"/>
+                    </a:ext>
+                  </a:extLst>
+                </a:gridCol>
+              </a:tblGrid>
+              <a:tr h="370840">
+                <a:tc>
+                  <a:txBody>
+                    <a:bodyPr/>
+                    <a:lstStyle/>
+                    <a:p>
+                      <a:r>
+                        <a:rPr kumimoji="1" lang="en-US" altLang="ja-JP" dirty="0"/>
+                        <a:t>Sound</a:t>
+                      </a:r>
+                      <a:endParaRPr kumimoji="1" lang="ja-JP" altLang="en-US" dirty="0"/>
+                    </a:p>
+                  </a:txBody>
+                  <a:tcPr>
+                    <a:solidFill>
+                      <a:schemeClr val="accent5"/>
+                    </a:solidFill>
+                  </a:tcPr>
+                </a:tc>
+                <a:tc>
+                  <a:txBody>
+                    <a:bodyPr/>
+                    <a:lstStyle/>
+                    <a:p>
+                      <a:r>
+                        <a:rPr kumimoji="1" lang="en-US" altLang="ja-JP" dirty="0"/>
+                        <a:t>Normal ROM</a:t>
+                      </a:r>
+                    </a:p>
+                    <a:p>
+                      <a:r>
+                        <a:rPr kumimoji="1" lang="en-US" altLang="ja-JP" dirty="0"/>
+                        <a:t>(Mapper 0)</a:t>
+                      </a:r>
+                      <a:endParaRPr kumimoji="1" lang="ja-JP" altLang="en-US" dirty="0"/>
+                    </a:p>
+                  </a:txBody>
+                  <a:tcPr/>
+                </a:tc>
+                <a:tc>
+                  <a:txBody>
+                    <a:bodyPr/>
+                    <a:lstStyle/>
+                    <a:p>
+                      <a:r>
+                        <a:rPr kumimoji="1" lang="en-US" altLang="ja-JP"/>
+                        <a:t>FDS IMAGE</a:t>
+                      </a:r>
+                      <a:r>
+                        <a:rPr kumimoji="1" lang="en-US" altLang="ja-JP" b="1" baseline="30000">
+                          <a:solidFill>
+                            <a:srgbClr val="FF0000"/>
+                          </a:solidFill>
+                        </a:rPr>
+                        <a:t>*</a:t>
+                      </a:r>
+                      <a:r>
+                        <a:rPr kumimoji="1" lang="en-US" altLang="ja-JP" b="1" baseline="30000" dirty="0">
+                          <a:solidFill>
+                            <a:srgbClr val="FF0000"/>
+                          </a:solidFill>
+                        </a:rPr>
+                        <a:t>2</a:t>
+                      </a:r>
+                      <a:endParaRPr kumimoji="1" lang="ja-JP" altLang="en-US" dirty="0"/>
+                    </a:p>
+                  </a:txBody>
+                  <a:tcPr/>
+                </a:tc>
+                <a:tc>
+                  <a:txBody>
+                    <a:bodyPr/>
+                    <a:lstStyle/>
+                    <a:p>
+                      <a:r>
+                        <a:rPr kumimoji="1" lang="en-US" altLang="ja-JP" dirty="0"/>
+                        <a:t>VRC6 ROM</a:t>
+                      </a:r>
+                      <a:r>
+                        <a:rPr kumimoji="1" lang="en-US" altLang="ja-JP" b="1" baseline="30000" dirty="0">
+                          <a:solidFill>
+                            <a:srgbClr val="FF0000"/>
+                          </a:solidFill>
+                        </a:rPr>
+                        <a:t>*2</a:t>
+                      </a:r>
+                    </a:p>
+                    <a:p>
+                      <a:pPr marL="0" marR="0" lvl="0" indent="0" algn="l" defTabSz="457200" rtl="0" eaLnBrk="1" fontAlgn="auto" latinLnBrk="0" hangingPunct="1">
+                        <a:lnSpc>
+                          <a:spcPct val="100000"/>
+                        </a:lnSpc>
+                        <a:spcBef>
+                          <a:spcPts val="0"/>
+                        </a:spcBef>
+                        <a:spcAft>
+                          <a:spcPts val="0"/>
+                        </a:spcAft>
+                        <a:buClrTx/>
+                        <a:buSzTx/>
+                        <a:buFontTx/>
+                        <a:buNone/>
+                        <a:tabLst/>
+                        <a:defRPr/>
+                      </a:pPr>
+                      <a:r>
+                        <a:rPr kumimoji="1" lang="en-US" altLang="ja-JP" dirty="0"/>
+                        <a:t>(Mapper 24)</a:t>
+                      </a:r>
+                      <a:endParaRPr kumimoji="1" lang="ja-JP" altLang="en-US" dirty="0"/>
+                    </a:p>
+                  </a:txBody>
+                  <a:tcPr/>
+                </a:tc>
+                <a:tc>
+                  <a:txBody>
+                    <a:bodyPr/>
+                    <a:lstStyle/>
+                    <a:p>
+                      <a:r>
+                        <a:rPr kumimoji="1" lang="en-US" altLang="ja-JP" dirty="0"/>
+                        <a:t>MMC5 ROM</a:t>
+                      </a:r>
+                      <a:r>
+                        <a:rPr kumimoji="1" lang="en-US" altLang="ja-JP" b="1" baseline="30000" dirty="0">
+                          <a:solidFill>
+                            <a:srgbClr val="FF0000"/>
+                          </a:solidFill>
+                        </a:rPr>
+                        <a:t>*2*3</a:t>
+                      </a:r>
+                    </a:p>
+                    <a:p>
+                      <a:r>
+                        <a:rPr kumimoji="1" lang="en-US" altLang="ja-JP" dirty="0"/>
+                        <a:t>(Mapper 5)</a:t>
+                      </a:r>
+                      <a:endParaRPr kumimoji="1" lang="ja-JP" altLang="en-US" dirty="0"/>
+                    </a:p>
+                  </a:txBody>
+                  <a:tcPr/>
+                </a:tc>
+                <a:extLst>
+                  <a:ext uri="{0D108BD9-81ED-4DB2-BD59-A6C34878D82A}">
+                    <a16:rowId xmlns:a16="http://schemas.microsoft.com/office/drawing/2014/main" val="2260063609"/>
+                  </a:ext>
+                </a:extLst>
+              </a:tr>
+              <a:tr h="370840">
+                <a:tc>
+                  <a:txBody>
+                    <a:bodyPr/>
+                    <a:lstStyle/>
+                    <a:p>
+                      <a:r>
+                        <a:rPr kumimoji="1" lang="en-US" altLang="ja-JP" dirty="0"/>
+                        <a:t>Square</a:t>
+                      </a:r>
+                      <a:endParaRPr kumimoji="1" lang="ja-JP" altLang="en-US" dirty="0"/>
+                    </a:p>
+                  </a:txBody>
+                  <a:tcPr>
+                    <a:solidFill>
+                      <a:schemeClr val="accent5">
+                        <a:lumMod val="40000"/>
+                        <a:lumOff val="60000"/>
+                      </a:schemeClr>
+                    </a:solidFill>
+                  </a:tcPr>
+                </a:tc>
+                <a:tc>
+                  <a:txBody>
+                    <a:bodyPr/>
+                    <a:lstStyle/>
+                    <a:p>
+                      <a:r>
+                        <a:rPr kumimoji="1" lang="en-US" altLang="ja-JP" b="1" dirty="0">
+                          <a:solidFill>
+                            <a:srgbClr val="00B050"/>
+                          </a:solidFill>
+                        </a:rPr>
+                        <a:t>OK</a:t>
+                      </a:r>
+                      <a:endParaRPr kumimoji="1" lang="ja-JP" altLang="en-US" b="1" dirty="0">
+                        <a:solidFill>
+                          <a:srgbClr val="00B050"/>
+                        </a:solidFill>
+                      </a:endParaRPr>
+                    </a:p>
+                  </a:txBody>
+                  <a:tcPr/>
+                </a:tc>
+                <a:tc>
+                  <a:txBody>
+                    <a:bodyPr/>
+                    <a:lstStyle/>
+                    <a:p>
+                      <a:r>
+                        <a:rPr kumimoji="1" lang="en-US" altLang="ja-JP" b="1" dirty="0">
+                          <a:solidFill>
+                            <a:srgbClr val="00B050"/>
+                          </a:solidFill>
+                        </a:rPr>
+                        <a:t>OK</a:t>
+                      </a:r>
+                      <a:endParaRPr kumimoji="1" lang="ja-JP" altLang="en-US" dirty="0"/>
+                    </a:p>
+                  </a:txBody>
+                  <a:tcPr/>
+                </a:tc>
+                <a:tc>
+                  <a:txBody>
+                    <a:bodyPr/>
+                    <a:lstStyle/>
+                    <a:p>
+                      <a:r>
+                        <a:rPr kumimoji="1" lang="en-US" altLang="ja-JP" b="1" dirty="0">
+                          <a:solidFill>
+                            <a:srgbClr val="00B050"/>
+                          </a:solidFill>
+                        </a:rPr>
+                        <a:t>OK</a:t>
+                      </a:r>
+                      <a:endParaRPr kumimoji="1" lang="ja-JP" altLang="en-US" dirty="0"/>
+                    </a:p>
+                  </a:txBody>
+                  <a:tcPr/>
+                </a:tc>
+                <a:tc>
+                  <a:txBody>
+                    <a:bodyPr/>
+                    <a:lstStyle/>
+                    <a:p>
+                      <a:r>
+                        <a:rPr kumimoji="1" lang="en-US" altLang="ja-JP" b="1" dirty="0">
+                          <a:solidFill>
+                            <a:srgbClr val="00B050"/>
+                          </a:solidFill>
+                        </a:rPr>
+                        <a:t>OK</a:t>
+                      </a:r>
+                      <a:endParaRPr kumimoji="1" lang="ja-JP" altLang="en-US" dirty="0"/>
+                    </a:p>
+                  </a:txBody>
+                  <a:tcPr/>
+                </a:tc>
+                <a:extLst>
+                  <a:ext uri="{0D108BD9-81ED-4DB2-BD59-A6C34878D82A}">
+                    <a16:rowId xmlns:a16="http://schemas.microsoft.com/office/drawing/2014/main" val="2644183734"/>
+                  </a:ext>
+                </a:extLst>
+              </a:tr>
+              <a:tr h="370840">
+                <a:tc>
+                  <a:txBody>
+                    <a:bodyPr/>
+                    <a:lstStyle/>
+                    <a:p>
+                      <a:r>
+                        <a:rPr kumimoji="1" lang="en-US" altLang="ja-JP" dirty="0"/>
+                        <a:t>Tri</a:t>
+                      </a:r>
+                      <a:endParaRPr kumimoji="1" lang="ja-JP" altLang="en-US" dirty="0"/>
+                    </a:p>
+                  </a:txBody>
+                  <a:tcPr>
+                    <a:solidFill>
+                      <a:schemeClr val="accent5">
+                        <a:lumMod val="20000"/>
+                        <a:lumOff val="80000"/>
+                      </a:schemeClr>
+                    </a:solidFill>
+                  </a:tcPr>
+                </a:tc>
+                <a:tc>
+                  <a:txBody>
+                    <a:bodyPr/>
+                    <a:lstStyle/>
+                    <a:p>
+                      <a:r>
+                        <a:rPr kumimoji="1" lang="en-US" altLang="ja-JP" b="1" dirty="0">
+                          <a:solidFill>
+                            <a:srgbClr val="00B050"/>
+                          </a:solidFill>
+                        </a:rPr>
+                        <a:t>OK</a:t>
+                      </a:r>
+                      <a:endParaRPr kumimoji="1" lang="ja-JP" altLang="en-US" b="1" dirty="0">
+                        <a:solidFill>
+                          <a:srgbClr val="00B050"/>
+                        </a:solidFill>
+                      </a:endParaRPr>
+                    </a:p>
+                  </a:txBody>
+                  <a:tcPr/>
+                </a:tc>
+                <a:tc>
+                  <a:txBody>
+                    <a:bodyPr/>
+                    <a:lstStyle/>
+                    <a:p>
+                      <a:r>
+                        <a:rPr kumimoji="1" lang="en-US" altLang="ja-JP" b="1" dirty="0">
+                          <a:solidFill>
+                            <a:srgbClr val="00B050"/>
+                          </a:solidFill>
+                        </a:rPr>
+                        <a:t>OK</a:t>
+                      </a:r>
+                      <a:endParaRPr kumimoji="1" lang="ja-JP" altLang="en-US" dirty="0"/>
+                    </a:p>
+                  </a:txBody>
+                  <a:tcPr/>
+                </a:tc>
+                <a:tc>
+                  <a:txBody>
+                    <a:bodyPr/>
+                    <a:lstStyle/>
+                    <a:p>
+                      <a:r>
+                        <a:rPr kumimoji="1" lang="en-US" altLang="ja-JP" b="1" dirty="0">
+                          <a:solidFill>
+                            <a:srgbClr val="00B050"/>
+                          </a:solidFill>
+                        </a:rPr>
+                        <a:t>OK</a:t>
+                      </a:r>
+                      <a:endParaRPr kumimoji="1" lang="ja-JP" altLang="en-US" dirty="0"/>
+                    </a:p>
+                  </a:txBody>
+                  <a:tcPr/>
+                </a:tc>
+                <a:tc>
+                  <a:txBody>
+                    <a:bodyPr/>
+                    <a:lstStyle/>
+                    <a:p>
+                      <a:r>
+                        <a:rPr kumimoji="1" lang="en-US" altLang="ja-JP" b="1" dirty="0">
+                          <a:solidFill>
+                            <a:srgbClr val="00B050"/>
+                          </a:solidFill>
+                        </a:rPr>
+                        <a:t>OK</a:t>
+                      </a:r>
+                      <a:endParaRPr kumimoji="1" lang="ja-JP" altLang="en-US" dirty="0"/>
+                    </a:p>
+                  </a:txBody>
+                  <a:tcPr/>
+                </a:tc>
+                <a:extLst>
+                  <a:ext uri="{0D108BD9-81ED-4DB2-BD59-A6C34878D82A}">
+                    <a16:rowId xmlns:a16="http://schemas.microsoft.com/office/drawing/2014/main" val="118565339"/>
+                  </a:ext>
+                </a:extLst>
+              </a:tr>
+              <a:tr h="370840">
+                <a:tc>
+                  <a:txBody>
+                    <a:bodyPr/>
+                    <a:lstStyle/>
+                    <a:p>
+                      <a:r>
+                        <a:rPr kumimoji="1" lang="en-US" altLang="ja-JP" dirty="0"/>
+                        <a:t>Noise</a:t>
+                      </a:r>
+                      <a:endParaRPr kumimoji="1" lang="ja-JP" altLang="en-US" dirty="0"/>
+                    </a:p>
+                  </a:txBody>
+                  <a:tcPr>
+                    <a:solidFill>
+                      <a:schemeClr val="accent5">
+                        <a:lumMod val="40000"/>
+                        <a:lumOff val="60000"/>
+                      </a:schemeClr>
+                    </a:solidFill>
+                  </a:tcPr>
+                </a:tc>
+                <a:tc>
+                  <a:txBody>
+                    <a:bodyPr/>
+                    <a:lstStyle/>
+                    <a:p>
+                      <a:r>
+                        <a:rPr kumimoji="1" lang="en-US" altLang="ja-JP" b="1" dirty="0">
+                          <a:solidFill>
+                            <a:srgbClr val="00B050"/>
+                          </a:solidFill>
+                        </a:rPr>
+                        <a:t>OK</a:t>
+                      </a:r>
+                      <a:endParaRPr kumimoji="1" lang="ja-JP" altLang="en-US" b="1" dirty="0">
+                        <a:solidFill>
+                          <a:srgbClr val="00B050"/>
+                        </a:solidFill>
+                      </a:endParaRPr>
+                    </a:p>
+                  </a:txBody>
+                  <a:tcPr/>
+                </a:tc>
+                <a:tc>
+                  <a:txBody>
+                    <a:bodyPr/>
+                    <a:lstStyle/>
+                    <a:p>
+                      <a:r>
+                        <a:rPr kumimoji="1" lang="en-US" altLang="ja-JP" b="1" dirty="0">
+                          <a:solidFill>
+                            <a:srgbClr val="00B050"/>
+                          </a:solidFill>
+                        </a:rPr>
+                        <a:t>OK</a:t>
+                      </a:r>
+                      <a:endParaRPr kumimoji="1" lang="ja-JP" altLang="en-US" dirty="0"/>
+                    </a:p>
+                  </a:txBody>
+                  <a:tcPr/>
+                </a:tc>
+                <a:tc>
+                  <a:txBody>
+                    <a:bodyPr/>
+                    <a:lstStyle/>
+                    <a:p>
+                      <a:r>
+                        <a:rPr kumimoji="1" lang="en-US" altLang="ja-JP" b="1" dirty="0">
+                          <a:solidFill>
+                            <a:srgbClr val="00B050"/>
+                          </a:solidFill>
+                        </a:rPr>
+                        <a:t>OK</a:t>
+                      </a:r>
+                      <a:endParaRPr kumimoji="1" lang="ja-JP" altLang="en-US" dirty="0"/>
+                    </a:p>
+                  </a:txBody>
+                  <a:tcPr/>
+                </a:tc>
+                <a:tc>
+                  <a:txBody>
+                    <a:bodyPr/>
+                    <a:lstStyle/>
+                    <a:p>
+                      <a:r>
+                        <a:rPr kumimoji="1" lang="en-US" altLang="ja-JP" b="1" dirty="0">
+                          <a:solidFill>
+                            <a:srgbClr val="00B050"/>
+                          </a:solidFill>
+                        </a:rPr>
+                        <a:t>OK</a:t>
+                      </a:r>
+                      <a:endParaRPr kumimoji="1" lang="ja-JP" altLang="en-US" dirty="0"/>
+                    </a:p>
+                  </a:txBody>
+                  <a:tcPr/>
+                </a:tc>
+                <a:extLst>
+                  <a:ext uri="{0D108BD9-81ED-4DB2-BD59-A6C34878D82A}">
+                    <a16:rowId xmlns:a16="http://schemas.microsoft.com/office/drawing/2014/main" val="3090321335"/>
+                  </a:ext>
+                </a:extLst>
+              </a:tr>
+              <a:tr h="370840">
+                <a:tc>
+                  <a:txBody>
+                    <a:bodyPr/>
+                    <a:lstStyle/>
+                    <a:p>
+                      <a:r>
+                        <a:rPr kumimoji="1" lang="en-US" altLang="ja-JP" dirty="0"/>
+                        <a:t>DPCM</a:t>
+                      </a:r>
+                      <a:endParaRPr kumimoji="1" lang="ja-JP" altLang="en-US" dirty="0"/>
+                    </a:p>
+                  </a:txBody>
+                  <a:tcPr>
+                    <a:solidFill>
+                      <a:schemeClr val="accent5">
+                        <a:lumMod val="20000"/>
+                        <a:lumOff val="80000"/>
+                      </a:schemeClr>
+                    </a:solidFill>
+                  </a:tcPr>
+                </a:tc>
+                <a:tc>
+                  <a:txBody>
+                    <a:bodyPr/>
+                    <a:lstStyle/>
+                    <a:p>
+                      <a:r>
+                        <a:rPr kumimoji="1" lang="en-US" altLang="ja-JP" b="1" dirty="0">
+                          <a:solidFill>
+                            <a:srgbClr val="FF0000"/>
+                          </a:solidFill>
+                        </a:rPr>
+                        <a:t>NO</a:t>
+                      </a:r>
+                      <a:endParaRPr kumimoji="1" lang="ja-JP" altLang="en-US" b="1" dirty="0">
+                        <a:solidFill>
+                          <a:srgbClr val="FF0000"/>
+                        </a:solidFill>
+                      </a:endParaRPr>
+                    </a:p>
+                  </a:txBody>
+                  <a:tcPr/>
+                </a:tc>
+                <a:tc>
+                  <a:txBody>
+                    <a:bodyPr/>
+                    <a:lstStyle/>
+                    <a:p>
+                      <a:pPr marL="0" marR="0" lvl="0" indent="0" algn="l" defTabSz="457200" rtl="0" eaLnBrk="1" fontAlgn="auto" latinLnBrk="0" hangingPunct="1">
+                        <a:lnSpc>
+                          <a:spcPct val="100000"/>
+                        </a:lnSpc>
+                        <a:spcBef>
+                          <a:spcPts val="0"/>
+                        </a:spcBef>
+                        <a:spcAft>
+                          <a:spcPts val="0"/>
+                        </a:spcAft>
+                        <a:buClrTx/>
+                        <a:buSzTx/>
+                        <a:buFontTx/>
+                        <a:buNone/>
+                        <a:tabLst/>
+                        <a:defRPr/>
+                      </a:pPr>
+                      <a:r>
+                        <a:rPr kumimoji="1" lang="en-US" altLang="ja-JP" b="1" dirty="0">
+                          <a:solidFill>
+                            <a:srgbClr val="00B050"/>
+                          </a:solidFill>
+                        </a:rPr>
+                        <a:t>OK</a:t>
+                      </a:r>
+                      <a:r>
+                        <a:rPr kumimoji="1" lang="en-US" altLang="ja-JP" sz="1200" b="1" dirty="0">
+                          <a:solidFill>
+                            <a:schemeClr val="tx1"/>
+                          </a:solidFill>
+                        </a:rPr>
+                        <a:t>(Up to 8KB)</a:t>
+                      </a:r>
+                      <a:endParaRPr kumimoji="1" lang="ja-JP" altLang="en-US" b="1" dirty="0">
+                        <a:solidFill>
+                          <a:schemeClr val="tx1"/>
+                        </a:solidFill>
+                      </a:endParaRPr>
+                    </a:p>
+                  </a:txBody>
+                  <a:tcPr/>
+                </a:tc>
+                <a:tc>
+                  <a:txBody>
+                    <a:bodyPr/>
+                    <a:lstStyle/>
+                    <a:p>
+                      <a:r>
+                        <a:rPr kumimoji="1" lang="en-US" altLang="ja-JP" b="1" dirty="0">
+                          <a:solidFill>
+                            <a:srgbClr val="FF0000"/>
+                          </a:solidFill>
+                        </a:rPr>
+                        <a:t>NO</a:t>
+                      </a:r>
+                      <a:endParaRPr kumimoji="1" lang="ja-JP" altLang="en-US" b="1" dirty="0">
+                        <a:solidFill>
+                          <a:srgbClr val="FF0000"/>
+                        </a:solidFill>
+                      </a:endParaRPr>
+                    </a:p>
+                  </a:txBody>
+                  <a:tcPr/>
+                </a:tc>
+                <a:tc>
+                  <a:txBody>
+                    <a:bodyPr/>
+                    <a:lstStyle/>
+                    <a:p>
+                      <a:pPr marL="0" marR="0" lvl="0" indent="0" algn="l" defTabSz="457200" rtl="0" eaLnBrk="1" fontAlgn="auto" latinLnBrk="0" hangingPunct="1">
+                        <a:lnSpc>
+                          <a:spcPct val="100000"/>
+                        </a:lnSpc>
+                        <a:spcBef>
+                          <a:spcPts val="0"/>
+                        </a:spcBef>
+                        <a:spcAft>
+                          <a:spcPts val="0"/>
+                        </a:spcAft>
+                        <a:buClrTx/>
+                        <a:buSzTx/>
+                        <a:buFontTx/>
+                        <a:buNone/>
+                        <a:tabLst/>
+                        <a:defRPr/>
+                      </a:pPr>
+                      <a:r>
+                        <a:rPr kumimoji="1" lang="en-US" altLang="ja-JP" sz="1800" b="1" i="0" u="none" strike="noStrike" kern="1200" cap="none" spc="0" normalizeH="0" baseline="0" noProof="0" dirty="0">
+                          <a:ln>
+                            <a:noFill/>
+                          </a:ln>
+                          <a:solidFill>
+                            <a:srgbClr val="00B050"/>
+                          </a:solidFill>
+                          <a:effectLst/>
+                          <a:uLnTx/>
+                          <a:uFillTx/>
+                          <a:latin typeface="+mn-lt"/>
+                          <a:ea typeface="+mn-ea"/>
+                          <a:cs typeface="+mn-cs"/>
+                        </a:rPr>
+                        <a:t>OK</a:t>
+                      </a:r>
+                      <a:r>
+                        <a:rPr kumimoji="1" lang="en-US" altLang="ja-JP" b="1" baseline="30000" dirty="0">
+                          <a:solidFill>
+                            <a:srgbClr val="FF0000"/>
+                          </a:solidFill>
+                        </a:rPr>
+                        <a:t>*1</a:t>
+                      </a:r>
+                      <a:r>
+                        <a:rPr kumimoji="1" lang="en-US" altLang="ja-JP" sz="1200" b="1" baseline="30000" dirty="0">
+                          <a:solidFill>
+                            <a:srgbClr val="00B050"/>
+                          </a:solidFill>
+                        </a:rPr>
+                        <a:t> </a:t>
+                      </a:r>
+                      <a:r>
+                        <a:rPr kumimoji="1" lang="en-US" altLang="ja-JP" sz="1200" b="1" i="0" u="none" strike="noStrike" kern="1200" cap="none" spc="0" normalizeH="0" baseline="0" noProof="0" dirty="0">
+                          <a:ln>
+                            <a:noFill/>
+                          </a:ln>
+                          <a:solidFill>
+                            <a:prstClr val="black"/>
+                          </a:solidFill>
+                          <a:effectLst/>
+                          <a:uLnTx/>
+                          <a:uFillTx/>
+                          <a:latin typeface="+mn-lt"/>
+                          <a:ea typeface="+mn-ea"/>
+                          <a:cs typeface="+mn-cs"/>
+                        </a:rPr>
+                        <a:t>(Up to 64KB)</a:t>
+                      </a:r>
+                      <a:endParaRPr kumimoji="1" lang="ja-JP" altLang="en-US" sz="1800" b="1" i="0" u="none" strike="noStrike" kern="1200" cap="none" spc="0" normalizeH="0" baseline="0" noProof="0" dirty="0">
+                        <a:ln>
+                          <a:noFill/>
+                        </a:ln>
+                        <a:solidFill>
+                          <a:prstClr val="black"/>
+                        </a:solidFill>
+                        <a:effectLst/>
+                        <a:uLnTx/>
+                        <a:uFillTx/>
+                        <a:latin typeface="+mn-lt"/>
+                        <a:ea typeface="+mn-ea"/>
+                        <a:cs typeface="+mn-cs"/>
+                      </a:endParaRPr>
+                    </a:p>
+                  </a:txBody>
+                  <a:tcPr/>
+                </a:tc>
+                <a:extLst>
+                  <a:ext uri="{0D108BD9-81ED-4DB2-BD59-A6C34878D82A}">
+                    <a16:rowId xmlns:a16="http://schemas.microsoft.com/office/drawing/2014/main" val="3270944413"/>
+                  </a:ext>
+                </a:extLst>
+              </a:tr>
+              <a:tr h="370840">
+                <a:tc>
+                  <a:txBody>
+                    <a:bodyPr/>
+                    <a:lstStyle/>
+                    <a:p>
+                      <a:r>
+                        <a:rPr kumimoji="1" lang="en-US" altLang="ja-JP" dirty="0"/>
+                        <a:t>Ext. </a:t>
+                      </a:r>
+                      <a:r>
+                        <a:rPr kumimoji="1" lang="en-US" altLang="ja-JP" dirty="0" err="1"/>
+                        <a:t>Snd</a:t>
+                      </a:r>
+                      <a:r>
+                        <a:rPr kumimoji="1" lang="en-US" altLang="ja-JP" dirty="0"/>
+                        <a:t> FDS</a:t>
+                      </a:r>
+                      <a:endParaRPr kumimoji="1" lang="ja-JP" altLang="en-US" dirty="0"/>
+                    </a:p>
+                  </a:txBody>
+                  <a:tcPr>
+                    <a:solidFill>
+                      <a:schemeClr val="accent5">
+                        <a:lumMod val="40000"/>
+                        <a:lumOff val="60000"/>
+                      </a:schemeClr>
+                    </a:solidFill>
+                  </a:tcPr>
+                </a:tc>
+                <a:tc>
+                  <a:txBody>
+                    <a:bodyPr/>
+                    <a:lstStyle/>
+                    <a:p>
+                      <a:pPr marL="0" marR="0" lvl="0" indent="0" algn="l" defTabSz="457200" rtl="0" eaLnBrk="1" fontAlgn="auto" latinLnBrk="0" hangingPunct="1">
+                        <a:lnSpc>
+                          <a:spcPct val="100000"/>
+                        </a:lnSpc>
+                        <a:spcBef>
+                          <a:spcPts val="0"/>
+                        </a:spcBef>
+                        <a:spcAft>
+                          <a:spcPts val="0"/>
+                        </a:spcAft>
+                        <a:buClrTx/>
+                        <a:buSzTx/>
+                        <a:buFontTx/>
+                        <a:buNone/>
+                        <a:tabLst/>
+                        <a:defRPr/>
+                      </a:pPr>
+                      <a:r>
+                        <a:rPr kumimoji="1" lang="en-US" altLang="ja-JP" b="1" dirty="0">
+                          <a:solidFill>
+                            <a:srgbClr val="FF0000"/>
+                          </a:solidFill>
+                        </a:rPr>
+                        <a:t>NO</a:t>
+                      </a:r>
+                      <a:endParaRPr kumimoji="1" lang="ja-JP" altLang="en-US" dirty="0"/>
+                    </a:p>
+                  </a:txBody>
+                  <a:tcPr/>
+                </a:tc>
+                <a:tc>
+                  <a:txBody>
+                    <a:bodyPr/>
+                    <a:lstStyle/>
+                    <a:p>
+                      <a:pPr marL="0" marR="0" lvl="0" indent="0" algn="l" defTabSz="457200" rtl="0" eaLnBrk="1" fontAlgn="auto" latinLnBrk="0" hangingPunct="1">
+                        <a:lnSpc>
+                          <a:spcPct val="100000"/>
+                        </a:lnSpc>
+                        <a:spcBef>
+                          <a:spcPts val="0"/>
+                        </a:spcBef>
+                        <a:spcAft>
+                          <a:spcPts val="0"/>
+                        </a:spcAft>
+                        <a:buClrTx/>
+                        <a:buSzTx/>
+                        <a:buFontTx/>
+                        <a:buNone/>
+                        <a:tabLst/>
+                        <a:defRPr/>
+                      </a:pPr>
+                      <a:r>
+                        <a:rPr kumimoji="1" lang="en-US" altLang="ja-JP" b="1" dirty="0">
+                          <a:solidFill>
+                            <a:srgbClr val="00B050"/>
+                          </a:solidFill>
+                        </a:rPr>
+                        <a:t>OK</a:t>
+                      </a:r>
+                      <a:r>
+                        <a:rPr kumimoji="1" lang="en-US" altLang="ja-JP" b="1" baseline="30000" dirty="0">
+                          <a:solidFill>
+                            <a:srgbClr val="FF0000"/>
+                          </a:solidFill>
+                        </a:rPr>
+                        <a:t>*1</a:t>
+                      </a:r>
+                      <a:endParaRPr kumimoji="1" lang="ja-JP" altLang="en-US" baseline="30000" dirty="0">
+                        <a:solidFill>
+                          <a:srgbClr val="FF0000"/>
+                        </a:solidFill>
+                      </a:endParaRPr>
+                    </a:p>
+                  </a:txBody>
+                  <a:tcPr/>
+                </a:tc>
+                <a:tc>
+                  <a:txBody>
+                    <a:bodyPr/>
+                    <a:lstStyle/>
+                    <a:p>
+                      <a:pPr marL="0" marR="0" lvl="0" indent="0" algn="l" defTabSz="457200" rtl="0" eaLnBrk="1" fontAlgn="auto" latinLnBrk="0" hangingPunct="1">
+                        <a:lnSpc>
+                          <a:spcPct val="100000"/>
+                        </a:lnSpc>
+                        <a:spcBef>
+                          <a:spcPts val="0"/>
+                        </a:spcBef>
+                        <a:spcAft>
+                          <a:spcPts val="0"/>
+                        </a:spcAft>
+                        <a:buClrTx/>
+                        <a:buSzTx/>
+                        <a:buFontTx/>
+                        <a:buNone/>
+                        <a:tabLst/>
+                        <a:defRPr/>
+                      </a:pPr>
+                      <a:r>
+                        <a:rPr kumimoji="1" lang="en-US" altLang="ja-JP" b="1" dirty="0">
+                          <a:solidFill>
+                            <a:srgbClr val="FF0000"/>
+                          </a:solidFill>
+                        </a:rPr>
+                        <a:t>NO</a:t>
+                      </a:r>
+                      <a:endParaRPr kumimoji="1" lang="ja-JP" altLang="en-US" dirty="0"/>
+                    </a:p>
+                  </a:txBody>
+                  <a:tcPr/>
+                </a:tc>
+                <a:tc>
+                  <a:txBody>
+                    <a:bodyPr/>
+                    <a:lstStyle/>
+                    <a:p>
+                      <a:pPr marL="0" marR="0" lvl="0" indent="0" algn="l" defTabSz="457200" rtl="0" eaLnBrk="1" fontAlgn="auto" latinLnBrk="0" hangingPunct="1">
+                        <a:lnSpc>
+                          <a:spcPct val="100000"/>
+                        </a:lnSpc>
+                        <a:spcBef>
+                          <a:spcPts val="0"/>
+                        </a:spcBef>
+                        <a:spcAft>
+                          <a:spcPts val="0"/>
+                        </a:spcAft>
+                        <a:buClrTx/>
+                        <a:buSzTx/>
+                        <a:buFontTx/>
+                        <a:buNone/>
+                        <a:tabLst/>
+                        <a:defRPr/>
+                      </a:pPr>
+                      <a:r>
+                        <a:rPr kumimoji="1" lang="en-US" altLang="ja-JP" b="1" dirty="0">
+                          <a:solidFill>
+                            <a:srgbClr val="FF0000"/>
+                          </a:solidFill>
+                        </a:rPr>
+                        <a:t>NO</a:t>
+                      </a:r>
+                      <a:endParaRPr kumimoji="1" lang="ja-JP" altLang="en-US" dirty="0"/>
+                    </a:p>
+                  </a:txBody>
+                  <a:tcPr/>
+                </a:tc>
+                <a:extLst>
+                  <a:ext uri="{0D108BD9-81ED-4DB2-BD59-A6C34878D82A}">
+                    <a16:rowId xmlns:a16="http://schemas.microsoft.com/office/drawing/2014/main" val="3714322586"/>
+                  </a:ext>
+                </a:extLst>
+              </a:tr>
+              <a:tr h="370840">
+                <a:tc>
+                  <a:txBody>
+                    <a:bodyPr/>
+                    <a:lstStyle/>
+                    <a:p>
+                      <a:r>
+                        <a:rPr kumimoji="1" lang="en-US" altLang="ja-JP" dirty="0"/>
+                        <a:t>Ext. </a:t>
+                      </a:r>
+                      <a:r>
+                        <a:rPr kumimoji="1" lang="en-US" altLang="ja-JP" dirty="0" err="1"/>
+                        <a:t>Snd</a:t>
+                      </a:r>
+                      <a:r>
+                        <a:rPr kumimoji="1" lang="en-US" altLang="ja-JP" dirty="0"/>
+                        <a:t> VRC</a:t>
+                      </a:r>
+                      <a:endParaRPr kumimoji="1" lang="ja-JP" altLang="en-US" dirty="0"/>
+                    </a:p>
+                  </a:txBody>
+                  <a:tcPr>
+                    <a:solidFill>
+                      <a:schemeClr val="accent5">
+                        <a:lumMod val="20000"/>
+                        <a:lumOff val="80000"/>
+                      </a:schemeClr>
+                    </a:solidFill>
+                  </a:tcPr>
+                </a:tc>
+                <a:tc>
+                  <a:txBody>
+                    <a:bodyPr/>
+                    <a:lstStyle/>
+                    <a:p>
+                      <a:pPr marL="0" marR="0" lvl="0" indent="0" algn="l" defTabSz="457200" rtl="0" eaLnBrk="1" fontAlgn="auto" latinLnBrk="0" hangingPunct="1">
+                        <a:lnSpc>
+                          <a:spcPct val="100000"/>
+                        </a:lnSpc>
+                        <a:spcBef>
+                          <a:spcPts val="0"/>
+                        </a:spcBef>
+                        <a:spcAft>
+                          <a:spcPts val="0"/>
+                        </a:spcAft>
+                        <a:buClrTx/>
+                        <a:buSzTx/>
+                        <a:buFontTx/>
+                        <a:buNone/>
+                        <a:tabLst/>
+                        <a:defRPr/>
+                      </a:pPr>
+                      <a:r>
+                        <a:rPr kumimoji="1" lang="en-US" altLang="ja-JP" b="1" dirty="0">
+                          <a:solidFill>
+                            <a:srgbClr val="FF0000"/>
+                          </a:solidFill>
+                        </a:rPr>
+                        <a:t>NO</a:t>
+                      </a:r>
+                      <a:endParaRPr kumimoji="1" lang="ja-JP" altLang="en-US" dirty="0"/>
+                    </a:p>
+                  </a:txBody>
+                  <a:tcPr/>
+                </a:tc>
+                <a:tc>
+                  <a:txBody>
+                    <a:bodyPr/>
+                    <a:lstStyle/>
+                    <a:p>
+                      <a:pPr marL="0" marR="0" lvl="0" indent="0" algn="l" defTabSz="457200" rtl="0" eaLnBrk="1" fontAlgn="auto" latinLnBrk="0" hangingPunct="1">
+                        <a:lnSpc>
+                          <a:spcPct val="100000"/>
+                        </a:lnSpc>
+                        <a:spcBef>
+                          <a:spcPts val="0"/>
+                        </a:spcBef>
+                        <a:spcAft>
+                          <a:spcPts val="0"/>
+                        </a:spcAft>
+                        <a:buClrTx/>
+                        <a:buSzTx/>
+                        <a:buFontTx/>
+                        <a:buNone/>
+                        <a:tabLst/>
+                        <a:defRPr/>
+                      </a:pPr>
+                      <a:r>
+                        <a:rPr kumimoji="1" lang="en-US" altLang="ja-JP" b="1" dirty="0">
+                          <a:solidFill>
+                            <a:srgbClr val="FF0000"/>
+                          </a:solidFill>
+                        </a:rPr>
+                        <a:t>NO</a:t>
+                      </a:r>
+                      <a:endParaRPr kumimoji="1" lang="ja-JP" altLang="en-US" dirty="0"/>
+                    </a:p>
+                  </a:txBody>
+                  <a:tcPr/>
+                </a:tc>
+                <a:tc>
+                  <a:txBody>
+                    <a:bodyPr/>
+                    <a:lstStyle/>
+                    <a:p>
+                      <a:pPr marL="0" marR="0" lvl="0" indent="0" algn="l" defTabSz="457200" rtl="0" eaLnBrk="1" fontAlgn="auto" latinLnBrk="0" hangingPunct="1">
+                        <a:lnSpc>
+                          <a:spcPct val="100000"/>
+                        </a:lnSpc>
+                        <a:spcBef>
+                          <a:spcPts val="0"/>
+                        </a:spcBef>
+                        <a:spcAft>
+                          <a:spcPts val="0"/>
+                        </a:spcAft>
+                        <a:buClrTx/>
+                        <a:buSzTx/>
+                        <a:buFontTx/>
+                        <a:buNone/>
+                        <a:tabLst/>
+                        <a:defRPr/>
+                      </a:pPr>
+                      <a:r>
+                        <a:rPr kumimoji="1" lang="en-US" altLang="ja-JP" b="1" dirty="0">
+                          <a:solidFill>
+                            <a:srgbClr val="00B050"/>
+                          </a:solidFill>
+                        </a:rPr>
+                        <a:t>OK</a:t>
+                      </a:r>
+                      <a:r>
+                        <a:rPr kumimoji="1" lang="en-US" altLang="ja-JP" b="1" baseline="30000" dirty="0">
+                          <a:solidFill>
+                            <a:srgbClr val="FF0000"/>
+                          </a:solidFill>
+                        </a:rPr>
+                        <a:t>*1</a:t>
+                      </a:r>
+                      <a:endParaRPr kumimoji="1" lang="ja-JP" altLang="en-US" dirty="0">
+                        <a:solidFill>
+                          <a:srgbClr val="FF0000"/>
+                        </a:solidFill>
+                      </a:endParaRPr>
+                    </a:p>
+                  </a:txBody>
+                  <a:tcPr/>
+                </a:tc>
+                <a:tc>
+                  <a:txBody>
+                    <a:bodyPr/>
+                    <a:lstStyle/>
+                    <a:p>
+                      <a:pPr marL="0" marR="0" lvl="0" indent="0" algn="l" defTabSz="457200" rtl="0" eaLnBrk="1" fontAlgn="auto" latinLnBrk="0" hangingPunct="1">
+                        <a:lnSpc>
+                          <a:spcPct val="100000"/>
+                        </a:lnSpc>
+                        <a:spcBef>
+                          <a:spcPts val="0"/>
+                        </a:spcBef>
+                        <a:spcAft>
+                          <a:spcPts val="0"/>
+                        </a:spcAft>
+                        <a:buClrTx/>
+                        <a:buSzTx/>
+                        <a:buFontTx/>
+                        <a:buNone/>
+                        <a:tabLst/>
+                        <a:defRPr/>
+                      </a:pPr>
+                      <a:r>
+                        <a:rPr kumimoji="1" lang="en-US" altLang="ja-JP" b="1" dirty="0">
+                          <a:solidFill>
+                            <a:srgbClr val="FF0000"/>
+                          </a:solidFill>
+                        </a:rPr>
+                        <a:t>NO</a:t>
+                      </a:r>
+                      <a:endParaRPr kumimoji="1" lang="ja-JP" altLang="en-US" dirty="0"/>
+                    </a:p>
+                  </a:txBody>
+                  <a:tcPr/>
+                </a:tc>
+                <a:extLst>
+                  <a:ext uri="{0D108BD9-81ED-4DB2-BD59-A6C34878D82A}">
+                    <a16:rowId xmlns:a16="http://schemas.microsoft.com/office/drawing/2014/main" val="2842942169"/>
+                  </a:ext>
+                </a:extLst>
+              </a:tr>
+              <a:tr h="370840">
+                <a:tc>
+                  <a:txBody>
+                    <a:bodyPr/>
+                    <a:lstStyle/>
+                    <a:p>
+                      <a:r>
+                        <a:rPr kumimoji="1" lang="en-US" altLang="ja-JP" dirty="0"/>
+                        <a:t>Ext. </a:t>
+                      </a:r>
+                      <a:r>
+                        <a:rPr kumimoji="1" lang="en-US" altLang="ja-JP" dirty="0" err="1"/>
+                        <a:t>Snd</a:t>
+                      </a:r>
+                      <a:r>
+                        <a:rPr kumimoji="1" lang="en-US" altLang="ja-JP" dirty="0"/>
+                        <a:t> MMC</a:t>
+                      </a:r>
+                      <a:endParaRPr kumimoji="1" lang="ja-JP" altLang="en-US" dirty="0"/>
+                    </a:p>
+                  </a:txBody>
+                  <a:tcPr>
+                    <a:solidFill>
+                      <a:schemeClr val="accent5">
+                        <a:lumMod val="40000"/>
+                        <a:lumOff val="60000"/>
+                      </a:schemeClr>
+                    </a:solidFill>
+                  </a:tcPr>
+                </a:tc>
+                <a:tc>
+                  <a:txBody>
+                    <a:bodyPr/>
+                    <a:lstStyle/>
+                    <a:p>
+                      <a:pPr marL="0" marR="0" lvl="0" indent="0" algn="l" defTabSz="457200" rtl="0" eaLnBrk="1" fontAlgn="auto" latinLnBrk="0" hangingPunct="1">
+                        <a:lnSpc>
+                          <a:spcPct val="100000"/>
+                        </a:lnSpc>
+                        <a:spcBef>
+                          <a:spcPts val="0"/>
+                        </a:spcBef>
+                        <a:spcAft>
+                          <a:spcPts val="0"/>
+                        </a:spcAft>
+                        <a:buClrTx/>
+                        <a:buSzTx/>
+                        <a:buFontTx/>
+                        <a:buNone/>
+                        <a:tabLst/>
+                        <a:defRPr/>
+                      </a:pPr>
+                      <a:r>
+                        <a:rPr kumimoji="1" lang="en-US" altLang="ja-JP" b="1" dirty="0">
+                          <a:solidFill>
+                            <a:srgbClr val="FF0000"/>
+                          </a:solidFill>
+                        </a:rPr>
+                        <a:t>NO</a:t>
+                      </a:r>
+                      <a:endParaRPr kumimoji="1" lang="ja-JP" altLang="en-US" dirty="0"/>
+                    </a:p>
+                  </a:txBody>
+                  <a:tcPr/>
+                </a:tc>
+                <a:tc>
+                  <a:txBody>
+                    <a:bodyPr/>
+                    <a:lstStyle/>
+                    <a:p>
+                      <a:pPr marL="0" marR="0" lvl="0" indent="0" algn="l" defTabSz="457200" rtl="0" eaLnBrk="1" fontAlgn="auto" latinLnBrk="0" hangingPunct="1">
+                        <a:lnSpc>
+                          <a:spcPct val="100000"/>
+                        </a:lnSpc>
+                        <a:spcBef>
+                          <a:spcPts val="0"/>
+                        </a:spcBef>
+                        <a:spcAft>
+                          <a:spcPts val="0"/>
+                        </a:spcAft>
+                        <a:buClrTx/>
+                        <a:buSzTx/>
+                        <a:buFontTx/>
+                        <a:buNone/>
+                        <a:tabLst/>
+                        <a:defRPr/>
+                      </a:pPr>
+                      <a:r>
+                        <a:rPr kumimoji="1" lang="en-US" altLang="ja-JP" b="1" dirty="0">
+                          <a:solidFill>
+                            <a:srgbClr val="FF0000"/>
+                          </a:solidFill>
+                        </a:rPr>
+                        <a:t>NO</a:t>
+                      </a:r>
+                      <a:endParaRPr kumimoji="1" lang="ja-JP" altLang="en-US" dirty="0"/>
+                    </a:p>
+                  </a:txBody>
+                  <a:tcPr/>
+                </a:tc>
+                <a:tc>
+                  <a:txBody>
+                    <a:bodyPr/>
+                    <a:lstStyle/>
+                    <a:p>
+                      <a:pPr marL="0" marR="0" lvl="0" indent="0" algn="l" defTabSz="457200" rtl="0" eaLnBrk="1" fontAlgn="auto" latinLnBrk="0" hangingPunct="1">
+                        <a:lnSpc>
+                          <a:spcPct val="100000"/>
+                        </a:lnSpc>
+                        <a:spcBef>
+                          <a:spcPts val="0"/>
+                        </a:spcBef>
+                        <a:spcAft>
+                          <a:spcPts val="0"/>
+                        </a:spcAft>
+                        <a:buClrTx/>
+                        <a:buSzTx/>
+                        <a:buFontTx/>
+                        <a:buNone/>
+                        <a:tabLst/>
+                        <a:defRPr/>
+                      </a:pPr>
+                      <a:r>
+                        <a:rPr kumimoji="1" lang="en-US" altLang="ja-JP" b="1" dirty="0">
+                          <a:solidFill>
+                            <a:srgbClr val="FF0000"/>
+                          </a:solidFill>
+                        </a:rPr>
+                        <a:t>NO</a:t>
+                      </a:r>
+                      <a:endParaRPr kumimoji="1" lang="ja-JP" altLang="en-US" dirty="0"/>
+                    </a:p>
+                  </a:txBody>
+                  <a:tcPr/>
+                </a:tc>
+                <a:tc>
+                  <a:txBody>
+                    <a:bodyPr/>
+                    <a:lstStyle/>
+                    <a:p>
+                      <a:pPr marL="0" marR="0" lvl="0" indent="0" algn="l" defTabSz="457200" rtl="0" eaLnBrk="1" fontAlgn="auto" latinLnBrk="0" hangingPunct="1">
+                        <a:lnSpc>
+                          <a:spcPct val="100000"/>
+                        </a:lnSpc>
+                        <a:spcBef>
+                          <a:spcPts val="0"/>
+                        </a:spcBef>
+                        <a:spcAft>
+                          <a:spcPts val="0"/>
+                        </a:spcAft>
+                        <a:buClrTx/>
+                        <a:buSzTx/>
+                        <a:buFontTx/>
+                        <a:buNone/>
+                        <a:tabLst/>
+                        <a:defRPr/>
+                      </a:pPr>
+                      <a:r>
+                        <a:rPr kumimoji="1" lang="en-US" altLang="ja-JP" b="1" dirty="0">
+                          <a:solidFill>
+                            <a:srgbClr val="FF0000"/>
+                          </a:solidFill>
+                        </a:rPr>
+                        <a:t>NO</a:t>
+                      </a:r>
+                      <a:endParaRPr kumimoji="1" lang="ja-JP" altLang="en-US" dirty="0"/>
+                    </a:p>
+                  </a:txBody>
+                  <a:tcPr/>
+                </a:tc>
+                <a:extLst>
+                  <a:ext uri="{0D108BD9-81ED-4DB2-BD59-A6C34878D82A}">
+                    <a16:rowId xmlns:a16="http://schemas.microsoft.com/office/drawing/2014/main" val="391380843"/>
+                  </a:ext>
+                </a:extLst>
+              </a:tr>
+            </a:tbl>
+          </a:graphicData>
+        </a:graphic>
+      </p:graphicFrame>
+      <p:sp>
+        <p:nvSpPr>
+          <p:cNvPr id="12" name="テキスト ボックス 11">
+            <a:extLst>
+              <a:ext uri="{FF2B5EF4-FFF2-40B4-BE49-F238E27FC236}">
+                <a16:creationId xmlns:a16="http://schemas.microsoft.com/office/drawing/2014/main" id="{1BB8651F-D61C-4A32-A0B7-87218BF86DAB}"/>
+              </a:ext>
+            </a:extLst>
+          </p:cNvPr>
+          <p:cNvSpPr txBox="1"/>
           <p:nvPr/>
-        </p:nvPicPr>
-        <p:blipFill>
-          <a:blip r:embed="rId2"/>
-          <a:stretch>
-            <a:fillRect/>
-          </a:stretch>
-        </p:blipFill>
+        </p:nvSpPr>
         <p:spPr>
           <a:xfrm>
-            <a:off x="3931301" y="2601704"/>
-            <a:ext cx="5553693" cy="3852435"/>
+            <a:off x="2212302" y="5450314"/>
+            <a:ext cx="4855336" cy="923330"/>
           </a:xfrm>
           <a:prstGeom prst="rect">
             <a:avLst/>
           </a:prstGeom>
-        </p:spPr>
-      </p:pic>
-      <p:sp>
-        <p:nvSpPr>
-          <p:cNvPr id="9" name="吹き出し: 四角形 8">
-            <a:extLst>
-              <a:ext uri="{FF2B5EF4-FFF2-40B4-BE49-F238E27FC236}">
-                <a16:creationId xmlns:a16="http://schemas.microsoft.com/office/drawing/2014/main" id="{3390D222-80C8-496D-BD12-26C7BE6A7BCC}"/>
-              </a:ext>
-            </a:extLst>
-          </p:cNvPr>
-          <p:cNvSpPr/>
-          <p:nvPr/>
-        </p:nvSpPr>
-        <p:spPr>
-          <a:xfrm>
-            <a:off x="531812" y="1592922"/>
-            <a:ext cx="2944468" cy="1836078"/>
-          </a:xfrm>
-          <a:prstGeom prst="wedgeRectCallout">
-            <a:avLst>
-              <a:gd name="adj1" fmla="val 81916"/>
-              <a:gd name="adj2" fmla="val 48112"/>
-            </a:avLst>
-          </a:prstGeom>
-        </p:spPr>
-        <p:style>
-          <a:lnRef idx="0">
-            <a:schemeClr val="accent2"/>
-          </a:lnRef>
-          <a:fillRef idx="3">
-            <a:schemeClr val="accent2"/>
-          </a:fillRef>
-          <a:effectRef idx="3">
-            <a:schemeClr val="accent2"/>
-          </a:effectRef>
-          <a:fontRef idx="minor">
-            <a:schemeClr val="lt1"/>
-          </a:fontRef>
-        </p:style>
-        <p:txBody>
-          <a:bodyPr rtlCol="0" anchor="ctr"/>
+          <a:noFill/>
+        </p:spPr>
+        <p:txBody>
+          <a:bodyPr wrap="square">
+            <a:spAutoFit/>
+          </a:bodyPr>
           <a:lstStyle/>
           <a:p>
-            <a:pPr marL="342900" indent="-342900" algn="ctr">
-              <a:buAutoNum type="arabicParenR"/>
-            </a:pPr>
-            <a:r>
-              <a:rPr kumimoji="1" lang="en-US" altLang="ja-JP" dirty="0"/>
-              <a:t>Select interface type</a:t>
-            </a:r>
-          </a:p>
-          <a:p>
-            <a:endParaRPr kumimoji="1" lang="en-US" altLang="ja-JP" dirty="0"/>
-          </a:p>
-          <a:p>
-            <a:r>
-              <a:rPr kumimoji="1" lang="en-US" altLang="ja-JP" sz="1600" dirty="0">
+            <a:r>
+              <a:rPr kumimoji="1" lang="en-US" altLang="ja-JP" dirty="0">
                 <a:solidFill>
-                  <a:srgbClr val="7030A0"/>
+                  <a:srgbClr val="FF0000"/>
                 </a:solidFill>
               </a:rPr>
-              <a:t>NOTE: Bandwidth of UART is narrow. So you can not play heavy track data properly.</a:t>
-            </a:r>
-          </a:p>
-        </p:txBody>
-      </p:sp>
-      <p:sp>
-        <p:nvSpPr>
-          <p:cNvPr id="11" name="吹き出し: 四角形 10">
-            <a:extLst>
-              <a:ext uri="{FF2B5EF4-FFF2-40B4-BE49-F238E27FC236}">
-                <a16:creationId xmlns:a16="http://schemas.microsoft.com/office/drawing/2014/main" id="{71DA82F0-2C5D-4269-BA50-9C67E6C586D5}"/>
-              </a:ext>
-            </a:extLst>
-          </p:cNvPr>
-          <p:cNvSpPr/>
-          <p:nvPr/>
-        </p:nvSpPr>
-        <p:spPr>
-          <a:xfrm>
-            <a:off x="9484993" y="1722500"/>
-            <a:ext cx="2530257" cy="2069571"/>
-          </a:xfrm>
-          <a:prstGeom prst="wedgeRectCallout">
-            <a:avLst>
-              <a:gd name="adj1" fmla="val -64160"/>
-              <a:gd name="adj2" fmla="val 33291"/>
-            </a:avLst>
-          </a:prstGeom>
-        </p:spPr>
-        <p:style>
-          <a:lnRef idx="0">
-            <a:schemeClr val="accent2"/>
-          </a:lnRef>
-          <a:fillRef idx="3">
-            <a:schemeClr val="accent2"/>
-          </a:fillRef>
-          <a:effectRef idx="3">
-            <a:schemeClr val="accent2"/>
-          </a:effectRef>
-          <a:fontRef idx="minor">
-            <a:schemeClr val="lt1"/>
-          </a:fontRef>
-        </p:style>
-        <p:txBody>
-          <a:bodyPr rtlCol="0" anchor="ctr"/>
-          <a:lstStyle/>
-          <a:p>
-            <a:r>
-              <a:rPr kumimoji="1" lang="en-US" altLang="ja-JP" dirty="0"/>
-              <a:t>3) Check to connect</a:t>
-            </a:r>
-          </a:p>
-          <a:p>
-            <a:endParaRPr kumimoji="1" lang="en-US" altLang="ja-JP" dirty="0"/>
-          </a:p>
-          <a:p>
-            <a:r>
-              <a:rPr kumimoji="1" lang="en-US" altLang="ja-JP" sz="1600" dirty="0">
+              <a:t>*1 Not Tested</a:t>
+            </a:r>
+          </a:p>
+          <a:p>
+            <a:r>
+              <a:rPr kumimoji="1" lang="en-US" altLang="ja-JP" dirty="0">
                 <a:solidFill>
-                  <a:srgbClr val="7030A0"/>
+                  <a:srgbClr val="FF0000"/>
                 </a:solidFill>
               </a:rPr>
-              <a:t>NOTE: If you re-connect to </a:t>
-            </a:r>
-            <a:r>
-              <a:rPr kumimoji="1" lang="en-US" altLang="ja-JP" sz="1600" dirty="0" err="1">
+              <a:t>*2 China flash cart may not work properly</a:t>
+            </a:r>
+          </a:p>
+          <a:p>
+            <a:r>
+              <a:rPr kumimoji="1" lang="en-US" altLang="ja-JP" dirty="0">
                 <a:solidFill>
-                  <a:srgbClr val="7030A0"/>
+                  <a:srgbClr val="FF0000"/>
                 </a:solidFill>
               </a:rPr>
-              <a:t>FTDIxxx</a:t>
-            </a:r>
-            <a:r>
-              <a:rPr kumimoji="1" lang="en-US" altLang="ja-JP" sz="1600" dirty="0">
-                <a:solidFill>
-                  <a:srgbClr val="7030A0"/>
-                </a:solidFill>
-              </a:rPr>
-              <a:t> mode, please reset Gen/MD.</a:t>
-            </a:r>
-          </a:p>
-        </p:txBody>
-      </p:sp>
-      <p:sp>
-        <p:nvSpPr>
-          <p:cNvPr id="13" name="吹き出し: 四角形 12">
-            <a:extLst>
-              <a:ext uri="{FF2B5EF4-FFF2-40B4-BE49-F238E27FC236}">
-                <a16:creationId xmlns:a16="http://schemas.microsoft.com/office/drawing/2014/main" id="{16DF548C-0B2A-4170-8307-64B38459E04A}"/>
-              </a:ext>
-            </a:extLst>
-          </p:cNvPr>
-          <p:cNvSpPr/>
-          <p:nvPr/>
-        </p:nvSpPr>
-        <p:spPr>
-          <a:xfrm>
-            <a:off x="531812" y="3630707"/>
-            <a:ext cx="3104071" cy="3110752"/>
-          </a:xfrm>
-          <a:prstGeom prst="wedgeRectCallout">
-            <a:avLst>
-              <a:gd name="adj1" fmla="val 71531"/>
-              <a:gd name="adj2" fmla="val -35404"/>
-            </a:avLst>
-          </a:prstGeom>
-        </p:spPr>
-        <p:style>
-          <a:lnRef idx="0">
-            <a:schemeClr val="accent2"/>
-          </a:lnRef>
-          <a:fillRef idx="3">
-            <a:schemeClr val="accent2"/>
-          </a:fillRef>
-          <a:effectRef idx="3">
-            <a:schemeClr val="accent2"/>
-          </a:effectRef>
-          <a:fontRef idx="minor">
-            <a:schemeClr val="lt1"/>
-          </a:fontRef>
-        </p:style>
-        <p:txBody>
-          <a:bodyPr rtlCol="0" anchor="ctr"/>
-          <a:lstStyle/>
-          <a:p>
-            <a:r>
-              <a:rPr kumimoji="1" lang="en-US" altLang="ja-JP" dirty="0"/>
-              <a:t>5) Adjust CLK speed for </a:t>
-            </a:r>
-            <a:r>
-              <a:rPr kumimoji="1" lang="en-US" altLang="ja-JP" dirty="0" err="1"/>
-              <a:t>FTDIxxx</a:t>
-            </a:r>
-            <a:r>
-              <a:rPr kumimoji="1" lang="en-US" altLang="ja-JP" dirty="0"/>
-              <a:t> mode for each environment</a:t>
-            </a:r>
-            <a:r>
-              <a:rPr kumimoji="1" lang="ja-JP" altLang="en-US" dirty="0"/>
-              <a:t> </a:t>
-            </a:r>
-            <a:r>
-              <a:rPr kumimoji="1" lang="en-US" altLang="ja-JP" sz="1600" dirty="0"/>
-              <a:t>(</a:t>
-            </a:r>
-            <a:r>
-              <a:rPr kumimoji="1" lang="en-US" altLang="ja-JP" sz="1600" dirty="0">
-                <a:solidFill>
-                  <a:srgbClr val="7030A0"/>
-                </a:solidFill>
-              </a:rPr>
-              <a:t>7</a:t>
-            </a:r>
-            <a:r>
-              <a:rPr kumimoji="1" lang="ja-JP" altLang="en-US" sz="1600" dirty="0">
-                <a:solidFill>
-                  <a:srgbClr val="7030A0"/>
-                </a:solidFill>
-              </a:rPr>
-              <a:t>～</a:t>
-            </a:r>
-            <a:r>
-              <a:rPr kumimoji="1" lang="en-US" altLang="ja-JP" sz="1600" dirty="0">
-                <a:solidFill>
-                  <a:srgbClr val="7030A0"/>
-                </a:solidFill>
-              </a:rPr>
-              <a:t>8% is best for normal machine</a:t>
-            </a:r>
-            <a:r>
-              <a:rPr kumimoji="1" lang="en-US" altLang="ja-JP" sz="1600" dirty="0"/>
-              <a:t>)</a:t>
-            </a:r>
-            <a:endParaRPr kumimoji="1" lang="en-US" altLang="ja-JP" dirty="0"/>
-          </a:p>
-          <a:p>
-            <a:endParaRPr kumimoji="1" lang="en-US" altLang="ja-JP" dirty="0"/>
-          </a:p>
-          <a:p>
-            <a:r>
-              <a:rPr kumimoji="1" lang="en-US" altLang="ja-JP" dirty="0"/>
-              <a:t>6) Adjust buffer size for each files. </a:t>
-            </a:r>
-            <a:r>
-              <a:rPr kumimoji="1" lang="en-US" altLang="ja-JP" sz="1600" dirty="0"/>
-              <a:t>(</a:t>
-            </a:r>
-            <a:r>
-              <a:rPr kumimoji="1" lang="en-US" altLang="ja-JP" sz="1600" dirty="0">
-                <a:solidFill>
-                  <a:srgbClr val="7030A0"/>
-                </a:solidFill>
-              </a:rPr>
-              <a:t>0 is max accuracy but so heavy.</a:t>
-            </a:r>
-            <a:r>
-              <a:rPr kumimoji="1" lang="en-US" altLang="ja-JP" sz="1600" dirty="0"/>
-              <a:t>)</a:t>
-            </a:r>
-          </a:p>
-        </p:txBody>
-      </p:sp>
-      <p:sp>
-        <p:nvSpPr>
-          <p:cNvPr id="15" name="吹き出し: 四角形 14">
-            <a:extLst>
-              <a:ext uri="{FF2B5EF4-FFF2-40B4-BE49-F238E27FC236}">
-                <a16:creationId xmlns:a16="http://schemas.microsoft.com/office/drawing/2014/main" id="{20B039CE-04C3-4F84-B670-7752FAE57578}"/>
-              </a:ext>
-            </a:extLst>
-          </p:cNvPr>
-          <p:cNvSpPr/>
-          <p:nvPr/>
-        </p:nvSpPr>
-        <p:spPr>
-          <a:xfrm>
-            <a:off x="5068293" y="1672955"/>
-            <a:ext cx="2944468" cy="1160795"/>
-          </a:xfrm>
-          <a:prstGeom prst="wedgeRectCallout">
-            <a:avLst>
-              <a:gd name="adj1" fmla="val 38834"/>
-              <a:gd name="adj2" fmla="val 80562"/>
-            </a:avLst>
-          </a:prstGeom>
-        </p:spPr>
-        <p:style>
-          <a:lnRef idx="0">
-            <a:schemeClr val="accent2"/>
-          </a:lnRef>
-          <a:fillRef idx="3">
-            <a:schemeClr val="accent2"/>
-          </a:fillRef>
-          <a:effectRef idx="3">
-            <a:schemeClr val="accent2"/>
-          </a:effectRef>
-          <a:fontRef idx="minor">
-            <a:schemeClr val="lt1"/>
-          </a:fontRef>
-        </p:style>
-        <p:txBody>
-          <a:bodyPr rtlCol="0" anchor="ctr"/>
-          <a:lstStyle/>
-          <a:p>
-            <a:r>
-              <a:rPr kumimoji="1" lang="en-US" altLang="ja-JP" dirty="0"/>
-              <a:t>2) Select interface ID</a:t>
-            </a:r>
-          </a:p>
-          <a:p>
-            <a:endParaRPr kumimoji="1" lang="en-US" altLang="ja-JP" dirty="0"/>
-          </a:p>
-          <a:p>
-            <a:r>
-              <a:rPr kumimoji="1" lang="en-US" altLang="ja-JP" sz="1600" dirty="0"/>
-              <a:t>for UART: </a:t>
-            </a:r>
-            <a:r>
-              <a:rPr kumimoji="1" lang="en-US" altLang="ja-JP" sz="1600" dirty="0" err="1">
-                <a:solidFill>
-                  <a:srgbClr val="7030A0"/>
-                </a:solidFill>
-              </a:rPr>
-              <a:t>COMPort</a:t>
-            </a:r>
-            <a:r>
-              <a:rPr kumimoji="1" lang="en-US" altLang="ja-JP" sz="1600" dirty="0">
-                <a:solidFill>
-                  <a:srgbClr val="7030A0"/>
-                </a:solidFill>
-              </a:rPr>
-              <a:t>#</a:t>
-            </a:r>
-            <a:r>
-              <a:rPr kumimoji="1" lang="en-US" altLang="ja-JP" sz="1600" dirty="0"/>
-              <a:t> </a:t>
-            </a:r>
-          </a:p>
-          <a:p>
-            <a:r>
-              <a:rPr kumimoji="1" lang="en-US" altLang="ja-JP" sz="1600" dirty="0"/>
-              <a:t>for FTDI2xxx: </a:t>
-            </a:r>
-            <a:r>
-              <a:rPr kumimoji="1" lang="en-US" altLang="ja-JP" sz="1600" dirty="0">
-                <a:solidFill>
-                  <a:srgbClr val="7030A0"/>
-                </a:solidFill>
-              </a:rPr>
-              <a:t>FDTI ID#</a:t>
-            </a:r>
+              <a:t>*3 PRG-RAM 32x2 KB</a:t>
+            </a:r>
+            <a:endParaRPr lang="ja-JP" altLang="en-US" dirty="0">
+              <a:solidFill>
+                <a:srgbClr val="FF0000"/>
+              </a:solidFill>
+            </a:endParaRPr>
           </a:p>
         </p:txBody>
       </p:sp>
     </p:spTree>
     <p:extLst>
       <p:ext uri="{BB962C8B-B14F-4D97-AF65-F5344CB8AC3E}">
-        <p14:creationId xmlns:p14="http://schemas.microsoft.com/office/powerpoint/2010/main" val="247279145"/>
+        <p14:creationId xmlns:p14="http://schemas.microsoft.com/office/powerpoint/2010/main" val="604496643"/>
       </p:ext>
     </p:extLst>
   </p:cSld>
@@ -14862,7 +15928,7 @@
           <p:cNvPr id="2" name="タイトル 1">
             <a:extLst>
               <a:ext uri="{FF2B5EF4-FFF2-40B4-BE49-F238E27FC236}">
-                <a16:creationId xmlns:a16="http://schemas.microsoft.com/office/drawing/2014/main" id="{EF2D61BD-EF14-496D-BA79-EAE1C4548936}"/>
+                <a16:creationId xmlns:a16="http://schemas.microsoft.com/office/drawing/2014/main" id="{45F6BDA5-EAAF-47BF-BA28-5541807FE9EF}"/>
               </a:ext>
             </a:extLst>
           </p:cNvPr>
@@ -14879,12 +15945,12 @@
           <a:lstStyle/>
           <a:p>
             <a:r>
-              <a:rPr kumimoji="1" lang="en-US" altLang="ja-JP" dirty="0"/>
-              <a:t>Trouble Shooting for </a:t>
-            </a:r>
-            <a:r>
               <a:rPr kumimoji="1" lang="en-US" altLang="ja-JP" dirty="0" err="1"/>
-              <a:t>MAmi</a:t>
+              <a:t>VGMP</a:t>
+            </a:r>
+            <a:r>
+              <a:rPr lang="en-US" altLang="ja-JP" dirty="0" err="1"/>
+              <a:t>layer</a:t>
             </a:r>
             <a:endParaRPr kumimoji="1" lang="ja-JP" altLang="en-US" dirty="0"/>
           </a:p>
@@ -14892,10 +15958,10 @@
       </p:sp>
       <p:sp>
         <p:nvSpPr>
-          <p:cNvPr id="3" name="コンテンツ プレースホルダー 2">
+          <p:cNvPr id="4" name="スライド番号プレースホルダー 3">
             <a:extLst>
               <a:ext uri="{FF2B5EF4-FFF2-40B4-BE49-F238E27FC236}">
-                <a16:creationId xmlns:a16="http://schemas.microsoft.com/office/drawing/2014/main" id="{842F450B-0CA1-4943-96AE-CA89B8EC0907}"/>
+                <a16:creationId xmlns:a16="http://schemas.microsoft.com/office/drawing/2014/main" id="{F3E89AAB-4727-42E3-A2B2-F5E25345DCC6}"/>
               </a:ext>
             </a:extLst>
           </p:cNvPr>
@@ -14903,7 +15969,7 @@
             <a:spLocks noGrp="1"/>
           </p:cNvSpPr>
           <p:nvPr>
-            <p:ph idx="1"/>
+            <p:ph type="sldNum" sz="quarter" idx="12"/>
           </p:nvPr>
         </p:nvSpPr>
         <p:spPr/>
@@ -14911,26 +15977,20 @@
           <a:bodyPr/>
           <a:lstStyle/>
           <a:p>
-            <a:r>
-              <a:rPr lang="en-US" altLang="ja-JP" dirty="0"/>
-              <a:t>If you noticed “sound lag” or “stutter”, open the Settings dialog from [TOOL] menu. Check [Sound Type] and [Audio Latency] value.</a:t>
-            </a:r>
-            <a:br>
-              <a:rPr lang="en-US" altLang="ja-JP" dirty="0"/>
-            </a:br>
-            <a:endParaRPr lang="en-US" altLang="ja-JP" dirty="0"/>
-          </a:p>
-          <a:p>
-            <a:endParaRPr kumimoji="1" lang="ja-JP" altLang="en-US" dirty="0"/>
+            <a:fld id="{E27E2812-4560-4165-A7C7-9C013F955547}" type="slidenum">
+              <a:rPr kumimoji="1" lang="ja-JP" altLang="en-US" smtClean="0"/>
+              <a:t>19</a:t>
+            </a:fld>
+            <a:endParaRPr kumimoji="1" lang="ja-JP" altLang="en-US"/>
           </a:p>
         </p:txBody>
       </p:sp>
       <p:pic>
         <p:nvPicPr>
-          <p:cNvPr id="4" name="図 3">
+          <p:cNvPr id="8" name="図 7">
             <a:extLst>
               <a:ext uri="{FF2B5EF4-FFF2-40B4-BE49-F238E27FC236}">
-                <a16:creationId xmlns:a16="http://schemas.microsoft.com/office/drawing/2014/main" id="{0654D0B2-1985-4CB9-9C64-2EFFE6E2B072}"/>
+                <a16:creationId xmlns:a16="http://schemas.microsoft.com/office/drawing/2014/main" id="{0EDBB92D-1466-4E68-9949-79578CDDF792}"/>
               </a:ext>
             </a:extLst>
           </p:cNvPr>
@@ -14947,30 +16007,551 @@
         </p:blipFill>
         <p:spPr>
           <a:xfrm>
-            <a:off x="8167596" y="3260638"/>
-            <a:ext cx="3259690" cy="3251835"/>
+            <a:off x="3931301" y="2601704"/>
+            <a:ext cx="5553693" cy="3852435"/>
           </a:xfrm>
           <a:prstGeom prst="rect">
             <a:avLst/>
           </a:prstGeom>
-          <a:ln>
-            <a:noFill/>
-          </a:ln>
-          <a:effectLst>
-            <a:outerShdw blurRad="190500" algn="tl" rotWithShape="0">
-              <a:srgbClr val="000000">
-                <a:alpha val="70000"/>
-              </a:srgbClr>
-            </a:outerShdw>
-          </a:effectLst>
         </p:spPr>
       </p:pic>
       <p:sp>
         <p:nvSpPr>
-          <p:cNvPr id="5" name="スライド番号プレースホルダー 4">
+          <p:cNvPr id="9" name="吹き出し: 四角形 8">
             <a:extLst>
               <a:ext uri="{FF2B5EF4-FFF2-40B4-BE49-F238E27FC236}">
-                <a16:creationId xmlns:a16="http://schemas.microsoft.com/office/drawing/2014/main" id="{A8A94BD3-C34E-4BE3-9A56-35AF5E951F7A}"/>
+                <a16:creationId xmlns:a16="http://schemas.microsoft.com/office/drawing/2014/main" id="{3390D222-80C8-496D-BD12-26C7BE6A7BCC}"/>
+              </a:ext>
+            </a:extLst>
+          </p:cNvPr>
+          <p:cNvSpPr/>
+          <p:nvPr/>
+        </p:nvSpPr>
+        <p:spPr>
+          <a:xfrm>
+            <a:off x="531812" y="1592922"/>
+            <a:ext cx="2944468" cy="1836078"/>
+          </a:xfrm>
+          <a:prstGeom prst="wedgeRectCallout">
+            <a:avLst>
+              <a:gd name="adj1" fmla="val 81916"/>
+              <a:gd name="adj2" fmla="val 48112"/>
+            </a:avLst>
+          </a:prstGeom>
+        </p:spPr>
+        <p:style>
+          <a:lnRef idx="0">
+            <a:schemeClr val="accent2"/>
+          </a:lnRef>
+          <a:fillRef idx="3">
+            <a:schemeClr val="accent2"/>
+          </a:fillRef>
+          <a:effectRef idx="3">
+            <a:schemeClr val="accent2"/>
+          </a:effectRef>
+          <a:fontRef idx="minor">
+            <a:schemeClr val="lt1"/>
+          </a:fontRef>
+        </p:style>
+        <p:txBody>
+          <a:bodyPr rtlCol="0" anchor="ctr"/>
+          <a:lstStyle/>
+          <a:p>
+            <a:pPr marL="342900" indent="-342900" algn="ctr">
+              <a:buAutoNum type="arabicParenR"/>
+            </a:pPr>
+            <a:r>
+              <a:rPr kumimoji="1" lang="en-US" altLang="ja-JP" dirty="0"/>
+              <a:t>Select interface type</a:t>
+            </a:r>
+          </a:p>
+          <a:p>
+            <a:endParaRPr kumimoji="1" lang="en-US" altLang="ja-JP" dirty="0"/>
+          </a:p>
+          <a:p>
+            <a:r>
+              <a:rPr kumimoji="1" lang="en-US" altLang="ja-JP" sz="1600" dirty="0">
+                <a:solidFill>
+                  <a:srgbClr val="7030A0"/>
+                </a:solidFill>
+              </a:rPr>
+              <a:t>NOTE: Bandwidth of UART is narrow. So you can not play heavy track data properly.</a:t>
+            </a:r>
+          </a:p>
+        </p:txBody>
+      </p:sp>
+      <p:sp>
+        <p:nvSpPr>
+          <p:cNvPr id="11" name="吹き出し: 四角形 10">
+            <a:extLst>
+              <a:ext uri="{FF2B5EF4-FFF2-40B4-BE49-F238E27FC236}">
+                <a16:creationId xmlns:a16="http://schemas.microsoft.com/office/drawing/2014/main" id="{71DA82F0-2C5D-4269-BA50-9C67E6C586D5}"/>
+              </a:ext>
+            </a:extLst>
+          </p:cNvPr>
+          <p:cNvSpPr/>
+          <p:nvPr/>
+        </p:nvSpPr>
+        <p:spPr>
+          <a:xfrm>
+            <a:off x="9484993" y="1722500"/>
+            <a:ext cx="2530257" cy="2069571"/>
+          </a:xfrm>
+          <a:prstGeom prst="wedgeRectCallout">
+            <a:avLst>
+              <a:gd name="adj1" fmla="val -64160"/>
+              <a:gd name="adj2" fmla="val 33291"/>
+            </a:avLst>
+          </a:prstGeom>
+        </p:spPr>
+        <p:style>
+          <a:lnRef idx="0">
+            <a:schemeClr val="accent2"/>
+          </a:lnRef>
+          <a:fillRef idx="3">
+            <a:schemeClr val="accent2"/>
+          </a:fillRef>
+          <a:effectRef idx="3">
+            <a:schemeClr val="accent2"/>
+          </a:effectRef>
+          <a:fontRef idx="minor">
+            <a:schemeClr val="lt1"/>
+          </a:fontRef>
+        </p:style>
+        <p:txBody>
+          <a:bodyPr rtlCol="0" anchor="ctr"/>
+          <a:lstStyle/>
+          <a:p>
+            <a:r>
+              <a:rPr kumimoji="1" lang="en-US" altLang="ja-JP" dirty="0"/>
+              <a:t>3) Check to connect</a:t>
+            </a:r>
+          </a:p>
+          <a:p>
+            <a:endParaRPr kumimoji="1" lang="en-US" altLang="ja-JP" dirty="0"/>
+          </a:p>
+          <a:p>
+            <a:r>
+              <a:rPr kumimoji="1" lang="en-US" altLang="ja-JP" sz="1600" dirty="0">
+                <a:solidFill>
+                  <a:srgbClr val="7030A0"/>
+                </a:solidFill>
+              </a:rPr>
+              <a:t>NOTE: If you re-connect to </a:t>
+            </a:r>
+            <a:r>
+              <a:rPr kumimoji="1" lang="en-US" altLang="ja-JP" sz="1600" dirty="0" err="1">
+                <a:solidFill>
+                  <a:srgbClr val="7030A0"/>
+                </a:solidFill>
+              </a:rPr>
+              <a:t>FTDIxxx</a:t>
+            </a:r>
+            <a:r>
+              <a:rPr kumimoji="1" lang="en-US" altLang="ja-JP" sz="1600" dirty="0">
+                <a:solidFill>
+                  <a:srgbClr val="7030A0"/>
+                </a:solidFill>
+              </a:rPr>
+              <a:t> mode, please reset Gen/MD.</a:t>
+            </a:r>
+          </a:p>
+        </p:txBody>
+      </p:sp>
+      <p:sp>
+        <p:nvSpPr>
+          <p:cNvPr id="13" name="吹き出し: 四角形 12">
+            <a:extLst>
+              <a:ext uri="{FF2B5EF4-FFF2-40B4-BE49-F238E27FC236}">
+                <a16:creationId xmlns:a16="http://schemas.microsoft.com/office/drawing/2014/main" id="{16DF548C-0B2A-4170-8307-64B38459E04A}"/>
+              </a:ext>
+            </a:extLst>
+          </p:cNvPr>
+          <p:cNvSpPr/>
+          <p:nvPr/>
+        </p:nvSpPr>
+        <p:spPr>
+          <a:xfrm>
+            <a:off x="531812" y="3630707"/>
+            <a:ext cx="3104071" cy="3110752"/>
+          </a:xfrm>
+          <a:prstGeom prst="wedgeRectCallout">
+            <a:avLst>
+              <a:gd name="adj1" fmla="val 71531"/>
+              <a:gd name="adj2" fmla="val -35404"/>
+            </a:avLst>
+          </a:prstGeom>
+        </p:spPr>
+        <p:style>
+          <a:lnRef idx="0">
+            <a:schemeClr val="accent2"/>
+          </a:lnRef>
+          <a:fillRef idx="3">
+            <a:schemeClr val="accent2"/>
+          </a:fillRef>
+          <a:effectRef idx="3">
+            <a:schemeClr val="accent2"/>
+          </a:effectRef>
+          <a:fontRef idx="minor">
+            <a:schemeClr val="lt1"/>
+          </a:fontRef>
+        </p:style>
+        <p:txBody>
+          <a:bodyPr rtlCol="0" anchor="ctr"/>
+          <a:lstStyle/>
+          <a:p>
+            <a:r>
+              <a:rPr kumimoji="1" lang="en-US" altLang="ja-JP" dirty="0"/>
+              <a:t>5) Adjust CLK speed for </a:t>
+            </a:r>
+            <a:r>
+              <a:rPr kumimoji="1" lang="en-US" altLang="ja-JP" dirty="0" err="1"/>
+              <a:t>FTDIxxx</a:t>
+            </a:r>
+            <a:r>
+              <a:rPr kumimoji="1" lang="en-US" altLang="ja-JP" dirty="0"/>
+              <a:t> mode for each environment</a:t>
+            </a:r>
+            <a:r>
+              <a:rPr kumimoji="1" lang="ja-JP" altLang="en-US" dirty="0"/>
+              <a:t> </a:t>
+            </a:r>
+            <a:r>
+              <a:rPr kumimoji="1" lang="en-US" altLang="ja-JP" sz="1600" dirty="0"/>
+              <a:t>(</a:t>
+            </a:r>
+            <a:r>
+              <a:rPr kumimoji="1" lang="en-US" altLang="ja-JP" sz="1600" dirty="0">
+                <a:solidFill>
+                  <a:srgbClr val="7030A0"/>
+                </a:solidFill>
+              </a:rPr>
+              <a:t>7</a:t>
+            </a:r>
+            <a:r>
+              <a:rPr kumimoji="1" lang="ja-JP" altLang="en-US" sz="1600" dirty="0">
+                <a:solidFill>
+                  <a:srgbClr val="7030A0"/>
+                </a:solidFill>
+              </a:rPr>
+              <a:t>～</a:t>
+            </a:r>
+            <a:r>
+              <a:rPr kumimoji="1" lang="en-US" altLang="ja-JP" sz="1600" dirty="0">
+                <a:solidFill>
+                  <a:srgbClr val="7030A0"/>
+                </a:solidFill>
+              </a:rPr>
+              <a:t>8% is best for normal machine</a:t>
+            </a:r>
+            <a:r>
+              <a:rPr kumimoji="1" lang="en-US" altLang="ja-JP" sz="1600" dirty="0"/>
+              <a:t>)</a:t>
+            </a:r>
+            <a:endParaRPr kumimoji="1" lang="en-US" altLang="ja-JP" dirty="0"/>
+          </a:p>
+          <a:p>
+            <a:endParaRPr kumimoji="1" lang="en-US" altLang="ja-JP" dirty="0"/>
+          </a:p>
+          <a:p>
+            <a:r>
+              <a:rPr kumimoji="1" lang="en-US" altLang="ja-JP" dirty="0"/>
+              <a:t>6) Adjust buffer size for each files. </a:t>
+            </a:r>
+            <a:r>
+              <a:rPr kumimoji="1" lang="en-US" altLang="ja-JP" sz="1600" dirty="0"/>
+              <a:t>(</a:t>
+            </a:r>
+            <a:r>
+              <a:rPr kumimoji="1" lang="en-US" altLang="ja-JP" sz="1600" dirty="0">
+                <a:solidFill>
+                  <a:srgbClr val="7030A0"/>
+                </a:solidFill>
+              </a:rPr>
+              <a:t>0 is max accuracy but so heavy.</a:t>
+            </a:r>
+            <a:r>
+              <a:rPr kumimoji="1" lang="en-US" altLang="ja-JP" sz="1600" dirty="0"/>
+              <a:t>)</a:t>
+            </a:r>
+          </a:p>
+        </p:txBody>
+      </p:sp>
+      <p:sp>
+        <p:nvSpPr>
+          <p:cNvPr id="15" name="吹き出し: 四角形 14">
+            <a:extLst>
+              <a:ext uri="{FF2B5EF4-FFF2-40B4-BE49-F238E27FC236}">
+                <a16:creationId xmlns:a16="http://schemas.microsoft.com/office/drawing/2014/main" id="{20B039CE-04C3-4F84-B670-7752FAE57578}"/>
+              </a:ext>
+            </a:extLst>
+          </p:cNvPr>
+          <p:cNvSpPr/>
+          <p:nvPr/>
+        </p:nvSpPr>
+        <p:spPr>
+          <a:xfrm>
+            <a:off x="5068293" y="1672955"/>
+            <a:ext cx="2944468" cy="1160795"/>
+          </a:xfrm>
+          <a:prstGeom prst="wedgeRectCallout">
+            <a:avLst>
+              <a:gd name="adj1" fmla="val 38834"/>
+              <a:gd name="adj2" fmla="val 80562"/>
+            </a:avLst>
+          </a:prstGeom>
+        </p:spPr>
+        <p:style>
+          <a:lnRef idx="0">
+            <a:schemeClr val="accent2"/>
+          </a:lnRef>
+          <a:fillRef idx="3">
+            <a:schemeClr val="accent2"/>
+          </a:fillRef>
+          <a:effectRef idx="3">
+            <a:schemeClr val="accent2"/>
+          </a:effectRef>
+          <a:fontRef idx="minor">
+            <a:schemeClr val="lt1"/>
+          </a:fontRef>
+        </p:style>
+        <p:txBody>
+          <a:bodyPr rtlCol="0" anchor="ctr"/>
+          <a:lstStyle/>
+          <a:p>
+            <a:r>
+              <a:rPr kumimoji="1" lang="en-US" altLang="ja-JP" dirty="0"/>
+              <a:t>2) Select interface ID</a:t>
+            </a:r>
+          </a:p>
+          <a:p>
+            <a:endParaRPr kumimoji="1" lang="en-US" altLang="ja-JP" dirty="0"/>
+          </a:p>
+          <a:p>
+            <a:r>
+              <a:rPr kumimoji="1" lang="en-US" altLang="ja-JP" sz="1600" dirty="0"/>
+              <a:t>for UART: </a:t>
+            </a:r>
+            <a:r>
+              <a:rPr kumimoji="1" lang="en-US" altLang="ja-JP" sz="1600" dirty="0" err="1">
+                <a:solidFill>
+                  <a:srgbClr val="7030A0"/>
+                </a:solidFill>
+              </a:rPr>
+              <a:t>COMPort</a:t>
+            </a:r>
+            <a:r>
+              <a:rPr kumimoji="1" lang="en-US" altLang="ja-JP" sz="1600" dirty="0">
+                <a:solidFill>
+                  <a:srgbClr val="7030A0"/>
+                </a:solidFill>
+              </a:rPr>
+              <a:t>#</a:t>
+            </a:r>
+            <a:r>
+              <a:rPr kumimoji="1" lang="en-US" altLang="ja-JP" sz="1600" dirty="0"/>
+              <a:t> </a:t>
+            </a:r>
+          </a:p>
+          <a:p>
+            <a:r>
+              <a:rPr kumimoji="1" lang="en-US" altLang="ja-JP" sz="1600" dirty="0"/>
+              <a:t>for FTDI2xxx: </a:t>
+            </a:r>
+            <a:r>
+              <a:rPr kumimoji="1" lang="en-US" altLang="ja-JP" sz="1600" dirty="0">
+                <a:solidFill>
+                  <a:srgbClr val="7030A0"/>
+                </a:solidFill>
+              </a:rPr>
+              <a:t>FDTI ID#</a:t>
+            </a:r>
+          </a:p>
+        </p:txBody>
+      </p:sp>
+    </p:spTree>
+    <p:extLst>
+      <p:ext uri="{BB962C8B-B14F-4D97-AF65-F5344CB8AC3E}">
+        <p14:creationId xmlns:p14="http://schemas.microsoft.com/office/powerpoint/2010/main" val="247279145"/>
+      </p:ext>
+    </p:extLst>
+  </p:cSld>
+  <p:clrMapOvr>
+    <a:masterClrMapping/>
+  </p:clrMapOvr>
+</p:sld>
+</file>
+
+<file path=ppt/slides/slide2.xml><?xml version="1.0" encoding="utf-8"?>
+<p:sld xmlns:a="http://schemas.openxmlformats.org/drawingml/2006/main" xmlns:r="http://schemas.openxmlformats.org/officeDocument/2006/relationships" xmlns:p="http://schemas.openxmlformats.org/presentationml/2006/main">
+  <p:cSld>
+    <p:spTree>
+      <p:nvGrpSpPr>
+        <p:cNvPr id="1" name=""/>
+        <p:cNvGrpSpPr/>
+        <p:nvPr/>
+      </p:nvGrpSpPr>
+      <p:grpSpPr>
+        <a:xfrm>
+          <a:off x="0" y="0"/>
+          <a:ext cx="0" cy="0"/>
+          <a:chOff x="0" y="0"/>
+          <a:chExt cx="0" cy="0"/>
+        </a:xfrm>
+      </p:grpSpPr>
+      <p:sp>
+        <p:nvSpPr>
+          <p:cNvPr id="4" name="タイトル 3">
+            <a:extLst>
+              <a:ext uri="{FF2B5EF4-FFF2-40B4-BE49-F238E27FC236}">
+                <a16:creationId xmlns:a16="http://schemas.microsoft.com/office/drawing/2014/main" id="{FB667DA0-7816-423C-ABB6-6E1A375E34C1}"/>
+              </a:ext>
+            </a:extLst>
+          </p:cNvPr>
+          <p:cNvSpPr>
+            <a:spLocks noGrp="1"/>
+          </p:cNvSpPr>
+          <p:nvPr>
+            <p:ph type="title"/>
+          </p:nvPr>
+        </p:nvSpPr>
+        <p:spPr/>
+        <p:txBody>
+          <a:bodyPr/>
+          <a:lstStyle/>
+          <a:p>
+            <a:r>
+              <a:rPr lang="en-US" altLang="ja-JP" dirty="0"/>
+              <a:t>Install &amp; Basic Settings</a:t>
+            </a:r>
+            <a:endParaRPr lang="ja-JP" altLang="en-US" dirty="0"/>
+          </a:p>
+        </p:txBody>
+      </p:sp>
+      <p:sp>
+        <p:nvSpPr>
+          <p:cNvPr id="5" name="コンテンツ プレースホルダー 4">
+            <a:extLst>
+              <a:ext uri="{FF2B5EF4-FFF2-40B4-BE49-F238E27FC236}">
+                <a16:creationId xmlns:a16="http://schemas.microsoft.com/office/drawing/2014/main" id="{AC69825B-3FB5-4D01-B59B-F0D6FED9FA79}"/>
+              </a:ext>
+            </a:extLst>
+          </p:cNvPr>
+          <p:cNvSpPr>
+            <a:spLocks noGrp="1"/>
+          </p:cNvSpPr>
+          <p:nvPr>
+            <p:ph idx="1"/>
+          </p:nvPr>
+        </p:nvSpPr>
+        <p:spPr/>
+        <p:txBody>
+          <a:bodyPr>
+            <a:normAutofit/>
+          </a:bodyPr>
+          <a:lstStyle/>
+          <a:p>
+            <a:r>
+              <a:rPr lang="en-US" altLang="ja-JP" dirty="0"/>
+              <a:t>Install</a:t>
+            </a:r>
+          </a:p>
+          <a:p>
+            <a:pPr lvl="1"/>
+            <a:r>
+              <a:rPr lang="en-US" altLang="ja-JP" dirty="0"/>
+              <a:t>Extract the downloaded zip file.</a:t>
+            </a:r>
+          </a:p>
+          <a:p>
+            <a:pPr lvl="1"/>
+            <a:r>
+              <a:rPr lang="en-US" altLang="ja-JP" dirty="0"/>
+              <a:t>Click MAmidiMEmo.exe</a:t>
+            </a:r>
+          </a:p>
+          <a:p>
+            <a:pPr lvl="1"/>
+            <a:r>
+              <a:rPr lang="en-US" altLang="ja-JP" dirty="0"/>
+              <a:t>Will open the </a:t>
+            </a:r>
+            <a:r>
+              <a:rPr lang="en-US" altLang="ja-JP" dirty="0" err="1"/>
+              <a:t>MAmidiMEmo</a:t>
+            </a:r>
+            <a:r>
+              <a:rPr lang="en-US" altLang="ja-JP" dirty="0"/>
+              <a:t>. If not, please check the followings.</a:t>
+            </a:r>
+          </a:p>
+          <a:p>
+            <a:pPr lvl="2"/>
+            <a:r>
+              <a:rPr lang="en-US" altLang="ja-JP" b="1" dirty="0"/>
+              <a:t>.NET Framework 4.7 or later </a:t>
+            </a:r>
+            <a:r>
+              <a:rPr lang="en-US" altLang="ja-JP" dirty="0"/>
+              <a:t>installed on your PC.</a:t>
+            </a:r>
+          </a:p>
+          <a:p>
+            <a:pPr lvl="2"/>
+            <a:r>
+              <a:rPr lang="en-US" altLang="ja-JP" b="1" dirty="0"/>
+              <a:t>VC++ 2012 Runtime </a:t>
+            </a:r>
+            <a:r>
+              <a:rPr lang="en-US" altLang="ja-JP" dirty="0"/>
+              <a:t>installed on your PC.</a:t>
+            </a:r>
+          </a:p>
+          <a:p>
+            <a:pPr lvl="2"/>
+            <a:r>
+              <a:rPr lang="en-US" altLang="ja-JP" dirty="0">
+                <a:solidFill>
+                  <a:schemeClr val="bg1">
+                    <a:lumMod val="65000"/>
+                  </a:schemeClr>
+                </a:solidFill>
+              </a:rPr>
+              <a:t>(Execute "DelZoneID.ps1“ to remove “</a:t>
+            </a:r>
+            <a:r>
+              <a:rPr lang="en-US" altLang="ja-JP" dirty="0" err="1">
+                <a:solidFill>
+                  <a:schemeClr val="bg1">
+                    <a:lumMod val="65000"/>
+                  </a:schemeClr>
+                </a:solidFill>
+              </a:rPr>
+              <a:t>Zone.Identifier</a:t>
+            </a:r>
+            <a:r>
+              <a:rPr lang="en-US" altLang="ja-JP" dirty="0">
+                <a:solidFill>
+                  <a:schemeClr val="bg1">
+                    <a:lumMod val="65000"/>
+                  </a:schemeClr>
+                </a:solidFill>
+              </a:rPr>
+              <a:t>” flag.)</a:t>
+            </a:r>
+          </a:p>
+          <a:p>
+            <a:pPr lvl="1"/>
+            <a:endParaRPr lang="ja-JP" altLang="en-US" dirty="0"/>
+          </a:p>
+        </p:txBody>
+      </p:sp>
+      <p:sp>
+        <p:nvSpPr>
+          <p:cNvPr id="2" name="スライド番号プレースホルダー 1">
+            <a:extLst>
+              <a:ext uri="{FF2B5EF4-FFF2-40B4-BE49-F238E27FC236}">
+                <a16:creationId xmlns:a16="http://schemas.microsoft.com/office/drawing/2014/main" id="{CC23E5B1-840D-4258-A81C-614C99CB76AA}"/>
               </a:ext>
             </a:extLst>
           </p:cNvPr>
@@ -14988,7 +16569,7 @@
           <a:p>
             <a:fld id="{E27E2812-4560-4165-A7C7-9C013F955547}" type="slidenum">
               <a:rPr kumimoji="1" lang="ja-JP" altLang="en-US" smtClean="0"/>
-              <a:t>19</a:t>
+              <a:t>2</a:t>
             </a:fld>
             <a:endParaRPr kumimoji="1" lang="ja-JP" altLang="en-US"/>
           </a:p>
@@ -14997,7 +16578,7 @@
     </p:spTree>
     <p:extLst>
       <p:ext uri="{BB962C8B-B14F-4D97-AF65-F5344CB8AC3E}">
-        <p14:creationId xmlns:p14="http://schemas.microsoft.com/office/powerpoint/2010/main" val="264604253"/>
+        <p14:creationId xmlns:p14="http://schemas.microsoft.com/office/powerpoint/2010/main" val="1914892417"/>
       </p:ext>
     </p:extLst>
   </p:cSld>
@@ -15019,7 +16600,7 @@
 </p:sld>
 </file>
 
-<file path=ppt/slides/slide2.xml><?xml version="1.0" encoding="utf-8"?>
+<file path=ppt/slides/slide20.xml><?xml version="1.0" encoding="utf-8"?>
 <p:sld xmlns:a="http://schemas.openxmlformats.org/drawingml/2006/main" xmlns:r="http://schemas.openxmlformats.org/officeDocument/2006/relationships" xmlns:p="http://schemas.openxmlformats.org/presentationml/2006/main">
   <p:cSld>
     <p:spTree>
@@ -15038,10 +16619,10 @@
       </p:grpSpPr>
       <p:sp>
         <p:nvSpPr>
-          <p:cNvPr id="4" name="タイトル 3">
+          <p:cNvPr id="2" name="タイトル 1">
             <a:extLst>
               <a:ext uri="{FF2B5EF4-FFF2-40B4-BE49-F238E27FC236}">
-                <a16:creationId xmlns:a16="http://schemas.microsoft.com/office/drawing/2014/main" id="{FB667DA0-7816-423C-ABB6-6E1A375E34C1}"/>
+                <a16:creationId xmlns:a16="http://schemas.microsoft.com/office/drawing/2014/main" id="{EF2D61BD-EF14-496D-BA79-EAE1C4548936}"/>
               </a:ext>
             </a:extLst>
           </p:cNvPr>
@@ -15058,19 +16639,23 @@
           <a:lstStyle/>
           <a:p>
             <a:r>
-              <a:rPr lang="en-US" altLang="ja-JP" dirty="0"/>
-              <a:t>Install &amp; Basic Settings</a:t>
-            </a:r>
-            <a:endParaRPr lang="ja-JP" altLang="en-US" dirty="0"/>
-          </a:p>
-        </p:txBody>
-      </p:sp>
-      <p:sp>
-        <p:nvSpPr>
-          <p:cNvPr id="5" name="コンテンツ プレースホルダー 4">
+              <a:rPr kumimoji="1" lang="en-US" altLang="ja-JP" dirty="0"/>
+              <a:t>Trouble Shooting for </a:t>
+            </a:r>
+            <a:r>
+              <a:rPr kumimoji="1" lang="en-US" altLang="ja-JP" dirty="0" err="1"/>
+              <a:t>MAmi</a:t>
+            </a:r>
+            <a:endParaRPr kumimoji="1" lang="ja-JP" altLang="en-US" dirty="0"/>
+          </a:p>
+        </p:txBody>
+      </p:sp>
+      <p:sp>
+        <p:nvSpPr>
+          <p:cNvPr id="3" name="コンテンツ プレースホルダー 2">
             <a:extLst>
               <a:ext uri="{FF2B5EF4-FFF2-40B4-BE49-F238E27FC236}">
-                <a16:creationId xmlns:a16="http://schemas.microsoft.com/office/drawing/2014/main" id="{AC69825B-3FB5-4D01-B59B-F0D6FED9FA79}"/>
+                <a16:creationId xmlns:a16="http://schemas.microsoft.com/office/drawing/2014/main" id="{842F450B-0CA1-4943-96AE-CA89B8EC0907}"/>
               </a:ext>
             </a:extLst>
           </p:cNvPr>
@@ -15083,112 +16668,69 @@
         </p:nvSpPr>
         <p:spPr/>
         <p:txBody>
-          <a:bodyPr>
-            <a:normAutofit/>
-          </a:bodyPr>
+          <a:bodyPr/>
           <a:lstStyle/>
           <a:p>
             <a:r>
               <a:rPr lang="en-US" altLang="ja-JP" dirty="0"/>
-              <a:t>Install</a:t>
-            </a:r>
-          </a:p>
-          <a:p>
-            <a:pPr lvl="1"/>
-            <a:r>
+              <a:t>If you noticed “sound lag” or “stutter”, open the Settings dialog from [TOOL] menu. Check [Sound Type] and [Audio Latency] value.</a:t>
+            </a:r>
+            <a:br>
               <a:rPr lang="en-US" altLang="ja-JP" dirty="0"/>
-              <a:t>Extract the downloaded zip file.</a:t>
-            </a:r>
-          </a:p>
-          <a:p>
-            <a:pPr lvl="1"/>
-            <a:r>
-              <a:rPr lang="en-US" altLang="ja-JP" dirty="0"/>
-              <a:t>Click MAmidiMEmo.exe</a:t>
-            </a:r>
-          </a:p>
-          <a:p>
-            <a:pPr lvl="1"/>
-            <a:r>
-              <a:rPr lang="en-US" altLang="ja-JP" dirty="0"/>
-              <a:t>Will open the </a:t>
-            </a:r>
-            <a:r>
-              <a:rPr lang="en-US" altLang="ja-JP" dirty="0" err="1"/>
-              <a:t>MAmidiMEmo</a:t>
-            </a:r>
-            <a:r>
-              <a:rPr lang="en-US" altLang="ja-JP" dirty="0"/>
-              <a:t>. If not, please check the followings.</a:t>
-            </a:r>
-          </a:p>
-          <a:p>
-            <a:pPr lvl="2"/>
-            <a:r>
-              <a:rPr lang="en-US" altLang="ja-JP" b="1" dirty="0"/>
-              <a:t>.NET Framework 4.7 or later </a:t>
-            </a:r>
-            <a:r>
-              <a:rPr lang="en-US" altLang="ja-JP" dirty="0"/>
-              <a:t>installed on your PC.</a:t>
-            </a:r>
-          </a:p>
-          <a:p>
-            <a:pPr lvl="2"/>
-            <a:r>
-              <a:rPr lang="en-US" altLang="ja-JP" b="1" dirty="0"/>
-              <a:t>VC++ 2012 Runtime </a:t>
-            </a:r>
-            <a:r>
-              <a:rPr lang="en-US" altLang="ja-JP" dirty="0"/>
-              <a:t>installed on your PC.</a:t>
-            </a:r>
-          </a:p>
-          <a:p>
-            <a:pPr lvl="2"/>
-            <a:r>
-              <a:rPr lang="en-US" altLang="ja-JP" dirty="0">
-                <a:solidFill>
-                  <a:schemeClr val="bg1">
-                    <a:lumMod val="65000"/>
-                  </a:schemeClr>
-                </a:solidFill>
-              </a:rPr>
-              <a:t>(Execute "DelZoneID.ps1“ to remove “</a:t>
-            </a:r>
-            <a:r>
-              <a:rPr lang="en-US" altLang="ja-JP" dirty="0" err="1">
-                <a:solidFill>
-                  <a:schemeClr val="bg1">
-                    <a:lumMod val="65000"/>
-                  </a:schemeClr>
-                </a:solidFill>
-              </a:rPr>
-              <a:t>Zone.Identifier</a:t>
-            </a:r>
-            <a:r>
-              <a:rPr lang="en-US" altLang="ja-JP" dirty="0">
-                <a:solidFill>
-                  <a:schemeClr val="bg1">
-                    <a:lumMod val="65000"/>
-                  </a:schemeClr>
-                </a:solidFill>
-              </a:rPr>
-              <a:t>” flag.)</a:t>
-            </a:r>
-          </a:p>
-          <a:p>
-            <a:pPr lvl="1"/>
-            <a:endParaRPr lang="ja-JP" altLang="en-US" dirty="0"/>
-          </a:p>
-        </p:txBody>
-      </p:sp>
-      <p:sp>
-        <p:nvSpPr>
-          <p:cNvPr id="2" name="スライド番号プレースホルダー 1">
+            </a:br>
+            <a:endParaRPr lang="en-US" altLang="ja-JP" dirty="0"/>
+          </a:p>
+          <a:p>
+            <a:endParaRPr kumimoji="1" lang="ja-JP" altLang="en-US" dirty="0"/>
+          </a:p>
+        </p:txBody>
+      </p:sp>
+      <p:pic>
+        <p:nvPicPr>
+          <p:cNvPr id="4" name="図 3">
             <a:extLst>
               <a:ext uri="{FF2B5EF4-FFF2-40B4-BE49-F238E27FC236}">
-                <a16:creationId xmlns:a16="http://schemas.microsoft.com/office/drawing/2014/main" id="{CC23E5B1-840D-4258-A81C-614C99CB76AA}"/>
+                <a16:creationId xmlns:a16="http://schemas.microsoft.com/office/drawing/2014/main" id="{0654D0B2-1985-4CB9-9C64-2EFFE6E2B072}"/>
+              </a:ext>
+            </a:extLst>
+          </p:cNvPr>
+          <p:cNvPicPr>
+            <a:picLocks noChangeAspect="1"/>
+          </p:cNvPicPr>
+          <p:nvPr/>
+        </p:nvPicPr>
+        <p:blipFill>
+          <a:blip r:embed="rId2"/>
+          <a:stretch>
+            <a:fillRect/>
+          </a:stretch>
+        </p:blipFill>
+        <p:spPr>
+          <a:xfrm>
+            <a:off x="8167596" y="3260638"/>
+            <a:ext cx="3259690" cy="3251835"/>
+          </a:xfrm>
+          <a:prstGeom prst="rect">
+            <a:avLst/>
+          </a:prstGeom>
+          <a:ln>
+            <a:noFill/>
+          </a:ln>
+          <a:effectLst>
+            <a:outerShdw blurRad="190500" algn="tl" rotWithShape="0">
+              <a:srgbClr val="000000">
+                <a:alpha val="70000"/>
+              </a:srgbClr>
+            </a:outerShdw>
+          </a:effectLst>
+        </p:spPr>
+      </p:pic>
+      <p:sp>
+        <p:nvSpPr>
+          <p:cNvPr id="5" name="スライド番号プレースホルダー 4">
+            <a:extLst>
+              <a:ext uri="{FF2B5EF4-FFF2-40B4-BE49-F238E27FC236}">
+                <a16:creationId xmlns:a16="http://schemas.microsoft.com/office/drawing/2014/main" id="{A8A94BD3-C34E-4BE3-9A56-35AF5E951F7A}"/>
               </a:ext>
             </a:extLst>
           </p:cNvPr>
@@ -15206,7 +16748,7 @@
           <a:p>
             <a:fld id="{E27E2812-4560-4165-A7C7-9C013F955547}" type="slidenum">
               <a:rPr kumimoji="1" lang="ja-JP" altLang="en-US" smtClean="0"/>
-              <a:t>2</a:t>
+              <a:t>20</a:t>
             </a:fld>
             <a:endParaRPr kumimoji="1" lang="ja-JP" altLang="en-US"/>
           </a:p>
@@ -15215,7 +16757,7 @@
     </p:spTree>
     <p:extLst>
       <p:ext uri="{BB962C8B-B14F-4D97-AF65-F5344CB8AC3E}">
-        <p14:creationId xmlns:p14="http://schemas.microsoft.com/office/powerpoint/2010/main" val="1914892417"/>
+        <p14:creationId xmlns:p14="http://schemas.microsoft.com/office/powerpoint/2010/main" val="264604253"/>
       </p:ext>
     </p:extLst>
   </p:cSld>

</xml_diff>

<commit_message>
-Updated manual --Added MIDI implementation chart
</commit_message>
<xml_diff>
--- a/docs/MAmidiMEmo/Manual.pptx
+++ b/docs/MAmidiMEmo/Manual.pptx
@@ -5,7 +5,7 @@
     <p:sldMasterId id="2147483678" r:id="rId1"/>
   </p:sldMasterIdLst>
   <p:notesMasterIdLst>
-    <p:notesMasterId r:id="rId22"/>
+    <p:notesMasterId r:id="rId28"/>
   </p:notesMasterIdLst>
   <p:sldIdLst>
     <p:sldId id="256" r:id="rId2"/>
@@ -28,6 +28,12 @@
     <p:sldId id="278" r:id="rId19"/>
     <p:sldId id="275" r:id="rId20"/>
     <p:sldId id="264" r:id="rId21"/>
+    <p:sldId id="279" r:id="rId22"/>
+    <p:sldId id="280" r:id="rId23"/>
+    <p:sldId id="281" r:id="rId24"/>
+    <p:sldId id="282" r:id="rId25"/>
+    <p:sldId id="283" r:id="rId26"/>
+    <p:sldId id="284" r:id="rId27"/>
   </p:sldIdLst>
   <p:sldSz cx="12192000" cy="6858000"/>
   <p:notesSz cx="6858000" cy="9144000"/>
@@ -216,7 +222,7 @@
           <a:p>
             <a:fld id="{581C28D8-13B6-41C3-9F5F-0284C569C6F1}" type="datetimeFigureOut">
               <a:rPr kumimoji="1" lang="ja-JP" altLang="en-US" smtClean="0"/>
-              <a:t>2021/7/1</a:t>
+              <a:t>2021/7/23</a:t>
             </a:fld>
             <a:endParaRPr kumimoji="1" lang="ja-JP" altLang="en-US"/>
           </a:p>
@@ -1123,7 +1129,7 @@
           <a:p>
             <a:fld id="{B8625E62-B904-4691-B75E-EC1C32885285}" type="datetime1">
               <a:rPr kumimoji="1" lang="ja-JP" altLang="en-US" smtClean="0"/>
-              <a:t>2021/7/1</a:t>
+              <a:t>2021/7/23</a:t>
             </a:fld>
             <a:endParaRPr kumimoji="1" lang="ja-JP" altLang="en-US"/>
           </a:p>
@@ -1461,7 +1467,7 @@
           <a:p>
             <a:fld id="{A4C87007-2A40-4EFC-90A3-258EFA3C1001}" type="datetime1">
               <a:rPr kumimoji="1" lang="ja-JP" altLang="en-US" smtClean="0"/>
-              <a:t>2021/7/1</a:t>
+              <a:t>2021/7/23</a:t>
             </a:fld>
             <a:endParaRPr kumimoji="1" lang="ja-JP" altLang="en-US"/>
           </a:p>
@@ -1862,7 +1868,7 @@
           <a:p>
             <a:fld id="{0FE0D7FF-9203-4AA3-90FD-622674A14F90}" type="datetime1">
               <a:rPr kumimoji="1" lang="ja-JP" altLang="en-US" smtClean="0"/>
-              <a:t>2021/7/1</a:t>
+              <a:t>2021/7/23</a:t>
             </a:fld>
             <a:endParaRPr kumimoji="1" lang="ja-JP" altLang="en-US"/>
           </a:p>
@@ -2198,7 +2204,7 @@
           <a:p>
             <a:fld id="{D2D6E4D3-BEDB-4F35-876B-5B9AA41BFB5B}" type="datetime1">
               <a:rPr kumimoji="1" lang="ja-JP" altLang="en-US" smtClean="0"/>
-              <a:t>2021/7/1</a:t>
+              <a:t>2021/7/23</a:t>
             </a:fld>
             <a:endParaRPr kumimoji="1" lang="ja-JP" altLang="en-US"/>
           </a:p>
@@ -2518,7 +2524,7 @@
           <a:p>
             <a:fld id="{2ACD896E-FC14-4F25-BC47-18ABAEA9E1FE}" type="datetime1">
               <a:rPr kumimoji="1" lang="ja-JP" altLang="en-US" smtClean="0"/>
-              <a:t>2021/7/1</a:t>
+              <a:t>2021/7/23</a:t>
             </a:fld>
             <a:endParaRPr kumimoji="1" lang="ja-JP" altLang="en-US"/>
           </a:p>
@@ -2914,7 +2920,7 @@
           <a:p>
             <a:fld id="{54FC701B-2185-4987-B8E2-5507664B65F4}" type="datetime1">
               <a:rPr kumimoji="1" lang="ja-JP" altLang="en-US" smtClean="0"/>
-              <a:t>2021/7/1</a:t>
+              <a:t>2021/7/23</a:t>
             </a:fld>
             <a:endParaRPr kumimoji="1" lang="ja-JP" altLang="en-US"/>
           </a:p>
@@ -3203,7 +3209,7 @@
           <a:p>
             <a:fld id="{3FB4CDED-9617-418F-B546-D66B9BB6C35E}" type="datetime1">
               <a:rPr kumimoji="1" lang="ja-JP" altLang="en-US" smtClean="0"/>
-              <a:t>2021/7/1</a:t>
+              <a:t>2021/7/23</a:t>
             </a:fld>
             <a:endParaRPr kumimoji="1" lang="ja-JP" altLang="en-US"/>
           </a:p>
@@ -3497,7 +3503,7 @@
           <a:p>
             <a:fld id="{F5635D40-962A-46D7-8037-3F2900B5EB4D}" type="datetime1">
               <a:rPr kumimoji="1" lang="ja-JP" altLang="en-US" smtClean="0"/>
-              <a:t>2021/7/1</a:t>
+              <a:t>2021/7/23</a:t>
             </a:fld>
             <a:endParaRPr kumimoji="1" lang="ja-JP" altLang="en-US"/>
           </a:p>
@@ -3791,7 +3797,7 @@
           <a:p>
             <a:fld id="{741DA9A2-8356-4FFD-B66A-E38811049858}" type="datetime1">
               <a:rPr kumimoji="1" lang="ja-JP" altLang="en-US" smtClean="0"/>
-              <a:t>2021/7/1</a:t>
+              <a:t>2021/7/23</a:t>
             </a:fld>
             <a:endParaRPr kumimoji="1" lang="ja-JP" altLang="en-US"/>
           </a:p>
@@ -4120,7 +4126,7 @@
           <a:p>
             <a:fld id="{9DDE8989-88B8-4869-97D9-547531F13E13}" type="datetime1">
               <a:rPr kumimoji="1" lang="ja-JP" altLang="en-US" smtClean="0"/>
-              <a:t>2021/7/1</a:t>
+              <a:t>2021/7/23</a:t>
             </a:fld>
             <a:endParaRPr kumimoji="1" lang="ja-JP" altLang="en-US"/>
           </a:p>
@@ -4507,7 +4513,7 @@
           <a:p>
             <a:fld id="{81EC4031-B949-4300-AB3E-1551426E8631}" type="datetime1">
               <a:rPr kumimoji="1" lang="ja-JP" altLang="en-US" smtClean="0"/>
-              <a:t>2021/7/1</a:t>
+              <a:t>2021/7/23</a:t>
             </a:fld>
             <a:endParaRPr kumimoji="1" lang="ja-JP" altLang="en-US"/>
           </a:p>
@@ -5028,7 +5034,7 @@
           <a:p>
             <a:fld id="{F39E755E-A59D-4634-B604-E9BB568B1156}" type="datetime1">
               <a:rPr kumimoji="1" lang="ja-JP" altLang="en-US" smtClean="0"/>
-              <a:t>2021/7/1</a:t>
+              <a:t>2021/7/23</a:t>
             </a:fld>
             <a:endParaRPr kumimoji="1" lang="ja-JP" altLang="en-US"/>
           </a:p>
@@ -5233,7 +5239,7 @@
           <a:p>
             <a:fld id="{61DA38B3-7601-4256-ABFE-386B92B0EDB5}" type="datetime1">
               <a:rPr kumimoji="1" lang="ja-JP" altLang="en-US" smtClean="0"/>
-              <a:t>2021/7/1</a:t>
+              <a:t>2021/7/23</a:t>
             </a:fld>
             <a:endParaRPr kumimoji="1" lang="ja-JP" altLang="en-US"/>
           </a:p>
@@ -5410,7 +5416,7 @@
           <a:p>
             <a:fld id="{5A28ED6D-8A94-4DBA-8EF2-284D1A467CE8}" type="datetime1">
               <a:rPr kumimoji="1" lang="ja-JP" altLang="en-US" smtClean="0"/>
-              <a:t>2021/7/1</a:t>
+              <a:t>2021/7/23</a:t>
             </a:fld>
             <a:endParaRPr kumimoji="1" lang="ja-JP" altLang="en-US"/>
           </a:p>
@@ -5775,7 +5781,7 @@
           <a:p>
             <a:fld id="{B27B0317-28AF-43C5-8944-AADFA89E0149}" type="datetime1">
               <a:rPr kumimoji="1" lang="ja-JP" altLang="en-US" smtClean="0"/>
-              <a:t>2021/7/1</a:t>
+              <a:t>2021/7/23</a:t>
             </a:fld>
             <a:endParaRPr kumimoji="1" lang="ja-JP" altLang="en-US"/>
           </a:p>
@@ -6120,7 +6126,7 @@
           <a:p>
             <a:fld id="{A78D023C-C4FA-4CE8-B5BE-6798898EE377}" type="datetime1">
               <a:rPr kumimoji="1" lang="ja-JP" altLang="en-US" smtClean="0"/>
-              <a:t>2021/7/1</a:t>
+              <a:t>2021/7/23</a:t>
             </a:fld>
             <a:endParaRPr kumimoji="1" lang="ja-JP" altLang="en-US"/>
           </a:p>
@@ -8269,7 +8275,7 @@
           <a:p>
             <a:fld id="{99567159-F4A8-4352-915B-DDBEFEF4A4D6}" type="datetime1">
               <a:rPr kumimoji="1" lang="ja-JP" altLang="en-US" smtClean="0"/>
-              <a:t>2021/7/1</a:t>
+              <a:t>2021/7/23</a:t>
             </a:fld>
             <a:endParaRPr kumimoji="1" lang="ja-JP" altLang="en-US"/>
           </a:p>
@@ -16779,6 +16785,4284 @@
 </p:sld>
 </file>
 
+<file path=ppt/slides/slide21.xml><?xml version="1.0" encoding="utf-8"?>
+<p:sld xmlns:a="http://schemas.openxmlformats.org/drawingml/2006/main" xmlns:r="http://schemas.openxmlformats.org/officeDocument/2006/relationships" xmlns:p="http://schemas.openxmlformats.org/presentationml/2006/main">
+  <p:cSld>
+    <p:spTree>
+      <p:nvGrpSpPr>
+        <p:cNvPr id="1" name=""/>
+        <p:cNvGrpSpPr/>
+        <p:nvPr/>
+      </p:nvGrpSpPr>
+      <p:grpSpPr>
+        <a:xfrm>
+          <a:off x="0" y="0"/>
+          <a:ext cx="0" cy="0"/>
+          <a:chOff x="0" y="0"/>
+          <a:chExt cx="0" cy="0"/>
+        </a:xfrm>
+      </p:grpSpPr>
+      <p:sp>
+        <p:nvSpPr>
+          <p:cNvPr id="2" name="タイトル 1">
+            <a:extLst>
+              <a:ext uri="{FF2B5EF4-FFF2-40B4-BE49-F238E27FC236}">
+                <a16:creationId xmlns:a16="http://schemas.microsoft.com/office/drawing/2014/main" id="{29A39A5C-7FC5-4D89-9A64-C4313BC4C574}"/>
+              </a:ext>
+            </a:extLst>
+          </p:cNvPr>
+          <p:cNvSpPr>
+            <a:spLocks noGrp="1"/>
+          </p:cNvSpPr>
+          <p:nvPr>
+            <p:ph type="title"/>
+          </p:nvPr>
+        </p:nvSpPr>
+        <p:spPr/>
+        <p:txBody>
+          <a:bodyPr/>
+          <a:lstStyle/>
+          <a:p>
+            <a:r>
+              <a:rPr kumimoji="1" lang="en-US" altLang="ja-JP" dirty="0"/>
+              <a:t>MIDI Implementation Chart 1</a:t>
+            </a:r>
+            <a:endParaRPr kumimoji="1" lang="ja-JP" altLang="en-US" dirty="0"/>
+          </a:p>
+        </p:txBody>
+      </p:sp>
+      <p:sp>
+        <p:nvSpPr>
+          <p:cNvPr id="4" name="スライド番号プレースホルダー 3">
+            <a:extLst>
+              <a:ext uri="{FF2B5EF4-FFF2-40B4-BE49-F238E27FC236}">
+                <a16:creationId xmlns:a16="http://schemas.microsoft.com/office/drawing/2014/main" id="{F527AEA0-7EF4-4546-B495-9F4920BF8281}"/>
+              </a:ext>
+            </a:extLst>
+          </p:cNvPr>
+          <p:cNvSpPr>
+            <a:spLocks noGrp="1"/>
+          </p:cNvSpPr>
+          <p:nvPr>
+            <p:ph type="sldNum" sz="quarter" idx="12"/>
+          </p:nvPr>
+        </p:nvSpPr>
+        <p:spPr/>
+        <p:txBody>
+          <a:bodyPr/>
+          <a:lstStyle/>
+          <a:p>
+            <a:fld id="{E27E2812-4560-4165-A7C7-9C013F955547}" type="slidenum">
+              <a:rPr kumimoji="1" lang="ja-JP" altLang="en-US" smtClean="0"/>
+              <a:t>21</a:t>
+            </a:fld>
+            <a:endParaRPr kumimoji="1" lang="ja-JP" altLang="en-US"/>
+          </a:p>
+        </p:txBody>
+      </p:sp>
+      <p:graphicFrame>
+        <p:nvGraphicFramePr>
+          <p:cNvPr id="5" name="表 5">
+            <a:extLst>
+              <a:ext uri="{FF2B5EF4-FFF2-40B4-BE49-F238E27FC236}">
+                <a16:creationId xmlns:a16="http://schemas.microsoft.com/office/drawing/2014/main" id="{30EAE93F-19A6-429D-9E65-73D2543B8418}"/>
+              </a:ext>
+            </a:extLst>
+          </p:cNvPr>
+          <p:cNvGraphicFramePr>
+            <a:graphicFrameLocks noGrp="1"/>
+          </p:cNvGraphicFramePr>
+          <p:nvPr>
+            <p:extLst>
+              <p:ext uri="{D42A27DB-BD31-4B8C-83A1-F6EECF244321}">
+                <p14:modId xmlns:p14="http://schemas.microsoft.com/office/powerpoint/2010/main" val="3243502642"/>
+              </p:ext>
+            </p:extLst>
+          </p:nvPr>
+        </p:nvGraphicFramePr>
+        <p:xfrm>
+          <a:off x="2032000" y="2225333"/>
+          <a:ext cx="9472612" cy="3134360"/>
+        </p:xfrm>
+        <a:graphic>
+          <a:graphicData uri="http://schemas.openxmlformats.org/drawingml/2006/table">
+            <a:tbl>
+              <a:tblPr firstRow="1" bandRow="1">
+                <a:tableStyleId>{5C22544A-7EE6-4342-B048-85BDC9FD1C3A}</a:tableStyleId>
+              </a:tblPr>
+              <a:tblGrid>
+                <a:gridCol w="2368153">
+                  <a:extLst>
+                    <a:ext uri="{9D8B030D-6E8A-4147-A177-3AD203B41FA5}">
+                      <a16:colId xmlns:a16="http://schemas.microsoft.com/office/drawing/2014/main" val="3140821746"/>
+                    </a:ext>
+                  </a:extLst>
+                </a:gridCol>
+                <a:gridCol w="2368153">
+                  <a:extLst>
+                    <a:ext uri="{9D8B030D-6E8A-4147-A177-3AD203B41FA5}">
+                      <a16:colId xmlns:a16="http://schemas.microsoft.com/office/drawing/2014/main" val="2862939062"/>
+                    </a:ext>
+                  </a:extLst>
+                </a:gridCol>
+                <a:gridCol w="2368153">
+                  <a:extLst>
+                    <a:ext uri="{9D8B030D-6E8A-4147-A177-3AD203B41FA5}">
+                      <a16:colId xmlns:a16="http://schemas.microsoft.com/office/drawing/2014/main" val="2770498619"/>
+                    </a:ext>
+                  </a:extLst>
+                </a:gridCol>
+                <a:gridCol w="2368153">
+                  <a:extLst>
+                    <a:ext uri="{9D8B030D-6E8A-4147-A177-3AD203B41FA5}">
+                      <a16:colId xmlns:a16="http://schemas.microsoft.com/office/drawing/2014/main" val="4289464401"/>
+                    </a:ext>
+                  </a:extLst>
+                </a:gridCol>
+              </a:tblGrid>
+              <a:tr h="370840">
+                <a:tc>
+                  <a:txBody>
+                    <a:bodyPr/>
+                    <a:lstStyle/>
+                    <a:p>
+                      <a:r>
+                        <a:rPr kumimoji="1" lang="en-US" altLang="ja-JP" dirty="0"/>
+                        <a:t>Function</a:t>
+                      </a:r>
+                      <a:endParaRPr kumimoji="1" lang="ja-JP" altLang="en-US" dirty="0"/>
+                    </a:p>
+                  </a:txBody>
+                  <a:tcPr/>
+                </a:tc>
+                <a:tc>
+                  <a:txBody>
+                    <a:bodyPr/>
+                    <a:lstStyle/>
+                    <a:p>
+                      <a:r>
+                        <a:rPr kumimoji="1" lang="en-US" altLang="ja-JP" dirty="0"/>
+                        <a:t>Transmitted</a:t>
+                      </a:r>
+                      <a:endParaRPr kumimoji="1" lang="ja-JP" altLang="en-US" dirty="0"/>
+                    </a:p>
+                  </a:txBody>
+                  <a:tcPr/>
+                </a:tc>
+                <a:tc>
+                  <a:txBody>
+                    <a:bodyPr/>
+                    <a:lstStyle/>
+                    <a:p>
+                      <a:r>
+                        <a:rPr kumimoji="1" lang="en-US" altLang="ja-JP" dirty="0"/>
+                        <a:t>Recognize</a:t>
+                      </a:r>
+                      <a:endParaRPr kumimoji="1" lang="ja-JP" altLang="en-US" dirty="0"/>
+                    </a:p>
+                  </a:txBody>
+                  <a:tcPr/>
+                </a:tc>
+                <a:tc>
+                  <a:txBody>
+                    <a:bodyPr/>
+                    <a:lstStyle/>
+                    <a:p>
+                      <a:r>
+                        <a:rPr kumimoji="1" lang="en-US" altLang="ja-JP" dirty="0"/>
+                        <a:t>Remarks</a:t>
+                      </a:r>
+                      <a:endParaRPr kumimoji="1" lang="ja-JP" altLang="en-US" dirty="0"/>
+                    </a:p>
+                  </a:txBody>
+                  <a:tcPr/>
+                </a:tc>
+                <a:extLst>
+                  <a:ext uri="{0D108BD9-81ED-4DB2-BD59-A6C34878D82A}">
+                    <a16:rowId xmlns:a16="http://schemas.microsoft.com/office/drawing/2014/main" val="1671041493"/>
+                  </a:ext>
+                </a:extLst>
+              </a:tr>
+              <a:tr h="370840">
+                <a:tc>
+                  <a:txBody>
+                    <a:bodyPr/>
+                    <a:lstStyle/>
+                    <a:p>
+                      <a:r>
+                        <a:rPr kumimoji="1" lang="en-US" altLang="ja-JP" dirty="0"/>
+                        <a:t>Basic Channel</a:t>
+                      </a:r>
+                      <a:endParaRPr kumimoji="1" lang="ja-JP" altLang="en-US" dirty="0"/>
+                    </a:p>
+                  </a:txBody>
+                  <a:tcPr/>
+                </a:tc>
+                <a:tc>
+                  <a:txBody>
+                    <a:bodyPr/>
+                    <a:lstStyle/>
+                    <a:p>
+                      <a:r>
+                        <a:rPr kumimoji="1" lang="en-US" altLang="ja-JP" dirty="0"/>
+                        <a:t>-</a:t>
+                      </a:r>
+                      <a:endParaRPr kumimoji="1" lang="ja-JP" altLang="en-US" dirty="0"/>
+                    </a:p>
+                  </a:txBody>
+                  <a:tcPr/>
+                </a:tc>
+                <a:tc>
+                  <a:txBody>
+                    <a:bodyPr/>
+                    <a:lstStyle/>
+                    <a:p>
+                      <a:r>
+                        <a:rPr kumimoji="1" lang="en-US" altLang="ja-JP" dirty="0"/>
+                        <a:t>1-16: </a:t>
+                      </a:r>
+                      <a:r>
+                        <a:rPr kumimoji="1" lang="en-US" altLang="ja-JP" dirty="0" err="1"/>
+                        <a:t>Defaut</a:t>
+                      </a:r>
+                      <a:endParaRPr kumimoji="1" lang="en-US" altLang="ja-JP" dirty="0"/>
+                    </a:p>
+                    <a:p>
+                      <a:r>
+                        <a:rPr kumimoji="1" lang="en-US" altLang="ja-JP" dirty="0"/>
+                        <a:t>1-16: Changed</a:t>
+                      </a:r>
+                      <a:endParaRPr kumimoji="1" lang="ja-JP" altLang="en-US" dirty="0"/>
+                    </a:p>
+                  </a:txBody>
+                  <a:tcPr/>
+                </a:tc>
+                <a:tc>
+                  <a:txBody>
+                    <a:bodyPr/>
+                    <a:lstStyle/>
+                    <a:p>
+                      <a:endParaRPr kumimoji="1" lang="ja-JP" altLang="en-US" dirty="0"/>
+                    </a:p>
+                  </a:txBody>
+                  <a:tcPr/>
+                </a:tc>
+                <a:extLst>
+                  <a:ext uri="{0D108BD9-81ED-4DB2-BD59-A6C34878D82A}">
+                    <a16:rowId xmlns:a16="http://schemas.microsoft.com/office/drawing/2014/main" val="144167080"/>
+                  </a:ext>
+                </a:extLst>
+              </a:tr>
+              <a:tr h="370840">
+                <a:tc>
+                  <a:txBody>
+                    <a:bodyPr/>
+                    <a:lstStyle/>
+                    <a:p>
+                      <a:r>
+                        <a:rPr kumimoji="1" lang="en-US" altLang="ja-JP" dirty="0"/>
+                        <a:t>Note Number</a:t>
+                      </a:r>
+                      <a:endParaRPr kumimoji="1" lang="ja-JP" altLang="en-US" dirty="0"/>
+                    </a:p>
+                  </a:txBody>
+                  <a:tcPr/>
+                </a:tc>
+                <a:tc>
+                  <a:txBody>
+                    <a:bodyPr/>
+                    <a:lstStyle/>
+                    <a:p>
+                      <a:r>
+                        <a:rPr kumimoji="1" lang="en-US" altLang="ja-JP" dirty="0"/>
+                        <a:t>-</a:t>
+                      </a:r>
+                      <a:endParaRPr kumimoji="1" lang="ja-JP" altLang="en-US" dirty="0"/>
+                    </a:p>
+                  </a:txBody>
+                  <a:tcPr/>
+                </a:tc>
+                <a:tc>
+                  <a:txBody>
+                    <a:bodyPr/>
+                    <a:lstStyle/>
+                    <a:p>
+                      <a:r>
+                        <a:rPr kumimoji="1" lang="en-US" altLang="ja-JP" dirty="0"/>
+                        <a:t>0-127</a:t>
+                      </a:r>
+                      <a:endParaRPr kumimoji="1" lang="ja-JP" altLang="en-US" dirty="0"/>
+                    </a:p>
+                  </a:txBody>
+                  <a:tcPr/>
+                </a:tc>
+                <a:tc>
+                  <a:txBody>
+                    <a:bodyPr/>
+                    <a:lstStyle/>
+                    <a:p>
+                      <a:r>
+                        <a:rPr kumimoji="1" lang="en-US" altLang="ja-JP" dirty="0"/>
+                        <a:t>Depends on chip</a:t>
+                      </a:r>
+                      <a:endParaRPr kumimoji="1" lang="ja-JP" altLang="en-US" dirty="0"/>
+                    </a:p>
+                  </a:txBody>
+                  <a:tcPr/>
+                </a:tc>
+                <a:extLst>
+                  <a:ext uri="{0D108BD9-81ED-4DB2-BD59-A6C34878D82A}">
+                    <a16:rowId xmlns:a16="http://schemas.microsoft.com/office/drawing/2014/main" val="2900028550"/>
+                  </a:ext>
+                </a:extLst>
+              </a:tr>
+              <a:tr h="370840">
+                <a:tc>
+                  <a:txBody>
+                    <a:bodyPr/>
+                    <a:lstStyle/>
+                    <a:p>
+                      <a:r>
+                        <a:rPr kumimoji="1" lang="en-US" altLang="ja-JP" dirty="0"/>
+                        <a:t>Velocity</a:t>
+                      </a:r>
+                      <a:endParaRPr kumimoji="1" lang="ja-JP" altLang="en-US" dirty="0"/>
+                    </a:p>
+                  </a:txBody>
+                  <a:tcPr/>
+                </a:tc>
+                <a:tc>
+                  <a:txBody>
+                    <a:bodyPr/>
+                    <a:lstStyle/>
+                    <a:p>
+                      <a:r>
+                        <a:rPr kumimoji="1" lang="en-US" altLang="ja-JP" dirty="0"/>
+                        <a:t>-</a:t>
+                      </a:r>
+                      <a:endParaRPr kumimoji="1" lang="ja-JP" altLang="en-US" dirty="0"/>
+                    </a:p>
+                  </a:txBody>
+                  <a:tcPr/>
+                </a:tc>
+                <a:tc>
+                  <a:txBody>
+                    <a:bodyPr/>
+                    <a:lstStyle/>
+                    <a:p>
+                      <a:r>
+                        <a:rPr kumimoji="1" lang="en-US" altLang="ja-JP" dirty="0"/>
+                        <a:t>Yes: Note ON</a:t>
+                      </a:r>
+                    </a:p>
+                    <a:p>
+                      <a:r>
+                        <a:rPr kumimoji="1" lang="en-US" altLang="ja-JP" dirty="0"/>
+                        <a:t>No: Note OFF</a:t>
+                      </a:r>
+                      <a:endParaRPr kumimoji="1" lang="ja-JP" altLang="en-US" dirty="0"/>
+                    </a:p>
+                  </a:txBody>
+                  <a:tcPr/>
+                </a:tc>
+                <a:tc>
+                  <a:txBody>
+                    <a:bodyPr/>
+                    <a:lstStyle/>
+                    <a:p>
+                      <a:endParaRPr kumimoji="1" lang="ja-JP" altLang="en-US" dirty="0"/>
+                    </a:p>
+                  </a:txBody>
+                  <a:tcPr/>
+                </a:tc>
+                <a:extLst>
+                  <a:ext uri="{0D108BD9-81ED-4DB2-BD59-A6C34878D82A}">
+                    <a16:rowId xmlns:a16="http://schemas.microsoft.com/office/drawing/2014/main" val="3068414997"/>
+                  </a:ext>
+                </a:extLst>
+              </a:tr>
+              <a:tr h="370840">
+                <a:tc>
+                  <a:txBody>
+                    <a:bodyPr/>
+                    <a:lstStyle/>
+                    <a:p>
+                      <a:r>
+                        <a:rPr kumimoji="1" lang="en-US" altLang="ja-JP" dirty="0"/>
+                        <a:t>After Touch</a:t>
+                      </a:r>
+                      <a:endParaRPr kumimoji="1" lang="ja-JP" altLang="en-US" dirty="0"/>
+                    </a:p>
+                  </a:txBody>
+                  <a:tcPr/>
+                </a:tc>
+                <a:tc>
+                  <a:txBody>
+                    <a:bodyPr/>
+                    <a:lstStyle/>
+                    <a:p>
+                      <a:r>
+                        <a:rPr kumimoji="1" lang="en-US" altLang="ja-JP" dirty="0"/>
+                        <a:t>-</a:t>
+                      </a:r>
+                      <a:endParaRPr kumimoji="1" lang="ja-JP" altLang="en-US" dirty="0"/>
+                    </a:p>
+                  </a:txBody>
+                  <a:tcPr/>
+                </a:tc>
+                <a:tc>
+                  <a:txBody>
+                    <a:bodyPr/>
+                    <a:lstStyle/>
+                    <a:p>
+                      <a:r>
+                        <a:rPr kumimoji="1" lang="en-US" altLang="ja-JP" dirty="0"/>
+                        <a:t>No</a:t>
+                      </a:r>
+                      <a:endParaRPr kumimoji="1" lang="ja-JP" altLang="en-US" dirty="0"/>
+                    </a:p>
+                  </a:txBody>
+                  <a:tcPr/>
+                </a:tc>
+                <a:tc>
+                  <a:txBody>
+                    <a:bodyPr/>
+                    <a:lstStyle/>
+                    <a:p>
+                      <a:endParaRPr kumimoji="1" lang="ja-JP" altLang="en-US" dirty="0"/>
+                    </a:p>
+                  </a:txBody>
+                  <a:tcPr/>
+                </a:tc>
+                <a:extLst>
+                  <a:ext uri="{0D108BD9-81ED-4DB2-BD59-A6C34878D82A}">
+                    <a16:rowId xmlns:a16="http://schemas.microsoft.com/office/drawing/2014/main" val="1691250239"/>
+                  </a:ext>
+                </a:extLst>
+              </a:tr>
+              <a:tr h="370840">
+                <a:tc>
+                  <a:txBody>
+                    <a:bodyPr/>
+                    <a:lstStyle/>
+                    <a:p>
+                      <a:r>
+                        <a:rPr kumimoji="1" lang="en-US" altLang="ja-JP" dirty="0"/>
+                        <a:t>Pitch Bend</a:t>
+                      </a:r>
+                      <a:endParaRPr kumimoji="1" lang="ja-JP" altLang="en-US" dirty="0"/>
+                    </a:p>
+                  </a:txBody>
+                  <a:tcPr/>
+                </a:tc>
+                <a:tc>
+                  <a:txBody>
+                    <a:bodyPr/>
+                    <a:lstStyle/>
+                    <a:p>
+                      <a:r>
+                        <a:rPr kumimoji="1" lang="en-US" altLang="ja-JP" dirty="0"/>
+                        <a:t>-</a:t>
+                      </a:r>
+                      <a:endParaRPr kumimoji="1" lang="ja-JP" altLang="en-US" dirty="0"/>
+                    </a:p>
+                  </a:txBody>
+                  <a:tcPr/>
+                </a:tc>
+                <a:tc>
+                  <a:txBody>
+                    <a:bodyPr/>
+                    <a:lstStyle/>
+                    <a:p>
+                      <a:r>
+                        <a:rPr kumimoji="1" lang="en-US" altLang="ja-JP" dirty="0"/>
+                        <a:t>Yes</a:t>
+                      </a:r>
+                      <a:endParaRPr kumimoji="1" lang="ja-JP" altLang="en-US" dirty="0"/>
+                    </a:p>
+                  </a:txBody>
+                  <a:tcPr/>
+                </a:tc>
+                <a:tc>
+                  <a:txBody>
+                    <a:bodyPr/>
+                    <a:lstStyle/>
+                    <a:p>
+                      <a:r>
+                        <a:rPr kumimoji="1" lang="en-US" altLang="ja-JP" b="1" dirty="0"/>
+                        <a:t>8192: Default</a:t>
+                      </a:r>
+                      <a:endParaRPr kumimoji="1" lang="ja-JP" altLang="en-US" b="1" dirty="0"/>
+                    </a:p>
+                  </a:txBody>
+                  <a:tcPr/>
+                </a:tc>
+                <a:extLst>
+                  <a:ext uri="{0D108BD9-81ED-4DB2-BD59-A6C34878D82A}">
+                    <a16:rowId xmlns:a16="http://schemas.microsoft.com/office/drawing/2014/main" val="1755374611"/>
+                  </a:ext>
+                </a:extLst>
+              </a:tr>
+              <a:tr h="370840">
+                <a:tc>
+                  <a:txBody>
+                    <a:bodyPr/>
+                    <a:lstStyle/>
+                    <a:p>
+                      <a:r>
+                        <a:rPr kumimoji="1" lang="en-US" altLang="ja-JP" dirty="0"/>
+                        <a:t>Program Change</a:t>
+                      </a:r>
+                      <a:endParaRPr kumimoji="1" lang="ja-JP" altLang="en-US" dirty="0"/>
+                    </a:p>
+                  </a:txBody>
+                  <a:tcPr/>
+                </a:tc>
+                <a:tc>
+                  <a:txBody>
+                    <a:bodyPr/>
+                    <a:lstStyle/>
+                    <a:p>
+                      <a:r>
+                        <a:rPr kumimoji="1" lang="en-US" altLang="ja-JP" dirty="0"/>
+                        <a:t>-</a:t>
+                      </a:r>
+                      <a:endParaRPr kumimoji="1" lang="ja-JP" altLang="en-US" dirty="0"/>
+                    </a:p>
+                  </a:txBody>
+                  <a:tcPr/>
+                </a:tc>
+                <a:tc>
+                  <a:txBody>
+                    <a:bodyPr/>
+                    <a:lstStyle/>
+                    <a:p>
+                      <a:r>
+                        <a:rPr kumimoji="1" lang="en-US" altLang="ja-JP" dirty="0"/>
+                        <a:t>0-127</a:t>
+                      </a:r>
+                      <a:endParaRPr kumimoji="1" lang="ja-JP" altLang="en-US" dirty="0"/>
+                    </a:p>
+                  </a:txBody>
+                  <a:tcPr/>
+                </a:tc>
+                <a:tc>
+                  <a:txBody>
+                    <a:bodyPr/>
+                    <a:lstStyle/>
+                    <a:p>
+                      <a:r>
+                        <a:rPr kumimoji="1" lang="en-US" altLang="ja-JP" b="1" dirty="0"/>
+                        <a:t>0: Default</a:t>
+                      </a:r>
+                      <a:endParaRPr kumimoji="1" lang="ja-JP" altLang="en-US" b="1" dirty="0"/>
+                    </a:p>
+                  </a:txBody>
+                  <a:tcPr/>
+                </a:tc>
+                <a:extLst>
+                  <a:ext uri="{0D108BD9-81ED-4DB2-BD59-A6C34878D82A}">
+                    <a16:rowId xmlns:a16="http://schemas.microsoft.com/office/drawing/2014/main" val="1073987621"/>
+                  </a:ext>
+                </a:extLst>
+              </a:tr>
+            </a:tbl>
+          </a:graphicData>
+        </a:graphic>
+      </p:graphicFrame>
+    </p:spTree>
+    <p:extLst>
+      <p:ext uri="{BB962C8B-B14F-4D97-AF65-F5344CB8AC3E}">
+        <p14:creationId xmlns:p14="http://schemas.microsoft.com/office/powerpoint/2010/main" val="2716310737"/>
+      </p:ext>
+    </p:extLst>
+  </p:cSld>
+  <p:clrMapOvr>
+    <a:masterClrMapping/>
+  </p:clrMapOvr>
+</p:sld>
+</file>
+
+<file path=ppt/slides/slide22.xml><?xml version="1.0" encoding="utf-8"?>
+<p:sld xmlns:a="http://schemas.openxmlformats.org/drawingml/2006/main" xmlns:r="http://schemas.openxmlformats.org/officeDocument/2006/relationships" xmlns:p="http://schemas.openxmlformats.org/presentationml/2006/main">
+  <p:cSld>
+    <p:spTree>
+      <p:nvGrpSpPr>
+        <p:cNvPr id="1" name=""/>
+        <p:cNvGrpSpPr/>
+        <p:nvPr/>
+      </p:nvGrpSpPr>
+      <p:grpSpPr>
+        <a:xfrm>
+          <a:off x="0" y="0"/>
+          <a:ext cx="0" cy="0"/>
+          <a:chOff x="0" y="0"/>
+          <a:chExt cx="0" cy="0"/>
+        </a:xfrm>
+      </p:grpSpPr>
+      <p:sp>
+        <p:nvSpPr>
+          <p:cNvPr id="2" name="タイトル 1">
+            <a:extLst>
+              <a:ext uri="{FF2B5EF4-FFF2-40B4-BE49-F238E27FC236}">
+                <a16:creationId xmlns:a16="http://schemas.microsoft.com/office/drawing/2014/main" id="{29A39A5C-7FC5-4D89-9A64-C4313BC4C574}"/>
+              </a:ext>
+            </a:extLst>
+          </p:cNvPr>
+          <p:cNvSpPr>
+            <a:spLocks noGrp="1"/>
+          </p:cNvSpPr>
+          <p:nvPr>
+            <p:ph type="title"/>
+          </p:nvPr>
+        </p:nvSpPr>
+        <p:spPr/>
+        <p:txBody>
+          <a:bodyPr/>
+          <a:lstStyle/>
+          <a:p>
+            <a:r>
+              <a:rPr kumimoji="1" lang="en-US" altLang="ja-JP" dirty="0"/>
+              <a:t>MIDI Implementation Chart 2</a:t>
+            </a:r>
+            <a:endParaRPr kumimoji="1" lang="ja-JP" altLang="en-US" dirty="0"/>
+          </a:p>
+        </p:txBody>
+      </p:sp>
+      <p:sp>
+        <p:nvSpPr>
+          <p:cNvPr id="4" name="スライド番号プレースホルダー 3">
+            <a:extLst>
+              <a:ext uri="{FF2B5EF4-FFF2-40B4-BE49-F238E27FC236}">
+                <a16:creationId xmlns:a16="http://schemas.microsoft.com/office/drawing/2014/main" id="{F527AEA0-7EF4-4546-B495-9F4920BF8281}"/>
+              </a:ext>
+            </a:extLst>
+          </p:cNvPr>
+          <p:cNvSpPr>
+            <a:spLocks noGrp="1"/>
+          </p:cNvSpPr>
+          <p:nvPr>
+            <p:ph type="sldNum" sz="quarter" idx="12"/>
+          </p:nvPr>
+        </p:nvSpPr>
+        <p:spPr/>
+        <p:txBody>
+          <a:bodyPr/>
+          <a:lstStyle/>
+          <a:p>
+            <a:fld id="{E27E2812-4560-4165-A7C7-9C013F955547}" type="slidenum">
+              <a:rPr kumimoji="1" lang="ja-JP" altLang="en-US" smtClean="0"/>
+              <a:t>22</a:t>
+            </a:fld>
+            <a:endParaRPr kumimoji="1" lang="ja-JP" altLang="en-US"/>
+          </a:p>
+        </p:txBody>
+      </p:sp>
+      <p:graphicFrame>
+        <p:nvGraphicFramePr>
+          <p:cNvPr id="5" name="表 5">
+            <a:extLst>
+              <a:ext uri="{FF2B5EF4-FFF2-40B4-BE49-F238E27FC236}">
+                <a16:creationId xmlns:a16="http://schemas.microsoft.com/office/drawing/2014/main" id="{30EAE93F-19A6-429D-9E65-73D2543B8418}"/>
+              </a:ext>
+            </a:extLst>
+          </p:cNvPr>
+          <p:cNvGraphicFramePr>
+            <a:graphicFrameLocks noGrp="1"/>
+          </p:cNvGraphicFramePr>
+          <p:nvPr>
+            <p:extLst>
+              <p:ext uri="{D42A27DB-BD31-4B8C-83A1-F6EECF244321}">
+                <p14:modId xmlns:p14="http://schemas.microsoft.com/office/powerpoint/2010/main" val="845934669"/>
+              </p:ext>
+            </p:extLst>
+          </p:nvPr>
+        </p:nvGraphicFramePr>
+        <p:xfrm>
+          <a:off x="2032000" y="2225333"/>
+          <a:ext cx="9472612" cy="4516120"/>
+        </p:xfrm>
+        <a:graphic>
+          <a:graphicData uri="http://schemas.openxmlformats.org/drawingml/2006/table">
+            <a:tbl>
+              <a:tblPr firstRow="1" bandRow="1">
+                <a:tableStyleId>{5C22544A-7EE6-4342-B048-85BDC9FD1C3A}</a:tableStyleId>
+              </a:tblPr>
+              <a:tblGrid>
+                <a:gridCol w="2368153">
+                  <a:extLst>
+                    <a:ext uri="{9D8B030D-6E8A-4147-A177-3AD203B41FA5}">
+                      <a16:colId xmlns:a16="http://schemas.microsoft.com/office/drawing/2014/main" val="3140821746"/>
+                    </a:ext>
+                  </a:extLst>
+                </a:gridCol>
+                <a:gridCol w="2368153">
+                  <a:extLst>
+                    <a:ext uri="{9D8B030D-6E8A-4147-A177-3AD203B41FA5}">
+                      <a16:colId xmlns:a16="http://schemas.microsoft.com/office/drawing/2014/main" val="2862939062"/>
+                    </a:ext>
+                  </a:extLst>
+                </a:gridCol>
+                <a:gridCol w="2368153">
+                  <a:extLst>
+                    <a:ext uri="{9D8B030D-6E8A-4147-A177-3AD203B41FA5}">
+                      <a16:colId xmlns:a16="http://schemas.microsoft.com/office/drawing/2014/main" val="2770498619"/>
+                    </a:ext>
+                  </a:extLst>
+                </a:gridCol>
+                <a:gridCol w="2368153">
+                  <a:extLst>
+                    <a:ext uri="{9D8B030D-6E8A-4147-A177-3AD203B41FA5}">
+                      <a16:colId xmlns:a16="http://schemas.microsoft.com/office/drawing/2014/main" val="4289464401"/>
+                    </a:ext>
+                  </a:extLst>
+                </a:gridCol>
+              </a:tblGrid>
+              <a:tr h="370840">
+                <a:tc>
+                  <a:txBody>
+                    <a:bodyPr/>
+                    <a:lstStyle/>
+                    <a:p>
+                      <a:r>
+                        <a:rPr kumimoji="1" lang="en-US" altLang="ja-JP" dirty="0"/>
+                        <a:t>Function</a:t>
+                      </a:r>
+                      <a:endParaRPr kumimoji="1" lang="ja-JP" altLang="en-US" dirty="0"/>
+                    </a:p>
+                  </a:txBody>
+                  <a:tcPr/>
+                </a:tc>
+                <a:tc>
+                  <a:txBody>
+                    <a:bodyPr/>
+                    <a:lstStyle/>
+                    <a:p>
+                      <a:r>
+                        <a:rPr kumimoji="1" lang="en-US" altLang="ja-JP" dirty="0"/>
+                        <a:t>Transmitted</a:t>
+                      </a:r>
+                      <a:endParaRPr kumimoji="1" lang="ja-JP" altLang="en-US" dirty="0"/>
+                    </a:p>
+                  </a:txBody>
+                  <a:tcPr/>
+                </a:tc>
+                <a:tc>
+                  <a:txBody>
+                    <a:bodyPr/>
+                    <a:lstStyle/>
+                    <a:p>
+                      <a:r>
+                        <a:rPr kumimoji="1" lang="en-US" altLang="ja-JP" dirty="0"/>
+                        <a:t>Recognize</a:t>
+                      </a:r>
+                      <a:endParaRPr kumimoji="1" lang="ja-JP" altLang="en-US" dirty="0"/>
+                    </a:p>
+                  </a:txBody>
+                  <a:tcPr/>
+                </a:tc>
+                <a:tc>
+                  <a:txBody>
+                    <a:bodyPr/>
+                    <a:lstStyle/>
+                    <a:p>
+                      <a:r>
+                        <a:rPr kumimoji="1" lang="en-US" altLang="ja-JP" dirty="0"/>
+                        <a:t>Remarks</a:t>
+                      </a:r>
+                      <a:endParaRPr kumimoji="1" lang="ja-JP" altLang="en-US" dirty="0"/>
+                    </a:p>
+                  </a:txBody>
+                  <a:tcPr/>
+                </a:tc>
+                <a:extLst>
+                  <a:ext uri="{0D108BD9-81ED-4DB2-BD59-A6C34878D82A}">
+                    <a16:rowId xmlns:a16="http://schemas.microsoft.com/office/drawing/2014/main" val="1671041493"/>
+                  </a:ext>
+                </a:extLst>
+              </a:tr>
+              <a:tr h="370840">
+                <a:tc>
+                  <a:txBody>
+                    <a:bodyPr/>
+                    <a:lstStyle/>
+                    <a:p>
+                      <a:pPr algn="l"/>
+                      <a:r>
+                        <a:rPr kumimoji="1" lang="en-US" altLang="ja-JP" dirty="0"/>
+                        <a:t>Control Change</a:t>
+                      </a:r>
+                    </a:p>
+                    <a:p>
+                      <a:pPr algn="r"/>
+                      <a:r>
+                        <a:rPr kumimoji="1" lang="en-US" altLang="ja-JP" dirty="0"/>
+                        <a:t>1</a:t>
+                      </a:r>
+                      <a:endParaRPr kumimoji="1" lang="ja-JP" altLang="en-US" dirty="0"/>
+                    </a:p>
+                  </a:txBody>
+                  <a:tcPr/>
+                </a:tc>
+                <a:tc>
+                  <a:txBody>
+                    <a:bodyPr/>
+                    <a:lstStyle/>
+                    <a:p>
+                      <a:r>
+                        <a:rPr kumimoji="1" lang="en-US" altLang="ja-JP" dirty="0"/>
+                        <a:t>-</a:t>
+                      </a:r>
+                      <a:endParaRPr kumimoji="1" lang="ja-JP" altLang="en-US" dirty="0"/>
+                    </a:p>
+                  </a:txBody>
+                  <a:tcPr/>
+                </a:tc>
+                <a:tc>
+                  <a:txBody>
+                    <a:bodyPr/>
+                    <a:lstStyle/>
+                    <a:p>
+                      <a:endParaRPr kumimoji="1" lang="en-US" altLang="ja-JP" dirty="0"/>
+                    </a:p>
+                    <a:p>
+                      <a:r>
+                        <a:rPr kumimoji="1" lang="en-US" altLang="ja-JP" dirty="0"/>
+                        <a:t>Modulation</a:t>
+                      </a:r>
+                    </a:p>
+                  </a:txBody>
+                  <a:tcPr/>
+                </a:tc>
+                <a:tc>
+                  <a:txBody>
+                    <a:bodyPr/>
+                    <a:lstStyle/>
+                    <a:p>
+                      <a:endParaRPr kumimoji="1" lang="en-US" altLang="ja-JP" dirty="0"/>
+                    </a:p>
+                    <a:p>
+                      <a:r>
+                        <a:rPr kumimoji="1" lang="en-US" altLang="ja-JP" b="1" dirty="0"/>
+                        <a:t>0: OFF</a:t>
+                      </a:r>
+                      <a:r>
+                        <a:rPr kumimoji="1" lang="en-US" altLang="ja-JP" dirty="0"/>
+                        <a:t>, 64: ON</a:t>
+                      </a:r>
+                      <a:endParaRPr kumimoji="1" lang="ja-JP" altLang="en-US" dirty="0"/>
+                    </a:p>
+                  </a:txBody>
+                  <a:tcPr/>
+                </a:tc>
+                <a:extLst>
+                  <a:ext uri="{0D108BD9-81ED-4DB2-BD59-A6C34878D82A}">
+                    <a16:rowId xmlns:a16="http://schemas.microsoft.com/office/drawing/2014/main" val="2531957203"/>
+                  </a:ext>
+                </a:extLst>
+              </a:tr>
+              <a:tr h="370840">
+                <a:tc>
+                  <a:txBody>
+                    <a:bodyPr/>
+                    <a:lstStyle/>
+                    <a:p>
+                      <a:pPr marL="0" marR="0" lvl="0" indent="0" algn="r" defTabSz="457200" rtl="0" eaLnBrk="1" fontAlgn="auto" latinLnBrk="0" hangingPunct="1">
+                        <a:lnSpc>
+                          <a:spcPct val="100000"/>
+                        </a:lnSpc>
+                        <a:spcBef>
+                          <a:spcPts val="0"/>
+                        </a:spcBef>
+                        <a:spcAft>
+                          <a:spcPts val="0"/>
+                        </a:spcAft>
+                        <a:buClrTx/>
+                        <a:buSzTx/>
+                        <a:buFontTx/>
+                        <a:buNone/>
+                        <a:tabLst/>
+                        <a:defRPr/>
+                      </a:pPr>
+                      <a:r>
+                        <a:rPr kumimoji="1" lang="en-US" altLang="ja-JP" dirty="0"/>
+                        <a:t>5</a:t>
+                      </a:r>
+                      <a:endParaRPr kumimoji="1" lang="ja-JP" altLang="en-US" dirty="0"/>
+                    </a:p>
+                  </a:txBody>
+                  <a:tcPr/>
+                </a:tc>
+                <a:tc>
+                  <a:txBody>
+                    <a:bodyPr/>
+                    <a:lstStyle/>
+                    <a:p>
+                      <a:endParaRPr kumimoji="1" lang="ja-JP" altLang="en-US" dirty="0"/>
+                    </a:p>
+                  </a:txBody>
+                  <a:tcPr/>
+                </a:tc>
+                <a:tc>
+                  <a:txBody>
+                    <a:bodyPr/>
+                    <a:lstStyle/>
+                    <a:p>
+                      <a:pPr marL="0" marR="0" lvl="0" indent="0" algn="l" defTabSz="457200" rtl="0" eaLnBrk="1" fontAlgn="auto" latinLnBrk="0" hangingPunct="1">
+                        <a:lnSpc>
+                          <a:spcPct val="100000"/>
+                        </a:lnSpc>
+                        <a:spcBef>
+                          <a:spcPts val="0"/>
+                        </a:spcBef>
+                        <a:spcAft>
+                          <a:spcPts val="0"/>
+                        </a:spcAft>
+                        <a:buClrTx/>
+                        <a:buSzTx/>
+                        <a:buFontTx/>
+                        <a:buNone/>
+                        <a:tabLst/>
+                        <a:defRPr/>
+                      </a:pPr>
+                      <a:r>
+                        <a:rPr kumimoji="1" lang="en-US" altLang="ja-JP" dirty="0"/>
+                        <a:t>Portamento Time</a:t>
+                      </a:r>
+                    </a:p>
+                  </a:txBody>
+                  <a:tcPr/>
+                </a:tc>
+                <a:tc>
+                  <a:txBody>
+                    <a:bodyPr/>
+                    <a:lstStyle/>
+                    <a:p>
+                      <a:pPr marL="0" marR="0" lvl="0" indent="0" algn="l" defTabSz="457200" rtl="0" eaLnBrk="1" fontAlgn="auto" latinLnBrk="0" hangingPunct="1">
+                        <a:lnSpc>
+                          <a:spcPct val="100000"/>
+                        </a:lnSpc>
+                        <a:spcBef>
+                          <a:spcPts val="0"/>
+                        </a:spcBef>
+                        <a:spcAft>
+                          <a:spcPts val="0"/>
+                        </a:spcAft>
+                        <a:buClrTx/>
+                        <a:buSzTx/>
+                        <a:buFontTx/>
+                        <a:buNone/>
+                        <a:tabLst/>
+                        <a:defRPr/>
+                      </a:pPr>
+                      <a:r>
+                        <a:rPr kumimoji="1" lang="en-US" altLang="ja-JP" b="1" dirty="0"/>
+                        <a:t>0: Default</a:t>
+                      </a:r>
+                      <a:endParaRPr kumimoji="1" lang="ja-JP" altLang="en-US" b="1" dirty="0"/>
+                    </a:p>
+                  </a:txBody>
+                  <a:tcPr/>
+                </a:tc>
+                <a:extLst>
+                  <a:ext uri="{0D108BD9-81ED-4DB2-BD59-A6C34878D82A}">
+                    <a16:rowId xmlns:a16="http://schemas.microsoft.com/office/drawing/2014/main" val="3151093501"/>
+                  </a:ext>
+                </a:extLst>
+              </a:tr>
+              <a:tr h="370840">
+                <a:tc>
+                  <a:txBody>
+                    <a:bodyPr/>
+                    <a:lstStyle/>
+                    <a:p>
+                      <a:pPr marL="0" marR="0" lvl="0" indent="0" algn="r" defTabSz="457200" rtl="0" eaLnBrk="1" fontAlgn="auto" latinLnBrk="0" hangingPunct="1">
+                        <a:lnSpc>
+                          <a:spcPct val="100000"/>
+                        </a:lnSpc>
+                        <a:spcBef>
+                          <a:spcPts val="0"/>
+                        </a:spcBef>
+                        <a:spcAft>
+                          <a:spcPts val="0"/>
+                        </a:spcAft>
+                        <a:buClrTx/>
+                        <a:buSzTx/>
+                        <a:buFontTx/>
+                        <a:buNone/>
+                        <a:tabLst/>
+                        <a:defRPr/>
+                      </a:pPr>
+                      <a:r>
+                        <a:rPr kumimoji="1" lang="en-US" altLang="ja-JP" dirty="0"/>
+                        <a:t>6</a:t>
+                      </a:r>
+                    </a:p>
+                    <a:p>
+                      <a:pPr marL="0" marR="0" lvl="0" indent="0" algn="r" defTabSz="457200" rtl="0" eaLnBrk="1" fontAlgn="auto" latinLnBrk="0" hangingPunct="1">
+                        <a:lnSpc>
+                          <a:spcPct val="100000"/>
+                        </a:lnSpc>
+                        <a:spcBef>
+                          <a:spcPts val="0"/>
+                        </a:spcBef>
+                        <a:spcAft>
+                          <a:spcPts val="0"/>
+                        </a:spcAft>
+                        <a:buClrTx/>
+                        <a:buSzTx/>
+                        <a:buFontTx/>
+                        <a:buNone/>
+                        <a:tabLst/>
+                        <a:defRPr/>
+                      </a:pPr>
+                      <a:r>
+                        <a:rPr kumimoji="1" lang="en-US" altLang="ja-JP" dirty="0"/>
+                        <a:t>38</a:t>
+                      </a:r>
+                      <a:endParaRPr kumimoji="1" lang="ja-JP" altLang="en-US" dirty="0"/>
+                    </a:p>
+                  </a:txBody>
+                  <a:tcPr/>
+                </a:tc>
+                <a:tc>
+                  <a:txBody>
+                    <a:bodyPr/>
+                    <a:lstStyle/>
+                    <a:p>
+                      <a:endParaRPr kumimoji="1" lang="ja-JP" altLang="en-US" dirty="0"/>
+                    </a:p>
+                  </a:txBody>
+                  <a:tcPr/>
+                </a:tc>
+                <a:tc>
+                  <a:txBody>
+                    <a:bodyPr/>
+                    <a:lstStyle/>
+                    <a:p>
+                      <a:pPr marL="0" marR="0" lvl="0" indent="0" algn="l" defTabSz="457200" rtl="0" eaLnBrk="1" fontAlgn="auto" latinLnBrk="0" hangingPunct="1">
+                        <a:lnSpc>
+                          <a:spcPct val="100000"/>
+                        </a:lnSpc>
+                        <a:spcBef>
+                          <a:spcPts val="0"/>
+                        </a:spcBef>
+                        <a:spcAft>
+                          <a:spcPts val="0"/>
+                        </a:spcAft>
+                        <a:buClrTx/>
+                        <a:buSzTx/>
+                        <a:buFontTx/>
+                        <a:buNone/>
+                        <a:tabLst/>
+                        <a:defRPr/>
+                      </a:pPr>
+                      <a:r>
+                        <a:rPr kumimoji="1" lang="en-US" altLang="ja-JP" dirty="0"/>
+                        <a:t>Data Entry MSB</a:t>
+                      </a:r>
+                    </a:p>
+                    <a:p>
+                      <a:pPr marL="0" marR="0" lvl="0" indent="0" algn="l" defTabSz="457200" rtl="0" eaLnBrk="1" fontAlgn="auto" latinLnBrk="0" hangingPunct="1">
+                        <a:lnSpc>
+                          <a:spcPct val="100000"/>
+                        </a:lnSpc>
+                        <a:spcBef>
+                          <a:spcPts val="0"/>
+                        </a:spcBef>
+                        <a:spcAft>
+                          <a:spcPts val="0"/>
+                        </a:spcAft>
+                        <a:buClrTx/>
+                        <a:buSzTx/>
+                        <a:buFontTx/>
+                        <a:buNone/>
+                        <a:tabLst/>
+                        <a:defRPr/>
+                      </a:pPr>
+                      <a:r>
+                        <a:rPr kumimoji="1" lang="en-US" altLang="ja-JP" dirty="0"/>
+                        <a:t>Data Entry LSB</a:t>
+                      </a:r>
+                      <a:endParaRPr kumimoji="1" lang="ja-JP" altLang="en-US" dirty="0"/>
+                    </a:p>
+                  </a:txBody>
+                  <a:tcPr/>
+                </a:tc>
+                <a:tc>
+                  <a:txBody>
+                    <a:bodyPr/>
+                    <a:lstStyle/>
+                    <a:p>
+                      <a:endParaRPr kumimoji="1" lang="ja-JP" altLang="en-US" dirty="0"/>
+                    </a:p>
+                  </a:txBody>
+                  <a:tcPr/>
+                </a:tc>
+                <a:extLst>
+                  <a:ext uri="{0D108BD9-81ED-4DB2-BD59-A6C34878D82A}">
+                    <a16:rowId xmlns:a16="http://schemas.microsoft.com/office/drawing/2014/main" val="3470120010"/>
+                  </a:ext>
+                </a:extLst>
+              </a:tr>
+              <a:tr h="370840">
+                <a:tc>
+                  <a:txBody>
+                    <a:bodyPr/>
+                    <a:lstStyle/>
+                    <a:p>
+                      <a:pPr algn="r"/>
+                      <a:r>
+                        <a:rPr kumimoji="1" lang="en-US" altLang="ja-JP" dirty="0"/>
+                        <a:t>7</a:t>
+                      </a:r>
+                      <a:endParaRPr kumimoji="1" lang="ja-JP" altLang="en-US" dirty="0"/>
+                    </a:p>
+                  </a:txBody>
+                  <a:tcPr/>
+                </a:tc>
+                <a:tc>
+                  <a:txBody>
+                    <a:bodyPr/>
+                    <a:lstStyle/>
+                    <a:p>
+                      <a:endParaRPr kumimoji="1" lang="ja-JP" altLang="en-US" dirty="0"/>
+                    </a:p>
+                  </a:txBody>
+                  <a:tcPr/>
+                </a:tc>
+                <a:tc>
+                  <a:txBody>
+                    <a:bodyPr/>
+                    <a:lstStyle/>
+                    <a:p>
+                      <a:pPr marL="0" marR="0" lvl="0" indent="0" algn="l" defTabSz="457200" rtl="0" eaLnBrk="1" fontAlgn="auto" latinLnBrk="0" hangingPunct="1">
+                        <a:lnSpc>
+                          <a:spcPct val="100000"/>
+                        </a:lnSpc>
+                        <a:spcBef>
+                          <a:spcPts val="0"/>
+                        </a:spcBef>
+                        <a:spcAft>
+                          <a:spcPts val="0"/>
+                        </a:spcAft>
+                        <a:buClrTx/>
+                        <a:buSzTx/>
+                        <a:buFontTx/>
+                        <a:buNone/>
+                        <a:tabLst/>
+                        <a:defRPr/>
+                      </a:pPr>
+                      <a:r>
+                        <a:rPr kumimoji="1" lang="en-US" altLang="ja-JP" dirty="0"/>
+                        <a:t>Volume</a:t>
+                      </a:r>
+                      <a:endParaRPr kumimoji="1" lang="ja-JP" altLang="en-US" dirty="0"/>
+                    </a:p>
+                  </a:txBody>
+                  <a:tcPr/>
+                </a:tc>
+                <a:tc>
+                  <a:txBody>
+                    <a:bodyPr/>
+                    <a:lstStyle/>
+                    <a:p>
+                      <a:pPr marL="0" marR="0" lvl="0" indent="0" algn="l" defTabSz="457200" rtl="0" eaLnBrk="1" fontAlgn="auto" latinLnBrk="0" hangingPunct="1">
+                        <a:lnSpc>
+                          <a:spcPct val="100000"/>
+                        </a:lnSpc>
+                        <a:spcBef>
+                          <a:spcPts val="0"/>
+                        </a:spcBef>
+                        <a:spcAft>
+                          <a:spcPts val="0"/>
+                        </a:spcAft>
+                        <a:buClrTx/>
+                        <a:buSzTx/>
+                        <a:buFontTx/>
+                        <a:buNone/>
+                        <a:tabLst/>
+                        <a:defRPr/>
+                      </a:pPr>
+                      <a:r>
+                        <a:rPr kumimoji="1" lang="en-US" altLang="ja-JP" b="1" dirty="0"/>
+                        <a:t>127: Default</a:t>
+                      </a:r>
+                      <a:endParaRPr kumimoji="1" lang="ja-JP" altLang="en-US" b="1" dirty="0"/>
+                    </a:p>
+                  </a:txBody>
+                  <a:tcPr/>
+                </a:tc>
+                <a:extLst>
+                  <a:ext uri="{0D108BD9-81ED-4DB2-BD59-A6C34878D82A}">
+                    <a16:rowId xmlns:a16="http://schemas.microsoft.com/office/drawing/2014/main" val="3692358912"/>
+                  </a:ext>
+                </a:extLst>
+              </a:tr>
+              <a:tr h="370840">
+                <a:tc>
+                  <a:txBody>
+                    <a:bodyPr/>
+                    <a:lstStyle/>
+                    <a:p>
+                      <a:pPr algn="r"/>
+                      <a:r>
+                        <a:rPr kumimoji="1" lang="en-US" altLang="ja-JP" dirty="0"/>
+                        <a:t>10</a:t>
+                      </a:r>
+                      <a:endParaRPr kumimoji="1" lang="ja-JP" altLang="en-US" dirty="0"/>
+                    </a:p>
+                  </a:txBody>
+                  <a:tcPr/>
+                </a:tc>
+                <a:tc>
+                  <a:txBody>
+                    <a:bodyPr/>
+                    <a:lstStyle/>
+                    <a:p>
+                      <a:endParaRPr kumimoji="1" lang="ja-JP" altLang="en-US" dirty="0"/>
+                    </a:p>
+                  </a:txBody>
+                  <a:tcPr/>
+                </a:tc>
+                <a:tc>
+                  <a:txBody>
+                    <a:bodyPr/>
+                    <a:lstStyle/>
+                    <a:p>
+                      <a:pPr marL="0" marR="0" lvl="0" indent="0" algn="l" defTabSz="457200" rtl="0" eaLnBrk="1" fontAlgn="auto" latinLnBrk="0" hangingPunct="1">
+                        <a:lnSpc>
+                          <a:spcPct val="100000"/>
+                        </a:lnSpc>
+                        <a:spcBef>
+                          <a:spcPts val="0"/>
+                        </a:spcBef>
+                        <a:spcAft>
+                          <a:spcPts val="0"/>
+                        </a:spcAft>
+                        <a:buClrTx/>
+                        <a:buSzTx/>
+                        <a:buFontTx/>
+                        <a:buNone/>
+                        <a:tabLst/>
+                        <a:defRPr/>
+                      </a:pPr>
+                      <a:r>
+                        <a:rPr kumimoji="1" lang="en-US" altLang="ja-JP" dirty="0" err="1"/>
+                        <a:t>Panpot</a:t>
+                      </a:r>
+                      <a:endParaRPr kumimoji="1" lang="en-US" altLang="ja-JP" dirty="0"/>
+                    </a:p>
+                  </a:txBody>
+                  <a:tcPr/>
+                </a:tc>
+                <a:tc>
+                  <a:txBody>
+                    <a:bodyPr/>
+                    <a:lstStyle/>
+                    <a:p>
+                      <a:r>
+                        <a:rPr kumimoji="1" lang="en-US" altLang="ja-JP" b="1" dirty="0"/>
+                        <a:t>64: Default</a:t>
+                      </a:r>
+                      <a:endParaRPr kumimoji="1" lang="en-US" altLang="ja-JP" dirty="0"/>
+                    </a:p>
+                    <a:p>
+                      <a:r>
+                        <a:rPr kumimoji="1" lang="en-US" altLang="ja-JP" dirty="0"/>
+                        <a:t>0: Left, 127: Right</a:t>
+                      </a:r>
+                      <a:endParaRPr kumimoji="1" lang="ja-JP" altLang="en-US" dirty="0"/>
+                    </a:p>
+                  </a:txBody>
+                  <a:tcPr/>
+                </a:tc>
+                <a:extLst>
+                  <a:ext uri="{0D108BD9-81ED-4DB2-BD59-A6C34878D82A}">
+                    <a16:rowId xmlns:a16="http://schemas.microsoft.com/office/drawing/2014/main" val="583184106"/>
+                  </a:ext>
+                </a:extLst>
+              </a:tr>
+              <a:tr h="370840">
+                <a:tc>
+                  <a:txBody>
+                    <a:bodyPr/>
+                    <a:lstStyle/>
+                    <a:p>
+                      <a:pPr algn="r"/>
+                      <a:r>
+                        <a:rPr kumimoji="1" lang="en-US" altLang="ja-JP" dirty="0"/>
+                        <a:t>11</a:t>
+                      </a:r>
+                      <a:endParaRPr kumimoji="1" lang="ja-JP" altLang="en-US" dirty="0"/>
+                    </a:p>
+                  </a:txBody>
+                  <a:tcPr/>
+                </a:tc>
+                <a:tc>
+                  <a:txBody>
+                    <a:bodyPr/>
+                    <a:lstStyle/>
+                    <a:p>
+                      <a:endParaRPr kumimoji="1" lang="ja-JP" altLang="en-US" dirty="0"/>
+                    </a:p>
+                  </a:txBody>
+                  <a:tcPr/>
+                </a:tc>
+                <a:tc>
+                  <a:txBody>
+                    <a:bodyPr/>
+                    <a:lstStyle/>
+                    <a:p>
+                      <a:pPr marL="0" marR="0" lvl="0" indent="0" algn="l" defTabSz="457200" rtl="0" eaLnBrk="1" fontAlgn="auto" latinLnBrk="0" hangingPunct="1">
+                        <a:lnSpc>
+                          <a:spcPct val="100000"/>
+                        </a:lnSpc>
+                        <a:spcBef>
+                          <a:spcPts val="0"/>
+                        </a:spcBef>
+                        <a:spcAft>
+                          <a:spcPts val="0"/>
+                        </a:spcAft>
+                        <a:buClrTx/>
+                        <a:buSzTx/>
+                        <a:buFontTx/>
+                        <a:buNone/>
+                        <a:tabLst/>
+                        <a:defRPr/>
+                      </a:pPr>
+                      <a:r>
+                        <a:rPr kumimoji="1" lang="en-US" altLang="ja-JP" dirty="0"/>
+                        <a:t>Expression</a:t>
+                      </a:r>
+                      <a:endParaRPr kumimoji="1" lang="ja-JP" altLang="en-US" dirty="0"/>
+                    </a:p>
+                  </a:txBody>
+                  <a:tcPr/>
+                </a:tc>
+                <a:tc>
+                  <a:txBody>
+                    <a:bodyPr/>
+                    <a:lstStyle/>
+                    <a:p>
+                      <a:r>
+                        <a:rPr kumimoji="1" lang="en-US" altLang="ja-JP" b="1" dirty="0"/>
+                        <a:t>127: Default</a:t>
+                      </a:r>
+                      <a:endParaRPr kumimoji="1" lang="ja-JP" altLang="en-US" dirty="0"/>
+                    </a:p>
+                  </a:txBody>
+                  <a:tcPr/>
+                </a:tc>
+                <a:extLst>
+                  <a:ext uri="{0D108BD9-81ED-4DB2-BD59-A6C34878D82A}">
+                    <a16:rowId xmlns:a16="http://schemas.microsoft.com/office/drawing/2014/main" val="304852787"/>
+                  </a:ext>
+                </a:extLst>
+              </a:tr>
+              <a:tr h="370840">
+                <a:tc>
+                  <a:txBody>
+                    <a:bodyPr/>
+                    <a:lstStyle/>
+                    <a:p>
+                      <a:pPr algn="r"/>
+                      <a:r>
+                        <a:rPr kumimoji="1" lang="en-US" altLang="ja-JP" dirty="0"/>
+                        <a:t>16-19</a:t>
+                      </a:r>
+                      <a:endParaRPr kumimoji="1" lang="ja-JP" altLang="en-US" dirty="0"/>
+                    </a:p>
+                  </a:txBody>
+                  <a:tcPr/>
+                </a:tc>
+                <a:tc>
+                  <a:txBody>
+                    <a:bodyPr/>
+                    <a:lstStyle/>
+                    <a:p>
+                      <a:endParaRPr kumimoji="1" lang="ja-JP" altLang="en-US" dirty="0"/>
+                    </a:p>
+                  </a:txBody>
+                  <a:tcPr/>
+                </a:tc>
+                <a:tc>
+                  <a:txBody>
+                    <a:bodyPr/>
+                    <a:lstStyle/>
+                    <a:p>
+                      <a:pPr marL="0" marR="0" lvl="0" indent="0" algn="l" defTabSz="457200" rtl="0" eaLnBrk="1" fontAlgn="auto" latinLnBrk="0" hangingPunct="1">
+                        <a:lnSpc>
+                          <a:spcPct val="100000"/>
+                        </a:lnSpc>
+                        <a:spcBef>
+                          <a:spcPts val="0"/>
+                        </a:spcBef>
+                        <a:spcAft>
+                          <a:spcPts val="0"/>
+                        </a:spcAft>
+                        <a:buClrTx/>
+                        <a:buSzTx/>
+                        <a:buFontTx/>
+                        <a:buNone/>
+                        <a:tabLst/>
+                        <a:defRPr/>
+                      </a:pPr>
+                      <a:r>
+                        <a:rPr kumimoji="1" lang="en-US" altLang="ja-JP" dirty="0"/>
+                        <a:t>GPCS1</a:t>
+                      </a:r>
+                      <a:endParaRPr kumimoji="1" lang="ja-JP" altLang="en-US" dirty="0"/>
+                    </a:p>
+                  </a:txBody>
+                  <a:tcPr/>
+                </a:tc>
+                <a:tc>
+                  <a:txBody>
+                    <a:bodyPr/>
+                    <a:lstStyle/>
+                    <a:p>
+                      <a:pPr marL="0" marR="0" lvl="0" indent="0" algn="l" defTabSz="457200" rtl="0" eaLnBrk="1" fontAlgn="auto" latinLnBrk="0" hangingPunct="1">
+                        <a:lnSpc>
+                          <a:spcPct val="100000"/>
+                        </a:lnSpc>
+                        <a:spcBef>
+                          <a:spcPts val="0"/>
+                        </a:spcBef>
+                        <a:spcAft>
+                          <a:spcPts val="0"/>
+                        </a:spcAft>
+                        <a:buClrTx/>
+                        <a:buSzTx/>
+                        <a:buFontTx/>
+                        <a:buNone/>
+                        <a:tabLst/>
+                        <a:defRPr/>
+                      </a:pPr>
+                      <a:r>
+                        <a:rPr kumimoji="1" lang="en-US" altLang="ja-JP" sz="1800" kern="1200" dirty="0">
+                          <a:solidFill>
+                            <a:schemeClr val="dk1"/>
+                          </a:solidFill>
+                          <a:latin typeface="+mn-lt"/>
+                          <a:ea typeface="+mn-ea"/>
+                          <a:cs typeface="+mn-cs"/>
+                        </a:rPr>
+                        <a:t>Modify params</a:t>
+                      </a:r>
+                      <a:endParaRPr kumimoji="1" lang="ja-JP" altLang="en-US" dirty="0"/>
+                    </a:p>
+                  </a:txBody>
+                  <a:tcPr/>
+                </a:tc>
+                <a:extLst>
+                  <a:ext uri="{0D108BD9-81ED-4DB2-BD59-A6C34878D82A}">
+                    <a16:rowId xmlns:a16="http://schemas.microsoft.com/office/drawing/2014/main" val="4096057222"/>
+                  </a:ext>
+                </a:extLst>
+              </a:tr>
+              <a:tr h="370840">
+                <a:tc>
+                  <a:txBody>
+                    <a:bodyPr/>
+                    <a:lstStyle/>
+                    <a:p>
+                      <a:pPr algn="r"/>
+                      <a:r>
+                        <a:rPr kumimoji="1" lang="en-US" altLang="ja-JP" dirty="0"/>
+                        <a:t>64</a:t>
+                      </a:r>
+                      <a:endParaRPr kumimoji="1" lang="ja-JP" altLang="en-US" dirty="0"/>
+                    </a:p>
+                  </a:txBody>
+                  <a:tcPr/>
+                </a:tc>
+                <a:tc>
+                  <a:txBody>
+                    <a:bodyPr/>
+                    <a:lstStyle/>
+                    <a:p>
+                      <a:endParaRPr kumimoji="1" lang="ja-JP" altLang="en-US" dirty="0"/>
+                    </a:p>
+                  </a:txBody>
+                  <a:tcPr/>
+                </a:tc>
+                <a:tc>
+                  <a:txBody>
+                    <a:bodyPr/>
+                    <a:lstStyle/>
+                    <a:p>
+                      <a:pPr marL="0" marR="0" lvl="0" indent="0" algn="l" defTabSz="457200" rtl="0" eaLnBrk="1" fontAlgn="auto" latinLnBrk="0" hangingPunct="1">
+                        <a:lnSpc>
+                          <a:spcPct val="100000"/>
+                        </a:lnSpc>
+                        <a:spcBef>
+                          <a:spcPts val="0"/>
+                        </a:spcBef>
+                        <a:spcAft>
+                          <a:spcPts val="0"/>
+                        </a:spcAft>
+                        <a:buClrTx/>
+                        <a:buSzTx/>
+                        <a:buFontTx/>
+                        <a:buNone/>
+                        <a:tabLst/>
+                        <a:defRPr/>
+                      </a:pPr>
+                      <a:r>
+                        <a:rPr kumimoji="1" lang="en-US" altLang="ja-JP" dirty="0"/>
+                        <a:t>Hold 1</a:t>
+                      </a:r>
+                      <a:endParaRPr kumimoji="1" lang="ja-JP" altLang="en-US" dirty="0"/>
+                    </a:p>
+                  </a:txBody>
+                  <a:tcPr/>
+                </a:tc>
+                <a:tc>
+                  <a:txBody>
+                    <a:bodyPr/>
+                    <a:lstStyle/>
+                    <a:p>
+                      <a:pPr marL="0" marR="0" lvl="0" indent="0" algn="l" defTabSz="457200" rtl="0" eaLnBrk="1" fontAlgn="auto" latinLnBrk="0" hangingPunct="1">
+                        <a:lnSpc>
+                          <a:spcPct val="100000"/>
+                        </a:lnSpc>
+                        <a:spcBef>
+                          <a:spcPts val="0"/>
+                        </a:spcBef>
+                        <a:spcAft>
+                          <a:spcPts val="0"/>
+                        </a:spcAft>
+                        <a:buClrTx/>
+                        <a:buSzTx/>
+                        <a:buFontTx/>
+                        <a:buNone/>
+                        <a:tabLst/>
+                        <a:defRPr/>
+                      </a:pPr>
+                      <a:r>
+                        <a:rPr kumimoji="1" lang="en-US" altLang="ja-JP" b="1" dirty="0"/>
+                        <a:t>0: OFF</a:t>
+                      </a:r>
+                      <a:r>
+                        <a:rPr kumimoji="1" lang="en-US" altLang="ja-JP" dirty="0"/>
+                        <a:t>, 64: ON</a:t>
+                      </a:r>
+                      <a:endParaRPr kumimoji="1" lang="ja-JP" altLang="en-US" dirty="0"/>
+                    </a:p>
+                  </a:txBody>
+                  <a:tcPr/>
+                </a:tc>
+                <a:extLst>
+                  <a:ext uri="{0D108BD9-81ED-4DB2-BD59-A6C34878D82A}">
+                    <a16:rowId xmlns:a16="http://schemas.microsoft.com/office/drawing/2014/main" val="414794709"/>
+                  </a:ext>
+                </a:extLst>
+              </a:tr>
+              <a:tr h="370840">
+                <a:tc>
+                  <a:txBody>
+                    <a:bodyPr/>
+                    <a:lstStyle/>
+                    <a:p>
+                      <a:pPr algn="r"/>
+                      <a:r>
+                        <a:rPr kumimoji="1" lang="en-US" altLang="ja-JP" dirty="0"/>
+                        <a:t>65</a:t>
+                      </a:r>
+                      <a:endParaRPr kumimoji="1" lang="ja-JP" altLang="en-US" dirty="0"/>
+                    </a:p>
+                  </a:txBody>
+                  <a:tcPr/>
+                </a:tc>
+                <a:tc>
+                  <a:txBody>
+                    <a:bodyPr/>
+                    <a:lstStyle/>
+                    <a:p>
+                      <a:endParaRPr kumimoji="1" lang="ja-JP" altLang="en-US" dirty="0"/>
+                    </a:p>
+                  </a:txBody>
+                  <a:tcPr/>
+                </a:tc>
+                <a:tc>
+                  <a:txBody>
+                    <a:bodyPr/>
+                    <a:lstStyle/>
+                    <a:p>
+                      <a:pPr marL="0" marR="0" lvl="0" indent="0" algn="l" defTabSz="457200" rtl="0" eaLnBrk="1" fontAlgn="auto" latinLnBrk="0" hangingPunct="1">
+                        <a:lnSpc>
+                          <a:spcPct val="100000"/>
+                        </a:lnSpc>
+                        <a:spcBef>
+                          <a:spcPts val="0"/>
+                        </a:spcBef>
+                        <a:spcAft>
+                          <a:spcPts val="0"/>
+                        </a:spcAft>
+                        <a:buClrTx/>
+                        <a:buSzTx/>
+                        <a:buFontTx/>
+                        <a:buNone/>
+                        <a:tabLst/>
+                        <a:defRPr/>
+                      </a:pPr>
+                      <a:r>
+                        <a:rPr kumimoji="1" lang="en-US" altLang="ja-JP" dirty="0"/>
+                        <a:t>Portamento</a:t>
+                      </a:r>
+                      <a:endParaRPr kumimoji="1" lang="ja-JP" altLang="en-US" dirty="0"/>
+                    </a:p>
+                  </a:txBody>
+                  <a:tcPr/>
+                </a:tc>
+                <a:tc>
+                  <a:txBody>
+                    <a:bodyPr/>
+                    <a:lstStyle/>
+                    <a:p>
+                      <a:r>
+                        <a:rPr kumimoji="1" lang="en-US" altLang="ja-JP" b="1" dirty="0"/>
+                        <a:t>0: OFF</a:t>
+                      </a:r>
+                      <a:r>
+                        <a:rPr kumimoji="1" lang="en-US" altLang="ja-JP" dirty="0"/>
+                        <a:t>, 64: ON</a:t>
+                      </a:r>
+                      <a:endParaRPr kumimoji="1" lang="ja-JP" altLang="en-US" dirty="0"/>
+                    </a:p>
+                  </a:txBody>
+                  <a:tcPr/>
+                </a:tc>
+                <a:extLst>
+                  <a:ext uri="{0D108BD9-81ED-4DB2-BD59-A6C34878D82A}">
+                    <a16:rowId xmlns:a16="http://schemas.microsoft.com/office/drawing/2014/main" val="4028159061"/>
+                  </a:ext>
+                </a:extLst>
+              </a:tr>
+            </a:tbl>
+          </a:graphicData>
+        </a:graphic>
+      </p:graphicFrame>
+    </p:spTree>
+    <p:extLst>
+      <p:ext uri="{BB962C8B-B14F-4D97-AF65-F5344CB8AC3E}">
+        <p14:creationId xmlns:p14="http://schemas.microsoft.com/office/powerpoint/2010/main" val="2481106099"/>
+      </p:ext>
+    </p:extLst>
+  </p:cSld>
+  <p:clrMapOvr>
+    <a:masterClrMapping/>
+  </p:clrMapOvr>
+</p:sld>
+</file>
+
+<file path=ppt/slides/slide23.xml><?xml version="1.0" encoding="utf-8"?>
+<p:sld xmlns:a="http://schemas.openxmlformats.org/drawingml/2006/main" xmlns:r="http://schemas.openxmlformats.org/officeDocument/2006/relationships" xmlns:p="http://schemas.openxmlformats.org/presentationml/2006/main">
+  <p:cSld>
+    <p:spTree>
+      <p:nvGrpSpPr>
+        <p:cNvPr id="1" name=""/>
+        <p:cNvGrpSpPr/>
+        <p:nvPr/>
+      </p:nvGrpSpPr>
+      <p:grpSpPr>
+        <a:xfrm>
+          <a:off x="0" y="0"/>
+          <a:ext cx="0" cy="0"/>
+          <a:chOff x="0" y="0"/>
+          <a:chExt cx="0" cy="0"/>
+        </a:xfrm>
+      </p:grpSpPr>
+      <p:sp>
+        <p:nvSpPr>
+          <p:cNvPr id="2" name="タイトル 1">
+            <a:extLst>
+              <a:ext uri="{FF2B5EF4-FFF2-40B4-BE49-F238E27FC236}">
+                <a16:creationId xmlns:a16="http://schemas.microsoft.com/office/drawing/2014/main" id="{29A39A5C-7FC5-4D89-9A64-C4313BC4C574}"/>
+              </a:ext>
+            </a:extLst>
+          </p:cNvPr>
+          <p:cNvSpPr>
+            <a:spLocks noGrp="1"/>
+          </p:cNvSpPr>
+          <p:nvPr>
+            <p:ph type="title"/>
+          </p:nvPr>
+        </p:nvSpPr>
+        <p:spPr/>
+        <p:txBody>
+          <a:bodyPr/>
+          <a:lstStyle/>
+          <a:p>
+            <a:r>
+              <a:rPr kumimoji="1" lang="en-US" altLang="ja-JP" dirty="0"/>
+              <a:t>MIDI Implementation Chart 3</a:t>
+            </a:r>
+            <a:endParaRPr kumimoji="1" lang="ja-JP" altLang="en-US" dirty="0"/>
+          </a:p>
+        </p:txBody>
+      </p:sp>
+      <p:sp>
+        <p:nvSpPr>
+          <p:cNvPr id="4" name="スライド番号プレースホルダー 3">
+            <a:extLst>
+              <a:ext uri="{FF2B5EF4-FFF2-40B4-BE49-F238E27FC236}">
+                <a16:creationId xmlns:a16="http://schemas.microsoft.com/office/drawing/2014/main" id="{F527AEA0-7EF4-4546-B495-9F4920BF8281}"/>
+              </a:ext>
+            </a:extLst>
+          </p:cNvPr>
+          <p:cNvSpPr>
+            <a:spLocks noGrp="1"/>
+          </p:cNvSpPr>
+          <p:nvPr>
+            <p:ph type="sldNum" sz="quarter" idx="12"/>
+          </p:nvPr>
+        </p:nvSpPr>
+        <p:spPr/>
+        <p:txBody>
+          <a:bodyPr/>
+          <a:lstStyle/>
+          <a:p>
+            <a:fld id="{E27E2812-4560-4165-A7C7-9C013F955547}" type="slidenum">
+              <a:rPr kumimoji="1" lang="ja-JP" altLang="en-US" smtClean="0"/>
+              <a:t>23</a:t>
+            </a:fld>
+            <a:endParaRPr kumimoji="1" lang="ja-JP" altLang="en-US"/>
+          </a:p>
+        </p:txBody>
+      </p:sp>
+      <p:graphicFrame>
+        <p:nvGraphicFramePr>
+          <p:cNvPr id="5" name="表 5">
+            <a:extLst>
+              <a:ext uri="{FF2B5EF4-FFF2-40B4-BE49-F238E27FC236}">
+                <a16:creationId xmlns:a16="http://schemas.microsoft.com/office/drawing/2014/main" id="{30EAE93F-19A6-429D-9E65-73D2543B8418}"/>
+              </a:ext>
+            </a:extLst>
+          </p:cNvPr>
+          <p:cNvGraphicFramePr>
+            <a:graphicFrameLocks noGrp="1"/>
+          </p:cNvGraphicFramePr>
+          <p:nvPr>
+            <p:extLst>
+              <p:ext uri="{D42A27DB-BD31-4B8C-83A1-F6EECF244321}">
+                <p14:modId xmlns:p14="http://schemas.microsoft.com/office/powerpoint/2010/main" val="4198317691"/>
+              </p:ext>
+            </p:extLst>
+          </p:nvPr>
+        </p:nvGraphicFramePr>
+        <p:xfrm>
+          <a:off x="2032000" y="2225333"/>
+          <a:ext cx="9472612" cy="4318000"/>
+        </p:xfrm>
+        <a:graphic>
+          <a:graphicData uri="http://schemas.openxmlformats.org/drawingml/2006/table">
+            <a:tbl>
+              <a:tblPr firstRow="1" bandRow="1">
+                <a:tableStyleId>{5C22544A-7EE6-4342-B048-85BDC9FD1C3A}</a:tableStyleId>
+              </a:tblPr>
+              <a:tblGrid>
+                <a:gridCol w="2368153">
+                  <a:extLst>
+                    <a:ext uri="{9D8B030D-6E8A-4147-A177-3AD203B41FA5}">
+                      <a16:colId xmlns:a16="http://schemas.microsoft.com/office/drawing/2014/main" val="3140821746"/>
+                    </a:ext>
+                  </a:extLst>
+                </a:gridCol>
+                <a:gridCol w="2368153">
+                  <a:extLst>
+                    <a:ext uri="{9D8B030D-6E8A-4147-A177-3AD203B41FA5}">
+                      <a16:colId xmlns:a16="http://schemas.microsoft.com/office/drawing/2014/main" val="2862939062"/>
+                    </a:ext>
+                  </a:extLst>
+                </a:gridCol>
+                <a:gridCol w="2368153">
+                  <a:extLst>
+                    <a:ext uri="{9D8B030D-6E8A-4147-A177-3AD203B41FA5}">
+                      <a16:colId xmlns:a16="http://schemas.microsoft.com/office/drawing/2014/main" val="2770498619"/>
+                    </a:ext>
+                  </a:extLst>
+                </a:gridCol>
+                <a:gridCol w="2368153">
+                  <a:extLst>
+                    <a:ext uri="{9D8B030D-6E8A-4147-A177-3AD203B41FA5}">
+                      <a16:colId xmlns:a16="http://schemas.microsoft.com/office/drawing/2014/main" val="4289464401"/>
+                    </a:ext>
+                  </a:extLst>
+                </a:gridCol>
+              </a:tblGrid>
+              <a:tr h="370840">
+                <a:tc>
+                  <a:txBody>
+                    <a:bodyPr/>
+                    <a:lstStyle/>
+                    <a:p>
+                      <a:r>
+                        <a:rPr kumimoji="1" lang="en-US" altLang="ja-JP" dirty="0"/>
+                        <a:t>Function</a:t>
+                      </a:r>
+                      <a:endParaRPr kumimoji="1" lang="ja-JP" altLang="en-US" dirty="0"/>
+                    </a:p>
+                  </a:txBody>
+                  <a:tcPr/>
+                </a:tc>
+                <a:tc>
+                  <a:txBody>
+                    <a:bodyPr/>
+                    <a:lstStyle/>
+                    <a:p>
+                      <a:r>
+                        <a:rPr kumimoji="1" lang="en-US" altLang="ja-JP" dirty="0"/>
+                        <a:t>Transmitted</a:t>
+                      </a:r>
+                      <a:endParaRPr kumimoji="1" lang="ja-JP" altLang="en-US" dirty="0"/>
+                    </a:p>
+                  </a:txBody>
+                  <a:tcPr/>
+                </a:tc>
+                <a:tc>
+                  <a:txBody>
+                    <a:bodyPr/>
+                    <a:lstStyle/>
+                    <a:p>
+                      <a:r>
+                        <a:rPr kumimoji="1" lang="en-US" altLang="ja-JP" dirty="0"/>
+                        <a:t>Recognize</a:t>
+                      </a:r>
+                      <a:endParaRPr kumimoji="1" lang="ja-JP" altLang="en-US" dirty="0"/>
+                    </a:p>
+                  </a:txBody>
+                  <a:tcPr/>
+                </a:tc>
+                <a:tc>
+                  <a:txBody>
+                    <a:bodyPr/>
+                    <a:lstStyle/>
+                    <a:p>
+                      <a:r>
+                        <a:rPr kumimoji="1" lang="en-US" altLang="ja-JP" dirty="0"/>
+                        <a:t>Remarks</a:t>
+                      </a:r>
+                      <a:endParaRPr kumimoji="1" lang="ja-JP" altLang="en-US" dirty="0"/>
+                    </a:p>
+                  </a:txBody>
+                  <a:tcPr/>
+                </a:tc>
+                <a:extLst>
+                  <a:ext uri="{0D108BD9-81ED-4DB2-BD59-A6C34878D82A}">
+                    <a16:rowId xmlns:a16="http://schemas.microsoft.com/office/drawing/2014/main" val="1671041493"/>
+                  </a:ext>
+                </a:extLst>
+              </a:tr>
+              <a:tr h="370840">
+                <a:tc>
+                  <a:txBody>
+                    <a:bodyPr/>
+                    <a:lstStyle/>
+                    <a:p>
+                      <a:pPr algn="l"/>
+                      <a:r>
+                        <a:rPr kumimoji="1" lang="en-US" altLang="ja-JP" dirty="0"/>
+                        <a:t>Control Change</a:t>
+                      </a:r>
+                    </a:p>
+                    <a:p>
+                      <a:pPr algn="r"/>
+                      <a:r>
+                        <a:rPr kumimoji="1" lang="en-US" altLang="ja-JP" dirty="0"/>
+                        <a:t>70-75,79</a:t>
+                      </a:r>
+                      <a:endParaRPr kumimoji="1" lang="ja-JP" altLang="en-US" dirty="0"/>
+                    </a:p>
+                  </a:txBody>
+                  <a:tcPr/>
+                </a:tc>
+                <a:tc>
+                  <a:txBody>
+                    <a:bodyPr/>
+                    <a:lstStyle/>
+                    <a:p>
+                      <a:r>
+                        <a:rPr kumimoji="1" lang="en-US" altLang="ja-JP" dirty="0"/>
+                        <a:t>-</a:t>
+                      </a:r>
+                      <a:endParaRPr kumimoji="1" lang="ja-JP" altLang="en-US" dirty="0"/>
+                    </a:p>
+                  </a:txBody>
+                  <a:tcPr/>
+                </a:tc>
+                <a:tc>
+                  <a:txBody>
+                    <a:bodyPr/>
+                    <a:lstStyle/>
+                    <a:p>
+                      <a:endParaRPr kumimoji="1" lang="en-US" altLang="ja-JP" dirty="0"/>
+                    </a:p>
+                    <a:p>
+                      <a:pPr marL="0" marR="0" lvl="0" indent="0" algn="l" defTabSz="457200" rtl="0" eaLnBrk="1" fontAlgn="auto" latinLnBrk="0" hangingPunct="1">
+                        <a:lnSpc>
+                          <a:spcPct val="100000"/>
+                        </a:lnSpc>
+                        <a:spcBef>
+                          <a:spcPts val="0"/>
+                        </a:spcBef>
+                        <a:spcAft>
+                          <a:spcPts val="0"/>
+                        </a:spcAft>
+                        <a:buClrTx/>
+                        <a:buSzTx/>
+                        <a:buFontTx/>
+                        <a:buNone/>
+                        <a:tabLst/>
+                        <a:defRPr/>
+                      </a:pPr>
+                      <a:r>
+                        <a:rPr kumimoji="1" lang="en-US" altLang="ja-JP" dirty="0"/>
+                        <a:t>SCCS</a:t>
+                      </a:r>
+                      <a:endParaRPr kumimoji="1" lang="ja-JP" altLang="en-US" dirty="0"/>
+                    </a:p>
+                  </a:txBody>
+                  <a:tcPr/>
+                </a:tc>
+                <a:tc>
+                  <a:txBody>
+                    <a:bodyPr/>
+                    <a:lstStyle/>
+                    <a:p>
+                      <a:r>
+                        <a:rPr kumimoji="1" lang="en-US" altLang="ja-JP" sz="1800" kern="1200" dirty="0">
+                          <a:solidFill>
+                            <a:schemeClr val="dk1"/>
+                          </a:solidFill>
+                          <a:latin typeface="+mn-lt"/>
+                          <a:ea typeface="+mn-ea"/>
+                          <a:cs typeface="+mn-cs"/>
+                        </a:rPr>
+                        <a:t>Modify current timbre params</a:t>
+                      </a:r>
+                      <a:endParaRPr kumimoji="1" lang="ja-JP" altLang="en-US" dirty="0"/>
+                    </a:p>
+                  </a:txBody>
+                  <a:tcPr/>
+                </a:tc>
+                <a:extLst>
+                  <a:ext uri="{0D108BD9-81ED-4DB2-BD59-A6C34878D82A}">
+                    <a16:rowId xmlns:a16="http://schemas.microsoft.com/office/drawing/2014/main" val="2531957203"/>
+                  </a:ext>
+                </a:extLst>
+              </a:tr>
+              <a:tr h="370840">
+                <a:tc>
+                  <a:txBody>
+                    <a:bodyPr/>
+                    <a:lstStyle/>
+                    <a:p>
+                      <a:pPr algn="r"/>
+                      <a:r>
+                        <a:rPr kumimoji="1" lang="en-US" altLang="ja-JP" dirty="0"/>
+                        <a:t>76</a:t>
+                      </a:r>
+                    </a:p>
+                    <a:p>
+                      <a:pPr algn="r"/>
+                      <a:r>
+                        <a:rPr kumimoji="1" lang="en-US" altLang="ja-JP" dirty="0"/>
+                        <a:t>77</a:t>
+                      </a:r>
+                    </a:p>
+                    <a:p>
+                      <a:pPr algn="r"/>
+                      <a:r>
+                        <a:rPr kumimoji="1" lang="en-US" altLang="ja-JP" dirty="0"/>
+                        <a:t>78</a:t>
+                      </a:r>
+                      <a:endParaRPr kumimoji="1" lang="ja-JP" altLang="en-US" dirty="0"/>
+                    </a:p>
+                  </a:txBody>
+                  <a:tcPr/>
+                </a:tc>
+                <a:tc>
+                  <a:txBody>
+                    <a:bodyPr/>
+                    <a:lstStyle/>
+                    <a:p>
+                      <a:r>
+                        <a:rPr kumimoji="1" lang="en-US" altLang="ja-JP" dirty="0"/>
+                        <a:t>-</a:t>
+                      </a:r>
+                    </a:p>
+                    <a:p>
+                      <a:r>
+                        <a:rPr kumimoji="1" lang="en-US" altLang="ja-JP" dirty="0"/>
+                        <a:t>-</a:t>
+                      </a:r>
+                    </a:p>
+                    <a:p>
+                      <a:r>
+                        <a:rPr kumimoji="1" lang="en-US" altLang="ja-JP" dirty="0"/>
+                        <a:t>-</a:t>
+                      </a:r>
+                      <a:endParaRPr kumimoji="1" lang="ja-JP" altLang="en-US" dirty="0"/>
+                    </a:p>
+                  </a:txBody>
+                  <a:tcPr/>
+                </a:tc>
+                <a:tc>
+                  <a:txBody>
+                    <a:bodyPr/>
+                    <a:lstStyle/>
+                    <a:p>
+                      <a:pPr marL="0" marR="0" lvl="0" indent="0" algn="l" defTabSz="457200" rtl="0" eaLnBrk="1" fontAlgn="auto" latinLnBrk="0" hangingPunct="1">
+                        <a:lnSpc>
+                          <a:spcPct val="100000"/>
+                        </a:lnSpc>
+                        <a:spcBef>
+                          <a:spcPts val="0"/>
+                        </a:spcBef>
+                        <a:spcAft>
+                          <a:spcPts val="0"/>
+                        </a:spcAft>
+                        <a:buClrTx/>
+                        <a:buSzTx/>
+                        <a:buFontTx/>
+                        <a:buNone/>
+                        <a:tabLst/>
+                        <a:defRPr/>
+                      </a:pPr>
+                      <a:r>
+                        <a:rPr kumimoji="1" lang="en-US" altLang="ja-JP" dirty="0"/>
+                        <a:t>Mod. Rate</a:t>
+                      </a:r>
+                    </a:p>
+                    <a:p>
+                      <a:pPr marL="0" marR="0" lvl="0" indent="0" algn="l" defTabSz="457200" rtl="0" eaLnBrk="1" fontAlgn="auto" latinLnBrk="0" hangingPunct="1">
+                        <a:lnSpc>
+                          <a:spcPct val="100000"/>
+                        </a:lnSpc>
+                        <a:spcBef>
+                          <a:spcPts val="0"/>
+                        </a:spcBef>
+                        <a:spcAft>
+                          <a:spcPts val="0"/>
+                        </a:spcAft>
+                        <a:buClrTx/>
+                        <a:buSzTx/>
+                        <a:buFontTx/>
+                        <a:buNone/>
+                        <a:tabLst/>
+                        <a:defRPr/>
+                      </a:pPr>
+                      <a:r>
+                        <a:rPr kumimoji="1" lang="en-US" altLang="ja-JP" dirty="0"/>
+                        <a:t>Mod. Depth</a:t>
+                      </a:r>
+                    </a:p>
+                    <a:p>
+                      <a:pPr marL="0" marR="0" lvl="0" indent="0" algn="l" defTabSz="457200" rtl="0" eaLnBrk="1" fontAlgn="auto" latinLnBrk="0" hangingPunct="1">
+                        <a:lnSpc>
+                          <a:spcPct val="100000"/>
+                        </a:lnSpc>
+                        <a:spcBef>
+                          <a:spcPts val="0"/>
+                        </a:spcBef>
+                        <a:spcAft>
+                          <a:spcPts val="0"/>
+                        </a:spcAft>
+                        <a:buClrTx/>
+                        <a:buSzTx/>
+                        <a:buFontTx/>
+                        <a:buNone/>
+                        <a:tabLst/>
+                        <a:defRPr/>
+                      </a:pPr>
+                      <a:r>
+                        <a:rPr kumimoji="1" lang="en-US" altLang="ja-JP" dirty="0"/>
+                        <a:t>Mod. Delay</a:t>
+                      </a:r>
+                      <a:endParaRPr kumimoji="1" lang="ja-JP" altLang="en-US" dirty="0"/>
+                    </a:p>
+                  </a:txBody>
+                  <a:tcPr/>
+                </a:tc>
+                <a:tc>
+                  <a:txBody>
+                    <a:bodyPr/>
+                    <a:lstStyle/>
+                    <a:p>
+                      <a:pPr marL="0" marR="0" lvl="0" indent="0" algn="l" defTabSz="457200" rtl="0" eaLnBrk="1" fontAlgn="auto" latinLnBrk="0" hangingPunct="1">
+                        <a:lnSpc>
+                          <a:spcPct val="100000"/>
+                        </a:lnSpc>
+                        <a:spcBef>
+                          <a:spcPts val="0"/>
+                        </a:spcBef>
+                        <a:spcAft>
+                          <a:spcPts val="0"/>
+                        </a:spcAft>
+                        <a:buClrTx/>
+                        <a:buSzTx/>
+                        <a:buFontTx/>
+                        <a:buNone/>
+                        <a:tabLst/>
+                        <a:defRPr/>
+                      </a:pPr>
+                      <a:r>
+                        <a:rPr kumimoji="1" lang="en-US" altLang="ja-JP" b="1" dirty="0"/>
+                        <a:t>64: Default</a:t>
+                      </a:r>
+                      <a:endParaRPr kumimoji="1" lang="en-US" altLang="ja-JP" dirty="0"/>
+                    </a:p>
+                    <a:p>
+                      <a:pPr marL="0" marR="0" lvl="0" indent="0" algn="l" defTabSz="457200" rtl="0" eaLnBrk="1" fontAlgn="auto" latinLnBrk="0" hangingPunct="1">
+                        <a:lnSpc>
+                          <a:spcPct val="100000"/>
+                        </a:lnSpc>
+                        <a:spcBef>
+                          <a:spcPts val="0"/>
+                        </a:spcBef>
+                        <a:spcAft>
+                          <a:spcPts val="0"/>
+                        </a:spcAft>
+                        <a:buClrTx/>
+                        <a:buSzTx/>
+                        <a:buFontTx/>
+                        <a:buNone/>
+                        <a:tabLst/>
+                        <a:defRPr/>
+                      </a:pPr>
+                      <a:r>
+                        <a:rPr kumimoji="1" lang="en-US" altLang="ja-JP" b="1" dirty="0"/>
+                        <a:t>64: Default</a:t>
+                      </a:r>
+                      <a:endParaRPr kumimoji="1" lang="en-US" altLang="ja-JP" dirty="0"/>
+                    </a:p>
+                    <a:p>
+                      <a:pPr marL="0" marR="0" lvl="0" indent="0" algn="l" defTabSz="457200" rtl="0" eaLnBrk="1" fontAlgn="auto" latinLnBrk="0" hangingPunct="1">
+                        <a:lnSpc>
+                          <a:spcPct val="100000"/>
+                        </a:lnSpc>
+                        <a:spcBef>
+                          <a:spcPts val="0"/>
+                        </a:spcBef>
+                        <a:spcAft>
+                          <a:spcPts val="0"/>
+                        </a:spcAft>
+                        <a:buClrTx/>
+                        <a:buSzTx/>
+                        <a:buFontTx/>
+                        <a:buNone/>
+                        <a:tabLst/>
+                        <a:defRPr/>
+                      </a:pPr>
+                      <a:r>
+                        <a:rPr kumimoji="1" lang="en-US" altLang="ja-JP" b="1" dirty="0"/>
+                        <a:t>64: Default</a:t>
+                      </a:r>
+                      <a:endParaRPr kumimoji="1" lang="ja-JP" altLang="en-US" dirty="0"/>
+                    </a:p>
+                  </a:txBody>
+                  <a:tcPr/>
+                </a:tc>
+                <a:extLst>
+                  <a:ext uri="{0D108BD9-81ED-4DB2-BD59-A6C34878D82A}">
+                    <a16:rowId xmlns:a16="http://schemas.microsoft.com/office/drawing/2014/main" val="1048862336"/>
+                  </a:ext>
+                </a:extLst>
+              </a:tr>
+              <a:tr h="370840">
+                <a:tc>
+                  <a:txBody>
+                    <a:bodyPr/>
+                    <a:lstStyle/>
+                    <a:p>
+                      <a:pPr algn="r"/>
+                      <a:r>
+                        <a:rPr kumimoji="1" lang="en-US" altLang="ja-JP" dirty="0"/>
+                        <a:t>80-83</a:t>
+                      </a:r>
+                      <a:endParaRPr kumimoji="1" lang="ja-JP" altLang="en-US" dirty="0"/>
+                    </a:p>
+                  </a:txBody>
+                  <a:tcPr/>
+                </a:tc>
+                <a:tc>
+                  <a:txBody>
+                    <a:bodyPr/>
+                    <a:lstStyle/>
+                    <a:p>
+                      <a:r>
+                        <a:rPr kumimoji="1" lang="en-US" altLang="ja-JP" dirty="0"/>
+                        <a:t>-</a:t>
+                      </a:r>
+                      <a:endParaRPr kumimoji="1" lang="ja-JP" altLang="en-US" dirty="0"/>
+                    </a:p>
+                  </a:txBody>
+                  <a:tcPr/>
+                </a:tc>
+                <a:tc>
+                  <a:txBody>
+                    <a:bodyPr/>
+                    <a:lstStyle/>
+                    <a:p>
+                      <a:pPr marL="0" marR="0" lvl="0" indent="0" algn="l" defTabSz="457200" rtl="0" eaLnBrk="1" fontAlgn="auto" latinLnBrk="0" hangingPunct="1">
+                        <a:lnSpc>
+                          <a:spcPct val="100000"/>
+                        </a:lnSpc>
+                        <a:spcBef>
+                          <a:spcPts val="0"/>
+                        </a:spcBef>
+                        <a:spcAft>
+                          <a:spcPts val="0"/>
+                        </a:spcAft>
+                        <a:buClrTx/>
+                        <a:buSzTx/>
+                        <a:buFontTx/>
+                        <a:buNone/>
+                        <a:tabLst/>
+                        <a:defRPr/>
+                      </a:pPr>
+                      <a:r>
+                        <a:rPr kumimoji="1" lang="en-US" altLang="ja-JP" dirty="0"/>
+                        <a:t>GPCS2</a:t>
+                      </a:r>
+                      <a:endParaRPr kumimoji="1" lang="ja-JP" altLang="en-US" dirty="0"/>
+                    </a:p>
+                  </a:txBody>
+                  <a:tcPr/>
+                </a:tc>
+                <a:tc>
+                  <a:txBody>
+                    <a:bodyPr/>
+                    <a:lstStyle/>
+                    <a:p>
+                      <a:r>
+                        <a:rPr kumimoji="1" lang="en-US" altLang="ja-JP" sz="1800" kern="1200" dirty="0">
+                          <a:solidFill>
+                            <a:schemeClr val="dk1"/>
+                          </a:solidFill>
+                          <a:latin typeface="+mn-lt"/>
+                          <a:ea typeface="+mn-ea"/>
+                          <a:cs typeface="+mn-cs"/>
+                        </a:rPr>
+                        <a:t>Modify parameters</a:t>
+                      </a:r>
+                      <a:endParaRPr kumimoji="1" lang="ja-JP" altLang="en-US" dirty="0"/>
+                    </a:p>
+                  </a:txBody>
+                  <a:tcPr/>
+                </a:tc>
+                <a:extLst>
+                  <a:ext uri="{0D108BD9-81ED-4DB2-BD59-A6C34878D82A}">
+                    <a16:rowId xmlns:a16="http://schemas.microsoft.com/office/drawing/2014/main" val="3184236357"/>
+                  </a:ext>
+                </a:extLst>
+              </a:tr>
+              <a:tr h="370840">
+                <a:tc>
+                  <a:txBody>
+                    <a:bodyPr/>
+                    <a:lstStyle/>
+                    <a:p>
+                      <a:pPr algn="r"/>
+                      <a:r>
+                        <a:rPr kumimoji="1" lang="en-US" altLang="ja-JP" dirty="0"/>
+                        <a:t>84</a:t>
+                      </a:r>
+                      <a:endParaRPr kumimoji="1" lang="ja-JP" altLang="en-US" dirty="0"/>
+                    </a:p>
+                  </a:txBody>
+                  <a:tcPr/>
+                </a:tc>
+                <a:tc>
+                  <a:txBody>
+                    <a:bodyPr/>
+                    <a:lstStyle/>
+                    <a:p>
+                      <a:r>
+                        <a:rPr kumimoji="1" lang="en-US" altLang="ja-JP" dirty="0"/>
+                        <a:t>-</a:t>
+                      </a:r>
+                      <a:endParaRPr kumimoji="1" lang="ja-JP" altLang="en-US" dirty="0"/>
+                    </a:p>
+                  </a:txBody>
+                  <a:tcPr/>
+                </a:tc>
+                <a:tc>
+                  <a:txBody>
+                    <a:bodyPr/>
+                    <a:lstStyle/>
+                    <a:p>
+                      <a:pPr marL="0" marR="0" lvl="0" indent="0" algn="l" defTabSz="457200" rtl="0" eaLnBrk="1" fontAlgn="auto" latinLnBrk="0" hangingPunct="1">
+                        <a:lnSpc>
+                          <a:spcPct val="100000"/>
+                        </a:lnSpc>
+                        <a:spcBef>
+                          <a:spcPts val="0"/>
+                        </a:spcBef>
+                        <a:spcAft>
+                          <a:spcPts val="0"/>
+                        </a:spcAft>
+                        <a:buClrTx/>
+                        <a:buSzTx/>
+                        <a:buFontTx/>
+                        <a:buNone/>
+                        <a:tabLst/>
+                        <a:defRPr/>
+                      </a:pPr>
+                      <a:r>
+                        <a:rPr kumimoji="1" lang="en-US" altLang="ja-JP" dirty="0"/>
+                        <a:t>Portamento Ctrl</a:t>
+                      </a:r>
+                      <a:endParaRPr kumimoji="1" lang="ja-JP" altLang="en-US" dirty="0"/>
+                    </a:p>
+                  </a:txBody>
+                  <a:tcPr/>
+                </a:tc>
+                <a:tc>
+                  <a:txBody>
+                    <a:bodyPr/>
+                    <a:lstStyle/>
+                    <a:p>
+                      <a:pPr marL="0" marR="0" lvl="0" indent="0" algn="l" defTabSz="457200" rtl="0" eaLnBrk="1" fontAlgn="auto" latinLnBrk="0" hangingPunct="1">
+                        <a:lnSpc>
+                          <a:spcPct val="100000"/>
+                        </a:lnSpc>
+                        <a:spcBef>
+                          <a:spcPts val="0"/>
+                        </a:spcBef>
+                        <a:spcAft>
+                          <a:spcPts val="0"/>
+                        </a:spcAft>
+                        <a:buClrTx/>
+                        <a:buSzTx/>
+                        <a:buFontTx/>
+                        <a:buNone/>
+                        <a:tabLst/>
+                        <a:defRPr/>
+                      </a:pPr>
+                      <a:r>
+                        <a:rPr kumimoji="1" lang="en-US" altLang="ja-JP" b="1" dirty="0"/>
+                        <a:t>0: OFF</a:t>
+                      </a:r>
+                      <a:r>
+                        <a:rPr kumimoji="1" lang="en-US" altLang="ja-JP" dirty="0"/>
+                        <a:t>, 64: ON</a:t>
+                      </a:r>
+                      <a:endParaRPr kumimoji="1" lang="ja-JP" altLang="en-US" dirty="0"/>
+                    </a:p>
+                  </a:txBody>
+                  <a:tcPr/>
+                </a:tc>
+                <a:extLst>
+                  <a:ext uri="{0D108BD9-81ED-4DB2-BD59-A6C34878D82A}">
+                    <a16:rowId xmlns:a16="http://schemas.microsoft.com/office/drawing/2014/main" val="3571608750"/>
+                  </a:ext>
+                </a:extLst>
+              </a:tr>
+              <a:tr h="370840">
+                <a:tc>
+                  <a:txBody>
+                    <a:bodyPr/>
+                    <a:lstStyle/>
+                    <a:p>
+                      <a:pPr algn="r"/>
+                      <a:r>
+                        <a:rPr kumimoji="1" lang="en-US" altLang="ja-JP" dirty="0"/>
+                        <a:t>91-95</a:t>
+                      </a:r>
+                      <a:endParaRPr kumimoji="1" lang="ja-JP" altLang="en-US" dirty="0"/>
+                    </a:p>
+                  </a:txBody>
+                  <a:tcPr/>
+                </a:tc>
+                <a:tc>
+                  <a:txBody>
+                    <a:bodyPr/>
+                    <a:lstStyle/>
+                    <a:p>
+                      <a:r>
+                        <a:rPr kumimoji="1" lang="en-US" altLang="ja-JP" dirty="0"/>
+                        <a:t>-</a:t>
+                      </a:r>
+                      <a:endParaRPr kumimoji="1" lang="ja-JP" altLang="en-US" dirty="0"/>
+                    </a:p>
+                  </a:txBody>
+                  <a:tcPr/>
+                </a:tc>
+                <a:tc>
+                  <a:txBody>
+                    <a:bodyPr/>
+                    <a:lstStyle/>
+                    <a:p>
+                      <a:pPr marL="0" marR="0" lvl="0" indent="0" algn="l" defTabSz="457200" rtl="0" eaLnBrk="1" fontAlgn="auto" latinLnBrk="0" hangingPunct="1">
+                        <a:lnSpc>
+                          <a:spcPct val="100000"/>
+                        </a:lnSpc>
+                        <a:spcBef>
+                          <a:spcPts val="0"/>
+                        </a:spcBef>
+                        <a:spcAft>
+                          <a:spcPts val="0"/>
+                        </a:spcAft>
+                        <a:buClrTx/>
+                        <a:buSzTx/>
+                        <a:buFontTx/>
+                        <a:buNone/>
+                        <a:tabLst/>
+                        <a:defRPr/>
+                      </a:pPr>
+                      <a:r>
+                        <a:rPr kumimoji="1" lang="en-US" altLang="ja-JP" dirty="0"/>
+                        <a:t>VST Plugin Ctrl</a:t>
+                      </a:r>
+                      <a:endParaRPr kumimoji="1" lang="ja-JP" altLang="en-US" dirty="0"/>
+                    </a:p>
+                  </a:txBody>
+                  <a:tcPr/>
+                </a:tc>
+                <a:tc>
+                  <a:txBody>
+                    <a:bodyPr/>
+                    <a:lstStyle/>
+                    <a:p>
+                      <a:r>
+                        <a:rPr kumimoji="1" lang="en-US" altLang="ja-JP" sz="1800" kern="1200" dirty="0">
+                          <a:solidFill>
+                            <a:schemeClr val="dk1"/>
+                          </a:solidFill>
+                          <a:latin typeface="+mn-lt"/>
+                          <a:ea typeface="+mn-ea"/>
+                          <a:cs typeface="+mn-cs"/>
+                        </a:rPr>
+                        <a:t>Modify VST  params</a:t>
+                      </a:r>
+                      <a:endParaRPr kumimoji="1" lang="ja-JP" altLang="en-US" dirty="0"/>
+                    </a:p>
+                  </a:txBody>
+                  <a:tcPr/>
+                </a:tc>
+                <a:extLst>
+                  <a:ext uri="{0D108BD9-81ED-4DB2-BD59-A6C34878D82A}">
+                    <a16:rowId xmlns:a16="http://schemas.microsoft.com/office/drawing/2014/main" val="332439132"/>
+                  </a:ext>
+                </a:extLst>
+              </a:tr>
+              <a:tr h="370840">
+                <a:tc>
+                  <a:txBody>
+                    <a:bodyPr/>
+                    <a:lstStyle/>
+                    <a:p>
+                      <a:pPr algn="r"/>
+                      <a:r>
+                        <a:rPr kumimoji="1" lang="en-US" altLang="ja-JP" dirty="0"/>
+                        <a:t>98</a:t>
+                      </a:r>
+                    </a:p>
+                    <a:p>
+                      <a:pPr algn="r"/>
+                      <a:r>
+                        <a:rPr kumimoji="1" lang="en-US" altLang="ja-JP" dirty="0"/>
+                        <a:t>99</a:t>
+                      </a:r>
+                      <a:endParaRPr kumimoji="1" lang="ja-JP" altLang="en-US" dirty="0"/>
+                    </a:p>
+                  </a:txBody>
+                  <a:tcPr/>
+                </a:tc>
+                <a:tc>
+                  <a:txBody>
+                    <a:bodyPr/>
+                    <a:lstStyle/>
+                    <a:p>
+                      <a:r>
+                        <a:rPr kumimoji="1" lang="en-US" altLang="ja-JP" dirty="0"/>
+                        <a:t>-</a:t>
+                      </a:r>
+                    </a:p>
+                    <a:p>
+                      <a:r>
+                        <a:rPr kumimoji="1" lang="en-US" altLang="ja-JP" dirty="0"/>
+                        <a:t>-</a:t>
+                      </a:r>
+                      <a:endParaRPr kumimoji="1" lang="ja-JP" altLang="en-US" dirty="0"/>
+                    </a:p>
+                  </a:txBody>
+                  <a:tcPr/>
+                </a:tc>
+                <a:tc>
+                  <a:txBody>
+                    <a:bodyPr/>
+                    <a:lstStyle/>
+                    <a:p>
+                      <a:r>
+                        <a:rPr kumimoji="1" lang="en-US" altLang="ja-JP" dirty="0"/>
+                        <a:t>NRPN LSB</a:t>
+                      </a:r>
+                    </a:p>
+                    <a:p>
+                      <a:r>
+                        <a:rPr kumimoji="1" lang="en-US" altLang="ja-JP" dirty="0"/>
+                        <a:t>NRPN MSB</a:t>
+                      </a:r>
+                      <a:endParaRPr kumimoji="1" lang="ja-JP" altLang="en-US" dirty="0"/>
+                    </a:p>
+                  </a:txBody>
+                  <a:tcPr/>
+                </a:tc>
+                <a:tc>
+                  <a:txBody>
+                    <a:bodyPr/>
+                    <a:lstStyle/>
+                    <a:p>
+                      <a:endParaRPr kumimoji="1" lang="ja-JP" altLang="en-US" dirty="0"/>
+                    </a:p>
+                  </a:txBody>
+                  <a:tcPr/>
+                </a:tc>
+                <a:extLst>
+                  <a:ext uri="{0D108BD9-81ED-4DB2-BD59-A6C34878D82A}">
+                    <a16:rowId xmlns:a16="http://schemas.microsoft.com/office/drawing/2014/main" val="632769015"/>
+                  </a:ext>
+                </a:extLst>
+              </a:tr>
+              <a:tr h="370840">
+                <a:tc>
+                  <a:txBody>
+                    <a:bodyPr/>
+                    <a:lstStyle/>
+                    <a:p>
+                      <a:pPr algn="r"/>
+                      <a:r>
+                        <a:rPr kumimoji="1" lang="en-US" altLang="ja-JP" dirty="0"/>
+                        <a:t>100</a:t>
+                      </a:r>
+                    </a:p>
+                    <a:p>
+                      <a:pPr algn="r"/>
+                      <a:r>
+                        <a:rPr kumimoji="1" lang="en-US" altLang="ja-JP" dirty="0"/>
+                        <a:t>101</a:t>
+                      </a:r>
+                      <a:endParaRPr kumimoji="1" lang="ja-JP" altLang="en-US" dirty="0"/>
+                    </a:p>
+                  </a:txBody>
+                  <a:tcPr/>
+                </a:tc>
+                <a:tc>
+                  <a:txBody>
+                    <a:bodyPr/>
+                    <a:lstStyle/>
+                    <a:p>
+                      <a:r>
+                        <a:rPr kumimoji="1" lang="en-US" altLang="ja-JP" dirty="0"/>
+                        <a:t>-</a:t>
+                      </a:r>
+                    </a:p>
+                    <a:p>
+                      <a:r>
+                        <a:rPr kumimoji="1" lang="en-US" altLang="ja-JP" dirty="0"/>
+                        <a:t>-</a:t>
+                      </a:r>
+                      <a:endParaRPr kumimoji="1" lang="ja-JP" altLang="en-US" dirty="0"/>
+                    </a:p>
+                  </a:txBody>
+                  <a:tcPr/>
+                </a:tc>
+                <a:tc>
+                  <a:txBody>
+                    <a:bodyPr/>
+                    <a:lstStyle/>
+                    <a:p>
+                      <a:r>
+                        <a:rPr kumimoji="1" lang="en-US" altLang="ja-JP" dirty="0"/>
+                        <a:t>RPN LSB</a:t>
+                      </a:r>
+                    </a:p>
+                    <a:p>
+                      <a:r>
+                        <a:rPr kumimoji="1" lang="en-US" altLang="ja-JP" dirty="0"/>
+                        <a:t>RPN MSB</a:t>
+                      </a:r>
+                      <a:endParaRPr kumimoji="1" lang="ja-JP" altLang="en-US" dirty="0"/>
+                    </a:p>
+                  </a:txBody>
+                  <a:tcPr/>
+                </a:tc>
+                <a:tc>
+                  <a:txBody>
+                    <a:bodyPr/>
+                    <a:lstStyle/>
+                    <a:p>
+                      <a:endParaRPr kumimoji="1" lang="ja-JP" altLang="en-US" dirty="0"/>
+                    </a:p>
+                  </a:txBody>
+                  <a:tcPr/>
+                </a:tc>
+                <a:extLst>
+                  <a:ext uri="{0D108BD9-81ED-4DB2-BD59-A6C34878D82A}">
+                    <a16:rowId xmlns:a16="http://schemas.microsoft.com/office/drawing/2014/main" val="3182083368"/>
+                  </a:ext>
+                </a:extLst>
+              </a:tr>
+            </a:tbl>
+          </a:graphicData>
+        </a:graphic>
+      </p:graphicFrame>
+    </p:spTree>
+    <p:extLst>
+      <p:ext uri="{BB962C8B-B14F-4D97-AF65-F5344CB8AC3E}">
+        <p14:creationId xmlns:p14="http://schemas.microsoft.com/office/powerpoint/2010/main" val="707807233"/>
+      </p:ext>
+    </p:extLst>
+  </p:cSld>
+  <p:clrMapOvr>
+    <a:masterClrMapping/>
+  </p:clrMapOvr>
+</p:sld>
+</file>
+
+<file path=ppt/slides/slide24.xml><?xml version="1.0" encoding="utf-8"?>
+<p:sld xmlns:a="http://schemas.openxmlformats.org/drawingml/2006/main" xmlns:r="http://schemas.openxmlformats.org/officeDocument/2006/relationships" xmlns:p="http://schemas.openxmlformats.org/presentationml/2006/main">
+  <p:cSld>
+    <p:spTree>
+      <p:nvGrpSpPr>
+        <p:cNvPr id="1" name=""/>
+        <p:cNvGrpSpPr/>
+        <p:nvPr/>
+      </p:nvGrpSpPr>
+      <p:grpSpPr>
+        <a:xfrm>
+          <a:off x="0" y="0"/>
+          <a:ext cx="0" cy="0"/>
+          <a:chOff x="0" y="0"/>
+          <a:chExt cx="0" cy="0"/>
+        </a:xfrm>
+      </p:grpSpPr>
+      <p:sp>
+        <p:nvSpPr>
+          <p:cNvPr id="2" name="タイトル 1">
+            <a:extLst>
+              <a:ext uri="{FF2B5EF4-FFF2-40B4-BE49-F238E27FC236}">
+                <a16:creationId xmlns:a16="http://schemas.microsoft.com/office/drawing/2014/main" id="{29A39A5C-7FC5-4D89-9A64-C4313BC4C574}"/>
+              </a:ext>
+            </a:extLst>
+          </p:cNvPr>
+          <p:cNvSpPr>
+            <a:spLocks noGrp="1"/>
+          </p:cNvSpPr>
+          <p:nvPr>
+            <p:ph type="title"/>
+          </p:nvPr>
+        </p:nvSpPr>
+        <p:spPr/>
+        <p:txBody>
+          <a:bodyPr/>
+          <a:lstStyle/>
+          <a:p>
+            <a:r>
+              <a:rPr kumimoji="1" lang="en-US" altLang="ja-JP" dirty="0"/>
+              <a:t>MIDI Implementation Chart 4</a:t>
+            </a:r>
+            <a:endParaRPr kumimoji="1" lang="ja-JP" altLang="en-US" dirty="0"/>
+          </a:p>
+        </p:txBody>
+      </p:sp>
+      <p:sp>
+        <p:nvSpPr>
+          <p:cNvPr id="4" name="スライド番号プレースホルダー 3">
+            <a:extLst>
+              <a:ext uri="{FF2B5EF4-FFF2-40B4-BE49-F238E27FC236}">
+                <a16:creationId xmlns:a16="http://schemas.microsoft.com/office/drawing/2014/main" id="{F527AEA0-7EF4-4546-B495-9F4920BF8281}"/>
+              </a:ext>
+            </a:extLst>
+          </p:cNvPr>
+          <p:cNvSpPr>
+            <a:spLocks noGrp="1"/>
+          </p:cNvSpPr>
+          <p:nvPr>
+            <p:ph type="sldNum" sz="quarter" idx="12"/>
+          </p:nvPr>
+        </p:nvSpPr>
+        <p:spPr/>
+        <p:txBody>
+          <a:bodyPr/>
+          <a:lstStyle/>
+          <a:p>
+            <a:fld id="{E27E2812-4560-4165-A7C7-9C013F955547}" type="slidenum">
+              <a:rPr kumimoji="1" lang="ja-JP" altLang="en-US" smtClean="0"/>
+              <a:t>24</a:t>
+            </a:fld>
+            <a:endParaRPr kumimoji="1" lang="ja-JP" altLang="en-US"/>
+          </a:p>
+        </p:txBody>
+      </p:sp>
+      <p:graphicFrame>
+        <p:nvGraphicFramePr>
+          <p:cNvPr id="5" name="表 5">
+            <a:extLst>
+              <a:ext uri="{FF2B5EF4-FFF2-40B4-BE49-F238E27FC236}">
+                <a16:creationId xmlns:a16="http://schemas.microsoft.com/office/drawing/2014/main" id="{30EAE93F-19A6-429D-9E65-73D2543B8418}"/>
+              </a:ext>
+            </a:extLst>
+          </p:cNvPr>
+          <p:cNvGraphicFramePr>
+            <a:graphicFrameLocks noGrp="1"/>
+          </p:cNvGraphicFramePr>
+          <p:nvPr>
+            <p:extLst>
+              <p:ext uri="{D42A27DB-BD31-4B8C-83A1-F6EECF244321}">
+                <p14:modId xmlns:p14="http://schemas.microsoft.com/office/powerpoint/2010/main" val="3380746082"/>
+              </p:ext>
+            </p:extLst>
+          </p:nvPr>
+        </p:nvGraphicFramePr>
+        <p:xfrm>
+          <a:off x="2032000" y="2225333"/>
+          <a:ext cx="9472612" cy="3388360"/>
+        </p:xfrm>
+        <a:graphic>
+          <a:graphicData uri="http://schemas.openxmlformats.org/drawingml/2006/table">
+            <a:tbl>
+              <a:tblPr firstRow="1" bandRow="1">
+                <a:tableStyleId>{5C22544A-7EE6-4342-B048-85BDC9FD1C3A}</a:tableStyleId>
+              </a:tblPr>
+              <a:tblGrid>
+                <a:gridCol w="2368153">
+                  <a:extLst>
+                    <a:ext uri="{9D8B030D-6E8A-4147-A177-3AD203B41FA5}">
+                      <a16:colId xmlns:a16="http://schemas.microsoft.com/office/drawing/2014/main" val="3140821746"/>
+                    </a:ext>
+                  </a:extLst>
+                </a:gridCol>
+                <a:gridCol w="2368153">
+                  <a:extLst>
+                    <a:ext uri="{9D8B030D-6E8A-4147-A177-3AD203B41FA5}">
+                      <a16:colId xmlns:a16="http://schemas.microsoft.com/office/drawing/2014/main" val="2862939062"/>
+                    </a:ext>
+                  </a:extLst>
+                </a:gridCol>
+                <a:gridCol w="2368153">
+                  <a:extLst>
+                    <a:ext uri="{9D8B030D-6E8A-4147-A177-3AD203B41FA5}">
+                      <a16:colId xmlns:a16="http://schemas.microsoft.com/office/drawing/2014/main" val="2770498619"/>
+                    </a:ext>
+                  </a:extLst>
+                </a:gridCol>
+                <a:gridCol w="2368153">
+                  <a:extLst>
+                    <a:ext uri="{9D8B030D-6E8A-4147-A177-3AD203B41FA5}">
+                      <a16:colId xmlns:a16="http://schemas.microsoft.com/office/drawing/2014/main" val="4289464401"/>
+                    </a:ext>
+                  </a:extLst>
+                </a:gridCol>
+              </a:tblGrid>
+              <a:tr h="370840">
+                <a:tc>
+                  <a:txBody>
+                    <a:bodyPr/>
+                    <a:lstStyle/>
+                    <a:p>
+                      <a:r>
+                        <a:rPr kumimoji="1" lang="en-US" altLang="ja-JP" dirty="0"/>
+                        <a:t>Function</a:t>
+                      </a:r>
+                      <a:endParaRPr kumimoji="1" lang="ja-JP" altLang="en-US" dirty="0"/>
+                    </a:p>
+                  </a:txBody>
+                  <a:tcPr/>
+                </a:tc>
+                <a:tc>
+                  <a:txBody>
+                    <a:bodyPr/>
+                    <a:lstStyle/>
+                    <a:p>
+                      <a:r>
+                        <a:rPr kumimoji="1" lang="en-US" altLang="ja-JP" dirty="0"/>
+                        <a:t>Transmitted</a:t>
+                      </a:r>
+                      <a:endParaRPr kumimoji="1" lang="ja-JP" altLang="en-US" dirty="0"/>
+                    </a:p>
+                  </a:txBody>
+                  <a:tcPr/>
+                </a:tc>
+                <a:tc>
+                  <a:txBody>
+                    <a:bodyPr/>
+                    <a:lstStyle/>
+                    <a:p>
+                      <a:r>
+                        <a:rPr kumimoji="1" lang="en-US" altLang="ja-JP" dirty="0"/>
+                        <a:t>Recognize</a:t>
+                      </a:r>
+                      <a:endParaRPr kumimoji="1" lang="ja-JP" altLang="en-US" dirty="0"/>
+                    </a:p>
+                  </a:txBody>
+                  <a:tcPr/>
+                </a:tc>
+                <a:tc>
+                  <a:txBody>
+                    <a:bodyPr/>
+                    <a:lstStyle/>
+                    <a:p>
+                      <a:r>
+                        <a:rPr kumimoji="1" lang="en-US" altLang="ja-JP" dirty="0"/>
+                        <a:t>Remarks</a:t>
+                      </a:r>
+                      <a:endParaRPr kumimoji="1" lang="ja-JP" altLang="en-US" dirty="0"/>
+                    </a:p>
+                  </a:txBody>
+                  <a:tcPr/>
+                </a:tc>
+                <a:extLst>
+                  <a:ext uri="{0D108BD9-81ED-4DB2-BD59-A6C34878D82A}">
+                    <a16:rowId xmlns:a16="http://schemas.microsoft.com/office/drawing/2014/main" val="1671041493"/>
+                  </a:ext>
+                </a:extLst>
+              </a:tr>
+              <a:tr h="370840">
+                <a:tc>
+                  <a:txBody>
+                    <a:bodyPr/>
+                    <a:lstStyle/>
+                    <a:p>
+                      <a:pPr algn="l"/>
+                      <a:r>
+                        <a:rPr kumimoji="1" lang="en-US" altLang="ja-JP" dirty="0"/>
+                        <a:t>Control Change</a:t>
+                      </a:r>
+                    </a:p>
+                    <a:p>
+                      <a:pPr algn="r"/>
+                      <a:r>
+                        <a:rPr kumimoji="1" lang="en-US" altLang="ja-JP" dirty="0"/>
+                        <a:t>121</a:t>
+                      </a:r>
+                      <a:endParaRPr kumimoji="1" lang="ja-JP" altLang="en-US" dirty="0"/>
+                    </a:p>
+                  </a:txBody>
+                  <a:tcPr/>
+                </a:tc>
+                <a:tc>
+                  <a:txBody>
+                    <a:bodyPr/>
+                    <a:lstStyle/>
+                    <a:p>
+                      <a:r>
+                        <a:rPr kumimoji="1" lang="en-US" altLang="ja-JP" dirty="0"/>
+                        <a:t>-</a:t>
+                      </a:r>
+                      <a:endParaRPr kumimoji="1" lang="ja-JP" altLang="en-US" dirty="0"/>
+                    </a:p>
+                  </a:txBody>
+                  <a:tcPr/>
+                </a:tc>
+                <a:tc>
+                  <a:txBody>
+                    <a:bodyPr/>
+                    <a:lstStyle/>
+                    <a:p>
+                      <a:endParaRPr kumimoji="1" lang="en-US" altLang="ja-JP" dirty="0"/>
+                    </a:p>
+                    <a:p>
+                      <a:pPr marL="0" marR="0" lvl="0" indent="0" algn="l" defTabSz="457200" rtl="0" eaLnBrk="1" fontAlgn="auto" latinLnBrk="0" hangingPunct="1">
+                        <a:lnSpc>
+                          <a:spcPct val="100000"/>
+                        </a:lnSpc>
+                        <a:spcBef>
+                          <a:spcPts val="0"/>
+                        </a:spcBef>
+                        <a:spcAft>
+                          <a:spcPts val="0"/>
+                        </a:spcAft>
+                        <a:buClrTx/>
+                        <a:buSzTx/>
+                        <a:buFontTx/>
+                        <a:buNone/>
+                        <a:tabLst/>
+                        <a:defRPr/>
+                      </a:pPr>
+                      <a:r>
+                        <a:rPr kumimoji="1" lang="en-US" altLang="ja-JP" dirty="0"/>
+                        <a:t>Reset All Ctrl</a:t>
+                      </a:r>
+                      <a:endParaRPr kumimoji="1" lang="ja-JP" altLang="en-US" dirty="0"/>
+                    </a:p>
+                  </a:txBody>
+                  <a:tcPr/>
+                </a:tc>
+                <a:tc>
+                  <a:txBody>
+                    <a:bodyPr/>
+                    <a:lstStyle/>
+                    <a:p>
+                      <a:endParaRPr kumimoji="1" lang="ja-JP" altLang="en-US" dirty="0"/>
+                    </a:p>
+                  </a:txBody>
+                  <a:tcPr/>
+                </a:tc>
+                <a:extLst>
+                  <a:ext uri="{0D108BD9-81ED-4DB2-BD59-A6C34878D82A}">
+                    <a16:rowId xmlns:a16="http://schemas.microsoft.com/office/drawing/2014/main" val="2531957203"/>
+                  </a:ext>
+                </a:extLst>
+              </a:tr>
+              <a:tr h="370840">
+                <a:tc>
+                  <a:txBody>
+                    <a:bodyPr/>
+                    <a:lstStyle/>
+                    <a:p>
+                      <a:pPr algn="r"/>
+                      <a:r>
+                        <a:rPr kumimoji="1" lang="en-US" altLang="ja-JP" dirty="0"/>
+                        <a:t>126</a:t>
+                      </a:r>
+                      <a:endParaRPr kumimoji="1" lang="ja-JP" altLang="en-US" dirty="0"/>
+                    </a:p>
+                  </a:txBody>
+                  <a:tcPr/>
+                </a:tc>
+                <a:tc>
+                  <a:txBody>
+                    <a:bodyPr/>
+                    <a:lstStyle/>
+                    <a:p>
+                      <a:r>
+                        <a:rPr kumimoji="1" lang="en-US" altLang="ja-JP" dirty="0"/>
+                        <a:t>-</a:t>
+                      </a:r>
+                      <a:endParaRPr kumimoji="1" lang="ja-JP" altLang="en-US" dirty="0"/>
+                    </a:p>
+                  </a:txBody>
+                  <a:tcPr/>
+                </a:tc>
+                <a:tc>
+                  <a:txBody>
+                    <a:bodyPr/>
+                    <a:lstStyle/>
+                    <a:p>
+                      <a:pPr marL="0" marR="0" lvl="0" indent="0" algn="l" defTabSz="457200" rtl="0" eaLnBrk="1" fontAlgn="auto" latinLnBrk="0" hangingPunct="1">
+                        <a:lnSpc>
+                          <a:spcPct val="100000"/>
+                        </a:lnSpc>
+                        <a:spcBef>
+                          <a:spcPts val="0"/>
+                        </a:spcBef>
+                        <a:spcAft>
+                          <a:spcPts val="0"/>
+                        </a:spcAft>
+                        <a:buClrTx/>
+                        <a:buSzTx/>
+                        <a:buFontTx/>
+                        <a:buNone/>
+                        <a:tabLst/>
+                        <a:defRPr/>
+                      </a:pPr>
+                      <a:r>
+                        <a:rPr kumimoji="1" lang="en-US" altLang="ja-JP" dirty="0"/>
+                        <a:t>Mono Mode</a:t>
+                      </a:r>
+                      <a:endParaRPr kumimoji="1" lang="ja-JP" altLang="en-US" dirty="0"/>
+                    </a:p>
+                  </a:txBody>
+                  <a:tcPr/>
+                </a:tc>
+                <a:tc>
+                  <a:txBody>
+                    <a:bodyPr/>
+                    <a:lstStyle/>
+                    <a:p>
+                      <a:r>
+                        <a:rPr kumimoji="1" lang="en-US" altLang="ja-JP" b="1" dirty="0"/>
+                        <a:t>0: OFF</a:t>
+                      </a:r>
+                      <a:endParaRPr kumimoji="1" lang="en-US" altLang="ja-JP" b="0" dirty="0"/>
+                    </a:p>
+                    <a:p>
+                      <a:r>
+                        <a:rPr kumimoji="1" lang="en-US" altLang="ja-JP" b="0" dirty="0"/>
+                        <a:t>1-127: Max Voice Num.</a:t>
+                      </a:r>
+                      <a:endParaRPr kumimoji="1" lang="ja-JP" altLang="en-US" b="0" dirty="0"/>
+                    </a:p>
+                  </a:txBody>
+                  <a:tcPr/>
+                </a:tc>
+                <a:extLst>
+                  <a:ext uri="{0D108BD9-81ED-4DB2-BD59-A6C34878D82A}">
+                    <a16:rowId xmlns:a16="http://schemas.microsoft.com/office/drawing/2014/main" val="1129224570"/>
+                  </a:ext>
+                </a:extLst>
+              </a:tr>
+              <a:tr h="370840">
+                <a:tc>
+                  <a:txBody>
+                    <a:bodyPr/>
+                    <a:lstStyle/>
+                    <a:p>
+                      <a:pPr algn="r"/>
+                      <a:r>
+                        <a:rPr kumimoji="1" lang="en-US" altLang="ja-JP" dirty="0"/>
+                        <a:t>127</a:t>
+                      </a:r>
+                      <a:endParaRPr kumimoji="1" lang="ja-JP" altLang="en-US" dirty="0"/>
+                    </a:p>
+                  </a:txBody>
+                  <a:tcPr/>
+                </a:tc>
+                <a:tc>
+                  <a:txBody>
+                    <a:bodyPr/>
+                    <a:lstStyle/>
+                    <a:p>
+                      <a:r>
+                        <a:rPr kumimoji="1" lang="en-US" altLang="ja-JP" dirty="0"/>
+                        <a:t>-</a:t>
+                      </a:r>
+                      <a:endParaRPr kumimoji="1" lang="ja-JP" altLang="en-US" dirty="0"/>
+                    </a:p>
+                  </a:txBody>
+                  <a:tcPr/>
+                </a:tc>
+                <a:tc>
+                  <a:txBody>
+                    <a:bodyPr/>
+                    <a:lstStyle/>
+                    <a:p>
+                      <a:pPr marL="0" marR="0" lvl="0" indent="0" algn="l" defTabSz="457200" rtl="0" eaLnBrk="1" fontAlgn="auto" latinLnBrk="0" hangingPunct="1">
+                        <a:lnSpc>
+                          <a:spcPct val="100000"/>
+                        </a:lnSpc>
+                        <a:spcBef>
+                          <a:spcPts val="0"/>
+                        </a:spcBef>
+                        <a:spcAft>
+                          <a:spcPts val="0"/>
+                        </a:spcAft>
+                        <a:buClrTx/>
+                        <a:buSzTx/>
+                        <a:buFontTx/>
+                        <a:buNone/>
+                        <a:tabLst/>
+                        <a:defRPr/>
+                      </a:pPr>
+                      <a:r>
+                        <a:rPr kumimoji="1" lang="en-US" altLang="ja-JP" dirty="0"/>
+                        <a:t>Poly Mode</a:t>
+                      </a:r>
+                      <a:endParaRPr kumimoji="1" lang="ja-JP" altLang="en-US" dirty="0"/>
+                    </a:p>
+                  </a:txBody>
+                  <a:tcPr/>
+                </a:tc>
+                <a:tc>
+                  <a:txBody>
+                    <a:bodyPr/>
+                    <a:lstStyle/>
+                    <a:p>
+                      <a:pPr marL="0" marR="0" lvl="0" indent="0" algn="l" defTabSz="457200" rtl="0" eaLnBrk="1" fontAlgn="auto" latinLnBrk="0" hangingPunct="1">
+                        <a:lnSpc>
+                          <a:spcPct val="100000"/>
+                        </a:lnSpc>
+                        <a:spcBef>
+                          <a:spcPts val="0"/>
+                        </a:spcBef>
+                        <a:spcAft>
+                          <a:spcPts val="0"/>
+                        </a:spcAft>
+                        <a:buClrTx/>
+                        <a:buSzTx/>
+                        <a:buFontTx/>
+                        <a:buNone/>
+                        <a:tabLst/>
+                        <a:defRPr/>
+                      </a:pPr>
+                      <a:r>
+                        <a:rPr kumimoji="1" lang="en-US" altLang="ja-JP" b="1" dirty="0"/>
+                        <a:t>0: OFF</a:t>
+                      </a:r>
+                      <a:endParaRPr kumimoji="1" lang="ja-JP" altLang="en-US" b="1" dirty="0"/>
+                    </a:p>
+                    <a:p>
+                      <a:r>
+                        <a:rPr kumimoji="1" lang="en-US" altLang="ja-JP" dirty="0"/>
+                        <a:t>1-127: Reserve Voice Num.</a:t>
+                      </a:r>
+                    </a:p>
+                    <a:p>
+                      <a:r>
+                        <a:rPr kumimoji="1" lang="en-US" altLang="ja-JP" dirty="0"/>
+                        <a:t>*Reset Mono Mode when set</a:t>
+                      </a:r>
+                      <a:endParaRPr kumimoji="1" lang="ja-JP" altLang="en-US" dirty="0"/>
+                    </a:p>
+                  </a:txBody>
+                  <a:tcPr/>
+                </a:tc>
+                <a:extLst>
+                  <a:ext uri="{0D108BD9-81ED-4DB2-BD59-A6C34878D82A}">
+                    <a16:rowId xmlns:a16="http://schemas.microsoft.com/office/drawing/2014/main" val="2453527332"/>
+                  </a:ext>
+                </a:extLst>
+              </a:tr>
+            </a:tbl>
+          </a:graphicData>
+        </a:graphic>
+      </p:graphicFrame>
+    </p:spTree>
+    <p:extLst>
+      <p:ext uri="{BB962C8B-B14F-4D97-AF65-F5344CB8AC3E}">
+        <p14:creationId xmlns:p14="http://schemas.microsoft.com/office/powerpoint/2010/main" val="3665989618"/>
+      </p:ext>
+    </p:extLst>
+  </p:cSld>
+  <p:clrMapOvr>
+    <a:masterClrMapping/>
+  </p:clrMapOvr>
+</p:sld>
+</file>
+
+<file path=ppt/slides/slide25.xml><?xml version="1.0" encoding="utf-8"?>
+<p:sld xmlns:a="http://schemas.openxmlformats.org/drawingml/2006/main" xmlns:r="http://schemas.openxmlformats.org/officeDocument/2006/relationships" xmlns:p="http://schemas.openxmlformats.org/presentationml/2006/main">
+  <p:cSld>
+    <p:spTree>
+      <p:nvGrpSpPr>
+        <p:cNvPr id="1" name=""/>
+        <p:cNvGrpSpPr/>
+        <p:nvPr/>
+      </p:nvGrpSpPr>
+      <p:grpSpPr>
+        <a:xfrm>
+          <a:off x="0" y="0"/>
+          <a:ext cx="0" cy="0"/>
+          <a:chOff x="0" y="0"/>
+          <a:chExt cx="0" cy="0"/>
+        </a:xfrm>
+      </p:grpSpPr>
+      <p:sp>
+        <p:nvSpPr>
+          <p:cNvPr id="2" name="タイトル 1">
+            <a:extLst>
+              <a:ext uri="{FF2B5EF4-FFF2-40B4-BE49-F238E27FC236}">
+                <a16:creationId xmlns:a16="http://schemas.microsoft.com/office/drawing/2014/main" id="{29A39A5C-7FC5-4D89-9A64-C4313BC4C574}"/>
+              </a:ext>
+            </a:extLst>
+          </p:cNvPr>
+          <p:cNvSpPr>
+            <a:spLocks noGrp="1"/>
+          </p:cNvSpPr>
+          <p:nvPr>
+            <p:ph type="title"/>
+          </p:nvPr>
+        </p:nvSpPr>
+        <p:spPr/>
+        <p:txBody>
+          <a:bodyPr/>
+          <a:lstStyle/>
+          <a:p>
+            <a:r>
+              <a:rPr kumimoji="1" lang="en-US" altLang="ja-JP" dirty="0"/>
+              <a:t>MIDI Implementation Chart 5</a:t>
+            </a:r>
+            <a:endParaRPr kumimoji="1" lang="ja-JP" altLang="en-US" dirty="0"/>
+          </a:p>
+        </p:txBody>
+      </p:sp>
+      <p:sp>
+        <p:nvSpPr>
+          <p:cNvPr id="4" name="スライド番号プレースホルダー 3">
+            <a:extLst>
+              <a:ext uri="{FF2B5EF4-FFF2-40B4-BE49-F238E27FC236}">
+                <a16:creationId xmlns:a16="http://schemas.microsoft.com/office/drawing/2014/main" id="{F527AEA0-7EF4-4546-B495-9F4920BF8281}"/>
+              </a:ext>
+            </a:extLst>
+          </p:cNvPr>
+          <p:cNvSpPr>
+            <a:spLocks noGrp="1"/>
+          </p:cNvSpPr>
+          <p:nvPr>
+            <p:ph type="sldNum" sz="quarter" idx="12"/>
+          </p:nvPr>
+        </p:nvSpPr>
+        <p:spPr/>
+        <p:txBody>
+          <a:bodyPr/>
+          <a:lstStyle/>
+          <a:p>
+            <a:fld id="{E27E2812-4560-4165-A7C7-9C013F955547}" type="slidenum">
+              <a:rPr kumimoji="1" lang="ja-JP" altLang="en-US" smtClean="0"/>
+              <a:t>25</a:t>
+            </a:fld>
+            <a:endParaRPr kumimoji="1" lang="ja-JP" altLang="en-US"/>
+          </a:p>
+        </p:txBody>
+      </p:sp>
+      <p:graphicFrame>
+        <p:nvGraphicFramePr>
+          <p:cNvPr id="5" name="表 5">
+            <a:extLst>
+              <a:ext uri="{FF2B5EF4-FFF2-40B4-BE49-F238E27FC236}">
+                <a16:creationId xmlns:a16="http://schemas.microsoft.com/office/drawing/2014/main" id="{30EAE93F-19A6-429D-9E65-73D2543B8418}"/>
+              </a:ext>
+            </a:extLst>
+          </p:cNvPr>
+          <p:cNvGraphicFramePr>
+            <a:graphicFrameLocks noGrp="1"/>
+          </p:cNvGraphicFramePr>
+          <p:nvPr>
+            <p:extLst>
+              <p:ext uri="{D42A27DB-BD31-4B8C-83A1-F6EECF244321}">
+                <p14:modId xmlns:p14="http://schemas.microsoft.com/office/powerpoint/2010/main" val="54378838"/>
+              </p:ext>
+            </p:extLst>
+          </p:nvPr>
+        </p:nvGraphicFramePr>
+        <p:xfrm>
+          <a:off x="2032000" y="2225333"/>
+          <a:ext cx="9472612" cy="1651000"/>
+        </p:xfrm>
+        <a:graphic>
+          <a:graphicData uri="http://schemas.openxmlformats.org/drawingml/2006/table">
+            <a:tbl>
+              <a:tblPr firstRow="1" bandRow="1">
+                <a:tableStyleId>{5C22544A-7EE6-4342-B048-85BDC9FD1C3A}</a:tableStyleId>
+              </a:tblPr>
+              <a:tblGrid>
+                <a:gridCol w="2368153">
+                  <a:extLst>
+                    <a:ext uri="{9D8B030D-6E8A-4147-A177-3AD203B41FA5}">
+                      <a16:colId xmlns:a16="http://schemas.microsoft.com/office/drawing/2014/main" val="3140821746"/>
+                    </a:ext>
+                  </a:extLst>
+                </a:gridCol>
+                <a:gridCol w="2368153">
+                  <a:extLst>
+                    <a:ext uri="{9D8B030D-6E8A-4147-A177-3AD203B41FA5}">
+                      <a16:colId xmlns:a16="http://schemas.microsoft.com/office/drawing/2014/main" val="2862939062"/>
+                    </a:ext>
+                  </a:extLst>
+                </a:gridCol>
+                <a:gridCol w="2368153">
+                  <a:extLst>
+                    <a:ext uri="{9D8B030D-6E8A-4147-A177-3AD203B41FA5}">
+                      <a16:colId xmlns:a16="http://schemas.microsoft.com/office/drawing/2014/main" val="2770498619"/>
+                    </a:ext>
+                  </a:extLst>
+                </a:gridCol>
+                <a:gridCol w="2368153">
+                  <a:extLst>
+                    <a:ext uri="{9D8B030D-6E8A-4147-A177-3AD203B41FA5}">
+                      <a16:colId xmlns:a16="http://schemas.microsoft.com/office/drawing/2014/main" val="4289464401"/>
+                    </a:ext>
+                  </a:extLst>
+                </a:gridCol>
+              </a:tblGrid>
+              <a:tr h="370840">
+                <a:tc>
+                  <a:txBody>
+                    <a:bodyPr/>
+                    <a:lstStyle/>
+                    <a:p>
+                      <a:r>
+                        <a:rPr kumimoji="1" lang="en-US" altLang="ja-JP" dirty="0"/>
+                        <a:t>Function</a:t>
+                      </a:r>
+                      <a:endParaRPr kumimoji="1" lang="ja-JP" altLang="en-US" dirty="0"/>
+                    </a:p>
+                  </a:txBody>
+                  <a:tcPr/>
+                </a:tc>
+                <a:tc>
+                  <a:txBody>
+                    <a:bodyPr/>
+                    <a:lstStyle/>
+                    <a:p>
+                      <a:r>
+                        <a:rPr kumimoji="1" lang="en-US" altLang="ja-JP" dirty="0"/>
+                        <a:t>MSB</a:t>
+                      </a:r>
+                      <a:endParaRPr kumimoji="1" lang="ja-JP" altLang="en-US" dirty="0"/>
+                    </a:p>
+                  </a:txBody>
+                  <a:tcPr/>
+                </a:tc>
+                <a:tc>
+                  <a:txBody>
+                    <a:bodyPr/>
+                    <a:lstStyle/>
+                    <a:p>
+                      <a:r>
+                        <a:rPr kumimoji="1" lang="en-US" altLang="ja-JP" dirty="0"/>
+                        <a:t>LSB</a:t>
+                      </a:r>
+                      <a:endParaRPr kumimoji="1" lang="ja-JP" altLang="en-US" dirty="0"/>
+                    </a:p>
+                  </a:txBody>
+                  <a:tcPr/>
+                </a:tc>
+                <a:tc>
+                  <a:txBody>
+                    <a:bodyPr/>
+                    <a:lstStyle/>
+                    <a:p>
+                      <a:r>
+                        <a:rPr kumimoji="1" lang="en-US" altLang="ja-JP" dirty="0"/>
+                        <a:t>Remarks</a:t>
+                      </a:r>
+                      <a:endParaRPr kumimoji="1" lang="ja-JP" altLang="en-US" dirty="0"/>
+                    </a:p>
+                  </a:txBody>
+                  <a:tcPr/>
+                </a:tc>
+                <a:extLst>
+                  <a:ext uri="{0D108BD9-81ED-4DB2-BD59-A6C34878D82A}">
+                    <a16:rowId xmlns:a16="http://schemas.microsoft.com/office/drawing/2014/main" val="1671041493"/>
+                  </a:ext>
+                </a:extLst>
+              </a:tr>
+              <a:tr h="370840">
+                <a:tc>
+                  <a:txBody>
+                    <a:bodyPr/>
+                    <a:lstStyle/>
+                    <a:p>
+                      <a:pPr algn="l"/>
+                      <a:r>
+                        <a:rPr kumimoji="1" lang="en-US" altLang="ja-JP" dirty="0"/>
+                        <a:t>RPN</a:t>
+                      </a:r>
+                    </a:p>
+                  </a:txBody>
+                  <a:tcPr/>
+                </a:tc>
+                <a:tc>
+                  <a:txBody>
+                    <a:bodyPr/>
+                    <a:lstStyle/>
+                    <a:p>
+                      <a:r>
+                        <a:rPr kumimoji="1" lang="en-US" altLang="ja-JP" dirty="0"/>
+                        <a:t>0</a:t>
+                      </a:r>
+                      <a:endParaRPr kumimoji="1" lang="ja-JP" altLang="en-US" dirty="0"/>
+                    </a:p>
+                  </a:txBody>
+                  <a:tcPr/>
+                </a:tc>
+                <a:tc>
+                  <a:txBody>
+                    <a:bodyPr/>
+                    <a:lstStyle/>
+                    <a:p>
+                      <a:pPr marL="0" marR="0" lvl="0" indent="0" algn="l" defTabSz="457200" rtl="0" eaLnBrk="1" fontAlgn="auto" latinLnBrk="0" hangingPunct="1">
+                        <a:lnSpc>
+                          <a:spcPct val="100000"/>
+                        </a:lnSpc>
+                        <a:spcBef>
+                          <a:spcPts val="0"/>
+                        </a:spcBef>
+                        <a:spcAft>
+                          <a:spcPts val="0"/>
+                        </a:spcAft>
+                        <a:buClrTx/>
+                        <a:buSzTx/>
+                        <a:buFontTx/>
+                        <a:buNone/>
+                        <a:tabLst/>
+                        <a:defRPr/>
+                      </a:pPr>
+                      <a:r>
+                        <a:rPr kumimoji="1" lang="en-US" altLang="ja-JP" dirty="0"/>
+                        <a:t>0</a:t>
+                      </a:r>
+                      <a:endParaRPr kumimoji="1" lang="ja-JP" altLang="en-US" dirty="0"/>
+                    </a:p>
+                  </a:txBody>
+                  <a:tcPr/>
+                </a:tc>
+                <a:tc>
+                  <a:txBody>
+                    <a:bodyPr/>
+                    <a:lstStyle/>
+                    <a:p>
+                      <a:r>
+                        <a:rPr kumimoji="1" lang="en-US" altLang="ja-JP" dirty="0"/>
+                        <a:t>Pitch Bend Range</a:t>
+                      </a:r>
+                    </a:p>
+                    <a:p>
+                      <a:r>
+                        <a:rPr kumimoji="1" lang="en-US" altLang="ja-JP" dirty="0"/>
+                        <a:t>0-</a:t>
+                      </a:r>
+                      <a:r>
+                        <a:rPr kumimoji="1" lang="en-US" altLang="ja-JP" b="1" dirty="0"/>
+                        <a:t>2</a:t>
+                      </a:r>
+                      <a:r>
+                        <a:rPr kumimoji="1" lang="en-US" altLang="ja-JP" dirty="0"/>
+                        <a:t>-127 [Half Note]</a:t>
+                      </a:r>
+                      <a:endParaRPr kumimoji="1" lang="ja-JP" altLang="en-US" dirty="0"/>
+                    </a:p>
+                  </a:txBody>
+                  <a:tcPr/>
+                </a:tc>
+                <a:extLst>
+                  <a:ext uri="{0D108BD9-81ED-4DB2-BD59-A6C34878D82A}">
+                    <a16:rowId xmlns:a16="http://schemas.microsoft.com/office/drawing/2014/main" val="2531957203"/>
+                  </a:ext>
+                </a:extLst>
+              </a:tr>
+              <a:tr h="370840">
+                <a:tc>
+                  <a:txBody>
+                    <a:bodyPr/>
+                    <a:lstStyle/>
+                    <a:p>
+                      <a:pPr algn="r"/>
+                      <a:endParaRPr kumimoji="1" lang="ja-JP" altLang="en-US" dirty="0"/>
+                    </a:p>
+                  </a:txBody>
+                  <a:tcPr/>
+                </a:tc>
+                <a:tc>
+                  <a:txBody>
+                    <a:bodyPr/>
+                    <a:lstStyle/>
+                    <a:p>
+                      <a:r>
+                        <a:rPr kumimoji="1" lang="en-US" altLang="ja-JP" dirty="0"/>
+                        <a:t>0</a:t>
+                      </a:r>
+                      <a:endParaRPr kumimoji="1" lang="ja-JP" altLang="en-US" dirty="0"/>
+                    </a:p>
+                  </a:txBody>
+                  <a:tcPr/>
+                </a:tc>
+                <a:tc>
+                  <a:txBody>
+                    <a:bodyPr/>
+                    <a:lstStyle/>
+                    <a:p>
+                      <a:pPr marL="0" marR="0" lvl="0" indent="0" algn="l" defTabSz="457200" rtl="0" eaLnBrk="1" fontAlgn="auto" latinLnBrk="0" hangingPunct="1">
+                        <a:lnSpc>
+                          <a:spcPct val="100000"/>
+                        </a:lnSpc>
+                        <a:spcBef>
+                          <a:spcPts val="0"/>
+                        </a:spcBef>
+                        <a:spcAft>
+                          <a:spcPts val="0"/>
+                        </a:spcAft>
+                        <a:buClrTx/>
+                        <a:buSzTx/>
+                        <a:buFontTx/>
+                        <a:buNone/>
+                        <a:tabLst/>
+                        <a:defRPr/>
+                      </a:pPr>
+                      <a:r>
+                        <a:rPr kumimoji="1" lang="en-US" altLang="ja-JP" dirty="0"/>
+                        <a:t>5</a:t>
+                      </a:r>
+                      <a:endParaRPr kumimoji="1" lang="ja-JP" altLang="en-US" dirty="0"/>
+                    </a:p>
+                  </a:txBody>
+                  <a:tcPr/>
+                </a:tc>
+                <a:tc>
+                  <a:txBody>
+                    <a:bodyPr/>
+                    <a:lstStyle/>
+                    <a:p>
+                      <a:r>
+                        <a:rPr kumimoji="1" lang="en-US" altLang="ja-JP" b="0" dirty="0"/>
+                        <a:t>Mod Depth</a:t>
+                      </a:r>
+                    </a:p>
+                    <a:p>
+                      <a:r>
+                        <a:rPr kumimoji="1" lang="en-US" altLang="ja-JP" b="1" dirty="0"/>
+                        <a:t>0</a:t>
+                      </a:r>
+                      <a:r>
+                        <a:rPr kumimoji="1" lang="en-US" altLang="ja-JP" b="0" dirty="0"/>
+                        <a:t>-127 [Relative]</a:t>
+                      </a:r>
+                      <a:endParaRPr kumimoji="1" lang="ja-JP" altLang="en-US" b="0" dirty="0"/>
+                    </a:p>
+                  </a:txBody>
+                  <a:tcPr/>
+                </a:tc>
+                <a:extLst>
+                  <a:ext uri="{0D108BD9-81ED-4DB2-BD59-A6C34878D82A}">
+                    <a16:rowId xmlns:a16="http://schemas.microsoft.com/office/drawing/2014/main" val="1129224570"/>
+                  </a:ext>
+                </a:extLst>
+              </a:tr>
+            </a:tbl>
+          </a:graphicData>
+        </a:graphic>
+      </p:graphicFrame>
+    </p:spTree>
+    <p:extLst>
+      <p:ext uri="{BB962C8B-B14F-4D97-AF65-F5344CB8AC3E}">
+        <p14:creationId xmlns:p14="http://schemas.microsoft.com/office/powerpoint/2010/main" val="3799396771"/>
+      </p:ext>
+    </p:extLst>
+  </p:cSld>
+  <p:clrMapOvr>
+    <a:masterClrMapping/>
+  </p:clrMapOvr>
+</p:sld>
+</file>
+
+<file path=ppt/slides/slide26.xml><?xml version="1.0" encoding="utf-8"?>
+<p:sld xmlns:a="http://schemas.openxmlformats.org/drawingml/2006/main" xmlns:r="http://schemas.openxmlformats.org/officeDocument/2006/relationships" xmlns:p="http://schemas.openxmlformats.org/presentationml/2006/main">
+  <p:cSld>
+    <p:spTree>
+      <p:nvGrpSpPr>
+        <p:cNvPr id="1" name=""/>
+        <p:cNvGrpSpPr/>
+        <p:nvPr/>
+      </p:nvGrpSpPr>
+      <p:grpSpPr>
+        <a:xfrm>
+          <a:off x="0" y="0"/>
+          <a:ext cx="0" cy="0"/>
+          <a:chOff x="0" y="0"/>
+          <a:chExt cx="0" cy="0"/>
+        </a:xfrm>
+      </p:grpSpPr>
+      <p:sp>
+        <p:nvSpPr>
+          <p:cNvPr id="2" name="タイトル 1">
+            <a:extLst>
+              <a:ext uri="{FF2B5EF4-FFF2-40B4-BE49-F238E27FC236}">
+                <a16:creationId xmlns:a16="http://schemas.microsoft.com/office/drawing/2014/main" id="{29A39A5C-7FC5-4D89-9A64-C4313BC4C574}"/>
+              </a:ext>
+            </a:extLst>
+          </p:cNvPr>
+          <p:cNvSpPr>
+            <a:spLocks noGrp="1"/>
+          </p:cNvSpPr>
+          <p:nvPr>
+            <p:ph type="title"/>
+          </p:nvPr>
+        </p:nvSpPr>
+        <p:spPr/>
+        <p:txBody>
+          <a:bodyPr/>
+          <a:lstStyle/>
+          <a:p>
+            <a:r>
+              <a:rPr kumimoji="1" lang="en-US" altLang="ja-JP" dirty="0"/>
+              <a:t>MIDI Implementation Chart 6</a:t>
+            </a:r>
+            <a:endParaRPr kumimoji="1" lang="ja-JP" altLang="en-US" dirty="0"/>
+          </a:p>
+        </p:txBody>
+      </p:sp>
+      <p:sp>
+        <p:nvSpPr>
+          <p:cNvPr id="4" name="スライド番号プレースホルダー 3">
+            <a:extLst>
+              <a:ext uri="{FF2B5EF4-FFF2-40B4-BE49-F238E27FC236}">
+                <a16:creationId xmlns:a16="http://schemas.microsoft.com/office/drawing/2014/main" id="{F527AEA0-7EF4-4546-B495-9F4920BF8281}"/>
+              </a:ext>
+            </a:extLst>
+          </p:cNvPr>
+          <p:cNvSpPr>
+            <a:spLocks noGrp="1"/>
+          </p:cNvSpPr>
+          <p:nvPr>
+            <p:ph type="sldNum" sz="quarter" idx="12"/>
+          </p:nvPr>
+        </p:nvSpPr>
+        <p:spPr/>
+        <p:txBody>
+          <a:bodyPr/>
+          <a:lstStyle/>
+          <a:p>
+            <a:fld id="{E27E2812-4560-4165-A7C7-9C013F955547}" type="slidenum">
+              <a:rPr kumimoji="1" lang="ja-JP" altLang="en-US" smtClean="0"/>
+              <a:t>26</a:t>
+            </a:fld>
+            <a:endParaRPr kumimoji="1" lang="ja-JP" altLang="en-US"/>
+          </a:p>
+        </p:txBody>
+      </p:sp>
+      <p:graphicFrame>
+        <p:nvGraphicFramePr>
+          <p:cNvPr id="5" name="表 5">
+            <a:extLst>
+              <a:ext uri="{FF2B5EF4-FFF2-40B4-BE49-F238E27FC236}">
+                <a16:creationId xmlns:a16="http://schemas.microsoft.com/office/drawing/2014/main" id="{30EAE93F-19A6-429D-9E65-73D2543B8418}"/>
+              </a:ext>
+            </a:extLst>
+          </p:cNvPr>
+          <p:cNvGraphicFramePr>
+            <a:graphicFrameLocks noGrp="1"/>
+          </p:cNvGraphicFramePr>
+          <p:nvPr>
+            <p:extLst>
+              <p:ext uri="{D42A27DB-BD31-4B8C-83A1-F6EECF244321}">
+                <p14:modId xmlns:p14="http://schemas.microsoft.com/office/powerpoint/2010/main" val="3061827042"/>
+              </p:ext>
+            </p:extLst>
+          </p:nvPr>
+        </p:nvGraphicFramePr>
+        <p:xfrm>
+          <a:off x="2032000" y="2225333"/>
+          <a:ext cx="9472612" cy="3510280"/>
+        </p:xfrm>
+        <a:graphic>
+          <a:graphicData uri="http://schemas.openxmlformats.org/drawingml/2006/table">
+            <a:tbl>
+              <a:tblPr firstRow="1" bandRow="1">
+                <a:tableStyleId>{5C22544A-7EE6-4342-B048-85BDC9FD1C3A}</a:tableStyleId>
+              </a:tblPr>
+              <a:tblGrid>
+                <a:gridCol w="1257300">
+                  <a:extLst>
+                    <a:ext uri="{9D8B030D-6E8A-4147-A177-3AD203B41FA5}">
+                      <a16:colId xmlns:a16="http://schemas.microsoft.com/office/drawing/2014/main" val="3140821746"/>
+                    </a:ext>
+                  </a:extLst>
+                </a:gridCol>
+                <a:gridCol w="6248400">
+                  <a:extLst>
+                    <a:ext uri="{9D8B030D-6E8A-4147-A177-3AD203B41FA5}">
+                      <a16:colId xmlns:a16="http://schemas.microsoft.com/office/drawing/2014/main" val="2862939062"/>
+                    </a:ext>
+                  </a:extLst>
+                </a:gridCol>
+                <a:gridCol w="1966912">
+                  <a:extLst>
+                    <a:ext uri="{9D8B030D-6E8A-4147-A177-3AD203B41FA5}">
+                      <a16:colId xmlns:a16="http://schemas.microsoft.com/office/drawing/2014/main" val="4289464401"/>
+                    </a:ext>
+                  </a:extLst>
+                </a:gridCol>
+              </a:tblGrid>
+              <a:tr h="370840">
+                <a:tc>
+                  <a:txBody>
+                    <a:bodyPr/>
+                    <a:lstStyle/>
+                    <a:p>
+                      <a:r>
+                        <a:rPr kumimoji="1" lang="en-US" altLang="ja-JP" dirty="0"/>
+                        <a:t>Function</a:t>
+                      </a:r>
+                      <a:endParaRPr kumimoji="1" lang="ja-JP" altLang="en-US" dirty="0"/>
+                    </a:p>
+                  </a:txBody>
+                  <a:tcPr/>
+                </a:tc>
+                <a:tc>
+                  <a:txBody>
+                    <a:bodyPr/>
+                    <a:lstStyle/>
+                    <a:p>
+                      <a:pPr marL="0" marR="0" lvl="0" indent="0" algn="l" defTabSz="457200" rtl="0" eaLnBrk="1" fontAlgn="auto" latinLnBrk="0" hangingPunct="1">
+                        <a:lnSpc>
+                          <a:spcPct val="100000"/>
+                        </a:lnSpc>
+                        <a:spcBef>
+                          <a:spcPts val="0"/>
+                        </a:spcBef>
+                        <a:spcAft>
+                          <a:spcPts val="0"/>
+                        </a:spcAft>
+                        <a:buClrTx/>
+                        <a:buSzTx/>
+                        <a:buFontTx/>
+                        <a:buNone/>
+                        <a:tabLst/>
+                        <a:defRPr/>
+                      </a:pPr>
+                      <a:r>
+                        <a:rPr kumimoji="1" lang="en-US" altLang="ja-JP" dirty="0"/>
+                        <a:t>Change Receiving MIDI </a:t>
+                      </a:r>
+                      <a:r>
+                        <a:rPr kumimoji="1" lang="en-US" altLang="ja-JP" dirty="0" err="1"/>
+                        <a:t>ch.</a:t>
+                      </a:r>
+                      <a:r>
+                        <a:rPr kumimoji="1" lang="en-US" altLang="ja-JP" dirty="0"/>
+                        <a:t> dynamically.</a:t>
+                      </a:r>
+                      <a:endParaRPr kumimoji="1" lang="ja-JP" altLang="en-US" dirty="0"/>
+                    </a:p>
+                  </a:txBody>
+                  <a:tcPr/>
+                </a:tc>
+                <a:tc>
+                  <a:txBody>
+                    <a:bodyPr/>
+                    <a:lstStyle/>
+                    <a:p>
+                      <a:r>
+                        <a:rPr kumimoji="1" lang="en-US" altLang="ja-JP" dirty="0"/>
+                        <a:t>Remarks</a:t>
+                      </a:r>
+                      <a:endParaRPr kumimoji="1" lang="ja-JP" altLang="en-US" dirty="0"/>
+                    </a:p>
+                  </a:txBody>
+                  <a:tcPr/>
+                </a:tc>
+                <a:extLst>
+                  <a:ext uri="{0D108BD9-81ED-4DB2-BD59-A6C34878D82A}">
+                    <a16:rowId xmlns:a16="http://schemas.microsoft.com/office/drawing/2014/main" val="1671041493"/>
+                  </a:ext>
+                </a:extLst>
+              </a:tr>
+              <a:tr h="370840">
+                <a:tc>
+                  <a:txBody>
+                    <a:bodyPr/>
+                    <a:lstStyle/>
+                    <a:p>
+                      <a:pPr algn="l"/>
+                      <a:r>
+                        <a:rPr kumimoji="1" lang="en-US" altLang="ja-JP" dirty="0"/>
+                        <a:t>NRPN</a:t>
+                      </a:r>
+                      <a:endParaRPr kumimoji="1" lang="ja-JP" altLang="en-US" dirty="0"/>
+                    </a:p>
+                  </a:txBody>
+                  <a:tcPr/>
+                </a:tc>
+                <a:tc>
+                  <a:txBody>
+                    <a:bodyPr/>
+                    <a:lstStyle/>
+                    <a:p>
+                      <a:r>
+                        <a:rPr kumimoji="1" lang="en-US" altLang="ja-JP" sz="1000" kern="1200" dirty="0">
+                          <a:solidFill>
+                            <a:schemeClr val="dk1"/>
+                          </a:solidFill>
+                          <a:latin typeface="ＭＳ ゴシック" panose="020B0609070205080204" pitchFamily="49" charset="-128"/>
+                          <a:ea typeface="ＭＳ ゴシック" panose="020B0609070205080204" pitchFamily="49" charset="-128"/>
+                          <a:cs typeface="+mn-cs"/>
+                        </a:rPr>
+                        <a:t>NRPN MSB  Bx 63 41 … for MIDI </a:t>
+                      </a:r>
+                      <a:r>
+                        <a:rPr kumimoji="1" lang="en-US" altLang="ja-JP" sz="1000" kern="1200" dirty="0" err="1">
+                          <a:solidFill>
+                            <a:schemeClr val="dk1"/>
+                          </a:solidFill>
+                          <a:latin typeface="ＭＳ ゴシック" panose="020B0609070205080204" pitchFamily="49" charset="-128"/>
+                          <a:ea typeface="ＭＳ ゴシック" panose="020B0609070205080204" pitchFamily="49" charset="-128"/>
+                          <a:cs typeface="+mn-cs"/>
+                        </a:rPr>
+                        <a:t>ch</a:t>
+                      </a:r>
+                      <a:r>
+                        <a:rPr kumimoji="1" lang="en-US" altLang="ja-JP" sz="1000" kern="1200" dirty="0">
+                          <a:solidFill>
+                            <a:schemeClr val="dk1"/>
+                          </a:solidFill>
+                          <a:latin typeface="ＭＳ ゴシック" panose="020B0609070205080204" pitchFamily="49" charset="-128"/>
+                          <a:ea typeface="ＭＳ ゴシック" panose="020B0609070205080204" pitchFamily="49" charset="-128"/>
+                          <a:cs typeface="+mn-cs"/>
+                        </a:rPr>
+                        <a:t>(1-7)</a:t>
+                      </a:r>
+                    </a:p>
+                    <a:p>
+                      <a:r>
+                        <a:rPr kumimoji="1" lang="en-US" altLang="ja-JP" sz="1000" kern="1200" dirty="0">
+                          <a:solidFill>
+                            <a:schemeClr val="dk1"/>
+                          </a:solidFill>
+                          <a:latin typeface="ＭＳ ゴシック" panose="020B0609070205080204" pitchFamily="49" charset="-128"/>
+                          <a:ea typeface="ＭＳ ゴシック" panose="020B0609070205080204" pitchFamily="49" charset="-128"/>
+                          <a:cs typeface="+mn-cs"/>
+                        </a:rPr>
+                        <a:t>NRPN LSB  Bx 62 &lt;Device ID&gt; ... Specify Device ID of existing instrument.</a:t>
+                      </a:r>
+                    </a:p>
+                    <a:p>
+                      <a:r>
+                        <a:rPr kumimoji="1" lang="en-US" altLang="ja-JP" sz="1000" kern="1200" dirty="0">
+                          <a:solidFill>
+                            <a:schemeClr val="dk1"/>
+                          </a:solidFill>
+                          <a:latin typeface="ＭＳ ゴシック" panose="020B0609070205080204" pitchFamily="49" charset="-128"/>
+                          <a:ea typeface="ＭＳ ゴシック" panose="020B0609070205080204" pitchFamily="49" charset="-128"/>
+                          <a:cs typeface="+mn-cs"/>
+                        </a:rPr>
+                        <a:t>DATA MSB  Bx 26 &lt;Unit No&gt;   ... Specify Unit No of the above Device ID of existing instrument.</a:t>
+                      </a:r>
+                    </a:p>
+                    <a:p>
+                      <a:r>
+                        <a:rPr kumimoji="1" lang="en-US" altLang="ja-JP" sz="1000" kern="1200" dirty="0">
+                          <a:solidFill>
+                            <a:schemeClr val="dk1"/>
+                          </a:solidFill>
+                          <a:latin typeface="ＭＳ ゴシック" panose="020B0609070205080204" pitchFamily="49" charset="-128"/>
+                          <a:ea typeface="ＭＳ ゴシック" panose="020B0609070205080204" pitchFamily="49" charset="-128"/>
+                          <a:cs typeface="+mn-cs"/>
+                        </a:rPr>
+                        <a:t>DATA LSB  Bx 06 &lt;Receiving MIDI </a:t>
+                      </a:r>
+                      <a:r>
+                        <a:rPr kumimoji="1" lang="en-US" altLang="ja-JP" sz="1000" kern="1200" dirty="0" err="1">
+                          <a:solidFill>
+                            <a:schemeClr val="dk1"/>
+                          </a:solidFill>
+                          <a:latin typeface="ＭＳ ゴシック" panose="020B0609070205080204" pitchFamily="49" charset="-128"/>
+                          <a:ea typeface="ＭＳ ゴシック" panose="020B0609070205080204" pitchFamily="49" charset="-128"/>
+                          <a:cs typeface="+mn-cs"/>
+                        </a:rPr>
+                        <a:t>ch</a:t>
+                      </a:r>
+                      <a:r>
+                        <a:rPr kumimoji="1" lang="en-US" altLang="ja-JP" sz="1000" kern="1200" dirty="0">
+                          <a:solidFill>
+                            <a:schemeClr val="dk1"/>
+                          </a:solidFill>
+                          <a:latin typeface="ＭＳ ゴシック" panose="020B0609070205080204" pitchFamily="49" charset="-128"/>
+                          <a:ea typeface="ＭＳ ゴシック" panose="020B0609070205080204" pitchFamily="49" charset="-128"/>
+                          <a:cs typeface="+mn-cs"/>
+                        </a:rPr>
+                        <a:t>(1-7) bit sets. 1=On, 0=Off&gt;</a:t>
+                      </a:r>
+                    </a:p>
+                    <a:p>
+                      <a:r>
+                        <a:rPr kumimoji="1" lang="en-US" altLang="ja-JP" sz="1000" kern="1200" dirty="0">
+                          <a:solidFill>
+                            <a:schemeClr val="dk1"/>
+                          </a:solidFill>
+                          <a:latin typeface="ＭＳ ゴシック" panose="020B0609070205080204" pitchFamily="49" charset="-128"/>
+                          <a:ea typeface="ＭＳ ゴシック" panose="020B0609070205080204" pitchFamily="49" charset="-128"/>
+                          <a:cs typeface="+mn-cs"/>
+                        </a:rPr>
+                        <a:t>            bit  6  5  4  3  2  1  0</a:t>
+                      </a:r>
+                    </a:p>
+                    <a:p>
+                      <a:r>
+                        <a:rPr kumimoji="1" lang="en-US" altLang="ja-JP" sz="1000" kern="1200" dirty="0">
+                          <a:solidFill>
+                            <a:schemeClr val="dk1"/>
+                          </a:solidFill>
+                          <a:latin typeface="ＭＳ ゴシック" panose="020B0609070205080204" pitchFamily="49" charset="-128"/>
+                          <a:ea typeface="ＭＳ ゴシック" panose="020B0609070205080204" pitchFamily="49" charset="-128"/>
+                          <a:cs typeface="+mn-cs"/>
+                        </a:rPr>
+                        <a:t>    </a:t>
+                      </a:r>
+                      <a:r>
+                        <a:rPr kumimoji="1" lang="pl-PL" altLang="ja-JP" sz="1000" kern="1200" dirty="0">
+                          <a:solidFill>
+                            <a:schemeClr val="dk1"/>
+                          </a:solidFill>
+                          <a:latin typeface="ＭＳ ゴシック" panose="020B0609070205080204" pitchFamily="49" charset="-128"/>
+                          <a:ea typeface="ＭＳ ゴシック" panose="020B0609070205080204" pitchFamily="49" charset="-128"/>
+                          <a:cs typeface="+mn-cs"/>
+                        </a:rPr>
+                        <a:t>    </a:t>
+                      </a:r>
+                      <a:r>
+                        <a:rPr kumimoji="1" lang="en-US" altLang="ja-JP" sz="1000" kern="1200" dirty="0">
+                          <a:solidFill>
+                            <a:schemeClr val="dk1"/>
+                          </a:solidFill>
+                          <a:latin typeface="ＭＳ ゴシック" panose="020B0609070205080204" pitchFamily="49" charset="-128"/>
+                          <a:ea typeface="ＭＳ ゴシック" panose="020B0609070205080204" pitchFamily="49" charset="-128"/>
+                          <a:cs typeface="+mn-cs"/>
+                        </a:rPr>
+                        <a:t>    </a:t>
+                      </a:r>
+                      <a:r>
+                        <a:rPr kumimoji="1" lang="pl-PL" altLang="ja-JP" sz="1000" kern="1200" dirty="0">
+                          <a:solidFill>
+                            <a:schemeClr val="dk1"/>
+                          </a:solidFill>
+                          <a:latin typeface="ＭＳ ゴシック" panose="020B0609070205080204" pitchFamily="49" charset="-128"/>
+                          <a:ea typeface="ＭＳ ゴシック" panose="020B0609070205080204" pitchFamily="49" charset="-128"/>
+                          <a:cs typeface="+mn-cs"/>
+                        </a:rPr>
+                        <a:t> ch  7  6  5  4  3  2  1</a:t>
+                      </a:r>
+                    </a:p>
+                    <a:p>
+                      <a:endParaRPr kumimoji="1" lang="ja-JP" altLang="en-US" sz="1000" kern="1200" dirty="0">
+                        <a:solidFill>
+                          <a:schemeClr val="dk1"/>
+                        </a:solidFill>
+                        <a:latin typeface="ＭＳ ゴシック" panose="020B0609070205080204" pitchFamily="49" charset="-128"/>
+                        <a:ea typeface="ＭＳ ゴシック" panose="020B0609070205080204" pitchFamily="49" charset="-128"/>
+                        <a:cs typeface="+mn-cs"/>
+                      </a:endParaRPr>
+                    </a:p>
+                    <a:p>
+                      <a:r>
+                        <a:rPr kumimoji="1" lang="en-US" altLang="ja-JP" sz="1000" kern="1200" dirty="0">
+                          <a:solidFill>
+                            <a:schemeClr val="dk1"/>
+                          </a:solidFill>
+                          <a:latin typeface="ＭＳ ゴシック" panose="020B0609070205080204" pitchFamily="49" charset="-128"/>
+                          <a:ea typeface="ＭＳ ゴシック" panose="020B0609070205080204" pitchFamily="49" charset="-128"/>
+                          <a:cs typeface="+mn-cs"/>
+                        </a:rPr>
+                        <a:t>NRPN MSB  Bx 63 42 ... for MIDI </a:t>
+                      </a:r>
+                      <a:r>
+                        <a:rPr kumimoji="1" lang="en-US" altLang="ja-JP" sz="1000" kern="1200" dirty="0" err="1">
+                          <a:solidFill>
+                            <a:schemeClr val="dk1"/>
+                          </a:solidFill>
+                          <a:latin typeface="ＭＳ ゴシック" panose="020B0609070205080204" pitchFamily="49" charset="-128"/>
+                          <a:ea typeface="ＭＳ ゴシック" panose="020B0609070205080204" pitchFamily="49" charset="-128"/>
+                          <a:cs typeface="+mn-cs"/>
+                        </a:rPr>
+                        <a:t>ch</a:t>
+                      </a:r>
+                      <a:r>
+                        <a:rPr kumimoji="1" lang="en-US" altLang="ja-JP" sz="1000" kern="1200" dirty="0">
+                          <a:solidFill>
+                            <a:schemeClr val="dk1"/>
+                          </a:solidFill>
+                          <a:latin typeface="ＭＳ ゴシック" panose="020B0609070205080204" pitchFamily="49" charset="-128"/>
+                          <a:ea typeface="ＭＳ ゴシック" panose="020B0609070205080204" pitchFamily="49" charset="-128"/>
+                          <a:cs typeface="+mn-cs"/>
+                        </a:rPr>
+                        <a:t>(8-14)</a:t>
+                      </a:r>
+                    </a:p>
+                    <a:p>
+                      <a:r>
+                        <a:rPr kumimoji="1" lang="en-US" altLang="ja-JP" sz="1000" kern="1200" dirty="0">
+                          <a:solidFill>
+                            <a:schemeClr val="dk1"/>
+                          </a:solidFill>
+                          <a:latin typeface="ＭＳ ゴシック" panose="020B0609070205080204" pitchFamily="49" charset="-128"/>
+                          <a:ea typeface="ＭＳ ゴシック" panose="020B0609070205080204" pitchFamily="49" charset="-128"/>
+                          <a:cs typeface="+mn-cs"/>
+                        </a:rPr>
+                        <a:t>NRPN LSB  Bx 62 &lt;Device ID&gt; ... Specify Device ID of existing instrument.</a:t>
+                      </a:r>
+                    </a:p>
+                    <a:p>
+                      <a:r>
+                        <a:rPr kumimoji="1" lang="en-US" altLang="ja-JP" sz="1000" kern="1200" dirty="0">
+                          <a:solidFill>
+                            <a:schemeClr val="dk1"/>
+                          </a:solidFill>
+                          <a:latin typeface="ＭＳ ゴシック" panose="020B0609070205080204" pitchFamily="49" charset="-128"/>
+                          <a:ea typeface="ＭＳ ゴシック" panose="020B0609070205080204" pitchFamily="49" charset="-128"/>
+                          <a:cs typeface="+mn-cs"/>
+                        </a:rPr>
+                        <a:t>DATA MSB  Bx 26 &lt;Unit No&gt;   ... Specify Unit No of the above Device ID of existing instrument.</a:t>
+                      </a:r>
+                    </a:p>
+                    <a:p>
+                      <a:r>
+                        <a:rPr kumimoji="1" lang="en-US" altLang="ja-JP" sz="1000" kern="1200" dirty="0">
+                          <a:solidFill>
+                            <a:schemeClr val="dk1"/>
+                          </a:solidFill>
+                          <a:latin typeface="ＭＳ ゴシック" panose="020B0609070205080204" pitchFamily="49" charset="-128"/>
+                          <a:ea typeface="ＭＳ ゴシック" panose="020B0609070205080204" pitchFamily="49" charset="-128"/>
+                          <a:cs typeface="+mn-cs"/>
+                        </a:rPr>
+                        <a:t>DATA LSB  Bx 06 &lt;Receiving MIDI </a:t>
+                      </a:r>
+                      <a:r>
+                        <a:rPr kumimoji="1" lang="en-US" altLang="ja-JP" sz="1000" kern="1200" dirty="0" err="1">
+                          <a:solidFill>
+                            <a:schemeClr val="dk1"/>
+                          </a:solidFill>
+                          <a:latin typeface="ＭＳ ゴシック" panose="020B0609070205080204" pitchFamily="49" charset="-128"/>
+                          <a:ea typeface="ＭＳ ゴシック" panose="020B0609070205080204" pitchFamily="49" charset="-128"/>
+                          <a:cs typeface="+mn-cs"/>
+                        </a:rPr>
+                        <a:t>ch</a:t>
+                      </a:r>
+                      <a:r>
+                        <a:rPr kumimoji="1" lang="en-US" altLang="ja-JP" sz="1000" kern="1200" dirty="0">
+                          <a:solidFill>
+                            <a:schemeClr val="dk1"/>
+                          </a:solidFill>
+                          <a:latin typeface="ＭＳ ゴシック" panose="020B0609070205080204" pitchFamily="49" charset="-128"/>
+                          <a:ea typeface="ＭＳ ゴシック" panose="020B0609070205080204" pitchFamily="49" charset="-128"/>
+                          <a:cs typeface="+mn-cs"/>
+                        </a:rPr>
+                        <a:t>(8-14) bit sets. 1=On, 0=Off&gt;</a:t>
+                      </a:r>
+                    </a:p>
+                    <a:p>
+                      <a:r>
+                        <a:rPr kumimoji="1" lang="en-US" altLang="ja-JP" sz="1000" kern="1200" dirty="0">
+                          <a:solidFill>
+                            <a:schemeClr val="dk1"/>
+                          </a:solidFill>
+                          <a:latin typeface="ＭＳ ゴシック" panose="020B0609070205080204" pitchFamily="49" charset="-128"/>
+                          <a:ea typeface="ＭＳ ゴシック" panose="020B0609070205080204" pitchFamily="49" charset="-128"/>
+                          <a:cs typeface="+mn-cs"/>
+                        </a:rPr>
+                        <a:t>            bit  6  5  4  3  2  1  0</a:t>
+                      </a:r>
+                    </a:p>
+                    <a:p>
+                      <a:r>
+                        <a:rPr kumimoji="1" lang="pl-PL" altLang="ja-JP" sz="1000" kern="1200" dirty="0">
+                          <a:solidFill>
+                            <a:schemeClr val="dk1"/>
+                          </a:solidFill>
+                          <a:latin typeface="ＭＳ ゴシック" panose="020B0609070205080204" pitchFamily="49" charset="-128"/>
+                          <a:ea typeface="ＭＳ ゴシック" panose="020B0609070205080204" pitchFamily="49" charset="-128"/>
+                          <a:cs typeface="+mn-cs"/>
+                        </a:rPr>
+                        <a:t>    </a:t>
+                      </a:r>
+                      <a:r>
+                        <a:rPr kumimoji="1" lang="en-US" altLang="ja-JP" sz="1000" kern="1200" dirty="0">
+                          <a:solidFill>
+                            <a:schemeClr val="dk1"/>
+                          </a:solidFill>
+                          <a:latin typeface="ＭＳ ゴシック" panose="020B0609070205080204" pitchFamily="49" charset="-128"/>
+                          <a:ea typeface="ＭＳ ゴシック" panose="020B0609070205080204" pitchFamily="49" charset="-128"/>
+                          <a:cs typeface="+mn-cs"/>
+                        </a:rPr>
+                        <a:t>        </a:t>
+                      </a:r>
+                      <a:r>
+                        <a:rPr kumimoji="1" lang="pl-PL" altLang="ja-JP" sz="1000" kern="1200" dirty="0">
+                          <a:solidFill>
+                            <a:schemeClr val="dk1"/>
+                          </a:solidFill>
+                          <a:latin typeface="ＭＳ ゴシック" panose="020B0609070205080204" pitchFamily="49" charset="-128"/>
+                          <a:ea typeface="ＭＳ ゴシック" panose="020B0609070205080204" pitchFamily="49" charset="-128"/>
+                          <a:cs typeface="+mn-cs"/>
+                        </a:rPr>
+                        <a:t> ch 14 13 12 11 10  9  8</a:t>
+                      </a:r>
+                    </a:p>
+                    <a:p>
+                      <a:endParaRPr kumimoji="1" lang="ja-JP" altLang="en-US" sz="1000" kern="1200" dirty="0">
+                        <a:solidFill>
+                          <a:schemeClr val="dk1"/>
+                        </a:solidFill>
+                        <a:latin typeface="ＭＳ ゴシック" panose="020B0609070205080204" pitchFamily="49" charset="-128"/>
+                        <a:ea typeface="ＭＳ ゴシック" panose="020B0609070205080204" pitchFamily="49" charset="-128"/>
+                        <a:cs typeface="+mn-cs"/>
+                      </a:endParaRPr>
+                    </a:p>
+                    <a:p>
+                      <a:r>
+                        <a:rPr kumimoji="1" lang="en-US" altLang="ja-JP" sz="1000" kern="1200" dirty="0">
+                          <a:solidFill>
+                            <a:schemeClr val="dk1"/>
+                          </a:solidFill>
+                          <a:latin typeface="ＭＳ ゴシック" panose="020B0609070205080204" pitchFamily="49" charset="-128"/>
+                          <a:ea typeface="ＭＳ ゴシック" panose="020B0609070205080204" pitchFamily="49" charset="-128"/>
+                          <a:cs typeface="+mn-cs"/>
+                        </a:rPr>
+                        <a:t>NRPN MSB  Bx 63 43 ... for MIDI </a:t>
+                      </a:r>
+                      <a:r>
+                        <a:rPr kumimoji="1" lang="en-US" altLang="ja-JP" sz="1000" kern="1200" dirty="0" err="1">
+                          <a:solidFill>
+                            <a:schemeClr val="dk1"/>
+                          </a:solidFill>
+                          <a:latin typeface="ＭＳ ゴシック" panose="020B0609070205080204" pitchFamily="49" charset="-128"/>
+                          <a:ea typeface="ＭＳ ゴシック" panose="020B0609070205080204" pitchFamily="49" charset="-128"/>
+                          <a:cs typeface="+mn-cs"/>
+                        </a:rPr>
+                        <a:t>ch</a:t>
+                      </a:r>
+                      <a:r>
+                        <a:rPr kumimoji="1" lang="en-US" altLang="ja-JP" sz="1000" kern="1200" dirty="0">
+                          <a:solidFill>
+                            <a:schemeClr val="dk1"/>
+                          </a:solidFill>
+                          <a:latin typeface="ＭＳ ゴシック" panose="020B0609070205080204" pitchFamily="49" charset="-128"/>
+                          <a:ea typeface="ＭＳ ゴシック" panose="020B0609070205080204" pitchFamily="49" charset="-128"/>
+                          <a:cs typeface="+mn-cs"/>
+                        </a:rPr>
+                        <a:t>(15-16)</a:t>
+                      </a:r>
+                    </a:p>
+                    <a:p>
+                      <a:r>
+                        <a:rPr kumimoji="1" lang="en-US" altLang="ja-JP" sz="1000" kern="1200" dirty="0">
+                          <a:solidFill>
+                            <a:schemeClr val="dk1"/>
+                          </a:solidFill>
+                          <a:latin typeface="ＭＳ ゴシック" panose="020B0609070205080204" pitchFamily="49" charset="-128"/>
+                          <a:ea typeface="ＭＳ ゴシック" panose="020B0609070205080204" pitchFamily="49" charset="-128"/>
+                          <a:cs typeface="+mn-cs"/>
+                        </a:rPr>
+                        <a:t>NRPN LSB  Bx 62 &lt;Device ID&gt; ... Specify Device ID of existing instrument.</a:t>
+                      </a:r>
+                    </a:p>
+                    <a:p>
+                      <a:r>
+                        <a:rPr kumimoji="1" lang="en-US" altLang="ja-JP" sz="1000" kern="1200" dirty="0">
+                          <a:solidFill>
+                            <a:schemeClr val="dk1"/>
+                          </a:solidFill>
+                          <a:latin typeface="ＭＳ ゴシック" panose="020B0609070205080204" pitchFamily="49" charset="-128"/>
+                          <a:ea typeface="ＭＳ ゴシック" panose="020B0609070205080204" pitchFamily="49" charset="-128"/>
+                          <a:cs typeface="+mn-cs"/>
+                        </a:rPr>
+                        <a:t>DATA MSB  Bx 26 &lt;Unit No&gt;   ... Specify Unit No of the above Device ID of existing instrument.</a:t>
+                      </a:r>
+                    </a:p>
+                    <a:p>
+                      <a:r>
+                        <a:rPr kumimoji="1" lang="en-US" altLang="ja-JP" sz="1000" kern="1200" dirty="0">
+                          <a:solidFill>
+                            <a:schemeClr val="dk1"/>
+                          </a:solidFill>
+                          <a:latin typeface="ＭＳ ゴシック" panose="020B0609070205080204" pitchFamily="49" charset="-128"/>
+                          <a:ea typeface="ＭＳ ゴシック" panose="020B0609070205080204" pitchFamily="49" charset="-128"/>
+                          <a:cs typeface="+mn-cs"/>
+                        </a:rPr>
+                        <a:t>DATA LSB  Bx 06 &lt;Receiving MIDI </a:t>
+                      </a:r>
+                      <a:r>
+                        <a:rPr kumimoji="1" lang="en-US" altLang="ja-JP" sz="1000" kern="1200" dirty="0" err="1">
+                          <a:solidFill>
+                            <a:schemeClr val="dk1"/>
+                          </a:solidFill>
+                          <a:latin typeface="ＭＳ ゴシック" panose="020B0609070205080204" pitchFamily="49" charset="-128"/>
+                          <a:ea typeface="ＭＳ ゴシック" panose="020B0609070205080204" pitchFamily="49" charset="-128"/>
+                          <a:cs typeface="+mn-cs"/>
+                        </a:rPr>
+                        <a:t>ch</a:t>
+                      </a:r>
+                      <a:r>
+                        <a:rPr kumimoji="1" lang="en-US" altLang="ja-JP" sz="1000" kern="1200" dirty="0">
+                          <a:solidFill>
+                            <a:schemeClr val="dk1"/>
+                          </a:solidFill>
+                          <a:latin typeface="ＭＳ ゴシック" panose="020B0609070205080204" pitchFamily="49" charset="-128"/>
+                          <a:ea typeface="ＭＳ ゴシック" panose="020B0609070205080204" pitchFamily="49" charset="-128"/>
+                          <a:cs typeface="+mn-cs"/>
+                        </a:rPr>
+                        <a:t>(15-16) bit sets. 1=On, 0=Off&gt;</a:t>
+                      </a:r>
+                    </a:p>
+                    <a:p>
+                      <a:r>
+                        <a:rPr kumimoji="1" lang="en-US" altLang="ja-JP" sz="1000" kern="1200" dirty="0">
+                          <a:solidFill>
+                            <a:schemeClr val="dk1"/>
+                          </a:solidFill>
+                          <a:latin typeface="ＭＳ ゴシック" panose="020B0609070205080204" pitchFamily="49" charset="-128"/>
+                          <a:ea typeface="ＭＳ ゴシック" panose="020B0609070205080204" pitchFamily="49" charset="-128"/>
+                          <a:cs typeface="+mn-cs"/>
+                        </a:rPr>
+                        <a:t>            bit  6  5  4  3  2  1  0</a:t>
+                      </a:r>
+                    </a:p>
+                    <a:p>
+                      <a:r>
+                        <a:rPr kumimoji="1" lang="pl-PL" altLang="ja-JP" sz="1000" kern="1200" dirty="0">
+                          <a:solidFill>
+                            <a:schemeClr val="dk1"/>
+                          </a:solidFill>
+                          <a:latin typeface="ＭＳ ゴシック" panose="020B0609070205080204" pitchFamily="49" charset="-128"/>
+                          <a:ea typeface="ＭＳ ゴシック" panose="020B0609070205080204" pitchFamily="49" charset="-128"/>
+                          <a:cs typeface="+mn-cs"/>
+                        </a:rPr>
+                        <a:t>    </a:t>
+                      </a:r>
+                      <a:r>
+                        <a:rPr kumimoji="1" lang="en-US" altLang="ja-JP" sz="1000" kern="1200" dirty="0">
+                          <a:solidFill>
+                            <a:schemeClr val="dk1"/>
+                          </a:solidFill>
+                          <a:latin typeface="ＭＳ ゴシック" panose="020B0609070205080204" pitchFamily="49" charset="-128"/>
+                          <a:ea typeface="ＭＳ ゴシック" panose="020B0609070205080204" pitchFamily="49" charset="-128"/>
+                          <a:cs typeface="+mn-cs"/>
+                        </a:rPr>
+                        <a:t>        </a:t>
+                      </a:r>
+                      <a:r>
+                        <a:rPr kumimoji="1" lang="pl-PL" altLang="ja-JP" sz="1000" kern="1200" dirty="0">
+                          <a:solidFill>
+                            <a:schemeClr val="dk1"/>
+                          </a:solidFill>
+                          <a:latin typeface="ＭＳ ゴシック" panose="020B0609070205080204" pitchFamily="49" charset="-128"/>
+                          <a:ea typeface="ＭＳ ゴシック" panose="020B0609070205080204" pitchFamily="49" charset="-128"/>
+                          <a:cs typeface="+mn-cs"/>
+                        </a:rPr>
+                        <a:t> ch xx xx xx xx xx 16 15</a:t>
+                      </a:r>
+                      <a:endParaRPr kumimoji="1" lang="ja-JP" altLang="en-US" sz="1000" dirty="0">
+                        <a:latin typeface="ＭＳ ゴシック" panose="020B0609070205080204" pitchFamily="49" charset="-128"/>
+                        <a:ea typeface="ＭＳ ゴシック" panose="020B0609070205080204" pitchFamily="49" charset="-128"/>
+                      </a:endParaRPr>
+                    </a:p>
+                  </a:txBody>
+                  <a:tcPr/>
+                </a:tc>
+                <a:tc>
+                  <a:txBody>
+                    <a:bodyPr/>
+                    <a:lstStyle/>
+                    <a:p>
+                      <a:pPr marL="0" marR="0" lvl="0" indent="0" algn="l" defTabSz="457200" rtl="0" eaLnBrk="1" fontAlgn="auto" latinLnBrk="0" hangingPunct="1">
+                        <a:lnSpc>
+                          <a:spcPct val="100000"/>
+                        </a:lnSpc>
+                        <a:spcBef>
+                          <a:spcPts val="0"/>
+                        </a:spcBef>
+                        <a:spcAft>
+                          <a:spcPts val="0"/>
+                        </a:spcAft>
+                        <a:buClrTx/>
+                        <a:buSzTx/>
+                        <a:buFontTx/>
+                        <a:buNone/>
+                        <a:tabLst/>
+                        <a:defRPr/>
+                      </a:pPr>
+                      <a:endParaRPr kumimoji="1" lang="ja-JP" altLang="en-US" dirty="0"/>
+                    </a:p>
+                  </a:txBody>
+                  <a:tcPr/>
+                </a:tc>
+                <a:extLst>
+                  <a:ext uri="{0D108BD9-81ED-4DB2-BD59-A6C34878D82A}">
+                    <a16:rowId xmlns:a16="http://schemas.microsoft.com/office/drawing/2014/main" val="2453527332"/>
+                  </a:ext>
+                </a:extLst>
+              </a:tr>
+            </a:tbl>
+          </a:graphicData>
+        </a:graphic>
+      </p:graphicFrame>
+    </p:spTree>
+    <p:extLst>
+      <p:ext uri="{BB962C8B-B14F-4D97-AF65-F5344CB8AC3E}">
+        <p14:creationId xmlns:p14="http://schemas.microsoft.com/office/powerpoint/2010/main" val="1466361753"/>
+      </p:ext>
+    </p:extLst>
+  </p:cSld>
+  <p:clrMapOvr>
+    <a:masterClrMapping/>
+  </p:clrMapOvr>
+</p:sld>
+</file>
+
 <file path=ppt/slides/slide3.xml><?xml version="1.0" encoding="utf-8"?>
 <p:sld xmlns:a="http://schemas.openxmlformats.org/drawingml/2006/main" xmlns:r="http://schemas.openxmlformats.org/officeDocument/2006/relationships" xmlns:p="http://schemas.openxmlformats.org/presentationml/2006/main">
   <p:cSld>

</xml_diff>

<commit_message>
3.7.5.0 - Supported Scale Tuning. You can set it on ScaleTuning property to the MIDI(Dedicated) category. - Supported Channel After Touch MIDI event. You can set the effect on the SCCS property on a Timbre property.
</commit_message>
<xml_diff>
--- a/docs/MAmidiMEmo/Manual.pptx
+++ b/docs/MAmidiMEmo/Manual.pptx
@@ -5,7 +5,7 @@
     <p:sldMasterId id="2147483678" r:id="rId1"/>
   </p:sldMasterIdLst>
   <p:notesMasterIdLst>
-    <p:notesMasterId r:id="rId28"/>
+    <p:notesMasterId r:id="rId29"/>
   </p:notesMasterIdLst>
   <p:sldIdLst>
     <p:sldId id="256" r:id="rId2"/>
@@ -33,7 +33,8 @@
     <p:sldId id="281" r:id="rId24"/>
     <p:sldId id="282" r:id="rId25"/>
     <p:sldId id="283" r:id="rId26"/>
-    <p:sldId id="284" r:id="rId27"/>
+    <p:sldId id="285" r:id="rId27"/>
+    <p:sldId id="284" r:id="rId28"/>
   </p:sldIdLst>
   <p:sldSz cx="12192000" cy="6858000"/>
   <p:notesSz cx="6858000" cy="9144000"/>
@@ -222,7 +223,7 @@
           <a:p>
             <a:fld id="{581C28D8-13B6-41C3-9F5F-0284C569C6F1}" type="datetimeFigureOut">
               <a:rPr kumimoji="1" lang="ja-JP" altLang="en-US" smtClean="0"/>
-              <a:t>2021/7/23</a:t>
+              <a:t>2021/7/25</a:t>
             </a:fld>
             <a:endParaRPr kumimoji="1" lang="ja-JP" altLang="en-US"/>
           </a:p>
@@ -1129,7 +1130,7 @@
           <a:p>
             <a:fld id="{B8625E62-B904-4691-B75E-EC1C32885285}" type="datetime1">
               <a:rPr kumimoji="1" lang="ja-JP" altLang="en-US" smtClean="0"/>
-              <a:t>2021/7/23</a:t>
+              <a:t>2021/7/25</a:t>
             </a:fld>
             <a:endParaRPr kumimoji="1" lang="ja-JP" altLang="en-US"/>
           </a:p>
@@ -1467,7 +1468,7 @@
           <a:p>
             <a:fld id="{A4C87007-2A40-4EFC-90A3-258EFA3C1001}" type="datetime1">
               <a:rPr kumimoji="1" lang="ja-JP" altLang="en-US" smtClean="0"/>
-              <a:t>2021/7/23</a:t>
+              <a:t>2021/7/25</a:t>
             </a:fld>
             <a:endParaRPr kumimoji="1" lang="ja-JP" altLang="en-US"/>
           </a:p>
@@ -1868,7 +1869,7 @@
           <a:p>
             <a:fld id="{0FE0D7FF-9203-4AA3-90FD-622674A14F90}" type="datetime1">
               <a:rPr kumimoji="1" lang="ja-JP" altLang="en-US" smtClean="0"/>
-              <a:t>2021/7/23</a:t>
+              <a:t>2021/7/25</a:t>
             </a:fld>
             <a:endParaRPr kumimoji="1" lang="ja-JP" altLang="en-US"/>
           </a:p>
@@ -2204,7 +2205,7 @@
           <a:p>
             <a:fld id="{D2D6E4D3-BEDB-4F35-876B-5B9AA41BFB5B}" type="datetime1">
               <a:rPr kumimoji="1" lang="ja-JP" altLang="en-US" smtClean="0"/>
-              <a:t>2021/7/23</a:t>
+              <a:t>2021/7/25</a:t>
             </a:fld>
             <a:endParaRPr kumimoji="1" lang="ja-JP" altLang="en-US"/>
           </a:p>
@@ -2524,7 +2525,7 @@
           <a:p>
             <a:fld id="{2ACD896E-FC14-4F25-BC47-18ABAEA9E1FE}" type="datetime1">
               <a:rPr kumimoji="1" lang="ja-JP" altLang="en-US" smtClean="0"/>
-              <a:t>2021/7/23</a:t>
+              <a:t>2021/7/25</a:t>
             </a:fld>
             <a:endParaRPr kumimoji="1" lang="ja-JP" altLang="en-US"/>
           </a:p>
@@ -2920,7 +2921,7 @@
           <a:p>
             <a:fld id="{54FC701B-2185-4987-B8E2-5507664B65F4}" type="datetime1">
               <a:rPr kumimoji="1" lang="ja-JP" altLang="en-US" smtClean="0"/>
-              <a:t>2021/7/23</a:t>
+              <a:t>2021/7/25</a:t>
             </a:fld>
             <a:endParaRPr kumimoji="1" lang="ja-JP" altLang="en-US"/>
           </a:p>
@@ -3209,7 +3210,7 @@
           <a:p>
             <a:fld id="{3FB4CDED-9617-418F-B546-D66B9BB6C35E}" type="datetime1">
               <a:rPr kumimoji="1" lang="ja-JP" altLang="en-US" smtClean="0"/>
-              <a:t>2021/7/23</a:t>
+              <a:t>2021/7/25</a:t>
             </a:fld>
             <a:endParaRPr kumimoji="1" lang="ja-JP" altLang="en-US"/>
           </a:p>
@@ -3503,7 +3504,7 @@
           <a:p>
             <a:fld id="{F5635D40-962A-46D7-8037-3F2900B5EB4D}" type="datetime1">
               <a:rPr kumimoji="1" lang="ja-JP" altLang="en-US" smtClean="0"/>
-              <a:t>2021/7/23</a:t>
+              <a:t>2021/7/25</a:t>
             </a:fld>
             <a:endParaRPr kumimoji="1" lang="ja-JP" altLang="en-US"/>
           </a:p>
@@ -3797,7 +3798,7 @@
           <a:p>
             <a:fld id="{741DA9A2-8356-4FFD-B66A-E38811049858}" type="datetime1">
               <a:rPr kumimoji="1" lang="ja-JP" altLang="en-US" smtClean="0"/>
-              <a:t>2021/7/23</a:t>
+              <a:t>2021/7/25</a:t>
             </a:fld>
             <a:endParaRPr kumimoji="1" lang="ja-JP" altLang="en-US"/>
           </a:p>
@@ -4126,7 +4127,7 @@
           <a:p>
             <a:fld id="{9DDE8989-88B8-4869-97D9-547531F13E13}" type="datetime1">
               <a:rPr kumimoji="1" lang="ja-JP" altLang="en-US" smtClean="0"/>
-              <a:t>2021/7/23</a:t>
+              <a:t>2021/7/25</a:t>
             </a:fld>
             <a:endParaRPr kumimoji="1" lang="ja-JP" altLang="en-US"/>
           </a:p>
@@ -4513,7 +4514,7 @@
           <a:p>
             <a:fld id="{81EC4031-B949-4300-AB3E-1551426E8631}" type="datetime1">
               <a:rPr kumimoji="1" lang="ja-JP" altLang="en-US" smtClean="0"/>
-              <a:t>2021/7/23</a:t>
+              <a:t>2021/7/25</a:t>
             </a:fld>
             <a:endParaRPr kumimoji="1" lang="ja-JP" altLang="en-US"/>
           </a:p>
@@ -5034,7 +5035,7 @@
           <a:p>
             <a:fld id="{F39E755E-A59D-4634-B604-E9BB568B1156}" type="datetime1">
               <a:rPr kumimoji="1" lang="ja-JP" altLang="en-US" smtClean="0"/>
-              <a:t>2021/7/23</a:t>
+              <a:t>2021/7/25</a:t>
             </a:fld>
             <a:endParaRPr kumimoji="1" lang="ja-JP" altLang="en-US"/>
           </a:p>
@@ -5239,7 +5240,7 @@
           <a:p>
             <a:fld id="{61DA38B3-7601-4256-ABFE-386B92B0EDB5}" type="datetime1">
               <a:rPr kumimoji="1" lang="ja-JP" altLang="en-US" smtClean="0"/>
-              <a:t>2021/7/23</a:t>
+              <a:t>2021/7/25</a:t>
             </a:fld>
             <a:endParaRPr kumimoji="1" lang="ja-JP" altLang="en-US"/>
           </a:p>
@@ -5416,7 +5417,7 @@
           <a:p>
             <a:fld id="{5A28ED6D-8A94-4DBA-8EF2-284D1A467CE8}" type="datetime1">
               <a:rPr kumimoji="1" lang="ja-JP" altLang="en-US" smtClean="0"/>
-              <a:t>2021/7/23</a:t>
+              <a:t>2021/7/25</a:t>
             </a:fld>
             <a:endParaRPr kumimoji="1" lang="ja-JP" altLang="en-US"/>
           </a:p>
@@ -5781,7 +5782,7 @@
           <a:p>
             <a:fld id="{B27B0317-28AF-43C5-8944-AADFA89E0149}" type="datetime1">
               <a:rPr kumimoji="1" lang="ja-JP" altLang="en-US" smtClean="0"/>
-              <a:t>2021/7/23</a:t>
+              <a:t>2021/7/25</a:t>
             </a:fld>
             <a:endParaRPr kumimoji="1" lang="ja-JP" altLang="en-US"/>
           </a:p>
@@ -6126,7 +6127,7 @@
           <a:p>
             <a:fld id="{A78D023C-C4FA-4CE8-B5BE-6798898EE377}" type="datetime1">
               <a:rPr kumimoji="1" lang="ja-JP" altLang="en-US" smtClean="0"/>
-              <a:t>2021/7/23</a:t>
+              <a:t>2021/7/25</a:t>
             </a:fld>
             <a:endParaRPr kumimoji="1" lang="ja-JP" altLang="en-US"/>
           </a:p>
@@ -8275,7 +8276,7 @@
           <a:p>
             <a:fld id="{99567159-F4A8-4352-915B-DDBEFEF4A4D6}" type="datetime1">
               <a:rPr kumimoji="1" lang="ja-JP" altLang="en-US" smtClean="0"/>
-              <a:t>2021/7/23</a:t>
+              <a:t>2021/7/25</a:t>
             </a:fld>
             <a:endParaRPr kumimoji="1" lang="ja-JP" altLang="en-US"/>
           </a:p>
@@ -8865,7 +8866,7 @@
             </a:r>
             <a:r>
               <a:rPr lang="en-US" altLang="ja-JP"/>
-              <a:t>Rev 0.5</a:t>
+              <a:t>Rev 0.5.1</a:t>
             </a:r>
             <a:endParaRPr lang="ja-JP" altLang="en-US" dirty="0"/>
           </a:p>
@@ -16879,7 +16880,7 @@
           <p:nvPr>
             <p:extLst>
               <p:ext uri="{D42A27DB-BD31-4B8C-83A1-F6EECF244321}">
-                <p14:modId xmlns:p14="http://schemas.microsoft.com/office/powerpoint/2010/main" val="3243502642"/>
+                <p14:modId xmlns:p14="http://schemas.microsoft.com/office/powerpoint/2010/main" val="867644288"/>
               </p:ext>
             </p:extLst>
           </p:nvPr>
@@ -17065,7 +17066,7 @@
                     <a:p>
                       <a:r>
                         <a:rPr kumimoji="1" lang="en-US" altLang="ja-JP" dirty="0"/>
-                        <a:t>Note Number</a:t>
+                        <a:t>Note Number*</a:t>
                       </a:r>
                       <a:endParaRPr kumimoji="1" lang="ja-JP" altLang="en-US" dirty="0"/>
                     </a:p>
@@ -17105,10 +17106,6 @@
                     <a:bodyPr/>
                     <a:lstStyle/>
                     <a:p>
-                      <a:r>
-                        <a:rPr kumimoji="1" lang="en-US" altLang="ja-JP" dirty="0"/>
-                        <a:t>Depends on chip</a:t>
-                      </a:r>
                       <a:endParaRPr kumimoji="1" lang="ja-JP" altLang="en-US" dirty="0"/>
                     </a:p>
                   </a:txBody>
@@ -17128,7 +17125,7 @@
                     <a:p>
                       <a:r>
                         <a:rPr kumimoji="1" lang="en-US" altLang="ja-JP" dirty="0"/>
-                        <a:t>Velocity</a:t>
+                        <a:t>Velocity*</a:t>
                       </a:r>
                       <a:endParaRPr kumimoji="1" lang="ja-JP" altLang="en-US" dirty="0"/>
                     </a:p>
@@ -17252,7 +17249,7 @@
                     <a:p>
                       <a:r>
                         <a:rPr kumimoji="1" lang="en-US" altLang="ja-JP" dirty="0"/>
-                        <a:t>Pitch Bend</a:t>
+                        <a:t>Pitch Bend*</a:t>
                       </a:r>
                       <a:endParaRPr kumimoji="1" lang="ja-JP" altLang="en-US" dirty="0"/>
                     </a:p>
@@ -17374,6 +17371,42 @@
           </a:graphicData>
         </a:graphic>
       </p:graphicFrame>
+      <p:sp>
+        <p:nvSpPr>
+          <p:cNvPr id="6" name="テキスト ボックス 5">
+            <a:extLst>
+              <a:ext uri="{FF2B5EF4-FFF2-40B4-BE49-F238E27FC236}">
+                <a16:creationId xmlns:a16="http://schemas.microsoft.com/office/drawing/2014/main" id="{7E89DED8-D5F8-48E8-870C-75CD48FD3453}"/>
+              </a:ext>
+            </a:extLst>
+          </p:cNvPr>
+          <p:cNvSpPr txBox="1"/>
+          <p:nvPr/>
+        </p:nvSpPr>
+        <p:spPr>
+          <a:xfrm>
+            <a:off x="9298692" y="1720334"/>
+            <a:ext cx="2781013" cy="369332"/>
+          </a:xfrm>
+          <a:prstGeom prst="rect">
+            <a:avLst/>
+          </a:prstGeom>
+          <a:noFill/>
+        </p:spPr>
+        <p:txBody>
+          <a:bodyPr wrap="square">
+            <a:spAutoFit/>
+          </a:bodyPr>
+          <a:lstStyle/>
+          <a:p>
+            <a:r>
+              <a:rPr kumimoji="1" lang="en-US" altLang="ja-JP" dirty="0"/>
+              <a:t>*Depends on the chip</a:t>
+            </a:r>
+            <a:endParaRPr kumimoji="1" lang="ja-JP" altLang="en-US" dirty="0"/>
+          </a:p>
+        </p:txBody>
+      </p:sp>
     </p:spTree>
     <p:extLst>
       <p:ext uri="{BB962C8B-B14F-4D97-AF65-F5344CB8AC3E}">
@@ -17477,7 +17510,7 @@
           <p:nvPr>
             <p:extLst>
               <p:ext uri="{D42A27DB-BD31-4B8C-83A1-F6EECF244321}">
-                <p14:modId xmlns:p14="http://schemas.microsoft.com/office/powerpoint/2010/main" val="845934669"/>
+                <p14:modId xmlns:p14="http://schemas.microsoft.com/office/powerpoint/2010/main" val="1231476087"/>
               </p:ext>
             </p:extLst>
           </p:nvPr>
@@ -17959,7 +17992,7 @@
                       </a:pPr>
                       <a:r>
                         <a:rPr kumimoji="1" lang="en-US" altLang="ja-JP" dirty="0"/>
-                        <a:t>Volume</a:t>
+                        <a:t>Volume*</a:t>
                       </a:r>
                       <a:endParaRPr kumimoji="1" lang="ja-JP" altLang="en-US" dirty="0"/>
                     </a:p>
@@ -18055,7 +18088,10 @@
                         <a:rPr kumimoji="1" lang="en-US" altLang="ja-JP" dirty="0" err="1"/>
                         <a:t>Panpot</a:t>
                       </a:r>
-                      <a:endParaRPr kumimoji="1" lang="en-US" altLang="ja-JP" dirty="0"/>
+                      <a:r>
+                        <a:rPr kumimoji="1" lang="en-US" altLang="ja-JP" dirty="0"/>
+                        <a:t>*</a:t>
+                      </a:r>
                     </a:p>
                   </a:txBody>
                   <a:tcPr/>
@@ -18137,7 +18173,7 @@
                       </a:pPr>
                       <a:r>
                         <a:rPr kumimoji="1" lang="en-US" altLang="ja-JP" dirty="0"/>
-                        <a:t>Expression</a:t>
+                        <a:t>Expression*</a:t>
                       </a:r>
                       <a:endParaRPr kumimoji="1" lang="ja-JP" altLang="en-US" dirty="0"/>
                     </a:p>
@@ -18448,6 +18484,42 @@
           </a:graphicData>
         </a:graphic>
       </p:graphicFrame>
+      <p:sp>
+        <p:nvSpPr>
+          <p:cNvPr id="6" name="テキスト ボックス 5">
+            <a:extLst>
+              <a:ext uri="{FF2B5EF4-FFF2-40B4-BE49-F238E27FC236}">
+                <a16:creationId xmlns:a16="http://schemas.microsoft.com/office/drawing/2014/main" id="{B20B2154-2A23-496A-B5F6-9D61D68BF845}"/>
+              </a:ext>
+            </a:extLst>
+          </p:cNvPr>
+          <p:cNvSpPr txBox="1"/>
+          <p:nvPr/>
+        </p:nvSpPr>
+        <p:spPr>
+          <a:xfrm>
+            <a:off x="9298692" y="1720334"/>
+            <a:ext cx="2781013" cy="369332"/>
+          </a:xfrm>
+          <a:prstGeom prst="rect">
+            <a:avLst/>
+          </a:prstGeom>
+          <a:noFill/>
+        </p:spPr>
+        <p:txBody>
+          <a:bodyPr wrap="square">
+            <a:spAutoFit/>
+          </a:bodyPr>
+          <a:lstStyle/>
+          <a:p>
+            <a:r>
+              <a:rPr kumimoji="1" lang="en-US" altLang="ja-JP" dirty="0"/>
+              <a:t>*Depends on the chip</a:t>
+            </a:r>
+            <a:endParaRPr kumimoji="1" lang="ja-JP" altLang="en-US" dirty="0"/>
+          </a:p>
+        </p:txBody>
+      </p:sp>
     </p:spTree>
     <p:extLst>
       <p:ext uri="{BB962C8B-B14F-4D97-AF65-F5344CB8AC3E}">
@@ -19415,6 +19487,42 @@
           </a:graphicData>
         </a:graphic>
       </p:graphicFrame>
+      <p:sp>
+        <p:nvSpPr>
+          <p:cNvPr id="6" name="テキスト ボックス 5">
+            <a:extLst>
+              <a:ext uri="{FF2B5EF4-FFF2-40B4-BE49-F238E27FC236}">
+                <a16:creationId xmlns:a16="http://schemas.microsoft.com/office/drawing/2014/main" id="{89FFBC64-426A-4214-A294-3377B47A7A15}"/>
+              </a:ext>
+            </a:extLst>
+          </p:cNvPr>
+          <p:cNvSpPr txBox="1"/>
+          <p:nvPr/>
+        </p:nvSpPr>
+        <p:spPr>
+          <a:xfrm>
+            <a:off x="9298692" y="1720334"/>
+            <a:ext cx="2781013" cy="369332"/>
+          </a:xfrm>
+          <a:prstGeom prst="rect">
+            <a:avLst/>
+          </a:prstGeom>
+          <a:noFill/>
+        </p:spPr>
+        <p:txBody>
+          <a:bodyPr wrap="square">
+            <a:spAutoFit/>
+          </a:bodyPr>
+          <a:lstStyle/>
+          <a:p>
+            <a:r>
+              <a:rPr kumimoji="1" lang="en-US" altLang="ja-JP" dirty="0"/>
+              <a:t>*Depends on the chip</a:t>
+            </a:r>
+            <a:endParaRPr kumimoji="1" lang="ja-JP" altLang="en-US" dirty="0"/>
+          </a:p>
+        </p:txBody>
+      </p:sp>
     </p:spTree>
     <p:extLst>
       <p:ext uri="{BB962C8B-B14F-4D97-AF65-F5344CB8AC3E}">
@@ -19518,7 +19626,7 @@
           <p:nvPr>
             <p:extLst>
               <p:ext uri="{D42A27DB-BD31-4B8C-83A1-F6EECF244321}">
-                <p14:modId xmlns:p14="http://schemas.microsoft.com/office/powerpoint/2010/main" val="3380746082"/>
+                <p14:modId xmlns:p14="http://schemas.microsoft.com/office/powerpoint/2010/main" val="3098523580"/>
               </p:ext>
             </p:extLst>
           </p:nvPr>
@@ -19788,7 +19896,7 @@
                     <a:p>
                       <a:r>
                         <a:rPr kumimoji="1" lang="en-US" altLang="ja-JP" b="0" dirty="0"/>
-                        <a:t>1-127: Max Voice Num.</a:t>
+                        <a:t>1-127: Max Voice Num.*</a:t>
                       </a:r>
                       <a:endParaRPr kumimoji="1" lang="ja-JP" altLang="en-US" b="0" dirty="0"/>
                     </a:p>
@@ -19893,7 +20001,7 @@
                     <a:p>
                       <a:r>
                         <a:rPr kumimoji="1" lang="en-US" altLang="ja-JP" dirty="0"/>
-                        <a:t>1-127: Reserve Voice Num.</a:t>
+                        <a:t>1-127: Reserve Voice Num.*</a:t>
                       </a:r>
                     </a:p>
                     <a:p>
@@ -19916,6 +20024,42 @@
           </a:graphicData>
         </a:graphic>
       </p:graphicFrame>
+      <p:sp>
+        <p:nvSpPr>
+          <p:cNvPr id="6" name="テキスト ボックス 5">
+            <a:extLst>
+              <a:ext uri="{FF2B5EF4-FFF2-40B4-BE49-F238E27FC236}">
+                <a16:creationId xmlns:a16="http://schemas.microsoft.com/office/drawing/2014/main" id="{9B937CB2-73AF-4979-8BD6-94BDF26EAC10}"/>
+              </a:ext>
+            </a:extLst>
+          </p:cNvPr>
+          <p:cNvSpPr txBox="1"/>
+          <p:nvPr/>
+        </p:nvSpPr>
+        <p:spPr>
+          <a:xfrm>
+            <a:off x="9298692" y="1720334"/>
+            <a:ext cx="2781013" cy="369332"/>
+          </a:xfrm>
+          <a:prstGeom prst="rect">
+            <a:avLst/>
+          </a:prstGeom>
+          <a:noFill/>
+        </p:spPr>
+        <p:txBody>
+          <a:bodyPr wrap="square">
+            <a:spAutoFit/>
+          </a:bodyPr>
+          <a:lstStyle/>
+          <a:p>
+            <a:r>
+              <a:rPr kumimoji="1" lang="en-US" altLang="ja-JP" dirty="0"/>
+              <a:t>*Depends on the chip</a:t>
+            </a:r>
+            <a:endParaRPr kumimoji="1" lang="ja-JP" altLang="en-US" dirty="0"/>
+          </a:p>
+        </p:txBody>
+      </p:sp>
     </p:spTree>
     <p:extLst>
       <p:ext uri="{BB962C8B-B14F-4D97-AF65-F5344CB8AC3E}">
@@ -20395,6 +20539,482 @@
             <a:fld id="{E27E2812-4560-4165-A7C7-9C013F955547}" type="slidenum">
               <a:rPr kumimoji="1" lang="ja-JP" altLang="en-US" smtClean="0"/>
               <a:t>26</a:t>
+            </a:fld>
+            <a:endParaRPr kumimoji="1" lang="ja-JP" altLang="en-US"/>
+          </a:p>
+        </p:txBody>
+      </p:sp>
+      <p:graphicFrame>
+        <p:nvGraphicFramePr>
+          <p:cNvPr id="6" name="表 5">
+            <a:extLst>
+              <a:ext uri="{FF2B5EF4-FFF2-40B4-BE49-F238E27FC236}">
+                <a16:creationId xmlns:a16="http://schemas.microsoft.com/office/drawing/2014/main" id="{FEA3A3F0-C393-4D99-8CBD-24B75B45ACFC}"/>
+              </a:ext>
+            </a:extLst>
+          </p:cNvPr>
+          <p:cNvGraphicFramePr>
+            <a:graphicFrameLocks noGrp="1"/>
+          </p:cNvGraphicFramePr>
+          <p:nvPr>
+            <p:extLst>
+              <p:ext uri="{D42A27DB-BD31-4B8C-83A1-F6EECF244321}">
+                <p14:modId xmlns:p14="http://schemas.microsoft.com/office/powerpoint/2010/main" val="1342764815"/>
+              </p:ext>
+            </p:extLst>
+          </p:nvPr>
+        </p:nvGraphicFramePr>
+        <p:xfrm>
+          <a:off x="2032000" y="2225333"/>
+          <a:ext cx="9472612" cy="2199640"/>
+        </p:xfrm>
+        <a:graphic>
+          <a:graphicData uri="http://schemas.openxmlformats.org/drawingml/2006/table">
+            <a:tbl>
+              <a:tblPr firstRow="1" bandRow="1">
+                <a:tableStyleId>{5C22544A-7EE6-4342-B048-85BDC9FD1C3A}</a:tableStyleId>
+              </a:tblPr>
+              <a:tblGrid>
+                <a:gridCol w="2368153">
+                  <a:extLst>
+                    <a:ext uri="{9D8B030D-6E8A-4147-A177-3AD203B41FA5}">
+                      <a16:colId xmlns:a16="http://schemas.microsoft.com/office/drawing/2014/main" val="3140821746"/>
+                    </a:ext>
+                  </a:extLst>
+                </a:gridCol>
+                <a:gridCol w="2368153">
+                  <a:extLst>
+                    <a:ext uri="{9D8B030D-6E8A-4147-A177-3AD203B41FA5}">
+                      <a16:colId xmlns:a16="http://schemas.microsoft.com/office/drawing/2014/main" val="2862939062"/>
+                    </a:ext>
+                  </a:extLst>
+                </a:gridCol>
+                <a:gridCol w="2368153">
+                  <a:extLst>
+                    <a:ext uri="{9D8B030D-6E8A-4147-A177-3AD203B41FA5}">
+                      <a16:colId xmlns:a16="http://schemas.microsoft.com/office/drawing/2014/main" val="2770498619"/>
+                    </a:ext>
+                  </a:extLst>
+                </a:gridCol>
+                <a:gridCol w="2368153">
+                  <a:extLst>
+                    <a:ext uri="{9D8B030D-6E8A-4147-A177-3AD203B41FA5}">
+                      <a16:colId xmlns:a16="http://schemas.microsoft.com/office/drawing/2014/main" val="4289464401"/>
+                    </a:ext>
+                  </a:extLst>
+                </a:gridCol>
+              </a:tblGrid>
+              <a:tr h="370840">
+                <a:tc>
+                  <a:txBody>
+                    <a:bodyPr/>
+                    <a:lstStyle/>
+                    <a:p>
+                      <a:r>
+                        <a:rPr kumimoji="1" lang="en-US" altLang="ja-JP" dirty="0"/>
+                        <a:t>Function</a:t>
+                      </a:r>
+                      <a:endParaRPr kumimoji="1" lang="ja-JP" altLang="en-US" dirty="0"/>
+                    </a:p>
+                  </a:txBody>
+                  <a:tcPr/>
+                </a:tc>
+                <a:tc>
+                  <a:txBody>
+                    <a:bodyPr/>
+                    <a:lstStyle/>
+                    <a:p>
+                      <a:r>
+                        <a:rPr kumimoji="1" lang="en-US" altLang="ja-JP" dirty="0"/>
+                        <a:t>MSB</a:t>
+                      </a:r>
+                      <a:endParaRPr kumimoji="1" lang="ja-JP" altLang="en-US" dirty="0"/>
+                    </a:p>
+                  </a:txBody>
+                  <a:tcPr/>
+                </a:tc>
+                <a:tc>
+                  <a:txBody>
+                    <a:bodyPr/>
+                    <a:lstStyle/>
+                    <a:p>
+                      <a:r>
+                        <a:rPr kumimoji="1" lang="en-US" altLang="ja-JP" dirty="0"/>
+                        <a:t>LSB</a:t>
+                      </a:r>
+                      <a:endParaRPr kumimoji="1" lang="ja-JP" altLang="en-US" dirty="0"/>
+                    </a:p>
+                  </a:txBody>
+                  <a:tcPr/>
+                </a:tc>
+                <a:tc>
+                  <a:txBody>
+                    <a:bodyPr/>
+                    <a:lstStyle/>
+                    <a:p>
+                      <a:r>
+                        <a:rPr kumimoji="1" lang="en-US" altLang="ja-JP" dirty="0"/>
+                        <a:t>Remarks</a:t>
+                      </a:r>
+                      <a:endParaRPr kumimoji="1" lang="ja-JP" altLang="en-US" dirty="0"/>
+                    </a:p>
+                  </a:txBody>
+                  <a:tcPr/>
+                </a:tc>
+                <a:extLst>
+                  <a:ext uri="{0D108BD9-81ED-4DB2-BD59-A6C34878D82A}">
+                    <a16:rowId xmlns:a16="http://schemas.microsoft.com/office/drawing/2014/main" val="1671041493"/>
+                  </a:ext>
+                </a:extLst>
+              </a:tr>
+              <a:tr h="370840">
+                <a:tc>
+                  <a:txBody>
+                    <a:bodyPr/>
+                    <a:lstStyle/>
+                    <a:p>
+                      <a:pPr algn="l"/>
+                      <a:r>
+                        <a:rPr kumimoji="1" lang="en-US" altLang="ja-JP" dirty="0"/>
+                        <a:t>NRPN</a:t>
+                      </a:r>
+                    </a:p>
+                  </a:txBody>
+                  <a:tcPr/>
+                </a:tc>
+                <a:tc>
+                  <a:txBody>
+                    <a:bodyPr/>
+                    <a:lstStyle/>
+                    <a:p>
+                      <a:r>
+                        <a:rPr kumimoji="1" lang="en-US" altLang="ja-JP" dirty="0"/>
+                        <a:t>0</a:t>
+                      </a:r>
+                      <a:endParaRPr kumimoji="1" lang="ja-JP" altLang="en-US" dirty="0"/>
+                    </a:p>
+                  </a:txBody>
+                  <a:tcPr/>
+                </a:tc>
+                <a:tc>
+                  <a:txBody>
+                    <a:bodyPr/>
+                    <a:lstStyle/>
+                    <a:p>
+                      <a:pPr marL="0" marR="0" lvl="0" indent="0" algn="l" defTabSz="457200" rtl="0" eaLnBrk="1" fontAlgn="auto" latinLnBrk="0" hangingPunct="1">
+                        <a:lnSpc>
+                          <a:spcPct val="100000"/>
+                        </a:lnSpc>
+                        <a:spcBef>
+                          <a:spcPts val="0"/>
+                        </a:spcBef>
+                        <a:spcAft>
+                          <a:spcPts val="0"/>
+                        </a:spcAft>
+                        <a:buClrTx/>
+                        <a:buSzTx/>
+                        <a:buFontTx/>
+                        <a:buNone/>
+                        <a:tabLst/>
+                        <a:defRPr/>
+                      </a:pPr>
+                      <a:r>
+                        <a:rPr kumimoji="1" lang="en-US" altLang="ja-JP" dirty="0"/>
+                        <a:t>16-19</a:t>
+                      </a:r>
+                    </a:p>
+                    <a:p>
+                      <a:pPr marL="0" marR="0" lvl="0" indent="0" algn="l" defTabSz="457200" rtl="0" eaLnBrk="1" fontAlgn="auto" latinLnBrk="0" hangingPunct="1">
+                        <a:lnSpc>
+                          <a:spcPct val="100000"/>
+                        </a:lnSpc>
+                        <a:spcBef>
+                          <a:spcPts val="0"/>
+                        </a:spcBef>
+                        <a:spcAft>
+                          <a:spcPts val="0"/>
+                        </a:spcAft>
+                        <a:buClrTx/>
+                        <a:buSzTx/>
+                        <a:buFontTx/>
+                        <a:buNone/>
+                        <a:tabLst/>
+                        <a:defRPr/>
+                      </a:pPr>
+                      <a:r>
+                        <a:rPr kumimoji="1" lang="en-US" altLang="ja-JP" dirty="0"/>
+                        <a:t>80-83</a:t>
+                      </a:r>
+                      <a:endParaRPr kumimoji="1" lang="ja-JP" altLang="en-US" dirty="0"/>
+                    </a:p>
+                  </a:txBody>
+                  <a:tcPr/>
+                </a:tc>
+                <a:tc>
+                  <a:txBody>
+                    <a:bodyPr/>
+                    <a:lstStyle/>
+                    <a:p>
+                      <a:r>
+                        <a:rPr kumimoji="1" lang="en-US" altLang="ja-JP" dirty="0"/>
+                        <a:t>GPCS[1-4] Value</a:t>
+                      </a:r>
+                    </a:p>
+                    <a:p>
+                      <a:pPr marL="0" marR="0" lvl="0" indent="0" algn="l" defTabSz="457200" rtl="0" eaLnBrk="1" fontAlgn="auto" latinLnBrk="0" hangingPunct="1">
+                        <a:lnSpc>
+                          <a:spcPct val="100000"/>
+                        </a:lnSpc>
+                        <a:spcBef>
+                          <a:spcPts val="0"/>
+                        </a:spcBef>
+                        <a:spcAft>
+                          <a:spcPts val="0"/>
+                        </a:spcAft>
+                        <a:buClrTx/>
+                        <a:buSzTx/>
+                        <a:buFontTx/>
+                        <a:buNone/>
+                        <a:tabLst/>
+                        <a:defRPr/>
+                      </a:pPr>
+                      <a:r>
+                        <a:rPr kumimoji="1" lang="en-US" altLang="ja-JP" dirty="0"/>
+                        <a:t>GPCS[5-6] Value</a:t>
+                      </a:r>
+                    </a:p>
+                    <a:p>
+                      <a:r>
+                        <a:rPr kumimoji="1" lang="en-US" altLang="ja-JP" dirty="0"/>
+                        <a:t>0-127</a:t>
+                      </a:r>
+                      <a:endParaRPr kumimoji="1" lang="ja-JP" altLang="en-US" dirty="0"/>
+                    </a:p>
+                  </a:txBody>
+                  <a:tcPr/>
+                </a:tc>
+                <a:extLst>
+                  <a:ext uri="{0D108BD9-81ED-4DB2-BD59-A6C34878D82A}">
+                    <a16:rowId xmlns:a16="http://schemas.microsoft.com/office/drawing/2014/main" val="2531957203"/>
+                  </a:ext>
+                </a:extLst>
+              </a:tr>
+              <a:tr h="370840">
+                <a:tc>
+                  <a:txBody>
+                    <a:bodyPr/>
+                    <a:lstStyle/>
+                    <a:p>
+                      <a:pPr algn="r"/>
+                      <a:endParaRPr kumimoji="1" lang="ja-JP" altLang="en-US" dirty="0"/>
+                    </a:p>
+                  </a:txBody>
+                  <a:tcPr/>
+                </a:tc>
+                <a:tc>
+                  <a:txBody>
+                    <a:bodyPr/>
+                    <a:lstStyle/>
+                    <a:p>
+                      <a:r>
+                        <a:rPr kumimoji="1" lang="en-US" altLang="ja-JP" dirty="0"/>
+                        <a:t>0</a:t>
+                      </a:r>
+                      <a:endParaRPr kumimoji="1" lang="ja-JP" altLang="en-US" dirty="0"/>
+                    </a:p>
+                  </a:txBody>
+                  <a:tcPr/>
+                </a:tc>
+                <a:tc>
+                  <a:txBody>
+                    <a:bodyPr/>
+                    <a:lstStyle/>
+                    <a:p>
+                      <a:pPr marL="0" marR="0" lvl="0" indent="0" algn="l" defTabSz="457200" rtl="0" eaLnBrk="1" fontAlgn="auto" latinLnBrk="0" hangingPunct="1">
+                        <a:lnSpc>
+                          <a:spcPct val="100000"/>
+                        </a:lnSpc>
+                        <a:spcBef>
+                          <a:spcPts val="0"/>
+                        </a:spcBef>
+                        <a:spcAft>
+                          <a:spcPts val="0"/>
+                        </a:spcAft>
+                        <a:buClrTx/>
+                        <a:buSzTx/>
+                        <a:buFontTx/>
+                        <a:buNone/>
+                        <a:tabLst/>
+                        <a:defRPr/>
+                      </a:pPr>
+                      <a:r>
+                        <a:rPr kumimoji="1" lang="en-US" altLang="ja-JP" dirty="0"/>
+                        <a:t>70-75</a:t>
+                      </a:r>
+                    </a:p>
+                    <a:p>
+                      <a:pPr marL="0" marR="0" lvl="0" indent="0" algn="l" defTabSz="457200" rtl="0" eaLnBrk="1" fontAlgn="auto" latinLnBrk="0" hangingPunct="1">
+                        <a:lnSpc>
+                          <a:spcPct val="100000"/>
+                        </a:lnSpc>
+                        <a:spcBef>
+                          <a:spcPts val="0"/>
+                        </a:spcBef>
+                        <a:spcAft>
+                          <a:spcPts val="0"/>
+                        </a:spcAft>
+                        <a:buClrTx/>
+                        <a:buSzTx/>
+                        <a:buFontTx/>
+                        <a:buNone/>
+                        <a:tabLst/>
+                        <a:defRPr/>
+                      </a:pPr>
+                      <a:r>
+                        <a:rPr kumimoji="1" lang="en-US" altLang="ja-JP" dirty="0"/>
+                        <a:t>79</a:t>
+                      </a:r>
+                      <a:endParaRPr kumimoji="1" lang="ja-JP" altLang="en-US" dirty="0"/>
+                    </a:p>
+                  </a:txBody>
+                  <a:tcPr/>
+                </a:tc>
+                <a:tc>
+                  <a:txBody>
+                    <a:bodyPr/>
+                    <a:lstStyle/>
+                    <a:p>
+                      <a:r>
+                        <a:rPr kumimoji="1" lang="en-US" altLang="ja-JP" dirty="0"/>
+                        <a:t>SCCS[1-6] Value</a:t>
+                      </a:r>
+                    </a:p>
+                    <a:p>
+                      <a:pPr marL="0" marR="0" lvl="0" indent="0" algn="l" defTabSz="457200" rtl="0" eaLnBrk="1" fontAlgn="auto" latinLnBrk="0" hangingPunct="1">
+                        <a:lnSpc>
+                          <a:spcPct val="100000"/>
+                        </a:lnSpc>
+                        <a:spcBef>
+                          <a:spcPts val="0"/>
+                        </a:spcBef>
+                        <a:spcAft>
+                          <a:spcPts val="0"/>
+                        </a:spcAft>
+                        <a:buClrTx/>
+                        <a:buSzTx/>
+                        <a:buFontTx/>
+                        <a:buNone/>
+                        <a:tabLst/>
+                        <a:defRPr/>
+                      </a:pPr>
+                      <a:r>
+                        <a:rPr kumimoji="1" lang="en-US" altLang="ja-JP" dirty="0"/>
+                        <a:t>SCCS[10] Value</a:t>
+                      </a:r>
+                    </a:p>
+                    <a:p>
+                      <a:r>
+                        <a:rPr kumimoji="1" lang="en-US" altLang="ja-JP" dirty="0"/>
+                        <a:t>0-127</a:t>
+                      </a:r>
+                      <a:endParaRPr kumimoji="1" lang="ja-JP" altLang="en-US" dirty="0"/>
+                    </a:p>
+                  </a:txBody>
+                  <a:tcPr/>
+                </a:tc>
+                <a:extLst>
+                  <a:ext uri="{0D108BD9-81ED-4DB2-BD59-A6C34878D82A}">
+                    <a16:rowId xmlns:a16="http://schemas.microsoft.com/office/drawing/2014/main" val="1129224570"/>
+                  </a:ext>
+                </a:extLst>
+              </a:tr>
+            </a:tbl>
+          </a:graphicData>
+        </a:graphic>
+      </p:graphicFrame>
+    </p:spTree>
+    <p:extLst>
+      <p:ext uri="{BB962C8B-B14F-4D97-AF65-F5344CB8AC3E}">
+        <p14:creationId xmlns:p14="http://schemas.microsoft.com/office/powerpoint/2010/main" val="3610130377"/>
+      </p:ext>
+    </p:extLst>
+  </p:cSld>
+  <p:clrMapOvr>
+    <a:masterClrMapping/>
+  </p:clrMapOvr>
+</p:sld>
+</file>
+
+<file path=ppt/slides/slide27.xml><?xml version="1.0" encoding="utf-8"?>
+<p:sld xmlns:a="http://schemas.openxmlformats.org/drawingml/2006/main" xmlns:r="http://schemas.openxmlformats.org/officeDocument/2006/relationships" xmlns:p="http://schemas.openxmlformats.org/presentationml/2006/main">
+  <p:cSld>
+    <p:spTree>
+      <p:nvGrpSpPr>
+        <p:cNvPr id="1" name=""/>
+        <p:cNvGrpSpPr/>
+        <p:nvPr/>
+      </p:nvGrpSpPr>
+      <p:grpSpPr>
+        <a:xfrm>
+          <a:off x="0" y="0"/>
+          <a:ext cx="0" cy="0"/>
+          <a:chOff x="0" y="0"/>
+          <a:chExt cx="0" cy="0"/>
+        </a:xfrm>
+      </p:grpSpPr>
+      <p:sp>
+        <p:nvSpPr>
+          <p:cNvPr id="2" name="タイトル 1">
+            <a:extLst>
+              <a:ext uri="{FF2B5EF4-FFF2-40B4-BE49-F238E27FC236}">
+                <a16:creationId xmlns:a16="http://schemas.microsoft.com/office/drawing/2014/main" id="{29A39A5C-7FC5-4D89-9A64-C4313BC4C574}"/>
+              </a:ext>
+            </a:extLst>
+          </p:cNvPr>
+          <p:cNvSpPr>
+            <a:spLocks noGrp="1"/>
+          </p:cNvSpPr>
+          <p:nvPr>
+            <p:ph type="title"/>
+          </p:nvPr>
+        </p:nvSpPr>
+        <p:spPr/>
+        <p:txBody>
+          <a:bodyPr/>
+          <a:lstStyle/>
+          <a:p>
+            <a:r>
+              <a:rPr kumimoji="1" lang="en-US" altLang="ja-JP" dirty="0"/>
+              <a:t>MIDI Implementation Chart 7</a:t>
+            </a:r>
+            <a:endParaRPr kumimoji="1" lang="ja-JP" altLang="en-US" dirty="0"/>
+          </a:p>
+        </p:txBody>
+      </p:sp>
+      <p:sp>
+        <p:nvSpPr>
+          <p:cNvPr id="4" name="スライド番号プレースホルダー 3">
+            <a:extLst>
+              <a:ext uri="{FF2B5EF4-FFF2-40B4-BE49-F238E27FC236}">
+                <a16:creationId xmlns:a16="http://schemas.microsoft.com/office/drawing/2014/main" id="{F527AEA0-7EF4-4546-B495-9F4920BF8281}"/>
+              </a:ext>
+            </a:extLst>
+          </p:cNvPr>
+          <p:cNvSpPr>
+            <a:spLocks noGrp="1"/>
+          </p:cNvSpPr>
+          <p:nvPr>
+            <p:ph type="sldNum" sz="quarter" idx="12"/>
+          </p:nvPr>
+        </p:nvSpPr>
+        <p:spPr/>
+        <p:txBody>
+          <a:bodyPr/>
+          <a:lstStyle/>
+          <a:p>
+            <a:fld id="{E27E2812-4560-4165-A7C7-9C013F955547}" type="slidenum">
+              <a:rPr kumimoji="1" lang="ja-JP" altLang="en-US" smtClean="0"/>
+              <a:t>27</a:t>
             </a:fld>
             <a:endParaRPr kumimoji="1" lang="ja-JP" altLang="en-US"/>
           </a:p>

</xml_diff>

<commit_message>
Version up to 3.8.0.0
</commit_message>
<xml_diff>
--- a/docs/MAmidiMEmo/Manual.pptx
+++ b/docs/MAmidiMEmo/Manual.pptx
@@ -224,7 +224,7 @@
           <a:p>
             <a:fld id="{581C28D8-13B6-41C3-9F5F-0284C569C6F1}" type="datetimeFigureOut">
               <a:rPr kumimoji="1" lang="ja-JP" altLang="en-US" smtClean="0"/>
-              <a:t>2021/8/13</a:t>
+              <a:t>2021/8/18</a:t>
             </a:fld>
             <a:endParaRPr kumimoji="1" lang="ja-JP" altLang="en-US"/>
           </a:p>
@@ -1215,7 +1215,7 @@
           <a:p>
             <a:fld id="{B8625E62-B904-4691-B75E-EC1C32885285}" type="datetime1">
               <a:rPr kumimoji="1" lang="ja-JP" altLang="en-US" smtClean="0"/>
-              <a:t>2021/8/13</a:t>
+              <a:t>2021/8/18</a:t>
             </a:fld>
             <a:endParaRPr kumimoji="1" lang="ja-JP" altLang="en-US"/>
           </a:p>
@@ -1553,7 +1553,7 @@
           <a:p>
             <a:fld id="{A4C87007-2A40-4EFC-90A3-258EFA3C1001}" type="datetime1">
               <a:rPr kumimoji="1" lang="ja-JP" altLang="en-US" smtClean="0"/>
-              <a:t>2021/8/13</a:t>
+              <a:t>2021/8/18</a:t>
             </a:fld>
             <a:endParaRPr kumimoji="1" lang="ja-JP" altLang="en-US"/>
           </a:p>
@@ -1954,7 +1954,7 @@
           <a:p>
             <a:fld id="{0FE0D7FF-9203-4AA3-90FD-622674A14F90}" type="datetime1">
               <a:rPr kumimoji="1" lang="ja-JP" altLang="en-US" smtClean="0"/>
-              <a:t>2021/8/13</a:t>
+              <a:t>2021/8/18</a:t>
             </a:fld>
             <a:endParaRPr kumimoji="1" lang="ja-JP" altLang="en-US"/>
           </a:p>
@@ -2290,7 +2290,7 @@
           <a:p>
             <a:fld id="{D2D6E4D3-BEDB-4F35-876B-5B9AA41BFB5B}" type="datetime1">
               <a:rPr kumimoji="1" lang="ja-JP" altLang="en-US" smtClean="0"/>
-              <a:t>2021/8/13</a:t>
+              <a:t>2021/8/18</a:t>
             </a:fld>
             <a:endParaRPr kumimoji="1" lang="ja-JP" altLang="en-US"/>
           </a:p>
@@ -2610,7 +2610,7 @@
           <a:p>
             <a:fld id="{2ACD896E-FC14-4F25-BC47-18ABAEA9E1FE}" type="datetime1">
               <a:rPr kumimoji="1" lang="ja-JP" altLang="en-US" smtClean="0"/>
-              <a:t>2021/8/13</a:t>
+              <a:t>2021/8/18</a:t>
             </a:fld>
             <a:endParaRPr kumimoji="1" lang="ja-JP" altLang="en-US"/>
           </a:p>
@@ -3006,7 +3006,7 @@
           <a:p>
             <a:fld id="{54FC701B-2185-4987-B8E2-5507664B65F4}" type="datetime1">
               <a:rPr kumimoji="1" lang="ja-JP" altLang="en-US" smtClean="0"/>
-              <a:t>2021/8/13</a:t>
+              <a:t>2021/8/18</a:t>
             </a:fld>
             <a:endParaRPr kumimoji="1" lang="ja-JP" altLang="en-US"/>
           </a:p>
@@ -3295,7 +3295,7 @@
           <a:p>
             <a:fld id="{3FB4CDED-9617-418F-B546-D66B9BB6C35E}" type="datetime1">
               <a:rPr kumimoji="1" lang="ja-JP" altLang="en-US" smtClean="0"/>
-              <a:t>2021/8/13</a:t>
+              <a:t>2021/8/18</a:t>
             </a:fld>
             <a:endParaRPr kumimoji="1" lang="ja-JP" altLang="en-US"/>
           </a:p>
@@ -3589,7 +3589,7 @@
           <a:p>
             <a:fld id="{F5635D40-962A-46D7-8037-3F2900B5EB4D}" type="datetime1">
               <a:rPr kumimoji="1" lang="ja-JP" altLang="en-US" smtClean="0"/>
-              <a:t>2021/8/13</a:t>
+              <a:t>2021/8/18</a:t>
             </a:fld>
             <a:endParaRPr kumimoji="1" lang="ja-JP" altLang="en-US"/>
           </a:p>
@@ -3883,7 +3883,7 @@
           <a:p>
             <a:fld id="{741DA9A2-8356-4FFD-B66A-E38811049858}" type="datetime1">
               <a:rPr kumimoji="1" lang="ja-JP" altLang="en-US" smtClean="0"/>
-              <a:t>2021/8/13</a:t>
+              <a:t>2021/8/18</a:t>
             </a:fld>
             <a:endParaRPr kumimoji="1" lang="ja-JP" altLang="en-US"/>
           </a:p>
@@ -4212,7 +4212,7 @@
           <a:p>
             <a:fld id="{9DDE8989-88B8-4869-97D9-547531F13E13}" type="datetime1">
               <a:rPr kumimoji="1" lang="ja-JP" altLang="en-US" smtClean="0"/>
-              <a:t>2021/8/13</a:t>
+              <a:t>2021/8/18</a:t>
             </a:fld>
             <a:endParaRPr kumimoji="1" lang="ja-JP" altLang="en-US"/>
           </a:p>
@@ -4599,7 +4599,7 @@
           <a:p>
             <a:fld id="{81EC4031-B949-4300-AB3E-1551426E8631}" type="datetime1">
               <a:rPr kumimoji="1" lang="ja-JP" altLang="en-US" smtClean="0"/>
-              <a:t>2021/8/13</a:t>
+              <a:t>2021/8/18</a:t>
             </a:fld>
             <a:endParaRPr kumimoji="1" lang="ja-JP" altLang="en-US"/>
           </a:p>
@@ -5120,7 +5120,7 @@
           <a:p>
             <a:fld id="{F39E755E-A59D-4634-B604-E9BB568B1156}" type="datetime1">
               <a:rPr kumimoji="1" lang="ja-JP" altLang="en-US" smtClean="0"/>
-              <a:t>2021/8/13</a:t>
+              <a:t>2021/8/18</a:t>
             </a:fld>
             <a:endParaRPr kumimoji="1" lang="ja-JP" altLang="en-US"/>
           </a:p>
@@ -5325,7 +5325,7 @@
           <a:p>
             <a:fld id="{61DA38B3-7601-4256-ABFE-386B92B0EDB5}" type="datetime1">
               <a:rPr kumimoji="1" lang="ja-JP" altLang="en-US" smtClean="0"/>
-              <a:t>2021/8/13</a:t>
+              <a:t>2021/8/18</a:t>
             </a:fld>
             <a:endParaRPr kumimoji="1" lang="ja-JP" altLang="en-US"/>
           </a:p>
@@ -5502,7 +5502,7 @@
           <a:p>
             <a:fld id="{5A28ED6D-8A94-4DBA-8EF2-284D1A467CE8}" type="datetime1">
               <a:rPr kumimoji="1" lang="ja-JP" altLang="en-US" smtClean="0"/>
-              <a:t>2021/8/13</a:t>
+              <a:t>2021/8/18</a:t>
             </a:fld>
             <a:endParaRPr kumimoji="1" lang="ja-JP" altLang="en-US"/>
           </a:p>
@@ -5867,7 +5867,7 @@
           <a:p>
             <a:fld id="{B27B0317-28AF-43C5-8944-AADFA89E0149}" type="datetime1">
               <a:rPr kumimoji="1" lang="ja-JP" altLang="en-US" smtClean="0"/>
-              <a:t>2021/8/13</a:t>
+              <a:t>2021/8/18</a:t>
             </a:fld>
             <a:endParaRPr kumimoji="1" lang="ja-JP" altLang="en-US"/>
           </a:p>
@@ -6212,7 +6212,7 @@
           <a:p>
             <a:fld id="{A78D023C-C4FA-4CE8-B5BE-6798898EE377}" type="datetime1">
               <a:rPr kumimoji="1" lang="ja-JP" altLang="en-US" smtClean="0"/>
-              <a:t>2021/8/13</a:t>
+              <a:t>2021/8/18</a:t>
             </a:fld>
             <a:endParaRPr kumimoji="1" lang="ja-JP" altLang="en-US"/>
           </a:p>
@@ -8361,7 +8361,7 @@
           <a:p>
             <a:fld id="{99567159-F4A8-4352-915B-DDBEFEF4A4D6}" type="datetime1">
               <a:rPr kumimoji="1" lang="ja-JP" altLang="en-US" smtClean="0"/>
-              <a:t>2021/8/13</a:t>
+              <a:t>2021/8/18</a:t>
             </a:fld>
             <a:endParaRPr kumimoji="1" lang="ja-JP" altLang="en-US"/>
           </a:p>
@@ -14264,15 +14264,11 @@
             </a:r>
             <a:r>
               <a:rPr kumimoji="1" lang="en-US" altLang="ja-JP" dirty="0"/>
-              <a:t> and </a:t>
-            </a:r>
-            <a:r>
-              <a:rPr kumimoji="1" lang="en-US" altLang="ja-JP" dirty="0" err="1"/>
-              <a:t>VGMPlayer</a:t>
-            </a:r>
-            <a:r>
-              <a:rPr kumimoji="1" lang="en-US" altLang="ja-JP" dirty="0"/>
-              <a:t> can drive real machine chips more faster if you use FTDI2xx(232R, 232H and so on). Currently supports NTSC MSX for AY-3-8910 and OPLL and SCC+ and OPL3.</a:t>
+              <a:t> can drive real MSX machine chips if you use FTDI2xx(232R, 232H and so on). Currently supports NTSC MSX for AY-3-8910 and OPLL and SCC+ and OPL3. </a:t>
+            </a:r>
+            <a:r>
+              <a:rPr kumimoji="1" lang="en-US" altLang="ja-JP" b="1" dirty="0"/>
+              <a:t>NOTE: Be sure to select proper SLOT# for SCC to use SCC.</a:t>
             </a:r>
           </a:p>
           <a:p>
@@ -14378,8 +14374,13 @@
             </a:pPr>
             <a:r>
               <a:rPr lang="en-US" altLang="ja-JP" dirty="0"/>
-              <a:t>Solder like the following.</a:t>
-            </a:r>
+              <a:t>Solder like </a:t>
+            </a:r>
+            <a:r>
+              <a:rPr lang="en-US" altLang="ja-JP"/>
+              <a:t>the following to the JOYSTICK PORT 2.</a:t>
+            </a:r>
+            <a:endParaRPr lang="en-US" altLang="ja-JP" dirty="0"/>
           </a:p>
           <a:p>
             <a:endParaRPr kumimoji="1" lang="en-US" altLang="ja-JP" dirty="0"/>
@@ -15387,7 +15388,15 @@
             </a:r>
             <a:r>
               <a:rPr kumimoji="1" lang="en-US" altLang="ja-JP" dirty="0"/>
-              <a:t>) to your FLASH Cart.</a:t>
+              <a:t>) or </a:t>
+            </a:r>
+            <a:r>
+              <a:rPr kumimoji="1" lang="en-US" altLang="ja-JP" dirty="0" err="1"/>
+              <a:t>VGMPlaymsx.rom</a:t>
+            </a:r>
+            <a:r>
+              <a:rPr kumimoji="1" lang="en-US" altLang="ja-JP" dirty="0"/>
+              <a:t>/bin(for MSX) to your FLASH Cart.</a:t>
             </a:r>
           </a:p>
           <a:p>

</xml_diff>

<commit_message>
Added manual for CMI8738
</commit_message>
<xml_diff>
--- a/docs/MAmidiMEmo/Manual.pptx
+++ b/docs/MAmidiMEmo/Manual.pptx
@@ -5,7 +5,7 @@
     <p:sldMasterId id="2147483678" r:id="rId1"/>
   </p:sldMasterIdLst>
   <p:notesMasterIdLst>
-    <p:notesMasterId r:id="rId33"/>
+    <p:notesMasterId r:id="rId34"/>
   </p:notesMasterIdLst>
   <p:sldIdLst>
     <p:sldId id="256" r:id="rId2"/>
@@ -29,16 +29,17 @@
     <p:sldId id="273" r:id="rId20"/>
     <p:sldId id="278" r:id="rId21"/>
     <p:sldId id="275" r:id="rId22"/>
-    <p:sldId id="264" r:id="rId23"/>
-    <p:sldId id="279" r:id="rId24"/>
-    <p:sldId id="280" r:id="rId25"/>
-    <p:sldId id="281" r:id="rId26"/>
-    <p:sldId id="282" r:id="rId27"/>
-    <p:sldId id="283" r:id="rId28"/>
-    <p:sldId id="285" r:id="rId29"/>
-    <p:sldId id="284" r:id="rId30"/>
-    <p:sldId id="288" r:id="rId31"/>
-    <p:sldId id="287" r:id="rId32"/>
+    <p:sldId id="290" r:id="rId23"/>
+    <p:sldId id="264" r:id="rId24"/>
+    <p:sldId id="279" r:id="rId25"/>
+    <p:sldId id="280" r:id="rId26"/>
+    <p:sldId id="281" r:id="rId27"/>
+    <p:sldId id="282" r:id="rId28"/>
+    <p:sldId id="283" r:id="rId29"/>
+    <p:sldId id="285" r:id="rId30"/>
+    <p:sldId id="284" r:id="rId31"/>
+    <p:sldId id="288" r:id="rId32"/>
+    <p:sldId id="287" r:id="rId33"/>
   </p:sldIdLst>
   <p:sldSz cx="12192000" cy="6858000"/>
   <p:notesSz cx="6858000" cy="9144000"/>
@@ -227,7 +228,7 @@
           <a:p>
             <a:fld id="{581C28D8-13B6-41C3-9F5F-0284C569C6F1}" type="datetimeFigureOut">
               <a:rPr kumimoji="1" lang="ja-JP" altLang="en-US" smtClean="0"/>
-              <a:t>2021/12/20</a:t>
+              <a:t>2022/2/20</a:t>
             </a:fld>
             <a:endParaRPr kumimoji="1" lang="ja-JP" altLang="en-US"/>
           </a:p>
@@ -1302,7 +1303,7 @@
           <a:p>
             <a:fld id="{B8625E62-B904-4691-B75E-EC1C32885285}" type="datetime1">
               <a:rPr kumimoji="1" lang="ja-JP" altLang="en-US" smtClean="0"/>
-              <a:t>2021/12/20</a:t>
+              <a:t>2022/2/20</a:t>
             </a:fld>
             <a:endParaRPr kumimoji="1" lang="ja-JP" altLang="en-US"/>
           </a:p>
@@ -1640,7 +1641,7 @@
           <a:p>
             <a:fld id="{A4C87007-2A40-4EFC-90A3-258EFA3C1001}" type="datetime1">
               <a:rPr kumimoji="1" lang="ja-JP" altLang="en-US" smtClean="0"/>
-              <a:t>2021/12/20</a:t>
+              <a:t>2022/2/20</a:t>
             </a:fld>
             <a:endParaRPr kumimoji="1" lang="ja-JP" altLang="en-US"/>
           </a:p>
@@ -2041,7 +2042,7 @@
           <a:p>
             <a:fld id="{0FE0D7FF-9203-4AA3-90FD-622674A14F90}" type="datetime1">
               <a:rPr kumimoji="1" lang="ja-JP" altLang="en-US" smtClean="0"/>
-              <a:t>2021/12/20</a:t>
+              <a:t>2022/2/20</a:t>
             </a:fld>
             <a:endParaRPr kumimoji="1" lang="ja-JP" altLang="en-US"/>
           </a:p>
@@ -2377,7 +2378,7 @@
           <a:p>
             <a:fld id="{D2D6E4D3-BEDB-4F35-876B-5B9AA41BFB5B}" type="datetime1">
               <a:rPr kumimoji="1" lang="ja-JP" altLang="en-US" smtClean="0"/>
-              <a:t>2021/12/20</a:t>
+              <a:t>2022/2/20</a:t>
             </a:fld>
             <a:endParaRPr kumimoji="1" lang="ja-JP" altLang="en-US"/>
           </a:p>
@@ -2697,7 +2698,7 @@
           <a:p>
             <a:fld id="{2ACD896E-FC14-4F25-BC47-18ABAEA9E1FE}" type="datetime1">
               <a:rPr kumimoji="1" lang="ja-JP" altLang="en-US" smtClean="0"/>
-              <a:t>2021/12/20</a:t>
+              <a:t>2022/2/20</a:t>
             </a:fld>
             <a:endParaRPr kumimoji="1" lang="ja-JP" altLang="en-US"/>
           </a:p>
@@ -3093,7 +3094,7 @@
           <a:p>
             <a:fld id="{54FC701B-2185-4987-B8E2-5507664B65F4}" type="datetime1">
               <a:rPr kumimoji="1" lang="ja-JP" altLang="en-US" smtClean="0"/>
-              <a:t>2021/12/20</a:t>
+              <a:t>2022/2/20</a:t>
             </a:fld>
             <a:endParaRPr kumimoji="1" lang="ja-JP" altLang="en-US"/>
           </a:p>
@@ -3382,7 +3383,7 @@
           <a:p>
             <a:fld id="{3FB4CDED-9617-418F-B546-D66B9BB6C35E}" type="datetime1">
               <a:rPr kumimoji="1" lang="ja-JP" altLang="en-US" smtClean="0"/>
-              <a:t>2021/12/20</a:t>
+              <a:t>2022/2/20</a:t>
             </a:fld>
             <a:endParaRPr kumimoji="1" lang="ja-JP" altLang="en-US"/>
           </a:p>
@@ -3676,7 +3677,7 @@
           <a:p>
             <a:fld id="{F5635D40-962A-46D7-8037-3F2900B5EB4D}" type="datetime1">
               <a:rPr kumimoji="1" lang="ja-JP" altLang="en-US" smtClean="0"/>
-              <a:t>2021/12/20</a:t>
+              <a:t>2022/2/20</a:t>
             </a:fld>
             <a:endParaRPr kumimoji="1" lang="ja-JP" altLang="en-US"/>
           </a:p>
@@ -3970,7 +3971,7 @@
           <a:p>
             <a:fld id="{741DA9A2-8356-4FFD-B66A-E38811049858}" type="datetime1">
               <a:rPr kumimoji="1" lang="ja-JP" altLang="en-US" smtClean="0"/>
-              <a:t>2021/12/20</a:t>
+              <a:t>2022/2/20</a:t>
             </a:fld>
             <a:endParaRPr kumimoji="1" lang="ja-JP" altLang="en-US"/>
           </a:p>
@@ -4299,7 +4300,7 @@
           <a:p>
             <a:fld id="{9DDE8989-88B8-4869-97D9-547531F13E13}" type="datetime1">
               <a:rPr kumimoji="1" lang="ja-JP" altLang="en-US" smtClean="0"/>
-              <a:t>2021/12/20</a:t>
+              <a:t>2022/2/20</a:t>
             </a:fld>
             <a:endParaRPr kumimoji="1" lang="ja-JP" altLang="en-US"/>
           </a:p>
@@ -4686,7 +4687,7 @@
           <a:p>
             <a:fld id="{81EC4031-B949-4300-AB3E-1551426E8631}" type="datetime1">
               <a:rPr kumimoji="1" lang="ja-JP" altLang="en-US" smtClean="0"/>
-              <a:t>2021/12/20</a:t>
+              <a:t>2022/2/20</a:t>
             </a:fld>
             <a:endParaRPr kumimoji="1" lang="ja-JP" altLang="en-US"/>
           </a:p>
@@ -5207,7 +5208,7 @@
           <a:p>
             <a:fld id="{F39E755E-A59D-4634-B604-E9BB568B1156}" type="datetime1">
               <a:rPr kumimoji="1" lang="ja-JP" altLang="en-US" smtClean="0"/>
-              <a:t>2021/12/20</a:t>
+              <a:t>2022/2/20</a:t>
             </a:fld>
             <a:endParaRPr kumimoji="1" lang="ja-JP" altLang="en-US"/>
           </a:p>
@@ -5412,7 +5413,7 @@
           <a:p>
             <a:fld id="{61DA38B3-7601-4256-ABFE-386B92B0EDB5}" type="datetime1">
               <a:rPr kumimoji="1" lang="ja-JP" altLang="en-US" smtClean="0"/>
-              <a:t>2021/12/20</a:t>
+              <a:t>2022/2/20</a:t>
             </a:fld>
             <a:endParaRPr kumimoji="1" lang="ja-JP" altLang="en-US"/>
           </a:p>
@@ -5589,7 +5590,7 @@
           <a:p>
             <a:fld id="{5A28ED6D-8A94-4DBA-8EF2-284D1A467CE8}" type="datetime1">
               <a:rPr kumimoji="1" lang="ja-JP" altLang="en-US" smtClean="0"/>
-              <a:t>2021/12/20</a:t>
+              <a:t>2022/2/20</a:t>
             </a:fld>
             <a:endParaRPr kumimoji="1" lang="ja-JP" altLang="en-US"/>
           </a:p>
@@ -5954,7 +5955,7 @@
           <a:p>
             <a:fld id="{B27B0317-28AF-43C5-8944-AADFA89E0149}" type="datetime1">
               <a:rPr kumimoji="1" lang="ja-JP" altLang="en-US" smtClean="0"/>
-              <a:t>2021/12/20</a:t>
+              <a:t>2022/2/20</a:t>
             </a:fld>
             <a:endParaRPr kumimoji="1" lang="ja-JP" altLang="en-US"/>
           </a:p>
@@ -6299,7 +6300,7 @@
           <a:p>
             <a:fld id="{A78D023C-C4FA-4CE8-B5BE-6798898EE377}" type="datetime1">
               <a:rPr kumimoji="1" lang="ja-JP" altLang="en-US" smtClean="0"/>
-              <a:t>2021/12/20</a:t>
+              <a:t>2022/2/20</a:t>
             </a:fld>
             <a:endParaRPr kumimoji="1" lang="ja-JP" altLang="en-US"/>
           </a:p>
@@ -8448,7 +8449,7 @@
           <a:p>
             <a:fld id="{99567159-F4A8-4352-915B-DDBEFEF4A4D6}" type="datetime1">
               <a:rPr kumimoji="1" lang="ja-JP" altLang="en-US" smtClean="0"/>
-              <a:t>2021/12/20</a:t>
+              <a:t>2022/2/20</a:t>
             </a:fld>
             <a:endParaRPr kumimoji="1" lang="ja-JP" altLang="en-US"/>
           </a:p>
@@ -24310,6 +24311,619 @@
           <p:cNvPr id="2" name="タイトル 1">
             <a:extLst>
               <a:ext uri="{FF2B5EF4-FFF2-40B4-BE49-F238E27FC236}">
+                <a16:creationId xmlns:a16="http://schemas.microsoft.com/office/drawing/2014/main" id="{44072A46-A9ED-47DA-85BE-53673BC608EC}"/>
+              </a:ext>
+            </a:extLst>
+          </p:cNvPr>
+          <p:cNvSpPr>
+            <a:spLocks noGrp="1"/>
+          </p:cNvSpPr>
+          <p:nvPr>
+            <p:ph type="title"/>
+          </p:nvPr>
+        </p:nvSpPr>
+        <p:spPr/>
+        <p:txBody>
+          <a:bodyPr>
+            <a:normAutofit fontScale="90000"/>
+          </a:bodyPr>
+          <a:lstStyle/>
+          <a:p>
+            <a:r>
+              <a:rPr kumimoji="1" lang="en-US" altLang="ja-JP" dirty="0"/>
+              <a:t>Use CMI8738(OPL) Board </a:t>
+            </a:r>
+            <a:r>
+              <a:rPr lang="en-US" altLang="ja-JP" b="1" i="0" u="sng" strike="noStrike" dirty="0">
+                <a:solidFill>
+                  <a:srgbClr val="FF0000"/>
+                </a:solidFill>
+                <a:effectLst/>
+                <a:latin typeface="arial" panose="020B0604020202020204" pitchFamily="34" charset="0"/>
+              </a:rPr>
+              <a:t>*NO WARRANTY*</a:t>
+            </a:r>
+            <a:br>
+              <a:rPr kumimoji="1" lang="en-US" altLang="ja-JP" dirty="0"/>
+            </a:br>
+            <a:endParaRPr kumimoji="1" lang="ja-JP" altLang="en-US" sz="2000" dirty="0">
+              <a:solidFill>
+                <a:srgbClr val="FF0000"/>
+              </a:solidFill>
+            </a:endParaRPr>
+          </a:p>
+        </p:txBody>
+      </p:sp>
+      <p:sp>
+        <p:nvSpPr>
+          <p:cNvPr id="3" name="コンテンツ プレースホルダー 2">
+            <a:extLst>
+              <a:ext uri="{FF2B5EF4-FFF2-40B4-BE49-F238E27FC236}">
+                <a16:creationId xmlns:a16="http://schemas.microsoft.com/office/drawing/2014/main" id="{685686A1-D505-4CFA-B92C-AF5EF3E00A69}"/>
+              </a:ext>
+            </a:extLst>
+          </p:cNvPr>
+          <p:cNvSpPr>
+            <a:spLocks noGrp="1"/>
+          </p:cNvSpPr>
+          <p:nvPr>
+            <p:ph idx="1"/>
+          </p:nvPr>
+        </p:nvSpPr>
+        <p:spPr>
+          <a:xfrm>
+            <a:off x="2589212" y="2133600"/>
+            <a:ext cx="8915400" cy="2618400"/>
+          </a:xfrm>
+        </p:spPr>
+        <p:txBody>
+          <a:bodyPr/>
+          <a:lstStyle/>
+          <a:p>
+            <a:pPr>
+              <a:buFont typeface="+mj-lt"/>
+              <a:buAutoNum type="arabicPeriod"/>
+            </a:pPr>
+            <a:r>
+              <a:rPr kumimoji="1" lang="en-US" altLang="ja-JP" dirty="0"/>
+              <a:t>Attach the CMI8738 Board to your PC.</a:t>
+            </a:r>
+            <a:r>
+              <a:rPr kumimoji="1" lang="en-US" altLang="ja-JP" sz="1800" dirty="0">
+                <a:solidFill>
+                  <a:srgbClr val="FF0000"/>
+                </a:solidFill>
+              </a:rPr>
+              <a:t> *Only for 64bit Windows</a:t>
+            </a:r>
+            <a:r>
+              <a:rPr lang="en-US" altLang="ja-JP" dirty="0">
+                <a:solidFill>
+                  <a:srgbClr val="FF0000"/>
+                </a:solidFill>
+              </a:rPr>
+              <a:t>*</a:t>
+            </a:r>
+            <a:endParaRPr kumimoji="1" lang="en-US" altLang="ja-JP" dirty="0"/>
+          </a:p>
+          <a:p>
+            <a:pPr>
+              <a:buFont typeface="+mj-lt"/>
+              <a:buAutoNum type="arabicPeriod"/>
+            </a:pPr>
+            <a:r>
+              <a:rPr lang="en-US" altLang="ja-JP" b="1" i="0" u="none" strike="noStrike" dirty="0">
+                <a:solidFill>
+                  <a:srgbClr val="FF0000"/>
+                </a:solidFill>
+                <a:effectLst/>
+                <a:latin typeface="arial" panose="020B0604020202020204" pitchFamily="34" charset="0"/>
+                <a:hlinkClick r:id="rId2">
+                  <a:extLst>
+                    <a:ext uri="{A12FA001-AC4F-418D-AE19-62706E023703}">
+                      <ahyp:hlinkClr xmlns:ahyp="http://schemas.microsoft.com/office/drawing/2018/hyperlinkcolor" val="tx"/>
+                    </a:ext>
+                  </a:extLst>
+                </a:hlinkClick>
+              </a:rPr>
+              <a:t>Disable Driver Signature enforcement</a:t>
+            </a:r>
+            <a:endParaRPr lang="en-US" altLang="ja-JP" b="1" i="0" u="sng" strike="noStrike" dirty="0">
+              <a:solidFill>
+                <a:srgbClr val="FF0000"/>
+              </a:solidFill>
+              <a:effectLst/>
+              <a:latin typeface="arial" panose="020B0604020202020204" pitchFamily="34" charset="0"/>
+              <a:hlinkClick r:id="rId3"/>
+            </a:endParaRPr>
+          </a:p>
+          <a:p>
+            <a:pPr>
+              <a:buFont typeface="+mj-lt"/>
+              <a:buAutoNum type="arabicPeriod"/>
+            </a:pPr>
+            <a:r>
+              <a:rPr kumimoji="1" lang="en-US" altLang="ja-JP" dirty="0"/>
+              <a:t>(</a:t>
+            </a:r>
+            <a:r>
+              <a:rPr kumimoji="1" lang="en-US" altLang="ja-JP" dirty="0">
+                <a:solidFill>
+                  <a:srgbClr val="FF0000"/>
+                </a:solidFill>
+              </a:rPr>
+              <a:t>*Uninstall and remove*</a:t>
+            </a:r>
+            <a:r>
+              <a:rPr kumimoji="1" lang="en-US" altLang="ja-JP" dirty="0"/>
+              <a:t> old CMI8738 OPL3 driver if installed. )</a:t>
+            </a:r>
+          </a:p>
+          <a:p>
+            <a:pPr>
+              <a:buFont typeface="+mj-lt"/>
+              <a:buAutoNum type="arabicPeriod"/>
+            </a:pPr>
+            <a:r>
+              <a:rPr kumimoji="1" lang="en-US" altLang="ja-JP" dirty="0"/>
+              <a:t>Install the CMI8738 OPL3 driver located in “.\CMI8738OPL3” folder.</a:t>
+            </a:r>
+          </a:p>
+          <a:p>
+            <a:pPr>
+              <a:buFont typeface="+mj-lt"/>
+              <a:buAutoNum type="arabicPeriod"/>
+            </a:pPr>
+            <a:r>
+              <a:rPr kumimoji="1" lang="en-US" altLang="ja-JP" dirty="0"/>
+              <a:t>Set [</a:t>
+            </a:r>
+            <a:r>
+              <a:rPr kumimoji="1" lang="en-US" altLang="ja-JP" dirty="0" err="1"/>
+              <a:t>SoundEngine</a:t>
+            </a:r>
+            <a:r>
+              <a:rPr kumimoji="1" lang="en-US" altLang="ja-JP" dirty="0"/>
+              <a:t>] prop to the “Real(CMI8738)”.</a:t>
+            </a:r>
+          </a:p>
+          <a:p>
+            <a:pPr>
+              <a:buFont typeface="+mj-lt"/>
+              <a:buAutoNum type="arabicPeriod"/>
+            </a:pPr>
+            <a:r>
+              <a:rPr lang="en-US" altLang="ja-JP" dirty="0"/>
+              <a:t>Have fun!!</a:t>
+            </a:r>
+            <a:endParaRPr kumimoji="1" lang="ja-JP" altLang="en-US" dirty="0"/>
+          </a:p>
+        </p:txBody>
+      </p:sp>
+      <p:sp>
+        <p:nvSpPr>
+          <p:cNvPr id="4" name="スライド番号プレースホルダー 3">
+            <a:extLst>
+              <a:ext uri="{FF2B5EF4-FFF2-40B4-BE49-F238E27FC236}">
+                <a16:creationId xmlns:a16="http://schemas.microsoft.com/office/drawing/2014/main" id="{7907F056-FF93-4396-BDC1-AFEC81D0F1E5}"/>
+              </a:ext>
+            </a:extLst>
+          </p:cNvPr>
+          <p:cNvSpPr>
+            <a:spLocks noGrp="1"/>
+          </p:cNvSpPr>
+          <p:nvPr>
+            <p:ph type="sldNum" sz="quarter" idx="12"/>
+          </p:nvPr>
+        </p:nvSpPr>
+        <p:spPr/>
+        <p:txBody>
+          <a:bodyPr/>
+          <a:lstStyle/>
+          <a:p>
+            <a:fld id="{E27E2812-4560-4165-A7C7-9C013F955547}" type="slidenum">
+              <a:rPr kumimoji="1" lang="ja-JP" altLang="en-US" smtClean="0"/>
+              <a:t>22</a:t>
+            </a:fld>
+            <a:endParaRPr kumimoji="1" lang="ja-JP" altLang="en-US"/>
+          </a:p>
+        </p:txBody>
+      </p:sp>
+      <p:pic>
+        <p:nvPicPr>
+          <p:cNvPr id="6" name="図 5">
+            <a:extLst>
+              <a:ext uri="{FF2B5EF4-FFF2-40B4-BE49-F238E27FC236}">
+                <a16:creationId xmlns:a16="http://schemas.microsoft.com/office/drawing/2014/main" id="{747262D8-394A-487E-94DE-460A3D85E084}"/>
+              </a:ext>
+            </a:extLst>
+          </p:cNvPr>
+          <p:cNvPicPr>
+            <a:picLocks noChangeAspect="1"/>
+          </p:cNvPicPr>
+          <p:nvPr/>
+        </p:nvPicPr>
+        <p:blipFill>
+          <a:blip r:embed="rId4"/>
+          <a:stretch>
+            <a:fillRect/>
+          </a:stretch>
+        </p:blipFill>
+        <p:spPr>
+          <a:xfrm>
+            <a:off x="8346763" y="3748811"/>
+            <a:ext cx="3662745" cy="1204190"/>
+          </a:xfrm>
+          <a:prstGeom prst="rect">
+            <a:avLst/>
+          </a:prstGeom>
+        </p:spPr>
+      </p:pic>
+      <p:sp>
+        <p:nvSpPr>
+          <p:cNvPr id="9" name="コンテンツ プレースホルダー 2">
+            <a:extLst>
+              <a:ext uri="{FF2B5EF4-FFF2-40B4-BE49-F238E27FC236}">
+                <a16:creationId xmlns:a16="http://schemas.microsoft.com/office/drawing/2014/main" id="{B4A53CEA-2421-4CA9-805F-B2E82A3774A5}"/>
+              </a:ext>
+            </a:extLst>
+          </p:cNvPr>
+          <p:cNvSpPr txBox="1">
+            <a:spLocks/>
+          </p:cNvSpPr>
+          <p:nvPr/>
+        </p:nvSpPr>
+        <p:spPr>
+          <a:xfrm>
+            <a:off x="2589212" y="4622400"/>
+            <a:ext cx="8915400" cy="1945812"/>
+          </a:xfrm>
+          <a:prstGeom prst="rect">
+            <a:avLst/>
+          </a:prstGeom>
+        </p:spPr>
+        <p:txBody>
+          <a:bodyPr vert="horz" lIns="91440" tIns="45720" rIns="91440" bIns="45720" rtlCol="0">
+            <a:normAutofit fontScale="92500" lnSpcReduction="10000"/>
+          </a:bodyPr>
+          <a:lstStyle>
+            <a:lvl1pPr marL="342900" indent="-342900" algn="l" defTabSz="457200" rtl="0" eaLnBrk="1" latinLnBrk="0" hangingPunct="1">
+              <a:spcBef>
+                <a:spcPts val="1000"/>
+              </a:spcBef>
+              <a:spcAft>
+                <a:spcPts val="0"/>
+              </a:spcAft>
+              <a:buClr>
+                <a:schemeClr val="accent1"/>
+              </a:buClr>
+              <a:buFont typeface="Wingdings 3" charset="2"/>
+              <a:buChar char=""/>
+              <a:defRPr kumimoji="1" sz="1800" kern="1200">
+                <a:solidFill>
+                  <a:schemeClr val="tx1">
+                    <a:lumMod val="75000"/>
+                    <a:lumOff val="25000"/>
+                  </a:schemeClr>
+                </a:solidFill>
+                <a:latin typeface="+mn-lt"/>
+                <a:ea typeface="+mn-ea"/>
+                <a:cs typeface="+mn-cs"/>
+              </a:defRPr>
+            </a:lvl1pPr>
+            <a:lvl2pPr marL="742950" indent="-285750" algn="l" defTabSz="457200" rtl="0" eaLnBrk="1" latinLnBrk="0" hangingPunct="1">
+              <a:spcBef>
+                <a:spcPts val="1000"/>
+              </a:spcBef>
+              <a:spcAft>
+                <a:spcPts val="0"/>
+              </a:spcAft>
+              <a:buClr>
+                <a:schemeClr val="accent1"/>
+              </a:buClr>
+              <a:buFont typeface="Wingdings 3" charset="2"/>
+              <a:buChar char=""/>
+              <a:defRPr kumimoji="1" sz="1600" kern="1200">
+                <a:solidFill>
+                  <a:schemeClr val="tx1">
+                    <a:lumMod val="75000"/>
+                    <a:lumOff val="25000"/>
+                  </a:schemeClr>
+                </a:solidFill>
+                <a:latin typeface="+mn-lt"/>
+                <a:ea typeface="+mn-ea"/>
+                <a:cs typeface="+mn-cs"/>
+              </a:defRPr>
+            </a:lvl2pPr>
+            <a:lvl3pPr marL="1143000" indent="-228600" algn="l" defTabSz="457200" rtl="0" eaLnBrk="1" latinLnBrk="0" hangingPunct="1">
+              <a:spcBef>
+                <a:spcPts val="1000"/>
+              </a:spcBef>
+              <a:spcAft>
+                <a:spcPts val="0"/>
+              </a:spcAft>
+              <a:buClr>
+                <a:schemeClr val="accent1"/>
+              </a:buClr>
+              <a:buFont typeface="Wingdings 3" charset="2"/>
+              <a:buChar char=""/>
+              <a:defRPr kumimoji="1" sz="1400" kern="1200">
+                <a:solidFill>
+                  <a:schemeClr val="tx1">
+                    <a:lumMod val="75000"/>
+                    <a:lumOff val="25000"/>
+                  </a:schemeClr>
+                </a:solidFill>
+                <a:latin typeface="+mn-lt"/>
+                <a:ea typeface="+mn-ea"/>
+                <a:cs typeface="+mn-cs"/>
+              </a:defRPr>
+            </a:lvl3pPr>
+            <a:lvl4pPr marL="1600200" indent="-228600" algn="l" defTabSz="457200" rtl="0" eaLnBrk="1" latinLnBrk="0" hangingPunct="1">
+              <a:spcBef>
+                <a:spcPts val="1000"/>
+              </a:spcBef>
+              <a:spcAft>
+                <a:spcPts val="0"/>
+              </a:spcAft>
+              <a:buClr>
+                <a:schemeClr val="accent1"/>
+              </a:buClr>
+              <a:buFont typeface="Wingdings 3" charset="2"/>
+              <a:buChar char=""/>
+              <a:defRPr kumimoji="1" sz="1200" kern="1200">
+                <a:solidFill>
+                  <a:schemeClr val="tx1">
+                    <a:lumMod val="75000"/>
+                    <a:lumOff val="25000"/>
+                  </a:schemeClr>
+                </a:solidFill>
+                <a:latin typeface="+mn-lt"/>
+                <a:ea typeface="+mn-ea"/>
+                <a:cs typeface="+mn-cs"/>
+              </a:defRPr>
+            </a:lvl4pPr>
+            <a:lvl5pPr marL="2057400" indent="-228600" algn="l" defTabSz="457200" rtl="0" eaLnBrk="1" latinLnBrk="0" hangingPunct="1">
+              <a:spcBef>
+                <a:spcPts val="1000"/>
+              </a:spcBef>
+              <a:spcAft>
+                <a:spcPts val="0"/>
+              </a:spcAft>
+              <a:buClr>
+                <a:schemeClr val="accent1"/>
+              </a:buClr>
+              <a:buFont typeface="Wingdings 3" charset="2"/>
+              <a:buChar char=""/>
+              <a:defRPr kumimoji="1" sz="1200" kern="1200">
+                <a:solidFill>
+                  <a:schemeClr val="tx1">
+                    <a:lumMod val="75000"/>
+                    <a:lumOff val="25000"/>
+                  </a:schemeClr>
+                </a:solidFill>
+                <a:latin typeface="+mn-lt"/>
+                <a:ea typeface="+mn-ea"/>
+                <a:cs typeface="+mn-cs"/>
+              </a:defRPr>
+            </a:lvl5pPr>
+            <a:lvl6pPr marL="2514600" indent="-228600" algn="l" defTabSz="457200" rtl="0" eaLnBrk="1" latinLnBrk="0" hangingPunct="1">
+              <a:spcBef>
+                <a:spcPts val="1000"/>
+              </a:spcBef>
+              <a:spcAft>
+                <a:spcPts val="0"/>
+              </a:spcAft>
+              <a:buClr>
+                <a:schemeClr val="accent1"/>
+              </a:buClr>
+              <a:buFont typeface="Wingdings 3" charset="2"/>
+              <a:buChar char=""/>
+              <a:defRPr kumimoji="1" sz="1200" kern="1200">
+                <a:solidFill>
+                  <a:schemeClr val="tx1">
+                    <a:lumMod val="75000"/>
+                    <a:lumOff val="25000"/>
+                  </a:schemeClr>
+                </a:solidFill>
+                <a:latin typeface="+mn-lt"/>
+                <a:ea typeface="+mn-ea"/>
+                <a:cs typeface="+mn-cs"/>
+              </a:defRPr>
+            </a:lvl6pPr>
+            <a:lvl7pPr marL="2971800" indent="-228600" algn="l" defTabSz="457200" rtl="0" eaLnBrk="1" latinLnBrk="0" hangingPunct="1">
+              <a:spcBef>
+                <a:spcPts val="1000"/>
+              </a:spcBef>
+              <a:spcAft>
+                <a:spcPts val="0"/>
+              </a:spcAft>
+              <a:buClr>
+                <a:schemeClr val="accent1"/>
+              </a:buClr>
+              <a:buFont typeface="Wingdings 3" charset="2"/>
+              <a:buChar char=""/>
+              <a:defRPr kumimoji="1" sz="1200" kern="1200">
+                <a:solidFill>
+                  <a:schemeClr val="tx1">
+                    <a:lumMod val="75000"/>
+                    <a:lumOff val="25000"/>
+                  </a:schemeClr>
+                </a:solidFill>
+                <a:latin typeface="+mn-lt"/>
+                <a:ea typeface="+mn-ea"/>
+                <a:cs typeface="+mn-cs"/>
+              </a:defRPr>
+            </a:lvl7pPr>
+            <a:lvl8pPr marL="3429000" indent="-228600" algn="l" defTabSz="457200" rtl="0" eaLnBrk="1" latinLnBrk="0" hangingPunct="1">
+              <a:spcBef>
+                <a:spcPts val="1000"/>
+              </a:spcBef>
+              <a:spcAft>
+                <a:spcPts val="0"/>
+              </a:spcAft>
+              <a:buClr>
+                <a:schemeClr val="accent1"/>
+              </a:buClr>
+              <a:buFont typeface="Wingdings 3" charset="2"/>
+              <a:buChar char=""/>
+              <a:defRPr kumimoji="1" sz="1200" kern="1200">
+                <a:solidFill>
+                  <a:schemeClr val="tx1">
+                    <a:lumMod val="75000"/>
+                    <a:lumOff val="25000"/>
+                  </a:schemeClr>
+                </a:solidFill>
+                <a:latin typeface="+mn-lt"/>
+                <a:ea typeface="+mn-ea"/>
+                <a:cs typeface="+mn-cs"/>
+              </a:defRPr>
+            </a:lvl8pPr>
+            <a:lvl9pPr marL="3886200" indent="-228600" algn="l" defTabSz="457200" rtl="0" eaLnBrk="1" latinLnBrk="0" hangingPunct="1">
+              <a:spcBef>
+                <a:spcPts val="1000"/>
+              </a:spcBef>
+              <a:spcAft>
+                <a:spcPts val="0"/>
+              </a:spcAft>
+              <a:buClr>
+                <a:schemeClr val="accent1"/>
+              </a:buClr>
+              <a:buFont typeface="Wingdings 3" charset="2"/>
+              <a:buChar char=""/>
+              <a:defRPr kumimoji="1" sz="1200" kern="1200">
+                <a:solidFill>
+                  <a:schemeClr val="tx1">
+                    <a:lumMod val="75000"/>
+                    <a:lumOff val="25000"/>
+                  </a:schemeClr>
+                </a:solidFill>
+                <a:latin typeface="+mn-lt"/>
+                <a:ea typeface="+mn-ea"/>
+                <a:cs typeface="+mn-cs"/>
+              </a:defRPr>
+            </a:lvl9pPr>
+          </a:lstStyle>
+          <a:p>
+            <a:pPr marL="0" indent="0">
+              <a:buNone/>
+            </a:pPr>
+            <a:endParaRPr lang="en-US" altLang="ja-JP" dirty="0"/>
+          </a:p>
+          <a:p>
+            <a:pPr marL="0" indent="0">
+              <a:buNone/>
+            </a:pPr>
+            <a:r>
+              <a:rPr lang="en-US" altLang="ja-JP" b="1" dirty="0"/>
+              <a:t>*Technical information*</a:t>
+            </a:r>
+            <a:br>
+              <a:rPr lang="en-US" altLang="ja-JP" b="1" dirty="0"/>
+            </a:br>
+            <a:r>
+              <a:rPr lang="en-US" altLang="ja-JP" dirty="0"/>
+              <a:t>If you want to use the OPL3 of the CMI8738 directly from your app…</a:t>
+            </a:r>
+          </a:p>
+          <a:p>
+            <a:pPr>
+              <a:buFont typeface="+mj-lt"/>
+              <a:buAutoNum type="arabicPeriod"/>
+            </a:pPr>
+            <a:r>
+              <a:rPr lang="en-US" altLang="ja-JP" dirty="0"/>
+              <a:t>Use the helper DLL “CMI8738OPL3Library.dll”.</a:t>
+            </a:r>
+          </a:p>
+          <a:p>
+            <a:pPr>
+              <a:buFont typeface="+mj-lt"/>
+              <a:buAutoNum type="arabicPeriod"/>
+            </a:pPr>
+            <a:r>
+              <a:rPr lang="en-US" altLang="ja-JP" dirty="0"/>
+              <a:t>Or, direct access I/O port with admin rights.</a:t>
+            </a:r>
+            <a:br>
+              <a:rPr lang="en-US" altLang="ja-JP" dirty="0"/>
+            </a:br>
+            <a:r>
+              <a:rPr lang="en-US" altLang="ja-JP" dirty="0" err="1"/>
+              <a:t>eg</a:t>
+            </a:r>
+            <a:r>
+              <a:rPr lang="en-US" altLang="ja-JP" dirty="0"/>
+              <a:t>) DF00H+50H is the OPL3(CMI8738) port.</a:t>
+            </a:r>
+          </a:p>
+        </p:txBody>
+      </p:sp>
+      <p:pic>
+        <p:nvPicPr>
+          <p:cNvPr id="11" name="図 10">
+            <a:extLst>
+              <a:ext uri="{FF2B5EF4-FFF2-40B4-BE49-F238E27FC236}">
+                <a16:creationId xmlns:a16="http://schemas.microsoft.com/office/drawing/2014/main" id="{5DEBF7F0-6D6B-4B04-926C-A03F9632F949}"/>
+              </a:ext>
+            </a:extLst>
+          </p:cNvPr>
+          <p:cNvPicPr>
+            <a:picLocks noChangeAspect="1"/>
+          </p:cNvPicPr>
+          <p:nvPr/>
+        </p:nvPicPr>
+        <p:blipFill>
+          <a:blip r:embed="rId5"/>
+          <a:stretch>
+            <a:fillRect/>
+          </a:stretch>
+        </p:blipFill>
+        <p:spPr>
+          <a:xfrm>
+            <a:off x="7892923" y="5684757"/>
+            <a:ext cx="1577477" cy="983065"/>
+          </a:xfrm>
+          <a:prstGeom prst="rect">
+            <a:avLst/>
+          </a:prstGeom>
+        </p:spPr>
+      </p:pic>
+    </p:spTree>
+    <p:extLst>
+      <p:ext uri="{BB962C8B-B14F-4D97-AF65-F5344CB8AC3E}">
+        <p14:creationId xmlns:p14="http://schemas.microsoft.com/office/powerpoint/2010/main" val="4158846069"/>
+      </p:ext>
+    </p:extLst>
+  </p:cSld>
+  <p:clrMapOvr>
+    <a:masterClrMapping/>
+  </p:clrMapOvr>
+</p:sld>
+</file>
+
+<file path=ppt/slides/slide23.xml><?xml version="1.0" encoding="utf-8"?>
+<p:sld xmlns:a="http://schemas.openxmlformats.org/drawingml/2006/main" xmlns:r="http://schemas.openxmlformats.org/officeDocument/2006/relationships" xmlns:p="http://schemas.openxmlformats.org/presentationml/2006/main">
+  <p:cSld>
+    <p:spTree>
+      <p:nvGrpSpPr>
+        <p:cNvPr id="1" name=""/>
+        <p:cNvGrpSpPr/>
+        <p:nvPr/>
+      </p:nvGrpSpPr>
+      <p:grpSpPr>
+        <a:xfrm>
+          <a:off x="0" y="0"/>
+          <a:ext cx="0" cy="0"/>
+          <a:chOff x="0" y="0"/>
+          <a:chExt cx="0" cy="0"/>
+        </a:xfrm>
+      </p:grpSpPr>
+      <p:sp>
+        <p:nvSpPr>
+          <p:cNvPr id="2" name="タイトル 1">
+            <a:extLst>
+              <a:ext uri="{FF2B5EF4-FFF2-40B4-BE49-F238E27FC236}">
                 <a16:creationId xmlns:a16="http://schemas.microsoft.com/office/drawing/2014/main" id="{EF2D61BD-EF14-496D-BA79-EAE1C4548936}"/>
               </a:ext>
             </a:extLst>
@@ -24436,7 +25050,7 @@
           <a:p>
             <a:fld id="{E27E2812-4560-4165-A7C7-9C013F955547}" type="slidenum">
               <a:rPr kumimoji="1" lang="ja-JP" altLang="en-US" smtClean="0"/>
-              <a:t>22</a:t>
+              <a:t>23</a:t>
             </a:fld>
             <a:endParaRPr kumimoji="1" lang="ja-JP" altLang="en-US"/>
           </a:p>
@@ -24467,7 +25081,7 @@
 </p:sld>
 </file>
 
-<file path=ppt/slides/slide23.xml><?xml version="1.0" encoding="utf-8"?>
+<file path=ppt/slides/slide24.xml><?xml version="1.0" encoding="utf-8"?>
 <p:sld xmlns:a="http://schemas.openxmlformats.org/drawingml/2006/main" xmlns:r="http://schemas.openxmlformats.org/officeDocument/2006/relationships" xmlns:p="http://schemas.openxmlformats.org/presentationml/2006/main">
   <p:cSld>
     <p:spTree>
@@ -24536,7 +25150,7 @@
           <a:p>
             <a:fld id="{E27E2812-4560-4165-A7C7-9C013F955547}" type="slidenum">
               <a:rPr kumimoji="1" lang="ja-JP" altLang="en-US" smtClean="0"/>
-              <a:t>23</a:t>
+              <a:t>24</a:t>
             </a:fld>
             <a:endParaRPr kumimoji="1" lang="ja-JP" altLang="en-US"/>
           </a:p>
@@ -25097,7 +25711,7 @@
 </p:sld>
 </file>
 
-<file path=ppt/slides/slide24.xml><?xml version="1.0" encoding="utf-8"?>
+<file path=ppt/slides/slide25.xml><?xml version="1.0" encoding="utf-8"?>
 <p:sld xmlns:a="http://schemas.openxmlformats.org/drawingml/2006/main" xmlns:r="http://schemas.openxmlformats.org/officeDocument/2006/relationships" xmlns:p="http://schemas.openxmlformats.org/presentationml/2006/main">
   <p:cSld>
     <p:spTree>
@@ -25166,7 +25780,7 @@
           <a:p>
             <a:fld id="{E27E2812-4560-4165-A7C7-9C013F955547}" type="slidenum">
               <a:rPr kumimoji="1" lang="ja-JP" altLang="en-US" smtClean="0"/>
-              <a:t>24</a:t>
+              <a:t>25</a:t>
             </a:fld>
             <a:endParaRPr kumimoji="1" lang="ja-JP" altLang="en-US"/>
           </a:p>
@@ -26210,7 +26824,7 @@
 </p:sld>
 </file>
 
-<file path=ppt/slides/slide25.xml><?xml version="1.0" encoding="utf-8"?>
+<file path=ppt/slides/slide26.xml><?xml version="1.0" encoding="utf-8"?>
 <p:sld xmlns:a="http://schemas.openxmlformats.org/drawingml/2006/main" xmlns:r="http://schemas.openxmlformats.org/officeDocument/2006/relationships" xmlns:p="http://schemas.openxmlformats.org/presentationml/2006/main">
   <p:cSld>
     <p:spTree>
@@ -26279,7 +26893,7 @@
           <a:p>
             <a:fld id="{E27E2812-4560-4165-A7C7-9C013F955547}" type="slidenum">
               <a:rPr kumimoji="1" lang="ja-JP" altLang="en-US" smtClean="0"/>
-              <a:t>25</a:t>
+              <a:t>26</a:t>
             </a:fld>
             <a:endParaRPr kumimoji="1" lang="ja-JP" altLang="en-US"/>
           </a:p>
@@ -27213,7 +27827,7 @@
 </p:sld>
 </file>
 
-<file path=ppt/slides/slide26.xml><?xml version="1.0" encoding="utf-8"?>
+<file path=ppt/slides/slide27.xml><?xml version="1.0" encoding="utf-8"?>
 <p:sld xmlns:a="http://schemas.openxmlformats.org/drawingml/2006/main" xmlns:r="http://schemas.openxmlformats.org/officeDocument/2006/relationships" xmlns:p="http://schemas.openxmlformats.org/presentationml/2006/main">
   <p:cSld>
     <p:spTree>
@@ -27282,7 +27896,7 @@
           <a:p>
             <a:fld id="{E27E2812-4560-4165-A7C7-9C013F955547}" type="slidenum">
               <a:rPr kumimoji="1" lang="ja-JP" altLang="en-US" smtClean="0"/>
-              <a:t>26</a:t>
+              <a:t>27</a:t>
             </a:fld>
             <a:endParaRPr kumimoji="1" lang="ja-JP" altLang="en-US"/>
           </a:p>
@@ -27750,7 +28364,7 @@
 </p:sld>
 </file>
 
-<file path=ppt/slides/slide27.xml><?xml version="1.0" encoding="utf-8"?>
+<file path=ppt/slides/slide28.xml><?xml version="1.0" encoding="utf-8"?>
 <p:sld xmlns:a="http://schemas.openxmlformats.org/drawingml/2006/main" xmlns:r="http://schemas.openxmlformats.org/officeDocument/2006/relationships" xmlns:p="http://schemas.openxmlformats.org/presentationml/2006/main">
   <p:cSld>
     <p:spTree>
@@ -27819,7 +28433,7 @@
           <a:p>
             <a:fld id="{E27E2812-4560-4165-A7C7-9C013F955547}" type="slidenum">
               <a:rPr kumimoji="1" lang="ja-JP" altLang="en-US" smtClean="0"/>
-              <a:t>27</a:t>
+              <a:t>28</a:t>
             </a:fld>
             <a:endParaRPr kumimoji="1" lang="ja-JP" altLang="en-US"/>
           </a:p>
@@ -28146,7 +28760,7 @@
 </p:sld>
 </file>
 
-<file path=ppt/slides/slide28.xml><?xml version="1.0" encoding="utf-8"?>
+<file path=ppt/slides/slide29.xml><?xml version="1.0" encoding="utf-8"?>
 <p:sld xmlns:a="http://schemas.openxmlformats.org/drawingml/2006/main" xmlns:r="http://schemas.openxmlformats.org/officeDocument/2006/relationships" xmlns:p="http://schemas.openxmlformats.org/presentationml/2006/main">
   <p:cSld>
     <p:spTree>
@@ -28215,7 +28829,7 @@
           <a:p>
             <a:fld id="{E27E2812-4560-4165-A7C7-9C013F955547}" type="slidenum">
               <a:rPr kumimoji="1" lang="ja-JP" altLang="en-US" smtClean="0"/>
-              <a:t>28</a:t>
+              <a:t>29</a:t>
             </a:fld>
             <a:endParaRPr kumimoji="1" lang="ja-JP" altLang="en-US"/>
           </a:p>
@@ -28622,7 +29236,225 @@
 </p:sld>
 </file>
 
-<file path=ppt/slides/slide29.xml><?xml version="1.0" encoding="utf-8"?>
+<file path=ppt/slides/slide3.xml><?xml version="1.0" encoding="utf-8"?>
+<p:sld xmlns:a="http://schemas.openxmlformats.org/drawingml/2006/main" xmlns:r="http://schemas.openxmlformats.org/officeDocument/2006/relationships" xmlns:p="http://schemas.openxmlformats.org/presentationml/2006/main">
+  <p:cSld>
+    <p:spTree>
+      <p:nvGrpSpPr>
+        <p:cNvPr id="1" name=""/>
+        <p:cNvGrpSpPr/>
+        <p:nvPr/>
+      </p:nvGrpSpPr>
+      <p:grpSpPr>
+        <a:xfrm>
+          <a:off x="0" y="0"/>
+          <a:ext cx="0" cy="0"/>
+          <a:chOff x="0" y="0"/>
+          <a:chExt cx="0" cy="0"/>
+        </a:xfrm>
+      </p:grpSpPr>
+      <p:sp>
+        <p:nvSpPr>
+          <p:cNvPr id="4" name="タイトル 3">
+            <a:extLst>
+              <a:ext uri="{FF2B5EF4-FFF2-40B4-BE49-F238E27FC236}">
+                <a16:creationId xmlns:a16="http://schemas.microsoft.com/office/drawing/2014/main" id="{FB667DA0-7816-423C-ABB6-6E1A375E34C1}"/>
+              </a:ext>
+            </a:extLst>
+          </p:cNvPr>
+          <p:cNvSpPr>
+            <a:spLocks noGrp="1"/>
+          </p:cNvSpPr>
+          <p:nvPr>
+            <p:ph type="title"/>
+          </p:nvPr>
+        </p:nvSpPr>
+        <p:spPr/>
+        <p:txBody>
+          <a:bodyPr/>
+          <a:lstStyle/>
+          <a:p>
+            <a:r>
+              <a:rPr lang="en-US" altLang="ja-JP" dirty="0"/>
+              <a:t>Install &amp; Basic Settings</a:t>
+            </a:r>
+            <a:endParaRPr lang="ja-JP" altLang="en-US" dirty="0"/>
+          </a:p>
+        </p:txBody>
+      </p:sp>
+      <p:sp>
+        <p:nvSpPr>
+          <p:cNvPr id="5" name="コンテンツ プレースホルダー 4">
+            <a:extLst>
+              <a:ext uri="{FF2B5EF4-FFF2-40B4-BE49-F238E27FC236}">
+                <a16:creationId xmlns:a16="http://schemas.microsoft.com/office/drawing/2014/main" id="{AC69825B-3FB5-4D01-B59B-F0D6FED9FA79}"/>
+              </a:ext>
+            </a:extLst>
+          </p:cNvPr>
+          <p:cNvSpPr>
+            <a:spLocks noGrp="1"/>
+          </p:cNvSpPr>
+          <p:nvPr>
+            <p:ph idx="1"/>
+          </p:nvPr>
+        </p:nvSpPr>
+        <p:spPr/>
+        <p:txBody>
+          <a:bodyPr>
+            <a:normAutofit/>
+          </a:bodyPr>
+          <a:lstStyle/>
+          <a:p>
+            <a:r>
+              <a:rPr lang="en-US" altLang="ja-JP" dirty="0"/>
+              <a:t>Install</a:t>
+            </a:r>
+          </a:p>
+          <a:p>
+            <a:pPr lvl="1"/>
+            <a:r>
+              <a:rPr lang="en-US" altLang="ja-JP" dirty="0"/>
+              <a:t>Extract the downloaded zip file.</a:t>
+            </a:r>
+          </a:p>
+          <a:p>
+            <a:pPr lvl="1"/>
+            <a:r>
+              <a:rPr lang="en-US" altLang="ja-JP" dirty="0"/>
+              <a:t>Click MAmidiMEmo.exe</a:t>
+            </a:r>
+          </a:p>
+          <a:p>
+            <a:pPr lvl="1"/>
+            <a:r>
+              <a:rPr lang="en-US" altLang="ja-JP" dirty="0"/>
+              <a:t>Will open the </a:t>
+            </a:r>
+            <a:r>
+              <a:rPr lang="en-US" altLang="ja-JP" dirty="0" err="1"/>
+              <a:t>MAmidiMEmo</a:t>
+            </a:r>
+            <a:r>
+              <a:rPr lang="en-US" altLang="ja-JP" dirty="0"/>
+              <a:t>. If not, please check the followings.</a:t>
+            </a:r>
+          </a:p>
+          <a:p>
+            <a:pPr lvl="2"/>
+            <a:r>
+              <a:rPr lang="en-US" altLang="ja-JP" b="1" dirty="0"/>
+              <a:t>.NET Framework 4.7 or later </a:t>
+            </a:r>
+            <a:r>
+              <a:rPr lang="en-US" altLang="ja-JP" dirty="0"/>
+              <a:t>installed on your PC.</a:t>
+            </a:r>
+          </a:p>
+          <a:p>
+            <a:pPr lvl="2"/>
+            <a:r>
+              <a:rPr lang="en-US" altLang="ja-JP" b="1" dirty="0"/>
+              <a:t>VC++ 2012 Runtime </a:t>
+            </a:r>
+            <a:r>
+              <a:rPr lang="en-US" altLang="ja-JP" dirty="0"/>
+              <a:t>installed on your PC.</a:t>
+            </a:r>
+          </a:p>
+          <a:p>
+            <a:pPr lvl="2"/>
+            <a:r>
+              <a:rPr lang="en-US" altLang="ja-JP" dirty="0">
+                <a:solidFill>
+                  <a:schemeClr val="bg1">
+                    <a:lumMod val="65000"/>
+                  </a:schemeClr>
+                </a:solidFill>
+              </a:rPr>
+              <a:t>(Execute "DelZoneID.ps1“ to remove “</a:t>
+            </a:r>
+            <a:r>
+              <a:rPr lang="en-US" altLang="ja-JP" dirty="0" err="1">
+                <a:solidFill>
+                  <a:schemeClr val="bg1">
+                    <a:lumMod val="65000"/>
+                  </a:schemeClr>
+                </a:solidFill>
+              </a:rPr>
+              <a:t>Zone.Identifier</a:t>
+            </a:r>
+            <a:r>
+              <a:rPr lang="en-US" altLang="ja-JP" dirty="0">
+                <a:solidFill>
+                  <a:schemeClr val="bg1">
+                    <a:lumMod val="65000"/>
+                  </a:schemeClr>
+                </a:solidFill>
+              </a:rPr>
+              <a:t>” flag.)</a:t>
+            </a:r>
+          </a:p>
+          <a:p>
+            <a:pPr lvl="1"/>
+            <a:endParaRPr lang="ja-JP" altLang="en-US" dirty="0"/>
+          </a:p>
+        </p:txBody>
+      </p:sp>
+      <p:sp>
+        <p:nvSpPr>
+          <p:cNvPr id="2" name="スライド番号プレースホルダー 1">
+            <a:extLst>
+              <a:ext uri="{FF2B5EF4-FFF2-40B4-BE49-F238E27FC236}">
+                <a16:creationId xmlns:a16="http://schemas.microsoft.com/office/drawing/2014/main" id="{CC23E5B1-840D-4258-A81C-614C99CB76AA}"/>
+              </a:ext>
+            </a:extLst>
+          </p:cNvPr>
+          <p:cNvSpPr>
+            <a:spLocks noGrp="1"/>
+          </p:cNvSpPr>
+          <p:nvPr>
+            <p:ph type="sldNum" sz="quarter" idx="12"/>
+          </p:nvPr>
+        </p:nvSpPr>
+        <p:spPr/>
+        <p:txBody>
+          <a:bodyPr/>
+          <a:lstStyle/>
+          <a:p>
+            <a:fld id="{E27E2812-4560-4165-A7C7-9C013F955547}" type="slidenum">
+              <a:rPr kumimoji="1" lang="ja-JP" altLang="en-US" smtClean="0"/>
+              <a:t>3</a:t>
+            </a:fld>
+            <a:endParaRPr kumimoji="1" lang="ja-JP" altLang="en-US"/>
+          </a:p>
+        </p:txBody>
+      </p:sp>
+    </p:spTree>
+    <p:extLst>
+      <p:ext uri="{BB962C8B-B14F-4D97-AF65-F5344CB8AC3E}">
+        <p14:creationId xmlns:p14="http://schemas.microsoft.com/office/powerpoint/2010/main" val="1914892417"/>
+      </p:ext>
+    </p:extLst>
+  </p:cSld>
+  <p:clrMapOvr>
+    <a:masterClrMapping/>
+  </p:clrMapOvr>
+  <mc:AlternateContent xmlns:mc="http://schemas.openxmlformats.org/markup-compatibility/2006" xmlns:p14="http://schemas.microsoft.com/office/powerpoint/2010/main">
+    <mc:Choice Requires="p14">
+      <p:transition spd="med" p14:dur="700">
+        <p:fade/>
+      </p:transition>
+    </mc:Choice>
+    <mc:Fallback xmlns="">
+      <p:transition spd="med">
+        <p:fade/>
+      </p:transition>
+    </mc:Fallback>
+  </mc:AlternateContent>
+</p:sld>
+</file>
+
+<file path=ppt/slides/slide30.xml><?xml version="1.0" encoding="utf-8"?>
 <p:sld xmlns:a="http://schemas.openxmlformats.org/drawingml/2006/main" xmlns:r="http://schemas.openxmlformats.org/officeDocument/2006/relationships" xmlns:p="http://schemas.openxmlformats.org/presentationml/2006/main">
   <p:cSld>
     <p:spTree>
@@ -28691,7 +29523,7 @@
           <a:p>
             <a:fld id="{E27E2812-4560-4165-A7C7-9C013F955547}" type="slidenum">
               <a:rPr kumimoji="1" lang="ja-JP" altLang="en-US" smtClean="0"/>
-              <a:t>29</a:t>
+              <a:t>30</a:t>
             </a:fld>
             <a:endParaRPr kumimoji="1" lang="ja-JP" altLang="en-US"/>
           </a:p>
@@ -29364,225 +30196,7 @@
 </p:sld>
 </file>
 
-<file path=ppt/slides/slide3.xml><?xml version="1.0" encoding="utf-8"?>
-<p:sld xmlns:a="http://schemas.openxmlformats.org/drawingml/2006/main" xmlns:r="http://schemas.openxmlformats.org/officeDocument/2006/relationships" xmlns:p="http://schemas.openxmlformats.org/presentationml/2006/main">
-  <p:cSld>
-    <p:spTree>
-      <p:nvGrpSpPr>
-        <p:cNvPr id="1" name=""/>
-        <p:cNvGrpSpPr/>
-        <p:nvPr/>
-      </p:nvGrpSpPr>
-      <p:grpSpPr>
-        <a:xfrm>
-          <a:off x="0" y="0"/>
-          <a:ext cx="0" cy="0"/>
-          <a:chOff x="0" y="0"/>
-          <a:chExt cx="0" cy="0"/>
-        </a:xfrm>
-      </p:grpSpPr>
-      <p:sp>
-        <p:nvSpPr>
-          <p:cNvPr id="4" name="タイトル 3">
-            <a:extLst>
-              <a:ext uri="{FF2B5EF4-FFF2-40B4-BE49-F238E27FC236}">
-                <a16:creationId xmlns:a16="http://schemas.microsoft.com/office/drawing/2014/main" id="{FB667DA0-7816-423C-ABB6-6E1A375E34C1}"/>
-              </a:ext>
-            </a:extLst>
-          </p:cNvPr>
-          <p:cNvSpPr>
-            <a:spLocks noGrp="1"/>
-          </p:cNvSpPr>
-          <p:nvPr>
-            <p:ph type="title"/>
-          </p:nvPr>
-        </p:nvSpPr>
-        <p:spPr/>
-        <p:txBody>
-          <a:bodyPr/>
-          <a:lstStyle/>
-          <a:p>
-            <a:r>
-              <a:rPr lang="en-US" altLang="ja-JP" dirty="0"/>
-              <a:t>Install &amp; Basic Settings</a:t>
-            </a:r>
-            <a:endParaRPr lang="ja-JP" altLang="en-US" dirty="0"/>
-          </a:p>
-        </p:txBody>
-      </p:sp>
-      <p:sp>
-        <p:nvSpPr>
-          <p:cNvPr id="5" name="コンテンツ プレースホルダー 4">
-            <a:extLst>
-              <a:ext uri="{FF2B5EF4-FFF2-40B4-BE49-F238E27FC236}">
-                <a16:creationId xmlns:a16="http://schemas.microsoft.com/office/drawing/2014/main" id="{AC69825B-3FB5-4D01-B59B-F0D6FED9FA79}"/>
-              </a:ext>
-            </a:extLst>
-          </p:cNvPr>
-          <p:cNvSpPr>
-            <a:spLocks noGrp="1"/>
-          </p:cNvSpPr>
-          <p:nvPr>
-            <p:ph idx="1"/>
-          </p:nvPr>
-        </p:nvSpPr>
-        <p:spPr/>
-        <p:txBody>
-          <a:bodyPr>
-            <a:normAutofit/>
-          </a:bodyPr>
-          <a:lstStyle/>
-          <a:p>
-            <a:r>
-              <a:rPr lang="en-US" altLang="ja-JP" dirty="0"/>
-              <a:t>Install</a:t>
-            </a:r>
-          </a:p>
-          <a:p>
-            <a:pPr lvl="1"/>
-            <a:r>
-              <a:rPr lang="en-US" altLang="ja-JP" dirty="0"/>
-              <a:t>Extract the downloaded zip file.</a:t>
-            </a:r>
-          </a:p>
-          <a:p>
-            <a:pPr lvl="1"/>
-            <a:r>
-              <a:rPr lang="en-US" altLang="ja-JP" dirty="0"/>
-              <a:t>Click MAmidiMEmo.exe</a:t>
-            </a:r>
-          </a:p>
-          <a:p>
-            <a:pPr lvl="1"/>
-            <a:r>
-              <a:rPr lang="en-US" altLang="ja-JP" dirty="0"/>
-              <a:t>Will open the </a:t>
-            </a:r>
-            <a:r>
-              <a:rPr lang="en-US" altLang="ja-JP" dirty="0" err="1"/>
-              <a:t>MAmidiMEmo</a:t>
-            </a:r>
-            <a:r>
-              <a:rPr lang="en-US" altLang="ja-JP" dirty="0"/>
-              <a:t>. If not, please check the followings.</a:t>
-            </a:r>
-          </a:p>
-          <a:p>
-            <a:pPr lvl="2"/>
-            <a:r>
-              <a:rPr lang="en-US" altLang="ja-JP" b="1" dirty="0"/>
-              <a:t>.NET Framework 4.7 or later </a:t>
-            </a:r>
-            <a:r>
-              <a:rPr lang="en-US" altLang="ja-JP" dirty="0"/>
-              <a:t>installed on your PC.</a:t>
-            </a:r>
-          </a:p>
-          <a:p>
-            <a:pPr lvl="2"/>
-            <a:r>
-              <a:rPr lang="en-US" altLang="ja-JP" b="1" dirty="0"/>
-              <a:t>VC++ 2012 Runtime </a:t>
-            </a:r>
-            <a:r>
-              <a:rPr lang="en-US" altLang="ja-JP" dirty="0"/>
-              <a:t>installed on your PC.</a:t>
-            </a:r>
-          </a:p>
-          <a:p>
-            <a:pPr lvl="2"/>
-            <a:r>
-              <a:rPr lang="en-US" altLang="ja-JP" dirty="0">
-                <a:solidFill>
-                  <a:schemeClr val="bg1">
-                    <a:lumMod val="65000"/>
-                  </a:schemeClr>
-                </a:solidFill>
-              </a:rPr>
-              <a:t>(Execute "DelZoneID.ps1“ to remove “</a:t>
-            </a:r>
-            <a:r>
-              <a:rPr lang="en-US" altLang="ja-JP" dirty="0" err="1">
-                <a:solidFill>
-                  <a:schemeClr val="bg1">
-                    <a:lumMod val="65000"/>
-                  </a:schemeClr>
-                </a:solidFill>
-              </a:rPr>
-              <a:t>Zone.Identifier</a:t>
-            </a:r>
-            <a:r>
-              <a:rPr lang="en-US" altLang="ja-JP" dirty="0">
-                <a:solidFill>
-                  <a:schemeClr val="bg1">
-                    <a:lumMod val="65000"/>
-                  </a:schemeClr>
-                </a:solidFill>
-              </a:rPr>
-              <a:t>” flag.)</a:t>
-            </a:r>
-          </a:p>
-          <a:p>
-            <a:pPr lvl="1"/>
-            <a:endParaRPr lang="ja-JP" altLang="en-US" dirty="0"/>
-          </a:p>
-        </p:txBody>
-      </p:sp>
-      <p:sp>
-        <p:nvSpPr>
-          <p:cNvPr id="2" name="スライド番号プレースホルダー 1">
-            <a:extLst>
-              <a:ext uri="{FF2B5EF4-FFF2-40B4-BE49-F238E27FC236}">
-                <a16:creationId xmlns:a16="http://schemas.microsoft.com/office/drawing/2014/main" id="{CC23E5B1-840D-4258-A81C-614C99CB76AA}"/>
-              </a:ext>
-            </a:extLst>
-          </p:cNvPr>
-          <p:cNvSpPr>
-            <a:spLocks noGrp="1"/>
-          </p:cNvSpPr>
-          <p:nvPr>
-            <p:ph type="sldNum" sz="quarter" idx="12"/>
-          </p:nvPr>
-        </p:nvSpPr>
-        <p:spPr/>
-        <p:txBody>
-          <a:bodyPr/>
-          <a:lstStyle/>
-          <a:p>
-            <a:fld id="{E27E2812-4560-4165-A7C7-9C013F955547}" type="slidenum">
-              <a:rPr kumimoji="1" lang="ja-JP" altLang="en-US" smtClean="0"/>
-              <a:t>3</a:t>
-            </a:fld>
-            <a:endParaRPr kumimoji="1" lang="ja-JP" altLang="en-US"/>
-          </a:p>
-        </p:txBody>
-      </p:sp>
-    </p:spTree>
-    <p:extLst>
-      <p:ext uri="{BB962C8B-B14F-4D97-AF65-F5344CB8AC3E}">
-        <p14:creationId xmlns:p14="http://schemas.microsoft.com/office/powerpoint/2010/main" val="1914892417"/>
-      </p:ext>
-    </p:extLst>
-  </p:cSld>
-  <p:clrMapOvr>
-    <a:masterClrMapping/>
-  </p:clrMapOvr>
-  <mc:AlternateContent xmlns:mc="http://schemas.openxmlformats.org/markup-compatibility/2006" xmlns:p14="http://schemas.microsoft.com/office/powerpoint/2010/main">
-    <mc:Choice Requires="p14">
-      <p:transition spd="med" p14:dur="700">
-        <p:fade/>
-      </p:transition>
-    </mc:Choice>
-    <mc:Fallback xmlns="">
-      <p:transition spd="med">
-        <p:fade/>
-      </p:transition>
-    </mc:Fallback>
-  </mc:AlternateContent>
-</p:sld>
-</file>
-
-<file path=ppt/slides/slide30.xml><?xml version="1.0" encoding="utf-8"?>
+<file path=ppt/slides/slide31.xml><?xml version="1.0" encoding="utf-8"?>
 <p:sld xmlns:a="http://schemas.openxmlformats.org/drawingml/2006/main" xmlns:r="http://schemas.openxmlformats.org/officeDocument/2006/relationships" xmlns:p="http://schemas.openxmlformats.org/presentationml/2006/main">
   <p:cSld>
     <p:spTree>
@@ -29730,7 +30344,7 @@
           <a:p>
             <a:fld id="{E27E2812-4560-4165-A7C7-9C013F955547}" type="slidenum">
               <a:rPr kumimoji="1" lang="ja-JP" altLang="en-US" smtClean="0"/>
-              <a:t>30</a:t>
+              <a:t>31</a:t>
             </a:fld>
             <a:endParaRPr kumimoji="1" lang="ja-JP" altLang="en-US"/>
           </a:p>
@@ -29921,7 +30535,7 @@
 </p:sld>
 </file>
 
-<file path=ppt/slides/slide31.xml><?xml version="1.0" encoding="utf-8"?>
+<file path=ppt/slides/slide32.xml><?xml version="1.0" encoding="utf-8"?>
 <p:sld xmlns:a="http://schemas.openxmlformats.org/drawingml/2006/main" xmlns:r="http://schemas.openxmlformats.org/officeDocument/2006/relationships" xmlns:p="http://schemas.openxmlformats.org/presentationml/2006/main">
   <p:cSld>
     <p:spTree>
@@ -30193,7 +30807,7 @@
           <a:p>
             <a:fld id="{E27E2812-4560-4165-A7C7-9C013F955547}" type="slidenum">
               <a:rPr kumimoji="1" lang="ja-JP" altLang="en-US" smtClean="0"/>
-              <a:t>31</a:t>
+              <a:t>32</a:t>
             </a:fld>
             <a:endParaRPr kumimoji="1" lang="ja-JP" altLang="en-US"/>
           </a:p>

</xml_diff>

<commit_message>
Added VSIF for C64 (preliminary)
</commit_message>
<xml_diff>
--- a/docs/MAmidiMEmo/Manual.pptx
+++ b/docs/MAmidiMEmo/Manual.pptx
@@ -5,7 +5,7 @@
     <p:sldMasterId id="2147483678" r:id="rId1"/>
   </p:sldMasterIdLst>
   <p:notesMasterIdLst>
-    <p:notesMasterId r:id="rId34"/>
+    <p:notesMasterId r:id="rId35"/>
   </p:notesMasterIdLst>
   <p:sldIdLst>
     <p:sldId id="256" r:id="rId2"/>
@@ -26,20 +26,21 @@
     <p:sldId id="274" r:id="rId17"/>
     <p:sldId id="277" r:id="rId18"/>
     <p:sldId id="286" r:id="rId19"/>
-    <p:sldId id="273" r:id="rId20"/>
-    <p:sldId id="278" r:id="rId21"/>
-    <p:sldId id="275" r:id="rId22"/>
-    <p:sldId id="290" r:id="rId23"/>
-    <p:sldId id="264" r:id="rId24"/>
-    <p:sldId id="279" r:id="rId25"/>
-    <p:sldId id="280" r:id="rId26"/>
-    <p:sldId id="281" r:id="rId27"/>
-    <p:sldId id="282" r:id="rId28"/>
-    <p:sldId id="283" r:id="rId29"/>
-    <p:sldId id="285" r:id="rId30"/>
-    <p:sldId id="284" r:id="rId31"/>
-    <p:sldId id="288" r:id="rId32"/>
-    <p:sldId id="287" r:id="rId33"/>
+    <p:sldId id="291" r:id="rId20"/>
+    <p:sldId id="273" r:id="rId21"/>
+    <p:sldId id="278" r:id="rId22"/>
+    <p:sldId id="275" r:id="rId23"/>
+    <p:sldId id="290" r:id="rId24"/>
+    <p:sldId id="264" r:id="rId25"/>
+    <p:sldId id="279" r:id="rId26"/>
+    <p:sldId id="280" r:id="rId27"/>
+    <p:sldId id="281" r:id="rId28"/>
+    <p:sldId id="282" r:id="rId29"/>
+    <p:sldId id="283" r:id="rId30"/>
+    <p:sldId id="285" r:id="rId31"/>
+    <p:sldId id="284" r:id="rId32"/>
+    <p:sldId id="288" r:id="rId33"/>
+    <p:sldId id="287" r:id="rId34"/>
   </p:sldIdLst>
   <p:sldSz cx="12192000" cy="6858000"/>
   <p:notesSz cx="6858000" cy="9144000"/>
@@ -228,7 +229,7 @@
           <a:p>
             <a:fld id="{581C28D8-13B6-41C3-9F5F-0284C569C6F1}" type="datetimeFigureOut">
               <a:rPr kumimoji="1" lang="ja-JP" altLang="en-US" smtClean="0"/>
-              <a:t>2022/2/20</a:t>
+              <a:t>2022/8/20</a:t>
             </a:fld>
             <a:endParaRPr kumimoji="1" lang="ja-JP" altLang="en-US"/>
           </a:p>
@@ -1021,7 +1022,7 @@
     </p:spTree>
     <p:extLst>
       <p:ext uri="{BB962C8B-B14F-4D97-AF65-F5344CB8AC3E}">
-        <p14:creationId xmlns:p14="http://schemas.microsoft.com/office/powerpoint/2010/main" val="901084948"/>
+        <p14:creationId xmlns:p14="http://schemas.microsoft.com/office/powerpoint/2010/main" val="4040367090"/>
       </p:ext>
     </p:extLst>
   </p:cSld>
@@ -1097,6 +1098,90 @@
             <a:fld id="{E8D2F5C4-CB40-44D3-9C89-5ECCD9AB4B5C}" type="slidenum">
               <a:rPr kumimoji="1" lang="ja-JP" altLang="en-US" smtClean="0"/>
               <a:t>20</a:t>
+            </a:fld>
+            <a:endParaRPr kumimoji="1" lang="ja-JP" altLang="en-US"/>
+          </a:p>
+        </p:txBody>
+      </p:sp>
+    </p:spTree>
+    <p:extLst>
+      <p:ext uri="{BB962C8B-B14F-4D97-AF65-F5344CB8AC3E}">
+        <p14:creationId xmlns:p14="http://schemas.microsoft.com/office/powerpoint/2010/main" val="901084948"/>
+      </p:ext>
+    </p:extLst>
+  </p:cSld>
+  <p:clrMapOvr>
+    <a:masterClrMapping/>
+  </p:clrMapOvr>
+</p:notes>
+</file>
+
+<file path=ppt/notesSlides/notesSlide8.xml><?xml version="1.0" encoding="utf-8"?>
+<p:notes xmlns:a="http://schemas.openxmlformats.org/drawingml/2006/main" xmlns:r="http://schemas.openxmlformats.org/officeDocument/2006/relationships" xmlns:p="http://schemas.openxmlformats.org/presentationml/2006/main">
+  <p:cSld>
+    <p:spTree>
+      <p:nvGrpSpPr>
+        <p:cNvPr id="1" name=""/>
+        <p:cNvGrpSpPr/>
+        <p:nvPr/>
+      </p:nvGrpSpPr>
+      <p:grpSpPr>
+        <a:xfrm>
+          <a:off x="0" y="0"/>
+          <a:ext cx="0" cy="0"/>
+          <a:chOff x="0" y="0"/>
+          <a:chExt cx="0" cy="0"/>
+        </a:xfrm>
+      </p:grpSpPr>
+      <p:sp>
+        <p:nvSpPr>
+          <p:cNvPr id="2" name="スライド イメージ プレースホルダー 1"/>
+          <p:cNvSpPr>
+            <a:spLocks noGrp="1" noRot="1" noChangeAspect="1"/>
+          </p:cNvSpPr>
+          <p:nvPr>
+            <p:ph type="sldImg"/>
+          </p:nvPr>
+        </p:nvSpPr>
+        <p:spPr/>
+      </p:sp>
+      <p:sp>
+        <p:nvSpPr>
+          <p:cNvPr id="3" name="ノート プレースホルダー 2"/>
+          <p:cNvSpPr>
+            <a:spLocks noGrp="1"/>
+          </p:cNvSpPr>
+          <p:nvPr>
+            <p:ph type="body" idx="1"/>
+          </p:nvPr>
+        </p:nvSpPr>
+        <p:spPr/>
+        <p:txBody>
+          <a:bodyPr/>
+          <a:lstStyle/>
+          <a:p>
+            <a:endParaRPr kumimoji="1" lang="ja-JP" altLang="en-US" dirty="0"/>
+          </a:p>
+        </p:txBody>
+      </p:sp>
+      <p:sp>
+        <p:nvSpPr>
+          <p:cNvPr id="4" name="スライド番号プレースホルダー 3"/>
+          <p:cNvSpPr>
+            <a:spLocks noGrp="1"/>
+          </p:cNvSpPr>
+          <p:nvPr>
+            <p:ph type="sldNum" sz="quarter" idx="5"/>
+          </p:nvPr>
+        </p:nvSpPr>
+        <p:spPr/>
+        <p:txBody>
+          <a:bodyPr/>
+          <a:lstStyle/>
+          <a:p>
+            <a:fld id="{E8D2F5C4-CB40-44D3-9C89-5ECCD9AB4B5C}" type="slidenum">
+              <a:rPr kumimoji="1" lang="ja-JP" altLang="en-US" smtClean="0"/>
+              <a:t>21</a:t>
             </a:fld>
             <a:endParaRPr kumimoji="1" lang="ja-JP" altLang="en-US"/>
           </a:p>
@@ -1303,7 +1388,7 @@
           <a:p>
             <a:fld id="{B8625E62-B904-4691-B75E-EC1C32885285}" type="datetime1">
               <a:rPr kumimoji="1" lang="ja-JP" altLang="en-US" smtClean="0"/>
-              <a:t>2022/2/20</a:t>
+              <a:t>2022/8/20</a:t>
             </a:fld>
             <a:endParaRPr kumimoji="1" lang="ja-JP" altLang="en-US"/>
           </a:p>
@@ -1641,7 +1726,7 @@
           <a:p>
             <a:fld id="{A4C87007-2A40-4EFC-90A3-258EFA3C1001}" type="datetime1">
               <a:rPr kumimoji="1" lang="ja-JP" altLang="en-US" smtClean="0"/>
-              <a:t>2022/2/20</a:t>
+              <a:t>2022/8/20</a:t>
             </a:fld>
             <a:endParaRPr kumimoji="1" lang="ja-JP" altLang="en-US"/>
           </a:p>
@@ -2042,7 +2127,7 @@
           <a:p>
             <a:fld id="{0FE0D7FF-9203-4AA3-90FD-622674A14F90}" type="datetime1">
               <a:rPr kumimoji="1" lang="ja-JP" altLang="en-US" smtClean="0"/>
-              <a:t>2022/2/20</a:t>
+              <a:t>2022/8/20</a:t>
             </a:fld>
             <a:endParaRPr kumimoji="1" lang="ja-JP" altLang="en-US"/>
           </a:p>
@@ -2378,7 +2463,7 @@
           <a:p>
             <a:fld id="{D2D6E4D3-BEDB-4F35-876B-5B9AA41BFB5B}" type="datetime1">
               <a:rPr kumimoji="1" lang="ja-JP" altLang="en-US" smtClean="0"/>
-              <a:t>2022/2/20</a:t>
+              <a:t>2022/8/20</a:t>
             </a:fld>
             <a:endParaRPr kumimoji="1" lang="ja-JP" altLang="en-US"/>
           </a:p>
@@ -2698,7 +2783,7 @@
           <a:p>
             <a:fld id="{2ACD896E-FC14-4F25-BC47-18ABAEA9E1FE}" type="datetime1">
               <a:rPr kumimoji="1" lang="ja-JP" altLang="en-US" smtClean="0"/>
-              <a:t>2022/2/20</a:t>
+              <a:t>2022/8/20</a:t>
             </a:fld>
             <a:endParaRPr kumimoji="1" lang="ja-JP" altLang="en-US"/>
           </a:p>
@@ -3094,7 +3179,7 @@
           <a:p>
             <a:fld id="{54FC701B-2185-4987-B8E2-5507664B65F4}" type="datetime1">
               <a:rPr kumimoji="1" lang="ja-JP" altLang="en-US" smtClean="0"/>
-              <a:t>2022/2/20</a:t>
+              <a:t>2022/8/20</a:t>
             </a:fld>
             <a:endParaRPr kumimoji="1" lang="ja-JP" altLang="en-US"/>
           </a:p>
@@ -3383,7 +3468,7 @@
           <a:p>
             <a:fld id="{3FB4CDED-9617-418F-B546-D66B9BB6C35E}" type="datetime1">
               <a:rPr kumimoji="1" lang="ja-JP" altLang="en-US" smtClean="0"/>
-              <a:t>2022/2/20</a:t>
+              <a:t>2022/8/20</a:t>
             </a:fld>
             <a:endParaRPr kumimoji="1" lang="ja-JP" altLang="en-US"/>
           </a:p>
@@ -3677,7 +3762,7 @@
           <a:p>
             <a:fld id="{F5635D40-962A-46D7-8037-3F2900B5EB4D}" type="datetime1">
               <a:rPr kumimoji="1" lang="ja-JP" altLang="en-US" smtClean="0"/>
-              <a:t>2022/2/20</a:t>
+              <a:t>2022/8/20</a:t>
             </a:fld>
             <a:endParaRPr kumimoji="1" lang="ja-JP" altLang="en-US"/>
           </a:p>
@@ -3971,7 +4056,7 @@
           <a:p>
             <a:fld id="{741DA9A2-8356-4FFD-B66A-E38811049858}" type="datetime1">
               <a:rPr kumimoji="1" lang="ja-JP" altLang="en-US" smtClean="0"/>
-              <a:t>2022/2/20</a:t>
+              <a:t>2022/8/20</a:t>
             </a:fld>
             <a:endParaRPr kumimoji="1" lang="ja-JP" altLang="en-US"/>
           </a:p>
@@ -4300,7 +4385,7 @@
           <a:p>
             <a:fld id="{9DDE8989-88B8-4869-97D9-547531F13E13}" type="datetime1">
               <a:rPr kumimoji="1" lang="ja-JP" altLang="en-US" smtClean="0"/>
-              <a:t>2022/2/20</a:t>
+              <a:t>2022/8/20</a:t>
             </a:fld>
             <a:endParaRPr kumimoji="1" lang="ja-JP" altLang="en-US"/>
           </a:p>
@@ -4687,7 +4772,7 @@
           <a:p>
             <a:fld id="{81EC4031-B949-4300-AB3E-1551426E8631}" type="datetime1">
               <a:rPr kumimoji="1" lang="ja-JP" altLang="en-US" smtClean="0"/>
-              <a:t>2022/2/20</a:t>
+              <a:t>2022/8/20</a:t>
             </a:fld>
             <a:endParaRPr kumimoji="1" lang="ja-JP" altLang="en-US"/>
           </a:p>
@@ -5208,7 +5293,7 @@
           <a:p>
             <a:fld id="{F39E755E-A59D-4634-B604-E9BB568B1156}" type="datetime1">
               <a:rPr kumimoji="1" lang="ja-JP" altLang="en-US" smtClean="0"/>
-              <a:t>2022/2/20</a:t>
+              <a:t>2022/8/20</a:t>
             </a:fld>
             <a:endParaRPr kumimoji="1" lang="ja-JP" altLang="en-US"/>
           </a:p>
@@ -5413,7 +5498,7 @@
           <a:p>
             <a:fld id="{61DA38B3-7601-4256-ABFE-386B92B0EDB5}" type="datetime1">
               <a:rPr kumimoji="1" lang="ja-JP" altLang="en-US" smtClean="0"/>
-              <a:t>2022/2/20</a:t>
+              <a:t>2022/8/20</a:t>
             </a:fld>
             <a:endParaRPr kumimoji="1" lang="ja-JP" altLang="en-US"/>
           </a:p>
@@ -5590,7 +5675,7 @@
           <a:p>
             <a:fld id="{5A28ED6D-8A94-4DBA-8EF2-284D1A467CE8}" type="datetime1">
               <a:rPr kumimoji="1" lang="ja-JP" altLang="en-US" smtClean="0"/>
-              <a:t>2022/2/20</a:t>
+              <a:t>2022/8/20</a:t>
             </a:fld>
             <a:endParaRPr kumimoji="1" lang="ja-JP" altLang="en-US"/>
           </a:p>
@@ -5955,7 +6040,7 @@
           <a:p>
             <a:fld id="{B27B0317-28AF-43C5-8944-AADFA89E0149}" type="datetime1">
               <a:rPr kumimoji="1" lang="ja-JP" altLang="en-US" smtClean="0"/>
-              <a:t>2022/2/20</a:t>
+              <a:t>2022/8/20</a:t>
             </a:fld>
             <a:endParaRPr kumimoji="1" lang="ja-JP" altLang="en-US"/>
           </a:p>
@@ -6300,7 +6385,7 @@
           <a:p>
             <a:fld id="{A78D023C-C4FA-4CE8-B5BE-6798898EE377}" type="datetime1">
               <a:rPr kumimoji="1" lang="ja-JP" altLang="en-US" smtClean="0"/>
-              <a:t>2022/2/20</a:t>
+              <a:t>2022/8/20</a:t>
             </a:fld>
             <a:endParaRPr kumimoji="1" lang="ja-JP" altLang="en-US"/>
           </a:p>
@@ -8449,7 +8534,7 @@
           <a:p>
             <a:fld id="{99567159-F4A8-4352-915B-DDBEFEF4A4D6}" type="datetime1">
               <a:rPr kumimoji="1" lang="ja-JP" altLang="en-US" smtClean="0"/>
-              <a:t>2022/2/20</a:t>
+              <a:t>2022/8/20</a:t>
             </a:fld>
             <a:endParaRPr kumimoji="1" lang="ja-JP" altLang="en-US"/>
           </a:p>
@@ -13631,6 +13716,94 @@
           </a:p>
         </p:txBody>
       </p:sp>
+      <p:sp>
+        <p:nvSpPr>
+          <p:cNvPr id="6" name="正方形/長方形 5">
+            <a:extLst>
+              <a:ext uri="{FF2B5EF4-FFF2-40B4-BE49-F238E27FC236}">
+                <a16:creationId xmlns:a16="http://schemas.microsoft.com/office/drawing/2014/main" id="{9DD1A2E0-7216-A762-4AE0-CFCAD963A83A}"/>
+              </a:ext>
+            </a:extLst>
+          </p:cNvPr>
+          <p:cNvSpPr/>
+          <p:nvPr/>
+        </p:nvSpPr>
+        <p:spPr>
+          <a:xfrm>
+            <a:off x="8468436" y="5973782"/>
+            <a:ext cx="1061373" cy="830997"/>
+          </a:xfrm>
+          <a:prstGeom prst="rect">
+            <a:avLst/>
+          </a:prstGeom>
+          <a:solidFill>
+            <a:schemeClr val="bg1"/>
+          </a:solidFill>
+        </p:spPr>
+        <p:style>
+          <a:lnRef idx="2">
+            <a:schemeClr val="accent1">
+              <a:shade val="50000"/>
+            </a:schemeClr>
+          </a:lnRef>
+          <a:fillRef idx="1">
+            <a:schemeClr val="accent1"/>
+          </a:fillRef>
+          <a:effectRef idx="0">
+            <a:schemeClr val="accent1"/>
+          </a:effectRef>
+          <a:fontRef idx="minor">
+            <a:schemeClr val="lt1"/>
+          </a:fontRef>
+        </p:style>
+        <p:txBody>
+          <a:bodyPr rtlCol="0" anchor="ctr"/>
+          <a:lstStyle/>
+          <a:p>
+            <a:pPr algn="ctr"/>
+            <a:r>
+              <a:rPr kumimoji="1" lang="en-US" altLang="ja-JP" sz="1200" b="1" dirty="0">
+                <a:solidFill>
+                  <a:srgbClr val="FF0000"/>
+                </a:solidFill>
+              </a:rPr>
+              <a:t>Do</a:t>
+            </a:r>
+            <a:r>
+              <a:rPr kumimoji="1" lang="ja-JP" altLang="en-US" sz="1200" b="1" dirty="0">
+                <a:solidFill>
+                  <a:srgbClr val="FF0000"/>
+                </a:solidFill>
+              </a:rPr>
+              <a:t> </a:t>
+            </a:r>
+            <a:r>
+              <a:rPr kumimoji="1" lang="en-US" altLang="ja-JP" sz="1200" b="1" dirty="0">
+                <a:solidFill>
+                  <a:srgbClr val="FF0000"/>
+                </a:solidFill>
+              </a:rPr>
+              <a:t>not</a:t>
+            </a:r>
+          </a:p>
+          <a:p>
+            <a:pPr algn="ctr"/>
+            <a:r>
+              <a:rPr kumimoji="1" lang="en-US" altLang="ja-JP" sz="1200" b="1" dirty="0">
+                <a:solidFill>
+                  <a:srgbClr val="FF0000"/>
+                </a:solidFill>
+              </a:rPr>
+              <a:t>short any pin.</a:t>
+            </a:r>
+            <a:endParaRPr kumimoji="1" lang="ja-JP" altLang="en-US" sz="1200" b="1" dirty="0">
+              <a:solidFill>
+                <a:srgbClr val="FF0000"/>
+              </a:solidFill>
+            </a:endParaRPr>
+          </a:p>
+        </p:txBody>
+      </p:sp>
     </p:spTree>
     <p:extLst>
       <p:ext uri="{BB962C8B-B14F-4D97-AF65-F5344CB8AC3E}">
@@ -14906,6 +15079,94 @@
           </a:prstGeom>
         </p:spPr>
       </p:pic>
+      <p:sp>
+        <p:nvSpPr>
+          <p:cNvPr id="7" name="正方形/長方形 6">
+            <a:extLst>
+              <a:ext uri="{FF2B5EF4-FFF2-40B4-BE49-F238E27FC236}">
+                <a16:creationId xmlns:a16="http://schemas.microsoft.com/office/drawing/2014/main" id="{4081594D-7231-EAF3-1479-1343656D9716}"/>
+              </a:ext>
+            </a:extLst>
+          </p:cNvPr>
+          <p:cNvSpPr/>
+          <p:nvPr/>
+        </p:nvSpPr>
+        <p:spPr>
+          <a:xfrm>
+            <a:off x="8809630" y="5983463"/>
+            <a:ext cx="873034" cy="821316"/>
+          </a:xfrm>
+          <a:prstGeom prst="rect">
+            <a:avLst/>
+          </a:prstGeom>
+          <a:solidFill>
+            <a:schemeClr val="bg1"/>
+          </a:solidFill>
+        </p:spPr>
+        <p:style>
+          <a:lnRef idx="2">
+            <a:schemeClr val="accent1">
+              <a:shade val="50000"/>
+            </a:schemeClr>
+          </a:lnRef>
+          <a:fillRef idx="1">
+            <a:schemeClr val="accent1"/>
+          </a:fillRef>
+          <a:effectRef idx="0">
+            <a:schemeClr val="accent1"/>
+          </a:effectRef>
+          <a:fontRef idx="minor">
+            <a:schemeClr val="lt1"/>
+          </a:fontRef>
+        </p:style>
+        <p:txBody>
+          <a:bodyPr rtlCol="0" anchor="ctr"/>
+          <a:lstStyle/>
+          <a:p>
+            <a:pPr algn="ctr"/>
+            <a:r>
+              <a:rPr kumimoji="1" lang="en-US" altLang="ja-JP" sz="1200" b="1" dirty="0">
+                <a:solidFill>
+                  <a:srgbClr val="FF0000"/>
+                </a:solidFill>
+              </a:rPr>
+              <a:t>Do</a:t>
+            </a:r>
+            <a:r>
+              <a:rPr kumimoji="1" lang="ja-JP" altLang="en-US" sz="1200" b="1" dirty="0">
+                <a:solidFill>
+                  <a:srgbClr val="FF0000"/>
+                </a:solidFill>
+              </a:rPr>
+              <a:t> </a:t>
+            </a:r>
+            <a:r>
+              <a:rPr kumimoji="1" lang="en-US" altLang="ja-JP" sz="1200" b="1" dirty="0">
+                <a:solidFill>
+                  <a:srgbClr val="FF0000"/>
+                </a:solidFill>
+              </a:rPr>
+              <a:t>not</a:t>
+            </a:r>
+          </a:p>
+          <a:p>
+            <a:pPr algn="ctr"/>
+            <a:r>
+              <a:rPr kumimoji="1" lang="en-US" altLang="ja-JP" sz="1200" b="1" dirty="0">
+                <a:solidFill>
+                  <a:srgbClr val="FF0000"/>
+                </a:solidFill>
+              </a:rPr>
+              <a:t>short any pin.</a:t>
+            </a:r>
+            <a:endParaRPr kumimoji="1" lang="ja-JP" altLang="en-US" sz="1200" b="1" dirty="0">
+              <a:solidFill>
+                <a:srgbClr val="FF0000"/>
+              </a:solidFill>
+            </a:endParaRPr>
+          </a:p>
+        </p:txBody>
+      </p:sp>
     </p:spTree>
     <p:extLst>
       <p:ext uri="{BB962C8B-B14F-4D97-AF65-F5344CB8AC3E}">
@@ -15984,6 +16245,94 @@
           </a:p>
         </p:txBody>
       </p:sp>
+      <p:sp>
+        <p:nvSpPr>
+          <p:cNvPr id="5" name="正方形/長方形 4">
+            <a:extLst>
+              <a:ext uri="{FF2B5EF4-FFF2-40B4-BE49-F238E27FC236}">
+                <a16:creationId xmlns:a16="http://schemas.microsoft.com/office/drawing/2014/main" id="{88AF3AD2-DA31-E7A0-5031-F17FB9C6F806}"/>
+              </a:ext>
+            </a:extLst>
+          </p:cNvPr>
+          <p:cNvSpPr/>
+          <p:nvPr/>
+        </p:nvSpPr>
+        <p:spPr>
+          <a:xfrm>
+            <a:off x="8721955" y="6056052"/>
+            <a:ext cx="807854" cy="748727"/>
+          </a:xfrm>
+          <a:prstGeom prst="rect">
+            <a:avLst/>
+          </a:prstGeom>
+          <a:solidFill>
+            <a:schemeClr val="bg1"/>
+          </a:solidFill>
+        </p:spPr>
+        <p:style>
+          <a:lnRef idx="2">
+            <a:schemeClr val="accent1">
+              <a:shade val="50000"/>
+            </a:schemeClr>
+          </a:lnRef>
+          <a:fillRef idx="1">
+            <a:schemeClr val="accent1"/>
+          </a:fillRef>
+          <a:effectRef idx="0">
+            <a:schemeClr val="accent1"/>
+          </a:effectRef>
+          <a:fontRef idx="minor">
+            <a:schemeClr val="lt1"/>
+          </a:fontRef>
+        </p:style>
+        <p:txBody>
+          <a:bodyPr rtlCol="0" anchor="ctr"/>
+          <a:lstStyle/>
+          <a:p>
+            <a:pPr algn="ctr"/>
+            <a:r>
+              <a:rPr kumimoji="1" lang="en-US" altLang="ja-JP" sz="1200" b="1" dirty="0">
+                <a:solidFill>
+                  <a:srgbClr val="FF0000"/>
+                </a:solidFill>
+              </a:rPr>
+              <a:t>Do</a:t>
+            </a:r>
+            <a:r>
+              <a:rPr kumimoji="1" lang="ja-JP" altLang="en-US" sz="1200" b="1" dirty="0">
+                <a:solidFill>
+                  <a:srgbClr val="FF0000"/>
+                </a:solidFill>
+              </a:rPr>
+              <a:t> </a:t>
+            </a:r>
+            <a:r>
+              <a:rPr kumimoji="1" lang="en-US" altLang="ja-JP" sz="1200" b="1" dirty="0">
+                <a:solidFill>
+                  <a:srgbClr val="FF0000"/>
+                </a:solidFill>
+              </a:rPr>
+              <a:t>not</a:t>
+            </a:r>
+          </a:p>
+          <a:p>
+            <a:pPr algn="ctr"/>
+            <a:r>
+              <a:rPr kumimoji="1" lang="en-US" altLang="ja-JP" sz="1200" b="1" dirty="0">
+                <a:solidFill>
+                  <a:srgbClr val="FF0000"/>
+                </a:solidFill>
+              </a:rPr>
+              <a:t>short any pin.</a:t>
+            </a:r>
+            <a:endParaRPr kumimoji="1" lang="ja-JP" altLang="en-US" sz="1200" b="1" dirty="0">
+              <a:solidFill>
+                <a:srgbClr val="FF0000"/>
+              </a:solidFill>
+            </a:endParaRPr>
+          </a:p>
+        </p:txBody>
+      </p:sp>
     </p:spTree>
     <p:extLst>
       <p:ext uri="{BB962C8B-B14F-4D97-AF65-F5344CB8AC3E}">
@@ -17094,6 +17443,94 @@
           </a:fontRef>
         </p:style>
       </p:cxnSp>
+      <p:sp>
+        <p:nvSpPr>
+          <p:cNvPr id="7" name="正方形/長方形 6">
+            <a:extLst>
+              <a:ext uri="{FF2B5EF4-FFF2-40B4-BE49-F238E27FC236}">
+                <a16:creationId xmlns:a16="http://schemas.microsoft.com/office/drawing/2014/main" id="{4218F38B-941B-9710-5159-5FB32B1B720A}"/>
+              </a:ext>
+            </a:extLst>
+          </p:cNvPr>
+          <p:cNvSpPr/>
+          <p:nvPr/>
+        </p:nvSpPr>
+        <p:spPr>
+          <a:xfrm>
+            <a:off x="8721955" y="5984562"/>
+            <a:ext cx="807854" cy="820217"/>
+          </a:xfrm>
+          <a:prstGeom prst="rect">
+            <a:avLst/>
+          </a:prstGeom>
+          <a:solidFill>
+            <a:schemeClr val="bg1"/>
+          </a:solidFill>
+        </p:spPr>
+        <p:style>
+          <a:lnRef idx="2">
+            <a:schemeClr val="accent1">
+              <a:shade val="50000"/>
+            </a:schemeClr>
+          </a:lnRef>
+          <a:fillRef idx="1">
+            <a:schemeClr val="accent1"/>
+          </a:fillRef>
+          <a:effectRef idx="0">
+            <a:schemeClr val="accent1"/>
+          </a:effectRef>
+          <a:fontRef idx="minor">
+            <a:schemeClr val="lt1"/>
+          </a:fontRef>
+        </p:style>
+        <p:txBody>
+          <a:bodyPr rtlCol="0" anchor="ctr"/>
+          <a:lstStyle/>
+          <a:p>
+            <a:pPr algn="ctr"/>
+            <a:r>
+              <a:rPr kumimoji="1" lang="en-US" altLang="ja-JP" sz="1200" b="1" dirty="0">
+                <a:solidFill>
+                  <a:srgbClr val="FF0000"/>
+                </a:solidFill>
+              </a:rPr>
+              <a:t>Do</a:t>
+            </a:r>
+            <a:r>
+              <a:rPr kumimoji="1" lang="ja-JP" altLang="en-US" sz="1200" b="1" dirty="0">
+                <a:solidFill>
+                  <a:srgbClr val="FF0000"/>
+                </a:solidFill>
+              </a:rPr>
+              <a:t> </a:t>
+            </a:r>
+            <a:r>
+              <a:rPr kumimoji="1" lang="en-US" altLang="ja-JP" sz="1200" b="1" dirty="0">
+                <a:solidFill>
+                  <a:srgbClr val="FF0000"/>
+                </a:solidFill>
+              </a:rPr>
+              <a:t>not</a:t>
+            </a:r>
+          </a:p>
+          <a:p>
+            <a:pPr algn="ctr"/>
+            <a:r>
+              <a:rPr kumimoji="1" lang="en-US" altLang="ja-JP" sz="1200" b="1" dirty="0">
+                <a:solidFill>
+                  <a:srgbClr val="FF0000"/>
+                </a:solidFill>
+              </a:rPr>
+              <a:t>short any pin.</a:t>
+            </a:r>
+            <a:endParaRPr kumimoji="1" lang="ja-JP" altLang="en-US" sz="1200" b="1" dirty="0">
+              <a:solidFill>
+                <a:srgbClr val="FF0000"/>
+              </a:solidFill>
+            </a:endParaRPr>
+          </a:p>
+        </p:txBody>
+      </p:sp>
     </p:spTree>
     <p:extLst>
       <p:ext uri="{BB962C8B-B14F-4D97-AF65-F5344CB8AC3E}">
@@ -17147,14 +17584,34 @@
           <a:p>
             <a:r>
               <a:rPr kumimoji="1" lang="en-US" altLang="ja-JP" dirty="0"/>
-              <a:t>VGM Sound Interface(VSIF)</a:t>
+              <a:t>VGM Sound Interface(VSIF</a:t>
+            </a:r>
+            <a:r>
+              <a:rPr lang="ja-JP" altLang="en-US" dirty="0"/>
+              <a:t> </a:t>
+            </a:r>
+            <a:r>
+              <a:rPr lang="en-US" altLang="ja-JP" dirty="0"/>
+              <a:t>- FTDI</a:t>
+            </a:r>
+            <a:r>
+              <a:rPr kumimoji="1" lang="en-US" altLang="ja-JP" dirty="0"/>
+              <a:t>)</a:t>
             </a:r>
             <a:br>
               <a:rPr kumimoji="1" lang="en-US" altLang="ja-JP" dirty="0"/>
             </a:br>
             <a:r>
               <a:rPr kumimoji="1" lang="en-US" altLang="ja-JP" dirty="0"/>
-              <a:t>Settings</a:t>
+              <a:t>for </a:t>
+            </a:r>
+            <a:r>
+              <a:rPr kumimoji="1" lang="en-US" altLang="ja-JP" dirty="0" err="1"/>
+              <a:t>Commodare</a:t>
+            </a:r>
+            <a:r>
+              <a:rPr kumimoji="1" lang="en-US" altLang="ja-JP" dirty="0"/>
+              <a:t> 64(C64)</a:t>
             </a:r>
             <a:endParaRPr kumimoji="1" lang="ja-JP" altLang="en-US" dirty="0"/>
           </a:p>
@@ -17179,252 +17636,259 @@
         <p:spPr>
           <a:xfrm>
             <a:off x="2589212" y="2133600"/>
-            <a:ext cx="9602788" cy="4627808"/>
+            <a:ext cx="9602788" cy="3777622"/>
           </a:xfrm>
         </p:spPr>
         <p:txBody>
-          <a:bodyPr>
-            <a:normAutofit fontScale="92500" lnSpcReduction="20000"/>
-          </a:bodyPr>
+          <a:bodyPr/>
           <a:lstStyle/>
           <a:p>
-            <a:pPr>
+            <a:r>
+              <a:rPr kumimoji="1" lang="en-US" altLang="ja-JP" dirty="0" err="1"/>
+              <a:t>MAmidiMEmo</a:t>
+            </a:r>
+            <a:r>
+              <a:rPr kumimoji="1" lang="en-US" altLang="ja-JP" dirty="0"/>
+              <a:t> can drive real MSX machine chips if you use FTDI2xx(232R, 232H and so on). Currently supports NTSC/PAL C64 for SIDs.</a:t>
+            </a:r>
+            <a:endParaRPr kumimoji="1" lang="en-US" altLang="ja-JP" b="1" dirty="0"/>
+          </a:p>
+          <a:p>
+            <a:r>
+              <a:rPr lang="en-US" altLang="ja-JP" dirty="0"/>
+              <a:t>How to</a:t>
+            </a:r>
+          </a:p>
+          <a:p>
+            <a:pPr marL="800100" lvl="1" indent="-342900">
               <a:buFont typeface="+mj-lt"/>
-              <a:buAutoNum type="arabicPeriod" startAt="3"/>
+              <a:buAutoNum type="arabicPeriod"/>
             </a:pPr>
             <a:r>
-              <a:rPr kumimoji="1" lang="en-US" altLang="ja-JP" dirty="0"/>
-              <a:t>Burn </a:t>
-            </a:r>
-            <a:r>
-              <a:rPr kumimoji="1" lang="en-US" altLang="ja-JP" dirty="0" err="1"/>
-              <a:t>VGMPlay_md.bin</a:t>
-            </a:r>
-            <a:r>
-              <a:rPr kumimoji="1" lang="en-US" altLang="ja-JP" dirty="0"/>
-              <a:t>(for Genesis) or </a:t>
-            </a:r>
-            <a:r>
-              <a:rPr kumimoji="1" lang="en-US" altLang="ja-JP" dirty="0" err="1"/>
-              <a:t>VGMPlay_sms.sms</a:t>
-            </a:r>
-            <a:r>
-              <a:rPr kumimoji="1" lang="en-US" altLang="ja-JP" dirty="0"/>
-              <a:t>(for SMS) or VGMPlay_nes*.* (for </a:t>
-            </a:r>
-            <a:r>
-              <a:rPr kumimoji="1" lang="en-US" altLang="ja-JP" dirty="0" err="1"/>
-              <a:t>Famicom</a:t>
-            </a:r>
-            <a:r>
-              <a:rPr kumimoji="1" lang="en-US" altLang="ja-JP" dirty="0"/>
-              <a:t>) or </a:t>
-            </a:r>
-            <a:r>
-              <a:rPr kumimoji="1" lang="en-US" altLang="ja-JP" dirty="0" err="1"/>
-              <a:t>VGMPlaymsx.rom</a:t>
-            </a:r>
-            <a:r>
-              <a:rPr kumimoji="1" lang="en-US" altLang="ja-JP" dirty="0"/>
-              <a:t>/bin(for MSX) to your FLASH Cart.</a:t>
-            </a:r>
-          </a:p>
-          <a:p>
-            <a:pPr marL="457200" lvl="1" indent="0">
+              <a:rPr lang="en-US" altLang="ja-JP" dirty="0"/>
+              <a:t>Buy the following parts.</a:t>
+            </a:r>
+          </a:p>
+          <a:p>
+            <a:pPr marL="914400" lvl="2" indent="0">
               <a:buNone/>
             </a:pPr>
             <a:r>
-              <a:rPr lang="en-US" altLang="ja-JP" sz="1300" dirty="0"/>
-              <a:t>*VGMPlay_nes_vrc6/</a:t>
-            </a:r>
-            <a:r>
-              <a:rPr kumimoji="1" lang="en-US" altLang="ja-JP" sz="1300" dirty="0" err="1"/>
-              <a:t>fds</a:t>
-            </a:r>
-            <a:r>
-              <a:rPr kumimoji="1" lang="en-US" altLang="ja-JP" sz="1300" dirty="0"/>
-              <a:t>/mmc5 ROM does not show any screen but same </a:t>
-            </a:r>
-            <a:r>
-              <a:rPr lang="en-US" altLang="ja-JP" sz="1300" dirty="0"/>
-              <a:t>UI with </a:t>
-            </a:r>
-            <a:r>
-              <a:rPr kumimoji="1" lang="en-US" altLang="ja-JP" sz="1300" dirty="0" err="1"/>
-              <a:t>VGMPlay_nes.nes</a:t>
-            </a:r>
-            <a:r>
-              <a:rPr kumimoji="1" lang="en-US" altLang="ja-JP" sz="1300" dirty="0"/>
-              <a:t> UI</a:t>
-            </a:r>
-          </a:p>
-          <a:p>
-            <a:pPr>
-              <a:buFont typeface="+mj-lt"/>
-              <a:buAutoNum type="arabicPeriod" startAt="3"/>
-            </a:pPr>
+              <a:rPr kumimoji="1" lang="ja-JP" altLang="en-US" dirty="0"/>
+              <a:t>・</a:t>
+            </a:r>
             <a:r>
               <a:rPr kumimoji="1" lang="en-US" altLang="ja-JP" dirty="0"/>
-              <a:t>Set the </a:t>
-            </a:r>
-            <a:r>
-              <a:rPr kumimoji="1" lang="en-US" altLang="ja-JP" dirty="0" err="1"/>
-              <a:t>COMPort</a:t>
-            </a:r>
-            <a:r>
-              <a:rPr kumimoji="1" lang="en-US" altLang="ja-JP" dirty="0"/>
-              <a:t>/FTDI </a:t>
-            </a:r>
-            <a:r>
-              <a:rPr lang="en-US" altLang="ja-JP" dirty="0"/>
-              <a:t>ID</a:t>
-            </a:r>
-            <a:r>
-              <a:rPr kumimoji="1" lang="en-US" altLang="ja-JP" dirty="0"/>
-              <a:t> and select “VSIF ***” you wish.</a:t>
-            </a:r>
-          </a:p>
-          <a:p>
-            <a:pPr>
-              <a:buFont typeface="+mj-lt"/>
-              <a:buAutoNum type="arabicPeriod" startAt="3"/>
-            </a:pPr>
-            <a:endParaRPr lang="en-US" altLang="ja-JP" dirty="0"/>
-          </a:p>
-          <a:p>
-            <a:pPr>
-              <a:buFont typeface="+mj-lt"/>
-              <a:buAutoNum type="arabicPeriod" startAt="3"/>
-            </a:pPr>
-            <a:endParaRPr kumimoji="1" lang="en-US" altLang="ja-JP" dirty="0"/>
-          </a:p>
-          <a:p>
-            <a:pPr>
-              <a:buFont typeface="+mj-lt"/>
-              <a:buAutoNum type="arabicPeriod" startAt="3"/>
-            </a:pPr>
-            <a:endParaRPr lang="en-US" altLang="ja-JP" dirty="0"/>
-          </a:p>
-          <a:p>
-            <a:pPr>
-              <a:buFont typeface="+mj-lt"/>
-              <a:buAutoNum type="arabicPeriod" startAt="3"/>
-            </a:pPr>
-            <a:endParaRPr kumimoji="1" lang="en-US" altLang="ja-JP" dirty="0"/>
-          </a:p>
-          <a:p>
-            <a:pPr>
-              <a:buFont typeface="+mj-lt"/>
-              <a:buAutoNum type="arabicPeriod" startAt="3"/>
-            </a:pPr>
-            <a:r>
-              <a:rPr lang="en-US" altLang="ja-JP" dirty="0"/>
-              <a:t>Reset your console and push [Panic!] button</a:t>
-            </a:r>
-          </a:p>
-          <a:p>
-            <a:pPr>
-              <a:buFont typeface="+mj-lt"/>
-              <a:buAutoNum type="arabicPeriod" startAt="3"/>
-            </a:pPr>
-            <a:r>
-              <a:rPr lang="en-US" altLang="ja-JP" dirty="0"/>
-              <a:t>(</a:t>
-            </a:r>
-            <a:r>
-              <a:rPr lang="en-US" altLang="ja-JP" dirty="0" err="1"/>
-              <a:t>Famicom</a:t>
-            </a:r>
-            <a:r>
-              <a:rPr lang="en-US" altLang="ja-JP" dirty="0"/>
-              <a:t> only)Re-send DPCM data.</a:t>
-            </a:r>
-          </a:p>
-          <a:p>
-            <a:pPr>
-              <a:buFont typeface="+mj-lt"/>
-              <a:buAutoNum type="arabicPeriod" startAt="3"/>
-            </a:pPr>
-            <a:r>
-              <a:rPr lang="en-US" altLang="ja-JP" dirty="0"/>
-              <a:t>Done! </a:t>
-            </a:r>
-          </a:p>
-          <a:p>
-            <a:pPr>
-              <a:buFont typeface="+mj-lt"/>
-              <a:buAutoNum type="arabicPeriod" startAt="3"/>
-            </a:pPr>
-            <a:r>
-              <a:rPr kumimoji="1" lang="en-US" altLang="ja-JP" dirty="0"/>
-              <a:t>I</a:t>
-            </a:r>
-            <a:r>
-              <a:rPr lang="en-US" altLang="ja-JP" dirty="0"/>
-              <a:t>f you can not sound sounds, make sure soldering</a:t>
-            </a:r>
-            <a:r>
-              <a:rPr lang="ja-JP" altLang="en-US" dirty="0"/>
-              <a:t> </a:t>
-            </a:r>
-            <a:r>
-              <a:rPr lang="en-US" altLang="ja-JP" dirty="0"/>
-              <a:t>and </a:t>
-            </a:r>
-            <a:r>
-              <a:rPr lang="en-US" altLang="ja-JP" dirty="0" err="1"/>
-              <a:t>COMPort</a:t>
-            </a:r>
-            <a:r>
-              <a:rPr lang="en-US" altLang="ja-JP" dirty="0"/>
-              <a:t> name.</a:t>
+              <a:t>1x </a:t>
+            </a:r>
+            <a:r>
+              <a:rPr lang="en-US" altLang="ja-JP" u="sng" dirty="0"/>
+              <a:t>FTDI2XX </a:t>
+            </a:r>
+            <a:r>
+              <a:rPr kumimoji="1" lang="en-US" altLang="ja-JP" u="sng" dirty="0"/>
+              <a:t>dongle</a:t>
+            </a:r>
+            <a:r>
+              <a:rPr kumimoji="1" lang="en-US" altLang="ja-JP" sz="1100" b="0" i="0" u="none" strike="noStrike" kern="1200" cap="none" spc="0" normalizeH="0" baseline="0" noProof="0" dirty="0">
+                <a:ln>
+                  <a:noFill/>
+                </a:ln>
+                <a:solidFill>
+                  <a:prstClr val="black">
+                    <a:lumMod val="75000"/>
+                    <a:lumOff val="25000"/>
+                  </a:prstClr>
+                </a:solidFill>
+                <a:effectLst/>
+                <a:uLnTx/>
+                <a:uFillTx/>
+                <a:latin typeface="Century Gothic" panose="020B0502020202020204"/>
+                <a:ea typeface="メイリオ" panose="020B0604030504040204" pitchFamily="50" charset="-128"/>
+                <a:cs typeface="+mn-cs"/>
+              </a:rPr>
+              <a:t> (FT232R and so on. Need to support 5V.)</a:t>
             </a:r>
             <a:br>
-              <a:rPr lang="en-US" altLang="ja-JP" dirty="0"/>
-            </a:br>
-            <a:r>
-              <a:rPr lang="en-US" altLang="ja-JP" dirty="0"/>
-              <a:t>Or, please contact me.</a:t>
-            </a:r>
-            <a:br>
-              <a:rPr lang="en-US" altLang="ja-JP" dirty="0"/>
-            </a:br>
-            <a:br>
-              <a:rPr lang="en-US" altLang="ja-JP" dirty="0"/>
-            </a:br>
-            <a:r>
-              <a:rPr lang="en-US" altLang="ja-JP" sz="1800" dirty="0">
+              <a:rPr kumimoji="1" lang="en-US" altLang="ja-JP" sz="1100" b="0" i="0" u="none" strike="noStrike" kern="1200" cap="none" spc="0" normalizeH="0" baseline="0" noProof="0" dirty="0">
+                <a:ln>
+                  <a:noFill/>
+                </a:ln>
                 <a:solidFill>
-                  <a:srgbClr val="FF0000"/>
+                  <a:prstClr val="black">
+                    <a:lumMod val="75000"/>
+                    <a:lumOff val="25000"/>
+                  </a:prstClr>
                 </a:solidFill>
-              </a:rPr>
-              <a:t>*Some UART dongles may not work properly.</a:t>
-            </a:r>
-            <a:br>
-              <a:rPr lang="en-US" altLang="ja-JP" sz="1800" dirty="0">
-                <a:solidFill>
-                  <a:srgbClr val="FF0000"/>
-                </a:solidFill>
+                <a:effectLst/>
+                <a:uLnTx/>
+                <a:uFillTx/>
+                <a:latin typeface="Century Gothic" panose="020B0502020202020204"/>
+                <a:ea typeface="メイリオ" panose="020B0604030504040204" pitchFamily="50" charset="-128"/>
+                <a:cs typeface="+mn-cs"/>
               </a:rPr>
             </a:br>
             <a:r>
-              <a:rPr lang="en-US" altLang="ja-JP" sz="1800" dirty="0">
-                <a:solidFill>
-                  <a:srgbClr val="FF0000"/>
-                </a:solidFill>
-              </a:rPr>
-              <a:t>*Compatible consoles may not work properly.</a:t>
-            </a:r>
+              <a:rPr kumimoji="1" lang="ja-JP" altLang="en-US" dirty="0"/>
+              <a:t>・</a:t>
+            </a:r>
+            <a:r>
+              <a:rPr kumimoji="1" lang="en-US" altLang="ja-JP" dirty="0"/>
+              <a:t>1x </a:t>
+            </a:r>
+            <a:r>
+              <a:rPr lang="en-US" altLang="ja-JP" u="sng" dirty="0"/>
+              <a:t>D-SUB 9 pin female connector</a:t>
+            </a:r>
+            <a:r>
+              <a:rPr lang="en-US" altLang="ja-JP" dirty="0"/>
+              <a:t> and </a:t>
+            </a:r>
+            <a:r>
+              <a:rPr lang="en-US" altLang="ja-JP" u="sng" dirty="0"/>
+              <a:t>DuPont wires</a:t>
+            </a:r>
+          </a:p>
+          <a:p>
+            <a:pPr marL="800100" lvl="1" indent="-342900">
+              <a:buFont typeface="+mj-lt"/>
+              <a:buAutoNum type="arabicPeriod"/>
+            </a:pPr>
+            <a:r>
+              <a:rPr lang="en-US" altLang="ja-JP" dirty="0"/>
+              <a:t>Solder like the following to the JOYSTICK PORT 2.</a:t>
+            </a:r>
+          </a:p>
+          <a:p>
+            <a:endParaRPr kumimoji="1" lang="en-US" altLang="ja-JP" dirty="0"/>
+          </a:p>
+          <a:p>
+            <a:pPr lvl="1"/>
+            <a:endParaRPr kumimoji="1" lang="en-US" altLang="ja-JP" dirty="0"/>
+          </a:p>
+          <a:p>
+            <a:pPr lvl="1"/>
             <a:endParaRPr kumimoji="1" lang="ja-JP" altLang="en-US" dirty="0"/>
           </a:p>
         </p:txBody>
       </p:sp>
+      <p:grpSp>
+        <p:nvGrpSpPr>
+          <p:cNvPr id="14" name="グループ化 13">
+            <a:extLst>
+              <a:ext uri="{FF2B5EF4-FFF2-40B4-BE49-F238E27FC236}">
+                <a16:creationId xmlns:a16="http://schemas.microsoft.com/office/drawing/2014/main" id="{65F69EC0-07F2-4F12-A990-D976407F18FA}"/>
+              </a:ext>
+            </a:extLst>
+          </p:cNvPr>
+          <p:cNvGrpSpPr/>
+          <p:nvPr/>
+        </p:nvGrpSpPr>
+        <p:grpSpPr>
+          <a:xfrm>
+            <a:off x="7838509" y="4752044"/>
+            <a:ext cx="2659093" cy="2043975"/>
+            <a:chOff x="8285813" y="5095875"/>
+            <a:chExt cx="2211789" cy="1700144"/>
+          </a:xfrm>
+        </p:grpSpPr>
+        <p:pic>
+          <p:nvPicPr>
+            <p:cNvPr id="1026" name="Picture 2">
+              <a:extLst>
+                <a:ext uri="{FF2B5EF4-FFF2-40B4-BE49-F238E27FC236}">
+                  <a16:creationId xmlns:a16="http://schemas.microsoft.com/office/drawing/2014/main" id="{38ED3953-4909-4809-9702-181604DE98BA}"/>
+                </a:ext>
+              </a:extLst>
+            </p:cNvPr>
+            <p:cNvPicPr>
+              <a:picLocks noChangeAspect="1" noChangeArrowheads="1"/>
+            </p:cNvPicPr>
+            <p:nvPr/>
+          </p:nvPicPr>
+          <p:blipFill rotWithShape="1">
+            <a:blip r:embed="rId3">
+              <a:extLst>
+                <a:ext uri="{28A0092B-C50C-407E-A947-70E740481C1C}">
+                  <a14:useLocalDpi xmlns:a14="http://schemas.microsoft.com/office/drawing/2010/main" val="0"/>
+                </a:ext>
+              </a:extLst>
+            </a:blip>
+            <a:srcRect t="25408" b="38518"/>
+            <a:stretch/>
+          </p:blipFill>
+          <p:spPr bwMode="auto">
+            <a:xfrm>
+              <a:off x="8285813" y="5095875"/>
+              <a:ext cx="2211789" cy="815348"/>
+            </a:xfrm>
+            <a:prstGeom prst="rect">
+              <a:avLst/>
+            </a:prstGeom>
+            <a:noFill/>
+            <a:extLst>
+              <a:ext uri="{909E8E84-426E-40DD-AFC4-6F175D3DCCD1}">
+                <a14:hiddenFill xmlns:a14="http://schemas.microsoft.com/office/drawing/2010/main">
+                  <a:solidFill>
+                    <a:srgbClr val="FFFFFF"/>
+                  </a:solidFill>
+                </a14:hiddenFill>
+              </a:ext>
+            </a:extLst>
+          </p:spPr>
+        </p:pic>
+        <p:pic>
+          <p:nvPicPr>
+            <p:cNvPr id="11" name="Picture 2">
+              <a:extLst>
+                <a:ext uri="{FF2B5EF4-FFF2-40B4-BE49-F238E27FC236}">
+                  <a16:creationId xmlns:a16="http://schemas.microsoft.com/office/drawing/2014/main" id="{10A285EC-23D2-4F62-84A9-24AA31774A67}"/>
+                </a:ext>
+              </a:extLst>
+            </p:cNvPr>
+            <p:cNvPicPr>
+              <a:picLocks noChangeAspect="1" noChangeArrowheads="1"/>
+            </p:cNvPicPr>
+            <p:nvPr/>
+          </p:nvPicPr>
+          <p:blipFill rotWithShape="1">
+            <a:blip r:embed="rId3">
+              <a:extLst>
+                <a:ext uri="{28A0092B-C50C-407E-A947-70E740481C1C}">
+                  <a14:useLocalDpi xmlns:a14="http://schemas.microsoft.com/office/drawing/2010/main" val="0"/>
+                </a:ext>
+              </a:extLst>
+            </a:blip>
+            <a:srcRect t="25407" r="34715" b="-628"/>
+            <a:stretch/>
+          </p:blipFill>
+          <p:spPr bwMode="auto">
+            <a:xfrm>
+              <a:off x="8285813" y="5095875"/>
+              <a:ext cx="1443975" cy="1700144"/>
+            </a:xfrm>
+            <a:prstGeom prst="rect">
+              <a:avLst/>
+            </a:prstGeom>
+            <a:noFill/>
+            <a:extLst>
+              <a:ext uri="{909E8E84-426E-40DD-AFC4-6F175D3DCCD1}">
+                <a14:hiddenFill xmlns:a14="http://schemas.microsoft.com/office/drawing/2010/main">
+                  <a:solidFill>
+                    <a:srgbClr val="FFFFFF"/>
+                  </a:solidFill>
+                </a14:hiddenFill>
+              </a:ext>
+            </a:extLst>
+          </p:spPr>
+        </p:pic>
+      </p:grpSp>
       <p:pic>
         <p:nvPicPr>
-          <p:cNvPr id="6" name="図 5">
+          <p:cNvPr id="5" name="図 4">
             <a:extLst>
               <a:ext uri="{FF2B5EF4-FFF2-40B4-BE49-F238E27FC236}">
-                <a16:creationId xmlns:a16="http://schemas.microsoft.com/office/drawing/2014/main" id="{A2E081AD-DB5B-41BB-9A52-55D69078DEAF}"/>
+                <a16:creationId xmlns:a16="http://schemas.microsoft.com/office/drawing/2014/main" id="{D2FD8FB6-1BC7-45A0-8613-21371F348CA9}"/>
               </a:ext>
             </a:extLst>
           </p:cNvPr>
@@ -17433,28 +17897,640 @@
           </p:cNvPicPr>
           <p:nvPr/>
         </p:nvPicPr>
-        <p:blipFill>
-          <a:blip r:embed="rId3"/>
-          <a:stretch>
-            <a:fillRect/>
-          </a:stretch>
+        <p:blipFill rotWithShape="1">
+          <a:blip r:embed="rId4">
+            <a:extLst>
+              <a:ext uri="{BEBA8EAE-BF5A-486C-A8C5-ECC9F3942E4B}">
+                <a14:imgProps xmlns:a14="http://schemas.microsoft.com/office/drawing/2010/main">
+                  <a14:imgLayer r:embed="rId5">
+                    <a14:imgEffect>
+                      <a14:brightnessContrast bright="40000" contrast="-40000"/>
+                    </a14:imgEffect>
+                  </a14:imgLayer>
+                </a14:imgProps>
+              </a:ext>
+              <a:ext uri="{28A0092B-C50C-407E-A947-70E740481C1C}">
+                <a14:useLocalDpi xmlns:a14="http://schemas.microsoft.com/office/drawing/2010/main" val="0"/>
+              </a:ext>
+            </a:extLst>
+          </a:blip>
+          <a:srcRect/>
+          <a:stretch/>
         </p:blipFill>
         <p:spPr>
           <a:xfrm>
-            <a:off x="3728707" y="3430800"/>
-            <a:ext cx="4734586" cy="1105054"/>
+            <a:off x="3745524" y="4958979"/>
+            <a:ext cx="4167595" cy="1427921"/>
           </a:xfrm>
           <a:prstGeom prst="rect">
             <a:avLst/>
           </a:prstGeom>
         </p:spPr>
       </p:pic>
+      <p:cxnSp>
+        <p:nvCxnSpPr>
+          <p:cNvPr id="43" name="コネクタ: カギ線 42">
+            <a:extLst>
+              <a:ext uri="{FF2B5EF4-FFF2-40B4-BE49-F238E27FC236}">
+                <a16:creationId xmlns:a16="http://schemas.microsoft.com/office/drawing/2014/main" id="{B558DB2F-F6F4-411D-90BA-64C83F873044}"/>
+              </a:ext>
+            </a:extLst>
+          </p:cNvPr>
+          <p:cNvCxnSpPr>
+            <a:cxnSpLocks/>
+          </p:cNvCxnSpPr>
+          <p:nvPr/>
+        </p:nvCxnSpPr>
+        <p:spPr>
+          <a:xfrm>
+            <a:off x="5234586" y="5792453"/>
+            <a:ext cx="2674662" cy="118769"/>
+          </a:xfrm>
+          <a:prstGeom prst="bentConnector3">
+            <a:avLst>
+              <a:gd name="adj1" fmla="val -213"/>
+            </a:avLst>
+          </a:prstGeom>
+          <a:ln>
+            <a:solidFill>
+              <a:srgbClr val="92D050"/>
+            </a:solidFill>
+            <a:tailEnd type="triangle"/>
+          </a:ln>
+        </p:spPr>
+        <p:style>
+          <a:lnRef idx="3">
+            <a:schemeClr val="accent2"/>
+          </a:lnRef>
+          <a:fillRef idx="0">
+            <a:schemeClr val="accent2"/>
+          </a:fillRef>
+          <a:effectRef idx="2">
+            <a:schemeClr val="accent2"/>
+          </a:effectRef>
+          <a:fontRef idx="minor">
+            <a:schemeClr val="tx1"/>
+          </a:fontRef>
+        </p:style>
+      </p:cxnSp>
+      <p:sp>
+        <p:nvSpPr>
+          <p:cNvPr id="23" name="テキスト ボックス 22">
+            <a:extLst>
+              <a:ext uri="{FF2B5EF4-FFF2-40B4-BE49-F238E27FC236}">
+                <a16:creationId xmlns:a16="http://schemas.microsoft.com/office/drawing/2014/main" id="{8AB3B45F-5847-4257-97E5-E74FEE7EC93F}"/>
+              </a:ext>
+            </a:extLst>
+          </p:cNvPr>
+          <p:cNvSpPr txBox="1"/>
+          <p:nvPr/>
+        </p:nvSpPr>
+        <p:spPr>
+          <a:xfrm>
+            <a:off x="4995360" y="6413339"/>
+            <a:ext cx="1257098" cy="307777"/>
+          </a:xfrm>
+          <a:prstGeom prst="rect">
+            <a:avLst/>
+          </a:prstGeom>
+          <a:noFill/>
+        </p:spPr>
+        <p:txBody>
+          <a:bodyPr wrap="square">
+            <a:spAutoFit/>
+          </a:bodyPr>
+          <a:lstStyle/>
+          <a:p>
+            <a:pPr algn="ctr"/>
+            <a:r>
+              <a:rPr lang="en-US" altLang="ja-JP" sz="1400" dirty="0"/>
+              <a:t>C64</a:t>
+            </a:r>
+            <a:endParaRPr lang="en-US" altLang="ja-JP" sz="1400" i="1" dirty="0"/>
+          </a:p>
+        </p:txBody>
+      </p:sp>
+      <p:sp>
+        <p:nvSpPr>
+          <p:cNvPr id="27" name="テキスト ボックス 26">
+            <a:extLst>
+              <a:ext uri="{FF2B5EF4-FFF2-40B4-BE49-F238E27FC236}">
+                <a16:creationId xmlns:a16="http://schemas.microsoft.com/office/drawing/2014/main" id="{0DC80F62-61CC-494D-9703-3987DA145C58}"/>
+              </a:ext>
+            </a:extLst>
+          </p:cNvPr>
+          <p:cNvSpPr txBox="1"/>
+          <p:nvPr/>
+        </p:nvSpPr>
+        <p:spPr>
+          <a:xfrm>
+            <a:off x="9653490" y="5741255"/>
+            <a:ext cx="2538510" cy="369332"/>
+          </a:xfrm>
+          <a:prstGeom prst="rect">
+            <a:avLst/>
+          </a:prstGeom>
+          <a:noFill/>
+        </p:spPr>
+        <p:txBody>
+          <a:bodyPr wrap="square">
+            <a:spAutoFit/>
+          </a:bodyPr>
+          <a:lstStyle/>
+          <a:p>
+            <a:r>
+              <a:rPr kumimoji="1" lang="en-US" altLang="ja-JP" dirty="0"/>
+              <a:t>Any </a:t>
+            </a:r>
+            <a:r>
+              <a:rPr lang="en-US" altLang="ja-JP" dirty="0"/>
+              <a:t>FTDI2XX </a:t>
+            </a:r>
+            <a:r>
+              <a:rPr kumimoji="1" lang="en-US" altLang="ja-JP" dirty="0"/>
+              <a:t> dongle</a:t>
+            </a:r>
+            <a:endParaRPr lang="ja-JP" altLang="en-US" dirty="0"/>
+          </a:p>
+        </p:txBody>
+      </p:sp>
+      <p:cxnSp>
+        <p:nvCxnSpPr>
+          <p:cNvPr id="6" name="コネクタ: カギ線 5">
+            <a:extLst>
+              <a:ext uri="{FF2B5EF4-FFF2-40B4-BE49-F238E27FC236}">
+                <a16:creationId xmlns:a16="http://schemas.microsoft.com/office/drawing/2014/main" id="{D6780EF1-45A8-4F9A-A35C-EC334491EA20}"/>
+              </a:ext>
+            </a:extLst>
+          </p:cNvPr>
+          <p:cNvCxnSpPr>
+            <a:cxnSpLocks/>
+          </p:cNvCxnSpPr>
+          <p:nvPr/>
+        </p:nvCxnSpPr>
+        <p:spPr>
+          <a:xfrm flipV="1">
+            <a:off x="5186363" y="5108038"/>
+            <a:ext cx="2726756" cy="564902"/>
+          </a:xfrm>
+          <a:prstGeom prst="bentConnector3">
+            <a:avLst>
+              <a:gd name="adj1" fmla="val -127"/>
+            </a:avLst>
+          </a:prstGeom>
+          <a:ln>
+            <a:solidFill>
+              <a:srgbClr val="FF0000"/>
+            </a:solidFill>
+            <a:tailEnd type="triangle"/>
+          </a:ln>
+        </p:spPr>
+        <p:style>
+          <a:lnRef idx="3">
+            <a:schemeClr val="accent1"/>
+          </a:lnRef>
+          <a:fillRef idx="0">
+            <a:schemeClr val="accent1"/>
+          </a:fillRef>
+          <a:effectRef idx="2">
+            <a:schemeClr val="accent1"/>
+          </a:effectRef>
+          <a:fontRef idx="minor">
+            <a:schemeClr val="tx1"/>
+          </a:fontRef>
+        </p:style>
+      </p:cxnSp>
+      <p:cxnSp>
+        <p:nvCxnSpPr>
+          <p:cNvPr id="28" name="コネクタ: カギ線 27">
+            <a:extLst>
+              <a:ext uri="{FF2B5EF4-FFF2-40B4-BE49-F238E27FC236}">
+                <a16:creationId xmlns:a16="http://schemas.microsoft.com/office/drawing/2014/main" id="{ECD35D9C-0590-4FE0-9345-4D16684A3D69}"/>
+              </a:ext>
+            </a:extLst>
+          </p:cNvPr>
+          <p:cNvCxnSpPr>
+            <a:cxnSpLocks/>
+          </p:cNvCxnSpPr>
+          <p:nvPr/>
+        </p:nvCxnSpPr>
+        <p:spPr>
+          <a:xfrm flipV="1">
+            <a:off x="5305426" y="5191125"/>
+            <a:ext cx="2607693" cy="491344"/>
+          </a:xfrm>
+          <a:prstGeom prst="bentConnector3">
+            <a:avLst>
+              <a:gd name="adj1" fmla="val -315"/>
+            </a:avLst>
+          </a:prstGeom>
+          <a:ln>
+            <a:solidFill>
+              <a:schemeClr val="tx1">
+                <a:lumMod val="75000"/>
+                <a:lumOff val="25000"/>
+              </a:schemeClr>
+            </a:solidFill>
+            <a:tailEnd type="triangle"/>
+          </a:ln>
+        </p:spPr>
+        <p:style>
+          <a:lnRef idx="3">
+            <a:schemeClr val="accent1"/>
+          </a:lnRef>
+          <a:fillRef idx="0">
+            <a:schemeClr val="accent1"/>
+          </a:fillRef>
+          <a:effectRef idx="2">
+            <a:schemeClr val="accent1"/>
+          </a:effectRef>
+          <a:fontRef idx="minor">
+            <a:schemeClr val="tx1"/>
+          </a:fontRef>
+        </p:style>
+      </p:cxnSp>
+      <p:cxnSp>
+        <p:nvCxnSpPr>
+          <p:cNvPr id="29" name="コネクタ: カギ線 28">
+            <a:extLst>
+              <a:ext uri="{FF2B5EF4-FFF2-40B4-BE49-F238E27FC236}">
+                <a16:creationId xmlns:a16="http://schemas.microsoft.com/office/drawing/2014/main" id="{7FC669E4-ACA1-45B6-98A6-E189DDF7CB20}"/>
+              </a:ext>
+            </a:extLst>
+          </p:cNvPr>
+          <p:cNvCxnSpPr>
+            <a:cxnSpLocks/>
+          </p:cNvCxnSpPr>
+          <p:nvPr/>
+        </p:nvCxnSpPr>
+        <p:spPr>
+          <a:xfrm flipV="1">
+            <a:off x="5415134" y="5272804"/>
+            <a:ext cx="2497985" cy="409663"/>
+          </a:xfrm>
+          <a:prstGeom prst="bentConnector3">
+            <a:avLst>
+              <a:gd name="adj1" fmla="val 144"/>
+            </a:avLst>
+          </a:prstGeom>
+          <a:ln>
+            <a:solidFill>
+              <a:schemeClr val="bg1">
+                <a:lumMod val="65000"/>
+              </a:schemeClr>
+            </a:solidFill>
+            <a:tailEnd type="triangle"/>
+          </a:ln>
+        </p:spPr>
+        <p:style>
+          <a:lnRef idx="3">
+            <a:schemeClr val="accent1"/>
+          </a:lnRef>
+          <a:fillRef idx="0">
+            <a:schemeClr val="accent1"/>
+          </a:fillRef>
+          <a:effectRef idx="2">
+            <a:schemeClr val="accent1"/>
+          </a:effectRef>
+          <a:fontRef idx="minor">
+            <a:schemeClr val="tx1"/>
+          </a:fontRef>
+        </p:style>
+      </p:cxnSp>
+      <p:cxnSp>
+        <p:nvCxnSpPr>
+          <p:cNvPr id="35" name="コネクタ: カギ線 34">
+            <a:extLst>
+              <a:ext uri="{FF2B5EF4-FFF2-40B4-BE49-F238E27FC236}">
+                <a16:creationId xmlns:a16="http://schemas.microsoft.com/office/drawing/2014/main" id="{A163A346-7AF2-46B6-871D-48F4A857B741}"/>
+              </a:ext>
+            </a:extLst>
+          </p:cNvPr>
+          <p:cNvCxnSpPr>
+            <a:cxnSpLocks/>
+          </p:cNvCxnSpPr>
+          <p:nvPr/>
+        </p:nvCxnSpPr>
+        <p:spPr>
+          <a:xfrm flipV="1">
+            <a:off x="5554359" y="5341143"/>
+            <a:ext cx="2354889" cy="331796"/>
+          </a:xfrm>
+          <a:prstGeom prst="bentConnector3">
+            <a:avLst>
+              <a:gd name="adj1" fmla="val -762"/>
+            </a:avLst>
+          </a:prstGeom>
+          <a:ln>
+            <a:solidFill>
+              <a:schemeClr val="accent1">
+                <a:lumMod val="60000"/>
+                <a:lumOff val="40000"/>
+              </a:schemeClr>
+            </a:solidFill>
+            <a:tailEnd type="triangle"/>
+          </a:ln>
+        </p:spPr>
+        <p:style>
+          <a:lnRef idx="3">
+            <a:schemeClr val="accent1"/>
+          </a:lnRef>
+          <a:fillRef idx="0">
+            <a:schemeClr val="accent1"/>
+          </a:fillRef>
+          <a:effectRef idx="2">
+            <a:schemeClr val="accent1"/>
+          </a:effectRef>
+          <a:fontRef idx="minor">
+            <a:schemeClr val="tx1"/>
+          </a:fontRef>
+        </p:style>
+      </p:cxnSp>
+      <p:cxnSp>
+        <p:nvCxnSpPr>
+          <p:cNvPr id="40" name="コネクタ: カギ線 39">
+            <a:extLst>
+              <a:ext uri="{FF2B5EF4-FFF2-40B4-BE49-F238E27FC236}">
+                <a16:creationId xmlns:a16="http://schemas.microsoft.com/office/drawing/2014/main" id="{3B48CAA6-B742-40C5-BB4D-0C3B0B82BCC4}"/>
+              </a:ext>
+            </a:extLst>
+          </p:cNvPr>
+          <p:cNvCxnSpPr>
+            <a:cxnSpLocks/>
+          </p:cNvCxnSpPr>
+          <p:nvPr/>
+        </p:nvCxnSpPr>
+        <p:spPr>
+          <a:xfrm flipV="1">
+            <a:off x="5467947" y="5029200"/>
+            <a:ext cx="2447328" cy="757706"/>
+          </a:xfrm>
+          <a:prstGeom prst="bentConnector3">
+            <a:avLst>
+              <a:gd name="adj1" fmla="val 598"/>
+            </a:avLst>
+          </a:prstGeom>
+          <a:ln>
+            <a:solidFill>
+              <a:srgbClr val="0045D0"/>
+            </a:solidFill>
+            <a:tailEnd type="triangle"/>
+          </a:ln>
+        </p:spPr>
+        <p:style>
+          <a:lnRef idx="3">
+            <a:schemeClr val="dk1"/>
+          </a:lnRef>
+          <a:fillRef idx="0">
+            <a:schemeClr val="dk1"/>
+          </a:fillRef>
+          <a:effectRef idx="2">
+            <a:schemeClr val="dk1"/>
+          </a:effectRef>
+          <a:fontRef idx="minor">
+            <a:schemeClr val="tx1"/>
+          </a:fontRef>
+        </p:style>
+      </p:cxnSp>
+      <p:sp>
+        <p:nvSpPr>
+          <p:cNvPr id="49" name="テキスト ボックス 48">
+            <a:extLst>
+              <a:ext uri="{FF2B5EF4-FFF2-40B4-BE49-F238E27FC236}">
+                <a16:creationId xmlns:a16="http://schemas.microsoft.com/office/drawing/2014/main" id="{849A3F92-C977-45B7-A4F0-119EE9E460DC}"/>
+              </a:ext>
+            </a:extLst>
+          </p:cNvPr>
+          <p:cNvSpPr txBox="1"/>
+          <p:nvPr/>
+        </p:nvSpPr>
+        <p:spPr>
+          <a:xfrm>
+            <a:off x="7862740" y="5786906"/>
+            <a:ext cx="485830" cy="415498"/>
+          </a:xfrm>
+          <a:prstGeom prst="rect">
+            <a:avLst/>
+          </a:prstGeom>
+          <a:noFill/>
+        </p:spPr>
+        <p:txBody>
+          <a:bodyPr wrap="square">
+            <a:spAutoFit/>
+          </a:bodyPr>
+          <a:lstStyle/>
+          <a:p>
+            <a:r>
+              <a:rPr kumimoji="1" lang="en-US" altLang="ja-JP" sz="700" b="1" dirty="0">
+                <a:solidFill>
+                  <a:srgbClr val="0070C0"/>
+                </a:solidFill>
+              </a:rPr>
+              <a:t>DTR</a:t>
+            </a:r>
+          </a:p>
+          <a:p>
+            <a:r>
+              <a:rPr kumimoji="1" lang="en-US" altLang="ja-JP" sz="700" b="1" dirty="0">
+                <a:solidFill>
+                  <a:srgbClr val="0070C0"/>
+                </a:solidFill>
+              </a:rPr>
+              <a:t>DCD</a:t>
+            </a:r>
+          </a:p>
+          <a:p>
+            <a:r>
+              <a:rPr kumimoji="1" lang="en-US" altLang="ja-JP" sz="700" b="1" dirty="0">
+                <a:solidFill>
+                  <a:srgbClr val="0070C0"/>
+                </a:solidFill>
+              </a:rPr>
+              <a:t>RI</a:t>
+            </a:r>
+          </a:p>
+        </p:txBody>
+      </p:sp>
+      <p:cxnSp>
+        <p:nvCxnSpPr>
+          <p:cNvPr id="73" name="コネクタ: カギ線 72">
+            <a:extLst>
+              <a:ext uri="{FF2B5EF4-FFF2-40B4-BE49-F238E27FC236}">
+                <a16:creationId xmlns:a16="http://schemas.microsoft.com/office/drawing/2014/main" id="{233B3B99-A2CF-4E26-9083-7BCCDF146450}"/>
+              </a:ext>
+            </a:extLst>
+          </p:cNvPr>
+          <p:cNvCxnSpPr>
+            <a:cxnSpLocks/>
+          </p:cNvCxnSpPr>
+          <p:nvPr/>
+        </p:nvCxnSpPr>
+        <p:spPr>
+          <a:xfrm rot="10800000" flipV="1">
+            <a:off x="8155781" y="5610225"/>
+            <a:ext cx="913650" cy="285750"/>
+          </a:xfrm>
+          <a:prstGeom prst="bentConnector3">
+            <a:avLst>
+              <a:gd name="adj1" fmla="val 50000"/>
+            </a:avLst>
+          </a:prstGeom>
+          <a:ln>
+            <a:solidFill>
+              <a:srgbClr val="92D050"/>
+            </a:solidFill>
+            <a:tailEnd type="triangle"/>
+          </a:ln>
+        </p:spPr>
+        <p:style>
+          <a:lnRef idx="3">
+            <a:schemeClr val="accent2"/>
+          </a:lnRef>
+          <a:fillRef idx="0">
+            <a:schemeClr val="accent2"/>
+          </a:fillRef>
+          <a:effectRef idx="2">
+            <a:schemeClr val="accent2"/>
+          </a:effectRef>
+          <a:fontRef idx="minor">
+            <a:schemeClr val="tx1"/>
+          </a:fontRef>
+        </p:style>
+      </p:cxnSp>
+      <p:cxnSp>
+        <p:nvCxnSpPr>
+          <p:cNvPr id="82" name="コネクタ: カギ線 81">
+            <a:extLst>
+              <a:ext uri="{FF2B5EF4-FFF2-40B4-BE49-F238E27FC236}">
+                <a16:creationId xmlns:a16="http://schemas.microsoft.com/office/drawing/2014/main" id="{2D5DE264-C630-4281-8954-5F9C2336C945}"/>
+              </a:ext>
+            </a:extLst>
+          </p:cNvPr>
+          <p:cNvCxnSpPr>
+            <a:cxnSpLocks/>
+          </p:cNvCxnSpPr>
+          <p:nvPr/>
+        </p:nvCxnSpPr>
+        <p:spPr>
+          <a:xfrm rot="10800000" flipV="1">
+            <a:off x="8155781" y="5705474"/>
+            <a:ext cx="1061334" cy="283369"/>
+          </a:xfrm>
+          <a:prstGeom prst="bentConnector3">
+            <a:avLst>
+              <a:gd name="adj1" fmla="val 50000"/>
+            </a:avLst>
+          </a:prstGeom>
+          <a:ln>
+            <a:solidFill>
+              <a:srgbClr val="FFC000"/>
+            </a:solidFill>
+            <a:tailEnd type="triangle"/>
+          </a:ln>
+        </p:spPr>
+        <p:style>
+          <a:lnRef idx="3">
+            <a:schemeClr val="dk1"/>
+          </a:lnRef>
+          <a:fillRef idx="0">
+            <a:schemeClr val="dk1"/>
+          </a:fillRef>
+          <a:effectRef idx="2">
+            <a:schemeClr val="dk1"/>
+          </a:effectRef>
+          <a:fontRef idx="minor">
+            <a:schemeClr val="tx1"/>
+          </a:fontRef>
+        </p:style>
+      </p:cxnSp>
+      <p:cxnSp>
+        <p:nvCxnSpPr>
+          <p:cNvPr id="91" name="コネクタ: カギ線 90">
+            <a:extLst>
+              <a:ext uri="{FF2B5EF4-FFF2-40B4-BE49-F238E27FC236}">
+                <a16:creationId xmlns:a16="http://schemas.microsoft.com/office/drawing/2014/main" id="{36BFB3F8-B6C3-47E3-92F3-0E2EB8F06C50}"/>
+              </a:ext>
+            </a:extLst>
+          </p:cNvPr>
+          <p:cNvCxnSpPr>
+            <a:cxnSpLocks/>
+          </p:cNvCxnSpPr>
+          <p:nvPr/>
+        </p:nvCxnSpPr>
+        <p:spPr>
+          <a:xfrm>
+            <a:off x="5650230" y="5666176"/>
+            <a:ext cx="2259018" cy="322669"/>
+          </a:xfrm>
+          <a:prstGeom prst="bentConnector3">
+            <a:avLst>
+              <a:gd name="adj1" fmla="val -91"/>
+            </a:avLst>
+          </a:prstGeom>
+          <a:ln>
+            <a:solidFill>
+              <a:srgbClr val="FFC000"/>
+            </a:solidFill>
+            <a:tailEnd type="triangle"/>
+          </a:ln>
+        </p:spPr>
+        <p:style>
+          <a:lnRef idx="3">
+            <a:schemeClr val="accent6"/>
+          </a:lnRef>
+          <a:fillRef idx="0">
+            <a:schemeClr val="accent6"/>
+          </a:fillRef>
+          <a:effectRef idx="2">
+            <a:schemeClr val="accent6"/>
+          </a:effectRef>
+          <a:fontRef idx="minor">
+            <a:schemeClr val="tx1"/>
+          </a:fontRef>
+        </p:style>
+      </p:cxnSp>
+      <p:cxnSp>
+        <p:nvCxnSpPr>
+          <p:cNvPr id="65" name="直線コネクタ 64">
+            <a:extLst>
+              <a:ext uri="{FF2B5EF4-FFF2-40B4-BE49-F238E27FC236}">
+                <a16:creationId xmlns:a16="http://schemas.microsoft.com/office/drawing/2014/main" id="{381AA494-82D4-469C-A4B2-B74438AC6A95}"/>
+              </a:ext>
+            </a:extLst>
+          </p:cNvPr>
+          <p:cNvCxnSpPr/>
+          <p:nvPr/>
+        </p:nvCxnSpPr>
+        <p:spPr>
+          <a:xfrm>
+            <a:off x="9069431" y="5413023"/>
+            <a:ext cx="0" cy="203865"/>
+          </a:xfrm>
+          <a:prstGeom prst="line">
+            <a:avLst/>
+          </a:prstGeom>
+        </p:spPr>
+        <p:style>
+          <a:lnRef idx="3">
+            <a:schemeClr val="accent2"/>
+          </a:lnRef>
+          <a:fillRef idx="0">
+            <a:schemeClr val="accent2"/>
+          </a:fillRef>
+          <a:effectRef idx="2">
+            <a:schemeClr val="accent2"/>
+          </a:effectRef>
+          <a:fontRef idx="minor">
+            <a:schemeClr val="tx1"/>
+          </a:fontRef>
+        </p:style>
+      </p:cxnSp>
       <p:sp>
         <p:nvSpPr>
           <p:cNvPr id="4" name="スライド番号プレースホルダー 3">
             <a:extLst>
               <a:ext uri="{FF2B5EF4-FFF2-40B4-BE49-F238E27FC236}">
-                <a16:creationId xmlns:a16="http://schemas.microsoft.com/office/drawing/2014/main" id="{455F9055-FE97-49E6-B05C-BBC13F55BB4C}"/>
+                <a16:creationId xmlns:a16="http://schemas.microsoft.com/office/drawing/2014/main" id="{BF95FE20-D6A5-4D5C-AC74-533156036244}"/>
               </a:ext>
             </a:extLst>
           </p:cNvPr>
@@ -17478,10 +18554,330 @@
           </a:p>
         </p:txBody>
       </p:sp>
+      <p:pic>
+        <p:nvPicPr>
+          <p:cNvPr id="26" name="図 25">
+            <a:extLst>
+              <a:ext uri="{FF2B5EF4-FFF2-40B4-BE49-F238E27FC236}">
+                <a16:creationId xmlns:a16="http://schemas.microsoft.com/office/drawing/2014/main" id="{6B22E47E-A278-4B93-BBED-4448024C894E}"/>
+              </a:ext>
+            </a:extLst>
+          </p:cNvPr>
+          <p:cNvPicPr>
+            <a:picLocks noChangeAspect="1"/>
+          </p:cNvPicPr>
+          <p:nvPr/>
+        </p:nvPicPr>
+        <p:blipFill>
+          <a:blip r:embed="rId6">
+            <a:extLst>
+              <a:ext uri="{BEBA8EAE-BF5A-486C-A8C5-ECC9F3942E4B}">
+                <a14:imgProps xmlns:a14="http://schemas.microsoft.com/office/drawing/2010/main">
+                  <a14:imgLayer r:embed="rId7">
+                    <a14:imgEffect>
+                      <a14:backgroundRemoval t="9942" b="89474" l="7310" r="92690">
+                        <a14:foregroundMark x1="75146" y1="29240" x2="40643" y2="53216"/>
+                        <a14:foregroundMark x1="27778" y1="55263" x2="47076" y2="66374"/>
+                        <a14:foregroundMark x1="38304" y1="46491" x2="42690" y2="59942"/>
+                        <a14:foregroundMark x1="25439" y1="57018" x2="21930" y2="69591"/>
+                        <a14:foregroundMark x1="7310" y1="67836" x2="12865" y2="73684"/>
+                        <a14:foregroundMark x1="24561" y1="76316" x2="33626" y2="84211"/>
+                        <a14:foregroundMark x1="20468" y1="79240" x2="29825" y2="86257"/>
+                        <a14:foregroundMark x1="92690" y1="31579" x2="82164" y2="30994"/>
+                      </a14:backgroundRemoval>
+                    </a14:imgEffect>
+                  </a14:imgLayer>
+                </a14:imgProps>
+              </a:ext>
+              <a:ext uri="{28A0092B-C50C-407E-A947-70E740481C1C}">
+                <a14:useLocalDpi xmlns:a14="http://schemas.microsoft.com/office/drawing/2010/main" val="0"/>
+              </a:ext>
+            </a:extLst>
+          </a:blip>
+          <a:stretch>
+            <a:fillRect/>
+          </a:stretch>
+        </p:blipFill>
+        <p:spPr>
+          <a:xfrm>
+            <a:off x="7730352" y="5314704"/>
+            <a:ext cx="574698" cy="574698"/>
+          </a:xfrm>
+          <a:prstGeom prst="rect">
+            <a:avLst/>
+          </a:prstGeom>
+        </p:spPr>
+      </p:pic>
+      <p:cxnSp>
+        <p:nvCxnSpPr>
+          <p:cNvPr id="33" name="直線コネクタ 32">
+            <a:extLst>
+              <a:ext uri="{FF2B5EF4-FFF2-40B4-BE49-F238E27FC236}">
+                <a16:creationId xmlns:a16="http://schemas.microsoft.com/office/drawing/2014/main" id="{4FF33BAC-60BE-4931-8926-4D2509C4C5E2}"/>
+              </a:ext>
+            </a:extLst>
+          </p:cNvPr>
+          <p:cNvCxnSpPr>
+            <a:cxnSpLocks/>
+          </p:cNvCxnSpPr>
+          <p:nvPr/>
+        </p:nvCxnSpPr>
+        <p:spPr>
+          <a:xfrm>
+            <a:off x="9216331" y="5413023"/>
+            <a:ext cx="0" cy="292451"/>
+          </a:xfrm>
+          <a:prstGeom prst="line">
+            <a:avLst/>
+          </a:prstGeom>
+          <a:ln>
+            <a:solidFill>
+              <a:srgbClr val="FFC000"/>
+            </a:solidFill>
+          </a:ln>
+        </p:spPr>
+        <p:style>
+          <a:lnRef idx="3">
+            <a:schemeClr val="dk1"/>
+          </a:lnRef>
+          <a:fillRef idx="0">
+            <a:schemeClr val="dk1"/>
+          </a:fillRef>
+          <a:effectRef idx="2">
+            <a:schemeClr val="dk1"/>
+          </a:effectRef>
+          <a:fontRef idx="minor">
+            <a:schemeClr val="tx1"/>
+          </a:fontRef>
+        </p:style>
+      </p:cxnSp>
+      <p:cxnSp>
+        <p:nvCxnSpPr>
+          <p:cNvPr id="10" name="コネクタ: カギ線 9">
+            <a:extLst>
+              <a:ext uri="{FF2B5EF4-FFF2-40B4-BE49-F238E27FC236}">
+                <a16:creationId xmlns:a16="http://schemas.microsoft.com/office/drawing/2014/main" id="{90953A8B-FF24-B765-25B2-DEBCB609067C}"/>
+              </a:ext>
+            </a:extLst>
+          </p:cNvPr>
+          <p:cNvCxnSpPr>
+            <a:cxnSpLocks/>
+          </p:cNvCxnSpPr>
+          <p:nvPr/>
+        </p:nvCxnSpPr>
+        <p:spPr>
+          <a:xfrm>
+            <a:off x="5592943" y="5796519"/>
+            <a:ext cx="2333819" cy="310908"/>
+          </a:xfrm>
+          <a:prstGeom prst="bentConnector3">
+            <a:avLst>
+              <a:gd name="adj1" fmla="val 45"/>
+            </a:avLst>
+          </a:prstGeom>
+          <a:ln>
+            <a:solidFill>
+              <a:srgbClr val="7030A0"/>
+            </a:solidFill>
+            <a:tailEnd type="triangle"/>
+          </a:ln>
+        </p:spPr>
+        <p:style>
+          <a:lnRef idx="3">
+            <a:schemeClr val="accent6"/>
+          </a:lnRef>
+          <a:fillRef idx="0">
+            <a:schemeClr val="accent6"/>
+          </a:fillRef>
+          <a:effectRef idx="2">
+            <a:schemeClr val="accent6"/>
+          </a:effectRef>
+          <a:fontRef idx="minor">
+            <a:schemeClr val="tx1"/>
+          </a:fontRef>
+        </p:style>
+      </p:cxnSp>
+      <p:sp>
+        <p:nvSpPr>
+          <p:cNvPr id="7" name="正方形/長方形 6">
+            <a:extLst>
+              <a:ext uri="{FF2B5EF4-FFF2-40B4-BE49-F238E27FC236}">
+                <a16:creationId xmlns:a16="http://schemas.microsoft.com/office/drawing/2014/main" id="{D6CB17A5-02A3-9D4D-5E7F-A0C5B4A14917}"/>
+              </a:ext>
+            </a:extLst>
+          </p:cNvPr>
+          <p:cNvSpPr/>
+          <p:nvPr/>
+        </p:nvSpPr>
+        <p:spPr>
+          <a:xfrm>
+            <a:off x="8859519" y="5970263"/>
+            <a:ext cx="739219" cy="799140"/>
+          </a:xfrm>
+          <a:prstGeom prst="rect">
+            <a:avLst/>
+          </a:prstGeom>
+          <a:solidFill>
+            <a:schemeClr val="bg1"/>
+          </a:solidFill>
+        </p:spPr>
+        <p:style>
+          <a:lnRef idx="2">
+            <a:schemeClr val="accent1">
+              <a:shade val="50000"/>
+            </a:schemeClr>
+          </a:lnRef>
+          <a:fillRef idx="1">
+            <a:schemeClr val="accent1"/>
+          </a:fillRef>
+          <a:effectRef idx="0">
+            <a:schemeClr val="accent1"/>
+          </a:effectRef>
+          <a:fontRef idx="minor">
+            <a:schemeClr val="lt1"/>
+          </a:fontRef>
+        </p:style>
+        <p:txBody>
+          <a:bodyPr rtlCol="0" anchor="ctr"/>
+          <a:lstStyle/>
+          <a:p>
+            <a:pPr algn="ctr"/>
+            <a:r>
+              <a:rPr kumimoji="1" lang="en-US" altLang="ja-JP" sz="1200" b="1" dirty="0">
+                <a:solidFill>
+                  <a:srgbClr val="FF0000"/>
+                </a:solidFill>
+              </a:rPr>
+              <a:t>Do</a:t>
+            </a:r>
+            <a:r>
+              <a:rPr kumimoji="1" lang="ja-JP" altLang="en-US" sz="1200" b="1" dirty="0">
+                <a:solidFill>
+                  <a:srgbClr val="FF0000"/>
+                </a:solidFill>
+              </a:rPr>
+              <a:t> </a:t>
+            </a:r>
+            <a:r>
+              <a:rPr kumimoji="1" lang="en-US" altLang="ja-JP" sz="1200" b="1" dirty="0">
+                <a:solidFill>
+                  <a:srgbClr val="FF0000"/>
+                </a:solidFill>
+              </a:rPr>
+              <a:t>not</a:t>
+            </a:r>
+          </a:p>
+          <a:p>
+            <a:pPr algn="ctr"/>
+            <a:r>
+              <a:rPr kumimoji="1" lang="en-US" altLang="ja-JP" sz="1200" b="1" dirty="0">
+                <a:solidFill>
+                  <a:srgbClr val="FF0000"/>
+                </a:solidFill>
+              </a:rPr>
+              <a:t>short any pin.</a:t>
+            </a:r>
+            <a:endParaRPr kumimoji="1" lang="ja-JP" altLang="en-US" sz="1200" b="1" dirty="0">
+              <a:solidFill>
+                <a:srgbClr val="FF0000"/>
+              </a:solidFill>
+            </a:endParaRPr>
+          </a:p>
+        </p:txBody>
+      </p:sp>
+      <p:cxnSp>
+        <p:nvCxnSpPr>
+          <p:cNvPr id="13" name="コネクタ: カギ線 12">
+            <a:extLst>
+              <a:ext uri="{FF2B5EF4-FFF2-40B4-BE49-F238E27FC236}">
+                <a16:creationId xmlns:a16="http://schemas.microsoft.com/office/drawing/2014/main" id="{BBDF4A26-2DBF-2A66-229E-3859B4CC8EB9}"/>
+              </a:ext>
+            </a:extLst>
+          </p:cNvPr>
+          <p:cNvCxnSpPr>
+            <a:cxnSpLocks/>
+          </p:cNvCxnSpPr>
+          <p:nvPr/>
+        </p:nvCxnSpPr>
+        <p:spPr>
+          <a:xfrm rot="10800000" flipV="1">
+            <a:off x="8164880" y="5772010"/>
+            <a:ext cx="961003" cy="328288"/>
+          </a:xfrm>
+          <a:prstGeom prst="bentConnector3">
+            <a:avLst>
+              <a:gd name="adj1" fmla="val 34935"/>
+            </a:avLst>
+          </a:prstGeom>
+          <a:ln>
+            <a:solidFill>
+              <a:srgbClr val="7030A0"/>
+            </a:solidFill>
+            <a:tailEnd type="triangle"/>
+          </a:ln>
+        </p:spPr>
+        <p:style>
+          <a:lnRef idx="3">
+            <a:schemeClr val="dk1"/>
+          </a:lnRef>
+          <a:fillRef idx="0">
+            <a:schemeClr val="dk1"/>
+          </a:fillRef>
+          <a:effectRef idx="2">
+            <a:schemeClr val="dk1"/>
+          </a:effectRef>
+          <a:fontRef idx="minor">
+            <a:schemeClr val="tx1"/>
+          </a:fontRef>
+        </p:style>
+      </p:cxnSp>
+      <p:cxnSp>
+        <p:nvCxnSpPr>
+          <p:cNvPr id="16" name="直線コネクタ 15">
+            <a:extLst>
+              <a:ext uri="{FF2B5EF4-FFF2-40B4-BE49-F238E27FC236}">
+                <a16:creationId xmlns:a16="http://schemas.microsoft.com/office/drawing/2014/main" id="{154B6BB9-69F7-3411-84EF-A7E21B39577F}"/>
+              </a:ext>
+            </a:extLst>
+          </p:cNvPr>
+          <p:cNvCxnSpPr>
+            <a:cxnSpLocks/>
+          </p:cNvCxnSpPr>
+          <p:nvPr/>
+        </p:nvCxnSpPr>
+        <p:spPr>
+          <a:xfrm>
+            <a:off x="9125882" y="5413023"/>
+            <a:ext cx="0" cy="340077"/>
+          </a:xfrm>
+          <a:prstGeom prst="line">
+            <a:avLst/>
+          </a:prstGeom>
+          <a:ln>
+            <a:solidFill>
+              <a:srgbClr val="7030A0"/>
+            </a:solidFill>
+          </a:ln>
+        </p:spPr>
+        <p:style>
+          <a:lnRef idx="3">
+            <a:schemeClr val="dk1"/>
+          </a:lnRef>
+          <a:fillRef idx="0">
+            <a:schemeClr val="dk1"/>
+          </a:fillRef>
+          <a:effectRef idx="2">
+            <a:schemeClr val="dk1"/>
+          </a:effectRef>
+          <a:fontRef idx="minor">
+            <a:schemeClr val="tx1"/>
+          </a:fontRef>
+        </p:style>
+      </p:cxnSp>
     </p:spTree>
     <p:extLst>
       <p:ext uri="{BB962C8B-B14F-4D97-AF65-F5344CB8AC3E}">
-        <p14:creationId xmlns:p14="http://schemas.microsoft.com/office/powerpoint/2010/main" val="1500572103"/>
+        <p14:creationId xmlns:p14="http://schemas.microsoft.com/office/powerpoint/2010/main" val="1240605201"/>
       </p:ext>
     </p:extLst>
   </p:cSld>
@@ -22401,7 +23797,63 @@
             </a:br>
             <a:r>
               <a:rPr kumimoji="1" lang="en-US" altLang="ja-JP" dirty="0"/>
-              <a:t>for </a:t>
+              <a:t>Settings</a:t>
+            </a:r>
+            <a:endParaRPr kumimoji="1" lang="ja-JP" altLang="en-US" dirty="0"/>
+          </a:p>
+        </p:txBody>
+      </p:sp>
+      <p:sp>
+        <p:nvSpPr>
+          <p:cNvPr id="3" name="コンテンツ プレースホルダー 2">
+            <a:extLst>
+              <a:ext uri="{FF2B5EF4-FFF2-40B4-BE49-F238E27FC236}">
+                <a16:creationId xmlns:a16="http://schemas.microsoft.com/office/drawing/2014/main" id="{CD745FAA-4C55-4719-9696-912443FC8E21}"/>
+              </a:ext>
+            </a:extLst>
+          </p:cNvPr>
+          <p:cNvSpPr>
+            <a:spLocks noGrp="1"/>
+          </p:cNvSpPr>
+          <p:nvPr>
+            <p:ph idx="1"/>
+          </p:nvPr>
+        </p:nvSpPr>
+        <p:spPr>
+          <a:xfrm>
+            <a:off x="2589212" y="2133600"/>
+            <a:ext cx="9602788" cy="4627808"/>
+          </a:xfrm>
+        </p:spPr>
+        <p:txBody>
+          <a:bodyPr>
+            <a:normAutofit fontScale="92500" lnSpcReduction="20000"/>
+          </a:bodyPr>
+          <a:lstStyle/>
+          <a:p>
+            <a:pPr>
+              <a:buFont typeface="+mj-lt"/>
+              <a:buAutoNum type="arabicPeriod" startAt="3"/>
+            </a:pPr>
+            <a:r>
+              <a:rPr kumimoji="1" lang="en-US" altLang="ja-JP" dirty="0"/>
+              <a:t>Burn </a:t>
+            </a:r>
+            <a:r>
+              <a:rPr kumimoji="1" lang="en-US" altLang="ja-JP" dirty="0" err="1"/>
+              <a:t>VGMPlay_md.bin</a:t>
+            </a:r>
+            <a:r>
+              <a:rPr kumimoji="1" lang="en-US" altLang="ja-JP" dirty="0"/>
+              <a:t>(for Genesis) or </a:t>
+            </a:r>
+            <a:r>
+              <a:rPr kumimoji="1" lang="en-US" altLang="ja-JP" dirty="0" err="1"/>
+              <a:t>VGMPlay_sms.sms</a:t>
+            </a:r>
+            <a:r>
+              <a:rPr kumimoji="1" lang="en-US" altLang="ja-JP" dirty="0"/>
+              <a:t>(for SMS) or VGMPlay_nes*.* (for </a:t>
             </a:r>
             <a:r>
               <a:rPr kumimoji="1" lang="en-US" altLang="ja-JP" dirty="0" err="1"/>
@@ -22409,12 +23861,237 @@
             </a:r>
             <a:r>
               <a:rPr kumimoji="1" lang="en-US" altLang="ja-JP" dirty="0"/>
-              <a:t> spec</a:t>
+              <a:t>) or </a:t>
+            </a:r>
+            <a:r>
+              <a:rPr kumimoji="1" lang="en-US" altLang="ja-JP" dirty="0" err="1"/>
+              <a:t>VGMPlaymsx.rom</a:t>
+            </a:r>
+            <a:r>
+              <a:rPr kumimoji="1" lang="en-US" altLang="ja-JP" dirty="0"/>
+              <a:t>/bin(for MSX) to your FLASH Cart.</a:t>
+            </a:r>
+          </a:p>
+          <a:p>
+            <a:pPr marL="457200" lvl="1" indent="0">
+              <a:buNone/>
+            </a:pPr>
+            <a:r>
+              <a:rPr lang="en-US" altLang="ja-JP" sz="1300" dirty="0"/>
+              <a:t>*VGMPlay_nes_vrc6/</a:t>
+            </a:r>
+            <a:r>
+              <a:rPr kumimoji="1" lang="en-US" altLang="ja-JP" sz="1300" dirty="0" err="1"/>
+              <a:t>fds</a:t>
+            </a:r>
+            <a:r>
+              <a:rPr kumimoji="1" lang="en-US" altLang="ja-JP" sz="1300" dirty="0"/>
+              <a:t>/mmc5 ROM does not show any screen but same </a:t>
+            </a:r>
+            <a:r>
+              <a:rPr lang="en-US" altLang="ja-JP" sz="1300" dirty="0"/>
+              <a:t>UI with </a:t>
+            </a:r>
+            <a:r>
+              <a:rPr kumimoji="1" lang="en-US" altLang="ja-JP" sz="1300" dirty="0" err="1"/>
+              <a:t>VGMPlay_nes.nes</a:t>
+            </a:r>
+            <a:r>
+              <a:rPr kumimoji="1" lang="en-US" altLang="ja-JP" sz="1300" dirty="0"/>
+              <a:t> UI</a:t>
+            </a:r>
+          </a:p>
+          <a:p>
+            <a:pPr>
+              <a:buFont typeface="+mj-lt"/>
+              <a:buAutoNum type="arabicPeriod" startAt="3"/>
+            </a:pPr>
+            <a:r>
+              <a:rPr kumimoji="1" lang="en-US" altLang="ja-JP" dirty="0"/>
+              <a:t>Set the </a:t>
+            </a:r>
+            <a:r>
+              <a:rPr kumimoji="1" lang="en-US" altLang="ja-JP" dirty="0" err="1"/>
+              <a:t>COMPort</a:t>
+            </a:r>
+            <a:r>
+              <a:rPr kumimoji="1" lang="en-US" altLang="ja-JP" dirty="0"/>
+              <a:t>/FTDI </a:t>
+            </a:r>
+            <a:r>
+              <a:rPr lang="en-US" altLang="ja-JP" dirty="0"/>
+              <a:t>ID</a:t>
+            </a:r>
+            <a:r>
+              <a:rPr kumimoji="1" lang="en-US" altLang="ja-JP" dirty="0"/>
+              <a:t> and select “VSIF ***” you wish.</a:t>
+            </a:r>
+          </a:p>
+          <a:p>
+            <a:pPr>
+              <a:buFont typeface="+mj-lt"/>
+              <a:buAutoNum type="arabicPeriod" startAt="3"/>
+            </a:pPr>
+            <a:endParaRPr lang="en-US" altLang="ja-JP" dirty="0"/>
+          </a:p>
+          <a:p>
+            <a:pPr>
+              <a:buFont typeface="+mj-lt"/>
+              <a:buAutoNum type="arabicPeriod" startAt="3"/>
+            </a:pPr>
+            <a:endParaRPr kumimoji="1" lang="en-US" altLang="ja-JP" dirty="0"/>
+          </a:p>
+          <a:p>
+            <a:pPr>
+              <a:buFont typeface="+mj-lt"/>
+              <a:buAutoNum type="arabicPeriod" startAt="3"/>
+            </a:pPr>
+            <a:endParaRPr lang="en-US" altLang="ja-JP" dirty="0"/>
+          </a:p>
+          <a:p>
+            <a:pPr>
+              <a:buFont typeface="+mj-lt"/>
+              <a:buAutoNum type="arabicPeriod" startAt="3"/>
+            </a:pPr>
+            <a:endParaRPr kumimoji="1" lang="en-US" altLang="ja-JP" dirty="0"/>
+          </a:p>
+          <a:p>
+            <a:pPr>
+              <a:buFont typeface="+mj-lt"/>
+              <a:buAutoNum type="arabicPeriod" startAt="3"/>
+            </a:pPr>
+            <a:r>
+              <a:rPr lang="en-US" altLang="ja-JP" dirty="0"/>
+              <a:t>Reset your console and push [Panic!] button</a:t>
+            </a:r>
+          </a:p>
+          <a:p>
+            <a:pPr>
+              <a:buFont typeface="+mj-lt"/>
+              <a:buAutoNum type="arabicPeriod" startAt="3"/>
+            </a:pPr>
+            <a:r>
+              <a:rPr lang="en-US" altLang="ja-JP" dirty="0"/>
+              <a:t>(</a:t>
+            </a:r>
+            <a:r>
+              <a:rPr lang="en-US" altLang="ja-JP" dirty="0" err="1"/>
+              <a:t>Famicom</a:t>
+            </a:r>
+            <a:r>
+              <a:rPr lang="en-US" altLang="ja-JP" dirty="0"/>
+              <a:t> only)Re-send DPCM data.</a:t>
+            </a:r>
+          </a:p>
+          <a:p>
+            <a:pPr>
+              <a:buFont typeface="+mj-lt"/>
+              <a:buAutoNum type="arabicPeriod" startAt="3"/>
+            </a:pPr>
+            <a:r>
+              <a:rPr lang="en-US" altLang="ja-JP" dirty="0"/>
+              <a:t>Done! </a:t>
+            </a:r>
+          </a:p>
+          <a:p>
+            <a:pPr>
+              <a:buFont typeface="+mj-lt"/>
+              <a:buAutoNum type="arabicPeriod" startAt="3"/>
+            </a:pPr>
+            <a:r>
+              <a:rPr kumimoji="1" lang="en-US" altLang="ja-JP" dirty="0"/>
+              <a:t>I</a:t>
+            </a:r>
+            <a:r>
+              <a:rPr lang="en-US" altLang="ja-JP" dirty="0"/>
+              <a:t>f you can not sound sounds, make sure soldering</a:t>
+            </a:r>
+            <a:r>
+              <a:rPr lang="ja-JP" altLang="en-US" dirty="0"/>
+              <a:t> </a:t>
+            </a:r>
+            <a:r>
+              <a:rPr lang="en-US" altLang="ja-JP" dirty="0"/>
+              <a:t>and </a:t>
+            </a:r>
+            <a:r>
+              <a:rPr lang="en-US" altLang="ja-JP" dirty="0" err="1"/>
+              <a:t>COMPort</a:t>
+            </a:r>
+            <a:r>
+              <a:rPr lang="en-US" altLang="ja-JP" dirty="0"/>
+              <a:t> name.</a:t>
+            </a:r>
+            <a:br>
+              <a:rPr lang="en-US" altLang="ja-JP" dirty="0"/>
+            </a:br>
+            <a:r>
+              <a:rPr lang="en-US" altLang="ja-JP" dirty="0"/>
+              <a:t>Or, please contact me.</a:t>
+            </a:r>
+            <a:br>
+              <a:rPr lang="en-US" altLang="ja-JP" dirty="0"/>
+            </a:br>
+            <a:br>
+              <a:rPr lang="en-US" altLang="ja-JP" dirty="0"/>
+            </a:br>
+            <a:r>
+              <a:rPr lang="en-US" altLang="ja-JP" sz="1800" dirty="0">
+                <a:solidFill>
+                  <a:srgbClr val="FF0000"/>
+                </a:solidFill>
+              </a:rPr>
+              <a:t>*Some UART dongles may not work properly.</a:t>
+            </a:r>
+            <a:br>
+              <a:rPr lang="en-US" altLang="ja-JP" sz="1800" dirty="0">
+                <a:solidFill>
+                  <a:srgbClr val="FF0000"/>
+                </a:solidFill>
+              </a:rPr>
+            </a:br>
+            <a:r>
+              <a:rPr lang="en-US" altLang="ja-JP" sz="1800" dirty="0">
+                <a:solidFill>
+                  <a:srgbClr val="FF0000"/>
+                </a:solidFill>
+              </a:rPr>
+              <a:t>*Compatible consoles may not work properly.</a:t>
             </a:r>
             <a:endParaRPr kumimoji="1" lang="ja-JP" altLang="en-US" dirty="0"/>
           </a:p>
         </p:txBody>
       </p:sp>
+      <p:pic>
+        <p:nvPicPr>
+          <p:cNvPr id="6" name="図 5">
+            <a:extLst>
+              <a:ext uri="{FF2B5EF4-FFF2-40B4-BE49-F238E27FC236}">
+                <a16:creationId xmlns:a16="http://schemas.microsoft.com/office/drawing/2014/main" id="{A2E081AD-DB5B-41BB-9A52-55D69078DEAF}"/>
+              </a:ext>
+            </a:extLst>
+          </p:cNvPr>
+          <p:cNvPicPr>
+            <a:picLocks noChangeAspect="1"/>
+          </p:cNvPicPr>
+          <p:nvPr/>
+        </p:nvPicPr>
+        <p:blipFill>
+          <a:blip r:embed="rId3"/>
+          <a:stretch>
+            <a:fillRect/>
+          </a:stretch>
+        </p:blipFill>
+        <p:spPr>
+          <a:xfrm>
+            <a:off x="3728707" y="3430800"/>
+            <a:ext cx="4734586" cy="1105054"/>
+          </a:xfrm>
+          <a:prstGeom prst="rect">
+            <a:avLst/>
+          </a:prstGeom>
+        </p:spPr>
+      </p:pic>
       <p:sp>
         <p:nvSpPr>
           <p:cNvPr id="4" name="スライド番号プレースホルダー 3">
@@ -22439,6 +24116,109 @@
             <a:fld id="{E27E2812-4560-4165-A7C7-9C013F955547}" type="slidenum">
               <a:rPr kumimoji="1" lang="ja-JP" altLang="en-US" smtClean="0"/>
               <a:t>20</a:t>
+            </a:fld>
+            <a:endParaRPr kumimoji="1" lang="ja-JP" altLang="en-US"/>
+          </a:p>
+        </p:txBody>
+      </p:sp>
+    </p:spTree>
+    <p:extLst>
+      <p:ext uri="{BB962C8B-B14F-4D97-AF65-F5344CB8AC3E}">
+        <p14:creationId xmlns:p14="http://schemas.microsoft.com/office/powerpoint/2010/main" val="1500572103"/>
+      </p:ext>
+    </p:extLst>
+  </p:cSld>
+  <p:clrMapOvr>
+    <a:masterClrMapping/>
+  </p:clrMapOvr>
+</p:sld>
+</file>
+
+<file path=ppt/slides/slide21.xml><?xml version="1.0" encoding="utf-8"?>
+<p:sld xmlns:a="http://schemas.openxmlformats.org/drawingml/2006/main" xmlns:r="http://schemas.openxmlformats.org/officeDocument/2006/relationships" xmlns:p="http://schemas.openxmlformats.org/presentationml/2006/main">
+  <p:cSld>
+    <p:spTree>
+      <p:nvGrpSpPr>
+        <p:cNvPr id="1" name=""/>
+        <p:cNvGrpSpPr/>
+        <p:nvPr/>
+      </p:nvGrpSpPr>
+      <p:grpSpPr>
+        <a:xfrm>
+          <a:off x="0" y="0"/>
+          <a:ext cx="0" cy="0"/>
+          <a:chOff x="0" y="0"/>
+          <a:chExt cx="0" cy="0"/>
+        </a:xfrm>
+      </p:grpSpPr>
+      <p:sp>
+        <p:nvSpPr>
+          <p:cNvPr id="2" name="タイトル 1">
+            <a:extLst>
+              <a:ext uri="{FF2B5EF4-FFF2-40B4-BE49-F238E27FC236}">
+                <a16:creationId xmlns:a16="http://schemas.microsoft.com/office/drawing/2014/main" id="{DF515C61-C958-43BC-BAFF-3C6346E55E36}"/>
+              </a:ext>
+            </a:extLst>
+          </p:cNvPr>
+          <p:cNvSpPr>
+            <a:spLocks noGrp="1"/>
+          </p:cNvSpPr>
+          <p:nvPr>
+            <p:ph type="title"/>
+          </p:nvPr>
+        </p:nvSpPr>
+        <p:spPr/>
+        <p:txBody>
+          <a:bodyPr/>
+          <a:lstStyle/>
+          <a:p>
+            <a:r>
+              <a:rPr kumimoji="1" lang="en-US" altLang="ja-JP" dirty="0"/>
+              <a:t>VGM Sound Interface(VSIF)</a:t>
+            </a:r>
+            <a:br>
+              <a:rPr kumimoji="1" lang="en-US" altLang="ja-JP" dirty="0"/>
+            </a:br>
+            <a:r>
+              <a:rPr kumimoji="1" lang="en-US" altLang="ja-JP" dirty="0"/>
+              <a:t>for </a:t>
+            </a:r>
+            <a:r>
+              <a:rPr kumimoji="1" lang="en-US" altLang="ja-JP" dirty="0" err="1"/>
+              <a:t>Famicom</a:t>
+            </a:r>
+            <a:r>
+              <a:rPr kumimoji="1" lang="en-US" altLang="ja-JP" dirty="0"/>
+              <a:t> spec</a:t>
+            </a:r>
+            <a:endParaRPr kumimoji="1" lang="ja-JP" altLang="en-US" dirty="0"/>
+          </a:p>
+        </p:txBody>
+      </p:sp>
+      <p:sp>
+        <p:nvSpPr>
+          <p:cNvPr id="4" name="スライド番号プレースホルダー 3">
+            <a:extLst>
+              <a:ext uri="{FF2B5EF4-FFF2-40B4-BE49-F238E27FC236}">
+                <a16:creationId xmlns:a16="http://schemas.microsoft.com/office/drawing/2014/main" id="{455F9055-FE97-49E6-B05C-BBC13F55BB4C}"/>
+              </a:ext>
+            </a:extLst>
+          </p:cNvPr>
+          <p:cNvSpPr>
+            <a:spLocks noGrp="1"/>
+          </p:cNvSpPr>
+          <p:nvPr>
+            <p:ph type="sldNum" sz="quarter" idx="12"/>
+          </p:nvPr>
+        </p:nvSpPr>
+        <p:spPr/>
+        <p:txBody>
+          <a:bodyPr/>
+          <a:lstStyle/>
+          <a:p>
+            <a:fld id="{E27E2812-4560-4165-A7C7-9C013F955547}" type="slidenum">
+              <a:rPr kumimoji="1" lang="ja-JP" altLang="en-US" smtClean="0"/>
+              <a:t>21</a:t>
             </a:fld>
             <a:endParaRPr kumimoji="1" lang="ja-JP" altLang="en-US"/>
           </a:p>
@@ -23813,7 +25593,7 @@
 </p:sld>
 </file>
 
-<file path=ppt/slides/slide21.xml><?xml version="1.0" encoding="utf-8"?>
+<file path=ppt/slides/slide22.xml><?xml version="1.0" encoding="utf-8"?>
 <p:sld xmlns:a="http://schemas.openxmlformats.org/drawingml/2006/main" xmlns:r="http://schemas.openxmlformats.org/officeDocument/2006/relationships" xmlns:p="http://schemas.openxmlformats.org/presentationml/2006/main">
   <p:cSld>
     <p:spTree>
@@ -23886,7 +25666,7 @@
           <a:p>
             <a:fld id="{E27E2812-4560-4165-A7C7-9C013F955547}" type="slidenum">
               <a:rPr kumimoji="1" lang="ja-JP" altLang="en-US" smtClean="0"/>
-              <a:t>21</a:t>
+              <a:t>22</a:t>
             </a:fld>
             <a:endParaRPr kumimoji="1" lang="ja-JP" altLang="en-US"/>
           </a:p>
@@ -24289,7 +26069,7 @@
 </p:sld>
 </file>
 
-<file path=ppt/slides/slide22.xml><?xml version="1.0" encoding="utf-8"?>
+<file path=ppt/slides/slide23.xml><?xml version="1.0" encoding="utf-8"?>
 <p:sld xmlns:a="http://schemas.openxmlformats.org/drawingml/2006/main" xmlns:r="http://schemas.openxmlformats.org/officeDocument/2006/relationships" xmlns:p="http://schemas.openxmlformats.org/presentationml/2006/main">
   <p:cSld>
     <p:spTree>
@@ -24523,7 +26303,7 @@
           <a:p>
             <a:fld id="{E27E2812-4560-4165-A7C7-9C013F955547}" type="slidenum">
               <a:rPr kumimoji="1" lang="ja-JP" altLang="en-US" smtClean="0"/>
-              <a:t>22</a:t>
+              <a:t>23</a:t>
             </a:fld>
             <a:endParaRPr kumimoji="1" lang="ja-JP" altLang="en-US"/>
           </a:p>
@@ -24902,7 +26682,7 @@
 </p:sld>
 </file>
 
-<file path=ppt/slides/slide23.xml><?xml version="1.0" encoding="utf-8"?>
+<file path=ppt/slides/slide24.xml><?xml version="1.0" encoding="utf-8"?>
 <p:sld xmlns:a="http://schemas.openxmlformats.org/drawingml/2006/main" xmlns:r="http://schemas.openxmlformats.org/officeDocument/2006/relationships" xmlns:p="http://schemas.openxmlformats.org/presentationml/2006/main">
   <p:cSld>
     <p:spTree>
@@ -25050,7 +26830,7 @@
           <a:p>
             <a:fld id="{E27E2812-4560-4165-A7C7-9C013F955547}" type="slidenum">
               <a:rPr kumimoji="1" lang="ja-JP" altLang="en-US" smtClean="0"/>
-              <a:t>23</a:t>
+              <a:t>24</a:t>
             </a:fld>
             <a:endParaRPr kumimoji="1" lang="ja-JP" altLang="en-US"/>
           </a:p>
@@ -25081,7 +26861,7 @@
 </p:sld>
 </file>
 
-<file path=ppt/slides/slide24.xml><?xml version="1.0" encoding="utf-8"?>
+<file path=ppt/slides/slide25.xml><?xml version="1.0" encoding="utf-8"?>
 <p:sld xmlns:a="http://schemas.openxmlformats.org/drawingml/2006/main" xmlns:r="http://schemas.openxmlformats.org/officeDocument/2006/relationships" xmlns:p="http://schemas.openxmlformats.org/presentationml/2006/main">
   <p:cSld>
     <p:spTree>
@@ -25150,7 +26930,7 @@
           <a:p>
             <a:fld id="{E27E2812-4560-4165-A7C7-9C013F955547}" type="slidenum">
               <a:rPr kumimoji="1" lang="ja-JP" altLang="en-US" smtClean="0"/>
-              <a:t>24</a:t>
+              <a:t>25</a:t>
             </a:fld>
             <a:endParaRPr kumimoji="1" lang="ja-JP" altLang="en-US"/>
           </a:p>
@@ -25711,7 +27491,7 @@
 </p:sld>
 </file>
 
-<file path=ppt/slides/slide25.xml><?xml version="1.0" encoding="utf-8"?>
+<file path=ppt/slides/slide26.xml><?xml version="1.0" encoding="utf-8"?>
 <p:sld xmlns:a="http://schemas.openxmlformats.org/drawingml/2006/main" xmlns:r="http://schemas.openxmlformats.org/officeDocument/2006/relationships" xmlns:p="http://schemas.openxmlformats.org/presentationml/2006/main">
   <p:cSld>
     <p:spTree>
@@ -25780,7 +27560,7 @@
           <a:p>
             <a:fld id="{E27E2812-4560-4165-A7C7-9C013F955547}" type="slidenum">
               <a:rPr kumimoji="1" lang="ja-JP" altLang="en-US" smtClean="0"/>
-              <a:t>25</a:t>
+              <a:t>26</a:t>
             </a:fld>
             <a:endParaRPr kumimoji="1" lang="ja-JP" altLang="en-US"/>
           </a:p>
@@ -26824,7 +28604,7 @@
 </p:sld>
 </file>
 
-<file path=ppt/slides/slide26.xml><?xml version="1.0" encoding="utf-8"?>
+<file path=ppt/slides/slide27.xml><?xml version="1.0" encoding="utf-8"?>
 <p:sld xmlns:a="http://schemas.openxmlformats.org/drawingml/2006/main" xmlns:r="http://schemas.openxmlformats.org/officeDocument/2006/relationships" xmlns:p="http://schemas.openxmlformats.org/presentationml/2006/main">
   <p:cSld>
     <p:spTree>
@@ -26893,7 +28673,7 @@
           <a:p>
             <a:fld id="{E27E2812-4560-4165-A7C7-9C013F955547}" type="slidenum">
               <a:rPr kumimoji="1" lang="ja-JP" altLang="en-US" smtClean="0"/>
-              <a:t>26</a:t>
+              <a:t>27</a:t>
             </a:fld>
             <a:endParaRPr kumimoji="1" lang="ja-JP" altLang="en-US"/>
           </a:p>
@@ -27827,7 +29607,7 @@
 </p:sld>
 </file>
 
-<file path=ppt/slides/slide27.xml><?xml version="1.0" encoding="utf-8"?>
+<file path=ppt/slides/slide28.xml><?xml version="1.0" encoding="utf-8"?>
 <p:sld xmlns:a="http://schemas.openxmlformats.org/drawingml/2006/main" xmlns:r="http://schemas.openxmlformats.org/officeDocument/2006/relationships" xmlns:p="http://schemas.openxmlformats.org/presentationml/2006/main">
   <p:cSld>
     <p:spTree>
@@ -27896,7 +29676,7 @@
           <a:p>
             <a:fld id="{E27E2812-4560-4165-A7C7-9C013F955547}" type="slidenum">
               <a:rPr kumimoji="1" lang="ja-JP" altLang="en-US" smtClean="0"/>
-              <a:t>27</a:t>
+              <a:t>28</a:t>
             </a:fld>
             <a:endParaRPr kumimoji="1" lang="ja-JP" altLang="en-US"/>
           </a:p>
@@ -28364,7 +30144,7 @@
 </p:sld>
 </file>
 
-<file path=ppt/slides/slide28.xml><?xml version="1.0" encoding="utf-8"?>
+<file path=ppt/slides/slide29.xml><?xml version="1.0" encoding="utf-8"?>
 <p:sld xmlns:a="http://schemas.openxmlformats.org/drawingml/2006/main" xmlns:r="http://schemas.openxmlformats.org/officeDocument/2006/relationships" xmlns:p="http://schemas.openxmlformats.org/presentationml/2006/main">
   <p:cSld>
     <p:spTree>
@@ -28433,7 +30213,7 @@
           <a:p>
             <a:fld id="{E27E2812-4560-4165-A7C7-9C013F955547}" type="slidenum">
               <a:rPr kumimoji="1" lang="ja-JP" altLang="en-US" smtClean="0"/>
-              <a:t>28</a:t>
+              <a:t>29</a:t>
             </a:fld>
             <a:endParaRPr kumimoji="1" lang="ja-JP" altLang="en-US"/>
           </a:p>
@@ -28760,7 +30540,225 @@
 </p:sld>
 </file>
 
-<file path=ppt/slides/slide29.xml><?xml version="1.0" encoding="utf-8"?>
+<file path=ppt/slides/slide3.xml><?xml version="1.0" encoding="utf-8"?>
+<p:sld xmlns:a="http://schemas.openxmlformats.org/drawingml/2006/main" xmlns:r="http://schemas.openxmlformats.org/officeDocument/2006/relationships" xmlns:p="http://schemas.openxmlformats.org/presentationml/2006/main">
+  <p:cSld>
+    <p:spTree>
+      <p:nvGrpSpPr>
+        <p:cNvPr id="1" name=""/>
+        <p:cNvGrpSpPr/>
+        <p:nvPr/>
+      </p:nvGrpSpPr>
+      <p:grpSpPr>
+        <a:xfrm>
+          <a:off x="0" y="0"/>
+          <a:ext cx="0" cy="0"/>
+          <a:chOff x="0" y="0"/>
+          <a:chExt cx="0" cy="0"/>
+        </a:xfrm>
+      </p:grpSpPr>
+      <p:sp>
+        <p:nvSpPr>
+          <p:cNvPr id="4" name="タイトル 3">
+            <a:extLst>
+              <a:ext uri="{FF2B5EF4-FFF2-40B4-BE49-F238E27FC236}">
+                <a16:creationId xmlns:a16="http://schemas.microsoft.com/office/drawing/2014/main" id="{FB667DA0-7816-423C-ABB6-6E1A375E34C1}"/>
+              </a:ext>
+            </a:extLst>
+          </p:cNvPr>
+          <p:cNvSpPr>
+            <a:spLocks noGrp="1"/>
+          </p:cNvSpPr>
+          <p:nvPr>
+            <p:ph type="title"/>
+          </p:nvPr>
+        </p:nvSpPr>
+        <p:spPr/>
+        <p:txBody>
+          <a:bodyPr/>
+          <a:lstStyle/>
+          <a:p>
+            <a:r>
+              <a:rPr lang="en-US" altLang="ja-JP" dirty="0"/>
+              <a:t>Install &amp; Basic Settings</a:t>
+            </a:r>
+            <a:endParaRPr lang="ja-JP" altLang="en-US" dirty="0"/>
+          </a:p>
+        </p:txBody>
+      </p:sp>
+      <p:sp>
+        <p:nvSpPr>
+          <p:cNvPr id="5" name="コンテンツ プレースホルダー 4">
+            <a:extLst>
+              <a:ext uri="{FF2B5EF4-FFF2-40B4-BE49-F238E27FC236}">
+                <a16:creationId xmlns:a16="http://schemas.microsoft.com/office/drawing/2014/main" id="{AC69825B-3FB5-4D01-B59B-F0D6FED9FA79}"/>
+              </a:ext>
+            </a:extLst>
+          </p:cNvPr>
+          <p:cNvSpPr>
+            <a:spLocks noGrp="1"/>
+          </p:cNvSpPr>
+          <p:nvPr>
+            <p:ph idx="1"/>
+          </p:nvPr>
+        </p:nvSpPr>
+        <p:spPr/>
+        <p:txBody>
+          <a:bodyPr>
+            <a:normAutofit/>
+          </a:bodyPr>
+          <a:lstStyle/>
+          <a:p>
+            <a:r>
+              <a:rPr lang="en-US" altLang="ja-JP" dirty="0"/>
+              <a:t>Install</a:t>
+            </a:r>
+          </a:p>
+          <a:p>
+            <a:pPr lvl="1"/>
+            <a:r>
+              <a:rPr lang="en-US" altLang="ja-JP" dirty="0"/>
+              <a:t>Extract the downloaded zip file.</a:t>
+            </a:r>
+          </a:p>
+          <a:p>
+            <a:pPr lvl="1"/>
+            <a:r>
+              <a:rPr lang="en-US" altLang="ja-JP" dirty="0"/>
+              <a:t>Click MAmidiMEmo.exe</a:t>
+            </a:r>
+          </a:p>
+          <a:p>
+            <a:pPr lvl="1"/>
+            <a:r>
+              <a:rPr lang="en-US" altLang="ja-JP" dirty="0"/>
+              <a:t>Will open the </a:t>
+            </a:r>
+            <a:r>
+              <a:rPr lang="en-US" altLang="ja-JP" dirty="0" err="1"/>
+              <a:t>MAmidiMEmo</a:t>
+            </a:r>
+            <a:r>
+              <a:rPr lang="en-US" altLang="ja-JP" dirty="0"/>
+              <a:t>. If not, please check the followings.</a:t>
+            </a:r>
+          </a:p>
+          <a:p>
+            <a:pPr lvl="2"/>
+            <a:r>
+              <a:rPr lang="en-US" altLang="ja-JP" b="1" dirty="0"/>
+              <a:t>.NET Framework 4.7 or later </a:t>
+            </a:r>
+            <a:r>
+              <a:rPr lang="en-US" altLang="ja-JP" dirty="0"/>
+              <a:t>installed on your PC.</a:t>
+            </a:r>
+          </a:p>
+          <a:p>
+            <a:pPr lvl="2"/>
+            <a:r>
+              <a:rPr lang="en-US" altLang="ja-JP" b="1" dirty="0"/>
+              <a:t>VC++ 2012 Runtime </a:t>
+            </a:r>
+            <a:r>
+              <a:rPr lang="en-US" altLang="ja-JP" dirty="0"/>
+              <a:t>installed on your PC.</a:t>
+            </a:r>
+          </a:p>
+          <a:p>
+            <a:pPr lvl="2"/>
+            <a:r>
+              <a:rPr lang="en-US" altLang="ja-JP" dirty="0">
+                <a:solidFill>
+                  <a:schemeClr val="bg1">
+                    <a:lumMod val="65000"/>
+                  </a:schemeClr>
+                </a:solidFill>
+              </a:rPr>
+              <a:t>(Execute "DelZoneID.ps1“ to remove “</a:t>
+            </a:r>
+            <a:r>
+              <a:rPr lang="en-US" altLang="ja-JP" dirty="0" err="1">
+                <a:solidFill>
+                  <a:schemeClr val="bg1">
+                    <a:lumMod val="65000"/>
+                  </a:schemeClr>
+                </a:solidFill>
+              </a:rPr>
+              <a:t>Zone.Identifier</a:t>
+            </a:r>
+            <a:r>
+              <a:rPr lang="en-US" altLang="ja-JP" dirty="0">
+                <a:solidFill>
+                  <a:schemeClr val="bg1">
+                    <a:lumMod val="65000"/>
+                  </a:schemeClr>
+                </a:solidFill>
+              </a:rPr>
+              <a:t>” flag.)</a:t>
+            </a:r>
+          </a:p>
+          <a:p>
+            <a:pPr lvl="1"/>
+            <a:endParaRPr lang="ja-JP" altLang="en-US" dirty="0"/>
+          </a:p>
+        </p:txBody>
+      </p:sp>
+      <p:sp>
+        <p:nvSpPr>
+          <p:cNvPr id="2" name="スライド番号プレースホルダー 1">
+            <a:extLst>
+              <a:ext uri="{FF2B5EF4-FFF2-40B4-BE49-F238E27FC236}">
+                <a16:creationId xmlns:a16="http://schemas.microsoft.com/office/drawing/2014/main" id="{CC23E5B1-840D-4258-A81C-614C99CB76AA}"/>
+              </a:ext>
+            </a:extLst>
+          </p:cNvPr>
+          <p:cNvSpPr>
+            <a:spLocks noGrp="1"/>
+          </p:cNvSpPr>
+          <p:nvPr>
+            <p:ph type="sldNum" sz="quarter" idx="12"/>
+          </p:nvPr>
+        </p:nvSpPr>
+        <p:spPr/>
+        <p:txBody>
+          <a:bodyPr/>
+          <a:lstStyle/>
+          <a:p>
+            <a:fld id="{E27E2812-4560-4165-A7C7-9C013F955547}" type="slidenum">
+              <a:rPr kumimoji="1" lang="ja-JP" altLang="en-US" smtClean="0"/>
+              <a:t>3</a:t>
+            </a:fld>
+            <a:endParaRPr kumimoji="1" lang="ja-JP" altLang="en-US"/>
+          </a:p>
+        </p:txBody>
+      </p:sp>
+    </p:spTree>
+    <p:extLst>
+      <p:ext uri="{BB962C8B-B14F-4D97-AF65-F5344CB8AC3E}">
+        <p14:creationId xmlns:p14="http://schemas.microsoft.com/office/powerpoint/2010/main" val="1914892417"/>
+      </p:ext>
+    </p:extLst>
+  </p:cSld>
+  <p:clrMapOvr>
+    <a:masterClrMapping/>
+  </p:clrMapOvr>
+  <mc:AlternateContent xmlns:mc="http://schemas.openxmlformats.org/markup-compatibility/2006" xmlns:p14="http://schemas.microsoft.com/office/powerpoint/2010/main">
+    <mc:Choice Requires="p14">
+      <p:transition spd="med" p14:dur="700">
+        <p:fade/>
+      </p:transition>
+    </mc:Choice>
+    <mc:Fallback xmlns="">
+      <p:transition spd="med">
+        <p:fade/>
+      </p:transition>
+    </mc:Fallback>
+  </mc:AlternateContent>
+</p:sld>
+</file>
+
+<file path=ppt/slides/slide30.xml><?xml version="1.0" encoding="utf-8"?>
 <p:sld xmlns:a="http://schemas.openxmlformats.org/drawingml/2006/main" xmlns:r="http://schemas.openxmlformats.org/officeDocument/2006/relationships" xmlns:p="http://schemas.openxmlformats.org/presentationml/2006/main">
   <p:cSld>
     <p:spTree>
@@ -28829,7 +30827,7 @@
           <a:p>
             <a:fld id="{E27E2812-4560-4165-A7C7-9C013F955547}" type="slidenum">
               <a:rPr kumimoji="1" lang="ja-JP" altLang="en-US" smtClean="0"/>
-              <a:t>29</a:t>
+              <a:t>30</a:t>
             </a:fld>
             <a:endParaRPr kumimoji="1" lang="ja-JP" altLang="en-US"/>
           </a:p>
@@ -29236,225 +31234,7 @@
 </p:sld>
 </file>
 
-<file path=ppt/slides/slide3.xml><?xml version="1.0" encoding="utf-8"?>
-<p:sld xmlns:a="http://schemas.openxmlformats.org/drawingml/2006/main" xmlns:r="http://schemas.openxmlformats.org/officeDocument/2006/relationships" xmlns:p="http://schemas.openxmlformats.org/presentationml/2006/main">
-  <p:cSld>
-    <p:spTree>
-      <p:nvGrpSpPr>
-        <p:cNvPr id="1" name=""/>
-        <p:cNvGrpSpPr/>
-        <p:nvPr/>
-      </p:nvGrpSpPr>
-      <p:grpSpPr>
-        <a:xfrm>
-          <a:off x="0" y="0"/>
-          <a:ext cx="0" cy="0"/>
-          <a:chOff x="0" y="0"/>
-          <a:chExt cx="0" cy="0"/>
-        </a:xfrm>
-      </p:grpSpPr>
-      <p:sp>
-        <p:nvSpPr>
-          <p:cNvPr id="4" name="タイトル 3">
-            <a:extLst>
-              <a:ext uri="{FF2B5EF4-FFF2-40B4-BE49-F238E27FC236}">
-                <a16:creationId xmlns:a16="http://schemas.microsoft.com/office/drawing/2014/main" id="{FB667DA0-7816-423C-ABB6-6E1A375E34C1}"/>
-              </a:ext>
-            </a:extLst>
-          </p:cNvPr>
-          <p:cNvSpPr>
-            <a:spLocks noGrp="1"/>
-          </p:cNvSpPr>
-          <p:nvPr>
-            <p:ph type="title"/>
-          </p:nvPr>
-        </p:nvSpPr>
-        <p:spPr/>
-        <p:txBody>
-          <a:bodyPr/>
-          <a:lstStyle/>
-          <a:p>
-            <a:r>
-              <a:rPr lang="en-US" altLang="ja-JP" dirty="0"/>
-              <a:t>Install &amp; Basic Settings</a:t>
-            </a:r>
-            <a:endParaRPr lang="ja-JP" altLang="en-US" dirty="0"/>
-          </a:p>
-        </p:txBody>
-      </p:sp>
-      <p:sp>
-        <p:nvSpPr>
-          <p:cNvPr id="5" name="コンテンツ プレースホルダー 4">
-            <a:extLst>
-              <a:ext uri="{FF2B5EF4-FFF2-40B4-BE49-F238E27FC236}">
-                <a16:creationId xmlns:a16="http://schemas.microsoft.com/office/drawing/2014/main" id="{AC69825B-3FB5-4D01-B59B-F0D6FED9FA79}"/>
-              </a:ext>
-            </a:extLst>
-          </p:cNvPr>
-          <p:cNvSpPr>
-            <a:spLocks noGrp="1"/>
-          </p:cNvSpPr>
-          <p:nvPr>
-            <p:ph idx="1"/>
-          </p:nvPr>
-        </p:nvSpPr>
-        <p:spPr/>
-        <p:txBody>
-          <a:bodyPr>
-            <a:normAutofit/>
-          </a:bodyPr>
-          <a:lstStyle/>
-          <a:p>
-            <a:r>
-              <a:rPr lang="en-US" altLang="ja-JP" dirty="0"/>
-              <a:t>Install</a:t>
-            </a:r>
-          </a:p>
-          <a:p>
-            <a:pPr lvl="1"/>
-            <a:r>
-              <a:rPr lang="en-US" altLang="ja-JP" dirty="0"/>
-              <a:t>Extract the downloaded zip file.</a:t>
-            </a:r>
-          </a:p>
-          <a:p>
-            <a:pPr lvl="1"/>
-            <a:r>
-              <a:rPr lang="en-US" altLang="ja-JP" dirty="0"/>
-              <a:t>Click MAmidiMEmo.exe</a:t>
-            </a:r>
-          </a:p>
-          <a:p>
-            <a:pPr lvl="1"/>
-            <a:r>
-              <a:rPr lang="en-US" altLang="ja-JP" dirty="0"/>
-              <a:t>Will open the </a:t>
-            </a:r>
-            <a:r>
-              <a:rPr lang="en-US" altLang="ja-JP" dirty="0" err="1"/>
-              <a:t>MAmidiMEmo</a:t>
-            </a:r>
-            <a:r>
-              <a:rPr lang="en-US" altLang="ja-JP" dirty="0"/>
-              <a:t>. If not, please check the followings.</a:t>
-            </a:r>
-          </a:p>
-          <a:p>
-            <a:pPr lvl="2"/>
-            <a:r>
-              <a:rPr lang="en-US" altLang="ja-JP" b="1" dirty="0"/>
-              <a:t>.NET Framework 4.7 or later </a:t>
-            </a:r>
-            <a:r>
-              <a:rPr lang="en-US" altLang="ja-JP" dirty="0"/>
-              <a:t>installed on your PC.</a:t>
-            </a:r>
-          </a:p>
-          <a:p>
-            <a:pPr lvl="2"/>
-            <a:r>
-              <a:rPr lang="en-US" altLang="ja-JP" b="1" dirty="0"/>
-              <a:t>VC++ 2012 Runtime </a:t>
-            </a:r>
-            <a:r>
-              <a:rPr lang="en-US" altLang="ja-JP" dirty="0"/>
-              <a:t>installed on your PC.</a:t>
-            </a:r>
-          </a:p>
-          <a:p>
-            <a:pPr lvl="2"/>
-            <a:r>
-              <a:rPr lang="en-US" altLang="ja-JP" dirty="0">
-                <a:solidFill>
-                  <a:schemeClr val="bg1">
-                    <a:lumMod val="65000"/>
-                  </a:schemeClr>
-                </a:solidFill>
-              </a:rPr>
-              <a:t>(Execute "DelZoneID.ps1“ to remove “</a:t>
-            </a:r>
-            <a:r>
-              <a:rPr lang="en-US" altLang="ja-JP" dirty="0" err="1">
-                <a:solidFill>
-                  <a:schemeClr val="bg1">
-                    <a:lumMod val="65000"/>
-                  </a:schemeClr>
-                </a:solidFill>
-              </a:rPr>
-              <a:t>Zone.Identifier</a:t>
-            </a:r>
-            <a:r>
-              <a:rPr lang="en-US" altLang="ja-JP" dirty="0">
-                <a:solidFill>
-                  <a:schemeClr val="bg1">
-                    <a:lumMod val="65000"/>
-                  </a:schemeClr>
-                </a:solidFill>
-              </a:rPr>
-              <a:t>” flag.)</a:t>
-            </a:r>
-          </a:p>
-          <a:p>
-            <a:pPr lvl="1"/>
-            <a:endParaRPr lang="ja-JP" altLang="en-US" dirty="0"/>
-          </a:p>
-        </p:txBody>
-      </p:sp>
-      <p:sp>
-        <p:nvSpPr>
-          <p:cNvPr id="2" name="スライド番号プレースホルダー 1">
-            <a:extLst>
-              <a:ext uri="{FF2B5EF4-FFF2-40B4-BE49-F238E27FC236}">
-                <a16:creationId xmlns:a16="http://schemas.microsoft.com/office/drawing/2014/main" id="{CC23E5B1-840D-4258-A81C-614C99CB76AA}"/>
-              </a:ext>
-            </a:extLst>
-          </p:cNvPr>
-          <p:cNvSpPr>
-            <a:spLocks noGrp="1"/>
-          </p:cNvSpPr>
-          <p:nvPr>
-            <p:ph type="sldNum" sz="quarter" idx="12"/>
-          </p:nvPr>
-        </p:nvSpPr>
-        <p:spPr/>
-        <p:txBody>
-          <a:bodyPr/>
-          <a:lstStyle/>
-          <a:p>
-            <a:fld id="{E27E2812-4560-4165-A7C7-9C013F955547}" type="slidenum">
-              <a:rPr kumimoji="1" lang="ja-JP" altLang="en-US" smtClean="0"/>
-              <a:t>3</a:t>
-            </a:fld>
-            <a:endParaRPr kumimoji="1" lang="ja-JP" altLang="en-US"/>
-          </a:p>
-        </p:txBody>
-      </p:sp>
-    </p:spTree>
-    <p:extLst>
-      <p:ext uri="{BB962C8B-B14F-4D97-AF65-F5344CB8AC3E}">
-        <p14:creationId xmlns:p14="http://schemas.microsoft.com/office/powerpoint/2010/main" val="1914892417"/>
-      </p:ext>
-    </p:extLst>
-  </p:cSld>
-  <p:clrMapOvr>
-    <a:masterClrMapping/>
-  </p:clrMapOvr>
-  <mc:AlternateContent xmlns:mc="http://schemas.openxmlformats.org/markup-compatibility/2006" xmlns:p14="http://schemas.microsoft.com/office/powerpoint/2010/main">
-    <mc:Choice Requires="p14">
-      <p:transition spd="med" p14:dur="700">
-        <p:fade/>
-      </p:transition>
-    </mc:Choice>
-    <mc:Fallback xmlns="">
-      <p:transition spd="med">
-        <p:fade/>
-      </p:transition>
-    </mc:Fallback>
-  </mc:AlternateContent>
-</p:sld>
-</file>
-
-<file path=ppt/slides/slide30.xml><?xml version="1.0" encoding="utf-8"?>
+<file path=ppt/slides/slide31.xml><?xml version="1.0" encoding="utf-8"?>
 <p:sld xmlns:a="http://schemas.openxmlformats.org/drawingml/2006/main" xmlns:r="http://schemas.openxmlformats.org/officeDocument/2006/relationships" xmlns:p="http://schemas.openxmlformats.org/presentationml/2006/main">
   <p:cSld>
     <p:spTree>
@@ -29523,7 +31303,7 @@
           <a:p>
             <a:fld id="{E27E2812-4560-4165-A7C7-9C013F955547}" type="slidenum">
               <a:rPr kumimoji="1" lang="ja-JP" altLang="en-US" smtClean="0"/>
-              <a:t>30</a:t>
+              <a:t>31</a:t>
             </a:fld>
             <a:endParaRPr kumimoji="1" lang="ja-JP" altLang="en-US"/>
           </a:p>
@@ -30196,7 +31976,7 @@
 </p:sld>
 </file>
 
-<file path=ppt/slides/slide31.xml><?xml version="1.0" encoding="utf-8"?>
+<file path=ppt/slides/slide32.xml><?xml version="1.0" encoding="utf-8"?>
 <p:sld xmlns:a="http://schemas.openxmlformats.org/drawingml/2006/main" xmlns:r="http://schemas.openxmlformats.org/officeDocument/2006/relationships" xmlns:p="http://schemas.openxmlformats.org/presentationml/2006/main">
   <p:cSld>
     <p:spTree>
@@ -30344,7 +32124,7 @@
           <a:p>
             <a:fld id="{E27E2812-4560-4165-A7C7-9C013F955547}" type="slidenum">
               <a:rPr kumimoji="1" lang="ja-JP" altLang="en-US" smtClean="0"/>
-              <a:t>31</a:t>
+              <a:t>32</a:t>
             </a:fld>
             <a:endParaRPr kumimoji="1" lang="ja-JP" altLang="en-US"/>
           </a:p>
@@ -30535,7 +32315,7 @@
 </p:sld>
 </file>
 
-<file path=ppt/slides/slide32.xml><?xml version="1.0" encoding="utf-8"?>
+<file path=ppt/slides/slide33.xml><?xml version="1.0" encoding="utf-8"?>
 <p:sld xmlns:a="http://schemas.openxmlformats.org/drawingml/2006/main" xmlns:r="http://schemas.openxmlformats.org/officeDocument/2006/relationships" xmlns:p="http://schemas.openxmlformats.org/presentationml/2006/main">
   <p:cSld>
     <p:spTree>
@@ -30807,7 +32587,7 @@
           <a:p>
             <a:fld id="{E27E2812-4560-4165-A7C7-9C013F955547}" type="slidenum">
               <a:rPr kumimoji="1" lang="ja-JP" altLang="en-US" smtClean="0"/>
-              <a:t>32</a:t>
+              <a:t>33</a:t>
             </a:fld>
             <a:endParaRPr kumimoji="1" lang="ja-JP" altLang="en-US"/>
           </a:p>

</xml_diff>

<commit_message>
4.3.0.0 Supported SID chip for VSIF.
</commit_message>
<xml_diff>
--- a/docs/MAmidiMEmo/Manual.pptx
+++ b/docs/MAmidiMEmo/Manual.pptx
@@ -229,7 +229,7 @@
           <a:p>
             <a:fld id="{581C28D8-13B6-41C3-9F5F-0284C569C6F1}" type="datetimeFigureOut">
               <a:rPr kumimoji="1" lang="ja-JP" altLang="en-US" smtClean="0"/>
-              <a:t>2022/8/20</a:t>
+              <a:t>2022/8/21</a:t>
             </a:fld>
             <a:endParaRPr kumimoji="1" lang="ja-JP" altLang="en-US"/>
           </a:p>
@@ -1388,7 +1388,7 @@
           <a:p>
             <a:fld id="{B8625E62-B904-4691-B75E-EC1C32885285}" type="datetime1">
               <a:rPr kumimoji="1" lang="ja-JP" altLang="en-US" smtClean="0"/>
-              <a:t>2022/8/20</a:t>
+              <a:t>2022/8/21</a:t>
             </a:fld>
             <a:endParaRPr kumimoji="1" lang="ja-JP" altLang="en-US"/>
           </a:p>
@@ -1726,7 +1726,7 @@
           <a:p>
             <a:fld id="{A4C87007-2A40-4EFC-90A3-258EFA3C1001}" type="datetime1">
               <a:rPr kumimoji="1" lang="ja-JP" altLang="en-US" smtClean="0"/>
-              <a:t>2022/8/20</a:t>
+              <a:t>2022/8/21</a:t>
             </a:fld>
             <a:endParaRPr kumimoji="1" lang="ja-JP" altLang="en-US"/>
           </a:p>
@@ -2127,7 +2127,7 @@
           <a:p>
             <a:fld id="{0FE0D7FF-9203-4AA3-90FD-622674A14F90}" type="datetime1">
               <a:rPr kumimoji="1" lang="ja-JP" altLang="en-US" smtClean="0"/>
-              <a:t>2022/8/20</a:t>
+              <a:t>2022/8/21</a:t>
             </a:fld>
             <a:endParaRPr kumimoji="1" lang="ja-JP" altLang="en-US"/>
           </a:p>
@@ -2463,7 +2463,7 @@
           <a:p>
             <a:fld id="{D2D6E4D3-BEDB-4F35-876B-5B9AA41BFB5B}" type="datetime1">
               <a:rPr kumimoji="1" lang="ja-JP" altLang="en-US" smtClean="0"/>
-              <a:t>2022/8/20</a:t>
+              <a:t>2022/8/21</a:t>
             </a:fld>
             <a:endParaRPr kumimoji="1" lang="ja-JP" altLang="en-US"/>
           </a:p>
@@ -2783,7 +2783,7 @@
           <a:p>
             <a:fld id="{2ACD896E-FC14-4F25-BC47-18ABAEA9E1FE}" type="datetime1">
               <a:rPr kumimoji="1" lang="ja-JP" altLang="en-US" smtClean="0"/>
-              <a:t>2022/8/20</a:t>
+              <a:t>2022/8/21</a:t>
             </a:fld>
             <a:endParaRPr kumimoji="1" lang="ja-JP" altLang="en-US"/>
           </a:p>
@@ -3179,7 +3179,7 @@
           <a:p>
             <a:fld id="{54FC701B-2185-4987-B8E2-5507664B65F4}" type="datetime1">
               <a:rPr kumimoji="1" lang="ja-JP" altLang="en-US" smtClean="0"/>
-              <a:t>2022/8/20</a:t>
+              <a:t>2022/8/21</a:t>
             </a:fld>
             <a:endParaRPr kumimoji="1" lang="ja-JP" altLang="en-US"/>
           </a:p>
@@ -3468,7 +3468,7 @@
           <a:p>
             <a:fld id="{3FB4CDED-9617-418F-B546-D66B9BB6C35E}" type="datetime1">
               <a:rPr kumimoji="1" lang="ja-JP" altLang="en-US" smtClean="0"/>
-              <a:t>2022/8/20</a:t>
+              <a:t>2022/8/21</a:t>
             </a:fld>
             <a:endParaRPr kumimoji="1" lang="ja-JP" altLang="en-US"/>
           </a:p>
@@ -3762,7 +3762,7 @@
           <a:p>
             <a:fld id="{F5635D40-962A-46D7-8037-3F2900B5EB4D}" type="datetime1">
               <a:rPr kumimoji="1" lang="ja-JP" altLang="en-US" smtClean="0"/>
-              <a:t>2022/8/20</a:t>
+              <a:t>2022/8/21</a:t>
             </a:fld>
             <a:endParaRPr kumimoji="1" lang="ja-JP" altLang="en-US"/>
           </a:p>
@@ -4056,7 +4056,7 @@
           <a:p>
             <a:fld id="{741DA9A2-8356-4FFD-B66A-E38811049858}" type="datetime1">
               <a:rPr kumimoji="1" lang="ja-JP" altLang="en-US" smtClean="0"/>
-              <a:t>2022/8/20</a:t>
+              <a:t>2022/8/21</a:t>
             </a:fld>
             <a:endParaRPr kumimoji="1" lang="ja-JP" altLang="en-US"/>
           </a:p>
@@ -4385,7 +4385,7 @@
           <a:p>
             <a:fld id="{9DDE8989-88B8-4869-97D9-547531F13E13}" type="datetime1">
               <a:rPr kumimoji="1" lang="ja-JP" altLang="en-US" smtClean="0"/>
-              <a:t>2022/8/20</a:t>
+              <a:t>2022/8/21</a:t>
             </a:fld>
             <a:endParaRPr kumimoji="1" lang="ja-JP" altLang="en-US"/>
           </a:p>
@@ -4772,7 +4772,7 @@
           <a:p>
             <a:fld id="{81EC4031-B949-4300-AB3E-1551426E8631}" type="datetime1">
               <a:rPr kumimoji="1" lang="ja-JP" altLang="en-US" smtClean="0"/>
-              <a:t>2022/8/20</a:t>
+              <a:t>2022/8/21</a:t>
             </a:fld>
             <a:endParaRPr kumimoji="1" lang="ja-JP" altLang="en-US"/>
           </a:p>
@@ -5293,7 +5293,7 @@
           <a:p>
             <a:fld id="{F39E755E-A59D-4634-B604-E9BB568B1156}" type="datetime1">
               <a:rPr kumimoji="1" lang="ja-JP" altLang="en-US" smtClean="0"/>
-              <a:t>2022/8/20</a:t>
+              <a:t>2022/8/21</a:t>
             </a:fld>
             <a:endParaRPr kumimoji="1" lang="ja-JP" altLang="en-US"/>
           </a:p>
@@ -5498,7 +5498,7 @@
           <a:p>
             <a:fld id="{61DA38B3-7601-4256-ABFE-386B92B0EDB5}" type="datetime1">
               <a:rPr kumimoji="1" lang="ja-JP" altLang="en-US" smtClean="0"/>
-              <a:t>2022/8/20</a:t>
+              <a:t>2022/8/21</a:t>
             </a:fld>
             <a:endParaRPr kumimoji="1" lang="ja-JP" altLang="en-US"/>
           </a:p>
@@ -5675,7 +5675,7 @@
           <a:p>
             <a:fld id="{5A28ED6D-8A94-4DBA-8EF2-284D1A467CE8}" type="datetime1">
               <a:rPr kumimoji="1" lang="ja-JP" altLang="en-US" smtClean="0"/>
-              <a:t>2022/8/20</a:t>
+              <a:t>2022/8/21</a:t>
             </a:fld>
             <a:endParaRPr kumimoji="1" lang="ja-JP" altLang="en-US"/>
           </a:p>
@@ -6040,7 +6040,7 @@
           <a:p>
             <a:fld id="{B27B0317-28AF-43C5-8944-AADFA89E0149}" type="datetime1">
               <a:rPr kumimoji="1" lang="ja-JP" altLang="en-US" smtClean="0"/>
-              <a:t>2022/8/20</a:t>
+              <a:t>2022/8/21</a:t>
             </a:fld>
             <a:endParaRPr kumimoji="1" lang="ja-JP" altLang="en-US"/>
           </a:p>
@@ -6385,7 +6385,7 @@
           <a:p>
             <a:fld id="{A78D023C-C4FA-4CE8-B5BE-6798898EE377}" type="datetime1">
               <a:rPr kumimoji="1" lang="ja-JP" altLang="en-US" smtClean="0"/>
-              <a:t>2022/8/20</a:t>
+              <a:t>2022/8/21</a:t>
             </a:fld>
             <a:endParaRPr kumimoji="1" lang="ja-JP" altLang="en-US"/>
           </a:p>
@@ -8534,7 +8534,7 @@
           <a:p>
             <a:fld id="{99567159-F4A8-4352-915B-DDBEFEF4A4D6}" type="datetime1">
               <a:rPr kumimoji="1" lang="ja-JP" altLang="en-US" smtClean="0"/>
-              <a:t>2022/8/20</a:t>
+              <a:t>2022/8/21</a:t>
             </a:fld>
             <a:endParaRPr kumimoji="1" lang="ja-JP" altLang="en-US"/>
           </a:p>
@@ -9120,11 +9120,15 @@
             </a:r>
             <a:r>
               <a:rPr lang="en-US" altLang="ja-JP" dirty="0"/>
-              <a:t>- </a:t>
-            </a:r>
-            <a:r>
-              <a:rPr lang="en-US" altLang="ja-JP"/>
-              <a:t>Rev 0.6.1</a:t>
+              <a:t>– for </a:t>
+            </a:r>
+            <a:r>
+              <a:rPr lang="en-US" altLang="ja-JP" dirty="0" err="1"/>
+              <a:t>MAmidiMEmo</a:t>
+            </a:r>
+            <a:r>
+              <a:rPr lang="en-US" altLang="ja-JP" dirty="0"/>
+              <a:t> V4.3.0.0</a:t>
             </a:r>
             <a:endParaRPr lang="ja-JP" altLang="en-US" dirty="0"/>
           </a:p>
@@ -13063,7 +13067,7 @@
             </a:pPr>
             <a:r>
               <a:rPr lang="en-US" altLang="ja-JP" dirty="0"/>
-              <a:t>Solder like the following.</a:t>
+              <a:t>Solder like the following and connect it to the JOYSTICK PORT 2.</a:t>
             </a:r>
           </a:p>
           <a:p>
@@ -13347,42 +13351,6 @@
       </p:sp>
       <p:sp>
         <p:nvSpPr>
-          <p:cNvPr id="27" name="テキスト ボックス 26">
-            <a:extLst>
-              <a:ext uri="{FF2B5EF4-FFF2-40B4-BE49-F238E27FC236}">
-                <a16:creationId xmlns:a16="http://schemas.microsoft.com/office/drawing/2014/main" id="{0DC80F62-61CC-494D-9703-3987DA145C58}"/>
-              </a:ext>
-            </a:extLst>
-          </p:cNvPr>
-          <p:cNvSpPr txBox="1"/>
-          <p:nvPr/>
-        </p:nvSpPr>
-        <p:spPr>
-          <a:xfrm>
-            <a:off x="9548667" y="5642688"/>
-            <a:ext cx="2172581" cy="369332"/>
-          </a:xfrm>
-          <a:prstGeom prst="rect">
-            <a:avLst/>
-          </a:prstGeom>
-          <a:noFill/>
-        </p:spPr>
-        <p:txBody>
-          <a:bodyPr wrap="square">
-            <a:spAutoFit/>
-          </a:bodyPr>
-          <a:lstStyle/>
-          <a:p>
-            <a:r>
-              <a:rPr kumimoji="1" lang="en-US" altLang="ja-JP" dirty="0"/>
-              <a:t>Any UART dongle</a:t>
-            </a:r>
-            <a:endParaRPr lang="ja-JP" altLang="en-US" dirty="0"/>
-          </a:p>
-        </p:txBody>
-      </p:sp>
-      <p:sp>
-        <p:nvSpPr>
           <p:cNvPr id="4" name="スライド番号プレースホルダー 3">
             <a:extLst>
               <a:ext uri="{FF2B5EF4-FFF2-40B4-BE49-F238E27FC236}">
@@ -13804,6 +13772,94 @@
           </a:p>
         </p:txBody>
       </p:sp>
+      <p:sp>
+        <p:nvSpPr>
+          <p:cNvPr id="9" name="正方形/長方形 8">
+            <a:extLst>
+              <a:ext uri="{FF2B5EF4-FFF2-40B4-BE49-F238E27FC236}">
+                <a16:creationId xmlns:a16="http://schemas.microsoft.com/office/drawing/2014/main" id="{7321A7D0-E7A9-852C-DE88-642041FEB9B4}"/>
+              </a:ext>
+            </a:extLst>
+          </p:cNvPr>
+          <p:cNvSpPr/>
+          <p:nvPr/>
+        </p:nvSpPr>
+        <p:spPr>
+          <a:xfrm>
+            <a:off x="9598738" y="5512655"/>
+            <a:ext cx="1121578" cy="219630"/>
+          </a:xfrm>
+          <a:prstGeom prst="rect">
+            <a:avLst/>
+          </a:prstGeom>
+          <a:solidFill>
+            <a:schemeClr val="bg1"/>
+          </a:solidFill>
+          <a:ln>
+            <a:noFill/>
+          </a:ln>
+        </p:spPr>
+        <p:style>
+          <a:lnRef idx="2">
+            <a:schemeClr val="accent1">
+              <a:shade val="50000"/>
+            </a:schemeClr>
+          </a:lnRef>
+          <a:fillRef idx="1">
+            <a:schemeClr val="accent1"/>
+          </a:fillRef>
+          <a:effectRef idx="0">
+            <a:schemeClr val="accent1"/>
+          </a:effectRef>
+          <a:fontRef idx="minor">
+            <a:schemeClr val="lt1"/>
+          </a:fontRef>
+        </p:style>
+        <p:txBody>
+          <a:bodyPr rtlCol="0" anchor="ctr"/>
+          <a:lstStyle/>
+          <a:p>
+            <a:pPr algn="ctr"/>
+            <a:endParaRPr kumimoji="1" lang="ja-JP" altLang="en-US"/>
+          </a:p>
+        </p:txBody>
+      </p:sp>
+      <p:sp>
+        <p:nvSpPr>
+          <p:cNvPr id="10" name="テキスト ボックス 9">
+            <a:extLst>
+              <a:ext uri="{FF2B5EF4-FFF2-40B4-BE49-F238E27FC236}">
+                <a16:creationId xmlns:a16="http://schemas.microsoft.com/office/drawing/2014/main" id="{067E41C3-7A69-86D3-4E07-F5D2C913DDDC}"/>
+              </a:ext>
+            </a:extLst>
+          </p:cNvPr>
+          <p:cNvSpPr txBox="1"/>
+          <p:nvPr/>
+        </p:nvSpPr>
+        <p:spPr>
+          <a:xfrm>
+            <a:off x="9548667" y="5642688"/>
+            <a:ext cx="2172581" cy="369332"/>
+          </a:xfrm>
+          <a:prstGeom prst="rect">
+            <a:avLst/>
+          </a:prstGeom>
+          <a:noFill/>
+        </p:spPr>
+        <p:txBody>
+          <a:bodyPr wrap="square">
+            <a:spAutoFit/>
+          </a:bodyPr>
+          <a:lstStyle/>
+          <a:p>
+            <a:r>
+              <a:rPr kumimoji="1" lang="en-US" altLang="ja-JP" dirty="0"/>
+              <a:t>Any UART dongle</a:t>
+            </a:r>
+            <a:endParaRPr lang="ja-JP" altLang="en-US" dirty="0"/>
+          </a:p>
+        </p:txBody>
+      </p:sp>
     </p:spTree>
     <p:extLst>
       <p:ext uri="{BB962C8B-B14F-4D97-AF65-F5344CB8AC3E}">
@@ -14036,7 +14092,7 @@
             </a:pPr>
             <a:r>
               <a:rPr lang="en-US" altLang="ja-JP" dirty="0"/>
-              <a:t>Solder like the following.</a:t>
+              <a:t>Solder like the following and connect it to the JOYSTICK PORT 2.</a:t>
             </a:r>
           </a:p>
           <a:p>
@@ -15167,6 +15223,58 @@
           </a:p>
         </p:txBody>
       </p:sp>
+      <p:sp>
+        <p:nvSpPr>
+          <p:cNvPr id="8" name="正方形/長方形 7">
+            <a:extLst>
+              <a:ext uri="{FF2B5EF4-FFF2-40B4-BE49-F238E27FC236}">
+                <a16:creationId xmlns:a16="http://schemas.microsoft.com/office/drawing/2014/main" id="{18DA50EE-8802-9946-4256-9F73D0F1EE06}"/>
+              </a:ext>
+            </a:extLst>
+          </p:cNvPr>
+          <p:cNvSpPr/>
+          <p:nvPr/>
+        </p:nvSpPr>
+        <p:spPr>
+          <a:xfrm>
+            <a:off x="9598738" y="5512655"/>
+            <a:ext cx="1121578" cy="283864"/>
+          </a:xfrm>
+          <a:prstGeom prst="rect">
+            <a:avLst/>
+          </a:prstGeom>
+          <a:solidFill>
+            <a:schemeClr val="bg1"/>
+          </a:solidFill>
+          <a:ln>
+            <a:noFill/>
+          </a:ln>
+        </p:spPr>
+        <p:style>
+          <a:lnRef idx="2">
+            <a:schemeClr val="accent1">
+              <a:shade val="50000"/>
+            </a:schemeClr>
+          </a:lnRef>
+          <a:fillRef idx="1">
+            <a:schemeClr val="accent1"/>
+          </a:fillRef>
+          <a:effectRef idx="0">
+            <a:schemeClr val="accent1"/>
+          </a:effectRef>
+          <a:fontRef idx="minor">
+            <a:schemeClr val="lt1"/>
+          </a:fontRef>
+        </p:style>
+        <p:txBody>
+          <a:bodyPr rtlCol="0" anchor="ctr"/>
+          <a:lstStyle/>
+          <a:p>
+            <a:pPr algn="ctr"/>
+            <a:endParaRPr kumimoji="1" lang="ja-JP" altLang="en-US"/>
+          </a:p>
+        </p:txBody>
+      </p:sp>
     </p:spTree>
     <p:extLst>
       <p:ext uri="{BB962C8B-B14F-4D97-AF65-F5344CB8AC3E}">
@@ -16333,6 +16441,58 @@
           </a:p>
         </p:txBody>
       </p:sp>
+      <p:sp>
+        <p:nvSpPr>
+          <p:cNvPr id="7" name="正方形/長方形 6">
+            <a:extLst>
+              <a:ext uri="{FF2B5EF4-FFF2-40B4-BE49-F238E27FC236}">
+                <a16:creationId xmlns:a16="http://schemas.microsoft.com/office/drawing/2014/main" id="{13B9A147-E8E6-7A20-8927-2B6D8499476F}"/>
+              </a:ext>
+            </a:extLst>
+          </p:cNvPr>
+          <p:cNvSpPr/>
+          <p:nvPr/>
+        </p:nvSpPr>
+        <p:spPr>
+          <a:xfrm>
+            <a:off x="9598738" y="5567451"/>
+            <a:ext cx="1121578" cy="229067"/>
+          </a:xfrm>
+          <a:prstGeom prst="rect">
+            <a:avLst/>
+          </a:prstGeom>
+          <a:solidFill>
+            <a:schemeClr val="bg1"/>
+          </a:solidFill>
+          <a:ln>
+            <a:noFill/>
+          </a:ln>
+        </p:spPr>
+        <p:style>
+          <a:lnRef idx="2">
+            <a:schemeClr val="accent1">
+              <a:shade val="50000"/>
+            </a:schemeClr>
+          </a:lnRef>
+          <a:fillRef idx="1">
+            <a:schemeClr val="accent1"/>
+          </a:fillRef>
+          <a:effectRef idx="0">
+            <a:schemeClr val="accent1"/>
+          </a:effectRef>
+          <a:fontRef idx="minor">
+            <a:schemeClr val="lt1"/>
+          </a:fontRef>
+        </p:style>
+        <p:txBody>
+          <a:bodyPr rtlCol="0" anchor="ctr"/>
+          <a:lstStyle/>
+          <a:p>
+            <a:pPr algn="ctr"/>
+            <a:endParaRPr kumimoji="1" lang="ja-JP" altLang="en-US"/>
+          </a:p>
+        </p:txBody>
+      </p:sp>
     </p:spTree>
     <p:extLst>
       <p:ext uri="{BB962C8B-B14F-4D97-AF65-F5344CB8AC3E}">
@@ -16553,13 +16713,8 @@
             </a:pPr>
             <a:r>
               <a:rPr lang="en-US" altLang="ja-JP" dirty="0"/>
-              <a:t>Solder like </a:t>
-            </a:r>
-            <a:r>
-              <a:rPr lang="en-US" altLang="ja-JP"/>
-              <a:t>the following to the JOYSTICK PORT 2.</a:t>
-            </a:r>
-            <a:endParaRPr lang="en-US" altLang="ja-JP" dirty="0"/>
+              <a:t>Solder like the following and connect it to the JOYSTICK PORT 2.</a:t>
+            </a:r>
           </a:p>
           <a:p>
             <a:endParaRPr kumimoji="1" lang="en-US" altLang="ja-JP" dirty="0"/>
@@ -17531,6 +17686,58 @@
           </a:p>
         </p:txBody>
       </p:sp>
+      <p:sp>
+        <p:nvSpPr>
+          <p:cNvPr id="8" name="正方形/長方形 7">
+            <a:extLst>
+              <a:ext uri="{FF2B5EF4-FFF2-40B4-BE49-F238E27FC236}">
+                <a16:creationId xmlns:a16="http://schemas.microsoft.com/office/drawing/2014/main" id="{AB88E56E-CCEF-6403-ACCC-DEF4D7EE82C4}"/>
+              </a:ext>
+            </a:extLst>
+          </p:cNvPr>
+          <p:cNvSpPr/>
+          <p:nvPr/>
+        </p:nvSpPr>
+        <p:spPr>
+          <a:xfrm>
+            <a:off x="9598738" y="5512655"/>
+            <a:ext cx="1121578" cy="283864"/>
+          </a:xfrm>
+          <a:prstGeom prst="rect">
+            <a:avLst/>
+          </a:prstGeom>
+          <a:solidFill>
+            <a:schemeClr val="bg1"/>
+          </a:solidFill>
+          <a:ln>
+            <a:noFill/>
+          </a:ln>
+        </p:spPr>
+        <p:style>
+          <a:lnRef idx="2">
+            <a:schemeClr val="accent1">
+              <a:shade val="50000"/>
+            </a:schemeClr>
+          </a:lnRef>
+          <a:fillRef idx="1">
+            <a:schemeClr val="accent1"/>
+          </a:fillRef>
+          <a:effectRef idx="0">
+            <a:schemeClr val="accent1"/>
+          </a:effectRef>
+          <a:fontRef idx="minor">
+            <a:schemeClr val="lt1"/>
+          </a:fontRef>
+        </p:style>
+        <p:txBody>
+          <a:bodyPr rtlCol="0" anchor="ctr"/>
+          <a:lstStyle/>
+          <a:p>
+            <a:pPr algn="ctr"/>
+            <a:endParaRPr kumimoji="1" lang="ja-JP" altLang="en-US"/>
+          </a:p>
+        </p:txBody>
+      </p:sp>
     </p:spTree>
     <p:extLst>
       <p:ext uri="{BB962C8B-B14F-4D97-AF65-F5344CB8AC3E}">
@@ -17603,15 +17810,7 @@
             </a:br>
             <a:r>
               <a:rPr kumimoji="1" lang="en-US" altLang="ja-JP" dirty="0"/>
-              <a:t>for </a:t>
-            </a:r>
-            <a:r>
-              <a:rPr kumimoji="1" lang="en-US" altLang="ja-JP" dirty="0" err="1"/>
-              <a:t>Commodare</a:t>
-            </a:r>
-            <a:r>
-              <a:rPr kumimoji="1" lang="en-US" altLang="ja-JP" dirty="0"/>
-              <a:t> 64(C64)</a:t>
+              <a:t>for Commodore 64(C64)</a:t>
             </a:r>
             <a:endParaRPr kumimoji="1" lang="ja-JP" altLang="en-US" dirty="0"/>
           </a:p>
@@ -17756,7 +17955,20 @@
             </a:pPr>
             <a:r>
               <a:rPr lang="en-US" altLang="ja-JP" dirty="0"/>
-              <a:t>Solder like the following to the JOYSTICK PORT 2.</a:t>
+              <a:t>Solder like the following and connect it to the JOYSTICK PORT 2.</a:t>
+            </a:r>
+          </a:p>
+          <a:p>
+            <a:pPr marL="457200" lvl="1" indent="0">
+              <a:buNone/>
+            </a:pPr>
+            <a:r>
+              <a:rPr lang="en-US" altLang="ja-JP" sz="1400" b="1" u="sng" dirty="0">
+                <a:solidFill>
+                  <a:srgbClr val="FF0000"/>
+                </a:solidFill>
+              </a:rPr>
+              <a:t>We recommend to use ARMSID with ADSR bud fixing.</a:t>
             </a:r>
           </a:p>
           <a:p>
@@ -18874,6 +19086,58 @@
           </a:fontRef>
         </p:style>
       </p:cxnSp>
+      <p:sp>
+        <p:nvSpPr>
+          <p:cNvPr id="9" name="正方形/長方形 8">
+            <a:extLst>
+              <a:ext uri="{FF2B5EF4-FFF2-40B4-BE49-F238E27FC236}">
+                <a16:creationId xmlns:a16="http://schemas.microsoft.com/office/drawing/2014/main" id="{6BDC9720-E505-8475-B0CF-C116B72C34B6}"/>
+              </a:ext>
+            </a:extLst>
+          </p:cNvPr>
+          <p:cNvSpPr/>
+          <p:nvPr/>
+        </p:nvSpPr>
+        <p:spPr>
+          <a:xfrm>
+            <a:off x="9598738" y="5512655"/>
+            <a:ext cx="1121578" cy="283864"/>
+          </a:xfrm>
+          <a:prstGeom prst="rect">
+            <a:avLst/>
+          </a:prstGeom>
+          <a:solidFill>
+            <a:schemeClr val="bg1"/>
+          </a:solidFill>
+          <a:ln>
+            <a:noFill/>
+          </a:ln>
+        </p:spPr>
+        <p:style>
+          <a:lnRef idx="2">
+            <a:schemeClr val="accent1">
+              <a:shade val="50000"/>
+            </a:schemeClr>
+          </a:lnRef>
+          <a:fillRef idx="1">
+            <a:schemeClr val="accent1"/>
+          </a:fillRef>
+          <a:effectRef idx="0">
+            <a:schemeClr val="accent1"/>
+          </a:effectRef>
+          <a:fontRef idx="minor">
+            <a:schemeClr val="lt1"/>
+          </a:fontRef>
+        </p:style>
+        <p:txBody>
+          <a:bodyPr rtlCol="0" anchor="ctr"/>
+          <a:lstStyle/>
+          <a:p>
+            <a:pPr algn="ctr"/>
+            <a:endParaRPr kumimoji="1" lang="ja-JP" altLang="en-US"/>
+          </a:p>
+        </p:txBody>
+      </p:sp>
     </p:spTree>
     <p:extLst>
       <p:ext uri="{BB962C8B-B14F-4D97-AF65-F5344CB8AC3E}">
@@ -23721,8 +23985,17 @@
             </a:r>
             <a:r>
               <a:rPr kumimoji="1" lang="en-US" altLang="ja-JP" sz="900" dirty="0"/>
-              <a:t>, MSX</a:t>
-            </a:r>
+              <a:t>, MSX,</a:t>
+            </a:r>
+            <a:r>
+              <a:rPr kumimoji="1" lang="ja-JP" altLang="en-US" sz="900" dirty="0"/>
+              <a:t> </a:t>
+            </a:r>
+            <a:r>
+              <a:rPr kumimoji="1" lang="en-US" altLang="ja-JP" sz="900"/>
+              <a:t>C64</a:t>
+            </a:r>
+            <a:endParaRPr kumimoji="1" lang="en-US" altLang="ja-JP" sz="900" dirty="0"/>
           </a:p>
           <a:p>
             <a:pPr marL="171450" indent="-171450">

</xml_diff>

<commit_message>
4.3.1.0 Added SYNC, RING, TEST flags envelope FxS.
</commit_message>
<xml_diff>
--- a/docs/MAmidiMEmo/Manual.pptx
+++ b/docs/MAmidiMEmo/Manual.pptx
@@ -5,7 +5,7 @@
     <p:sldMasterId id="2147483678" r:id="rId1"/>
   </p:sldMasterIdLst>
   <p:notesMasterIdLst>
-    <p:notesMasterId r:id="rId35"/>
+    <p:notesMasterId r:id="rId36"/>
   </p:notesMasterIdLst>
   <p:sldIdLst>
     <p:sldId id="256" r:id="rId2"/>
@@ -41,6 +41,7 @@
     <p:sldId id="284" r:id="rId32"/>
     <p:sldId id="288" r:id="rId33"/>
     <p:sldId id="287" r:id="rId34"/>
+    <p:sldId id="292" r:id="rId35"/>
   </p:sldIdLst>
   <p:sldSz cx="12192000" cy="6858000"/>
   <p:notesSz cx="6858000" cy="9144000"/>
@@ -229,7 +230,7 @@
           <a:p>
             <a:fld id="{581C28D8-13B6-41C3-9F5F-0284C569C6F1}" type="datetimeFigureOut">
               <a:rPr kumimoji="1" lang="ja-JP" altLang="en-US" smtClean="0"/>
-              <a:t>2022/8/21</a:t>
+              <a:t>2022/8/23</a:t>
             </a:fld>
             <a:endParaRPr kumimoji="1" lang="ja-JP" altLang="en-US"/>
           </a:p>
@@ -1388,7 +1389,7 @@
           <a:p>
             <a:fld id="{B8625E62-B904-4691-B75E-EC1C32885285}" type="datetime1">
               <a:rPr kumimoji="1" lang="ja-JP" altLang="en-US" smtClean="0"/>
-              <a:t>2022/8/21</a:t>
+              <a:t>2022/8/23</a:t>
             </a:fld>
             <a:endParaRPr kumimoji="1" lang="ja-JP" altLang="en-US"/>
           </a:p>
@@ -1726,7 +1727,7 @@
           <a:p>
             <a:fld id="{A4C87007-2A40-4EFC-90A3-258EFA3C1001}" type="datetime1">
               <a:rPr kumimoji="1" lang="ja-JP" altLang="en-US" smtClean="0"/>
-              <a:t>2022/8/21</a:t>
+              <a:t>2022/8/23</a:t>
             </a:fld>
             <a:endParaRPr kumimoji="1" lang="ja-JP" altLang="en-US"/>
           </a:p>
@@ -2127,7 +2128,7 @@
           <a:p>
             <a:fld id="{0FE0D7FF-9203-4AA3-90FD-622674A14F90}" type="datetime1">
               <a:rPr kumimoji="1" lang="ja-JP" altLang="en-US" smtClean="0"/>
-              <a:t>2022/8/21</a:t>
+              <a:t>2022/8/23</a:t>
             </a:fld>
             <a:endParaRPr kumimoji="1" lang="ja-JP" altLang="en-US"/>
           </a:p>
@@ -2463,7 +2464,7 @@
           <a:p>
             <a:fld id="{D2D6E4D3-BEDB-4F35-876B-5B9AA41BFB5B}" type="datetime1">
               <a:rPr kumimoji="1" lang="ja-JP" altLang="en-US" smtClean="0"/>
-              <a:t>2022/8/21</a:t>
+              <a:t>2022/8/23</a:t>
             </a:fld>
             <a:endParaRPr kumimoji="1" lang="ja-JP" altLang="en-US"/>
           </a:p>
@@ -2783,7 +2784,7 @@
           <a:p>
             <a:fld id="{2ACD896E-FC14-4F25-BC47-18ABAEA9E1FE}" type="datetime1">
               <a:rPr kumimoji="1" lang="ja-JP" altLang="en-US" smtClean="0"/>
-              <a:t>2022/8/21</a:t>
+              <a:t>2022/8/23</a:t>
             </a:fld>
             <a:endParaRPr kumimoji="1" lang="ja-JP" altLang="en-US"/>
           </a:p>
@@ -3179,7 +3180,7 @@
           <a:p>
             <a:fld id="{54FC701B-2185-4987-B8E2-5507664B65F4}" type="datetime1">
               <a:rPr kumimoji="1" lang="ja-JP" altLang="en-US" smtClean="0"/>
-              <a:t>2022/8/21</a:t>
+              <a:t>2022/8/23</a:t>
             </a:fld>
             <a:endParaRPr kumimoji="1" lang="ja-JP" altLang="en-US"/>
           </a:p>
@@ -3468,7 +3469,7 @@
           <a:p>
             <a:fld id="{3FB4CDED-9617-418F-B546-D66B9BB6C35E}" type="datetime1">
               <a:rPr kumimoji="1" lang="ja-JP" altLang="en-US" smtClean="0"/>
-              <a:t>2022/8/21</a:t>
+              <a:t>2022/8/23</a:t>
             </a:fld>
             <a:endParaRPr kumimoji="1" lang="ja-JP" altLang="en-US"/>
           </a:p>
@@ -3762,7 +3763,7 @@
           <a:p>
             <a:fld id="{F5635D40-962A-46D7-8037-3F2900B5EB4D}" type="datetime1">
               <a:rPr kumimoji="1" lang="ja-JP" altLang="en-US" smtClean="0"/>
-              <a:t>2022/8/21</a:t>
+              <a:t>2022/8/23</a:t>
             </a:fld>
             <a:endParaRPr kumimoji="1" lang="ja-JP" altLang="en-US"/>
           </a:p>
@@ -4056,7 +4057,7 @@
           <a:p>
             <a:fld id="{741DA9A2-8356-4FFD-B66A-E38811049858}" type="datetime1">
               <a:rPr kumimoji="1" lang="ja-JP" altLang="en-US" smtClean="0"/>
-              <a:t>2022/8/21</a:t>
+              <a:t>2022/8/23</a:t>
             </a:fld>
             <a:endParaRPr kumimoji="1" lang="ja-JP" altLang="en-US"/>
           </a:p>
@@ -4385,7 +4386,7 @@
           <a:p>
             <a:fld id="{9DDE8989-88B8-4869-97D9-547531F13E13}" type="datetime1">
               <a:rPr kumimoji="1" lang="ja-JP" altLang="en-US" smtClean="0"/>
-              <a:t>2022/8/21</a:t>
+              <a:t>2022/8/23</a:t>
             </a:fld>
             <a:endParaRPr kumimoji="1" lang="ja-JP" altLang="en-US"/>
           </a:p>
@@ -4772,7 +4773,7 @@
           <a:p>
             <a:fld id="{81EC4031-B949-4300-AB3E-1551426E8631}" type="datetime1">
               <a:rPr kumimoji="1" lang="ja-JP" altLang="en-US" smtClean="0"/>
-              <a:t>2022/8/21</a:t>
+              <a:t>2022/8/23</a:t>
             </a:fld>
             <a:endParaRPr kumimoji="1" lang="ja-JP" altLang="en-US"/>
           </a:p>
@@ -5293,7 +5294,7 @@
           <a:p>
             <a:fld id="{F39E755E-A59D-4634-B604-E9BB568B1156}" type="datetime1">
               <a:rPr kumimoji="1" lang="ja-JP" altLang="en-US" smtClean="0"/>
-              <a:t>2022/8/21</a:t>
+              <a:t>2022/8/23</a:t>
             </a:fld>
             <a:endParaRPr kumimoji="1" lang="ja-JP" altLang="en-US"/>
           </a:p>
@@ -5498,7 +5499,7 @@
           <a:p>
             <a:fld id="{61DA38B3-7601-4256-ABFE-386B92B0EDB5}" type="datetime1">
               <a:rPr kumimoji="1" lang="ja-JP" altLang="en-US" smtClean="0"/>
-              <a:t>2022/8/21</a:t>
+              <a:t>2022/8/23</a:t>
             </a:fld>
             <a:endParaRPr kumimoji="1" lang="ja-JP" altLang="en-US"/>
           </a:p>
@@ -5675,7 +5676,7 @@
           <a:p>
             <a:fld id="{5A28ED6D-8A94-4DBA-8EF2-284D1A467CE8}" type="datetime1">
               <a:rPr kumimoji="1" lang="ja-JP" altLang="en-US" smtClean="0"/>
-              <a:t>2022/8/21</a:t>
+              <a:t>2022/8/23</a:t>
             </a:fld>
             <a:endParaRPr kumimoji="1" lang="ja-JP" altLang="en-US"/>
           </a:p>
@@ -6040,7 +6041,7 @@
           <a:p>
             <a:fld id="{B27B0317-28AF-43C5-8944-AADFA89E0149}" type="datetime1">
               <a:rPr kumimoji="1" lang="ja-JP" altLang="en-US" smtClean="0"/>
-              <a:t>2022/8/21</a:t>
+              <a:t>2022/8/23</a:t>
             </a:fld>
             <a:endParaRPr kumimoji="1" lang="ja-JP" altLang="en-US"/>
           </a:p>
@@ -6385,7 +6386,7 @@
           <a:p>
             <a:fld id="{A78D023C-C4FA-4CE8-B5BE-6798898EE377}" type="datetime1">
               <a:rPr kumimoji="1" lang="ja-JP" altLang="en-US" smtClean="0"/>
-              <a:t>2022/8/21</a:t>
+              <a:t>2022/8/23</a:t>
             </a:fld>
             <a:endParaRPr kumimoji="1" lang="ja-JP" altLang="en-US"/>
           </a:p>
@@ -8534,7 +8535,7 @@
           <a:p>
             <a:fld id="{99567159-F4A8-4352-915B-DDBEFEF4A4D6}" type="datetime1">
               <a:rPr kumimoji="1" lang="ja-JP" altLang="en-US" smtClean="0"/>
-              <a:t>2022/8/21</a:t>
+              <a:t>2022/8/23</a:t>
             </a:fld>
             <a:endParaRPr kumimoji="1" lang="ja-JP" altLang="en-US"/>
           </a:p>
@@ -24100,7 +24101,7 @@
         </p:spPr>
         <p:txBody>
           <a:bodyPr>
-            <a:normAutofit fontScale="92500" lnSpcReduction="20000"/>
+            <a:normAutofit fontScale="85000" lnSpcReduction="10000"/>
           </a:bodyPr>
           <a:lstStyle/>
           <a:p>
@@ -24142,7 +24143,15 @@
             </a:r>
             <a:r>
               <a:rPr kumimoji="1" lang="en-US" altLang="ja-JP" dirty="0"/>
-              <a:t>/bin(for MSX) to your FLASH Cart.</a:t>
+              <a:t>/bin(for MSX) or VGMPlay_</a:t>
+            </a:r>
+            <a:r>
+              <a:rPr lang="en-US" altLang="ja-JP" dirty="0"/>
+              <a:t>c64.prg </a:t>
+            </a:r>
+            <a:r>
+              <a:rPr kumimoji="1" lang="en-US" altLang="ja-JP" dirty="0"/>
+              <a:t>to your FLASH Cart and so on.</a:t>
             </a:r>
           </a:p>
           <a:p>
@@ -33851,6 +33860,2251 @@
 </p:sld>
 </file>
 
+<file path=ppt/slides/slide34.xml><?xml version="1.0" encoding="utf-8"?>
+<p:sld xmlns:a="http://schemas.openxmlformats.org/drawingml/2006/main" xmlns:r="http://schemas.openxmlformats.org/officeDocument/2006/relationships" xmlns:p="http://schemas.openxmlformats.org/presentationml/2006/main">
+  <p:cSld>
+    <p:spTree>
+      <p:nvGrpSpPr>
+        <p:cNvPr id="1" name=""/>
+        <p:cNvGrpSpPr/>
+        <p:nvPr/>
+      </p:nvGrpSpPr>
+      <p:grpSpPr>
+        <a:xfrm>
+          <a:off x="0" y="0"/>
+          <a:ext cx="0" cy="0"/>
+          <a:chOff x="0" y="0"/>
+          <a:chExt cx="0" cy="0"/>
+        </a:xfrm>
+      </p:grpSpPr>
+      <p:sp>
+        <p:nvSpPr>
+          <p:cNvPr id="2" name="タイトル 1">
+            <a:extLst>
+              <a:ext uri="{FF2B5EF4-FFF2-40B4-BE49-F238E27FC236}">
+                <a16:creationId xmlns:a16="http://schemas.microsoft.com/office/drawing/2014/main" id="{FF137733-6174-4A76-B52E-89E44936D189}"/>
+              </a:ext>
+            </a:extLst>
+          </p:cNvPr>
+          <p:cNvSpPr>
+            <a:spLocks noGrp="1"/>
+          </p:cNvSpPr>
+          <p:nvPr>
+            <p:ph type="title"/>
+          </p:nvPr>
+        </p:nvSpPr>
+        <p:spPr/>
+        <p:txBody>
+          <a:bodyPr/>
+          <a:lstStyle/>
+          <a:p>
+            <a:r>
+              <a:rPr kumimoji="1" lang="en-US" altLang="ja-JP" dirty="0"/>
+              <a:t>VSIF – C64(FTDI) SPECIFICATION</a:t>
+            </a:r>
+            <a:br>
+              <a:rPr kumimoji="1" lang="en-US" altLang="ja-JP" dirty="0"/>
+            </a:br>
+            <a:r>
+              <a:rPr kumimoji="1" lang="en-US" altLang="ja-JP" dirty="0"/>
+              <a:t>for </a:t>
+            </a:r>
+            <a:r>
+              <a:rPr lang="en-US" altLang="ja-JP" b="0" i="0" dirty="0">
+                <a:solidFill>
+                  <a:srgbClr val="202122"/>
+                </a:solidFill>
+                <a:effectLst/>
+                <a:latin typeface="Arial" panose="020B0604020202020204" pitchFamily="34" charset="0"/>
+              </a:rPr>
+              <a:t>SID</a:t>
+            </a:r>
+            <a:endParaRPr kumimoji="1" lang="ja-JP" altLang="en-US" dirty="0">
+              <a:solidFill>
+                <a:schemeClr val="tx1"/>
+              </a:solidFill>
+            </a:endParaRPr>
+          </a:p>
+        </p:txBody>
+      </p:sp>
+      <p:sp>
+        <p:nvSpPr>
+          <p:cNvPr id="3" name="コンテンツ プレースホルダー 2">
+            <a:extLst>
+              <a:ext uri="{FF2B5EF4-FFF2-40B4-BE49-F238E27FC236}">
+                <a16:creationId xmlns:a16="http://schemas.microsoft.com/office/drawing/2014/main" id="{2E5DDE30-9A16-4A82-90A7-733F711600B5}"/>
+              </a:ext>
+            </a:extLst>
+          </p:cNvPr>
+          <p:cNvSpPr>
+            <a:spLocks noGrp="1"/>
+          </p:cNvSpPr>
+          <p:nvPr>
+            <p:ph idx="1"/>
+          </p:nvPr>
+        </p:nvSpPr>
+        <p:spPr>
+          <a:xfrm>
+            <a:off x="2589212" y="2133600"/>
+            <a:ext cx="9348788" cy="4559300"/>
+          </a:xfrm>
+        </p:spPr>
+        <p:txBody>
+          <a:bodyPr>
+            <a:normAutofit/>
+          </a:bodyPr>
+          <a:lstStyle/>
+          <a:p>
+            <a:r>
+              <a:rPr lang="en-US" altLang="ja-JP" dirty="0"/>
+              <a:t>Baud rate : 93,750 bytes / sec</a:t>
+            </a:r>
+          </a:p>
+          <a:p>
+            <a:r>
+              <a:rPr kumimoji="1" lang="en-US" altLang="ja-JP" dirty="0"/>
+              <a:t>1 packet : 6 bytes~</a:t>
+            </a:r>
+          </a:p>
+          <a:p>
+            <a:endParaRPr lang="en-US" altLang="ja-JP" dirty="0"/>
+          </a:p>
+          <a:p>
+            <a:endParaRPr kumimoji="1" lang="en-US" altLang="ja-JP" dirty="0"/>
+          </a:p>
+          <a:p>
+            <a:r>
+              <a:rPr lang="en-US" altLang="ja-JP" dirty="0"/>
+              <a:t>1byte : 3bit(data) + 2bit(Start</a:t>
+            </a:r>
+            <a:r>
+              <a:rPr lang="en-US" altLang="ja-JP" sz="1200" dirty="0"/>
+              <a:t>(Active low)</a:t>
+            </a:r>
+            <a:r>
+              <a:rPr lang="en-US" altLang="ja-JP" dirty="0"/>
+              <a:t> + </a:t>
+            </a:r>
+            <a:r>
+              <a:rPr lang="en-US" altLang="ja-JP" dirty="0" err="1"/>
+              <a:t>Clk</a:t>
+            </a:r>
+            <a:r>
+              <a:rPr kumimoji="1" lang="en-US" altLang="ja-JP" sz="1200" b="0" i="0" u="none" strike="noStrike" kern="1200" cap="none" spc="0" normalizeH="0" baseline="0" noProof="0" dirty="0">
+                <a:ln>
+                  <a:noFill/>
+                </a:ln>
+                <a:solidFill>
+                  <a:prstClr val="black">
+                    <a:lumMod val="75000"/>
+                    <a:lumOff val="25000"/>
+                  </a:prstClr>
+                </a:solidFill>
+                <a:effectLst/>
+                <a:uLnTx/>
+                <a:uFillTx/>
+                <a:latin typeface="Century Gothic" panose="020B0502020202020204"/>
+                <a:ea typeface="メイリオ" panose="020B0604030504040204" pitchFamily="50" charset="-128"/>
+                <a:cs typeface="+mn-cs"/>
+              </a:rPr>
+              <a:t>(Active low)</a:t>
+            </a:r>
+            <a:r>
+              <a:rPr lang="en-US" altLang="ja-JP" dirty="0"/>
+              <a:t> bit)</a:t>
+            </a:r>
+          </a:p>
+          <a:p>
+            <a:endParaRPr kumimoji="1" lang="en-US" altLang="ja-JP" dirty="0"/>
+          </a:p>
+          <a:p>
+            <a:endParaRPr kumimoji="1" lang="en-US" altLang="ja-JP" dirty="0"/>
+          </a:p>
+          <a:p>
+            <a:r>
+              <a:rPr kumimoji="1" lang="en-US" altLang="ja-JP" dirty="0"/>
+              <a:t>Burst Transfer mode:</a:t>
+            </a:r>
+          </a:p>
+          <a:p>
+            <a:endParaRPr kumimoji="1" lang="en-US" altLang="ja-JP" dirty="0"/>
+          </a:p>
+        </p:txBody>
+      </p:sp>
+      <p:sp>
+        <p:nvSpPr>
+          <p:cNvPr id="4" name="スライド番号プレースホルダー 3">
+            <a:extLst>
+              <a:ext uri="{FF2B5EF4-FFF2-40B4-BE49-F238E27FC236}">
+                <a16:creationId xmlns:a16="http://schemas.microsoft.com/office/drawing/2014/main" id="{41B537D0-9FEF-4D05-A7D3-E1D123FAF757}"/>
+              </a:ext>
+            </a:extLst>
+          </p:cNvPr>
+          <p:cNvSpPr>
+            <a:spLocks noGrp="1"/>
+          </p:cNvSpPr>
+          <p:nvPr>
+            <p:ph type="sldNum" sz="quarter" idx="12"/>
+          </p:nvPr>
+        </p:nvSpPr>
+        <p:spPr/>
+        <p:txBody>
+          <a:bodyPr/>
+          <a:lstStyle/>
+          <a:p>
+            <a:fld id="{E27E2812-4560-4165-A7C7-9C013F955547}" type="slidenum">
+              <a:rPr kumimoji="1" lang="ja-JP" altLang="en-US" smtClean="0"/>
+              <a:t>34</a:t>
+            </a:fld>
+            <a:endParaRPr kumimoji="1" lang="ja-JP" altLang="en-US"/>
+          </a:p>
+        </p:txBody>
+      </p:sp>
+      <p:sp>
+        <p:nvSpPr>
+          <p:cNvPr id="5" name="正方形/長方形 4">
+            <a:extLst>
+              <a:ext uri="{FF2B5EF4-FFF2-40B4-BE49-F238E27FC236}">
+                <a16:creationId xmlns:a16="http://schemas.microsoft.com/office/drawing/2014/main" id="{14C188A7-5DF1-49E0-B695-B34E50334084}"/>
+              </a:ext>
+            </a:extLst>
+          </p:cNvPr>
+          <p:cNvSpPr/>
+          <p:nvPr/>
+        </p:nvSpPr>
+        <p:spPr>
+          <a:xfrm>
+            <a:off x="3409950" y="3211097"/>
+            <a:ext cx="1319212" cy="292100"/>
+          </a:xfrm>
+          <a:prstGeom prst="rect">
+            <a:avLst/>
+          </a:prstGeom>
+        </p:spPr>
+        <p:style>
+          <a:lnRef idx="2">
+            <a:schemeClr val="accent1">
+              <a:shade val="50000"/>
+            </a:schemeClr>
+          </a:lnRef>
+          <a:fillRef idx="1">
+            <a:schemeClr val="accent1"/>
+          </a:fillRef>
+          <a:effectRef idx="0">
+            <a:schemeClr val="accent1"/>
+          </a:effectRef>
+          <a:fontRef idx="minor">
+            <a:schemeClr val="lt1"/>
+          </a:fontRef>
+        </p:style>
+        <p:txBody>
+          <a:bodyPr rtlCol="0" anchor="ctr"/>
+          <a:lstStyle/>
+          <a:p>
+            <a:pPr algn="ctr"/>
+            <a:r>
+              <a:rPr kumimoji="1" lang="en-US" altLang="ja-JP" sz="1050" dirty="0"/>
+              <a:t>Address(Lo 3bit)</a:t>
+            </a:r>
+            <a:endParaRPr kumimoji="1" lang="ja-JP" altLang="en-US" sz="1050" dirty="0"/>
+          </a:p>
+        </p:txBody>
+      </p:sp>
+      <p:sp>
+        <p:nvSpPr>
+          <p:cNvPr id="6" name="正方形/長方形 5">
+            <a:extLst>
+              <a:ext uri="{FF2B5EF4-FFF2-40B4-BE49-F238E27FC236}">
+                <a16:creationId xmlns:a16="http://schemas.microsoft.com/office/drawing/2014/main" id="{9A836AD6-43CD-41A0-BB39-38FEE7E64D21}"/>
+              </a:ext>
+            </a:extLst>
+          </p:cNvPr>
+          <p:cNvSpPr/>
+          <p:nvPr/>
+        </p:nvSpPr>
+        <p:spPr>
+          <a:xfrm>
+            <a:off x="4721490" y="3211097"/>
+            <a:ext cx="1319212" cy="292100"/>
+          </a:xfrm>
+          <a:prstGeom prst="rect">
+            <a:avLst/>
+          </a:prstGeom>
+        </p:spPr>
+        <p:style>
+          <a:lnRef idx="2">
+            <a:schemeClr val="accent1">
+              <a:shade val="50000"/>
+            </a:schemeClr>
+          </a:lnRef>
+          <a:fillRef idx="1">
+            <a:schemeClr val="accent1"/>
+          </a:fillRef>
+          <a:effectRef idx="0">
+            <a:schemeClr val="accent1"/>
+          </a:effectRef>
+          <a:fontRef idx="minor">
+            <a:schemeClr val="lt1"/>
+          </a:fontRef>
+        </p:style>
+        <p:txBody>
+          <a:bodyPr rtlCol="0" anchor="ctr"/>
+          <a:lstStyle/>
+          <a:p>
+            <a:pPr algn="ctr"/>
+            <a:r>
+              <a:rPr kumimoji="1" lang="en-US" altLang="ja-JP" sz="1050" dirty="0"/>
+              <a:t>Address(Mid 3bit)</a:t>
+            </a:r>
+            <a:endParaRPr kumimoji="1" lang="ja-JP" altLang="en-US" sz="1050" dirty="0"/>
+          </a:p>
+        </p:txBody>
+      </p:sp>
+      <p:sp>
+        <p:nvSpPr>
+          <p:cNvPr id="7" name="正方形/長方形 6">
+            <a:extLst>
+              <a:ext uri="{FF2B5EF4-FFF2-40B4-BE49-F238E27FC236}">
+                <a16:creationId xmlns:a16="http://schemas.microsoft.com/office/drawing/2014/main" id="{8995F2AD-2F6C-47CD-A40C-DBA8DA5A1B2E}"/>
+              </a:ext>
+            </a:extLst>
+          </p:cNvPr>
+          <p:cNvSpPr/>
+          <p:nvPr/>
+        </p:nvSpPr>
+        <p:spPr>
+          <a:xfrm>
+            <a:off x="7352242" y="3211097"/>
+            <a:ext cx="1319212" cy="292100"/>
+          </a:xfrm>
+          <a:prstGeom prst="rect">
+            <a:avLst/>
+          </a:prstGeom>
+        </p:spPr>
+        <p:style>
+          <a:lnRef idx="2">
+            <a:schemeClr val="accent1">
+              <a:shade val="50000"/>
+            </a:schemeClr>
+          </a:lnRef>
+          <a:fillRef idx="1">
+            <a:schemeClr val="accent1"/>
+          </a:fillRef>
+          <a:effectRef idx="0">
+            <a:schemeClr val="accent1"/>
+          </a:effectRef>
+          <a:fontRef idx="minor">
+            <a:schemeClr val="lt1"/>
+          </a:fontRef>
+        </p:style>
+        <p:txBody>
+          <a:bodyPr rtlCol="0" anchor="ctr"/>
+          <a:lstStyle/>
+          <a:p>
+            <a:pPr algn="ctr"/>
+            <a:r>
+              <a:rPr kumimoji="1" lang="en-US" altLang="ja-JP" sz="1050" dirty="0"/>
+              <a:t>Value(Hi 3bit)</a:t>
+            </a:r>
+            <a:endParaRPr kumimoji="1" lang="ja-JP" altLang="en-US" sz="1050" dirty="0"/>
+          </a:p>
+        </p:txBody>
+      </p:sp>
+      <p:sp>
+        <p:nvSpPr>
+          <p:cNvPr id="8" name="正方形/長方形 7">
+            <a:extLst>
+              <a:ext uri="{FF2B5EF4-FFF2-40B4-BE49-F238E27FC236}">
+                <a16:creationId xmlns:a16="http://schemas.microsoft.com/office/drawing/2014/main" id="{9313BB50-A230-4338-BE1D-95514D3718E9}"/>
+              </a:ext>
+            </a:extLst>
+          </p:cNvPr>
+          <p:cNvSpPr/>
+          <p:nvPr/>
+        </p:nvSpPr>
+        <p:spPr>
+          <a:xfrm>
+            <a:off x="8534400" y="3211097"/>
+            <a:ext cx="1319212" cy="292100"/>
+          </a:xfrm>
+          <a:prstGeom prst="rect">
+            <a:avLst/>
+          </a:prstGeom>
+        </p:spPr>
+        <p:style>
+          <a:lnRef idx="2">
+            <a:schemeClr val="accent1">
+              <a:shade val="50000"/>
+            </a:schemeClr>
+          </a:lnRef>
+          <a:fillRef idx="1">
+            <a:schemeClr val="accent1"/>
+          </a:fillRef>
+          <a:effectRef idx="0">
+            <a:schemeClr val="accent1"/>
+          </a:effectRef>
+          <a:fontRef idx="minor">
+            <a:schemeClr val="lt1"/>
+          </a:fontRef>
+        </p:style>
+        <p:txBody>
+          <a:bodyPr rtlCol="0" anchor="ctr"/>
+          <a:lstStyle/>
+          <a:p>
+            <a:pPr algn="ctr"/>
+            <a:r>
+              <a:rPr kumimoji="1" lang="en-US" altLang="ja-JP" sz="1050" dirty="0"/>
+              <a:t>Value(Mid 3bit)</a:t>
+            </a:r>
+            <a:endParaRPr kumimoji="1" lang="ja-JP" altLang="en-US" sz="1050" dirty="0"/>
+          </a:p>
+        </p:txBody>
+      </p:sp>
+      <p:sp>
+        <p:nvSpPr>
+          <p:cNvPr id="13" name="テキスト ボックス 12">
+            <a:extLst>
+              <a:ext uri="{FF2B5EF4-FFF2-40B4-BE49-F238E27FC236}">
+                <a16:creationId xmlns:a16="http://schemas.microsoft.com/office/drawing/2014/main" id="{73B945CA-DFD3-4EC8-BFEF-1FE7A0C4F447}"/>
+              </a:ext>
+            </a:extLst>
+          </p:cNvPr>
+          <p:cNvSpPr txBox="1"/>
+          <p:nvPr/>
+        </p:nvSpPr>
+        <p:spPr>
+          <a:xfrm>
+            <a:off x="3830638" y="2797831"/>
+            <a:ext cx="525462" cy="338554"/>
+          </a:xfrm>
+          <a:prstGeom prst="rect">
+            <a:avLst/>
+          </a:prstGeom>
+          <a:noFill/>
+        </p:spPr>
+        <p:txBody>
+          <a:bodyPr wrap="square">
+            <a:spAutoFit/>
+          </a:bodyPr>
+          <a:lstStyle/>
+          <a:p>
+            <a:r>
+              <a:rPr kumimoji="1" lang="en-US" altLang="ja-JP" sz="1600" dirty="0"/>
+              <a:t>1st</a:t>
+            </a:r>
+            <a:endParaRPr lang="ja-JP" altLang="en-US" sz="1600" dirty="0"/>
+          </a:p>
+        </p:txBody>
+      </p:sp>
+      <p:sp>
+        <p:nvSpPr>
+          <p:cNvPr id="14" name="テキスト ボックス 13">
+            <a:extLst>
+              <a:ext uri="{FF2B5EF4-FFF2-40B4-BE49-F238E27FC236}">
+                <a16:creationId xmlns:a16="http://schemas.microsoft.com/office/drawing/2014/main" id="{E376A897-0895-4876-A090-0E5925C0EDF6}"/>
+              </a:ext>
+            </a:extLst>
+          </p:cNvPr>
+          <p:cNvSpPr txBox="1"/>
+          <p:nvPr/>
+        </p:nvSpPr>
+        <p:spPr>
+          <a:xfrm>
+            <a:off x="5082437" y="2797831"/>
+            <a:ext cx="668338" cy="338554"/>
+          </a:xfrm>
+          <a:prstGeom prst="rect">
+            <a:avLst/>
+          </a:prstGeom>
+          <a:noFill/>
+        </p:spPr>
+        <p:txBody>
+          <a:bodyPr wrap="square">
+            <a:spAutoFit/>
+          </a:bodyPr>
+          <a:lstStyle/>
+          <a:p>
+            <a:r>
+              <a:rPr kumimoji="1" lang="en-US" altLang="ja-JP" sz="1600" dirty="0"/>
+              <a:t>2nd</a:t>
+            </a:r>
+            <a:endParaRPr lang="ja-JP" altLang="en-US" sz="1600" dirty="0"/>
+          </a:p>
+        </p:txBody>
+      </p:sp>
+      <p:sp>
+        <p:nvSpPr>
+          <p:cNvPr id="15" name="テキスト ボックス 14">
+            <a:extLst>
+              <a:ext uri="{FF2B5EF4-FFF2-40B4-BE49-F238E27FC236}">
+                <a16:creationId xmlns:a16="http://schemas.microsoft.com/office/drawing/2014/main" id="{E41C2A09-27C1-4E24-8B09-EEC4258A344C}"/>
+              </a:ext>
+            </a:extLst>
+          </p:cNvPr>
+          <p:cNvSpPr txBox="1"/>
+          <p:nvPr/>
+        </p:nvSpPr>
+        <p:spPr>
+          <a:xfrm>
+            <a:off x="6420643" y="2797831"/>
+            <a:ext cx="811214" cy="338554"/>
+          </a:xfrm>
+          <a:prstGeom prst="rect">
+            <a:avLst/>
+          </a:prstGeom>
+          <a:noFill/>
+        </p:spPr>
+        <p:txBody>
+          <a:bodyPr wrap="square">
+            <a:spAutoFit/>
+          </a:bodyPr>
+          <a:lstStyle/>
+          <a:p>
+            <a:r>
+              <a:rPr kumimoji="1" lang="en-US" altLang="ja-JP" sz="1600" dirty="0"/>
+              <a:t>3rd</a:t>
+            </a:r>
+            <a:endParaRPr lang="ja-JP" altLang="en-US" sz="1600" dirty="0"/>
+          </a:p>
+        </p:txBody>
+      </p:sp>
+      <p:sp>
+        <p:nvSpPr>
+          <p:cNvPr id="17" name="テキスト ボックス 16">
+            <a:extLst>
+              <a:ext uri="{FF2B5EF4-FFF2-40B4-BE49-F238E27FC236}">
+                <a16:creationId xmlns:a16="http://schemas.microsoft.com/office/drawing/2014/main" id="{E4BB9215-E1D9-4972-99D4-0DD1A11AB856}"/>
+              </a:ext>
+            </a:extLst>
+          </p:cNvPr>
+          <p:cNvSpPr txBox="1"/>
+          <p:nvPr/>
+        </p:nvSpPr>
+        <p:spPr>
+          <a:xfrm>
+            <a:off x="7606241" y="2797831"/>
+            <a:ext cx="811214" cy="338554"/>
+          </a:xfrm>
+          <a:prstGeom prst="rect">
+            <a:avLst/>
+          </a:prstGeom>
+          <a:noFill/>
+        </p:spPr>
+        <p:txBody>
+          <a:bodyPr wrap="square">
+            <a:spAutoFit/>
+          </a:bodyPr>
+          <a:lstStyle/>
+          <a:p>
+            <a:r>
+              <a:rPr kumimoji="1" lang="en-US" altLang="ja-JP" sz="1600" dirty="0"/>
+              <a:t>4th</a:t>
+            </a:r>
+            <a:endParaRPr lang="ja-JP" altLang="en-US" sz="1600" dirty="0"/>
+          </a:p>
+        </p:txBody>
+      </p:sp>
+      <p:sp>
+        <p:nvSpPr>
+          <p:cNvPr id="18" name="テキスト ボックス 17">
+            <a:extLst>
+              <a:ext uri="{FF2B5EF4-FFF2-40B4-BE49-F238E27FC236}">
+                <a16:creationId xmlns:a16="http://schemas.microsoft.com/office/drawing/2014/main" id="{1C8C0E69-E581-457D-A603-0232C967E7B8}"/>
+              </a:ext>
+            </a:extLst>
+          </p:cNvPr>
+          <p:cNvSpPr txBox="1"/>
+          <p:nvPr/>
+        </p:nvSpPr>
+        <p:spPr>
+          <a:xfrm>
+            <a:off x="8866753" y="2797831"/>
+            <a:ext cx="811214" cy="338554"/>
+          </a:xfrm>
+          <a:prstGeom prst="rect">
+            <a:avLst/>
+          </a:prstGeom>
+          <a:noFill/>
+        </p:spPr>
+        <p:txBody>
+          <a:bodyPr wrap="square">
+            <a:spAutoFit/>
+          </a:bodyPr>
+          <a:lstStyle/>
+          <a:p>
+            <a:r>
+              <a:rPr kumimoji="1" lang="en-US" altLang="ja-JP" sz="1600" dirty="0"/>
+              <a:t>5th</a:t>
+            </a:r>
+            <a:endParaRPr lang="ja-JP" altLang="en-US" sz="1600" dirty="0"/>
+          </a:p>
+        </p:txBody>
+      </p:sp>
+      <p:sp>
+        <p:nvSpPr>
+          <p:cNvPr id="19" name="正方形/長方形 18">
+            <a:extLst>
+              <a:ext uri="{FF2B5EF4-FFF2-40B4-BE49-F238E27FC236}">
+                <a16:creationId xmlns:a16="http://schemas.microsoft.com/office/drawing/2014/main" id="{018E0670-19CB-4FEC-905B-D16CD09F78A3}"/>
+              </a:ext>
+            </a:extLst>
+          </p:cNvPr>
+          <p:cNvSpPr/>
+          <p:nvPr/>
+        </p:nvSpPr>
+        <p:spPr>
+          <a:xfrm>
+            <a:off x="3685268" y="4278413"/>
+            <a:ext cx="931974" cy="292100"/>
+          </a:xfrm>
+          <a:prstGeom prst="rect">
+            <a:avLst/>
+          </a:prstGeom>
+          <a:solidFill>
+            <a:schemeClr val="bg1"/>
+          </a:solidFill>
+        </p:spPr>
+        <p:style>
+          <a:lnRef idx="2">
+            <a:schemeClr val="accent1">
+              <a:shade val="50000"/>
+            </a:schemeClr>
+          </a:lnRef>
+          <a:fillRef idx="1">
+            <a:schemeClr val="accent1"/>
+          </a:fillRef>
+          <a:effectRef idx="0">
+            <a:schemeClr val="accent1"/>
+          </a:effectRef>
+          <a:fontRef idx="minor">
+            <a:schemeClr val="lt1"/>
+          </a:fontRef>
+        </p:style>
+        <p:txBody>
+          <a:bodyPr rtlCol="0" anchor="ctr"/>
+          <a:lstStyle/>
+          <a:p>
+            <a:pPr algn="ctr"/>
+            <a:endParaRPr kumimoji="1" lang="ja-JP" altLang="en-US" sz="1600" dirty="0"/>
+          </a:p>
+        </p:txBody>
+      </p:sp>
+      <p:sp>
+        <p:nvSpPr>
+          <p:cNvPr id="20" name="正方形/長方形 19">
+            <a:extLst>
+              <a:ext uri="{FF2B5EF4-FFF2-40B4-BE49-F238E27FC236}">
+                <a16:creationId xmlns:a16="http://schemas.microsoft.com/office/drawing/2014/main" id="{BEBFB75A-7BE5-4C4A-BC77-A5EC82CAA5B5}"/>
+              </a:ext>
+            </a:extLst>
+          </p:cNvPr>
+          <p:cNvSpPr/>
+          <p:nvPr/>
+        </p:nvSpPr>
+        <p:spPr>
+          <a:xfrm>
+            <a:off x="4616450" y="4278413"/>
+            <a:ext cx="931974" cy="292100"/>
+          </a:xfrm>
+          <a:prstGeom prst="rect">
+            <a:avLst/>
+          </a:prstGeom>
+          <a:solidFill>
+            <a:schemeClr val="bg1"/>
+          </a:solidFill>
+        </p:spPr>
+        <p:style>
+          <a:lnRef idx="2">
+            <a:schemeClr val="accent1">
+              <a:shade val="50000"/>
+            </a:schemeClr>
+          </a:lnRef>
+          <a:fillRef idx="1">
+            <a:schemeClr val="accent1"/>
+          </a:fillRef>
+          <a:effectRef idx="0">
+            <a:schemeClr val="accent1"/>
+          </a:effectRef>
+          <a:fontRef idx="minor">
+            <a:schemeClr val="lt1"/>
+          </a:fontRef>
+        </p:style>
+        <p:txBody>
+          <a:bodyPr rtlCol="0" anchor="ctr"/>
+          <a:lstStyle/>
+          <a:p>
+            <a:pPr algn="ctr"/>
+            <a:endParaRPr kumimoji="1" lang="ja-JP" altLang="en-US" sz="1600" dirty="0"/>
+          </a:p>
+        </p:txBody>
+      </p:sp>
+      <p:sp>
+        <p:nvSpPr>
+          <p:cNvPr id="21" name="正方形/長方形 20">
+            <a:extLst>
+              <a:ext uri="{FF2B5EF4-FFF2-40B4-BE49-F238E27FC236}">
+                <a16:creationId xmlns:a16="http://schemas.microsoft.com/office/drawing/2014/main" id="{8ADC7990-8532-4A8E-9959-F9B539090536}"/>
+              </a:ext>
+            </a:extLst>
+          </p:cNvPr>
+          <p:cNvSpPr/>
+          <p:nvPr/>
+        </p:nvSpPr>
+        <p:spPr>
+          <a:xfrm>
+            <a:off x="6466724" y="4278413"/>
+            <a:ext cx="931974" cy="292100"/>
+          </a:xfrm>
+          <a:prstGeom prst="rect">
+            <a:avLst/>
+          </a:prstGeom>
+        </p:spPr>
+        <p:style>
+          <a:lnRef idx="2">
+            <a:schemeClr val="accent1">
+              <a:shade val="50000"/>
+            </a:schemeClr>
+          </a:lnRef>
+          <a:fillRef idx="1">
+            <a:schemeClr val="accent1"/>
+          </a:fillRef>
+          <a:effectRef idx="0">
+            <a:schemeClr val="accent1"/>
+          </a:effectRef>
+          <a:fontRef idx="minor">
+            <a:schemeClr val="lt1"/>
+          </a:fontRef>
+        </p:style>
+        <p:txBody>
+          <a:bodyPr rtlCol="0" anchor="ctr"/>
+          <a:lstStyle/>
+          <a:p>
+            <a:pPr algn="ctr"/>
+            <a:r>
+              <a:rPr lang="en-US" altLang="ja-JP" sz="1600" dirty="0"/>
+              <a:t>Start</a:t>
+            </a:r>
+            <a:endParaRPr kumimoji="1" lang="ja-JP" altLang="en-US" sz="1600" dirty="0"/>
+          </a:p>
+        </p:txBody>
+      </p:sp>
+      <p:sp>
+        <p:nvSpPr>
+          <p:cNvPr id="22" name="正方形/長方形 21">
+            <a:extLst>
+              <a:ext uri="{FF2B5EF4-FFF2-40B4-BE49-F238E27FC236}">
+                <a16:creationId xmlns:a16="http://schemas.microsoft.com/office/drawing/2014/main" id="{DD491D66-A1B7-434C-BD3F-FBD7705F1345}"/>
+              </a:ext>
+            </a:extLst>
+          </p:cNvPr>
+          <p:cNvSpPr/>
+          <p:nvPr/>
+        </p:nvSpPr>
+        <p:spPr>
+          <a:xfrm>
+            <a:off x="7397906" y="4278413"/>
+            <a:ext cx="931974" cy="292100"/>
+          </a:xfrm>
+          <a:prstGeom prst="rect">
+            <a:avLst/>
+          </a:prstGeom>
+        </p:spPr>
+        <p:style>
+          <a:lnRef idx="2">
+            <a:schemeClr val="accent1">
+              <a:shade val="50000"/>
+            </a:schemeClr>
+          </a:lnRef>
+          <a:fillRef idx="1">
+            <a:schemeClr val="accent1"/>
+          </a:fillRef>
+          <a:effectRef idx="0">
+            <a:schemeClr val="accent1"/>
+          </a:effectRef>
+          <a:fontRef idx="minor">
+            <a:schemeClr val="lt1"/>
+          </a:fontRef>
+        </p:style>
+        <p:txBody>
+          <a:bodyPr rtlCol="0" anchor="ctr"/>
+          <a:lstStyle/>
+          <a:p>
+            <a:pPr algn="ctr"/>
+            <a:r>
+              <a:rPr kumimoji="1" lang="en-US" altLang="ja-JP" sz="1600" dirty="0" err="1"/>
+              <a:t>Clk</a:t>
+            </a:r>
+            <a:endParaRPr kumimoji="1" lang="ja-JP" altLang="en-US" sz="1600" dirty="0"/>
+          </a:p>
+        </p:txBody>
+      </p:sp>
+      <p:sp>
+        <p:nvSpPr>
+          <p:cNvPr id="24" name="正方形/長方形 23">
+            <a:extLst>
+              <a:ext uri="{FF2B5EF4-FFF2-40B4-BE49-F238E27FC236}">
+                <a16:creationId xmlns:a16="http://schemas.microsoft.com/office/drawing/2014/main" id="{5BAA1FF0-14D8-493C-8D48-DBE39F6F9BDC}"/>
+              </a:ext>
+            </a:extLst>
+          </p:cNvPr>
+          <p:cNvSpPr/>
+          <p:nvPr/>
+        </p:nvSpPr>
+        <p:spPr>
+          <a:xfrm>
+            <a:off x="8341178" y="4278413"/>
+            <a:ext cx="931974" cy="292100"/>
+          </a:xfrm>
+          <a:prstGeom prst="rect">
+            <a:avLst/>
+          </a:prstGeom>
+        </p:spPr>
+        <p:style>
+          <a:lnRef idx="2">
+            <a:schemeClr val="accent1">
+              <a:shade val="50000"/>
+            </a:schemeClr>
+          </a:lnRef>
+          <a:fillRef idx="1">
+            <a:schemeClr val="accent1"/>
+          </a:fillRef>
+          <a:effectRef idx="0">
+            <a:schemeClr val="accent1"/>
+          </a:effectRef>
+          <a:fontRef idx="minor">
+            <a:schemeClr val="lt1"/>
+          </a:fontRef>
+        </p:style>
+        <p:txBody>
+          <a:bodyPr rtlCol="0" anchor="ctr"/>
+          <a:lstStyle/>
+          <a:p>
+            <a:pPr algn="ctr"/>
+            <a:r>
+              <a:rPr kumimoji="1" lang="en-US" altLang="ja-JP" sz="1600" dirty="0"/>
+              <a:t>Data</a:t>
+            </a:r>
+            <a:endParaRPr kumimoji="1" lang="ja-JP" altLang="en-US" sz="1600" dirty="0"/>
+          </a:p>
+        </p:txBody>
+      </p:sp>
+      <p:sp>
+        <p:nvSpPr>
+          <p:cNvPr id="25" name="正方形/長方形 24">
+            <a:extLst>
+              <a:ext uri="{FF2B5EF4-FFF2-40B4-BE49-F238E27FC236}">
+                <a16:creationId xmlns:a16="http://schemas.microsoft.com/office/drawing/2014/main" id="{688536EE-90DA-439F-8999-D34D7BF5BE7A}"/>
+              </a:ext>
+            </a:extLst>
+          </p:cNvPr>
+          <p:cNvSpPr/>
+          <p:nvPr/>
+        </p:nvSpPr>
+        <p:spPr>
+          <a:xfrm>
+            <a:off x="9272360" y="4278413"/>
+            <a:ext cx="931974" cy="292100"/>
+          </a:xfrm>
+          <a:prstGeom prst="rect">
+            <a:avLst/>
+          </a:prstGeom>
+        </p:spPr>
+        <p:style>
+          <a:lnRef idx="2">
+            <a:schemeClr val="accent1">
+              <a:shade val="50000"/>
+            </a:schemeClr>
+          </a:lnRef>
+          <a:fillRef idx="1">
+            <a:schemeClr val="accent1"/>
+          </a:fillRef>
+          <a:effectRef idx="0">
+            <a:schemeClr val="accent1"/>
+          </a:effectRef>
+          <a:fontRef idx="minor">
+            <a:schemeClr val="lt1"/>
+          </a:fontRef>
+        </p:style>
+        <p:txBody>
+          <a:bodyPr rtlCol="0" anchor="ctr"/>
+          <a:lstStyle/>
+          <a:p>
+            <a:pPr algn="ctr"/>
+            <a:r>
+              <a:rPr kumimoji="1" lang="en-US" altLang="ja-JP" sz="1600" dirty="0"/>
+              <a:t>Data</a:t>
+            </a:r>
+            <a:endParaRPr kumimoji="1" lang="ja-JP" altLang="en-US" sz="1600" dirty="0"/>
+          </a:p>
+        </p:txBody>
+      </p:sp>
+      <p:sp>
+        <p:nvSpPr>
+          <p:cNvPr id="26" name="正方形/長方形 25">
+            <a:extLst>
+              <a:ext uri="{FF2B5EF4-FFF2-40B4-BE49-F238E27FC236}">
+                <a16:creationId xmlns:a16="http://schemas.microsoft.com/office/drawing/2014/main" id="{099CD03A-8FEB-4B28-9F93-137518257087}"/>
+              </a:ext>
+            </a:extLst>
+          </p:cNvPr>
+          <p:cNvSpPr/>
+          <p:nvPr/>
+        </p:nvSpPr>
+        <p:spPr>
+          <a:xfrm>
+            <a:off x="10203544" y="4278413"/>
+            <a:ext cx="931974" cy="292100"/>
+          </a:xfrm>
+          <a:prstGeom prst="rect">
+            <a:avLst/>
+          </a:prstGeom>
+        </p:spPr>
+        <p:style>
+          <a:lnRef idx="2">
+            <a:schemeClr val="accent1">
+              <a:shade val="50000"/>
+            </a:schemeClr>
+          </a:lnRef>
+          <a:fillRef idx="1">
+            <a:schemeClr val="accent1"/>
+          </a:fillRef>
+          <a:effectRef idx="0">
+            <a:schemeClr val="accent1"/>
+          </a:effectRef>
+          <a:fontRef idx="minor">
+            <a:schemeClr val="lt1"/>
+          </a:fontRef>
+        </p:style>
+        <p:txBody>
+          <a:bodyPr rtlCol="0" anchor="ctr"/>
+          <a:lstStyle/>
+          <a:p>
+            <a:pPr algn="ctr"/>
+            <a:r>
+              <a:rPr kumimoji="1" lang="en-US" altLang="ja-JP" sz="1600" dirty="0"/>
+              <a:t>Data</a:t>
+            </a:r>
+            <a:endParaRPr kumimoji="1" lang="ja-JP" altLang="en-US" sz="1600" dirty="0"/>
+          </a:p>
+        </p:txBody>
+      </p:sp>
+      <p:sp>
+        <p:nvSpPr>
+          <p:cNvPr id="29" name="テキスト ボックス 28">
+            <a:extLst>
+              <a:ext uri="{FF2B5EF4-FFF2-40B4-BE49-F238E27FC236}">
+                <a16:creationId xmlns:a16="http://schemas.microsoft.com/office/drawing/2014/main" id="{CEEE2D45-32F1-4CE4-82E8-AEC2F048D50D}"/>
+              </a:ext>
+            </a:extLst>
+          </p:cNvPr>
+          <p:cNvSpPr txBox="1"/>
+          <p:nvPr/>
+        </p:nvSpPr>
+        <p:spPr>
+          <a:xfrm>
+            <a:off x="10910888" y="4614447"/>
+            <a:ext cx="754062" cy="338554"/>
+          </a:xfrm>
+          <a:prstGeom prst="rect">
+            <a:avLst/>
+          </a:prstGeom>
+          <a:noFill/>
+        </p:spPr>
+        <p:txBody>
+          <a:bodyPr wrap="square">
+            <a:spAutoFit/>
+          </a:bodyPr>
+          <a:lstStyle/>
+          <a:p>
+            <a:r>
+              <a:rPr kumimoji="1" lang="en-US" altLang="ja-JP" sz="1600" dirty="0"/>
+              <a:t>LSB</a:t>
+            </a:r>
+            <a:endParaRPr lang="ja-JP" altLang="en-US" sz="1600" dirty="0"/>
+          </a:p>
+        </p:txBody>
+      </p:sp>
+      <p:sp>
+        <p:nvSpPr>
+          <p:cNvPr id="30" name="テキスト ボックス 29">
+            <a:extLst>
+              <a:ext uri="{FF2B5EF4-FFF2-40B4-BE49-F238E27FC236}">
+                <a16:creationId xmlns:a16="http://schemas.microsoft.com/office/drawing/2014/main" id="{7FD9F990-A8F4-4554-9A22-4F38AAE16B57}"/>
+              </a:ext>
+            </a:extLst>
+          </p:cNvPr>
+          <p:cNvSpPr txBox="1"/>
+          <p:nvPr/>
+        </p:nvSpPr>
+        <p:spPr>
+          <a:xfrm>
+            <a:off x="10453688" y="3942379"/>
+            <a:ext cx="754062" cy="338554"/>
+          </a:xfrm>
+          <a:prstGeom prst="rect">
+            <a:avLst/>
+          </a:prstGeom>
+          <a:noFill/>
+        </p:spPr>
+        <p:txBody>
+          <a:bodyPr wrap="square">
+            <a:spAutoFit/>
+          </a:bodyPr>
+          <a:lstStyle/>
+          <a:p>
+            <a:r>
+              <a:rPr kumimoji="1" lang="en-US" altLang="ja-JP" sz="1600" dirty="0"/>
+              <a:t>0</a:t>
+            </a:r>
+            <a:endParaRPr lang="ja-JP" altLang="en-US" sz="1600" dirty="0"/>
+          </a:p>
+        </p:txBody>
+      </p:sp>
+      <p:sp>
+        <p:nvSpPr>
+          <p:cNvPr id="31" name="テキスト ボックス 30">
+            <a:extLst>
+              <a:ext uri="{FF2B5EF4-FFF2-40B4-BE49-F238E27FC236}">
+                <a16:creationId xmlns:a16="http://schemas.microsoft.com/office/drawing/2014/main" id="{4FBB096C-7BE9-4853-808B-4AF85A43FA90}"/>
+              </a:ext>
+            </a:extLst>
+          </p:cNvPr>
+          <p:cNvSpPr txBox="1"/>
+          <p:nvPr/>
+        </p:nvSpPr>
+        <p:spPr>
+          <a:xfrm>
+            <a:off x="3453607" y="4614447"/>
+            <a:ext cx="754062" cy="338554"/>
+          </a:xfrm>
+          <a:prstGeom prst="rect">
+            <a:avLst/>
+          </a:prstGeom>
+          <a:noFill/>
+        </p:spPr>
+        <p:txBody>
+          <a:bodyPr wrap="square">
+            <a:spAutoFit/>
+          </a:bodyPr>
+          <a:lstStyle/>
+          <a:p>
+            <a:r>
+              <a:rPr kumimoji="1" lang="en-US" altLang="ja-JP" sz="1600" dirty="0"/>
+              <a:t>MSB</a:t>
+            </a:r>
+            <a:endParaRPr lang="ja-JP" altLang="en-US" sz="1600" dirty="0"/>
+          </a:p>
+        </p:txBody>
+      </p:sp>
+      <p:sp>
+        <p:nvSpPr>
+          <p:cNvPr id="32" name="テキスト ボックス 31">
+            <a:extLst>
+              <a:ext uri="{FF2B5EF4-FFF2-40B4-BE49-F238E27FC236}">
+                <a16:creationId xmlns:a16="http://schemas.microsoft.com/office/drawing/2014/main" id="{5E4FF8C6-04E3-4BBB-80FF-BF99A9A324F7}"/>
+              </a:ext>
+            </a:extLst>
+          </p:cNvPr>
+          <p:cNvSpPr txBox="1"/>
+          <p:nvPr/>
+        </p:nvSpPr>
+        <p:spPr>
+          <a:xfrm>
+            <a:off x="3716338" y="3942379"/>
+            <a:ext cx="754062" cy="338554"/>
+          </a:xfrm>
+          <a:prstGeom prst="rect">
+            <a:avLst/>
+          </a:prstGeom>
+          <a:noFill/>
+        </p:spPr>
+        <p:txBody>
+          <a:bodyPr wrap="square">
+            <a:spAutoFit/>
+          </a:bodyPr>
+          <a:lstStyle/>
+          <a:p>
+            <a:r>
+              <a:rPr kumimoji="1" lang="en-US" altLang="ja-JP" sz="1600" dirty="0"/>
+              <a:t>7</a:t>
+            </a:r>
+            <a:endParaRPr lang="ja-JP" altLang="en-US" sz="1600" dirty="0"/>
+          </a:p>
+        </p:txBody>
+      </p:sp>
+      <p:sp>
+        <p:nvSpPr>
+          <p:cNvPr id="10" name="正方形/長方形 9">
+            <a:extLst>
+              <a:ext uri="{FF2B5EF4-FFF2-40B4-BE49-F238E27FC236}">
+                <a16:creationId xmlns:a16="http://schemas.microsoft.com/office/drawing/2014/main" id="{683C9143-F01C-269A-142A-E3B03F021C6D}"/>
+              </a:ext>
+            </a:extLst>
+          </p:cNvPr>
+          <p:cNvSpPr/>
+          <p:nvPr/>
+        </p:nvSpPr>
+        <p:spPr>
+          <a:xfrm>
+            <a:off x="6040702" y="3211097"/>
+            <a:ext cx="1319212" cy="292100"/>
+          </a:xfrm>
+          <a:prstGeom prst="rect">
+            <a:avLst/>
+          </a:prstGeom>
+        </p:spPr>
+        <p:style>
+          <a:lnRef idx="2">
+            <a:schemeClr val="accent1">
+              <a:shade val="50000"/>
+            </a:schemeClr>
+          </a:lnRef>
+          <a:fillRef idx="1">
+            <a:schemeClr val="accent1"/>
+          </a:fillRef>
+          <a:effectRef idx="0">
+            <a:schemeClr val="accent1"/>
+          </a:effectRef>
+          <a:fontRef idx="minor">
+            <a:schemeClr val="lt1"/>
+          </a:fontRef>
+        </p:style>
+        <p:txBody>
+          <a:bodyPr rtlCol="0" anchor="ctr"/>
+          <a:lstStyle/>
+          <a:p>
+            <a:pPr algn="ctr"/>
+            <a:r>
+              <a:rPr kumimoji="1" lang="en-US" altLang="ja-JP" sz="1050" dirty="0"/>
+              <a:t>Address(Hi 2bit)</a:t>
+            </a:r>
+            <a:endParaRPr kumimoji="1" lang="ja-JP" altLang="en-US" sz="1050" dirty="0"/>
+          </a:p>
+        </p:txBody>
+      </p:sp>
+      <p:sp>
+        <p:nvSpPr>
+          <p:cNvPr id="11" name="正方形/長方形 10">
+            <a:extLst>
+              <a:ext uri="{FF2B5EF4-FFF2-40B4-BE49-F238E27FC236}">
+                <a16:creationId xmlns:a16="http://schemas.microsoft.com/office/drawing/2014/main" id="{55E3114B-2E16-4130-A390-FD57C2AABA88}"/>
+              </a:ext>
+            </a:extLst>
+          </p:cNvPr>
+          <p:cNvSpPr/>
+          <p:nvPr/>
+        </p:nvSpPr>
+        <p:spPr>
+          <a:xfrm>
+            <a:off x="9853612" y="3211097"/>
+            <a:ext cx="1319212" cy="292100"/>
+          </a:xfrm>
+          <a:prstGeom prst="rect">
+            <a:avLst/>
+          </a:prstGeom>
+        </p:spPr>
+        <p:style>
+          <a:lnRef idx="2">
+            <a:schemeClr val="accent1">
+              <a:shade val="50000"/>
+            </a:schemeClr>
+          </a:lnRef>
+          <a:fillRef idx="1">
+            <a:schemeClr val="accent1"/>
+          </a:fillRef>
+          <a:effectRef idx="0">
+            <a:schemeClr val="accent1"/>
+          </a:effectRef>
+          <a:fontRef idx="minor">
+            <a:schemeClr val="lt1"/>
+          </a:fontRef>
+        </p:style>
+        <p:txBody>
+          <a:bodyPr rtlCol="0" anchor="ctr"/>
+          <a:lstStyle/>
+          <a:p>
+            <a:pPr algn="ctr"/>
+            <a:r>
+              <a:rPr kumimoji="1" lang="en-US" altLang="ja-JP" sz="1050" dirty="0"/>
+              <a:t>Value(Lo 2bit)</a:t>
+            </a:r>
+            <a:endParaRPr kumimoji="1" lang="ja-JP" altLang="en-US" sz="1050" dirty="0"/>
+          </a:p>
+        </p:txBody>
+      </p:sp>
+      <p:sp>
+        <p:nvSpPr>
+          <p:cNvPr id="12" name="テキスト ボックス 11">
+            <a:extLst>
+              <a:ext uri="{FF2B5EF4-FFF2-40B4-BE49-F238E27FC236}">
+                <a16:creationId xmlns:a16="http://schemas.microsoft.com/office/drawing/2014/main" id="{8EA6D75E-B616-67BD-4FA6-41BE3417FBBF}"/>
+              </a:ext>
+            </a:extLst>
+          </p:cNvPr>
+          <p:cNvSpPr txBox="1"/>
+          <p:nvPr/>
+        </p:nvSpPr>
+        <p:spPr>
+          <a:xfrm>
+            <a:off x="10263924" y="2797831"/>
+            <a:ext cx="811214" cy="338554"/>
+          </a:xfrm>
+          <a:prstGeom prst="rect">
+            <a:avLst/>
+          </a:prstGeom>
+          <a:noFill/>
+        </p:spPr>
+        <p:txBody>
+          <a:bodyPr wrap="square">
+            <a:spAutoFit/>
+          </a:bodyPr>
+          <a:lstStyle/>
+          <a:p>
+            <a:r>
+              <a:rPr kumimoji="1" lang="en-US" altLang="ja-JP" sz="1600" dirty="0"/>
+              <a:t>6th</a:t>
+            </a:r>
+            <a:endParaRPr lang="ja-JP" altLang="en-US" sz="1600" dirty="0"/>
+          </a:p>
+        </p:txBody>
+      </p:sp>
+      <p:sp>
+        <p:nvSpPr>
+          <p:cNvPr id="16" name="正方形/長方形 15">
+            <a:extLst>
+              <a:ext uri="{FF2B5EF4-FFF2-40B4-BE49-F238E27FC236}">
+                <a16:creationId xmlns:a16="http://schemas.microsoft.com/office/drawing/2014/main" id="{2244A8B6-3EF7-6C7E-96EA-0AA5D51FE279}"/>
+              </a:ext>
+            </a:extLst>
+          </p:cNvPr>
+          <p:cNvSpPr/>
+          <p:nvPr/>
+        </p:nvSpPr>
+        <p:spPr>
+          <a:xfrm>
+            <a:off x="5548028" y="4278413"/>
+            <a:ext cx="931974" cy="292100"/>
+          </a:xfrm>
+          <a:prstGeom prst="rect">
+            <a:avLst/>
+          </a:prstGeom>
+          <a:solidFill>
+            <a:schemeClr val="bg1"/>
+          </a:solidFill>
+        </p:spPr>
+        <p:style>
+          <a:lnRef idx="2">
+            <a:schemeClr val="accent1">
+              <a:shade val="50000"/>
+            </a:schemeClr>
+          </a:lnRef>
+          <a:fillRef idx="1">
+            <a:schemeClr val="accent1"/>
+          </a:fillRef>
+          <a:effectRef idx="0">
+            <a:schemeClr val="accent1"/>
+          </a:effectRef>
+          <a:fontRef idx="minor">
+            <a:schemeClr val="lt1"/>
+          </a:fontRef>
+        </p:style>
+        <p:txBody>
+          <a:bodyPr rtlCol="0" anchor="ctr"/>
+          <a:lstStyle/>
+          <a:p>
+            <a:pPr algn="ctr"/>
+            <a:endParaRPr kumimoji="1" lang="ja-JP" altLang="en-US" sz="1600" dirty="0"/>
+          </a:p>
+        </p:txBody>
+      </p:sp>
+      <p:sp>
+        <p:nvSpPr>
+          <p:cNvPr id="27" name="正方形/長方形 26">
+            <a:extLst>
+              <a:ext uri="{FF2B5EF4-FFF2-40B4-BE49-F238E27FC236}">
+                <a16:creationId xmlns:a16="http://schemas.microsoft.com/office/drawing/2014/main" id="{F4E1488C-D8CF-DC7B-5EA0-CA35C4AEDFCB}"/>
+              </a:ext>
+            </a:extLst>
+          </p:cNvPr>
+          <p:cNvSpPr/>
+          <p:nvPr/>
+        </p:nvSpPr>
+        <p:spPr>
+          <a:xfrm>
+            <a:off x="3837668" y="5553656"/>
+            <a:ext cx="931974" cy="292100"/>
+          </a:xfrm>
+          <a:prstGeom prst="rect">
+            <a:avLst/>
+          </a:prstGeom>
+          <a:solidFill>
+            <a:schemeClr val="bg1"/>
+          </a:solidFill>
+        </p:spPr>
+        <p:style>
+          <a:lnRef idx="2">
+            <a:schemeClr val="accent1">
+              <a:shade val="50000"/>
+            </a:schemeClr>
+          </a:lnRef>
+          <a:fillRef idx="1">
+            <a:schemeClr val="accent1"/>
+          </a:fillRef>
+          <a:effectRef idx="0">
+            <a:schemeClr val="accent1"/>
+          </a:effectRef>
+          <a:fontRef idx="minor">
+            <a:schemeClr val="lt1"/>
+          </a:fontRef>
+        </p:style>
+        <p:txBody>
+          <a:bodyPr rtlCol="0" anchor="ctr"/>
+          <a:lstStyle/>
+          <a:p>
+            <a:pPr algn="ctr"/>
+            <a:endParaRPr kumimoji="1" lang="ja-JP" altLang="en-US" sz="1600" dirty="0"/>
+          </a:p>
+        </p:txBody>
+      </p:sp>
+      <p:sp>
+        <p:nvSpPr>
+          <p:cNvPr id="28" name="正方形/長方形 27">
+            <a:extLst>
+              <a:ext uri="{FF2B5EF4-FFF2-40B4-BE49-F238E27FC236}">
+                <a16:creationId xmlns:a16="http://schemas.microsoft.com/office/drawing/2014/main" id="{28778E60-1A7F-4F40-EACD-00B3D8F21E72}"/>
+              </a:ext>
+            </a:extLst>
+          </p:cNvPr>
+          <p:cNvSpPr/>
+          <p:nvPr/>
+        </p:nvSpPr>
+        <p:spPr>
+          <a:xfrm>
+            <a:off x="4768850" y="5553656"/>
+            <a:ext cx="931974" cy="292100"/>
+          </a:xfrm>
+          <a:prstGeom prst="rect">
+            <a:avLst/>
+          </a:prstGeom>
+          <a:solidFill>
+            <a:schemeClr val="bg1"/>
+          </a:solidFill>
+        </p:spPr>
+        <p:style>
+          <a:lnRef idx="2">
+            <a:schemeClr val="accent1">
+              <a:shade val="50000"/>
+            </a:schemeClr>
+          </a:lnRef>
+          <a:fillRef idx="1">
+            <a:schemeClr val="accent1"/>
+          </a:fillRef>
+          <a:effectRef idx="0">
+            <a:schemeClr val="accent1"/>
+          </a:effectRef>
+          <a:fontRef idx="minor">
+            <a:schemeClr val="lt1"/>
+          </a:fontRef>
+        </p:style>
+        <p:txBody>
+          <a:bodyPr rtlCol="0" anchor="ctr"/>
+          <a:lstStyle/>
+          <a:p>
+            <a:pPr algn="ctr"/>
+            <a:endParaRPr kumimoji="1" lang="ja-JP" altLang="en-US" sz="1600" dirty="0"/>
+          </a:p>
+        </p:txBody>
+      </p:sp>
+      <p:sp>
+        <p:nvSpPr>
+          <p:cNvPr id="33" name="正方形/長方形 32">
+            <a:extLst>
+              <a:ext uri="{FF2B5EF4-FFF2-40B4-BE49-F238E27FC236}">
+                <a16:creationId xmlns:a16="http://schemas.microsoft.com/office/drawing/2014/main" id="{D2AE67B6-8923-E419-EB9B-633A5B7D8135}"/>
+              </a:ext>
+            </a:extLst>
+          </p:cNvPr>
+          <p:cNvSpPr/>
+          <p:nvPr/>
+        </p:nvSpPr>
+        <p:spPr>
+          <a:xfrm>
+            <a:off x="6619124" y="5553656"/>
+            <a:ext cx="931974" cy="292100"/>
+          </a:xfrm>
+          <a:prstGeom prst="rect">
+            <a:avLst/>
+          </a:prstGeom>
+          <a:solidFill>
+            <a:schemeClr val="accent1">
+              <a:lumMod val="20000"/>
+              <a:lumOff val="80000"/>
+            </a:schemeClr>
+          </a:solidFill>
+        </p:spPr>
+        <p:style>
+          <a:lnRef idx="2">
+            <a:schemeClr val="accent1">
+              <a:shade val="50000"/>
+            </a:schemeClr>
+          </a:lnRef>
+          <a:fillRef idx="1">
+            <a:schemeClr val="accent1"/>
+          </a:fillRef>
+          <a:effectRef idx="0">
+            <a:schemeClr val="accent1"/>
+          </a:effectRef>
+          <a:fontRef idx="minor">
+            <a:schemeClr val="lt1"/>
+          </a:fontRef>
+        </p:style>
+        <p:txBody>
+          <a:bodyPr rtlCol="0" anchor="ctr"/>
+          <a:lstStyle/>
+          <a:p>
+            <a:pPr algn="ctr"/>
+            <a:r>
+              <a:rPr lang="en-US" altLang="ja-JP" sz="1600" dirty="0"/>
+              <a:t>Start</a:t>
+            </a:r>
+            <a:endParaRPr kumimoji="1" lang="ja-JP" altLang="en-US" sz="1600" dirty="0"/>
+          </a:p>
+        </p:txBody>
+      </p:sp>
+      <p:sp>
+        <p:nvSpPr>
+          <p:cNvPr id="34" name="正方形/長方形 33">
+            <a:extLst>
+              <a:ext uri="{FF2B5EF4-FFF2-40B4-BE49-F238E27FC236}">
+                <a16:creationId xmlns:a16="http://schemas.microsoft.com/office/drawing/2014/main" id="{3094336B-6A02-FAF2-CFFF-558360811392}"/>
+              </a:ext>
+            </a:extLst>
+          </p:cNvPr>
+          <p:cNvSpPr/>
+          <p:nvPr/>
+        </p:nvSpPr>
+        <p:spPr>
+          <a:xfrm>
+            <a:off x="7550306" y="5553656"/>
+            <a:ext cx="931974" cy="292100"/>
+          </a:xfrm>
+          <a:prstGeom prst="rect">
+            <a:avLst/>
+          </a:prstGeom>
+          <a:solidFill>
+            <a:schemeClr val="accent1">
+              <a:lumMod val="20000"/>
+              <a:lumOff val="80000"/>
+            </a:schemeClr>
+          </a:solidFill>
+        </p:spPr>
+        <p:style>
+          <a:lnRef idx="2">
+            <a:schemeClr val="accent1">
+              <a:shade val="50000"/>
+            </a:schemeClr>
+          </a:lnRef>
+          <a:fillRef idx="1">
+            <a:schemeClr val="accent1"/>
+          </a:fillRef>
+          <a:effectRef idx="0">
+            <a:schemeClr val="accent1"/>
+          </a:effectRef>
+          <a:fontRef idx="minor">
+            <a:schemeClr val="lt1"/>
+          </a:fontRef>
+        </p:style>
+        <p:txBody>
+          <a:bodyPr rtlCol="0" anchor="ctr"/>
+          <a:lstStyle/>
+          <a:p>
+            <a:pPr algn="ctr"/>
+            <a:r>
+              <a:rPr kumimoji="1" lang="en-US" altLang="ja-JP" sz="1600" dirty="0" err="1"/>
+              <a:t>Clk</a:t>
+            </a:r>
+            <a:endParaRPr kumimoji="1" lang="ja-JP" altLang="en-US" sz="1600" dirty="0"/>
+          </a:p>
+        </p:txBody>
+      </p:sp>
+      <p:sp>
+        <p:nvSpPr>
+          <p:cNvPr id="35" name="正方形/長方形 34">
+            <a:extLst>
+              <a:ext uri="{FF2B5EF4-FFF2-40B4-BE49-F238E27FC236}">
+                <a16:creationId xmlns:a16="http://schemas.microsoft.com/office/drawing/2014/main" id="{98DD4D56-95A8-F182-67F1-740E43663AC4}"/>
+              </a:ext>
+            </a:extLst>
+          </p:cNvPr>
+          <p:cNvSpPr/>
+          <p:nvPr/>
+        </p:nvSpPr>
+        <p:spPr>
+          <a:xfrm>
+            <a:off x="8493578" y="5553656"/>
+            <a:ext cx="931974" cy="292100"/>
+          </a:xfrm>
+          <a:prstGeom prst="rect">
+            <a:avLst/>
+          </a:prstGeom>
+        </p:spPr>
+        <p:style>
+          <a:lnRef idx="2">
+            <a:schemeClr val="accent1">
+              <a:shade val="50000"/>
+            </a:schemeClr>
+          </a:lnRef>
+          <a:fillRef idx="1">
+            <a:schemeClr val="accent1"/>
+          </a:fillRef>
+          <a:effectRef idx="0">
+            <a:schemeClr val="accent1"/>
+          </a:effectRef>
+          <a:fontRef idx="minor">
+            <a:schemeClr val="lt1"/>
+          </a:fontRef>
+        </p:style>
+        <p:txBody>
+          <a:bodyPr rtlCol="0" anchor="ctr"/>
+          <a:lstStyle/>
+          <a:p>
+            <a:pPr algn="ctr"/>
+            <a:r>
+              <a:rPr kumimoji="1" lang="en-US" altLang="ja-JP" sz="1100" dirty="0"/>
+              <a:t>Burst or Not Flag</a:t>
+            </a:r>
+            <a:endParaRPr kumimoji="1" lang="ja-JP" altLang="en-US" sz="1100" dirty="0"/>
+          </a:p>
+        </p:txBody>
+      </p:sp>
+      <p:sp>
+        <p:nvSpPr>
+          <p:cNvPr id="36" name="正方形/長方形 35">
+            <a:extLst>
+              <a:ext uri="{FF2B5EF4-FFF2-40B4-BE49-F238E27FC236}">
+                <a16:creationId xmlns:a16="http://schemas.microsoft.com/office/drawing/2014/main" id="{8ECDABAD-32E0-CCC7-6053-5690F3641CEF}"/>
+              </a:ext>
+            </a:extLst>
+          </p:cNvPr>
+          <p:cNvSpPr/>
+          <p:nvPr/>
+        </p:nvSpPr>
+        <p:spPr>
+          <a:xfrm>
+            <a:off x="9424760" y="5553656"/>
+            <a:ext cx="931974" cy="292100"/>
+          </a:xfrm>
+          <a:prstGeom prst="rect">
+            <a:avLst/>
+          </a:prstGeom>
+          <a:solidFill>
+            <a:schemeClr val="accent1">
+              <a:lumMod val="20000"/>
+              <a:lumOff val="80000"/>
+            </a:schemeClr>
+          </a:solidFill>
+        </p:spPr>
+        <p:style>
+          <a:lnRef idx="2">
+            <a:schemeClr val="accent1">
+              <a:shade val="50000"/>
+            </a:schemeClr>
+          </a:lnRef>
+          <a:fillRef idx="1">
+            <a:schemeClr val="accent1"/>
+          </a:fillRef>
+          <a:effectRef idx="0">
+            <a:schemeClr val="accent1"/>
+          </a:effectRef>
+          <a:fontRef idx="minor">
+            <a:schemeClr val="lt1"/>
+          </a:fontRef>
+        </p:style>
+        <p:txBody>
+          <a:bodyPr rtlCol="0" anchor="ctr"/>
+          <a:lstStyle/>
+          <a:p>
+            <a:pPr algn="ctr"/>
+            <a:r>
+              <a:rPr kumimoji="1" lang="en-US" altLang="ja-JP" sz="1600" dirty="0"/>
+              <a:t>Data</a:t>
+            </a:r>
+            <a:endParaRPr kumimoji="1" lang="ja-JP" altLang="en-US" sz="1600" dirty="0"/>
+          </a:p>
+        </p:txBody>
+      </p:sp>
+      <p:sp>
+        <p:nvSpPr>
+          <p:cNvPr id="37" name="正方形/長方形 36">
+            <a:extLst>
+              <a:ext uri="{FF2B5EF4-FFF2-40B4-BE49-F238E27FC236}">
+                <a16:creationId xmlns:a16="http://schemas.microsoft.com/office/drawing/2014/main" id="{5FE70A87-5166-8021-6BF2-7E5A78510093}"/>
+              </a:ext>
+            </a:extLst>
+          </p:cNvPr>
+          <p:cNvSpPr/>
+          <p:nvPr/>
+        </p:nvSpPr>
+        <p:spPr>
+          <a:xfrm>
+            <a:off x="10355944" y="5553656"/>
+            <a:ext cx="931974" cy="292100"/>
+          </a:xfrm>
+          <a:prstGeom prst="rect">
+            <a:avLst/>
+          </a:prstGeom>
+          <a:solidFill>
+            <a:schemeClr val="accent1">
+              <a:lumMod val="20000"/>
+              <a:lumOff val="80000"/>
+            </a:schemeClr>
+          </a:solidFill>
+        </p:spPr>
+        <p:style>
+          <a:lnRef idx="2">
+            <a:schemeClr val="accent1">
+              <a:shade val="50000"/>
+            </a:schemeClr>
+          </a:lnRef>
+          <a:fillRef idx="1">
+            <a:schemeClr val="accent1"/>
+          </a:fillRef>
+          <a:effectRef idx="0">
+            <a:schemeClr val="accent1"/>
+          </a:effectRef>
+          <a:fontRef idx="minor">
+            <a:schemeClr val="lt1"/>
+          </a:fontRef>
+        </p:style>
+        <p:txBody>
+          <a:bodyPr rtlCol="0" anchor="ctr"/>
+          <a:lstStyle/>
+          <a:p>
+            <a:pPr algn="ctr"/>
+            <a:r>
+              <a:rPr kumimoji="1" lang="en-US" altLang="ja-JP" sz="1600" dirty="0"/>
+              <a:t>Data</a:t>
+            </a:r>
+            <a:endParaRPr kumimoji="1" lang="ja-JP" altLang="en-US" sz="1600" dirty="0"/>
+          </a:p>
+        </p:txBody>
+      </p:sp>
+      <p:sp>
+        <p:nvSpPr>
+          <p:cNvPr id="38" name="テキスト ボックス 37">
+            <a:extLst>
+              <a:ext uri="{FF2B5EF4-FFF2-40B4-BE49-F238E27FC236}">
+                <a16:creationId xmlns:a16="http://schemas.microsoft.com/office/drawing/2014/main" id="{7DE77C18-EEEF-180E-B373-32DE5CC5303F}"/>
+              </a:ext>
+            </a:extLst>
+          </p:cNvPr>
+          <p:cNvSpPr txBox="1"/>
+          <p:nvPr/>
+        </p:nvSpPr>
+        <p:spPr>
+          <a:xfrm>
+            <a:off x="11063288" y="5889690"/>
+            <a:ext cx="754062" cy="338554"/>
+          </a:xfrm>
+          <a:prstGeom prst="rect">
+            <a:avLst/>
+          </a:prstGeom>
+          <a:noFill/>
+        </p:spPr>
+        <p:txBody>
+          <a:bodyPr wrap="square">
+            <a:spAutoFit/>
+          </a:bodyPr>
+          <a:lstStyle/>
+          <a:p>
+            <a:r>
+              <a:rPr kumimoji="1" lang="en-US" altLang="ja-JP" sz="1600" dirty="0"/>
+              <a:t>LSB</a:t>
+            </a:r>
+            <a:endParaRPr lang="ja-JP" altLang="en-US" sz="1600" dirty="0"/>
+          </a:p>
+        </p:txBody>
+      </p:sp>
+      <p:sp>
+        <p:nvSpPr>
+          <p:cNvPr id="39" name="テキスト ボックス 38">
+            <a:extLst>
+              <a:ext uri="{FF2B5EF4-FFF2-40B4-BE49-F238E27FC236}">
+                <a16:creationId xmlns:a16="http://schemas.microsoft.com/office/drawing/2014/main" id="{33BC7D11-2D08-4389-58BB-BFFB20557BAD}"/>
+              </a:ext>
+            </a:extLst>
+          </p:cNvPr>
+          <p:cNvSpPr txBox="1"/>
+          <p:nvPr/>
+        </p:nvSpPr>
+        <p:spPr>
+          <a:xfrm>
+            <a:off x="10606088" y="5217622"/>
+            <a:ext cx="754062" cy="338554"/>
+          </a:xfrm>
+          <a:prstGeom prst="rect">
+            <a:avLst/>
+          </a:prstGeom>
+          <a:noFill/>
+        </p:spPr>
+        <p:txBody>
+          <a:bodyPr wrap="square">
+            <a:spAutoFit/>
+          </a:bodyPr>
+          <a:lstStyle/>
+          <a:p>
+            <a:r>
+              <a:rPr kumimoji="1" lang="en-US" altLang="ja-JP" sz="1600" dirty="0"/>
+              <a:t>0</a:t>
+            </a:r>
+            <a:endParaRPr lang="ja-JP" altLang="en-US" sz="1600" dirty="0"/>
+          </a:p>
+        </p:txBody>
+      </p:sp>
+      <p:sp>
+        <p:nvSpPr>
+          <p:cNvPr id="40" name="テキスト ボックス 39">
+            <a:extLst>
+              <a:ext uri="{FF2B5EF4-FFF2-40B4-BE49-F238E27FC236}">
+                <a16:creationId xmlns:a16="http://schemas.microsoft.com/office/drawing/2014/main" id="{6C75A3BE-E8B1-7CB1-CEEF-59862A43D497}"/>
+              </a:ext>
+            </a:extLst>
+          </p:cNvPr>
+          <p:cNvSpPr txBox="1"/>
+          <p:nvPr/>
+        </p:nvSpPr>
+        <p:spPr>
+          <a:xfrm>
+            <a:off x="3606007" y="5889690"/>
+            <a:ext cx="754062" cy="338554"/>
+          </a:xfrm>
+          <a:prstGeom prst="rect">
+            <a:avLst/>
+          </a:prstGeom>
+          <a:noFill/>
+        </p:spPr>
+        <p:txBody>
+          <a:bodyPr wrap="square">
+            <a:spAutoFit/>
+          </a:bodyPr>
+          <a:lstStyle/>
+          <a:p>
+            <a:r>
+              <a:rPr kumimoji="1" lang="en-US" altLang="ja-JP" sz="1600" dirty="0"/>
+              <a:t>MSB</a:t>
+            </a:r>
+            <a:endParaRPr lang="ja-JP" altLang="en-US" sz="1600" dirty="0"/>
+          </a:p>
+        </p:txBody>
+      </p:sp>
+      <p:sp>
+        <p:nvSpPr>
+          <p:cNvPr id="41" name="テキスト ボックス 40">
+            <a:extLst>
+              <a:ext uri="{FF2B5EF4-FFF2-40B4-BE49-F238E27FC236}">
+                <a16:creationId xmlns:a16="http://schemas.microsoft.com/office/drawing/2014/main" id="{A8FA690B-1C69-6D46-D5AB-7A0E3AC6373A}"/>
+              </a:ext>
+            </a:extLst>
+          </p:cNvPr>
+          <p:cNvSpPr txBox="1"/>
+          <p:nvPr/>
+        </p:nvSpPr>
+        <p:spPr>
+          <a:xfrm>
+            <a:off x="3868738" y="5217622"/>
+            <a:ext cx="754062" cy="338554"/>
+          </a:xfrm>
+          <a:prstGeom prst="rect">
+            <a:avLst/>
+          </a:prstGeom>
+          <a:noFill/>
+        </p:spPr>
+        <p:txBody>
+          <a:bodyPr wrap="square">
+            <a:spAutoFit/>
+          </a:bodyPr>
+          <a:lstStyle/>
+          <a:p>
+            <a:r>
+              <a:rPr kumimoji="1" lang="en-US" altLang="ja-JP" sz="1600" dirty="0"/>
+              <a:t>7</a:t>
+            </a:r>
+            <a:endParaRPr lang="ja-JP" altLang="en-US" sz="1600" dirty="0"/>
+          </a:p>
+        </p:txBody>
+      </p:sp>
+      <p:sp>
+        <p:nvSpPr>
+          <p:cNvPr id="42" name="正方形/長方形 41">
+            <a:extLst>
+              <a:ext uri="{FF2B5EF4-FFF2-40B4-BE49-F238E27FC236}">
+                <a16:creationId xmlns:a16="http://schemas.microsoft.com/office/drawing/2014/main" id="{A74D2F94-343D-3F20-B588-569D4900C75A}"/>
+              </a:ext>
+            </a:extLst>
+          </p:cNvPr>
+          <p:cNvSpPr/>
+          <p:nvPr/>
+        </p:nvSpPr>
+        <p:spPr>
+          <a:xfrm>
+            <a:off x="5700428" y="5553656"/>
+            <a:ext cx="931974" cy="292100"/>
+          </a:xfrm>
+          <a:prstGeom prst="rect">
+            <a:avLst/>
+          </a:prstGeom>
+          <a:solidFill>
+            <a:schemeClr val="bg1"/>
+          </a:solidFill>
+        </p:spPr>
+        <p:style>
+          <a:lnRef idx="2">
+            <a:schemeClr val="accent1">
+              <a:shade val="50000"/>
+            </a:schemeClr>
+          </a:lnRef>
+          <a:fillRef idx="1">
+            <a:schemeClr val="accent1"/>
+          </a:fillRef>
+          <a:effectRef idx="0">
+            <a:schemeClr val="accent1"/>
+          </a:effectRef>
+          <a:fontRef idx="minor">
+            <a:schemeClr val="lt1"/>
+          </a:fontRef>
+        </p:style>
+        <p:txBody>
+          <a:bodyPr rtlCol="0" anchor="ctr"/>
+          <a:lstStyle/>
+          <a:p>
+            <a:pPr algn="ctr"/>
+            <a:endParaRPr kumimoji="1" lang="ja-JP" altLang="en-US" sz="1600" dirty="0"/>
+          </a:p>
+        </p:txBody>
+      </p:sp>
+      <p:sp>
+        <p:nvSpPr>
+          <p:cNvPr id="43" name="テキスト ボックス 42">
+            <a:extLst>
+              <a:ext uri="{FF2B5EF4-FFF2-40B4-BE49-F238E27FC236}">
+                <a16:creationId xmlns:a16="http://schemas.microsoft.com/office/drawing/2014/main" id="{D72B21C8-B649-B7F0-086D-A2712490021A}"/>
+              </a:ext>
+            </a:extLst>
+          </p:cNvPr>
+          <p:cNvSpPr txBox="1"/>
+          <p:nvPr/>
+        </p:nvSpPr>
+        <p:spPr>
+          <a:xfrm>
+            <a:off x="2899403" y="5551136"/>
+            <a:ext cx="1219365" cy="338554"/>
+          </a:xfrm>
+          <a:prstGeom prst="rect">
+            <a:avLst/>
+          </a:prstGeom>
+          <a:noFill/>
+        </p:spPr>
+        <p:txBody>
+          <a:bodyPr wrap="square">
+            <a:spAutoFit/>
+          </a:bodyPr>
+          <a:lstStyle/>
+          <a:p>
+            <a:r>
+              <a:rPr kumimoji="1" lang="en-US" altLang="ja-JP" sz="1600" dirty="0"/>
+              <a:t>6</a:t>
+            </a:r>
+            <a:r>
+              <a:rPr kumimoji="1" lang="en-US" altLang="ja-JP" sz="1600" baseline="30000" dirty="0"/>
+              <a:t>th</a:t>
+            </a:r>
+            <a:r>
+              <a:rPr kumimoji="1" lang="en-US" altLang="ja-JP" sz="1600" dirty="0"/>
+              <a:t>(last)</a:t>
+            </a:r>
+            <a:endParaRPr lang="ja-JP" altLang="en-US" sz="1600" dirty="0"/>
+          </a:p>
+        </p:txBody>
+      </p:sp>
+      <p:sp>
+        <p:nvSpPr>
+          <p:cNvPr id="44" name="正方形/長方形 43">
+            <a:extLst>
+              <a:ext uri="{FF2B5EF4-FFF2-40B4-BE49-F238E27FC236}">
+                <a16:creationId xmlns:a16="http://schemas.microsoft.com/office/drawing/2014/main" id="{2CCBD8B5-A4B3-761D-B8E3-B1AC09ED50DA}"/>
+              </a:ext>
+            </a:extLst>
+          </p:cNvPr>
+          <p:cNvSpPr/>
+          <p:nvPr/>
+        </p:nvSpPr>
+        <p:spPr>
+          <a:xfrm>
+            <a:off x="3837668" y="6375959"/>
+            <a:ext cx="1319212" cy="292100"/>
+          </a:xfrm>
+          <a:prstGeom prst="rect">
+            <a:avLst/>
+          </a:prstGeom>
+        </p:spPr>
+        <p:style>
+          <a:lnRef idx="2">
+            <a:schemeClr val="accent1">
+              <a:shade val="50000"/>
+            </a:schemeClr>
+          </a:lnRef>
+          <a:fillRef idx="1">
+            <a:schemeClr val="accent1"/>
+          </a:fillRef>
+          <a:effectRef idx="0">
+            <a:schemeClr val="accent1"/>
+          </a:effectRef>
+          <a:fontRef idx="minor">
+            <a:schemeClr val="lt1"/>
+          </a:fontRef>
+        </p:style>
+        <p:txBody>
+          <a:bodyPr rtlCol="0" anchor="ctr"/>
+          <a:lstStyle/>
+          <a:p>
+            <a:pPr algn="ctr"/>
+            <a:r>
+              <a:rPr kumimoji="1" lang="en-US" altLang="ja-JP" sz="1050" dirty="0"/>
+              <a:t>Value(Hi 3bit)</a:t>
+            </a:r>
+            <a:endParaRPr kumimoji="1" lang="ja-JP" altLang="en-US" sz="1050" dirty="0"/>
+          </a:p>
+        </p:txBody>
+      </p:sp>
+      <p:sp>
+        <p:nvSpPr>
+          <p:cNvPr id="45" name="正方形/長方形 44">
+            <a:extLst>
+              <a:ext uri="{FF2B5EF4-FFF2-40B4-BE49-F238E27FC236}">
+                <a16:creationId xmlns:a16="http://schemas.microsoft.com/office/drawing/2014/main" id="{63C1B64E-3E4F-8897-E54D-32EC4B14EA56}"/>
+              </a:ext>
+            </a:extLst>
+          </p:cNvPr>
+          <p:cNvSpPr/>
+          <p:nvPr/>
+        </p:nvSpPr>
+        <p:spPr>
+          <a:xfrm>
+            <a:off x="5019826" y="6375959"/>
+            <a:ext cx="1319212" cy="292100"/>
+          </a:xfrm>
+          <a:prstGeom prst="rect">
+            <a:avLst/>
+          </a:prstGeom>
+        </p:spPr>
+        <p:style>
+          <a:lnRef idx="2">
+            <a:schemeClr val="accent1">
+              <a:shade val="50000"/>
+            </a:schemeClr>
+          </a:lnRef>
+          <a:fillRef idx="1">
+            <a:schemeClr val="accent1"/>
+          </a:fillRef>
+          <a:effectRef idx="0">
+            <a:schemeClr val="accent1"/>
+          </a:effectRef>
+          <a:fontRef idx="minor">
+            <a:schemeClr val="lt1"/>
+          </a:fontRef>
+        </p:style>
+        <p:txBody>
+          <a:bodyPr rtlCol="0" anchor="ctr"/>
+          <a:lstStyle/>
+          <a:p>
+            <a:pPr algn="ctr"/>
+            <a:r>
+              <a:rPr kumimoji="1" lang="en-US" altLang="ja-JP" sz="1050" dirty="0"/>
+              <a:t>Value(Mid 3bit)</a:t>
+            </a:r>
+            <a:endParaRPr kumimoji="1" lang="ja-JP" altLang="en-US" sz="1050" dirty="0"/>
+          </a:p>
+        </p:txBody>
+      </p:sp>
+      <p:sp>
+        <p:nvSpPr>
+          <p:cNvPr id="46" name="正方形/長方形 45">
+            <a:extLst>
+              <a:ext uri="{FF2B5EF4-FFF2-40B4-BE49-F238E27FC236}">
+                <a16:creationId xmlns:a16="http://schemas.microsoft.com/office/drawing/2014/main" id="{02E482CB-279A-F571-C2C0-C6429E4D7188}"/>
+              </a:ext>
+            </a:extLst>
+          </p:cNvPr>
+          <p:cNvSpPr/>
+          <p:nvPr/>
+        </p:nvSpPr>
+        <p:spPr>
+          <a:xfrm>
+            <a:off x="6339038" y="6375959"/>
+            <a:ext cx="1319212" cy="292100"/>
+          </a:xfrm>
+          <a:prstGeom prst="rect">
+            <a:avLst/>
+          </a:prstGeom>
+        </p:spPr>
+        <p:style>
+          <a:lnRef idx="2">
+            <a:schemeClr val="accent1">
+              <a:shade val="50000"/>
+            </a:schemeClr>
+          </a:lnRef>
+          <a:fillRef idx="1">
+            <a:schemeClr val="accent1"/>
+          </a:fillRef>
+          <a:effectRef idx="0">
+            <a:schemeClr val="accent1"/>
+          </a:effectRef>
+          <a:fontRef idx="minor">
+            <a:schemeClr val="lt1"/>
+          </a:fontRef>
+        </p:style>
+        <p:txBody>
+          <a:bodyPr rtlCol="0" anchor="ctr"/>
+          <a:lstStyle/>
+          <a:p>
+            <a:pPr algn="ctr"/>
+            <a:r>
+              <a:rPr kumimoji="1" lang="en-US" altLang="ja-JP" sz="1050" dirty="0"/>
+              <a:t>Value(Lo 2bit)</a:t>
+            </a:r>
+            <a:endParaRPr kumimoji="1" lang="ja-JP" altLang="en-US" sz="1050" dirty="0"/>
+          </a:p>
+        </p:txBody>
+      </p:sp>
+      <p:sp>
+        <p:nvSpPr>
+          <p:cNvPr id="47" name="テキスト ボックス 46">
+            <a:extLst>
+              <a:ext uri="{FF2B5EF4-FFF2-40B4-BE49-F238E27FC236}">
+                <a16:creationId xmlns:a16="http://schemas.microsoft.com/office/drawing/2014/main" id="{50F6D79B-786C-9646-130B-7787F84ECA17}"/>
+              </a:ext>
+            </a:extLst>
+          </p:cNvPr>
+          <p:cNvSpPr txBox="1"/>
+          <p:nvPr/>
+        </p:nvSpPr>
+        <p:spPr>
+          <a:xfrm>
+            <a:off x="4202623" y="6058967"/>
+            <a:ext cx="811214" cy="338554"/>
+          </a:xfrm>
+          <a:prstGeom prst="rect">
+            <a:avLst/>
+          </a:prstGeom>
+          <a:noFill/>
+        </p:spPr>
+        <p:txBody>
+          <a:bodyPr wrap="square">
+            <a:spAutoFit/>
+          </a:bodyPr>
+          <a:lstStyle/>
+          <a:p>
+            <a:r>
+              <a:rPr kumimoji="1" lang="en-US" altLang="ja-JP" sz="1600" dirty="0"/>
+              <a:t>7th</a:t>
+            </a:r>
+            <a:endParaRPr lang="ja-JP" altLang="en-US" sz="1600" dirty="0"/>
+          </a:p>
+        </p:txBody>
+      </p:sp>
+      <p:sp>
+        <p:nvSpPr>
+          <p:cNvPr id="48" name="テキスト ボックス 47">
+            <a:extLst>
+              <a:ext uri="{FF2B5EF4-FFF2-40B4-BE49-F238E27FC236}">
+                <a16:creationId xmlns:a16="http://schemas.microsoft.com/office/drawing/2014/main" id="{6A66C383-2AAF-093B-E2F4-61E4725F0437}"/>
+              </a:ext>
+            </a:extLst>
+          </p:cNvPr>
+          <p:cNvSpPr txBox="1"/>
+          <p:nvPr/>
+        </p:nvSpPr>
+        <p:spPr>
+          <a:xfrm>
+            <a:off x="5521835" y="6058967"/>
+            <a:ext cx="811214" cy="338554"/>
+          </a:xfrm>
+          <a:prstGeom prst="rect">
+            <a:avLst/>
+          </a:prstGeom>
+          <a:noFill/>
+        </p:spPr>
+        <p:txBody>
+          <a:bodyPr wrap="square">
+            <a:spAutoFit/>
+          </a:bodyPr>
+          <a:lstStyle/>
+          <a:p>
+            <a:r>
+              <a:rPr kumimoji="1" lang="en-US" altLang="ja-JP" sz="1600" dirty="0"/>
+              <a:t>8th</a:t>
+            </a:r>
+            <a:endParaRPr lang="ja-JP" altLang="en-US" sz="1600" dirty="0"/>
+          </a:p>
+        </p:txBody>
+      </p:sp>
+      <p:sp>
+        <p:nvSpPr>
+          <p:cNvPr id="49" name="テキスト ボックス 48">
+            <a:extLst>
+              <a:ext uri="{FF2B5EF4-FFF2-40B4-BE49-F238E27FC236}">
+                <a16:creationId xmlns:a16="http://schemas.microsoft.com/office/drawing/2014/main" id="{477891D7-E9C6-703E-510E-1023CDEB1AF3}"/>
+              </a:ext>
+            </a:extLst>
+          </p:cNvPr>
+          <p:cNvSpPr txBox="1"/>
+          <p:nvPr/>
+        </p:nvSpPr>
+        <p:spPr>
+          <a:xfrm>
+            <a:off x="6816110" y="6058967"/>
+            <a:ext cx="811214" cy="338554"/>
+          </a:xfrm>
+          <a:prstGeom prst="rect">
+            <a:avLst/>
+          </a:prstGeom>
+          <a:noFill/>
+        </p:spPr>
+        <p:txBody>
+          <a:bodyPr wrap="square">
+            <a:spAutoFit/>
+          </a:bodyPr>
+          <a:lstStyle/>
+          <a:p>
+            <a:r>
+              <a:rPr kumimoji="1" lang="en-US" altLang="ja-JP" sz="1600" dirty="0"/>
+              <a:t>9th</a:t>
+            </a:r>
+            <a:endParaRPr lang="ja-JP" altLang="en-US" sz="1600" dirty="0"/>
+          </a:p>
+        </p:txBody>
+      </p:sp>
+      <p:sp>
+        <p:nvSpPr>
+          <p:cNvPr id="50" name="テキスト ボックス 49">
+            <a:extLst>
+              <a:ext uri="{FF2B5EF4-FFF2-40B4-BE49-F238E27FC236}">
+                <a16:creationId xmlns:a16="http://schemas.microsoft.com/office/drawing/2014/main" id="{612F3D4F-FFA0-93F1-D77E-86EAE101682B}"/>
+              </a:ext>
+            </a:extLst>
+          </p:cNvPr>
+          <p:cNvSpPr txBox="1"/>
+          <p:nvPr/>
+        </p:nvSpPr>
+        <p:spPr>
+          <a:xfrm>
+            <a:off x="3453607" y="6352732"/>
+            <a:ext cx="361950" cy="338554"/>
+          </a:xfrm>
+          <a:prstGeom prst="rect">
+            <a:avLst/>
+          </a:prstGeom>
+          <a:noFill/>
+        </p:spPr>
+        <p:txBody>
+          <a:bodyPr wrap="square">
+            <a:spAutoFit/>
+          </a:bodyPr>
+          <a:lstStyle/>
+          <a:p>
+            <a:r>
+              <a:rPr kumimoji="1" lang="en-US" altLang="ja-JP" sz="1600" dirty="0"/>
+              <a:t>…</a:t>
+            </a:r>
+            <a:endParaRPr lang="ja-JP" altLang="en-US" sz="1600" dirty="0"/>
+          </a:p>
+        </p:txBody>
+      </p:sp>
+      <p:sp>
+        <p:nvSpPr>
+          <p:cNvPr id="51" name="テキスト ボックス 50">
+            <a:extLst>
+              <a:ext uri="{FF2B5EF4-FFF2-40B4-BE49-F238E27FC236}">
+                <a16:creationId xmlns:a16="http://schemas.microsoft.com/office/drawing/2014/main" id="{0BB4C7C6-65EC-C22B-0918-3CC8A797D830}"/>
+              </a:ext>
+            </a:extLst>
+          </p:cNvPr>
+          <p:cNvSpPr txBox="1"/>
+          <p:nvPr/>
+        </p:nvSpPr>
+        <p:spPr>
+          <a:xfrm>
+            <a:off x="7639678" y="6352732"/>
+            <a:ext cx="361950" cy="338554"/>
+          </a:xfrm>
+          <a:prstGeom prst="rect">
+            <a:avLst/>
+          </a:prstGeom>
+          <a:noFill/>
+        </p:spPr>
+        <p:txBody>
+          <a:bodyPr wrap="square">
+            <a:spAutoFit/>
+          </a:bodyPr>
+          <a:lstStyle/>
+          <a:p>
+            <a:r>
+              <a:rPr kumimoji="1" lang="en-US" altLang="ja-JP" sz="1600" dirty="0"/>
+              <a:t>…</a:t>
+            </a:r>
+            <a:endParaRPr lang="ja-JP" altLang="en-US" sz="1600" dirty="0"/>
+          </a:p>
+        </p:txBody>
+      </p:sp>
+      <p:sp>
+        <p:nvSpPr>
+          <p:cNvPr id="55" name="テキスト ボックス 54">
+            <a:extLst>
+              <a:ext uri="{FF2B5EF4-FFF2-40B4-BE49-F238E27FC236}">
+                <a16:creationId xmlns:a16="http://schemas.microsoft.com/office/drawing/2014/main" id="{6F3D75EE-5EDB-1999-25CD-F326245F8B42}"/>
+              </a:ext>
+            </a:extLst>
+          </p:cNvPr>
+          <p:cNvSpPr txBox="1"/>
+          <p:nvPr/>
+        </p:nvSpPr>
+        <p:spPr>
+          <a:xfrm>
+            <a:off x="2433852" y="6321954"/>
+            <a:ext cx="6100548" cy="369332"/>
+          </a:xfrm>
+          <a:prstGeom prst="rect">
+            <a:avLst/>
+          </a:prstGeom>
+          <a:noFill/>
+        </p:spPr>
+        <p:txBody>
+          <a:bodyPr wrap="square">
+            <a:spAutoFit/>
+          </a:bodyPr>
+          <a:lstStyle/>
+          <a:p>
+            <a:r>
+              <a:rPr kumimoji="1" lang="en-US" altLang="ja-JP" sz="1800" dirty="0"/>
+              <a:t>Burst ON</a:t>
+            </a:r>
+            <a:endParaRPr lang="ja-JP" altLang="en-US" dirty="0"/>
+          </a:p>
+        </p:txBody>
+      </p:sp>
+    </p:spTree>
+    <p:extLst>
+      <p:ext uri="{BB962C8B-B14F-4D97-AF65-F5344CB8AC3E}">
+        <p14:creationId xmlns:p14="http://schemas.microsoft.com/office/powerpoint/2010/main" val="666887639"/>
+      </p:ext>
+    </p:extLst>
+  </p:cSld>
+  <p:clrMapOvr>
+    <a:masterClrMapping/>
+  </p:clrMapOvr>
+</p:sld>
+</file>
+
 <file path=ppt/slides/slide4.xml><?xml version="1.0" encoding="utf-8"?>
 <p:sld xmlns:a="http://schemas.openxmlformats.org/drawingml/2006/main" xmlns:r="http://schemas.openxmlformats.org/officeDocument/2006/relationships" xmlns:p="http://schemas.openxmlformats.org/presentationml/2006/main">
   <p:cSld>

</xml_diff>

<commit_message>
4.3.3.0 Improved performance for VSIF for SID chip. Please upload VSIF_C64.prg to your C64.
</commit_message>
<xml_diff>
--- a/docs/MAmidiMEmo/Manual.pptx
+++ b/docs/MAmidiMEmo/Manual.pptx
@@ -230,7 +230,7 @@
           <a:p>
             <a:fld id="{581C28D8-13B6-41C3-9F5F-0284C569C6F1}" type="datetimeFigureOut">
               <a:rPr kumimoji="1" lang="ja-JP" altLang="en-US" smtClean="0"/>
-              <a:t>2022/8/23</a:t>
+              <a:t>2022/9/1</a:t>
             </a:fld>
             <a:endParaRPr kumimoji="1" lang="ja-JP" altLang="en-US"/>
           </a:p>
@@ -1201,6 +1201,90 @@
 </p:notes>
 </file>
 
+<file path=ppt/notesSlides/notesSlide9.xml><?xml version="1.0" encoding="utf-8"?>
+<p:notes xmlns:a="http://schemas.openxmlformats.org/drawingml/2006/main" xmlns:r="http://schemas.openxmlformats.org/officeDocument/2006/relationships" xmlns:p="http://schemas.openxmlformats.org/presentationml/2006/main">
+  <p:cSld>
+    <p:spTree>
+      <p:nvGrpSpPr>
+        <p:cNvPr id="1" name=""/>
+        <p:cNvGrpSpPr/>
+        <p:nvPr/>
+      </p:nvGrpSpPr>
+      <p:grpSpPr>
+        <a:xfrm>
+          <a:off x="0" y="0"/>
+          <a:ext cx="0" cy="0"/>
+          <a:chOff x="0" y="0"/>
+          <a:chExt cx="0" cy="0"/>
+        </a:xfrm>
+      </p:grpSpPr>
+      <p:sp>
+        <p:nvSpPr>
+          <p:cNvPr id="2" name="スライド イメージ プレースホルダー 1"/>
+          <p:cNvSpPr>
+            <a:spLocks noGrp="1" noRot="1" noChangeAspect="1"/>
+          </p:cNvSpPr>
+          <p:nvPr>
+            <p:ph type="sldImg"/>
+          </p:nvPr>
+        </p:nvSpPr>
+        <p:spPr/>
+      </p:sp>
+      <p:sp>
+        <p:nvSpPr>
+          <p:cNvPr id="3" name="ノート プレースホルダー 2"/>
+          <p:cNvSpPr>
+            <a:spLocks noGrp="1"/>
+          </p:cNvSpPr>
+          <p:nvPr>
+            <p:ph type="body" idx="1"/>
+          </p:nvPr>
+        </p:nvSpPr>
+        <p:spPr/>
+        <p:txBody>
+          <a:bodyPr/>
+          <a:lstStyle/>
+          <a:p>
+            <a:endParaRPr kumimoji="1" lang="ja-JP" altLang="en-US" dirty="0"/>
+          </a:p>
+        </p:txBody>
+      </p:sp>
+      <p:sp>
+        <p:nvSpPr>
+          <p:cNvPr id="4" name="スライド番号プレースホルダー 3"/>
+          <p:cNvSpPr>
+            <a:spLocks noGrp="1"/>
+          </p:cNvSpPr>
+          <p:nvPr>
+            <p:ph type="sldNum" sz="quarter" idx="5"/>
+          </p:nvPr>
+        </p:nvSpPr>
+        <p:spPr/>
+        <p:txBody>
+          <a:bodyPr/>
+          <a:lstStyle/>
+          <a:p>
+            <a:fld id="{E8D2F5C4-CB40-44D3-9C89-5ECCD9AB4B5C}" type="slidenum">
+              <a:rPr kumimoji="1" lang="ja-JP" altLang="en-US" smtClean="0"/>
+              <a:t>34</a:t>
+            </a:fld>
+            <a:endParaRPr kumimoji="1" lang="ja-JP" altLang="en-US"/>
+          </a:p>
+        </p:txBody>
+      </p:sp>
+    </p:spTree>
+    <p:extLst>
+      <p:ext uri="{BB962C8B-B14F-4D97-AF65-F5344CB8AC3E}">
+        <p14:creationId xmlns:p14="http://schemas.microsoft.com/office/powerpoint/2010/main" val="1783975363"/>
+      </p:ext>
+    </p:extLst>
+  </p:cSld>
+  <p:clrMapOvr>
+    <a:masterClrMapping/>
+  </p:clrMapOvr>
+</p:notes>
+</file>
+
 <file path=ppt/slideLayouts/slideLayout1.xml><?xml version="1.0" encoding="utf-8"?>
 <p:sldLayout xmlns:a="http://schemas.openxmlformats.org/drawingml/2006/main" xmlns:r="http://schemas.openxmlformats.org/officeDocument/2006/relationships" xmlns:p="http://schemas.openxmlformats.org/presentationml/2006/main" type="title" preserve="1">
   <p:cSld name="タイトル スライド">
@@ -1389,7 +1473,7 @@
           <a:p>
             <a:fld id="{B8625E62-B904-4691-B75E-EC1C32885285}" type="datetime1">
               <a:rPr kumimoji="1" lang="ja-JP" altLang="en-US" smtClean="0"/>
-              <a:t>2022/8/23</a:t>
+              <a:t>2022/9/1</a:t>
             </a:fld>
             <a:endParaRPr kumimoji="1" lang="ja-JP" altLang="en-US"/>
           </a:p>
@@ -1727,7 +1811,7 @@
           <a:p>
             <a:fld id="{A4C87007-2A40-4EFC-90A3-258EFA3C1001}" type="datetime1">
               <a:rPr kumimoji="1" lang="ja-JP" altLang="en-US" smtClean="0"/>
-              <a:t>2022/8/23</a:t>
+              <a:t>2022/9/1</a:t>
             </a:fld>
             <a:endParaRPr kumimoji="1" lang="ja-JP" altLang="en-US"/>
           </a:p>
@@ -2128,7 +2212,7 @@
           <a:p>
             <a:fld id="{0FE0D7FF-9203-4AA3-90FD-622674A14F90}" type="datetime1">
               <a:rPr kumimoji="1" lang="ja-JP" altLang="en-US" smtClean="0"/>
-              <a:t>2022/8/23</a:t>
+              <a:t>2022/9/1</a:t>
             </a:fld>
             <a:endParaRPr kumimoji="1" lang="ja-JP" altLang="en-US"/>
           </a:p>
@@ -2464,7 +2548,7 @@
           <a:p>
             <a:fld id="{D2D6E4D3-BEDB-4F35-876B-5B9AA41BFB5B}" type="datetime1">
               <a:rPr kumimoji="1" lang="ja-JP" altLang="en-US" smtClean="0"/>
-              <a:t>2022/8/23</a:t>
+              <a:t>2022/9/1</a:t>
             </a:fld>
             <a:endParaRPr kumimoji="1" lang="ja-JP" altLang="en-US"/>
           </a:p>
@@ -2784,7 +2868,7 @@
           <a:p>
             <a:fld id="{2ACD896E-FC14-4F25-BC47-18ABAEA9E1FE}" type="datetime1">
               <a:rPr kumimoji="1" lang="ja-JP" altLang="en-US" smtClean="0"/>
-              <a:t>2022/8/23</a:t>
+              <a:t>2022/9/1</a:t>
             </a:fld>
             <a:endParaRPr kumimoji="1" lang="ja-JP" altLang="en-US"/>
           </a:p>
@@ -3180,7 +3264,7 @@
           <a:p>
             <a:fld id="{54FC701B-2185-4987-B8E2-5507664B65F4}" type="datetime1">
               <a:rPr kumimoji="1" lang="ja-JP" altLang="en-US" smtClean="0"/>
-              <a:t>2022/8/23</a:t>
+              <a:t>2022/9/1</a:t>
             </a:fld>
             <a:endParaRPr kumimoji="1" lang="ja-JP" altLang="en-US"/>
           </a:p>
@@ -3469,7 +3553,7 @@
           <a:p>
             <a:fld id="{3FB4CDED-9617-418F-B546-D66B9BB6C35E}" type="datetime1">
               <a:rPr kumimoji="1" lang="ja-JP" altLang="en-US" smtClean="0"/>
-              <a:t>2022/8/23</a:t>
+              <a:t>2022/9/1</a:t>
             </a:fld>
             <a:endParaRPr kumimoji="1" lang="ja-JP" altLang="en-US"/>
           </a:p>
@@ -3763,7 +3847,7 @@
           <a:p>
             <a:fld id="{F5635D40-962A-46D7-8037-3F2900B5EB4D}" type="datetime1">
               <a:rPr kumimoji="1" lang="ja-JP" altLang="en-US" smtClean="0"/>
-              <a:t>2022/8/23</a:t>
+              <a:t>2022/9/1</a:t>
             </a:fld>
             <a:endParaRPr kumimoji="1" lang="ja-JP" altLang="en-US"/>
           </a:p>
@@ -4057,7 +4141,7 @@
           <a:p>
             <a:fld id="{741DA9A2-8356-4FFD-B66A-E38811049858}" type="datetime1">
               <a:rPr kumimoji="1" lang="ja-JP" altLang="en-US" smtClean="0"/>
-              <a:t>2022/8/23</a:t>
+              <a:t>2022/9/1</a:t>
             </a:fld>
             <a:endParaRPr kumimoji="1" lang="ja-JP" altLang="en-US"/>
           </a:p>
@@ -4386,7 +4470,7 @@
           <a:p>
             <a:fld id="{9DDE8989-88B8-4869-97D9-547531F13E13}" type="datetime1">
               <a:rPr kumimoji="1" lang="ja-JP" altLang="en-US" smtClean="0"/>
-              <a:t>2022/8/23</a:t>
+              <a:t>2022/9/1</a:t>
             </a:fld>
             <a:endParaRPr kumimoji="1" lang="ja-JP" altLang="en-US"/>
           </a:p>
@@ -4773,7 +4857,7 @@
           <a:p>
             <a:fld id="{81EC4031-B949-4300-AB3E-1551426E8631}" type="datetime1">
               <a:rPr kumimoji="1" lang="ja-JP" altLang="en-US" smtClean="0"/>
-              <a:t>2022/8/23</a:t>
+              <a:t>2022/9/1</a:t>
             </a:fld>
             <a:endParaRPr kumimoji="1" lang="ja-JP" altLang="en-US"/>
           </a:p>
@@ -5294,7 +5378,7 @@
           <a:p>
             <a:fld id="{F39E755E-A59D-4634-B604-E9BB568B1156}" type="datetime1">
               <a:rPr kumimoji="1" lang="ja-JP" altLang="en-US" smtClean="0"/>
-              <a:t>2022/8/23</a:t>
+              <a:t>2022/9/1</a:t>
             </a:fld>
             <a:endParaRPr kumimoji="1" lang="ja-JP" altLang="en-US"/>
           </a:p>
@@ -5499,7 +5583,7 @@
           <a:p>
             <a:fld id="{61DA38B3-7601-4256-ABFE-386B92B0EDB5}" type="datetime1">
               <a:rPr kumimoji="1" lang="ja-JP" altLang="en-US" smtClean="0"/>
-              <a:t>2022/8/23</a:t>
+              <a:t>2022/9/1</a:t>
             </a:fld>
             <a:endParaRPr kumimoji="1" lang="ja-JP" altLang="en-US"/>
           </a:p>
@@ -5676,7 +5760,7 @@
           <a:p>
             <a:fld id="{5A28ED6D-8A94-4DBA-8EF2-284D1A467CE8}" type="datetime1">
               <a:rPr kumimoji="1" lang="ja-JP" altLang="en-US" smtClean="0"/>
-              <a:t>2022/8/23</a:t>
+              <a:t>2022/9/1</a:t>
             </a:fld>
             <a:endParaRPr kumimoji="1" lang="ja-JP" altLang="en-US"/>
           </a:p>
@@ -6041,7 +6125,7 @@
           <a:p>
             <a:fld id="{B27B0317-28AF-43C5-8944-AADFA89E0149}" type="datetime1">
               <a:rPr kumimoji="1" lang="ja-JP" altLang="en-US" smtClean="0"/>
-              <a:t>2022/8/23</a:t>
+              <a:t>2022/9/1</a:t>
             </a:fld>
             <a:endParaRPr kumimoji="1" lang="ja-JP" altLang="en-US"/>
           </a:p>
@@ -6386,7 +6470,7 @@
           <a:p>
             <a:fld id="{A78D023C-C4FA-4CE8-B5BE-6798898EE377}" type="datetime1">
               <a:rPr kumimoji="1" lang="ja-JP" altLang="en-US" smtClean="0"/>
-              <a:t>2022/8/23</a:t>
+              <a:t>2022/9/1</a:t>
             </a:fld>
             <a:endParaRPr kumimoji="1" lang="ja-JP" altLang="en-US"/>
           </a:p>
@@ -8535,7 +8619,7 @@
           <a:p>
             <a:fld id="{99567159-F4A8-4352-915B-DDBEFEF4A4D6}" type="datetime1">
               <a:rPr kumimoji="1" lang="ja-JP" altLang="en-US" smtClean="0"/>
-              <a:t>2022/8/23</a:t>
+              <a:t>2022/9/1</a:t>
             </a:fld>
             <a:endParaRPr kumimoji="1" lang="ja-JP" altLang="en-US"/>
           </a:p>
@@ -33957,13 +34041,13 @@
           <a:p>
             <a:r>
               <a:rPr lang="en-US" altLang="ja-JP" dirty="0"/>
-              <a:t>Baud rate : 93,750 bytes / sec</a:t>
+              <a:t>Baud rate : 31,250 bytes / sec</a:t>
             </a:r>
           </a:p>
           <a:p>
             <a:r>
               <a:rPr kumimoji="1" lang="en-US" altLang="ja-JP" dirty="0"/>
-              <a:t>1 packet : 6 bytes~</a:t>
+              <a:t>1 packet : 6 bytes(1 byte value) or 9 bytes (2 bytes value) mode</a:t>
             </a:r>
           </a:p>
           <a:p>
@@ -34023,7 +34107,7 @@
           <a:p>
             <a:r>
               <a:rPr kumimoji="1" lang="en-US" altLang="ja-JP" dirty="0"/>
-              <a:t>Burst Transfer mode:</a:t>
+              <a:t>9 bytes mode flag:</a:t>
             </a:r>
           </a:p>
           <a:p>
@@ -35371,7 +35455,7 @@
             <a:pPr algn="ctr"/>
             <a:r>
               <a:rPr kumimoji="1" lang="en-US" altLang="ja-JP" sz="1100" dirty="0"/>
-              <a:t>Burst or Not Flag</a:t>
+              <a:t>9bytes flag</a:t>
             </a:r>
             <a:endParaRPr kumimoji="1" lang="ja-JP" altLang="en-US" sz="1100" dirty="0"/>
           </a:p>
@@ -35696,8 +35780,8 @@
         </p:nvSpPr>
         <p:spPr>
           <a:xfrm>
-            <a:off x="2899403" y="5551136"/>
-            <a:ext cx="1219365" cy="338554"/>
+            <a:off x="2390843" y="5546018"/>
+            <a:ext cx="1498698" cy="338554"/>
           </a:xfrm>
           <a:prstGeom prst="rect">
             <a:avLst/>
@@ -35716,11 +35800,11 @@
             </a:r>
             <a:r>
               <a:rPr kumimoji="1" lang="en-US" altLang="ja-JP" sz="1600" baseline="30000" dirty="0"/>
-              <a:t>th</a:t>
+              <a:t>th </a:t>
             </a:r>
             <a:r>
               <a:rPr kumimoji="1" lang="en-US" altLang="ja-JP" sz="1600" dirty="0"/>
-              <a:t>(last)</a:t>
+              <a:t>byte data</a:t>
             </a:r>
             <a:endParaRPr lang="ja-JP" altLang="en-US" sz="1600" dirty="0"/>
           </a:p>
@@ -36022,10 +36106,10 @@
       </p:sp>
       <p:sp>
         <p:nvSpPr>
-          <p:cNvPr id="51" name="テキスト ボックス 50">
-            <a:extLst>
-              <a:ext uri="{FF2B5EF4-FFF2-40B4-BE49-F238E27FC236}">
-                <a16:creationId xmlns:a16="http://schemas.microsoft.com/office/drawing/2014/main" id="{0BB4C7C6-65EC-C22B-0918-3CC8A797D830}"/>
+          <p:cNvPr id="9" name="テキスト ボックス 8">
+            <a:extLst>
+              <a:ext uri="{FF2B5EF4-FFF2-40B4-BE49-F238E27FC236}">
+                <a16:creationId xmlns:a16="http://schemas.microsoft.com/office/drawing/2014/main" id="{C699DB5E-7E76-A3FB-1C02-46BF9C5B47AD}"/>
               </a:ext>
             </a:extLst>
           </p:cNvPr>
@@ -36034,8 +36118,8 @@
         </p:nvSpPr>
         <p:spPr>
           <a:xfrm>
-            <a:off x="7639678" y="6352732"/>
-            <a:ext cx="361950" cy="338554"/>
+            <a:off x="11207750" y="2797831"/>
+            <a:ext cx="811214" cy="338554"/>
           </a:xfrm>
           <a:prstGeom prst="rect">
             <a:avLst/>
@@ -36050,7 +36134,7 @@
           <a:p>
             <a:r>
               <a:rPr kumimoji="1" lang="en-US" altLang="ja-JP" sz="1600" dirty="0"/>
-              <a:t>…</a:t>
+              <a:t>7~9th</a:t>
             </a:r>
             <a:endParaRPr lang="ja-JP" altLang="en-US" sz="1600" dirty="0"/>
           </a:p>
@@ -36058,10 +36142,10 @@
       </p:sp>
       <p:sp>
         <p:nvSpPr>
-          <p:cNvPr id="55" name="テキスト ボックス 54">
-            <a:extLst>
-              <a:ext uri="{FF2B5EF4-FFF2-40B4-BE49-F238E27FC236}">
-                <a16:creationId xmlns:a16="http://schemas.microsoft.com/office/drawing/2014/main" id="{6F3D75EE-5EDB-1999-25CD-F326245F8B42}"/>
+          <p:cNvPr id="23" name="テキスト ボックス 22">
+            <a:extLst>
+              <a:ext uri="{FF2B5EF4-FFF2-40B4-BE49-F238E27FC236}">
+                <a16:creationId xmlns:a16="http://schemas.microsoft.com/office/drawing/2014/main" id="{67C40D51-6725-3FF3-5721-A6FE521C3001}"/>
               </a:ext>
             </a:extLst>
           </p:cNvPr>
@@ -36070,8 +36154,8 @@
         </p:nvSpPr>
         <p:spPr>
           <a:xfrm>
-            <a:off x="2433852" y="6321954"/>
-            <a:ext cx="6100548" cy="369332"/>
+            <a:off x="7692479" y="6037931"/>
+            <a:ext cx="3649028" cy="830997"/>
           </a:xfrm>
           <a:prstGeom prst="rect">
             <a:avLst/>
@@ -36085,10 +36169,108 @@
           <a:lstStyle/>
           <a:p>
             <a:r>
-              <a:rPr kumimoji="1" lang="en-US" altLang="ja-JP" sz="1800" dirty="0"/>
-              <a:t>Burst ON</a:t>
-            </a:r>
-            <a:endParaRPr lang="ja-JP" altLang="en-US" dirty="0"/>
+              <a:rPr kumimoji="1" lang="en-US" altLang="ja-JP" sz="1600" dirty="0"/>
+              <a:t>NOTE: In 9bytes mode, send value for Address+1 data first, second is Address+0 data</a:t>
+            </a:r>
+            <a:endParaRPr lang="ja-JP" altLang="en-US" sz="1600" dirty="0"/>
+          </a:p>
+        </p:txBody>
+      </p:sp>
+      <p:sp>
+        <p:nvSpPr>
+          <p:cNvPr id="52" name="テキスト ボックス 51">
+            <a:extLst>
+              <a:ext uri="{FF2B5EF4-FFF2-40B4-BE49-F238E27FC236}">
+                <a16:creationId xmlns:a16="http://schemas.microsoft.com/office/drawing/2014/main" id="{9D064015-CF81-2B6D-CA96-CFBFC532D246}"/>
+              </a:ext>
+            </a:extLst>
+          </p:cNvPr>
+          <p:cNvSpPr txBox="1"/>
+          <p:nvPr/>
+        </p:nvSpPr>
+        <p:spPr>
+          <a:xfrm>
+            <a:off x="1832068" y="6375959"/>
+            <a:ext cx="1945588" cy="338554"/>
+          </a:xfrm>
+          <a:prstGeom prst="rect">
+            <a:avLst/>
+          </a:prstGeom>
+          <a:noFill/>
+        </p:spPr>
+        <p:txBody>
+          <a:bodyPr wrap="square">
+            <a:spAutoFit/>
+          </a:bodyPr>
+          <a:lstStyle/>
+          <a:p>
+            <a:r>
+              <a:rPr kumimoji="1" lang="en-US" altLang="ja-JP" sz="1600" dirty="0"/>
+              <a:t>7~9</a:t>
+            </a:r>
+            <a:r>
+              <a:rPr kumimoji="1" lang="en-US" altLang="ja-JP" sz="1600" baseline="30000" dirty="0"/>
+              <a:t>th</a:t>
+            </a:r>
+            <a:r>
+              <a:rPr kumimoji="1" lang="en-US" altLang="ja-JP" sz="1600" dirty="0"/>
+              <a:t> byte data</a:t>
+            </a:r>
+            <a:endParaRPr lang="ja-JP" altLang="en-US" sz="1600" dirty="0"/>
+          </a:p>
+        </p:txBody>
+      </p:sp>
+      <p:sp>
+        <p:nvSpPr>
+          <p:cNvPr id="53" name="正方形/長方形 52">
+            <a:extLst>
+              <a:ext uri="{FF2B5EF4-FFF2-40B4-BE49-F238E27FC236}">
+                <a16:creationId xmlns:a16="http://schemas.microsoft.com/office/drawing/2014/main" id="{2BE556F3-100B-CFBC-7E45-9604F27EF3DD}"/>
+              </a:ext>
+            </a:extLst>
+          </p:cNvPr>
+          <p:cNvSpPr/>
+          <p:nvPr/>
+        </p:nvSpPr>
+        <p:spPr>
+          <a:xfrm>
+            <a:off x="11075137" y="3211097"/>
+            <a:ext cx="925975" cy="292100"/>
+          </a:xfrm>
+          <a:prstGeom prst="rect">
+            <a:avLst/>
+          </a:prstGeom>
+        </p:spPr>
+        <p:style>
+          <a:lnRef idx="2">
+            <a:schemeClr val="accent1">
+              <a:shade val="50000"/>
+            </a:schemeClr>
+          </a:lnRef>
+          <a:fillRef idx="1">
+            <a:schemeClr val="accent1"/>
+          </a:fillRef>
+          <a:effectRef idx="0">
+            <a:schemeClr val="accent1"/>
+          </a:effectRef>
+          <a:fontRef idx="minor">
+            <a:schemeClr val="lt1"/>
+          </a:fontRef>
+        </p:style>
+        <p:txBody>
+          <a:bodyPr rtlCol="0" anchor="ctr"/>
+          <a:lstStyle/>
+          <a:p>
+            <a:pPr algn="ctr"/>
+            <a:r>
+              <a:rPr kumimoji="1" lang="en-US" altLang="ja-JP" sz="1050" dirty="0"/>
+              <a:t>Same as 4,5,6 </a:t>
+            </a:r>
+            <a:r>
+              <a:rPr kumimoji="1" lang="en-US" altLang="ja-JP" sz="1050" dirty="0" err="1"/>
+              <a:t>th</a:t>
+            </a:r>
+            <a:endParaRPr kumimoji="1" lang="ja-JP" altLang="en-US" sz="1050" dirty="0"/>
           </a:p>
         </p:txBody>
       </p:sp>

</xml_diff>

<commit_message>
Default FTDI clk value to 17 for SCC
</commit_message>
<xml_diff>
--- a/docs/MAmidiMEmo/Manual.pptx
+++ b/docs/MAmidiMEmo/Manual.pptx
@@ -230,7 +230,7 @@
           <a:p>
             <a:fld id="{581C28D8-13B6-41C3-9F5F-0284C569C6F1}" type="datetimeFigureOut">
               <a:rPr kumimoji="1" lang="ja-JP" altLang="en-US" smtClean="0"/>
-              <a:t>2022/10/18</a:t>
+              <a:t>2022/10/22</a:t>
             </a:fld>
             <a:endParaRPr kumimoji="1" lang="ja-JP" altLang="en-US"/>
           </a:p>
@@ -1473,7 +1473,7 @@
           <a:p>
             <a:fld id="{B8625E62-B904-4691-B75E-EC1C32885285}" type="datetime1">
               <a:rPr kumimoji="1" lang="ja-JP" altLang="en-US" smtClean="0"/>
-              <a:t>2022/10/18</a:t>
+              <a:t>2022/10/22</a:t>
             </a:fld>
             <a:endParaRPr kumimoji="1" lang="ja-JP" altLang="en-US"/>
           </a:p>
@@ -1811,7 +1811,7 @@
           <a:p>
             <a:fld id="{A4C87007-2A40-4EFC-90A3-258EFA3C1001}" type="datetime1">
               <a:rPr kumimoji="1" lang="ja-JP" altLang="en-US" smtClean="0"/>
-              <a:t>2022/10/18</a:t>
+              <a:t>2022/10/22</a:t>
             </a:fld>
             <a:endParaRPr kumimoji="1" lang="ja-JP" altLang="en-US"/>
           </a:p>
@@ -2212,7 +2212,7 @@
           <a:p>
             <a:fld id="{0FE0D7FF-9203-4AA3-90FD-622674A14F90}" type="datetime1">
               <a:rPr kumimoji="1" lang="ja-JP" altLang="en-US" smtClean="0"/>
-              <a:t>2022/10/18</a:t>
+              <a:t>2022/10/22</a:t>
             </a:fld>
             <a:endParaRPr kumimoji="1" lang="ja-JP" altLang="en-US"/>
           </a:p>
@@ -2548,7 +2548,7 @@
           <a:p>
             <a:fld id="{D2D6E4D3-BEDB-4F35-876B-5B9AA41BFB5B}" type="datetime1">
               <a:rPr kumimoji="1" lang="ja-JP" altLang="en-US" smtClean="0"/>
-              <a:t>2022/10/18</a:t>
+              <a:t>2022/10/22</a:t>
             </a:fld>
             <a:endParaRPr kumimoji="1" lang="ja-JP" altLang="en-US"/>
           </a:p>
@@ -2868,7 +2868,7 @@
           <a:p>
             <a:fld id="{2ACD896E-FC14-4F25-BC47-18ABAEA9E1FE}" type="datetime1">
               <a:rPr kumimoji="1" lang="ja-JP" altLang="en-US" smtClean="0"/>
-              <a:t>2022/10/18</a:t>
+              <a:t>2022/10/22</a:t>
             </a:fld>
             <a:endParaRPr kumimoji="1" lang="ja-JP" altLang="en-US"/>
           </a:p>
@@ -3264,7 +3264,7 @@
           <a:p>
             <a:fld id="{54FC701B-2185-4987-B8E2-5507664B65F4}" type="datetime1">
               <a:rPr kumimoji="1" lang="ja-JP" altLang="en-US" smtClean="0"/>
-              <a:t>2022/10/18</a:t>
+              <a:t>2022/10/22</a:t>
             </a:fld>
             <a:endParaRPr kumimoji="1" lang="ja-JP" altLang="en-US"/>
           </a:p>
@@ -3553,7 +3553,7 @@
           <a:p>
             <a:fld id="{3FB4CDED-9617-418F-B546-D66B9BB6C35E}" type="datetime1">
               <a:rPr kumimoji="1" lang="ja-JP" altLang="en-US" smtClean="0"/>
-              <a:t>2022/10/18</a:t>
+              <a:t>2022/10/22</a:t>
             </a:fld>
             <a:endParaRPr kumimoji="1" lang="ja-JP" altLang="en-US"/>
           </a:p>
@@ -3847,7 +3847,7 @@
           <a:p>
             <a:fld id="{F5635D40-962A-46D7-8037-3F2900B5EB4D}" type="datetime1">
               <a:rPr kumimoji="1" lang="ja-JP" altLang="en-US" smtClean="0"/>
-              <a:t>2022/10/18</a:t>
+              <a:t>2022/10/22</a:t>
             </a:fld>
             <a:endParaRPr kumimoji="1" lang="ja-JP" altLang="en-US"/>
           </a:p>
@@ -4141,7 +4141,7 @@
           <a:p>
             <a:fld id="{741DA9A2-8356-4FFD-B66A-E38811049858}" type="datetime1">
               <a:rPr kumimoji="1" lang="ja-JP" altLang="en-US" smtClean="0"/>
-              <a:t>2022/10/18</a:t>
+              <a:t>2022/10/22</a:t>
             </a:fld>
             <a:endParaRPr kumimoji="1" lang="ja-JP" altLang="en-US"/>
           </a:p>
@@ -4470,7 +4470,7 @@
           <a:p>
             <a:fld id="{9DDE8989-88B8-4869-97D9-547531F13E13}" type="datetime1">
               <a:rPr kumimoji="1" lang="ja-JP" altLang="en-US" smtClean="0"/>
-              <a:t>2022/10/18</a:t>
+              <a:t>2022/10/22</a:t>
             </a:fld>
             <a:endParaRPr kumimoji="1" lang="ja-JP" altLang="en-US"/>
           </a:p>
@@ -4857,7 +4857,7 @@
           <a:p>
             <a:fld id="{81EC4031-B949-4300-AB3E-1551426E8631}" type="datetime1">
               <a:rPr kumimoji="1" lang="ja-JP" altLang="en-US" smtClean="0"/>
-              <a:t>2022/10/18</a:t>
+              <a:t>2022/10/22</a:t>
             </a:fld>
             <a:endParaRPr kumimoji="1" lang="ja-JP" altLang="en-US"/>
           </a:p>
@@ -5378,7 +5378,7 @@
           <a:p>
             <a:fld id="{F39E755E-A59D-4634-B604-E9BB568B1156}" type="datetime1">
               <a:rPr kumimoji="1" lang="ja-JP" altLang="en-US" smtClean="0"/>
-              <a:t>2022/10/18</a:t>
+              <a:t>2022/10/22</a:t>
             </a:fld>
             <a:endParaRPr kumimoji="1" lang="ja-JP" altLang="en-US"/>
           </a:p>
@@ -5583,7 +5583,7 @@
           <a:p>
             <a:fld id="{61DA38B3-7601-4256-ABFE-386B92B0EDB5}" type="datetime1">
               <a:rPr kumimoji="1" lang="ja-JP" altLang="en-US" smtClean="0"/>
-              <a:t>2022/10/18</a:t>
+              <a:t>2022/10/22</a:t>
             </a:fld>
             <a:endParaRPr kumimoji="1" lang="ja-JP" altLang="en-US"/>
           </a:p>
@@ -5760,7 +5760,7 @@
           <a:p>
             <a:fld id="{5A28ED6D-8A94-4DBA-8EF2-284D1A467CE8}" type="datetime1">
               <a:rPr kumimoji="1" lang="ja-JP" altLang="en-US" smtClean="0"/>
-              <a:t>2022/10/18</a:t>
+              <a:t>2022/10/22</a:t>
             </a:fld>
             <a:endParaRPr kumimoji="1" lang="ja-JP" altLang="en-US"/>
           </a:p>
@@ -6125,7 +6125,7 @@
           <a:p>
             <a:fld id="{B27B0317-28AF-43C5-8944-AADFA89E0149}" type="datetime1">
               <a:rPr kumimoji="1" lang="ja-JP" altLang="en-US" smtClean="0"/>
-              <a:t>2022/10/18</a:t>
+              <a:t>2022/10/22</a:t>
             </a:fld>
             <a:endParaRPr kumimoji="1" lang="ja-JP" altLang="en-US"/>
           </a:p>
@@ -6470,7 +6470,7 @@
           <a:p>
             <a:fld id="{A78D023C-C4FA-4CE8-B5BE-6798898EE377}" type="datetime1">
               <a:rPr kumimoji="1" lang="ja-JP" altLang="en-US" smtClean="0"/>
-              <a:t>2022/10/18</a:t>
+              <a:t>2022/10/22</a:t>
             </a:fld>
             <a:endParaRPr kumimoji="1" lang="ja-JP" altLang="en-US"/>
           </a:p>
@@ -8619,7 +8619,7 @@
           <a:p>
             <a:fld id="{99567159-F4A8-4352-915B-DDBEFEF4A4D6}" type="datetime1">
               <a:rPr kumimoji="1" lang="ja-JP" altLang="en-US" smtClean="0"/>
-              <a:t>2022/10/18</a:t>
+              <a:t>2022/10/22</a:t>
             </a:fld>
             <a:endParaRPr kumimoji="1" lang="ja-JP" altLang="en-US"/>
           </a:p>
@@ -16419,17 +16419,40 @@
           <a:lstStyle/>
           <a:p>
             <a:r>
-              <a:rPr kumimoji="1" lang="en-US" altLang="ja-JP" dirty="0" err="1"/>
+              <a:rPr kumimoji="1" lang="en-US" altLang="ja-JP" sz="1600" dirty="0" err="1"/>
               <a:t>MAmidiMEmo</a:t>
             </a:r>
             <a:r>
-              <a:rPr kumimoji="1" lang="en-US" altLang="ja-JP" dirty="0"/>
-              <a:t> can drive real MSX machine chips if you use FTDI2xx(232R, 232H and so on). Currently supports NTSC MSX for AY-3-8910 and OPLL and SCC+ and OPL3. </a:t>
-            </a:r>
-            <a:r>
-              <a:rPr kumimoji="1" lang="en-US" altLang="ja-JP" b="1" dirty="0"/>
+              <a:rPr kumimoji="1" lang="en-US" altLang="ja-JP" sz="1600" dirty="0"/>
+              <a:t> can drive real MSX machine chips if you use FTDI2xx(232R, 232H and so on). Currently supports NTSC MSX for AY-3-8910 and OPLL and SCC+ and OPL3.</a:t>
+            </a:r>
+            <a:br>
+              <a:rPr kumimoji="1" lang="en-US" altLang="ja-JP" sz="1600" dirty="0"/>
+            </a:br>
+            <a:r>
+              <a:rPr kumimoji="1" lang="en-US" altLang="ja-JP" sz="1400" b="1" dirty="0"/>
               <a:t>NOTE: Be sure to select proper SLOT# for SCC to use SCC.</a:t>
             </a:r>
+            <a:br>
+              <a:rPr kumimoji="1" lang="en-US" altLang="ja-JP" sz="1400" b="1" dirty="0"/>
+            </a:br>
+            <a:r>
+              <a:rPr kumimoji="1" lang="en-US" altLang="ja-JP" sz="1400" b="1" dirty="0"/>
+              <a:t>           Set FTDI </a:t>
+            </a:r>
+            <a:r>
+              <a:rPr kumimoji="1" lang="en-US" altLang="ja-JP" sz="1400" b="1" dirty="0" err="1"/>
+              <a:t>clk</a:t>
+            </a:r>
+            <a:r>
+              <a:rPr kumimoji="1" lang="en-US" altLang="ja-JP" sz="1400" b="1" dirty="0"/>
+              <a:t> value to 17</a:t>
+            </a:r>
+            <a:r>
+              <a:rPr kumimoji="1" lang="en-US" altLang="ja-JP" sz="1400" b="1"/>
+              <a:t>~ for each chip.</a:t>
+            </a:r>
+            <a:endParaRPr kumimoji="1" lang="en-US" altLang="ja-JP" sz="1400" b="1" dirty="0"/>
           </a:p>
           <a:p>
             <a:r>

</xml_diff>

<commit_message>
Updated manual for FTDI dongle
</commit_message>
<xml_diff>
--- a/docs/MAmidiMEmo/Manual.pptx
+++ b/docs/MAmidiMEmo/Manual.pptx
@@ -230,7 +230,7 @@
           <a:p>
             <a:fld id="{581C28D8-13B6-41C3-9F5F-0284C569C6F1}" type="datetimeFigureOut">
               <a:rPr kumimoji="1" lang="ja-JP" altLang="en-US" smtClean="0"/>
-              <a:t>2022/10/22</a:t>
+              <a:t>2022/10/25</a:t>
             </a:fld>
             <a:endParaRPr kumimoji="1" lang="ja-JP" altLang="en-US"/>
           </a:p>
@@ -1473,7 +1473,7 @@
           <a:p>
             <a:fld id="{B8625E62-B904-4691-B75E-EC1C32885285}" type="datetime1">
               <a:rPr kumimoji="1" lang="ja-JP" altLang="en-US" smtClean="0"/>
-              <a:t>2022/10/22</a:t>
+              <a:t>2022/10/25</a:t>
             </a:fld>
             <a:endParaRPr kumimoji="1" lang="ja-JP" altLang="en-US"/>
           </a:p>
@@ -1811,7 +1811,7 @@
           <a:p>
             <a:fld id="{A4C87007-2A40-4EFC-90A3-258EFA3C1001}" type="datetime1">
               <a:rPr kumimoji="1" lang="ja-JP" altLang="en-US" smtClean="0"/>
-              <a:t>2022/10/22</a:t>
+              <a:t>2022/10/25</a:t>
             </a:fld>
             <a:endParaRPr kumimoji="1" lang="ja-JP" altLang="en-US"/>
           </a:p>
@@ -2212,7 +2212,7 @@
           <a:p>
             <a:fld id="{0FE0D7FF-9203-4AA3-90FD-622674A14F90}" type="datetime1">
               <a:rPr kumimoji="1" lang="ja-JP" altLang="en-US" smtClean="0"/>
-              <a:t>2022/10/22</a:t>
+              <a:t>2022/10/25</a:t>
             </a:fld>
             <a:endParaRPr kumimoji="1" lang="ja-JP" altLang="en-US"/>
           </a:p>
@@ -2548,7 +2548,7 @@
           <a:p>
             <a:fld id="{D2D6E4D3-BEDB-4F35-876B-5B9AA41BFB5B}" type="datetime1">
               <a:rPr kumimoji="1" lang="ja-JP" altLang="en-US" smtClean="0"/>
-              <a:t>2022/10/22</a:t>
+              <a:t>2022/10/25</a:t>
             </a:fld>
             <a:endParaRPr kumimoji="1" lang="ja-JP" altLang="en-US"/>
           </a:p>
@@ -2868,7 +2868,7 @@
           <a:p>
             <a:fld id="{2ACD896E-FC14-4F25-BC47-18ABAEA9E1FE}" type="datetime1">
               <a:rPr kumimoji="1" lang="ja-JP" altLang="en-US" smtClean="0"/>
-              <a:t>2022/10/22</a:t>
+              <a:t>2022/10/25</a:t>
             </a:fld>
             <a:endParaRPr kumimoji="1" lang="ja-JP" altLang="en-US"/>
           </a:p>
@@ -3264,7 +3264,7 @@
           <a:p>
             <a:fld id="{54FC701B-2185-4987-B8E2-5507664B65F4}" type="datetime1">
               <a:rPr kumimoji="1" lang="ja-JP" altLang="en-US" smtClean="0"/>
-              <a:t>2022/10/22</a:t>
+              <a:t>2022/10/25</a:t>
             </a:fld>
             <a:endParaRPr kumimoji="1" lang="ja-JP" altLang="en-US"/>
           </a:p>
@@ -3553,7 +3553,7 @@
           <a:p>
             <a:fld id="{3FB4CDED-9617-418F-B546-D66B9BB6C35E}" type="datetime1">
               <a:rPr kumimoji="1" lang="ja-JP" altLang="en-US" smtClean="0"/>
-              <a:t>2022/10/22</a:t>
+              <a:t>2022/10/25</a:t>
             </a:fld>
             <a:endParaRPr kumimoji="1" lang="ja-JP" altLang="en-US"/>
           </a:p>
@@ -3847,7 +3847,7 @@
           <a:p>
             <a:fld id="{F5635D40-962A-46D7-8037-3F2900B5EB4D}" type="datetime1">
               <a:rPr kumimoji="1" lang="ja-JP" altLang="en-US" smtClean="0"/>
-              <a:t>2022/10/22</a:t>
+              <a:t>2022/10/25</a:t>
             </a:fld>
             <a:endParaRPr kumimoji="1" lang="ja-JP" altLang="en-US"/>
           </a:p>
@@ -4141,7 +4141,7 @@
           <a:p>
             <a:fld id="{741DA9A2-8356-4FFD-B66A-E38811049858}" type="datetime1">
               <a:rPr kumimoji="1" lang="ja-JP" altLang="en-US" smtClean="0"/>
-              <a:t>2022/10/22</a:t>
+              <a:t>2022/10/25</a:t>
             </a:fld>
             <a:endParaRPr kumimoji="1" lang="ja-JP" altLang="en-US"/>
           </a:p>
@@ -4470,7 +4470,7 @@
           <a:p>
             <a:fld id="{9DDE8989-88B8-4869-97D9-547531F13E13}" type="datetime1">
               <a:rPr kumimoji="1" lang="ja-JP" altLang="en-US" smtClean="0"/>
-              <a:t>2022/10/22</a:t>
+              <a:t>2022/10/25</a:t>
             </a:fld>
             <a:endParaRPr kumimoji="1" lang="ja-JP" altLang="en-US"/>
           </a:p>
@@ -4857,7 +4857,7 @@
           <a:p>
             <a:fld id="{81EC4031-B949-4300-AB3E-1551426E8631}" type="datetime1">
               <a:rPr kumimoji="1" lang="ja-JP" altLang="en-US" smtClean="0"/>
-              <a:t>2022/10/22</a:t>
+              <a:t>2022/10/25</a:t>
             </a:fld>
             <a:endParaRPr kumimoji="1" lang="ja-JP" altLang="en-US"/>
           </a:p>
@@ -5378,7 +5378,7 @@
           <a:p>
             <a:fld id="{F39E755E-A59D-4634-B604-E9BB568B1156}" type="datetime1">
               <a:rPr kumimoji="1" lang="ja-JP" altLang="en-US" smtClean="0"/>
-              <a:t>2022/10/22</a:t>
+              <a:t>2022/10/25</a:t>
             </a:fld>
             <a:endParaRPr kumimoji="1" lang="ja-JP" altLang="en-US"/>
           </a:p>
@@ -5583,7 +5583,7 @@
           <a:p>
             <a:fld id="{61DA38B3-7601-4256-ABFE-386B92B0EDB5}" type="datetime1">
               <a:rPr kumimoji="1" lang="ja-JP" altLang="en-US" smtClean="0"/>
-              <a:t>2022/10/22</a:t>
+              <a:t>2022/10/25</a:t>
             </a:fld>
             <a:endParaRPr kumimoji="1" lang="ja-JP" altLang="en-US"/>
           </a:p>
@@ -5760,7 +5760,7 @@
           <a:p>
             <a:fld id="{5A28ED6D-8A94-4DBA-8EF2-284D1A467CE8}" type="datetime1">
               <a:rPr kumimoji="1" lang="ja-JP" altLang="en-US" smtClean="0"/>
-              <a:t>2022/10/22</a:t>
+              <a:t>2022/10/25</a:t>
             </a:fld>
             <a:endParaRPr kumimoji="1" lang="ja-JP" altLang="en-US"/>
           </a:p>
@@ -6125,7 +6125,7 @@
           <a:p>
             <a:fld id="{B27B0317-28AF-43C5-8944-AADFA89E0149}" type="datetime1">
               <a:rPr kumimoji="1" lang="ja-JP" altLang="en-US" smtClean="0"/>
-              <a:t>2022/10/22</a:t>
+              <a:t>2022/10/25</a:t>
             </a:fld>
             <a:endParaRPr kumimoji="1" lang="ja-JP" altLang="en-US"/>
           </a:p>
@@ -6470,7 +6470,7 @@
           <a:p>
             <a:fld id="{A78D023C-C4FA-4CE8-B5BE-6798898EE377}" type="datetime1">
               <a:rPr kumimoji="1" lang="ja-JP" altLang="en-US" smtClean="0"/>
-              <a:t>2022/10/22</a:t>
+              <a:t>2022/10/25</a:t>
             </a:fld>
             <a:endParaRPr kumimoji="1" lang="ja-JP" altLang="en-US"/>
           </a:p>
@@ -8619,7 +8619,7 @@
           <a:p>
             <a:fld id="{99567159-F4A8-4352-915B-DDBEFEF4A4D6}" type="datetime1">
               <a:rPr kumimoji="1" lang="ja-JP" altLang="en-US" smtClean="0"/>
-              <a:t>2022/10/22</a:t>
+              <a:t>2022/10/25</a:t>
             </a:fld>
             <a:endParaRPr kumimoji="1" lang="ja-JP" altLang="en-US"/>
           </a:p>
@@ -9212,8 +9212,8 @@
               <a:t>MAmidiMEmo</a:t>
             </a:r>
             <a:r>
-              <a:rPr lang="en-US" altLang="ja-JP" dirty="0"/>
-              <a:t> V4.3.0.0</a:t>
+              <a:rPr lang="en-US" altLang="ja-JP"/>
+              <a:t> V4.3.7.0</a:t>
             </a:r>
             <a:endParaRPr lang="ja-JP" altLang="en-US" dirty="0"/>
           </a:p>
@@ -13857,6 +13857,186 @@
           </a:p>
         </p:txBody>
       </p:sp>
+      <p:sp>
+        <p:nvSpPr>
+          <p:cNvPr id="6" name="正方形/長方形 5">
+            <a:extLst>
+              <a:ext uri="{FF2B5EF4-FFF2-40B4-BE49-F238E27FC236}">
+                <a16:creationId xmlns:a16="http://schemas.microsoft.com/office/drawing/2014/main" id="{34BCE510-9960-9602-2A0A-742A68C1C467}"/>
+              </a:ext>
+            </a:extLst>
+          </p:cNvPr>
+          <p:cNvSpPr/>
+          <p:nvPr/>
+        </p:nvSpPr>
+        <p:spPr>
+          <a:xfrm>
+            <a:off x="8859519" y="5970263"/>
+            <a:ext cx="739219" cy="799140"/>
+          </a:xfrm>
+          <a:prstGeom prst="rect">
+            <a:avLst/>
+          </a:prstGeom>
+          <a:solidFill>
+            <a:schemeClr val="bg1"/>
+          </a:solidFill>
+        </p:spPr>
+        <p:style>
+          <a:lnRef idx="2">
+            <a:schemeClr val="accent1">
+              <a:shade val="50000"/>
+            </a:schemeClr>
+          </a:lnRef>
+          <a:fillRef idx="1">
+            <a:schemeClr val="accent1"/>
+          </a:fillRef>
+          <a:effectRef idx="0">
+            <a:schemeClr val="accent1"/>
+          </a:effectRef>
+          <a:fontRef idx="minor">
+            <a:schemeClr val="lt1"/>
+          </a:fontRef>
+        </p:style>
+        <p:txBody>
+          <a:bodyPr rtlCol="0" anchor="ctr"/>
+          <a:lstStyle/>
+          <a:p>
+            <a:pPr algn="ctr"/>
+            <a:r>
+              <a:rPr kumimoji="1" lang="en-US" altLang="ja-JP" sz="1200" b="1" dirty="0">
+                <a:solidFill>
+                  <a:srgbClr val="FF0000"/>
+                </a:solidFill>
+              </a:rPr>
+              <a:t>Do</a:t>
+            </a:r>
+            <a:r>
+              <a:rPr kumimoji="1" lang="ja-JP" altLang="en-US" sz="1200" b="1" dirty="0">
+                <a:solidFill>
+                  <a:srgbClr val="FF0000"/>
+                </a:solidFill>
+              </a:rPr>
+              <a:t> </a:t>
+            </a:r>
+            <a:r>
+              <a:rPr kumimoji="1" lang="en-US" altLang="ja-JP" sz="1200" b="1" dirty="0">
+                <a:solidFill>
+                  <a:srgbClr val="FF0000"/>
+                </a:solidFill>
+              </a:rPr>
+              <a:t>not</a:t>
+            </a:r>
+          </a:p>
+          <a:p>
+            <a:pPr algn="ctr"/>
+            <a:r>
+              <a:rPr kumimoji="1" lang="en-US" altLang="ja-JP" sz="1200" b="1" dirty="0">
+                <a:solidFill>
+                  <a:srgbClr val="FF0000"/>
+                </a:solidFill>
+              </a:rPr>
+              <a:t>short any pin.</a:t>
+            </a:r>
+            <a:endParaRPr kumimoji="1" lang="ja-JP" altLang="en-US" sz="1200" b="1" dirty="0">
+              <a:solidFill>
+                <a:srgbClr val="FF0000"/>
+              </a:solidFill>
+            </a:endParaRPr>
+          </a:p>
+        </p:txBody>
+      </p:sp>
+      <p:cxnSp>
+        <p:nvCxnSpPr>
+          <p:cNvPr id="12" name="コネクタ: カギ線 11">
+            <a:extLst>
+              <a:ext uri="{FF2B5EF4-FFF2-40B4-BE49-F238E27FC236}">
+                <a16:creationId xmlns:a16="http://schemas.microsoft.com/office/drawing/2014/main" id="{3B3D4051-1209-65E9-AC38-083506123CC8}"/>
+              </a:ext>
+            </a:extLst>
+          </p:cNvPr>
+          <p:cNvCxnSpPr>
+            <a:cxnSpLocks/>
+          </p:cNvCxnSpPr>
+          <p:nvPr/>
+        </p:nvCxnSpPr>
+        <p:spPr>
+          <a:xfrm flipV="1">
+            <a:off x="6223076" y="4938648"/>
+            <a:ext cx="1692199" cy="802260"/>
+          </a:xfrm>
+          <a:prstGeom prst="bentConnector3">
+            <a:avLst>
+              <a:gd name="adj1" fmla="val 50000"/>
+            </a:avLst>
+          </a:prstGeom>
+          <a:ln>
+            <a:solidFill>
+              <a:srgbClr val="C00000"/>
+            </a:solidFill>
+            <a:tailEnd type="triangle"/>
+          </a:ln>
+        </p:spPr>
+        <p:style>
+          <a:lnRef idx="3">
+            <a:schemeClr val="accent1"/>
+          </a:lnRef>
+          <a:fillRef idx="0">
+            <a:schemeClr val="accent1"/>
+          </a:fillRef>
+          <a:effectRef idx="2">
+            <a:schemeClr val="accent1"/>
+          </a:effectRef>
+          <a:fontRef idx="minor">
+            <a:schemeClr val="tx1"/>
+          </a:fontRef>
+        </p:style>
+      </p:cxnSp>
+      <p:cxnSp>
+        <p:nvCxnSpPr>
+          <p:cNvPr id="15" name="コネクタ: カギ線 14">
+            <a:extLst>
+              <a:ext uri="{FF2B5EF4-FFF2-40B4-BE49-F238E27FC236}">
+                <a16:creationId xmlns:a16="http://schemas.microsoft.com/office/drawing/2014/main" id="{EA86D3C9-5EE5-0BD0-A8EF-45A5283D6E61}"/>
+              </a:ext>
+            </a:extLst>
+          </p:cNvPr>
+          <p:cNvCxnSpPr>
+            <a:cxnSpLocks/>
+          </p:cNvCxnSpPr>
+          <p:nvPr/>
+        </p:nvCxnSpPr>
+        <p:spPr>
+          <a:xfrm flipV="1">
+            <a:off x="4295238" y="4938648"/>
+            <a:ext cx="3620037" cy="802260"/>
+          </a:xfrm>
+          <a:prstGeom prst="bentConnector3">
+            <a:avLst>
+              <a:gd name="adj1" fmla="val 113"/>
+            </a:avLst>
+          </a:prstGeom>
+          <a:ln>
+            <a:solidFill>
+              <a:srgbClr val="C00000"/>
+            </a:solidFill>
+            <a:tailEnd type="triangle"/>
+          </a:ln>
+        </p:spPr>
+        <p:style>
+          <a:lnRef idx="3">
+            <a:schemeClr val="accent1"/>
+          </a:lnRef>
+          <a:fillRef idx="0">
+            <a:schemeClr val="accent1"/>
+          </a:fillRef>
+          <a:effectRef idx="2">
+            <a:schemeClr val="accent1"/>
+          </a:effectRef>
+          <a:fontRef idx="minor">
+            <a:schemeClr val="tx1"/>
+          </a:fontRef>
+        </p:style>
+      </p:cxnSp>
     </p:spTree>
     <p:extLst>
       <p:ext uri="{BB962C8B-B14F-4D97-AF65-F5344CB8AC3E}">
@@ -15184,6 +15364,140 @@
           </a:p>
         </p:txBody>
       </p:sp>
+      <p:sp>
+        <p:nvSpPr>
+          <p:cNvPr id="7" name="正方形/長方形 6">
+            <a:extLst>
+              <a:ext uri="{FF2B5EF4-FFF2-40B4-BE49-F238E27FC236}">
+                <a16:creationId xmlns:a16="http://schemas.microsoft.com/office/drawing/2014/main" id="{D89C349F-4065-D673-D8BC-EB93656D0D99}"/>
+              </a:ext>
+            </a:extLst>
+          </p:cNvPr>
+          <p:cNvSpPr/>
+          <p:nvPr/>
+        </p:nvSpPr>
+        <p:spPr>
+          <a:xfrm>
+            <a:off x="8859519" y="5970263"/>
+            <a:ext cx="739219" cy="799140"/>
+          </a:xfrm>
+          <a:prstGeom prst="rect">
+            <a:avLst/>
+          </a:prstGeom>
+          <a:solidFill>
+            <a:schemeClr val="bg1"/>
+          </a:solidFill>
+        </p:spPr>
+        <p:style>
+          <a:lnRef idx="2">
+            <a:schemeClr val="accent1">
+              <a:shade val="50000"/>
+            </a:schemeClr>
+          </a:lnRef>
+          <a:fillRef idx="1">
+            <a:schemeClr val="accent1"/>
+          </a:fillRef>
+          <a:effectRef idx="0">
+            <a:schemeClr val="accent1"/>
+          </a:effectRef>
+          <a:fontRef idx="minor">
+            <a:schemeClr val="lt1"/>
+          </a:fontRef>
+        </p:style>
+        <p:txBody>
+          <a:bodyPr rtlCol="0" anchor="ctr"/>
+          <a:lstStyle/>
+          <a:p>
+            <a:pPr algn="ctr"/>
+            <a:r>
+              <a:rPr kumimoji="1" lang="en-US" altLang="ja-JP" sz="1200" b="1" dirty="0">
+                <a:solidFill>
+                  <a:srgbClr val="FF0000"/>
+                </a:solidFill>
+              </a:rPr>
+              <a:t>Do</a:t>
+            </a:r>
+            <a:r>
+              <a:rPr kumimoji="1" lang="ja-JP" altLang="en-US" sz="1200" b="1" dirty="0">
+                <a:solidFill>
+                  <a:srgbClr val="FF0000"/>
+                </a:solidFill>
+              </a:rPr>
+              <a:t> </a:t>
+            </a:r>
+            <a:r>
+              <a:rPr kumimoji="1" lang="en-US" altLang="ja-JP" sz="1200" b="1" dirty="0">
+                <a:solidFill>
+                  <a:srgbClr val="FF0000"/>
+                </a:solidFill>
+              </a:rPr>
+              <a:t>not</a:t>
+            </a:r>
+          </a:p>
+          <a:p>
+            <a:pPr algn="ctr"/>
+            <a:r>
+              <a:rPr kumimoji="1" lang="en-US" altLang="ja-JP" sz="1200" b="1" dirty="0">
+                <a:solidFill>
+                  <a:srgbClr val="FF0000"/>
+                </a:solidFill>
+              </a:rPr>
+              <a:t>short any pin.</a:t>
+            </a:r>
+            <a:endParaRPr kumimoji="1" lang="ja-JP" altLang="en-US" sz="1200" b="1" dirty="0">
+              <a:solidFill>
+                <a:srgbClr val="FF0000"/>
+              </a:solidFill>
+            </a:endParaRPr>
+          </a:p>
+        </p:txBody>
+      </p:sp>
+      <p:cxnSp>
+        <p:nvCxnSpPr>
+          <p:cNvPr id="9" name="コネクタ: カギ線 8">
+            <a:extLst>
+              <a:ext uri="{FF2B5EF4-FFF2-40B4-BE49-F238E27FC236}">
+                <a16:creationId xmlns:a16="http://schemas.microsoft.com/office/drawing/2014/main" id="{FD8A892F-5ECD-16FC-4873-8CE94B2216AB}"/>
+              </a:ext>
+            </a:extLst>
+          </p:cNvPr>
+          <p:cNvCxnSpPr>
+            <a:cxnSpLocks/>
+          </p:cNvCxnSpPr>
+          <p:nvPr/>
+        </p:nvCxnSpPr>
+        <p:spPr>
+          <a:xfrm flipV="1">
+            <a:off x="5654040" y="4932251"/>
+            <a:ext cx="2261235" cy="740688"/>
+          </a:xfrm>
+          <a:prstGeom prst="bentConnector3">
+            <a:avLst>
+              <a:gd name="adj1" fmla="val 15291"/>
+            </a:avLst>
+          </a:prstGeom>
+          <a:ln>
+            <a:solidFill>
+              <a:srgbClr val="C00000"/>
+            </a:solidFill>
+            <a:tailEnd type="triangle"/>
+          </a:ln>
+        </p:spPr>
+        <p:style>
+          <a:lnRef idx="3">
+            <a:schemeClr val="dk1"/>
+          </a:lnRef>
+          <a:fillRef idx="0">
+            <a:schemeClr val="dk1"/>
+          </a:fillRef>
+          <a:effectRef idx="2">
+            <a:schemeClr val="dk1"/>
+          </a:effectRef>
+          <a:fontRef idx="minor">
+            <a:schemeClr val="tx1"/>
+          </a:fontRef>
+        </p:style>
+      </p:cxnSp>
     </p:spTree>
     <p:extLst>
       <p:ext uri="{BB962C8B-B14F-4D97-AF65-F5344CB8AC3E}">
@@ -16314,6 +16628,140 @@
           </a:p>
         </p:txBody>
       </p:sp>
+      <p:sp>
+        <p:nvSpPr>
+          <p:cNvPr id="5" name="正方形/長方形 4">
+            <a:extLst>
+              <a:ext uri="{FF2B5EF4-FFF2-40B4-BE49-F238E27FC236}">
+                <a16:creationId xmlns:a16="http://schemas.microsoft.com/office/drawing/2014/main" id="{FFEEC8C6-3D88-1C23-59F4-1CC52F4AB34A}"/>
+              </a:ext>
+            </a:extLst>
+          </p:cNvPr>
+          <p:cNvSpPr/>
+          <p:nvPr/>
+        </p:nvSpPr>
+        <p:spPr>
+          <a:xfrm>
+            <a:off x="8859519" y="5970263"/>
+            <a:ext cx="739219" cy="799140"/>
+          </a:xfrm>
+          <a:prstGeom prst="rect">
+            <a:avLst/>
+          </a:prstGeom>
+          <a:solidFill>
+            <a:schemeClr val="bg1"/>
+          </a:solidFill>
+        </p:spPr>
+        <p:style>
+          <a:lnRef idx="2">
+            <a:schemeClr val="accent1">
+              <a:shade val="50000"/>
+            </a:schemeClr>
+          </a:lnRef>
+          <a:fillRef idx="1">
+            <a:schemeClr val="accent1"/>
+          </a:fillRef>
+          <a:effectRef idx="0">
+            <a:schemeClr val="accent1"/>
+          </a:effectRef>
+          <a:fontRef idx="minor">
+            <a:schemeClr val="lt1"/>
+          </a:fontRef>
+        </p:style>
+        <p:txBody>
+          <a:bodyPr rtlCol="0" anchor="ctr"/>
+          <a:lstStyle/>
+          <a:p>
+            <a:pPr algn="ctr"/>
+            <a:r>
+              <a:rPr kumimoji="1" lang="en-US" altLang="ja-JP" sz="1200" b="1" dirty="0">
+                <a:solidFill>
+                  <a:srgbClr val="FF0000"/>
+                </a:solidFill>
+              </a:rPr>
+              <a:t>Do</a:t>
+            </a:r>
+            <a:r>
+              <a:rPr kumimoji="1" lang="ja-JP" altLang="en-US" sz="1200" b="1" dirty="0">
+                <a:solidFill>
+                  <a:srgbClr val="FF0000"/>
+                </a:solidFill>
+              </a:rPr>
+              <a:t> </a:t>
+            </a:r>
+            <a:r>
+              <a:rPr kumimoji="1" lang="en-US" altLang="ja-JP" sz="1200" b="1" dirty="0">
+                <a:solidFill>
+                  <a:srgbClr val="FF0000"/>
+                </a:solidFill>
+              </a:rPr>
+              <a:t>not</a:t>
+            </a:r>
+          </a:p>
+          <a:p>
+            <a:pPr algn="ctr"/>
+            <a:r>
+              <a:rPr kumimoji="1" lang="en-US" altLang="ja-JP" sz="1200" b="1" dirty="0">
+                <a:solidFill>
+                  <a:srgbClr val="FF0000"/>
+                </a:solidFill>
+              </a:rPr>
+              <a:t>short any pin.</a:t>
+            </a:r>
+            <a:endParaRPr kumimoji="1" lang="ja-JP" altLang="en-US" sz="1200" b="1" dirty="0">
+              <a:solidFill>
+                <a:srgbClr val="FF0000"/>
+              </a:solidFill>
+            </a:endParaRPr>
+          </a:p>
+        </p:txBody>
+      </p:sp>
+      <p:cxnSp>
+        <p:nvCxnSpPr>
+          <p:cNvPr id="8" name="コネクタ: カギ線 7">
+            <a:extLst>
+              <a:ext uri="{FF2B5EF4-FFF2-40B4-BE49-F238E27FC236}">
+                <a16:creationId xmlns:a16="http://schemas.microsoft.com/office/drawing/2014/main" id="{68C447F6-1F5C-7D93-7CE4-53B31D65D834}"/>
+              </a:ext>
+            </a:extLst>
+          </p:cNvPr>
+          <p:cNvCxnSpPr>
+            <a:cxnSpLocks/>
+          </p:cNvCxnSpPr>
+          <p:nvPr/>
+        </p:nvCxnSpPr>
+        <p:spPr>
+          <a:xfrm flipV="1">
+            <a:off x="5859780" y="5016834"/>
+            <a:ext cx="2049468" cy="868346"/>
+          </a:xfrm>
+          <a:prstGeom prst="bentConnector3">
+            <a:avLst>
+              <a:gd name="adj1" fmla="val 50000"/>
+            </a:avLst>
+          </a:prstGeom>
+          <a:ln>
+            <a:solidFill>
+              <a:srgbClr val="C00000"/>
+            </a:solidFill>
+            <a:tailEnd type="triangle"/>
+          </a:ln>
+        </p:spPr>
+        <p:style>
+          <a:lnRef idx="3">
+            <a:schemeClr val="dk1"/>
+          </a:lnRef>
+          <a:fillRef idx="0">
+            <a:schemeClr val="dk1"/>
+          </a:fillRef>
+          <a:effectRef idx="2">
+            <a:schemeClr val="dk1"/>
+          </a:effectRef>
+          <a:fontRef idx="minor">
+            <a:schemeClr val="tx1"/>
+          </a:fontRef>
+        </p:style>
+      </p:cxnSp>
     </p:spTree>
     <p:extLst>
       <p:ext uri="{BB962C8B-B14F-4D97-AF65-F5344CB8AC3E}">
@@ -16446,13 +16894,8 @@
             </a:r>
             <a:r>
               <a:rPr kumimoji="1" lang="en-US" altLang="ja-JP" sz="1400" b="1" dirty="0"/>
-              <a:t> value to 17</a:t>
-            </a:r>
-            <a:r>
-              <a:rPr kumimoji="1" lang="en-US" altLang="ja-JP" sz="1400" b="1"/>
-              <a:t>~ for each chip.</a:t>
-            </a:r>
-            <a:endParaRPr kumimoji="1" lang="en-US" altLang="ja-JP" sz="1400" b="1" dirty="0"/>
+              <a:t> value to 17~ for each chip.</a:t>
+            </a:r>
           </a:p>
           <a:p>
             <a:r>
@@ -16720,7 +17163,7 @@
         </p:blipFill>
         <p:spPr>
           <a:xfrm>
-            <a:off x="3745524" y="4958979"/>
+            <a:off x="3741653" y="4958978"/>
             <a:ext cx="4167595" cy="1427921"/>
           </a:xfrm>
           <a:prstGeom prst="rect">
@@ -17494,6 +17937,140 @@
           </a:p>
         </p:txBody>
       </p:sp>
+      <p:sp>
+        <p:nvSpPr>
+          <p:cNvPr id="7" name="正方形/長方形 6">
+            <a:extLst>
+              <a:ext uri="{FF2B5EF4-FFF2-40B4-BE49-F238E27FC236}">
+                <a16:creationId xmlns:a16="http://schemas.microsoft.com/office/drawing/2014/main" id="{38CB7F90-04B0-CD44-E7B7-9BDB808AA8E3}"/>
+              </a:ext>
+            </a:extLst>
+          </p:cNvPr>
+          <p:cNvSpPr/>
+          <p:nvPr/>
+        </p:nvSpPr>
+        <p:spPr>
+          <a:xfrm>
+            <a:off x="8859519" y="5970263"/>
+            <a:ext cx="739219" cy="799140"/>
+          </a:xfrm>
+          <a:prstGeom prst="rect">
+            <a:avLst/>
+          </a:prstGeom>
+          <a:solidFill>
+            <a:schemeClr val="bg1"/>
+          </a:solidFill>
+        </p:spPr>
+        <p:style>
+          <a:lnRef idx="2">
+            <a:schemeClr val="accent1">
+              <a:shade val="50000"/>
+            </a:schemeClr>
+          </a:lnRef>
+          <a:fillRef idx="1">
+            <a:schemeClr val="accent1"/>
+          </a:fillRef>
+          <a:effectRef idx="0">
+            <a:schemeClr val="accent1"/>
+          </a:effectRef>
+          <a:fontRef idx="minor">
+            <a:schemeClr val="lt1"/>
+          </a:fontRef>
+        </p:style>
+        <p:txBody>
+          <a:bodyPr rtlCol="0" anchor="ctr"/>
+          <a:lstStyle/>
+          <a:p>
+            <a:pPr algn="ctr"/>
+            <a:r>
+              <a:rPr kumimoji="1" lang="en-US" altLang="ja-JP" sz="1200" b="1" dirty="0">
+                <a:solidFill>
+                  <a:srgbClr val="FF0000"/>
+                </a:solidFill>
+              </a:rPr>
+              <a:t>Do</a:t>
+            </a:r>
+            <a:r>
+              <a:rPr kumimoji="1" lang="ja-JP" altLang="en-US" sz="1200" b="1" dirty="0">
+                <a:solidFill>
+                  <a:srgbClr val="FF0000"/>
+                </a:solidFill>
+              </a:rPr>
+              <a:t> </a:t>
+            </a:r>
+            <a:r>
+              <a:rPr kumimoji="1" lang="en-US" altLang="ja-JP" sz="1200" b="1" dirty="0">
+                <a:solidFill>
+                  <a:srgbClr val="FF0000"/>
+                </a:solidFill>
+              </a:rPr>
+              <a:t>not</a:t>
+            </a:r>
+          </a:p>
+          <a:p>
+            <a:pPr algn="ctr"/>
+            <a:r>
+              <a:rPr kumimoji="1" lang="en-US" altLang="ja-JP" sz="1200" b="1" dirty="0">
+                <a:solidFill>
+                  <a:srgbClr val="FF0000"/>
+                </a:solidFill>
+              </a:rPr>
+              <a:t>short any pin.</a:t>
+            </a:r>
+            <a:endParaRPr kumimoji="1" lang="ja-JP" altLang="en-US" sz="1200" b="1" dirty="0">
+              <a:solidFill>
+                <a:srgbClr val="FF0000"/>
+              </a:solidFill>
+            </a:endParaRPr>
+          </a:p>
+        </p:txBody>
+      </p:sp>
+      <p:cxnSp>
+        <p:nvCxnSpPr>
+          <p:cNvPr id="9" name="コネクタ: カギ線 8">
+            <a:extLst>
+              <a:ext uri="{FF2B5EF4-FFF2-40B4-BE49-F238E27FC236}">
+                <a16:creationId xmlns:a16="http://schemas.microsoft.com/office/drawing/2014/main" id="{48CDF055-0B57-1B92-F62F-D1F3FEEFF216}"/>
+              </a:ext>
+            </a:extLst>
+          </p:cNvPr>
+          <p:cNvCxnSpPr>
+            <a:cxnSpLocks/>
+          </p:cNvCxnSpPr>
+          <p:nvPr/>
+        </p:nvCxnSpPr>
+        <p:spPr>
+          <a:xfrm flipV="1">
+            <a:off x="5673090" y="4932251"/>
+            <a:ext cx="2242185" cy="736662"/>
+          </a:xfrm>
+          <a:prstGeom prst="bentConnector3">
+            <a:avLst>
+              <a:gd name="adj1" fmla="val 11427"/>
+            </a:avLst>
+          </a:prstGeom>
+          <a:ln>
+            <a:solidFill>
+              <a:srgbClr val="C00000"/>
+            </a:solidFill>
+            <a:tailEnd type="triangle"/>
+          </a:ln>
+        </p:spPr>
+        <p:style>
+          <a:lnRef idx="3">
+            <a:schemeClr val="dk1"/>
+          </a:lnRef>
+          <a:fillRef idx="0">
+            <a:schemeClr val="dk1"/>
+          </a:fillRef>
+          <a:effectRef idx="2">
+            <a:schemeClr val="dk1"/>
+          </a:effectRef>
+          <a:fontRef idx="minor">
+            <a:schemeClr val="tx1"/>
+          </a:fontRef>
+        </p:style>
+      </p:cxnSp>
     </p:spTree>
     <p:extLst>
       <p:ext uri="{BB962C8B-B14F-4D97-AF65-F5344CB8AC3E}">
@@ -18894,6 +19471,52 @@
           </a:p>
         </p:txBody>
       </p:sp>
+      <p:cxnSp>
+        <p:nvCxnSpPr>
+          <p:cNvPr id="8" name="コネクタ: カギ線 7">
+            <a:extLst>
+              <a:ext uri="{FF2B5EF4-FFF2-40B4-BE49-F238E27FC236}">
+                <a16:creationId xmlns:a16="http://schemas.microsoft.com/office/drawing/2014/main" id="{21F6E7FC-0B25-3EFF-DC49-EDF106521B9C}"/>
+              </a:ext>
+            </a:extLst>
+          </p:cNvPr>
+          <p:cNvCxnSpPr>
+            <a:cxnSpLocks/>
+          </p:cNvCxnSpPr>
+          <p:nvPr/>
+        </p:nvCxnSpPr>
+        <p:spPr>
+          <a:xfrm flipV="1">
+            <a:off x="5345430" y="4932251"/>
+            <a:ext cx="2569845" cy="854655"/>
+          </a:xfrm>
+          <a:prstGeom prst="bentConnector3">
+            <a:avLst>
+              <a:gd name="adj1" fmla="val 334"/>
+            </a:avLst>
+          </a:prstGeom>
+          <a:ln>
+            <a:solidFill>
+              <a:srgbClr val="C00000"/>
+            </a:solidFill>
+            <a:tailEnd type="triangle"/>
+          </a:ln>
+        </p:spPr>
+        <p:style>
+          <a:lnRef idx="3">
+            <a:schemeClr val="dk1"/>
+          </a:lnRef>
+          <a:fillRef idx="0">
+            <a:schemeClr val="dk1"/>
+          </a:fillRef>
+          <a:effectRef idx="2">
+            <a:schemeClr val="dk1"/>
+          </a:effectRef>
+          <a:fontRef idx="minor">
+            <a:schemeClr val="tx1"/>
+          </a:fontRef>
+        </p:style>
+      </p:cxnSp>
     </p:spTree>
     <p:extLst>
       <p:ext uri="{BB962C8B-B14F-4D97-AF65-F5344CB8AC3E}">

</xml_diff>

<commit_message>
4.4.0.0 Added RPC server feture. Your application can be integrated with the MAmidiMEmo. See the manual for details.
</commit_message>
<xml_diff>
--- a/docs/MAmidiMEmo/Manual.pptx
+++ b/docs/MAmidiMEmo/Manual.pptx
@@ -5,7 +5,7 @@
     <p:sldMasterId id="2147483678" r:id="rId1"/>
   </p:sldMasterIdLst>
   <p:notesMasterIdLst>
-    <p:notesMasterId r:id="rId36"/>
+    <p:notesMasterId r:id="rId37"/>
   </p:notesMasterIdLst>
   <p:sldIdLst>
     <p:sldId id="256" r:id="rId2"/>
@@ -42,6 +42,7 @@
     <p:sldId id="288" r:id="rId33"/>
     <p:sldId id="287" r:id="rId34"/>
     <p:sldId id="292" r:id="rId35"/>
+    <p:sldId id="293" r:id="rId36"/>
   </p:sldIdLst>
   <p:sldSz cx="12192000" cy="6858000"/>
   <p:notesSz cx="6858000" cy="9144000"/>
@@ -230,7 +231,7 @@
           <a:p>
             <a:fld id="{581C28D8-13B6-41C3-9F5F-0284C569C6F1}" type="datetimeFigureOut">
               <a:rPr kumimoji="1" lang="ja-JP" altLang="en-US" smtClean="0"/>
-              <a:t>2022/10/25</a:t>
+              <a:t>2022/11/7</a:t>
             </a:fld>
             <a:endParaRPr kumimoji="1" lang="ja-JP" altLang="en-US"/>
           </a:p>
@@ -613,6 +614,90 @@
 </p:notes>
 </file>
 
+<file path=ppt/notesSlides/notesSlide10.xml><?xml version="1.0" encoding="utf-8"?>
+<p:notes xmlns:a="http://schemas.openxmlformats.org/drawingml/2006/main" xmlns:r="http://schemas.openxmlformats.org/officeDocument/2006/relationships" xmlns:p="http://schemas.openxmlformats.org/presentationml/2006/main">
+  <p:cSld>
+    <p:spTree>
+      <p:nvGrpSpPr>
+        <p:cNvPr id="1" name=""/>
+        <p:cNvGrpSpPr/>
+        <p:nvPr/>
+      </p:nvGrpSpPr>
+      <p:grpSpPr>
+        <a:xfrm>
+          <a:off x="0" y="0"/>
+          <a:ext cx="0" cy="0"/>
+          <a:chOff x="0" y="0"/>
+          <a:chExt cx="0" cy="0"/>
+        </a:xfrm>
+      </p:grpSpPr>
+      <p:sp>
+        <p:nvSpPr>
+          <p:cNvPr id="2" name="スライド イメージ プレースホルダー 1"/>
+          <p:cNvSpPr>
+            <a:spLocks noGrp="1" noRot="1" noChangeAspect="1"/>
+          </p:cNvSpPr>
+          <p:nvPr>
+            <p:ph type="sldImg"/>
+          </p:nvPr>
+        </p:nvSpPr>
+        <p:spPr/>
+      </p:sp>
+      <p:sp>
+        <p:nvSpPr>
+          <p:cNvPr id="3" name="ノート プレースホルダー 2"/>
+          <p:cNvSpPr>
+            <a:spLocks noGrp="1"/>
+          </p:cNvSpPr>
+          <p:nvPr>
+            <p:ph type="body" idx="1"/>
+          </p:nvPr>
+        </p:nvSpPr>
+        <p:spPr/>
+        <p:txBody>
+          <a:bodyPr/>
+          <a:lstStyle/>
+          <a:p>
+            <a:endParaRPr kumimoji="1" lang="ja-JP" altLang="en-US" dirty="0"/>
+          </a:p>
+        </p:txBody>
+      </p:sp>
+      <p:sp>
+        <p:nvSpPr>
+          <p:cNvPr id="4" name="スライド番号プレースホルダー 3"/>
+          <p:cNvSpPr>
+            <a:spLocks noGrp="1"/>
+          </p:cNvSpPr>
+          <p:nvPr>
+            <p:ph type="sldNum" sz="quarter" idx="5"/>
+          </p:nvPr>
+        </p:nvSpPr>
+        <p:spPr/>
+        <p:txBody>
+          <a:bodyPr/>
+          <a:lstStyle/>
+          <a:p>
+            <a:fld id="{E8D2F5C4-CB40-44D3-9C89-5ECCD9AB4B5C}" type="slidenum">
+              <a:rPr kumimoji="1" lang="ja-JP" altLang="en-US" smtClean="0"/>
+              <a:t>35</a:t>
+            </a:fld>
+            <a:endParaRPr kumimoji="1" lang="ja-JP" altLang="en-US"/>
+          </a:p>
+        </p:txBody>
+      </p:sp>
+    </p:spTree>
+    <p:extLst>
+      <p:ext uri="{BB962C8B-B14F-4D97-AF65-F5344CB8AC3E}">
+        <p14:creationId xmlns:p14="http://schemas.microsoft.com/office/powerpoint/2010/main" val="3201007170"/>
+      </p:ext>
+    </p:extLst>
+  </p:cSld>
+  <p:clrMapOvr>
+    <a:masterClrMapping/>
+  </p:clrMapOvr>
+</p:notes>
+</file>
+
 <file path=ppt/notesSlides/notesSlide2.xml><?xml version="1.0" encoding="utf-8"?>
 <p:notes xmlns:a="http://schemas.openxmlformats.org/drawingml/2006/main" xmlns:r="http://schemas.openxmlformats.org/officeDocument/2006/relationships" xmlns:p="http://schemas.openxmlformats.org/presentationml/2006/main">
   <p:cSld>
@@ -1473,7 +1558,7 @@
           <a:p>
             <a:fld id="{B8625E62-B904-4691-B75E-EC1C32885285}" type="datetime1">
               <a:rPr kumimoji="1" lang="ja-JP" altLang="en-US" smtClean="0"/>
-              <a:t>2022/10/25</a:t>
+              <a:t>2022/11/7</a:t>
             </a:fld>
             <a:endParaRPr kumimoji="1" lang="ja-JP" altLang="en-US"/>
           </a:p>
@@ -1811,7 +1896,7 @@
           <a:p>
             <a:fld id="{A4C87007-2A40-4EFC-90A3-258EFA3C1001}" type="datetime1">
               <a:rPr kumimoji="1" lang="ja-JP" altLang="en-US" smtClean="0"/>
-              <a:t>2022/10/25</a:t>
+              <a:t>2022/11/7</a:t>
             </a:fld>
             <a:endParaRPr kumimoji="1" lang="ja-JP" altLang="en-US"/>
           </a:p>
@@ -2212,7 +2297,7 @@
           <a:p>
             <a:fld id="{0FE0D7FF-9203-4AA3-90FD-622674A14F90}" type="datetime1">
               <a:rPr kumimoji="1" lang="ja-JP" altLang="en-US" smtClean="0"/>
-              <a:t>2022/10/25</a:t>
+              <a:t>2022/11/7</a:t>
             </a:fld>
             <a:endParaRPr kumimoji="1" lang="ja-JP" altLang="en-US"/>
           </a:p>
@@ -2548,7 +2633,7 @@
           <a:p>
             <a:fld id="{D2D6E4D3-BEDB-4F35-876B-5B9AA41BFB5B}" type="datetime1">
               <a:rPr kumimoji="1" lang="ja-JP" altLang="en-US" smtClean="0"/>
-              <a:t>2022/10/25</a:t>
+              <a:t>2022/11/7</a:t>
             </a:fld>
             <a:endParaRPr kumimoji="1" lang="ja-JP" altLang="en-US"/>
           </a:p>
@@ -2868,7 +2953,7 @@
           <a:p>
             <a:fld id="{2ACD896E-FC14-4F25-BC47-18ABAEA9E1FE}" type="datetime1">
               <a:rPr kumimoji="1" lang="ja-JP" altLang="en-US" smtClean="0"/>
-              <a:t>2022/10/25</a:t>
+              <a:t>2022/11/7</a:t>
             </a:fld>
             <a:endParaRPr kumimoji="1" lang="ja-JP" altLang="en-US"/>
           </a:p>
@@ -3264,7 +3349,7 @@
           <a:p>
             <a:fld id="{54FC701B-2185-4987-B8E2-5507664B65F4}" type="datetime1">
               <a:rPr kumimoji="1" lang="ja-JP" altLang="en-US" smtClean="0"/>
-              <a:t>2022/10/25</a:t>
+              <a:t>2022/11/7</a:t>
             </a:fld>
             <a:endParaRPr kumimoji="1" lang="ja-JP" altLang="en-US"/>
           </a:p>
@@ -3553,7 +3638,7 @@
           <a:p>
             <a:fld id="{3FB4CDED-9617-418F-B546-D66B9BB6C35E}" type="datetime1">
               <a:rPr kumimoji="1" lang="ja-JP" altLang="en-US" smtClean="0"/>
-              <a:t>2022/10/25</a:t>
+              <a:t>2022/11/7</a:t>
             </a:fld>
             <a:endParaRPr kumimoji="1" lang="ja-JP" altLang="en-US"/>
           </a:p>
@@ -3847,7 +3932,7 @@
           <a:p>
             <a:fld id="{F5635D40-962A-46D7-8037-3F2900B5EB4D}" type="datetime1">
               <a:rPr kumimoji="1" lang="ja-JP" altLang="en-US" smtClean="0"/>
-              <a:t>2022/10/25</a:t>
+              <a:t>2022/11/7</a:t>
             </a:fld>
             <a:endParaRPr kumimoji="1" lang="ja-JP" altLang="en-US"/>
           </a:p>
@@ -4141,7 +4226,7 @@
           <a:p>
             <a:fld id="{741DA9A2-8356-4FFD-B66A-E38811049858}" type="datetime1">
               <a:rPr kumimoji="1" lang="ja-JP" altLang="en-US" smtClean="0"/>
-              <a:t>2022/10/25</a:t>
+              <a:t>2022/11/7</a:t>
             </a:fld>
             <a:endParaRPr kumimoji="1" lang="ja-JP" altLang="en-US"/>
           </a:p>
@@ -4470,7 +4555,7 @@
           <a:p>
             <a:fld id="{9DDE8989-88B8-4869-97D9-547531F13E13}" type="datetime1">
               <a:rPr kumimoji="1" lang="ja-JP" altLang="en-US" smtClean="0"/>
-              <a:t>2022/10/25</a:t>
+              <a:t>2022/11/7</a:t>
             </a:fld>
             <a:endParaRPr kumimoji="1" lang="ja-JP" altLang="en-US"/>
           </a:p>
@@ -4857,7 +4942,7 @@
           <a:p>
             <a:fld id="{81EC4031-B949-4300-AB3E-1551426E8631}" type="datetime1">
               <a:rPr kumimoji="1" lang="ja-JP" altLang="en-US" smtClean="0"/>
-              <a:t>2022/10/25</a:t>
+              <a:t>2022/11/7</a:t>
             </a:fld>
             <a:endParaRPr kumimoji="1" lang="ja-JP" altLang="en-US"/>
           </a:p>
@@ -5378,7 +5463,7 @@
           <a:p>
             <a:fld id="{F39E755E-A59D-4634-B604-E9BB568B1156}" type="datetime1">
               <a:rPr kumimoji="1" lang="ja-JP" altLang="en-US" smtClean="0"/>
-              <a:t>2022/10/25</a:t>
+              <a:t>2022/11/7</a:t>
             </a:fld>
             <a:endParaRPr kumimoji="1" lang="ja-JP" altLang="en-US"/>
           </a:p>
@@ -5583,7 +5668,7 @@
           <a:p>
             <a:fld id="{61DA38B3-7601-4256-ABFE-386B92B0EDB5}" type="datetime1">
               <a:rPr kumimoji="1" lang="ja-JP" altLang="en-US" smtClean="0"/>
-              <a:t>2022/10/25</a:t>
+              <a:t>2022/11/7</a:t>
             </a:fld>
             <a:endParaRPr kumimoji="1" lang="ja-JP" altLang="en-US"/>
           </a:p>
@@ -5760,7 +5845,7 @@
           <a:p>
             <a:fld id="{5A28ED6D-8A94-4DBA-8EF2-284D1A467CE8}" type="datetime1">
               <a:rPr kumimoji="1" lang="ja-JP" altLang="en-US" smtClean="0"/>
-              <a:t>2022/10/25</a:t>
+              <a:t>2022/11/7</a:t>
             </a:fld>
             <a:endParaRPr kumimoji="1" lang="ja-JP" altLang="en-US"/>
           </a:p>
@@ -6125,7 +6210,7 @@
           <a:p>
             <a:fld id="{B27B0317-28AF-43C5-8944-AADFA89E0149}" type="datetime1">
               <a:rPr kumimoji="1" lang="ja-JP" altLang="en-US" smtClean="0"/>
-              <a:t>2022/10/25</a:t>
+              <a:t>2022/11/7</a:t>
             </a:fld>
             <a:endParaRPr kumimoji="1" lang="ja-JP" altLang="en-US"/>
           </a:p>
@@ -6470,7 +6555,7 @@
           <a:p>
             <a:fld id="{A78D023C-C4FA-4CE8-B5BE-6798898EE377}" type="datetime1">
               <a:rPr kumimoji="1" lang="ja-JP" altLang="en-US" smtClean="0"/>
-              <a:t>2022/10/25</a:t>
+              <a:t>2022/11/7</a:t>
             </a:fld>
             <a:endParaRPr kumimoji="1" lang="ja-JP" altLang="en-US"/>
           </a:p>
@@ -8619,7 +8704,7 @@
           <a:p>
             <a:fld id="{99567159-F4A8-4352-915B-DDBEFEF4A4D6}" type="datetime1">
               <a:rPr kumimoji="1" lang="ja-JP" altLang="en-US" smtClean="0"/>
-              <a:t>2022/10/25</a:t>
+              <a:t>2022/11/7</a:t>
             </a:fld>
             <a:endParaRPr kumimoji="1" lang="ja-JP" altLang="en-US"/>
           </a:p>
@@ -9212,8 +9297,8 @@
               <a:t>MAmidiMEmo</a:t>
             </a:r>
             <a:r>
-              <a:rPr lang="en-US" altLang="ja-JP"/>
-              <a:t> V4.3.7.0</a:t>
+              <a:rPr lang="en-US" altLang="ja-JP" dirty="0"/>
+              <a:t> V4.4.0.0</a:t>
             </a:r>
             <a:endParaRPr lang="ja-JP" altLang="en-US" dirty="0"/>
           </a:p>
@@ -36581,6 +36666,1577 @@
 </p:sld>
 </file>
 
+<file path=ppt/slides/slide35.xml><?xml version="1.0" encoding="utf-8"?>
+<p:sld xmlns:a="http://schemas.openxmlformats.org/drawingml/2006/main" xmlns:r="http://schemas.openxmlformats.org/officeDocument/2006/relationships" xmlns:p="http://schemas.openxmlformats.org/presentationml/2006/main">
+  <p:cSld>
+    <p:spTree>
+      <p:nvGrpSpPr>
+        <p:cNvPr id="1" name=""/>
+        <p:cNvGrpSpPr/>
+        <p:nvPr/>
+      </p:nvGrpSpPr>
+      <p:grpSpPr>
+        <a:xfrm>
+          <a:off x="0" y="0"/>
+          <a:ext cx="0" cy="0"/>
+          <a:chOff x="0" y="0"/>
+          <a:chExt cx="0" cy="0"/>
+        </a:xfrm>
+      </p:grpSpPr>
+      <p:sp>
+        <p:nvSpPr>
+          <p:cNvPr id="2" name="タイトル 1">
+            <a:extLst>
+              <a:ext uri="{FF2B5EF4-FFF2-40B4-BE49-F238E27FC236}">
+                <a16:creationId xmlns:a16="http://schemas.microsoft.com/office/drawing/2014/main" id="{B90563AF-CB12-1C19-3F3F-220BA4F80796}"/>
+              </a:ext>
+            </a:extLst>
+          </p:cNvPr>
+          <p:cNvSpPr>
+            <a:spLocks noGrp="1"/>
+          </p:cNvSpPr>
+          <p:nvPr>
+            <p:ph type="title"/>
+          </p:nvPr>
+        </p:nvSpPr>
+        <p:spPr/>
+        <p:txBody>
+          <a:bodyPr/>
+          <a:lstStyle/>
+          <a:p>
+            <a:r>
+              <a:rPr kumimoji="1" lang="en-US" altLang="ja-JP" dirty="0"/>
+              <a:t>Integrate with </a:t>
+            </a:r>
+            <a:r>
+              <a:rPr kumimoji="1" lang="en-US" altLang="ja-JP" dirty="0" err="1"/>
+              <a:t>MAmidiMEmo</a:t>
+            </a:r>
+            <a:r>
+              <a:rPr kumimoji="1" lang="en-US" altLang="ja-JP" dirty="0"/>
+              <a:t> via RPC</a:t>
+            </a:r>
+            <a:endParaRPr kumimoji="1" lang="ja-JP" altLang="en-US" dirty="0"/>
+          </a:p>
+        </p:txBody>
+      </p:sp>
+      <p:sp>
+        <p:nvSpPr>
+          <p:cNvPr id="3" name="コンテンツ プレースホルダー 2">
+            <a:extLst>
+              <a:ext uri="{FF2B5EF4-FFF2-40B4-BE49-F238E27FC236}">
+                <a16:creationId xmlns:a16="http://schemas.microsoft.com/office/drawing/2014/main" id="{83FFC752-5850-5A1D-9AD0-4FE6462D4A33}"/>
+              </a:ext>
+            </a:extLst>
+          </p:cNvPr>
+          <p:cNvSpPr>
+            <a:spLocks noGrp="1"/>
+          </p:cNvSpPr>
+          <p:nvPr>
+            <p:ph idx="1"/>
+          </p:nvPr>
+        </p:nvSpPr>
+        <p:spPr>
+          <a:xfrm>
+            <a:off x="2589211" y="2133600"/>
+            <a:ext cx="9488819" cy="3777622"/>
+          </a:xfrm>
+        </p:spPr>
+        <p:txBody>
+          <a:bodyPr>
+            <a:normAutofit/>
+          </a:bodyPr>
+          <a:lstStyle/>
+          <a:p>
+            <a:r>
+              <a:rPr kumimoji="1" lang="en-US" altLang="ja-JP" dirty="0" err="1"/>
+              <a:t>MAmidiMEmo</a:t>
+            </a:r>
+            <a:r>
+              <a:rPr kumimoji="1" lang="en-US" altLang="ja-JP" dirty="0"/>
+              <a:t> will starts RPC server on port 30000 at startup.</a:t>
+            </a:r>
+            <a:br>
+              <a:rPr kumimoji="1" lang="en-US" altLang="ja-JP" dirty="0"/>
+            </a:br>
+            <a:r>
+              <a:rPr kumimoji="1" lang="en-US" altLang="ja-JP" dirty="0"/>
+              <a:t>So, your application can be integrate with the </a:t>
+            </a:r>
+            <a:r>
+              <a:rPr kumimoji="1" lang="en-US" altLang="ja-JP" dirty="0" err="1"/>
+              <a:t>MAmidiMEmo</a:t>
+            </a:r>
+            <a:r>
+              <a:rPr kumimoji="1" lang="en-US" altLang="ja-JP" dirty="0"/>
+              <a:t> via RPC.</a:t>
+            </a:r>
+            <a:br>
+              <a:rPr kumimoji="1" lang="en-US" altLang="ja-JP" dirty="0"/>
+            </a:br>
+            <a:r>
+              <a:rPr kumimoji="1" lang="en-US" altLang="ja-JP" dirty="0" err="1"/>
+              <a:t>MAmidiMEmo</a:t>
+            </a:r>
+            <a:r>
+              <a:rPr lang="en-US" altLang="ja-JP" dirty="0"/>
+              <a:t> provides the following API</a:t>
+            </a:r>
+            <a:br>
+              <a:rPr kumimoji="1" lang="en-US" altLang="ja-JP" dirty="0"/>
+            </a:br>
+            <a:br>
+              <a:rPr kumimoji="1" lang="en-US" altLang="ja-JP" dirty="0"/>
+            </a:br>
+            <a:r>
+              <a:rPr lang="en-US" altLang="ja-JP" sz="1200" dirty="0">
+                <a:solidFill>
+                  <a:srgbClr val="000000"/>
+                </a:solidFill>
+                <a:latin typeface="ＭＳ ゴシック" panose="020B0609070205080204" pitchFamily="49" charset="-128"/>
+                <a:ea typeface="ＭＳ ゴシック" panose="020B0609070205080204" pitchFamily="49" charset="-128"/>
+              </a:rPr>
+              <a:t>//Write the value to the address to the specific chip</a:t>
+            </a:r>
+            <a:br>
+              <a:rPr kumimoji="1" lang="en-US" altLang="ja-JP" dirty="0"/>
+            </a:br>
+            <a:r>
+              <a:rPr lang="en-US" altLang="ja-JP" sz="1200" dirty="0">
+                <a:solidFill>
+                  <a:srgbClr val="000000"/>
+                </a:solidFill>
+                <a:latin typeface="ＭＳ ゴシック" panose="020B0609070205080204" pitchFamily="49" charset="-128"/>
+                <a:ea typeface="ＭＳ ゴシック" panose="020B0609070205080204" pitchFamily="49" charset="-128"/>
+              </a:rPr>
+              <a:t>void </a:t>
+            </a:r>
+            <a:r>
+              <a:rPr lang="en-US" altLang="ja-JP" sz="1200" dirty="0" err="1">
+                <a:solidFill>
+                  <a:srgbClr val="000000"/>
+                </a:solidFill>
+                <a:latin typeface="ＭＳ ゴシック" panose="020B0609070205080204" pitchFamily="49" charset="-128"/>
+                <a:ea typeface="ＭＳ ゴシック" panose="020B0609070205080204" pitchFamily="49" charset="-128"/>
+              </a:rPr>
+              <a:t>DirectAccessToChip</a:t>
+            </a:r>
+            <a:r>
+              <a:rPr lang="en-US" altLang="ja-JP" sz="1200" dirty="0">
+                <a:solidFill>
+                  <a:srgbClr val="000000"/>
+                </a:solidFill>
+                <a:latin typeface="ＭＳ ゴシック" panose="020B0609070205080204" pitchFamily="49" charset="-128"/>
+                <a:ea typeface="ＭＳ ゴシック" panose="020B0609070205080204" pitchFamily="49" charset="-128"/>
+              </a:rPr>
+              <a:t>(</a:t>
+            </a:r>
+            <a:r>
+              <a:rPr lang="en-US" altLang="ja-JP" sz="1200" dirty="0">
+                <a:solidFill>
+                  <a:srgbClr val="0000FF"/>
+                </a:solidFill>
+                <a:latin typeface="ＭＳ ゴシック" panose="020B0609070205080204" pitchFamily="49" charset="-128"/>
+                <a:ea typeface="ＭＳ ゴシック" panose="020B0609070205080204" pitchFamily="49" charset="-128"/>
+              </a:rPr>
+              <a:t>unsigned</a:t>
+            </a:r>
+            <a:r>
+              <a:rPr lang="en-US" altLang="ja-JP" sz="1200" dirty="0">
+                <a:solidFill>
+                  <a:srgbClr val="000000"/>
+                </a:solidFill>
+                <a:latin typeface="ＭＳ ゴシック" panose="020B0609070205080204" pitchFamily="49" charset="-128"/>
+                <a:ea typeface="ＭＳ ゴシック" panose="020B0609070205080204" pitchFamily="49" charset="-128"/>
+              </a:rPr>
+              <a:t> </a:t>
+            </a:r>
+            <a:r>
+              <a:rPr lang="en-US" altLang="ja-JP" sz="1200" dirty="0">
+                <a:solidFill>
+                  <a:srgbClr val="0000FF"/>
+                </a:solidFill>
+                <a:latin typeface="ＭＳ ゴシック" panose="020B0609070205080204" pitchFamily="49" charset="-128"/>
+                <a:ea typeface="ＭＳ ゴシック" panose="020B0609070205080204" pitchFamily="49" charset="-128"/>
+              </a:rPr>
+              <a:t>char</a:t>
+            </a:r>
+            <a:r>
+              <a:rPr lang="en-US" altLang="ja-JP" sz="1200" dirty="0">
+                <a:solidFill>
+                  <a:srgbClr val="000000"/>
+                </a:solidFill>
+                <a:latin typeface="ＭＳ ゴシック" panose="020B0609070205080204" pitchFamily="49" charset="-128"/>
+                <a:ea typeface="ＭＳ ゴシック" panose="020B0609070205080204" pitchFamily="49" charset="-128"/>
+              </a:rPr>
+              <a:t> </a:t>
+            </a:r>
+            <a:r>
+              <a:rPr lang="en-US" altLang="ja-JP" sz="1200" dirty="0" err="1">
+                <a:solidFill>
+                  <a:srgbClr val="808080"/>
+                </a:solidFill>
+                <a:latin typeface="ＭＳ ゴシック" panose="020B0609070205080204" pitchFamily="49" charset="-128"/>
+                <a:ea typeface="ＭＳ ゴシック" panose="020B0609070205080204" pitchFamily="49" charset="-128"/>
+              </a:rPr>
+              <a:t>DeviceID</a:t>
+            </a:r>
+            <a:r>
+              <a:rPr lang="en-US" altLang="ja-JP" sz="1200" dirty="0">
+                <a:solidFill>
+                  <a:srgbClr val="000000"/>
+                </a:solidFill>
+                <a:latin typeface="ＭＳ ゴシック" panose="020B0609070205080204" pitchFamily="49" charset="-128"/>
+                <a:ea typeface="ＭＳ ゴシック" panose="020B0609070205080204" pitchFamily="49" charset="-128"/>
+              </a:rPr>
+              <a:t>, </a:t>
+            </a:r>
+            <a:r>
+              <a:rPr lang="en-US" altLang="ja-JP" sz="1200" dirty="0">
+                <a:solidFill>
+                  <a:srgbClr val="0000FF"/>
+                </a:solidFill>
+                <a:latin typeface="ＭＳ ゴシック" panose="020B0609070205080204" pitchFamily="49" charset="-128"/>
+                <a:ea typeface="ＭＳ ゴシック" panose="020B0609070205080204" pitchFamily="49" charset="-128"/>
+              </a:rPr>
+              <a:t>unsigned</a:t>
+            </a:r>
+            <a:r>
+              <a:rPr lang="en-US" altLang="ja-JP" sz="1200" dirty="0">
+                <a:solidFill>
+                  <a:srgbClr val="000000"/>
+                </a:solidFill>
+                <a:latin typeface="ＭＳ ゴシック" panose="020B0609070205080204" pitchFamily="49" charset="-128"/>
+                <a:ea typeface="ＭＳ ゴシック" panose="020B0609070205080204" pitchFamily="49" charset="-128"/>
+              </a:rPr>
+              <a:t> </a:t>
+            </a:r>
+            <a:r>
+              <a:rPr lang="en-US" altLang="ja-JP" sz="1200" dirty="0">
+                <a:solidFill>
+                  <a:srgbClr val="0000FF"/>
+                </a:solidFill>
+                <a:latin typeface="ＭＳ ゴシック" panose="020B0609070205080204" pitchFamily="49" charset="-128"/>
+                <a:ea typeface="ＭＳ ゴシック" panose="020B0609070205080204" pitchFamily="49" charset="-128"/>
+              </a:rPr>
+              <a:t>char</a:t>
+            </a:r>
+            <a:r>
+              <a:rPr lang="en-US" altLang="ja-JP" sz="1200" dirty="0">
+                <a:solidFill>
+                  <a:srgbClr val="000000"/>
+                </a:solidFill>
+                <a:latin typeface="ＭＳ ゴシック" panose="020B0609070205080204" pitchFamily="49" charset="-128"/>
+                <a:ea typeface="ＭＳ ゴシック" panose="020B0609070205080204" pitchFamily="49" charset="-128"/>
+              </a:rPr>
+              <a:t> </a:t>
+            </a:r>
+            <a:r>
+              <a:rPr lang="en-US" altLang="ja-JP" sz="1200" dirty="0" err="1">
+                <a:solidFill>
+                  <a:srgbClr val="808080"/>
+                </a:solidFill>
+                <a:latin typeface="ＭＳ ゴシック" panose="020B0609070205080204" pitchFamily="49" charset="-128"/>
+                <a:ea typeface="ＭＳ ゴシック" panose="020B0609070205080204" pitchFamily="49" charset="-128"/>
+              </a:rPr>
+              <a:t>UnitNo</a:t>
+            </a:r>
+            <a:r>
+              <a:rPr lang="en-US" altLang="ja-JP" sz="1200" dirty="0">
+                <a:solidFill>
+                  <a:srgbClr val="000000"/>
+                </a:solidFill>
+                <a:latin typeface="ＭＳ ゴシック" panose="020B0609070205080204" pitchFamily="49" charset="-128"/>
+                <a:ea typeface="ＭＳ ゴシック" panose="020B0609070205080204" pitchFamily="49" charset="-128"/>
+              </a:rPr>
+              <a:t>, </a:t>
+            </a:r>
+            <a:r>
+              <a:rPr lang="en-US" altLang="ja-JP" sz="1200" dirty="0">
+                <a:solidFill>
+                  <a:srgbClr val="0000FF"/>
+                </a:solidFill>
+                <a:latin typeface="ＭＳ ゴシック" panose="020B0609070205080204" pitchFamily="49" charset="-128"/>
+                <a:ea typeface="ＭＳ ゴシック" panose="020B0609070205080204" pitchFamily="49" charset="-128"/>
+              </a:rPr>
+              <a:t>unsigned</a:t>
+            </a:r>
+            <a:r>
+              <a:rPr lang="en-US" altLang="ja-JP" sz="1200" dirty="0">
+                <a:solidFill>
+                  <a:srgbClr val="000000"/>
+                </a:solidFill>
+                <a:latin typeface="ＭＳ ゴシック" panose="020B0609070205080204" pitchFamily="49" charset="-128"/>
+                <a:ea typeface="ＭＳ ゴシック" panose="020B0609070205080204" pitchFamily="49" charset="-128"/>
+              </a:rPr>
+              <a:t> </a:t>
+            </a:r>
+            <a:r>
+              <a:rPr lang="en-US" altLang="ja-JP" sz="1200" dirty="0">
+                <a:solidFill>
+                  <a:srgbClr val="0000FF"/>
+                </a:solidFill>
+                <a:latin typeface="ＭＳ ゴシック" panose="020B0609070205080204" pitchFamily="49" charset="-128"/>
+                <a:ea typeface="ＭＳ ゴシック" panose="020B0609070205080204" pitchFamily="49" charset="-128"/>
+              </a:rPr>
+              <a:t>int</a:t>
+            </a:r>
+            <a:r>
+              <a:rPr lang="en-US" altLang="ja-JP" sz="1200" dirty="0">
+                <a:solidFill>
+                  <a:srgbClr val="000000"/>
+                </a:solidFill>
+                <a:latin typeface="ＭＳ ゴシック" panose="020B0609070205080204" pitchFamily="49" charset="-128"/>
+                <a:ea typeface="ＭＳ ゴシック" panose="020B0609070205080204" pitchFamily="49" charset="-128"/>
+              </a:rPr>
+              <a:t> </a:t>
+            </a:r>
+            <a:r>
+              <a:rPr lang="en-US" altLang="ja-JP" sz="1200" dirty="0">
+                <a:solidFill>
+                  <a:srgbClr val="808080"/>
+                </a:solidFill>
+                <a:latin typeface="ＭＳ ゴシック" panose="020B0609070205080204" pitchFamily="49" charset="-128"/>
+                <a:ea typeface="ＭＳ ゴシック" panose="020B0609070205080204" pitchFamily="49" charset="-128"/>
+              </a:rPr>
+              <a:t>address</a:t>
+            </a:r>
+            <a:r>
+              <a:rPr lang="en-US" altLang="ja-JP" sz="1200" dirty="0">
+                <a:solidFill>
+                  <a:srgbClr val="000000"/>
+                </a:solidFill>
+                <a:latin typeface="ＭＳ ゴシック" panose="020B0609070205080204" pitchFamily="49" charset="-128"/>
+                <a:ea typeface="ＭＳ ゴシック" panose="020B0609070205080204" pitchFamily="49" charset="-128"/>
+              </a:rPr>
+              <a:t>, </a:t>
+            </a:r>
+            <a:r>
+              <a:rPr lang="en-US" altLang="ja-JP" sz="1200" dirty="0">
+                <a:solidFill>
+                  <a:srgbClr val="0000FF"/>
+                </a:solidFill>
+                <a:latin typeface="ＭＳ ゴシック" panose="020B0609070205080204" pitchFamily="49" charset="-128"/>
+                <a:ea typeface="ＭＳ ゴシック" panose="020B0609070205080204" pitchFamily="49" charset="-128"/>
+              </a:rPr>
+              <a:t>unsigned</a:t>
+            </a:r>
+            <a:r>
+              <a:rPr lang="en-US" altLang="ja-JP" sz="1200" dirty="0">
+                <a:solidFill>
+                  <a:srgbClr val="000000"/>
+                </a:solidFill>
+                <a:latin typeface="ＭＳ ゴシック" panose="020B0609070205080204" pitchFamily="49" charset="-128"/>
+                <a:ea typeface="ＭＳ ゴシック" panose="020B0609070205080204" pitchFamily="49" charset="-128"/>
+              </a:rPr>
+              <a:t> </a:t>
+            </a:r>
+            <a:r>
+              <a:rPr lang="en-US" altLang="ja-JP" sz="1200" dirty="0">
+                <a:solidFill>
+                  <a:srgbClr val="0000FF"/>
+                </a:solidFill>
+                <a:latin typeface="ＭＳ ゴシック" panose="020B0609070205080204" pitchFamily="49" charset="-128"/>
+                <a:ea typeface="ＭＳ ゴシック" panose="020B0609070205080204" pitchFamily="49" charset="-128"/>
+              </a:rPr>
+              <a:t>int</a:t>
+            </a:r>
+            <a:r>
+              <a:rPr lang="en-US" altLang="ja-JP" sz="1200" dirty="0">
+                <a:solidFill>
+                  <a:srgbClr val="000000"/>
+                </a:solidFill>
+                <a:latin typeface="ＭＳ ゴシック" panose="020B0609070205080204" pitchFamily="49" charset="-128"/>
+                <a:ea typeface="ＭＳ ゴシック" panose="020B0609070205080204" pitchFamily="49" charset="-128"/>
+              </a:rPr>
+              <a:t> </a:t>
+            </a:r>
+            <a:r>
+              <a:rPr lang="en-US" altLang="ja-JP" sz="1200" dirty="0">
+                <a:solidFill>
+                  <a:srgbClr val="808080"/>
+                </a:solidFill>
+                <a:latin typeface="ＭＳ ゴシック" panose="020B0609070205080204" pitchFamily="49" charset="-128"/>
+                <a:ea typeface="ＭＳ ゴシック" panose="020B0609070205080204" pitchFamily="49" charset="-128"/>
+              </a:rPr>
+              <a:t>data</a:t>
+            </a:r>
+            <a:r>
+              <a:rPr lang="en-US" altLang="ja-JP" sz="1200" dirty="0">
+                <a:solidFill>
+                  <a:srgbClr val="000000"/>
+                </a:solidFill>
+                <a:latin typeface="ＭＳ ゴシック" panose="020B0609070205080204" pitchFamily="49" charset="-128"/>
+                <a:ea typeface="ＭＳ ゴシック" panose="020B0609070205080204" pitchFamily="49" charset="-128"/>
+              </a:rPr>
+              <a:t>)</a:t>
+            </a:r>
+            <a:br>
+              <a:rPr lang="en-US" altLang="ja-JP" sz="1800" dirty="0">
+                <a:solidFill>
+                  <a:srgbClr val="000000"/>
+                </a:solidFill>
+                <a:latin typeface="ＭＳ ゴシック" panose="020B0609070205080204" pitchFamily="49" charset="-128"/>
+                <a:ea typeface="ＭＳ ゴシック" panose="020B0609070205080204" pitchFamily="49" charset="-128"/>
+              </a:rPr>
+            </a:br>
+            <a:br>
+              <a:rPr kumimoji="1" lang="en-US" altLang="ja-JP" dirty="0"/>
+            </a:br>
+            <a:r>
+              <a:rPr kumimoji="1" lang="en-US" altLang="ja-JP" sz="1200" dirty="0"/>
+              <a:t>* You can confirm the </a:t>
+            </a:r>
+            <a:r>
+              <a:rPr lang="en-US" altLang="ja-JP" sz="1200" dirty="0" err="1"/>
+              <a:t>DeviceID</a:t>
+            </a:r>
+            <a:r>
+              <a:rPr lang="en-US" altLang="ja-JP" sz="1200" dirty="0"/>
+              <a:t> and </a:t>
+            </a:r>
+            <a:r>
+              <a:rPr lang="en-US" altLang="ja-JP" sz="1200" dirty="0" err="1"/>
+              <a:t>UnitNumber</a:t>
+            </a:r>
+            <a:r>
+              <a:rPr lang="en-US" altLang="ja-JP" sz="1200" dirty="0"/>
+              <a:t> from the property.</a:t>
+            </a:r>
+            <a:br>
+              <a:rPr lang="en-US" altLang="ja-JP" sz="1200" dirty="0"/>
+            </a:br>
+            <a:r>
+              <a:rPr kumimoji="1" lang="en-US" altLang="ja-JP" sz="1200" dirty="0"/>
+              <a:t>* Currently, OPLL(ID9), SCC(ID7), AY8910(ID11) chips are supported.</a:t>
+            </a:r>
+            <a:br>
+              <a:rPr kumimoji="1" lang="en-US" altLang="ja-JP" sz="1200" dirty="0"/>
+            </a:br>
+            <a:r>
+              <a:rPr kumimoji="1" lang="en-US" altLang="ja-JP" sz="1200" dirty="0"/>
+              <a:t>* If you want to use SCC</a:t>
+            </a:r>
+            <a:r>
+              <a:rPr kumimoji="1" lang="en-US" altLang="ja-JP" sz="1200" b="1" dirty="0"/>
+              <a:t>1</a:t>
+            </a:r>
+            <a:r>
+              <a:rPr kumimoji="1" lang="en-US" altLang="ja-JP" sz="1200" dirty="0"/>
+              <a:t>(aka SCC</a:t>
+            </a:r>
+            <a:r>
+              <a:rPr kumimoji="1" lang="en-US" altLang="ja-JP" sz="1200" b="1" dirty="0"/>
+              <a:t>+</a:t>
+            </a:r>
+            <a:r>
+              <a:rPr kumimoji="1" lang="en-US" altLang="ja-JP" sz="1200" dirty="0"/>
+              <a:t>)</a:t>
+            </a:r>
+            <a:r>
+              <a:rPr lang="en-US" altLang="ja-JP" sz="1200" dirty="0"/>
+              <a:t>, you need to add 0x100 to the address.</a:t>
+            </a:r>
+          </a:p>
+          <a:p>
+            <a:r>
+              <a:rPr kumimoji="1" lang="en-US" altLang="ja-JP" sz="1600" dirty="0"/>
+              <a:t>Ex)</a:t>
+            </a:r>
+            <a:endParaRPr kumimoji="1" lang="en-US" altLang="ja-JP" dirty="0"/>
+          </a:p>
+          <a:p>
+            <a:endParaRPr kumimoji="1" lang="ja-JP" altLang="en-US" dirty="0"/>
+          </a:p>
+        </p:txBody>
+      </p:sp>
+      <p:sp>
+        <p:nvSpPr>
+          <p:cNvPr id="4" name="スライド番号プレースホルダー 3">
+            <a:extLst>
+              <a:ext uri="{FF2B5EF4-FFF2-40B4-BE49-F238E27FC236}">
+                <a16:creationId xmlns:a16="http://schemas.microsoft.com/office/drawing/2014/main" id="{ACA188B6-323B-7E0E-E37A-A55B67D6A54C}"/>
+              </a:ext>
+            </a:extLst>
+          </p:cNvPr>
+          <p:cNvSpPr>
+            <a:spLocks noGrp="1"/>
+          </p:cNvSpPr>
+          <p:nvPr>
+            <p:ph type="sldNum" sz="quarter" idx="12"/>
+          </p:nvPr>
+        </p:nvSpPr>
+        <p:spPr/>
+        <p:txBody>
+          <a:bodyPr/>
+          <a:lstStyle/>
+          <a:p>
+            <a:fld id="{E27E2812-4560-4165-A7C7-9C013F955547}" type="slidenum">
+              <a:rPr kumimoji="1" lang="ja-JP" altLang="en-US" smtClean="0"/>
+              <a:t>35</a:t>
+            </a:fld>
+            <a:endParaRPr kumimoji="1" lang="ja-JP" altLang="en-US"/>
+          </a:p>
+        </p:txBody>
+      </p:sp>
+      <p:sp>
+        <p:nvSpPr>
+          <p:cNvPr id="5" name="テキスト ボックス 4">
+            <a:extLst>
+              <a:ext uri="{FF2B5EF4-FFF2-40B4-BE49-F238E27FC236}">
+                <a16:creationId xmlns:a16="http://schemas.microsoft.com/office/drawing/2014/main" id="{74AD7425-2AE0-4068-AE32-DBE5AF646760}"/>
+              </a:ext>
+            </a:extLst>
+          </p:cNvPr>
+          <p:cNvSpPr txBox="1"/>
+          <p:nvPr/>
+        </p:nvSpPr>
+        <p:spPr>
+          <a:xfrm>
+            <a:off x="2583123" y="4866584"/>
+            <a:ext cx="9494907" cy="1938992"/>
+          </a:xfrm>
+          <a:prstGeom prst="rect">
+            <a:avLst/>
+          </a:prstGeom>
+          <a:solidFill>
+            <a:schemeClr val="bg1"/>
+          </a:solidFill>
+          <a:ln>
+            <a:solidFill>
+              <a:schemeClr val="tx1"/>
+            </a:solidFill>
+          </a:ln>
+        </p:spPr>
+        <p:txBody>
+          <a:bodyPr wrap="none" rtlCol="0">
+            <a:spAutoFit/>
+          </a:bodyPr>
+          <a:lstStyle/>
+          <a:p>
+            <a:r>
+              <a:rPr lang="en-US" altLang="ja-JP" sz="1200" dirty="0" err="1">
+                <a:solidFill>
+                  <a:srgbClr val="000000"/>
+                </a:solidFill>
+                <a:latin typeface="PixelMplus12" panose="020B0509020203020207" pitchFamily="49" charset="-128"/>
+                <a:ea typeface="PixelMplus12" panose="020B0509020203020207" pitchFamily="49" charset="-128"/>
+              </a:rPr>
+              <a:t>rpc</a:t>
+            </a:r>
+            <a:r>
+              <a:rPr lang="en-US" altLang="ja-JP" sz="1200" dirty="0">
+                <a:solidFill>
+                  <a:srgbClr val="000000"/>
+                </a:solidFill>
+                <a:latin typeface="PixelMplus12" panose="020B0509020203020207" pitchFamily="49" charset="-128"/>
+                <a:ea typeface="PixelMplus12" panose="020B0509020203020207" pitchFamily="49" charset="-128"/>
+              </a:rPr>
+              <a:t>::client* </a:t>
+            </a:r>
+            <a:r>
+              <a:rPr lang="en-US" altLang="ja-JP" sz="1200" dirty="0" err="1">
+                <a:solidFill>
+                  <a:srgbClr val="000000"/>
+                </a:solidFill>
+                <a:latin typeface="PixelMplus12" panose="020B0509020203020207" pitchFamily="49" charset="-128"/>
+                <a:ea typeface="PixelMplus12" panose="020B0509020203020207" pitchFamily="49" charset="-128"/>
+              </a:rPr>
+              <a:t>m_rpcClient</a:t>
+            </a:r>
+            <a:r>
+              <a:rPr lang="en-US" altLang="ja-JP" sz="1200" dirty="0">
+                <a:solidFill>
+                  <a:srgbClr val="000000"/>
+                </a:solidFill>
+                <a:latin typeface="PixelMplus12" panose="020B0509020203020207" pitchFamily="49" charset="-128"/>
+                <a:ea typeface="PixelMplus12" panose="020B0509020203020207" pitchFamily="49" charset="-128"/>
+              </a:rPr>
+              <a:t> = </a:t>
+            </a:r>
+            <a:r>
+              <a:rPr lang="en-US" altLang="ja-JP" sz="1200" dirty="0">
+                <a:solidFill>
+                  <a:srgbClr val="0000FF"/>
+                </a:solidFill>
+                <a:latin typeface="PixelMplus12" panose="020B0509020203020207" pitchFamily="49" charset="-128"/>
+                <a:ea typeface="PixelMplus12" panose="020B0509020203020207" pitchFamily="49" charset="-128"/>
+              </a:rPr>
+              <a:t>new</a:t>
+            </a:r>
+            <a:r>
+              <a:rPr lang="en-US" altLang="ja-JP" sz="1200" dirty="0">
+                <a:solidFill>
+                  <a:srgbClr val="000000"/>
+                </a:solidFill>
+                <a:latin typeface="PixelMplus12" panose="020B0509020203020207" pitchFamily="49" charset="-128"/>
+                <a:ea typeface="PixelMplus12" panose="020B0509020203020207" pitchFamily="49" charset="-128"/>
+              </a:rPr>
+              <a:t> </a:t>
+            </a:r>
+            <a:r>
+              <a:rPr lang="en-US" altLang="ja-JP" sz="1200" dirty="0" err="1">
+                <a:solidFill>
+                  <a:srgbClr val="000000"/>
+                </a:solidFill>
+                <a:latin typeface="PixelMplus12" panose="020B0509020203020207" pitchFamily="49" charset="-128"/>
+                <a:ea typeface="PixelMplus12" panose="020B0509020203020207" pitchFamily="49" charset="-128"/>
+              </a:rPr>
+              <a:t>rpc</a:t>
+            </a:r>
+            <a:r>
+              <a:rPr lang="en-US" altLang="ja-JP" sz="1200" dirty="0">
+                <a:solidFill>
+                  <a:srgbClr val="000000"/>
+                </a:solidFill>
+                <a:latin typeface="PixelMplus12" panose="020B0509020203020207" pitchFamily="49" charset="-128"/>
+                <a:ea typeface="PixelMplus12" panose="020B0509020203020207" pitchFamily="49" charset="-128"/>
+              </a:rPr>
+              <a:t>::client(</a:t>
+            </a:r>
+            <a:r>
+              <a:rPr lang="en-US" altLang="ja-JP" sz="1200" dirty="0">
+                <a:solidFill>
+                  <a:srgbClr val="A31515"/>
+                </a:solidFill>
+                <a:latin typeface="PixelMplus12" panose="020B0509020203020207" pitchFamily="49" charset="-128"/>
+                <a:ea typeface="PixelMplus12" panose="020B0509020203020207" pitchFamily="49" charset="-128"/>
+              </a:rPr>
+              <a:t>"localhost"</a:t>
+            </a:r>
+            <a:r>
+              <a:rPr lang="en-US" altLang="ja-JP" sz="1200" dirty="0">
+                <a:solidFill>
+                  <a:srgbClr val="000000"/>
+                </a:solidFill>
+                <a:latin typeface="PixelMplus12" panose="020B0509020203020207" pitchFamily="49" charset="-128"/>
+                <a:ea typeface="PixelMplus12" panose="020B0509020203020207" pitchFamily="49" charset="-128"/>
+              </a:rPr>
+              <a:t>, 30000);	//Open RPC port</a:t>
+            </a:r>
+          </a:p>
+          <a:p>
+            <a:r>
+              <a:rPr lang="en-US" altLang="ja-JP" sz="1200" dirty="0">
+                <a:solidFill>
+                  <a:srgbClr val="000000"/>
+                </a:solidFill>
+                <a:latin typeface="PixelMplus12" panose="020B0509020203020207" pitchFamily="49" charset="-128"/>
+                <a:ea typeface="PixelMplus12" panose="020B0509020203020207" pitchFamily="49" charset="-128"/>
+              </a:rPr>
+              <a:t>:::</a:t>
+            </a:r>
+          </a:p>
+          <a:p>
+            <a:r>
+              <a:rPr lang="en-US" altLang="ja-JP" sz="1200" dirty="0">
+                <a:solidFill>
+                  <a:srgbClr val="000000"/>
+                </a:solidFill>
+                <a:latin typeface="PixelMplus12" panose="020B0509020203020207" pitchFamily="49" charset="-128"/>
+                <a:ea typeface="PixelMplus12" panose="020B0509020203020207" pitchFamily="49" charset="-128"/>
+              </a:rPr>
+              <a:t>//Write SCC1 wave form</a:t>
+            </a:r>
+          </a:p>
+          <a:p>
+            <a:r>
+              <a:rPr lang="en-US" altLang="ja-JP" sz="1200" dirty="0" err="1">
+                <a:solidFill>
+                  <a:srgbClr val="000000"/>
+                </a:solidFill>
+                <a:latin typeface="PixelMplus12" panose="020B0509020203020207" pitchFamily="49" charset="-128"/>
+                <a:ea typeface="PixelMplus12" panose="020B0509020203020207" pitchFamily="49" charset="-128"/>
+              </a:rPr>
+              <a:t>m_rpcClient</a:t>
+            </a:r>
+            <a:r>
+              <a:rPr lang="en-US" altLang="ja-JP" sz="1200" dirty="0">
+                <a:solidFill>
+                  <a:srgbClr val="000000"/>
+                </a:solidFill>
+                <a:latin typeface="PixelMplus12" panose="020B0509020203020207" pitchFamily="49" charset="-128"/>
+                <a:ea typeface="PixelMplus12" panose="020B0509020203020207" pitchFamily="49" charset="-128"/>
+              </a:rPr>
+              <a:t>-&gt;</a:t>
+            </a:r>
+            <a:r>
+              <a:rPr lang="en-US" altLang="ja-JP" sz="1200" dirty="0" err="1">
+                <a:solidFill>
+                  <a:srgbClr val="000000"/>
+                </a:solidFill>
+                <a:latin typeface="PixelMplus12" panose="020B0509020203020207" pitchFamily="49" charset="-128"/>
+                <a:ea typeface="PixelMplus12" panose="020B0509020203020207" pitchFamily="49" charset="-128"/>
+              </a:rPr>
+              <a:t>async_call</a:t>
+            </a:r>
+            <a:r>
+              <a:rPr lang="en-US" altLang="ja-JP" sz="1200" dirty="0">
+                <a:solidFill>
+                  <a:srgbClr val="000000"/>
+                </a:solidFill>
+                <a:latin typeface="PixelMplus12" panose="020B0509020203020207" pitchFamily="49" charset="-128"/>
+                <a:ea typeface="PixelMplus12" panose="020B0509020203020207" pitchFamily="49" charset="-128"/>
+              </a:rPr>
+              <a:t>(</a:t>
+            </a:r>
+            <a:r>
+              <a:rPr lang="en-US" altLang="ja-JP" sz="1200" dirty="0">
+                <a:solidFill>
+                  <a:srgbClr val="A31515"/>
+                </a:solidFill>
+                <a:latin typeface="PixelMplus12" panose="020B0509020203020207" pitchFamily="49" charset="-128"/>
+                <a:ea typeface="PixelMplus12" panose="020B0509020203020207" pitchFamily="49" charset="-128"/>
+              </a:rPr>
+              <a:t>"</a:t>
+            </a:r>
+            <a:r>
+              <a:rPr lang="en-US" altLang="ja-JP" sz="1200" dirty="0" err="1">
+                <a:solidFill>
+                  <a:srgbClr val="A31515"/>
+                </a:solidFill>
+                <a:latin typeface="PixelMplus12" panose="020B0509020203020207" pitchFamily="49" charset="-128"/>
+                <a:ea typeface="PixelMplus12" panose="020B0509020203020207" pitchFamily="49" charset="-128"/>
+              </a:rPr>
+              <a:t>DirectAccessToChip</a:t>
+            </a:r>
+            <a:r>
+              <a:rPr lang="en-US" altLang="ja-JP" sz="1200" dirty="0">
+                <a:solidFill>
+                  <a:srgbClr val="A31515"/>
+                </a:solidFill>
+                <a:latin typeface="PixelMplus12" panose="020B0509020203020207" pitchFamily="49" charset="-128"/>
+                <a:ea typeface="PixelMplus12" panose="020B0509020203020207" pitchFamily="49" charset="-128"/>
+              </a:rPr>
+              <a:t>"</a:t>
+            </a:r>
+            <a:r>
+              <a:rPr lang="en-US" altLang="ja-JP" sz="1200" dirty="0">
+                <a:solidFill>
+                  <a:srgbClr val="000000"/>
+                </a:solidFill>
+                <a:latin typeface="PixelMplus12" panose="020B0509020203020207" pitchFamily="49" charset="-128"/>
+                <a:ea typeface="PixelMplus12" panose="020B0509020203020207" pitchFamily="49" charset="-128"/>
+              </a:rPr>
+              <a:t>, (</a:t>
+            </a:r>
+            <a:r>
+              <a:rPr lang="en-US" altLang="ja-JP" sz="1200" dirty="0">
+                <a:solidFill>
+                  <a:srgbClr val="0000FF"/>
+                </a:solidFill>
+                <a:latin typeface="PixelMplus12" panose="020B0509020203020207" pitchFamily="49" charset="-128"/>
+                <a:ea typeface="PixelMplus12" panose="020B0509020203020207" pitchFamily="49" charset="-128"/>
+              </a:rPr>
+              <a:t>unsigned</a:t>
+            </a:r>
+            <a:r>
+              <a:rPr lang="en-US" altLang="ja-JP" sz="1200" dirty="0">
+                <a:solidFill>
+                  <a:srgbClr val="000000"/>
+                </a:solidFill>
+                <a:latin typeface="PixelMplus12" panose="020B0509020203020207" pitchFamily="49" charset="-128"/>
+                <a:ea typeface="PixelMplus12" panose="020B0509020203020207" pitchFamily="49" charset="-128"/>
+              </a:rPr>
+              <a:t> </a:t>
+            </a:r>
+            <a:r>
+              <a:rPr lang="en-US" altLang="ja-JP" sz="1200" dirty="0">
+                <a:solidFill>
+                  <a:srgbClr val="0000FF"/>
+                </a:solidFill>
+                <a:latin typeface="PixelMplus12" panose="020B0509020203020207" pitchFamily="49" charset="-128"/>
+                <a:ea typeface="PixelMplus12" panose="020B0509020203020207" pitchFamily="49" charset="-128"/>
+              </a:rPr>
+              <a:t>char</a:t>
+            </a:r>
+            <a:r>
+              <a:rPr lang="en-US" altLang="ja-JP" sz="1200" dirty="0">
+                <a:solidFill>
+                  <a:srgbClr val="000000"/>
+                </a:solidFill>
+                <a:latin typeface="PixelMplus12" panose="020B0509020203020207" pitchFamily="49" charset="-128"/>
+                <a:ea typeface="PixelMplus12" panose="020B0509020203020207" pitchFamily="49" charset="-128"/>
+              </a:rPr>
+              <a:t>)7, (</a:t>
+            </a:r>
+            <a:r>
+              <a:rPr lang="en-US" altLang="ja-JP" sz="1200" dirty="0">
+                <a:solidFill>
+                  <a:srgbClr val="0000FF"/>
+                </a:solidFill>
+                <a:latin typeface="PixelMplus12" panose="020B0509020203020207" pitchFamily="49" charset="-128"/>
+                <a:ea typeface="PixelMplus12" panose="020B0509020203020207" pitchFamily="49" charset="-128"/>
+              </a:rPr>
+              <a:t>unsigned</a:t>
+            </a:r>
+            <a:r>
+              <a:rPr lang="en-US" altLang="ja-JP" sz="1200" dirty="0">
+                <a:solidFill>
+                  <a:srgbClr val="000000"/>
+                </a:solidFill>
+                <a:latin typeface="PixelMplus12" panose="020B0509020203020207" pitchFamily="49" charset="-128"/>
+                <a:ea typeface="PixelMplus12" panose="020B0509020203020207" pitchFamily="49" charset="-128"/>
+              </a:rPr>
+              <a:t> </a:t>
+            </a:r>
+            <a:r>
+              <a:rPr lang="en-US" altLang="ja-JP" sz="1200" dirty="0">
+                <a:solidFill>
+                  <a:srgbClr val="0000FF"/>
+                </a:solidFill>
+                <a:latin typeface="PixelMplus12" panose="020B0509020203020207" pitchFamily="49" charset="-128"/>
+                <a:ea typeface="PixelMplus12" panose="020B0509020203020207" pitchFamily="49" charset="-128"/>
+              </a:rPr>
+              <a:t>char</a:t>
+            </a:r>
+            <a:r>
+              <a:rPr lang="en-US" altLang="ja-JP" sz="1200" dirty="0">
+                <a:solidFill>
+                  <a:srgbClr val="000000"/>
+                </a:solidFill>
+                <a:latin typeface="PixelMplus12" panose="020B0509020203020207" pitchFamily="49" charset="-128"/>
+                <a:ea typeface="PixelMplus12" panose="020B0509020203020207" pitchFamily="49" charset="-128"/>
+              </a:rPr>
+              <a:t>)0, (</a:t>
+            </a:r>
+            <a:r>
+              <a:rPr lang="en-US" altLang="ja-JP" sz="1200" dirty="0">
+                <a:solidFill>
+                  <a:srgbClr val="0000FF"/>
+                </a:solidFill>
+                <a:latin typeface="PixelMplus12" panose="020B0509020203020207" pitchFamily="49" charset="-128"/>
+                <a:ea typeface="PixelMplus12" panose="020B0509020203020207" pitchFamily="49" charset="-128"/>
+              </a:rPr>
+              <a:t>unsigned</a:t>
+            </a:r>
+            <a:r>
+              <a:rPr lang="en-US" altLang="ja-JP" sz="1200" dirty="0">
+                <a:solidFill>
+                  <a:srgbClr val="000000"/>
+                </a:solidFill>
+                <a:latin typeface="PixelMplus12" panose="020B0509020203020207" pitchFamily="49" charset="-128"/>
+                <a:ea typeface="PixelMplus12" panose="020B0509020203020207" pitchFamily="49" charset="-128"/>
+              </a:rPr>
+              <a:t> </a:t>
+            </a:r>
+            <a:r>
+              <a:rPr lang="en-US" altLang="ja-JP" sz="1200" dirty="0">
+                <a:solidFill>
+                  <a:srgbClr val="0000FF"/>
+                </a:solidFill>
+                <a:latin typeface="PixelMplus12" panose="020B0509020203020207" pitchFamily="49" charset="-128"/>
+                <a:ea typeface="PixelMplus12" panose="020B0509020203020207" pitchFamily="49" charset="-128"/>
+              </a:rPr>
+              <a:t>int</a:t>
+            </a:r>
+            <a:r>
+              <a:rPr lang="en-US" altLang="ja-JP" sz="1200" dirty="0">
+                <a:solidFill>
+                  <a:srgbClr val="000000"/>
+                </a:solidFill>
+                <a:latin typeface="PixelMplus12" panose="020B0509020203020207" pitchFamily="49" charset="-128"/>
+                <a:ea typeface="PixelMplus12" panose="020B0509020203020207" pitchFamily="49" charset="-128"/>
+              </a:rPr>
+              <a:t>)0x100, (</a:t>
+            </a:r>
+            <a:r>
+              <a:rPr lang="en-US" altLang="ja-JP" sz="1200" dirty="0">
+                <a:solidFill>
+                  <a:srgbClr val="0000FF"/>
+                </a:solidFill>
+                <a:latin typeface="PixelMplus12" panose="020B0509020203020207" pitchFamily="49" charset="-128"/>
+                <a:ea typeface="PixelMplus12" panose="020B0509020203020207" pitchFamily="49" charset="-128"/>
+              </a:rPr>
+              <a:t>unsigned</a:t>
+            </a:r>
+            <a:r>
+              <a:rPr lang="en-US" altLang="ja-JP" sz="1200" dirty="0">
+                <a:solidFill>
+                  <a:srgbClr val="000000"/>
+                </a:solidFill>
+                <a:latin typeface="PixelMplus12" panose="020B0509020203020207" pitchFamily="49" charset="-128"/>
+                <a:ea typeface="PixelMplus12" panose="020B0509020203020207" pitchFamily="49" charset="-128"/>
+              </a:rPr>
+              <a:t> </a:t>
+            </a:r>
+            <a:r>
+              <a:rPr lang="en-US" altLang="ja-JP" sz="1200" dirty="0">
+                <a:solidFill>
+                  <a:srgbClr val="0000FF"/>
+                </a:solidFill>
+                <a:latin typeface="PixelMplus12" panose="020B0509020203020207" pitchFamily="49" charset="-128"/>
+                <a:ea typeface="PixelMplus12" panose="020B0509020203020207" pitchFamily="49" charset="-128"/>
+              </a:rPr>
+              <a:t>int</a:t>
+            </a:r>
+            <a:r>
+              <a:rPr lang="en-US" altLang="ja-JP" sz="1200" dirty="0">
+                <a:solidFill>
+                  <a:srgbClr val="000000"/>
+                </a:solidFill>
+                <a:latin typeface="PixelMplus12" panose="020B0509020203020207" pitchFamily="49" charset="-128"/>
+                <a:ea typeface="PixelMplus12" panose="020B0509020203020207" pitchFamily="49" charset="-128"/>
+              </a:rPr>
+              <a:t>)</a:t>
+            </a:r>
+            <a:r>
+              <a:rPr lang="en-US" altLang="ja-JP" sz="1200" dirty="0">
+                <a:solidFill>
+                  <a:srgbClr val="808080"/>
+                </a:solidFill>
+                <a:latin typeface="PixelMplus12" panose="020B0509020203020207" pitchFamily="49" charset="-128"/>
+                <a:ea typeface="PixelMplus12" panose="020B0509020203020207" pitchFamily="49" charset="-128"/>
+              </a:rPr>
+              <a:t>10</a:t>
+            </a:r>
+            <a:r>
+              <a:rPr lang="en-US" altLang="ja-JP" sz="1200" dirty="0">
+                <a:solidFill>
+                  <a:srgbClr val="000000"/>
+                </a:solidFill>
+                <a:latin typeface="PixelMplus12" panose="020B0509020203020207" pitchFamily="49" charset="-128"/>
+                <a:ea typeface="PixelMplus12" panose="020B0509020203020207" pitchFamily="49" charset="-128"/>
+              </a:rPr>
+              <a:t>);</a:t>
+            </a:r>
+          </a:p>
+          <a:p>
+            <a:r>
+              <a:rPr lang="en-US" altLang="ja-JP" sz="1200" dirty="0">
+                <a:solidFill>
+                  <a:srgbClr val="000000"/>
+                </a:solidFill>
+                <a:latin typeface="PixelMplus12" panose="020B0509020203020207" pitchFamily="49" charset="-128"/>
+                <a:ea typeface="PixelMplus12" panose="020B0509020203020207" pitchFamily="49" charset="-128"/>
+              </a:rPr>
+              <a:t>//All sound off for AY8910</a:t>
+            </a:r>
+          </a:p>
+          <a:p>
+            <a:r>
+              <a:rPr lang="en-US" altLang="ja-JP" sz="1200" dirty="0" err="1">
+                <a:solidFill>
+                  <a:srgbClr val="000000"/>
+                </a:solidFill>
+                <a:latin typeface="PixelMplus12" panose="020B0509020203020207" pitchFamily="49" charset="-128"/>
+                <a:ea typeface="PixelMplus12" panose="020B0509020203020207" pitchFamily="49" charset="-128"/>
+              </a:rPr>
+              <a:t>m_rpcClient</a:t>
+            </a:r>
+            <a:r>
+              <a:rPr lang="en-US" altLang="ja-JP" sz="1200" dirty="0">
+                <a:solidFill>
+                  <a:srgbClr val="000000"/>
+                </a:solidFill>
+                <a:latin typeface="PixelMplus12" panose="020B0509020203020207" pitchFamily="49" charset="-128"/>
+                <a:ea typeface="PixelMplus12" panose="020B0509020203020207" pitchFamily="49" charset="-128"/>
+              </a:rPr>
+              <a:t>-&gt;</a:t>
+            </a:r>
+            <a:r>
+              <a:rPr lang="en-US" altLang="ja-JP" sz="1200" dirty="0" err="1">
+                <a:solidFill>
+                  <a:srgbClr val="000000"/>
+                </a:solidFill>
+                <a:latin typeface="PixelMplus12" panose="020B0509020203020207" pitchFamily="49" charset="-128"/>
+                <a:ea typeface="PixelMplus12" panose="020B0509020203020207" pitchFamily="49" charset="-128"/>
+              </a:rPr>
+              <a:t>async_call</a:t>
+            </a:r>
+            <a:r>
+              <a:rPr lang="en-US" altLang="ja-JP" sz="1200" dirty="0">
+                <a:solidFill>
+                  <a:srgbClr val="000000"/>
+                </a:solidFill>
+                <a:latin typeface="PixelMplus12" panose="020B0509020203020207" pitchFamily="49" charset="-128"/>
+                <a:ea typeface="PixelMplus12" panose="020B0509020203020207" pitchFamily="49" charset="-128"/>
+              </a:rPr>
+              <a:t>(</a:t>
+            </a:r>
+            <a:r>
+              <a:rPr lang="en-US" altLang="ja-JP" sz="1200" dirty="0">
+                <a:solidFill>
+                  <a:srgbClr val="A31515"/>
+                </a:solidFill>
+                <a:latin typeface="PixelMplus12" panose="020B0509020203020207" pitchFamily="49" charset="-128"/>
+                <a:ea typeface="PixelMplus12" panose="020B0509020203020207" pitchFamily="49" charset="-128"/>
+              </a:rPr>
+              <a:t>"</a:t>
+            </a:r>
+            <a:r>
+              <a:rPr lang="en-US" altLang="ja-JP" sz="1200" dirty="0" err="1">
+                <a:solidFill>
+                  <a:srgbClr val="A31515"/>
+                </a:solidFill>
+                <a:latin typeface="PixelMplus12" panose="020B0509020203020207" pitchFamily="49" charset="-128"/>
+                <a:ea typeface="PixelMplus12" panose="020B0509020203020207" pitchFamily="49" charset="-128"/>
+              </a:rPr>
+              <a:t>DirectAccessToChip</a:t>
+            </a:r>
+            <a:r>
+              <a:rPr lang="en-US" altLang="ja-JP" sz="1200" dirty="0">
+                <a:solidFill>
+                  <a:srgbClr val="A31515"/>
+                </a:solidFill>
+                <a:latin typeface="PixelMplus12" panose="020B0509020203020207" pitchFamily="49" charset="-128"/>
+                <a:ea typeface="PixelMplus12" panose="020B0509020203020207" pitchFamily="49" charset="-128"/>
+              </a:rPr>
+              <a:t>"</a:t>
+            </a:r>
+            <a:r>
+              <a:rPr lang="en-US" altLang="ja-JP" sz="1200" dirty="0">
+                <a:solidFill>
+                  <a:srgbClr val="000000"/>
+                </a:solidFill>
+                <a:latin typeface="PixelMplus12" panose="020B0509020203020207" pitchFamily="49" charset="-128"/>
+                <a:ea typeface="PixelMplus12" panose="020B0509020203020207" pitchFamily="49" charset="-128"/>
+              </a:rPr>
+              <a:t>, (</a:t>
+            </a:r>
+            <a:r>
+              <a:rPr lang="en-US" altLang="ja-JP" sz="1200" dirty="0">
+                <a:solidFill>
+                  <a:srgbClr val="0000FF"/>
+                </a:solidFill>
+                <a:latin typeface="PixelMplus12" panose="020B0509020203020207" pitchFamily="49" charset="-128"/>
+                <a:ea typeface="PixelMplus12" panose="020B0509020203020207" pitchFamily="49" charset="-128"/>
+              </a:rPr>
+              <a:t>unsigned</a:t>
+            </a:r>
+            <a:r>
+              <a:rPr lang="en-US" altLang="ja-JP" sz="1200" dirty="0">
+                <a:solidFill>
+                  <a:srgbClr val="000000"/>
+                </a:solidFill>
+                <a:latin typeface="PixelMplus12" panose="020B0509020203020207" pitchFamily="49" charset="-128"/>
+                <a:ea typeface="PixelMplus12" panose="020B0509020203020207" pitchFamily="49" charset="-128"/>
+              </a:rPr>
+              <a:t> </a:t>
+            </a:r>
+            <a:r>
+              <a:rPr lang="en-US" altLang="ja-JP" sz="1200" dirty="0">
+                <a:solidFill>
+                  <a:srgbClr val="0000FF"/>
+                </a:solidFill>
+                <a:latin typeface="PixelMplus12" panose="020B0509020203020207" pitchFamily="49" charset="-128"/>
+                <a:ea typeface="PixelMplus12" panose="020B0509020203020207" pitchFamily="49" charset="-128"/>
+              </a:rPr>
+              <a:t>char</a:t>
+            </a:r>
+            <a:r>
+              <a:rPr lang="en-US" altLang="ja-JP" sz="1200" dirty="0">
+                <a:solidFill>
+                  <a:srgbClr val="000000"/>
+                </a:solidFill>
+                <a:latin typeface="PixelMplus12" panose="020B0509020203020207" pitchFamily="49" charset="-128"/>
+                <a:ea typeface="PixelMplus12" panose="020B0509020203020207" pitchFamily="49" charset="-128"/>
+              </a:rPr>
+              <a:t>)11, (</a:t>
+            </a:r>
+            <a:r>
+              <a:rPr lang="en-US" altLang="ja-JP" sz="1200" dirty="0">
+                <a:solidFill>
+                  <a:srgbClr val="0000FF"/>
+                </a:solidFill>
+                <a:latin typeface="PixelMplus12" panose="020B0509020203020207" pitchFamily="49" charset="-128"/>
+                <a:ea typeface="PixelMplus12" panose="020B0509020203020207" pitchFamily="49" charset="-128"/>
+              </a:rPr>
+              <a:t>unsigned</a:t>
+            </a:r>
+            <a:r>
+              <a:rPr lang="en-US" altLang="ja-JP" sz="1200" dirty="0">
+                <a:solidFill>
+                  <a:srgbClr val="000000"/>
+                </a:solidFill>
+                <a:latin typeface="PixelMplus12" panose="020B0509020203020207" pitchFamily="49" charset="-128"/>
+                <a:ea typeface="PixelMplus12" panose="020B0509020203020207" pitchFamily="49" charset="-128"/>
+              </a:rPr>
+              <a:t> </a:t>
+            </a:r>
+            <a:r>
+              <a:rPr lang="en-US" altLang="ja-JP" sz="1200" dirty="0">
+                <a:solidFill>
+                  <a:srgbClr val="0000FF"/>
+                </a:solidFill>
+                <a:latin typeface="PixelMplus12" panose="020B0509020203020207" pitchFamily="49" charset="-128"/>
+                <a:ea typeface="PixelMplus12" panose="020B0509020203020207" pitchFamily="49" charset="-128"/>
+              </a:rPr>
+              <a:t>char</a:t>
+            </a:r>
+            <a:r>
+              <a:rPr lang="en-US" altLang="ja-JP" sz="1200" dirty="0">
+                <a:solidFill>
+                  <a:srgbClr val="000000"/>
+                </a:solidFill>
+                <a:latin typeface="PixelMplus12" panose="020B0509020203020207" pitchFamily="49" charset="-128"/>
+                <a:ea typeface="PixelMplus12" panose="020B0509020203020207" pitchFamily="49" charset="-128"/>
+              </a:rPr>
+              <a:t>)0, (</a:t>
+            </a:r>
+            <a:r>
+              <a:rPr lang="en-US" altLang="ja-JP" sz="1200" dirty="0">
+                <a:solidFill>
+                  <a:srgbClr val="0000FF"/>
+                </a:solidFill>
+                <a:latin typeface="PixelMplus12" panose="020B0509020203020207" pitchFamily="49" charset="-128"/>
+                <a:ea typeface="PixelMplus12" panose="020B0509020203020207" pitchFamily="49" charset="-128"/>
+              </a:rPr>
+              <a:t>unsigned</a:t>
+            </a:r>
+            <a:r>
+              <a:rPr lang="en-US" altLang="ja-JP" sz="1200" dirty="0">
+                <a:solidFill>
+                  <a:srgbClr val="000000"/>
+                </a:solidFill>
+                <a:latin typeface="PixelMplus12" panose="020B0509020203020207" pitchFamily="49" charset="-128"/>
+                <a:ea typeface="PixelMplus12" panose="020B0509020203020207" pitchFamily="49" charset="-128"/>
+              </a:rPr>
+              <a:t> </a:t>
+            </a:r>
+            <a:r>
+              <a:rPr lang="en-US" altLang="ja-JP" sz="1200" dirty="0">
+                <a:solidFill>
+                  <a:srgbClr val="0000FF"/>
+                </a:solidFill>
+                <a:latin typeface="PixelMplus12" panose="020B0509020203020207" pitchFamily="49" charset="-128"/>
+                <a:ea typeface="PixelMplus12" panose="020B0509020203020207" pitchFamily="49" charset="-128"/>
+              </a:rPr>
+              <a:t>int</a:t>
+            </a:r>
+            <a:r>
+              <a:rPr lang="en-US" altLang="ja-JP" sz="1200" dirty="0">
+                <a:solidFill>
+                  <a:srgbClr val="000000"/>
+                </a:solidFill>
+                <a:latin typeface="PixelMplus12" panose="020B0509020203020207" pitchFamily="49" charset="-128"/>
+                <a:ea typeface="PixelMplus12" panose="020B0509020203020207" pitchFamily="49" charset="-128"/>
+              </a:rPr>
+              <a:t>)7, (</a:t>
+            </a:r>
+            <a:r>
+              <a:rPr lang="en-US" altLang="ja-JP" sz="1200" dirty="0">
+                <a:solidFill>
+                  <a:srgbClr val="0000FF"/>
+                </a:solidFill>
+                <a:latin typeface="PixelMplus12" panose="020B0509020203020207" pitchFamily="49" charset="-128"/>
+                <a:ea typeface="PixelMplus12" panose="020B0509020203020207" pitchFamily="49" charset="-128"/>
+              </a:rPr>
+              <a:t>unsigned</a:t>
+            </a:r>
+            <a:r>
+              <a:rPr lang="en-US" altLang="ja-JP" sz="1200" dirty="0">
+                <a:solidFill>
+                  <a:srgbClr val="000000"/>
+                </a:solidFill>
+                <a:latin typeface="PixelMplus12" panose="020B0509020203020207" pitchFamily="49" charset="-128"/>
+                <a:ea typeface="PixelMplus12" panose="020B0509020203020207" pitchFamily="49" charset="-128"/>
+              </a:rPr>
+              <a:t> </a:t>
+            </a:r>
+            <a:r>
+              <a:rPr lang="en-US" altLang="ja-JP" sz="1200" dirty="0">
+                <a:solidFill>
+                  <a:srgbClr val="0000FF"/>
+                </a:solidFill>
+                <a:latin typeface="PixelMplus12" panose="020B0509020203020207" pitchFamily="49" charset="-128"/>
+                <a:ea typeface="PixelMplus12" panose="020B0509020203020207" pitchFamily="49" charset="-128"/>
+              </a:rPr>
+              <a:t>int</a:t>
+            </a:r>
+            <a:r>
+              <a:rPr lang="en-US" altLang="ja-JP" sz="1200" dirty="0">
+                <a:solidFill>
+                  <a:srgbClr val="000000"/>
+                </a:solidFill>
+                <a:latin typeface="PixelMplus12" panose="020B0509020203020207" pitchFamily="49" charset="-128"/>
+                <a:ea typeface="PixelMplus12" panose="020B0509020203020207" pitchFamily="49" charset="-128"/>
+              </a:rPr>
+              <a:t>)0x3f);</a:t>
+            </a:r>
+          </a:p>
+          <a:p>
+            <a:r>
+              <a:rPr lang="en-US" altLang="ja-JP" sz="1200" dirty="0">
+                <a:solidFill>
+                  <a:srgbClr val="000000"/>
+                </a:solidFill>
+                <a:latin typeface="PixelMplus12" panose="020B0509020203020207" pitchFamily="49" charset="-128"/>
+                <a:ea typeface="PixelMplus12" panose="020B0509020203020207" pitchFamily="49" charset="-128"/>
+              </a:rPr>
+              <a:t>//Key off 1ch for OPLL</a:t>
+            </a:r>
+          </a:p>
+          <a:p>
+            <a:r>
+              <a:rPr lang="en-US" altLang="ja-JP" sz="1200" dirty="0" err="1">
+                <a:solidFill>
+                  <a:srgbClr val="000000"/>
+                </a:solidFill>
+                <a:latin typeface="PixelMplus12" panose="020B0509020203020207" pitchFamily="49" charset="-128"/>
+                <a:ea typeface="PixelMplus12" panose="020B0509020203020207" pitchFamily="49" charset="-128"/>
+              </a:rPr>
+              <a:t>m_rpcClient</a:t>
+            </a:r>
+            <a:r>
+              <a:rPr lang="en-US" altLang="ja-JP" sz="1200" dirty="0">
+                <a:solidFill>
+                  <a:srgbClr val="000000"/>
+                </a:solidFill>
+                <a:latin typeface="PixelMplus12" panose="020B0509020203020207" pitchFamily="49" charset="-128"/>
+                <a:ea typeface="PixelMplus12" panose="020B0509020203020207" pitchFamily="49" charset="-128"/>
+              </a:rPr>
+              <a:t>-&gt;</a:t>
+            </a:r>
+            <a:r>
+              <a:rPr lang="en-US" altLang="ja-JP" sz="1200" dirty="0" err="1">
+                <a:solidFill>
+                  <a:srgbClr val="000000"/>
+                </a:solidFill>
+                <a:latin typeface="PixelMplus12" panose="020B0509020203020207" pitchFamily="49" charset="-128"/>
+                <a:ea typeface="PixelMplus12" panose="020B0509020203020207" pitchFamily="49" charset="-128"/>
+              </a:rPr>
+              <a:t>async_call</a:t>
+            </a:r>
+            <a:r>
+              <a:rPr lang="en-US" altLang="ja-JP" sz="1200" dirty="0">
+                <a:solidFill>
+                  <a:srgbClr val="000000"/>
+                </a:solidFill>
+                <a:latin typeface="PixelMplus12" panose="020B0509020203020207" pitchFamily="49" charset="-128"/>
+                <a:ea typeface="PixelMplus12" panose="020B0509020203020207" pitchFamily="49" charset="-128"/>
+              </a:rPr>
+              <a:t>(</a:t>
+            </a:r>
+            <a:r>
+              <a:rPr lang="en-US" altLang="ja-JP" sz="1200" dirty="0">
+                <a:solidFill>
+                  <a:srgbClr val="A31515"/>
+                </a:solidFill>
+                <a:latin typeface="PixelMplus12" panose="020B0509020203020207" pitchFamily="49" charset="-128"/>
+                <a:ea typeface="PixelMplus12" panose="020B0509020203020207" pitchFamily="49" charset="-128"/>
+              </a:rPr>
+              <a:t>"</a:t>
+            </a:r>
+            <a:r>
+              <a:rPr lang="en-US" altLang="ja-JP" sz="1200" dirty="0" err="1">
+                <a:solidFill>
+                  <a:srgbClr val="A31515"/>
+                </a:solidFill>
+                <a:latin typeface="PixelMplus12" panose="020B0509020203020207" pitchFamily="49" charset="-128"/>
+                <a:ea typeface="PixelMplus12" panose="020B0509020203020207" pitchFamily="49" charset="-128"/>
+              </a:rPr>
+              <a:t>DirectAccessToChip</a:t>
+            </a:r>
+            <a:r>
+              <a:rPr lang="en-US" altLang="ja-JP" sz="1200" dirty="0">
+                <a:solidFill>
+                  <a:srgbClr val="A31515"/>
+                </a:solidFill>
+                <a:latin typeface="PixelMplus12" panose="020B0509020203020207" pitchFamily="49" charset="-128"/>
+                <a:ea typeface="PixelMplus12" panose="020B0509020203020207" pitchFamily="49" charset="-128"/>
+              </a:rPr>
+              <a:t>"</a:t>
+            </a:r>
+            <a:r>
+              <a:rPr lang="en-US" altLang="ja-JP" sz="1200" dirty="0">
+                <a:solidFill>
+                  <a:srgbClr val="000000"/>
+                </a:solidFill>
+                <a:latin typeface="PixelMplus12" panose="020B0509020203020207" pitchFamily="49" charset="-128"/>
+                <a:ea typeface="PixelMplus12" panose="020B0509020203020207" pitchFamily="49" charset="-128"/>
+              </a:rPr>
+              <a:t>, (</a:t>
+            </a:r>
+            <a:r>
+              <a:rPr lang="en-US" altLang="ja-JP" sz="1200" dirty="0">
+                <a:solidFill>
+                  <a:srgbClr val="0000FF"/>
+                </a:solidFill>
+                <a:latin typeface="PixelMplus12" panose="020B0509020203020207" pitchFamily="49" charset="-128"/>
+                <a:ea typeface="PixelMplus12" panose="020B0509020203020207" pitchFamily="49" charset="-128"/>
+              </a:rPr>
+              <a:t>unsigned</a:t>
+            </a:r>
+            <a:r>
+              <a:rPr lang="en-US" altLang="ja-JP" sz="1200" dirty="0">
+                <a:solidFill>
+                  <a:srgbClr val="000000"/>
+                </a:solidFill>
+                <a:latin typeface="PixelMplus12" panose="020B0509020203020207" pitchFamily="49" charset="-128"/>
+                <a:ea typeface="PixelMplus12" panose="020B0509020203020207" pitchFamily="49" charset="-128"/>
+              </a:rPr>
+              <a:t> </a:t>
+            </a:r>
+            <a:r>
+              <a:rPr lang="en-US" altLang="ja-JP" sz="1200" dirty="0">
+                <a:solidFill>
+                  <a:srgbClr val="0000FF"/>
+                </a:solidFill>
+                <a:latin typeface="PixelMplus12" panose="020B0509020203020207" pitchFamily="49" charset="-128"/>
+                <a:ea typeface="PixelMplus12" panose="020B0509020203020207" pitchFamily="49" charset="-128"/>
+              </a:rPr>
+              <a:t>char</a:t>
+            </a:r>
+            <a:r>
+              <a:rPr lang="en-US" altLang="ja-JP" sz="1200" dirty="0">
+                <a:solidFill>
+                  <a:srgbClr val="000000"/>
+                </a:solidFill>
+                <a:latin typeface="PixelMplus12" panose="020B0509020203020207" pitchFamily="49" charset="-128"/>
+                <a:ea typeface="PixelMplus12" panose="020B0509020203020207" pitchFamily="49" charset="-128"/>
+              </a:rPr>
+              <a:t>)9, (</a:t>
+            </a:r>
+            <a:r>
+              <a:rPr lang="en-US" altLang="ja-JP" sz="1200" dirty="0">
+                <a:solidFill>
+                  <a:srgbClr val="0000FF"/>
+                </a:solidFill>
+                <a:latin typeface="PixelMplus12" panose="020B0509020203020207" pitchFamily="49" charset="-128"/>
+                <a:ea typeface="PixelMplus12" panose="020B0509020203020207" pitchFamily="49" charset="-128"/>
+              </a:rPr>
+              <a:t>unsigned</a:t>
+            </a:r>
+            <a:r>
+              <a:rPr lang="en-US" altLang="ja-JP" sz="1200" dirty="0">
+                <a:solidFill>
+                  <a:srgbClr val="000000"/>
+                </a:solidFill>
+                <a:latin typeface="PixelMplus12" panose="020B0509020203020207" pitchFamily="49" charset="-128"/>
+                <a:ea typeface="PixelMplus12" panose="020B0509020203020207" pitchFamily="49" charset="-128"/>
+              </a:rPr>
+              <a:t> </a:t>
+            </a:r>
+            <a:r>
+              <a:rPr lang="en-US" altLang="ja-JP" sz="1200" dirty="0">
+                <a:solidFill>
+                  <a:srgbClr val="0000FF"/>
+                </a:solidFill>
+                <a:latin typeface="PixelMplus12" panose="020B0509020203020207" pitchFamily="49" charset="-128"/>
+                <a:ea typeface="PixelMplus12" panose="020B0509020203020207" pitchFamily="49" charset="-128"/>
+              </a:rPr>
+              <a:t>char</a:t>
+            </a:r>
+            <a:r>
+              <a:rPr lang="en-US" altLang="ja-JP" sz="1200" dirty="0">
+                <a:solidFill>
+                  <a:srgbClr val="000000"/>
+                </a:solidFill>
+                <a:latin typeface="PixelMplus12" panose="020B0509020203020207" pitchFamily="49" charset="-128"/>
+                <a:ea typeface="PixelMplus12" panose="020B0509020203020207" pitchFamily="49" charset="-128"/>
+              </a:rPr>
+              <a:t>)0, (</a:t>
+            </a:r>
+            <a:r>
+              <a:rPr lang="en-US" altLang="ja-JP" sz="1200" dirty="0">
+                <a:solidFill>
+                  <a:srgbClr val="0000FF"/>
+                </a:solidFill>
+                <a:latin typeface="PixelMplus12" panose="020B0509020203020207" pitchFamily="49" charset="-128"/>
+                <a:ea typeface="PixelMplus12" panose="020B0509020203020207" pitchFamily="49" charset="-128"/>
+              </a:rPr>
+              <a:t>unsigned</a:t>
+            </a:r>
+            <a:r>
+              <a:rPr lang="en-US" altLang="ja-JP" sz="1200" dirty="0">
+                <a:solidFill>
+                  <a:srgbClr val="000000"/>
+                </a:solidFill>
+                <a:latin typeface="PixelMplus12" panose="020B0509020203020207" pitchFamily="49" charset="-128"/>
+                <a:ea typeface="PixelMplus12" panose="020B0509020203020207" pitchFamily="49" charset="-128"/>
+              </a:rPr>
+              <a:t> </a:t>
+            </a:r>
+            <a:r>
+              <a:rPr lang="en-US" altLang="ja-JP" sz="1200" dirty="0">
+                <a:solidFill>
+                  <a:srgbClr val="0000FF"/>
+                </a:solidFill>
+                <a:latin typeface="PixelMplus12" panose="020B0509020203020207" pitchFamily="49" charset="-128"/>
+                <a:ea typeface="PixelMplus12" panose="020B0509020203020207" pitchFamily="49" charset="-128"/>
+              </a:rPr>
+              <a:t>int</a:t>
+            </a:r>
+            <a:r>
+              <a:rPr lang="en-US" altLang="ja-JP" sz="1200" dirty="0">
+                <a:solidFill>
+                  <a:srgbClr val="000000"/>
+                </a:solidFill>
+                <a:latin typeface="PixelMplus12" panose="020B0509020203020207" pitchFamily="49" charset="-128"/>
+                <a:ea typeface="PixelMplus12" panose="020B0509020203020207" pitchFamily="49" charset="-128"/>
+              </a:rPr>
+              <a:t>)0x20, (</a:t>
+            </a:r>
+            <a:r>
+              <a:rPr lang="en-US" altLang="ja-JP" sz="1200" dirty="0">
+                <a:solidFill>
+                  <a:srgbClr val="0000FF"/>
+                </a:solidFill>
+                <a:latin typeface="PixelMplus12" panose="020B0509020203020207" pitchFamily="49" charset="-128"/>
+                <a:ea typeface="PixelMplus12" panose="020B0509020203020207" pitchFamily="49" charset="-128"/>
+              </a:rPr>
+              <a:t>unsigned</a:t>
+            </a:r>
+            <a:r>
+              <a:rPr lang="en-US" altLang="ja-JP" sz="1200" dirty="0">
+                <a:solidFill>
+                  <a:srgbClr val="000000"/>
+                </a:solidFill>
+                <a:latin typeface="PixelMplus12" panose="020B0509020203020207" pitchFamily="49" charset="-128"/>
+                <a:ea typeface="PixelMplus12" panose="020B0509020203020207" pitchFamily="49" charset="-128"/>
+              </a:rPr>
+              <a:t> </a:t>
+            </a:r>
+            <a:r>
+              <a:rPr lang="en-US" altLang="ja-JP" sz="1200" dirty="0">
+                <a:solidFill>
+                  <a:srgbClr val="0000FF"/>
+                </a:solidFill>
+                <a:latin typeface="PixelMplus12" panose="020B0509020203020207" pitchFamily="49" charset="-128"/>
+                <a:ea typeface="PixelMplus12" panose="020B0509020203020207" pitchFamily="49" charset="-128"/>
+              </a:rPr>
+              <a:t>int</a:t>
+            </a:r>
+            <a:r>
+              <a:rPr lang="en-US" altLang="ja-JP" sz="1200" dirty="0">
+                <a:solidFill>
+                  <a:srgbClr val="000000"/>
+                </a:solidFill>
+                <a:latin typeface="PixelMplus12" panose="020B0509020203020207" pitchFamily="49" charset="-128"/>
+                <a:ea typeface="PixelMplus12" panose="020B0509020203020207" pitchFamily="49" charset="-128"/>
+              </a:rPr>
+              <a:t>)0x0);</a:t>
+            </a:r>
+          </a:p>
+          <a:p>
+            <a:r>
+              <a:rPr kumimoji="1" lang="en-US" altLang="ja-JP" sz="1200" dirty="0">
+                <a:solidFill>
+                  <a:srgbClr val="000000"/>
+                </a:solidFill>
+                <a:latin typeface="PixelMplus12" panose="020B0509020203020207" pitchFamily="49" charset="-128"/>
+                <a:ea typeface="PixelMplus12" panose="020B0509020203020207" pitchFamily="49" charset="-128"/>
+              </a:rPr>
+              <a:t>:::</a:t>
+            </a:r>
+          </a:p>
+          <a:p>
+            <a:r>
+              <a:rPr lang="en-US" altLang="ja-JP" sz="1200" dirty="0" err="1">
+                <a:solidFill>
+                  <a:srgbClr val="000000"/>
+                </a:solidFill>
+                <a:latin typeface="PixelMplus12" panose="020B0509020203020207" pitchFamily="49" charset="-128"/>
+                <a:ea typeface="PixelMplus12" panose="020B0509020203020207" pitchFamily="49" charset="-128"/>
+              </a:rPr>
+              <a:t>m_rpcClient</a:t>
+            </a:r>
+            <a:r>
+              <a:rPr lang="en-US" altLang="ja-JP" sz="1200" dirty="0">
+                <a:solidFill>
+                  <a:srgbClr val="000000"/>
+                </a:solidFill>
+                <a:latin typeface="PixelMplus12" panose="020B0509020203020207" pitchFamily="49" charset="-128"/>
+                <a:ea typeface="PixelMplus12" panose="020B0509020203020207" pitchFamily="49" charset="-128"/>
+              </a:rPr>
+              <a:t>-&gt;~client();	//Close</a:t>
+            </a:r>
+            <a:r>
+              <a:rPr kumimoji="1" lang="ja-JP" altLang="en-US" sz="1200" dirty="0">
+                <a:solidFill>
+                  <a:srgbClr val="000000"/>
+                </a:solidFill>
+                <a:latin typeface="PixelMplus12" panose="020B0509020203020207" pitchFamily="49" charset="-128"/>
+                <a:ea typeface="PixelMplus12" panose="020B0509020203020207" pitchFamily="49" charset="-128"/>
+              </a:rPr>
+              <a:t> </a:t>
+            </a:r>
+            <a:r>
+              <a:rPr kumimoji="1" lang="en-US" altLang="ja-JP" sz="1200" dirty="0">
+                <a:solidFill>
+                  <a:srgbClr val="000000"/>
+                </a:solidFill>
+                <a:latin typeface="PixelMplus12" panose="020B0509020203020207" pitchFamily="49" charset="-128"/>
+                <a:ea typeface="PixelMplus12" panose="020B0509020203020207" pitchFamily="49" charset="-128"/>
+              </a:rPr>
+              <a:t>RPC</a:t>
+            </a:r>
+            <a:r>
+              <a:rPr kumimoji="1" lang="ja-JP" altLang="en-US" sz="1200" dirty="0">
+                <a:solidFill>
+                  <a:srgbClr val="000000"/>
+                </a:solidFill>
+                <a:latin typeface="PixelMplus12" panose="020B0509020203020207" pitchFamily="49" charset="-128"/>
+                <a:ea typeface="PixelMplus12" panose="020B0509020203020207" pitchFamily="49" charset="-128"/>
+              </a:rPr>
+              <a:t> </a:t>
+            </a:r>
+            <a:r>
+              <a:rPr kumimoji="1" lang="en-US" altLang="ja-JP" sz="1200" dirty="0">
+                <a:solidFill>
+                  <a:srgbClr val="000000"/>
+                </a:solidFill>
+                <a:latin typeface="PixelMplus12" panose="020B0509020203020207" pitchFamily="49" charset="-128"/>
+                <a:ea typeface="PixelMplus12" panose="020B0509020203020207" pitchFamily="49" charset="-128"/>
+              </a:rPr>
+              <a:t>port</a:t>
+            </a:r>
+            <a:endParaRPr kumimoji="1" lang="ja-JP" altLang="en-US" sz="1200" dirty="0">
+              <a:latin typeface="PixelMplus12" panose="020B0509020203020207" pitchFamily="49" charset="-128"/>
+              <a:ea typeface="PixelMplus12" panose="020B0509020203020207" pitchFamily="49" charset="-128"/>
+            </a:endParaRPr>
+          </a:p>
+        </p:txBody>
+      </p:sp>
+      <p:pic>
+        <p:nvPicPr>
+          <p:cNvPr id="7" name="図 6">
+            <a:extLst>
+              <a:ext uri="{FF2B5EF4-FFF2-40B4-BE49-F238E27FC236}">
+                <a16:creationId xmlns:a16="http://schemas.microsoft.com/office/drawing/2014/main" id="{7A466743-E1DC-C729-0305-F781C605EA9C}"/>
+              </a:ext>
+            </a:extLst>
+          </p:cNvPr>
+          <p:cNvPicPr>
+            <a:picLocks noChangeAspect="1"/>
+          </p:cNvPicPr>
+          <p:nvPr/>
+        </p:nvPicPr>
+        <p:blipFill>
+          <a:blip r:embed="rId3"/>
+          <a:stretch>
+            <a:fillRect/>
+          </a:stretch>
+        </p:blipFill>
+        <p:spPr>
+          <a:xfrm>
+            <a:off x="9008828" y="3843571"/>
+            <a:ext cx="2011679" cy="529671"/>
+          </a:xfrm>
+          <a:prstGeom prst="rect">
+            <a:avLst/>
+          </a:prstGeom>
+          <a:ln>
+            <a:solidFill>
+              <a:schemeClr val="tx1"/>
+            </a:solidFill>
+          </a:ln>
+        </p:spPr>
+      </p:pic>
+    </p:spTree>
+    <p:extLst>
+      <p:ext uri="{BB962C8B-B14F-4D97-AF65-F5344CB8AC3E}">
+        <p14:creationId xmlns:p14="http://schemas.microsoft.com/office/powerpoint/2010/main" val="386666229"/>
+      </p:ext>
+    </p:extLst>
+  </p:cSld>
+  <p:clrMapOvr>
+    <a:masterClrMapping/>
+  </p:clrMapOvr>
+</p:sld>
+</file>
+
 <file path=ppt/slides/slide4.xml><?xml version="1.0" encoding="utf-8"?>
 <p:sld xmlns:a="http://schemas.openxmlformats.org/drawingml/2006/main" xmlns:r="http://schemas.openxmlformats.org/officeDocument/2006/relationships" xmlns:p="http://schemas.openxmlformats.org/presentationml/2006/main">
   <p:cSld>

</xml_diff>

<commit_message>
Changed VSTI - MSX I/F frame format. Please update VGMPlay_msx.rom, too.
</commit_message>
<xml_diff>
--- a/docs/MAmidiMEmo/Manual.pptx
+++ b/docs/MAmidiMEmo/Manual.pptx
@@ -231,7 +231,7 @@
           <a:p>
             <a:fld id="{581C28D8-13B6-41C3-9F5F-0284C569C6F1}" type="datetimeFigureOut">
               <a:rPr kumimoji="1" lang="ja-JP" altLang="en-US" smtClean="0"/>
-              <a:t>2022/11/7</a:t>
+              <a:t>2022/11/14</a:t>
             </a:fld>
             <a:endParaRPr kumimoji="1" lang="ja-JP" altLang="en-US"/>
           </a:p>
@@ -1558,7 +1558,7 @@
           <a:p>
             <a:fld id="{B8625E62-B904-4691-B75E-EC1C32885285}" type="datetime1">
               <a:rPr kumimoji="1" lang="ja-JP" altLang="en-US" smtClean="0"/>
-              <a:t>2022/11/7</a:t>
+              <a:t>2022/11/14</a:t>
             </a:fld>
             <a:endParaRPr kumimoji="1" lang="ja-JP" altLang="en-US"/>
           </a:p>
@@ -1896,7 +1896,7 @@
           <a:p>
             <a:fld id="{A4C87007-2A40-4EFC-90A3-258EFA3C1001}" type="datetime1">
               <a:rPr kumimoji="1" lang="ja-JP" altLang="en-US" smtClean="0"/>
-              <a:t>2022/11/7</a:t>
+              <a:t>2022/11/14</a:t>
             </a:fld>
             <a:endParaRPr kumimoji="1" lang="ja-JP" altLang="en-US"/>
           </a:p>
@@ -2297,7 +2297,7 @@
           <a:p>
             <a:fld id="{0FE0D7FF-9203-4AA3-90FD-622674A14F90}" type="datetime1">
               <a:rPr kumimoji="1" lang="ja-JP" altLang="en-US" smtClean="0"/>
-              <a:t>2022/11/7</a:t>
+              <a:t>2022/11/14</a:t>
             </a:fld>
             <a:endParaRPr kumimoji="1" lang="ja-JP" altLang="en-US"/>
           </a:p>
@@ -2633,7 +2633,7 @@
           <a:p>
             <a:fld id="{D2D6E4D3-BEDB-4F35-876B-5B9AA41BFB5B}" type="datetime1">
               <a:rPr kumimoji="1" lang="ja-JP" altLang="en-US" smtClean="0"/>
-              <a:t>2022/11/7</a:t>
+              <a:t>2022/11/14</a:t>
             </a:fld>
             <a:endParaRPr kumimoji="1" lang="ja-JP" altLang="en-US"/>
           </a:p>
@@ -2953,7 +2953,7 @@
           <a:p>
             <a:fld id="{2ACD896E-FC14-4F25-BC47-18ABAEA9E1FE}" type="datetime1">
               <a:rPr kumimoji="1" lang="ja-JP" altLang="en-US" smtClean="0"/>
-              <a:t>2022/11/7</a:t>
+              <a:t>2022/11/14</a:t>
             </a:fld>
             <a:endParaRPr kumimoji="1" lang="ja-JP" altLang="en-US"/>
           </a:p>
@@ -3349,7 +3349,7 @@
           <a:p>
             <a:fld id="{54FC701B-2185-4987-B8E2-5507664B65F4}" type="datetime1">
               <a:rPr kumimoji="1" lang="ja-JP" altLang="en-US" smtClean="0"/>
-              <a:t>2022/11/7</a:t>
+              <a:t>2022/11/14</a:t>
             </a:fld>
             <a:endParaRPr kumimoji="1" lang="ja-JP" altLang="en-US"/>
           </a:p>
@@ -3638,7 +3638,7 @@
           <a:p>
             <a:fld id="{3FB4CDED-9617-418F-B546-D66B9BB6C35E}" type="datetime1">
               <a:rPr kumimoji="1" lang="ja-JP" altLang="en-US" smtClean="0"/>
-              <a:t>2022/11/7</a:t>
+              <a:t>2022/11/14</a:t>
             </a:fld>
             <a:endParaRPr kumimoji="1" lang="ja-JP" altLang="en-US"/>
           </a:p>
@@ -3932,7 +3932,7 @@
           <a:p>
             <a:fld id="{F5635D40-962A-46D7-8037-3F2900B5EB4D}" type="datetime1">
               <a:rPr kumimoji="1" lang="ja-JP" altLang="en-US" smtClean="0"/>
-              <a:t>2022/11/7</a:t>
+              <a:t>2022/11/14</a:t>
             </a:fld>
             <a:endParaRPr kumimoji="1" lang="ja-JP" altLang="en-US"/>
           </a:p>
@@ -4226,7 +4226,7 @@
           <a:p>
             <a:fld id="{741DA9A2-8356-4FFD-B66A-E38811049858}" type="datetime1">
               <a:rPr kumimoji="1" lang="ja-JP" altLang="en-US" smtClean="0"/>
-              <a:t>2022/11/7</a:t>
+              <a:t>2022/11/14</a:t>
             </a:fld>
             <a:endParaRPr kumimoji="1" lang="ja-JP" altLang="en-US"/>
           </a:p>
@@ -4555,7 +4555,7 @@
           <a:p>
             <a:fld id="{9DDE8989-88B8-4869-97D9-547531F13E13}" type="datetime1">
               <a:rPr kumimoji="1" lang="ja-JP" altLang="en-US" smtClean="0"/>
-              <a:t>2022/11/7</a:t>
+              <a:t>2022/11/14</a:t>
             </a:fld>
             <a:endParaRPr kumimoji="1" lang="ja-JP" altLang="en-US"/>
           </a:p>
@@ -4942,7 +4942,7 @@
           <a:p>
             <a:fld id="{81EC4031-B949-4300-AB3E-1551426E8631}" type="datetime1">
               <a:rPr kumimoji="1" lang="ja-JP" altLang="en-US" smtClean="0"/>
-              <a:t>2022/11/7</a:t>
+              <a:t>2022/11/14</a:t>
             </a:fld>
             <a:endParaRPr kumimoji="1" lang="ja-JP" altLang="en-US"/>
           </a:p>
@@ -5463,7 +5463,7 @@
           <a:p>
             <a:fld id="{F39E755E-A59D-4634-B604-E9BB568B1156}" type="datetime1">
               <a:rPr kumimoji="1" lang="ja-JP" altLang="en-US" smtClean="0"/>
-              <a:t>2022/11/7</a:t>
+              <a:t>2022/11/14</a:t>
             </a:fld>
             <a:endParaRPr kumimoji="1" lang="ja-JP" altLang="en-US"/>
           </a:p>
@@ -5668,7 +5668,7 @@
           <a:p>
             <a:fld id="{61DA38B3-7601-4256-ABFE-386B92B0EDB5}" type="datetime1">
               <a:rPr kumimoji="1" lang="ja-JP" altLang="en-US" smtClean="0"/>
-              <a:t>2022/11/7</a:t>
+              <a:t>2022/11/14</a:t>
             </a:fld>
             <a:endParaRPr kumimoji="1" lang="ja-JP" altLang="en-US"/>
           </a:p>
@@ -5845,7 +5845,7 @@
           <a:p>
             <a:fld id="{5A28ED6D-8A94-4DBA-8EF2-284D1A467CE8}" type="datetime1">
               <a:rPr kumimoji="1" lang="ja-JP" altLang="en-US" smtClean="0"/>
-              <a:t>2022/11/7</a:t>
+              <a:t>2022/11/14</a:t>
             </a:fld>
             <a:endParaRPr kumimoji="1" lang="ja-JP" altLang="en-US"/>
           </a:p>
@@ -6210,7 +6210,7 @@
           <a:p>
             <a:fld id="{B27B0317-28AF-43C5-8944-AADFA89E0149}" type="datetime1">
               <a:rPr kumimoji="1" lang="ja-JP" altLang="en-US" smtClean="0"/>
-              <a:t>2022/11/7</a:t>
+              <a:t>2022/11/14</a:t>
             </a:fld>
             <a:endParaRPr kumimoji="1" lang="ja-JP" altLang="en-US"/>
           </a:p>
@@ -6555,7 +6555,7 @@
           <a:p>
             <a:fld id="{A78D023C-C4FA-4CE8-B5BE-6798898EE377}" type="datetime1">
               <a:rPr kumimoji="1" lang="ja-JP" altLang="en-US" smtClean="0"/>
-              <a:t>2022/11/7</a:t>
+              <a:t>2022/11/14</a:t>
             </a:fld>
             <a:endParaRPr kumimoji="1" lang="ja-JP" altLang="en-US"/>
           </a:p>
@@ -8704,7 +8704,7 @@
           <a:p>
             <a:fld id="{99567159-F4A8-4352-915B-DDBEFEF4A4D6}" type="datetime1">
               <a:rPr kumimoji="1" lang="ja-JP" altLang="en-US" smtClean="0"/>
-              <a:t>2022/11/7</a:t>
+              <a:t>2022/11/14</a:t>
             </a:fld>
             <a:endParaRPr kumimoji="1" lang="ja-JP" altLang="en-US"/>
           </a:p>
@@ -9297,8 +9297,8 @@
               <a:t>MAmidiMEmo</a:t>
             </a:r>
             <a:r>
-              <a:rPr lang="en-US" altLang="ja-JP" dirty="0"/>
-              <a:t> V4.4.0.0</a:t>
+              <a:rPr lang="en-US" altLang="ja-JP"/>
+              <a:t> V4.4.4.0</a:t>
             </a:r>
             <a:endParaRPr lang="ja-JP" altLang="en-US" dirty="0"/>
           </a:p>
@@ -33173,7 +33173,7 @@
           <a:p>
             <a:r>
               <a:rPr kumimoji="1" lang="en-US" altLang="ja-JP" dirty="0"/>
-              <a:t>1 packet : 5 bytes</a:t>
+              <a:t>1 packet : 5 bytes + α</a:t>
             </a:r>
           </a:p>
           <a:p>
@@ -33352,7 +33352,7 @@
         </p:nvSpPr>
         <p:spPr>
           <a:xfrm>
-            <a:off x="3409950" y="3211097"/>
+            <a:off x="4375150" y="3211097"/>
             <a:ext cx="1708150" cy="292100"/>
           </a:xfrm>
           <a:prstGeom prst="rect">
@@ -33402,7 +33402,7 @@
         </p:nvSpPr>
         <p:spPr>
           <a:xfrm>
-            <a:off x="5118100" y="3211097"/>
+            <a:off x="6083300" y="3211097"/>
             <a:ext cx="1708150" cy="292100"/>
           </a:xfrm>
           <a:prstGeom prst="rect">
@@ -33452,7 +33452,7 @@
         </p:nvSpPr>
         <p:spPr>
           <a:xfrm>
-            <a:off x="6826250" y="3211097"/>
+            <a:off x="7791450" y="3211097"/>
             <a:ext cx="1708150" cy="292100"/>
           </a:xfrm>
           <a:prstGeom prst="rect">
@@ -33502,7 +33502,7 @@
         </p:nvSpPr>
         <p:spPr>
           <a:xfrm>
-            <a:off x="8534400" y="3211097"/>
+            <a:off x="9499600" y="3211097"/>
             <a:ext cx="1708150" cy="292100"/>
           </a:xfrm>
           <a:prstGeom prst="rect">
@@ -33552,7 +33552,7 @@
         </p:nvSpPr>
         <p:spPr>
           <a:xfrm>
-            <a:off x="10185400" y="3211097"/>
+            <a:off x="2659530" y="3211097"/>
             <a:ext cx="1708150" cy="292100"/>
           </a:xfrm>
           <a:prstGeom prst="rect">
@@ -33602,8 +33602,8 @@
         </p:nvSpPr>
         <p:spPr>
           <a:xfrm>
-            <a:off x="3830638" y="2797831"/>
-            <a:ext cx="525462" cy="338554"/>
+            <a:off x="2652060" y="2868194"/>
+            <a:ext cx="1683405" cy="338554"/>
           </a:xfrm>
           <a:prstGeom prst="rect">
             <a:avLst/>
@@ -33616,9 +33616,18 @@
           </a:bodyPr>
           <a:lstStyle/>
           <a:p>
+            <a:pPr algn="ctr"/>
             <a:r>
               <a:rPr kumimoji="1" lang="en-US" altLang="ja-JP" sz="1600" dirty="0"/>
-              <a:t>1st</a:t>
+              <a:t>1</a:t>
+            </a:r>
+            <a:r>
+              <a:rPr kumimoji="1" lang="en-US" altLang="ja-JP" sz="1600" baseline="30000" dirty="0"/>
+              <a:t>st</a:t>
+            </a:r>
+            <a:r>
+              <a:rPr kumimoji="1" lang="en-US" altLang="ja-JP" sz="1600" dirty="0"/>
+              <a:t>(Start)</a:t>
             </a:r>
             <a:endParaRPr lang="ja-JP" altLang="en-US" sz="1600" dirty="0"/>
           </a:p>
@@ -33638,8 +33647,8 @@
         </p:nvSpPr>
         <p:spPr>
           <a:xfrm>
-            <a:off x="5575300" y="2797831"/>
-            <a:ext cx="668338" cy="338554"/>
+            <a:off x="4367680" y="2868194"/>
+            <a:ext cx="1722763" cy="338554"/>
           </a:xfrm>
           <a:prstGeom prst="rect">
             <a:avLst/>
@@ -33652,9 +33661,26 @@
           </a:bodyPr>
           <a:lstStyle/>
           <a:p>
+            <a:pPr algn="ctr"/>
             <a:r>
               <a:rPr kumimoji="1" lang="en-US" altLang="ja-JP" sz="1600" dirty="0"/>
-              <a:t>2nd</a:t>
+              <a:t>2</a:t>
+            </a:r>
+            <a:r>
+              <a:rPr kumimoji="1" lang="en-US" altLang="ja-JP" sz="1600" baseline="30000" dirty="0"/>
+              <a:t>nd</a:t>
+            </a:r>
+            <a:r>
+              <a:rPr kumimoji="1" lang="en-US" altLang="ja-JP" sz="1600" dirty="0"/>
+              <a:t>(</a:t>
+            </a:r>
+            <a:r>
+              <a:rPr kumimoji="1" lang="en-US" altLang="ja-JP" sz="1600" dirty="0" err="1"/>
+              <a:t>clk</a:t>
+            </a:r>
+            <a:r>
+              <a:rPr kumimoji="1" lang="en-US" altLang="ja-JP" sz="1600" dirty="0"/>
+              <a:t>=0)</a:t>
             </a:r>
             <a:endParaRPr lang="ja-JP" altLang="en-US" sz="1600" dirty="0"/>
           </a:p>
@@ -33674,8 +33700,8 @@
         </p:nvSpPr>
         <p:spPr>
           <a:xfrm>
-            <a:off x="7274718" y="2797831"/>
-            <a:ext cx="811214" cy="338554"/>
+            <a:off x="6036472" y="2868194"/>
+            <a:ext cx="1747835" cy="338554"/>
           </a:xfrm>
           <a:prstGeom prst="rect">
             <a:avLst/>
@@ -33688,9 +33714,26 @@
           </a:bodyPr>
           <a:lstStyle/>
           <a:p>
+            <a:pPr algn="ctr"/>
             <a:r>
               <a:rPr kumimoji="1" lang="en-US" altLang="ja-JP" sz="1600" dirty="0"/>
-              <a:t>3rd</a:t>
+              <a:t>3</a:t>
+            </a:r>
+            <a:r>
+              <a:rPr kumimoji="1" lang="en-US" altLang="ja-JP" sz="1600" baseline="30000" dirty="0"/>
+              <a:t>rd</a:t>
+            </a:r>
+            <a:r>
+              <a:rPr kumimoji="1" lang="en-US" altLang="ja-JP" sz="1600" dirty="0"/>
+              <a:t>(</a:t>
+            </a:r>
+            <a:r>
+              <a:rPr kumimoji="1" lang="en-US" altLang="ja-JP" sz="1600" dirty="0" err="1"/>
+              <a:t>clk</a:t>
+            </a:r>
+            <a:r>
+              <a:rPr kumimoji="1" lang="en-US" altLang="ja-JP" sz="1600" dirty="0"/>
+              <a:t>=1)</a:t>
             </a:r>
             <a:endParaRPr lang="ja-JP" altLang="en-US" sz="1600" dirty="0"/>
           </a:p>
@@ -33710,8 +33753,8 @@
         </p:nvSpPr>
         <p:spPr>
           <a:xfrm>
-            <a:off x="9117012" y="2797831"/>
-            <a:ext cx="811214" cy="338554"/>
+            <a:off x="7759234" y="2868194"/>
+            <a:ext cx="1740365" cy="338554"/>
           </a:xfrm>
           <a:prstGeom prst="rect">
             <a:avLst/>
@@ -33724,9 +33767,26 @@
           </a:bodyPr>
           <a:lstStyle/>
           <a:p>
+            <a:pPr algn="ctr"/>
             <a:r>
               <a:rPr kumimoji="1" lang="en-US" altLang="ja-JP" sz="1600" dirty="0"/>
-              <a:t>4th</a:t>
+              <a:t>4</a:t>
+            </a:r>
+            <a:r>
+              <a:rPr kumimoji="1" lang="en-US" altLang="ja-JP" sz="1600" baseline="30000" dirty="0"/>
+              <a:t>th</a:t>
+            </a:r>
+            <a:r>
+              <a:rPr kumimoji="1" lang="en-US" altLang="ja-JP" sz="1600" dirty="0"/>
+              <a:t>(</a:t>
+            </a:r>
+            <a:r>
+              <a:rPr kumimoji="1" lang="en-US" altLang="ja-JP" sz="1600" dirty="0" err="1"/>
+              <a:t>clk</a:t>
+            </a:r>
+            <a:r>
+              <a:rPr kumimoji="1" lang="en-US" altLang="ja-JP" sz="1600" dirty="0"/>
+              <a:t>=0)</a:t>
             </a:r>
             <a:endParaRPr lang="ja-JP" altLang="en-US" sz="1600" dirty="0"/>
           </a:p>
@@ -33746,8 +33806,8 @@
         </p:nvSpPr>
         <p:spPr>
           <a:xfrm>
-            <a:off x="10694986" y="2797831"/>
-            <a:ext cx="811214" cy="338554"/>
+            <a:off x="9492456" y="2868194"/>
+            <a:ext cx="1701007" cy="338554"/>
           </a:xfrm>
           <a:prstGeom prst="rect">
             <a:avLst/>
@@ -33760,9 +33820,26 @@
           </a:bodyPr>
           <a:lstStyle/>
           <a:p>
+            <a:pPr algn="ctr"/>
             <a:r>
               <a:rPr kumimoji="1" lang="en-US" altLang="ja-JP" sz="1600" dirty="0"/>
-              <a:t>5th</a:t>
+              <a:t>5</a:t>
+            </a:r>
+            <a:r>
+              <a:rPr kumimoji="1" lang="en-US" altLang="ja-JP" sz="1600" baseline="30000" dirty="0"/>
+              <a:t>th</a:t>
+            </a:r>
+            <a:r>
+              <a:rPr kumimoji="1" lang="en-US" altLang="ja-JP" sz="1600" dirty="0"/>
+              <a:t>(</a:t>
+            </a:r>
+            <a:r>
+              <a:rPr kumimoji="1" lang="en-US" altLang="ja-JP" sz="1600" dirty="0" err="1"/>
+              <a:t>clk</a:t>
+            </a:r>
+            <a:r>
+              <a:rPr kumimoji="1" lang="en-US" altLang="ja-JP" sz="1600" dirty="0"/>
+              <a:t>=1)</a:t>
             </a:r>
             <a:endParaRPr lang="ja-JP" altLang="en-US" sz="1600" dirty="0"/>
           </a:p>
@@ -33782,7 +33859,7 @@
         </p:nvSpPr>
         <p:spPr>
           <a:xfrm>
-            <a:off x="3685268" y="4278413"/>
+            <a:off x="3685268" y="4150468"/>
             <a:ext cx="931974" cy="292100"/>
           </a:xfrm>
           <a:prstGeom prst="rect">
@@ -33831,7 +33908,7 @@
         </p:nvSpPr>
         <p:spPr>
           <a:xfrm>
-            <a:off x="4616450" y="4278413"/>
+            <a:off x="4616450" y="4150468"/>
             <a:ext cx="931974" cy="292100"/>
           </a:xfrm>
           <a:prstGeom prst="rect">
@@ -33880,7 +33957,7 @@
         </p:nvSpPr>
         <p:spPr>
           <a:xfrm>
-            <a:off x="5547632" y="4278413"/>
+            <a:off x="5547632" y="4150468"/>
             <a:ext cx="931974" cy="292100"/>
           </a:xfrm>
           <a:prstGeom prst="rect">
@@ -33910,7 +33987,7 @@
             <a:pPr algn="ctr"/>
             <a:r>
               <a:rPr lang="en-US" altLang="ja-JP" sz="1600" dirty="0"/>
-              <a:t>Start</a:t>
+              <a:t>1</a:t>
             </a:r>
             <a:endParaRPr kumimoji="1" lang="ja-JP" altLang="en-US" sz="1600" dirty="0"/>
           </a:p>
@@ -33930,7 +34007,7 @@
         </p:nvSpPr>
         <p:spPr>
           <a:xfrm>
-            <a:off x="6478814" y="4278413"/>
+            <a:off x="6478814" y="4150468"/>
             <a:ext cx="931974" cy="292100"/>
           </a:xfrm>
           <a:prstGeom prst="rect">
@@ -33959,8 +34036,8 @@
           <a:p>
             <a:pPr algn="ctr"/>
             <a:r>
-              <a:rPr kumimoji="1" lang="en-US" altLang="ja-JP" sz="1600" dirty="0" err="1"/>
-              <a:t>Clk</a:t>
+              <a:rPr kumimoji="1" lang="en-US" altLang="ja-JP" sz="1600" dirty="0"/>
+              <a:t>Type</a:t>
             </a:r>
             <a:endParaRPr kumimoji="1" lang="ja-JP" altLang="en-US" sz="1600" dirty="0"/>
           </a:p>
@@ -33980,7 +34057,7 @@
         </p:nvSpPr>
         <p:spPr>
           <a:xfrm>
-            <a:off x="7409996" y="4278413"/>
+            <a:off x="7409996" y="4150468"/>
             <a:ext cx="931974" cy="292100"/>
           </a:xfrm>
           <a:prstGeom prst="rect">
@@ -34010,7 +34087,7 @@
             <a:pPr algn="ctr"/>
             <a:r>
               <a:rPr kumimoji="1" lang="en-US" altLang="ja-JP" sz="1600" dirty="0"/>
-              <a:t>Data</a:t>
+              <a:t>Type</a:t>
             </a:r>
             <a:endParaRPr kumimoji="1" lang="ja-JP" altLang="en-US" sz="1600" dirty="0"/>
           </a:p>
@@ -34030,7 +34107,7 @@
         </p:nvSpPr>
         <p:spPr>
           <a:xfrm>
-            <a:off x="8341178" y="4278413"/>
+            <a:off x="8341178" y="4150468"/>
             <a:ext cx="931974" cy="292100"/>
           </a:xfrm>
           <a:prstGeom prst="rect">
@@ -34060,7 +34137,7 @@
             <a:pPr algn="ctr"/>
             <a:r>
               <a:rPr kumimoji="1" lang="en-US" altLang="ja-JP" sz="1600" dirty="0"/>
-              <a:t>Data</a:t>
+              <a:t>Type</a:t>
             </a:r>
             <a:endParaRPr kumimoji="1" lang="ja-JP" altLang="en-US" sz="1600" dirty="0"/>
           </a:p>
@@ -34080,7 +34157,7 @@
         </p:nvSpPr>
         <p:spPr>
           <a:xfrm>
-            <a:off x="9272360" y="4278413"/>
+            <a:off x="9272360" y="4150468"/>
             <a:ext cx="931974" cy="292100"/>
           </a:xfrm>
           <a:prstGeom prst="rect">
@@ -34110,7 +34187,7 @@
             <a:pPr algn="ctr"/>
             <a:r>
               <a:rPr kumimoji="1" lang="en-US" altLang="ja-JP" sz="1600" dirty="0"/>
-              <a:t>Data</a:t>
+              <a:t>Type</a:t>
             </a:r>
             <a:endParaRPr kumimoji="1" lang="ja-JP" altLang="en-US" sz="1600" dirty="0"/>
           </a:p>
@@ -34130,7 +34207,7 @@
         </p:nvSpPr>
         <p:spPr>
           <a:xfrm>
-            <a:off x="10203544" y="4278413"/>
+            <a:off x="10203544" y="4150468"/>
             <a:ext cx="931974" cy="292100"/>
           </a:xfrm>
           <a:prstGeom prst="rect">
@@ -34160,7 +34237,7 @@
             <a:pPr algn="ctr"/>
             <a:r>
               <a:rPr kumimoji="1" lang="en-US" altLang="ja-JP" sz="1600" dirty="0"/>
-              <a:t>Data</a:t>
+              <a:t>Type</a:t>
             </a:r>
             <a:endParaRPr kumimoji="1" lang="ja-JP" altLang="en-US" sz="1600" dirty="0"/>
           </a:p>
@@ -34180,7 +34257,7 @@
         </p:nvSpPr>
         <p:spPr>
           <a:xfrm>
-            <a:off x="10910888" y="4614447"/>
+            <a:off x="10453688" y="4764617"/>
             <a:ext cx="754062" cy="338554"/>
           </a:xfrm>
           <a:prstGeom prst="rect">
@@ -34216,7 +34293,44 @@
         </p:nvSpPr>
         <p:spPr>
           <a:xfrm>
-            <a:off x="10453688" y="3942379"/>
+            <a:off x="10202750" y="3814434"/>
+            <a:ext cx="931974" cy="338554"/>
+          </a:xfrm>
+          <a:prstGeom prst="rect">
+            <a:avLst/>
+          </a:prstGeom>
+          <a:noFill/>
+        </p:spPr>
+        <p:txBody>
+          <a:bodyPr wrap="square">
+            <a:spAutoFit/>
+          </a:bodyPr>
+          <a:lstStyle/>
+          <a:p>
+            <a:pPr algn="ctr"/>
+            <a:r>
+              <a:rPr kumimoji="1" lang="en-US" altLang="ja-JP" sz="1600" dirty="0"/>
+              <a:t>0</a:t>
+            </a:r>
+            <a:endParaRPr lang="ja-JP" altLang="en-US" sz="1600" dirty="0"/>
+          </a:p>
+        </p:txBody>
+      </p:sp>
+      <p:sp>
+        <p:nvSpPr>
+          <p:cNvPr id="31" name="テキスト ボックス 30">
+            <a:extLst>
+              <a:ext uri="{FF2B5EF4-FFF2-40B4-BE49-F238E27FC236}">
+                <a16:creationId xmlns:a16="http://schemas.microsoft.com/office/drawing/2014/main" id="{4FBB096C-7BE9-4853-808B-4AF85A43FA90}"/>
+              </a:ext>
+            </a:extLst>
+          </p:cNvPr>
+          <p:cNvSpPr txBox="1"/>
+          <p:nvPr/>
+        </p:nvSpPr>
+        <p:spPr>
+          <a:xfrm>
+            <a:off x="3701200" y="4724885"/>
             <a:ext cx="754062" cy="338554"/>
           </a:xfrm>
           <a:prstGeom prst="rect">
@@ -34232,7 +34346,7 @@
           <a:p>
             <a:r>
               <a:rPr kumimoji="1" lang="en-US" altLang="ja-JP" sz="1600" dirty="0"/>
-              <a:t>0</a:t>
+              <a:t>MSB</a:t>
             </a:r>
             <a:endParaRPr lang="ja-JP" altLang="en-US" sz="1600" dirty="0"/>
           </a:p>
@@ -34240,10 +34354,10 @@
       </p:sp>
       <p:sp>
         <p:nvSpPr>
-          <p:cNvPr id="31" name="テキスト ボックス 30">
+          <p:cNvPr id="32" name="テキスト ボックス 31">
             <a:extLst>
               <a:ext uri="{FF2B5EF4-FFF2-40B4-BE49-F238E27FC236}">
-                <a16:creationId xmlns:a16="http://schemas.microsoft.com/office/drawing/2014/main" id="{4FBB096C-7BE9-4853-808B-4AF85A43FA90}"/>
+                <a16:creationId xmlns:a16="http://schemas.microsoft.com/office/drawing/2014/main" id="{5E4FF8C6-04E3-4BBB-80FF-BF99A9A324F7}"/>
               </a:ext>
             </a:extLst>
           </p:cNvPr>
@@ -34252,7 +34366,442 @@
         </p:nvSpPr>
         <p:spPr>
           <a:xfrm>
-            <a:off x="3453607" y="4614447"/>
+            <a:off x="3683682" y="3814434"/>
+            <a:ext cx="931974" cy="338554"/>
+          </a:xfrm>
+          <a:prstGeom prst="rect">
+            <a:avLst/>
+          </a:prstGeom>
+          <a:noFill/>
+        </p:spPr>
+        <p:txBody>
+          <a:bodyPr wrap="square">
+            <a:spAutoFit/>
+          </a:bodyPr>
+          <a:lstStyle/>
+          <a:p>
+            <a:pPr algn="ctr"/>
+            <a:r>
+              <a:rPr kumimoji="1" lang="en-US" altLang="ja-JP" sz="1600" dirty="0"/>
+              <a:t>7</a:t>
+            </a:r>
+            <a:endParaRPr lang="ja-JP" altLang="en-US" sz="1600" dirty="0"/>
+          </a:p>
+        </p:txBody>
+      </p:sp>
+      <p:sp>
+        <p:nvSpPr>
+          <p:cNvPr id="10" name="正方形/長方形 9">
+            <a:extLst>
+              <a:ext uri="{FF2B5EF4-FFF2-40B4-BE49-F238E27FC236}">
+                <a16:creationId xmlns:a16="http://schemas.microsoft.com/office/drawing/2014/main" id="{478506DE-C4A6-BEEE-F149-2B4EDB9489BC}"/>
+              </a:ext>
+            </a:extLst>
+          </p:cNvPr>
+          <p:cNvSpPr/>
+          <p:nvPr/>
+        </p:nvSpPr>
+        <p:spPr>
+          <a:xfrm>
+            <a:off x="3685268" y="4442568"/>
+            <a:ext cx="931974" cy="292100"/>
+          </a:xfrm>
+          <a:prstGeom prst="rect">
+            <a:avLst/>
+          </a:prstGeom>
+          <a:solidFill>
+            <a:schemeClr val="bg1"/>
+          </a:solidFill>
+        </p:spPr>
+        <p:style>
+          <a:lnRef idx="2">
+            <a:schemeClr val="accent1">
+              <a:shade val="50000"/>
+            </a:schemeClr>
+          </a:lnRef>
+          <a:fillRef idx="1">
+            <a:schemeClr val="accent1"/>
+          </a:fillRef>
+          <a:effectRef idx="0">
+            <a:schemeClr val="accent1"/>
+          </a:effectRef>
+          <a:fontRef idx="minor">
+            <a:schemeClr val="lt1"/>
+          </a:fontRef>
+        </p:style>
+        <p:txBody>
+          <a:bodyPr rtlCol="0" anchor="ctr"/>
+          <a:lstStyle/>
+          <a:p>
+            <a:pPr algn="ctr"/>
+            <a:endParaRPr kumimoji="1" lang="ja-JP" altLang="en-US" sz="1600" dirty="0"/>
+          </a:p>
+        </p:txBody>
+      </p:sp>
+      <p:sp>
+        <p:nvSpPr>
+          <p:cNvPr id="11" name="正方形/長方形 10">
+            <a:extLst>
+              <a:ext uri="{FF2B5EF4-FFF2-40B4-BE49-F238E27FC236}">
+                <a16:creationId xmlns:a16="http://schemas.microsoft.com/office/drawing/2014/main" id="{5DE6008D-A295-8224-A8DB-60A78F5305CF}"/>
+              </a:ext>
+            </a:extLst>
+          </p:cNvPr>
+          <p:cNvSpPr/>
+          <p:nvPr/>
+        </p:nvSpPr>
+        <p:spPr>
+          <a:xfrm>
+            <a:off x="4616450" y="4442568"/>
+            <a:ext cx="931974" cy="292100"/>
+          </a:xfrm>
+          <a:prstGeom prst="rect">
+            <a:avLst/>
+          </a:prstGeom>
+          <a:solidFill>
+            <a:schemeClr val="bg1"/>
+          </a:solidFill>
+        </p:spPr>
+        <p:style>
+          <a:lnRef idx="2">
+            <a:schemeClr val="accent1">
+              <a:shade val="50000"/>
+            </a:schemeClr>
+          </a:lnRef>
+          <a:fillRef idx="1">
+            <a:schemeClr val="accent1"/>
+          </a:fillRef>
+          <a:effectRef idx="0">
+            <a:schemeClr val="accent1"/>
+          </a:effectRef>
+          <a:fontRef idx="minor">
+            <a:schemeClr val="lt1"/>
+          </a:fontRef>
+        </p:style>
+        <p:txBody>
+          <a:bodyPr rtlCol="0" anchor="ctr"/>
+          <a:lstStyle/>
+          <a:p>
+            <a:pPr algn="ctr"/>
+            <a:endParaRPr kumimoji="1" lang="ja-JP" altLang="en-US" sz="1600" dirty="0"/>
+          </a:p>
+        </p:txBody>
+      </p:sp>
+      <p:sp>
+        <p:nvSpPr>
+          <p:cNvPr id="12" name="正方形/長方形 11">
+            <a:extLst>
+              <a:ext uri="{FF2B5EF4-FFF2-40B4-BE49-F238E27FC236}">
+                <a16:creationId xmlns:a16="http://schemas.microsoft.com/office/drawing/2014/main" id="{A9D8EE6D-3028-80A4-83BC-22A0166138C8}"/>
+              </a:ext>
+            </a:extLst>
+          </p:cNvPr>
+          <p:cNvSpPr/>
+          <p:nvPr/>
+        </p:nvSpPr>
+        <p:spPr>
+          <a:xfrm>
+            <a:off x="5547632" y="4442568"/>
+            <a:ext cx="931974" cy="292100"/>
+          </a:xfrm>
+          <a:prstGeom prst="rect">
+            <a:avLst/>
+          </a:prstGeom>
+        </p:spPr>
+        <p:style>
+          <a:lnRef idx="2">
+            <a:schemeClr val="accent1">
+              <a:shade val="50000"/>
+            </a:schemeClr>
+          </a:lnRef>
+          <a:fillRef idx="1">
+            <a:schemeClr val="accent1"/>
+          </a:fillRef>
+          <a:effectRef idx="0">
+            <a:schemeClr val="accent1"/>
+          </a:effectRef>
+          <a:fontRef idx="minor">
+            <a:schemeClr val="lt1"/>
+          </a:fontRef>
+        </p:style>
+        <p:txBody>
+          <a:bodyPr rtlCol="0" anchor="ctr"/>
+          <a:lstStyle/>
+          <a:p>
+            <a:pPr algn="ctr"/>
+            <a:r>
+              <a:rPr lang="en-US" altLang="ja-JP" sz="1600" dirty="0"/>
+              <a:t>0</a:t>
+            </a:r>
+            <a:endParaRPr kumimoji="1" lang="ja-JP" altLang="en-US" sz="1600" dirty="0"/>
+          </a:p>
+        </p:txBody>
+      </p:sp>
+      <p:sp>
+        <p:nvSpPr>
+          <p:cNvPr id="16" name="正方形/長方形 15">
+            <a:extLst>
+              <a:ext uri="{FF2B5EF4-FFF2-40B4-BE49-F238E27FC236}">
+                <a16:creationId xmlns:a16="http://schemas.microsoft.com/office/drawing/2014/main" id="{66E10A75-D78B-6248-F89D-3EFF22F74953}"/>
+              </a:ext>
+            </a:extLst>
+          </p:cNvPr>
+          <p:cNvSpPr/>
+          <p:nvPr/>
+        </p:nvSpPr>
+        <p:spPr>
+          <a:xfrm>
+            <a:off x="6478814" y="4442568"/>
+            <a:ext cx="931974" cy="292100"/>
+          </a:xfrm>
+          <a:prstGeom prst="rect">
+            <a:avLst/>
+          </a:prstGeom>
+        </p:spPr>
+        <p:style>
+          <a:lnRef idx="2">
+            <a:schemeClr val="accent1">
+              <a:shade val="50000"/>
+            </a:schemeClr>
+          </a:lnRef>
+          <a:fillRef idx="1">
+            <a:schemeClr val="accent1"/>
+          </a:fillRef>
+          <a:effectRef idx="0">
+            <a:schemeClr val="accent1"/>
+          </a:effectRef>
+          <a:fontRef idx="minor">
+            <a:schemeClr val="lt1"/>
+          </a:fontRef>
+        </p:style>
+        <p:txBody>
+          <a:bodyPr rtlCol="0" anchor="ctr"/>
+          <a:lstStyle/>
+          <a:p>
+            <a:pPr algn="ctr"/>
+            <a:r>
+              <a:rPr kumimoji="1" lang="en-US" altLang="ja-JP" sz="1600" dirty="0" err="1"/>
+              <a:t>clk</a:t>
+            </a:r>
+            <a:endParaRPr kumimoji="1" lang="ja-JP" altLang="en-US" sz="1600" dirty="0"/>
+          </a:p>
+        </p:txBody>
+      </p:sp>
+      <p:sp>
+        <p:nvSpPr>
+          <p:cNvPr id="27" name="正方形/長方形 26">
+            <a:extLst>
+              <a:ext uri="{FF2B5EF4-FFF2-40B4-BE49-F238E27FC236}">
+                <a16:creationId xmlns:a16="http://schemas.microsoft.com/office/drawing/2014/main" id="{A0668D44-ED14-2275-D91F-33F330C9616E}"/>
+              </a:ext>
+            </a:extLst>
+          </p:cNvPr>
+          <p:cNvSpPr/>
+          <p:nvPr/>
+        </p:nvSpPr>
+        <p:spPr>
+          <a:xfrm>
+            <a:off x="7409996" y="4442568"/>
+            <a:ext cx="931974" cy="292100"/>
+          </a:xfrm>
+          <a:prstGeom prst="rect">
+            <a:avLst/>
+          </a:prstGeom>
+        </p:spPr>
+        <p:style>
+          <a:lnRef idx="2">
+            <a:schemeClr val="accent1">
+              <a:shade val="50000"/>
+            </a:schemeClr>
+          </a:lnRef>
+          <a:fillRef idx="1">
+            <a:schemeClr val="accent1"/>
+          </a:fillRef>
+          <a:effectRef idx="0">
+            <a:schemeClr val="accent1"/>
+          </a:effectRef>
+          <a:fontRef idx="minor">
+            <a:schemeClr val="lt1"/>
+          </a:fontRef>
+        </p:style>
+        <p:txBody>
+          <a:bodyPr rtlCol="0" anchor="ctr"/>
+          <a:lstStyle/>
+          <a:p>
+            <a:pPr algn="ctr"/>
+            <a:r>
+              <a:rPr kumimoji="1" lang="en-US" altLang="ja-JP" sz="1600" dirty="0"/>
+              <a:t>Data</a:t>
+            </a:r>
+            <a:endParaRPr kumimoji="1" lang="ja-JP" altLang="en-US" sz="1600" dirty="0"/>
+          </a:p>
+        </p:txBody>
+      </p:sp>
+      <p:sp>
+        <p:nvSpPr>
+          <p:cNvPr id="28" name="正方形/長方形 27">
+            <a:extLst>
+              <a:ext uri="{FF2B5EF4-FFF2-40B4-BE49-F238E27FC236}">
+                <a16:creationId xmlns:a16="http://schemas.microsoft.com/office/drawing/2014/main" id="{324020AE-1D74-2BBE-B6AE-2DBB28872336}"/>
+              </a:ext>
+            </a:extLst>
+          </p:cNvPr>
+          <p:cNvSpPr/>
+          <p:nvPr/>
+        </p:nvSpPr>
+        <p:spPr>
+          <a:xfrm>
+            <a:off x="8341178" y="4442568"/>
+            <a:ext cx="931974" cy="292100"/>
+          </a:xfrm>
+          <a:prstGeom prst="rect">
+            <a:avLst/>
+          </a:prstGeom>
+        </p:spPr>
+        <p:style>
+          <a:lnRef idx="2">
+            <a:schemeClr val="accent1">
+              <a:shade val="50000"/>
+            </a:schemeClr>
+          </a:lnRef>
+          <a:fillRef idx="1">
+            <a:schemeClr val="accent1"/>
+          </a:fillRef>
+          <a:effectRef idx="0">
+            <a:schemeClr val="accent1"/>
+          </a:effectRef>
+          <a:fontRef idx="minor">
+            <a:schemeClr val="lt1"/>
+          </a:fontRef>
+        </p:style>
+        <p:txBody>
+          <a:bodyPr rtlCol="0" anchor="ctr"/>
+          <a:lstStyle/>
+          <a:p>
+            <a:pPr algn="ctr"/>
+            <a:r>
+              <a:rPr kumimoji="1" lang="en-US" altLang="ja-JP" sz="1600" dirty="0"/>
+              <a:t>Data</a:t>
+            </a:r>
+            <a:endParaRPr kumimoji="1" lang="ja-JP" altLang="en-US" sz="1600" dirty="0"/>
+          </a:p>
+        </p:txBody>
+      </p:sp>
+      <p:sp>
+        <p:nvSpPr>
+          <p:cNvPr id="33" name="正方形/長方形 32">
+            <a:extLst>
+              <a:ext uri="{FF2B5EF4-FFF2-40B4-BE49-F238E27FC236}">
+                <a16:creationId xmlns:a16="http://schemas.microsoft.com/office/drawing/2014/main" id="{F05F5EA1-7E83-1625-891E-FBAD75E64B41}"/>
+              </a:ext>
+            </a:extLst>
+          </p:cNvPr>
+          <p:cNvSpPr/>
+          <p:nvPr/>
+        </p:nvSpPr>
+        <p:spPr>
+          <a:xfrm>
+            <a:off x="9272360" y="4442568"/>
+            <a:ext cx="931974" cy="292100"/>
+          </a:xfrm>
+          <a:prstGeom prst="rect">
+            <a:avLst/>
+          </a:prstGeom>
+        </p:spPr>
+        <p:style>
+          <a:lnRef idx="2">
+            <a:schemeClr val="accent1">
+              <a:shade val="50000"/>
+            </a:schemeClr>
+          </a:lnRef>
+          <a:fillRef idx="1">
+            <a:schemeClr val="accent1"/>
+          </a:fillRef>
+          <a:effectRef idx="0">
+            <a:schemeClr val="accent1"/>
+          </a:effectRef>
+          <a:fontRef idx="minor">
+            <a:schemeClr val="lt1"/>
+          </a:fontRef>
+        </p:style>
+        <p:txBody>
+          <a:bodyPr rtlCol="0" anchor="ctr"/>
+          <a:lstStyle/>
+          <a:p>
+            <a:pPr algn="ctr"/>
+            <a:r>
+              <a:rPr kumimoji="1" lang="en-US" altLang="ja-JP" sz="1600" dirty="0"/>
+              <a:t>Data</a:t>
+            </a:r>
+            <a:endParaRPr kumimoji="1" lang="ja-JP" altLang="en-US" sz="1600" dirty="0"/>
+          </a:p>
+        </p:txBody>
+      </p:sp>
+      <p:sp>
+        <p:nvSpPr>
+          <p:cNvPr id="34" name="正方形/長方形 33">
+            <a:extLst>
+              <a:ext uri="{FF2B5EF4-FFF2-40B4-BE49-F238E27FC236}">
+                <a16:creationId xmlns:a16="http://schemas.microsoft.com/office/drawing/2014/main" id="{7CBDC923-4B35-09F7-CE6B-4605F7730CE1}"/>
+              </a:ext>
+            </a:extLst>
+          </p:cNvPr>
+          <p:cNvSpPr/>
+          <p:nvPr/>
+        </p:nvSpPr>
+        <p:spPr>
+          <a:xfrm>
+            <a:off x="10203544" y="4442568"/>
+            <a:ext cx="931974" cy="292100"/>
+          </a:xfrm>
+          <a:prstGeom prst="rect">
+            <a:avLst/>
+          </a:prstGeom>
+        </p:spPr>
+        <p:style>
+          <a:lnRef idx="2">
+            <a:schemeClr val="accent1">
+              <a:shade val="50000"/>
+            </a:schemeClr>
+          </a:lnRef>
+          <a:fillRef idx="1">
+            <a:schemeClr val="accent1"/>
+          </a:fillRef>
+          <a:effectRef idx="0">
+            <a:schemeClr val="accent1"/>
+          </a:effectRef>
+          <a:fontRef idx="minor">
+            <a:schemeClr val="lt1"/>
+          </a:fontRef>
+        </p:style>
+        <p:txBody>
+          <a:bodyPr rtlCol="0" anchor="ctr"/>
+          <a:lstStyle/>
+          <a:p>
+            <a:pPr algn="ctr"/>
+            <a:r>
+              <a:rPr kumimoji="1" lang="en-US" altLang="ja-JP" sz="1600" dirty="0"/>
+              <a:t>Data</a:t>
+            </a:r>
+            <a:endParaRPr kumimoji="1" lang="ja-JP" altLang="en-US" sz="1600" dirty="0"/>
+          </a:p>
+        </p:txBody>
+      </p:sp>
+      <p:sp>
+        <p:nvSpPr>
+          <p:cNvPr id="37" name="テキスト ボックス 36">
+            <a:extLst>
+              <a:ext uri="{FF2B5EF4-FFF2-40B4-BE49-F238E27FC236}">
+                <a16:creationId xmlns:a16="http://schemas.microsoft.com/office/drawing/2014/main" id="{24E6C233-7582-B65B-8CA8-628B9BD91206}"/>
+              </a:ext>
+            </a:extLst>
+          </p:cNvPr>
+          <p:cNvSpPr txBox="1"/>
+          <p:nvPr/>
+        </p:nvSpPr>
+        <p:spPr>
+          <a:xfrm>
+            <a:off x="2858974" y="4127241"/>
             <a:ext cx="754062" cy="338554"/>
           </a:xfrm>
           <a:prstGeom prst="rect">
@@ -34268,7 +34817,7 @@
           <a:p>
             <a:r>
               <a:rPr kumimoji="1" lang="en-US" altLang="ja-JP" sz="1600" dirty="0"/>
-              <a:t>MSB</a:t>
+              <a:t>Start</a:t>
             </a:r>
             <a:endParaRPr lang="ja-JP" altLang="en-US" sz="1600" dirty="0"/>
           </a:p>
@@ -34276,10 +34825,10 @@
       </p:sp>
       <p:sp>
         <p:nvSpPr>
-          <p:cNvPr id="32" name="テキスト ボックス 31">
+          <p:cNvPr id="38" name="テキスト ボックス 37">
             <a:extLst>
               <a:ext uri="{FF2B5EF4-FFF2-40B4-BE49-F238E27FC236}">
-                <a16:creationId xmlns:a16="http://schemas.microsoft.com/office/drawing/2014/main" id="{5E4FF8C6-04E3-4BBB-80FF-BF99A9A324F7}"/>
+                <a16:creationId xmlns:a16="http://schemas.microsoft.com/office/drawing/2014/main" id="{BAD04C24-4EBC-79B7-9D31-FB105C37DA06}"/>
               </a:ext>
             </a:extLst>
           </p:cNvPr>
@@ -34288,7 +34837,7 @@
         </p:nvSpPr>
         <p:spPr>
           <a:xfrm>
-            <a:off x="3716338" y="3942379"/>
+            <a:off x="2858974" y="4426063"/>
             <a:ext cx="754062" cy="338554"/>
           </a:xfrm>
           <a:prstGeom prst="rect">
@@ -34303,10 +34852,60 @@
           <a:lstStyle/>
           <a:p>
             <a:r>
+              <a:rPr kumimoji="1" lang="en-US" altLang="ja-JP" sz="1600" dirty="0" err="1"/>
+              <a:t>Clk</a:t>
+            </a:r>
+            <a:endParaRPr lang="ja-JP" altLang="en-US" sz="1600" dirty="0"/>
+          </a:p>
+        </p:txBody>
+      </p:sp>
+      <p:sp>
+        <p:nvSpPr>
+          <p:cNvPr id="40" name="正方形/長方形 39">
+            <a:extLst>
+              <a:ext uri="{FF2B5EF4-FFF2-40B4-BE49-F238E27FC236}">
+                <a16:creationId xmlns:a16="http://schemas.microsoft.com/office/drawing/2014/main" id="{81384D31-A7C9-4A76-9DD8-688389BBA22E}"/>
+              </a:ext>
+            </a:extLst>
+          </p:cNvPr>
+          <p:cNvSpPr/>
+          <p:nvPr/>
+        </p:nvSpPr>
+        <p:spPr>
+          <a:xfrm>
+            <a:off x="11164257" y="3211097"/>
+            <a:ext cx="754063" cy="292100"/>
+          </a:xfrm>
+          <a:prstGeom prst="rect">
+            <a:avLst/>
+          </a:prstGeom>
+        </p:spPr>
+        <p:style>
+          <a:lnRef idx="2">
+            <a:schemeClr val="accent1">
+              <a:shade val="50000"/>
+            </a:schemeClr>
+          </a:lnRef>
+          <a:fillRef idx="1">
+            <a:schemeClr val="accent1"/>
+          </a:fillRef>
+          <a:effectRef idx="0">
+            <a:schemeClr val="accent1"/>
+          </a:effectRef>
+          <a:fontRef idx="minor">
+            <a:schemeClr val="lt1"/>
+          </a:fontRef>
+        </p:style>
+        <p:txBody>
+          <a:bodyPr rtlCol="0" anchor="ctr"/>
+          <a:lstStyle/>
+          <a:p>
+            <a:pPr algn="ctr"/>
+            <a:r>
               <a:rPr kumimoji="1" lang="en-US" altLang="ja-JP" sz="1600" dirty="0"/>
-              <a:t>7</a:t>
-            </a:r>
-            <a:endParaRPr lang="ja-JP" altLang="en-US" sz="1600" dirty="0"/>
+              <a:t>…</a:t>
+            </a:r>
+            <a:endParaRPr kumimoji="1" lang="ja-JP" altLang="en-US" sz="1600" dirty="0"/>
           </a:p>
         </p:txBody>
       </p:sp>

</xml_diff>

<commit_message>
- Fixed VGM/XGM playback routine for VGMPlayer. - Added VGMPlay_msx_Vkey.rom (See the manual for details)
</commit_message>
<xml_diff>
--- a/docs/MAmidiMEmo/Manual.pptx
+++ b/docs/MAmidiMEmo/Manual.pptx
@@ -231,7 +231,7 @@
           <a:p>
             <a:fld id="{581C28D8-13B6-41C3-9F5F-0284C569C6F1}" type="datetimeFigureOut">
               <a:rPr kumimoji="1" lang="ja-JP" altLang="en-US" smtClean="0"/>
-              <a:t>2022/11/14</a:t>
+              <a:t>2022/12/17</a:t>
             </a:fld>
             <a:endParaRPr kumimoji="1" lang="ja-JP" altLang="en-US"/>
           </a:p>
@@ -1558,7 +1558,7 @@
           <a:p>
             <a:fld id="{B8625E62-B904-4691-B75E-EC1C32885285}" type="datetime1">
               <a:rPr kumimoji="1" lang="ja-JP" altLang="en-US" smtClean="0"/>
-              <a:t>2022/11/14</a:t>
+              <a:t>2022/12/17</a:t>
             </a:fld>
             <a:endParaRPr kumimoji="1" lang="ja-JP" altLang="en-US"/>
           </a:p>
@@ -1896,7 +1896,7 @@
           <a:p>
             <a:fld id="{A4C87007-2A40-4EFC-90A3-258EFA3C1001}" type="datetime1">
               <a:rPr kumimoji="1" lang="ja-JP" altLang="en-US" smtClean="0"/>
-              <a:t>2022/11/14</a:t>
+              <a:t>2022/12/17</a:t>
             </a:fld>
             <a:endParaRPr kumimoji="1" lang="ja-JP" altLang="en-US"/>
           </a:p>
@@ -2297,7 +2297,7 @@
           <a:p>
             <a:fld id="{0FE0D7FF-9203-4AA3-90FD-622674A14F90}" type="datetime1">
               <a:rPr kumimoji="1" lang="ja-JP" altLang="en-US" smtClean="0"/>
-              <a:t>2022/11/14</a:t>
+              <a:t>2022/12/17</a:t>
             </a:fld>
             <a:endParaRPr kumimoji="1" lang="ja-JP" altLang="en-US"/>
           </a:p>
@@ -2633,7 +2633,7 @@
           <a:p>
             <a:fld id="{D2D6E4D3-BEDB-4F35-876B-5B9AA41BFB5B}" type="datetime1">
               <a:rPr kumimoji="1" lang="ja-JP" altLang="en-US" smtClean="0"/>
-              <a:t>2022/11/14</a:t>
+              <a:t>2022/12/17</a:t>
             </a:fld>
             <a:endParaRPr kumimoji="1" lang="ja-JP" altLang="en-US"/>
           </a:p>
@@ -2953,7 +2953,7 @@
           <a:p>
             <a:fld id="{2ACD896E-FC14-4F25-BC47-18ABAEA9E1FE}" type="datetime1">
               <a:rPr kumimoji="1" lang="ja-JP" altLang="en-US" smtClean="0"/>
-              <a:t>2022/11/14</a:t>
+              <a:t>2022/12/17</a:t>
             </a:fld>
             <a:endParaRPr kumimoji="1" lang="ja-JP" altLang="en-US"/>
           </a:p>
@@ -3349,7 +3349,7 @@
           <a:p>
             <a:fld id="{54FC701B-2185-4987-B8E2-5507664B65F4}" type="datetime1">
               <a:rPr kumimoji="1" lang="ja-JP" altLang="en-US" smtClean="0"/>
-              <a:t>2022/11/14</a:t>
+              <a:t>2022/12/17</a:t>
             </a:fld>
             <a:endParaRPr kumimoji="1" lang="ja-JP" altLang="en-US"/>
           </a:p>
@@ -3638,7 +3638,7 @@
           <a:p>
             <a:fld id="{3FB4CDED-9617-418F-B546-D66B9BB6C35E}" type="datetime1">
               <a:rPr kumimoji="1" lang="ja-JP" altLang="en-US" smtClean="0"/>
-              <a:t>2022/11/14</a:t>
+              <a:t>2022/12/17</a:t>
             </a:fld>
             <a:endParaRPr kumimoji="1" lang="ja-JP" altLang="en-US"/>
           </a:p>
@@ -3932,7 +3932,7 @@
           <a:p>
             <a:fld id="{F5635D40-962A-46D7-8037-3F2900B5EB4D}" type="datetime1">
               <a:rPr kumimoji="1" lang="ja-JP" altLang="en-US" smtClean="0"/>
-              <a:t>2022/11/14</a:t>
+              <a:t>2022/12/17</a:t>
             </a:fld>
             <a:endParaRPr kumimoji="1" lang="ja-JP" altLang="en-US"/>
           </a:p>
@@ -4226,7 +4226,7 @@
           <a:p>
             <a:fld id="{741DA9A2-8356-4FFD-B66A-E38811049858}" type="datetime1">
               <a:rPr kumimoji="1" lang="ja-JP" altLang="en-US" smtClean="0"/>
-              <a:t>2022/11/14</a:t>
+              <a:t>2022/12/17</a:t>
             </a:fld>
             <a:endParaRPr kumimoji="1" lang="ja-JP" altLang="en-US"/>
           </a:p>
@@ -4555,7 +4555,7 @@
           <a:p>
             <a:fld id="{9DDE8989-88B8-4869-97D9-547531F13E13}" type="datetime1">
               <a:rPr kumimoji="1" lang="ja-JP" altLang="en-US" smtClean="0"/>
-              <a:t>2022/11/14</a:t>
+              <a:t>2022/12/17</a:t>
             </a:fld>
             <a:endParaRPr kumimoji="1" lang="ja-JP" altLang="en-US"/>
           </a:p>
@@ -4942,7 +4942,7 @@
           <a:p>
             <a:fld id="{81EC4031-B949-4300-AB3E-1551426E8631}" type="datetime1">
               <a:rPr kumimoji="1" lang="ja-JP" altLang="en-US" smtClean="0"/>
-              <a:t>2022/11/14</a:t>
+              <a:t>2022/12/17</a:t>
             </a:fld>
             <a:endParaRPr kumimoji="1" lang="ja-JP" altLang="en-US"/>
           </a:p>
@@ -5463,7 +5463,7 @@
           <a:p>
             <a:fld id="{F39E755E-A59D-4634-B604-E9BB568B1156}" type="datetime1">
               <a:rPr kumimoji="1" lang="ja-JP" altLang="en-US" smtClean="0"/>
-              <a:t>2022/11/14</a:t>
+              <a:t>2022/12/17</a:t>
             </a:fld>
             <a:endParaRPr kumimoji="1" lang="ja-JP" altLang="en-US"/>
           </a:p>
@@ -5668,7 +5668,7 @@
           <a:p>
             <a:fld id="{61DA38B3-7601-4256-ABFE-386B92B0EDB5}" type="datetime1">
               <a:rPr kumimoji="1" lang="ja-JP" altLang="en-US" smtClean="0"/>
-              <a:t>2022/11/14</a:t>
+              <a:t>2022/12/17</a:t>
             </a:fld>
             <a:endParaRPr kumimoji="1" lang="ja-JP" altLang="en-US"/>
           </a:p>
@@ -5845,7 +5845,7 @@
           <a:p>
             <a:fld id="{5A28ED6D-8A94-4DBA-8EF2-284D1A467CE8}" type="datetime1">
               <a:rPr kumimoji="1" lang="ja-JP" altLang="en-US" smtClean="0"/>
-              <a:t>2022/11/14</a:t>
+              <a:t>2022/12/17</a:t>
             </a:fld>
             <a:endParaRPr kumimoji="1" lang="ja-JP" altLang="en-US"/>
           </a:p>
@@ -6210,7 +6210,7 @@
           <a:p>
             <a:fld id="{B27B0317-28AF-43C5-8944-AADFA89E0149}" type="datetime1">
               <a:rPr kumimoji="1" lang="ja-JP" altLang="en-US" smtClean="0"/>
-              <a:t>2022/11/14</a:t>
+              <a:t>2022/12/17</a:t>
             </a:fld>
             <a:endParaRPr kumimoji="1" lang="ja-JP" altLang="en-US"/>
           </a:p>
@@ -6555,7 +6555,7 @@
           <a:p>
             <a:fld id="{A78D023C-C4FA-4CE8-B5BE-6798898EE377}" type="datetime1">
               <a:rPr kumimoji="1" lang="ja-JP" altLang="en-US" smtClean="0"/>
-              <a:t>2022/11/14</a:t>
+              <a:t>2022/12/17</a:t>
             </a:fld>
             <a:endParaRPr kumimoji="1" lang="ja-JP" altLang="en-US"/>
           </a:p>
@@ -8704,7 +8704,7 @@
           <a:p>
             <a:fld id="{99567159-F4A8-4352-915B-DDBEFEF4A4D6}" type="datetime1">
               <a:rPr kumimoji="1" lang="ja-JP" altLang="en-US" smtClean="0"/>
-              <a:t>2022/11/14</a:t>
+              <a:t>2022/12/17</a:t>
             </a:fld>
             <a:endParaRPr kumimoji="1" lang="ja-JP" altLang="en-US"/>
           </a:p>
@@ -9298,7 +9298,7 @@
             </a:r>
             <a:r>
               <a:rPr lang="en-US" altLang="ja-JP"/>
-              <a:t> V4.4.4.0</a:t>
+              <a:t> V4.5.5.0</a:t>
             </a:r>
             <a:endParaRPr lang="ja-JP" altLang="en-US" dirty="0"/>
           </a:p>
@@ -24564,7 +24564,7 @@
         </p:spPr>
         <p:txBody>
           <a:bodyPr>
-            <a:normAutofit fontScale="85000" lnSpcReduction="10000"/>
+            <a:normAutofit fontScale="85000" lnSpcReduction="20000"/>
           </a:bodyPr>
           <a:lstStyle/>
           <a:p>
@@ -24606,7 +24606,7 @@
             </a:r>
             <a:r>
               <a:rPr kumimoji="1" lang="en-US" altLang="ja-JP" dirty="0"/>
-              <a:t>/bin(for MSX) or VGMPlay_</a:t>
+              <a:t>(for MSX*) or VGMPlay_</a:t>
             </a:r>
             <a:r>
               <a:rPr lang="en-US" altLang="ja-JP" dirty="0"/>
@@ -24644,6 +24644,29 @@
             <a:r>
               <a:rPr kumimoji="1" lang="en-US" altLang="ja-JP" sz="1300" dirty="0"/>
               <a:t> UI</a:t>
+            </a:r>
+            <a:br>
+              <a:rPr kumimoji="1" lang="en-US" altLang="ja-JP" sz="1300" dirty="0"/>
+            </a:br>
+            <a:r>
+              <a:rPr kumimoji="1" lang="en-US" altLang="ja-JP" sz="1300" dirty="0"/>
+              <a:t>*</a:t>
+            </a:r>
+            <a:r>
+              <a:rPr kumimoji="1" lang="en-US" altLang="ja-JP" sz="1300" dirty="0" err="1"/>
+              <a:t>VGMPlaymsx_Vkey.rom</a:t>
+            </a:r>
+            <a:r>
+              <a:rPr kumimoji="1" lang="en-US" altLang="ja-JP" sz="1300" dirty="0"/>
+              <a:t> can skip booting from this ROM while the [V] key is </a:t>
+            </a:r>
+            <a:r>
+              <a:rPr kumimoji="1" lang="en-US" altLang="ja-JP" sz="1300" b="1" dirty="0"/>
+              <a:t>NOT</a:t>
+            </a:r>
+            <a:r>
+              <a:rPr kumimoji="1" lang="en-US" altLang="ja-JP" sz="1300" dirty="0"/>
+              <a:t> pressed at boot time.</a:t>
             </a:r>
           </a:p>
           <a:p>

</xml_diff>

<commit_message>
- Supported PC-6001 for VSIF(FTDI). VSIF(FTDI) spec is same as MSX.
</commit_message>
<xml_diff>
--- a/docs/MAmidiMEmo/Manual.pptx
+++ b/docs/MAmidiMEmo/Manual.pptx
@@ -231,7 +231,7 @@
           <a:p>
             <a:fld id="{581C28D8-13B6-41C3-9F5F-0284C569C6F1}" type="datetimeFigureOut">
               <a:rPr kumimoji="1" lang="ja-JP" altLang="en-US" smtClean="0"/>
-              <a:t>2022/12/17</a:t>
+              <a:t>2022/12/28</a:t>
             </a:fld>
             <a:endParaRPr kumimoji="1" lang="ja-JP" altLang="en-US"/>
           </a:p>
@@ -1558,7 +1558,7 @@
           <a:p>
             <a:fld id="{B8625E62-B904-4691-B75E-EC1C32885285}" type="datetime1">
               <a:rPr kumimoji="1" lang="ja-JP" altLang="en-US" smtClean="0"/>
-              <a:t>2022/12/17</a:t>
+              <a:t>2022/12/28</a:t>
             </a:fld>
             <a:endParaRPr kumimoji="1" lang="ja-JP" altLang="en-US"/>
           </a:p>
@@ -1896,7 +1896,7 @@
           <a:p>
             <a:fld id="{A4C87007-2A40-4EFC-90A3-258EFA3C1001}" type="datetime1">
               <a:rPr kumimoji="1" lang="ja-JP" altLang="en-US" smtClean="0"/>
-              <a:t>2022/12/17</a:t>
+              <a:t>2022/12/28</a:t>
             </a:fld>
             <a:endParaRPr kumimoji="1" lang="ja-JP" altLang="en-US"/>
           </a:p>
@@ -2297,7 +2297,7 @@
           <a:p>
             <a:fld id="{0FE0D7FF-9203-4AA3-90FD-622674A14F90}" type="datetime1">
               <a:rPr kumimoji="1" lang="ja-JP" altLang="en-US" smtClean="0"/>
-              <a:t>2022/12/17</a:t>
+              <a:t>2022/12/28</a:t>
             </a:fld>
             <a:endParaRPr kumimoji="1" lang="ja-JP" altLang="en-US"/>
           </a:p>
@@ -2633,7 +2633,7 @@
           <a:p>
             <a:fld id="{D2D6E4D3-BEDB-4F35-876B-5B9AA41BFB5B}" type="datetime1">
               <a:rPr kumimoji="1" lang="ja-JP" altLang="en-US" smtClean="0"/>
-              <a:t>2022/12/17</a:t>
+              <a:t>2022/12/28</a:t>
             </a:fld>
             <a:endParaRPr kumimoji="1" lang="ja-JP" altLang="en-US"/>
           </a:p>
@@ -2953,7 +2953,7 @@
           <a:p>
             <a:fld id="{2ACD896E-FC14-4F25-BC47-18ABAEA9E1FE}" type="datetime1">
               <a:rPr kumimoji="1" lang="ja-JP" altLang="en-US" smtClean="0"/>
-              <a:t>2022/12/17</a:t>
+              <a:t>2022/12/28</a:t>
             </a:fld>
             <a:endParaRPr kumimoji="1" lang="ja-JP" altLang="en-US"/>
           </a:p>
@@ -3349,7 +3349,7 @@
           <a:p>
             <a:fld id="{54FC701B-2185-4987-B8E2-5507664B65F4}" type="datetime1">
               <a:rPr kumimoji="1" lang="ja-JP" altLang="en-US" smtClean="0"/>
-              <a:t>2022/12/17</a:t>
+              <a:t>2022/12/28</a:t>
             </a:fld>
             <a:endParaRPr kumimoji="1" lang="ja-JP" altLang="en-US"/>
           </a:p>
@@ -3638,7 +3638,7 @@
           <a:p>
             <a:fld id="{3FB4CDED-9617-418F-B546-D66B9BB6C35E}" type="datetime1">
               <a:rPr kumimoji="1" lang="ja-JP" altLang="en-US" smtClean="0"/>
-              <a:t>2022/12/17</a:t>
+              <a:t>2022/12/28</a:t>
             </a:fld>
             <a:endParaRPr kumimoji="1" lang="ja-JP" altLang="en-US"/>
           </a:p>
@@ -3932,7 +3932,7 @@
           <a:p>
             <a:fld id="{F5635D40-962A-46D7-8037-3F2900B5EB4D}" type="datetime1">
               <a:rPr kumimoji="1" lang="ja-JP" altLang="en-US" smtClean="0"/>
-              <a:t>2022/12/17</a:t>
+              <a:t>2022/12/28</a:t>
             </a:fld>
             <a:endParaRPr kumimoji="1" lang="ja-JP" altLang="en-US"/>
           </a:p>
@@ -4226,7 +4226,7 @@
           <a:p>
             <a:fld id="{741DA9A2-8356-4FFD-B66A-E38811049858}" type="datetime1">
               <a:rPr kumimoji="1" lang="ja-JP" altLang="en-US" smtClean="0"/>
-              <a:t>2022/12/17</a:t>
+              <a:t>2022/12/28</a:t>
             </a:fld>
             <a:endParaRPr kumimoji="1" lang="ja-JP" altLang="en-US"/>
           </a:p>
@@ -4555,7 +4555,7 @@
           <a:p>
             <a:fld id="{9DDE8989-88B8-4869-97D9-547531F13E13}" type="datetime1">
               <a:rPr kumimoji="1" lang="ja-JP" altLang="en-US" smtClean="0"/>
-              <a:t>2022/12/17</a:t>
+              <a:t>2022/12/28</a:t>
             </a:fld>
             <a:endParaRPr kumimoji="1" lang="ja-JP" altLang="en-US"/>
           </a:p>
@@ -4942,7 +4942,7 @@
           <a:p>
             <a:fld id="{81EC4031-B949-4300-AB3E-1551426E8631}" type="datetime1">
               <a:rPr kumimoji="1" lang="ja-JP" altLang="en-US" smtClean="0"/>
-              <a:t>2022/12/17</a:t>
+              <a:t>2022/12/28</a:t>
             </a:fld>
             <a:endParaRPr kumimoji="1" lang="ja-JP" altLang="en-US"/>
           </a:p>
@@ -5463,7 +5463,7 @@
           <a:p>
             <a:fld id="{F39E755E-A59D-4634-B604-E9BB568B1156}" type="datetime1">
               <a:rPr kumimoji="1" lang="ja-JP" altLang="en-US" smtClean="0"/>
-              <a:t>2022/12/17</a:t>
+              <a:t>2022/12/28</a:t>
             </a:fld>
             <a:endParaRPr kumimoji="1" lang="ja-JP" altLang="en-US"/>
           </a:p>
@@ -5668,7 +5668,7 @@
           <a:p>
             <a:fld id="{61DA38B3-7601-4256-ABFE-386B92B0EDB5}" type="datetime1">
               <a:rPr kumimoji="1" lang="ja-JP" altLang="en-US" smtClean="0"/>
-              <a:t>2022/12/17</a:t>
+              <a:t>2022/12/28</a:t>
             </a:fld>
             <a:endParaRPr kumimoji="1" lang="ja-JP" altLang="en-US"/>
           </a:p>
@@ -5845,7 +5845,7 @@
           <a:p>
             <a:fld id="{5A28ED6D-8A94-4DBA-8EF2-284D1A467CE8}" type="datetime1">
               <a:rPr kumimoji="1" lang="ja-JP" altLang="en-US" smtClean="0"/>
-              <a:t>2022/12/17</a:t>
+              <a:t>2022/12/28</a:t>
             </a:fld>
             <a:endParaRPr kumimoji="1" lang="ja-JP" altLang="en-US"/>
           </a:p>
@@ -6210,7 +6210,7 @@
           <a:p>
             <a:fld id="{B27B0317-28AF-43C5-8944-AADFA89E0149}" type="datetime1">
               <a:rPr kumimoji="1" lang="ja-JP" altLang="en-US" smtClean="0"/>
-              <a:t>2022/12/17</a:t>
+              <a:t>2022/12/28</a:t>
             </a:fld>
             <a:endParaRPr kumimoji="1" lang="ja-JP" altLang="en-US"/>
           </a:p>
@@ -6555,7 +6555,7 @@
           <a:p>
             <a:fld id="{A78D023C-C4FA-4CE8-B5BE-6798898EE377}" type="datetime1">
               <a:rPr kumimoji="1" lang="ja-JP" altLang="en-US" smtClean="0"/>
-              <a:t>2022/12/17</a:t>
+              <a:t>2022/12/28</a:t>
             </a:fld>
             <a:endParaRPr kumimoji="1" lang="ja-JP" altLang="en-US"/>
           </a:p>
@@ -8704,7 +8704,7 @@
           <a:p>
             <a:fld id="{99567159-F4A8-4352-915B-DDBEFEF4A4D6}" type="datetime1">
               <a:rPr kumimoji="1" lang="ja-JP" altLang="en-US" smtClean="0"/>
-              <a:t>2022/12/17</a:t>
+              <a:t>2022/12/28</a:t>
             </a:fld>
             <a:endParaRPr kumimoji="1" lang="ja-JP" altLang="en-US"/>
           </a:p>
@@ -9298,7 +9298,7 @@
             </a:r>
             <a:r>
               <a:rPr lang="en-US" altLang="ja-JP"/>
-              <a:t> V4.5.5.0</a:t>
+              <a:t> V4.5.6.0</a:t>
             </a:r>
             <a:endParaRPr lang="ja-JP" altLang="en-US" dirty="0"/>
           </a:p>
@@ -24410,8 +24410,8 @@
         </p:nvSpPr>
         <p:spPr>
           <a:xfrm>
-            <a:off x="9406359" y="3980434"/>
-            <a:ext cx="2724681" cy="507831"/>
+            <a:off x="9406359" y="3886379"/>
+            <a:ext cx="2724681" cy="646331"/>
           </a:xfrm>
           <a:prstGeom prst="rect">
             <a:avLst/>
@@ -24456,10 +24456,16 @@
               <a:t> </a:t>
             </a:r>
             <a:r>
-              <a:rPr kumimoji="1" lang="en-US" altLang="ja-JP" sz="900"/>
-              <a:t>C64</a:t>
-            </a:r>
-            <a:endParaRPr kumimoji="1" lang="en-US" altLang="ja-JP" sz="900" dirty="0"/>
+              <a:rPr kumimoji="1" lang="en-US" altLang="ja-JP" sz="900" dirty="0"/>
+              <a:t>C64,</a:t>
+            </a:r>
+            <a:br>
+              <a:rPr kumimoji="1" lang="en-US" altLang="ja-JP" sz="900" dirty="0"/>
+            </a:br>
+            <a:r>
+              <a:rPr kumimoji="1" lang="en-US" altLang="ja-JP" sz="900" dirty="0"/>
+              <a:t>	PC-6001</a:t>
+            </a:r>
           </a:p>
           <a:p>
             <a:pPr marL="171450" indent="-171450">
@@ -33123,36 +33129,44 @@
           <a:p>
             <a:r>
               <a:rPr kumimoji="1" lang="en-US" altLang="ja-JP" dirty="0"/>
-              <a:t>VSIF – MSX(FTDI) SPECIFICATION</a:t>
+              <a:t>VSIF </a:t>
+            </a:r>
+            <a:r>
+              <a:rPr kumimoji="1" lang="en-US" altLang="ja-JP"/>
+              <a:t>– MSX/P6(</a:t>
+            </a:r>
+            <a:r>
+              <a:rPr kumimoji="1" lang="en-US" altLang="ja-JP" dirty="0"/>
+              <a:t>FTDI) SPECIFICATION</a:t>
             </a:r>
             <a:br>
               <a:rPr kumimoji="1" lang="en-US" altLang="ja-JP" dirty="0"/>
             </a:br>
             <a:r>
-              <a:rPr kumimoji="1" lang="en-US" altLang="ja-JP" dirty="0"/>
+              <a:rPr kumimoji="1" lang="en-US" altLang="ja-JP" sz="2400" dirty="0"/>
               <a:t>for </a:t>
             </a:r>
             <a:r>
-              <a:rPr lang="en-US" altLang="ja-JP" b="0" i="0" dirty="0">
+              <a:rPr lang="en-US" altLang="ja-JP" sz="2400" b="0" i="0" dirty="0">
                 <a:solidFill>
                   <a:srgbClr val="202122"/>
                 </a:solidFill>
                 <a:effectLst/>
                 <a:latin typeface="Arial" panose="020B0604020202020204" pitchFamily="34" charset="0"/>
               </a:rPr>
-              <a:t>AY-3-8910, YM2413, SCC-I, </a:t>
-            </a:r>
-            <a:r>
-              <a:rPr lang="en-US" altLang="ja-JP" b="0" i="0" dirty="0">
+              <a:t>AY-3-8910, OPLL, SCC-I, </a:t>
+            </a:r>
+            <a:r>
+              <a:rPr lang="en-US" altLang="ja-JP" sz="2400" b="0" i="0" dirty="0">
                 <a:solidFill>
                   <a:schemeClr val="tx1"/>
                 </a:solidFill>
                 <a:effectLst/>
                 <a:latin typeface="arial" panose="020B0604020202020204" pitchFamily="34" charset="0"/>
               </a:rPr>
-              <a:t>YMF262</a:t>
-            </a:r>
-            <a:endParaRPr kumimoji="1" lang="ja-JP" altLang="en-US" dirty="0">
+              <a:t>OPL3, OPM, OPNA/OPN2, OPN</a:t>
+            </a:r>
+            <a:endParaRPr kumimoji="1" lang="ja-JP" altLang="en-US" sz="2400" dirty="0">
               <a:solidFill>
                 <a:schemeClr val="tx1"/>
               </a:solidFill>
@@ -33184,7 +33198,7 @@
         </p:spPr>
         <p:txBody>
           <a:bodyPr>
-            <a:normAutofit fontScale="92500" lnSpcReduction="10000"/>
+            <a:normAutofit fontScale="70000" lnSpcReduction="20000"/>
           </a:bodyPr>
           <a:lstStyle/>
           <a:p>
@@ -33237,97 +33251,167 @@
           <a:p>
             <a:pPr lvl="1"/>
             <a:r>
-              <a:rPr kumimoji="1" lang="en-US" altLang="ja-JP" b="1" dirty="0"/>
+              <a:rPr kumimoji="1" lang="en-US" altLang="ja-JP" sz="1300" b="1" dirty="0"/>
               <a:t>0</a:t>
             </a:r>
             <a:r>
-              <a:rPr kumimoji="1" lang="en-US" altLang="ja-JP" dirty="0"/>
+              <a:rPr kumimoji="1" lang="en-US" altLang="ja-JP" sz="1300" dirty="0"/>
               <a:t>		AY-3-8910: Write value to address</a:t>
             </a:r>
           </a:p>
           <a:p>
             <a:pPr lvl="1"/>
             <a:r>
-              <a:rPr kumimoji="1" lang="en-US" altLang="ja-JP" b="1" dirty="0"/>
-              <a:t>1,2</a:t>
-            </a:r>
-            <a:r>
-              <a:rPr kumimoji="1" lang="en-US" altLang="ja-JP" dirty="0"/>
-              <a:t>	YM2413: </a:t>
-            </a:r>
-            <a:r>
-              <a:rPr kumimoji="1" lang="en-US" altLang="ja-JP" b="1" dirty="0"/>
+              <a:rPr kumimoji="1" lang="en-US" altLang="ja-JP" sz="1300" b="1" dirty="0"/>
+              <a:t>1,2,(12)	</a:t>
+            </a:r>
+            <a:r>
+              <a:rPr kumimoji="1" lang="en-US" altLang="ja-JP" sz="1300" dirty="0"/>
+              <a:t>YM2413: </a:t>
+            </a:r>
+            <a:r>
+              <a:rPr kumimoji="1" lang="en-US" altLang="ja-JP" sz="1300" b="1" dirty="0"/>
               <a:t>1</a:t>
             </a:r>
             <a:r>
-              <a:rPr kumimoji="1" lang="en-US" altLang="ja-JP" dirty="0"/>
+              <a:rPr kumimoji="1" lang="en-US" altLang="ja-JP" sz="1300" dirty="0"/>
               <a:t> is write value to address, </a:t>
             </a:r>
             <a:r>
-              <a:rPr kumimoji="1" lang="en-US" altLang="ja-JP" b="1" dirty="0"/>
+              <a:rPr kumimoji="1" lang="en-US" altLang="ja-JP" sz="1300" b="1" dirty="0"/>
               <a:t>2</a:t>
             </a:r>
             <a:r>
-              <a:rPr kumimoji="1" lang="en-US" altLang="ja-JP" dirty="0"/>
+              <a:rPr kumimoji="1" lang="en-US" altLang="ja-JP" sz="1300" dirty="0"/>
               <a:t> is set OPLL cartridge slot number</a:t>
             </a:r>
           </a:p>
           <a:p>
             <a:pPr lvl="1"/>
             <a:r>
-              <a:rPr lang="en-US" altLang="ja-JP" b="1" dirty="0"/>
+              <a:rPr lang="en-US" altLang="ja-JP" sz="1300" b="1" dirty="0"/>
               <a:t>3</a:t>
             </a:r>
             <a:r>
-              <a:rPr lang="ja-JP" altLang="en-US" b="1" dirty="0"/>
+              <a:rPr lang="ja-JP" altLang="en-US" sz="1300" b="1" dirty="0"/>
               <a:t>～</a:t>
             </a:r>
             <a:r>
-              <a:rPr lang="en-US" altLang="ja-JP" b="1" dirty="0"/>
+              <a:rPr lang="en-US" altLang="ja-JP" sz="1300" b="1" dirty="0"/>
               <a:t>9</a:t>
             </a:r>
             <a:r>
-              <a:rPr lang="en-US" altLang="ja-JP" dirty="0"/>
+              <a:rPr lang="en-US" altLang="ja-JP" sz="1300" dirty="0"/>
               <a:t>	SCC-I: </a:t>
             </a:r>
             <a:r>
-              <a:rPr lang="en-US" altLang="ja-JP" i="1" dirty="0"/>
+              <a:rPr lang="en-US" altLang="ja-JP" sz="1300" i="1" dirty="0"/>
               <a:t>(in preparation)</a:t>
             </a:r>
           </a:p>
           <a:p>
             <a:pPr lvl="1"/>
             <a:r>
-              <a:rPr kumimoji="1" lang="en-US" altLang="ja-JP" b="1" dirty="0"/>
+              <a:rPr kumimoji="1" lang="en-US" altLang="ja-JP" sz="1300" b="1" dirty="0"/>
               <a:t>10</a:t>
             </a:r>
             <a:r>
-              <a:rPr kumimoji="1" lang="ja-JP" altLang="en-US" b="1" dirty="0"/>
+              <a:rPr kumimoji="1" lang="ja-JP" altLang="en-US" sz="1300" b="1" dirty="0"/>
               <a:t>～</a:t>
             </a:r>
             <a:r>
-              <a:rPr kumimoji="1" lang="en-US" altLang="ja-JP" b="1" dirty="0"/>
+              <a:rPr kumimoji="1" lang="en-US" altLang="ja-JP" sz="1300" b="1" dirty="0"/>
               <a:t>11</a:t>
             </a:r>
             <a:r>
-              <a:rPr kumimoji="1" lang="en-US" altLang="ja-JP" dirty="0"/>
+              <a:rPr kumimoji="1" lang="en-US" altLang="ja-JP" sz="1300" dirty="0"/>
               <a:t>	YMF262: </a:t>
             </a:r>
             <a:r>
-              <a:rPr kumimoji="1" lang="en-US" altLang="ja-JP" b="1" dirty="0"/>
+              <a:rPr kumimoji="1" lang="en-US" altLang="ja-JP" sz="1300" b="1" dirty="0"/>
               <a:t>10</a:t>
             </a:r>
             <a:r>
-              <a:rPr kumimoji="1" lang="en-US" altLang="ja-JP" dirty="0"/>
+              <a:rPr kumimoji="1" lang="en-US" altLang="ja-JP" sz="1300" dirty="0"/>
               <a:t> is write value to address of port L , </a:t>
             </a:r>
             <a:r>
-              <a:rPr kumimoji="1" lang="en-US" altLang="ja-JP" b="1" dirty="0"/>
+              <a:rPr kumimoji="1" lang="en-US" altLang="ja-JP" sz="1300" b="1" dirty="0"/>
               <a:t>11</a:t>
             </a:r>
             <a:r>
-              <a:rPr kumimoji="1" lang="en-US" altLang="ja-JP" dirty="0"/>
+              <a:rPr kumimoji="1" lang="en-US" altLang="ja-JP" sz="1300" dirty="0"/>
               <a:t> is Write value to address of port H</a:t>
+            </a:r>
+          </a:p>
+          <a:p>
+            <a:pPr lvl="1"/>
+            <a:r>
+              <a:rPr lang="en-US" altLang="ja-JP" sz="1300" b="1" dirty="0"/>
+              <a:t>(13),14	</a:t>
+            </a:r>
+            <a:r>
+              <a:rPr lang="en-US" altLang="ja-JP" sz="1300" dirty="0"/>
+              <a:t>OPM: </a:t>
+            </a:r>
+            <a:r>
+              <a:rPr kumimoji="1" lang="en-US" altLang="ja-JP" sz="1300" dirty="0"/>
+              <a:t>Write value to address</a:t>
+            </a:r>
+            <a:endParaRPr lang="en-US" altLang="ja-JP" sz="1300" dirty="0"/>
+          </a:p>
+          <a:p>
+            <a:pPr lvl="1"/>
+            <a:r>
+              <a:rPr kumimoji="1" lang="en-US" altLang="ja-JP" sz="1300" b="1" dirty="0"/>
+              <a:t>15</a:t>
+            </a:r>
+            <a:r>
+              <a:rPr kumimoji="1" lang="en-US" altLang="ja-JP" sz="1300" dirty="0"/>
+              <a:t>		DCSG:</a:t>
+            </a:r>
+            <a:r>
+              <a:rPr lang="en-US" altLang="ja-JP" sz="1300" dirty="0"/>
+              <a:t> </a:t>
+            </a:r>
+            <a:r>
+              <a:rPr kumimoji="1" lang="en-US" altLang="ja-JP" sz="1300" dirty="0"/>
+              <a:t>Write value to address</a:t>
+            </a:r>
+          </a:p>
+          <a:p>
+            <a:pPr lvl="1"/>
+            <a:r>
+              <a:rPr lang="en-US" altLang="ja-JP" sz="1300" b="1" dirty="0"/>
+              <a:t>16	</a:t>
+            </a:r>
+            <a:r>
+              <a:rPr lang="ja-JP" altLang="en-US" sz="1300" b="1" dirty="0"/>
+              <a:t>～</a:t>
+            </a:r>
+            <a:r>
+              <a:rPr lang="en-US" altLang="ja-JP" sz="1300" b="1" dirty="0"/>
+              <a:t>17</a:t>
+            </a:r>
+            <a:r>
+              <a:rPr lang="en-US" altLang="ja-JP" sz="1300" dirty="0"/>
+              <a:t>	OPNA/OPN2: </a:t>
+            </a:r>
+            <a:r>
+              <a:rPr kumimoji="1" lang="en-US" altLang="ja-JP" sz="1300" dirty="0"/>
+              <a:t>Write value to address</a:t>
+            </a:r>
+            <a:endParaRPr lang="en-US" altLang="ja-JP" sz="1300" dirty="0"/>
+          </a:p>
+          <a:p>
+            <a:pPr lvl="1"/>
+            <a:r>
+              <a:rPr kumimoji="1" lang="en-US" altLang="ja-JP" sz="1300" b="1" dirty="0"/>
+              <a:t>18</a:t>
+            </a:r>
+            <a:r>
+              <a:rPr kumimoji="1" lang="en-US" altLang="ja-JP" sz="1300" dirty="0"/>
+              <a:t>		OPN: Write value to address</a:t>
             </a:r>
           </a:p>
         </p:txBody>
@@ -33375,8 +33459,8 @@
         </p:nvSpPr>
         <p:spPr>
           <a:xfrm>
-            <a:off x="4375150" y="3211097"/>
-            <a:ext cx="1708150" cy="292100"/>
+            <a:off x="4375150" y="2939380"/>
+            <a:ext cx="1708150" cy="222735"/>
           </a:xfrm>
           <a:prstGeom prst="rect">
             <a:avLst/>
@@ -33404,10 +33488,10 @@
           <a:p>
             <a:pPr algn="ctr"/>
             <a:r>
-              <a:rPr kumimoji="1" lang="en-US" altLang="ja-JP" sz="1600" dirty="0"/>
+              <a:rPr kumimoji="1" lang="en-US" altLang="ja-JP" sz="1200" dirty="0"/>
               <a:t>Address(Hi)</a:t>
             </a:r>
-            <a:endParaRPr kumimoji="1" lang="ja-JP" altLang="en-US" sz="1600" dirty="0"/>
+            <a:endParaRPr kumimoji="1" lang="ja-JP" altLang="en-US" sz="1200" dirty="0"/>
           </a:p>
         </p:txBody>
       </p:sp>
@@ -33425,8 +33509,8 @@
         </p:nvSpPr>
         <p:spPr>
           <a:xfrm>
-            <a:off x="6083300" y="3211097"/>
-            <a:ext cx="1708150" cy="292100"/>
+            <a:off x="6083300" y="2939380"/>
+            <a:ext cx="1708150" cy="222735"/>
           </a:xfrm>
           <a:prstGeom prst="rect">
             <a:avLst/>
@@ -33454,10 +33538,10 @@
           <a:p>
             <a:pPr algn="ctr"/>
             <a:r>
-              <a:rPr kumimoji="1" lang="en-US" altLang="ja-JP" sz="1600" dirty="0"/>
+              <a:rPr kumimoji="1" lang="en-US" altLang="ja-JP" sz="1200" dirty="0"/>
               <a:t>Address(Lo)</a:t>
             </a:r>
-            <a:endParaRPr kumimoji="1" lang="ja-JP" altLang="en-US" sz="1600" dirty="0"/>
+            <a:endParaRPr kumimoji="1" lang="ja-JP" altLang="en-US" sz="1200" dirty="0"/>
           </a:p>
         </p:txBody>
       </p:sp>
@@ -33475,8 +33559,8 @@
         </p:nvSpPr>
         <p:spPr>
           <a:xfrm>
-            <a:off x="7791450" y="3211097"/>
-            <a:ext cx="1708150" cy="292100"/>
+            <a:off x="7791450" y="2939380"/>
+            <a:ext cx="1708150" cy="222735"/>
           </a:xfrm>
           <a:prstGeom prst="rect">
             <a:avLst/>
@@ -33504,10 +33588,10 @@
           <a:p>
             <a:pPr algn="ctr"/>
             <a:r>
-              <a:rPr kumimoji="1" lang="en-US" altLang="ja-JP" sz="1600" dirty="0"/>
+              <a:rPr kumimoji="1" lang="en-US" altLang="ja-JP" sz="1200" dirty="0"/>
               <a:t>Value(Lo)</a:t>
             </a:r>
-            <a:endParaRPr kumimoji="1" lang="ja-JP" altLang="en-US" sz="1600" dirty="0"/>
+            <a:endParaRPr kumimoji="1" lang="ja-JP" altLang="en-US" sz="1200" dirty="0"/>
           </a:p>
         </p:txBody>
       </p:sp>
@@ -33525,8 +33609,8 @@
         </p:nvSpPr>
         <p:spPr>
           <a:xfrm>
-            <a:off x="9499600" y="3211097"/>
-            <a:ext cx="1708150" cy="292100"/>
+            <a:off x="9499600" y="2939380"/>
+            <a:ext cx="1708150" cy="222735"/>
           </a:xfrm>
           <a:prstGeom prst="rect">
             <a:avLst/>
@@ -33554,10 +33638,10 @@
           <a:p>
             <a:pPr algn="ctr"/>
             <a:r>
-              <a:rPr kumimoji="1" lang="en-US" altLang="ja-JP" sz="1600" dirty="0"/>
+              <a:rPr kumimoji="1" lang="en-US" altLang="ja-JP" sz="1200" dirty="0"/>
               <a:t>Value(Hi)</a:t>
             </a:r>
-            <a:endParaRPr kumimoji="1" lang="ja-JP" altLang="en-US" sz="1600" dirty="0"/>
+            <a:endParaRPr kumimoji="1" lang="ja-JP" altLang="en-US" sz="1200" dirty="0"/>
           </a:p>
         </p:txBody>
       </p:sp>
@@ -33575,8 +33659,8 @@
         </p:nvSpPr>
         <p:spPr>
           <a:xfrm>
-            <a:off x="2659530" y="3211097"/>
-            <a:ext cx="1708150" cy="292100"/>
+            <a:off x="2659530" y="2939380"/>
+            <a:ext cx="1708150" cy="222735"/>
           </a:xfrm>
           <a:prstGeom prst="rect">
             <a:avLst/>
@@ -33604,10 +33688,10 @@
           <a:p>
             <a:pPr algn="ctr"/>
             <a:r>
-              <a:rPr kumimoji="1" lang="en-US" altLang="ja-JP" sz="1600" dirty="0"/>
+              <a:rPr kumimoji="1" lang="en-US" altLang="ja-JP" sz="1200" dirty="0"/>
               <a:t>Type</a:t>
             </a:r>
-            <a:endParaRPr kumimoji="1" lang="ja-JP" altLang="en-US" sz="1600" dirty="0"/>
+            <a:endParaRPr kumimoji="1" lang="ja-JP" altLang="en-US" sz="1200" dirty="0"/>
           </a:p>
         </p:txBody>
       </p:sp>
@@ -33625,8 +33709,8 @@
         </p:nvSpPr>
         <p:spPr>
           <a:xfrm>
-            <a:off x="2652060" y="2868194"/>
-            <a:ext cx="1683405" cy="338554"/>
+            <a:off x="2652060" y="2656516"/>
+            <a:ext cx="1683405" cy="276999"/>
           </a:xfrm>
           <a:prstGeom prst="rect">
             <a:avLst/>
@@ -33641,18 +33725,18 @@
           <a:p>
             <a:pPr algn="ctr"/>
             <a:r>
-              <a:rPr kumimoji="1" lang="en-US" altLang="ja-JP" sz="1600" dirty="0"/>
+              <a:rPr kumimoji="1" lang="en-US" altLang="ja-JP" sz="1200" dirty="0"/>
               <a:t>1</a:t>
             </a:r>
             <a:r>
-              <a:rPr kumimoji="1" lang="en-US" altLang="ja-JP" sz="1600" baseline="30000" dirty="0"/>
+              <a:rPr kumimoji="1" lang="en-US" altLang="ja-JP" sz="1200" baseline="30000" dirty="0"/>
               <a:t>st</a:t>
             </a:r>
             <a:r>
-              <a:rPr kumimoji="1" lang="en-US" altLang="ja-JP" sz="1600" dirty="0"/>
+              <a:rPr kumimoji="1" lang="en-US" altLang="ja-JP" sz="1200" dirty="0"/>
               <a:t>(Start)</a:t>
             </a:r>
-            <a:endParaRPr lang="ja-JP" altLang="en-US" sz="1600" dirty="0"/>
+            <a:endParaRPr lang="ja-JP" altLang="en-US" sz="1200" dirty="0"/>
           </a:p>
         </p:txBody>
       </p:sp>
@@ -33670,8 +33754,8 @@
         </p:nvSpPr>
         <p:spPr>
           <a:xfrm>
-            <a:off x="4367680" y="2868194"/>
-            <a:ext cx="1722763" cy="338554"/>
+            <a:off x="4367680" y="2656516"/>
+            <a:ext cx="1722763" cy="276999"/>
           </a:xfrm>
           <a:prstGeom prst="rect">
             <a:avLst/>
@@ -33686,26 +33770,26 @@
           <a:p>
             <a:pPr algn="ctr"/>
             <a:r>
-              <a:rPr kumimoji="1" lang="en-US" altLang="ja-JP" sz="1600" dirty="0"/>
+              <a:rPr kumimoji="1" lang="en-US" altLang="ja-JP" sz="1200" dirty="0"/>
               <a:t>2</a:t>
             </a:r>
             <a:r>
-              <a:rPr kumimoji="1" lang="en-US" altLang="ja-JP" sz="1600" baseline="30000" dirty="0"/>
+              <a:rPr kumimoji="1" lang="en-US" altLang="ja-JP" sz="1200" baseline="30000" dirty="0"/>
               <a:t>nd</a:t>
             </a:r>
             <a:r>
-              <a:rPr kumimoji="1" lang="en-US" altLang="ja-JP" sz="1600" dirty="0"/>
+              <a:rPr kumimoji="1" lang="en-US" altLang="ja-JP" sz="1200" dirty="0"/>
               <a:t>(</a:t>
             </a:r>
             <a:r>
-              <a:rPr kumimoji="1" lang="en-US" altLang="ja-JP" sz="1600" dirty="0" err="1"/>
+              <a:rPr kumimoji="1" lang="en-US" altLang="ja-JP" sz="1200" dirty="0" err="1"/>
               <a:t>clk</a:t>
             </a:r>
             <a:r>
-              <a:rPr kumimoji="1" lang="en-US" altLang="ja-JP" sz="1600" dirty="0"/>
+              <a:rPr kumimoji="1" lang="en-US" altLang="ja-JP" sz="1200" dirty="0"/>
               <a:t>=0)</a:t>
             </a:r>
-            <a:endParaRPr lang="ja-JP" altLang="en-US" sz="1600" dirty="0"/>
+            <a:endParaRPr lang="ja-JP" altLang="en-US" sz="1200" dirty="0"/>
           </a:p>
         </p:txBody>
       </p:sp>
@@ -33723,8 +33807,8 @@
         </p:nvSpPr>
         <p:spPr>
           <a:xfrm>
-            <a:off x="6036472" y="2868194"/>
-            <a:ext cx="1747835" cy="338554"/>
+            <a:off x="6036472" y="2656516"/>
+            <a:ext cx="1747835" cy="276999"/>
           </a:xfrm>
           <a:prstGeom prst="rect">
             <a:avLst/>
@@ -33739,26 +33823,26 @@
           <a:p>
             <a:pPr algn="ctr"/>
             <a:r>
-              <a:rPr kumimoji="1" lang="en-US" altLang="ja-JP" sz="1600" dirty="0"/>
+              <a:rPr kumimoji="1" lang="en-US" altLang="ja-JP" sz="1200" dirty="0"/>
               <a:t>3</a:t>
             </a:r>
             <a:r>
-              <a:rPr kumimoji="1" lang="en-US" altLang="ja-JP" sz="1600" baseline="30000" dirty="0"/>
+              <a:rPr kumimoji="1" lang="en-US" altLang="ja-JP" sz="1200" baseline="30000" dirty="0"/>
               <a:t>rd</a:t>
             </a:r>
             <a:r>
-              <a:rPr kumimoji="1" lang="en-US" altLang="ja-JP" sz="1600" dirty="0"/>
+              <a:rPr kumimoji="1" lang="en-US" altLang="ja-JP" sz="1200" dirty="0"/>
               <a:t>(</a:t>
             </a:r>
             <a:r>
-              <a:rPr kumimoji="1" lang="en-US" altLang="ja-JP" sz="1600" dirty="0" err="1"/>
+              <a:rPr kumimoji="1" lang="en-US" altLang="ja-JP" sz="1200" dirty="0" err="1"/>
               <a:t>clk</a:t>
             </a:r>
             <a:r>
-              <a:rPr kumimoji="1" lang="en-US" altLang="ja-JP" sz="1600" dirty="0"/>
+              <a:rPr kumimoji="1" lang="en-US" altLang="ja-JP" sz="1200" dirty="0"/>
               <a:t>=1)</a:t>
             </a:r>
-            <a:endParaRPr lang="ja-JP" altLang="en-US" sz="1600" dirty="0"/>
+            <a:endParaRPr lang="ja-JP" altLang="en-US" sz="1200" dirty="0"/>
           </a:p>
         </p:txBody>
       </p:sp>
@@ -33776,8 +33860,8 @@
         </p:nvSpPr>
         <p:spPr>
           <a:xfrm>
-            <a:off x="7759234" y="2868194"/>
-            <a:ext cx="1740365" cy="338554"/>
+            <a:off x="7759234" y="2656516"/>
+            <a:ext cx="1740365" cy="276999"/>
           </a:xfrm>
           <a:prstGeom prst="rect">
             <a:avLst/>
@@ -33792,26 +33876,26 @@
           <a:p>
             <a:pPr algn="ctr"/>
             <a:r>
-              <a:rPr kumimoji="1" lang="en-US" altLang="ja-JP" sz="1600" dirty="0"/>
+              <a:rPr kumimoji="1" lang="en-US" altLang="ja-JP" sz="1200" dirty="0"/>
               <a:t>4</a:t>
             </a:r>
             <a:r>
-              <a:rPr kumimoji="1" lang="en-US" altLang="ja-JP" sz="1600" baseline="30000" dirty="0"/>
+              <a:rPr kumimoji="1" lang="en-US" altLang="ja-JP" sz="1200" baseline="30000" dirty="0"/>
               <a:t>th</a:t>
             </a:r>
             <a:r>
-              <a:rPr kumimoji="1" lang="en-US" altLang="ja-JP" sz="1600" dirty="0"/>
+              <a:rPr kumimoji="1" lang="en-US" altLang="ja-JP" sz="1200" dirty="0"/>
               <a:t>(</a:t>
             </a:r>
             <a:r>
-              <a:rPr kumimoji="1" lang="en-US" altLang="ja-JP" sz="1600" dirty="0" err="1"/>
+              <a:rPr kumimoji="1" lang="en-US" altLang="ja-JP" sz="1200" dirty="0" err="1"/>
               <a:t>clk</a:t>
             </a:r>
             <a:r>
-              <a:rPr kumimoji="1" lang="en-US" altLang="ja-JP" sz="1600" dirty="0"/>
+              <a:rPr kumimoji="1" lang="en-US" altLang="ja-JP" sz="1200" dirty="0"/>
               <a:t>=0)</a:t>
             </a:r>
-            <a:endParaRPr lang="ja-JP" altLang="en-US" sz="1600" dirty="0"/>
+            <a:endParaRPr lang="ja-JP" altLang="en-US" sz="1200" dirty="0"/>
           </a:p>
         </p:txBody>
       </p:sp>
@@ -33829,8 +33913,8 @@
         </p:nvSpPr>
         <p:spPr>
           <a:xfrm>
-            <a:off x="9492456" y="2868194"/>
-            <a:ext cx="1701007" cy="338554"/>
+            <a:off x="9492456" y="2656516"/>
+            <a:ext cx="1701007" cy="276999"/>
           </a:xfrm>
           <a:prstGeom prst="rect">
             <a:avLst/>
@@ -33845,26 +33929,26 @@
           <a:p>
             <a:pPr algn="ctr"/>
             <a:r>
-              <a:rPr kumimoji="1" lang="en-US" altLang="ja-JP" sz="1600" dirty="0"/>
+              <a:rPr kumimoji="1" lang="en-US" altLang="ja-JP" sz="1200" dirty="0"/>
               <a:t>5</a:t>
             </a:r>
             <a:r>
-              <a:rPr kumimoji="1" lang="en-US" altLang="ja-JP" sz="1600" baseline="30000" dirty="0"/>
+              <a:rPr kumimoji="1" lang="en-US" altLang="ja-JP" sz="1200" baseline="30000" dirty="0"/>
               <a:t>th</a:t>
             </a:r>
             <a:r>
-              <a:rPr kumimoji="1" lang="en-US" altLang="ja-JP" sz="1600" dirty="0"/>
+              <a:rPr kumimoji="1" lang="en-US" altLang="ja-JP" sz="1200" dirty="0"/>
               <a:t>(</a:t>
             </a:r>
             <a:r>
-              <a:rPr kumimoji="1" lang="en-US" altLang="ja-JP" sz="1600" dirty="0" err="1"/>
+              <a:rPr kumimoji="1" lang="en-US" altLang="ja-JP" sz="1200" dirty="0" err="1"/>
               <a:t>clk</a:t>
             </a:r>
             <a:r>
-              <a:rPr kumimoji="1" lang="en-US" altLang="ja-JP" sz="1600" dirty="0"/>
+              <a:rPr kumimoji="1" lang="en-US" altLang="ja-JP" sz="1200" dirty="0"/>
               <a:t>=1)</a:t>
             </a:r>
-            <a:endParaRPr lang="ja-JP" altLang="en-US" sz="1600" dirty="0"/>
+            <a:endParaRPr lang="ja-JP" altLang="en-US" sz="1200" dirty="0"/>
           </a:p>
         </p:txBody>
       </p:sp>
@@ -33882,8 +33966,8 @@
         </p:nvSpPr>
         <p:spPr>
           <a:xfrm>
-            <a:off x="3685268" y="4150468"/>
-            <a:ext cx="931974" cy="292100"/>
+            <a:off x="3685268" y="3709230"/>
+            <a:ext cx="931974" cy="222735"/>
           </a:xfrm>
           <a:prstGeom prst="rect">
             <a:avLst/>
@@ -33913,7 +33997,7 @@
           <a:lstStyle/>
           <a:p>
             <a:pPr algn="ctr"/>
-            <a:endParaRPr kumimoji="1" lang="ja-JP" altLang="en-US" sz="1600" dirty="0"/>
+            <a:endParaRPr kumimoji="1" lang="ja-JP" altLang="en-US" sz="1200" dirty="0"/>
           </a:p>
         </p:txBody>
       </p:sp>
@@ -33931,8 +34015,8 @@
         </p:nvSpPr>
         <p:spPr>
           <a:xfrm>
-            <a:off x="4616450" y="4150468"/>
-            <a:ext cx="931974" cy="292100"/>
+            <a:off x="4616450" y="3709230"/>
+            <a:ext cx="931974" cy="222735"/>
           </a:xfrm>
           <a:prstGeom prst="rect">
             <a:avLst/>
@@ -33962,7 +34046,7 @@
           <a:lstStyle/>
           <a:p>
             <a:pPr algn="ctr"/>
-            <a:endParaRPr kumimoji="1" lang="ja-JP" altLang="en-US" sz="1600" dirty="0"/>
+            <a:endParaRPr kumimoji="1" lang="ja-JP" altLang="en-US" sz="1200" dirty="0"/>
           </a:p>
         </p:txBody>
       </p:sp>
@@ -33980,8 +34064,8 @@
         </p:nvSpPr>
         <p:spPr>
           <a:xfrm>
-            <a:off x="5547632" y="4150468"/>
-            <a:ext cx="931974" cy="292100"/>
+            <a:off x="5547632" y="3709230"/>
+            <a:ext cx="931974" cy="222735"/>
           </a:xfrm>
           <a:prstGeom prst="rect">
             <a:avLst/>
@@ -34009,10 +34093,10 @@
           <a:p>
             <a:pPr algn="ctr"/>
             <a:r>
-              <a:rPr lang="en-US" altLang="ja-JP" sz="1600" dirty="0"/>
+              <a:rPr lang="en-US" altLang="ja-JP" sz="1200" dirty="0"/>
               <a:t>1</a:t>
             </a:r>
-            <a:endParaRPr kumimoji="1" lang="ja-JP" altLang="en-US" sz="1600" dirty="0"/>
+            <a:endParaRPr kumimoji="1" lang="ja-JP" altLang="en-US" sz="1200" dirty="0"/>
           </a:p>
         </p:txBody>
       </p:sp>
@@ -34030,8 +34114,8 @@
         </p:nvSpPr>
         <p:spPr>
           <a:xfrm>
-            <a:off x="6478814" y="4150468"/>
-            <a:ext cx="931974" cy="292100"/>
+            <a:off x="6478814" y="3709230"/>
+            <a:ext cx="931974" cy="222735"/>
           </a:xfrm>
           <a:prstGeom prst="rect">
             <a:avLst/>
@@ -34059,10 +34143,10 @@
           <a:p>
             <a:pPr algn="ctr"/>
             <a:r>
-              <a:rPr kumimoji="1" lang="en-US" altLang="ja-JP" sz="1600" dirty="0"/>
+              <a:rPr kumimoji="1" lang="en-US" altLang="ja-JP" sz="1200" dirty="0"/>
               <a:t>Type</a:t>
             </a:r>
-            <a:endParaRPr kumimoji="1" lang="ja-JP" altLang="en-US" sz="1600" dirty="0"/>
+            <a:endParaRPr kumimoji="1" lang="ja-JP" altLang="en-US" sz="1200" dirty="0"/>
           </a:p>
         </p:txBody>
       </p:sp>
@@ -34080,8 +34164,8 @@
         </p:nvSpPr>
         <p:spPr>
           <a:xfrm>
-            <a:off x="7409996" y="4150468"/>
-            <a:ext cx="931974" cy="292100"/>
+            <a:off x="7409996" y="3709230"/>
+            <a:ext cx="931974" cy="222735"/>
           </a:xfrm>
           <a:prstGeom prst="rect">
             <a:avLst/>
@@ -34109,10 +34193,10 @@
           <a:p>
             <a:pPr algn="ctr"/>
             <a:r>
-              <a:rPr kumimoji="1" lang="en-US" altLang="ja-JP" sz="1600" dirty="0"/>
+              <a:rPr kumimoji="1" lang="en-US" altLang="ja-JP" sz="1200" dirty="0"/>
               <a:t>Type</a:t>
             </a:r>
-            <a:endParaRPr kumimoji="1" lang="ja-JP" altLang="en-US" sz="1600" dirty="0"/>
+            <a:endParaRPr kumimoji="1" lang="ja-JP" altLang="en-US" sz="1200" dirty="0"/>
           </a:p>
         </p:txBody>
       </p:sp>
@@ -34130,8 +34214,8 @@
         </p:nvSpPr>
         <p:spPr>
           <a:xfrm>
-            <a:off x="8341178" y="4150468"/>
-            <a:ext cx="931974" cy="292100"/>
+            <a:off x="8341178" y="3709230"/>
+            <a:ext cx="931974" cy="222735"/>
           </a:xfrm>
           <a:prstGeom prst="rect">
             <a:avLst/>
@@ -34159,10 +34243,10 @@
           <a:p>
             <a:pPr algn="ctr"/>
             <a:r>
-              <a:rPr kumimoji="1" lang="en-US" altLang="ja-JP" sz="1600" dirty="0"/>
+              <a:rPr kumimoji="1" lang="en-US" altLang="ja-JP" sz="1200" dirty="0"/>
               <a:t>Type</a:t>
             </a:r>
-            <a:endParaRPr kumimoji="1" lang="ja-JP" altLang="en-US" sz="1600" dirty="0"/>
+            <a:endParaRPr kumimoji="1" lang="ja-JP" altLang="en-US" sz="1200" dirty="0"/>
           </a:p>
         </p:txBody>
       </p:sp>
@@ -34180,8 +34264,8 @@
         </p:nvSpPr>
         <p:spPr>
           <a:xfrm>
-            <a:off x="9272360" y="4150468"/>
-            <a:ext cx="931974" cy="292100"/>
+            <a:off x="9272360" y="3709230"/>
+            <a:ext cx="931974" cy="222735"/>
           </a:xfrm>
           <a:prstGeom prst="rect">
             <a:avLst/>
@@ -34209,10 +34293,10 @@
           <a:p>
             <a:pPr algn="ctr"/>
             <a:r>
-              <a:rPr kumimoji="1" lang="en-US" altLang="ja-JP" sz="1600" dirty="0"/>
+              <a:rPr kumimoji="1" lang="en-US" altLang="ja-JP" sz="1200" dirty="0"/>
               <a:t>Type</a:t>
             </a:r>
-            <a:endParaRPr kumimoji="1" lang="ja-JP" altLang="en-US" sz="1600" dirty="0"/>
+            <a:endParaRPr kumimoji="1" lang="ja-JP" altLang="en-US" sz="1200" dirty="0"/>
           </a:p>
         </p:txBody>
       </p:sp>
@@ -34230,8 +34314,8 @@
         </p:nvSpPr>
         <p:spPr>
           <a:xfrm>
-            <a:off x="10203544" y="4150468"/>
-            <a:ext cx="931974" cy="292100"/>
+            <a:off x="10203544" y="3709230"/>
+            <a:ext cx="931974" cy="222735"/>
           </a:xfrm>
           <a:prstGeom prst="rect">
             <a:avLst/>
@@ -34259,10 +34343,10 @@
           <a:p>
             <a:pPr algn="ctr"/>
             <a:r>
-              <a:rPr kumimoji="1" lang="en-US" altLang="ja-JP" sz="1600" dirty="0"/>
+              <a:rPr kumimoji="1" lang="en-US" altLang="ja-JP" sz="1200" dirty="0"/>
               <a:t>Type</a:t>
             </a:r>
-            <a:endParaRPr kumimoji="1" lang="ja-JP" altLang="en-US" sz="1600" dirty="0"/>
+            <a:endParaRPr kumimoji="1" lang="ja-JP" altLang="en-US" sz="1200" dirty="0"/>
           </a:p>
         </p:txBody>
       </p:sp>
@@ -34280,8 +34364,8 @@
         </p:nvSpPr>
         <p:spPr>
           <a:xfrm>
-            <a:off x="10453688" y="4764617"/>
-            <a:ext cx="754062" cy="338554"/>
+            <a:off x="10453688" y="4143046"/>
+            <a:ext cx="754062" cy="276999"/>
           </a:xfrm>
           <a:prstGeom prst="rect">
             <a:avLst/>
@@ -34295,10 +34379,10 @@
           <a:lstStyle/>
           <a:p>
             <a:r>
-              <a:rPr kumimoji="1" lang="en-US" altLang="ja-JP" sz="1600" dirty="0"/>
+              <a:rPr kumimoji="1" lang="en-US" altLang="ja-JP" sz="1200" dirty="0"/>
               <a:t>LSB</a:t>
             </a:r>
-            <a:endParaRPr lang="ja-JP" altLang="en-US" sz="1600" dirty="0"/>
+            <a:endParaRPr lang="ja-JP" altLang="en-US" sz="1200" dirty="0"/>
           </a:p>
         </p:txBody>
       </p:sp>
@@ -34316,8 +34400,8 @@
         </p:nvSpPr>
         <p:spPr>
           <a:xfrm>
-            <a:off x="10202750" y="3814434"/>
-            <a:ext cx="931974" cy="338554"/>
+            <a:off x="10202750" y="3324567"/>
+            <a:ext cx="931974" cy="276999"/>
           </a:xfrm>
           <a:prstGeom prst="rect">
             <a:avLst/>
@@ -34332,10 +34416,10 @@
           <a:p>
             <a:pPr algn="ctr"/>
             <a:r>
-              <a:rPr kumimoji="1" lang="en-US" altLang="ja-JP" sz="1600" dirty="0"/>
+              <a:rPr kumimoji="1" lang="en-US" altLang="ja-JP" sz="1200" dirty="0"/>
               <a:t>0</a:t>
             </a:r>
-            <a:endParaRPr lang="ja-JP" altLang="en-US" sz="1600" dirty="0"/>
+            <a:endParaRPr lang="ja-JP" altLang="en-US" sz="1200" dirty="0"/>
           </a:p>
         </p:txBody>
       </p:sp>
@@ -34353,8 +34437,8 @@
         </p:nvSpPr>
         <p:spPr>
           <a:xfrm>
-            <a:off x="3701200" y="4724885"/>
-            <a:ext cx="754062" cy="338554"/>
+            <a:off x="3701200" y="4141429"/>
+            <a:ext cx="754062" cy="276999"/>
           </a:xfrm>
           <a:prstGeom prst="rect">
             <a:avLst/>
@@ -34368,10 +34452,10 @@
           <a:lstStyle/>
           <a:p>
             <a:r>
-              <a:rPr kumimoji="1" lang="en-US" altLang="ja-JP" sz="1600" dirty="0"/>
+              <a:rPr kumimoji="1" lang="en-US" altLang="ja-JP" sz="1200" dirty="0"/>
               <a:t>MSB</a:t>
             </a:r>
-            <a:endParaRPr lang="ja-JP" altLang="en-US" sz="1600" dirty="0"/>
+            <a:endParaRPr lang="ja-JP" altLang="en-US" sz="1200" dirty="0"/>
           </a:p>
         </p:txBody>
       </p:sp>
@@ -34389,8 +34473,8 @@
         </p:nvSpPr>
         <p:spPr>
           <a:xfrm>
-            <a:off x="3683682" y="3814434"/>
-            <a:ext cx="931974" cy="338554"/>
+            <a:off x="3683682" y="3456431"/>
+            <a:ext cx="931974" cy="276999"/>
           </a:xfrm>
           <a:prstGeom prst="rect">
             <a:avLst/>
@@ -34405,10 +34489,10 @@
           <a:p>
             <a:pPr algn="ctr"/>
             <a:r>
-              <a:rPr kumimoji="1" lang="en-US" altLang="ja-JP" sz="1600" dirty="0"/>
+              <a:rPr kumimoji="1" lang="en-US" altLang="ja-JP" sz="1200" dirty="0"/>
               <a:t>7</a:t>
             </a:r>
-            <a:endParaRPr lang="ja-JP" altLang="en-US" sz="1600" dirty="0"/>
+            <a:endParaRPr lang="ja-JP" altLang="en-US" sz="1200" dirty="0"/>
           </a:p>
         </p:txBody>
       </p:sp>
@@ -34426,8 +34510,8 @@
         </p:nvSpPr>
         <p:spPr>
           <a:xfrm>
-            <a:off x="3685268" y="4442568"/>
-            <a:ext cx="931974" cy="292100"/>
+            <a:off x="3685268" y="3925946"/>
+            <a:ext cx="931974" cy="222735"/>
           </a:xfrm>
           <a:prstGeom prst="rect">
             <a:avLst/>
@@ -34457,7 +34541,7 @@
           <a:lstStyle/>
           <a:p>
             <a:pPr algn="ctr"/>
-            <a:endParaRPr kumimoji="1" lang="ja-JP" altLang="en-US" sz="1600" dirty="0"/>
+            <a:endParaRPr kumimoji="1" lang="ja-JP" altLang="en-US" sz="1200" dirty="0"/>
           </a:p>
         </p:txBody>
       </p:sp>
@@ -34475,8 +34559,8 @@
         </p:nvSpPr>
         <p:spPr>
           <a:xfrm>
-            <a:off x="4616450" y="4442568"/>
-            <a:ext cx="931974" cy="292100"/>
+            <a:off x="4616450" y="3925946"/>
+            <a:ext cx="931974" cy="222735"/>
           </a:xfrm>
           <a:prstGeom prst="rect">
             <a:avLst/>
@@ -34506,7 +34590,7 @@
           <a:lstStyle/>
           <a:p>
             <a:pPr algn="ctr"/>
-            <a:endParaRPr kumimoji="1" lang="ja-JP" altLang="en-US" sz="1600" dirty="0"/>
+            <a:endParaRPr kumimoji="1" lang="ja-JP" altLang="en-US" sz="1200" dirty="0"/>
           </a:p>
         </p:txBody>
       </p:sp>
@@ -34524,8 +34608,8 @@
         </p:nvSpPr>
         <p:spPr>
           <a:xfrm>
-            <a:off x="5547632" y="4442568"/>
-            <a:ext cx="931974" cy="292100"/>
+            <a:off x="5547632" y="3925946"/>
+            <a:ext cx="931974" cy="222735"/>
           </a:xfrm>
           <a:prstGeom prst="rect">
             <a:avLst/>
@@ -34553,10 +34637,10 @@
           <a:p>
             <a:pPr algn="ctr"/>
             <a:r>
-              <a:rPr lang="en-US" altLang="ja-JP" sz="1600" dirty="0"/>
+              <a:rPr lang="en-US" altLang="ja-JP" sz="1200" dirty="0"/>
               <a:t>0</a:t>
             </a:r>
-            <a:endParaRPr kumimoji="1" lang="ja-JP" altLang="en-US" sz="1600" dirty="0"/>
+            <a:endParaRPr kumimoji="1" lang="ja-JP" altLang="en-US" sz="1200" dirty="0"/>
           </a:p>
         </p:txBody>
       </p:sp>
@@ -34574,8 +34658,8 @@
         </p:nvSpPr>
         <p:spPr>
           <a:xfrm>
-            <a:off x="6478814" y="4442568"/>
-            <a:ext cx="931974" cy="292100"/>
+            <a:off x="6478814" y="3925946"/>
+            <a:ext cx="931974" cy="222735"/>
           </a:xfrm>
           <a:prstGeom prst="rect">
             <a:avLst/>
@@ -34603,10 +34687,10 @@
           <a:p>
             <a:pPr algn="ctr"/>
             <a:r>
-              <a:rPr kumimoji="1" lang="en-US" altLang="ja-JP" sz="1600" dirty="0" err="1"/>
+              <a:rPr kumimoji="1" lang="en-US" altLang="ja-JP" sz="1200" dirty="0" err="1"/>
               <a:t>clk</a:t>
             </a:r>
-            <a:endParaRPr kumimoji="1" lang="ja-JP" altLang="en-US" sz="1600" dirty="0"/>
+            <a:endParaRPr kumimoji="1" lang="ja-JP" altLang="en-US" sz="1200" dirty="0"/>
           </a:p>
         </p:txBody>
       </p:sp>
@@ -34624,8 +34708,8 @@
         </p:nvSpPr>
         <p:spPr>
           <a:xfrm>
-            <a:off x="7409996" y="4442568"/>
-            <a:ext cx="931974" cy="292100"/>
+            <a:off x="7409996" y="3925946"/>
+            <a:ext cx="931974" cy="222735"/>
           </a:xfrm>
           <a:prstGeom prst="rect">
             <a:avLst/>
@@ -34653,10 +34737,10 @@
           <a:p>
             <a:pPr algn="ctr"/>
             <a:r>
-              <a:rPr kumimoji="1" lang="en-US" altLang="ja-JP" sz="1600" dirty="0"/>
+              <a:rPr kumimoji="1" lang="en-US" altLang="ja-JP" sz="1200" dirty="0"/>
               <a:t>Data</a:t>
             </a:r>
-            <a:endParaRPr kumimoji="1" lang="ja-JP" altLang="en-US" sz="1600" dirty="0"/>
+            <a:endParaRPr kumimoji="1" lang="ja-JP" altLang="en-US" sz="1200" dirty="0"/>
           </a:p>
         </p:txBody>
       </p:sp>
@@ -34674,8 +34758,8 @@
         </p:nvSpPr>
         <p:spPr>
           <a:xfrm>
-            <a:off x="8341178" y="4442568"/>
-            <a:ext cx="931974" cy="292100"/>
+            <a:off x="8341178" y="3925946"/>
+            <a:ext cx="931974" cy="222735"/>
           </a:xfrm>
           <a:prstGeom prst="rect">
             <a:avLst/>
@@ -34703,10 +34787,10 @@
           <a:p>
             <a:pPr algn="ctr"/>
             <a:r>
-              <a:rPr kumimoji="1" lang="en-US" altLang="ja-JP" sz="1600" dirty="0"/>
+              <a:rPr kumimoji="1" lang="en-US" altLang="ja-JP" sz="1200" dirty="0"/>
               <a:t>Data</a:t>
             </a:r>
-            <a:endParaRPr kumimoji="1" lang="ja-JP" altLang="en-US" sz="1600" dirty="0"/>
+            <a:endParaRPr kumimoji="1" lang="ja-JP" altLang="en-US" sz="1200" dirty="0"/>
           </a:p>
         </p:txBody>
       </p:sp>
@@ -34724,8 +34808,8 @@
         </p:nvSpPr>
         <p:spPr>
           <a:xfrm>
-            <a:off x="9272360" y="4442568"/>
-            <a:ext cx="931974" cy="292100"/>
+            <a:off x="9272360" y="3925946"/>
+            <a:ext cx="931974" cy="222735"/>
           </a:xfrm>
           <a:prstGeom prst="rect">
             <a:avLst/>
@@ -34753,10 +34837,10 @@
           <a:p>
             <a:pPr algn="ctr"/>
             <a:r>
-              <a:rPr kumimoji="1" lang="en-US" altLang="ja-JP" sz="1600" dirty="0"/>
+              <a:rPr kumimoji="1" lang="en-US" altLang="ja-JP" sz="1200" dirty="0"/>
               <a:t>Data</a:t>
             </a:r>
-            <a:endParaRPr kumimoji="1" lang="ja-JP" altLang="en-US" sz="1600" dirty="0"/>
+            <a:endParaRPr kumimoji="1" lang="ja-JP" altLang="en-US" sz="1200" dirty="0"/>
           </a:p>
         </p:txBody>
       </p:sp>
@@ -34774,8 +34858,8 @@
         </p:nvSpPr>
         <p:spPr>
           <a:xfrm>
-            <a:off x="10203544" y="4442568"/>
-            <a:ext cx="931974" cy="292100"/>
+            <a:off x="10203544" y="3925946"/>
+            <a:ext cx="931974" cy="222735"/>
           </a:xfrm>
           <a:prstGeom prst="rect">
             <a:avLst/>
@@ -34803,10 +34887,10 @@
           <a:p>
             <a:pPr algn="ctr"/>
             <a:r>
-              <a:rPr kumimoji="1" lang="en-US" altLang="ja-JP" sz="1600" dirty="0"/>
+              <a:rPr kumimoji="1" lang="en-US" altLang="ja-JP" sz="1200" dirty="0"/>
               <a:t>Data</a:t>
             </a:r>
-            <a:endParaRPr kumimoji="1" lang="ja-JP" altLang="en-US" sz="1600" dirty="0"/>
+            <a:endParaRPr kumimoji="1" lang="ja-JP" altLang="en-US" sz="1200" dirty="0"/>
           </a:p>
         </p:txBody>
       </p:sp>
@@ -34824,8 +34908,8 @@
         </p:nvSpPr>
         <p:spPr>
           <a:xfrm>
-            <a:off x="2858974" y="4127241"/>
-            <a:ext cx="754062" cy="338554"/>
+            <a:off x="2858974" y="3686003"/>
+            <a:ext cx="754062" cy="276999"/>
           </a:xfrm>
           <a:prstGeom prst="rect">
             <a:avLst/>
@@ -34839,10 +34923,10 @@
           <a:lstStyle/>
           <a:p>
             <a:r>
-              <a:rPr kumimoji="1" lang="en-US" altLang="ja-JP" sz="1600" dirty="0"/>
+              <a:rPr kumimoji="1" lang="en-US" altLang="ja-JP" sz="1200" dirty="0"/>
               <a:t>Start</a:t>
             </a:r>
-            <a:endParaRPr lang="ja-JP" altLang="en-US" sz="1600" dirty="0"/>
+            <a:endParaRPr lang="ja-JP" altLang="en-US" sz="1200" dirty="0"/>
           </a:p>
         </p:txBody>
       </p:sp>
@@ -34860,8 +34944,8 @@
         </p:nvSpPr>
         <p:spPr>
           <a:xfrm>
-            <a:off x="2858974" y="4426063"/>
-            <a:ext cx="754062" cy="338554"/>
+            <a:off x="2858974" y="3909441"/>
+            <a:ext cx="754062" cy="276999"/>
           </a:xfrm>
           <a:prstGeom prst="rect">
             <a:avLst/>
@@ -34875,10 +34959,10 @@
           <a:lstStyle/>
           <a:p>
             <a:r>
-              <a:rPr kumimoji="1" lang="en-US" altLang="ja-JP" sz="1600" dirty="0" err="1"/>
+              <a:rPr kumimoji="1" lang="en-US" altLang="ja-JP" sz="1200" dirty="0" err="1"/>
               <a:t>Clk</a:t>
             </a:r>
-            <a:endParaRPr lang="ja-JP" altLang="en-US" sz="1600" dirty="0"/>
+            <a:endParaRPr lang="ja-JP" altLang="en-US" sz="1200" dirty="0"/>
           </a:p>
         </p:txBody>
       </p:sp>
@@ -34896,8 +34980,8 @@
         </p:nvSpPr>
         <p:spPr>
           <a:xfrm>
-            <a:off x="11164257" y="3211097"/>
-            <a:ext cx="754063" cy="292100"/>
+            <a:off x="11164257" y="2939380"/>
+            <a:ext cx="754063" cy="222735"/>
           </a:xfrm>
           <a:prstGeom prst="rect">
             <a:avLst/>
@@ -34925,10 +35009,10 @@
           <a:p>
             <a:pPr algn="ctr"/>
             <a:r>
-              <a:rPr kumimoji="1" lang="en-US" altLang="ja-JP" sz="1600" dirty="0"/>
+              <a:rPr kumimoji="1" lang="en-US" altLang="ja-JP" sz="1200" dirty="0"/>
               <a:t>…</a:t>
             </a:r>
-            <a:endParaRPr kumimoji="1" lang="ja-JP" altLang="en-US" sz="1600" dirty="0"/>
+            <a:endParaRPr kumimoji="1" lang="ja-JP" altLang="en-US" sz="1200" dirty="0"/>
           </a:p>
         </p:txBody>
       </p:sp>

</xml_diff>

<commit_message>
4.5.8.0 - Renamed CM-32P user soundfont table sample file name. You need to remove "_memo" from tbl file name to use properly. - Changed MSX rom filename for for VSIF(FTDI) to VGM_msx*.rom from VGMPlay_msx*.rom. - Added wav file for VSIF(FTDI) for PC-6001.
</commit_message>
<xml_diff>
--- a/docs/MAmidiMEmo/Manual.pptx
+++ b/docs/MAmidiMEmo/Manual.pptx
@@ -234,7 +234,7 @@
           <a:p>
             <a:fld id="{581C28D8-13B6-41C3-9F5F-0284C569C6F1}" type="datetimeFigureOut">
               <a:rPr kumimoji="1" lang="ja-JP" altLang="en-US" smtClean="0"/>
-              <a:t>2023/1/14</a:t>
+              <a:t>2023/1/23</a:t>
             </a:fld>
             <a:endParaRPr kumimoji="1" lang="ja-JP" altLang="en-US"/>
           </a:p>
@@ -1561,7 +1561,7 @@
           <a:p>
             <a:fld id="{B8625E62-B904-4691-B75E-EC1C32885285}" type="datetime1">
               <a:rPr kumimoji="1" lang="ja-JP" altLang="en-US" smtClean="0"/>
-              <a:t>2023/1/14</a:t>
+              <a:t>2023/1/23</a:t>
             </a:fld>
             <a:endParaRPr kumimoji="1" lang="ja-JP" altLang="en-US"/>
           </a:p>
@@ -1899,7 +1899,7 @@
           <a:p>
             <a:fld id="{A4C87007-2A40-4EFC-90A3-258EFA3C1001}" type="datetime1">
               <a:rPr kumimoji="1" lang="ja-JP" altLang="en-US" smtClean="0"/>
-              <a:t>2023/1/14</a:t>
+              <a:t>2023/1/23</a:t>
             </a:fld>
             <a:endParaRPr kumimoji="1" lang="ja-JP" altLang="en-US"/>
           </a:p>
@@ -2300,7 +2300,7 @@
           <a:p>
             <a:fld id="{0FE0D7FF-9203-4AA3-90FD-622674A14F90}" type="datetime1">
               <a:rPr kumimoji="1" lang="ja-JP" altLang="en-US" smtClean="0"/>
-              <a:t>2023/1/14</a:t>
+              <a:t>2023/1/23</a:t>
             </a:fld>
             <a:endParaRPr kumimoji="1" lang="ja-JP" altLang="en-US"/>
           </a:p>
@@ -2636,7 +2636,7 @@
           <a:p>
             <a:fld id="{D2D6E4D3-BEDB-4F35-876B-5B9AA41BFB5B}" type="datetime1">
               <a:rPr kumimoji="1" lang="ja-JP" altLang="en-US" smtClean="0"/>
-              <a:t>2023/1/14</a:t>
+              <a:t>2023/1/23</a:t>
             </a:fld>
             <a:endParaRPr kumimoji="1" lang="ja-JP" altLang="en-US"/>
           </a:p>
@@ -2956,7 +2956,7 @@
           <a:p>
             <a:fld id="{2ACD896E-FC14-4F25-BC47-18ABAEA9E1FE}" type="datetime1">
               <a:rPr kumimoji="1" lang="ja-JP" altLang="en-US" smtClean="0"/>
-              <a:t>2023/1/14</a:t>
+              <a:t>2023/1/23</a:t>
             </a:fld>
             <a:endParaRPr kumimoji="1" lang="ja-JP" altLang="en-US"/>
           </a:p>
@@ -3352,7 +3352,7 @@
           <a:p>
             <a:fld id="{54FC701B-2185-4987-B8E2-5507664B65F4}" type="datetime1">
               <a:rPr kumimoji="1" lang="ja-JP" altLang="en-US" smtClean="0"/>
-              <a:t>2023/1/14</a:t>
+              <a:t>2023/1/23</a:t>
             </a:fld>
             <a:endParaRPr kumimoji="1" lang="ja-JP" altLang="en-US"/>
           </a:p>
@@ -3641,7 +3641,7 @@
           <a:p>
             <a:fld id="{3FB4CDED-9617-418F-B546-D66B9BB6C35E}" type="datetime1">
               <a:rPr kumimoji="1" lang="ja-JP" altLang="en-US" smtClean="0"/>
-              <a:t>2023/1/14</a:t>
+              <a:t>2023/1/23</a:t>
             </a:fld>
             <a:endParaRPr kumimoji="1" lang="ja-JP" altLang="en-US"/>
           </a:p>
@@ -3935,7 +3935,7 @@
           <a:p>
             <a:fld id="{F5635D40-962A-46D7-8037-3F2900B5EB4D}" type="datetime1">
               <a:rPr kumimoji="1" lang="ja-JP" altLang="en-US" smtClean="0"/>
-              <a:t>2023/1/14</a:t>
+              <a:t>2023/1/23</a:t>
             </a:fld>
             <a:endParaRPr kumimoji="1" lang="ja-JP" altLang="en-US"/>
           </a:p>
@@ -4229,7 +4229,7 @@
           <a:p>
             <a:fld id="{741DA9A2-8356-4FFD-B66A-E38811049858}" type="datetime1">
               <a:rPr kumimoji="1" lang="ja-JP" altLang="en-US" smtClean="0"/>
-              <a:t>2023/1/14</a:t>
+              <a:t>2023/1/23</a:t>
             </a:fld>
             <a:endParaRPr kumimoji="1" lang="ja-JP" altLang="en-US"/>
           </a:p>
@@ -4558,7 +4558,7 @@
           <a:p>
             <a:fld id="{9DDE8989-88B8-4869-97D9-547531F13E13}" type="datetime1">
               <a:rPr kumimoji="1" lang="ja-JP" altLang="en-US" smtClean="0"/>
-              <a:t>2023/1/14</a:t>
+              <a:t>2023/1/23</a:t>
             </a:fld>
             <a:endParaRPr kumimoji="1" lang="ja-JP" altLang="en-US"/>
           </a:p>
@@ -4945,7 +4945,7 @@
           <a:p>
             <a:fld id="{81EC4031-B949-4300-AB3E-1551426E8631}" type="datetime1">
               <a:rPr kumimoji="1" lang="ja-JP" altLang="en-US" smtClean="0"/>
-              <a:t>2023/1/14</a:t>
+              <a:t>2023/1/23</a:t>
             </a:fld>
             <a:endParaRPr kumimoji="1" lang="ja-JP" altLang="en-US"/>
           </a:p>
@@ -5466,7 +5466,7 @@
           <a:p>
             <a:fld id="{F39E755E-A59D-4634-B604-E9BB568B1156}" type="datetime1">
               <a:rPr kumimoji="1" lang="ja-JP" altLang="en-US" smtClean="0"/>
-              <a:t>2023/1/14</a:t>
+              <a:t>2023/1/23</a:t>
             </a:fld>
             <a:endParaRPr kumimoji="1" lang="ja-JP" altLang="en-US"/>
           </a:p>
@@ -5671,7 +5671,7 @@
           <a:p>
             <a:fld id="{61DA38B3-7601-4256-ABFE-386B92B0EDB5}" type="datetime1">
               <a:rPr kumimoji="1" lang="ja-JP" altLang="en-US" smtClean="0"/>
-              <a:t>2023/1/14</a:t>
+              <a:t>2023/1/23</a:t>
             </a:fld>
             <a:endParaRPr kumimoji="1" lang="ja-JP" altLang="en-US"/>
           </a:p>
@@ -5848,7 +5848,7 @@
           <a:p>
             <a:fld id="{5A28ED6D-8A94-4DBA-8EF2-284D1A467CE8}" type="datetime1">
               <a:rPr kumimoji="1" lang="ja-JP" altLang="en-US" smtClean="0"/>
-              <a:t>2023/1/14</a:t>
+              <a:t>2023/1/23</a:t>
             </a:fld>
             <a:endParaRPr kumimoji="1" lang="ja-JP" altLang="en-US"/>
           </a:p>
@@ -6213,7 +6213,7 @@
           <a:p>
             <a:fld id="{B27B0317-28AF-43C5-8944-AADFA89E0149}" type="datetime1">
               <a:rPr kumimoji="1" lang="ja-JP" altLang="en-US" smtClean="0"/>
-              <a:t>2023/1/14</a:t>
+              <a:t>2023/1/23</a:t>
             </a:fld>
             <a:endParaRPr kumimoji="1" lang="ja-JP" altLang="en-US"/>
           </a:p>
@@ -6558,7 +6558,7 @@
           <a:p>
             <a:fld id="{A78D023C-C4FA-4CE8-B5BE-6798898EE377}" type="datetime1">
               <a:rPr kumimoji="1" lang="ja-JP" altLang="en-US" smtClean="0"/>
-              <a:t>2023/1/14</a:t>
+              <a:t>2023/1/23</a:t>
             </a:fld>
             <a:endParaRPr kumimoji="1" lang="ja-JP" altLang="en-US"/>
           </a:p>
@@ -8707,7 +8707,7 @@
           <a:p>
             <a:fld id="{99567159-F4A8-4352-915B-DDBEFEF4A4D6}" type="datetime1">
               <a:rPr kumimoji="1" lang="ja-JP" altLang="en-US" smtClean="0"/>
-              <a:t>2023/1/14</a:t>
+              <a:t>2023/1/23</a:t>
             </a:fld>
             <a:endParaRPr kumimoji="1" lang="ja-JP" altLang="en-US"/>
           </a:p>
@@ -9300,8 +9300,8 @@
               <a:t>MAmidiMEmo</a:t>
             </a:r>
             <a:r>
-              <a:rPr lang="en-US" altLang="ja-JP" dirty="0"/>
-              <a:t> V4.5.7.0</a:t>
+              <a:rPr lang="en-US" altLang="ja-JP"/>
+              <a:t> V4.5.8.0</a:t>
             </a:r>
             <a:endParaRPr lang="ja-JP" altLang="en-US" dirty="0"/>
           </a:p>
@@ -24902,11 +24902,11 @@
             </a:r>
             <a:r>
               <a:rPr kumimoji="1" lang="en-US" altLang="ja-JP" dirty="0" err="1"/>
-              <a:t>VGMPlaymsx.rom</a:t>
+              <a:t>VGM_msx</a:t>
             </a:r>
             <a:r>
               <a:rPr kumimoji="1" lang="en-US" altLang="ja-JP" dirty="0"/>
-              <a:t>(for MSX*) or VGMPlay_</a:t>
+              <a:t>/P6.rom(for MSX*/PC-6001) or VGMPlay_</a:t>
             </a:r>
             <a:r>
               <a:rPr lang="en-US" altLang="ja-JP" dirty="0"/>
@@ -24954,7 +24954,7 @@
             </a:r>
             <a:r>
               <a:rPr kumimoji="1" lang="en-US" altLang="ja-JP" sz="1300" dirty="0" err="1"/>
-              <a:t>VGMPlaymsx_Vkey.rom</a:t>
+              <a:t>VGM_msx_Vkey.rom</a:t>
             </a:r>
             <a:r>
               <a:rPr kumimoji="1" lang="en-US" altLang="ja-JP" sz="1300" dirty="0"/>

</xml_diff>

<commit_message>
- Improved DAC performance for OPN2 for MSX/P6. Please update rom, too.
</commit_message>
<xml_diff>
--- a/docs/MAmidiMEmo/Manual.pptx
+++ b/docs/MAmidiMEmo/Manual.pptx
@@ -234,7 +234,7 @@
           <a:p>
             <a:fld id="{581C28D8-13B6-41C3-9F5F-0284C569C6F1}" type="datetimeFigureOut">
               <a:rPr kumimoji="1" lang="ja-JP" altLang="en-US" smtClean="0"/>
-              <a:t>2023/2/14</a:t>
+              <a:t>2023/2/25</a:t>
             </a:fld>
             <a:endParaRPr kumimoji="1" lang="ja-JP" altLang="en-US"/>
           </a:p>
@@ -1645,7 +1645,7 @@
           <a:p>
             <a:fld id="{B8625E62-B904-4691-B75E-EC1C32885285}" type="datetime1">
               <a:rPr kumimoji="1" lang="ja-JP" altLang="en-US" smtClean="0"/>
-              <a:t>2023/2/14</a:t>
+              <a:t>2023/2/25</a:t>
             </a:fld>
             <a:endParaRPr kumimoji="1" lang="ja-JP" altLang="en-US"/>
           </a:p>
@@ -1983,7 +1983,7 @@
           <a:p>
             <a:fld id="{A4C87007-2A40-4EFC-90A3-258EFA3C1001}" type="datetime1">
               <a:rPr kumimoji="1" lang="ja-JP" altLang="en-US" smtClean="0"/>
-              <a:t>2023/2/14</a:t>
+              <a:t>2023/2/25</a:t>
             </a:fld>
             <a:endParaRPr kumimoji="1" lang="ja-JP" altLang="en-US"/>
           </a:p>
@@ -2384,7 +2384,7 @@
           <a:p>
             <a:fld id="{0FE0D7FF-9203-4AA3-90FD-622674A14F90}" type="datetime1">
               <a:rPr kumimoji="1" lang="ja-JP" altLang="en-US" smtClean="0"/>
-              <a:t>2023/2/14</a:t>
+              <a:t>2023/2/25</a:t>
             </a:fld>
             <a:endParaRPr kumimoji="1" lang="ja-JP" altLang="en-US"/>
           </a:p>
@@ -2720,7 +2720,7 @@
           <a:p>
             <a:fld id="{D2D6E4D3-BEDB-4F35-876B-5B9AA41BFB5B}" type="datetime1">
               <a:rPr kumimoji="1" lang="ja-JP" altLang="en-US" smtClean="0"/>
-              <a:t>2023/2/14</a:t>
+              <a:t>2023/2/25</a:t>
             </a:fld>
             <a:endParaRPr kumimoji="1" lang="ja-JP" altLang="en-US"/>
           </a:p>
@@ -3040,7 +3040,7 @@
           <a:p>
             <a:fld id="{2ACD896E-FC14-4F25-BC47-18ABAEA9E1FE}" type="datetime1">
               <a:rPr kumimoji="1" lang="ja-JP" altLang="en-US" smtClean="0"/>
-              <a:t>2023/2/14</a:t>
+              <a:t>2023/2/25</a:t>
             </a:fld>
             <a:endParaRPr kumimoji="1" lang="ja-JP" altLang="en-US"/>
           </a:p>
@@ -3436,7 +3436,7 @@
           <a:p>
             <a:fld id="{54FC701B-2185-4987-B8E2-5507664B65F4}" type="datetime1">
               <a:rPr kumimoji="1" lang="ja-JP" altLang="en-US" smtClean="0"/>
-              <a:t>2023/2/14</a:t>
+              <a:t>2023/2/25</a:t>
             </a:fld>
             <a:endParaRPr kumimoji="1" lang="ja-JP" altLang="en-US"/>
           </a:p>
@@ -3725,7 +3725,7 @@
           <a:p>
             <a:fld id="{3FB4CDED-9617-418F-B546-D66B9BB6C35E}" type="datetime1">
               <a:rPr kumimoji="1" lang="ja-JP" altLang="en-US" smtClean="0"/>
-              <a:t>2023/2/14</a:t>
+              <a:t>2023/2/25</a:t>
             </a:fld>
             <a:endParaRPr kumimoji="1" lang="ja-JP" altLang="en-US"/>
           </a:p>
@@ -4019,7 +4019,7 @@
           <a:p>
             <a:fld id="{F5635D40-962A-46D7-8037-3F2900B5EB4D}" type="datetime1">
               <a:rPr kumimoji="1" lang="ja-JP" altLang="en-US" smtClean="0"/>
-              <a:t>2023/2/14</a:t>
+              <a:t>2023/2/25</a:t>
             </a:fld>
             <a:endParaRPr kumimoji="1" lang="ja-JP" altLang="en-US"/>
           </a:p>
@@ -4313,7 +4313,7 @@
           <a:p>
             <a:fld id="{741DA9A2-8356-4FFD-B66A-E38811049858}" type="datetime1">
               <a:rPr kumimoji="1" lang="ja-JP" altLang="en-US" smtClean="0"/>
-              <a:t>2023/2/14</a:t>
+              <a:t>2023/2/25</a:t>
             </a:fld>
             <a:endParaRPr kumimoji="1" lang="ja-JP" altLang="en-US"/>
           </a:p>
@@ -4642,7 +4642,7 @@
           <a:p>
             <a:fld id="{9DDE8989-88B8-4869-97D9-547531F13E13}" type="datetime1">
               <a:rPr kumimoji="1" lang="ja-JP" altLang="en-US" smtClean="0"/>
-              <a:t>2023/2/14</a:t>
+              <a:t>2023/2/25</a:t>
             </a:fld>
             <a:endParaRPr kumimoji="1" lang="ja-JP" altLang="en-US"/>
           </a:p>
@@ -5029,7 +5029,7 @@
           <a:p>
             <a:fld id="{81EC4031-B949-4300-AB3E-1551426E8631}" type="datetime1">
               <a:rPr kumimoji="1" lang="ja-JP" altLang="en-US" smtClean="0"/>
-              <a:t>2023/2/14</a:t>
+              <a:t>2023/2/25</a:t>
             </a:fld>
             <a:endParaRPr kumimoji="1" lang="ja-JP" altLang="en-US"/>
           </a:p>
@@ -5550,7 +5550,7 @@
           <a:p>
             <a:fld id="{F39E755E-A59D-4634-B604-E9BB568B1156}" type="datetime1">
               <a:rPr kumimoji="1" lang="ja-JP" altLang="en-US" smtClean="0"/>
-              <a:t>2023/2/14</a:t>
+              <a:t>2023/2/25</a:t>
             </a:fld>
             <a:endParaRPr kumimoji="1" lang="ja-JP" altLang="en-US"/>
           </a:p>
@@ -5755,7 +5755,7 @@
           <a:p>
             <a:fld id="{61DA38B3-7601-4256-ABFE-386B92B0EDB5}" type="datetime1">
               <a:rPr kumimoji="1" lang="ja-JP" altLang="en-US" smtClean="0"/>
-              <a:t>2023/2/14</a:t>
+              <a:t>2023/2/25</a:t>
             </a:fld>
             <a:endParaRPr kumimoji="1" lang="ja-JP" altLang="en-US"/>
           </a:p>
@@ -5932,7 +5932,7 @@
           <a:p>
             <a:fld id="{5A28ED6D-8A94-4DBA-8EF2-284D1A467CE8}" type="datetime1">
               <a:rPr kumimoji="1" lang="ja-JP" altLang="en-US" smtClean="0"/>
-              <a:t>2023/2/14</a:t>
+              <a:t>2023/2/25</a:t>
             </a:fld>
             <a:endParaRPr kumimoji="1" lang="ja-JP" altLang="en-US"/>
           </a:p>
@@ -6297,7 +6297,7 @@
           <a:p>
             <a:fld id="{B27B0317-28AF-43C5-8944-AADFA89E0149}" type="datetime1">
               <a:rPr kumimoji="1" lang="ja-JP" altLang="en-US" smtClean="0"/>
-              <a:t>2023/2/14</a:t>
+              <a:t>2023/2/25</a:t>
             </a:fld>
             <a:endParaRPr kumimoji="1" lang="ja-JP" altLang="en-US"/>
           </a:p>
@@ -6642,7 +6642,7 @@
           <a:p>
             <a:fld id="{A78D023C-C4FA-4CE8-B5BE-6798898EE377}" type="datetime1">
               <a:rPr kumimoji="1" lang="ja-JP" altLang="en-US" smtClean="0"/>
-              <a:t>2023/2/14</a:t>
+              <a:t>2023/2/25</a:t>
             </a:fld>
             <a:endParaRPr kumimoji="1" lang="ja-JP" altLang="en-US"/>
           </a:p>
@@ -8791,7 +8791,7 @@
           <a:p>
             <a:fld id="{99567159-F4A8-4352-915B-DDBEFEF4A4D6}" type="datetime1">
               <a:rPr kumimoji="1" lang="ja-JP" altLang="en-US" smtClean="0"/>
-              <a:t>2023/2/14</a:t>
+              <a:t>2023/2/25</a:t>
             </a:fld>
             <a:endParaRPr kumimoji="1" lang="ja-JP" altLang="en-US"/>
           </a:p>
@@ -27569,15 +27569,20 @@
           <p:nvPr/>
         </p:nvPicPr>
         <p:blipFill>
-          <a:blip r:embed="rId3"/>
-          <a:stretch>
-            <a:fillRect/>
-          </a:stretch>
+          <a:blip r:embed="rId3">
+            <a:extLst>
+              <a:ext uri="{28A0092B-C50C-407E-A947-70E740481C1C}">
+                <a14:useLocalDpi xmlns:a14="http://schemas.microsoft.com/office/drawing/2010/main" val="0"/>
+              </a:ext>
+            </a:extLst>
+          </a:blip>
+          <a:srcRect/>
+          <a:stretch/>
         </p:blipFill>
         <p:spPr>
           <a:xfrm>
-            <a:off x="2512907" y="2222389"/>
-            <a:ext cx="3741944" cy="4339768"/>
+            <a:off x="2512907" y="2403574"/>
+            <a:ext cx="3741944" cy="3707135"/>
           </a:xfrm>
           <a:prstGeom prst="rect">
             <a:avLst/>
@@ -27837,7 +27842,7 @@
           <a:p>
             <a:r>
               <a:rPr kumimoji="1" lang="en-US" altLang="ja-JP" sz="1200" dirty="0"/>
-              <a:t>7) If the pitch is wrong, click here. </a:t>
+              <a:t>7) If the pitch/tempo is wrong, click here. </a:t>
             </a:r>
           </a:p>
         </p:txBody>
@@ -27856,7 +27861,7 @@
         </p:nvSpPr>
         <p:spPr>
           <a:xfrm>
-            <a:off x="3743960" y="2218908"/>
+            <a:off x="4067141" y="2373877"/>
             <a:ext cx="550333" cy="369332"/>
           </a:xfrm>
           <a:prstGeom prst="rect">
@@ -27892,7 +27897,7 @@
         </p:nvSpPr>
         <p:spPr>
           <a:xfrm>
-            <a:off x="4820920" y="2218908"/>
+            <a:off x="4820920" y="2344180"/>
             <a:ext cx="550333" cy="369332"/>
           </a:xfrm>
           <a:prstGeom prst="rect">
@@ -27928,7 +27933,7 @@
         </p:nvSpPr>
         <p:spPr>
           <a:xfrm>
-            <a:off x="5293062" y="2218908"/>
+            <a:off x="5293062" y="2344180"/>
             <a:ext cx="550333" cy="369332"/>
           </a:xfrm>
           <a:prstGeom prst="rect">
@@ -27964,7 +27969,7 @@
         </p:nvSpPr>
         <p:spPr>
           <a:xfrm>
-            <a:off x="5737332" y="2218908"/>
+            <a:off x="5737332" y="2344180"/>
             <a:ext cx="550333" cy="369332"/>
           </a:xfrm>
           <a:prstGeom prst="rect">
@@ -28000,7 +28005,7 @@
         </p:nvSpPr>
         <p:spPr>
           <a:xfrm>
-            <a:off x="2062835" y="2489841"/>
+            <a:off x="1996350" y="2644151"/>
             <a:ext cx="550333" cy="369332"/>
           </a:xfrm>
           <a:prstGeom prst="rect">
@@ -28036,7 +28041,7 @@
         </p:nvSpPr>
         <p:spPr>
           <a:xfrm>
-            <a:off x="2783682" y="4101125"/>
+            <a:off x="5211095" y="5698184"/>
             <a:ext cx="550333" cy="369332"/>
           </a:xfrm>
           <a:prstGeom prst="rect">
@@ -28072,7 +28077,7 @@
         </p:nvSpPr>
         <p:spPr>
           <a:xfrm>
-            <a:off x="4108712" y="4875899"/>
+            <a:off x="4108712" y="4691233"/>
             <a:ext cx="550333" cy="369332"/>
           </a:xfrm>
           <a:prstGeom prst="rect">
@@ -28108,7 +28113,7 @@
         </p:nvSpPr>
         <p:spPr>
           <a:xfrm>
-            <a:off x="2783682" y="5538427"/>
+            <a:off x="2062835" y="5429897"/>
             <a:ext cx="550333" cy="369332"/>
           </a:xfrm>
           <a:prstGeom prst="rect">
@@ -28182,6 +28187,386 @@
               <a:rPr kumimoji="1" lang="en-US" altLang="ja-JP" sz="1600" dirty="0"/>
               <a:t>/mgs file on a real chip via VSIF or SPFM. Substitutes for similar chips are also available. For example, an OPL track can be played on an OPL3 chip.</a:t>
             </a:r>
+          </a:p>
+        </p:txBody>
+      </p:sp>
+      <p:sp>
+        <p:nvSpPr>
+          <p:cNvPr id="3" name="四角形: 角を丸くする 2">
+            <a:extLst>
+              <a:ext uri="{FF2B5EF4-FFF2-40B4-BE49-F238E27FC236}">
+                <a16:creationId xmlns:a16="http://schemas.microsoft.com/office/drawing/2014/main" id="{4D908123-7D67-F946-77AB-13D8C870CCD3}"/>
+              </a:ext>
+            </a:extLst>
+          </p:cNvPr>
+          <p:cNvSpPr/>
+          <p:nvPr/>
+        </p:nvSpPr>
+        <p:spPr>
+          <a:xfrm>
+            <a:off x="2480093" y="2713512"/>
+            <a:ext cx="221543" cy="1556249"/>
+          </a:xfrm>
+          <a:prstGeom prst="roundRect">
+            <a:avLst/>
+          </a:prstGeom>
+          <a:noFill/>
+        </p:spPr>
+        <p:style>
+          <a:lnRef idx="2">
+            <a:schemeClr val="accent1">
+              <a:shade val="50000"/>
+            </a:schemeClr>
+          </a:lnRef>
+          <a:fillRef idx="1">
+            <a:schemeClr val="accent1"/>
+          </a:fillRef>
+          <a:effectRef idx="0">
+            <a:schemeClr val="accent1"/>
+          </a:effectRef>
+          <a:fontRef idx="minor">
+            <a:schemeClr val="lt1"/>
+          </a:fontRef>
+        </p:style>
+        <p:txBody>
+          <a:bodyPr rtlCol="0" anchor="ctr"/>
+          <a:lstStyle/>
+          <a:p>
+            <a:pPr algn="ctr"/>
+            <a:endParaRPr kumimoji="1" lang="ja-JP" altLang="en-US"/>
+          </a:p>
+        </p:txBody>
+      </p:sp>
+      <p:sp>
+        <p:nvSpPr>
+          <p:cNvPr id="7" name="四角形: 角を丸くする 6">
+            <a:extLst>
+              <a:ext uri="{FF2B5EF4-FFF2-40B4-BE49-F238E27FC236}">
+                <a16:creationId xmlns:a16="http://schemas.microsoft.com/office/drawing/2014/main" id="{FF730A5D-E1A0-EB4C-F92C-95107157E48B}"/>
+              </a:ext>
+            </a:extLst>
+          </p:cNvPr>
+          <p:cNvSpPr/>
+          <p:nvPr/>
+        </p:nvSpPr>
+        <p:spPr>
+          <a:xfrm>
+            <a:off x="3296269" y="2713512"/>
+            <a:ext cx="1655741" cy="1556249"/>
+          </a:xfrm>
+          <a:prstGeom prst="roundRect">
+            <a:avLst>
+              <a:gd name="adj" fmla="val 5614"/>
+            </a:avLst>
+          </a:prstGeom>
+          <a:noFill/>
+        </p:spPr>
+        <p:style>
+          <a:lnRef idx="2">
+            <a:schemeClr val="accent1">
+              <a:shade val="50000"/>
+            </a:schemeClr>
+          </a:lnRef>
+          <a:fillRef idx="1">
+            <a:schemeClr val="accent1"/>
+          </a:fillRef>
+          <a:effectRef idx="0">
+            <a:schemeClr val="accent1"/>
+          </a:effectRef>
+          <a:fontRef idx="minor">
+            <a:schemeClr val="lt1"/>
+          </a:fontRef>
+        </p:style>
+        <p:txBody>
+          <a:bodyPr rtlCol="0" anchor="ctr"/>
+          <a:lstStyle/>
+          <a:p>
+            <a:pPr algn="ctr"/>
+            <a:endParaRPr kumimoji="1" lang="ja-JP" altLang="en-US"/>
+          </a:p>
+        </p:txBody>
+      </p:sp>
+      <p:sp>
+        <p:nvSpPr>
+          <p:cNvPr id="8" name="四角形: 角を丸くする 7">
+            <a:extLst>
+              <a:ext uri="{FF2B5EF4-FFF2-40B4-BE49-F238E27FC236}">
+                <a16:creationId xmlns:a16="http://schemas.microsoft.com/office/drawing/2014/main" id="{A7EEE237-4DFA-7C10-25CD-3CB33517A5DD}"/>
+              </a:ext>
+            </a:extLst>
+          </p:cNvPr>
+          <p:cNvSpPr/>
+          <p:nvPr/>
+        </p:nvSpPr>
+        <p:spPr>
+          <a:xfrm>
+            <a:off x="2542221" y="5429897"/>
+            <a:ext cx="2639560" cy="530827"/>
+          </a:xfrm>
+          <a:prstGeom prst="roundRect">
+            <a:avLst/>
+          </a:prstGeom>
+          <a:noFill/>
+        </p:spPr>
+        <p:style>
+          <a:lnRef idx="2">
+            <a:schemeClr val="accent1">
+              <a:shade val="50000"/>
+            </a:schemeClr>
+          </a:lnRef>
+          <a:fillRef idx="1">
+            <a:schemeClr val="accent1"/>
+          </a:fillRef>
+          <a:effectRef idx="0">
+            <a:schemeClr val="accent1"/>
+          </a:effectRef>
+          <a:fontRef idx="minor">
+            <a:schemeClr val="lt1"/>
+          </a:fontRef>
+        </p:style>
+        <p:txBody>
+          <a:bodyPr rtlCol="0" anchor="ctr"/>
+          <a:lstStyle/>
+          <a:p>
+            <a:pPr algn="ctr"/>
+            <a:endParaRPr kumimoji="1" lang="ja-JP" altLang="en-US"/>
+          </a:p>
+        </p:txBody>
+      </p:sp>
+      <p:sp>
+        <p:nvSpPr>
+          <p:cNvPr id="9" name="四角形: 角を丸くする 8">
+            <a:extLst>
+              <a:ext uri="{FF2B5EF4-FFF2-40B4-BE49-F238E27FC236}">
+                <a16:creationId xmlns:a16="http://schemas.microsoft.com/office/drawing/2014/main" id="{59476CBB-5CF9-07F5-8E98-03F5C30024BA}"/>
+              </a:ext>
+            </a:extLst>
+          </p:cNvPr>
+          <p:cNvSpPr/>
+          <p:nvPr/>
+        </p:nvSpPr>
+        <p:spPr>
+          <a:xfrm>
+            <a:off x="2512907" y="4368243"/>
+            <a:ext cx="3741944" cy="963348"/>
+          </a:xfrm>
+          <a:prstGeom prst="roundRect">
+            <a:avLst>
+              <a:gd name="adj" fmla="val 6805"/>
+            </a:avLst>
+          </a:prstGeom>
+          <a:noFill/>
+        </p:spPr>
+        <p:style>
+          <a:lnRef idx="2">
+            <a:schemeClr val="accent1">
+              <a:shade val="50000"/>
+            </a:schemeClr>
+          </a:lnRef>
+          <a:fillRef idx="1">
+            <a:schemeClr val="accent1"/>
+          </a:fillRef>
+          <a:effectRef idx="0">
+            <a:schemeClr val="accent1"/>
+          </a:effectRef>
+          <a:fontRef idx="minor">
+            <a:schemeClr val="lt1"/>
+          </a:fontRef>
+        </p:style>
+        <p:txBody>
+          <a:bodyPr rtlCol="0" anchor="ctr"/>
+          <a:lstStyle/>
+          <a:p>
+            <a:pPr algn="ctr"/>
+            <a:endParaRPr kumimoji="1" lang="ja-JP" altLang="en-US"/>
+          </a:p>
+        </p:txBody>
+      </p:sp>
+      <p:sp>
+        <p:nvSpPr>
+          <p:cNvPr id="10" name="四角形: 角を丸くする 9">
+            <a:extLst>
+              <a:ext uri="{FF2B5EF4-FFF2-40B4-BE49-F238E27FC236}">
+                <a16:creationId xmlns:a16="http://schemas.microsoft.com/office/drawing/2014/main" id="{16F99D0C-E39F-716F-E280-85AA63BD8964}"/>
+              </a:ext>
+            </a:extLst>
+          </p:cNvPr>
+          <p:cNvSpPr/>
+          <p:nvPr/>
+        </p:nvSpPr>
+        <p:spPr>
+          <a:xfrm>
+            <a:off x="5181781" y="5429897"/>
+            <a:ext cx="632766" cy="268287"/>
+          </a:xfrm>
+          <a:prstGeom prst="roundRect">
+            <a:avLst/>
+          </a:prstGeom>
+          <a:noFill/>
+        </p:spPr>
+        <p:style>
+          <a:lnRef idx="2">
+            <a:schemeClr val="accent1">
+              <a:shade val="50000"/>
+            </a:schemeClr>
+          </a:lnRef>
+          <a:fillRef idx="1">
+            <a:schemeClr val="accent1"/>
+          </a:fillRef>
+          <a:effectRef idx="0">
+            <a:schemeClr val="accent1"/>
+          </a:effectRef>
+          <a:fontRef idx="minor">
+            <a:schemeClr val="lt1"/>
+          </a:fontRef>
+        </p:style>
+        <p:txBody>
+          <a:bodyPr rtlCol="0" anchor="ctr"/>
+          <a:lstStyle/>
+          <a:p>
+            <a:pPr algn="ctr"/>
+            <a:endParaRPr kumimoji="1" lang="ja-JP" altLang="en-US"/>
+          </a:p>
+        </p:txBody>
+      </p:sp>
+      <p:sp>
+        <p:nvSpPr>
+          <p:cNvPr id="11" name="四角形: 角を丸くする 10">
+            <a:extLst>
+              <a:ext uri="{FF2B5EF4-FFF2-40B4-BE49-F238E27FC236}">
+                <a16:creationId xmlns:a16="http://schemas.microsoft.com/office/drawing/2014/main" id="{610F8C62-A0B1-4C56-E977-EB027977C24F}"/>
+              </a:ext>
+            </a:extLst>
+          </p:cNvPr>
+          <p:cNvSpPr/>
+          <p:nvPr/>
+        </p:nvSpPr>
+        <p:spPr>
+          <a:xfrm>
+            <a:off x="4942257" y="2713512"/>
+            <a:ext cx="366013" cy="1556249"/>
+          </a:xfrm>
+          <a:prstGeom prst="roundRect">
+            <a:avLst/>
+          </a:prstGeom>
+          <a:noFill/>
+        </p:spPr>
+        <p:style>
+          <a:lnRef idx="2">
+            <a:schemeClr val="accent1">
+              <a:shade val="50000"/>
+            </a:schemeClr>
+          </a:lnRef>
+          <a:fillRef idx="1">
+            <a:schemeClr val="accent1"/>
+          </a:fillRef>
+          <a:effectRef idx="0">
+            <a:schemeClr val="accent1"/>
+          </a:effectRef>
+          <a:fontRef idx="minor">
+            <a:schemeClr val="lt1"/>
+          </a:fontRef>
+        </p:style>
+        <p:txBody>
+          <a:bodyPr rtlCol="0" anchor="ctr"/>
+          <a:lstStyle/>
+          <a:p>
+            <a:pPr algn="ctr"/>
+            <a:endParaRPr kumimoji="1" lang="ja-JP" altLang="en-US"/>
+          </a:p>
+        </p:txBody>
+      </p:sp>
+      <p:sp>
+        <p:nvSpPr>
+          <p:cNvPr id="12" name="四角形: 角を丸くする 11">
+            <a:extLst>
+              <a:ext uri="{FF2B5EF4-FFF2-40B4-BE49-F238E27FC236}">
+                <a16:creationId xmlns:a16="http://schemas.microsoft.com/office/drawing/2014/main" id="{01AE615C-C4CF-84BE-B92A-C8B244A13F39}"/>
+              </a:ext>
+            </a:extLst>
+          </p:cNvPr>
+          <p:cNvSpPr/>
+          <p:nvPr/>
+        </p:nvSpPr>
+        <p:spPr>
+          <a:xfrm>
+            <a:off x="5303254" y="2713512"/>
+            <a:ext cx="455088" cy="1556249"/>
+          </a:xfrm>
+          <a:prstGeom prst="roundRect">
+            <a:avLst/>
+          </a:prstGeom>
+          <a:noFill/>
+        </p:spPr>
+        <p:style>
+          <a:lnRef idx="2">
+            <a:schemeClr val="accent1">
+              <a:shade val="50000"/>
+            </a:schemeClr>
+          </a:lnRef>
+          <a:fillRef idx="1">
+            <a:schemeClr val="accent1"/>
+          </a:fillRef>
+          <a:effectRef idx="0">
+            <a:schemeClr val="accent1"/>
+          </a:effectRef>
+          <a:fontRef idx="minor">
+            <a:schemeClr val="lt1"/>
+          </a:fontRef>
+        </p:style>
+        <p:txBody>
+          <a:bodyPr rtlCol="0" anchor="ctr"/>
+          <a:lstStyle/>
+          <a:p>
+            <a:pPr algn="ctr"/>
+            <a:endParaRPr kumimoji="1" lang="ja-JP" altLang="en-US"/>
+          </a:p>
+        </p:txBody>
+      </p:sp>
+      <p:sp>
+        <p:nvSpPr>
+          <p:cNvPr id="13" name="四角形: 角を丸くする 12">
+            <a:extLst>
+              <a:ext uri="{FF2B5EF4-FFF2-40B4-BE49-F238E27FC236}">
+                <a16:creationId xmlns:a16="http://schemas.microsoft.com/office/drawing/2014/main" id="{D2C262B8-5A09-6E28-53D4-F79AA0CF0462}"/>
+              </a:ext>
+            </a:extLst>
+          </p:cNvPr>
+          <p:cNvSpPr/>
+          <p:nvPr/>
+        </p:nvSpPr>
+        <p:spPr>
+          <a:xfrm>
+            <a:off x="5766790" y="2713512"/>
+            <a:ext cx="455088" cy="1556249"/>
+          </a:xfrm>
+          <a:prstGeom prst="roundRect">
+            <a:avLst/>
+          </a:prstGeom>
+          <a:noFill/>
+        </p:spPr>
+        <p:style>
+          <a:lnRef idx="2">
+            <a:schemeClr val="accent1">
+              <a:shade val="50000"/>
+            </a:schemeClr>
+          </a:lnRef>
+          <a:fillRef idx="1">
+            <a:schemeClr val="accent1"/>
+          </a:fillRef>
+          <a:effectRef idx="0">
+            <a:schemeClr val="accent1"/>
+          </a:effectRef>
+          <a:fontRef idx="minor">
+            <a:schemeClr val="lt1"/>
+          </a:fontRef>
+        </p:style>
+        <p:txBody>
+          <a:bodyPr rtlCol="0" anchor="ctr"/>
+          <a:lstStyle/>
+          <a:p>
+            <a:pPr algn="ctr"/>
+            <a:endParaRPr kumimoji="1" lang="ja-JP" altLang="en-US"/>
           </a:p>
         </p:txBody>
       </p:sp>

</xml_diff>

<commit_message>
4.6.6.0 Suppressed F/W dialog at startup. And add the "-chip_server" option to enable RPC server feature to control MAmidiMEmo chips from other applications.
</commit_message>
<xml_diff>
--- a/docs/MAmidiMEmo/Manual.pptx
+++ b/docs/MAmidiMEmo/Manual.pptx
@@ -235,7 +235,7 @@
           <a:p>
             <a:fld id="{581C28D8-13B6-41C3-9F5F-0284C569C6F1}" type="datetimeFigureOut">
               <a:rPr kumimoji="1" lang="ja-JP" altLang="en-US" smtClean="0"/>
-              <a:t>2023/2/26</a:t>
+              <a:t>2023/3/25</a:t>
             </a:fld>
             <a:endParaRPr kumimoji="1" lang="ja-JP" altLang="en-US"/>
           </a:p>
@@ -1646,7 +1646,7 @@
           <a:p>
             <a:fld id="{B8625E62-B904-4691-B75E-EC1C32885285}" type="datetime1">
               <a:rPr kumimoji="1" lang="ja-JP" altLang="en-US" smtClean="0"/>
-              <a:t>2023/2/26</a:t>
+              <a:t>2023/3/25</a:t>
             </a:fld>
             <a:endParaRPr kumimoji="1" lang="ja-JP" altLang="en-US"/>
           </a:p>
@@ -1984,7 +1984,7 @@
           <a:p>
             <a:fld id="{A4C87007-2A40-4EFC-90A3-258EFA3C1001}" type="datetime1">
               <a:rPr kumimoji="1" lang="ja-JP" altLang="en-US" smtClean="0"/>
-              <a:t>2023/2/26</a:t>
+              <a:t>2023/3/25</a:t>
             </a:fld>
             <a:endParaRPr kumimoji="1" lang="ja-JP" altLang="en-US"/>
           </a:p>
@@ -2385,7 +2385,7 @@
           <a:p>
             <a:fld id="{0FE0D7FF-9203-4AA3-90FD-622674A14F90}" type="datetime1">
               <a:rPr kumimoji="1" lang="ja-JP" altLang="en-US" smtClean="0"/>
-              <a:t>2023/2/26</a:t>
+              <a:t>2023/3/25</a:t>
             </a:fld>
             <a:endParaRPr kumimoji="1" lang="ja-JP" altLang="en-US"/>
           </a:p>
@@ -2721,7 +2721,7 @@
           <a:p>
             <a:fld id="{D2D6E4D3-BEDB-4F35-876B-5B9AA41BFB5B}" type="datetime1">
               <a:rPr kumimoji="1" lang="ja-JP" altLang="en-US" smtClean="0"/>
-              <a:t>2023/2/26</a:t>
+              <a:t>2023/3/25</a:t>
             </a:fld>
             <a:endParaRPr kumimoji="1" lang="ja-JP" altLang="en-US"/>
           </a:p>
@@ -3041,7 +3041,7 @@
           <a:p>
             <a:fld id="{2ACD896E-FC14-4F25-BC47-18ABAEA9E1FE}" type="datetime1">
               <a:rPr kumimoji="1" lang="ja-JP" altLang="en-US" smtClean="0"/>
-              <a:t>2023/2/26</a:t>
+              <a:t>2023/3/25</a:t>
             </a:fld>
             <a:endParaRPr kumimoji="1" lang="ja-JP" altLang="en-US"/>
           </a:p>
@@ -3437,7 +3437,7 @@
           <a:p>
             <a:fld id="{54FC701B-2185-4987-B8E2-5507664B65F4}" type="datetime1">
               <a:rPr kumimoji="1" lang="ja-JP" altLang="en-US" smtClean="0"/>
-              <a:t>2023/2/26</a:t>
+              <a:t>2023/3/25</a:t>
             </a:fld>
             <a:endParaRPr kumimoji="1" lang="ja-JP" altLang="en-US"/>
           </a:p>
@@ -3726,7 +3726,7 @@
           <a:p>
             <a:fld id="{3FB4CDED-9617-418F-B546-D66B9BB6C35E}" type="datetime1">
               <a:rPr kumimoji="1" lang="ja-JP" altLang="en-US" smtClean="0"/>
-              <a:t>2023/2/26</a:t>
+              <a:t>2023/3/25</a:t>
             </a:fld>
             <a:endParaRPr kumimoji="1" lang="ja-JP" altLang="en-US"/>
           </a:p>
@@ -4020,7 +4020,7 @@
           <a:p>
             <a:fld id="{F5635D40-962A-46D7-8037-3F2900B5EB4D}" type="datetime1">
               <a:rPr kumimoji="1" lang="ja-JP" altLang="en-US" smtClean="0"/>
-              <a:t>2023/2/26</a:t>
+              <a:t>2023/3/25</a:t>
             </a:fld>
             <a:endParaRPr kumimoji="1" lang="ja-JP" altLang="en-US"/>
           </a:p>
@@ -4314,7 +4314,7 @@
           <a:p>
             <a:fld id="{741DA9A2-8356-4FFD-B66A-E38811049858}" type="datetime1">
               <a:rPr kumimoji="1" lang="ja-JP" altLang="en-US" smtClean="0"/>
-              <a:t>2023/2/26</a:t>
+              <a:t>2023/3/25</a:t>
             </a:fld>
             <a:endParaRPr kumimoji="1" lang="ja-JP" altLang="en-US"/>
           </a:p>
@@ -4643,7 +4643,7 @@
           <a:p>
             <a:fld id="{9DDE8989-88B8-4869-97D9-547531F13E13}" type="datetime1">
               <a:rPr kumimoji="1" lang="ja-JP" altLang="en-US" smtClean="0"/>
-              <a:t>2023/2/26</a:t>
+              <a:t>2023/3/25</a:t>
             </a:fld>
             <a:endParaRPr kumimoji="1" lang="ja-JP" altLang="en-US"/>
           </a:p>
@@ -5030,7 +5030,7 @@
           <a:p>
             <a:fld id="{81EC4031-B949-4300-AB3E-1551426E8631}" type="datetime1">
               <a:rPr kumimoji="1" lang="ja-JP" altLang="en-US" smtClean="0"/>
-              <a:t>2023/2/26</a:t>
+              <a:t>2023/3/25</a:t>
             </a:fld>
             <a:endParaRPr kumimoji="1" lang="ja-JP" altLang="en-US"/>
           </a:p>
@@ -5551,7 +5551,7 @@
           <a:p>
             <a:fld id="{F39E755E-A59D-4634-B604-E9BB568B1156}" type="datetime1">
               <a:rPr kumimoji="1" lang="ja-JP" altLang="en-US" smtClean="0"/>
-              <a:t>2023/2/26</a:t>
+              <a:t>2023/3/25</a:t>
             </a:fld>
             <a:endParaRPr kumimoji="1" lang="ja-JP" altLang="en-US"/>
           </a:p>
@@ -5756,7 +5756,7 @@
           <a:p>
             <a:fld id="{61DA38B3-7601-4256-ABFE-386B92B0EDB5}" type="datetime1">
               <a:rPr kumimoji="1" lang="ja-JP" altLang="en-US" smtClean="0"/>
-              <a:t>2023/2/26</a:t>
+              <a:t>2023/3/25</a:t>
             </a:fld>
             <a:endParaRPr kumimoji="1" lang="ja-JP" altLang="en-US"/>
           </a:p>
@@ -5933,7 +5933,7 @@
           <a:p>
             <a:fld id="{5A28ED6D-8A94-4DBA-8EF2-284D1A467CE8}" type="datetime1">
               <a:rPr kumimoji="1" lang="ja-JP" altLang="en-US" smtClean="0"/>
-              <a:t>2023/2/26</a:t>
+              <a:t>2023/3/25</a:t>
             </a:fld>
             <a:endParaRPr kumimoji="1" lang="ja-JP" altLang="en-US"/>
           </a:p>
@@ -6298,7 +6298,7 @@
           <a:p>
             <a:fld id="{B27B0317-28AF-43C5-8944-AADFA89E0149}" type="datetime1">
               <a:rPr kumimoji="1" lang="ja-JP" altLang="en-US" smtClean="0"/>
-              <a:t>2023/2/26</a:t>
+              <a:t>2023/3/25</a:t>
             </a:fld>
             <a:endParaRPr kumimoji="1" lang="ja-JP" altLang="en-US"/>
           </a:p>
@@ -6643,7 +6643,7 @@
           <a:p>
             <a:fld id="{A78D023C-C4FA-4CE8-B5BE-6798898EE377}" type="datetime1">
               <a:rPr kumimoji="1" lang="ja-JP" altLang="en-US" smtClean="0"/>
-              <a:t>2023/2/26</a:t>
+              <a:t>2023/3/25</a:t>
             </a:fld>
             <a:endParaRPr kumimoji="1" lang="ja-JP" altLang="en-US"/>
           </a:p>
@@ -8792,7 +8792,7 @@
           <a:p>
             <a:fld id="{99567159-F4A8-4352-915B-DDBEFEF4A4D6}" type="datetime1">
               <a:rPr kumimoji="1" lang="ja-JP" altLang="en-US" smtClean="0"/>
-              <a:t>2023/2/26</a:t>
+              <a:t>2023/3/25</a:t>
             </a:fld>
             <a:endParaRPr kumimoji="1" lang="ja-JP" altLang="en-US"/>
           </a:p>
@@ -9386,7 +9386,7 @@
             </a:r>
             <a:r>
               <a:rPr lang="en-US" altLang="ja-JP"/>
-              <a:t> V4.5.8.0</a:t>
+              <a:t> V4.6.5.0</a:t>
             </a:r>
             <a:endParaRPr lang="ja-JP" altLang="en-US" dirty="0"/>
           </a:p>
@@ -39105,7 +39105,35 @@
             </a:r>
             <a:r>
               <a:rPr kumimoji="1" lang="en-US" altLang="ja-JP" dirty="0"/>
-              <a:t> will starts RPC server on port 30000 at startup.</a:t>
+              <a:t> will starts RPC server on port 30000 at startup</a:t>
+            </a:r>
+            <a:r>
+              <a:rPr lang="ja-JP" altLang="en-US" dirty="0"/>
+              <a:t> </a:t>
+            </a:r>
+            <a:r>
+              <a:rPr lang="en-US" altLang="ja-JP" dirty="0"/>
+              <a:t>with</a:t>
+            </a:r>
+            <a:r>
+              <a:rPr lang="ja-JP" altLang="en-US" dirty="0"/>
+              <a:t> </a:t>
+            </a:r>
+            <a:r>
+              <a:rPr lang="en-US" altLang="ja-JP" dirty="0"/>
+              <a:t>“-</a:t>
+            </a:r>
+            <a:r>
+              <a:rPr lang="en-US" altLang="ja-JP" dirty="0" err="1"/>
+              <a:t>chip_server</a:t>
+            </a:r>
+            <a:r>
+              <a:rPr lang="en-US" altLang="ja-JP" dirty="0"/>
+              <a:t>” option</a:t>
+            </a:r>
+            <a:r>
+              <a:rPr kumimoji="1" lang="en-US" altLang="ja-JP" dirty="0"/>
+              <a:t>.</a:t>
             </a:r>
             <a:br>
               <a:rPr kumimoji="1" lang="en-US" altLang="ja-JP" dirty="0"/>

</xml_diff>

<commit_message>
- Improved XGM timing
</commit_message>
<xml_diff>
--- a/docs/MAmidiMEmo/Manual.pptx
+++ b/docs/MAmidiMEmo/Manual.pptx
@@ -5,7 +5,7 @@
     <p:sldMasterId id="2147483678" r:id="rId1"/>
   </p:sldMasterIdLst>
   <p:notesMasterIdLst>
-    <p:notesMasterId r:id="rId43"/>
+    <p:notesMasterId r:id="rId44"/>
   </p:notesMasterIdLst>
   <p:sldIdLst>
     <p:sldId id="256" r:id="rId2"/>
@@ -45,10 +45,11 @@
     <p:sldId id="283" r:id="rId36"/>
     <p:sldId id="285" r:id="rId37"/>
     <p:sldId id="284" r:id="rId38"/>
-    <p:sldId id="288" r:id="rId39"/>
-    <p:sldId id="287" r:id="rId40"/>
-    <p:sldId id="292" r:id="rId41"/>
-    <p:sldId id="293" r:id="rId42"/>
+    <p:sldId id="301" r:id="rId39"/>
+    <p:sldId id="288" r:id="rId40"/>
+    <p:sldId id="287" r:id="rId41"/>
+    <p:sldId id="292" r:id="rId42"/>
+    <p:sldId id="293" r:id="rId43"/>
   </p:sldIdLst>
   <p:sldSz cx="12192000" cy="6858000"/>
   <p:notesSz cx="6858000" cy="9144000"/>
@@ -237,7 +238,7 @@
           <a:p>
             <a:fld id="{581C28D8-13B6-41C3-9F5F-0284C569C6F1}" type="datetimeFigureOut">
               <a:rPr kumimoji="1" lang="ja-JP" altLang="en-US" smtClean="0"/>
-              <a:t>2023/3/31</a:t>
+              <a:t>2023/4/4</a:t>
             </a:fld>
             <a:endParaRPr kumimoji="1" lang="ja-JP" altLang="en-US"/>
           </a:p>
@@ -685,7 +686,7 @@
           <a:p>
             <a:fld id="{E8D2F5C4-CB40-44D3-9C89-5ECCD9AB4B5C}" type="slidenum">
               <a:rPr kumimoji="1" lang="ja-JP" altLang="en-US" smtClean="0"/>
-              <a:t>40</a:t>
+              <a:t>41</a:t>
             </a:fld>
             <a:endParaRPr kumimoji="1" lang="ja-JP" altLang="en-US"/>
           </a:p>
@@ -769,7 +770,7 @@
           <a:p>
             <a:fld id="{E8D2F5C4-CB40-44D3-9C89-5ECCD9AB4B5C}" type="slidenum">
               <a:rPr kumimoji="1" lang="ja-JP" altLang="en-US" smtClean="0"/>
-              <a:t>41</a:t>
+              <a:t>42</a:t>
             </a:fld>
             <a:endParaRPr kumimoji="1" lang="ja-JP" altLang="en-US"/>
           </a:p>
@@ -1648,7 +1649,7 @@
           <a:p>
             <a:fld id="{B8625E62-B904-4691-B75E-EC1C32885285}" type="datetime1">
               <a:rPr kumimoji="1" lang="ja-JP" altLang="en-US" smtClean="0"/>
-              <a:t>2023/3/31</a:t>
+              <a:t>2023/4/4</a:t>
             </a:fld>
             <a:endParaRPr kumimoji="1" lang="ja-JP" altLang="en-US"/>
           </a:p>
@@ -1986,7 +1987,7 @@
           <a:p>
             <a:fld id="{A4C87007-2A40-4EFC-90A3-258EFA3C1001}" type="datetime1">
               <a:rPr kumimoji="1" lang="ja-JP" altLang="en-US" smtClean="0"/>
-              <a:t>2023/3/31</a:t>
+              <a:t>2023/4/4</a:t>
             </a:fld>
             <a:endParaRPr kumimoji="1" lang="ja-JP" altLang="en-US"/>
           </a:p>
@@ -2387,7 +2388,7 @@
           <a:p>
             <a:fld id="{0FE0D7FF-9203-4AA3-90FD-622674A14F90}" type="datetime1">
               <a:rPr kumimoji="1" lang="ja-JP" altLang="en-US" smtClean="0"/>
-              <a:t>2023/3/31</a:t>
+              <a:t>2023/4/4</a:t>
             </a:fld>
             <a:endParaRPr kumimoji="1" lang="ja-JP" altLang="en-US"/>
           </a:p>
@@ -2723,7 +2724,7 @@
           <a:p>
             <a:fld id="{D2D6E4D3-BEDB-4F35-876B-5B9AA41BFB5B}" type="datetime1">
               <a:rPr kumimoji="1" lang="ja-JP" altLang="en-US" smtClean="0"/>
-              <a:t>2023/3/31</a:t>
+              <a:t>2023/4/4</a:t>
             </a:fld>
             <a:endParaRPr kumimoji="1" lang="ja-JP" altLang="en-US"/>
           </a:p>
@@ -3043,7 +3044,7 @@
           <a:p>
             <a:fld id="{2ACD896E-FC14-4F25-BC47-18ABAEA9E1FE}" type="datetime1">
               <a:rPr kumimoji="1" lang="ja-JP" altLang="en-US" smtClean="0"/>
-              <a:t>2023/3/31</a:t>
+              <a:t>2023/4/4</a:t>
             </a:fld>
             <a:endParaRPr kumimoji="1" lang="ja-JP" altLang="en-US"/>
           </a:p>
@@ -3439,7 +3440,7 @@
           <a:p>
             <a:fld id="{54FC701B-2185-4987-B8E2-5507664B65F4}" type="datetime1">
               <a:rPr kumimoji="1" lang="ja-JP" altLang="en-US" smtClean="0"/>
-              <a:t>2023/3/31</a:t>
+              <a:t>2023/4/4</a:t>
             </a:fld>
             <a:endParaRPr kumimoji="1" lang="ja-JP" altLang="en-US"/>
           </a:p>
@@ -3728,7 +3729,7 @@
           <a:p>
             <a:fld id="{3FB4CDED-9617-418F-B546-D66B9BB6C35E}" type="datetime1">
               <a:rPr kumimoji="1" lang="ja-JP" altLang="en-US" smtClean="0"/>
-              <a:t>2023/3/31</a:t>
+              <a:t>2023/4/4</a:t>
             </a:fld>
             <a:endParaRPr kumimoji="1" lang="ja-JP" altLang="en-US"/>
           </a:p>
@@ -4022,7 +4023,7 @@
           <a:p>
             <a:fld id="{F5635D40-962A-46D7-8037-3F2900B5EB4D}" type="datetime1">
               <a:rPr kumimoji="1" lang="ja-JP" altLang="en-US" smtClean="0"/>
-              <a:t>2023/3/31</a:t>
+              <a:t>2023/4/4</a:t>
             </a:fld>
             <a:endParaRPr kumimoji="1" lang="ja-JP" altLang="en-US"/>
           </a:p>
@@ -4316,7 +4317,7 @@
           <a:p>
             <a:fld id="{741DA9A2-8356-4FFD-B66A-E38811049858}" type="datetime1">
               <a:rPr kumimoji="1" lang="ja-JP" altLang="en-US" smtClean="0"/>
-              <a:t>2023/3/31</a:t>
+              <a:t>2023/4/4</a:t>
             </a:fld>
             <a:endParaRPr kumimoji="1" lang="ja-JP" altLang="en-US"/>
           </a:p>
@@ -4645,7 +4646,7 @@
           <a:p>
             <a:fld id="{9DDE8989-88B8-4869-97D9-547531F13E13}" type="datetime1">
               <a:rPr kumimoji="1" lang="ja-JP" altLang="en-US" smtClean="0"/>
-              <a:t>2023/3/31</a:t>
+              <a:t>2023/4/4</a:t>
             </a:fld>
             <a:endParaRPr kumimoji="1" lang="ja-JP" altLang="en-US"/>
           </a:p>
@@ -5032,7 +5033,7 @@
           <a:p>
             <a:fld id="{81EC4031-B949-4300-AB3E-1551426E8631}" type="datetime1">
               <a:rPr kumimoji="1" lang="ja-JP" altLang="en-US" smtClean="0"/>
-              <a:t>2023/3/31</a:t>
+              <a:t>2023/4/4</a:t>
             </a:fld>
             <a:endParaRPr kumimoji="1" lang="ja-JP" altLang="en-US"/>
           </a:p>
@@ -5553,7 +5554,7 @@
           <a:p>
             <a:fld id="{F39E755E-A59D-4634-B604-E9BB568B1156}" type="datetime1">
               <a:rPr kumimoji="1" lang="ja-JP" altLang="en-US" smtClean="0"/>
-              <a:t>2023/3/31</a:t>
+              <a:t>2023/4/4</a:t>
             </a:fld>
             <a:endParaRPr kumimoji="1" lang="ja-JP" altLang="en-US"/>
           </a:p>
@@ -5758,7 +5759,7 @@
           <a:p>
             <a:fld id="{61DA38B3-7601-4256-ABFE-386B92B0EDB5}" type="datetime1">
               <a:rPr kumimoji="1" lang="ja-JP" altLang="en-US" smtClean="0"/>
-              <a:t>2023/3/31</a:t>
+              <a:t>2023/4/4</a:t>
             </a:fld>
             <a:endParaRPr kumimoji="1" lang="ja-JP" altLang="en-US"/>
           </a:p>
@@ -5935,7 +5936,7 @@
           <a:p>
             <a:fld id="{5A28ED6D-8A94-4DBA-8EF2-284D1A467CE8}" type="datetime1">
               <a:rPr kumimoji="1" lang="ja-JP" altLang="en-US" smtClean="0"/>
-              <a:t>2023/3/31</a:t>
+              <a:t>2023/4/4</a:t>
             </a:fld>
             <a:endParaRPr kumimoji="1" lang="ja-JP" altLang="en-US"/>
           </a:p>
@@ -6300,7 +6301,7 @@
           <a:p>
             <a:fld id="{B27B0317-28AF-43C5-8944-AADFA89E0149}" type="datetime1">
               <a:rPr kumimoji="1" lang="ja-JP" altLang="en-US" smtClean="0"/>
-              <a:t>2023/3/31</a:t>
+              <a:t>2023/4/4</a:t>
             </a:fld>
             <a:endParaRPr kumimoji="1" lang="ja-JP" altLang="en-US"/>
           </a:p>
@@ -6645,7 +6646,7 @@
           <a:p>
             <a:fld id="{A78D023C-C4FA-4CE8-B5BE-6798898EE377}" type="datetime1">
               <a:rPr kumimoji="1" lang="ja-JP" altLang="en-US" smtClean="0"/>
-              <a:t>2023/3/31</a:t>
+              <a:t>2023/4/4</a:t>
             </a:fld>
             <a:endParaRPr kumimoji="1" lang="ja-JP" altLang="en-US"/>
           </a:p>
@@ -8794,7 +8795,7 @@
           <a:p>
             <a:fld id="{99567159-F4A8-4352-915B-DDBEFEF4A4D6}" type="datetime1">
               <a:rPr kumimoji="1" lang="ja-JP" altLang="en-US" smtClean="0"/>
-              <a:t>2023/3/31</a:t>
+              <a:t>2023/4/4</a:t>
             </a:fld>
             <a:endParaRPr kumimoji="1" lang="ja-JP" altLang="en-US"/>
           </a:p>
@@ -9387,8 +9388,8 @@
               <a:t>MAmidiMEmo</a:t>
             </a:r>
             <a:r>
-              <a:rPr lang="en-US" altLang="ja-JP" dirty="0"/>
-              <a:t> V4.6.9.0</a:t>
+              <a:rPr lang="en-US" altLang="ja-JP"/>
+              <a:t> V4.7.0.0</a:t>
             </a:r>
             <a:endParaRPr lang="ja-JP" altLang="en-US" dirty="0"/>
           </a:p>
@@ -34941,6 +34942,372 @@
           <p:cNvPr id="2" name="タイトル 1">
             <a:extLst>
               <a:ext uri="{FF2B5EF4-FFF2-40B4-BE49-F238E27FC236}">
+                <a16:creationId xmlns:a16="http://schemas.microsoft.com/office/drawing/2014/main" id="{29A39A5C-7FC5-4D89-9A64-C4313BC4C574}"/>
+              </a:ext>
+            </a:extLst>
+          </p:cNvPr>
+          <p:cNvSpPr>
+            <a:spLocks noGrp="1"/>
+          </p:cNvSpPr>
+          <p:nvPr>
+            <p:ph type="title"/>
+          </p:nvPr>
+        </p:nvSpPr>
+        <p:spPr/>
+        <p:txBody>
+          <a:bodyPr/>
+          <a:lstStyle/>
+          <a:p>
+            <a:r>
+              <a:rPr kumimoji="1" lang="en-US" altLang="ja-JP" dirty="0"/>
+              <a:t>MIDI Implementation Chart 8</a:t>
+            </a:r>
+            <a:endParaRPr kumimoji="1" lang="ja-JP" altLang="en-US" dirty="0"/>
+          </a:p>
+        </p:txBody>
+      </p:sp>
+      <p:sp>
+        <p:nvSpPr>
+          <p:cNvPr id="4" name="スライド番号プレースホルダー 3">
+            <a:extLst>
+              <a:ext uri="{FF2B5EF4-FFF2-40B4-BE49-F238E27FC236}">
+                <a16:creationId xmlns:a16="http://schemas.microsoft.com/office/drawing/2014/main" id="{F527AEA0-7EF4-4546-B495-9F4920BF8281}"/>
+              </a:ext>
+            </a:extLst>
+          </p:cNvPr>
+          <p:cNvSpPr>
+            <a:spLocks noGrp="1"/>
+          </p:cNvSpPr>
+          <p:nvPr>
+            <p:ph type="sldNum" sz="quarter" idx="12"/>
+          </p:nvPr>
+        </p:nvSpPr>
+        <p:spPr/>
+        <p:txBody>
+          <a:bodyPr/>
+          <a:lstStyle/>
+          <a:p>
+            <a:fld id="{E27E2812-4560-4165-A7C7-9C013F955547}" type="slidenum">
+              <a:rPr kumimoji="1" lang="ja-JP" altLang="en-US" smtClean="0"/>
+              <a:t>38</a:t>
+            </a:fld>
+            <a:endParaRPr kumimoji="1" lang="ja-JP" altLang="en-US"/>
+          </a:p>
+        </p:txBody>
+      </p:sp>
+      <p:graphicFrame>
+        <p:nvGraphicFramePr>
+          <p:cNvPr id="8" name="表 7">
+            <a:extLst>
+              <a:ext uri="{FF2B5EF4-FFF2-40B4-BE49-F238E27FC236}">
+                <a16:creationId xmlns:a16="http://schemas.microsoft.com/office/drawing/2014/main" id="{CE226A58-A5B3-8096-445B-2C244D5AD3AD}"/>
+              </a:ext>
+            </a:extLst>
+          </p:cNvPr>
+          <p:cNvGraphicFramePr>
+            <a:graphicFrameLocks noGrp="1"/>
+          </p:cNvGraphicFramePr>
+          <p:nvPr>
+            <p:extLst>
+              <p:ext uri="{D42A27DB-BD31-4B8C-83A1-F6EECF244321}">
+                <p14:modId xmlns:p14="http://schemas.microsoft.com/office/powerpoint/2010/main" val="3284848408"/>
+              </p:ext>
+            </p:extLst>
+          </p:nvPr>
+        </p:nvGraphicFramePr>
+        <p:xfrm>
+          <a:off x="2032000" y="2225333"/>
+          <a:ext cx="9472611" cy="2656840"/>
+        </p:xfrm>
+        <a:graphic>
+          <a:graphicData uri="http://schemas.openxmlformats.org/drawingml/2006/table">
+            <a:tbl>
+              <a:tblPr firstRow="1" bandRow="1">
+                <a:tableStyleId>{5C22544A-7EE6-4342-B048-85BDC9FD1C3A}</a:tableStyleId>
+              </a:tblPr>
+              <a:tblGrid>
+                <a:gridCol w="2027484">
+                  <a:extLst>
+                    <a:ext uri="{9D8B030D-6E8A-4147-A177-3AD203B41FA5}">
+                      <a16:colId xmlns:a16="http://schemas.microsoft.com/office/drawing/2014/main" val="3140821746"/>
+                    </a:ext>
+                  </a:extLst>
+                </a:gridCol>
+                <a:gridCol w="2027484">
+                  <a:extLst>
+                    <a:ext uri="{9D8B030D-6E8A-4147-A177-3AD203B41FA5}">
+                      <a16:colId xmlns:a16="http://schemas.microsoft.com/office/drawing/2014/main" val="2862939062"/>
+                    </a:ext>
+                  </a:extLst>
+                </a:gridCol>
+                <a:gridCol w="2027484">
+                  <a:extLst>
+                    <a:ext uri="{9D8B030D-6E8A-4147-A177-3AD203B41FA5}">
+                      <a16:colId xmlns:a16="http://schemas.microsoft.com/office/drawing/2014/main" val="2770498619"/>
+                    </a:ext>
+                  </a:extLst>
+                </a:gridCol>
+                <a:gridCol w="3390159">
+                  <a:extLst>
+                    <a:ext uri="{9D8B030D-6E8A-4147-A177-3AD203B41FA5}">
+                      <a16:colId xmlns:a16="http://schemas.microsoft.com/office/drawing/2014/main" val="4289464401"/>
+                    </a:ext>
+                  </a:extLst>
+                </a:gridCol>
+              </a:tblGrid>
+              <a:tr h="370840">
+                <a:tc>
+                  <a:txBody>
+                    <a:bodyPr/>
+                    <a:lstStyle/>
+                    <a:p>
+                      <a:r>
+                        <a:rPr kumimoji="1" lang="en-US" altLang="ja-JP" dirty="0"/>
+                        <a:t>Function</a:t>
+                      </a:r>
+                      <a:endParaRPr kumimoji="1" lang="ja-JP" altLang="en-US" dirty="0"/>
+                    </a:p>
+                  </a:txBody>
+                  <a:tcPr/>
+                </a:tc>
+                <a:tc>
+                  <a:txBody>
+                    <a:bodyPr/>
+                    <a:lstStyle/>
+                    <a:p>
+                      <a:r>
+                        <a:rPr kumimoji="1" lang="en-US" altLang="ja-JP" dirty="0"/>
+                        <a:t>MSB</a:t>
+                      </a:r>
+                      <a:endParaRPr kumimoji="1" lang="ja-JP" altLang="en-US" dirty="0"/>
+                    </a:p>
+                  </a:txBody>
+                  <a:tcPr/>
+                </a:tc>
+                <a:tc>
+                  <a:txBody>
+                    <a:bodyPr/>
+                    <a:lstStyle/>
+                    <a:p>
+                      <a:r>
+                        <a:rPr kumimoji="1" lang="en-US" altLang="ja-JP" dirty="0"/>
+                        <a:t>LSB</a:t>
+                      </a:r>
+                      <a:endParaRPr kumimoji="1" lang="ja-JP" altLang="en-US" dirty="0"/>
+                    </a:p>
+                  </a:txBody>
+                  <a:tcPr/>
+                </a:tc>
+                <a:tc>
+                  <a:txBody>
+                    <a:bodyPr/>
+                    <a:lstStyle/>
+                    <a:p>
+                      <a:r>
+                        <a:rPr kumimoji="1" lang="en-US" altLang="ja-JP" dirty="0"/>
+                        <a:t>Remarks</a:t>
+                      </a:r>
+                      <a:endParaRPr kumimoji="1" lang="ja-JP" altLang="en-US" dirty="0"/>
+                    </a:p>
+                  </a:txBody>
+                  <a:tcPr/>
+                </a:tc>
+                <a:extLst>
+                  <a:ext uri="{0D108BD9-81ED-4DB2-BD59-A6C34878D82A}">
+                    <a16:rowId xmlns:a16="http://schemas.microsoft.com/office/drawing/2014/main" val="1671041493"/>
+                  </a:ext>
+                </a:extLst>
+              </a:tr>
+              <a:tr h="370840">
+                <a:tc>
+                  <a:txBody>
+                    <a:bodyPr/>
+                    <a:lstStyle/>
+                    <a:p>
+                      <a:pPr algn="l"/>
+                      <a:r>
+                        <a:rPr kumimoji="1" lang="en-US" altLang="ja-JP" dirty="0"/>
+                        <a:t>NRPN</a:t>
+                      </a:r>
+                    </a:p>
+                  </a:txBody>
+                  <a:tcPr/>
+                </a:tc>
+                <a:tc>
+                  <a:txBody>
+                    <a:bodyPr/>
+                    <a:lstStyle/>
+                    <a:p>
+                      <a:r>
+                        <a:rPr kumimoji="1" lang="en-US" altLang="ja-JP" dirty="0"/>
+                        <a:t>1</a:t>
+                      </a:r>
+                      <a:endParaRPr kumimoji="1" lang="ja-JP" altLang="en-US" dirty="0"/>
+                    </a:p>
+                  </a:txBody>
+                  <a:tcPr/>
+                </a:tc>
+                <a:tc>
+                  <a:txBody>
+                    <a:bodyPr/>
+                    <a:lstStyle/>
+                    <a:p>
+                      <a:pPr marL="0" marR="0" lvl="0" indent="0" algn="l" defTabSz="457200" rtl="0" eaLnBrk="1" fontAlgn="auto" latinLnBrk="0" hangingPunct="1">
+                        <a:lnSpc>
+                          <a:spcPct val="100000"/>
+                        </a:lnSpc>
+                        <a:spcBef>
+                          <a:spcPts val="0"/>
+                        </a:spcBef>
+                        <a:spcAft>
+                          <a:spcPts val="0"/>
+                        </a:spcAft>
+                        <a:buClrTx/>
+                        <a:buSzTx/>
+                        <a:buFontTx/>
+                        <a:buNone/>
+                        <a:tabLst/>
+                        <a:defRPr/>
+                      </a:pPr>
+                      <a:r>
+                        <a:rPr kumimoji="1" lang="en-US" altLang="ja-JP" dirty="0"/>
+                        <a:t>6</a:t>
+                      </a:r>
+                    </a:p>
+                  </a:txBody>
+                  <a:tcPr/>
+                </a:tc>
+                <a:tc>
+                  <a:txBody>
+                    <a:bodyPr/>
+                    <a:lstStyle/>
+                    <a:p>
+                      <a:r>
+                        <a:rPr kumimoji="1" lang="en-US" altLang="ja-JP" dirty="0"/>
+                        <a:t>XGM Recording Command</a:t>
+                      </a:r>
+                    </a:p>
+                    <a:p>
+                      <a:endParaRPr kumimoji="1" lang="en-US" altLang="ja-JP" dirty="0"/>
+                    </a:p>
+                    <a:p>
+                      <a:r>
+                        <a:rPr kumimoji="1" lang="en-US" altLang="ja-JP" dirty="0"/>
+                        <a:t>DATA MSB </a:t>
+                      </a:r>
+                    </a:p>
+                    <a:p>
+                      <a:endParaRPr kumimoji="1" lang="en-US" altLang="ja-JP" dirty="0"/>
+                    </a:p>
+                    <a:p>
+                      <a:r>
+                        <a:rPr kumimoji="1" lang="en-US" altLang="ja-JP" dirty="0"/>
+                        <a:t> 0: Start Recording</a:t>
+                      </a:r>
+                    </a:p>
+                    <a:p>
+                      <a:r>
+                        <a:rPr kumimoji="1" lang="en-US" altLang="ja-JP" dirty="0"/>
+                        <a:t> 1: Set Loop Start Point</a:t>
+                      </a:r>
+                    </a:p>
+                    <a:p>
+                      <a:r>
+                        <a:rPr kumimoji="1" lang="en-US" altLang="ja-JP" dirty="0"/>
+                        <a:t> 2: Set Loop End Point</a:t>
+                      </a:r>
+                    </a:p>
+                    <a:p>
+                      <a:r>
+                        <a:rPr kumimoji="1" lang="en-US" altLang="ja-JP" dirty="0"/>
+                        <a:t> 3: Stop Recording</a:t>
+                      </a:r>
+                      <a:endParaRPr kumimoji="1" lang="ja-JP" altLang="en-US" dirty="0"/>
+                    </a:p>
+                  </a:txBody>
+                  <a:tcPr/>
+                </a:tc>
+                <a:extLst>
+                  <a:ext uri="{0D108BD9-81ED-4DB2-BD59-A6C34878D82A}">
+                    <a16:rowId xmlns:a16="http://schemas.microsoft.com/office/drawing/2014/main" val="2531957203"/>
+                  </a:ext>
+                </a:extLst>
+              </a:tr>
+            </a:tbl>
+          </a:graphicData>
+        </a:graphic>
+      </p:graphicFrame>
+      <p:sp>
+        <p:nvSpPr>
+          <p:cNvPr id="10" name="テキスト ボックス 9">
+            <a:extLst>
+              <a:ext uri="{FF2B5EF4-FFF2-40B4-BE49-F238E27FC236}">
+                <a16:creationId xmlns:a16="http://schemas.microsoft.com/office/drawing/2014/main" id="{CFF551F2-D286-69A9-1227-F47DD7DB22D1}"/>
+              </a:ext>
+            </a:extLst>
+          </p:cNvPr>
+          <p:cNvSpPr txBox="1"/>
+          <p:nvPr/>
+        </p:nvSpPr>
+        <p:spPr>
+          <a:xfrm>
+            <a:off x="5501640" y="5102275"/>
+            <a:ext cx="6099386" cy="923330"/>
+          </a:xfrm>
+          <a:prstGeom prst="rect">
+            <a:avLst/>
+          </a:prstGeom>
+          <a:noFill/>
+        </p:spPr>
+        <p:txBody>
+          <a:bodyPr wrap="square">
+            <a:spAutoFit/>
+          </a:bodyPr>
+          <a:lstStyle/>
+          <a:p>
+            <a:r>
+              <a:rPr lang="en-US" altLang="ja-JP" dirty="0"/>
+              <a:t>NOTE: If you stop playing in the middle of a performance, the recording will not stop. Please press the XGM recording button manually.</a:t>
+            </a:r>
+            <a:endParaRPr lang="ja-JP" altLang="en-US" dirty="0"/>
+          </a:p>
+        </p:txBody>
+      </p:sp>
+    </p:spTree>
+    <p:extLst>
+      <p:ext uri="{BB962C8B-B14F-4D97-AF65-F5344CB8AC3E}">
+        <p14:creationId xmlns:p14="http://schemas.microsoft.com/office/powerpoint/2010/main" val="795726936"/>
+      </p:ext>
+    </p:extLst>
+  </p:cSld>
+  <p:clrMapOvr>
+    <a:masterClrMapping/>
+  </p:clrMapOvr>
+</p:sld>
+</file>
+
+<file path=ppt/slides/slide39.xml><?xml version="1.0" encoding="utf-8"?>
+<p:sld xmlns:a="http://schemas.openxmlformats.org/drawingml/2006/main" xmlns:r="http://schemas.openxmlformats.org/officeDocument/2006/relationships" xmlns:p="http://schemas.openxmlformats.org/presentationml/2006/main">
+  <p:cSld>
+    <p:spTree>
+      <p:nvGrpSpPr>
+        <p:cNvPr id="1" name=""/>
+        <p:cNvGrpSpPr/>
+        <p:nvPr/>
+      </p:nvGrpSpPr>
+      <p:grpSpPr>
+        <a:xfrm>
+          <a:off x="0" y="0"/>
+          <a:ext cx="0" cy="0"/>
+          <a:chOff x="0" y="0"/>
+          <a:chExt cx="0" cy="0"/>
+        </a:xfrm>
+      </p:grpSpPr>
+      <p:sp>
+        <p:nvSpPr>
+          <p:cNvPr id="2" name="タイトル 1">
+            <a:extLst>
+              <a:ext uri="{FF2B5EF4-FFF2-40B4-BE49-F238E27FC236}">
                 <a16:creationId xmlns:a16="http://schemas.microsoft.com/office/drawing/2014/main" id="{FF137733-6174-4A76-B52E-89E44936D189}"/>
               </a:ext>
             </a:extLst>
@@ -35067,7 +35434,7 @@
           <a:p>
             <a:fld id="{E27E2812-4560-4165-A7C7-9C013F955547}" type="slidenum">
               <a:rPr kumimoji="1" lang="ja-JP" altLang="en-US" smtClean="0"/>
-              <a:t>38</a:t>
+              <a:t>39</a:t>
             </a:fld>
             <a:endParaRPr kumimoji="1" lang="ja-JP" altLang="en-US"/>
           </a:p>
@@ -35249,1946 +35616,6 @@
     <p:extLst>
       <p:ext uri="{BB962C8B-B14F-4D97-AF65-F5344CB8AC3E}">
         <p14:creationId xmlns:p14="http://schemas.microsoft.com/office/powerpoint/2010/main" val="3502929180"/>
-      </p:ext>
-    </p:extLst>
-  </p:cSld>
-  <p:clrMapOvr>
-    <a:masterClrMapping/>
-  </p:clrMapOvr>
-</p:sld>
-</file>
-
-<file path=ppt/slides/slide39.xml><?xml version="1.0" encoding="utf-8"?>
-<p:sld xmlns:a="http://schemas.openxmlformats.org/drawingml/2006/main" xmlns:r="http://schemas.openxmlformats.org/officeDocument/2006/relationships" xmlns:p="http://schemas.openxmlformats.org/presentationml/2006/main">
-  <p:cSld>
-    <p:spTree>
-      <p:nvGrpSpPr>
-        <p:cNvPr id="1" name=""/>
-        <p:cNvGrpSpPr/>
-        <p:nvPr/>
-      </p:nvGrpSpPr>
-      <p:grpSpPr>
-        <a:xfrm>
-          <a:off x="0" y="0"/>
-          <a:ext cx="0" cy="0"/>
-          <a:chOff x="0" y="0"/>
-          <a:chExt cx="0" cy="0"/>
-        </a:xfrm>
-      </p:grpSpPr>
-      <p:sp>
-        <p:nvSpPr>
-          <p:cNvPr id="2" name="タイトル 1">
-            <a:extLst>
-              <a:ext uri="{FF2B5EF4-FFF2-40B4-BE49-F238E27FC236}">
-                <a16:creationId xmlns:a16="http://schemas.microsoft.com/office/drawing/2014/main" id="{FF137733-6174-4A76-B52E-89E44936D189}"/>
-              </a:ext>
-            </a:extLst>
-          </p:cNvPr>
-          <p:cNvSpPr>
-            <a:spLocks noGrp="1"/>
-          </p:cNvSpPr>
-          <p:nvPr>
-            <p:ph type="title"/>
-          </p:nvPr>
-        </p:nvSpPr>
-        <p:spPr/>
-        <p:txBody>
-          <a:bodyPr/>
-          <a:lstStyle/>
-          <a:p>
-            <a:r>
-              <a:rPr kumimoji="1" lang="en-US" altLang="ja-JP" dirty="0"/>
-              <a:t>VSIF </a:t>
-            </a:r>
-            <a:r>
-              <a:rPr kumimoji="1" lang="en-US" altLang="ja-JP"/>
-              <a:t>– MSX/P6(</a:t>
-            </a:r>
-            <a:r>
-              <a:rPr kumimoji="1" lang="en-US" altLang="ja-JP" dirty="0"/>
-              <a:t>FTDI) SPECIFICATION</a:t>
-            </a:r>
-            <a:br>
-              <a:rPr kumimoji="1" lang="en-US" altLang="ja-JP" dirty="0"/>
-            </a:br>
-            <a:r>
-              <a:rPr kumimoji="1" lang="en-US" altLang="ja-JP" sz="2400" dirty="0"/>
-              <a:t>for </a:t>
-            </a:r>
-            <a:r>
-              <a:rPr lang="en-US" altLang="ja-JP" sz="2400" b="0" i="0" dirty="0">
-                <a:solidFill>
-                  <a:srgbClr val="202122"/>
-                </a:solidFill>
-                <a:effectLst/>
-                <a:latin typeface="Arial" panose="020B0604020202020204" pitchFamily="34" charset="0"/>
-              </a:rPr>
-              <a:t>AY-3-8910, OPLL, SCC-I, </a:t>
-            </a:r>
-            <a:r>
-              <a:rPr lang="en-US" altLang="ja-JP" sz="2400" b="0" i="0" dirty="0">
-                <a:solidFill>
-                  <a:schemeClr val="tx1"/>
-                </a:solidFill>
-                <a:effectLst/>
-                <a:latin typeface="arial" panose="020B0604020202020204" pitchFamily="34" charset="0"/>
-              </a:rPr>
-              <a:t>OPL3, OPM, OPNA/OPN2, OPN</a:t>
-            </a:r>
-            <a:endParaRPr kumimoji="1" lang="ja-JP" altLang="en-US" sz="2400" dirty="0">
-              <a:solidFill>
-                <a:schemeClr val="tx1"/>
-              </a:solidFill>
-            </a:endParaRPr>
-          </a:p>
-        </p:txBody>
-      </p:sp>
-      <p:sp>
-        <p:nvSpPr>
-          <p:cNvPr id="3" name="コンテンツ プレースホルダー 2">
-            <a:extLst>
-              <a:ext uri="{FF2B5EF4-FFF2-40B4-BE49-F238E27FC236}">
-                <a16:creationId xmlns:a16="http://schemas.microsoft.com/office/drawing/2014/main" id="{2E5DDE30-9A16-4A82-90A7-733F711600B5}"/>
-              </a:ext>
-            </a:extLst>
-          </p:cNvPr>
-          <p:cNvSpPr>
-            <a:spLocks noGrp="1"/>
-          </p:cNvSpPr>
-          <p:nvPr>
-            <p:ph idx="1"/>
-          </p:nvPr>
-        </p:nvSpPr>
-        <p:spPr>
-          <a:xfrm>
-            <a:off x="2589212" y="2133600"/>
-            <a:ext cx="9348788" cy="4559300"/>
-          </a:xfrm>
-        </p:spPr>
-        <p:txBody>
-          <a:bodyPr>
-            <a:normAutofit fontScale="70000" lnSpcReduction="20000"/>
-          </a:bodyPr>
-          <a:lstStyle/>
-          <a:p>
-            <a:r>
-              <a:rPr lang="en-US" altLang="ja-JP" dirty="0"/>
-              <a:t>Baud rate : 38,400 bytes / sec</a:t>
-            </a:r>
-          </a:p>
-          <a:p>
-            <a:r>
-              <a:rPr kumimoji="1" lang="en-US" altLang="ja-JP" dirty="0"/>
-              <a:t>1 packet : 5 bytes + α</a:t>
-            </a:r>
-          </a:p>
-          <a:p>
-            <a:endParaRPr lang="en-US" altLang="ja-JP" dirty="0"/>
-          </a:p>
-          <a:p>
-            <a:endParaRPr kumimoji="1" lang="en-US" altLang="ja-JP" dirty="0"/>
-          </a:p>
-          <a:p>
-            <a:r>
-              <a:rPr lang="en-US" altLang="ja-JP" dirty="0"/>
-              <a:t>1byte : 4bit(data) + 2bit(Start + </a:t>
-            </a:r>
-            <a:r>
-              <a:rPr lang="en-US" altLang="ja-JP" dirty="0" err="1"/>
-              <a:t>Clk</a:t>
-            </a:r>
-            <a:r>
-              <a:rPr lang="en-US" altLang="ja-JP" dirty="0"/>
-              <a:t> bit)</a:t>
-            </a:r>
-          </a:p>
-          <a:p>
-            <a:endParaRPr kumimoji="1" lang="en-US" altLang="ja-JP" dirty="0"/>
-          </a:p>
-          <a:p>
-            <a:endParaRPr lang="en-US" altLang="ja-JP" dirty="0"/>
-          </a:p>
-          <a:p>
-            <a:endParaRPr kumimoji="1" lang="en-US" altLang="ja-JP" dirty="0"/>
-          </a:p>
-          <a:p>
-            <a:r>
-              <a:rPr kumimoji="1" lang="en-US" altLang="ja-JP" dirty="0"/>
-              <a:t>Type:</a:t>
-            </a:r>
-          </a:p>
-          <a:p>
-            <a:pPr lvl="1"/>
-            <a:r>
-              <a:rPr kumimoji="1" lang="en-US" altLang="ja-JP" sz="1300" b="1" dirty="0"/>
-              <a:t>0</a:t>
-            </a:r>
-            <a:r>
-              <a:rPr kumimoji="1" lang="en-US" altLang="ja-JP" sz="1300" dirty="0"/>
-              <a:t>		AY-3-8910: Write value to address</a:t>
-            </a:r>
-          </a:p>
-          <a:p>
-            <a:pPr lvl="1"/>
-            <a:r>
-              <a:rPr kumimoji="1" lang="en-US" altLang="ja-JP" sz="1300" b="1" dirty="0"/>
-              <a:t>1,2,(12)	</a:t>
-            </a:r>
-            <a:r>
-              <a:rPr kumimoji="1" lang="en-US" altLang="ja-JP" sz="1300" dirty="0"/>
-              <a:t>YM2413: </a:t>
-            </a:r>
-            <a:r>
-              <a:rPr kumimoji="1" lang="en-US" altLang="ja-JP" sz="1300" b="1" dirty="0"/>
-              <a:t>1</a:t>
-            </a:r>
-            <a:r>
-              <a:rPr kumimoji="1" lang="en-US" altLang="ja-JP" sz="1300" dirty="0"/>
-              <a:t> is write value to address, </a:t>
-            </a:r>
-            <a:r>
-              <a:rPr kumimoji="1" lang="en-US" altLang="ja-JP" sz="1300" b="1" dirty="0"/>
-              <a:t>2</a:t>
-            </a:r>
-            <a:r>
-              <a:rPr kumimoji="1" lang="en-US" altLang="ja-JP" sz="1300" dirty="0"/>
-              <a:t> is set OPLL cartridge slot number</a:t>
-            </a:r>
-          </a:p>
-          <a:p>
-            <a:pPr lvl="1"/>
-            <a:r>
-              <a:rPr lang="en-US" altLang="ja-JP" sz="1300" b="1" dirty="0"/>
-              <a:t>3</a:t>
-            </a:r>
-            <a:r>
-              <a:rPr lang="ja-JP" altLang="en-US" sz="1300" b="1" dirty="0"/>
-              <a:t>～</a:t>
-            </a:r>
-            <a:r>
-              <a:rPr lang="en-US" altLang="ja-JP" sz="1300" b="1" dirty="0"/>
-              <a:t>9</a:t>
-            </a:r>
-            <a:r>
-              <a:rPr lang="en-US" altLang="ja-JP" sz="1300" dirty="0"/>
-              <a:t>	SCC-I: </a:t>
-            </a:r>
-            <a:r>
-              <a:rPr lang="en-US" altLang="ja-JP" sz="1300" i="1" dirty="0"/>
-              <a:t>(in preparation)</a:t>
-            </a:r>
-          </a:p>
-          <a:p>
-            <a:pPr lvl="1"/>
-            <a:r>
-              <a:rPr kumimoji="1" lang="en-US" altLang="ja-JP" sz="1300" b="1" dirty="0"/>
-              <a:t>10</a:t>
-            </a:r>
-            <a:r>
-              <a:rPr kumimoji="1" lang="ja-JP" altLang="en-US" sz="1300" b="1" dirty="0"/>
-              <a:t>～</a:t>
-            </a:r>
-            <a:r>
-              <a:rPr kumimoji="1" lang="en-US" altLang="ja-JP" sz="1300" b="1" dirty="0"/>
-              <a:t>11</a:t>
-            </a:r>
-            <a:r>
-              <a:rPr kumimoji="1" lang="en-US" altLang="ja-JP" sz="1300" dirty="0"/>
-              <a:t>	YMF262: </a:t>
-            </a:r>
-            <a:r>
-              <a:rPr kumimoji="1" lang="en-US" altLang="ja-JP" sz="1300" b="1" dirty="0"/>
-              <a:t>10</a:t>
-            </a:r>
-            <a:r>
-              <a:rPr kumimoji="1" lang="en-US" altLang="ja-JP" sz="1300" dirty="0"/>
-              <a:t> is write value to address of port L , </a:t>
-            </a:r>
-            <a:r>
-              <a:rPr kumimoji="1" lang="en-US" altLang="ja-JP" sz="1300" b="1" dirty="0"/>
-              <a:t>11</a:t>
-            </a:r>
-            <a:r>
-              <a:rPr kumimoji="1" lang="en-US" altLang="ja-JP" sz="1300" dirty="0"/>
-              <a:t> is Write value to address of port H</a:t>
-            </a:r>
-          </a:p>
-          <a:p>
-            <a:pPr lvl="1"/>
-            <a:r>
-              <a:rPr lang="en-US" altLang="ja-JP" sz="1300" b="1" dirty="0"/>
-              <a:t>(13),14	</a:t>
-            </a:r>
-            <a:r>
-              <a:rPr lang="en-US" altLang="ja-JP" sz="1300" dirty="0"/>
-              <a:t>OPM: </a:t>
-            </a:r>
-            <a:r>
-              <a:rPr kumimoji="1" lang="en-US" altLang="ja-JP" sz="1300" dirty="0"/>
-              <a:t>Write value to address</a:t>
-            </a:r>
-            <a:endParaRPr lang="en-US" altLang="ja-JP" sz="1300" dirty="0"/>
-          </a:p>
-          <a:p>
-            <a:pPr lvl="1"/>
-            <a:r>
-              <a:rPr kumimoji="1" lang="en-US" altLang="ja-JP" sz="1300" b="1" dirty="0"/>
-              <a:t>15</a:t>
-            </a:r>
-            <a:r>
-              <a:rPr kumimoji="1" lang="en-US" altLang="ja-JP" sz="1300" dirty="0"/>
-              <a:t>		DCSG:</a:t>
-            </a:r>
-            <a:r>
-              <a:rPr lang="en-US" altLang="ja-JP" sz="1300" dirty="0"/>
-              <a:t> </a:t>
-            </a:r>
-            <a:r>
-              <a:rPr kumimoji="1" lang="en-US" altLang="ja-JP" sz="1300" dirty="0"/>
-              <a:t>Write value to address</a:t>
-            </a:r>
-          </a:p>
-          <a:p>
-            <a:pPr lvl="1"/>
-            <a:r>
-              <a:rPr lang="en-US" altLang="ja-JP" sz="1300" b="1" dirty="0"/>
-              <a:t>16	</a:t>
-            </a:r>
-            <a:r>
-              <a:rPr lang="ja-JP" altLang="en-US" sz="1300" b="1" dirty="0"/>
-              <a:t>～</a:t>
-            </a:r>
-            <a:r>
-              <a:rPr lang="en-US" altLang="ja-JP" sz="1300" b="1" dirty="0"/>
-              <a:t>17</a:t>
-            </a:r>
-            <a:r>
-              <a:rPr lang="en-US" altLang="ja-JP" sz="1300" dirty="0"/>
-              <a:t>	OPNA/OPN2: </a:t>
-            </a:r>
-            <a:r>
-              <a:rPr kumimoji="1" lang="en-US" altLang="ja-JP" sz="1300" dirty="0"/>
-              <a:t>Write value to address</a:t>
-            </a:r>
-            <a:endParaRPr lang="en-US" altLang="ja-JP" sz="1300" dirty="0"/>
-          </a:p>
-          <a:p>
-            <a:pPr lvl="1"/>
-            <a:r>
-              <a:rPr kumimoji="1" lang="en-US" altLang="ja-JP" sz="1300" b="1" dirty="0"/>
-              <a:t>18</a:t>
-            </a:r>
-            <a:r>
-              <a:rPr kumimoji="1" lang="en-US" altLang="ja-JP" sz="1300" dirty="0"/>
-              <a:t>		OPN: Write value to address</a:t>
-            </a:r>
-          </a:p>
-        </p:txBody>
-      </p:sp>
-      <p:sp>
-        <p:nvSpPr>
-          <p:cNvPr id="4" name="スライド番号プレースホルダー 3">
-            <a:extLst>
-              <a:ext uri="{FF2B5EF4-FFF2-40B4-BE49-F238E27FC236}">
-                <a16:creationId xmlns:a16="http://schemas.microsoft.com/office/drawing/2014/main" id="{41B537D0-9FEF-4D05-A7D3-E1D123FAF757}"/>
-              </a:ext>
-            </a:extLst>
-          </p:cNvPr>
-          <p:cNvSpPr>
-            <a:spLocks noGrp="1"/>
-          </p:cNvSpPr>
-          <p:nvPr>
-            <p:ph type="sldNum" sz="quarter" idx="12"/>
-          </p:nvPr>
-        </p:nvSpPr>
-        <p:spPr/>
-        <p:txBody>
-          <a:bodyPr/>
-          <a:lstStyle/>
-          <a:p>
-            <a:fld id="{E27E2812-4560-4165-A7C7-9C013F955547}" type="slidenum">
-              <a:rPr kumimoji="1" lang="ja-JP" altLang="en-US" smtClean="0"/>
-              <a:t>39</a:t>
-            </a:fld>
-            <a:endParaRPr kumimoji="1" lang="ja-JP" altLang="en-US"/>
-          </a:p>
-        </p:txBody>
-      </p:sp>
-      <p:sp>
-        <p:nvSpPr>
-          <p:cNvPr id="5" name="正方形/長方形 4">
-            <a:extLst>
-              <a:ext uri="{FF2B5EF4-FFF2-40B4-BE49-F238E27FC236}">
-                <a16:creationId xmlns:a16="http://schemas.microsoft.com/office/drawing/2014/main" id="{14C188A7-5DF1-49E0-B695-B34E50334084}"/>
-              </a:ext>
-            </a:extLst>
-          </p:cNvPr>
-          <p:cNvSpPr/>
-          <p:nvPr/>
-        </p:nvSpPr>
-        <p:spPr>
-          <a:xfrm>
-            <a:off x="4375150" y="2939380"/>
-            <a:ext cx="1708150" cy="222735"/>
-          </a:xfrm>
-          <a:prstGeom prst="rect">
-            <a:avLst/>
-          </a:prstGeom>
-        </p:spPr>
-        <p:style>
-          <a:lnRef idx="2">
-            <a:schemeClr val="accent1">
-              <a:shade val="50000"/>
-            </a:schemeClr>
-          </a:lnRef>
-          <a:fillRef idx="1">
-            <a:schemeClr val="accent1"/>
-          </a:fillRef>
-          <a:effectRef idx="0">
-            <a:schemeClr val="accent1"/>
-          </a:effectRef>
-          <a:fontRef idx="minor">
-            <a:schemeClr val="lt1"/>
-          </a:fontRef>
-        </p:style>
-        <p:txBody>
-          <a:bodyPr rtlCol="0" anchor="ctr"/>
-          <a:lstStyle/>
-          <a:p>
-            <a:pPr algn="ctr"/>
-            <a:r>
-              <a:rPr kumimoji="1" lang="en-US" altLang="ja-JP" sz="1200" dirty="0"/>
-              <a:t>Address(Hi)</a:t>
-            </a:r>
-            <a:endParaRPr kumimoji="1" lang="ja-JP" altLang="en-US" sz="1200" dirty="0"/>
-          </a:p>
-        </p:txBody>
-      </p:sp>
-      <p:sp>
-        <p:nvSpPr>
-          <p:cNvPr id="6" name="正方形/長方形 5">
-            <a:extLst>
-              <a:ext uri="{FF2B5EF4-FFF2-40B4-BE49-F238E27FC236}">
-                <a16:creationId xmlns:a16="http://schemas.microsoft.com/office/drawing/2014/main" id="{9A836AD6-43CD-41A0-BB39-38FEE7E64D21}"/>
-              </a:ext>
-            </a:extLst>
-          </p:cNvPr>
-          <p:cNvSpPr/>
-          <p:nvPr/>
-        </p:nvSpPr>
-        <p:spPr>
-          <a:xfrm>
-            <a:off x="6083300" y="2939380"/>
-            <a:ext cx="1708150" cy="222735"/>
-          </a:xfrm>
-          <a:prstGeom prst="rect">
-            <a:avLst/>
-          </a:prstGeom>
-        </p:spPr>
-        <p:style>
-          <a:lnRef idx="2">
-            <a:schemeClr val="accent1">
-              <a:shade val="50000"/>
-            </a:schemeClr>
-          </a:lnRef>
-          <a:fillRef idx="1">
-            <a:schemeClr val="accent1"/>
-          </a:fillRef>
-          <a:effectRef idx="0">
-            <a:schemeClr val="accent1"/>
-          </a:effectRef>
-          <a:fontRef idx="minor">
-            <a:schemeClr val="lt1"/>
-          </a:fontRef>
-        </p:style>
-        <p:txBody>
-          <a:bodyPr rtlCol="0" anchor="ctr"/>
-          <a:lstStyle/>
-          <a:p>
-            <a:pPr algn="ctr"/>
-            <a:r>
-              <a:rPr kumimoji="1" lang="en-US" altLang="ja-JP" sz="1200" dirty="0"/>
-              <a:t>Address(Lo)</a:t>
-            </a:r>
-            <a:endParaRPr kumimoji="1" lang="ja-JP" altLang="en-US" sz="1200" dirty="0"/>
-          </a:p>
-        </p:txBody>
-      </p:sp>
-      <p:sp>
-        <p:nvSpPr>
-          <p:cNvPr id="7" name="正方形/長方形 6">
-            <a:extLst>
-              <a:ext uri="{FF2B5EF4-FFF2-40B4-BE49-F238E27FC236}">
-                <a16:creationId xmlns:a16="http://schemas.microsoft.com/office/drawing/2014/main" id="{8995F2AD-2F6C-47CD-A40C-DBA8DA5A1B2E}"/>
-              </a:ext>
-            </a:extLst>
-          </p:cNvPr>
-          <p:cNvSpPr/>
-          <p:nvPr/>
-        </p:nvSpPr>
-        <p:spPr>
-          <a:xfrm>
-            <a:off x="7791450" y="2939380"/>
-            <a:ext cx="1708150" cy="222735"/>
-          </a:xfrm>
-          <a:prstGeom prst="rect">
-            <a:avLst/>
-          </a:prstGeom>
-        </p:spPr>
-        <p:style>
-          <a:lnRef idx="2">
-            <a:schemeClr val="accent1">
-              <a:shade val="50000"/>
-            </a:schemeClr>
-          </a:lnRef>
-          <a:fillRef idx="1">
-            <a:schemeClr val="accent1"/>
-          </a:fillRef>
-          <a:effectRef idx="0">
-            <a:schemeClr val="accent1"/>
-          </a:effectRef>
-          <a:fontRef idx="minor">
-            <a:schemeClr val="lt1"/>
-          </a:fontRef>
-        </p:style>
-        <p:txBody>
-          <a:bodyPr rtlCol="0" anchor="ctr"/>
-          <a:lstStyle/>
-          <a:p>
-            <a:pPr algn="ctr"/>
-            <a:r>
-              <a:rPr kumimoji="1" lang="en-US" altLang="ja-JP" sz="1200" dirty="0"/>
-              <a:t>Value(Lo)</a:t>
-            </a:r>
-            <a:endParaRPr kumimoji="1" lang="ja-JP" altLang="en-US" sz="1200" dirty="0"/>
-          </a:p>
-        </p:txBody>
-      </p:sp>
-      <p:sp>
-        <p:nvSpPr>
-          <p:cNvPr id="8" name="正方形/長方形 7">
-            <a:extLst>
-              <a:ext uri="{FF2B5EF4-FFF2-40B4-BE49-F238E27FC236}">
-                <a16:creationId xmlns:a16="http://schemas.microsoft.com/office/drawing/2014/main" id="{9313BB50-A230-4338-BE1D-95514D3718E9}"/>
-              </a:ext>
-            </a:extLst>
-          </p:cNvPr>
-          <p:cNvSpPr/>
-          <p:nvPr/>
-        </p:nvSpPr>
-        <p:spPr>
-          <a:xfrm>
-            <a:off x="9499600" y="2939380"/>
-            <a:ext cx="1708150" cy="222735"/>
-          </a:xfrm>
-          <a:prstGeom prst="rect">
-            <a:avLst/>
-          </a:prstGeom>
-        </p:spPr>
-        <p:style>
-          <a:lnRef idx="2">
-            <a:schemeClr val="accent1">
-              <a:shade val="50000"/>
-            </a:schemeClr>
-          </a:lnRef>
-          <a:fillRef idx="1">
-            <a:schemeClr val="accent1"/>
-          </a:fillRef>
-          <a:effectRef idx="0">
-            <a:schemeClr val="accent1"/>
-          </a:effectRef>
-          <a:fontRef idx="minor">
-            <a:schemeClr val="lt1"/>
-          </a:fontRef>
-        </p:style>
-        <p:txBody>
-          <a:bodyPr rtlCol="0" anchor="ctr"/>
-          <a:lstStyle/>
-          <a:p>
-            <a:pPr algn="ctr"/>
-            <a:r>
-              <a:rPr kumimoji="1" lang="en-US" altLang="ja-JP" sz="1200" dirty="0"/>
-              <a:t>Value(Hi)</a:t>
-            </a:r>
-            <a:endParaRPr kumimoji="1" lang="ja-JP" altLang="en-US" sz="1200" dirty="0"/>
-          </a:p>
-        </p:txBody>
-      </p:sp>
-      <p:sp>
-        <p:nvSpPr>
-          <p:cNvPr id="9" name="正方形/長方形 8">
-            <a:extLst>
-              <a:ext uri="{FF2B5EF4-FFF2-40B4-BE49-F238E27FC236}">
-                <a16:creationId xmlns:a16="http://schemas.microsoft.com/office/drawing/2014/main" id="{7EC0E042-5B68-4AC1-A3B8-0096BC43A3D3}"/>
-              </a:ext>
-            </a:extLst>
-          </p:cNvPr>
-          <p:cNvSpPr/>
-          <p:nvPr/>
-        </p:nvSpPr>
-        <p:spPr>
-          <a:xfrm>
-            <a:off x="2659530" y="2939380"/>
-            <a:ext cx="1708150" cy="222735"/>
-          </a:xfrm>
-          <a:prstGeom prst="rect">
-            <a:avLst/>
-          </a:prstGeom>
-        </p:spPr>
-        <p:style>
-          <a:lnRef idx="2">
-            <a:schemeClr val="accent1">
-              <a:shade val="50000"/>
-            </a:schemeClr>
-          </a:lnRef>
-          <a:fillRef idx="1">
-            <a:schemeClr val="accent1"/>
-          </a:fillRef>
-          <a:effectRef idx="0">
-            <a:schemeClr val="accent1"/>
-          </a:effectRef>
-          <a:fontRef idx="minor">
-            <a:schemeClr val="lt1"/>
-          </a:fontRef>
-        </p:style>
-        <p:txBody>
-          <a:bodyPr rtlCol="0" anchor="ctr"/>
-          <a:lstStyle/>
-          <a:p>
-            <a:pPr algn="ctr"/>
-            <a:r>
-              <a:rPr kumimoji="1" lang="en-US" altLang="ja-JP" sz="1200" dirty="0"/>
-              <a:t>Type</a:t>
-            </a:r>
-            <a:endParaRPr kumimoji="1" lang="ja-JP" altLang="en-US" sz="1200" dirty="0"/>
-          </a:p>
-        </p:txBody>
-      </p:sp>
-      <p:sp>
-        <p:nvSpPr>
-          <p:cNvPr id="13" name="テキスト ボックス 12">
-            <a:extLst>
-              <a:ext uri="{FF2B5EF4-FFF2-40B4-BE49-F238E27FC236}">
-                <a16:creationId xmlns:a16="http://schemas.microsoft.com/office/drawing/2014/main" id="{73B945CA-DFD3-4EC8-BFEF-1FE7A0C4F447}"/>
-              </a:ext>
-            </a:extLst>
-          </p:cNvPr>
-          <p:cNvSpPr txBox="1"/>
-          <p:nvPr/>
-        </p:nvSpPr>
-        <p:spPr>
-          <a:xfrm>
-            <a:off x="2652060" y="2656516"/>
-            <a:ext cx="1683405" cy="276999"/>
-          </a:xfrm>
-          <a:prstGeom prst="rect">
-            <a:avLst/>
-          </a:prstGeom>
-          <a:noFill/>
-        </p:spPr>
-        <p:txBody>
-          <a:bodyPr wrap="square">
-            <a:spAutoFit/>
-          </a:bodyPr>
-          <a:lstStyle/>
-          <a:p>
-            <a:pPr algn="ctr"/>
-            <a:r>
-              <a:rPr kumimoji="1" lang="en-US" altLang="ja-JP" sz="1200" dirty="0"/>
-              <a:t>1</a:t>
-            </a:r>
-            <a:r>
-              <a:rPr kumimoji="1" lang="en-US" altLang="ja-JP" sz="1200" baseline="30000" dirty="0"/>
-              <a:t>st</a:t>
-            </a:r>
-            <a:r>
-              <a:rPr kumimoji="1" lang="en-US" altLang="ja-JP" sz="1200" dirty="0"/>
-              <a:t>(Start)</a:t>
-            </a:r>
-            <a:endParaRPr lang="ja-JP" altLang="en-US" sz="1200" dirty="0"/>
-          </a:p>
-        </p:txBody>
-      </p:sp>
-      <p:sp>
-        <p:nvSpPr>
-          <p:cNvPr id="14" name="テキスト ボックス 13">
-            <a:extLst>
-              <a:ext uri="{FF2B5EF4-FFF2-40B4-BE49-F238E27FC236}">
-                <a16:creationId xmlns:a16="http://schemas.microsoft.com/office/drawing/2014/main" id="{E376A897-0895-4876-A090-0E5925C0EDF6}"/>
-              </a:ext>
-            </a:extLst>
-          </p:cNvPr>
-          <p:cNvSpPr txBox="1"/>
-          <p:nvPr/>
-        </p:nvSpPr>
-        <p:spPr>
-          <a:xfrm>
-            <a:off x="4367680" y="2656516"/>
-            <a:ext cx="1722763" cy="276999"/>
-          </a:xfrm>
-          <a:prstGeom prst="rect">
-            <a:avLst/>
-          </a:prstGeom>
-          <a:noFill/>
-        </p:spPr>
-        <p:txBody>
-          <a:bodyPr wrap="square">
-            <a:spAutoFit/>
-          </a:bodyPr>
-          <a:lstStyle/>
-          <a:p>
-            <a:pPr algn="ctr"/>
-            <a:r>
-              <a:rPr kumimoji="1" lang="en-US" altLang="ja-JP" sz="1200" dirty="0"/>
-              <a:t>2</a:t>
-            </a:r>
-            <a:r>
-              <a:rPr kumimoji="1" lang="en-US" altLang="ja-JP" sz="1200" baseline="30000" dirty="0"/>
-              <a:t>nd</a:t>
-            </a:r>
-            <a:r>
-              <a:rPr kumimoji="1" lang="en-US" altLang="ja-JP" sz="1200" dirty="0"/>
-              <a:t>(</a:t>
-            </a:r>
-            <a:r>
-              <a:rPr kumimoji="1" lang="en-US" altLang="ja-JP" sz="1200" dirty="0" err="1"/>
-              <a:t>clk</a:t>
-            </a:r>
-            <a:r>
-              <a:rPr kumimoji="1" lang="en-US" altLang="ja-JP" sz="1200" dirty="0"/>
-              <a:t>=0)</a:t>
-            </a:r>
-            <a:endParaRPr lang="ja-JP" altLang="en-US" sz="1200" dirty="0"/>
-          </a:p>
-        </p:txBody>
-      </p:sp>
-      <p:sp>
-        <p:nvSpPr>
-          <p:cNvPr id="15" name="テキスト ボックス 14">
-            <a:extLst>
-              <a:ext uri="{FF2B5EF4-FFF2-40B4-BE49-F238E27FC236}">
-                <a16:creationId xmlns:a16="http://schemas.microsoft.com/office/drawing/2014/main" id="{E41C2A09-27C1-4E24-8B09-EEC4258A344C}"/>
-              </a:ext>
-            </a:extLst>
-          </p:cNvPr>
-          <p:cNvSpPr txBox="1"/>
-          <p:nvPr/>
-        </p:nvSpPr>
-        <p:spPr>
-          <a:xfrm>
-            <a:off x="6036472" y="2656516"/>
-            <a:ext cx="1747835" cy="276999"/>
-          </a:xfrm>
-          <a:prstGeom prst="rect">
-            <a:avLst/>
-          </a:prstGeom>
-          <a:noFill/>
-        </p:spPr>
-        <p:txBody>
-          <a:bodyPr wrap="square">
-            <a:spAutoFit/>
-          </a:bodyPr>
-          <a:lstStyle/>
-          <a:p>
-            <a:pPr algn="ctr"/>
-            <a:r>
-              <a:rPr kumimoji="1" lang="en-US" altLang="ja-JP" sz="1200" dirty="0"/>
-              <a:t>3</a:t>
-            </a:r>
-            <a:r>
-              <a:rPr kumimoji="1" lang="en-US" altLang="ja-JP" sz="1200" baseline="30000" dirty="0"/>
-              <a:t>rd</a:t>
-            </a:r>
-            <a:r>
-              <a:rPr kumimoji="1" lang="en-US" altLang="ja-JP" sz="1200" dirty="0"/>
-              <a:t>(</a:t>
-            </a:r>
-            <a:r>
-              <a:rPr kumimoji="1" lang="en-US" altLang="ja-JP" sz="1200" dirty="0" err="1"/>
-              <a:t>clk</a:t>
-            </a:r>
-            <a:r>
-              <a:rPr kumimoji="1" lang="en-US" altLang="ja-JP" sz="1200" dirty="0"/>
-              <a:t>=1)</a:t>
-            </a:r>
-            <a:endParaRPr lang="ja-JP" altLang="en-US" sz="1200" dirty="0"/>
-          </a:p>
-        </p:txBody>
-      </p:sp>
-      <p:sp>
-        <p:nvSpPr>
-          <p:cNvPr id="17" name="テキスト ボックス 16">
-            <a:extLst>
-              <a:ext uri="{FF2B5EF4-FFF2-40B4-BE49-F238E27FC236}">
-                <a16:creationId xmlns:a16="http://schemas.microsoft.com/office/drawing/2014/main" id="{E4BB9215-E1D9-4972-99D4-0DD1A11AB856}"/>
-              </a:ext>
-            </a:extLst>
-          </p:cNvPr>
-          <p:cNvSpPr txBox="1"/>
-          <p:nvPr/>
-        </p:nvSpPr>
-        <p:spPr>
-          <a:xfrm>
-            <a:off x="7759234" y="2656516"/>
-            <a:ext cx="1740365" cy="276999"/>
-          </a:xfrm>
-          <a:prstGeom prst="rect">
-            <a:avLst/>
-          </a:prstGeom>
-          <a:noFill/>
-        </p:spPr>
-        <p:txBody>
-          <a:bodyPr wrap="square">
-            <a:spAutoFit/>
-          </a:bodyPr>
-          <a:lstStyle/>
-          <a:p>
-            <a:pPr algn="ctr"/>
-            <a:r>
-              <a:rPr kumimoji="1" lang="en-US" altLang="ja-JP" sz="1200" dirty="0"/>
-              <a:t>4</a:t>
-            </a:r>
-            <a:r>
-              <a:rPr kumimoji="1" lang="en-US" altLang="ja-JP" sz="1200" baseline="30000" dirty="0"/>
-              <a:t>th</a:t>
-            </a:r>
-            <a:r>
-              <a:rPr kumimoji="1" lang="en-US" altLang="ja-JP" sz="1200" dirty="0"/>
-              <a:t>(</a:t>
-            </a:r>
-            <a:r>
-              <a:rPr kumimoji="1" lang="en-US" altLang="ja-JP" sz="1200" dirty="0" err="1"/>
-              <a:t>clk</a:t>
-            </a:r>
-            <a:r>
-              <a:rPr kumimoji="1" lang="en-US" altLang="ja-JP" sz="1200" dirty="0"/>
-              <a:t>=0)</a:t>
-            </a:r>
-            <a:endParaRPr lang="ja-JP" altLang="en-US" sz="1200" dirty="0"/>
-          </a:p>
-        </p:txBody>
-      </p:sp>
-      <p:sp>
-        <p:nvSpPr>
-          <p:cNvPr id="18" name="テキスト ボックス 17">
-            <a:extLst>
-              <a:ext uri="{FF2B5EF4-FFF2-40B4-BE49-F238E27FC236}">
-                <a16:creationId xmlns:a16="http://schemas.microsoft.com/office/drawing/2014/main" id="{1C8C0E69-E581-457D-A603-0232C967E7B8}"/>
-              </a:ext>
-            </a:extLst>
-          </p:cNvPr>
-          <p:cNvSpPr txBox="1"/>
-          <p:nvPr/>
-        </p:nvSpPr>
-        <p:spPr>
-          <a:xfrm>
-            <a:off x="9492456" y="2656516"/>
-            <a:ext cx="1701007" cy="276999"/>
-          </a:xfrm>
-          <a:prstGeom prst="rect">
-            <a:avLst/>
-          </a:prstGeom>
-          <a:noFill/>
-        </p:spPr>
-        <p:txBody>
-          <a:bodyPr wrap="square">
-            <a:spAutoFit/>
-          </a:bodyPr>
-          <a:lstStyle/>
-          <a:p>
-            <a:pPr algn="ctr"/>
-            <a:r>
-              <a:rPr kumimoji="1" lang="en-US" altLang="ja-JP" sz="1200" dirty="0"/>
-              <a:t>5</a:t>
-            </a:r>
-            <a:r>
-              <a:rPr kumimoji="1" lang="en-US" altLang="ja-JP" sz="1200" baseline="30000" dirty="0"/>
-              <a:t>th</a:t>
-            </a:r>
-            <a:r>
-              <a:rPr kumimoji="1" lang="en-US" altLang="ja-JP" sz="1200" dirty="0"/>
-              <a:t>(</a:t>
-            </a:r>
-            <a:r>
-              <a:rPr kumimoji="1" lang="en-US" altLang="ja-JP" sz="1200" dirty="0" err="1"/>
-              <a:t>clk</a:t>
-            </a:r>
-            <a:r>
-              <a:rPr kumimoji="1" lang="en-US" altLang="ja-JP" sz="1200" dirty="0"/>
-              <a:t>=1)</a:t>
-            </a:r>
-            <a:endParaRPr lang="ja-JP" altLang="en-US" sz="1200" dirty="0"/>
-          </a:p>
-        </p:txBody>
-      </p:sp>
-      <p:sp>
-        <p:nvSpPr>
-          <p:cNvPr id="19" name="正方形/長方形 18">
-            <a:extLst>
-              <a:ext uri="{FF2B5EF4-FFF2-40B4-BE49-F238E27FC236}">
-                <a16:creationId xmlns:a16="http://schemas.microsoft.com/office/drawing/2014/main" id="{018E0670-19CB-4FEC-905B-D16CD09F78A3}"/>
-              </a:ext>
-            </a:extLst>
-          </p:cNvPr>
-          <p:cNvSpPr/>
-          <p:nvPr/>
-        </p:nvSpPr>
-        <p:spPr>
-          <a:xfrm>
-            <a:off x="3685268" y="3709230"/>
-            <a:ext cx="931974" cy="222735"/>
-          </a:xfrm>
-          <a:prstGeom prst="rect">
-            <a:avLst/>
-          </a:prstGeom>
-          <a:solidFill>
-            <a:schemeClr val="bg1"/>
-          </a:solidFill>
-        </p:spPr>
-        <p:style>
-          <a:lnRef idx="2">
-            <a:schemeClr val="accent1">
-              <a:shade val="50000"/>
-            </a:schemeClr>
-          </a:lnRef>
-          <a:fillRef idx="1">
-            <a:schemeClr val="accent1"/>
-          </a:fillRef>
-          <a:effectRef idx="0">
-            <a:schemeClr val="accent1"/>
-          </a:effectRef>
-          <a:fontRef idx="minor">
-            <a:schemeClr val="lt1"/>
-          </a:fontRef>
-        </p:style>
-        <p:txBody>
-          <a:bodyPr rtlCol="0" anchor="ctr"/>
-          <a:lstStyle/>
-          <a:p>
-            <a:pPr algn="ctr"/>
-            <a:endParaRPr kumimoji="1" lang="ja-JP" altLang="en-US" sz="1200" dirty="0"/>
-          </a:p>
-        </p:txBody>
-      </p:sp>
-      <p:sp>
-        <p:nvSpPr>
-          <p:cNvPr id="20" name="正方形/長方形 19">
-            <a:extLst>
-              <a:ext uri="{FF2B5EF4-FFF2-40B4-BE49-F238E27FC236}">
-                <a16:creationId xmlns:a16="http://schemas.microsoft.com/office/drawing/2014/main" id="{BEBFB75A-7BE5-4C4A-BC77-A5EC82CAA5B5}"/>
-              </a:ext>
-            </a:extLst>
-          </p:cNvPr>
-          <p:cNvSpPr/>
-          <p:nvPr/>
-        </p:nvSpPr>
-        <p:spPr>
-          <a:xfrm>
-            <a:off x="4616450" y="3709230"/>
-            <a:ext cx="931974" cy="222735"/>
-          </a:xfrm>
-          <a:prstGeom prst="rect">
-            <a:avLst/>
-          </a:prstGeom>
-          <a:solidFill>
-            <a:schemeClr val="bg1"/>
-          </a:solidFill>
-        </p:spPr>
-        <p:style>
-          <a:lnRef idx="2">
-            <a:schemeClr val="accent1">
-              <a:shade val="50000"/>
-            </a:schemeClr>
-          </a:lnRef>
-          <a:fillRef idx="1">
-            <a:schemeClr val="accent1"/>
-          </a:fillRef>
-          <a:effectRef idx="0">
-            <a:schemeClr val="accent1"/>
-          </a:effectRef>
-          <a:fontRef idx="minor">
-            <a:schemeClr val="lt1"/>
-          </a:fontRef>
-        </p:style>
-        <p:txBody>
-          <a:bodyPr rtlCol="0" anchor="ctr"/>
-          <a:lstStyle/>
-          <a:p>
-            <a:pPr algn="ctr"/>
-            <a:endParaRPr kumimoji="1" lang="ja-JP" altLang="en-US" sz="1200" dirty="0"/>
-          </a:p>
-        </p:txBody>
-      </p:sp>
-      <p:sp>
-        <p:nvSpPr>
-          <p:cNvPr id="21" name="正方形/長方形 20">
-            <a:extLst>
-              <a:ext uri="{FF2B5EF4-FFF2-40B4-BE49-F238E27FC236}">
-                <a16:creationId xmlns:a16="http://schemas.microsoft.com/office/drawing/2014/main" id="{8ADC7990-8532-4A8E-9959-F9B539090536}"/>
-              </a:ext>
-            </a:extLst>
-          </p:cNvPr>
-          <p:cNvSpPr/>
-          <p:nvPr/>
-        </p:nvSpPr>
-        <p:spPr>
-          <a:xfrm>
-            <a:off x="5547632" y="3709230"/>
-            <a:ext cx="931974" cy="222735"/>
-          </a:xfrm>
-          <a:prstGeom prst="rect">
-            <a:avLst/>
-          </a:prstGeom>
-        </p:spPr>
-        <p:style>
-          <a:lnRef idx="2">
-            <a:schemeClr val="accent1">
-              <a:shade val="50000"/>
-            </a:schemeClr>
-          </a:lnRef>
-          <a:fillRef idx="1">
-            <a:schemeClr val="accent1"/>
-          </a:fillRef>
-          <a:effectRef idx="0">
-            <a:schemeClr val="accent1"/>
-          </a:effectRef>
-          <a:fontRef idx="minor">
-            <a:schemeClr val="lt1"/>
-          </a:fontRef>
-        </p:style>
-        <p:txBody>
-          <a:bodyPr rtlCol="0" anchor="ctr"/>
-          <a:lstStyle/>
-          <a:p>
-            <a:pPr algn="ctr"/>
-            <a:r>
-              <a:rPr lang="en-US" altLang="ja-JP" sz="1200" dirty="0"/>
-              <a:t>1</a:t>
-            </a:r>
-            <a:endParaRPr kumimoji="1" lang="ja-JP" altLang="en-US" sz="1200" dirty="0"/>
-          </a:p>
-        </p:txBody>
-      </p:sp>
-      <p:sp>
-        <p:nvSpPr>
-          <p:cNvPr id="22" name="正方形/長方形 21">
-            <a:extLst>
-              <a:ext uri="{FF2B5EF4-FFF2-40B4-BE49-F238E27FC236}">
-                <a16:creationId xmlns:a16="http://schemas.microsoft.com/office/drawing/2014/main" id="{DD491D66-A1B7-434C-BD3F-FBD7705F1345}"/>
-              </a:ext>
-            </a:extLst>
-          </p:cNvPr>
-          <p:cNvSpPr/>
-          <p:nvPr/>
-        </p:nvSpPr>
-        <p:spPr>
-          <a:xfrm>
-            <a:off x="6478814" y="3709230"/>
-            <a:ext cx="931974" cy="222735"/>
-          </a:xfrm>
-          <a:prstGeom prst="rect">
-            <a:avLst/>
-          </a:prstGeom>
-        </p:spPr>
-        <p:style>
-          <a:lnRef idx="2">
-            <a:schemeClr val="accent1">
-              <a:shade val="50000"/>
-            </a:schemeClr>
-          </a:lnRef>
-          <a:fillRef idx="1">
-            <a:schemeClr val="accent1"/>
-          </a:fillRef>
-          <a:effectRef idx="0">
-            <a:schemeClr val="accent1"/>
-          </a:effectRef>
-          <a:fontRef idx="minor">
-            <a:schemeClr val="lt1"/>
-          </a:fontRef>
-        </p:style>
-        <p:txBody>
-          <a:bodyPr rtlCol="0" anchor="ctr"/>
-          <a:lstStyle/>
-          <a:p>
-            <a:pPr algn="ctr"/>
-            <a:r>
-              <a:rPr kumimoji="1" lang="en-US" altLang="ja-JP" sz="1200" dirty="0"/>
-              <a:t>Type</a:t>
-            </a:r>
-            <a:endParaRPr kumimoji="1" lang="ja-JP" altLang="en-US" sz="1200" dirty="0"/>
-          </a:p>
-        </p:txBody>
-      </p:sp>
-      <p:sp>
-        <p:nvSpPr>
-          <p:cNvPr id="23" name="正方形/長方形 22">
-            <a:extLst>
-              <a:ext uri="{FF2B5EF4-FFF2-40B4-BE49-F238E27FC236}">
-                <a16:creationId xmlns:a16="http://schemas.microsoft.com/office/drawing/2014/main" id="{1359E0B5-0CAD-4866-AA40-159677B32AF5}"/>
-              </a:ext>
-            </a:extLst>
-          </p:cNvPr>
-          <p:cNvSpPr/>
-          <p:nvPr/>
-        </p:nvSpPr>
-        <p:spPr>
-          <a:xfrm>
-            <a:off x="7409996" y="3709230"/>
-            <a:ext cx="931974" cy="222735"/>
-          </a:xfrm>
-          <a:prstGeom prst="rect">
-            <a:avLst/>
-          </a:prstGeom>
-        </p:spPr>
-        <p:style>
-          <a:lnRef idx="2">
-            <a:schemeClr val="accent1">
-              <a:shade val="50000"/>
-            </a:schemeClr>
-          </a:lnRef>
-          <a:fillRef idx="1">
-            <a:schemeClr val="accent1"/>
-          </a:fillRef>
-          <a:effectRef idx="0">
-            <a:schemeClr val="accent1"/>
-          </a:effectRef>
-          <a:fontRef idx="minor">
-            <a:schemeClr val="lt1"/>
-          </a:fontRef>
-        </p:style>
-        <p:txBody>
-          <a:bodyPr rtlCol="0" anchor="ctr"/>
-          <a:lstStyle/>
-          <a:p>
-            <a:pPr algn="ctr"/>
-            <a:r>
-              <a:rPr kumimoji="1" lang="en-US" altLang="ja-JP" sz="1200" dirty="0"/>
-              <a:t>Type</a:t>
-            </a:r>
-            <a:endParaRPr kumimoji="1" lang="ja-JP" altLang="en-US" sz="1200" dirty="0"/>
-          </a:p>
-        </p:txBody>
-      </p:sp>
-      <p:sp>
-        <p:nvSpPr>
-          <p:cNvPr id="24" name="正方形/長方形 23">
-            <a:extLst>
-              <a:ext uri="{FF2B5EF4-FFF2-40B4-BE49-F238E27FC236}">
-                <a16:creationId xmlns:a16="http://schemas.microsoft.com/office/drawing/2014/main" id="{5BAA1FF0-14D8-493C-8D48-DBE39F6F9BDC}"/>
-              </a:ext>
-            </a:extLst>
-          </p:cNvPr>
-          <p:cNvSpPr/>
-          <p:nvPr/>
-        </p:nvSpPr>
-        <p:spPr>
-          <a:xfrm>
-            <a:off x="8341178" y="3709230"/>
-            <a:ext cx="931974" cy="222735"/>
-          </a:xfrm>
-          <a:prstGeom prst="rect">
-            <a:avLst/>
-          </a:prstGeom>
-        </p:spPr>
-        <p:style>
-          <a:lnRef idx="2">
-            <a:schemeClr val="accent1">
-              <a:shade val="50000"/>
-            </a:schemeClr>
-          </a:lnRef>
-          <a:fillRef idx="1">
-            <a:schemeClr val="accent1"/>
-          </a:fillRef>
-          <a:effectRef idx="0">
-            <a:schemeClr val="accent1"/>
-          </a:effectRef>
-          <a:fontRef idx="minor">
-            <a:schemeClr val="lt1"/>
-          </a:fontRef>
-        </p:style>
-        <p:txBody>
-          <a:bodyPr rtlCol="0" anchor="ctr"/>
-          <a:lstStyle/>
-          <a:p>
-            <a:pPr algn="ctr"/>
-            <a:r>
-              <a:rPr kumimoji="1" lang="en-US" altLang="ja-JP" sz="1200" dirty="0"/>
-              <a:t>Type</a:t>
-            </a:r>
-            <a:endParaRPr kumimoji="1" lang="ja-JP" altLang="en-US" sz="1200" dirty="0"/>
-          </a:p>
-        </p:txBody>
-      </p:sp>
-      <p:sp>
-        <p:nvSpPr>
-          <p:cNvPr id="25" name="正方形/長方形 24">
-            <a:extLst>
-              <a:ext uri="{FF2B5EF4-FFF2-40B4-BE49-F238E27FC236}">
-                <a16:creationId xmlns:a16="http://schemas.microsoft.com/office/drawing/2014/main" id="{688536EE-90DA-439F-8999-D34D7BF5BE7A}"/>
-              </a:ext>
-            </a:extLst>
-          </p:cNvPr>
-          <p:cNvSpPr/>
-          <p:nvPr/>
-        </p:nvSpPr>
-        <p:spPr>
-          <a:xfrm>
-            <a:off x="9272360" y="3709230"/>
-            <a:ext cx="931974" cy="222735"/>
-          </a:xfrm>
-          <a:prstGeom prst="rect">
-            <a:avLst/>
-          </a:prstGeom>
-        </p:spPr>
-        <p:style>
-          <a:lnRef idx="2">
-            <a:schemeClr val="accent1">
-              <a:shade val="50000"/>
-            </a:schemeClr>
-          </a:lnRef>
-          <a:fillRef idx="1">
-            <a:schemeClr val="accent1"/>
-          </a:fillRef>
-          <a:effectRef idx="0">
-            <a:schemeClr val="accent1"/>
-          </a:effectRef>
-          <a:fontRef idx="minor">
-            <a:schemeClr val="lt1"/>
-          </a:fontRef>
-        </p:style>
-        <p:txBody>
-          <a:bodyPr rtlCol="0" anchor="ctr"/>
-          <a:lstStyle/>
-          <a:p>
-            <a:pPr algn="ctr"/>
-            <a:r>
-              <a:rPr kumimoji="1" lang="en-US" altLang="ja-JP" sz="1200" dirty="0"/>
-              <a:t>Type</a:t>
-            </a:r>
-            <a:endParaRPr kumimoji="1" lang="ja-JP" altLang="en-US" sz="1200" dirty="0"/>
-          </a:p>
-        </p:txBody>
-      </p:sp>
-      <p:sp>
-        <p:nvSpPr>
-          <p:cNvPr id="26" name="正方形/長方形 25">
-            <a:extLst>
-              <a:ext uri="{FF2B5EF4-FFF2-40B4-BE49-F238E27FC236}">
-                <a16:creationId xmlns:a16="http://schemas.microsoft.com/office/drawing/2014/main" id="{099CD03A-8FEB-4B28-9F93-137518257087}"/>
-              </a:ext>
-            </a:extLst>
-          </p:cNvPr>
-          <p:cNvSpPr/>
-          <p:nvPr/>
-        </p:nvSpPr>
-        <p:spPr>
-          <a:xfrm>
-            <a:off x="10203544" y="3709230"/>
-            <a:ext cx="931974" cy="222735"/>
-          </a:xfrm>
-          <a:prstGeom prst="rect">
-            <a:avLst/>
-          </a:prstGeom>
-        </p:spPr>
-        <p:style>
-          <a:lnRef idx="2">
-            <a:schemeClr val="accent1">
-              <a:shade val="50000"/>
-            </a:schemeClr>
-          </a:lnRef>
-          <a:fillRef idx="1">
-            <a:schemeClr val="accent1"/>
-          </a:fillRef>
-          <a:effectRef idx="0">
-            <a:schemeClr val="accent1"/>
-          </a:effectRef>
-          <a:fontRef idx="minor">
-            <a:schemeClr val="lt1"/>
-          </a:fontRef>
-        </p:style>
-        <p:txBody>
-          <a:bodyPr rtlCol="0" anchor="ctr"/>
-          <a:lstStyle/>
-          <a:p>
-            <a:pPr algn="ctr"/>
-            <a:r>
-              <a:rPr kumimoji="1" lang="en-US" altLang="ja-JP" sz="1200" dirty="0"/>
-              <a:t>Type</a:t>
-            </a:r>
-            <a:endParaRPr kumimoji="1" lang="ja-JP" altLang="en-US" sz="1200" dirty="0"/>
-          </a:p>
-        </p:txBody>
-      </p:sp>
-      <p:sp>
-        <p:nvSpPr>
-          <p:cNvPr id="29" name="テキスト ボックス 28">
-            <a:extLst>
-              <a:ext uri="{FF2B5EF4-FFF2-40B4-BE49-F238E27FC236}">
-                <a16:creationId xmlns:a16="http://schemas.microsoft.com/office/drawing/2014/main" id="{CEEE2D45-32F1-4CE4-82E8-AEC2F048D50D}"/>
-              </a:ext>
-            </a:extLst>
-          </p:cNvPr>
-          <p:cNvSpPr txBox="1"/>
-          <p:nvPr/>
-        </p:nvSpPr>
-        <p:spPr>
-          <a:xfrm>
-            <a:off x="10453688" y="4143046"/>
-            <a:ext cx="754062" cy="276999"/>
-          </a:xfrm>
-          <a:prstGeom prst="rect">
-            <a:avLst/>
-          </a:prstGeom>
-          <a:noFill/>
-        </p:spPr>
-        <p:txBody>
-          <a:bodyPr wrap="square">
-            <a:spAutoFit/>
-          </a:bodyPr>
-          <a:lstStyle/>
-          <a:p>
-            <a:r>
-              <a:rPr kumimoji="1" lang="en-US" altLang="ja-JP" sz="1200" dirty="0"/>
-              <a:t>LSB</a:t>
-            </a:r>
-            <a:endParaRPr lang="ja-JP" altLang="en-US" sz="1200" dirty="0"/>
-          </a:p>
-        </p:txBody>
-      </p:sp>
-      <p:sp>
-        <p:nvSpPr>
-          <p:cNvPr id="30" name="テキスト ボックス 29">
-            <a:extLst>
-              <a:ext uri="{FF2B5EF4-FFF2-40B4-BE49-F238E27FC236}">
-                <a16:creationId xmlns:a16="http://schemas.microsoft.com/office/drawing/2014/main" id="{7FD9F990-A8F4-4554-9A22-4F38AAE16B57}"/>
-              </a:ext>
-            </a:extLst>
-          </p:cNvPr>
-          <p:cNvSpPr txBox="1"/>
-          <p:nvPr/>
-        </p:nvSpPr>
-        <p:spPr>
-          <a:xfrm>
-            <a:off x="10202750" y="3324567"/>
-            <a:ext cx="931974" cy="276999"/>
-          </a:xfrm>
-          <a:prstGeom prst="rect">
-            <a:avLst/>
-          </a:prstGeom>
-          <a:noFill/>
-        </p:spPr>
-        <p:txBody>
-          <a:bodyPr wrap="square">
-            <a:spAutoFit/>
-          </a:bodyPr>
-          <a:lstStyle/>
-          <a:p>
-            <a:pPr algn="ctr"/>
-            <a:r>
-              <a:rPr kumimoji="1" lang="en-US" altLang="ja-JP" sz="1200" dirty="0"/>
-              <a:t>0</a:t>
-            </a:r>
-            <a:endParaRPr lang="ja-JP" altLang="en-US" sz="1200" dirty="0"/>
-          </a:p>
-        </p:txBody>
-      </p:sp>
-      <p:sp>
-        <p:nvSpPr>
-          <p:cNvPr id="31" name="テキスト ボックス 30">
-            <a:extLst>
-              <a:ext uri="{FF2B5EF4-FFF2-40B4-BE49-F238E27FC236}">
-                <a16:creationId xmlns:a16="http://schemas.microsoft.com/office/drawing/2014/main" id="{4FBB096C-7BE9-4853-808B-4AF85A43FA90}"/>
-              </a:ext>
-            </a:extLst>
-          </p:cNvPr>
-          <p:cNvSpPr txBox="1"/>
-          <p:nvPr/>
-        </p:nvSpPr>
-        <p:spPr>
-          <a:xfrm>
-            <a:off x="3701200" y="4141429"/>
-            <a:ext cx="754062" cy="276999"/>
-          </a:xfrm>
-          <a:prstGeom prst="rect">
-            <a:avLst/>
-          </a:prstGeom>
-          <a:noFill/>
-        </p:spPr>
-        <p:txBody>
-          <a:bodyPr wrap="square">
-            <a:spAutoFit/>
-          </a:bodyPr>
-          <a:lstStyle/>
-          <a:p>
-            <a:r>
-              <a:rPr kumimoji="1" lang="en-US" altLang="ja-JP" sz="1200" dirty="0"/>
-              <a:t>MSB</a:t>
-            </a:r>
-            <a:endParaRPr lang="ja-JP" altLang="en-US" sz="1200" dirty="0"/>
-          </a:p>
-        </p:txBody>
-      </p:sp>
-      <p:sp>
-        <p:nvSpPr>
-          <p:cNvPr id="32" name="テキスト ボックス 31">
-            <a:extLst>
-              <a:ext uri="{FF2B5EF4-FFF2-40B4-BE49-F238E27FC236}">
-                <a16:creationId xmlns:a16="http://schemas.microsoft.com/office/drawing/2014/main" id="{5E4FF8C6-04E3-4BBB-80FF-BF99A9A324F7}"/>
-              </a:ext>
-            </a:extLst>
-          </p:cNvPr>
-          <p:cNvSpPr txBox="1"/>
-          <p:nvPr/>
-        </p:nvSpPr>
-        <p:spPr>
-          <a:xfrm>
-            <a:off x="3683682" y="3456431"/>
-            <a:ext cx="931974" cy="276999"/>
-          </a:xfrm>
-          <a:prstGeom prst="rect">
-            <a:avLst/>
-          </a:prstGeom>
-          <a:noFill/>
-        </p:spPr>
-        <p:txBody>
-          <a:bodyPr wrap="square">
-            <a:spAutoFit/>
-          </a:bodyPr>
-          <a:lstStyle/>
-          <a:p>
-            <a:pPr algn="ctr"/>
-            <a:r>
-              <a:rPr kumimoji="1" lang="en-US" altLang="ja-JP" sz="1200" dirty="0"/>
-              <a:t>7</a:t>
-            </a:r>
-            <a:endParaRPr lang="ja-JP" altLang="en-US" sz="1200" dirty="0"/>
-          </a:p>
-        </p:txBody>
-      </p:sp>
-      <p:sp>
-        <p:nvSpPr>
-          <p:cNvPr id="10" name="正方形/長方形 9">
-            <a:extLst>
-              <a:ext uri="{FF2B5EF4-FFF2-40B4-BE49-F238E27FC236}">
-                <a16:creationId xmlns:a16="http://schemas.microsoft.com/office/drawing/2014/main" id="{478506DE-C4A6-BEEE-F149-2B4EDB9489BC}"/>
-              </a:ext>
-            </a:extLst>
-          </p:cNvPr>
-          <p:cNvSpPr/>
-          <p:nvPr/>
-        </p:nvSpPr>
-        <p:spPr>
-          <a:xfrm>
-            <a:off x="3685268" y="3925946"/>
-            <a:ext cx="931974" cy="222735"/>
-          </a:xfrm>
-          <a:prstGeom prst="rect">
-            <a:avLst/>
-          </a:prstGeom>
-          <a:solidFill>
-            <a:schemeClr val="bg1"/>
-          </a:solidFill>
-        </p:spPr>
-        <p:style>
-          <a:lnRef idx="2">
-            <a:schemeClr val="accent1">
-              <a:shade val="50000"/>
-            </a:schemeClr>
-          </a:lnRef>
-          <a:fillRef idx="1">
-            <a:schemeClr val="accent1"/>
-          </a:fillRef>
-          <a:effectRef idx="0">
-            <a:schemeClr val="accent1"/>
-          </a:effectRef>
-          <a:fontRef idx="minor">
-            <a:schemeClr val="lt1"/>
-          </a:fontRef>
-        </p:style>
-        <p:txBody>
-          <a:bodyPr rtlCol="0" anchor="ctr"/>
-          <a:lstStyle/>
-          <a:p>
-            <a:pPr algn="ctr"/>
-            <a:endParaRPr kumimoji="1" lang="ja-JP" altLang="en-US" sz="1200" dirty="0"/>
-          </a:p>
-        </p:txBody>
-      </p:sp>
-      <p:sp>
-        <p:nvSpPr>
-          <p:cNvPr id="11" name="正方形/長方形 10">
-            <a:extLst>
-              <a:ext uri="{FF2B5EF4-FFF2-40B4-BE49-F238E27FC236}">
-                <a16:creationId xmlns:a16="http://schemas.microsoft.com/office/drawing/2014/main" id="{5DE6008D-A295-8224-A8DB-60A78F5305CF}"/>
-              </a:ext>
-            </a:extLst>
-          </p:cNvPr>
-          <p:cNvSpPr/>
-          <p:nvPr/>
-        </p:nvSpPr>
-        <p:spPr>
-          <a:xfrm>
-            <a:off x="4616450" y="3925946"/>
-            <a:ext cx="931974" cy="222735"/>
-          </a:xfrm>
-          <a:prstGeom prst="rect">
-            <a:avLst/>
-          </a:prstGeom>
-          <a:solidFill>
-            <a:schemeClr val="bg1"/>
-          </a:solidFill>
-        </p:spPr>
-        <p:style>
-          <a:lnRef idx="2">
-            <a:schemeClr val="accent1">
-              <a:shade val="50000"/>
-            </a:schemeClr>
-          </a:lnRef>
-          <a:fillRef idx="1">
-            <a:schemeClr val="accent1"/>
-          </a:fillRef>
-          <a:effectRef idx="0">
-            <a:schemeClr val="accent1"/>
-          </a:effectRef>
-          <a:fontRef idx="minor">
-            <a:schemeClr val="lt1"/>
-          </a:fontRef>
-        </p:style>
-        <p:txBody>
-          <a:bodyPr rtlCol="0" anchor="ctr"/>
-          <a:lstStyle/>
-          <a:p>
-            <a:pPr algn="ctr"/>
-            <a:endParaRPr kumimoji="1" lang="ja-JP" altLang="en-US" sz="1200" dirty="0"/>
-          </a:p>
-        </p:txBody>
-      </p:sp>
-      <p:sp>
-        <p:nvSpPr>
-          <p:cNvPr id="12" name="正方形/長方形 11">
-            <a:extLst>
-              <a:ext uri="{FF2B5EF4-FFF2-40B4-BE49-F238E27FC236}">
-                <a16:creationId xmlns:a16="http://schemas.microsoft.com/office/drawing/2014/main" id="{A9D8EE6D-3028-80A4-83BC-22A0166138C8}"/>
-              </a:ext>
-            </a:extLst>
-          </p:cNvPr>
-          <p:cNvSpPr/>
-          <p:nvPr/>
-        </p:nvSpPr>
-        <p:spPr>
-          <a:xfrm>
-            <a:off x="5547632" y="3925946"/>
-            <a:ext cx="931974" cy="222735"/>
-          </a:xfrm>
-          <a:prstGeom prst="rect">
-            <a:avLst/>
-          </a:prstGeom>
-        </p:spPr>
-        <p:style>
-          <a:lnRef idx="2">
-            <a:schemeClr val="accent1">
-              <a:shade val="50000"/>
-            </a:schemeClr>
-          </a:lnRef>
-          <a:fillRef idx="1">
-            <a:schemeClr val="accent1"/>
-          </a:fillRef>
-          <a:effectRef idx="0">
-            <a:schemeClr val="accent1"/>
-          </a:effectRef>
-          <a:fontRef idx="minor">
-            <a:schemeClr val="lt1"/>
-          </a:fontRef>
-        </p:style>
-        <p:txBody>
-          <a:bodyPr rtlCol="0" anchor="ctr"/>
-          <a:lstStyle/>
-          <a:p>
-            <a:pPr algn="ctr"/>
-            <a:r>
-              <a:rPr lang="en-US" altLang="ja-JP" sz="1200" dirty="0"/>
-              <a:t>0</a:t>
-            </a:r>
-            <a:endParaRPr kumimoji="1" lang="ja-JP" altLang="en-US" sz="1200" dirty="0"/>
-          </a:p>
-        </p:txBody>
-      </p:sp>
-      <p:sp>
-        <p:nvSpPr>
-          <p:cNvPr id="16" name="正方形/長方形 15">
-            <a:extLst>
-              <a:ext uri="{FF2B5EF4-FFF2-40B4-BE49-F238E27FC236}">
-                <a16:creationId xmlns:a16="http://schemas.microsoft.com/office/drawing/2014/main" id="{66E10A75-D78B-6248-F89D-3EFF22F74953}"/>
-              </a:ext>
-            </a:extLst>
-          </p:cNvPr>
-          <p:cNvSpPr/>
-          <p:nvPr/>
-        </p:nvSpPr>
-        <p:spPr>
-          <a:xfrm>
-            <a:off x="6478814" y="3925946"/>
-            <a:ext cx="931974" cy="222735"/>
-          </a:xfrm>
-          <a:prstGeom prst="rect">
-            <a:avLst/>
-          </a:prstGeom>
-        </p:spPr>
-        <p:style>
-          <a:lnRef idx="2">
-            <a:schemeClr val="accent1">
-              <a:shade val="50000"/>
-            </a:schemeClr>
-          </a:lnRef>
-          <a:fillRef idx="1">
-            <a:schemeClr val="accent1"/>
-          </a:fillRef>
-          <a:effectRef idx="0">
-            <a:schemeClr val="accent1"/>
-          </a:effectRef>
-          <a:fontRef idx="minor">
-            <a:schemeClr val="lt1"/>
-          </a:fontRef>
-        </p:style>
-        <p:txBody>
-          <a:bodyPr rtlCol="0" anchor="ctr"/>
-          <a:lstStyle/>
-          <a:p>
-            <a:pPr algn="ctr"/>
-            <a:r>
-              <a:rPr kumimoji="1" lang="en-US" altLang="ja-JP" sz="1200" dirty="0" err="1"/>
-              <a:t>clk</a:t>
-            </a:r>
-            <a:endParaRPr kumimoji="1" lang="ja-JP" altLang="en-US" sz="1200" dirty="0"/>
-          </a:p>
-        </p:txBody>
-      </p:sp>
-      <p:sp>
-        <p:nvSpPr>
-          <p:cNvPr id="27" name="正方形/長方形 26">
-            <a:extLst>
-              <a:ext uri="{FF2B5EF4-FFF2-40B4-BE49-F238E27FC236}">
-                <a16:creationId xmlns:a16="http://schemas.microsoft.com/office/drawing/2014/main" id="{A0668D44-ED14-2275-D91F-33F330C9616E}"/>
-              </a:ext>
-            </a:extLst>
-          </p:cNvPr>
-          <p:cNvSpPr/>
-          <p:nvPr/>
-        </p:nvSpPr>
-        <p:spPr>
-          <a:xfrm>
-            <a:off x="7409996" y="3925946"/>
-            <a:ext cx="931974" cy="222735"/>
-          </a:xfrm>
-          <a:prstGeom prst="rect">
-            <a:avLst/>
-          </a:prstGeom>
-        </p:spPr>
-        <p:style>
-          <a:lnRef idx="2">
-            <a:schemeClr val="accent1">
-              <a:shade val="50000"/>
-            </a:schemeClr>
-          </a:lnRef>
-          <a:fillRef idx="1">
-            <a:schemeClr val="accent1"/>
-          </a:fillRef>
-          <a:effectRef idx="0">
-            <a:schemeClr val="accent1"/>
-          </a:effectRef>
-          <a:fontRef idx="minor">
-            <a:schemeClr val="lt1"/>
-          </a:fontRef>
-        </p:style>
-        <p:txBody>
-          <a:bodyPr rtlCol="0" anchor="ctr"/>
-          <a:lstStyle/>
-          <a:p>
-            <a:pPr algn="ctr"/>
-            <a:r>
-              <a:rPr kumimoji="1" lang="en-US" altLang="ja-JP" sz="1200" dirty="0"/>
-              <a:t>Data</a:t>
-            </a:r>
-            <a:endParaRPr kumimoji="1" lang="ja-JP" altLang="en-US" sz="1200" dirty="0"/>
-          </a:p>
-        </p:txBody>
-      </p:sp>
-      <p:sp>
-        <p:nvSpPr>
-          <p:cNvPr id="28" name="正方形/長方形 27">
-            <a:extLst>
-              <a:ext uri="{FF2B5EF4-FFF2-40B4-BE49-F238E27FC236}">
-                <a16:creationId xmlns:a16="http://schemas.microsoft.com/office/drawing/2014/main" id="{324020AE-1D74-2BBE-B6AE-2DBB28872336}"/>
-              </a:ext>
-            </a:extLst>
-          </p:cNvPr>
-          <p:cNvSpPr/>
-          <p:nvPr/>
-        </p:nvSpPr>
-        <p:spPr>
-          <a:xfrm>
-            <a:off x="8341178" y="3925946"/>
-            <a:ext cx="931974" cy="222735"/>
-          </a:xfrm>
-          <a:prstGeom prst="rect">
-            <a:avLst/>
-          </a:prstGeom>
-        </p:spPr>
-        <p:style>
-          <a:lnRef idx="2">
-            <a:schemeClr val="accent1">
-              <a:shade val="50000"/>
-            </a:schemeClr>
-          </a:lnRef>
-          <a:fillRef idx="1">
-            <a:schemeClr val="accent1"/>
-          </a:fillRef>
-          <a:effectRef idx="0">
-            <a:schemeClr val="accent1"/>
-          </a:effectRef>
-          <a:fontRef idx="minor">
-            <a:schemeClr val="lt1"/>
-          </a:fontRef>
-        </p:style>
-        <p:txBody>
-          <a:bodyPr rtlCol="0" anchor="ctr"/>
-          <a:lstStyle/>
-          <a:p>
-            <a:pPr algn="ctr"/>
-            <a:r>
-              <a:rPr kumimoji="1" lang="en-US" altLang="ja-JP" sz="1200" dirty="0"/>
-              <a:t>Data</a:t>
-            </a:r>
-            <a:endParaRPr kumimoji="1" lang="ja-JP" altLang="en-US" sz="1200" dirty="0"/>
-          </a:p>
-        </p:txBody>
-      </p:sp>
-      <p:sp>
-        <p:nvSpPr>
-          <p:cNvPr id="33" name="正方形/長方形 32">
-            <a:extLst>
-              <a:ext uri="{FF2B5EF4-FFF2-40B4-BE49-F238E27FC236}">
-                <a16:creationId xmlns:a16="http://schemas.microsoft.com/office/drawing/2014/main" id="{F05F5EA1-7E83-1625-891E-FBAD75E64B41}"/>
-              </a:ext>
-            </a:extLst>
-          </p:cNvPr>
-          <p:cNvSpPr/>
-          <p:nvPr/>
-        </p:nvSpPr>
-        <p:spPr>
-          <a:xfrm>
-            <a:off x="9272360" y="3925946"/>
-            <a:ext cx="931974" cy="222735"/>
-          </a:xfrm>
-          <a:prstGeom prst="rect">
-            <a:avLst/>
-          </a:prstGeom>
-        </p:spPr>
-        <p:style>
-          <a:lnRef idx="2">
-            <a:schemeClr val="accent1">
-              <a:shade val="50000"/>
-            </a:schemeClr>
-          </a:lnRef>
-          <a:fillRef idx="1">
-            <a:schemeClr val="accent1"/>
-          </a:fillRef>
-          <a:effectRef idx="0">
-            <a:schemeClr val="accent1"/>
-          </a:effectRef>
-          <a:fontRef idx="minor">
-            <a:schemeClr val="lt1"/>
-          </a:fontRef>
-        </p:style>
-        <p:txBody>
-          <a:bodyPr rtlCol="0" anchor="ctr"/>
-          <a:lstStyle/>
-          <a:p>
-            <a:pPr algn="ctr"/>
-            <a:r>
-              <a:rPr kumimoji="1" lang="en-US" altLang="ja-JP" sz="1200" dirty="0"/>
-              <a:t>Data</a:t>
-            </a:r>
-            <a:endParaRPr kumimoji="1" lang="ja-JP" altLang="en-US" sz="1200" dirty="0"/>
-          </a:p>
-        </p:txBody>
-      </p:sp>
-      <p:sp>
-        <p:nvSpPr>
-          <p:cNvPr id="34" name="正方形/長方形 33">
-            <a:extLst>
-              <a:ext uri="{FF2B5EF4-FFF2-40B4-BE49-F238E27FC236}">
-                <a16:creationId xmlns:a16="http://schemas.microsoft.com/office/drawing/2014/main" id="{7CBDC923-4B35-09F7-CE6B-4605F7730CE1}"/>
-              </a:ext>
-            </a:extLst>
-          </p:cNvPr>
-          <p:cNvSpPr/>
-          <p:nvPr/>
-        </p:nvSpPr>
-        <p:spPr>
-          <a:xfrm>
-            <a:off x="10203544" y="3925946"/>
-            <a:ext cx="931974" cy="222735"/>
-          </a:xfrm>
-          <a:prstGeom prst="rect">
-            <a:avLst/>
-          </a:prstGeom>
-        </p:spPr>
-        <p:style>
-          <a:lnRef idx="2">
-            <a:schemeClr val="accent1">
-              <a:shade val="50000"/>
-            </a:schemeClr>
-          </a:lnRef>
-          <a:fillRef idx="1">
-            <a:schemeClr val="accent1"/>
-          </a:fillRef>
-          <a:effectRef idx="0">
-            <a:schemeClr val="accent1"/>
-          </a:effectRef>
-          <a:fontRef idx="minor">
-            <a:schemeClr val="lt1"/>
-          </a:fontRef>
-        </p:style>
-        <p:txBody>
-          <a:bodyPr rtlCol="0" anchor="ctr"/>
-          <a:lstStyle/>
-          <a:p>
-            <a:pPr algn="ctr"/>
-            <a:r>
-              <a:rPr kumimoji="1" lang="en-US" altLang="ja-JP" sz="1200" dirty="0"/>
-              <a:t>Data</a:t>
-            </a:r>
-            <a:endParaRPr kumimoji="1" lang="ja-JP" altLang="en-US" sz="1200" dirty="0"/>
-          </a:p>
-        </p:txBody>
-      </p:sp>
-      <p:sp>
-        <p:nvSpPr>
-          <p:cNvPr id="37" name="テキスト ボックス 36">
-            <a:extLst>
-              <a:ext uri="{FF2B5EF4-FFF2-40B4-BE49-F238E27FC236}">
-                <a16:creationId xmlns:a16="http://schemas.microsoft.com/office/drawing/2014/main" id="{24E6C233-7582-B65B-8CA8-628B9BD91206}"/>
-              </a:ext>
-            </a:extLst>
-          </p:cNvPr>
-          <p:cNvSpPr txBox="1"/>
-          <p:nvPr/>
-        </p:nvSpPr>
-        <p:spPr>
-          <a:xfrm>
-            <a:off x="2858974" y="3686003"/>
-            <a:ext cx="754062" cy="276999"/>
-          </a:xfrm>
-          <a:prstGeom prst="rect">
-            <a:avLst/>
-          </a:prstGeom>
-          <a:noFill/>
-        </p:spPr>
-        <p:txBody>
-          <a:bodyPr wrap="square">
-            <a:spAutoFit/>
-          </a:bodyPr>
-          <a:lstStyle/>
-          <a:p>
-            <a:r>
-              <a:rPr kumimoji="1" lang="en-US" altLang="ja-JP" sz="1200" dirty="0"/>
-              <a:t>Start</a:t>
-            </a:r>
-            <a:endParaRPr lang="ja-JP" altLang="en-US" sz="1200" dirty="0"/>
-          </a:p>
-        </p:txBody>
-      </p:sp>
-      <p:sp>
-        <p:nvSpPr>
-          <p:cNvPr id="38" name="テキスト ボックス 37">
-            <a:extLst>
-              <a:ext uri="{FF2B5EF4-FFF2-40B4-BE49-F238E27FC236}">
-                <a16:creationId xmlns:a16="http://schemas.microsoft.com/office/drawing/2014/main" id="{BAD04C24-4EBC-79B7-9D31-FB105C37DA06}"/>
-              </a:ext>
-            </a:extLst>
-          </p:cNvPr>
-          <p:cNvSpPr txBox="1"/>
-          <p:nvPr/>
-        </p:nvSpPr>
-        <p:spPr>
-          <a:xfrm>
-            <a:off x="2858974" y="3909441"/>
-            <a:ext cx="754062" cy="276999"/>
-          </a:xfrm>
-          <a:prstGeom prst="rect">
-            <a:avLst/>
-          </a:prstGeom>
-          <a:noFill/>
-        </p:spPr>
-        <p:txBody>
-          <a:bodyPr wrap="square">
-            <a:spAutoFit/>
-          </a:bodyPr>
-          <a:lstStyle/>
-          <a:p>
-            <a:r>
-              <a:rPr kumimoji="1" lang="en-US" altLang="ja-JP" sz="1200" dirty="0" err="1"/>
-              <a:t>Clk</a:t>
-            </a:r>
-            <a:endParaRPr lang="ja-JP" altLang="en-US" sz="1200" dirty="0"/>
-          </a:p>
-        </p:txBody>
-      </p:sp>
-      <p:sp>
-        <p:nvSpPr>
-          <p:cNvPr id="40" name="正方形/長方形 39">
-            <a:extLst>
-              <a:ext uri="{FF2B5EF4-FFF2-40B4-BE49-F238E27FC236}">
-                <a16:creationId xmlns:a16="http://schemas.microsoft.com/office/drawing/2014/main" id="{81384D31-A7C9-4A76-9DD8-688389BBA22E}"/>
-              </a:ext>
-            </a:extLst>
-          </p:cNvPr>
-          <p:cNvSpPr/>
-          <p:nvPr/>
-        </p:nvSpPr>
-        <p:spPr>
-          <a:xfrm>
-            <a:off x="11164257" y="2939380"/>
-            <a:ext cx="754063" cy="222735"/>
-          </a:xfrm>
-          <a:prstGeom prst="rect">
-            <a:avLst/>
-          </a:prstGeom>
-        </p:spPr>
-        <p:style>
-          <a:lnRef idx="2">
-            <a:schemeClr val="accent1">
-              <a:shade val="50000"/>
-            </a:schemeClr>
-          </a:lnRef>
-          <a:fillRef idx="1">
-            <a:schemeClr val="accent1"/>
-          </a:fillRef>
-          <a:effectRef idx="0">
-            <a:schemeClr val="accent1"/>
-          </a:effectRef>
-          <a:fontRef idx="minor">
-            <a:schemeClr val="lt1"/>
-          </a:fontRef>
-        </p:style>
-        <p:txBody>
-          <a:bodyPr rtlCol="0" anchor="ctr"/>
-          <a:lstStyle/>
-          <a:p>
-            <a:pPr algn="ctr"/>
-            <a:r>
-              <a:rPr kumimoji="1" lang="en-US" altLang="ja-JP" sz="1200" dirty="0"/>
-              <a:t>…</a:t>
-            </a:r>
-            <a:endParaRPr kumimoji="1" lang="ja-JP" altLang="en-US" sz="1200" dirty="0"/>
-          </a:p>
-        </p:txBody>
-      </p:sp>
-    </p:spTree>
-    <p:extLst>
-      <p:ext uri="{BB962C8B-B14F-4D97-AF65-F5344CB8AC3E}">
-        <p14:creationId xmlns:p14="http://schemas.microsoft.com/office/powerpoint/2010/main" val="1111983188"/>
       </p:ext>
     </p:extLst>
   </p:cSld>
@@ -37600,6 +36027,1946 @@
           <a:p>
             <a:r>
               <a:rPr kumimoji="1" lang="en-US" altLang="ja-JP" dirty="0"/>
+              <a:t>VSIF </a:t>
+            </a:r>
+            <a:r>
+              <a:rPr kumimoji="1" lang="en-US" altLang="ja-JP"/>
+              <a:t>– MSX/P6(</a:t>
+            </a:r>
+            <a:r>
+              <a:rPr kumimoji="1" lang="en-US" altLang="ja-JP" dirty="0"/>
+              <a:t>FTDI) SPECIFICATION</a:t>
+            </a:r>
+            <a:br>
+              <a:rPr kumimoji="1" lang="en-US" altLang="ja-JP" dirty="0"/>
+            </a:br>
+            <a:r>
+              <a:rPr kumimoji="1" lang="en-US" altLang="ja-JP" sz="2400" dirty="0"/>
+              <a:t>for </a:t>
+            </a:r>
+            <a:r>
+              <a:rPr lang="en-US" altLang="ja-JP" sz="2400" b="0" i="0" dirty="0">
+                <a:solidFill>
+                  <a:srgbClr val="202122"/>
+                </a:solidFill>
+                <a:effectLst/>
+                <a:latin typeface="Arial" panose="020B0604020202020204" pitchFamily="34" charset="0"/>
+              </a:rPr>
+              <a:t>AY-3-8910, OPLL, SCC-I, </a:t>
+            </a:r>
+            <a:r>
+              <a:rPr lang="en-US" altLang="ja-JP" sz="2400" b="0" i="0" dirty="0">
+                <a:solidFill>
+                  <a:schemeClr val="tx1"/>
+                </a:solidFill>
+                <a:effectLst/>
+                <a:latin typeface="arial" panose="020B0604020202020204" pitchFamily="34" charset="0"/>
+              </a:rPr>
+              <a:t>OPL3, OPM, OPNA/OPN2, OPN</a:t>
+            </a:r>
+            <a:endParaRPr kumimoji="1" lang="ja-JP" altLang="en-US" sz="2400" dirty="0">
+              <a:solidFill>
+                <a:schemeClr val="tx1"/>
+              </a:solidFill>
+            </a:endParaRPr>
+          </a:p>
+        </p:txBody>
+      </p:sp>
+      <p:sp>
+        <p:nvSpPr>
+          <p:cNvPr id="3" name="コンテンツ プレースホルダー 2">
+            <a:extLst>
+              <a:ext uri="{FF2B5EF4-FFF2-40B4-BE49-F238E27FC236}">
+                <a16:creationId xmlns:a16="http://schemas.microsoft.com/office/drawing/2014/main" id="{2E5DDE30-9A16-4A82-90A7-733F711600B5}"/>
+              </a:ext>
+            </a:extLst>
+          </p:cNvPr>
+          <p:cNvSpPr>
+            <a:spLocks noGrp="1"/>
+          </p:cNvSpPr>
+          <p:nvPr>
+            <p:ph idx="1"/>
+          </p:nvPr>
+        </p:nvSpPr>
+        <p:spPr>
+          <a:xfrm>
+            <a:off x="2589212" y="2133600"/>
+            <a:ext cx="9348788" cy="4559300"/>
+          </a:xfrm>
+        </p:spPr>
+        <p:txBody>
+          <a:bodyPr>
+            <a:normAutofit fontScale="70000" lnSpcReduction="20000"/>
+          </a:bodyPr>
+          <a:lstStyle/>
+          <a:p>
+            <a:r>
+              <a:rPr lang="en-US" altLang="ja-JP" dirty="0"/>
+              <a:t>Baud rate : 38,400 bytes / sec</a:t>
+            </a:r>
+          </a:p>
+          <a:p>
+            <a:r>
+              <a:rPr kumimoji="1" lang="en-US" altLang="ja-JP" dirty="0"/>
+              <a:t>1 packet : 5 bytes + α</a:t>
+            </a:r>
+          </a:p>
+          <a:p>
+            <a:endParaRPr lang="en-US" altLang="ja-JP" dirty="0"/>
+          </a:p>
+          <a:p>
+            <a:endParaRPr kumimoji="1" lang="en-US" altLang="ja-JP" dirty="0"/>
+          </a:p>
+          <a:p>
+            <a:r>
+              <a:rPr lang="en-US" altLang="ja-JP" dirty="0"/>
+              <a:t>1byte : 4bit(data) + 2bit(Start + </a:t>
+            </a:r>
+            <a:r>
+              <a:rPr lang="en-US" altLang="ja-JP" dirty="0" err="1"/>
+              <a:t>Clk</a:t>
+            </a:r>
+            <a:r>
+              <a:rPr lang="en-US" altLang="ja-JP" dirty="0"/>
+              <a:t> bit)</a:t>
+            </a:r>
+          </a:p>
+          <a:p>
+            <a:endParaRPr kumimoji="1" lang="en-US" altLang="ja-JP" dirty="0"/>
+          </a:p>
+          <a:p>
+            <a:endParaRPr lang="en-US" altLang="ja-JP" dirty="0"/>
+          </a:p>
+          <a:p>
+            <a:endParaRPr kumimoji="1" lang="en-US" altLang="ja-JP" dirty="0"/>
+          </a:p>
+          <a:p>
+            <a:r>
+              <a:rPr kumimoji="1" lang="en-US" altLang="ja-JP" dirty="0"/>
+              <a:t>Type:</a:t>
+            </a:r>
+          </a:p>
+          <a:p>
+            <a:pPr lvl="1"/>
+            <a:r>
+              <a:rPr kumimoji="1" lang="en-US" altLang="ja-JP" sz="1300" b="1" dirty="0"/>
+              <a:t>0</a:t>
+            </a:r>
+            <a:r>
+              <a:rPr kumimoji="1" lang="en-US" altLang="ja-JP" sz="1300" dirty="0"/>
+              <a:t>		AY-3-8910: Write value to address</a:t>
+            </a:r>
+          </a:p>
+          <a:p>
+            <a:pPr lvl="1"/>
+            <a:r>
+              <a:rPr kumimoji="1" lang="en-US" altLang="ja-JP" sz="1300" b="1" dirty="0"/>
+              <a:t>1,2,(12)	</a:t>
+            </a:r>
+            <a:r>
+              <a:rPr kumimoji="1" lang="en-US" altLang="ja-JP" sz="1300" dirty="0"/>
+              <a:t>YM2413: </a:t>
+            </a:r>
+            <a:r>
+              <a:rPr kumimoji="1" lang="en-US" altLang="ja-JP" sz="1300" b="1" dirty="0"/>
+              <a:t>1</a:t>
+            </a:r>
+            <a:r>
+              <a:rPr kumimoji="1" lang="en-US" altLang="ja-JP" sz="1300" dirty="0"/>
+              <a:t> is write value to address, </a:t>
+            </a:r>
+            <a:r>
+              <a:rPr kumimoji="1" lang="en-US" altLang="ja-JP" sz="1300" b="1" dirty="0"/>
+              <a:t>2</a:t>
+            </a:r>
+            <a:r>
+              <a:rPr kumimoji="1" lang="en-US" altLang="ja-JP" sz="1300" dirty="0"/>
+              <a:t> is set OPLL cartridge slot number</a:t>
+            </a:r>
+          </a:p>
+          <a:p>
+            <a:pPr lvl="1"/>
+            <a:r>
+              <a:rPr lang="en-US" altLang="ja-JP" sz="1300" b="1" dirty="0"/>
+              <a:t>3</a:t>
+            </a:r>
+            <a:r>
+              <a:rPr lang="ja-JP" altLang="en-US" sz="1300" b="1" dirty="0"/>
+              <a:t>～</a:t>
+            </a:r>
+            <a:r>
+              <a:rPr lang="en-US" altLang="ja-JP" sz="1300" b="1" dirty="0"/>
+              <a:t>9</a:t>
+            </a:r>
+            <a:r>
+              <a:rPr lang="en-US" altLang="ja-JP" sz="1300" dirty="0"/>
+              <a:t>	SCC-I: </a:t>
+            </a:r>
+            <a:r>
+              <a:rPr lang="en-US" altLang="ja-JP" sz="1300" i="1" dirty="0"/>
+              <a:t>(in preparation)</a:t>
+            </a:r>
+          </a:p>
+          <a:p>
+            <a:pPr lvl="1"/>
+            <a:r>
+              <a:rPr kumimoji="1" lang="en-US" altLang="ja-JP" sz="1300" b="1" dirty="0"/>
+              <a:t>10</a:t>
+            </a:r>
+            <a:r>
+              <a:rPr kumimoji="1" lang="ja-JP" altLang="en-US" sz="1300" b="1" dirty="0"/>
+              <a:t>～</a:t>
+            </a:r>
+            <a:r>
+              <a:rPr kumimoji="1" lang="en-US" altLang="ja-JP" sz="1300" b="1" dirty="0"/>
+              <a:t>11</a:t>
+            </a:r>
+            <a:r>
+              <a:rPr kumimoji="1" lang="en-US" altLang="ja-JP" sz="1300" dirty="0"/>
+              <a:t>	YMF262: </a:t>
+            </a:r>
+            <a:r>
+              <a:rPr kumimoji="1" lang="en-US" altLang="ja-JP" sz="1300" b="1" dirty="0"/>
+              <a:t>10</a:t>
+            </a:r>
+            <a:r>
+              <a:rPr kumimoji="1" lang="en-US" altLang="ja-JP" sz="1300" dirty="0"/>
+              <a:t> is write value to address of port L , </a:t>
+            </a:r>
+            <a:r>
+              <a:rPr kumimoji="1" lang="en-US" altLang="ja-JP" sz="1300" b="1" dirty="0"/>
+              <a:t>11</a:t>
+            </a:r>
+            <a:r>
+              <a:rPr kumimoji="1" lang="en-US" altLang="ja-JP" sz="1300" dirty="0"/>
+              <a:t> is Write value to address of port H</a:t>
+            </a:r>
+          </a:p>
+          <a:p>
+            <a:pPr lvl="1"/>
+            <a:r>
+              <a:rPr lang="en-US" altLang="ja-JP" sz="1300" b="1" dirty="0"/>
+              <a:t>(13),14	</a:t>
+            </a:r>
+            <a:r>
+              <a:rPr lang="en-US" altLang="ja-JP" sz="1300" dirty="0"/>
+              <a:t>OPM: </a:t>
+            </a:r>
+            <a:r>
+              <a:rPr kumimoji="1" lang="en-US" altLang="ja-JP" sz="1300" dirty="0"/>
+              <a:t>Write value to address</a:t>
+            </a:r>
+            <a:endParaRPr lang="en-US" altLang="ja-JP" sz="1300" dirty="0"/>
+          </a:p>
+          <a:p>
+            <a:pPr lvl="1"/>
+            <a:r>
+              <a:rPr kumimoji="1" lang="en-US" altLang="ja-JP" sz="1300" b="1" dirty="0"/>
+              <a:t>15</a:t>
+            </a:r>
+            <a:r>
+              <a:rPr kumimoji="1" lang="en-US" altLang="ja-JP" sz="1300" dirty="0"/>
+              <a:t>		DCSG:</a:t>
+            </a:r>
+            <a:r>
+              <a:rPr lang="en-US" altLang="ja-JP" sz="1300" dirty="0"/>
+              <a:t> </a:t>
+            </a:r>
+            <a:r>
+              <a:rPr kumimoji="1" lang="en-US" altLang="ja-JP" sz="1300" dirty="0"/>
+              <a:t>Write value to address</a:t>
+            </a:r>
+          </a:p>
+          <a:p>
+            <a:pPr lvl="1"/>
+            <a:r>
+              <a:rPr lang="en-US" altLang="ja-JP" sz="1300" b="1" dirty="0"/>
+              <a:t>16	</a:t>
+            </a:r>
+            <a:r>
+              <a:rPr lang="ja-JP" altLang="en-US" sz="1300" b="1" dirty="0"/>
+              <a:t>～</a:t>
+            </a:r>
+            <a:r>
+              <a:rPr lang="en-US" altLang="ja-JP" sz="1300" b="1" dirty="0"/>
+              <a:t>17</a:t>
+            </a:r>
+            <a:r>
+              <a:rPr lang="en-US" altLang="ja-JP" sz="1300" dirty="0"/>
+              <a:t>	OPNA/OPN2: </a:t>
+            </a:r>
+            <a:r>
+              <a:rPr kumimoji="1" lang="en-US" altLang="ja-JP" sz="1300" dirty="0"/>
+              <a:t>Write value to address</a:t>
+            </a:r>
+            <a:endParaRPr lang="en-US" altLang="ja-JP" sz="1300" dirty="0"/>
+          </a:p>
+          <a:p>
+            <a:pPr lvl="1"/>
+            <a:r>
+              <a:rPr kumimoji="1" lang="en-US" altLang="ja-JP" sz="1300" b="1" dirty="0"/>
+              <a:t>18</a:t>
+            </a:r>
+            <a:r>
+              <a:rPr kumimoji="1" lang="en-US" altLang="ja-JP" sz="1300" dirty="0"/>
+              <a:t>		OPN: Write value to address</a:t>
+            </a:r>
+          </a:p>
+        </p:txBody>
+      </p:sp>
+      <p:sp>
+        <p:nvSpPr>
+          <p:cNvPr id="4" name="スライド番号プレースホルダー 3">
+            <a:extLst>
+              <a:ext uri="{FF2B5EF4-FFF2-40B4-BE49-F238E27FC236}">
+                <a16:creationId xmlns:a16="http://schemas.microsoft.com/office/drawing/2014/main" id="{41B537D0-9FEF-4D05-A7D3-E1D123FAF757}"/>
+              </a:ext>
+            </a:extLst>
+          </p:cNvPr>
+          <p:cNvSpPr>
+            <a:spLocks noGrp="1"/>
+          </p:cNvSpPr>
+          <p:nvPr>
+            <p:ph type="sldNum" sz="quarter" idx="12"/>
+          </p:nvPr>
+        </p:nvSpPr>
+        <p:spPr/>
+        <p:txBody>
+          <a:bodyPr/>
+          <a:lstStyle/>
+          <a:p>
+            <a:fld id="{E27E2812-4560-4165-A7C7-9C013F955547}" type="slidenum">
+              <a:rPr kumimoji="1" lang="ja-JP" altLang="en-US" smtClean="0"/>
+              <a:t>40</a:t>
+            </a:fld>
+            <a:endParaRPr kumimoji="1" lang="ja-JP" altLang="en-US"/>
+          </a:p>
+        </p:txBody>
+      </p:sp>
+      <p:sp>
+        <p:nvSpPr>
+          <p:cNvPr id="5" name="正方形/長方形 4">
+            <a:extLst>
+              <a:ext uri="{FF2B5EF4-FFF2-40B4-BE49-F238E27FC236}">
+                <a16:creationId xmlns:a16="http://schemas.microsoft.com/office/drawing/2014/main" id="{14C188A7-5DF1-49E0-B695-B34E50334084}"/>
+              </a:ext>
+            </a:extLst>
+          </p:cNvPr>
+          <p:cNvSpPr/>
+          <p:nvPr/>
+        </p:nvSpPr>
+        <p:spPr>
+          <a:xfrm>
+            <a:off x="4375150" y="2939380"/>
+            <a:ext cx="1708150" cy="222735"/>
+          </a:xfrm>
+          <a:prstGeom prst="rect">
+            <a:avLst/>
+          </a:prstGeom>
+        </p:spPr>
+        <p:style>
+          <a:lnRef idx="2">
+            <a:schemeClr val="accent1">
+              <a:shade val="50000"/>
+            </a:schemeClr>
+          </a:lnRef>
+          <a:fillRef idx="1">
+            <a:schemeClr val="accent1"/>
+          </a:fillRef>
+          <a:effectRef idx="0">
+            <a:schemeClr val="accent1"/>
+          </a:effectRef>
+          <a:fontRef idx="minor">
+            <a:schemeClr val="lt1"/>
+          </a:fontRef>
+        </p:style>
+        <p:txBody>
+          <a:bodyPr rtlCol="0" anchor="ctr"/>
+          <a:lstStyle/>
+          <a:p>
+            <a:pPr algn="ctr"/>
+            <a:r>
+              <a:rPr kumimoji="1" lang="en-US" altLang="ja-JP" sz="1200" dirty="0"/>
+              <a:t>Address(Hi)</a:t>
+            </a:r>
+            <a:endParaRPr kumimoji="1" lang="ja-JP" altLang="en-US" sz="1200" dirty="0"/>
+          </a:p>
+        </p:txBody>
+      </p:sp>
+      <p:sp>
+        <p:nvSpPr>
+          <p:cNvPr id="6" name="正方形/長方形 5">
+            <a:extLst>
+              <a:ext uri="{FF2B5EF4-FFF2-40B4-BE49-F238E27FC236}">
+                <a16:creationId xmlns:a16="http://schemas.microsoft.com/office/drawing/2014/main" id="{9A836AD6-43CD-41A0-BB39-38FEE7E64D21}"/>
+              </a:ext>
+            </a:extLst>
+          </p:cNvPr>
+          <p:cNvSpPr/>
+          <p:nvPr/>
+        </p:nvSpPr>
+        <p:spPr>
+          <a:xfrm>
+            <a:off x="6083300" y="2939380"/>
+            <a:ext cx="1708150" cy="222735"/>
+          </a:xfrm>
+          <a:prstGeom prst="rect">
+            <a:avLst/>
+          </a:prstGeom>
+        </p:spPr>
+        <p:style>
+          <a:lnRef idx="2">
+            <a:schemeClr val="accent1">
+              <a:shade val="50000"/>
+            </a:schemeClr>
+          </a:lnRef>
+          <a:fillRef idx="1">
+            <a:schemeClr val="accent1"/>
+          </a:fillRef>
+          <a:effectRef idx="0">
+            <a:schemeClr val="accent1"/>
+          </a:effectRef>
+          <a:fontRef idx="minor">
+            <a:schemeClr val="lt1"/>
+          </a:fontRef>
+        </p:style>
+        <p:txBody>
+          <a:bodyPr rtlCol="0" anchor="ctr"/>
+          <a:lstStyle/>
+          <a:p>
+            <a:pPr algn="ctr"/>
+            <a:r>
+              <a:rPr kumimoji="1" lang="en-US" altLang="ja-JP" sz="1200" dirty="0"/>
+              <a:t>Address(Lo)</a:t>
+            </a:r>
+            <a:endParaRPr kumimoji="1" lang="ja-JP" altLang="en-US" sz="1200" dirty="0"/>
+          </a:p>
+        </p:txBody>
+      </p:sp>
+      <p:sp>
+        <p:nvSpPr>
+          <p:cNvPr id="7" name="正方形/長方形 6">
+            <a:extLst>
+              <a:ext uri="{FF2B5EF4-FFF2-40B4-BE49-F238E27FC236}">
+                <a16:creationId xmlns:a16="http://schemas.microsoft.com/office/drawing/2014/main" id="{8995F2AD-2F6C-47CD-A40C-DBA8DA5A1B2E}"/>
+              </a:ext>
+            </a:extLst>
+          </p:cNvPr>
+          <p:cNvSpPr/>
+          <p:nvPr/>
+        </p:nvSpPr>
+        <p:spPr>
+          <a:xfrm>
+            <a:off x="7791450" y="2939380"/>
+            <a:ext cx="1708150" cy="222735"/>
+          </a:xfrm>
+          <a:prstGeom prst="rect">
+            <a:avLst/>
+          </a:prstGeom>
+        </p:spPr>
+        <p:style>
+          <a:lnRef idx="2">
+            <a:schemeClr val="accent1">
+              <a:shade val="50000"/>
+            </a:schemeClr>
+          </a:lnRef>
+          <a:fillRef idx="1">
+            <a:schemeClr val="accent1"/>
+          </a:fillRef>
+          <a:effectRef idx="0">
+            <a:schemeClr val="accent1"/>
+          </a:effectRef>
+          <a:fontRef idx="minor">
+            <a:schemeClr val="lt1"/>
+          </a:fontRef>
+        </p:style>
+        <p:txBody>
+          <a:bodyPr rtlCol="0" anchor="ctr"/>
+          <a:lstStyle/>
+          <a:p>
+            <a:pPr algn="ctr"/>
+            <a:r>
+              <a:rPr kumimoji="1" lang="en-US" altLang="ja-JP" sz="1200" dirty="0"/>
+              <a:t>Value(Lo)</a:t>
+            </a:r>
+            <a:endParaRPr kumimoji="1" lang="ja-JP" altLang="en-US" sz="1200" dirty="0"/>
+          </a:p>
+        </p:txBody>
+      </p:sp>
+      <p:sp>
+        <p:nvSpPr>
+          <p:cNvPr id="8" name="正方形/長方形 7">
+            <a:extLst>
+              <a:ext uri="{FF2B5EF4-FFF2-40B4-BE49-F238E27FC236}">
+                <a16:creationId xmlns:a16="http://schemas.microsoft.com/office/drawing/2014/main" id="{9313BB50-A230-4338-BE1D-95514D3718E9}"/>
+              </a:ext>
+            </a:extLst>
+          </p:cNvPr>
+          <p:cNvSpPr/>
+          <p:nvPr/>
+        </p:nvSpPr>
+        <p:spPr>
+          <a:xfrm>
+            <a:off x="9499600" y="2939380"/>
+            <a:ext cx="1708150" cy="222735"/>
+          </a:xfrm>
+          <a:prstGeom prst="rect">
+            <a:avLst/>
+          </a:prstGeom>
+        </p:spPr>
+        <p:style>
+          <a:lnRef idx="2">
+            <a:schemeClr val="accent1">
+              <a:shade val="50000"/>
+            </a:schemeClr>
+          </a:lnRef>
+          <a:fillRef idx="1">
+            <a:schemeClr val="accent1"/>
+          </a:fillRef>
+          <a:effectRef idx="0">
+            <a:schemeClr val="accent1"/>
+          </a:effectRef>
+          <a:fontRef idx="minor">
+            <a:schemeClr val="lt1"/>
+          </a:fontRef>
+        </p:style>
+        <p:txBody>
+          <a:bodyPr rtlCol="0" anchor="ctr"/>
+          <a:lstStyle/>
+          <a:p>
+            <a:pPr algn="ctr"/>
+            <a:r>
+              <a:rPr kumimoji="1" lang="en-US" altLang="ja-JP" sz="1200" dirty="0"/>
+              <a:t>Value(Hi)</a:t>
+            </a:r>
+            <a:endParaRPr kumimoji="1" lang="ja-JP" altLang="en-US" sz="1200" dirty="0"/>
+          </a:p>
+        </p:txBody>
+      </p:sp>
+      <p:sp>
+        <p:nvSpPr>
+          <p:cNvPr id="9" name="正方形/長方形 8">
+            <a:extLst>
+              <a:ext uri="{FF2B5EF4-FFF2-40B4-BE49-F238E27FC236}">
+                <a16:creationId xmlns:a16="http://schemas.microsoft.com/office/drawing/2014/main" id="{7EC0E042-5B68-4AC1-A3B8-0096BC43A3D3}"/>
+              </a:ext>
+            </a:extLst>
+          </p:cNvPr>
+          <p:cNvSpPr/>
+          <p:nvPr/>
+        </p:nvSpPr>
+        <p:spPr>
+          <a:xfrm>
+            <a:off x="2659530" y="2939380"/>
+            <a:ext cx="1708150" cy="222735"/>
+          </a:xfrm>
+          <a:prstGeom prst="rect">
+            <a:avLst/>
+          </a:prstGeom>
+        </p:spPr>
+        <p:style>
+          <a:lnRef idx="2">
+            <a:schemeClr val="accent1">
+              <a:shade val="50000"/>
+            </a:schemeClr>
+          </a:lnRef>
+          <a:fillRef idx="1">
+            <a:schemeClr val="accent1"/>
+          </a:fillRef>
+          <a:effectRef idx="0">
+            <a:schemeClr val="accent1"/>
+          </a:effectRef>
+          <a:fontRef idx="minor">
+            <a:schemeClr val="lt1"/>
+          </a:fontRef>
+        </p:style>
+        <p:txBody>
+          <a:bodyPr rtlCol="0" anchor="ctr"/>
+          <a:lstStyle/>
+          <a:p>
+            <a:pPr algn="ctr"/>
+            <a:r>
+              <a:rPr kumimoji="1" lang="en-US" altLang="ja-JP" sz="1200" dirty="0"/>
+              <a:t>Type</a:t>
+            </a:r>
+            <a:endParaRPr kumimoji="1" lang="ja-JP" altLang="en-US" sz="1200" dirty="0"/>
+          </a:p>
+        </p:txBody>
+      </p:sp>
+      <p:sp>
+        <p:nvSpPr>
+          <p:cNvPr id="13" name="テキスト ボックス 12">
+            <a:extLst>
+              <a:ext uri="{FF2B5EF4-FFF2-40B4-BE49-F238E27FC236}">
+                <a16:creationId xmlns:a16="http://schemas.microsoft.com/office/drawing/2014/main" id="{73B945CA-DFD3-4EC8-BFEF-1FE7A0C4F447}"/>
+              </a:ext>
+            </a:extLst>
+          </p:cNvPr>
+          <p:cNvSpPr txBox="1"/>
+          <p:nvPr/>
+        </p:nvSpPr>
+        <p:spPr>
+          <a:xfrm>
+            <a:off x="2652060" y="2656516"/>
+            <a:ext cx="1683405" cy="276999"/>
+          </a:xfrm>
+          <a:prstGeom prst="rect">
+            <a:avLst/>
+          </a:prstGeom>
+          <a:noFill/>
+        </p:spPr>
+        <p:txBody>
+          <a:bodyPr wrap="square">
+            <a:spAutoFit/>
+          </a:bodyPr>
+          <a:lstStyle/>
+          <a:p>
+            <a:pPr algn="ctr"/>
+            <a:r>
+              <a:rPr kumimoji="1" lang="en-US" altLang="ja-JP" sz="1200" dirty="0"/>
+              <a:t>1</a:t>
+            </a:r>
+            <a:r>
+              <a:rPr kumimoji="1" lang="en-US" altLang="ja-JP" sz="1200" baseline="30000" dirty="0"/>
+              <a:t>st</a:t>
+            </a:r>
+            <a:r>
+              <a:rPr kumimoji="1" lang="en-US" altLang="ja-JP" sz="1200" dirty="0"/>
+              <a:t>(Start)</a:t>
+            </a:r>
+            <a:endParaRPr lang="ja-JP" altLang="en-US" sz="1200" dirty="0"/>
+          </a:p>
+        </p:txBody>
+      </p:sp>
+      <p:sp>
+        <p:nvSpPr>
+          <p:cNvPr id="14" name="テキスト ボックス 13">
+            <a:extLst>
+              <a:ext uri="{FF2B5EF4-FFF2-40B4-BE49-F238E27FC236}">
+                <a16:creationId xmlns:a16="http://schemas.microsoft.com/office/drawing/2014/main" id="{E376A897-0895-4876-A090-0E5925C0EDF6}"/>
+              </a:ext>
+            </a:extLst>
+          </p:cNvPr>
+          <p:cNvSpPr txBox="1"/>
+          <p:nvPr/>
+        </p:nvSpPr>
+        <p:spPr>
+          <a:xfrm>
+            <a:off x="4367680" y="2656516"/>
+            <a:ext cx="1722763" cy="276999"/>
+          </a:xfrm>
+          <a:prstGeom prst="rect">
+            <a:avLst/>
+          </a:prstGeom>
+          <a:noFill/>
+        </p:spPr>
+        <p:txBody>
+          <a:bodyPr wrap="square">
+            <a:spAutoFit/>
+          </a:bodyPr>
+          <a:lstStyle/>
+          <a:p>
+            <a:pPr algn="ctr"/>
+            <a:r>
+              <a:rPr kumimoji="1" lang="en-US" altLang="ja-JP" sz="1200" dirty="0"/>
+              <a:t>2</a:t>
+            </a:r>
+            <a:r>
+              <a:rPr kumimoji="1" lang="en-US" altLang="ja-JP" sz="1200" baseline="30000" dirty="0"/>
+              <a:t>nd</a:t>
+            </a:r>
+            <a:r>
+              <a:rPr kumimoji="1" lang="en-US" altLang="ja-JP" sz="1200" dirty="0"/>
+              <a:t>(</a:t>
+            </a:r>
+            <a:r>
+              <a:rPr kumimoji="1" lang="en-US" altLang="ja-JP" sz="1200" dirty="0" err="1"/>
+              <a:t>clk</a:t>
+            </a:r>
+            <a:r>
+              <a:rPr kumimoji="1" lang="en-US" altLang="ja-JP" sz="1200" dirty="0"/>
+              <a:t>=0)</a:t>
+            </a:r>
+            <a:endParaRPr lang="ja-JP" altLang="en-US" sz="1200" dirty="0"/>
+          </a:p>
+        </p:txBody>
+      </p:sp>
+      <p:sp>
+        <p:nvSpPr>
+          <p:cNvPr id="15" name="テキスト ボックス 14">
+            <a:extLst>
+              <a:ext uri="{FF2B5EF4-FFF2-40B4-BE49-F238E27FC236}">
+                <a16:creationId xmlns:a16="http://schemas.microsoft.com/office/drawing/2014/main" id="{E41C2A09-27C1-4E24-8B09-EEC4258A344C}"/>
+              </a:ext>
+            </a:extLst>
+          </p:cNvPr>
+          <p:cNvSpPr txBox="1"/>
+          <p:nvPr/>
+        </p:nvSpPr>
+        <p:spPr>
+          <a:xfrm>
+            <a:off x="6036472" y="2656516"/>
+            <a:ext cx="1747835" cy="276999"/>
+          </a:xfrm>
+          <a:prstGeom prst="rect">
+            <a:avLst/>
+          </a:prstGeom>
+          <a:noFill/>
+        </p:spPr>
+        <p:txBody>
+          <a:bodyPr wrap="square">
+            <a:spAutoFit/>
+          </a:bodyPr>
+          <a:lstStyle/>
+          <a:p>
+            <a:pPr algn="ctr"/>
+            <a:r>
+              <a:rPr kumimoji="1" lang="en-US" altLang="ja-JP" sz="1200" dirty="0"/>
+              <a:t>3</a:t>
+            </a:r>
+            <a:r>
+              <a:rPr kumimoji="1" lang="en-US" altLang="ja-JP" sz="1200" baseline="30000" dirty="0"/>
+              <a:t>rd</a:t>
+            </a:r>
+            <a:r>
+              <a:rPr kumimoji="1" lang="en-US" altLang="ja-JP" sz="1200" dirty="0"/>
+              <a:t>(</a:t>
+            </a:r>
+            <a:r>
+              <a:rPr kumimoji="1" lang="en-US" altLang="ja-JP" sz="1200" dirty="0" err="1"/>
+              <a:t>clk</a:t>
+            </a:r>
+            <a:r>
+              <a:rPr kumimoji="1" lang="en-US" altLang="ja-JP" sz="1200" dirty="0"/>
+              <a:t>=1)</a:t>
+            </a:r>
+            <a:endParaRPr lang="ja-JP" altLang="en-US" sz="1200" dirty="0"/>
+          </a:p>
+        </p:txBody>
+      </p:sp>
+      <p:sp>
+        <p:nvSpPr>
+          <p:cNvPr id="17" name="テキスト ボックス 16">
+            <a:extLst>
+              <a:ext uri="{FF2B5EF4-FFF2-40B4-BE49-F238E27FC236}">
+                <a16:creationId xmlns:a16="http://schemas.microsoft.com/office/drawing/2014/main" id="{E4BB9215-E1D9-4972-99D4-0DD1A11AB856}"/>
+              </a:ext>
+            </a:extLst>
+          </p:cNvPr>
+          <p:cNvSpPr txBox="1"/>
+          <p:nvPr/>
+        </p:nvSpPr>
+        <p:spPr>
+          <a:xfrm>
+            <a:off x="7759234" y="2656516"/>
+            <a:ext cx="1740365" cy="276999"/>
+          </a:xfrm>
+          <a:prstGeom prst="rect">
+            <a:avLst/>
+          </a:prstGeom>
+          <a:noFill/>
+        </p:spPr>
+        <p:txBody>
+          <a:bodyPr wrap="square">
+            <a:spAutoFit/>
+          </a:bodyPr>
+          <a:lstStyle/>
+          <a:p>
+            <a:pPr algn="ctr"/>
+            <a:r>
+              <a:rPr kumimoji="1" lang="en-US" altLang="ja-JP" sz="1200" dirty="0"/>
+              <a:t>4</a:t>
+            </a:r>
+            <a:r>
+              <a:rPr kumimoji="1" lang="en-US" altLang="ja-JP" sz="1200" baseline="30000" dirty="0"/>
+              <a:t>th</a:t>
+            </a:r>
+            <a:r>
+              <a:rPr kumimoji="1" lang="en-US" altLang="ja-JP" sz="1200" dirty="0"/>
+              <a:t>(</a:t>
+            </a:r>
+            <a:r>
+              <a:rPr kumimoji="1" lang="en-US" altLang="ja-JP" sz="1200" dirty="0" err="1"/>
+              <a:t>clk</a:t>
+            </a:r>
+            <a:r>
+              <a:rPr kumimoji="1" lang="en-US" altLang="ja-JP" sz="1200" dirty="0"/>
+              <a:t>=0)</a:t>
+            </a:r>
+            <a:endParaRPr lang="ja-JP" altLang="en-US" sz="1200" dirty="0"/>
+          </a:p>
+        </p:txBody>
+      </p:sp>
+      <p:sp>
+        <p:nvSpPr>
+          <p:cNvPr id="18" name="テキスト ボックス 17">
+            <a:extLst>
+              <a:ext uri="{FF2B5EF4-FFF2-40B4-BE49-F238E27FC236}">
+                <a16:creationId xmlns:a16="http://schemas.microsoft.com/office/drawing/2014/main" id="{1C8C0E69-E581-457D-A603-0232C967E7B8}"/>
+              </a:ext>
+            </a:extLst>
+          </p:cNvPr>
+          <p:cNvSpPr txBox="1"/>
+          <p:nvPr/>
+        </p:nvSpPr>
+        <p:spPr>
+          <a:xfrm>
+            <a:off x="9492456" y="2656516"/>
+            <a:ext cx="1701007" cy="276999"/>
+          </a:xfrm>
+          <a:prstGeom prst="rect">
+            <a:avLst/>
+          </a:prstGeom>
+          <a:noFill/>
+        </p:spPr>
+        <p:txBody>
+          <a:bodyPr wrap="square">
+            <a:spAutoFit/>
+          </a:bodyPr>
+          <a:lstStyle/>
+          <a:p>
+            <a:pPr algn="ctr"/>
+            <a:r>
+              <a:rPr kumimoji="1" lang="en-US" altLang="ja-JP" sz="1200" dirty="0"/>
+              <a:t>5</a:t>
+            </a:r>
+            <a:r>
+              <a:rPr kumimoji="1" lang="en-US" altLang="ja-JP" sz="1200" baseline="30000" dirty="0"/>
+              <a:t>th</a:t>
+            </a:r>
+            <a:r>
+              <a:rPr kumimoji="1" lang="en-US" altLang="ja-JP" sz="1200" dirty="0"/>
+              <a:t>(</a:t>
+            </a:r>
+            <a:r>
+              <a:rPr kumimoji="1" lang="en-US" altLang="ja-JP" sz="1200" dirty="0" err="1"/>
+              <a:t>clk</a:t>
+            </a:r>
+            <a:r>
+              <a:rPr kumimoji="1" lang="en-US" altLang="ja-JP" sz="1200" dirty="0"/>
+              <a:t>=1)</a:t>
+            </a:r>
+            <a:endParaRPr lang="ja-JP" altLang="en-US" sz="1200" dirty="0"/>
+          </a:p>
+        </p:txBody>
+      </p:sp>
+      <p:sp>
+        <p:nvSpPr>
+          <p:cNvPr id="19" name="正方形/長方形 18">
+            <a:extLst>
+              <a:ext uri="{FF2B5EF4-FFF2-40B4-BE49-F238E27FC236}">
+                <a16:creationId xmlns:a16="http://schemas.microsoft.com/office/drawing/2014/main" id="{018E0670-19CB-4FEC-905B-D16CD09F78A3}"/>
+              </a:ext>
+            </a:extLst>
+          </p:cNvPr>
+          <p:cNvSpPr/>
+          <p:nvPr/>
+        </p:nvSpPr>
+        <p:spPr>
+          <a:xfrm>
+            <a:off x="3685268" y="3709230"/>
+            <a:ext cx="931974" cy="222735"/>
+          </a:xfrm>
+          <a:prstGeom prst="rect">
+            <a:avLst/>
+          </a:prstGeom>
+          <a:solidFill>
+            <a:schemeClr val="bg1"/>
+          </a:solidFill>
+        </p:spPr>
+        <p:style>
+          <a:lnRef idx="2">
+            <a:schemeClr val="accent1">
+              <a:shade val="50000"/>
+            </a:schemeClr>
+          </a:lnRef>
+          <a:fillRef idx="1">
+            <a:schemeClr val="accent1"/>
+          </a:fillRef>
+          <a:effectRef idx="0">
+            <a:schemeClr val="accent1"/>
+          </a:effectRef>
+          <a:fontRef idx="minor">
+            <a:schemeClr val="lt1"/>
+          </a:fontRef>
+        </p:style>
+        <p:txBody>
+          <a:bodyPr rtlCol="0" anchor="ctr"/>
+          <a:lstStyle/>
+          <a:p>
+            <a:pPr algn="ctr"/>
+            <a:endParaRPr kumimoji="1" lang="ja-JP" altLang="en-US" sz="1200" dirty="0"/>
+          </a:p>
+        </p:txBody>
+      </p:sp>
+      <p:sp>
+        <p:nvSpPr>
+          <p:cNvPr id="20" name="正方形/長方形 19">
+            <a:extLst>
+              <a:ext uri="{FF2B5EF4-FFF2-40B4-BE49-F238E27FC236}">
+                <a16:creationId xmlns:a16="http://schemas.microsoft.com/office/drawing/2014/main" id="{BEBFB75A-7BE5-4C4A-BC77-A5EC82CAA5B5}"/>
+              </a:ext>
+            </a:extLst>
+          </p:cNvPr>
+          <p:cNvSpPr/>
+          <p:nvPr/>
+        </p:nvSpPr>
+        <p:spPr>
+          <a:xfrm>
+            <a:off x="4616450" y="3709230"/>
+            <a:ext cx="931974" cy="222735"/>
+          </a:xfrm>
+          <a:prstGeom prst="rect">
+            <a:avLst/>
+          </a:prstGeom>
+          <a:solidFill>
+            <a:schemeClr val="bg1"/>
+          </a:solidFill>
+        </p:spPr>
+        <p:style>
+          <a:lnRef idx="2">
+            <a:schemeClr val="accent1">
+              <a:shade val="50000"/>
+            </a:schemeClr>
+          </a:lnRef>
+          <a:fillRef idx="1">
+            <a:schemeClr val="accent1"/>
+          </a:fillRef>
+          <a:effectRef idx="0">
+            <a:schemeClr val="accent1"/>
+          </a:effectRef>
+          <a:fontRef idx="minor">
+            <a:schemeClr val="lt1"/>
+          </a:fontRef>
+        </p:style>
+        <p:txBody>
+          <a:bodyPr rtlCol="0" anchor="ctr"/>
+          <a:lstStyle/>
+          <a:p>
+            <a:pPr algn="ctr"/>
+            <a:endParaRPr kumimoji="1" lang="ja-JP" altLang="en-US" sz="1200" dirty="0"/>
+          </a:p>
+        </p:txBody>
+      </p:sp>
+      <p:sp>
+        <p:nvSpPr>
+          <p:cNvPr id="21" name="正方形/長方形 20">
+            <a:extLst>
+              <a:ext uri="{FF2B5EF4-FFF2-40B4-BE49-F238E27FC236}">
+                <a16:creationId xmlns:a16="http://schemas.microsoft.com/office/drawing/2014/main" id="{8ADC7990-8532-4A8E-9959-F9B539090536}"/>
+              </a:ext>
+            </a:extLst>
+          </p:cNvPr>
+          <p:cNvSpPr/>
+          <p:nvPr/>
+        </p:nvSpPr>
+        <p:spPr>
+          <a:xfrm>
+            <a:off x="5547632" y="3709230"/>
+            <a:ext cx="931974" cy="222735"/>
+          </a:xfrm>
+          <a:prstGeom prst="rect">
+            <a:avLst/>
+          </a:prstGeom>
+        </p:spPr>
+        <p:style>
+          <a:lnRef idx="2">
+            <a:schemeClr val="accent1">
+              <a:shade val="50000"/>
+            </a:schemeClr>
+          </a:lnRef>
+          <a:fillRef idx="1">
+            <a:schemeClr val="accent1"/>
+          </a:fillRef>
+          <a:effectRef idx="0">
+            <a:schemeClr val="accent1"/>
+          </a:effectRef>
+          <a:fontRef idx="minor">
+            <a:schemeClr val="lt1"/>
+          </a:fontRef>
+        </p:style>
+        <p:txBody>
+          <a:bodyPr rtlCol="0" anchor="ctr"/>
+          <a:lstStyle/>
+          <a:p>
+            <a:pPr algn="ctr"/>
+            <a:r>
+              <a:rPr lang="en-US" altLang="ja-JP" sz="1200" dirty="0"/>
+              <a:t>1</a:t>
+            </a:r>
+            <a:endParaRPr kumimoji="1" lang="ja-JP" altLang="en-US" sz="1200" dirty="0"/>
+          </a:p>
+        </p:txBody>
+      </p:sp>
+      <p:sp>
+        <p:nvSpPr>
+          <p:cNvPr id="22" name="正方形/長方形 21">
+            <a:extLst>
+              <a:ext uri="{FF2B5EF4-FFF2-40B4-BE49-F238E27FC236}">
+                <a16:creationId xmlns:a16="http://schemas.microsoft.com/office/drawing/2014/main" id="{DD491D66-A1B7-434C-BD3F-FBD7705F1345}"/>
+              </a:ext>
+            </a:extLst>
+          </p:cNvPr>
+          <p:cNvSpPr/>
+          <p:nvPr/>
+        </p:nvSpPr>
+        <p:spPr>
+          <a:xfrm>
+            <a:off x="6478814" y="3709230"/>
+            <a:ext cx="931974" cy="222735"/>
+          </a:xfrm>
+          <a:prstGeom prst="rect">
+            <a:avLst/>
+          </a:prstGeom>
+        </p:spPr>
+        <p:style>
+          <a:lnRef idx="2">
+            <a:schemeClr val="accent1">
+              <a:shade val="50000"/>
+            </a:schemeClr>
+          </a:lnRef>
+          <a:fillRef idx="1">
+            <a:schemeClr val="accent1"/>
+          </a:fillRef>
+          <a:effectRef idx="0">
+            <a:schemeClr val="accent1"/>
+          </a:effectRef>
+          <a:fontRef idx="minor">
+            <a:schemeClr val="lt1"/>
+          </a:fontRef>
+        </p:style>
+        <p:txBody>
+          <a:bodyPr rtlCol="0" anchor="ctr"/>
+          <a:lstStyle/>
+          <a:p>
+            <a:pPr algn="ctr"/>
+            <a:r>
+              <a:rPr kumimoji="1" lang="en-US" altLang="ja-JP" sz="1200" dirty="0"/>
+              <a:t>Type</a:t>
+            </a:r>
+            <a:endParaRPr kumimoji="1" lang="ja-JP" altLang="en-US" sz="1200" dirty="0"/>
+          </a:p>
+        </p:txBody>
+      </p:sp>
+      <p:sp>
+        <p:nvSpPr>
+          <p:cNvPr id="23" name="正方形/長方形 22">
+            <a:extLst>
+              <a:ext uri="{FF2B5EF4-FFF2-40B4-BE49-F238E27FC236}">
+                <a16:creationId xmlns:a16="http://schemas.microsoft.com/office/drawing/2014/main" id="{1359E0B5-0CAD-4866-AA40-159677B32AF5}"/>
+              </a:ext>
+            </a:extLst>
+          </p:cNvPr>
+          <p:cNvSpPr/>
+          <p:nvPr/>
+        </p:nvSpPr>
+        <p:spPr>
+          <a:xfrm>
+            <a:off x="7409996" y="3709230"/>
+            <a:ext cx="931974" cy="222735"/>
+          </a:xfrm>
+          <a:prstGeom prst="rect">
+            <a:avLst/>
+          </a:prstGeom>
+        </p:spPr>
+        <p:style>
+          <a:lnRef idx="2">
+            <a:schemeClr val="accent1">
+              <a:shade val="50000"/>
+            </a:schemeClr>
+          </a:lnRef>
+          <a:fillRef idx="1">
+            <a:schemeClr val="accent1"/>
+          </a:fillRef>
+          <a:effectRef idx="0">
+            <a:schemeClr val="accent1"/>
+          </a:effectRef>
+          <a:fontRef idx="minor">
+            <a:schemeClr val="lt1"/>
+          </a:fontRef>
+        </p:style>
+        <p:txBody>
+          <a:bodyPr rtlCol="0" anchor="ctr"/>
+          <a:lstStyle/>
+          <a:p>
+            <a:pPr algn="ctr"/>
+            <a:r>
+              <a:rPr kumimoji="1" lang="en-US" altLang="ja-JP" sz="1200" dirty="0"/>
+              <a:t>Type</a:t>
+            </a:r>
+            <a:endParaRPr kumimoji="1" lang="ja-JP" altLang="en-US" sz="1200" dirty="0"/>
+          </a:p>
+        </p:txBody>
+      </p:sp>
+      <p:sp>
+        <p:nvSpPr>
+          <p:cNvPr id="24" name="正方形/長方形 23">
+            <a:extLst>
+              <a:ext uri="{FF2B5EF4-FFF2-40B4-BE49-F238E27FC236}">
+                <a16:creationId xmlns:a16="http://schemas.microsoft.com/office/drawing/2014/main" id="{5BAA1FF0-14D8-493C-8D48-DBE39F6F9BDC}"/>
+              </a:ext>
+            </a:extLst>
+          </p:cNvPr>
+          <p:cNvSpPr/>
+          <p:nvPr/>
+        </p:nvSpPr>
+        <p:spPr>
+          <a:xfrm>
+            <a:off x="8341178" y="3709230"/>
+            <a:ext cx="931974" cy="222735"/>
+          </a:xfrm>
+          <a:prstGeom prst="rect">
+            <a:avLst/>
+          </a:prstGeom>
+        </p:spPr>
+        <p:style>
+          <a:lnRef idx="2">
+            <a:schemeClr val="accent1">
+              <a:shade val="50000"/>
+            </a:schemeClr>
+          </a:lnRef>
+          <a:fillRef idx="1">
+            <a:schemeClr val="accent1"/>
+          </a:fillRef>
+          <a:effectRef idx="0">
+            <a:schemeClr val="accent1"/>
+          </a:effectRef>
+          <a:fontRef idx="minor">
+            <a:schemeClr val="lt1"/>
+          </a:fontRef>
+        </p:style>
+        <p:txBody>
+          <a:bodyPr rtlCol="0" anchor="ctr"/>
+          <a:lstStyle/>
+          <a:p>
+            <a:pPr algn="ctr"/>
+            <a:r>
+              <a:rPr kumimoji="1" lang="en-US" altLang="ja-JP" sz="1200" dirty="0"/>
+              <a:t>Type</a:t>
+            </a:r>
+            <a:endParaRPr kumimoji="1" lang="ja-JP" altLang="en-US" sz="1200" dirty="0"/>
+          </a:p>
+        </p:txBody>
+      </p:sp>
+      <p:sp>
+        <p:nvSpPr>
+          <p:cNvPr id="25" name="正方形/長方形 24">
+            <a:extLst>
+              <a:ext uri="{FF2B5EF4-FFF2-40B4-BE49-F238E27FC236}">
+                <a16:creationId xmlns:a16="http://schemas.microsoft.com/office/drawing/2014/main" id="{688536EE-90DA-439F-8999-D34D7BF5BE7A}"/>
+              </a:ext>
+            </a:extLst>
+          </p:cNvPr>
+          <p:cNvSpPr/>
+          <p:nvPr/>
+        </p:nvSpPr>
+        <p:spPr>
+          <a:xfrm>
+            <a:off x="9272360" y="3709230"/>
+            <a:ext cx="931974" cy="222735"/>
+          </a:xfrm>
+          <a:prstGeom prst="rect">
+            <a:avLst/>
+          </a:prstGeom>
+        </p:spPr>
+        <p:style>
+          <a:lnRef idx="2">
+            <a:schemeClr val="accent1">
+              <a:shade val="50000"/>
+            </a:schemeClr>
+          </a:lnRef>
+          <a:fillRef idx="1">
+            <a:schemeClr val="accent1"/>
+          </a:fillRef>
+          <a:effectRef idx="0">
+            <a:schemeClr val="accent1"/>
+          </a:effectRef>
+          <a:fontRef idx="minor">
+            <a:schemeClr val="lt1"/>
+          </a:fontRef>
+        </p:style>
+        <p:txBody>
+          <a:bodyPr rtlCol="0" anchor="ctr"/>
+          <a:lstStyle/>
+          <a:p>
+            <a:pPr algn="ctr"/>
+            <a:r>
+              <a:rPr kumimoji="1" lang="en-US" altLang="ja-JP" sz="1200" dirty="0"/>
+              <a:t>Type</a:t>
+            </a:r>
+            <a:endParaRPr kumimoji="1" lang="ja-JP" altLang="en-US" sz="1200" dirty="0"/>
+          </a:p>
+        </p:txBody>
+      </p:sp>
+      <p:sp>
+        <p:nvSpPr>
+          <p:cNvPr id="26" name="正方形/長方形 25">
+            <a:extLst>
+              <a:ext uri="{FF2B5EF4-FFF2-40B4-BE49-F238E27FC236}">
+                <a16:creationId xmlns:a16="http://schemas.microsoft.com/office/drawing/2014/main" id="{099CD03A-8FEB-4B28-9F93-137518257087}"/>
+              </a:ext>
+            </a:extLst>
+          </p:cNvPr>
+          <p:cNvSpPr/>
+          <p:nvPr/>
+        </p:nvSpPr>
+        <p:spPr>
+          <a:xfrm>
+            <a:off x="10203544" y="3709230"/>
+            <a:ext cx="931974" cy="222735"/>
+          </a:xfrm>
+          <a:prstGeom prst="rect">
+            <a:avLst/>
+          </a:prstGeom>
+        </p:spPr>
+        <p:style>
+          <a:lnRef idx="2">
+            <a:schemeClr val="accent1">
+              <a:shade val="50000"/>
+            </a:schemeClr>
+          </a:lnRef>
+          <a:fillRef idx="1">
+            <a:schemeClr val="accent1"/>
+          </a:fillRef>
+          <a:effectRef idx="0">
+            <a:schemeClr val="accent1"/>
+          </a:effectRef>
+          <a:fontRef idx="minor">
+            <a:schemeClr val="lt1"/>
+          </a:fontRef>
+        </p:style>
+        <p:txBody>
+          <a:bodyPr rtlCol="0" anchor="ctr"/>
+          <a:lstStyle/>
+          <a:p>
+            <a:pPr algn="ctr"/>
+            <a:r>
+              <a:rPr kumimoji="1" lang="en-US" altLang="ja-JP" sz="1200" dirty="0"/>
+              <a:t>Type</a:t>
+            </a:r>
+            <a:endParaRPr kumimoji="1" lang="ja-JP" altLang="en-US" sz="1200" dirty="0"/>
+          </a:p>
+        </p:txBody>
+      </p:sp>
+      <p:sp>
+        <p:nvSpPr>
+          <p:cNvPr id="29" name="テキスト ボックス 28">
+            <a:extLst>
+              <a:ext uri="{FF2B5EF4-FFF2-40B4-BE49-F238E27FC236}">
+                <a16:creationId xmlns:a16="http://schemas.microsoft.com/office/drawing/2014/main" id="{CEEE2D45-32F1-4CE4-82E8-AEC2F048D50D}"/>
+              </a:ext>
+            </a:extLst>
+          </p:cNvPr>
+          <p:cNvSpPr txBox="1"/>
+          <p:nvPr/>
+        </p:nvSpPr>
+        <p:spPr>
+          <a:xfrm>
+            <a:off x="10453688" y="4143046"/>
+            <a:ext cx="754062" cy="276999"/>
+          </a:xfrm>
+          <a:prstGeom prst="rect">
+            <a:avLst/>
+          </a:prstGeom>
+          <a:noFill/>
+        </p:spPr>
+        <p:txBody>
+          <a:bodyPr wrap="square">
+            <a:spAutoFit/>
+          </a:bodyPr>
+          <a:lstStyle/>
+          <a:p>
+            <a:r>
+              <a:rPr kumimoji="1" lang="en-US" altLang="ja-JP" sz="1200" dirty="0"/>
+              <a:t>LSB</a:t>
+            </a:r>
+            <a:endParaRPr lang="ja-JP" altLang="en-US" sz="1200" dirty="0"/>
+          </a:p>
+        </p:txBody>
+      </p:sp>
+      <p:sp>
+        <p:nvSpPr>
+          <p:cNvPr id="30" name="テキスト ボックス 29">
+            <a:extLst>
+              <a:ext uri="{FF2B5EF4-FFF2-40B4-BE49-F238E27FC236}">
+                <a16:creationId xmlns:a16="http://schemas.microsoft.com/office/drawing/2014/main" id="{7FD9F990-A8F4-4554-9A22-4F38AAE16B57}"/>
+              </a:ext>
+            </a:extLst>
+          </p:cNvPr>
+          <p:cNvSpPr txBox="1"/>
+          <p:nvPr/>
+        </p:nvSpPr>
+        <p:spPr>
+          <a:xfrm>
+            <a:off x="10202750" y="3324567"/>
+            <a:ext cx="931974" cy="276999"/>
+          </a:xfrm>
+          <a:prstGeom prst="rect">
+            <a:avLst/>
+          </a:prstGeom>
+          <a:noFill/>
+        </p:spPr>
+        <p:txBody>
+          <a:bodyPr wrap="square">
+            <a:spAutoFit/>
+          </a:bodyPr>
+          <a:lstStyle/>
+          <a:p>
+            <a:pPr algn="ctr"/>
+            <a:r>
+              <a:rPr kumimoji="1" lang="en-US" altLang="ja-JP" sz="1200" dirty="0"/>
+              <a:t>0</a:t>
+            </a:r>
+            <a:endParaRPr lang="ja-JP" altLang="en-US" sz="1200" dirty="0"/>
+          </a:p>
+        </p:txBody>
+      </p:sp>
+      <p:sp>
+        <p:nvSpPr>
+          <p:cNvPr id="31" name="テキスト ボックス 30">
+            <a:extLst>
+              <a:ext uri="{FF2B5EF4-FFF2-40B4-BE49-F238E27FC236}">
+                <a16:creationId xmlns:a16="http://schemas.microsoft.com/office/drawing/2014/main" id="{4FBB096C-7BE9-4853-808B-4AF85A43FA90}"/>
+              </a:ext>
+            </a:extLst>
+          </p:cNvPr>
+          <p:cNvSpPr txBox="1"/>
+          <p:nvPr/>
+        </p:nvSpPr>
+        <p:spPr>
+          <a:xfrm>
+            <a:off x="3701200" y="4141429"/>
+            <a:ext cx="754062" cy="276999"/>
+          </a:xfrm>
+          <a:prstGeom prst="rect">
+            <a:avLst/>
+          </a:prstGeom>
+          <a:noFill/>
+        </p:spPr>
+        <p:txBody>
+          <a:bodyPr wrap="square">
+            <a:spAutoFit/>
+          </a:bodyPr>
+          <a:lstStyle/>
+          <a:p>
+            <a:r>
+              <a:rPr kumimoji="1" lang="en-US" altLang="ja-JP" sz="1200" dirty="0"/>
+              <a:t>MSB</a:t>
+            </a:r>
+            <a:endParaRPr lang="ja-JP" altLang="en-US" sz="1200" dirty="0"/>
+          </a:p>
+        </p:txBody>
+      </p:sp>
+      <p:sp>
+        <p:nvSpPr>
+          <p:cNvPr id="32" name="テキスト ボックス 31">
+            <a:extLst>
+              <a:ext uri="{FF2B5EF4-FFF2-40B4-BE49-F238E27FC236}">
+                <a16:creationId xmlns:a16="http://schemas.microsoft.com/office/drawing/2014/main" id="{5E4FF8C6-04E3-4BBB-80FF-BF99A9A324F7}"/>
+              </a:ext>
+            </a:extLst>
+          </p:cNvPr>
+          <p:cNvSpPr txBox="1"/>
+          <p:nvPr/>
+        </p:nvSpPr>
+        <p:spPr>
+          <a:xfrm>
+            <a:off x="3683682" y="3456431"/>
+            <a:ext cx="931974" cy="276999"/>
+          </a:xfrm>
+          <a:prstGeom prst="rect">
+            <a:avLst/>
+          </a:prstGeom>
+          <a:noFill/>
+        </p:spPr>
+        <p:txBody>
+          <a:bodyPr wrap="square">
+            <a:spAutoFit/>
+          </a:bodyPr>
+          <a:lstStyle/>
+          <a:p>
+            <a:pPr algn="ctr"/>
+            <a:r>
+              <a:rPr kumimoji="1" lang="en-US" altLang="ja-JP" sz="1200" dirty="0"/>
+              <a:t>7</a:t>
+            </a:r>
+            <a:endParaRPr lang="ja-JP" altLang="en-US" sz="1200" dirty="0"/>
+          </a:p>
+        </p:txBody>
+      </p:sp>
+      <p:sp>
+        <p:nvSpPr>
+          <p:cNvPr id="10" name="正方形/長方形 9">
+            <a:extLst>
+              <a:ext uri="{FF2B5EF4-FFF2-40B4-BE49-F238E27FC236}">
+                <a16:creationId xmlns:a16="http://schemas.microsoft.com/office/drawing/2014/main" id="{478506DE-C4A6-BEEE-F149-2B4EDB9489BC}"/>
+              </a:ext>
+            </a:extLst>
+          </p:cNvPr>
+          <p:cNvSpPr/>
+          <p:nvPr/>
+        </p:nvSpPr>
+        <p:spPr>
+          <a:xfrm>
+            <a:off x="3685268" y="3925946"/>
+            <a:ext cx="931974" cy="222735"/>
+          </a:xfrm>
+          <a:prstGeom prst="rect">
+            <a:avLst/>
+          </a:prstGeom>
+          <a:solidFill>
+            <a:schemeClr val="bg1"/>
+          </a:solidFill>
+        </p:spPr>
+        <p:style>
+          <a:lnRef idx="2">
+            <a:schemeClr val="accent1">
+              <a:shade val="50000"/>
+            </a:schemeClr>
+          </a:lnRef>
+          <a:fillRef idx="1">
+            <a:schemeClr val="accent1"/>
+          </a:fillRef>
+          <a:effectRef idx="0">
+            <a:schemeClr val="accent1"/>
+          </a:effectRef>
+          <a:fontRef idx="minor">
+            <a:schemeClr val="lt1"/>
+          </a:fontRef>
+        </p:style>
+        <p:txBody>
+          <a:bodyPr rtlCol="0" anchor="ctr"/>
+          <a:lstStyle/>
+          <a:p>
+            <a:pPr algn="ctr"/>
+            <a:endParaRPr kumimoji="1" lang="ja-JP" altLang="en-US" sz="1200" dirty="0"/>
+          </a:p>
+        </p:txBody>
+      </p:sp>
+      <p:sp>
+        <p:nvSpPr>
+          <p:cNvPr id="11" name="正方形/長方形 10">
+            <a:extLst>
+              <a:ext uri="{FF2B5EF4-FFF2-40B4-BE49-F238E27FC236}">
+                <a16:creationId xmlns:a16="http://schemas.microsoft.com/office/drawing/2014/main" id="{5DE6008D-A295-8224-A8DB-60A78F5305CF}"/>
+              </a:ext>
+            </a:extLst>
+          </p:cNvPr>
+          <p:cNvSpPr/>
+          <p:nvPr/>
+        </p:nvSpPr>
+        <p:spPr>
+          <a:xfrm>
+            <a:off x="4616450" y="3925946"/>
+            <a:ext cx="931974" cy="222735"/>
+          </a:xfrm>
+          <a:prstGeom prst="rect">
+            <a:avLst/>
+          </a:prstGeom>
+          <a:solidFill>
+            <a:schemeClr val="bg1"/>
+          </a:solidFill>
+        </p:spPr>
+        <p:style>
+          <a:lnRef idx="2">
+            <a:schemeClr val="accent1">
+              <a:shade val="50000"/>
+            </a:schemeClr>
+          </a:lnRef>
+          <a:fillRef idx="1">
+            <a:schemeClr val="accent1"/>
+          </a:fillRef>
+          <a:effectRef idx="0">
+            <a:schemeClr val="accent1"/>
+          </a:effectRef>
+          <a:fontRef idx="minor">
+            <a:schemeClr val="lt1"/>
+          </a:fontRef>
+        </p:style>
+        <p:txBody>
+          <a:bodyPr rtlCol="0" anchor="ctr"/>
+          <a:lstStyle/>
+          <a:p>
+            <a:pPr algn="ctr"/>
+            <a:endParaRPr kumimoji="1" lang="ja-JP" altLang="en-US" sz="1200" dirty="0"/>
+          </a:p>
+        </p:txBody>
+      </p:sp>
+      <p:sp>
+        <p:nvSpPr>
+          <p:cNvPr id="12" name="正方形/長方形 11">
+            <a:extLst>
+              <a:ext uri="{FF2B5EF4-FFF2-40B4-BE49-F238E27FC236}">
+                <a16:creationId xmlns:a16="http://schemas.microsoft.com/office/drawing/2014/main" id="{A9D8EE6D-3028-80A4-83BC-22A0166138C8}"/>
+              </a:ext>
+            </a:extLst>
+          </p:cNvPr>
+          <p:cNvSpPr/>
+          <p:nvPr/>
+        </p:nvSpPr>
+        <p:spPr>
+          <a:xfrm>
+            <a:off x="5547632" y="3925946"/>
+            <a:ext cx="931974" cy="222735"/>
+          </a:xfrm>
+          <a:prstGeom prst="rect">
+            <a:avLst/>
+          </a:prstGeom>
+        </p:spPr>
+        <p:style>
+          <a:lnRef idx="2">
+            <a:schemeClr val="accent1">
+              <a:shade val="50000"/>
+            </a:schemeClr>
+          </a:lnRef>
+          <a:fillRef idx="1">
+            <a:schemeClr val="accent1"/>
+          </a:fillRef>
+          <a:effectRef idx="0">
+            <a:schemeClr val="accent1"/>
+          </a:effectRef>
+          <a:fontRef idx="minor">
+            <a:schemeClr val="lt1"/>
+          </a:fontRef>
+        </p:style>
+        <p:txBody>
+          <a:bodyPr rtlCol="0" anchor="ctr"/>
+          <a:lstStyle/>
+          <a:p>
+            <a:pPr algn="ctr"/>
+            <a:r>
+              <a:rPr lang="en-US" altLang="ja-JP" sz="1200" dirty="0"/>
+              <a:t>0</a:t>
+            </a:r>
+            <a:endParaRPr kumimoji="1" lang="ja-JP" altLang="en-US" sz="1200" dirty="0"/>
+          </a:p>
+        </p:txBody>
+      </p:sp>
+      <p:sp>
+        <p:nvSpPr>
+          <p:cNvPr id="16" name="正方形/長方形 15">
+            <a:extLst>
+              <a:ext uri="{FF2B5EF4-FFF2-40B4-BE49-F238E27FC236}">
+                <a16:creationId xmlns:a16="http://schemas.microsoft.com/office/drawing/2014/main" id="{66E10A75-D78B-6248-F89D-3EFF22F74953}"/>
+              </a:ext>
+            </a:extLst>
+          </p:cNvPr>
+          <p:cNvSpPr/>
+          <p:nvPr/>
+        </p:nvSpPr>
+        <p:spPr>
+          <a:xfrm>
+            <a:off x="6478814" y="3925946"/>
+            <a:ext cx="931974" cy="222735"/>
+          </a:xfrm>
+          <a:prstGeom prst="rect">
+            <a:avLst/>
+          </a:prstGeom>
+        </p:spPr>
+        <p:style>
+          <a:lnRef idx="2">
+            <a:schemeClr val="accent1">
+              <a:shade val="50000"/>
+            </a:schemeClr>
+          </a:lnRef>
+          <a:fillRef idx="1">
+            <a:schemeClr val="accent1"/>
+          </a:fillRef>
+          <a:effectRef idx="0">
+            <a:schemeClr val="accent1"/>
+          </a:effectRef>
+          <a:fontRef idx="minor">
+            <a:schemeClr val="lt1"/>
+          </a:fontRef>
+        </p:style>
+        <p:txBody>
+          <a:bodyPr rtlCol="0" anchor="ctr"/>
+          <a:lstStyle/>
+          <a:p>
+            <a:pPr algn="ctr"/>
+            <a:r>
+              <a:rPr kumimoji="1" lang="en-US" altLang="ja-JP" sz="1200" dirty="0" err="1"/>
+              <a:t>clk</a:t>
+            </a:r>
+            <a:endParaRPr kumimoji="1" lang="ja-JP" altLang="en-US" sz="1200" dirty="0"/>
+          </a:p>
+        </p:txBody>
+      </p:sp>
+      <p:sp>
+        <p:nvSpPr>
+          <p:cNvPr id="27" name="正方形/長方形 26">
+            <a:extLst>
+              <a:ext uri="{FF2B5EF4-FFF2-40B4-BE49-F238E27FC236}">
+                <a16:creationId xmlns:a16="http://schemas.microsoft.com/office/drawing/2014/main" id="{A0668D44-ED14-2275-D91F-33F330C9616E}"/>
+              </a:ext>
+            </a:extLst>
+          </p:cNvPr>
+          <p:cNvSpPr/>
+          <p:nvPr/>
+        </p:nvSpPr>
+        <p:spPr>
+          <a:xfrm>
+            <a:off x="7409996" y="3925946"/>
+            <a:ext cx="931974" cy="222735"/>
+          </a:xfrm>
+          <a:prstGeom prst="rect">
+            <a:avLst/>
+          </a:prstGeom>
+        </p:spPr>
+        <p:style>
+          <a:lnRef idx="2">
+            <a:schemeClr val="accent1">
+              <a:shade val="50000"/>
+            </a:schemeClr>
+          </a:lnRef>
+          <a:fillRef idx="1">
+            <a:schemeClr val="accent1"/>
+          </a:fillRef>
+          <a:effectRef idx="0">
+            <a:schemeClr val="accent1"/>
+          </a:effectRef>
+          <a:fontRef idx="minor">
+            <a:schemeClr val="lt1"/>
+          </a:fontRef>
+        </p:style>
+        <p:txBody>
+          <a:bodyPr rtlCol="0" anchor="ctr"/>
+          <a:lstStyle/>
+          <a:p>
+            <a:pPr algn="ctr"/>
+            <a:r>
+              <a:rPr kumimoji="1" lang="en-US" altLang="ja-JP" sz="1200" dirty="0"/>
+              <a:t>Data</a:t>
+            </a:r>
+            <a:endParaRPr kumimoji="1" lang="ja-JP" altLang="en-US" sz="1200" dirty="0"/>
+          </a:p>
+        </p:txBody>
+      </p:sp>
+      <p:sp>
+        <p:nvSpPr>
+          <p:cNvPr id="28" name="正方形/長方形 27">
+            <a:extLst>
+              <a:ext uri="{FF2B5EF4-FFF2-40B4-BE49-F238E27FC236}">
+                <a16:creationId xmlns:a16="http://schemas.microsoft.com/office/drawing/2014/main" id="{324020AE-1D74-2BBE-B6AE-2DBB28872336}"/>
+              </a:ext>
+            </a:extLst>
+          </p:cNvPr>
+          <p:cNvSpPr/>
+          <p:nvPr/>
+        </p:nvSpPr>
+        <p:spPr>
+          <a:xfrm>
+            <a:off x="8341178" y="3925946"/>
+            <a:ext cx="931974" cy="222735"/>
+          </a:xfrm>
+          <a:prstGeom prst="rect">
+            <a:avLst/>
+          </a:prstGeom>
+        </p:spPr>
+        <p:style>
+          <a:lnRef idx="2">
+            <a:schemeClr val="accent1">
+              <a:shade val="50000"/>
+            </a:schemeClr>
+          </a:lnRef>
+          <a:fillRef idx="1">
+            <a:schemeClr val="accent1"/>
+          </a:fillRef>
+          <a:effectRef idx="0">
+            <a:schemeClr val="accent1"/>
+          </a:effectRef>
+          <a:fontRef idx="minor">
+            <a:schemeClr val="lt1"/>
+          </a:fontRef>
+        </p:style>
+        <p:txBody>
+          <a:bodyPr rtlCol="0" anchor="ctr"/>
+          <a:lstStyle/>
+          <a:p>
+            <a:pPr algn="ctr"/>
+            <a:r>
+              <a:rPr kumimoji="1" lang="en-US" altLang="ja-JP" sz="1200" dirty="0"/>
+              <a:t>Data</a:t>
+            </a:r>
+            <a:endParaRPr kumimoji="1" lang="ja-JP" altLang="en-US" sz="1200" dirty="0"/>
+          </a:p>
+        </p:txBody>
+      </p:sp>
+      <p:sp>
+        <p:nvSpPr>
+          <p:cNvPr id="33" name="正方形/長方形 32">
+            <a:extLst>
+              <a:ext uri="{FF2B5EF4-FFF2-40B4-BE49-F238E27FC236}">
+                <a16:creationId xmlns:a16="http://schemas.microsoft.com/office/drawing/2014/main" id="{F05F5EA1-7E83-1625-891E-FBAD75E64B41}"/>
+              </a:ext>
+            </a:extLst>
+          </p:cNvPr>
+          <p:cNvSpPr/>
+          <p:nvPr/>
+        </p:nvSpPr>
+        <p:spPr>
+          <a:xfrm>
+            <a:off x="9272360" y="3925946"/>
+            <a:ext cx="931974" cy="222735"/>
+          </a:xfrm>
+          <a:prstGeom prst="rect">
+            <a:avLst/>
+          </a:prstGeom>
+        </p:spPr>
+        <p:style>
+          <a:lnRef idx="2">
+            <a:schemeClr val="accent1">
+              <a:shade val="50000"/>
+            </a:schemeClr>
+          </a:lnRef>
+          <a:fillRef idx="1">
+            <a:schemeClr val="accent1"/>
+          </a:fillRef>
+          <a:effectRef idx="0">
+            <a:schemeClr val="accent1"/>
+          </a:effectRef>
+          <a:fontRef idx="minor">
+            <a:schemeClr val="lt1"/>
+          </a:fontRef>
+        </p:style>
+        <p:txBody>
+          <a:bodyPr rtlCol="0" anchor="ctr"/>
+          <a:lstStyle/>
+          <a:p>
+            <a:pPr algn="ctr"/>
+            <a:r>
+              <a:rPr kumimoji="1" lang="en-US" altLang="ja-JP" sz="1200" dirty="0"/>
+              <a:t>Data</a:t>
+            </a:r>
+            <a:endParaRPr kumimoji="1" lang="ja-JP" altLang="en-US" sz="1200" dirty="0"/>
+          </a:p>
+        </p:txBody>
+      </p:sp>
+      <p:sp>
+        <p:nvSpPr>
+          <p:cNvPr id="34" name="正方形/長方形 33">
+            <a:extLst>
+              <a:ext uri="{FF2B5EF4-FFF2-40B4-BE49-F238E27FC236}">
+                <a16:creationId xmlns:a16="http://schemas.microsoft.com/office/drawing/2014/main" id="{7CBDC923-4B35-09F7-CE6B-4605F7730CE1}"/>
+              </a:ext>
+            </a:extLst>
+          </p:cNvPr>
+          <p:cNvSpPr/>
+          <p:nvPr/>
+        </p:nvSpPr>
+        <p:spPr>
+          <a:xfrm>
+            <a:off x="10203544" y="3925946"/>
+            <a:ext cx="931974" cy="222735"/>
+          </a:xfrm>
+          <a:prstGeom prst="rect">
+            <a:avLst/>
+          </a:prstGeom>
+        </p:spPr>
+        <p:style>
+          <a:lnRef idx="2">
+            <a:schemeClr val="accent1">
+              <a:shade val="50000"/>
+            </a:schemeClr>
+          </a:lnRef>
+          <a:fillRef idx="1">
+            <a:schemeClr val="accent1"/>
+          </a:fillRef>
+          <a:effectRef idx="0">
+            <a:schemeClr val="accent1"/>
+          </a:effectRef>
+          <a:fontRef idx="minor">
+            <a:schemeClr val="lt1"/>
+          </a:fontRef>
+        </p:style>
+        <p:txBody>
+          <a:bodyPr rtlCol="0" anchor="ctr"/>
+          <a:lstStyle/>
+          <a:p>
+            <a:pPr algn="ctr"/>
+            <a:r>
+              <a:rPr kumimoji="1" lang="en-US" altLang="ja-JP" sz="1200" dirty="0"/>
+              <a:t>Data</a:t>
+            </a:r>
+            <a:endParaRPr kumimoji="1" lang="ja-JP" altLang="en-US" sz="1200" dirty="0"/>
+          </a:p>
+        </p:txBody>
+      </p:sp>
+      <p:sp>
+        <p:nvSpPr>
+          <p:cNvPr id="37" name="テキスト ボックス 36">
+            <a:extLst>
+              <a:ext uri="{FF2B5EF4-FFF2-40B4-BE49-F238E27FC236}">
+                <a16:creationId xmlns:a16="http://schemas.microsoft.com/office/drawing/2014/main" id="{24E6C233-7582-B65B-8CA8-628B9BD91206}"/>
+              </a:ext>
+            </a:extLst>
+          </p:cNvPr>
+          <p:cNvSpPr txBox="1"/>
+          <p:nvPr/>
+        </p:nvSpPr>
+        <p:spPr>
+          <a:xfrm>
+            <a:off x="2858974" y="3686003"/>
+            <a:ext cx="754062" cy="276999"/>
+          </a:xfrm>
+          <a:prstGeom prst="rect">
+            <a:avLst/>
+          </a:prstGeom>
+          <a:noFill/>
+        </p:spPr>
+        <p:txBody>
+          <a:bodyPr wrap="square">
+            <a:spAutoFit/>
+          </a:bodyPr>
+          <a:lstStyle/>
+          <a:p>
+            <a:r>
+              <a:rPr kumimoji="1" lang="en-US" altLang="ja-JP" sz="1200" dirty="0"/>
+              <a:t>Start</a:t>
+            </a:r>
+            <a:endParaRPr lang="ja-JP" altLang="en-US" sz="1200" dirty="0"/>
+          </a:p>
+        </p:txBody>
+      </p:sp>
+      <p:sp>
+        <p:nvSpPr>
+          <p:cNvPr id="38" name="テキスト ボックス 37">
+            <a:extLst>
+              <a:ext uri="{FF2B5EF4-FFF2-40B4-BE49-F238E27FC236}">
+                <a16:creationId xmlns:a16="http://schemas.microsoft.com/office/drawing/2014/main" id="{BAD04C24-4EBC-79B7-9D31-FB105C37DA06}"/>
+              </a:ext>
+            </a:extLst>
+          </p:cNvPr>
+          <p:cNvSpPr txBox="1"/>
+          <p:nvPr/>
+        </p:nvSpPr>
+        <p:spPr>
+          <a:xfrm>
+            <a:off x="2858974" y="3909441"/>
+            <a:ext cx="754062" cy="276999"/>
+          </a:xfrm>
+          <a:prstGeom prst="rect">
+            <a:avLst/>
+          </a:prstGeom>
+          <a:noFill/>
+        </p:spPr>
+        <p:txBody>
+          <a:bodyPr wrap="square">
+            <a:spAutoFit/>
+          </a:bodyPr>
+          <a:lstStyle/>
+          <a:p>
+            <a:r>
+              <a:rPr kumimoji="1" lang="en-US" altLang="ja-JP" sz="1200" dirty="0" err="1"/>
+              <a:t>Clk</a:t>
+            </a:r>
+            <a:endParaRPr lang="ja-JP" altLang="en-US" sz="1200" dirty="0"/>
+          </a:p>
+        </p:txBody>
+      </p:sp>
+      <p:sp>
+        <p:nvSpPr>
+          <p:cNvPr id="40" name="正方形/長方形 39">
+            <a:extLst>
+              <a:ext uri="{FF2B5EF4-FFF2-40B4-BE49-F238E27FC236}">
+                <a16:creationId xmlns:a16="http://schemas.microsoft.com/office/drawing/2014/main" id="{81384D31-A7C9-4A76-9DD8-688389BBA22E}"/>
+              </a:ext>
+            </a:extLst>
+          </p:cNvPr>
+          <p:cNvSpPr/>
+          <p:nvPr/>
+        </p:nvSpPr>
+        <p:spPr>
+          <a:xfrm>
+            <a:off x="11164257" y="2939380"/>
+            <a:ext cx="754063" cy="222735"/>
+          </a:xfrm>
+          <a:prstGeom prst="rect">
+            <a:avLst/>
+          </a:prstGeom>
+        </p:spPr>
+        <p:style>
+          <a:lnRef idx="2">
+            <a:schemeClr val="accent1">
+              <a:shade val="50000"/>
+            </a:schemeClr>
+          </a:lnRef>
+          <a:fillRef idx="1">
+            <a:schemeClr val="accent1"/>
+          </a:fillRef>
+          <a:effectRef idx="0">
+            <a:schemeClr val="accent1"/>
+          </a:effectRef>
+          <a:fontRef idx="minor">
+            <a:schemeClr val="lt1"/>
+          </a:fontRef>
+        </p:style>
+        <p:txBody>
+          <a:bodyPr rtlCol="0" anchor="ctr"/>
+          <a:lstStyle/>
+          <a:p>
+            <a:pPr algn="ctr"/>
+            <a:r>
+              <a:rPr kumimoji="1" lang="en-US" altLang="ja-JP" sz="1200" dirty="0"/>
+              <a:t>…</a:t>
+            </a:r>
+            <a:endParaRPr kumimoji="1" lang="ja-JP" altLang="en-US" sz="1200" dirty="0"/>
+          </a:p>
+        </p:txBody>
+      </p:sp>
+    </p:spTree>
+    <p:extLst>
+      <p:ext uri="{BB962C8B-B14F-4D97-AF65-F5344CB8AC3E}">
+        <p14:creationId xmlns:p14="http://schemas.microsoft.com/office/powerpoint/2010/main" val="1111983188"/>
+      </p:ext>
+    </p:extLst>
+  </p:cSld>
+  <p:clrMapOvr>
+    <a:masterClrMapping/>
+  </p:clrMapOvr>
+</p:sld>
+</file>
+
+<file path=ppt/slides/slide41.xml><?xml version="1.0" encoding="utf-8"?>
+<p:sld xmlns:a="http://schemas.openxmlformats.org/drawingml/2006/main" xmlns:r="http://schemas.openxmlformats.org/officeDocument/2006/relationships" xmlns:p="http://schemas.openxmlformats.org/presentationml/2006/main">
+  <p:cSld>
+    <p:spTree>
+      <p:nvGrpSpPr>
+        <p:cNvPr id="1" name=""/>
+        <p:cNvGrpSpPr/>
+        <p:nvPr/>
+      </p:nvGrpSpPr>
+      <p:grpSpPr>
+        <a:xfrm>
+          <a:off x="0" y="0"/>
+          <a:ext cx="0" cy="0"/>
+          <a:chOff x="0" y="0"/>
+          <a:chExt cx="0" cy="0"/>
+        </a:xfrm>
+      </p:grpSpPr>
+      <p:sp>
+        <p:nvSpPr>
+          <p:cNvPr id="2" name="タイトル 1">
+            <a:extLst>
+              <a:ext uri="{FF2B5EF4-FFF2-40B4-BE49-F238E27FC236}">
+                <a16:creationId xmlns:a16="http://schemas.microsoft.com/office/drawing/2014/main" id="{FF137733-6174-4A76-B52E-89E44936D189}"/>
+              </a:ext>
+            </a:extLst>
+          </p:cNvPr>
+          <p:cNvSpPr>
+            <a:spLocks noGrp="1"/>
+          </p:cNvSpPr>
+          <p:nvPr>
+            <p:ph type="title"/>
+          </p:nvPr>
+        </p:nvSpPr>
+        <p:spPr/>
+        <p:txBody>
+          <a:bodyPr/>
+          <a:lstStyle/>
+          <a:p>
+            <a:r>
+              <a:rPr kumimoji="1" lang="en-US" altLang="ja-JP" dirty="0"/>
               <a:t>VSIF – C64(FTDI) SPECIFICATION</a:t>
             </a:r>
             <a:br>
@@ -37754,7 +38121,7 @@
           <a:p>
             <a:fld id="{E27E2812-4560-4165-A7C7-9C013F955547}" type="slidenum">
               <a:rPr kumimoji="1" lang="ja-JP" altLang="en-US" smtClean="0"/>
-              <a:t>40</a:t>
+              <a:t>41</a:t>
             </a:fld>
             <a:endParaRPr kumimoji="1" lang="ja-JP" altLang="en-US"/>
           </a:p>
@@ -39903,7 +40270,7 @@
 </p:sld>
 </file>
 
-<file path=ppt/slides/slide41.xml><?xml version="1.0" encoding="utf-8"?>
+<file path=ppt/slides/slide42.xml><?xml version="1.0" encoding="utf-8"?>
 <p:sld xmlns:a="http://schemas.openxmlformats.org/drawingml/2006/main" xmlns:r="http://schemas.openxmlformats.org/officeDocument/2006/relationships" xmlns:p="http://schemas.openxmlformats.org/presentationml/2006/main">
   <p:cSld>
     <p:spTree>
@@ -40438,7 +40805,7 @@
           <a:p>
             <a:fld id="{E27E2812-4560-4165-A7C7-9C013F955547}" type="slidenum">
               <a:rPr kumimoji="1" lang="ja-JP" altLang="en-US" smtClean="0"/>
-              <a:t>41</a:t>
+              <a:t>42</a:t>
             </a:fld>
             <a:endParaRPr kumimoji="1" lang="ja-JP" altLang="en-US"/>
           </a:p>

</xml_diff>

<commit_message>
- Supported OKIM6259 - Improved DAC stream performance for VGM file
</commit_message>
<xml_diff>
--- a/docs/MAmidiMEmo/Manual.pptx
+++ b/docs/MAmidiMEmo/Manual.pptx
@@ -238,7 +238,7 @@
           <a:p>
             <a:fld id="{581C28D8-13B6-41C3-9F5F-0284C569C6F1}" type="datetimeFigureOut">
               <a:rPr kumimoji="1" lang="ja-JP" altLang="en-US" smtClean="0"/>
-              <a:t>2023/4/4</a:t>
+              <a:t>2023/4/27</a:t>
             </a:fld>
             <a:endParaRPr kumimoji="1" lang="ja-JP" altLang="en-US"/>
           </a:p>
@@ -1649,7 +1649,7 @@
           <a:p>
             <a:fld id="{B8625E62-B904-4691-B75E-EC1C32885285}" type="datetime1">
               <a:rPr kumimoji="1" lang="ja-JP" altLang="en-US" smtClean="0"/>
-              <a:t>2023/4/4</a:t>
+              <a:t>2023/4/27</a:t>
             </a:fld>
             <a:endParaRPr kumimoji="1" lang="ja-JP" altLang="en-US"/>
           </a:p>
@@ -1987,7 +1987,7 @@
           <a:p>
             <a:fld id="{A4C87007-2A40-4EFC-90A3-258EFA3C1001}" type="datetime1">
               <a:rPr kumimoji="1" lang="ja-JP" altLang="en-US" smtClean="0"/>
-              <a:t>2023/4/4</a:t>
+              <a:t>2023/4/27</a:t>
             </a:fld>
             <a:endParaRPr kumimoji="1" lang="ja-JP" altLang="en-US"/>
           </a:p>
@@ -2388,7 +2388,7 @@
           <a:p>
             <a:fld id="{0FE0D7FF-9203-4AA3-90FD-622674A14F90}" type="datetime1">
               <a:rPr kumimoji="1" lang="ja-JP" altLang="en-US" smtClean="0"/>
-              <a:t>2023/4/4</a:t>
+              <a:t>2023/4/27</a:t>
             </a:fld>
             <a:endParaRPr kumimoji="1" lang="ja-JP" altLang="en-US"/>
           </a:p>
@@ -2724,7 +2724,7 @@
           <a:p>
             <a:fld id="{D2D6E4D3-BEDB-4F35-876B-5B9AA41BFB5B}" type="datetime1">
               <a:rPr kumimoji="1" lang="ja-JP" altLang="en-US" smtClean="0"/>
-              <a:t>2023/4/4</a:t>
+              <a:t>2023/4/27</a:t>
             </a:fld>
             <a:endParaRPr kumimoji="1" lang="ja-JP" altLang="en-US"/>
           </a:p>
@@ -3044,7 +3044,7 @@
           <a:p>
             <a:fld id="{2ACD896E-FC14-4F25-BC47-18ABAEA9E1FE}" type="datetime1">
               <a:rPr kumimoji="1" lang="ja-JP" altLang="en-US" smtClean="0"/>
-              <a:t>2023/4/4</a:t>
+              <a:t>2023/4/27</a:t>
             </a:fld>
             <a:endParaRPr kumimoji="1" lang="ja-JP" altLang="en-US"/>
           </a:p>
@@ -3440,7 +3440,7 @@
           <a:p>
             <a:fld id="{54FC701B-2185-4987-B8E2-5507664B65F4}" type="datetime1">
               <a:rPr kumimoji="1" lang="ja-JP" altLang="en-US" smtClean="0"/>
-              <a:t>2023/4/4</a:t>
+              <a:t>2023/4/27</a:t>
             </a:fld>
             <a:endParaRPr kumimoji="1" lang="ja-JP" altLang="en-US"/>
           </a:p>
@@ -3729,7 +3729,7 @@
           <a:p>
             <a:fld id="{3FB4CDED-9617-418F-B546-D66B9BB6C35E}" type="datetime1">
               <a:rPr kumimoji="1" lang="ja-JP" altLang="en-US" smtClean="0"/>
-              <a:t>2023/4/4</a:t>
+              <a:t>2023/4/27</a:t>
             </a:fld>
             <a:endParaRPr kumimoji="1" lang="ja-JP" altLang="en-US"/>
           </a:p>
@@ -4023,7 +4023,7 @@
           <a:p>
             <a:fld id="{F5635D40-962A-46D7-8037-3F2900B5EB4D}" type="datetime1">
               <a:rPr kumimoji="1" lang="ja-JP" altLang="en-US" smtClean="0"/>
-              <a:t>2023/4/4</a:t>
+              <a:t>2023/4/27</a:t>
             </a:fld>
             <a:endParaRPr kumimoji="1" lang="ja-JP" altLang="en-US"/>
           </a:p>
@@ -4317,7 +4317,7 @@
           <a:p>
             <a:fld id="{741DA9A2-8356-4FFD-B66A-E38811049858}" type="datetime1">
               <a:rPr kumimoji="1" lang="ja-JP" altLang="en-US" smtClean="0"/>
-              <a:t>2023/4/4</a:t>
+              <a:t>2023/4/27</a:t>
             </a:fld>
             <a:endParaRPr kumimoji="1" lang="ja-JP" altLang="en-US"/>
           </a:p>
@@ -4646,7 +4646,7 @@
           <a:p>
             <a:fld id="{9DDE8989-88B8-4869-97D9-547531F13E13}" type="datetime1">
               <a:rPr kumimoji="1" lang="ja-JP" altLang="en-US" smtClean="0"/>
-              <a:t>2023/4/4</a:t>
+              <a:t>2023/4/27</a:t>
             </a:fld>
             <a:endParaRPr kumimoji="1" lang="ja-JP" altLang="en-US"/>
           </a:p>
@@ -5033,7 +5033,7 @@
           <a:p>
             <a:fld id="{81EC4031-B949-4300-AB3E-1551426E8631}" type="datetime1">
               <a:rPr kumimoji="1" lang="ja-JP" altLang="en-US" smtClean="0"/>
-              <a:t>2023/4/4</a:t>
+              <a:t>2023/4/27</a:t>
             </a:fld>
             <a:endParaRPr kumimoji="1" lang="ja-JP" altLang="en-US"/>
           </a:p>
@@ -5554,7 +5554,7 @@
           <a:p>
             <a:fld id="{F39E755E-A59D-4634-B604-E9BB568B1156}" type="datetime1">
               <a:rPr kumimoji="1" lang="ja-JP" altLang="en-US" smtClean="0"/>
-              <a:t>2023/4/4</a:t>
+              <a:t>2023/4/27</a:t>
             </a:fld>
             <a:endParaRPr kumimoji="1" lang="ja-JP" altLang="en-US"/>
           </a:p>
@@ -5759,7 +5759,7 @@
           <a:p>
             <a:fld id="{61DA38B3-7601-4256-ABFE-386B92B0EDB5}" type="datetime1">
               <a:rPr kumimoji="1" lang="ja-JP" altLang="en-US" smtClean="0"/>
-              <a:t>2023/4/4</a:t>
+              <a:t>2023/4/27</a:t>
             </a:fld>
             <a:endParaRPr kumimoji="1" lang="ja-JP" altLang="en-US"/>
           </a:p>
@@ -5936,7 +5936,7 @@
           <a:p>
             <a:fld id="{5A28ED6D-8A94-4DBA-8EF2-284D1A467CE8}" type="datetime1">
               <a:rPr kumimoji="1" lang="ja-JP" altLang="en-US" smtClean="0"/>
-              <a:t>2023/4/4</a:t>
+              <a:t>2023/4/27</a:t>
             </a:fld>
             <a:endParaRPr kumimoji="1" lang="ja-JP" altLang="en-US"/>
           </a:p>
@@ -6301,7 +6301,7 @@
           <a:p>
             <a:fld id="{B27B0317-28AF-43C5-8944-AADFA89E0149}" type="datetime1">
               <a:rPr kumimoji="1" lang="ja-JP" altLang="en-US" smtClean="0"/>
-              <a:t>2023/4/4</a:t>
+              <a:t>2023/4/27</a:t>
             </a:fld>
             <a:endParaRPr kumimoji="1" lang="ja-JP" altLang="en-US"/>
           </a:p>
@@ -6646,7 +6646,7 @@
           <a:p>
             <a:fld id="{A78D023C-C4FA-4CE8-B5BE-6798898EE377}" type="datetime1">
               <a:rPr kumimoji="1" lang="ja-JP" altLang="en-US" smtClean="0"/>
-              <a:t>2023/4/4</a:t>
+              <a:t>2023/4/27</a:t>
             </a:fld>
             <a:endParaRPr kumimoji="1" lang="ja-JP" altLang="en-US"/>
           </a:p>
@@ -8795,7 +8795,7 @@
           <a:p>
             <a:fld id="{99567159-F4A8-4352-915B-DDBEFEF4A4D6}" type="datetime1">
               <a:rPr kumimoji="1" lang="ja-JP" altLang="en-US" smtClean="0"/>
-              <a:t>2023/4/4</a:t>
+              <a:t>2023/4/27</a:t>
             </a:fld>
             <a:endParaRPr kumimoji="1" lang="ja-JP" altLang="en-US"/>
           </a:p>
@@ -14732,7 +14732,15 @@
             </a:r>
             <a:r>
               <a:rPr kumimoji="1" lang="en-US" altLang="ja-JP" dirty="0"/>
-              <a:t> can drive real machine chips more faster if you use FTDI2xx(232R, 232H and so on). Currently supports NTSC Genesis(MD) for SN76489, OPN2.</a:t>
+              <a:t> can drive real machine chips more faster if you use FTDI2xx(232R, </a:t>
+            </a:r>
+            <a:r>
+              <a:rPr kumimoji="1" lang="en-US" altLang="ja-JP" b="1" dirty="0"/>
+              <a:t>232H</a:t>
+            </a:r>
+            <a:r>
+              <a:rPr kumimoji="1" lang="en-US" altLang="ja-JP" dirty="0"/>
+              <a:t> and so on). Currently supports NTSC Genesis(MD) for SN76489, OPN2.</a:t>
             </a:r>
           </a:p>
           <a:p>
@@ -22418,7 +22426,15 @@
             </a:r>
             <a:r>
               <a:rPr kumimoji="1" lang="en-US" altLang="ja-JP" sz="1600" dirty="0"/>
-              <a:t> can drive real MSX machine chips if you use FTDI2xx(232R, 232H and so on). Currently supports NTSC MSX for AY-3-8910 and OPLL and SCC+ and OPL3.</a:t>
+              <a:t> can drive real MSX machine chips if you use FTDI2xx(232R, </a:t>
+            </a:r>
+            <a:r>
+              <a:rPr kumimoji="1" lang="en-US" altLang="ja-JP" sz="1600" b="1" dirty="0"/>
+              <a:t>232H</a:t>
+            </a:r>
+            <a:r>
+              <a:rPr kumimoji="1" lang="en-US" altLang="ja-JP" sz="1600" dirty="0"/>
+              <a:t> and so on). Currently supports NTSC MSX for AY-3-8910 and OPLL and SCC+ and OPL3.</a:t>
             </a:r>
             <a:br>
               <a:rPr kumimoji="1" lang="en-US" altLang="ja-JP" sz="1600" dirty="0"/>

</xml_diff>

<commit_message>
- Added gerber data, circuit diagram, parts list, and product images of MAmi-VSIF dongle for MSX
</commit_message>
<xml_diff>
--- a/docs/MAmidiMEmo/Manual.pptx
+++ b/docs/MAmidiMEmo/Manual.pptx
@@ -238,7 +238,7 @@
           <a:p>
             <a:fld id="{581C28D8-13B6-41C3-9F5F-0284C569C6F1}" type="datetimeFigureOut">
               <a:rPr kumimoji="1" lang="ja-JP" altLang="en-US" smtClean="0"/>
-              <a:t>2023/4/27</a:t>
+              <a:t>2023/6/1</a:t>
             </a:fld>
             <a:endParaRPr kumimoji="1" lang="ja-JP" altLang="en-US"/>
           </a:p>
@@ -1649,7 +1649,7 @@
           <a:p>
             <a:fld id="{B8625E62-B904-4691-B75E-EC1C32885285}" type="datetime1">
               <a:rPr kumimoji="1" lang="ja-JP" altLang="en-US" smtClean="0"/>
-              <a:t>2023/4/27</a:t>
+              <a:t>2023/6/1</a:t>
             </a:fld>
             <a:endParaRPr kumimoji="1" lang="ja-JP" altLang="en-US"/>
           </a:p>
@@ -1987,7 +1987,7 @@
           <a:p>
             <a:fld id="{A4C87007-2A40-4EFC-90A3-258EFA3C1001}" type="datetime1">
               <a:rPr kumimoji="1" lang="ja-JP" altLang="en-US" smtClean="0"/>
-              <a:t>2023/4/27</a:t>
+              <a:t>2023/6/1</a:t>
             </a:fld>
             <a:endParaRPr kumimoji="1" lang="ja-JP" altLang="en-US"/>
           </a:p>
@@ -2388,7 +2388,7 @@
           <a:p>
             <a:fld id="{0FE0D7FF-9203-4AA3-90FD-622674A14F90}" type="datetime1">
               <a:rPr kumimoji="1" lang="ja-JP" altLang="en-US" smtClean="0"/>
-              <a:t>2023/4/27</a:t>
+              <a:t>2023/6/1</a:t>
             </a:fld>
             <a:endParaRPr kumimoji="1" lang="ja-JP" altLang="en-US"/>
           </a:p>
@@ -2724,7 +2724,7 @@
           <a:p>
             <a:fld id="{D2D6E4D3-BEDB-4F35-876B-5B9AA41BFB5B}" type="datetime1">
               <a:rPr kumimoji="1" lang="ja-JP" altLang="en-US" smtClean="0"/>
-              <a:t>2023/4/27</a:t>
+              <a:t>2023/6/1</a:t>
             </a:fld>
             <a:endParaRPr kumimoji="1" lang="ja-JP" altLang="en-US"/>
           </a:p>
@@ -3044,7 +3044,7 @@
           <a:p>
             <a:fld id="{2ACD896E-FC14-4F25-BC47-18ABAEA9E1FE}" type="datetime1">
               <a:rPr kumimoji="1" lang="ja-JP" altLang="en-US" smtClean="0"/>
-              <a:t>2023/4/27</a:t>
+              <a:t>2023/6/1</a:t>
             </a:fld>
             <a:endParaRPr kumimoji="1" lang="ja-JP" altLang="en-US"/>
           </a:p>
@@ -3440,7 +3440,7 @@
           <a:p>
             <a:fld id="{54FC701B-2185-4987-B8E2-5507664B65F4}" type="datetime1">
               <a:rPr kumimoji="1" lang="ja-JP" altLang="en-US" smtClean="0"/>
-              <a:t>2023/4/27</a:t>
+              <a:t>2023/6/1</a:t>
             </a:fld>
             <a:endParaRPr kumimoji="1" lang="ja-JP" altLang="en-US"/>
           </a:p>
@@ -3729,7 +3729,7 @@
           <a:p>
             <a:fld id="{3FB4CDED-9617-418F-B546-D66B9BB6C35E}" type="datetime1">
               <a:rPr kumimoji="1" lang="ja-JP" altLang="en-US" smtClean="0"/>
-              <a:t>2023/4/27</a:t>
+              <a:t>2023/6/1</a:t>
             </a:fld>
             <a:endParaRPr kumimoji="1" lang="ja-JP" altLang="en-US"/>
           </a:p>
@@ -4023,7 +4023,7 @@
           <a:p>
             <a:fld id="{F5635D40-962A-46D7-8037-3F2900B5EB4D}" type="datetime1">
               <a:rPr kumimoji="1" lang="ja-JP" altLang="en-US" smtClean="0"/>
-              <a:t>2023/4/27</a:t>
+              <a:t>2023/6/1</a:t>
             </a:fld>
             <a:endParaRPr kumimoji="1" lang="ja-JP" altLang="en-US"/>
           </a:p>
@@ -4317,7 +4317,7 @@
           <a:p>
             <a:fld id="{741DA9A2-8356-4FFD-B66A-E38811049858}" type="datetime1">
               <a:rPr kumimoji="1" lang="ja-JP" altLang="en-US" smtClean="0"/>
-              <a:t>2023/4/27</a:t>
+              <a:t>2023/6/1</a:t>
             </a:fld>
             <a:endParaRPr kumimoji="1" lang="ja-JP" altLang="en-US"/>
           </a:p>
@@ -4646,7 +4646,7 @@
           <a:p>
             <a:fld id="{9DDE8989-88B8-4869-97D9-547531F13E13}" type="datetime1">
               <a:rPr kumimoji="1" lang="ja-JP" altLang="en-US" smtClean="0"/>
-              <a:t>2023/4/27</a:t>
+              <a:t>2023/6/1</a:t>
             </a:fld>
             <a:endParaRPr kumimoji="1" lang="ja-JP" altLang="en-US"/>
           </a:p>
@@ -5033,7 +5033,7 @@
           <a:p>
             <a:fld id="{81EC4031-B949-4300-AB3E-1551426E8631}" type="datetime1">
               <a:rPr kumimoji="1" lang="ja-JP" altLang="en-US" smtClean="0"/>
-              <a:t>2023/4/27</a:t>
+              <a:t>2023/6/1</a:t>
             </a:fld>
             <a:endParaRPr kumimoji="1" lang="ja-JP" altLang="en-US"/>
           </a:p>
@@ -5554,7 +5554,7 @@
           <a:p>
             <a:fld id="{F39E755E-A59D-4634-B604-E9BB568B1156}" type="datetime1">
               <a:rPr kumimoji="1" lang="ja-JP" altLang="en-US" smtClean="0"/>
-              <a:t>2023/4/27</a:t>
+              <a:t>2023/6/1</a:t>
             </a:fld>
             <a:endParaRPr kumimoji="1" lang="ja-JP" altLang="en-US"/>
           </a:p>
@@ -5759,7 +5759,7 @@
           <a:p>
             <a:fld id="{61DA38B3-7601-4256-ABFE-386B92B0EDB5}" type="datetime1">
               <a:rPr kumimoji="1" lang="ja-JP" altLang="en-US" smtClean="0"/>
-              <a:t>2023/4/27</a:t>
+              <a:t>2023/6/1</a:t>
             </a:fld>
             <a:endParaRPr kumimoji="1" lang="ja-JP" altLang="en-US"/>
           </a:p>
@@ -5936,7 +5936,7 @@
           <a:p>
             <a:fld id="{5A28ED6D-8A94-4DBA-8EF2-284D1A467CE8}" type="datetime1">
               <a:rPr kumimoji="1" lang="ja-JP" altLang="en-US" smtClean="0"/>
-              <a:t>2023/4/27</a:t>
+              <a:t>2023/6/1</a:t>
             </a:fld>
             <a:endParaRPr kumimoji="1" lang="ja-JP" altLang="en-US"/>
           </a:p>
@@ -6301,7 +6301,7 @@
           <a:p>
             <a:fld id="{B27B0317-28AF-43C5-8944-AADFA89E0149}" type="datetime1">
               <a:rPr kumimoji="1" lang="ja-JP" altLang="en-US" smtClean="0"/>
-              <a:t>2023/4/27</a:t>
+              <a:t>2023/6/1</a:t>
             </a:fld>
             <a:endParaRPr kumimoji="1" lang="ja-JP" altLang="en-US"/>
           </a:p>
@@ -6646,7 +6646,7 @@
           <a:p>
             <a:fld id="{A78D023C-C4FA-4CE8-B5BE-6798898EE377}" type="datetime1">
               <a:rPr kumimoji="1" lang="ja-JP" altLang="en-US" smtClean="0"/>
-              <a:t>2023/4/27</a:t>
+              <a:t>2023/6/1</a:t>
             </a:fld>
             <a:endParaRPr kumimoji="1" lang="ja-JP" altLang="en-US"/>
           </a:p>
@@ -8795,7 +8795,7 @@
           <a:p>
             <a:fld id="{99567159-F4A8-4352-915B-DDBEFEF4A4D6}" type="datetime1">
               <a:rPr kumimoji="1" lang="ja-JP" altLang="en-US" smtClean="0"/>
-              <a:t>2023/4/27</a:t>
+              <a:t>2023/6/1</a:t>
             </a:fld>
             <a:endParaRPr kumimoji="1" lang="ja-JP" altLang="en-US"/>
           </a:p>
@@ -22462,8 +22462,40 @@
           <a:p>
             <a:r>
               <a:rPr lang="en-US" altLang="ja-JP" dirty="0"/>
-              <a:t>How to</a:t>
-            </a:r>
+              <a:t>How to </a:t>
+            </a:r>
+            <a:r>
+              <a:rPr lang="en-US" altLang="ja-JP" sz="1600" dirty="0"/>
+              <a:t>(You can also create a </a:t>
+            </a:r>
+            <a:r>
+              <a:rPr lang="en-US" altLang="ja-JP" sz="1600" b="1" dirty="0"/>
+              <a:t>dedicated dongle </a:t>
+            </a:r>
+            <a:r>
+              <a:rPr lang="en-US" altLang="ja-JP" sz="1600" dirty="0"/>
+              <a:t>from the </a:t>
+            </a:r>
+            <a:r>
+              <a:rPr lang="en-US" altLang="ja-JP" sz="1600" dirty="0">
+                <a:solidFill>
+                  <a:srgbClr val="0045D0"/>
+                </a:solidFill>
+                <a:hlinkClick r:id="rId3">
+                  <a:extLst>
+                    <a:ext uri="{A12FA001-AC4F-418D-AE19-62706E023703}">
+                      <ahyp:hlinkClr xmlns:ahyp="http://schemas.microsoft.com/office/drawing/2018/hyperlinkcolor" val="tx"/>
+                    </a:ext>
+                  </a:extLst>
+                </a:hlinkClick>
+              </a:rPr>
+              <a:t>Gerber file</a:t>
+            </a:r>
+            <a:r>
+              <a:rPr lang="en-US" altLang="ja-JP" sz="1600" dirty="0"/>
+              <a:t>.)</a:t>
+            </a:r>
+            <a:endParaRPr lang="en-US" altLang="ja-JP" dirty="0"/>
           </a:p>
           <a:p>
             <a:pPr marL="800100" lvl="1" indent="-342900">
@@ -22650,7 +22682,7 @@
             <p:nvPr/>
           </p:nvPicPr>
           <p:blipFill rotWithShape="1">
-            <a:blip r:embed="rId3">
+            <a:blip r:embed="rId4">
               <a:extLst>
                 <a:ext uri="{28A0092B-C50C-407E-A947-70E740481C1C}">
                   <a14:useLocalDpi xmlns:a14="http://schemas.microsoft.com/office/drawing/2010/main" val="0"/>
@@ -22695,7 +22727,7 @@
             <p:nvPr/>
           </p:nvPicPr>
           <p:blipFill rotWithShape="1">
-            <a:blip r:embed="rId3">
+            <a:blip r:embed="rId4">
               <a:extLst>
                 <a:ext uri="{28A0092B-C50C-407E-A947-70E740481C1C}">
                   <a14:useLocalDpi xmlns:a14="http://schemas.microsoft.com/office/drawing/2010/main" val="0"/>
@@ -22741,11 +22773,11 @@
           <p:nvPr/>
         </p:nvPicPr>
         <p:blipFill rotWithShape="1">
-          <a:blip r:embed="rId4">
+          <a:blip r:embed="rId5">
             <a:extLst>
               <a:ext uri="{BEBA8EAE-BF5A-486C-A8C5-ECC9F3942E4B}">
                 <a14:imgProps xmlns:a14="http://schemas.microsoft.com/office/drawing/2010/main">
-                  <a14:imgLayer r:embed="rId5">
+                  <a14:imgLayer r:embed="rId6">
                     <a14:imgEffect>
                       <a14:brightnessContrast bright="40000" contrast="-40000"/>
                     </a14:imgEffect>
@@ -23402,11 +23434,11 @@
           <p:nvPr/>
         </p:nvPicPr>
         <p:blipFill>
-          <a:blip r:embed="rId6">
+          <a:blip r:embed="rId7">
             <a:extLst>
               <a:ext uri="{BEBA8EAE-BF5A-486C-A8C5-ECC9F3942E4B}">
                 <a14:imgProps xmlns:a14="http://schemas.microsoft.com/office/drawing/2010/main">
-                  <a14:imgLayer r:embed="rId7">
+                  <a14:imgLayer r:embed="rId8">
                     <a14:imgEffect>
                       <a14:backgroundRemoval t="9942" b="89474" l="7310" r="92690">
                         <a14:foregroundMark x1="75146" y1="29240" x2="40643" y2="53216"/>

</xml_diff>

<commit_message>
4.8.2.1 Added VGM_P6M.bin for ROM Cartridge of PC-6001.
</commit_message>
<xml_diff>
--- a/docs/MAmidiMEmo/Manual.pptx
+++ b/docs/MAmidiMEmo/Manual.pptx
@@ -238,7 +238,7 @@
           <a:p>
             <a:fld id="{581C28D8-13B6-41C3-9F5F-0284C569C6F1}" type="datetimeFigureOut">
               <a:rPr kumimoji="1" lang="ja-JP" altLang="en-US" smtClean="0"/>
-              <a:t>2023/6/1</a:t>
+              <a:t>2023/6/4</a:t>
             </a:fld>
             <a:endParaRPr kumimoji="1" lang="ja-JP" altLang="en-US"/>
           </a:p>
@@ -1649,7 +1649,7 @@
           <a:p>
             <a:fld id="{B8625E62-B904-4691-B75E-EC1C32885285}" type="datetime1">
               <a:rPr kumimoji="1" lang="ja-JP" altLang="en-US" smtClean="0"/>
-              <a:t>2023/6/1</a:t>
+              <a:t>2023/6/4</a:t>
             </a:fld>
             <a:endParaRPr kumimoji="1" lang="ja-JP" altLang="en-US"/>
           </a:p>
@@ -1987,7 +1987,7 @@
           <a:p>
             <a:fld id="{A4C87007-2A40-4EFC-90A3-258EFA3C1001}" type="datetime1">
               <a:rPr kumimoji="1" lang="ja-JP" altLang="en-US" smtClean="0"/>
-              <a:t>2023/6/1</a:t>
+              <a:t>2023/6/4</a:t>
             </a:fld>
             <a:endParaRPr kumimoji="1" lang="ja-JP" altLang="en-US"/>
           </a:p>
@@ -2388,7 +2388,7 @@
           <a:p>
             <a:fld id="{0FE0D7FF-9203-4AA3-90FD-622674A14F90}" type="datetime1">
               <a:rPr kumimoji="1" lang="ja-JP" altLang="en-US" smtClean="0"/>
-              <a:t>2023/6/1</a:t>
+              <a:t>2023/6/4</a:t>
             </a:fld>
             <a:endParaRPr kumimoji="1" lang="ja-JP" altLang="en-US"/>
           </a:p>
@@ -2724,7 +2724,7 @@
           <a:p>
             <a:fld id="{D2D6E4D3-BEDB-4F35-876B-5B9AA41BFB5B}" type="datetime1">
               <a:rPr kumimoji="1" lang="ja-JP" altLang="en-US" smtClean="0"/>
-              <a:t>2023/6/1</a:t>
+              <a:t>2023/6/4</a:t>
             </a:fld>
             <a:endParaRPr kumimoji="1" lang="ja-JP" altLang="en-US"/>
           </a:p>
@@ -3044,7 +3044,7 @@
           <a:p>
             <a:fld id="{2ACD896E-FC14-4F25-BC47-18ABAEA9E1FE}" type="datetime1">
               <a:rPr kumimoji="1" lang="ja-JP" altLang="en-US" smtClean="0"/>
-              <a:t>2023/6/1</a:t>
+              <a:t>2023/6/4</a:t>
             </a:fld>
             <a:endParaRPr kumimoji="1" lang="ja-JP" altLang="en-US"/>
           </a:p>
@@ -3440,7 +3440,7 @@
           <a:p>
             <a:fld id="{54FC701B-2185-4987-B8E2-5507664B65F4}" type="datetime1">
               <a:rPr kumimoji="1" lang="ja-JP" altLang="en-US" smtClean="0"/>
-              <a:t>2023/6/1</a:t>
+              <a:t>2023/6/4</a:t>
             </a:fld>
             <a:endParaRPr kumimoji="1" lang="ja-JP" altLang="en-US"/>
           </a:p>
@@ -3729,7 +3729,7 @@
           <a:p>
             <a:fld id="{3FB4CDED-9617-418F-B546-D66B9BB6C35E}" type="datetime1">
               <a:rPr kumimoji="1" lang="ja-JP" altLang="en-US" smtClean="0"/>
-              <a:t>2023/6/1</a:t>
+              <a:t>2023/6/4</a:t>
             </a:fld>
             <a:endParaRPr kumimoji="1" lang="ja-JP" altLang="en-US"/>
           </a:p>
@@ -4023,7 +4023,7 @@
           <a:p>
             <a:fld id="{F5635D40-962A-46D7-8037-3F2900B5EB4D}" type="datetime1">
               <a:rPr kumimoji="1" lang="ja-JP" altLang="en-US" smtClean="0"/>
-              <a:t>2023/6/1</a:t>
+              <a:t>2023/6/4</a:t>
             </a:fld>
             <a:endParaRPr kumimoji="1" lang="ja-JP" altLang="en-US"/>
           </a:p>
@@ -4317,7 +4317,7 @@
           <a:p>
             <a:fld id="{741DA9A2-8356-4FFD-B66A-E38811049858}" type="datetime1">
               <a:rPr kumimoji="1" lang="ja-JP" altLang="en-US" smtClean="0"/>
-              <a:t>2023/6/1</a:t>
+              <a:t>2023/6/4</a:t>
             </a:fld>
             <a:endParaRPr kumimoji="1" lang="ja-JP" altLang="en-US"/>
           </a:p>
@@ -4646,7 +4646,7 @@
           <a:p>
             <a:fld id="{9DDE8989-88B8-4869-97D9-547531F13E13}" type="datetime1">
               <a:rPr kumimoji="1" lang="ja-JP" altLang="en-US" smtClean="0"/>
-              <a:t>2023/6/1</a:t>
+              <a:t>2023/6/4</a:t>
             </a:fld>
             <a:endParaRPr kumimoji="1" lang="ja-JP" altLang="en-US"/>
           </a:p>
@@ -5033,7 +5033,7 @@
           <a:p>
             <a:fld id="{81EC4031-B949-4300-AB3E-1551426E8631}" type="datetime1">
               <a:rPr kumimoji="1" lang="ja-JP" altLang="en-US" smtClean="0"/>
-              <a:t>2023/6/1</a:t>
+              <a:t>2023/6/4</a:t>
             </a:fld>
             <a:endParaRPr kumimoji="1" lang="ja-JP" altLang="en-US"/>
           </a:p>
@@ -5554,7 +5554,7 @@
           <a:p>
             <a:fld id="{F39E755E-A59D-4634-B604-E9BB568B1156}" type="datetime1">
               <a:rPr kumimoji="1" lang="ja-JP" altLang="en-US" smtClean="0"/>
-              <a:t>2023/6/1</a:t>
+              <a:t>2023/6/4</a:t>
             </a:fld>
             <a:endParaRPr kumimoji="1" lang="ja-JP" altLang="en-US"/>
           </a:p>
@@ -5759,7 +5759,7 @@
           <a:p>
             <a:fld id="{61DA38B3-7601-4256-ABFE-386B92B0EDB5}" type="datetime1">
               <a:rPr kumimoji="1" lang="ja-JP" altLang="en-US" smtClean="0"/>
-              <a:t>2023/6/1</a:t>
+              <a:t>2023/6/4</a:t>
             </a:fld>
             <a:endParaRPr kumimoji="1" lang="ja-JP" altLang="en-US"/>
           </a:p>
@@ -5936,7 +5936,7 @@
           <a:p>
             <a:fld id="{5A28ED6D-8A94-4DBA-8EF2-284D1A467CE8}" type="datetime1">
               <a:rPr kumimoji="1" lang="ja-JP" altLang="en-US" smtClean="0"/>
-              <a:t>2023/6/1</a:t>
+              <a:t>2023/6/4</a:t>
             </a:fld>
             <a:endParaRPr kumimoji="1" lang="ja-JP" altLang="en-US"/>
           </a:p>
@@ -6301,7 +6301,7 @@
           <a:p>
             <a:fld id="{B27B0317-28AF-43C5-8944-AADFA89E0149}" type="datetime1">
               <a:rPr kumimoji="1" lang="ja-JP" altLang="en-US" smtClean="0"/>
-              <a:t>2023/6/1</a:t>
+              <a:t>2023/6/4</a:t>
             </a:fld>
             <a:endParaRPr kumimoji="1" lang="ja-JP" altLang="en-US"/>
           </a:p>
@@ -6646,7 +6646,7 @@
           <a:p>
             <a:fld id="{A78D023C-C4FA-4CE8-B5BE-6798898EE377}" type="datetime1">
               <a:rPr kumimoji="1" lang="ja-JP" altLang="en-US" smtClean="0"/>
-              <a:t>2023/6/1</a:t>
+              <a:t>2023/6/4</a:t>
             </a:fld>
             <a:endParaRPr kumimoji="1" lang="ja-JP" altLang="en-US"/>
           </a:p>
@@ -8795,7 +8795,7 @@
           <a:p>
             <a:fld id="{99567159-F4A8-4352-915B-DDBEFEF4A4D6}" type="datetime1">
               <a:rPr kumimoji="1" lang="ja-JP" altLang="en-US" smtClean="0"/>
-              <a:t>2023/6/1</a:t>
+              <a:t>2023/6/4</a:t>
             </a:fld>
             <a:endParaRPr kumimoji="1" lang="ja-JP" altLang="en-US"/>
           </a:p>
@@ -9389,7 +9389,7 @@
             </a:r>
             <a:r>
               <a:rPr lang="en-US" altLang="ja-JP"/>
-              <a:t> V4.7.0.0</a:t>
+              <a:t> V4.8.2.1</a:t>
             </a:r>
             <a:endParaRPr lang="ja-JP" altLang="en-US" dirty="0"/>
           </a:p>
@@ -22388,7 +22388,7 @@
             </a:br>
             <a:r>
               <a:rPr kumimoji="1" lang="en-US" altLang="ja-JP" dirty="0"/>
-              <a:t>for MSX</a:t>
+              <a:t>for MSX/PC-6001</a:t>
             </a:r>
             <a:endParaRPr kumimoji="1" lang="ja-JP" altLang="en-US" dirty="0"/>
           </a:p>
@@ -22426,7 +22426,7 @@
             </a:r>
             <a:r>
               <a:rPr kumimoji="1" lang="en-US" altLang="ja-JP" sz="1600" dirty="0"/>
-              <a:t> can drive real MSX machine chips if you use FTDI2xx(232R, </a:t>
+              <a:t> can drive real chips on MSX/P6 if you use FTDI2xx(232R, </a:t>
             </a:r>
             <a:r>
               <a:rPr kumimoji="1" lang="en-US" altLang="ja-JP" sz="1600" b="1" dirty="0"/>
@@ -22434,14 +22434,14 @@
             </a:r>
             <a:r>
               <a:rPr kumimoji="1" lang="en-US" altLang="ja-JP" sz="1600" dirty="0"/>
-              <a:t> and so on). Currently supports NTSC MSX for AY-3-8910 and OPLL and SCC+ and OPL3.</a:t>
+              <a:t> and so on). Currently supports NTSC MSX for AY-3-8910,OPLL,SCC+,OPM,OPNA,OPL3,Y8950.</a:t>
             </a:r>
             <a:br>
               <a:rPr kumimoji="1" lang="en-US" altLang="ja-JP" sz="1600" dirty="0"/>
             </a:br>
             <a:r>
               <a:rPr kumimoji="1" lang="en-US" altLang="ja-JP" sz="1400" b="1" dirty="0"/>
-              <a:t>NOTE: Be sure to select proper SLOT# for SCC to use SCC.</a:t>
+              <a:t>NOTE1: Be sure to select proper SLOT# for SCC to use SCC.</a:t>
             </a:r>
             <a:br>
               <a:rPr kumimoji="1" lang="en-US" altLang="ja-JP" sz="1400" b="1" dirty="0"/>
@@ -22456,7 +22456,30 @@
             </a:r>
             <a:r>
               <a:rPr kumimoji="1" lang="en-US" altLang="ja-JP" sz="1400" b="1" dirty="0"/>
-              <a:t> value to 17~ for each chip.</a:t>
+              <a:t> value to 25 for each chip on normal MSX. If you have a </a:t>
+            </a:r>
+            <a:r>
+              <a:rPr kumimoji="1" lang="en-US" altLang="ja-JP" sz="1400" b="1" dirty="0" err="1"/>
+              <a:t>tR</a:t>
+            </a:r>
+            <a:r>
+              <a:rPr kumimoji="1" lang="en-US" altLang="ja-JP" sz="1400" b="1" dirty="0"/>
+              <a:t>, you can decrease value.</a:t>
+            </a:r>
+            <a:br>
+              <a:rPr kumimoji="1" lang="en-US" altLang="ja-JP" sz="1400" b="1" dirty="0"/>
+            </a:br>
+            <a:r>
+              <a:rPr kumimoji="1" lang="en-US" altLang="ja-JP" sz="1400" b="1" dirty="0"/>
+              <a:t>NOTE2: You can not use the VGM_P6M.ROM on </a:t>
+            </a:r>
+            <a:r>
+              <a:rPr kumimoji="1" lang="ja-JP" altLang="en-US" sz="1400" b="1" dirty="0"/>
+              <a:t>戦士のカートリッジ </a:t>
+            </a:r>
+            <a:r>
+              <a:rPr kumimoji="1" lang="en-US" altLang="ja-JP" sz="1400" b="1" dirty="0"/>
+              <a:t>for PC-6001</a:t>
             </a:r>
           </a:p>
           <a:p>
@@ -22631,7 +22654,23 @@
             </a:pPr>
             <a:r>
               <a:rPr lang="en-US" altLang="ja-JP" dirty="0"/>
-              <a:t>Solder like the following and connect it to the JOYSTICK PORT 2.</a:t>
+              <a:t>Solder like the following and connect it to the JOYSTICK </a:t>
+            </a:r>
+            <a:r>
+              <a:rPr lang="en-US" altLang="ja-JP" b="1" dirty="0"/>
+              <a:t>P2</a:t>
+            </a:r>
+            <a:r>
+              <a:rPr lang="en-US" altLang="ja-JP" dirty="0"/>
+              <a:t>(MSX), </a:t>
+            </a:r>
+            <a:r>
+              <a:rPr lang="en-US" altLang="ja-JP" b="1" dirty="0"/>
+              <a:t>P1</a:t>
+            </a:r>
+            <a:r>
+              <a:rPr lang="en-US" altLang="ja-JP" dirty="0"/>
+              <a:t>(P6).</a:t>
             </a:r>
           </a:p>
           <a:p>
@@ -22661,10 +22700,10 @@
         </p:nvGrpSpPr>
         <p:grpSpPr>
           <a:xfrm>
-            <a:off x="7838509" y="4752044"/>
-            <a:ext cx="2659093" cy="2043975"/>
-            <a:chOff x="8285813" y="5095875"/>
-            <a:chExt cx="2211789" cy="1700144"/>
+            <a:off x="7838509" y="5095267"/>
+            <a:ext cx="2659093" cy="1487807"/>
+            <a:chOff x="8285813" y="5155659"/>
+            <a:chExt cx="2211789" cy="1237533"/>
           </a:xfrm>
         </p:grpSpPr>
         <p:pic>
@@ -22689,13 +22728,13 @@
                 </a:ext>
               </a:extLst>
             </a:blip>
-            <a:srcRect t="25408" b="38518"/>
+            <a:srcRect t="28053" b="38519"/>
             <a:stretch/>
           </p:blipFill>
           <p:spPr bwMode="auto">
             <a:xfrm>
-              <a:off x="8285813" y="5095875"/>
-              <a:ext cx="2211789" cy="815348"/>
+              <a:off x="8285813" y="5155659"/>
+              <a:ext cx="2211789" cy="755564"/>
             </a:xfrm>
             <a:prstGeom prst="rect">
               <a:avLst/>
@@ -22734,13 +22773,13 @@
                 </a:ext>
               </a:extLst>
             </a:blip>
-            <a:srcRect t="25407" r="34715" b="-628"/>
+            <a:srcRect t="29485" r="34715" b="17194"/>
             <a:stretch/>
           </p:blipFill>
           <p:spPr bwMode="auto">
             <a:xfrm>
-              <a:off x="8285813" y="5095875"/>
-              <a:ext cx="1443975" cy="1700144"/>
+              <a:off x="8285813" y="5188029"/>
+              <a:ext cx="1443975" cy="1205163"/>
             </a:xfrm>
             <a:prstGeom prst="rect">
               <a:avLst/>
@@ -22789,13 +22828,13 @@
               </a:ext>
             </a:extLst>
           </a:blip>
-          <a:srcRect/>
+          <a:srcRect l="19181" t="21978" r="34760" b="14235"/>
           <a:stretch/>
         </p:blipFill>
         <p:spPr>
           <a:xfrm>
-            <a:off x="3741653" y="4958978"/>
-            <a:ext cx="4167595" cy="1427921"/>
+            <a:off x="4541046" y="5544154"/>
+            <a:ext cx="1919542" cy="910833"/>
           </a:xfrm>
           <a:prstGeom prst="rect">
             <a:avLst/>
@@ -22818,7 +22857,7 @@
         </p:nvCxnSpPr>
         <p:spPr>
           <a:xfrm>
-            <a:off x="5234586" y="5792453"/>
+            <a:off x="5234586" y="6063803"/>
             <a:ext cx="2674662" cy="118769"/>
           </a:xfrm>
           <a:prstGeom prst="bentConnector3">
@@ -22862,8 +22901,8 @@
         </p:nvSpPr>
         <p:spPr>
           <a:xfrm>
-            <a:off x="4995360" y="6413339"/>
-            <a:ext cx="1257098" cy="307777"/>
+            <a:off x="4541046" y="6523326"/>
+            <a:ext cx="1919542" cy="307777"/>
           </a:xfrm>
           <a:prstGeom prst="rect">
             <a:avLst/>
@@ -22879,7 +22918,7 @@
             <a:pPr algn="ctr"/>
             <a:r>
               <a:rPr lang="en-US" altLang="ja-JP" sz="1400" dirty="0"/>
-              <a:t>MSX</a:t>
+              <a:t>MSX/PC-6001</a:t>
             </a:r>
             <a:endParaRPr lang="en-US" altLang="ja-JP" sz="1400" i="1" dirty="0"/>
           </a:p>
@@ -22899,7 +22938,7 @@
         </p:nvSpPr>
         <p:spPr>
           <a:xfrm>
-            <a:off x="9653490" y="5741255"/>
+            <a:off x="9653490" y="5803236"/>
             <a:ext cx="2538510" cy="369332"/>
           </a:xfrm>
           <a:prstGeom prst="rect">
@@ -22945,7 +22984,7 @@
         </p:nvCxnSpPr>
         <p:spPr>
           <a:xfrm flipV="1">
-            <a:off x="5186363" y="5108038"/>
+            <a:off x="5186363" y="5379388"/>
             <a:ext cx="2726756" cy="564902"/>
           </a:xfrm>
           <a:prstGeom prst="bentConnector3">
@@ -22991,7 +23030,7 @@
         </p:nvCxnSpPr>
         <p:spPr>
           <a:xfrm flipV="1">
-            <a:off x="5305426" y="5191125"/>
+            <a:off x="5305426" y="5462475"/>
             <a:ext cx="2607693" cy="491344"/>
           </a:xfrm>
           <a:prstGeom prst="bentConnector3">
@@ -23040,7 +23079,7 @@
         </p:nvCxnSpPr>
         <p:spPr>
           <a:xfrm flipV="1">
-            <a:off x="5415134" y="5272804"/>
+            <a:off x="5415134" y="5544154"/>
             <a:ext cx="2497985" cy="409663"/>
           </a:xfrm>
           <a:prstGeom prst="bentConnector3">
@@ -23088,7 +23127,7 @@
         </p:nvCxnSpPr>
         <p:spPr>
           <a:xfrm flipV="1">
-            <a:off x="5554359" y="5341143"/>
+            <a:off x="5554359" y="5612493"/>
             <a:ext cx="2354889" cy="331796"/>
           </a:xfrm>
           <a:prstGeom prst="bentConnector3">
@@ -23137,7 +23176,7 @@
         </p:nvCxnSpPr>
         <p:spPr>
           <a:xfrm flipV="1">
-            <a:off x="5597525" y="5029200"/>
+            <a:off x="5597525" y="5300550"/>
             <a:ext cx="2317750" cy="767231"/>
           </a:xfrm>
           <a:prstGeom prst="bentConnector3">
@@ -23181,7 +23220,7 @@
         </p:nvSpPr>
         <p:spPr>
           <a:xfrm>
-            <a:off x="7862740" y="5786906"/>
+            <a:off x="7862740" y="6058256"/>
             <a:ext cx="485830" cy="307777"/>
           </a:xfrm>
           <a:prstGeom prst="rect">
@@ -23232,7 +23271,7 @@
         </p:nvCxnSpPr>
         <p:spPr>
           <a:xfrm rot="10800000" flipV="1">
-            <a:off x="8155781" y="5610225"/>
+            <a:off x="8155781" y="5881575"/>
             <a:ext cx="913650" cy="285750"/>
           </a:xfrm>
           <a:prstGeom prst="bentConnector3">
@@ -23278,7 +23317,7 @@
         </p:nvCxnSpPr>
         <p:spPr>
           <a:xfrm rot="10800000" flipV="1">
-            <a:off x="8155781" y="5705474"/>
+            <a:off x="8155781" y="5976824"/>
             <a:ext cx="1061334" cy="283369"/>
           </a:xfrm>
           <a:prstGeom prst="bentConnector3">
@@ -23324,7 +23363,7 @@
         </p:nvCxnSpPr>
         <p:spPr>
           <a:xfrm>
-            <a:off x="5353050" y="5796431"/>
+            <a:off x="5353050" y="6067781"/>
             <a:ext cx="2556198" cy="192414"/>
           </a:xfrm>
           <a:prstGeom prst="bentConnector3">
@@ -23368,7 +23407,7 @@
         </p:nvCxnSpPr>
         <p:spPr>
           <a:xfrm>
-            <a:off x="9069431" y="5413023"/>
+            <a:off x="9069431" y="5684373"/>
             <a:ext cx="0" cy="203865"/>
           </a:xfrm>
           <a:prstGeom prst="line">
@@ -23465,7 +23504,7 @@
         </p:blipFill>
         <p:spPr>
           <a:xfrm>
-            <a:off x="7730352" y="5314704"/>
+            <a:off x="7730352" y="5586054"/>
             <a:ext cx="574698" cy="574698"/>
           </a:xfrm>
           <a:prstGeom prst="rect">
@@ -23489,7 +23528,7 @@
         </p:nvCxnSpPr>
         <p:spPr>
           <a:xfrm>
-            <a:off x="9216331" y="5413023"/>
+            <a:off x="9216331" y="5684373"/>
             <a:ext cx="0" cy="292451"/>
           </a:xfrm>
           <a:prstGeom prst="line">
@@ -23530,7 +23569,7 @@
         </p:nvSpPr>
         <p:spPr>
           <a:xfrm>
-            <a:off x="9598738" y="5512655"/>
+            <a:off x="9598738" y="5784005"/>
             <a:ext cx="1121578" cy="283864"/>
           </a:xfrm>
           <a:prstGeom prst="rect">
@@ -23582,8 +23621,8 @@
         </p:nvSpPr>
         <p:spPr>
           <a:xfrm>
-            <a:off x="8859519" y="5970263"/>
-            <a:ext cx="739219" cy="799140"/>
+            <a:off x="8721253" y="6241613"/>
+            <a:ext cx="1018800" cy="450758"/>
           </a:xfrm>
           <a:prstGeom prst="rect">
             <a:avLst/>
@@ -23614,7 +23653,7 @@
           <a:p>
             <a:pPr algn="ctr"/>
             <a:r>
-              <a:rPr kumimoji="1" lang="en-US" altLang="ja-JP" sz="1200" b="1" dirty="0">
+              <a:rPr kumimoji="1" lang="en-US" altLang="ja-JP" sz="1050" b="1" dirty="0">
                 <a:solidFill>
                   <a:srgbClr val="FF0000"/>
                 </a:solidFill>
@@ -23622,7 +23661,7 @@
               <a:t>Do</a:t>
             </a:r>
             <a:r>
-              <a:rPr kumimoji="1" lang="ja-JP" altLang="en-US" sz="1200" b="1" dirty="0">
+              <a:rPr kumimoji="1" lang="ja-JP" altLang="en-US" sz="1050" b="1" dirty="0">
                 <a:solidFill>
                   <a:srgbClr val="FF0000"/>
                 </a:solidFill>
@@ -23630,7 +23669,7 @@
               <a:t> </a:t>
             </a:r>
             <a:r>
-              <a:rPr kumimoji="1" lang="en-US" altLang="ja-JP" sz="1200" b="1" dirty="0">
+              <a:rPr kumimoji="1" lang="en-US" altLang="ja-JP" sz="1050" b="1" dirty="0">
                 <a:solidFill>
                   <a:srgbClr val="FF0000"/>
                 </a:solidFill>
@@ -23641,14 +23680,14 @@
           <a:p>
             <a:pPr algn="ctr"/>
             <a:r>
-              <a:rPr kumimoji="1" lang="en-US" altLang="ja-JP" sz="1200" b="1" dirty="0">
+              <a:rPr kumimoji="1" lang="en-US" altLang="ja-JP" sz="1050" b="1" dirty="0">
                 <a:solidFill>
                   <a:srgbClr val="FF0000"/>
                 </a:solidFill>
               </a:rPr>
               <a:t>short any pin.</a:t>
             </a:r>
-            <a:endParaRPr kumimoji="1" lang="ja-JP" altLang="en-US" sz="1200" b="1" dirty="0">
+            <a:endParaRPr kumimoji="1" lang="ja-JP" altLang="en-US" sz="1050" b="1" dirty="0">
               <a:solidFill>
                 <a:srgbClr val="FF0000"/>
               </a:solidFill>
@@ -23672,7 +23711,7 @@
         </p:nvCxnSpPr>
         <p:spPr>
           <a:xfrm flipV="1">
-            <a:off x="5673090" y="4932251"/>
+            <a:off x="5673090" y="5203601"/>
             <a:ext cx="2242185" cy="736662"/>
           </a:xfrm>
           <a:prstGeom prst="bentConnector3">
@@ -23823,7 +23862,7 @@
                   <a:srgbClr val="FF0000"/>
                 </a:solidFill>
               </a:rPr>
-              <a:t>We recommend to use ARMSID with ADSR bud fixing.</a:t>
+              <a:t>I recommend to use ARMSID with ADSR bud fixing.</a:t>
             </a:r>
             <a:endParaRPr kumimoji="1" lang="en-US" altLang="ja-JP" b="1" dirty="0"/>
           </a:p>
@@ -24135,13 +24174,13 @@
               </a:ext>
             </a:extLst>
           </a:blip>
-          <a:srcRect/>
+          <a:srcRect l="17183" r="34991"/>
           <a:stretch/>
         </p:blipFill>
         <p:spPr>
           <a:xfrm>
-            <a:off x="3745524" y="4958979"/>
-            <a:ext cx="4167595" cy="1427921"/>
+            <a:off x="4461649" y="4958979"/>
+            <a:ext cx="1993199" cy="1427921"/>
           </a:xfrm>
           <a:prstGeom prst="rect">
             <a:avLst/>
@@ -24208,8 +24247,8 @@
         </p:nvSpPr>
         <p:spPr>
           <a:xfrm>
-            <a:off x="4995360" y="6413339"/>
-            <a:ext cx="1257098" cy="307777"/>
+            <a:off x="4612640" y="6413339"/>
+            <a:ext cx="1639818" cy="307777"/>
           </a:xfrm>
           <a:prstGeom prst="rect">
             <a:avLst/>
@@ -24225,7 +24264,7 @@
             <a:pPr algn="ctr"/>
             <a:r>
               <a:rPr lang="en-US" altLang="ja-JP" sz="1400" dirty="0"/>
-              <a:t>C64</a:t>
+              <a:t>Commodore 64</a:t>
             </a:r>
             <a:endParaRPr lang="en-US" altLang="ja-JP" sz="1400" i="1" dirty="0"/>
           </a:p>
@@ -25301,7 +25340,7 @@
             </a:r>
             <a:r>
               <a:rPr kumimoji="1" lang="en-US" altLang="ja-JP" dirty="0"/>
-              <a:t>(for Genesis) or </a:t>
+              <a:t>(for Genesis), </a:t>
             </a:r>
             <a:r>
               <a:rPr kumimoji="1" lang="en-US" altLang="ja-JP" dirty="0" err="1"/>
@@ -25309,15 +25348,19 @@
             </a:r>
             <a:r>
               <a:rPr kumimoji="1" lang="en-US" altLang="ja-JP" dirty="0"/>
-              <a:t>(for SMS) or VGMPlay_nes*.* (for </a:t>
+              <a:t>(for SMS), VGMPlay_nes*.* (for </a:t>
             </a:r>
             <a:r>
               <a:rPr kumimoji="1" lang="en-US" altLang="ja-JP" dirty="0" err="1"/>
               <a:t>Famicom</a:t>
             </a:r>
             <a:r>
+              <a:rPr kumimoji="1" lang="en-US" altLang="ja-JP" baseline="30000" dirty="0"/>
+              <a:t>*1</a:t>
+            </a:r>
+            <a:r>
               <a:rPr kumimoji="1" lang="en-US" altLang="ja-JP" dirty="0"/>
-              <a:t>) or </a:t>
+              <a:t>), </a:t>
             </a:r>
             <a:r>
               <a:rPr kumimoji="1" lang="en-US" altLang="ja-JP" dirty="0" err="1"/>
@@ -25325,15 +25368,23 @@
             </a:r>
             <a:r>
               <a:rPr kumimoji="1" lang="en-US" altLang="ja-JP" dirty="0"/>
-              <a:t>/P6.rom(for MSX*/PC-6001) or VGMPlay_</a:t>
+              <a:t>*(for MSX</a:t>
+            </a:r>
+            <a:r>
+              <a:rPr kumimoji="1" lang="en-US" altLang="ja-JP" baseline="30000" dirty="0"/>
+              <a:t>*2</a:t>
+            </a:r>
+            <a:r>
+              <a:rPr kumimoji="1" lang="en-US" altLang="ja-JP" dirty="0"/>
+              <a:t>), P6*.rom(for PC-6001), VGMPlay_</a:t>
             </a:r>
             <a:r>
               <a:rPr lang="en-US" altLang="ja-JP" dirty="0"/>
-              <a:t>c64.prg </a:t>
+              <a:t>c64.prg(for V64) </a:t>
             </a:r>
             <a:r>
               <a:rPr kumimoji="1" lang="en-US" altLang="ja-JP" dirty="0"/>
-              <a:t>to your FLASH Cart and so on.</a:t>
+              <a:t>to your FLASH Cart/ROM/Tape and so on.</a:t>
             </a:r>
           </a:p>
           <a:p>
@@ -25342,7 +25393,7 @@
             </a:pPr>
             <a:r>
               <a:rPr lang="en-US" altLang="ja-JP" sz="1300" dirty="0"/>
-              <a:t>*VGMPlay_nes_vrc6/</a:t>
+              <a:t>*1 VGMPlay_nes_vrc6/</a:t>
             </a:r>
             <a:r>
               <a:rPr kumimoji="1" lang="en-US" altLang="ja-JP" sz="1300" dirty="0" err="1"/>
@@ -25369,7 +25420,7 @@
             </a:br>
             <a:r>
               <a:rPr kumimoji="1" lang="en-US" altLang="ja-JP" sz="1300" dirty="0"/>
-              <a:t>*</a:t>
+              <a:t>*2 </a:t>
             </a:r>
             <a:r>
               <a:rPr kumimoji="1" lang="en-US" altLang="ja-JP" sz="1300" dirty="0" err="1"/>
@@ -25571,12 +25622,17 @@
         </p:blipFill>
         <p:spPr>
           <a:xfrm>
-            <a:off x="3728707" y="3430800"/>
+            <a:off x="3728707" y="3539174"/>
             <a:ext cx="4734586" cy="1105054"/>
           </a:xfrm>
           <a:prstGeom prst="rect">
             <a:avLst/>
           </a:prstGeom>
+          <a:ln>
+            <a:solidFill>
+              <a:schemeClr val="tx1"/>
+            </a:solidFill>
+          </a:ln>
         </p:spPr>
       </p:pic>
       <p:sp>

</xml_diff>

<commit_message>
updated manual (added URL link about fake FT232R chip)
</commit_message>
<xml_diff>
--- a/docs/MAmidiMEmo/Manual.pptx
+++ b/docs/MAmidiMEmo/Manual.pptx
@@ -14814,24 +14814,28 @@
                 <a:ea typeface="メイリオ" panose="020B0604030504040204" pitchFamily="50" charset="-128"/>
                 <a:cs typeface="+mn-cs"/>
               </a:rPr>
-              <a:t>*WARN* Please use genuine dongle.</a:t>
-            </a:r>
-            <a:r>
-              <a:rPr kumimoji="1" lang="en-US" altLang="ja-JP" sz="1100" b="0" i="0" u="none" strike="noStrike" kern="1200" cap="none" spc="0" normalizeH="0" baseline="0" noProof="0" dirty="0">
-                <a:ln>
-                  <a:noFill/>
-                </a:ln>
+              <a:t>*WARN* Please use a </a:t>
+            </a:r>
+            <a:r>
+              <a:rPr lang="en-US" altLang="ja-JP" sz="1100" b="1" dirty="0">
                 <a:solidFill>
                   <a:srgbClr val="FF0000"/>
                 </a:solidFill>
-                <a:effectLst/>
-                <a:uLnTx/>
-                <a:uFillTx/>
                 <a:latin typeface="Century Gothic" panose="020B0502020202020204"/>
                 <a:ea typeface="メイリオ" panose="020B0604030504040204" pitchFamily="50" charset="-128"/>
-                <a:cs typeface="+mn-cs"/>
+                <a:hlinkClick r:id="rId3"/>
               </a:rPr>
-              <a:t> </a:t>
+              <a:t>genuine dongle</a:t>
+            </a:r>
+            <a:r>
+              <a:rPr lang="en-US" altLang="ja-JP" sz="1100" b="1" dirty="0">
+                <a:solidFill>
+                  <a:srgbClr val="FF0000"/>
+                </a:solidFill>
+                <a:latin typeface="Century Gothic" panose="020B0502020202020204"/>
+                <a:ea typeface="メイリオ" panose="020B0604030504040204" pitchFamily="50" charset="-128"/>
+              </a:rPr>
+              <a:t>.</a:t>
             </a:r>
             <a:r>
               <a:rPr kumimoji="1" lang="en-US" altLang="ja-JP" sz="1100" b="0" i="0" u="none" strike="noStrike" kern="1200" cap="none" spc="0" normalizeH="0" baseline="0" noProof="0" dirty="0">
@@ -14959,7 +14963,7 @@
             <p:nvPr/>
           </p:nvPicPr>
           <p:blipFill rotWithShape="1">
-            <a:blip r:embed="rId3">
+            <a:blip r:embed="rId4">
               <a:extLst>
                 <a:ext uri="{28A0092B-C50C-407E-A947-70E740481C1C}">
                   <a14:useLocalDpi xmlns:a14="http://schemas.microsoft.com/office/drawing/2010/main" val="0"/>
@@ -15004,7 +15008,7 @@
             <p:nvPr/>
           </p:nvPicPr>
           <p:blipFill rotWithShape="1">
-            <a:blip r:embed="rId3">
+            <a:blip r:embed="rId4">
               <a:extLst>
                 <a:ext uri="{28A0092B-C50C-407E-A947-70E740481C1C}">
                   <a14:useLocalDpi xmlns:a14="http://schemas.microsoft.com/office/drawing/2010/main" val="0"/>
@@ -15050,11 +15054,11 @@
           <p:nvPr/>
         </p:nvPicPr>
         <p:blipFill rotWithShape="1">
-          <a:blip r:embed="rId4">
+          <a:blip r:embed="rId5">
             <a:extLst>
               <a:ext uri="{BEBA8EAE-BF5A-486C-A8C5-ECC9F3942E4B}">
                 <a14:imgProps xmlns:a14="http://schemas.microsoft.com/office/drawing/2010/main">
-                  <a14:imgLayer r:embed="rId5">
+                  <a14:imgLayer r:embed="rId6">
                     <a14:imgEffect>
                       <a14:brightnessContrast bright="40000" contrast="-40000"/>
                     </a14:imgEffect>
@@ -15912,11 +15916,11 @@
           <p:nvPr/>
         </p:nvPicPr>
         <p:blipFill>
-          <a:blip r:embed="rId6">
+          <a:blip r:embed="rId7">
             <a:extLst>
               <a:ext uri="{BEBA8EAE-BF5A-486C-A8C5-ECC9F3942E4B}">
                 <a14:imgProps xmlns:a14="http://schemas.microsoft.com/office/drawing/2010/main">
-                  <a14:imgLayer r:embed="rId7">
+                  <a14:imgLayer r:embed="rId8">
                     <a14:imgEffect>
                       <a14:backgroundRemoval t="9942" b="89474" l="7310" r="92690">
                         <a14:foregroundMark x1="75146" y1="29240" x2="40643" y2="53216"/>
@@ -16345,7 +16349,42 @@
                 <a:ea typeface="メイリオ" panose="020B0604030504040204" pitchFamily="50" charset="-128"/>
                 <a:cs typeface="+mn-cs"/>
               </a:rPr>
-              <a:t>*WARN* Please use genuine dongle.</a:t>
+              <a:t>*WARN* Please use a </a:t>
+            </a:r>
+            <a:r>
+              <a:rPr kumimoji="1" lang="en-US" altLang="ja-JP" sz="1100" b="1" i="0" u="none" strike="noStrike" kern="1200" cap="none" spc="0" normalizeH="0" baseline="0" noProof="0" dirty="0">
+                <a:ln>
+                  <a:noFill/>
+                </a:ln>
+                <a:solidFill>
+                  <a:srgbClr val="FF0000"/>
+                </a:solidFill>
+                <a:effectLst/>
+                <a:uLnTx/>
+                <a:uFillTx/>
+                <a:latin typeface="Century Gothic" panose="020B0502020202020204"/>
+                <a:ea typeface="メイリオ" panose="020B0604030504040204" pitchFamily="50" charset="-128"/>
+                <a:cs typeface="+mn-cs"/>
+                <a:hlinkClick r:id="rId3"/>
+              </a:rPr>
+              <a:t>genuine dongle</a:t>
+            </a:r>
+            <a:r>
+              <a:rPr kumimoji="1" lang="en-US" altLang="ja-JP" sz="1100" b="1" i="0" u="none" strike="noStrike" kern="1200" cap="none" spc="0" normalizeH="0" baseline="0" noProof="0" dirty="0">
+                <a:ln>
+                  <a:noFill/>
+                </a:ln>
+                <a:solidFill>
+                  <a:srgbClr val="FF0000"/>
+                </a:solidFill>
+                <a:effectLst/>
+                <a:uLnTx/>
+                <a:uFillTx/>
+                <a:latin typeface="Century Gothic" panose="020B0502020202020204"/>
+                <a:ea typeface="メイリオ" panose="020B0604030504040204" pitchFamily="50" charset="-128"/>
+                <a:cs typeface="+mn-cs"/>
+              </a:rPr>
+              <a:t>.</a:t>
             </a:r>
             <a:r>
               <a:rPr kumimoji="1" lang="en-US" altLang="ja-JP" sz="1100" b="0" i="0" u="none" strike="noStrike" kern="1200" cap="none" spc="0" normalizeH="0" baseline="0" noProof="0" dirty="0">
@@ -16461,7 +16500,7 @@
           <p:nvPr/>
         </p:nvPicPr>
         <p:blipFill rotWithShape="1">
-          <a:blip r:embed="rId3">
+          <a:blip r:embed="rId4">
             <a:extLst>
               <a:ext uri="{28A0092B-C50C-407E-A947-70E740481C1C}">
                 <a14:useLocalDpi xmlns:a14="http://schemas.microsoft.com/office/drawing/2010/main" val="0"/>
@@ -16516,7 +16555,7 @@
             <p:nvPr/>
           </p:nvPicPr>
           <p:blipFill rotWithShape="1">
-            <a:blip r:embed="rId4">
+            <a:blip r:embed="rId5">
               <a:extLst>
                 <a:ext uri="{28A0092B-C50C-407E-A947-70E740481C1C}">
                   <a14:useLocalDpi xmlns:a14="http://schemas.microsoft.com/office/drawing/2010/main" val="0"/>
@@ -16561,7 +16600,7 @@
             <p:nvPr/>
           </p:nvPicPr>
           <p:blipFill rotWithShape="1">
-            <a:blip r:embed="rId4">
+            <a:blip r:embed="rId5">
               <a:extLst>
                 <a:ext uri="{28A0092B-C50C-407E-A947-70E740481C1C}">
                   <a14:useLocalDpi xmlns:a14="http://schemas.microsoft.com/office/drawing/2010/main" val="0"/>
@@ -17123,11 +17162,11 @@
           <p:nvPr/>
         </p:nvPicPr>
         <p:blipFill>
-          <a:blip r:embed="rId5">
+          <a:blip r:embed="rId6">
             <a:extLst>
               <a:ext uri="{BEBA8EAE-BF5A-486C-A8C5-ECC9F3942E4B}">
                 <a14:imgProps xmlns:a14="http://schemas.microsoft.com/office/drawing/2010/main">
-                  <a14:imgLayer r:embed="rId6">
+                  <a14:imgLayer r:embed="rId7">
                     <a14:imgEffect>
                       <a14:backgroundRemoval t="9942" b="89474" l="7310" r="92690">
                         <a14:foregroundMark x1="75146" y1="29240" x2="40643" y2="53216"/>
@@ -22585,7 +22624,28 @@
                 <a:ea typeface="メイリオ" panose="020B0604030504040204" pitchFamily="50" charset="-128"/>
                 <a:cs typeface="+mn-cs"/>
               </a:rPr>
-              <a:t>*WARN* Please use genuine dongle.</a:t>
+              <a:t>*WARN* Please use a </a:t>
+            </a:r>
+            <a:r>
+              <a:rPr lang="en-US" altLang="ja-JP" sz="1100" b="1" dirty="0">
+                <a:solidFill>
+                  <a:srgbClr val="FF0000"/>
+                </a:solidFill>
+                <a:latin typeface="Century Gothic" panose="020B0502020202020204"/>
+                <a:ea typeface="メイリオ" panose="020B0604030504040204" pitchFamily="50" charset="-128"/>
+                <a:hlinkClick r:id="rId4"/>
+              </a:rPr>
+              <a:t>genuine dongle</a:t>
+            </a:r>
+            <a:r>
+              <a:rPr lang="en-US" altLang="ja-JP" sz="1100" b="1" dirty="0">
+                <a:solidFill>
+                  <a:srgbClr val="FF0000"/>
+                </a:solidFill>
+                <a:latin typeface="Century Gothic" panose="020B0502020202020204"/>
+                <a:ea typeface="メイリオ" panose="020B0604030504040204" pitchFamily="50" charset="-128"/>
+              </a:rPr>
+              <a:t>.</a:t>
             </a:r>
             <a:r>
               <a:rPr kumimoji="1" lang="en-US" altLang="ja-JP" sz="1100" b="0" i="0" u="none" strike="noStrike" kern="1200" cap="none" spc="0" normalizeH="0" baseline="0" noProof="0" dirty="0">
@@ -22721,7 +22781,7 @@
             <p:nvPr/>
           </p:nvPicPr>
           <p:blipFill rotWithShape="1">
-            <a:blip r:embed="rId4">
+            <a:blip r:embed="rId5">
               <a:extLst>
                 <a:ext uri="{28A0092B-C50C-407E-A947-70E740481C1C}">
                   <a14:useLocalDpi xmlns:a14="http://schemas.microsoft.com/office/drawing/2010/main" val="0"/>
@@ -22766,7 +22826,7 @@
             <p:nvPr/>
           </p:nvPicPr>
           <p:blipFill rotWithShape="1">
-            <a:blip r:embed="rId4">
+            <a:blip r:embed="rId5">
               <a:extLst>
                 <a:ext uri="{28A0092B-C50C-407E-A947-70E740481C1C}">
                   <a14:useLocalDpi xmlns:a14="http://schemas.microsoft.com/office/drawing/2010/main" val="0"/>
@@ -22812,11 +22872,11 @@
           <p:nvPr/>
         </p:nvPicPr>
         <p:blipFill rotWithShape="1">
-          <a:blip r:embed="rId5">
+          <a:blip r:embed="rId6">
             <a:extLst>
               <a:ext uri="{BEBA8EAE-BF5A-486C-A8C5-ECC9F3942E4B}">
                 <a14:imgProps xmlns:a14="http://schemas.microsoft.com/office/drawing/2010/main">
-                  <a14:imgLayer r:embed="rId6">
+                  <a14:imgLayer r:embed="rId7">
                     <a14:imgEffect>
                       <a14:brightnessContrast bright="40000" contrast="-40000"/>
                     </a14:imgEffect>
@@ -23473,11 +23533,11 @@
           <p:nvPr/>
         </p:nvPicPr>
         <p:blipFill>
-          <a:blip r:embed="rId7">
+          <a:blip r:embed="rId8">
             <a:extLst>
               <a:ext uri="{BEBA8EAE-BF5A-486C-A8C5-ECC9F3942E4B}">
                 <a14:imgProps xmlns:a14="http://schemas.microsoft.com/office/drawing/2010/main">
-                  <a14:imgLayer r:embed="rId8">
+                  <a14:imgLayer r:embed="rId9">
                     <a14:imgEffect>
                       <a14:backgroundRemoval t="9942" b="89474" l="7310" r="92690">
                         <a14:foregroundMark x1="75146" y1="29240" x2="40643" y2="53216"/>
@@ -23937,7 +23997,62 @@
                 <a:ea typeface="メイリオ" panose="020B0604030504040204" pitchFamily="50" charset="-128"/>
                 <a:cs typeface="+mn-cs"/>
               </a:rPr>
-              <a:t>*WARN* Please use genuine dongle.</a:t>
+              <a:t>*WARN* Please </a:t>
+            </a:r>
+            <a:r>
+              <a:rPr kumimoji="1" lang="en-US" altLang="ja-JP" sz="1100" b="1" i="0" u="none" strike="noStrike" kern="1200" cap="none" spc="0" normalizeH="0" baseline="0" noProof="0" dirty="0" err="1">
+                <a:ln>
+                  <a:noFill/>
+                </a:ln>
+                <a:solidFill>
+                  <a:srgbClr val="FF0000"/>
+                </a:solidFill>
+                <a:effectLst/>
+                <a:uLnTx/>
+                <a:uFillTx/>
+                <a:latin typeface="Century Gothic" panose="020B0502020202020204"/>
+                <a:ea typeface="メイリオ" panose="020B0604030504040204" pitchFamily="50" charset="-128"/>
+                <a:cs typeface="+mn-cs"/>
+              </a:rPr>
+              <a:t>usea</a:t>
+            </a:r>
+            <a:r>
+              <a:rPr kumimoji="1" lang="en-US" altLang="ja-JP" sz="1100" b="1" i="0" u="none" strike="noStrike" kern="1200" cap="none" spc="0" normalizeH="0" baseline="0" noProof="0" dirty="0">
+                <a:ln>
+                  <a:noFill/>
+                </a:ln>
+                <a:solidFill>
+                  <a:srgbClr val="FF0000"/>
+                </a:solidFill>
+                <a:effectLst/>
+                <a:uLnTx/>
+                <a:uFillTx/>
+                <a:latin typeface="Century Gothic" panose="020B0502020202020204"/>
+                <a:ea typeface="メイリオ" panose="020B0604030504040204" pitchFamily="50" charset="-128"/>
+                <a:cs typeface="+mn-cs"/>
+              </a:rPr>
+              <a:t> </a:t>
+            </a:r>
+            <a:r>
+              <a:rPr lang="en-US" altLang="ja-JP" sz="1100" b="1" dirty="0">
+                <a:solidFill>
+                  <a:srgbClr val="FF0000"/>
+                </a:solidFill>
+                <a:latin typeface="Century Gothic" panose="020B0502020202020204"/>
+                <a:ea typeface="メイリオ" panose="020B0604030504040204" pitchFamily="50" charset="-128"/>
+                <a:hlinkClick r:id="rId3"/>
+              </a:rPr>
+              <a:t>genuine dongle</a:t>
+            </a:r>
+            <a:r>
+              <a:rPr lang="en-US" altLang="ja-JP" sz="1100" b="1" dirty="0">
+                <a:solidFill>
+                  <a:srgbClr val="FF0000"/>
+                </a:solidFill>
+                <a:latin typeface="Century Gothic" panose="020B0502020202020204"/>
+                <a:ea typeface="メイリオ" panose="020B0604030504040204" pitchFamily="50" charset="-128"/>
+              </a:rPr>
+              <a:t>.</a:t>
             </a:r>
             <a:r>
               <a:rPr kumimoji="1" lang="en-US" altLang="ja-JP" sz="1100" b="0" i="0" u="none" strike="noStrike" kern="1200" cap="none" spc="0" normalizeH="0" baseline="0" noProof="0" dirty="0">
@@ -24067,7 +24182,7 @@
             <p:nvPr/>
           </p:nvPicPr>
           <p:blipFill rotWithShape="1">
-            <a:blip r:embed="rId3">
+            <a:blip r:embed="rId4">
               <a:extLst>
                 <a:ext uri="{28A0092B-C50C-407E-A947-70E740481C1C}">
                   <a14:useLocalDpi xmlns:a14="http://schemas.microsoft.com/office/drawing/2010/main" val="0"/>
@@ -24112,7 +24227,7 @@
             <p:nvPr/>
           </p:nvPicPr>
           <p:blipFill rotWithShape="1">
-            <a:blip r:embed="rId3">
+            <a:blip r:embed="rId4">
               <a:extLst>
                 <a:ext uri="{28A0092B-C50C-407E-A947-70E740481C1C}">
                   <a14:useLocalDpi xmlns:a14="http://schemas.microsoft.com/office/drawing/2010/main" val="0"/>
@@ -24158,11 +24273,11 @@
           <p:nvPr/>
         </p:nvPicPr>
         <p:blipFill rotWithShape="1">
-          <a:blip r:embed="rId4">
+          <a:blip r:embed="rId5">
             <a:extLst>
               <a:ext uri="{BEBA8EAE-BF5A-486C-A8C5-ECC9F3942E4B}">
                 <a14:imgProps xmlns:a14="http://schemas.microsoft.com/office/drawing/2010/main">
-                  <a14:imgLayer r:embed="rId5">
+                  <a14:imgLayer r:embed="rId6">
                     <a14:imgEffect>
                       <a14:brightnessContrast bright="40000" contrast="-40000"/>
                     </a14:imgEffect>
@@ -24829,11 +24944,11 @@
           <p:nvPr/>
         </p:nvPicPr>
         <p:blipFill>
-          <a:blip r:embed="rId6">
+          <a:blip r:embed="rId7">
             <a:extLst>
               <a:ext uri="{BEBA8EAE-BF5A-486C-A8C5-ECC9F3942E4B}">
                 <a14:imgProps xmlns:a14="http://schemas.microsoft.com/office/drawing/2010/main">
-                  <a14:imgLayer r:embed="rId7">
+                  <a14:imgLayer r:embed="rId8">
                     <a14:imgEffect>
                       <a14:backgroundRemoval t="9942" b="89474" l="7310" r="92690">
                         <a14:foregroundMark x1="75146" y1="29240" x2="40643" y2="53216"/>

</xml_diff>

<commit_message>
4.9.9.0 Supported PC-8801 OPNA
</commit_message>
<xml_diff>
--- a/docs/MAmidiMEmo/Manual.pptx
+++ b/docs/MAmidiMEmo/Manual.pptx
@@ -239,7 +239,7 @@
           <a:p>
             <a:fld id="{581C28D8-13B6-41C3-9F5F-0284C569C6F1}" type="datetimeFigureOut">
               <a:rPr kumimoji="1" lang="ja-JP" altLang="en-US" smtClean="0"/>
-              <a:t>2023/9/6</a:t>
+              <a:t>2023/9/9</a:t>
             </a:fld>
             <a:endParaRPr kumimoji="1" lang="ja-JP" altLang="en-US"/>
           </a:p>
@@ -1734,7 +1734,7 @@
           <a:p>
             <a:fld id="{B8625E62-B904-4691-B75E-EC1C32885285}" type="datetime1">
               <a:rPr kumimoji="1" lang="ja-JP" altLang="en-US" smtClean="0"/>
-              <a:t>2023/9/6</a:t>
+              <a:t>2023/9/9</a:t>
             </a:fld>
             <a:endParaRPr kumimoji="1" lang="ja-JP" altLang="en-US"/>
           </a:p>
@@ -2072,7 +2072,7 @@
           <a:p>
             <a:fld id="{A4C87007-2A40-4EFC-90A3-258EFA3C1001}" type="datetime1">
               <a:rPr kumimoji="1" lang="ja-JP" altLang="en-US" smtClean="0"/>
-              <a:t>2023/9/6</a:t>
+              <a:t>2023/9/9</a:t>
             </a:fld>
             <a:endParaRPr kumimoji="1" lang="ja-JP" altLang="en-US"/>
           </a:p>
@@ -2473,7 +2473,7 @@
           <a:p>
             <a:fld id="{0FE0D7FF-9203-4AA3-90FD-622674A14F90}" type="datetime1">
               <a:rPr kumimoji="1" lang="ja-JP" altLang="en-US" smtClean="0"/>
-              <a:t>2023/9/6</a:t>
+              <a:t>2023/9/9</a:t>
             </a:fld>
             <a:endParaRPr kumimoji="1" lang="ja-JP" altLang="en-US"/>
           </a:p>
@@ -2809,7 +2809,7 @@
           <a:p>
             <a:fld id="{D2D6E4D3-BEDB-4F35-876B-5B9AA41BFB5B}" type="datetime1">
               <a:rPr kumimoji="1" lang="ja-JP" altLang="en-US" smtClean="0"/>
-              <a:t>2023/9/6</a:t>
+              <a:t>2023/9/9</a:t>
             </a:fld>
             <a:endParaRPr kumimoji="1" lang="ja-JP" altLang="en-US"/>
           </a:p>
@@ -3129,7 +3129,7 @@
           <a:p>
             <a:fld id="{2ACD896E-FC14-4F25-BC47-18ABAEA9E1FE}" type="datetime1">
               <a:rPr kumimoji="1" lang="ja-JP" altLang="en-US" smtClean="0"/>
-              <a:t>2023/9/6</a:t>
+              <a:t>2023/9/9</a:t>
             </a:fld>
             <a:endParaRPr kumimoji="1" lang="ja-JP" altLang="en-US"/>
           </a:p>
@@ -3525,7 +3525,7 @@
           <a:p>
             <a:fld id="{54FC701B-2185-4987-B8E2-5507664B65F4}" type="datetime1">
               <a:rPr kumimoji="1" lang="ja-JP" altLang="en-US" smtClean="0"/>
-              <a:t>2023/9/6</a:t>
+              <a:t>2023/9/9</a:t>
             </a:fld>
             <a:endParaRPr kumimoji="1" lang="ja-JP" altLang="en-US"/>
           </a:p>
@@ -3814,7 +3814,7 @@
           <a:p>
             <a:fld id="{3FB4CDED-9617-418F-B546-D66B9BB6C35E}" type="datetime1">
               <a:rPr kumimoji="1" lang="ja-JP" altLang="en-US" smtClean="0"/>
-              <a:t>2023/9/6</a:t>
+              <a:t>2023/9/9</a:t>
             </a:fld>
             <a:endParaRPr kumimoji="1" lang="ja-JP" altLang="en-US"/>
           </a:p>
@@ -4108,7 +4108,7 @@
           <a:p>
             <a:fld id="{F5635D40-962A-46D7-8037-3F2900B5EB4D}" type="datetime1">
               <a:rPr kumimoji="1" lang="ja-JP" altLang="en-US" smtClean="0"/>
-              <a:t>2023/9/6</a:t>
+              <a:t>2023/9/9</a:t>
             </a:fld>
             <a:endParaRPr kumimoji="1" lang="ja-JP" altLang="en-US"/>
           </a:p>
@@ -4402,7 +4402,7 @@
           <a:p>
             <a:fld id="{741DA9A2-8356-4FFD-B66A-E38811049858}" type="datetime1">
               <a:rPr kumimoji="1" lang="ja-JP" altLang="en-US" smtClean="0"/>
-              <a:t>2023/9/6</a:t>
+              <a:t>2023/9/9</a:t>
             </a:fld>
             <a:endParaRPr kumimoji="1" lang="ja-JP" altLang="en-US"/>
           </a:p>
@@ -4731,7 +4731,7 @@
           <a:p>
             <a:fld id="{9DDE8989-88B8-4869-97D9-547531F13E13}" type="datetime1">
               <a:rPr kumimoji="1" lang="ja-JP" altLang="en-US" smtClean="0"/>
-              <a:t>2023/9/6</a:t>
+              <a:t>2023/9/9</a:t>
             </a:fld>
             <a:endParaRPr kumimoji="1" lang="ja-JP" altLang="en-US"/>
           </a:p>
@@ -5118,7 +5118,7 @@
           <a:p>
             <a:fld id="{81EC4031-B949-4300-AB3E-1551426E8631}" type="datetime1">
               <a:rPr kumimoji="1" lang="ja-JP" altLang="en-US" smtClean="0"/>
-              <a:t>2023/9/6</a:t>
+              <a:t>2023/9/9</a:t>
             </a:fld>
             <a:endParaRPr kumimoji="1" lang="ja-JP" altLang="en-US"/>
           </a:p>
@@ -5639,7 +5639,7 @@
           <a:p>
             <a:fld id="{F39E755E-A59D-4634-B604-E9BB568B1156}" type="datetime1">
               <a:rPr kumimoji="1" lang="ja-JP" altLang="en-US" smtClean="0"/>
-              <a:t>2023/9/6</a:t>
+              <a:t>2023/9/9</a:t>
             </a:fld>
             <a:endParaRPr kumimoji="1" lang="ja-JP" altLang="en-US"/>
           </a:p>
@@ -5844,7 +5844,7 @@
           <a:p>
             <a:fld id="{61DA38B3-7601-4256-ABFE-386B92B0EDB5}" type="datetime1">
               <a:rPr kumimoji="1" lang="ja-JP" altLang="en-US" smtClean="0"/>
-              <a:t>2023/9/6</a:t>
+              <a:t>2023/9/9</a:t>
             </a:fld>
             <a:endParaRPr kumimoji="1" lang="ja-JP" altLang="en-US"/>
           </a:p>
@@ -6021,7 +6021,7 @@
           <a:p>
             <a:fld id="{5A28ED6D-8A94-4DBA-8EF2-284D1A467CE8}" type="datetime1">
               <a:rPr kumimoji="1" lang="ja-JP" altLang="en-US" smtClean="0"/>
-              <a:t>2023/9/6</a:t>
+              <a:t>2023/9/9</a:t>
             </a:fld>
             <a:endParaRPr kumimoji="1" lang="ja-JP" altLang="en-US"/>
           </a:p>
@@ -6386,7 +6386,7 @@
           <a:p>
             <a:fld id="{B27B0317-28AF-43C5-8944-AADFA89E0149}" type="datetime1">
               <a:rPr kumimoji="1" lang="ja-JP" altLang="en-US" smtClean="0"/>
-              <a:t>2023/9/6</a:t>
+              <a:t>2023/9/9</a:t>
             </a:fld>
             <a:endParaRPr kumimoji="1" lang="ja-JP" altLang="en-US"/>
           </a:p>
@@ -6731,7 +6731,7 @@
           <a:p>
             <a:fld id="{A78D023C-C4FA-4CE8-B5BE-6798898EE377}" type="datetime1">
               <a:rPr kumimoji="1" lang="ja-JP" altLang="en-US" smtClean="0"/>
-              <a:t>2023/9/6</a:t>
+              <a:t>2023/9/9</a:t>
             </a:fld>
             <a:endParaRPr kumimoji="1" lang="ja-JP" altLang="en-US"/>
           </a:p>
@@ -8880,7 +8880,7 @@
           <a:p>
             <a:fld id="{99567159-F4A8-4352-915B-DDBEFEF4A4D6}" type="datetime1">
               <a:rPr kumimoji="1" lang="ja-JP" altLang="en-US" smtClean="0"/>
-              <a:t>2023/9/6</a:t>
+              <a:t>2023/9/9</a:t>
             </a:fld>
             <a:endParaRPr kumimoji="1" lang="ja-JP" altLang="en-US"/>
           </a:p>
@@ -9473,8 +9473,8 @@
               <a:t>MAmidiMEmo</a:t>
             </a:r>
             <a:r>
-              <a:rPr lang="en-US" altLang="ja-JP"/>
-              <a:t> V4.8.2.1</a:t>
+              <a:rPr lang="en-US" altLang="ja-JP" dirty="0"/>
+              <a:t> V4.9.8.1</a:t>
             </a:r>
             <a:endParaRPr lang="ja-JP" altLang="en-US" dirty="0"/>
           </a:p>
@@ -29636,7 +29636,7 @@
             <a:pPr lvl="1"/>
             <a:r>
               <a:rPr lang="en-US" altLang="ja-JP" dirty="0"/>
-              <a:t>Click MAmidiMEmo.exe and please press [Allow access] button. This is because </a:t>
+              <a:t>Will open the </a:t>
             </a:r>
             <a:r>
               <a:rPr lang="en-US" altLang="ja-JP" dirty="0" err="1"/>
@@ -29644,69 +29644,29 @@
             </a:r>
             <a:r>
               <a:rPr lang="en-US" altLang="ja-JP" dirty="0"/>
-              <a:t> uses </a:t>
-            </a:r>
-            <a:r>
-              <a:rPr lang="en-US" altLang="ja-JP" dirty="0" err="1"/>
-              <a:t>interprocess</a:t>
+              <a:t>. If not, please check the followings.</a:t>
+            </a:r>
+          </a:p>
+          <a:p>
+            <a:pPr lvl="2"/>
+            <a:r>
+              <a:rPr lang="en-US" altLang="ja-JP" b="1" dirty="0"/>
+              <a:t>VC++ 2012 Runtime </a:t>
             </a:r>
             <a:r>
               <a:rPr lang="en-US" altLang="ja-JP" dirty="0"/>
-              <a:t> communication technology to communicate with other apps in order to sound from the app.</a:t>
+              <a:t>installed on your PC.</a:t>
             </a:r>
             <a:br>
               <a:rPr lang="en-US" altLang="ja-JP" dirty="0"/>
             </a:br>
-            <a:br>
-              <a:rPr lang="en-US" altLang="ja-JP" dirty="0"/>
-            </a:br>
-            <a:br>
-              <a:rPr lang="en-US" altLang="ja-JP" dirty="0"/>
-            </a:br>
-            <a:br>
-              <a:rPr lang="en-US" altLang="ja-JP" dirty="0"/>
-            </a:br>
-            <a:br>
-              <a:rPr lang="en-US" altLang="ja-JP" dirty="0"/>
-            </a:br>
+            <a:r>
+              <a:rPr lang="en-US" altLang="ja-JP" dirty="0">
+                <a:hlinkClick r:id="rId2"/>
+              </a:rPr>
+              <a:t>https://www.microsoft.com/en-au/download/details.aspx?id=30679</a:t>
+            </a:r>
             <a:endParaRPr lang="en-US" altLang="ja-JP" dirty="0"/>
-          </a:p>
-          <a:p>
-            <a:pPr lvl="1"/>
-            <a:r>
-              <a:rPr lang="en-US" altLang="ja-JP" dirty="0"/>
-              <a:t>Will open the </a:t>
-            </a:r>
-            <a:r>
-              <a:rPr lang="en-US" altLang="ja-JP" dirty="0" err="1"/>
-              <a:t>MAmidiMEmo</a:t>
-            </a:r>
-            <a:r>
-              <a:rPr lang="en-US" altLang="ja-JP" dirty="0"/>
-              <a:t>. If not, please check the followings.</a:t>
-            </a:r>
-          </a:p>
-          <a:p>
-            <a:pPr lvl="2"/>
-            <a:r>
-              <a:rPr lang="en-US" altLang="ja-JP" b="1" dirty="0"/>
-              <a:t>.NET Framework 4.7 or later </a:t>
-            </a:r>
-            <a:r>
-              <a:rPr lang="en-US" altLang="ja-JP" dirty="0"/>
-              <a:t>installed on your PC.</a:t>
-            </a:r>
-          </a:p>
-          <a:p>
-            <a:pPr lvl="2"/>
-            <a:r>
-              <a:rPr lang="en-US" altLang="ja-JP" b="1" dirty="0"/>
-              <a:t>VC++ 2012 Runtime </a:t>
-            </a:r>
-            <a:r>
-              <a:rPr lang="en-US" altLang="ja-JP" dirty="0"/>
-              <a:t>installed on your PC.</a:t>
-            </a:r>
           </a:p>
           <a:p>
             <a:pPr lvl="2"/>
@@ -29743,6 +29703,17 @@
           </a:p>
           <a:p>
             <a:pPr lvl="1"/>
+            <a:r>
+              <a:rPr lang="en-US" altLang="ja-JP" dirty="0">
+                <a:solidFill>
+                  <a:schemeClr val="tx1"/>
+                </a:solidFill>
+              </a:rPr>
+              <a:t>Click MAmidiMEmo.exe to run</a:t>
+            </a:r>
+          </a:p>
+          <a:p>
+            <a:pPr lvl="1"/>
             <a:endParaRPr lang="ja-JP" altLang="en-US" dirty="0"/>
           </a:p>
         </p:txBody>
@@ -29772,89 +29743,6 @@
               <a:rPr kumimoji="1" lang="ja-JP" altLang="en-US" smtClean="0"/>
               <a:t>3</a:t>
             </a:fld>
-            <a:endParaRPr kumimoji="1" lang="ja-JP" altLang="en-US"/>
-          </a:p>
-        </p:txBody>
-      </p:sp>
-      <p:pic>
-        <p:nvPicPr>
-          <p:cNvPr id="6" name="図 5">
-            <a:extLst>
-              <a:ext uri="{FF2B5EF4-FFF2-40B4-BE49-F238E27FC236}">
-                <a16:creationId xmlns:a16="http://schemas.microsoft.com/office/drawing/2014/main" id="{72AEE42A-E322-9B5B-551D-FDA703E0672A}"/>
-              </a:ext>
-            </a:extLst>
-          </p:cNvPr>
-          <p:cNvPicPr>
-            <a:picLocks noChangeAspect="1"/>
-          </p:cNvPicPr>
-          <p:nvPr/>
-        </p:nvPicPr>
-        <p:blipFill>
-          <a:blip r:embed="rId2"/>
-          <a:stretch>
-            <a:fillRect/>
-          </a:stretch>
-        </p:blipFill>
-        <p:spPr>
-          <a:xfrm>
-            <a:off x="6096000" y="3763383"/>
-            <a:ext cx="1699020" cy="1203472"/>
-          </a:xfrm>
-          <a:prstGeom prst="rect">
-            <a:avLst/>
-          </a:prstGeom>
-          <a:ln>
-            <a:solidFill>
-              <a:schemeClr val="accent1"/>
-            </a:solidFill>
-          </a:ln>
-        </p:spPr>
-      </p:pic>
-      <p:sp>
-        <p:nvSpPr>
-          <p:cNvPr id="8" name="四角形: 角を丸くする 7">
-            <a:extLst>
-              <a:ext uri="{FF2B5EF4-FFF2-40B4-BE49-F238E27FC236}">
-                <a16:creationId xmlns:a16="http://schemas.microsoft.com/office/drawing/2014/main" id="{974847C5-4944-37B1-2D14-FA4F5F59A0A7}"/>
-              </a:ext>
-            </a:extLst>
-          </p:cNvPr>
-          <p:cNvSpPr/>
-          <p:nvPr/>
-        </p:nvSpPr>
-        <p:spPr>
-          <a:xfrm>
-            <a:off x="6960870" y="4834890"/>
-            <a:ext cx="548294" cy="131965"/>
-          </a:xfrm>
-          <a:prstGeom prst="roundRect">
-            <a:avLst/>
-          </a:prstGeom>
-          <a:noFill/>
-          <a:ln w="19050"/>
-        </p:spPr>
-        <p:style>
-          <a:lnRef idx="2">
-            <a:schemeClr val="accent1">
-              <a:shade val="50000"/>
-            </a:schemeClr>
-          </a:lnRef>
-          <a:fillRef idx="1">
-            <a:schemeClr val="accent1"/>
-          </a:fillRef>
-          <a:effectRef idx="0">
-            <a:schemeClr val="accent1"/>
-          </a:effectRef>
-          <a:fontRef idx="minor">
-            <a:schemeClr val="lt1"/>
-          </a:fontRef>
-        </p:style>
-        <p:txBody>
-          <a:bodyPr rtlCol="0" anchor="ctr"/>
-          <a:lstStyle/>
-          <a:p>
-            <a:pPr algn="ctr"/>
             <a:endParaRPr kumimoji="1" lang="ja-JP" altLang="en-US"/>
           </a:p>
         </p:txBody>

</xml_diff>

<commit_message>
5.1.0.0 Supported YM2608 for RPC server feature. Other applications can control MAmidiMEmo chips via RPC.
</commit_message>
<xml_diff>
--- a/docs/MAmidiMEmo/Manual.pptx
+++ b/docs/MAmidiMEmo/Manual.pptx
@@ -239,7 +239,7 @@
           <a:p>
             <a:fld id="{581C28D8-13B6-41C3-9F5F-0284C569C6F1}" type="datetimeFigureOut">
               <a:rPr kumimoji="1" lang="ja-JP" altLang="en-US" smtClean="0"/>
-              <a:t>2023/9/9</a:t>
+              <a:t>2023/10/21</a:t>
             </a:fld>
             <a:endParaRPr kumimoji="1" lang="ja-JP" altLang="en-US"/>
           </a:p>
@@ -1734,7 +1734,7 @@
           <a:p>
             <a:fld id="{B8625E62-B904-4691-B75E-EC1C32885285}" type="datetime1">
               <a:rPr kumimoji="1" lang="ja-JP" altLang="en-US" smtClean="0"/>
-              <a:t>2023/9/9</a:t>
+              <a:t>2023/10/21</a:t>
             </a:fld>
             <a:endParaRPr kumimoji="1" lang="ja-JP" altLang="en-US"/>
           </a:p>
@@ -2072,7 +2072,7 @@
           <a:p>
             <a:fld id="{A4C87007-2A40-4EFC-90A3-258EFA3C1001}" type="datetime1">
               <a:rPr kumimoji="1" lang="ja-JP" altLang="en-US" smtClean="0"/>
-              <a:t>2023/9/9</a:t>
+              <a:t>2023/10/21</a:t>
             </a:fld>
             <a:endParaRPr kumimoji="1" lang="ja-JP" altLang="en-US"/>
           </a:p>
@@ -2473,7 +2473,7 @@
           <a:p>
             <a:fld id="{0FE0D7FF-9203-4AA3-90FD-622674A14F90}" type="datetime1">
               <a:rPr kumimoji="1" lang="ja-JP" altLang="en-US" smtClean="0"/>
-              <a:t>2023/9/9</a:t>
+              <a:t>2023/10/21</a:t>
             </a:fld>
             <a:endParaRPr kumimoji="1" lang="ja-JP" altLang="en-US"/>
           </a:p>
@@ -2809,7 +2809,7 @@
           <a:p>
             <a:fld id="{D2D6E4D3-BEDB-4F35-876B-5B9AA41BFB5B}" type="datetime1">
               <a:rPr kumimoji="1" lang="ja-JP" altLang="en-US" smtClean="0"/>
-              <a:t>2023/9/9</a:t>
+              <a:t>2023/10/21</a:t>
             </a:fld>
             <a:endParaRPr kumimoji="1" lang="ja-JP" altLang="en-US"/>
           </a:p>
@@ -3129,7 +3129,7 @@
           <a:p>
             <a:fld id="{2ACD896E-FC14-4F25-BC47-18ABAEA9E1FE}" type="datetime1">
               <a:rPr kumimoji="1" lang="ja-JP" altLang="en-US" smtClean="0"/>
-              <a:t>2023/9/9</a:t>
+              <a:t>2023/10/21</a:t>
             </a:fld>
             <a:endParaRPr kumimoji="1" lang="ja-JP" altLang="en-US"/>
           </a:p>
@@ -3525,7 +3525,7 @@
           <a:p>
             <a:fld id="{54FC701B-2185-4987-B8E2-5507664B65F4}" type="datetime1">
               <a:rPr kumimoji="1" lang="ja-JP" altLang="en-US" smtClean="0"/>
-              <a:t>2023/9/9</a:t>
+              <a:t>2023/10/21</a:t>
             </a:fld>
             <a:endParaRPr kumimoji="1" lang="ja-JP" altLang="en-US"/>
           </a:p>
@@ -3814,7 +3814,7 @@
           <a:p>
             <a:fld id="{3FB4CDED-9617-418F-B546-D66B9BB6C35E}" type="datetime1">
               <a:rPr kumimoji="1" lang="ja-JP" altLang="en-US" smtClean="0"/>
-              <a:t>2023/9/9</a:t>
+              <a:t>2023/10/21</a:t>
             </a:fld>
             <a:endParaRPr kumimoji="1" lang="ja-JP" altLang="en-US"/>
           </a:p>
@@ -4108,7 +4108,7 @@
           <a:p>
             <a:fld id="{F5635D40-962A-46D7-8037-3F2900B5EB4D}" type="datetime1">
               <a:rPr kumimoji="1" lang="ja-JP" altLang="en-US" smtClean="0"/>
-              <a:t>2023/9/9</a:t>
+              <a:t>2023/10/21</a:t>
             </a:fld>
             <a:endParaRPr kumimoji="1" lang="ja-JP" altLang="en-US"/>
           </a:p>
@@ -4402,7 +4402,7 @@
           <a:p>
             <a:fld id="{741DA9A2-8356-4FFD-B66A-E38811049858}" type="datetime1">
               <a:rPr kumimoji="1" lang="ja-JP" altLang="en-US" smtClean="0"/>
-              <a:t>2023/9/9</a:t>
+              <a:t>2023/10/21</a:t>
             </a:fld>
             <a:endParaRPr kumimoji="1" lang="ja-JP" altLang="en-US"/>
           </a:p>
@@ -4731,7 +4731,7 @@
           <a:p>
             <a:fld id="{9DDE8989-88B8-4869-97D9-547531F13E13}" type="datetime1">
               <a:rPr kumimoji="1" lang="ja-JP" altLang="en-US" smtClean="0"/>
-              <a:t>2023/9/9</a:t>
+              <a:t>2023/10/21</a:t>
             </a:fld>
             <a:endParaRPr kumimoji="1" lang="ja-JP" altLang="en-US"/>
           </a:p>
@@ -5118,7 +5118,7 @@
           <a:p>
             <a:fld id="{81EC4031-B949-4300-AB3E-1551426E8631}" type="datetime1">
               <a:rPr kumimoji="1" lang="ja-JP" altLang="en-US" smtClean="0"/>
-              <a:t>2023/9/9</a:t>
+              <a:t>2023/10/21</a:t>
             </a:fld>
             <a:endParaRPr kumimoji="1" lang="ja-JP" altLang="en-US"/>
           </a:p>
@@ -5639,7 +5639,7 @@
           <a:p>
             <a:fld id="{F39E755E-A59D-4634-B604-E9BB568B1156}" type="datetime1">
               <a:rPr kumimoji="1" lang="ja-JP" altLang="en-US" smtClean="0"/>
-              <a:t>2023/9/9</a:t>
+              <a:t>2023/10/21</a:t>
             </a:fld>
             <a:endParaRPr kumimoji="1" lang="ja-JP" altLang="en-US"/>
           </a:p>
@@ -5844,7 +5844,7 @@
           <a:p>
             <a:fld id="{61DA38B3-7601-4256-ABFE-386B92B0EDB5}" type="datetime1">
               <a:rPr kumimoji="1" lang="ja-JP" altLang="en-US" smtClean="0"/>
-              <a:t>2023/9/9</a:t>
+              <a:t>2023/10/21</a:t>
             </a:fld>
             <a:endParaRPr kumimoji="1" lang="ja-JP" altLang="en-US"/>
           </a:p>
@@ -6021,7 +6021,7 @@
           <a:p>
             <a:fld id="{5A28ED6D-8A94-4DBA-8EF2-284D1A467CE8}" type="datetime1">
               <a:rPr kumimoji="1" lang="ja-JP" altLang="en-US" smtClean="0"/>
-              <a:t>2023/9/9</a:t>
+              <a:t>2023/10/21</a:t>
             </a:fld>
             <a:endParaRPr kumimoji="1" lang="ja-JP" altLang="en-US"/>
           </a:p>
@@ -6386,7 +6386,7 @@
           <a:p>
             <a:fld id="{B27B0317-28AF-43C5-8944-AADFA89E0149}" type="datetime1">
               <a:rPr kumimoji="1" lang="ja-JP" altLang="en-US" smtClean="0"/>
-              <a:t>2023/9/9</a:t>
+              <a:t>2023/10/21</a:t>
             </a:fld>
             <a:endParaRPr kumimoji="1" lang="ja-JP" altLang="en-US"/>
           </a:p>
@@ -6731,7 +6731,7 @@
           <a:p>
             <a:fld id="{A78D023C-C4FA-4CE8-B5BE-6798898EE377}" type="datetime1">
               <a:rPr kumimoji="1" lang="ja-JP" altLang="en-US" smtClean="0"/>
-              <a:t>2023/9/9</a:t>
+              <a:t>2023/10/21</a:t>
             </a:fld>
             <a:endParaRPr kumimoji="1" lang="ja-JP" altLang="en-US"/>
           </a:p>
@@ -8880,7 +8880,7 @@
           <a:p>
             <a:fld id="{99567159-F4A8-4352-915B-DDBEFEF4A4D6}" type="datetime1">
               <a:rPr kumimoji="1" lang="ja-JP" altLang="en-US" smtClean="0"/>
-              <a:t>2023/9/9</a:t>
+              <a:t>2023/10/21</a:t>
             </a:fld>
             <a:endParaRPr kumimoji="1" lang="ja-JP" altLang="en-US"/>
           </a:p>
@@ -9474,7 +9474,7 @@
             </a:r>
             <a:r>
               <a:rPr lang="en-US" altLang="ja-JP" dirty="0"/>
-              <a:t> V4.9.8.1</a:t>
+              <a:t> V5.0.1.0</a:t>
             </a:r>
             <a:endParaRPr lang="ja-JP" altLang="en-US" dirty="0"/>
           </a:p>
@@ -40644,7 +40644,7 @@
         </p:nvSpPr>
         <p:spPr>
           <a:xfrm>
-            <a:off x="2589211" y="2133600"/>
+            <a:off x="2589211" y="1414732"/>
             <a:ext cx="9488819" cy="3777622"/>
           </a:xfrm>
         </p:spPr>
@@ -41042,7 +41042,7 @@
             </a:br>
             <a:r>
               <a:rPr kumimoji="1" lang="en-US" altLang="ja-JP" sz="1200" dirty="0"/>
-              <a:t>* Currently, OPLL(ID9), SCC(ID7), AY8910(ID11) chips are supported.</a:t>
+              <a:t>* Currently, OPLL(ID9), SCC(ID7), AY8910(ID11), YM2608(ID23) chips are supported.</a:t>
             </a:r>
             <a:br>
               <a:rPr kumimoji="1" lang="en-US" altLang="ja-JP" sz="1200" dirty="0"/>
@@ -41127,8 +41127,8 @@
         </p:nvSpPr>
         <p:spPr>
           <a:xfrm>
-            <a:off x="2583123" y="4866584"/>
-            <a:ext cx="9494907" cy="1938992"/>
+            <a:off x="3008692" y="4453732"/>
+            <a:ext cx="7943200" cy="2246769"/>
           </a:xfrm>
           <a:prstGeom prst="rect">
             <a:avLst/>
@@ -41149,7 +41149,7 @@
           <a:lstStyle/>
           <a:p>
             <a:r>
-              <a:rPr lang="en-US" altLang="ja-JP" sz="1200" dirty="0" err="1">
+              <a:rPr lang="en-US" altLang="ja-JP" sz="1000" dirty="0" err="1">
                 <a:solidFill>
                   <a:srgbClr val="000000"/>
                 </a:solidFill>
@@ -41159,7 +41159,7 @@
               <a:t>rpc</a:t>
             </a:r>
             <a:r>
-              <a:rPr lang="en-US" altLang="ja-JP" sz="1200" dirty="0">
+              <a:rPr lang="en-US" altLang="ja-JP" sz="1000" dirty="0">
                 <a:solidFill>
                   <a:srgbClr val="000000"/>
                 </a:solidFill>
@@ -41169,7 +41169,7 @@
               <a:t>::client* </a:t>
             </a:r>
             <a:r>
-              <a:rPr lang="en-US" altLang="ja-JP" sz="1200" dirty="0" err="1">
+              <a:rPr lang="en-US" altLang="ja-JP" sz="1000" dirty="0" err="1">
                 <a:solidFill>
                   <a:srgbClr val="000000"/>
                 </a:solidFill>
@@ -41179,7 +41179,7 @@
               <a:t>m_rpcClient</a:t>
             </a:r>
             <a:r>
-              <a:rPr lang="en-US" altLang="ja-JP" sz="1200" dirty="0">
+              <a:rPr lang="en-US" altLang="ja-JP" sz="1000" dirty="0">
                 <a:solidFill>
                   <a:srgbClr val="000000"/>
                 </a:solidFill>
@@ -41189,7 +41189,7 @@
               <a:t> = </a:t>
             </a:r>
             <a:r>
-              <a:rPr lang="en-US" altLang="ja-JP" sz="1200" dirty="0">
+              <a:rPr lang="en-US" altLang="ja-JP" sz="1000" dirty="0">
                 <a:solidFill>
                   <a:srgbClr val="0000FF"/>
                 </a:solidFill>
@@ -41199,7 +41199,7 @@
               <a:t>new</a:t>
             </a:r>
             <a:r>
-              <a:rPr lang="en-US" altLang="ja-JP" sz="1200" dirty="0">
+              <a:rPr lang="en-US" altLang="ja-JP" sz="1000" dirty="0">
                 <a:solidFill>
                   <a:srgbClr val="000000"/>
                 </a:solidFill>
@@ -41209,7 +41209,7 @@
               <a:t> </a:t>
             </a:r>
             <a:r>
-              <a:rPr lang="en-US" altLang="ja-JP" sz="1200" dirty="0" err="1">
+              <a:rPr lang="en-US" altLang="ja-JP" sz="1000" dirty="0" err="1">
                 <a:solidFill>
                   <a:srgbClr val="000000"/>
                 </a:solidFill>
@@ -41219,7 +41219,7 @@
               <a:t>rpc</a:t>
             </a:r>
             <a:r>
-              <a:rPr lang="en-US" altLang="ja-JP" sz="1200" dirty="0">
+              <a:rPr lang="en-US" altLang="ja-JP" sz="1000" dirty="0">
                 <a:solidFill>
                   <a:srgbClr val="000000"/>
                 </a:solidFill>
@@ -41229,7 +41229,7 @@
               <a:t>::client(</a:t>
             </a:r>
             <a:r>
-              <a:rPr lang="en-US" altLang="ja-JP" sz="1200" dirty="0">
+              <a:rPr lang="en-US" altLang="ja-JP" sz="1000" dirty="0">
                 <a:solidFill>
                   <a:srgbClr val="A31515"/>
                 </a:solidFill>
@@ -41239,7 +41239,7 @@
               <a:t>"localhost"</a:t>
             </a:r>
             <a:r>
-              <a:rPr lang="en-US" altLang="ja-JP" sz="1200" dirty="0">
+              <a:rPr lang="en-US" altLang="ja-JP" sz="1000" dirty="0">
                 <a:solidFill>
                   <a:srgbClr val="000000"/>
                 </a:solidFill>
@@ -41251,7 +41251,105 @@
           </a:p>
           <a:p>
             <a:r>
-              <a:rPr lang="en-US" altLang="ja-JP" sz="1200" dirty="0">
+              <a:rPr lang="en-US" altLang="ja-JP" sz="1000" dirty="0">
+                <a:solidFill>
+                  <a:srgbClr val="000000"/>
+                </a:solidFill>
+                <a:latin typeface="PixelMplus12" panose="020B0509020203020207" pitchFamily="49" charset="-128"/>
+                <a:ea typeface="PixelMplus12" panose="020B0509020203020207" pitchFamily="49" charset="-128"/>
+              </a:rPr>
+              <a:t>try {</a:t>
+            </a:r>
+          </a:p>
+          <a:p>
+            <a:r>
+              <a:rPr lang="en-US" altLang="ja-JP" sz="1000" dirty="0">
+                <a:solidFill>
+                  <a:srgbClr val="000000"/>
+                </a:solidFill>
+                <a:latin typeface="PixelMplus12" panose="020B0509020203020207" pitchFamily="49" charset="-128"/>
+                <a:ea typeface="PixelMplus12" panose="020B0509020203020207" pitchFamily="49" charset="-128"/>
+              </a:rPr>
+              <a:t>    //Check connection</a:t>
+            </a:r>
+          </a:p>
+          <a:p>
+            <a:r>
+              <a:rPr lang="en-US" altLang="ja-JP" sz="1000" dirty="0">
+                <a:solidFill>
+                  <a:srgbClr val="000000"/>
+                </a:solidFill>
+                <a:latin typeface="PixelMplus12" panose="020B0509020203020207" pitchFamily="49" charset="-128"/>
+                <a:ea typeface="PixelMplus12" panose="020B0509020203020207" pitchFamily="49" charset="-128"/>
+              </a:rPr>
+              <a:t>    </a:t>
+            </a:r>
+            <a:r>
+              <a:rPr lang="en-US" altLang="ja-JP" sz="1000" dirty="0" err="1">
+                <a:solidFill>
+                  <a:srgbClr val="000000"/>
+                </a:solidFill>
+                <a:latin typeface="PixelMplus12" panose="020B0509020203020207" pitchFamily="49" charset="-128"/>
+                <a:ea typeface="PixelMplus12" panose="020B0509020203020207" pitchFamily="49" charset="-128"/>
+              </a:rPr>
+              <a:t>m_rpcClient</a:t>
+            </a:r>
+            <a:r>
+              <a:rPr lang="en-US" altLang="ja-JP" sz="1000" dirty="0">
+                <a:solidFill>
+                  <a:srgbClr val="000000"/>
+                </a:solidFill>
+                <a:latin typeface="PixelMplus12" panose="020B0509020203020207" pitchFamily="49" charset="-128"/>
+                <a:ea typeface="PixelMplus12" panose="020B0509020203020207" pitchFamily="49" charset="-128"/>
+              </a:rPr>
+              <a:t>-&gt;call("</a:t>
+            </a:r>
+            <a:r>
+              <a:rPr lang="en-US" altLang="ja-JP" sz="1000" dirty="0" err="1">
+                <a:solidFill>
+                  <a:srgbClr val="000000"/>
+                </a:solidFill>
+                <a:latin typeface="PixelMplus12" panose="020B0509020203020207" pitchFamily="49" charset="-128"/>
+                <a:ea typeface="PixelMplus12" panose="020B0509020203020207" pitchFamily="49" charset="-128"/>
+              </a:rPr>
+              <a:t>DirectAccessToChip</a:t>
+            </a:r>
+            <a:r>
+              <a:rPr lang="en-US" altLang="ja-JP" sz="1000" dirty="0">
+                <a:solidFill>
+                  <a:srgbClr val="000000"/>
+                </a:solidFill>
+                <a:latin typeface="PixelMplus12" panose="020B0509020203020207" pitchFamily="49" charset="-128"/>
+                <a:ea typeface="PixelMplus12" panose="020B0509020203020207" pitchFamily="49" charset="-128"/>
+              </a:rPr>
+              <a:t>", (unsigned char)0, (unsigned char)0, (unsigned int)0, (unsigned int)0);</a:t>
+            </a:r>
+          </a:p>
+          <a:p>
+            <a:r>
+              <a:rPr lang="en-US" altLang="ja-JP" sz="1000">
+                <a:solidFill>
+                  <a:srgbClr val="000000"/>
+                </a:solidFill>
+                <a:latin typeface="PixelMplus12" panose="020B0509020203020207" pitchFamily="49" charset="-128"/>
+                <a:ea typeface="PixelMplus12" panose="020B0509020203020207" pitchFamily="49" charset="-128"/>
+              </a:rPr>
+              <a:t>} catch</a:t>
+            </a:r>
+            <a:r>
+              <a:rPr lang="en-US" altLang="ja-JP" sz="1000" dirty="0">
+                <a:solidFill>
+                  <a:srgbClr val="000000"/>
+                </a:solidFill>
+                <a:latin typeface="PixelMplus12" panose="020B0509020203020207" pitchFamily="49" charset="-128"/>
+                <a:ea typeface="PixelMplus12" panose="020B0509020203020207" pitchFamily="49" charset="-128"/>
+              </a:rPr>
+              <a:t>(...) { //Failed }</a:t>
+            </a:r>
+          </a:p>
+          <a:p>
+            <a:r>
+              <a:rPr lang="en-US" altLang="ja-JP" sz="1000" dirty="0">
                 <a:solidFill>
                   <a:srgbClr val="000000"/>
                 </a:solidFill>
@@ -41263,7 +41361,7 @@
           </a:p>
           <a:p>
             <a:r>
-              <a:rPr lang="en-US" altLang="ja-JP" sz="1200" dirty="0">
+              <a:rPr lang="en-US" altLang="ja-JP" sz="1000" dirty="0">
                 <a:solidFill>
                   <a:srgbClr val="000000"/>
                 </a:solidFill>
@@ -41275,7 +41373,7 @@
           </a:p>
           <a:p>
             <a:r>
-              <a:rPr lang="en-US" altLang="ja-JP" sz="1200" dirty="0" err="1">
+              <a:rPr lang="en-US" altLang="ja-JP" sz="1000" dirty="0" err="1">
                 <a:solidFill>
                   <a:srgbClr val="000000"/>
                 </a:solidFill>
@@ -41285,7 +41383,7 @@
               <a:t>m_rpcClient</a:t>
             </a:r>
             <a:r>
-              <a:rPr lang="en-US" altLang="ja-JP" sz="1200" dirty="0">
+              <a:rPr lang="en-US" altLang="ja-JP" sz="1000" dirty="0">
                 <a:solidFill>
                   <a:srgbClr val="000000"/>
                 </a:solidFill>
@@ -41295,7 +41393,7 @@
               <a:t>-&gt;</a:t>
             </a:r>
             <a:r>
-              <a:rPr lang="en-US" altLang="ja-JP" sz="1200" dirty="0" err="1">
+              <a:rPr lang="en-US" altLang="ja-JP" sz="1000" dirty="0" err="1">
                 <a:solidFill>
                   <a:srgbClr val="000000"/>
                 </a:solidFill>
@@ -41305,7 +41403,7 @@
               <a:t>async_call</a:t>
             </a:r>
             <a:r>
-              <a:rPr lang="en-US" altLang="ja-JP" sz="1200" dirty="0">
+              <a:rPr lang="en-US" altLang="ja-JP" sz="1000" dirty="0">
                 <a:solidFill>
                   <a:srgbClr val="000000"/>
                 </a:solidFill>
@@ -41315,7 +41413,7 @@
               <a:t>(</a:t>
             </a:r>
             <a:r>
-              <a:rPr lang="en-US" altLang="ja-JP" sz="1200" dirty="0">
+              <a:rPr lang="en-US" altLang="ja-JP" sz="1000" dirty="0">
                 <a:solidFill>
                   <a:srgbClr val="A31515"/>
                 </a:solidFill>
@@ -41325,7 +41423,7 @@
               <a:t>"</a:t>
             </a:r>
             <a:r>
-              <a:rPr lang="en-US" altLang="ja-JP" sz="1200" dirty="0" err="1">
+              <a:rPr lang="en-US" altLang="ja-JP" sz="1000" dirty="0" err="1">
                 <a:solidFill>
                   <a:srgbClr val="A31515"/>
                 </a:solidFill>
@@ -41335,7 +41433,7 @@
               <a:t>DirectAccessToChip</a:t>
             </a:r>
             <a:r>
-              <a:rPr lang="en-US" altLang="ja-JP" sz="1200" dirty="0">
+              <a:rPr lang="en-US" altLang="ja-JP" sz="1000" dirty="0">
                 <a:solidFill>
                   <a:srgbClr val="A31515"/>
                 </a:solidFill>
@@ -41345,7 +41443,7 @@
               <a:t>"</a:t>
             </a:r>
             <a:r>
-              <a:rPr lang="en-US" altLang="ja-JP" sz="1200" dirty="0">
+              <a:rPr lang="en-US" altLang="ja-JP" sz="1000" dirty="0">
                 <a:solidFill>
                   <a:srgbClr val="000000"/>
                 </a:solidFill>
@@ -41355,7 +41453,7 @@
               <a:t>, (</a:t>
             </a:r>
             <a:r>
-              <a:rPr lang="en-US" altLang="ja-JP" sz="1200" dirty="0">
+              <a:rPr lang="en-US" altLang="ja-JP" sz="1000" dirty="0">
                 <a:solidFill>
                   <a:srgbClr val="0000FF"/>
                 </a:solidFill>
@@ -41365,7 +41463,7 @@
               <a:t>unsigned</a:t>
             </a:r>
             <a:r>
-              <a:rPr lang="en-US" altLang="ja-JP" sz="1200" dirty="0">
+              <a:rPr lang="en-US" altLang="ja-JP" sz="1000" dirty="0">
                 <a:solidFill>
                   <a:srgbClr val="000000"/>
                 </a:solidFill>
@@ -41375,7 +41473,7 @@
               <a:t> </a:t>
             </a:r>
             <a:r>
-              <a:rPr lang="en-US" altLang="ja-JP" sz="1200" dirty="0">
+              <a:rPr lang="en-US" altLang="ja-JP" sz="1000" dirty="0">
                 <a:solidFill>
                   <a:srgbClr val="0000FF"/>
                 </a:solidFill>
@@ -41385,7 +41483,401 @@
               <a:t>char</a:t>
             </a:r>
             <a:r>
-              <a:rPr lang="en-US" altLang="ja-JP" sz="1200" dirty="0">
+              <a:rPr lang="en-US" altLang="ja-JP" sz="1000" dirty="0">
+                <a:solidFill>
+                  <a:srgbClr val="000000"/>
+                </a:solidFill>
+                <a:latin typeface="PixelMplus12" panose="020B0509020203020207" pitchFamily="49" charset="-128"/>
+                <a:ea typeface="PixelMplus12" panose="020B0509020203020207" pitchFamily="49" charset="-128"/>
+              </a:rPr>
+              <a:t>)</a:t>
+            </a:r>
+            <a:r>
+              <a:rPr lang="en-US" altLang="ja-JP" sz="1000" b="1" dirty="0">
+                <a:solidFill>
+                  <a:srgbClr val="000000"/>
+                </a:solidFill>
+                <a:latin typeface="PixelMplus12" panose="020B0509020203020207" pitchFamily="49" charset="-128"/>
+                <a:ea typeface="PixelMplus12" panose="020B0509020203020207" pitchFamily="49" charset="-128"/>
+              </a:rPr>
+              <a:t>7</a:t>
+            </a:r>
+            <a:r>
+              <a:rPr lang="en-US" altLang="ja-JP" sz="1000" dirty="0">
+                <a:solidFill>
+                  <a:srgbClr val="000000"/>
+                </a:solidFill>
+                <a:latin typeface="PixelMplus12" panose="020B0509020203020207" pitchFamily="49" charset="-128"/>
+                <a:ea typeface="PixelMplus12" panose="020B0509020203020207" pitchFamily="49" charset="-128"/>
+              </a:rPr>
+              <a:t>, (</a:t>
+            </a:r>
+            <a:r>
+              <a:rPr lang="en-US" altLang="ja-JP" sz="1000" dirty="0">
+                <a:solidFill>
+                  <a:srgbClr val="0000FF"/>
+                </a:solidFill>
+                <a:latin typeface="PixelMplus12" panose="020B0509020203020207" pitchFamily="49" charset="-128"/>
+                <a:ea typeface="PixelMplus12" panose="020B0509020203020207" pitchFamily="49" charset="-128"/>
+              </a:rPr>
+              <a:t>unsigned</a:t>
+            </a:r>
+            <a:r>
+              <a:rPr lang="en-US" altLang="ja-JP" sz="1000" dirty="0">
+                <a:solidFill>
+                  <a:srgbClr val="000000"/>
+                </a:solidFill>
+                <a:latin typeface="PixelMplus12" panose="020B0509020203020207" pitchFamily="49" charset="-128"/>
+                <a:ea typeface="PixelMplus12" panose="020B0509020203020207" pitchFamily="49" charset="-128"/>
+              </a:rPr>
+              <a:t> </a:t>
+            </a:r>
+            <a:r>
+              <a:rPr lang="en-US" altLang="ja-JP" sz="1000" dirty="0">
+                <a:solidFill>
+                  <a:srgbClr val="0000FF"/>
+                </a:solidFill>
+                <a:latin typeface="PixelMplus12" panose="020B0509020203020207" pitchFamily="49" charset="-128"/>
+                <a:ea typeface="PixelMplus12" panose="020B0509020203020207" pitchFamily="49" charset="-128"/>
+              </a:rPr>
+              <a:t>char</a:t>
+            </a:r>
+            <a:r>
+              <a:rPr lang="en-US" altLang="ja-JP" sz="1000" dirty="0">
+                <a:solidFill>
+                  <a:srgbClr val="000000"/>
+                </a:solidFill>
+                <a:latin typeface="PixelMplus12" panose="020B0509020203020207" pitchFamily="49" charset="-128"/>
+                <a:ea typeface="PixelMplus12" panose="020B0509020203020207" pitchFamily="49" charset="-128"/>
+              </a:rPr>
+              <a:t>)0, (</a:t>
+            </a:r>
+            <a:r>
+              <a:rPr lang="en-US" altLang="ja-JP" sz="1000" dirty="0">
+                <a:solidFill>
+                  <a:srgbClr val="0000FF"/>
+                </a:solidFill>
+                <a:latin typeface="PixelMplus12" panose="020B0509020203020207" pitchFamily="49" charset="-128"/>
+                <a:ea typeface="PixelMplus12" panose="020B0509020203020207" pitchFamily="49" charset="-128"/>
+              </a:rPr>
+              <a:t>unsigned</a:t>
+            </a:r>
+            <a:r>
+              <a:rPr lang="en-US" altLang="ja-JP" sz="1000" dirty="0">
+                <a:solidFill>
+                  <a:srgbClr val="000000"/>
+                </a:solidFill>
+                <a:latin typeface="PixelMplus12" panose="020B0509020203020207" pitchFamily="49" charset="-128"/>
+                <a:ea typeface="PixelMplus12" panose="020B0509020203020207" pitchFamily="49" charset="-128"/>
+              </a:rPr>
+              <a:t> </a:t>
+            </a:r>
+            <a:r>
+              <a:rPr lang="en-US" altLang="ja-JP" sz="1000" dirty="0">
+                <a:solidFill>
+                  <a:srgbClr val="0000FF"/>
+                </a:solidFill>
+                <a:latin typeface="PixelMplus12" panose="020B0509020203020207" pitchFamily="49" charset="-128"/>
+                <a:ea typeface="PixelMplus12" panose="020B0509020203020207" pitchFamily="49" charset="-128"/>
+              </a:rPr>
+              <a:t>int</a:t>
+            </a:r>
+            <a:r>
+              <a:rPr lang="en-US" altLang="ja-JP" sz="1000" dirty="0">
+                <a:solidFill>
+                  <a:srgbClr val="000000"/>
+                </a:solidFill>
+                <a:latin typeface="PixelMplus12" panose="020B0509020203020207" pitchFamily="49" charset="-128"/>
+                <a:ea typeface="PixelMplus12" panose="020B0509020203020207" pitchFamily="49" charset="-128"/>
+              </a:rPr>
+              <a:t>)0x100, (</a:t>
+            </a:r>
+            <a:r>
+              <a:rPr lang="en-US" altLang="ja-JP" sz="1000" dirty="0">
+                <a:solidFill>
+                  <a:srgbClr val="0000FF"/>
+                </a:solidFill>
+                <a:latin typeface="PixelMplus12" panose="020B0509020203020207" pitchFamily="49" charset="-128"/>
+                <a:ea typeface="PixelMplus12" panose="020B0509020203020207" pitchFamily="49" charset="-128"/>
+              </a:rPr>
+              <a:t>unsigned</a:t>
+            </a:r>
+            <a:r>
+              <a:rPr lang="en-US" altLang="ja-JP" sz="1000" dirty="0">
+                <a:solidFill>
+                  <a:srgbClr val="000000"/>
+                </a:solidFill>
+                <a:latin typeface="PixelMplus12" panose="020B0509020203020207" pitchFamily="49" charset="-128"/>
+                <a:ea typeface="PixelMplus12" panose="020B0509020203020207" pitchFamily="49" charset="-128"/>
+              </a:rPr>
+              <a:t> </a:t>
+            </a:r>
+            <a:r>
+              <a:rPr lang="en-US" altLang="ja-JP" sz="1000" dirty="0">
+                <a:solidFill>
+                  <a:srgbClr val="0000FF"/>
+                </a:solidFill>
+                <a:latin typeface="PixelMplus12" panose="020B0509020203020207" pitchFamily="49" charset="-128"/>
+                <a:ea typeface="PixelMplus12" panose="020B0509020203020207" pitchFamily="49" charset="-128"/>
+              </a:rPr>
+              <a:t>int</a:t>
+            </a:r>
+            <a:r>
+              <a:rPr lang="en-US" altLang="ja-JP" sz="1000" dirty="0">
+                <a:solidFill>
+                  <a:srgbClr val="000000"/>
+                </a:solidFill>
+                <a:latin typeface="PixelMplus12" panose="020B0509020203020207" pitchFamily="49" charset="-128"/>
+                <a:ea typeface="PixelMplus12" panose="020B0509020203020207" pitchFamily="49" charset="-128"/>
+              </a:rPr>
+              <a:t>)</a:t>
+            </a:r>
+            <a:r>
+              <a:rPr lang="en-US" altLang="ja-JP" sz="1000" dirty="0">
+                <a:solidFill>
+                  <a:srgbClr val="808080"/>
+                </a:solidFill>
+                <a:latin typeface="PixelMplus12" panose="020B0509020203020207" pitchFamily="49" charset="-128"/>
+                <a:ea typeface="PixelMplus12" panose="020B0509020203020207" pitchFamily="49" charset="-128"/>
+              </a:rPr>
+              <a:t>10</a:t>
+            </a:r>
+            <a:r>
+              <a:rPr lang="en-US" altLang="ja-JP" sz="1000" dirty="0">
+                <a:solidFill>
+                  <a:srgbClr val="000000"/>
+                </a:solidFill>
+                <a:latin typeface="PixelMplus12" panose="020B0509020203020207" pitchFamily="49" charset="-128"/>
+                <a:ea typeface="PixelMplus12" panose="020B0509020203020207" pitchFamily="49" charset="-128"/>
+              </a:rPr>
+              <a:t>);</a:t>
+            </a:r>
+          </a:p>
+          <a:p>
+            <a:r>
+              <a:rPr lang="en-US" altLang="ja-JP" sz="1000" dirty="0">
+                <a:solidFill>
+                  <a:srgbClr val="000000"/>
+                </a:solidFill>
+                <a:latin typeface="PixelMplus12" panose="020B0509020203020207" pitchFamily="49" charset="-128"/>
+                <a:ea typeface="PixelMplus12" panose="020B0509020203020207" pitchFamily="49" charset="-128"/>
+              </a:rPr>
+              <a:t>//All sound off for AY8910</a:t>
+            </a:r>
+          </a:p>
+          <a:p>
+            <a:r>
+              <a:rPr lang="en-US" altLang="ja-JP" sz="1000" dirty="0" err="1">
+                <a:solidFill>
+                  <a:srgbClr val="000000"/>
+                </a:solidFill>
+                <a:latin typeface="PixelMplus12" panose="020B0509020203020207" pitchFamily="49" charset="-128"/>
+                <a:ea typeface="PixelMplus12" panose="020B0509020203020207" pitchFamily="49" charset="-128"/>
+              </a:rPr>
+              <a:t>m_rpcClient</a:t>
+            </a:r>
+            <a:r>
+              <a:rPr lang="en-US" altLang="ja-JP" sz="1000" dirty="0">
+                <a:solidFill>
+                  <a:srgbClr val="000000"/>
+                </a:solidFill>
+                <a:latin typeface="PixelMplus12" panose="020B0509020203020207" pitchFamily="49" charset="-128"/>
+                <a:ea typeface="PixelMplus12" panose="020B0509020203020207" pitchFamily="49" charset="-128"/>
+              </a:rPr>
+              <a:t>-&gt;</a:t>
+            </a:r>
+            <a:r>
+              <a:rPr lang="en-US" altLang="ja-JP" sz="1000" dirty="0" err="1">
+                <a:solidFill>
+                  <a:srgbClr val="000000"/>
+                </a:solidFill>
+                <a:latin typeface="PixelMplus12" panose="020B0509020203020207" pitchFamily="49" charset="-128"/>
+                <a:ea typeface="PixelMplus12" panose="020B0509020203020207" pitchFamily="49" charset="-128"/>
+              </a:rPr>
+              <a:t>async_call</a:t>
+            </a:r>
+            <a:r>
+              <a:rPr lang="en-US" altLang="ja-JP" sz="1000" dirty="0">
+                <a:solidFill>
+                  <a:srgbClr val="000000"/>
+                </a:solidFill>
+                <a:latin typeface="PixelMplus12" panose="020B0509020203020207" pitchFamily="49" charset="-128"/>
+                <a:ea typeface="PixelMplus12" panose="020B0509020203020207" pitchFamily="49" charset="-128"/>
+              </a:rPr>
+              <a:t>(</a:t>
+            </a:r>
+            <a:r>
+              <a:rPr lang="en-US" altLang="ja-JP" sz="1000" dirty="0">
+                <a:solidFill>
+                  <a:srgbClr val="A31515"/>
+                </a:solidFill>
+                <a:latin typeface="PixelMplus12" panose="020B0509020203020207" pitchFamily="49" charset="-128"/>
+                <a:ea typeface="PixelMplus12" panose="020B0509020203020207" pitchFamily="49" charset="-128"/>
+              </a:rPr>
+              <a:t>"</a:t>
+            </a:r>
+            <a:r>
+              <a:rPr lang="en-US" altLang="ja-JP" sz="1000" dirty="0" err="1">
+                <a:solidFill>
+                  <a:srgbClr val="A31515"/>
+                </a:solidFill>
+                <a:latin typeface="PixelMplus12" panose="020B0509020203020207" pitchFamily="49" charset="-128"/>
+                <a:ea typeface="PixelMplus12" panose="020B0509020203020207" pitchFamily="49" charset="-128"/>
+              </a:rPr>
+              <a:t>DirectAccessToChip</a:t>
+            </a:r>
+            <a:r>
+              <a:rPr lang="en-US" altLang="ja-JP" sz="1000" dirty="0">
+                <a:solidFill>
+                  <a:srgbClr val="A31515"/>
+                </a:solidFill>
+                <a:latin typeface="PixelMplus12" panose="020B0509020203020207" pitchFamily="49" charset="-128"/>
+                <a:ea typeface="PixelMplus12" panose="020B0509020203020207" pitchFamily="49" charset="-128"/>
+              </a:rPr>
+              <a:t>"</a:t>
+            </a:r>
+            <a:r>
+              <a:rPr lang="en-US" altLang="ja-JP" sz="1000" dirty="0">
+                <a:solidFill>
+                  <a:srgbClr val="000000"/>
+                </a:solidFill>
+                <a:latin typeface="PixelMplus12" panose="020B0509020203020207" pitchFamily="49" charset="-128"/>
+                <a:ea typeface="PixelMplus12" panose="020B0509020203020207" pitchFamily="49" charset="-128"/>
+              </a:rPr>
+              <a:t>, (</a:t>
+            </a:r>
+            <a:r>
+              <a:rPr lang="en-US" altLang="ja-JP" sz="1000" dirty="0">
+                <a:solidFill>
+                  <a:srgbClr val="0000FF"/>
+                </a:solidFill>
+                <a:latin typeface="PixelMplus12" panose="020B0509020203020207" pitchFamily="49" charset="-128"/>
+                <a:ea typeface="PixelMplus12" panose="020B0509020203020207" pitchFamily="49" charset="-128"/>
+              </a:rPr>
+              <a:t>unsigned</a:t>
+            </a:r>
+            <a:r>
+              <a:rPr lang="en-US" altLang="ja-JP" sz="1000" dirty="0">
+                <a:solidFill>
+                  <a:srgbClr val="000000"/>
+                </a:solidFill>
+                <a:latin typeface="PixelMplus12" panose="020B0509020203020207" pitchFamily="49" charset="-128"/>
+                <a:ea typeface="PixelMplus12" panose="020B0509020203020207" pitchFamily="49" charset="-128"/>
+              </a:rPr>
+              <a:t> </a:t>
+            </a:r>
+            <a:r>
+              <a:rPr lang="en-US" altLang="ja-JP" sz="1000" dirty="0">
+                <a:solidFill>
+                  <a:srgbClr val="0000FF"/>
+                </a:solidFill>
+                <a:latin typeface="PixelMplus12" panose="020B0509020203020207" pitchFamily="49" charset="-128"/>
+                <a:ea typeface="PixelMplus12" panose="020B0509020203020207" pitchFamily="49" charset="-128"/>
+              </a:rPr>
+              <a:t>char</a:t>
+            </a:r>
+            <a:r>
+              <a:rPr lang="en-US" altLang="ja-JP" sz="1000" dirty="0">
+                <a:solidFill>
+                  <a:srgbClr val="000000"/>
+                </a:solidFill>
+                <a:latin typeface="PixelMplus12" panose="020B0509020203020207" pitchFamily="49" charset="-128"/>
+                <a:ea typeface="PixelMplus12" panose="020B0509020203020207" pitchFamily="49" charset="-128"/>
+              </a:rPr>
+              <a:t>)</a:t>
+            </a:r>
+            <a:r>
+              <a:rPr lang="en-US" altLang="ja-JP" sz="1000" b="1" dirty="0">
+                <a:solidFill>
+                  <a:srgbClr val="000000"/>
+                </a:solidFill>
+                <a:latin typeface="PixelMplus12" panose="020B0509020203020207" pitchFamily="49" charset="-128"/>
+                <a:ea typeface="PixelMplus12" panose="020B0509020203020207" pitchFamily="49" charset="-128"/>
+              </a:rPr>
+              <a:t>11</a:t>
+            </a:r>
+            <a:r>
+              <a:rPr lang="en-US" altLang="ja-JP" sz="1000" dirty="0">
+                <a:solidFill>
+                  <a:srgbClr val="000000"/>
+                </a:solidFill>
+                <a:latin typeface="PixelMplus12" panose="020B0509020203020207" pitchFamily="49" charset="-128"/>
+                <a:ea typeface="PixelMplus12" panose="020B0509020203020207" pitchFamily="49" charset="-128"/>
+              </a:rPr>
+              <a:t>, (</a:t>
+            </a:r>
+            <a:r>
+              <a:rPr lang="en-US" altLang="ja-JP" sz="1000" dirty="0">
+                <a:solidFill>
+                  <a:srgbClr val="0000FF"/>
+                </a:solidFill>
+                <a:latin typeface="PixelMplus12" panose="020B0509020203020207" pitchFamily="49" charset="-128"/>
+                <a:ea typeface="PixelMplus12" panose="020B0509020203020207" pitchFamily="49" charset="-128"/>
+              </a:rPr>
+              <a:t>unsigned</a:t>
+            </a:r>
+            <a:r>
+              <a:rPr lang="en-US" altLang="ja-JP" sz="1000" dirty="0">
+                <a:solidFill>
+                  <a:srgbClr val="000000"/>
+                </a:solidFill>
+                <a:latin typeface="PixelMplus12" panose="020B0509020203020207" pitchFamily="49" charset="-128"/>
+                <a:ea typeface="PixelMplus12" panose="020B0509020203020207" pitchFamily="49" charset="-128"/>
+              </a:rPr>
+              <a:t> </a:t>
+            </a:r>
+            <a:r>
+              <a:rPr lang="en-US" altLang="ja-JP" sz="1000" dirty="0">
+                <a:solidFill>
+                  <a:srgbClr val="0000FF"/>
+                </a:solidFill>
+                <a:latin typeface="PixelMplus12" panose="020B0509020203020207" pitchFamily="49" charset="-128"/>
+                <a:ea typeface="PixelMplus12" panose="020B0509020203020207" pitchFamily="49" charset="-128"/>
+              </a:rPr>
+              <a:t>char</a:t>
+            </a:r>
+            <a:r>
+              <a:rPr lang="en-US" altLang="ja-JP" sz="1000" dirty="0">
+                <a:solidFill>
+                  <a:srgbClr val="000000"/>
+                </a:solidFill>
+                <a:latin typeface="PixelMplus12" panose="020B0509020203020207" pitchFamily="49" charset="-128"/>
+                <a:ea typeface="PixelMplus12" panose="020B0509020203020207" pitchFamily="49" charset="-128"/>
+              </a:rPr>
+              <a:t>)0, (</a:t>
+            </a:r>
+            <a:r>
+              <a:rPr lang="en-US" altLang="ja-JP" sz="1000" dirty="0">
+                <a:solidFill>
+                  <a:srgbClr val="0000FF"/>
+                </a:solidFill>
+                <a:latin typeface="PixelMplus12" panose="020B0509020203020207" pitchFamily="49" charset="-128"/>
+                <a:ea typeface="PixelMplus12" panose="020B0509020203020207" pitchFamily="49" charset="-128"/>
+              </a:rPr>
+              <a:t>unsigned</a:t>
+            </a:r>
+            <a:r>
+              <a:rPr lang="en-US" altLang="ja-JP" sz="1000" dirty="0">
+                <a:solidFill>
+                  <a:srgbClr val="000000"/>
+                </a:solidFill>
+                <a:latin typeface="PixelMplus12" panose="020B0509020203020207" pitchFamily="49" charset="-128"/>
+                <a:ea typeface="PixelMplus12" panose="020B0509020203020207" pitchFamily="49" charset="-128"/>
+              </a:rPr>
+              <a:t> </a:t>
+            </a:r>
+            <a:r>
+              <a:rPr lang="en-US" altLang="ja-JP" sz="1000" dirty="0">
+                <a:solidFill>
+                  <a:srgbClr val="0000FF"/>
+                </a:solidFill>
+                <a:latin typeface="PixelMplus12" panose="020B0509020203020207" pitchFamily="49" charset="-128"/>
+                <a:ea typeface="PixelMplus12" panose="020B0509020203020207" pitchFamily="49" charset="-128"/>
+              </a:rPr>
+              <a:t>int</a:t>
+            </a:r>
+            <a:r>
+              <a:rPr lang="en-US" altLang="ja-JP" sz="1000" dirty="0">
                 <a:solidFill>
                   <a:srgbClr val="000000"/>
                 </a:solidFill>
@@ -41395,7 +41887,7 @@
               <a:t>)7, (</a:t>
             </a:r>
             <a:r>
-              <a:rPr lang="en-US" altLang="ja-JP" sz="1200" dirty="0">
+              <a:rPr lang="en-US" altLang="ja-JP" sz="1000" dirty="0">
                 <a:solidFill>
                   <a:srgbClr val="0000FF"/>
                 </a:solidFill>
@@ -41405,7 +41897,7 @@
               <a:t>unsigned</a:t>
             </a:r>
             <a:r>
-              <a:rPr lang="en-US" altLang="ja-JP" sz="1200" dirty="0">
+              <a:rPr lang="en-US" altLang="ja-JP" sz="1000" dirty="0">
                 <a:solidFill>
                   <a:srgbClr val="000000"/>
                 </a:solidFill>
@@ -41415,7 +41907,141 @@
               <a:t> </a:t>
             </a:r>
             <a:r>
-              <a:rPr lang="en-US" altLang="ja-JP" sz="1200" dirty="0">
+              <a:rPr lang="en-US" altLang="ja-JP" sz="1000" dirty="0">
+                <a:solidFill>
+                  <a:srgbClr val="0000FF"/>
+                </a:solidFill>
+                <a:latin typeface="PixelMplus12" panose="020B0509020203020207" pitchFamily="49" charset="-128"/>
+                <a:ea typeface="PixelMplus12" panose="020B0509020203020207" pitchFamily="49" charset="-128"/>
+              </a:rPr>
+              <a:t>int</a:t>
+            </a:r>
+            <a:r>
+              <a:rPr lang="en-US" altLang="ja-JP" sz="1000" dirty="0">
+                <a:solidFill>
+                  <a:srgbClr val="000000"/>
+                </a:solidFill>
+                <a:latin typeface="PixelMplus12" panose="020B0509020203020207" pitchFamily="49" charset="-128"/>
+                <a:ea typeface="PixelMplus12" panose="020B0509020203020207" pitchFamily="49" charset="-128"/>
+              </a:rPr>
+              <a:t>)0x3f);</a:t>
+            </a:r>
+          </a:p>
+          <a:p>
+            <a:r>
+              <a:rPr lang="en-US" altLang="ja-JP" sz="1000" dirty="0">
+                <a:solidFill>
+                  <a:srgbClr val="000000"/>
+                </a:solidFill>
+                <a:latin typeface="PixelMplus12" panose="020B0509020203020207" pitchFamily="49" charset="-128"/>
+                <a:ea typeface="PixelMplus12" panose="020B0509020203020207" pitchFamily="49" charset="-128"/>
+              </a:rPr>
+              <a:t>//Key off 1ch for OPLL</a:t>
+            </a:r>
+          </a:p>
+          <a:p>
+            <a:r>
+              <a:rPr lang="en-US" altLang="ja-JP" sz="1000" dirty="0" err="1">
+                <a:solidFill>
+                  <a:srgbClr val="000000"/>
+                </a:solidFill>
+                <a:latin typeface="PixelMplus12" panose="020B0509020203020207" pitchFamily="49" charset="-128"/>
+                <a:ea typeface="PixelMplus12" panose="020B0509020203020207" pitchFamily="49" charset="-128"/>
+              </a:rPr>
+              <a:t>m_rpcClient</a:t>
+            </a:r>
+            <a:r>
+              <a:rPr lang="en-US" altLang="ja-JP" sz="1000" dirty="0">
+                <a:solidFill>
+                  <a:srgbClr val="000000"/>
+                </a:solidFill>
+                <a:latin typeface="PixelMplus12" panose="020B0509020203020207" pitchFamily="49" charset="-128"/>
+                <a:ea typeface="PixelMplus12" panose="020B0509020203020207" pitchFamily="49" charset="-128"/>
+              </a:rPr>
+              <a:t>-&gt;</a:t>
+            </a:r>
+            <a:r>
+              <a:rPr lang="en-US" altLang="ja-JP" sz="1000" dirty="0" err="1">
+                <a:solidFill>
+                  <a:srgbClr val="000000"/>
+                </a:solidFill>
+                <a:latin typeface="PixelMplus12" panose="020B0509020203020207" pitchFamily="49" charset="-128"/>
+                <a:ea typeface="PixelMplus12" panose="020B0509020203020207" pitchFamily="49" charset="-128"/>
+              </a:rPr>
+              <a:t>async_call</a:t>
+            </a:r>
+            <a:r>
+              <a:rPr lang="en-US" altLang="ja-JP" sz="1000" dirty="0">
+                <a:solidFill>
+                  <a:srgbClr val="000000"/>
+                </a:solidFill>
+                <a:latin typeface="PixelMplus12" panose="020B0509020203020207" pitchFamily="49" charset="-128"/>
+                <a:ea typeface="PixelMplus12" panose="020B0509020203020207" pitchFamily="49" charset="-128"/>
+              </a:rPr>
+              <a:t>(</a:t>
+            </a:r>
+            <a:r>
+              <a:rPr lang="en-US" altLang="ja-JP" sz="1000" dirty="0">
+                <a:solidFill>
+                  <a:srgbClr val="A31515"/>
+                </a:solidFill>
+                <a:latin typeface="PixelMplus12" panose="020B0509020203020207" pitchFamily="49" charset="-128"/>
+                <a:ea typeface="PixelMplus12" panose="020B0509020203020207" pitchFamily="49" charset="-128"/>
+              </a:rPr>
+              <a:t>"</a:t>
+            </a:r>
+            <a:r>
+              <a:rPr lang="en-US" altLang="ja-JP" sz="1000" dirty="0" err="1">
+                <a:solidFill>
+                  <a:srgbClr val="A31515"/>
+                </a:solidFill>
+                <a:latin typeface="PixelMplus12" panose="020B0509020203020207" pitchFamily="49" charset="-128"/>
+                <a:ea typeface="PixelMplus12" panose="020B0509020203020207" pitchFamily="49" charset="-128"/>
+              </a:rPr>
+              <a:t>DirectAccessToChip</a:t>
+            </a:r>
+            <a:r>
+              <a:rPr lang="en-US" altLang="ja-JP" sz="1000" dirty="0">
+                <a:solidFill>
+                  <a:srgbClr val="A31515"/>
+                </a:solidFill>
+                <a:latin typeface="PixelMplus12" panose="020B0509020203020207" pitchFamily="49" charset="-128"/>
+                <a:ea typeface="PixelMplus12" panose="020B0509020203020207" pitchFamily="49" charset="-128"/>
+              </a:rPr>
+              <a:t>"</a:t>
+            </a:r>
+            <a:r>
+              <a:rPr lang="en-US" altLang="ja-JP" sz="1000" dirty="0">
+                <a:solidFill>
+                  <a:srgbClr val="000000"/>
+                </a:solidFill>
+                <a:latin typeface="PixelMplus12" panose="020B0509020203020207" pitchFamily="49" charset="-128"/>
+                <a:ea typeface="PixelMplus12" panose="020B0509020203020207" pitchFamily="49" charset="-128"/>
+              </a:rPr>
+              <a:t>, (</a:t>
+            </a:r>
+            <a:r>
+              <a:rPr lang="en-US" altLang="ja-JP" sz="1000" dirty="0">
+                <a:solidFill>
+                  <a:srgbClr val="0000FF"/>
+                </a:solidFill>
+                <a:latin typeface="PixelMplus12" panose="020B0509020203020207" pitchFamily="49" charset="-128"/>
+                <a:ea typeface="PixelMplus12" panose="020B0509020203020207" pitchFamily="49" charset="-128"/>
+              </a:rPr>
+              <a:t>unsigned</a:t>
+            </a:r>
+            <a:r>
+              <a:rPr lang="en-US" altLang="ja-JP" sz="1000" dirty="0">
+                <a:solidFill>
+                  <a:srgbClr val="000000"/>
+                </a:solidFill>
+                <a:latin typeface="PixelMplus12" panose="020B0509020203020207" pitchFamily="49" charset="-128"/>
+                <a:ea typeface="PixelMplus12" panose="020B0509020203020207" pitchFamily="49" charset="-128"/>
+              </a:rPr>
+              <a:t> </a:t>
+            </a:r>
+            <a:r>
+              <a:rPr lang="en-US" altLang="ja-JP" sz="1000" dirty="0">
                 <a:solidFill>
                   <a:srgbClr val="0000FF"/>
                 </a:solidFill>
@@ -41425,7 +42051,67 @@
               <a:t>char</a:t>
             </a:r>
             <a:r>
-              <a:rPr lang="en-US" altLang="ja-JP" sz="1200" dirty="0">
+              <a:rPr lang="en-US" altLang="ja-JP" sz="1000" dirty="0">
+                <a:solidFill>
+                  <a:srgbClr val="000000"/>
+                </a:solidFill>
+                <a:latin typeface="PixelMplus12" panose="020B0509020203020207" pitchFamily="49" charset="-128"/>
+                <a:ea typeface="PixelMplus12" panose="020B0509020203020207" pitchFamily="49" charset="-128"/>
+              </a:rPr>
+              <a:t>)</a:t>
+            </a:r>
+            <a:r>
+              <a:rPr lang="en-US" altLang="ja-JP" sz="1000" b="1" dirty="0">
+                <a:solidFill>
+                  <a:srgbClr val="000000"/>
+                </a:solidFill>
+                <a:latin typeface="PixelMplus12" panose="020B0509020203020207" pitchFamily="49" charset="-128"/>
+                <a:ea typeface="PixelMplus12" panose="020B0509020203020207" pitchFamily="49" charset="-128"/>
+              </a:rPr>
+              <a:t>9</a:t>
+            </a:r>
+            <a:r>
+              <a:rPr lang="en-US" altLang="ja-JP" sz="1000" dirty="0">
+                <a:solidFill>
+                  <a:srgbClr val="000000"/>
+                </a:solidFill>
+                <a:latin typeface="PixelMplus12" panose="020B0509020203020207" pitchFamily="49" charset="-128"/>
+                <a:ea typeface="PixelMplus12" panose="020B0509020203020207" pitchFamily="49" charset="-128"/>
+              </a:rPr>
+              <a:t>, (</a:t>
+            </a:r>
+            <a:r>
+              <a:rPr lang="en-US" altLang="ja-JP" sz="1000" dirty="0">
+                <a:solidFill>
+                  <a:srgbClr val="0000FF"/>
+                </a:solidFill>
+                <a:latin typeface="PixelMplus12" panose="020B0509020203020207" pitchFamily="49" charset="-128"/>
+                <a:ea typeface="PixelMplus12" panose="020B0509020203020207" pitchFamily="49" charset="-128"/>
+              </a:rPr>
+              <a:t>unsigned</a:t>
+            </a:r>
+            <a:r>
+              <a:rPr lang="en-US" altLang="ja-JP" sz="1000" dirty="0">
+                <a:solidFill>
+                  <a:srgbClr val="000000"/>
+                </a:solidFill>
+                <a:latin typeface="PixelMplus12" panose="020B0509020203020207" pitchFamily="49" charset="-128"/>
+                <a:ea typeface="PixelMplus12" panose="020B0509020203020207" pitchFamily="49" charset="-128"/>
+              </a:rPr>
+              <a:t> </a:t>
+            </a:r>
+            <a:r>
+              <a:rPr lang="en-US" altLang="ja-JP" sz="1000" dirty="0">
+                <a:solidFill>
+                  <a:srgbClr val="0000FF"/>
+                </a:solidFill>
+                <a:latin typeface="PixelMplus12" panose="020B0509020203020207" pitchFamily="49" charset="-128"/>
+                <a:ea typeface="PixelMplus12" panose="020B0509020203020207" pitchFamily="49" charset="-128"/>
+              </a:rPr>
+              <a:t>char</a:t>
+            </a:r>
+            <a:r>
+              <a:rPr lang="en-US" altLang="ja-JP" sz="1000" dirty="0">
                 <a:solidFill>
                   <a:srgbClr val="000000"/>
                 </a:solidFill>
@@ -41435,7 +42121,7 @@
               <a:t>)0, (</a:t>
             </a:r>
             <a:r>
-              <a:rPr lang="en-US" altLang="ja-JP" sz="1200" dirty="0">
+              <a:rPr lang="en-US" altLang="ja-JP" sz="1000" dirty="0">
                 <a:solidFill>
                   <a:srgbClr val="0000FF"/>
                 </a:solidFill>
@@ -41445,7 +42131,7 @@
               <a:t>unsigned</a:t>
             </a:r>
             <a:r>
-              <a:rPr lang="en-US" altLang="ja-JP" sz="1200" dirty="0">
+              <a:rPr lang="en-US" altLang="ja-JP" sz="1000" dirty="0">
                 <a:solidFill>
                   <a:srgbClr val="000000"/>
                 </a:solidFill>
@@ -41455,7 +42141,7 @@
               <a:t> </a:t>
             </a:r>
             <a:r>
-              <a:rPr lang="en-US" altLang="ja-JP" sz="1200" dirty="0">
+              <a:rPr lang="en-US" altLang="ja-JP" sz="1000" dirty="0">
                 <a:solidFill>
                   <a:srgbClr val="0000FF"/>
                 </a:solidFill>
@@ -41465,17 +42151,17 @@
               <a:t>int</a:t>
             </a:r>
             <a:r>
-              <a:rPr lang="en-US" altLang="ja-JP" sz="1200" dirty="0">
+              <a:rPr lang="en-US" altLang="ja-JP" sz="1000" dirty="0">
                 <a:solidFill>
                   <a:srgbClr val="000000"/>
                 </a:solidFill>
                 <a:latin typeface="PixelMplus12" panose="020B0509020203020207" pitchFamily="49" charset="-128"/>
                 <a:ea typeface="PixelMplus12" panose="020B0509020203020207" pitchFamily="49" charset="-128"/>
               </a:rPr>
-              <a:t>)0x100, (</a:t>
-            </a:r>
-            <a:r>
-              <a:rPr lang="en-US" altLang="ja-JP" sz="1200" dirty="0">
+              <a:t>)0x20, (</a:t>
+            </a:r>
+            <a:r>
+              <a:rPr lang="en-US" altLang="ja-JP" sz="1000" dirty="0">
                 <a:solidFill>
                   <a:srgbClr val="0000FF"/>
                 </a:solidFill>
@@ -41485,7 +42171,7 @@
               <a:t>unsigned</a:t>
             </a:r>
             <a:r>
-              <a:rPr lang="en-US" altLang="ja-JP" sz="1200" dirty="0">
+              <a:rPr lang="en-US" altLang="ja-JP" sz="1000" dirty="0">
                 <a:solidFill>
                   <a:srgbClr val="000000"/>
                 </a:solidFill>
@@ -41495,7 +42181,7 @@
               <a:t> </a:t>
             </a:r>
             <a:r>
-              <a:rPr lang="en-US" altLang="ja-JP" sz="1200" dirty="0">
+              <a:rPr lang="en-US" altLang="ja-JP" sz="1000" dirty="0">
                 <a:solidFill>
                   <a:srgbClr val="0000FF"/>
                 </a:solidFill>
@@ -41505,51 +42191,31 @@
               <a:t>int</a:t>
             </a:r>
             <a:r>
-              <a:rPr lang="en-US" altLang="ja-JP" sz="1200" dirty="0">
+              <a:rPr lang="en-US" altLang="ja-JP" sz="1000" dirty="0">
                 <a:solidFill>
                   <a:srgbClr val="000000"/>
                 </a:solidFill>
                 <a:latin typeface="PixelMplus12" panose="020B0509020203020207" pitchFamily="49" charset="-128"/>
                 <a:ea typeface="PixelMplus12" panose="020B0509020203020207" pitchFamily="49" charset="-128"/>
               </a:rPr>
-              <a:t>)</a:t>
-            </a:r>
-            <a:r>
-              <a:rPr lang="en-US" altLang="ja-JP" sz="1200" dirty="0">
-                <a:solidFill>
-                  <a:srgbClr val="808080"/>
-                </a:solidFill>
-                <a:latin typeface="PixelMplus12" panose="020B0509020203020207" pitchFamily="49" charset="-128"/>
-                <a:ea typeface="PixelMplus12" panose="020B0509020203020207" pitchFamily="49" charset="-128"/>
-              </a:rPr>
-              <a:t>10</a:t>
-            </a:r>
-            <a:r>
-              <a:rPr lang="en-US" altLang="ja-JP" sz="1200" dirty="0">
+              <a:t>)0x0);</a:t>
+            </a:r>
+          </a:p>
+          <a:p>
+            <a:r>
+              <a:rPr kumimoji="1" lang="en-US" altLang="ja-JP" sz="1000" dirty="0">
                 <a:solidFill>
                   <a:srgbClr val="000000"/>
                 </a:solidFill>
                 <a:latin typeface="PixelMplus12" panose="020B0509020203020207" pitchFamily="49" charset="-128"/>
                 <a:ea typeface="PixelMplus12" panose="020B0509020203020207" pitchFamily="49" charset="-128"/>
               </a:rPr>
-              <a:t>);</a:t>
-            </a:r>
-          </a:p>
-          <a:p>
-            <a:r>
-              <a:rPr lang="en-US" altLang="ja-JP" sz="1200" dirty="0">
-                <a:solidFill>
-                  <a:srgbClr val="000000"/>
-                </a:solidFill>
-                <a:latin typeface="PixelMplus12" panose="020B0509020203020207" pitchFamily="49" charset="-128"/>
-                <a:ea typeface="PixelMplus12" panose="020B0509020203020207" pitchFamily="49" charset="-128"/>
-              </a:rPr>
-              <a:t>//All sound off for AY8910</a:t>
-            </a:r>
-          </a:p>
-          <a:p>
-            <a:r>
-              <a:rPr lang="en-US" altLang="ja-JP" sz="1200" dirty="0" err="1">
+              <a:t>:::</a:t>
+            </a:r>
+          </a:p>
+          <a:p>
+            <a:r>
+              <a:rPr lang="en-US" altLang="ja-JP" sz="1000" dirty="0" err="1">
                 <a:solidFill>
                   <a:srgbClr val="000000"/>
                 </a:solidFill>
@@ -41559,87 +42225,17 @@
               <a:t>m_rpcClient</a:t>
             </a:r>
             <a:r>
-              <a:rPr lang="en-US" altLang="ja-JP" sz="1200" dirty="0">
+              <a:rPr lang="en-US" altLang="ja-JP" sz="1000" dirty="0">
                 <a:solidFill>
                   <a:srgbClr val="000000"/>
                 </a:solidFill>
                 <a:latin typeface="PixelMplus12" panose="020B0509020203020207" pitchFamily="49" charset="-128"/>
                 <a:ea typeface="PixelMplus12" panose="020B0509020203020207" pitchFamily="49" charset="-128"/>
               </a:rPr>
-              <a:t>-&gt;</a:t>
-            </a:r>
-            <a:r>
-              <a:rPr lang="en-US" altLang="ja-JP" sz="1200" dirty="0" err="1">
-                <a:solidFill>
-                  <a:srgbClr val="000000"/>
-                </a:solidFill>
-                <a:latin typeface="PixelMplus12" panose="020B0509020203020207" pitchFamily="49" charset="-128"/>
-                <a:ea typeface="PixelMplus12" panose="020B0509020203020207" pitchFamily="49" charset="-128"/>
-              </a:rPr>
-              <a:t>async_call</a:t>
-            </a:r>
-            <a:r>
-              <a:rPr lang="en-US" altLang="ja-JP" sz="1200" dirty="0">
-                <a:solidFill>
-                  <a:srgbClr val="000000"/>
-                </a:solidFill>
-                <a:latin typeface="PixelMplus12" panose="020B0509020203020207" pitchFamily="49" charset="-128"/>
-                <a:ea typeface="PixelMplus12" panose="020B0509020203020207" pitchFamily="49" charset="-128"/>
-              </a:rPr>
-              <a:t>(</a:t>
-            </a:r>
-            <a:r>
-              <a:rPr lang="en-US" altLang="ja-JP" sz="1200" dirty="0">
-                <a:solidFill>
-                  <a:srgbClr val="A31515"/>
-                </a:solidFill>
-                <a:latin typeface="PixelMplus12" panose="020B0509020203020207" pitchFamily="49" charset="-128"/>
-                <a:ea typeface="PixelMplus12" panose="020B0509020203020207" pitchFamily="49" charset="-128"/>
-              </a:rPr>
-              <a:t>"</a:t>
-            </a:r>
-            <a:r>
-              <a:rPr lang="en-US" altLang="ja-JP" sz="1200" dirty="0" err="1">
-                <a:solidFill>
-                  <a:srgbClr val="A31515"/>
-                </a:solidFill>
-                <a:latin typeface="PixelMplus12" panose="020B0509020203020207" pitchFamily="49" charset="-128"/>
-                <a:ea typeface="PixelMplus12" panose="020B0509020203020207" pitchFamily="49" charset="-128"/>
-              </a:rPr>
-              <a:t>DirectAccessToChip</a:t>
-            </a:r>
-            <a:r>
-              <a:rPr lang="en-US" altLang="ja-JP" sz="1200" dirty="0">
-                <a:solidFill>
-                  <a:srgbClr val="A31515"/>
-                </a:solidFill>
-                <a:latin typeface="PixelMplus12" panose="020B0509020203020207" pitchFamily="49" charset="-128"/>
-                <a:ea typeface="PixelMplus12" panose="020B0509020203020207" pitchFamily="49" charset="-128"/>
-              </a:rPr>
-              <a:t>"</a:t>
-            </a:r>
-            <a:r>
-              <a:rPr lang="en-US" altLang="ja-JP" sz="1200" dirty="0">
-                <a:solidFill>
-                  <a:srgbClr val="000000"/>
-                </a:solidFill>
-                <a:latin typeface="PixelMplus12" panose="020B0509020203020207" pitchFamily="49" charset="-128"/>
-                <a:ea typeface="PixelMplus12" panose="020B0509020203020207" pitchFamily="49" charset="-128"/>
-              </a:rPr>
-              <a:t>, (</a:t>
-            </a:r>
-            <a:r>
-              <a:rPr lang="en-US" altLang="ja-JP" sz="1200" dirty="0">
-                <a:solidFill>
-                  <a:srgbClr val="0000FF"/>
-                </a:solidFill>
-                <a:latin typeface="PixelMplus12" panose="020B0509020203020207" pitchFamily="49" charset="-128"/>
-                <a:ea typeface="PixelMplus12" panose="020B0509020203020207" pitchFamily="49" charset="-128"/>
-              </a:rPr>
-              <a:t>unsigned</a:t>
-            </a:r>
-            <a:r>
-              <a:rPr lang="en-US" altLang="ja-JP" sz="1200" dirty="0">
+              <a:t>-&gt;~client();	//Close</a:t>
+            </a:r>
+            <a:r>
+              <a:rPr kumimoji="1" lang="ja-JP" altLang="en-US" sz="1000" dirty="0">
                 <a:solidFill>
                   <a:srgbClr val="000000"/>
                 </a:solidFill>
@@ -41649,37 +42245,17 @@
               <a:t> </a:t>
             </a:r>
             <a:r>
-              <a:rPr lang="en-US" altLang="ja-JP" sz="1200" dirty="0">
-                <a:solidFill>
-                  <a:srgbClr val="0000FF"/>
-                </a:solidFill>
-                <a:latin typeface="PixelMplus12" panose="020B0509020203020207" pitchFamily="49" charset="-128"/>
-                <a:ea typeface="PixelMplus12" panose="020B0509020203020207" pitchFamily="49" charset="-128"/>
-              </a:rPr>
-              <a:t>char</a:t>
-            </a:r>
-            <a:r>
-              <a:rPr lang="en-US" altLang="ja-JP" sz="1200" dirty="0">
+              <a:rPr kumimoji="1" lang="en-US" altLang="ja-JP" sz="1000" dirty="0">
                 <a:solidFill>
                   <a:srgbClr val="000000"/>
                 </a:solidFill>
                 <a:latin typeface="PixelMplus12" panose="020B0509020203020207" pitchFamily="49" charset="-128"/>
                 <a:ea typeface="PixelMplus12" panose="020B0509020203020207" pitchFamily="49" charset="-128"/>
               </a:rPr>
-              <a:t>)11, (</a:t>
-            </a:r>
-            <a:r>
-              <a:rPr lang="en-US" altLang="ja-JP" sz="1200" dirty="0">
-                <a:solidFill>
-                  <a:srgbClr val="0000FF"/>
-                </a:solidFill>
-                <a:latin typeface="PixelMplus12" panose="020B0509020203020207" pitchFamily="49" charset="-128"/>
-                <a:ea typeface="PixelMplus12" panose="020B0509020203020207" pitchFamily="49" charset="-128"/>
-              </a:rPr>
-              <a:t>unsigned</a:t>
-            </a:r>
-            <a:r>
-              <a:rPr lang="en-US" altLang="ja-JP" sz="1200" dirty="0">
+              <a:t>RPC</a:t>
+            </a:r>
+            <a:r>
+              <a:rPr kumimoji="1" lang="ja-JP" altLang="en-US" sz="1000" dirty="0">
                 <a:solidFill>
                   <a:srgbClr val="000000"/>
                 </a:solidFill>
@@ -41689,434 +42265,16 @@
               <a:t> </a:t>
             </a:r>
             <a:r>
-              <a:rPr lang="en-US" altLang="ja-JP" sz="1200" dirty="0">
-                <a:solidFill>
-                  <a:srgbClr val="0000FF"/>
-                </a:solidFill>
-                <a:latin typeface="PixelMplus12" panose="020B0509020203020207" pitchFamily="49" charset="-128"/>
-                <a:ea typeface="PixelMplus12" panose="020B0509020203020207" pitchFamily="49" charset="-128"/>
-              </a:rPr>
-              <a:t>char</a:t>
-            </a:r>
-            <a:r>
-              <a:rPr lang="en-US" altLang="ja-JP" sz="1200" dirty="0">
+              <a:rPr kumimoji="1" lang="en-US" altLang="ja-JP" sz="1000" dirty="0">
                 <a:solidFill>
                   <a:srgbClr val="000000"/>
                 </a:solidFill>
                 <a:latin typeface="PixelMplus12" panose="020B0509020203020207" pitchFamily="49" charset="-128"/>
                 <a:ea typeface="PixelMplus12" panose="020B0509020203020207" pitchFamily="49" charset="-128"/>
               </a:rPr>
-              <a:t>)0, (</a:t>
-            </a:r>
-            <a:r>
-              <a:rPr lang="en-US" altLang="ja-JP" sz="1200" dirty="0">
-                <a:solidFill>
-                  <a:srgbClr val="0000FF"/>
-                </a:solidFill>
-                <a:latin typeface="PixelMplus12" panose="020B0509020203020207" pitchFamily="49" charset="-128"/>
-                <a:ea typeface="PixelMplus12" panose="020B0509020203020207" pitchFamily="49" charset="-128"/>
-              </a:rPr>
-              <a:t>unsigned</a:t>
-            </a:r>
-            <a:r>
-              <a:rPr lang="en-US" altLang="ja-JP" sz="1200" dirty="0">
-                <a:solidFill>
-                  <a:srgbClr val="000000"/>
-                </a:solidFill>
-                <a:latin typeface="PixelMplus12" panose="020B0509020203020207" pitchFamily="49" charset="-128"/>
-                <a:ea typeface="PixelMplus12" panose="020B0509020203020207" pitchFamily="49" charset="-128"/>
-              </a:rPr>
-              <a:t> </a:t>
-            </a:r>
-            <a:r>
-              <a:rPr lang="en-US" altLang="ja-JP" sz="1200" dirty="0">
-                <a:solidFill>
-                  <a:srgbClr val="0000FF"/>
-                </a:solidFill>
-                <a:latin typeface="PixelMplus12" panose="020B0509020203020207" pitchFamily="49" charset="-128"/>
-                <a:ea typeface="PixelMplus12" panose="020B0509020203020207" pitchFamily="49" charset="-128"/>
-              </a:rPr>
-              <a:t>int</a:t>
-            </a:r>
-            <a:r>
-              <a:rPr lang="en-US" altLang="ja-JP" sz="1200" dirty="0">
-                <a:solidFill>
-                  <a:srgbClr val="000000"/>
-                </a:solidFill>
-                <a:latin typeface="PixelMplus12" panose="020B0509020203020207" pitchFamily="49" charset="-128"/>
-                <a:ea typeface="PixelMplus12" panose="020B0509020203020207" pitchFamily="49" charset="-128"/>
-              </a:rPr>
-              <a:t>)7, (</a:t>
-            </a:r>
-            <a:r>
-              <a:rPr lang="en-US" altLang="ja-JP" sz="1200" dirty="0">
-                <a:solidFill>
-                  <a:srgbClr val="0000FF"/>
-                </a:solidFill>
-                <a:latin typeface="PixelMplus12" panose="020B0509020203020207" pitchFamily="49" charset="-128"/>
-                <a:ea typeface="PixelMplus12" panose="020B0509020203020207" pitchFamily="49" charset="-128"/>
-              </a:rPr>
-              <a:t>unsigned</a:t>
-            </a:r>
-            <a:r>
-              <a:rPr lang="en-US" altLang="ja-JP" sz="1200" dirty="0">
-                <a:solidFill>
-                  <a:srgbClr val="000000"/>
-                </a:solidFill>
-                <a:latin typeface="PixelMplus12" panose="020B0509020203020207" pitchFamily="49" charset="-128"/>
-                <a:ea typeface="PixelMplus12" panose="020B0509020203020207" pitchFamily="49" charset="-128"/>
-              </a:rPr>
-              <a:t> </a:t>
-            </a:r>
-            <a:r>
-              <a:rPr lang="en-US" altLang="ja-JP" sz="1200" dirty="0">
-                <a:solidFill>
-                  <a:srgbClr val="0000FF"/>
-                </a:solidFill>
-                <a:latin typeface="PixelMplus12" panose="020B0509020203020207" pitchFamily="49" charset="-128"/>
-                <a:ea typeface="PixelMplus12" panose="020B0509020203020207" pitchFamily="49" charset="-128"/>
-              </a:rPr>
-              <a:t>int</a:t>
-            </a:r>
-            <a:r>
-              <a:rPr lang="en-US" altLang="ja-JP" sz="1200" dirty="0">
-                <a:solidFill>
-                  <a:srgbClr val="000000"/>
-                </a:solidFill>
-                <a:latin typeface="PixelMplus12" panose="020B0509020203020207" pitchFamily="49" charset="-128"/>
-                <a:ea typeface="PixelMplus12" panose="020B0509020203020207" pitchFamily="49" charset="-128"/>
-              </a:rPr>
-              <a:t>)0x3f);</a:t>
-            </a:r>
-          </a:p>
-          <a:p>
-            <a:r>
-              <a:rPr lang="en-US" altLang="ja-JP" sz="1200" dirty="0">
-                <a:solidFill>
-                  <a:srgbClr val="000000"/>
-                </a:solidFill>
-                <a:latin typeface="PixelMplus12" panose="020B0509020203020207" pitchFamily="49" charset="-128"/>
-                <a:ea typeface="PixelMplus12" panose="020B0509020203020207" pitchFamily="49" charset="-128"/>
-              </a:rPr>
-              <a:t>//Key off 1ch for OPLL</a:t>
-            </a:r>
-          </a:p>
-          <a:p>
-            <a:r>
-              <a:rPr lang="en-US" altLang="ja-JP" sz="1200" dirty="0" err="1">
-                <a:solidFill>
-                  <a:srgbClr val="000000"/>
-                </a:solidFill>
-                <a:latin typeface="PixelMplus12" panose="020B0509020203020207" pitchFamily="49" charset="-128"/>
-                <a:ea typeface="PixelMplus12" panose="020B0509020203020207" pitchFamily="49" charset="-128"/>
-              </a:rPr>
-              <a:t>m_rpcClient</a:t>
-            </a:r>
-            <a:r>
-              <a:rPr lang="en-US" altLang="ja-JP" sz="1200" dirty="0">
-                <a:solidFill>
-                  <a:srgbClr val="000000"/>
-                </a:solidFill>
-                <a:latin typeface="PixelMplus12" panose="020B0509020203020207" pitchFamily="49" charset="-128"/>
-                <a:ea typeface="PixelMplus12" panose="020B0509020203020207" pitchFamily="49" charset="-128"/>
-              </a:rPr>
-              <a:t>-&gt;</a:t>
-            </a:r>
-            <a:r>
-              <a:rPr lang="en-US" altLang="ja-JP" sz="1200" dirty="0" err="1">
-                <a:solidFill>
-                  <a:srgbClr val="000000"/>
-                </a:solidFill>
-                <a:latin typeface="PixelMplus12" panose="020B0509020203020207" pitchFamily="49" charset="-128"/>
-                <a:ea typeface="PixelMplus12" panose="020B0509020203020207" pitchFamily="49" charset="-128"/>
-              </a:rPr>
-              <a:t>async_call</a:t>
-            </a:r>
-            <a:r>
-              <a:rPr lang="en-US" altLang="ja-JP" sz="1200" dirty="0">
-                <a:solidFill>
-                  <a:srgbClr val="000000"/>
-                </a:solidFill>
-                <a:latin typeface="PixelMplus12" panose="020B0509020203020207" pitchFamily="49" charset="-128"/>
-                <a:ea typeface="PixelMplus12" panose="020B0509020203020207" pitchFamily="49" charset="-128"/>
-              </a:rPr>
-              <a:t>(</a:t>
-            </a:r>
-            <a:r>
-              <a:rPr lang="en-US" altLang="ja-JP" sz="1200" dirty="0">
-                <a:solidFill>
-                  <a:srgbClr val="A31515"/>
-                </a:solidFill>
-                <a:latin typeface="PixelMplus12" panose="020B0509020203020207" pitchFamily="49" charset="-128"/>
-                <a:ea typeface="PixelMplus12" panose="020B0509020203020207" pitchFamily="49" charset="-128"/>
-              </a:rPr>
-              <a:t>"</a:t>
-            </a:r>
-            <a:r>
-              <a:rPr lang="en-US" altLang="ja-JP" sz="1200" dirty="0" err="1">
-                <a:solidFill>
-                  <a:srgbClr val="A31515"/>
-                </a:solidFill>
-                <a:latin typeface="PixelMplus12" panose="020B0509020203020207" pitchFamily="49" charset="-128"/>
-                <a:ea typeface="PixelMplus12" panose="020B0509020203020207" pitchFamily="49" charset="-128"/>
-              </a:rPr>
-              <a:t>DirectAccessToChip</a:t>
-            </a:r>
-            <a:r>
-              <a:rPr lang="en-US" altLang="ja-JP" sz="1200" dirty="0">
-                <a:solidFill>
-                  <a:srgbClr val="A31515"/>
-                </a:solidFill>
-                <a:latin typeface="PixelMplus12" panose="020B0509020203020207" pitchFamily="49" charset="-128"/>
-                <a:ea typeface="PixelMplus12" panose="020B0509020203020207" pitchFamily="49" charset="-128"/>
-              </a:rPr>
-              <a:t>"</a:t>
-            </a:r>
-            <a:r>
-              <a:rPr lang="en-US" altLang="ja-JP" sz="1200" dirty="0">
-                <a:solidFill>
-                  <a:srgbClr val="000000"/>
-                </a:solidFill>
-                <a:latin typeface="PixelMplus12" panose="020B0509020203020207" pitchFamily="49" charset="-128"/>
-                <a:ea typeface="PixelMplus12" panose="020B0509020203020207" pitchFamily="49" charset="-128"/>
-              </a:rPr>
-              <a:t>, (</a:t>
-            </a:r>
-            <a:r>
-              <a:rPr lang="en-US" altLang="ja-JP" sz="1200" dirty="0">
-                <a:solidFill>
-                  <a:srgbClr val="0000FF"/>
-                </a:solidFill>
-                <a:latin typeface="PixelMplus12" panose="020B0509020203020207" pitchFamily="49" charset="-128"/>
-                <a:ea typeface="PixelMplus12" panose="020B0509020203020207" pitchFamily="49" charset="-128"/>
-              </a:rPr>
-              <a:t>unsigned</a:t>
-            </a:r>
-            <a:r>
-              <a:rPr lang="en-US" altLang="ja-JP" sz="1200" dirty="0">
-                <a:solidFill>
-                  <a:srgbClr val="000000"/>
-                </a:solidFill>
-                <a:latin typeface="PixelMplus12" panose="020B0509020203020207" pitchFamily="49" charset="-128"/>
-                <a:ea typeface="PixelMplus12" panose="020B0509020203020207" pitchFamily="49" charset="-128"/>
-              </a:rPr>
-              <a:t> </a:t>
-            </a:r>
-            <a:r>
-              <a:rPr lang="en-US" altLang="ja-JP" sz="1200" dirty="0">
-                <a:solidFill>
-                  <a:srgbClr val="0000FF"/>
-                </a:solidFill>
-                <a:latin typeface="PixelMplus12" panose="020B0509020203020207" pitchFamily="49" charset="-128"/>
-                <a:ea typeface="PixelMplus12" panose="020B0509020203020207" pitchFamily="49" charset="-128"/>
-              </a:rPr>
-              <a:t>char</a:t>
-            </a:r>
-            <a:r>
-              <a:rPr lang="en-US" altLang="ja-JP" sz="1200" dirty="0">
-                <a:solidFill>
-                  <a:srgbClr val="000000"/>
-                </a:solidFill>
-                <a:latin typeface="PixelMplus12" panose="020B0509020203020207" pitchFamily="49" charset="-128"/>
-                <a:ea typeface="PixelMplus12" panose="020B0509020203020207" pitchFamily="49" charset="-128"/>
-              </a:rPr>
-              <a:t>)9, (</a:t>
-            </a:r>
-            <a:r>
-              <a:rPr lang="en-US" altLang="ja-JP" sz="1200" dirty="0">
-                <a:solidFill>
-                  <a:srgbClr val="0000FF"/>
-                </a:solidFill>
-                <a:latin typeface="PixelMplus12" panose="020B0509020203020207" pitchFamily="49" charset="-128"/>
-                <a:ea typeface="PixelMplus12" panose="020B0509020203020207" pitchFamily="49" charset="-128"/>
-              </a:rPr>
-              <a:t>unsigned</a:t>
-            </a:r>
-            <a:r>
-              <a:rPr lang="en-US" altLang="ja-JP" sz="1200" dirty="0">
-                <a:solidFill>
-                  <a:srgbClr val="000000"/>
-                </a:solidFill>
-                <a:latin typeface="PixelMplus12" panose="020B0509020203020207" pitchFamily="49" charset="-128"/>
-                <a:ea typeface="PixelMplus12" panose="020B0509020203020207" pitchFamily="49" charset="-128"/>
-              </a:rPr>
-              <a:t> </a:t>
-            </a:r>
-            <a:r>
-              <a:rPr lang="en-US" altLang="ja-JP" sz="1200" dirty="0">
-                <a:solidFill>
-                  <a:srgbClr val="0000FF"/>
-                </a:solidFill>
-                <a:latin typeface="PixelMplus12" panose="020B0509020203020207" pitchFamily="49" charset="-128"/>
-                <a:ea typeface="PixelMplus12" panose="020B0509020203020207" pitchFamily="49" charset="-128"/>
-              </a:rPr>
-              <a:t>char</a:t>
-            </a:r>
-            <a:r>
-              <a:rPr lang="en-US" altLang="ja-JP" sz="1200" dirty="0">
-                <a:solidFill>
-                  <a:srgbClr val="000000"/>
-                </a:solidFill>
-                <a:latin typeface="PixelMplus12" panose="020B0509020203020207" pitchFamily="49" charset="-128"/>
-                <a:ea typeface="PixelMplus12" panose="020B0509020203020207" pitchFamily="49" charset="-128"/>
-              </a:rPr>
-              <a:t>)0, (</a:t>
-            </a:r>
-            <a:r>
-              <a:rPr lang="en-US" altLang="ja-JP" sz="1200" dirty="0">
-                <a:solidFill>
-                  <a:srgbClr val="0000FF"/>
-                </a:solidFill>
-                <a:latin typeface="PixelMplus12" panose="020B0509020203020207" pitchFamily="49" charset="-128"/>
-                <a:ea typeface="PixelMplus12" panose="020B0509020203020207" pitchFamily="49" charset="-128"/>
-              </a:rPr>
-              <a:t>unsigned</a:t>
-            </a:r>
-            <a:r>
-              <a:rPr lang="en-US" altLang="ja-JP" sz="1200" dirty="0">
-                <a:solidFill>
-                  <a:srgbClr val="000000"/>
-                </a:solidFill>
-                <a:latin typeface="PixelMplus12" panose="020B0509020203020207" pitchFamily="49" charset="-128"/>
-                <a:ea typeface="PixelMplus12" panose="020B0509020203020207" pitchFamily="49" charset="-128"/>
-              </a:rPr>
-              <a:t> </a:t>
-            </a:r>
-            <a:r>
-              <a:rPr lang="en-US" altLang="ja-JP" sz="1200" dirty="0">
-                <a:solidFill>
-                  <a:srgbClr val="0000FF"/>
-                </a:solidFill>
-                <a:latin typeface="PixelMplus12" panose="020B0509020203020207" pitchFamily="49" charset="-128"/>
-                <a:ea typeface="PixelMplus12" panose="020B0509020203020207" pitchFamily="49" charset="-128"/>
-              </a:rPr>
-              <a:t>int</a:t>
-            </a:r>
-            <a:r>
-              <a:rPr lang="en-US" altLang="ja-JP" sz="1200" dirty="0">
-                <a:solidFill>
-                  <a:srgbClr val="000000"/>
-                </a:solidFill>
-                <a:latin typeface="PixelMplus12" panose="020B0509020203020207" pitchFamily="49" charset="-128"/>
-                <a:ea typeface="PixelMplus12" panose="020B0509020203020207" pitchFamily="49" charset="-128"/>
-              </a:rPr>
-              <a:t>)0x20, (</a:t>
-            </a:r>
-            <a:r>
-              <a:rPr lang="en-US" altLang="ja-JP" sz="1200" dirty="0">
-                <a:solidFill>
-                  <a:srgbClr val="0000FF"/>
-                </a:solidFill>
-                <a:latin typeface="PixelMplus12" panose="020B0509020203020207" pitchFamily="49" charset="-128"/>
-                <a:ea typeface="PixelMplus12" panose="020B0509020203020207" pitchFamily="49" charset="-128"/>
-              </a:rPr>
-              <a:t>unsigned</a:t>
-            </a:r>
-            <a:r>
-              <a:rPr lang="en-US" altLang="ja-JP" sz="1200" dirty="0">
-                <a:solidFill>
-                  <a:srgbClr val="000000"/>
-                </a:solidFill>
-                <a:latin typeface="PixelMplus12" panose="020B0509020203020207" pitchFamily="49" charset="-128"/>
-                <a:ea typeface="PixelMplus12" panose="020B0509020203020207" pitchFamily="49" charset="-128"/>
-              </a:rPr>
-              <a:t> </a:t>
-            </a:r>
-            <a:r>
-              <a:rPr lang="en-US" altLang="ja-JP" sz="1200" dirty="0">
-                <a:solidFill>
-                  <a:srgbClr val="0000FF"/>
-                </a:solidFill>
-                <a:latin typeface="PixelMplus12" panose="020B0509020203020207" pitchFamily="49" charset="-128"/>
-                <a:ea typeface="PixelMplus12" panose="020B0509020203020207" pitchFamily="49" charset="-128"/>
-              </a:rPr>
-              <a:t>int</a:t>
-            </a:r>
-            <a:r>
-              <a:rPr lang="en-US" altLang="ja-JP" sz="1200" dirty="0">
-                <a:solidFill>
-                  <a:srgbClr val="000000"/>
-                </a:solidFill>
-                <a:latin typeface="PixelMplus12" panose="020B0509020203020207" pitchFamily="49" charset="-128"/>
-                <a:ea typeface="PixelMplus12" panose="020B0509020203020207" pitchFamily="49" charset="-128"/>
-              </a:rPr>
-              <a:t>)0x0);</a:t>
-            </a:r>
-          </a:p>
-          <a:p>
-            <a:r>
-              <a:rPr kumimoji="1" lang="en-US" altLang="ja-JP" sz="1200" dirty="0">
-                <a:solidFill>
-                  <a:srgbClr val="000000"/>
-                </a:solidFill>
-                <a:latin typeface="PixelMplus12" panose="020B0509020203020207" pitchFamily="49" charset="-128"/>
-                <a:ea typeface="PixelMplus12" panose="020B0509020203020207" pitchFamily="49" charset="-128"/>
-              </a:rPr>
-              <a:t>:::</a:t>
-            </a:r>
-          </a:p>
-          <a:p>
-            <a:r>
-              <a:rPr lang="en-US" altLang="ja-JP" sz="1200" dirty="0" err="1">
-                <a:solidFill>
-                  <a:srgbClr val="000000"/>
-                </a:solidFill>
-                <a:latin typeface="PixelMplus12" panose="020B0509020203020207" pitchFamily="49" charset="-128"/>
-                <a:ea typeface="PixelMplus12" panose="020B0509020203020207" pitchFamily="49" charset="-128"/>
-              </a:rPr>
-              <a:t>m_rpcClient</a:t>
-            </a:r>
-            <a:r>
-              <a:rPr lang="en-US" altLang="ja-JP" sz="1200" dirty="0">
-                <a:solidFill>
-                  <a:srgbClr val="000000"/>
-                </a:solidFill>
-                <a:latin typeface="PixelMplus12" panose="020B0509020203020207" pitchFamily="49" charset="-128"/>
-                <a:ea typeface="PixelMplus12" panose="020B0509020203020207" pitchFamily="49" charset="-128"/>
-              </a:rPr>
-              <a:t>-&gt;~client();	//Close</a:t>
-            </a:r>
-            <a:r>
-              <a:rPr kumimoji="1" lang="ja-JP" altLang="en-US" sz="1200" dirty="0">
-                <a:solidFill>
-                  <a:srgbClr val="000000"/>
-                </a:solidFill>
-                <a:latin typeface="PixelMplus12" panose="020B0509020203020207" pitchFamily="49" charset="-128"/>
-                <a:ea typeface="PixelMplus12" panose="020B0509020203020207" pitchFamily="49" charset="-128"/>
-              </a:rPr>
-              <a:t> </a:t>
-            </a:r>
-            <a:r>
-              <a:rPr kumimoji="1" lang="en-US" altLang="ja-JP" sz="1200" dirty="0">
-                <a:solidFill>
-                  <a:srgbClr val="000000"/>
-                </a:solidFill>
-                <a:latin typeface="PixelMplus12" panose="020B0509020203020207" pitchFamily="49" charset="-128"/>
-                <a:ea typeface="PixelMplus12" panose="020B0509020203020207" pitchFamily="49" charset="-128"/>
-              </a:rPr>
-              <a:t>RPC</a:t>
-            </a:r>
-            <a:r>
-              <a:rPr kumimoji="1" lang="ja-JP" altLang="en-US" sz="1200" dirty="0">
-                <a:solidFill>
-                  <a:srgbClr val="000000"/>
-                </a:solidFill>
-                <a:latin typeface="PixelMplus12" panose="020B0509020203020207" pitchFamily="49" charset="-128"/>
-                <a:ea typeface="PixelMplus12" panose="020B0509020203020207" pitchFamily="49" charset="-128"/>
-              </a:rPr>
-              <a:t> </a:t>
-            </a:r>
-            <a:r>
-              <a:rPr kumimoji="1" lang="en-US" altLang="ja-JP" sz="1200" dirty="0">
-                <a:solidFill>
-                  <a:srgbClr val="000000"/>
-                </a:solidFill>
-                <a:latin typeface="PixelMplus12" panose="020B0509020203020207" pitchFamily="49" charset="-128"/>
-                <a:ea typeface="PixelMplus12" panose="020B0509020203020207" pitchFamily="49" charset="-128"/>
-              </a:rPr>
-              <a:t>port</a:t>
-            </a:r>
-            <a:endParaRPr kumimoji="1" lang="ja-JP" altLang="en-US" sz="1200" dirty="0">
+              <a:t>port(But, may not working properly. Recommend commenting out this line.)</a:t>
+            </a:r>
+            <a:endParaRPr kumimoji="1" lang="ja-JP" altLang="en-US" sz="1000" dirty="0">
               <a:latin typeface="PixelMplus12" panose="020B0509020203020207" pitchFamily="49" charset="-128"/>
               <a:ea typeface="PixelMplus12" panose="020B0509020203020207" pitchFamily="49" charset="-128"/>
             </a:endParaRPr>
@@ -42145,7 +42303,7 @@
         </p:blipFill>
         <p:spPr>
           <a:xfrm>
-            <a:off x="9008828" y="3843571"/>
+            <a:off x="9744950" y="3429000"/>
             <a:ext cx="2011679" cy="529671"/>
           </a:xfrm>
           <a:prstGeom prst="rect">
@@ -42158,6 +42316,47 @@
           </a:ln>
         </p:spPr>
       </p:pic>
+      <p:cxnSp>
+        <p:nvCxnSpPr>
+          <p:cNvPr id="8" name="直線矢印コネクタ 7">
+            <a:extLst>
+              <a:ext uri="{FF2B5EF4-FFF2-40B4-BE49-F238E27FC236}">
+                <a16:creationId xmlns:a16="http://schemas.microsoft.com/office/drawing/2014/main" id="{F43BC414-8C68-36B2-CD7E-EC4A99393D3E}"/>
+              </a:ext>
+            </a:extLst>
+          </p:cNvPr>
+          <p:cNvCxnSpPr>
+            <a:cxnSpLocks/>
+          </p:cNvCxnSpPr>
+          <p:nvPr/>
+        </p:nvCxnSpPr>
+        <p:spPr>
+          <a:xfrm>
+            <a:off x="6521570" y="3191774"/>
+            <a:ext cx="3393056" cy="502061"/>
+          </a:xfrm>
+          <a:prstGeom prst="straightConnector1">
+            <a:avLst/>
+          </a:prstGeom>
+          <a:ln>
+            <a:tailEnd type="triangle"/>
+          </a:ln>
+        </p:spPr>
+        <p:style>
+          <a:lnRef idx="1">
+            <a:schemeClr val="accent1"/>
+          </a:lnRef>
+          <a:fillRef idx="0">
+            <a:schemeClr val="accent1"/>
+          </a:fillRef>
+          <a:effectRef idx="0">
+            <a:schemeClr val="accent1"/>
+          </a:effectRef>
+          <a:fontRef idx="minor">
+            <a:schemeClr val="tx1"/>
+          </a:fontRef>
+        </p:style>
+      </p:cxnSp>
     </p:spTree>
     <p:extLst>
       <p:ext uri="{BB962C8B-B14F-4D97-AF65-F5344CB8AC3E}">

</xml_diff>

<commit_message>
5.4.0.1 Fixed SMS(FTDI) clk generator.
</commit_message>
<xml_diff>
--- a/docs/MAmidiMEmo/Manual.pptx
+++ b/docs/MAmidiMEmo/Manual.pptx
@@ -239,7 +239,7 @@
           <a:p>
             <a:fld id="{581C28D8-13B6-41C3-9F5F-0284C569C6F1}" type="datetimeFigureOut">
               <a:rPr kumimoji="1" lang="ja-JP" altLang="en-US" smtClean="0"/>
-              <a:t>2023/10/21</a:t>
+              <a:t>2023/12/24</a:t>
             </a:fld>
             <a:endParaRPr kumimoji="1" lang="ja-JP" altLang="en-US"/>
           </a:p>
@@ -1734,7 +1734,7 @@
           <a:p>
             <a:fld id="{B8625E62-B904-4691-B75E-EC1C32885285}" type="datetime1">
               <a:rPr kumimoji="1" lang="ja-JP" altLang="en-US" smtClean="0"/>
-              <a:t>2023/10/21</a:t>
+              <a:t>2023/12/24</a:t>
             </a:fld>
             <a:endParaRPr kumimoji="1" lang="ja-JP" altLang="en-US"/>
           </a:p>
@@ -2072,7 +2072,7 @@
           <a:p>
             <a:fld id="{A4C87007-2A40-4EFC-90A3-258EFA3C1001}" type="datetime1">
               <a:rPr kumimoji="1" lang="ja-JP" altLang="en-US" smtClean="0"/>
-              <a:t>2023/10/21</a:t>
+              <a:t>2023/12/24</a:t>
             </a:fld>
             <a:endParaRPr kumimoji="1" lang="ja-JP" altLang="en-US"/>
           </a:p>
@@ -2473,7 +2473,7 @@
           <a:p>
             <a:fld id="{0FE0D7FF-9203-4AA3-90FD-622674A14F90}" type="datetime1">
               <a:rPr kumimoji="1" lang="ja-JP" altLang="en-US" smtClean="0"/>
-              <a:t>2023/10/21</a:t>
+              <a:t>2023/12/24</a:t>
             </a:fld>
             <a:endParaRPr kumimoji="1" lang="ja-JP" altLang="en-US"/>
           </a:p>
@@ -2809,7 +2809,7 @@
           <a:p>
             <a:fld id="{D2D6E4D3-BEDB-4F35-876B-5B9AA41BFB5B}" type="datetime1">
               <a:rPr kumimoji="1" lang="ja-JP" altLang="en-US" smtClean="0"/>
-              <a:t>2023/10/21</a:t>
+              <a:t>2023/12/24</a:t>
             </a:fld>
             <a:endParaRPr kumimoji="1" lang="ja-JP" altLang="en-US"/>
           </a:p>
@@ -3129,7 +3129,7 @@
           <a:p>
             <a:fld id="{2ACD896E-FC14-4F25-BC47-18ABAEA9E1FE}" type="datetime1">
               <a:rPr kumimoji="1" lang="ja-JP" altLang="en-US" smtClean="0"/>
-              <a:t>2023/10/21</a:t>
+              <a:t>2023/12/24</a:t>
             </a:fld>
             <a:endParaRPr kumimoji="1" lang="ja-JP" altLang="en-US"/>
           </a:p>
@@ -3525,7 +3525,7 @@
           <a:p>
             <a:fld id="{54FC701B-2185-4987-B8E2-5507664B65F4}" type="datetime1">
               <a:rPr kumimoji="1" lang="ja-JP" altLang="en-US" smtClean="0"/>
-              <a:t>2023/10/21</a:t>
+              <a:t>2023/12/24</a:t>
             </a:fld>
             <a:endParaRPr kumimoji="1" lang="ja-JP" altLang="en-US"/>
           </a:p>
@@ -3814,7 +3814,7 @@
           <a:p>
             <a:fld id="{3FB4CDED-9617-418F-B546-D66B9BB6C35E}" type="datetime1">
               <a:rPr kumimoji="1" lang="ja-JP" altLang="en-US" smtClean="0"/>
-              <a:t>2023/10/21</a:t>
+              <a:t>2023/12/24</a:t>
             </a:fld>
             <a:endParaRPr kumimoji="1" lang="ja-JP" altLang="en-US"/>
           </a:p>
@@ -4108,7 +4108,7 @@
           <a:p>
             <a:fld id="{F5635D40-962A-46D7-8037-3F2900B5EB4D}" type="datetime1">
               <a:rPr kumimoji="1" lang="ja-JP" altLang="en-US" smtClean="0"/>
-              <a:t>2023/10/21</a:t>
+              <a:t>2023/12/24</a:t>
             </a:fld>
             <a:endParaRPr kumimoji="1" lang="ja-JP" altLang="en-US"/>
           </a:p>
@@ -4402,7 +4402,7 @@
           <a:p>
             <a:fld id="{741DA9A2-8356-4FFD-B66A-E38811049858}" type="datetime1">
               <a:rPr kumimoji="1" lang="ja-JP" altLang="en-US" smtClean="0"/>
-              <a:t>2023/10/21</a:t>
+              <a:t>2023/12/24</a:t>
             </a:fld>
             <a:endParaRPr kumimoji="1" lang="ja-JP" altLang="en-US"/>
           </a:p>
@@ -4731,7 +4731,7 @@
           <a:p>
             <a:fld id="{9DDE8989-88B8-4869-97D9-547531F13E13}" type="datetime1">
               <a:rPr kumimoji="1" lang="ja-JP" altLang="en-US" smtClean="0"/>
-              <a:t>2023/10/21</a:t>
+              <a:t>2023/12/24</a:t>
             </a:fld>
             <a:endParaRPr kumimoji="1" lang="ja-JP" altLang="en-US"/>
           </a:p>
@@ -5118,7 +5118,7 @@
           <a:p>
             <a:fld id="{81EC4031-B949-4300-AB3E-1551426E8631}" type="datetime1">
               <a:rPr kumimoji="1" lang="ja-JP" altLang="en-US" smtClean="0"/>
-              <a:t>2023/10/21</a:t>
+              <a:t>2023/12/24</a:t>
             </a:fld>
             <a:endParaRPr kumimoji="1" lang="ja-JP" altLang="en-US"/>
           </a:p>
@@ -5639,7 +5639,7 @@
           <a:p>
             <a:fld id="{F39E755E-A59D-4634-B604-E9BB568B1156}" type="datetime1">
               <a:rPr kumimoji="1" lang="ja-JP" altLang="en-US" smtClean="0"/>
-              <a:t>2023/10/21</a:t>
+              <a:t>2023/12/24</a:t>
             </a:fld>
             <a:endParaRPr kumimoji="1" lang="ja-JP" altLang="en-US"/>
           </a:p>
@@ -5844,7 +5844,7 @@
           <a:p>
             <a:fld id="{61DA38B3-7601-4256-ABFE-386B92B0EDB5}" type="datetime1">
               <a:rPr kumimoji="1" lang="ja-JP" altLang="en-US" smtClean="0"/>
-              <a:t>2023/10/21</a:t>
+              <a:t>2023/12/24</a:t>
             </a:fld>
             <a:endParaRPr kumimoji="1" lang="ja-JP" altLang="en-US"/>
           </a:p>
@@ -6021,7 +6021,7 @@
           <a:p>
             <a:fld id="{5A28ED6D-8A94-4DBA-8EF2-284D1A467CE8}" type="datetime1">
               <a:rPr kumimoji="1" lang="ja-JP" altLang="en-US" smtClean="0"/>
-              <a:t>2023/10/21</a:t>
+              <a:t>2023/12/24</a:t>
             </a:fld>
             <a:endParaRPr kumimoji="1" lang="ja-JP" altLang="en-US"/>
           </a:p>
@@ -6386,7 +6386,7 @@
           <a:p>
             <a:fld id="{B27B0317-28AF-43C5-8944-AADFA89E0149}" type="datetime1">
               <a:rPr kumimoji="1" lang="ja-JP" altLang="en-US" smtClean="0"/>
-              <a:t>2023/10/21</a:t>
+              <a:t>2023/12/24</a:t>
             </a:fld>
             <a:endParaRPr kumimoji="1" lang="ja-JP" altLang="en-US"/>
           </a:p>
@@ -6731,7 +6731,7 @@
           <a:p>
             <a:fld id="{A78D023C-C4FA-4CE8-B5BE-6798898EE377}" type="datetime1">
               <a:rPr kumimoji="1" lang="ja-JP" altLang="en-US" smtClean="0"/>
-              <a:t>2023/10/21</a:t>
+              <a:t>2023/12/24</a:t>
             </a:fld>
             <a:endParaRPr kumimoji="1" lang="ja-JP" altLang="en-US"/>
           </a:p>
@@ -8880,7 +8880,7 @@
           <a:p>
             <a:fld id="{99567159-F4A8-4352-915B-DDBEFEF4A4D6}" type="datetime1">
               <a:rPr kumimoji="1" lang="ja-JP" altLang="en-US" smtClean="0"/>
-              <a:t>2023/10/21</a:t>
+              <a:t>2023/12/24</a:t>
             </a:fld>
             <a:endParaRPr kumimoji="1" lang="ja-JP" altLang="en-US"/>
           </a:p>
@@ -32711,8 +32711,8 @@
         </p:nvSpPr>
         <p:spPr>
           <a:xfrm>
-            <a:off x="7183120" y="1523122"/>
-            <a:ext cx="4896585" cy="369332"/>
+            <a:off x="7533404" y="1612612"/>
+            <a:ext cx="4023056" cy="584775"/>
           </a:xfrm>
           <a:prstGeom prst="rect">
             <a:avLst/>
@@ -32726,22 +32726,22 @@
           <a:lstStyle/>
           <a:p>
             <a:r>
-              <a:rPr kumimoji="1" lang="en-US" altLang="ja-JP" b="1" dirty="0"/>
-              <a:t>*</a:t>
-            </a:r>
-            <a:r>
-              <a:rPr kumimoji="1" lang="en-US" altLang="ja-JP" dirty="0"/>
-              <a:t>MONO and </a:t>
-            </a:r>
-            <a:r>
-              <a:rPr kumimoji="1" lang="en-US" altLang="ja-JP" dirty="0" err="1"/>
+              <a:rPr kumimoji="1" lang="en-US" altLang="ja-JP" sz="1600" dirty="0"/>
+              <a:t>*Enabled only MONO = 1 and </a:t>
+            </a:r>
+            <a:r>
+              <a:rPr kumimoji="1" lang="en-US" altLang="ja-JP" sz="1600" dirty="0" err="1"/>
+              <a:t>SlotAssignAlgorithm</a:t>
+            </a:r>
+            <a:r>
+              <a:rPr kumimoji="1" lang="en-US" altLang="ja-JP" sz="1600" dirty="0"/>
+              <a:t> = </a:t>
+            </a:r>
+            <a:r>
+              <a:rPr kumimoji="1" lang="en-US" altLang="ja-JP" sz="1600" dirty="0" err="1"/>
               <a:t>RecentlyUsedSlot</a:t>
             </a:r>
-            <a:r>
-              <a:rPr kumimoji="1" lang="en-US" altLang="ja-JP" dirty="0"/>
-              <a:t> mode only</a:t>
-            </a:r>
-            <a:endParaRPr kumimoji="1" lang="ja-JP" altLang="en-US" dirty="0"/>
+            <a:endParaRPr kumimoji="1" lang="ja-JP" altLang="en-US" sz="1600" dirty="0"/>
           </a:p>
         </p:txBody>
       </p:sp>

</xml_diff>

<commit_message>
5.6.0.0 Supported SAA1099. 	Fixed envelope release timing of FxEngine when key off.         (Preliminary) Supported XGM2 recording and fixed XGM PCM data.
</commit_message>
<xml_diff>
--- a/docs/MAmidiMEmo/Manual.pptx
+++ b/docs/MAmidiMEmo/Manual.pptx
@@ -5,7 +5,7 @@
     <p:sldMasterId id="2147483678" r:id="rId1"/>
   </p:sldMasterIdLst>
   <p:notesMasterIdLst>
-    <p:notesMasterId r:id="rId45"/>
+    <p:notesMasterId r:id="rId46"/>
   </p:notesMasterIdLst>
   <p:sldIdLst>
     <p:sldId id="256" r:id="rId2"/>
@@ -47,10 +47,11 @@
     <p:sldId id="285" r:id="rId38"/>
     <p:sldId id="284" r:id="rId39"/>
     <p:sldId id="301" r:id="rId40"/>
-    <p:sldId id="288" r:id="rId41"/>
-    <p:sldId id="287" r:id="rId42"/>
-    <p:sldId id="292" r:id="rId43"/>
-    <p:sldId id="293" r:id="rId44"/>
+    <p:sldId id="304" r:id="rId41"/>
+    <p:sldId id="288" r:id="rId42"/>
+    <p:sldId id="287" r:id="rId43"/>
+    <p:sldId id="292" r:id="rId44"/>
+    <p:sldId id="293" r:id="rId45"/>
   </p:sldIdLst>
   <p:sldSz cx="12192000" cy="6858000"/>
   <p:notesSz cx="6858000" cy="9144000"/>
@@ -239,7 +240,7 @@
           <a:p>
             <a:fld id="{581C28D8-13B6-41C3-9F5F-0284C569C6F1}" type="datetimeFigureOut">
               <a:rPr kumimoji="1" lang="ja-JP" altLang="en-US" smtClean="0"/>
-              <a:t>2023/12/24</a:t>
+              <a:t>2024/2/7</a:t>
             </a:fld>
             <a:endParaRPr kumimoji="1" lang="ja-JP" altLang="en-US"/>
           </a:p>
@@ -771,7 +772,7 @@
           <a:p>
             <a:fld id="{E8D2F5C4-CB40-44D3-9C89-5ECCD9AB4B5C}" type="slidenum">
               <a:rPr kumimoji="1" lang="ja-JP" altLang="en-US" smtClean="0"/>
-              <a:t>42</a:t>
+              <a:t>39</a:t>
             </a:fld>
             <a:endParaRPr kumimoji="1" lang="ja-JP" altLang="en-US"/>
           </a:p>
@@ -780,7 +781,7 @@
     </p:spTree>
     <p:extLst>
       <p:ext uri="{BB962C8B-B14F-4D97-AF65-F5344CB8AC3E}">
-        <p14:creationId xmlns:p14="http://schemas.microsoft.com/office/powerpoint/2010/main" val="1783975363"/>
+        <p14:creationId xmlns:p14="http://schemas.microsoft.com/office/powerpoint/2010/main" val="1885226347"/>
       </p:ext>
     </p:extLst>
   </p:cSld>
@@ -856,6 +857,90 @@
             <a:fld id="{E8D2F5C4-CB40-44D3-9C89-5ECCD9AB4B5C}" type="slidenum">
               <a:rPr kumimoji="1" lang="ja-JP" altLang="en-US" smtClean="0"/>
               <a:t>43</a:t>
+            </a:fld>
+            <a:endParaRPr kumimoji="1" lang="ja-JP" altLang="en-US"/>
+          </a:p>
+        </p:txBody>
+      </p:sp>
+    </p:spTree>
+    <p:extLst>
+      <p:ext uri="{BB962C8B-B14F-4D97-AF65-F5344CB8AC3E}">
+        <p14:creationId xmlns:p14="http://schemas.microsoft.com/office/powerpoint/2010/main" val="1783975363"/>
+      </p:ext>
+    </p:extLst>
+  </p:cSld>
+  <p:clrMapOvr>
+    <a:masterClrMapping/>
+  </p:clrMapOvr>
+</p:notes>
+</file>
+
+<file path=ppt/notesSlides/notesSlide13.xml><?xml version="1.0" encoding="utf-8"?>
+<p:notes xmlns:a="http://schemas.openxmlformats.org/drawingml/2006/main" xmlns:r="http://schemas.openxmlformats.org/officeDocument/2006/relationships" xmlns:p="http://schemas.openxmlformats.org/presentationml/2006/main">
+  <p:cSld>
+    <p:spTree>
+      <p:nvGrpSpPr>
+        <p:cNvPr id="1" name=""/>
+        <p:cNvGrpSpPr/>
+        <p:nvPr/>
+      </p:nvGrpSpPr>
+      <p:grpSpPr>
+        <a:xfrm>
+          <a:off x="0" y="0"/>
+          <a:ext cx="0" cy="0"/>
+          <a:chOff x="0" y="0"/>
+          <a:chExt cx="0" cy="0"/>
+        </a:xfrm>
+      </p:grpSpPr>
+      <p:sp>
+        <p:nvSpPr>
+          <p:cNvPr id="2" name="スライド イメージ プレースホルダー 1"/>
+          <p:cNvSpPr>
+            <a:spLocks noGrp="1" noRot="1" noChangeAspect="1"/>
+          </p:cNvSpPr>
+          <p:nvPr>
+            <p:ph type="sldImg"/>
+          </p:nvPr>
+        </p:nvSpPr>
+        <p:spPr/>
+      </p:sp>
+      <p:sp>
+        <p:nvSpPr>
+          <p:cNvPr id="3" name="ノート プレースホルダー 2"/>
+          <p:cNvSpPr>
+            <a:spLocks noGrp="1"/>
+          </p:cNvSpPr>
+          <p:nvPr>
+            <p:ph type="body" idx="1"/>
+          </p:nvPr>
+        </p:nvSpPr>
+        <p:spPr/>
+        <p:txBody>
+          <a:bodyPr/>
+          <a:lstStyle/>
+          <a:p>
+            <a:endParaRPr kumimoji="1" lang="ja-JP" altLang="en-US" dirty="0"/>
+          </a:p>
+        </p:txBody>
+      </p:sp>
+      <p:sp>
+        <p:nvSpPr>
+          <p:cNvPr id="4" name="スライド番号プレースホルダー 3"/>
+          <p:cNvSpPr>
+            <a:spLocks noGrp="1"/>
+          </p:cNvSpPr>
+          <p:nvPr>
+            <p:ph type="sldNum" sz="quarter" idx="5"/>
+          </p:nvPr>
+        </p:nvSpPr>
+        <p:spPr/>
+        <p:txBody>
+          <a:bodyPr/>
+          <a:lstStyle/>
+          <a:p>
+            <a:fld id="{E8D2F5C4-CB40-44D3-9C89-5ECCD9AB4B5C}" type="slidenum">
+              <a:rPr kumimoji="1" lang="ja-JP" altLang="en-US" smtClean="0"/>
+              <a:t>44</a:t>
             </a:fld>
             <a:endParaRPr kumimoji="1" lang="ja-JP" altLang="en-US"/>
           </a:p>
@@ -1734,7 +1819,7 @@
           <a:p>
             <a:fld id="{B8625E62-B904-4691-B75E-EC1C32885285}" type="datetime1">
               <a:rPr kumimoji="1" lang="ja-JP" altLang="en-US" smtClean="0"/>
-              <a:t>2023/12/24</a:t>
+              <a:t>2024/2/7</a:t>
             </a:fld>
             <a:endParaRPr kumimoji="1" lang="ja-JP" altLang="en-US"/>
           </a:p>
@@ -2072,7 +2157,7 @@
           <a:p>
             <a:fld id="{A4C87007-2A40-4EFC-90A3-258EFA3C1001}" type="datetime1">
               <a:rPr kumimoji="1" lang="ja-JP" altLang="en-US" smtClean="0"/>
-              <a:t>2023/12/24</a:t>
+              <a:t>2024/2/7</a:t>
             </a:fld>
             <a:endParaRPr kumimoji="1" lang="ja-JP" altLang="en-US"/>
           </a:p>
@@ -2473,7 +2558,7 @@
           <a:p>
             <a:fld id="{0FE0D7FF-9203-4AA3-90FD-622674A14F90}" type="datetime1">
               <a:rPr kumimoji="1" lang="ja-JP" altLang="en-US" smtClean="0"/>
-              <a:t>2023/12/24</a:t>
+              <a:t>2024/2/7</a:t>
             </a:fld>
             <a:endParaRPr kumimoji="1" lang="ja-JP" altLang="en-US"/>
           </a:p>
@@ -2809,7 +2894,7 @@
           <a:p>
             <a:fld id="{D2D6E4D3-BEDB-4F35-876B-5B9AA41BFB5B}" type="datetime1">
               <a:rPr kumimoji="1" lang="ja-JP" altLang="en-US" smtClean="0"/>
-              <a:t>2023/12/24</a:t>
+              <a:t>2024/2/7</a:t>
             </a:fld>
             <a:endParaRPr kumimoji="1" lang="ja-JP" altLang="en-US"/>
           </a:p>
@@ -3129,7 +3214,7 @@
           <a:p>
             <a:fld id="{2ACD896E-FC14-4F25-BC47-18ABAEA9E1FE}" type="datetime1">
               <a:rPr kumimoji="1" lang="ja-JP" altLang="en-US" smtClean="0"/>
-              <a:t>2023/12/24</a:t>
+              <a:t>2024/2/7</a:t>
             </a:fld>
             <a:endParaRPr kumimoji="1" lang="ja-JP" altLang="en-US"/>
           </a:p>
@@ -3525,7 +3610,7 @@
           <a:p>
             <a:fld id="{54FC701B-2185-4987-B8E2-5507664B65F4}" type="datetime1">
               <a:rPr kumimoji="1" lang="ja-JP" altLang="en-US" smtClean="0"/>
-              <a:t>2023/12/24</a:t>
+              <a:t>2024/2/7</a:t>
             </a:fld>
             <a:endParaRPr kumimoji="1" lang="ja-JP" altLang="en-US"/>
           </a:p>
@@ -3814,7 +3899,7 @@
           <a:p>
             <a:fld id="{3FB4CDED-9617-418F-B546-D66B9BB6C35E}" type="datetime1">
               <a:rPr kumimoji="1" lang="ja-JP" altLang="en-US" smtClean="0"/>
-              <a:t>2023/12/24</a:t>
+              <a:t>2024/2/7</a:t>
             </a:fld>
             <a:endParaRPr kumimoji="1" lang="ja-JP" altLang="en-US"/>
           </a:p>
@@ -4108,7 +4193,7 @@
           <a:p>
             <a:fld id="{F5635D40-962A-46D7-8037-3F2900B5EB4D}" type="datetime1">
               <a:rPr kumimoji="1" lang="ja-JP" altLang="en-US" smtClean="0"/>
-              <a:t>2023/12/24</a:t>
+              <a:t>2024/2/7</a:t>
             </a:fld>
             <a:endParaRPr kumimoji="1" lang="ja-JP" altLang="en-US"/>
           </a:p>
@@ -4402,7 +4487,7 @@
           <a:p>
             <a:fld id="{741DA9A2-8356-4FFD-B66A-E38811049858}" type="datetime1">
               <a:rPr kumimoji="1" lang="ja-JP" altLang="en-US" smtClean="0"/>
-              <a:t>2023/12/24</a:t>
+              <a:t>2024/2/7</a:t>
             </a:fld>
             <a:endParaRPr kumimoji="1" lang="ja-JP" altLang="en-US"/>
           </a:p>
@@ -4731,7 +4816,7 @@
           <a:p>
             <a:fld id="{9DDE8989-88B8-4869-97D9-547531F13E13}" type="datetime1">
               <a:rPr kumimoji="1" lang="ja-JP" altLang="en-US" smtClean="0"/>
-              <a:t>2023/12/24</a:t>
+              <a:t>2024/2/7</a:t>
             </a:fld>
             <a:endParaRPr kumimoji="1" lang="ja-JP" altLang="en-US"/>
           </a:p>
@@ -5118,7 +5203,7 @@
           <a:p>
             <a:fld id="{81EC4031-B949-4300-AB3E-1551426E8631}" type="datetime1">
               <a:rPr kumimoji="1" lang="ja-JP" altLang="en-US" smtClean="0"/>
-              <a:t>2023/12/24</a:t>
+              <a:t>2024/2/7</a:t>
             </a:fld>
             <a:endParaRPr kumimoji="1" lang="ja-JP" altLang="en-US"/>
           </a:p>
@@ -5639,7 +5724,7 @@
           <a:p>
             <a:fld id="{F39E755E-A59D-4634-B604-E9BB568B1156}" type="datetime1">
               <a:rPr kumimoji="1" lang="ja-JP" altLang="en-US" smtClean="0"/>
-              <a:t>2023/12/24</a:t>
+              <a:t>2024/2/7</a:t>
             </a:fld>
             <a:endParaRPr kumimoji="1" lang="ja-JP" altLang="en-US"/>
           </a:p>
@@ -5844,7 +5929,7 @@
           <a:p>
             <a:fld id="{61DA38B3-7601-4256-ABFE-386B92B0EDB5}" type="datetime1">
               <a:rPr kumimoji="1" lang="ja-JP" altLang="en-US" smtClean="0"/>
-              <a:t>2023/12/24</a:t>
+              <a:t>2024/2/7</a:t>
             </a:fld>
             <a:endParaRPr kumimoji="1" lang="ja-JP" altLang="en-US"/>
           </a:p>
@@ -6021,7 +6106,7 @@
           <a:p>
             <a:fld id="{5A28ED6D-8A94-4DBA-8EF2-284D1A467CE8}" type="datetime1">
               <a:rPr kumimoji="1" lang="ja-JP" altLang="en-US" smtClean="0"/>
-              <a:t>2023/12/24</a:t>
+              <a:t>2024/2/7</a:t>
             </a:fld>
             <a:endParaRPr kumimoji="1" lang="ja-JP" altLang="en-US"/>
           </a:p>
@@ -6386,7 +6471,7 @@
           <a:p>
             <a:fld id="{B27B0317-28AF-43C5-8944-AADFA89E0149}" type="datetime1">
               <a:rPr kumimoji="1" lang="ja-JP" altLang="en-US" smtClean="0"/>
-              <a:t>2023/12/24</a:t>
+              <a:t>2024/2/7</a:t>
             </a:fld>
             <a:endParaRPr kumimoji="1" lang="ja-JP" altLang="en-US"/>
           </a:p>
@@ -6731,7 +6816,7 @@
           <a:p>
             <a:fld id="{A78D023C-C4FA-4CE8-B5BE-6798898EE377}" type="datetime1">
               <a:rPr kumimoji="1" lang="ja-JP" altLang="en-US" smtClean="0"/>
-              <a:t>2023/12/24</a:t>
+              <a:t>2024/2/7</a:t>
             </a:fld>
             <a:endParaRPr kumimoji="1" lang="ja-JP" altLang="en-US"/>
           </a:p>
@@ -8880,7 +8965,7 @@
           <a:p>
             <a:fld id="{99567159-F4A8-4352-915B-DDBEFEF4A4D6}" type="datetime1">
               <a:rPr kumimoji="1" lang="ja-JP" altLang="en-US" smtClean="0"/>
-              <a:t>2023/12/24</a:t>
+              <a:t>2024/2/7</a:t>
             </a:fld>
             <a:endParaRPr kumimoji="1" lang="ja-JP" altLang="en-US"/>
           </a:p>
@@ -9473,8 +9558,8 @@
               <a:t>MAmidiMEmo</a:t>
             </a:r>
             <a:r>
-              <a:rPr lang="en-US" altLang="ja-JP" dirty="0"/>
-              <a:t> V5.0.1.0</a:t>
+              <a:rPr lang="en-US" altLang="ja-JP"/>
+              <a:t> V5.5.1.0</a:t>
             </a:r>
             <a:endParaRPr lang="ja-JP" altLang="en-US" dirty="0"/>
           </a:p>
@@ -30082,6 +30167,13 @@
               <a:rPr kumimoji="1" lang="en-US" altLang="ja-JP" dirty="0"/>
               <a:t>MIDI Implementation Chart 1</a:t>
             </a:r>
+            <a:br>
+              <a:rPr kumimoji="1" lang="en-US" altLang="ja-JP" dirty="0"/>
+            </a:br>
+            <a:r>
+              <a:rPr kumimoji="1" lang="en-US" altLang="ja-JP" dirty="0"/>
+              <a:t>General</a:t>
+            </a:r>
             <a:endParaRPr kumimoji="1" lang="ja-JP" altLang="en-US" dirty="0"/>
           </a:p>
         </p:txBody>
@@ -30711,6 +30803,13 @@
             <a:r>
               <a:rPr kumimoji="1" lang="en-US" altLang="ja-JP" dirty="0"/>
               <a:t>MIDI Implementation Chart 2</a:t>
+            </a:r>
+            <a:br>
+              <a:rPr kumimoji="1" lang="en-US" altLang="ja-JP" dirty="0"/>
+            </a:br>
+            <a:r>
+              <a:rPr kumimoji="1" lang="en-US" altLang="ja-JP" dirty="0"/>
+              <a:t>Modulation, Vol, Pan, GPCS</a:t>
             </a:r>
             <a:endParaRPr kumimoji="1" lang="ja-JP" altLang="en-US" dirty="0"/>
           </a:p>
@@ -31645,6 +31744,25 @@
             <a:r>
               <a:rPr kumimoji="1" lang="en-US" altLang="ja-JP" dirty="0"/>
               <a:t>MIDI Implementation Chart 3</a:t>
+            </a:r>
+            <a:br>
+              <a:rPr kumimoji="1" lang="en-US" altLang="ja-JP" dirty="0"/>
+            </a:br>
+            <a:r>
+              <a:rPr kumimoji="1" lang="en-US" altLang="ja-JP" dirty="0"/>
+              <a:t>Hold, </a:t>
+            </a:r>
+            <a:r>
+              <a:rPr kumimoji="1" lang="en-US" altLang="ja-JP" dirty="0" err="1"/>
+              <a:t>Portamentom</a:t>
+            </a:r>
+            <a:r>
+              <a:rPr lang="en-US" altLang="ja-JP" dirty="0"/>
+              <a:t>, </a:t>
+            </a:r>
+            <a:r>
+              <a:rPr kumimoji="1" lang="en-US" altLang="ja-JP" dirty="0"/>
+              <a:t>Modulation, SCCS</a:t>
             </a:r>
             <a:endParaRPr kumimoji="1" lang="ja-JP" altLang="en-US" dirty="0"/>
           </a:p>
@@ -32711,8 +32829,8 @@
         </p:nvSpPr>
         <p:spPr>
           <a:xfrm>
-            <a:off x="7533404" y="1612612"/>
-            <a:ext cx="4023056" cy="584775"/>
+            <a:off x="4176074" y="1878138"/>
+            <a:ext cx="7380386" cy="338554"/>
           </a:xfrm>
           <a:prstGeom prst="rect">
             <a:avLst/>
@@ -32799,6 +32917,13 @@
             <a:r>
               <a:rPr kumimoji="1" lang="en-US" altLang="ja-JP" dirty="0"/>
               <a:t>MIDI Implementation Chart 4</a:t>
+            </a:r>
+            <a:br>
+              <a:rPr kumimoji="1" lang="en-US" altLang="ja-JP" dirty="0"/>
+            </a:br>
+            <a:r>
+              <a:rPr kumimoji="1" lang="en-US" altLang="ja-JP" dirty="0"/>
+              <a:t>NRPN, RPN, Mono, Poly</a:t>
             </a:r>
             <a:endParaRPr kumimoji="1" lang="ja-JP" altLang="en-US" dirty="0"/>
           </a:p>
@@ -33517,6 +33642,13 @@
               <a:rPr kumimoji="1" lang="en-US" altLang="ja-JP" dirty="0"/>
               <a:t>MIDI Implementation Chart 5</a:t>
             </a:r>
+            <a:br>
+              <a:rPr kumimoji="1" lang="en-US" altLang="ja-JP" dirty="0"/>
+            </a:br>
+            <a:r>
+              <a:rPr kumimoji="1" lang="en-US" altLang="ja-JP" dirty="0"/>
+              <a:t>Pitch, Tune, Modulation Depth</a:t>
+            </a:r>
             <a:endParaRPr kumimoji="1" lang="ja-JP" altLang="en-US" dirty="0"/>
           </a:p>
         </p:txBody>
@@ -34046,6 +34178,13 @@
               <a:rPr kumimoji="1" lang="en-US" altLang="ja-JP" dirty="0"/>
               <a:t>MIDI Implementation Chart 6</a:t>
             </a:r>
+            <a:br>
+              <a:rPr kumimoji="1" lang="en-US" altLang="ja-JP" dirty="0"/>
+            </a:br>
+            <a:r>
+              <a:rPr kumimoji="1" lang="en-US" altLang="ja-JP" dirty="0"/>
+              <a:t>GPCS, SCCS</a:t>
+            </a:r>
             <a:endParaRPr kumimoji="1" lang="ja-JP" altLang="en-US" dirty="0"/>
           </a:p>
         </p:txBody>
@@ -34521,6 +34660,13 @@
             <a:r>
               <a:rPr kumimoji="1" lang="en-US" altLang="ja-JP" dirty="0"/>
               <a:t>MIDI Implementation Chart 7</a:t>
+            </a:r>
+            <a:br>
+              <a:rPr lang="en-US" altLang="ja-JP" dirty="0"/>
+            </a:br>
+            <a:r>
+              <a:rPr lang="en-US" altLang="ja-JP" dirty="0"/>
+              <a:t>Manage Instruments</a:t>
             </a:r>
             <a:endParaRPr kumimoji="1" lang="ja-JP" altLang="en-US" dirty="0"/>
           </a:p>
@@ -35264,6 +35410,13 @@
               <a:rPr kumimoji="1" lang="en-US" altLang="ja-JP" dirty="0"/>
               <a:t>MIDI Implementation Chart 8</a:t>
             </a:r>
+            <a:br>
+              <a:rPr kumimoji="1" lang="en-US" altLang="ja-JP" dirty="0"/>
+            </a:br>
+            <a:r>
+              <a:rPr kumimoji="1" lang="en-US" altLang="ja-JP" dirty="0"/>
+              <a:t>XGM Recording</a:t>
+            </a:r>
             <a:endParaRPr kumimoji="1" lang="ja-JP" altLang="en-US" dirty="0"/>
           </a:p>
         </p:txBody>
@@ -35312,13 +35465,13 @@
           <p:nvPr>
             <p:extLst>
               <p:ext uri="{D42A27DB-BD31-4B8C-83A1-F6EECF244321}">
-                <p14:modId xmlns:p14="http://schemas.microsoft.com/office/powerpoint/2010/main" val="3284848408"/>
+                <p14:modId xmlns:p14="http://schemas.microsoft.com/office/powerpoint/2010/main" val="2817542711"/>
               </p:ext>
             </p:extLst>
           </p:nvPr>
         </p:nvGraphicFramePr>
         <p:xfrm>
-          <a:off x="2032000" y="2225333"/>
+          <a:off x="2032000" y="2510192"/>
           <a:ext cx="9472611" cy="2656840"/>
         </p:xfrm>
         <a:graphic>
@@ -35553,8 +35706,8 @@
         </p:nvSpPr>
         <p:spPr>
           <a:xfrm>
-            <a:off x="5501640" y="5102275"/>
-            <a:ext cx="6099386" cy="923330"/>
+            <a:off x="2158738" y="5772225"/>
+            <a:ext cx="10033261" cy="923330"/>
           </a:xfrm>
           <a:prstGeom prst="rect">
             <a:avLst/>
@@ -35569,7 +35722,13 @@
           <a:p>
             <a:r>
               <a:rPr lang="en-US" altLang="ja-JP" dirty="0"/>
-              <a:t>NOTE: If you stop playing in the middle of a performance, the recording will not stop. Please press the XGM recording button manually.</a:t>
+              <a:t>NOTE: If you stop playing in the middle of a sequence, “Stop Rec” is not called and the recording will not stop.</a:t>
+            </a:r>
+          </a:p>
+          <a:p>
+            <a:r>
+              <a:rPr lang="en-US" altLang="ja-JP" dirty="0"/>
+              <a:t>Please press the XGM recording button manually.</a:t>
             </a:r>
             <a:endParaRPr lang="ja-JP" altLang="en-US" dirty="0"/>
           </a:p>
@@ -35955,6 +36114,391 @@
   <p:cSld>
     <p:spTree>
       <p:nvGrpSpPr>
+        <p:cNvPr id="1" name="">
+          <a:extLst>
+            <a:ext uri="{FF2B5EF4-FFF2-40B4-BE49-F238E27FC236}">
+              <a16:creationId xmlns:a16="http://schemas.microsoft.com/office/drawing/2014/main" id="{1E9CDDC3-330D-F7D5-5098-8080740D756D}"/>
+            </a:ext>
+          </a:extLst>
+        </p:cNvPr>
+        <p:cNvGrpSpPr/>
+        <p:nvPr/>
+      </p:nvGrpSpPr>
+      <p:grpSpPr>
+        <a:xfrm>
+          <a:off x="0" y="0"/>
+          <a:ext cx="0" cy="0"/>
+          <a:chOff x="0" y="0"/>
+          <a:chExt cx="0" cy="0"/>
+        </a:xfrm>
+      </p:grpSpPr>
+      <p:sp>
+        <p:nvSpPr>
+          <p:cNvPr id="2" name="タイトル 1">
+            <a:extLst>
+              <a:ext uri="{FF2B5EF4-FFF2-40B4-BE49-F238E27FC236}">
+                <a16:creationId xmlns:a16="http://schemas.microsoft.com/office/drawing/2014/main" id="{7A01879B-B351-A89B-20CE-B76210AAC752}"/>
+              </a:ext>
+            </a:extLst>
+          </p:cNvPr>
+          <p:cNvSpPr>
+            <a:spLocks noGrp="1"/>
+          </p:cNvSpPr>
+          <p:nvPr>
+            <p:ph type="title"/>
+          </p:nvPr>
+        </p:nvSpPr>
+        <p:spPr/>
+        <p:txBody>
+          <a:bodyPr/>
+          <a:lstStyle/>
+          <a:p>
+            <a:r>
+              <a:rPr kumimoji="1" lang="en-US" altLang="ja-JP" dirty="0"/>
+              <a:t>MIDI Implementation Chart 9</a:t>
+            </a:r>
+            <a:br>
+              <a:rPr kumimoji="1" lang="en-US" altLang="ja-JP" dirty="0"/>
+            </a:br>
+            <a:r>
+              <a:rPr kumimoji="1" lang="en-US" altLang="ja-JP" dirty="0"/>
+              <a:t>XGM2 Recording</a:t>
+            </a:r>
+            <a:endParaRPr kumimoji="1" lang="ja-JP" altLang="en-US" dirty="0"/>
+          </a:p>
+        </p:txBody>
+      </p:sp>
+      <p:sp>
+        <p:nvSpPr>
+          <p:cNvPr id="4" name="スライド番号プレースホルダー 3">
+            <a:extLst>
+              <a:ext uri="{FF2B5EF4-FFF2-40B4-BE49-F238E27FC236}">
+                <a16:creationId xmlns:a16="http://schemas.microsoft.com/office/drawing/2014/main" id="{97D8E8FE-0750-53D5-B42B-42D975ED38D2}"/>
+              </a:ext>
+            </a:extLst>
+          </p:cNvPr>
+          <p:cNvSpPr>
+            <a:spLocks noGrp="1"/>
+          </p:cNvSpPr>
+          <p:nvPr>
+            <p:ph type="sldNum" sz="quarter" idx="12"/>
+          </p:nvPr>
+        </p:nvSpPr>
+        <p:spPr/>
+        <p:txBody>
+          <a:bodyPr/>
+          <a:lstStyle/>
+          <a:p>
+            <a:fld id="{E27E2812-4560-4165-A7C7-9C013F955547}" type="slidenum">
+              <a:rPr kumimoji="1" lang="ja-JP" altLang="en-US" smtClean="0"/>
+              <a:t>40</a:t>
+            </a:fld>
+            <a:endParaRPr kumimoji="1" lang="ja-JP" altLang="en-US"/>
+          </a:p>
+        </p:txBody>
+      </p:sp>
+      <p:sp>
+        <p:nvSpPr>
+          <p:cNvPr id="3" name="テキスト ボックス 2">
+            <a:extLst>
+              <a:ext uri="{FF2B5EF4-FFF2-40B4-BE49-F238E27FC236}">
+                <a16:creationId xmlns:a16="http://schemas.microsoft.com/office/drawing/2014/main" id="{DA2BFF27-9B49-6848-AE60-4D3853F53A11}"/>
+              </a:ext>
+            </a:extLst>
+          </p:cNvPr>
+          <p:cNvSpPr txBox="1"/>
+          <p:nvPr/>
+        </p:nvSpPr>
+        <p:spPr>
+          <a:xfrm>
+            <a:off x="2158738" y="5772225"/>
+            <a:ext cx="10033261" cy="923330"/>
+          </a:xfrm>
+          <a:prstGeom prst="rect">
+            <a:avLst/>
+          </a:prstGeom>
+          <a:noFill/>
+        </p:spPr>
+        <p:txBody>
+          <a:bodyPr wrap="square">
+            <a:spAutoFit/>
+          </a:bodyPr>
+          <a:lstStyle/>
+          <a:p>
+            <a:r>
+              <a:rPr lang="en-US" altLang="ja-JP" dirty="0"/>
+              <a:t>NOTE: If you stop playing in the middle of a sequence, “Stop Rec” is not called and the recording will not stop.</a:t>
+            </a:r>
+          </a:p>
+          <a:p>
+            <a:r>
+              <a:rPr lang="en-US" altLang="ja-JP" dirty="0"/>
+              <a:t>Please press the XGM2 recording button manually.</a:t>
+            </a:r>
+            <a:endParaRPr lang="ja-JP" altLang="en-US" dirty="0"/>
+          </a:p>
+        </p:txBody>
+      </p:sp>
+      <p:graphicFrame>
+        <p:nvGraphicFramePr>
+          <p:cNvPr id="5" name="表 4">
+            <a:extLst>
+              <a:ext uri="{FF2B5EF4-FFF2-40B4-BE49-F238E27FC236}">
+                <a16:creationId xmlns:a16="http://schemas.microsoft.com/office/drawing/2014/main" id="{AA6E7CD6-BA5E-D986-6D1C-A4DD27586969}"/>
+              </a:ext>
+            </a:extLst>
+          </p:cNvPr>
+          <p:cNvGraphicFramePr>
+            <a:graphicFrameLocks noGrp="1"/>
+          </p:cNvGraphicFramePr>
+          <p:nvPr>
+            <p:extLst>
+              <p:ext uri="{D42A27DB-BD31-4B8C-83A1-F6EECF244321}">
+                <p14:modId xmlns:p14="http://schemas.microsoft.com/office/powerpoint/2010/main" val="1133559348"/>
+              </p:ext>
+            </p:extLst>
+          </p:nvPr>
+        </p:nvGraphicFramePr>
+        <p:xfrm>
+          <a:off x="2032000" y="2510192"/>
+          <a:ext cx="9472611" cy="2656840"/>
+        </p:xfrm>
+        <a:graphic>
+          <a:graphicData uri="http://schemas.openxmlformats.org/drawingml/2006/table">
+            <a:tbl>
+              <a:tblPr firstRow="1" bandRow="1">
+                <a:tableStyleId>{5C22544A-7EE6-4342-B048-85BDC9FD1C3A}</a:tableStyleId>
+              </a:tblPr>
+              <a:tblGrid>
+                <a:gridCol w="2027484">
+                  <a:extLst>
+                    <a:ext uri="{9D8B030D-6E8A-4147-A177-3AD203B41FA5}">
+                      <a16:colId xmlns:a16="http://schemas.microsoft.com/office/drawing/2014/main" val="3140821746"/>
+                    </a:ext>
+                  </a:extLst>
+                </a:gridCol>
+                <a:gridCol w="2027484">
+                  <a:extLst>
+                    <a:ext uri="{9D8B030D-6E8A-4147-A177-3AD203B41FA5}">
+                      <a16:colId xmlns:a16="http://schemas.microsoft.com/office/drawing/2014/main" val="2862939062"/>
+                    </a:ext>
+                  </a:extLst>
+                </a:gridCol>
+                <a:gridCol w="2027484">
+                  <a:extLst>
+                    <a:ext uri="{9D8B030D-6E8A-4147-A177-3AD203B41FA5}">
+                      <a16:colId xmlns:a16="http://schemas.microsoft.com/office/drawing/2014/main" val="2770498619"/>
+                    </a:ext>
+                  </a:extLst>
+                </a:gridCol>
+                <a:gridCol w="3390159">
+                  <a:extLst>
+                    <a:ext uri="{9D8B030D-6E8A-4147-A177-3AD203B41FA5}">
+                      <a16:colId xmlns:a16="http://schemas.microsoft.com/office/drawing/2014/main" val="4289464401"/>
+                    </a:ext>
+                  </a:extLst>
+                </a:gridCol>
+              </a:tblGrid>
+              <a:tr h="370840">
+                <a:tc>
+                  <a:txBody>
+                    <a:bodyPr/>
+                    <a:lstStyle/>
+                    <a:p>
+                      <a:r>
+                        <a:rPr kumimoji="1" lang="en-US" altLang="ja-JP" dirty="0"/>
+                        <a:t>Function</a:t>
+                      </a:r>
+                      <a:endParaRPr kumimoji="1" lang="ja-JP" altLang="en-US" dirty="0"/>
+                    </a:p>
+                  </a:txBody>
+                  <a:tcPr/>
+                </a:tc>
+                <a:tc>
+                  <a:txBody>
+                    <a:bodyPr/>
+                    <a:lstStyle/>
+                    <a:p>
+                      <a:r>
+                        <a:rPr kumimoji="1" lang="en-US" altLang="ja-JP" dirty="0"/>
+                        <a:t>MSB</a:t>
+                      </a:r>
+                      <a:endParaRPr kumimoji="1" lang="ja-JP" altLang="en-US" dirty="0"/>
+                    </a:p>
+                  </a:txBody>
+                  <a:tcPr/>
+                </a:tc>
+                <a:tc>
+                  <a:txBody>
+                    <a:bodyPr/>
+                    <a:lstStyle/>
+                    <a:p>
+                      <a:r>
+                        <a:rPr kumimoji="1" lang="en-US" altLang="ja-JP" dirty="0"/>
+                        <a:t>LSB</a:t>
+                      </a:r>
+                      <a:endParaRPr kumimoji="1" lang="ja-JP" altLang="en-US" dirty="0"/>
+                    </a:p>
+                  </a:txBody>
+                  <a:tcPr/>
+                </a:tc>
+                <a:tc>
+                  <a:txBody>
+                    <a:bodyPr/>
+                    <a:lstStyle/>
+                    <a:p>
+                      <a:r>
+                        <a:rPr kumimoji="1" lang="en-US" altLang="ja-JP" dirty="0"/>
+                        <a:t>Remarks</a:t>
+                      </a:r>
+                      <a:endParaRPr kumimoji="1" lang="ja-JP" altLang="en-US" dirty="0"/>
+                    </a:p>
+                  </a:txBody>
+                  <a:tcPr/>
+                </a:tc>
+                <a:extLst>
+                  <a:ext uri="{0D108BD9-81ED-4DB2-BD59-A6C34878D82A}">
+                    <a16:rowId xmlns:a16="http://schemas.microsoft.com/office/drawing/2014/main" val="1671041493"/>
+                  </a:ext>
+                </a:extLst>
+              </a:tr>
+              <a:tr h="370840">
+                <a:tc>
+                  <a:txBody>
+                    <a:bodyPr/>
+                    <a:lstStyle/>
+                    <a:p>
+                      <a:pPr algn="l"/>
+                      <a:r>
+                        <a:rPr kumimoji="1" lang="en-US" altLang="ja-JP" dirty="0"/>
+                        <a:t>NRPN</a:t>
+                      </a:r>
+                    </a:p>
+                  </a:txBody>
+                  <a:tcPr/>
+                </a:tc>
+                <a:tc>
+                  <a:txBody>
+                    <a:bodyPr/>
+                    <a:lstStyle/>
+                    <a:p>
+                      <a:r>
+                        <a:rPr kumimoji="1" lang="en-US" altLang="ja-JP" dirty="0"/>
+                        <a:t>2</a:t>
+                      </a:r>
+                      <a:endParaRPr kumimoji="1" lang="ja-JP" altLang="en-US" dirty="0"/>
+                    </a:p>
+                  </a:txBody>
+                  <a:tcPr/>
+                </a:tc>
+                <a:tc>
+                  <a:txBody>
+                    <a:bodyPr/>
+                    <a:lstStyle/>
+                    <a:p>
+                      <a:pPr marL="0" marR="0" lvl="0" indent="0" algn="l" defTabSz="457200" rtl="0" eaLnBrk="1" fontAlgn="auto" latinLnBrk="0" hangingPunct="1">
+                        <a:lnSpc>
+                          <a:spcPct val="100000"/>
+                        </a:lnSpc>
+                        <a:spcBef>
+                          <a:spcPts val="0"/>
+                        </a:spcBef>
+                        <a:spcAft>
+                          <a:spcPts val="0"/>
+                        </a:spcAft>
+                        <a:buClrTx/>
+                        <a:buSzTx/>
+                        <a:buFontTx/>
+                        <a:buNone/>
+                        <a:tabLst/>
+                        <a:defRPr/>
+                      </a:pPr>
+                      <a:r>
+                        <a:rPr kumimoji="1" lang="en-US" altLang="ja-JP" dirty="0"/>
+                        <a:t>6</a:t>
+                      </a:r>
+                    </a:p>
+                  </a:txBody>
+                  <a:tcPr/>
+                </a:tc>
+                <a:tc>
+                  <a:txBody>
+                    <a:bodyPr/>
+                    <a:lstStyle/>
+                    <a:p>
+                      <a:r>
+                        <a:rPr kumimoji="1" lang="en-US" altLang="ja-JP" dirty="0"/>
+                        <a:t>XGM2 Recording Command</a:t>
+                      </a:r>
+                    </a:p>
+                    <a:p>
+                      <a:endParaRPr kumimoji="1" lang="en-US" altLang="ja-JP" dirty="0"/>
+                    </a:p>
+                    <a:p>
+                      <a:r>
+                        <a:rPr kumimoji="1" lang="en-US" altLang="ja-JP" dirty="0"/>
+                        <a:t>DATA MSB </a:t>
+                      </a:r>
+                    </a:p>
+                    <a:p>
+                      <a:endParaRPr kumimoji="1" lang="en-US" altLang="ja-JP" dirty="0"/>
+                    </a:p>
+                    <a:p>
+                      <a:r>
+                        <a:rPr kumimoji="1" lang="en-US" altLang="ja-JP" dirty="0"/>
+                        <a:t> 0: Start Recording</a:t>
+                      </a:r>
+                    </a:p>
+                    <a:p>
+                      <a:r>
+                        <a:rPr kumimoji="1" lang="en-US" altLang="ja-JP" dirty="0"/>
+                        <a:t> 1: Set Loop Start Point</a:t>
+                      </a:r>
+                    </a:p>
+                    <a:p>
+                      <a:r>
+                        <a:rPr kumimoji="1" lang="en-US" altLang="ja-JP" dirty="0"/>
+                        <a:t> 2: Set Loop End Point</a:t>
+                      </a:r>
+                    </a:p>
+                    <a:p>
+                      <a:r>
+                        <a:rPr kumimoji="1" lang="en-US" altLang="ja-JP" dirty="0"/>
+                        <a:t> 3: Stop Recording</a:t>
+                      </a:r>
+                      <a:endParaRPr kumimoji="1" lang="ja-JP" altLang="en-US" dirty="0"/>
+                    </a:p>
+                  </a:txBody>
+                  <a:tcPr/>
+                </a:tc>
+                <a:extLst>
+                  <a:ext uri="{0D108BD9-81ED-4DB2-BD59-A6C34878D82A}">
+                    <a16:rowId xmlns:a16="http://schemas.microsoft.com/office/drawing/2014/main" val="2531957203"/>
+                  </a:ext>
+                </a:extLst>
+              </a:tr>
+            </a:tbl>
+          </a:graphicData>
+        </a:graphic>
+      </p:graphicFrame>
+    </p:spTree>
+    <p:extLst>
+      <p:ext uri="{BB962C8B-B14F-4D97-AF65-F5344CB8AC3E}">
+        <p14:creationId xmlns:p14="http://schemas.microsoft.com/office/powerpoint/2010/main" val="4285372935"/>
+      </p:ext>
+    </p:extLst>
+  </p:cSld>
+  <p:clrMapOvr>
+    <a:masterClrMapping/>
+  </p:clrMapOvr>
+</p:sld>
+</file>
+
+<file path=ppt/slides/slide41.xml><?xml version="1.0" encoding="utf-8"?>
+<p:sld xmlns:a="http://schemas.openxmlformats.org/drawingml/2006/main" xmlns:r="http://schemas.openxmlformats.org/officeDocument/2006/relationships" xmlns:p="http://schemas.openxmlformats.org/presentationml/2006/main">
+  <p:cSld>
+    <p:spTree>
+      <p:nvGrpSpPr>
         <p:cNvPr id="1" name=""/>
         <p:cNvGrpSpPr/>
         <p:nvPr/>
@@ -36098,7 +36642,7 @@
           <a:p>
             <a:fld id="{E27E2812-4560-4165-A7C7-9C013F955547}" type="slidenum">
               <a:rPr kumimoji="1" lang="ja-JP" altLang="en-US" smtClean="0"/>
-              <a:t>40</a:t>
+              <a:t>41</a:t>
             </a:fld>
             <a:endParaRPr kumimoji="1" lang="ja-JP" altLang="en-US"/>
           </a:p>
@@ -36289,7 +36833,7 @@
 </p:sld>
 </file>
 
-<file path=ppt/slides/slide41.xml><?xml version="1.0" encoding="utf-8"?>
+<file path=ppt/slides/slide42.xml><?xml version="1.0" encoding="utf-8"?>
 <p:sld xmlns:a="http://schemas.openxmlformats.org/drawingml/2006/main" xmlns:r="http://schemas.openxmlformats.org/officeDocument/2006/relationships" xmlns:p="http://schemas.openxmlformats.org/presentationml/2006/main">
   <p:cSld>
     <p:spTree>
@@ -36639,7 +37183,7 @@
           <a:p>
             <a:fld id="{E27E2812-4560-4165-A7C7-9C013F955547}" type="slidenum">
               <a:rPr kumimoji="1" lang="ja-JP" altLang="en-US" smtClean="0"/>
-              <a:t>41</a:t>
+              <a:t>42</a:t>
             </a:fld>
             <a:endParaRPr kumimoji="1" lang="ja-JP" altLang="en-US"/>
           </a:p>
@@ -38229,7 +38773,7 @@
 </p:sld>
 </file>
 
-<file path=ppt/slides/slide42.xml><?xml version="1.0" encoding="utf-8"?>
+<file path=ppt/slides/slide43.xml><?xml version="1.0" encoding="utf-8"?>
 <p:sld xmlns:a="http://schemas.openxmlformats.org/drawingml/2006/main" xmlns:r="http://schemas.openxmlformats.org/officeDocument/2006/relationships" xmlns:p="http://schemas.openxmlformats.org/presentationml/2006/main">
   <p:cSld>
     <p:spTree>
@@ -38423,7 +38967,7 @@
           <a:p>
             <a:fld id="{E27E2812-4560-4165-A7C7-9C013F955547}" type="slidenum">
               <a:rPr kumimoji="1" lang="ja-JP" altLang="en-US" smtClean="0"/>
-              <a:t>42</a:t>
+              <a:t>43</a:t>
             </a:fld>
             <a:endParaRPr kumimoji="1" lang="ja-JP" altLang="en-US"/>
           </a:p>
@@ -40572,7 +41116,7 @@
 </p:sld>
 </file>
 
-<file path=ppt/slides/slide43.xml><?xml version="1.0" encoding="utf-8"?>
+<file path=ppt/slides/slide44.xml><?xml version="1.0" encoding="utf-8"?>
 <p:sld xmlns:a="http://schemas.openxmlformats.org/drawingml/2006/main" xmlns:r="http://schemas.openxmlformats.org/officeDocument/2006/relationships" xmlns:p="http://schemas.openxmlformats.org/presentationml/2006/main">
   <p:cSld>
     <p:spTree>
@@ -41107,7 +41651,7 @@
           <a:p>
             <a:fld id="{E27E2812-4560-4165-A7C7-9C013F955547}" type="slidenum">
               <a:rPr kumimoji="1" lang="ja-JP" altLang="en-US" smtClean="0"/>
-              <a:t>43</a:t>
+              <a:t>44</a:t>
             </a:fld>
             <a:endParaRPr kumimoji="1" lang="ja-JP" altLang="en-US"/>
           </a:p>

</xml_diff>

<commit_message>
- 6.0.0.0 Supported PAULA_8364(AMIGA).
</commit_message>
<xml_diff>
--- a/docs/MAmidiMEmo/Manual.pptx
+++ b/docs/MAmidiMEmo/Manual.pptx
@@ -5,7 +5,7 @@
     <p:sldMasterId id="2147483678" r:id="rId1"/>
   </p:sldMasterIdLst>
   <p:notesMasterIdLst>
-    <p:notesMasterId r:id="rId46"/>
+    <p:notesMasterId r:id="rId47"/>
   </p:notesMasterIdLst>
   <p:sldIdLst>
     <p:sldId id="256" r:id="rId2"/>
@@ -29,29 +29,30 @@
     <p:sldId id="277" r:id="rId20"/>
     <p:sldId id="286" r:id="rId21"/>
     <p:sldId id="291" r:id="rId22"/>
-    <p:sldId id="273" r:id="rId23"/>
-    <p:sldId id="303" r:id="rId24"/>
-    <p:sldId id="278" r:id="rId25"/>
-    <p:sldId id="290" r:id="rId26"/>
-    <p:sldId id="295" r:id="rId27"/>
-    <p:sldId id="275" r:id="rId28"/>
-    <p:sldId id="300" r:id="rId29"/>
-    <p:sldId id="299" r:id="rId30"/>
-    <p:sldId id="296" r:id="rId31"/>
-    <p:sldId id="264" r:id="rId32"/>
-    <p:sldId id="279" r:id="rId33"/>
-    <p:sldId id="280" r:id="rId34"/>
-    <p:sldId id="281" r:id="rId35"/>
-    <p:sldId id="282" r:id="rId36"/>
-    <p:sldId id="283" r:id="rId37"/>
-    <p:sldId id="285" r:id="rId38"/>
-    <p:sldId id="284" r:id="rId39"/>
-    <p:sldId id="301" r:id="rId40"/>
-    <p:sldId id="304" r:id="rId41"/>
-    <p:sldId id="288" r:id="rId42"/>
-    <p:sldId id="287" r:id="rId43"/>
-    <p:sldId id="292" r:id="rId44"/>
-    <p:sldId id="293" r:id="rId45"/>
+    <p:sldId id="305" r:id="rId23"/>
+    <p:sldId id="273" r:id="rId24"/>
+    <p:sldId id="303" r:id="rId25"/>
+    <p:sldId id="278" r:id="rId26"/>
+    <p:sldId id="290" r:id="rId27"/>
+    <p:sldId id="295" r:id="rId28"/>
+    <p:sldId id="275" r:id="rId29"/>
+    <p:sldId id="300" r:id="rId30"/>
+    <p:sldId id="299" r:id="rId31"/>
+    <p:sldId id="296" r:id="rId32"/>
+    <p:sldId id="264" r:id="rId33"/>
+    <p:sldId id="279" r:id="rId34"/>
+    <p:sldId id="280" r:id="rId35"/>
+    <p:sldId id="281" r:id="rId36"/>
+    <p:sldId id="282" r:id="rId37"/>
+    <p:sldId id="283" r:id="rId38"/>
+    <p:sldId id="285" r:id="rId39"/>
+    <p:sldId id="284" r:id="rId40"/>
+    <p:sldId id="301" r:id="rId41"/>
+    <p:sldId id="304" r:id="rId42"/>
+    <p:sldId id="288" r:id="rId43"/>
+    <p:sldId id="287" r:id="rId44"/>
+    <p:sldId id="292" r:id="rId45"/>
+    <p:sldId id="293" r:id="rId46"/>
   </p:sldIdLst>
   <p:sldSz cx="12192000" cy="6858000"/>
   <p:notesSz cx="6858000" cy="9144000"/>
@@ -240,7 +241,7 @@
           <a:p>
             <a:fld id="{581C28D8-13B6-41C3-9F5F-0284C569C6F1}" type="datetimeFigureOut">
               <a:rPr kumimoji="1" lang="ja-JP" altLang="en-US" smtClean="0"/>
-              <a:t>2024/2/7</a:t>
+              <a:t>2025/4/6</a:t>
             </a:fld>
             <a:endParaRPr kumimoji="1" lang="ja-JP" altLang="en-US"/>
           </a:p>
@@ -688,7 +689,7 @@
           <a:p>
             <a:fld id="{E8D2F5C4-CB40-44D3-9C89-5ECCD9AB4B5C}" type="slidenum">
               <a:rPr kumimoji="1" lang="ja-JP" altLang="en-US" smtClean="0"/>
-              <a:t>27</a:t>
+              <a:t>25</a:t>
             </a:fld>
             <a:endParaRPr kumimoji="1" lang="ja-JP" altLang="en-US"/>
           </a:p>
@@ -697,7 +698,7 @@
     </p:spTree>
     <p:extLst>
       <p:ext uri="{BB962C8B-B14F-4D97-AF65-F5344CB8AC3E}">
-        <p14:creationId xmlns:p14="http://schemas.microsoft.com/office/powerpoint/2010/main" val="3798507305"/>
+        <p14:creationId xmlns:p14="http://schemas.microsoft.com/office/powerpoint/2010/main" val="4133215805"/>
       </p:ext>
     </p:extLst>
   </p:cSld>
@@ -772,7 +773,7 @@
           <a:p>
             <a:fld id="{E8D2F5C4-CB40-44D3-9C89-5ECCD9AB4B5C}" type="slidenum">
               <a:rPr kumimoji="1" lang="ja-JP" altLang="en-US" smtClean="0"/>
-              <a:t>39</a:t>
+              <a:t>28</a:t>
             </a:fld>
             <a:endParaRPr kumimoji="1" lang="ja-JP" altLang="en-US"/>
           </a:p>
@@ -781,7 +782,7 @@
     </p:spTree>
     <p:extLst>
       <p:ext uri="{BB962C8B-B14F-4D97-AF65-F5344CB8AC3E}">
-        <p14:creationId xmlns:p14="http://schemas.microsoft.com/office/powerpoint/2010/main" val="1885226347"/>
+        <p14:creationId xmlns:p14="http://schemas.microsoft.com/office/powerpoint/2010/main" val="3798507305"/>
       </p:ext>
     </p:extLst>
   </p:cSld>
@@ -856,7 +857,7 @@
           <a:p>
             <a:fld id="{E8D2F5C4-CB40-44D3-9C89-5ECCD9AB4B5C}" type="slidenum">
               <a:rPr kumimoji="1" lang="ja-JP" altLang="en-US" smtClean="0"/>
-              <a:t>43</a:t>
+              <a:t>40</a:t>
             </a:fld>
             <a:endParaRPr kumimoji="1" lang="ja-JP" altLang="en-US"/>
           </a:p>
@@ -865,7 +866,7 @@
     </p:spTree>
     <p:extLst>
       <p:ext uri="{BB962C8B-B14F-4D97-AF65-F5344CB8AC3E}">
-        <p14:creationId xmlns:p14="http://schemas.microsoft.com/office/powerpoint/2010/main" val="1783975363"/>
+        <p14:creationId xmlns:p14="http://schemas.microsoft.com/office/powerpoint/2010/main" val="1885226347"/>
       </p:ext>
     </p:extLst>
   </p:cSld>
@@ -941,6 +942,90 @@
             <a:fld id="{E8D2F5C4-CB40-44D3-9C89-5ECCD9AB4B5C}" type="slidenum">
               <a:rPr kumimoji="1" lang="ja-JP" altLang="en-US" smtClean="0"/>
               <a:t>44</a:t>
+            </a:fld>
+            <a:endParaRPr kumimoji="1" lang="ja-JP" altLang="en-US"/>
+          </a:p>
+        </p:txBody>
+      </p:sp>
+    </p:spTree>
+    <p:extLst>
+      <p:ext uri="{BB962C8B-B14F-4D97-AF65-F5344CB8AC3E}">
+        <p14:creationId xmlns:p14="http://schemas.microsoft.com/office/powerpoint/2010/main" val="1783975363"/>
+      </p:ext>
+    </p:extLst>
+  </p:cSld>
+  <p:clrMapOvr>
+    <a:masterClrMapping/>
+  </p:clrMapOvr>
+</p:notes>
+</file>
+
+<file path=ppt/notesSlides/notesSlide14.xml><?xml version="1.0" encoding="utf-8"?>
+<p:notes xmlns:a="http://schemas.openxmlformats.org/drawingml/2006/main" xmlns:r="http://schemas.openxmlformats.org/officeDocument/2006/relationships" xmlns:p="http://schemas.openxmlformats.org/presentationml/2006/main">
+  <p:cSld>
+    <p:spTree>
+      <p:nvGrpSpPr>
+        <p:cNvPr id="1" name=""/>
+        <p:cNvGrpSpPr/>
+        <p:nvPr/>
+      </p:nvGrpSpPr>
+      <p:grpSpPr>
+        <a:xfrm>
+          <a:off x="0" y="0"/>
+          <a:ext cx="0" cy="0"/>
+          <a:chOff x="0" y="0"/>
+          <a:chExt cx="0" cy="0"/>
+        </a:xfrm>
+      </p:grpSpPr>
+      <p:sp>
+        <p:nvSpPr>
+          <p:cNvPr id="2" name="スライド イメージ プレースホルダー 1"/>
+          <p:cNvSpPr>
+            <a:spLocks noGrp="1" noRot="1" noChangeAspect="1"/>
+          </p:cNvSpPr>
+          <p:nvPr>
+            <p:ph type="sldImg"/>
+          </p:nvPr>
+        </p:nvSpPr>
+        <p:spPr/>
+      </p:sp>
+      <p:sp>
+        <p:nvSpPr>
+          <p:cNvPr id="3" name="ノート プレースホルダー 2"/>
+          <p:cNvSpPr>
+            <a:spLocks noGrp="1"/>
+          </p:cNvSpPr>
+          <p:nvPr>
+            <p:ph type="body" idx="1"/>
+          </p:nvPr>
+        </p:nvSpPr>
+        <p:spPr/>
+        <p:txBody>
+          <a:bodyPr/>
+          <a:lstStyle/>
+          <a:p>
+            <a:endParaRPr kumimoji="1" lang="ja-JP" altLang="en-US" dirty="0"/>
+          </a:p>
+        </p:txBody>
+      </p:sp>
+      <p:sp>
+        <p:nvSpPr>
+          <p:cNvPr id="4" name="スライド番号プレースホルダー 3"/>
+          <p:cNvSpPr>
+            <a:spLocks noGrp="1"/>
+          </p:cNvSpPr>
+          <p:nvPr>
+            <p:ph type="sldNum" sz="quarter" idx="5"/>
+          </p:nvPr>
+        </p:nvSpPr>
+        <p:spPr/>
+        <p:txBody>
+          <a:bodyPr/>
+          <a:lstStyle/>
+          <a:p>
+            <a:fld id="{E8D2F5C4-CB40-44D3-9C89-5ECCD9AB4B5C}" type="slidenum">
+              <a:rPr kumimoji="1" lang="ja-JP" altLang="en-US" smtClean="0"/>
+              <a:t>45</a:t>
             </a:fld>
             <a:endParaRPr kumimoji="1" lang="ja-JP" altLang="en-US"/>
           </a:p>
@@ -1384,7 +1469,13 @@
   <p:cSld>
     <p:spTree>
       <p:nvGrpSpPr>
-        <p:cNvPr id="1" name=""/>
+        <p:cNvPr id="1" name="">
+          <a:extLst>
+            <a:ext uri="{FF2B5EF4-FFF2-40B4-BE49-F238E27FC236}">
+              <a16:creationId xmlns:a16="http://schemas.microsoft.com/office/drawing/2014/main" id="{9DC49489-95BA-3DFB-43EF-FCF3BE3B44B1}"/>
+            </a:ext>
+          </a:extLst>
+        </p:cNvPr>
         <p:cNvGrpSpPr/>
         <p:nvPr/>
       </p:nvGrpSpPr>
@@ -1398,7 +1489,13 @@
       </p:grpSpPr>
       <p:sp>
         <p:nvSpPr>
-          <p:cNvPr id="2" name="スライド イメージ プレースホルダー 1"/>
+          <p:cNvPr id="2" name="スライド イメージ プレースホルダー 1">
+            <a:extLst>
+              <a:ext uri="{FF2B5EF4-FFF2-40B4-BE49-F238E27FC236}">
+                <a16:creationId xmlns:a16="http://schemas.microsoft.com/office/drawing/2014/main" id="{5170109C-DAE9-FFAC-1DEF-E9CDD6630084}"/>
+              </a:ext>
+            </a:extLst>
+          </p:cNvPr>
           <p:cNvSpPr>
             <a:spLocks noGrp="1" noRot="1" noChangeAspect="1"/>
           </p:cNvSpPr>
@@ -1410,7 +1507,13 @@
       </p:sp>
       <p:sp>
         <p:nvSpPr>
-          <p:cNvPr id="3" name="ノート プレースホルダー 2"/>
+          <p:cNvPr id="3" name="ノート プレースホルダー 2">
+            <a:extLst>
+              <a:ext uri="{FF2B5EF4-FFF2-40B4-BE49-F238E27FC236}">
+                <a16:creationId xmlns:a16="http://schemas.microsoft.com/office/drawing/2014/main" id="{45752B1B-4F7C-9EB9-479B-CF3D54480BB2}"/>
+              </a:ext>
+            </a:extLst>
+          </p:cNvPr>
           <p:cNvSpPr>
             <a:spLocks noGrp="1"/>
           </p:cNvSpPr>
@@ -1429,7 +1532,13 @@
       </p:sp>
       <p:sp>
         <p:nvSpPr>
-          <p:cNvPr id="4" name="スライド番号プレースホルダー 3"/>
+          <p:cNvPr id="4" name="スライド番号プレースホルダー 3">
+            <a:extLst>
+              <a:ext uri="{FF2B5EF4-FFF2-40B4-BE49-F238E27FC236}">
+                <a16:creationId xmlns:a16="http://schemas.microsoft.com/office/drawing/2014/main" id="{32E89363-9CA7-1966-C89F-F2E6B1007E96}"/>
+              </a:ext>
+            </a:extLst>
+          </p:cNvPr>
           <p:cNvSpPr>
             <a:spLocks noGrp="1"/>
           </p:cNvSpPr>
@@ -1453,7 +1562,7 @@
     </p:spTree>
     <p:extLst>
       <p:ext uri="{BB962C8B-B14F-4D97-AF65-F5344CB8AC3E}">
-        <p14:creationId xmlns:p14="http://schemas.microsoft.com/office/powerpoint/2010/main" val="901084948"/>
+        <p14:creationId xmlns:p14="http://schemas.microsoft.com/office/powerpoint/2010/main" val="1025088145"/>
       </p:ext>
     </p:extLst>
   </p:cSld>
@@ -1537,7 +1646,7 @@
     </p:spTree>
     <p:extLst>
       <p:ext uri="{BB962C8B-B14F-4D97-AF65-F5344CB8AC3E}">
-        <p14:creationId xmlns:p14="http://schemas.microsoft.com/office/powerpoint/2010/main" val="1264787881"/>
+        <p14:creationId xmlns:p14="http://schemas.microsoft.com/office/powerpoint/2010/main" val="901084948"/>
       </p:ext>
     </p:extLst>
   </p:cSld>
@@ -1621,7 +1730,7 @@
     </p:spTree>
     <p:extLst>
       <p:ext uri="{BB962C8B-B14F-4D97-AF65-F5344CB8AC3E}">
-        <p14:creationId xmlns:p14="http://schemas.microsoft.com/office/powerpoint/2010/main" val="4133215805"/>
+        <p14:creationId xmlns:p14="http://schemas.microsoft.com/office/powerpoint/2010/main" val="1264787881"/>
       </p:ext>
     </p:extLst>
   </p:cSld>
@@ -1819,7 +1928,7 @@
           <a:p>
             <a:fld id="{B8625E62-B904-4691-B75E-EC1C32885285}" type="datetime1">
               <a:rPr kumimoji="1" lang="ja-JP" altLang="en-US" smtClean="0"/>
-              <a:t>2024/2/7</a:t>
+              <a:t>2025/4/6</a:t>
             </a:fld>
             <a:endParaRPr kumimoji="1" lang="ja-JP" altLang="en-US"/>
           </a:p>
@@ -2157,7 +2266,7 @@
           <a:p>
             <a:fld id="{A4C87007-2A40-4EFC-90A3-258EFA3C1001}" type="datetime1">
               <a:rPr kumimoji="1" lang="ja-JP" altLang="en-US" smtClean="0"/>
-              <a:t>2024/2/7</a:t>
+              <a:t>2025/4/6</a:t>
             </a:fld>
             <a:endParaRPr kumimoji="1" lang="ja-JP" altLang="en-US"/>
           </a:p>
@@ -2558,7 +2667,7 @@
           <a:p>
             <a:fld id="{0FE0D7FF-9203-4AA3-90FD-622674A14F90}" type="datetime1">
               <a:rPr kumimoji="1" lang="ja-JP" altLang="en-US" smtClean="0"/>
-              <a:t>2024/2/7</a:t>
+              <a:t>2025/4/6</a:t>
             </a:fld>
             <a:endParaRPr kumimoji="1" lang="ja-JP" altLang="en-US"/>
           </a:p>
@@ -2894,7 +3003,7 @@
           <a:p>
             <a:fld id="{D2D6E4D3-BEDB-4F35-876B-5B9AA41BFB5B}" type="datetime1">
               <a:rPr kumimoji="1" lang="ja-JP" altLang="en-US" smtClean="0"/>
-              <a:t>2024/2/7</a:t>
+              <a:t>2025/4/6</a:t>
             </a:fld>
             <a:endParaRPr kumimoji="1" lang="ja-JP" altLang="en-US"/>
           </a:p>
@@ -3214,7 +3323,7 @@
           <a:p>
             <a:fld id="{2ACD896E-FC14-4F25-BC47-18ABAEA9E1FE}" type="datetime1">
               <a:rPr kumimoji="1" lang="ja-JP" altLang="en-US" smtClean="0"/>
-              <a:t>2024/2/7</a:t>
+              <a:t>2025/4/6</a:t>
             </a:fld>
             <a:endParaRPr kumimoji="1" lang="ja-JP" altLang="en-US"/>
           </a:p>
@@ -3610,7 +3719,7 @@
           <a:p>
             <a:fld id="{54FC701B-2185-4987-B8E2-5507664B65F4}" type="datetime1">
               <a:rPr kumimoji="1" lang="ja-JP" altLang="en-US" smtClean="0"/>
-              <a:t>2024/2/7</a:t>
+              <a:t>2025/4/6</a:t>
             </a:fld>
             <a:endParaRPr kumimoji="1" lang="ja-JP" altLang="en-US"/>
           </a:p>
@@ -3899,7 +4008,7 @@
           <a:p>
             <a:fld id="{3FB4CDED-9617-418F-B546-D66B9BB6C35E}" type="datetime1">
               <a:rPr kumimoji="1" lang="ja-JP" altLang="en-US" smtClean="0"/>
-              <a:t>2024/2/7</a:t>
+              <a:t>2025/4/6</a:t>
             </a:fld>
             <a:endParaRPr kumimoji="1" lang="ja-JP" altLang="en-US"/>
           </a:p>
@@ -4193,7 +4302,7 @@
           <a:p>
             <a:fld id="{F5635D40-962A-46D7-8037-3F2900B5EB4D}" type="datetime1">
               <a:rPr kumimoji="1" lang="ja-JP" altLang="en-US" smtClean="0"/>
-              <a:t>2024/2/7</a:t>
+              <a:t>2025/4/6</a:t>
             </a:fld>
             <a:endParaRPr kumimoji="1" lang="ja-JP" altLang="en-US"/>
           </a:p>
@@ -4487,7 +4596,7 @@
           <a:p>
             <a:fld id="{741DA9A2-8356-4FFD-B66A-E38811049858}" type="datetime1">
               <a:rPr kumimoji="1" lang="ja-JP" altLang="en-US" smtClean="0"/>
-              <a:t>2024/2/7</a:t>
+              <a:t>2025/4/6</a:t>
             </a:fld>
             <a:endParaRPr kumimoji="1" lang="ja-JP" altLang="en-US"/>
           </a:p>
@@ -4816,7 +4925,7 @@
           <a:p>
             <a:fld id="{9DDE8989-88B8-4869-97D9-547531F13E13}" type="datetime1">
               <a:rPr kumimoji="1" lang="ja-JP" altLang="en-US" smtClean="0"/>
-              <a:t>2024/2/7</a:t>
+              <a:t>2025/4/6</a:t>
             </a:fld>
             <a:endParaRPr kumimoji="1" lang="ja-JP" altLang="en-US"/>
           </a:p>
@@ -5203,7 +5312,7 @@
           <a:p>
             <a:fld id="{81EC4031-B949-4300-AB3E-1551426E8631}" type="datetime1">
               <a:rPr kumimoji="1" lang="ja-JP" altLang="en-US" smtClean="0"/>
-              <a:t>2024/2/7</a:t>
+              <a:t>2025/4/6</a:t>
             </a:fld>
             <a:endParaRPr kumimoji="1" lang="ja-JP" altLang="en-US"/>
           </a:p>
@@ -5724,7 +5833,7 @@
           <a:p>
             <a:fld id="{F39E755E-A59D-4634-B604-E9BB568B1156}" type="datetime1">
               <a:rPr kumimoji="1" lang="ja-JP" altLang="en-US" smtClean="0"/>
-              <a:t>2024/2/7</a:t>
+              <a:t>2025/4/6</a:t>
             </a:fld>
             <a:endParaRPr kumimoji="1" lang="ja-JP" altLang="en-US"/>
           </a:p>
@@ -5929,7 +6038,7 @@
           <a:p>
             <a:fld id="{61DA38B3-7601-4256-ABFE-386B92B0EDB5}" type="datetime1">
               <a:rPr kumimoji="1" lang="ja-JP" altLang="en-US" smtClean="0"/>
-              <a:t>2024/2/7</a:t>
+              <a:t>2025/4/6</a:t>
             </a:fld>
             <a:endParaRPr kumimoji="1" lang="ja-JP" altLang="en-US"/>
           </a:p>
@@ -6106,7 +6215,7 @@
           <a:p>
             <a:fld id="{5A28ED6D-8A94-4DBA-8EF2-284D1A467CE8}" type="datetime1">
               <a:rPr kumimoji="1" lang="ja-JP" altLang="en-US" smtClean="0"/>
-              <a:t>2024/2/7</a:t>
+              <a:t>2025/4/6</a:t>
             </a:fld>
             <a:endParaRPr kumimoji="1" lang="ja-JP" altLang="en-US"/>
           </a:p>
@@ -6471,7 +6580,7 @@
           <a:p>
             <a:fld id="{B27B0317-28AF-43C5-8944-AADFA89E0149}" type="datetime1">
               <a:rPr kumimoji="1" lang="ja-JP" altLang="en-US" smtClean="0"/>
-              <a:t>2024/2/7</a:t>
+              <a:t>2025/4/6</a:t>
             </a:fld>
             <a:endParaRPr kumimoji="1" lang="ja-JP" altLang="en-US"/>
           </a:p>
@@ -6816,7 +6925,7 @@
           <a:p>
             <a:fld id="{A78D023C-C4FA-4CE8-B5BE-6798898EE377}" type="datetime1">
               <a:rPr kumimoji="1" lang="ja-JP" altLang="en-US" smtClean="0"/>
-              <a:t>2024/2/7</a:t>
+              <a:t>2025/4/6</a:t>
             </a:fld>
             <a:endParaRPr kumimoji="1" lang="ja-JP" altLang="en-US"/>
           </a:p>
@@ -8965,7 +9074,7 @@
           <a:p>
             <a:fld id="{99567159-F4A8-4352-915B-DDBEFEF4A4D6}" type="datetime1">
               <a:rPr kumimoji="1" lang="ja-JP" altLang="en-US" smtClean="0"/>
-              <a:t>2024/2/7</a:t>
+              <a:t>2025/4/6</a:t>
             </a:fld>
             <a:endParaRPr kumimoji="1" lang="ja-JP" altLang="en-US"/>
           </a:p>
@@ -25535,6 +25644,337 @@
   <p:cSld>
     <p:spTree>
       <p:nvGrpSpPr>
+        <p:cNvPr id="1" name="">
+          <a:extLst>
+            <a:ext uri="{FF2B5EF4-FFF2-40B4-BE49-F238E27FC236}">
+              <a16:creationId xmlns:a16="http://schemas.microsoft.com/office/drawing/2014/main" id="{52D1F2B5-748A-F7DC-3B84-B0E0902EFE39}"/>
+            </a:ext>
+          </a:extLst>
+        </p:cNvPr>
+        <p:cNvGrpSpPr/>
+        <p:nvPr/>
+      </p:nvGrpSpPr>
+      <p:grpSpPr>
+        <a:xfrm>
+          <a:off x="0" y="0"/>
+          <a:ext cx="0" cy="0"/>
+          <a:chOff x="0" y="0"/>
+          <a:chExt cx="0" cy="0"/>
+        </a:xfrm>
+      </p:grpSpPr>
+      <p:sp>
+        <p:nvSpPr>
+          <p:cNvPr id="2" name="タイトル 1">
+            <a:extLst>
+              <a:ext uri="{FF2B5EF4-FFF2-40B4-BE49-F238E27FC236}">
+                <a16:creationId xmlns:a16="http://schemas.microsoft.com/office/drawing/2014/main" id="{6ACAC06B-F564-3C7A-CB06-071F96B87AB1}"/>
+              </a:ext>
+            </a:extLst>
+          </p:cNvPr>
+          <p:cNvSpPr>
+            <a:spLocks noGrp="1"/>
+          </p:cNvSpPr>
+          <p:nvPr>
+            <p:ph type="title"/>
+          </p:nvPr>
+        </p:nvSpPr>
+        <p:spPr/>
+        <p:txBody>
+          <a:bodyPr/>
+          <a:lstStyle/>
+          <a:p>
+            <a:r>
+              <a:rPr kumimoji="1" lang="en-US" altLang="ja-JP" dirty="0"/>
+              <a:t>VGM Sound Interface(VSIF</a:t>
+            </a:r>
+            <a:r>
+              <a:rPr lang="ja-JP" altLang="en-US" dirty="0"/>
+              <a:t> </a:t>
+            </a:r>
+            <a:r>
+              <a:rPr lang="en-US" altLang="ja-JP" dirty="0"/>
+              <a:t>- AMIGA</a:t>
+            </a:r>
+            <a:r>
+              <a:rPr kumimoji="1" lang="en-US" altLang="ja-JP" dirty="0"/>
+              <a:t>)</a:t>
+            </a:r>
+            <a:br>
+              <a:rPr kumimoji="1" lang="en-US" altLang="ja-JP" dirty="0"/>
+            </a:br>
+            <a:r>
+              <a:rPr kumimoji="1" lang="en-US" altLang="ja-JP" dirty="0"/>
+              <a:t>for AMIGA</a:t>
+            </a:r>
+            <a:endParaRPr kumimoji="1" lang="ja-JP" altLang="en-US" dirty="0"/>
+          </a:p>
+        </p:txBody>
+      </p:sp>
+      <p:sp>
+        <p:nvSpPr>
+          <p:cNvPr id="3" name="コンテンツ プレースホルダー 2">
+            <a:extLst>
+              <a:ext uri="{FF2B5EF4-FFF2-40B4-BE49-F238E27FC236}">
+                <a16:creationId xmlns:a16="http://schemas.microsoft.com/office/drawing/2014/main" id="{D3BBEADB-5B56-B052-996B-7C703600D360}"/>
+              </a:ext>
+            </a:extLst>
+          </p:cNvPr>
+          <p:cNvSpPr>
+            <a:spLocks noGrp="1"/>
+          </p:cNvSpPr>
+          <p:nvPr>
+            <p:ph idx="1"/>
+          </p:nvPr>
+        </p:nvSpPr>
+        <p:spPr>
+          <a:xfrm>
+            <a:off x="2589212" y="2133600"/>
+            <a:ext cx="9602788" cy="3777622"/>
+          </a:xfrm>
+        </p:spPr>
+        <p:txBody>
+          <a:bodyPr>
+            <a:normAutofit/>
+          </a:bodyPr>
+          <a:lstStyle/>
+          <a:p>
+            <a:r>
+              <a:rPr kumimoji="1" lang="en-US" altLang="ja-JP" dirty="0" err="1"/>
+              <a:t>MAmidiMEmo</a:t>
+            </a:r>
+            <a:r>
+              <a:rPr kumimoji="1" lang="en-US" altLang="ja-JP" dirty="0"/>
+              <a:t> can drive real AMIGA machine chips via Serial Port</a:t>
+            </a:r>
+            <a:br>
+              <a:rPr kumimoji="1" lang="en-US" altLang="ja-JP" dirty="0"/>
+            </a:br>
+            <a:br>
+              <a:rPr kumimoji="1" lang="en-US" altLang="ja-JP" dirty="0"/>
+            </a:br>
+            <a:r>
+              <a:rPr kumimoji="1" lang="en-US" altLang="ja-JP" dirty="0" err="1"/>
+              <a:t>eg</a:t>
+            </a:r>
+            <a:r>
+              <a:rPr kumimoji="1" lang="en-US" altLang="ja-JP" dirty="0"/>
+              <a:t>)</a:t>
+            </a:r>
+            <a:br>
+              <a:rPr kumimoji="1" lang="en-US" altLang="ja-JP" dirty="0"/>
+            </a:br>
+            <a:r>
+              <a:rPr kumimoji="1" lang="en-US" altLang="ja-JP" dirty="0"/>
+              <a:t>- </a:t>
+            </a:r>
+            <a:r>
+              <a:rPr lang="en-US" altLang="ja-JP" b="0" i="0" dirty="0">
+                <a:solidFill>
+                  <a:srgbClr val="0F1111"/>
+                </a:solidFill>
+                <a:effectLst/>
+                <a:latin typeface="Hiragino Kaku Gothic ProN"/>
+              </a:rPr>
+              <a:t>YFFSFDC RS232C USB </a:t>
+            </a:r>
+            <a:r>
+              <a:rPr lang="ja-JP" altLang="en-US" b="0" i="0" dirty="0">
+                <a:solidFill>
+                  <a:srgbClr val="0F1111"/>
+                </a:solidFill>
+                <a:effectLst/>
+                <a:latin typeface="Hiragino Kaku Gothic ProN"/>
+              </a:rPr>
+              <a:t>シリアル変換ケーブル </a:t>
+            </a:r>
+            <a:r>
+              <a:rPr lang="en-US" altLang="ja-JP" b="0" i="0" dirty="0">
+                <a:solidFill>
+                  <a:srgbClr val="0F1111"/>
+                </a:solidFill>
+                <a:effectLst/>
+                <a:latin typeface="Hiragino Kaku Gothic ProN"/>
+              </a:rPr>
+              <a:t>CH340</a:t>
+            </a:r>
+            <a:r>
+              <a:rPr lang="ja-JP" altLang="en-US" b="0" i="0" dirty="0">
+                <a:solidFill>
+                  <a:srgbClr val="0F1111"/>
+                </a:solidFill>
+                <a:effectLst/>
+                <a:latin typeface="Hiragino Kaku Gothic ProN"/>
+              </a:rPr>
+              <a:t>チップ内蔵</a:t>
+            </a:r>
+            <a:br>
+              <a:rPr lang="en-US" altLang="ja-JP" b="0" i="0" dirty="0">
+                <a:solidFill>
+                  <a:srgbClr val="0F1111"/>
+                </a:solidFill>
+                <a:effectLst/>
+                <a:latin typeface="Hiragino Kaku Gothic ProN"/>
+              </a:rPr>
+            </a:br>
+            <a:r>
+              <a:rPr lang="ja-JP" altLang="en-US" b="0" i="0" dirty="0">
+                <a:solidFill>
+                  <a:srgbClr val="0F1111"/>
+                </a:solidFill>
+                <a:effectLst/>
+                <a:latin typeface="Hiragino Kaku Gothic ProN"/>
+              </a:rPr>
+              <a:t>　</a:t>
+            </a:r>
+            <a:r>
+              <a:rPr lang="en-US" altLang="ja-JP" b="0" i="0" dirty="0">
+                <a:solidFill>
+                  <a:srgbClr val="0F1111"/>
+                </a:solidFill>
+                <a:effectLst/>
+                <a:latin typeface="Hiragino Kaku Gothic ProN"/>
+                <a:hlinkClick r:id="rId3"/>
+              </a:rPr>
+              <a:t>Need to use old driver for CH340 for Windows</a:t>
+            </a:r>
+            <a:br>
+              <a:rPr lang="en-US" altLang="ja-JP" b="0" i="0" dirty="0">
+                <a:solidFill>
+                  <a:srgbClr val="0F1111"/>
+                </a:solidFill>
+                <a:effectLst/>
+                <a:latin typeface="Hiragino Kaku Gothic ProN"/>
+              </a:rPr>
+            </a:br>
+            <a:r>
+              <a:rPr lang="en-US" altLang="ja-JP" b="0" i="0" dirty="0">
+                <a:solidFill>
+                  <a:srgbClr val="0F1111"/>
+                </a:solidFill>
+                <a:effectLst/>
+                <a:latin typeface="Hiragino Kaku Gothic ProN"/>
+              </a:rPr>
+              <a:t>- DB9 DB25 adapter</a:t>
+            </a:r>
+            <a:br>
+              <a:rPr kumimoji="1" lang="en-US" altLang="ja-JP" dirty="0"/>
+            </a:br>
+            <a:endParaRPr kumimoji="1" lang="en-US" altLang="ja-JP" b="1" dirty="0"/>
+          </a:p>
+          <a:p>
+            <a:r>
+              <a:rPr lang="en-US" altLang="ja-JP" dirty="0"/>
+              <a:t>How to</a:t>
+            </a:r>
+          </a:p>
+          <a:p>
+            <a:pPr marL="800100" lvl="1" indent="-342900">
+              <a:buFont typeface="+mj-lt"/>
+              <a:buAutoNum type="arabicPeriod"/>
+            </a:pPr>
+            <a:r>
+              <a:rPr lang="en-US" altLang="ja-JP" dirty="0"/>
+              <a:t>Buy Serial Cross Cable(NULL MODEM)</a:t>
+            </a:r>
+          </a:p>
+          <a:p>
+            <a:pPr marL="800100" lvl="1" indent="-342900">
+              <a:buFont typeface="+mj-lt"/>
+              <a:buAutoNum type="arabicPeriod"/>
+            </a:pPr>
+            <a:r>
+              <a:rPr lang="en-US" altLang="ja-JP" dirty="0"/>
+              <a:t>Connect PC and AMIGA directly</a:t>
+            </a:r>
+          </a:p>
+          <a:p>
+            <a:pPr marL="457200" lvl="1" indent="0">
+              <a:buNone/>
+            </a:pPr>
+            <a:r>
+              <a:rPr lang="en-US" altLang="ja-JP" sz="1400" b="1" u="sng" dirty="0">
+                <a:solidFill>
+                  <a:srgbClr val="FF0000"/>
+                </a:solidFill>
+              </a:rPr>
+              <a:t>UART uses high speed ( 31250 bps ) transfer rate.</a:t>
+            </a:r>
+            <a:br>
+              <a:rPr lang="en-US" altLang="ja-JP" sz="1400" b="1" u="sng" dirty="0">
+                <a:solidFill>
+                  <a:srgbClr val="FF0000"/>
+                </a:solidFill>
+              </a:rPr>
+            </a:br>
+            <a:r>
+              <a:rPr lang="en-US" altLang="ja-JP" sz="1400" b="1" u="sng" dirty="0">
+                <a:solidFill>
+                  <a:srgbClr val="FF0000"/>
+                </a:solidFill>
+              </a:rPr>
+              <a:t>So, you should not launch other apps and so on.</a:t>
+            </a:r>
+          </a:p>
+          <a:p>
+            <a:endParaRPr kumimoji="1" lang="en-US" altLang="ja-JP" dirty="0"/>
+          </a:p>
+          <a:p>
+            <a:pPr lvl="1"/>
+            <a:endParaRPr kumimoji="1" lang="en-US" altLang="ja-JP" dirty="0"/>
+          </a:p>
+          <a:p>
+            <a:pPr lvl="1"/>
+            <a:endParaRPr kumimoji="1" lang="ja-JP" altLang="en-US" dirty="0"/>
+          </a:p>
+        </p:txBody>
+      </p:sp>
+      <p:sp>
+        <p:nvSpPr>
+          <p:cNvPr id="4" name="スライド番号プレースホルダー 3">
+            <a:extLst>
+              <a:ext uri="{FF2B5EF4-FFF2-40B4-BE49-F238E27FC236}">
+                <a16:creationId xmlns:a16="http://schemas.microsoft.com/office/drawing/2014/main" id="{19EA8057-B4B0-3A6C-27A1-40F7392AA810}"/>
+              </a:ext>
+            </a:extLst>
+          </p:cNvPr>
+          <p:cNvSpPr>
+            <a:spLocks noGrp="1"/>
+          </p:cNvSpPr>
+          <p:nvPr>
+            <p:ph type="sldNum" sz="quarter" idx="12"/>
+          </p:nvPr>
+        </p:nvSpPr>
+        <p:spPr/>
+        <p:txBody>
+          <a:bodyPr/>
+          <a:lstStyle/>
+          <a:p>
+            <a:fld id="{E27E2812-4560-4165-A7C7-9C013F955547}" type="slidenum">
+              <a:rPr kumimoji="1" lang="ja-JP" altLang="en-US" smtClean="0"/>
+              <a:t>22</a:t>
+            </a:fld>
+            <a:endParaRPr kumimoji="1" lang="ja-JP" altLang="en-US"/>
+          </a:p>
+        </p:txBody>
+      </p:sp>
+    </p:spTree>
+    <p:extLst>
+      <p:ext uri="{BB962C8B-B14F-4D97-AF65-F5344CB8AC3E}">
+        <p14:creationId xmlns:p14="http://schemas.microsoft.com/office/powerpoint/2010/main" val="3932846262"/>
+      </p:ext>
+    </p:extLst>
+  </p:cSld>
+  <p:clrMapOvr>
+    <a:masterClrMapping/>
+  </p:clrMapOvr>
+</p:sld>
+</file>
+
+<file path=ppt/slides/slide23.xml><?xml version="1.0" encoding="utf-8"?>
+<p:sld xmlns:a="http://schemas.openxmlformats.org/drawingml/2006/main" xmlns:r="http://schemas.openxmlformats.org/officeDocument/2006/relationships" xmlns:p="http://schemas.openxmlformats.org/presentationml/2006/main">
+  <p:cSld>
+    <p:spTree>
+      <p:nvGrpSpPr>
         <p:cNvPr id="1" name=""/>
         <p:cNvGrpSpPr/>
         <p:nvPr/>
@@ -25943,7 +26383,7 @@
           <a:p>
             <a:fld id="{E27E2812-4560-4165-A7C7-9C013F955547}" type="slidenum">
               <a:rPr kumimoji="1" lang="ja-JP" altLang="en-US" smtClean="0"/>
-              <a:t>22</a:t>
+              <a:t>23</a:t>
             </a:fld>
             <a:endParaRPr kumimoji="1" lang="ja-JP" altLang="en-US"/>
           </a:p>
@@ -25962,7 +26402,7 @@
 </p:sld>
 </file>
 
-<file path=ppt/slides/slide23.xml><?xml version="1.0" encoding="utf-8"?>
+<file path=ppt/slides/slide24.xml><?xml version="1.0" encoding="utf-8"?>
 <p:sld xmlns:a="http://schemas.openxmlformats.org/drawingml/2006/main" xmlns:r="http://schemas.openxmlformats.org/officeDocument/2006/relationships" xmlns:p="http://schemas.openxmlformats.org/presentationml/2006/main">
   <p:cSld>
     <p:spTree>
@@ -26046,7 +26486,7 @@
           <a:p>
             <a:fld id="{E27E2812-4560-4165-A7C7-9C013F955547}" type="slidenum">
               <a:rPr kumimoji="1" lang="ja-JP" altLang="en-US" smtClean="0"/>
-              <a:t>23</a:t>
+              <a:t>24</a:t>
             </a:fld>
             <a:endParaRPr kumimoji="1" lang="ja-JP" altLang="en-US"/>
           </a:p>
@@ -27405,7 +27845,7 @@
 </p:sld>
 </file>
 
-<file path=ppt/slides/slide24.xml><?xml version="1.0" encoding="utf-8"?>
+<file path=ppt/slides/slide25.xml><?xml version="1.0" encoding="utf-8"?>
 <p:sld xmlns:a="http://schemas.openxmlformats.org/drawingml/2006/main" xmlns:r="http://schemas.openxmlformats.org/officeDocument/2006/relationships" xmlns:p="http://schemas.openxmlformats.org/presentationml/2006/main">
   <p:cSld>
     <p:spTree>
@@ -27483,7 +27923,7 @@
           <a:p>
             <a:fld id="{E27E2812-4560-4165-A7C7-9C013F955547}" type="slidenum">
               <a:rPr kumimoji="1" lang="ja-JP" altLang="en-US" smtClean="0"/>
-              <a:t>24</a:t>
+              <a:t>25</a:t>
             </a:fld>
             <a:endParaRPr kumimoji="1" lang="ja-JP" altLang="en-US"/>
           </a:p>
@@ -27531,7 +27971,7 @@
 </p:sld>
 </file>
 
-<file path=ppt/slides/slide25.xml><?xml version="1.0" encoding="utf-8"?>
+<file path=ppt/slides/slide26.xml><?xml version="1.0" encoding="utf-8"?>
 <p:sld xmlns:a="http://schemas.openxmlformats.org/drawingml/2006/main" xmlns:r="http://schemas.openxmlformats.org/officeDocument/2006/relationships" xmlns:p="http://schemas.openxmlformats.org/presentationml/2006/main">
   <p:cSld>
     <p:spTree>
@@ -27768,7 +28208,7 @@
           <a:p>
             <a:fld id="{E27E2812-4560-4165-A7C7-9C013F955547}" type="slidenum">
               <a:rPr kumimoji="1" lang="ja-JP" altLang="en-US" smtClean="0"/>
-              <a:t>25</a:t>
+              <a:t>26</a:t>
             </a:fld>
             <a:endParaRPr kumimoji="1" lang="ja-JP" altLang="en-US"/>
           </a:p>
@@ -28147,95 +28587,6 @@
 </p:sld>
 </file>
 
-<file path=ppt/slides/slide26.xml><?xml version="1.0" encoding="utf-8"?>
-<p:sld xmlns:a="http://schemas.openxmlformats.org/drawingml/2006/main" xmlns:r="http://schemas.openxmlformats.org/officeDocument/2006/relationships" xmlns:p="http://schemas.openxmlformats.org/presentationml/2006/main">
-  <p:cSld>
-    <p:spTree>
-      <p:nvGrpSpPr>
-        <p:cNvPr id="1" name=""/>
-        <p:cNvGrpSpPr/>
-        <p:nvPr/>
-      </p:nvGrpSpPr>
-      <p:grpSpPr>
-        <a:xfrm>
-          <a:off x="0" y="0"/>
-          <a:ext cx="0" cy="0"/>
-          <a:chOff x="0" y="0"/>
-          <a:chExt cx="0" cy="0"/>
-        </a:xfrm>
-      </p:grpSpPr>
-      <p:sp>
-        <p:nvSpPr>
-          <p:cNvPr id="8" name="タイトル 7">
-            <a:extLst>
-              <a:ext uri="{FF2B5EF4-FFF2-40B4-BE49-F238E27FC236}">
-                <a16:creationId xmlns:a16="http://schemas.microsoft.com/office/drawing/2014/main" id="{D04E5850-8353-2464-F5AF-B7FB3A8721C1}"/>
-              </a:ext>
-            </a:extLst>
-          </p:cNvPr>
-          <p:cNvSpPr>
-            <a:spLocks noGrp="1"/>
-          </p:cNvSpPr>
-          <p:nvPr>
-            <p:ph type="title"/>
-          </p:nvPr>
-        </p:nvSpPr>
-        <p:spPr/>
-        <p:txBody>
-          <a:bodyPr/>
-          <a:lstStyle/>
-          <a:p>
-            <a:r>
-              <a:rPr lang="en-US" altLang="ja-JP" dirty="0" err="1"/>
-              <a:t>VGMPlayer</a:t>
-            </a:r>
-            <a:endParaRPr lang="ja-JP" altLang="en-US" dirty="0"/>
-          </a:p>
-        </p:txBody>
-      </p:sp>
-      <p:sp>
-        <p:nvSpPr>
-          <p:cNvPr id="4" name="スライド番号プレースホルダー 3">
-            <a:extLst>
-              <a:ext uri="{FF2B5EF4-FFF2-40B4-BE49-F238E27FC236}">
-                <a16:creationId xmlns:a16="http://schemas.microsoft.com/office/drawing/2014/main" id="{616F7C8E-73E3-7AA6-34B1-C5A5B8BB3870}"/>
-              </a:ext>
-            </a:extLst>
-          </p:cNvPr>
-          <p:cNvSpPr>
-            <a:spLocks noGrp="1"/>
-          </p:cNvSpPr>
-          <p:nvPr>
-            <p:ph type="sldNum" sz="quarter" idx="12"/>
-          </p:nvPr>
-        </p:nvSpPr>
-        <p:spPr/>
-        <p:txBody>
-          <a:bodyPr/>
-          <a:lstStyle/>
-          <a:p>
-            <a:fld id="{E27E2812-4560-4165-A7C7-9C013F955547}" type="slidenum">
-              <a:rPr lang="ja-JP" altLang="en-US" smtClean="0"/>
-              <a:pPr/>
-              <a:t>26</a:t>
-            </a:fld>
-            <a:endParaRPr lang="ja-JP" altLang="en-US"/>
-          </a:p>
-        </p:txBody>
-      </p:sp>
-    </p:spTree>
-    <p:extLst>
-      <p:ext uri="{BB962C8B-B14F-4D97-AF65-F5344CB8AC3E}">
-        <p14:creationId xmlns:p14="http://schemas.microsoft.com/office/powerpoint/2010/main" val="1910741203"/>
-      </p:ext>
-    </p:extLst>
-  </p:cSld>
-  <p:clrMapOvr>
-    <a:masterClrMapping/>
-  </p:clrMapOvr>
-</p:sld>
-</file>
-
 <file path=ppt/slides/slide27.xml><?xml version="1.0" encoding="utf-8"?>
 <p:sld xmlns:a="http://schemas.openxmlformats.org/drawingml/2006/main" xmlns:r="http://schemas.openxmlformats.org/officeDocument/2006/relationships" xmlns:p="http://schemas.openxmlformats.org/presentationml/2006/main">
   <p:cSld>
@@ -28255,10 +28606,10 @@
       </p:grpSpPr>
       <p:sp>
         <p:nvSpPr>
-          <p:cNvPr id="2" name="タイトル 1">
-            <a:extLst>
-              <a:ext uri="{FF2B5EF4-FFF2-40B4-BE49-F238E27FC236}">
-                <a16:creationId xmlns:a16="http://schemas.microsoft.com/office/drawing/2014/main" id="{45F6BDA5-EAAF-47BF-BA28-5541807FE9EF}"/>
+          <p:cNvPr id="8" name="タイトル 7">
+            <a:extLst>
+              <a:ext uri="{FF2B5EF4-FFF2-40B4-BE49-F238E27FC236}">
+                <a16:creationId xmlns:a16="http://schemas.microsoft.com/office/drawing/2014/main" id="{D04E5850-8353-2464-F5AF-B7FB3A8721C1}"/>
               </a:ext>
             </a:extLst>
           </p:cNvPr>
@@ -28275,14 +28626,10 @@
           <a:lstStyle/>
           <a:p>
             <a:r>
-              <a:rPr kumimoji="1" lang="en-US" altLang="ja-JP" dirty="0" err="1"/>
-              <a:t>VGMP</a:t>
-            </a:r>
-            <a:r>
               <a:rPr lang="en-US" altLang="ja-JP" dirty="0" err="1"/>
-              <a:t>layer</a:t>
-            </a:r>
-            <a:endParaRPr kumimoji="1" lang="ja-JP" altLang="en-US" dirty="0"/>
+              <a:t>VGMPlayer</a:t>
+            </a:r>
+            <a:endParaRPr lang="ja-JP" altLang="en-US" dirty="0"/>
           </a:p>
         </p:txBody>
       </p:sp>
@@ -28291,7 +28638,7 @@
           <p:cNvPr id="4" name="スライド番号プレースホルダー 3">
             <a:extLst>
               <a:ext uri="{FF2B5EF4-FFF2-40B4-BE49-F238E27FC236}">
-                <a16:creationId xmlns:a16="http://schemas.microsoft.com/office/drawing/2014/main" id="{F3E89AAB-4727-42E3-A2B2-F5E25345DCC6}"/>
+                <a16:creationId xmlns:a16="http://schemas.microsoft.com/office/drawing/2014/main" id="{616F7C8E-73E3-7AA6-34B1-C5A5B8BB3870}"/>
               </a:ext>
             </a:extLst>
           </p:cNvPr>
@@ -28308,8 +28655,101 @@
           <a:lstStyle/>
           <a:p>
             <a:fld id="{E27E2812-4560-4165-A7C7-9C013F955547}" type="slidenum">
+              <a:rPr lang="ja-JP" altLang="en-US" smtClean="0"/>
+              <a:pPr/>
+              <a:t>27</a:t>
+            </a:fld>
+            <a:endParaRPr lang="ja-JP" altLang="en-US"/>
+          </a:p>
+        </p:txBody>
+      </p:sp>
+    </p:spTree>
+    <p:extLst>
+      <p:ext uri="{BB962C8B-B14F-4D97-AF65-F5344CB8AC3E}">
+        <p14:creationId xmlns:p14="http://schemas.microsoft.com/office/powerpoint/2010/main" val="1910741203"/>
+      </p:ext>
+    </p:extLst>
+  </p:cSld>
+  <p:clrMapOvr>
+    <a:masterClrMapping/>
+  </p:clrMapOvr>
+</p:sld>
+</file>
+
+<file path=ppt/slides/slide28.xml><?xml version="1.0" encoding="utf-8"?>
+<p:sld xmlns:a="http://schemas.openxmlformats.org/drawingml/2006/main" xmlns:r="http://schemas.openxmlformats.org/officeDocument/2006/relationships" xmlns:p="http://schemas.openxmlformats.org/presentationml/2006/main">
+  <p:cSld>
+    <p:spTree>
+      <p:nvGrpSpPr>
+        <p:cNvPr id="1" name=""/>
+        <p:cNvGrpSpPr/>
+        <p:nvPr/>
+      </p:nvGrpSpPr>
+      <p:grpSpPr>
+        <a:xfrm>
+          <a:off x="0" y="0"/>
+          <a:ext cx="0" cy="0"/>
+          <a:chOff x="0" y="0"/>
+          <a:chExt cx="0" cy="0"/>
+        </a:xfrm>
+      </p:grpSpPr>
+      <p:sp>
+        <p:nvSpPr>
+          <p:cNvPr id="2" name="タイトル 1">
+            <a:extLst>
+              <a:ext uri="{FF2B5EF4-FFF2-40B4-BE49-F238E27FC236}">
+                <a16:creationId xmlns:a16="http://schemas.microsoft.com/office/drawing/2014/main" id="{45F6BDA5-EAAF-47BF-BA28-5541807FE9EF}"/>
+              </a:ext>
+            </a:extLst>
+          </p:cNvPr>
+          <p:cNvSpPr>
+            <a:spLocks noGrp="1"/>
+          </p:cNvSpPr>
+          <p:nvPr>
+            <p:ph type="title"/>
+          </p:nvPr>
+        </p:nvSpPr>
+        <p:spPr/>
+        <p:txBody>
+          <a:bodyPr/>
+          <a:lstStyle/>
+          <a:p>
+            <a:r>
+              <a:rPr kumimoji="1" lang="en-US" altLang="ja-JP" dirty="0" err="1"/>
+              <a:t>VGMP</a:t>
+            </a:r>
+            <a:r>
+              <a:rPr lang="en-US" altLang="ja-JP" dirty="0" err="1"/>
+              <a:t>layer</a:t>
+            </a:r>
+            <a:endParaRPr kumimoji="1" lang="ja-JP" altLang="en-US" dirty="0"/>
+          </a:p>
+        </p:txBody>
+      </p:sp>
+      <p:sp>
+        <p:nvSpPr>
+          <p:cNvPr id="4" name="スライド番号プレースホルダー 3">
+            <a:extLst>
+              <a:ext uri="{FF2B5EF4-FFF2-40B4-BE49-F238E27FC236}">
+                <a16:creationId xmlns:a16="http://schemas.microsoft.com/office/drawing/2014/main" id="{F3E89AAB-4727-42E3-A2B2-F5E25345DCC6}"/>
+              </a:ext>
+            </a:extLst>
+          </p:cNvPr>
+          <p:cNvSpPr>
+            <a:spLocks noGrp="1"/>
+          </p:cNvSpPr>
+          <p:nvPr>
+            <p:ph type="sldNum" sz="quarter" idx="12"/>
+          </p:nvPr>
+        </p:nvSpPr>
+        <p:spPr/>
+        <p:txBody>
+          <a:bodyPr/>
+          <a:lstStyle/>
+          <a:p>
+            <a:fld id="{E27E2812-4560-4165-A7C7-9C013F955547}" type="slidenum">
               <a:rPr kumimoji="1" lang="ja-JP" altLang="en-US" smtClean="0"/>
-              <a:t>27</a:t>
+              <a:t>28</a:t>
             </a:fld>
             <a:endParaRPr kumimoji="1" lang="ja-JP" altLang="en-US"/>
           </a:p>
@@ -29344,95 +29784,6 @@
 </p:sld>
 </file>
 
-<file path=ppt/slides/slide28.xml><?xml version="1.0" encoding="utf-8"?>
-<p:sld xmlns:a="http://schemas.openxmlformats.org/drawingml/2006/main" xmlns:r="http://schemas.openxmlformats.org/officeDocument/2006/relationships" xmlns:p="http://schemas.openxmlformats.org/presentationml/2006/main">
-  <p:cSld>
-    <p:spTree>
-      <p:nvGrpSpPr>
-        <p:cNvPr id="1" name=""/>
-        <p:cNvGrpSpPr/>
-        <p:nvPr/>
-      </p:nvGrpSpPr>
-      <p:grpSpPr>
-        <a:xfrm>
-          <a:off x="0" y="0"/>
-          <a:ext cx="0" cy="0"/>
-          <a:chOff x="0" y="0"/>
-          <a:chExt cx="0" cy="0"/>
-        </a:xfrm>
-      </p:grpSpPr>
-      <p:sp>
-        <p:nvSpPr>
-          <p:cNvPr id="8" name="タイトル 7">
-            <a:extLst>
-              <a:ext uri="{FF2B5EF4-FFF2-40B4-BE49-F238E27FC236}">
-                <a16:creationId xmlns:a16="http://schemas.microsoft.com/office/drawing/2014/main" id="{D04E5850-8353-2464-F5AF-B7FB3A8721C1}"/>
-              </a:ext>
-            </a:extLst>
-          </p:cNvPr>
-          <p:cNvSpPr>
-            <a:spLocks noGrp="1"/>
-          </p:cNvSpPr>
-          <p:nvPr>
-            <p:ph type="title"/>
-          </p:nvPr>
-        </p:nvSpPr>
-        <p:spPr/>
-        <p:txBody>
-          <a:bodyPr/>
-          <a:lstStyle/>
-          <a:p>
-            <a:r>
-              <a:rPr lang="en-US" altLang="ja-JP" dirty="0"/>
-              <a:t>Known issues and limitations</a:t>
-            </a:r>
-            <a:endParaRPr lang="ja-JP" altLang="en-US" dirty="0"/>
-          </a:p>
-        </p:txBody>
-      </p:sp>
-      <p:sp>
-        <p:nvSpPr>
-          <p:cNvPr id="4" name="スライド番号プレースホルダー 3">
-            <a:extLst>
-              <a:ext uri="{FF2B5EF4-FFF2-40B4-BE49-F238E27FC236}">
-                <a16:creationId xmlns:a16="http://schemas.microsoft.com/office/drawing/2014/main" id="{616F7C8E-73E3-7AA6-34B1-C5A5B8BB3870}"/>
-              </a:ext>
-            </a:extLst>
-          </p:cNvPr>
-          <p:cNvSpPr>
-            <a:spLocks noGrp="1"/>
-          </p:cNvSpPr>
-          <p:nvPr>
-            <p:ph type="sldNum" sz="quarter" idx="12"/>
-          </p:nvPr>
-        </p:nvSpPr>
-        <p:spPr/>
-        <p:txBody>
-          <a:bodyPr/>
-          <a:lstStyle/>
-          <a:p>
-            <a:fld id="{E27E2812-4560-4165-A7C7-9C013F955547}" type="slidenum">
-              <a:rPr lang="ja-JP" altLang="en-US" smtClean="0"/>
-              <a:pPr/>
-              <a:t>28</a:t>
-            </a:fld>
-            <a:endParaRPr lang="ja-JP" altLang="en-US"/>
-          </a:p>
-        </p:txBody>
-      </p:sp>
-    </p:spTree>
-    <p:extLst>
-      <p:ext uri="{BB962C8B-B14F-4D97-AF65-F5344CB8AC3E}">
-        <p14:creationId xmlns:p14="http://schemas.microsoft.com/office/powerpoint/2010/main" val="3796750774"/>
-      </p:ext>
-    </p:extLst>
-  </p:cSld>
-  <p:clrMapOvr>
-    <a:masterClrMapping/>
-  </p:clrMapOvr>
-</p:sld>
-</file>
-
 <file path=ppt/slides/slide29.xml><?xml version="1.0" encoding="utf-8"?>
 <p:sld xmlns:a="http://schemas.openxmlformats.org/drawingml/2006/main" xmlns:r="http://schemas.openxmlformats.org/officeDocument/2006/relationships" xmlns:p="http://schemas.openxmlformats.org/presentationml/2006/main">
   <p:cSld>
@@ -29452,10 +29803,10 @@
       </p:grpSpPr>
       <p:sp>
         <p:nvSpPr>
-          <p:cNvPr id="2" name="タイトル 1">
-            <a:extLst>
-              <a:ext uri="{FF2B5EF4-FFF2-40B4-BE49-F238E27FC236}">
-                <a16:creationId xmlns:a16="http://schemas.microsoft.com/office/drawing/2014/main" id="{EF2D61BD-EF14-496D-BA79-EAE1C4548936}"/>
+          <p:cNvPr id="8" name="タイトル 7">
+            <a:extLst>
+              <a:ext uri="{FF2B5EF4-FFF2-40B4-BE49-F238E27FC236}">
+                <a16:creationId xmlns:a16="http://schemas.microsoft.com/office/drawing/2014/main" id="{D04E5850-8353-2464-F5AF-B7FB3A8721C1}"/>
               </a:ext>
             </a:extLst>
           </p:cNvPr>
@@ -29472,117 +29823,19 @@
           <a:lstStyle/>
           <a:p>
             <a:r>
-              <a:rPr kumimoji="1" lang="en-US" altLang="ja-JP" dirty="0"/>
+              <a:rPr lang="en-US" altLang="ja-JP" dirty="0"/>
               <a:t>Known issues and limitations</a:t>
             </a:r>
-            <a:endParaRPr kumimoji="1" lang="ja-JP" altLang="en-US" dirty="0"/>
+            <a:endParaRPr lang="ja-JP" altLang="en-US" dirty="0"/>
           </a:p>
         </p:txBody>
       </p:sp>
       <p:sp>
         <p:nvSpPr>
-          <p:cNvPr id="3" name="コンテンツ プレースホルダー 2">
-            <a:extLst>
-              <a:ext uri="{FF2B5EF4-FFF2-40B4-BE49-F238E27FC236}">
-                <a16:creationId xmlns:a16="http://schemas.microsoft.com/office/drawing/2014/main" id="{842F450B-0CA1-4943-96AE-CA89B8EC0907}"/>
-              </a:ext>
-            </a:extLst>
-          </p:cNvPr>
-          <p:cNvSpPr>
-            <a:spLocks noGrp="1"/>
-          </p:cNvSpPr>
-          <p:nvPr>
-            <p:ph idx="1"/>
-          </p:nvPr>
-        </p:nvSpPr>
-        <p:spPr/>
-        <p:txBody>
-          <a:bodyPr/>
-          <a:lstStyle/>
-          <a:p>
-            <a:pPr>
-              <a:buFont typeface="+mj-lt"/>
-              <a:buAutoNum type="arabicPeriod"/>
-            </a:pPr>
-            <a:r>
-              <a:rPr lang="en-US" altLang="ja-JP" dirty="0"/>
-              <a:t>MT-32 &amp; CM32-P can not store/restore last settings.</a:t>
-            </a:r>
-          </a:p>
-          <a:p>
-            <a:pPr>
-              <a:buFont typeface="+mj-lt"/>
-              <a:buAutoNum type="arabicPeriod"/>
-            </a:pPr>
-            <a:r>
-              <a:rPr lang="en-US" altLang="ja-JP" dirty="0"/>
-              <a:t>HuC6820 suddenly stop sounding. Please restart </a:t>
-            </a:r>
-            <a:r>
-              <a:rPr lang="en-US" altLang="ja-JP" dirty="0" err="1"/>
-              <a:t>MAmi</a:t>
-            </a:r>
-            <a:r>
-              <a:rPr lang="en-US" altLang="ja-JP" dirty="0"/>
-              <a:t>.</a:t>
-            </a:r>
-          </a:p>
-          <a:p>
-            <a:pPr>
-              <a:buFont typeface="+mj-lt"/>
-              <a:buAutoNum type="arabicPeriod"/>
-            </a:pPr>
-            <a:r>
-              <a:rPr lang="en-US" altLang="ja-JP" dirty="0" err="1"/>
-              <a:t>MAmidiMEmo</a:t>
-            </a:r>
-            <a:r>
-              <a:rPr lang="en-US" altLang="ja-JP" dirty="0"/>
-              <a:t> process stuck after sound interface changed if you used SCCI interface.</a:t>
-            </a:r>
-          </a:p>
-          <a:p>
-            <a:pPr>
-              <a:buFont typeface="+mj-lt"/>
-              <a:buAutoNum type="arabicPeriod"/>
-            </a:pPr>
-            <a:r>
-              <a:rPr lang="en-US" altLang="ja-JP" dirty="0"/>
-              <a:t>You need to save the data manually on the DAW (Cubase and so on).</a:t>
-            </a:r>
-            <a:br>
-              <a:rPr lang="en-US" altLang="ja-JP" dirty="0"/>
-            </a:br>
-            <a:r>
-              <a:rPr lang="en-US" altLang="ja-JP" dirty="0"/>
-              <a:t>Or, keep </a:t>
-            </a:r>
-            <a:r>
-              <a:rPr lang="en-US" altLang="ja-JP" b="1" dirty="0"/>
-              <a:t>open the dummy editor window</a:t>
-            </a:r>
-            <a:r>
-              <a:rPr lang="en-US" altLang="ja-JP" dirty="0"/>
-              <a:t> of the </a:t>
-            </a:r>
-            <a:r>
-              <a:rPr lang="en-US" altLang="ja-JP" dirty="0" err="1"/>
-              <a:t>MAmidiMemo</a:t>
-            </a:r>
-            <a:r>
-              <a:rPr lang="en-US" altLang="ja-JP" dirty="0"/>
-              <a:t>.</a:t>
-            </a:r>
-            <a:endParaRPr lang="ja-JP" altLang="en-US" dirty="0"/>
-          </a:p>
-        </p:txBody>
-      </p:sp>
-      <p:sp>
-        <p:nvSpPr>
-          <p:cNvPr id="5" name="スライド番号プレースホルダー 4">
-            <a:extLst>
-              <a:ext uri="{FF2B5EF4-FFF2-40B4-BE49-F238E27FC236}">
-                <a16:creationId xmlns:a16="http://schemas.microsoft.com/office/drawing/2014/main" id="{A8A94BD3-C34E-4BE3-9A56-35AF5E951F7A}"/>
+          <p:cNvPr id="4" name="スライド番号プレースホルダー 3">
+            <a:extLst>
+              <a:ext uri="{FF2B5EF4-FFF2-40B4-BE49-F238E27FC236}">
+                <a16:creationId xmlns:a16="http://schemas.microsoft.com/office/drawing/2014/main" id="{616F7C8E-73E3-7AA6-34B1-C5A5B8BB3870}"/>
               </a:ext>
             </a:extLst>
           </p:cNvPr>
@@ -29599,35 +29852,24 @@
           <a:lstStyle/>
           <a:p>
             <a:fld id="{E27E2812-4560-4165-A7C7-9C013F955547}" type="slidenum">
-              <a:rPr kumimoji="1" lang="ja-JP" altLang="en-US" smtClean="0"/>
+              <a:rPr lang="ja-JP" altLang="en-US" smtClean="0"/>
+              <a:pPr/>
               <a:t>29</a:t>
             </a:fld>
-            <a:endParaRPr kumimoji="1" lang="ja-JP" altLang="en-US"/>
+            <a:endParaRPr lang="ja-JP" altLang="en-US"/>
           </a:p>
         </p:txBody>
       </p:sp>
     </p:spTree>
     <p:extLst>
       <p:ext uri="{BB962C8B-B14F-4D97-AF65-F5344CB8AC3E}">
-        <p14:creationId xmlns:p14="http://schemas.microsoft.com/office/powerpoint/2010/main" val="1308317624"/>
+        <p14:creationId xmlns:p14="http://schemas.microsoft.com/office/powerpoint/2010/main" val="3796750774"/>
       </p:ext>
     </p:extLst>
   </p:cSld>
   <p:clrMapOvr>
     <a:masterClrMapping/>
   </p:clrMapOvr>
-  <mc:AlternateContent xmlns:mc="http://schemas.openxmlformats.org/markup-compatibility/2006" xmlns:p14="http://schemas.microsoft.com/office/powerpoint/2010/main">
-    <mc:Choice Requires="p14">
-      <p:transition spd="med" p14:dur="700">
-        <p:fade/>
-      </p:transition>
-    </mc:Choice>
-    <mc:Fallback xmlns="">
-      <p:transition spd="med">
-        <p:fade/>
-      </p:transition>
-    </mc:Fallback>
-  </mc:AlternateContent>
 </p:sld>
 </file>
 
@@ -29876,10 +30118,10 @@
       </p:grpSpPr>
       <p:sp>
         <p:nvSpPr>
-          <p:cNvPr id="8" name="タイトル 7">
-            <a:extLst>
-              <a:ext uri="{FF2B5EF4-FFF2-40B4-BE49-F238E27FC236}">
-                <a16:creationId xmlns:a16="http://schemas.microsoft.com/office/drawing/2014/main" id="{D04E5850-8353-2464-F5AF-B7FB3A8721C1}"/>
+          <p:cNvPr id="2" name="タイトル 1">
+            <a:extLst>
+              <a:ext uri="{FF2B5EF4-FFF2-40B4-BE49-F238E27FC236}">
+                <a16:creationId xmlns:a16="http://schemas.microsoft.com/office/drawing/2014/main" id="{EF2D61BD-EF14-496D-BA79-EAE1C4548936}"/>
               </a:ext>
             </a:extLst>
           </p:cNvPr>
@@ -29896,8 +30138,106 @@
           <a:lstStyle/>
           <a:p>
             <a:r>
+              <a:rPr kumimoji="1" lang="en-US" altLang="ja-JP" dirty="0"/>
+              <a:t>Known issues and limitations</a:t>
+            </a:r>
+            <a:endParaRPr kumimoji="1" lang="ja-JP" altLang="en-US" dirty="0"/>
+          </a:p>
+        </p:txBody>
+      </p:sp>
+      <p:sp>
+        <p:nvSpPr>
+          <p:cNvPr id="3" name="コンテンツ プレースホルダー 2">
+            <a:extLst>
+              <a:ext uri="{FF2B5EF4-FFF2-40B4-BE49-F238E27FC236}">
+                <a16:creationId xmlns:a16="http://schemas.microsoft.com/office/drawing/2014/main" id="{842F450B-0CA1-4943-96AE-CA89B8EC0907}"/>
+              </a:ext>
+            </a:extLst>
+          </p:cNvPr>
+          <p:cNvSpPr>
+            <a:spLocks noGrp="1"/>
+          </p:cNvSpPr>
+          <p:nvPr>
+            <p:ph idx="1"/>
+          </p:nvPr>
+        </p:nvSpPr>
+        <p:spPr/>
+        <p:txBody>
+          <a:bodyPr/>
+          <a:lstStyle/>
+          <a:p>
+            <a:pPr>
+              <a:buFont typeface="+mj-lt"/>
+              <a:buAutoNum type="arabicPeriod"/>
+            </a:pPr>
+            <a:r>
               <a:rPr lang="en-US" altLang="ja-JP" dirty="0"/>
-              <a:t>Appendix</a:t>
+              <a:t>MT-32 &amp; CM32-P can not store/restore last settings.</a:t>
+            </a:r>
+          </a:p>
+          <a:p>
+            <a:pPr>
+              <a:buFont typeface="+mj-lt"/>
+              <a:buAutoNum type="arabicPeriod"/>
+            </a:pPr>
+            <a:r>
+              <a:rPr lang="en-US" altLang="ja-JP" dirty="0"/>
+              <a:t>HuC6820 suddenly stop sounding. Please restart </a:t>
+            </a:r>
+            <a:r>
+              <a:rPr lang="en-US" altLang="ja-JP" dirty="0" err="1"/>
+              <a:t>MAmi</a:t>
+            </a:r>
+            <a:r>
+              <a:rPr lang="en-US" altLang="ja-JP" dirty="0"/>
+              <a:t>.</a:t>
+            </a:r>
+          </a:p>
+          <a:p>
+            <a:pPr>
+              <a:buFont typeface="+mj-lt"/>
+              <a:buAutoNum type="arabicPeriod"/>
+            </a:pPr>
+            <a:r>
+              <a:rPr lang="en-US" altLang="ja-JP" dirty="0" err="1"/>
+              <a:t>MAmidiMEmo</a:t>
+            </a:r>
+            <a:r>
+              <a:rPr lang="en-US" altLang="ja-JP" dirty="0"/>
+              <a:t> process stuck after sound interface changed if you used SCCI interface.</a:t>
+            </a:r>
+          </a:p>
+          <a:p>
+            <a:pPr>
+              <a:buFont typeface="+mj-lt"/>
+              <a:buAutoNum type="arabicPeriod"/>
+            </a:pPr>
+            <a:r>
+              <a:rPr lang="en-US" altLang="ja-JP" dirty="0"/>
+              <a:t>You need to save the data manually on the DAW (Cubase and so on).</a:t>
+            </a:r>
+            <a:br>
+              <a:rPr lang="en-US" altLang="ja-JP" dirty="0"/>
+            </a:br>
+            <a:r>
+              <a:rPr lang="en-US" altLang="ja-JP" dirty="0"/>
+              <a:t>Or, keep </a:t>
+            </a:r>
+            <a:r>
+              <a:rPr lang="en-US" altLang="ja-JP" b="1" dirty="0"/>
+              <a:t>open the dummy editor window</a:t>
+            </a:r>
+            <a:r>
+              <a:rPr lang="en-US" altLang="ja-JP" dirty="0"/>
+              <a:t> of the </a:t>
+            </a:r>
+            <a:r>
+              <a:rPr lang="en-US" altLang="ja-JP" dirty="0" err="1"/>
+              <a:t>MAmidiMemo</a:t>
+            </a:r>
+            <a:r>
+              <a:rPr lang="en-US" altLang="ja-JP" dirty="0"/>
+              <a:t>.</a:t>
             </a:r>
             <a:endParaRPr lang="ja-JP" altLang="en-US" dirty="0"/>
           </a:p>
@@ -29905,10 +30245,10 @@
       </p:sp>
       <p:sp>
         <p:nvSpPr>
-          <p:cNvPr id="4" name="スライド番号プレースホルダー 3">
-            <a:extLst>
-              <a:ext uri="{FF2B5EF4-FFF2-40B4-BE49-F238E27FC236}">
-                <a16:creationId xmlns:a16="http://schemas.microsoft.com/office/drawing/2014/main" id="{616F7C8E-73E3-7AA6-34B1-C5A5B8BB3870}"/>
+          <p:cNvPr id="5" name="スライド番号プレースホルダー 4">
+            <a:extLst>
+              <a:ext uri="{FF2B5EF4-FFF2-40B4-BE49-F238E27FC236}">
+                <a16:creationId xmlns:a16="http://schemas.microsoft.com/office/drawing/2014/main" id="{A8A94BD3-C34E-4BE3-9A56-35AF5E951F7A}"/>
               </a:ext>
             </a:extLst>
           </p:cNvPr>
@@ -29925,9 +30265,109 @@
           <a:lstStyle/>
           <a:p>
             <a:fld id="{E27E2812-4560-4165-A7C7-9C013F955547}" type="slidenum">
+              <a:rPr kumimoji="1" lang="ja-JP" altLang="en-US" smtClean="0"/>
+              <a:t>30</a:t>
+            </a:fld>
+            <a:endParaRPr kumimoji="1" lang="ja-JP" altLang="en-US"/>
+          </a:p>
+        </p:txBody>
+      </p:sp>
+    </p:spTree>
+    <p:extLst>
+      <p:ext uri="{BB962C8B-B14F-4D97-AF65-F5344CB8AC3E}">
+        <p14:creationId xmlns:p14="http://schemas.microsoft.com/office/powerpoint/2010/main" val="1308317624"/>
+      </p:ext>
+    </p:extLst>
+  </p:cSld>
+  <p:clrMapOvr>
+    <a:masterClrMapping/>
+  </p:clrMapOvr>
+  <mc:AlternateContent xmlns:mc="http://schemas.openxmlformats.org/markup-compatibility/2006" xmlns:p14="http://schemas.microsoft.com/office/powerpoint/2010/main">
+    <mc:Choice Requires="p14">
+      <p:transition spd="med" p14:dur="700">
+        <p:fade/>
+      </p:transition>
+    </mc:Choice>
+    <mc:Fallback xmlns="">
+      <p:transition spd="med">
+        <p:fade/>
+      </p:transition>
+    </mc:Fallback>
+  </mc:AlternateContent>
+</p:sld>
+</file>
+
+<file path=ppt/slides/slide31.xml><?xml version="1.0" encoding="utf-8"?>
+<p:sld xmlns:a="http://schemas.openxmlformats.org/drawingml/2006/main" xmlns:r="http://schemas.openxmlformats.org/officeDocument/2006/relationships" xmlns:p="http://schemas.openxmlformats.org/presentationml/2006/main">
+  <p:cSld>
+    <p:spTree>
+      <p:nvGrpSpPr>
+        <p:cNvPr id="1" name=""/>
+        <p:cNvGrpSpPr/>
+        <p:nvPr/>
+      </p:nvGrpSpPr>
+      <p:grpSpPr>
+        <a:xfrm>
+          <a:off x="0" y="0"/>
+          <a:ext cx="0" cy="0"/>
+          <a:chOff x="0" y="0"/>
+          <a:chExt cx="0" cy="0"/>
+        </a:xfrm>
+      </p:grpSpPr>
+      <p:sp>
+        <p:nvSpPr>
+          <p:cNvPr id="8" name="タイトル 7">
+            <a:extLst>
+              <a:ext uri="{FF2B5EF4-FFF2-40B4-BE49-F238E27FC236}">
+                <a16:creationId xmlns:a16="http://schemas.microsoft.com/office/drawing/2014/main" id="{D04E5850-8353-2464-F5AF-B7FB3A8721C1}"/>
+              </a:ext>
+            </a:extLst>
+          </p:cNvPr>
+          <p:cNvSpPr>
+            <a:spLocks noGrp="1"/>
+          </p:cNvSpPr>
+          <p:nvPr>
+            <p:ph type="title"/>
+          </p:nvPr>
+        </p:nvSpPr>
+        <p:spPr/>
+        <p:txBody>
+          <a:bodyPr/>
+          <a:lstStyle/>
+          <a:p>
+            <a:r>
+              <a:rPr lang="en-US" altLang="ja-JP" dirty="0"/>
+              <a:t>Appendix</a:t>
+            </a:r>
+            <a:endParaRPr lang="ja-JP" altLang="en-US" dirty="0"/>
+          </a:p>
+        </p:txBody>
+      </p:sp>
+      <p:sp>
+        <p:nvSpPr>
+          <p:cNvPr id="4" name="スライド番号プレースホルダー 3">
+            <a:extLst>
+              <a:ext uri="{FF2B5EF4-FFF2-40B4-BE49-F238E27FC236}">
+                <a16:creationId xmlns:a16="http://schemas.microsoft.com/office/drawing/2014/main" id="{616F7C8E-73E3-7AA6-34B1-C5A5B8BB3870}"/>
+              </a:ext>
+            </a:extLst>
+          </p:cNvPr>
+          <p:cNvSpPr>
+            <a:spLocks noGrp="1"/>
+          </p:cNvSpPr>
+          <p:nvPr>
+            <p:ph type="sldNum" sz="quarter" idx="12"/>
+          </p:nvPr>
+        </p:nvSpPr>
+        <p:spPr/>
+        <p:txBody>
+          <a:bodyPr/>
+          <a:lstStyle/>
+          <a:p>
+            <a:fld id="{E27E2812-4560-4165-A7C7-9C013F955547}" type="slidenum">
               <a:rPr lang="ja-JP" altLang="en-US" smtClean="0"/>
               <a:pPr/>
-              <a:t>30</a:t>
+              <a:t>31</a:t>
             </a:fld>
             <a:endParaRPr lang="ja-JP" altLang="en-US"/>
           </a:p>
@@ -29946,7 +30386,7 @@
 </p:sld>
 </file>
 
-<file path=ppt/slides/slide31.xml><?xml version="1.0" encoding="utf-8"?>
+<file path=ppt/slides/slide32.xml><?xml version="1.0" encoding="utf-8"?>
 <p:sld xmlns:a="http://schemas.openxmlformats.org/drawingml/2006/main" xmlns:r="http://schemas.openxmlformats.org/officeDocument/2006/relationships" xmlns:p="http://schemas.openxmlformats.org/presentationml/2006/main">
   <p:cSld>
     <p:spTree>
@@ -30094,7 +30534,7 @@
           <a:p>
             <a:fld id="{E27E2812-4560-4165-A7C7-9C013F955547}" type="slidenum">
               <a:rPr kumimoji="1" lang="ja-JP" altLang="en-US" smtClean="0"/>
-              <a:t>31</a:t>
+              <a:t>32</a:t>
             </a:fld>
             <a:endParaRPr kumimoji="1" lang="ja-JP" altLang="en-US"/>
           </a:p>
@@ -30125,7 +30565,7 @@
 </p:sld>
 </file>
 
-<file path=ppt/slides/slide32.xml><?xml version="1.0" encoding="utf-8"?>
+<file path=ppt/slides/slide33.xml><?xml version="1.0" encoding="utf-8"?>
 <p:sld xmlns:a="http://schemas.openxmlformats.org/drawingml/2006/main" xmlns:r="http://schemas.openxmlformats.org/officeDocument/2006/relationships" xmlns:p="http://schemas.openxmlformats.org/presentationml/2006/main">
   <p:cSld>
     <p:spTree>
@@ -30201,7 +30641,7 @@
           <a:p>
             <a:fld id="{E27E2812-4560-4165-A7C7-9C013F955547}" type="slidenum">
               <a:rPr kumimoji="1" lang="ja-JP" altLang="en-US" smtClean="0"/>
-              <a:t>32</a:t>
+              <a:t>33</a:t>
             </a:fld>
             <a:endParaRPr kumimoji="1" lang="ja-JP" altLang="en-US"/>
           </a:p>
@@ -30762,7 +31202,7 @@
 </p:sld>
 </file>
 
-<file path=ppt/slides/slide33.xml><?xml version="1.0" encoding="utf-8"?>
+<file path=ppt/slides/slide34.xml><?xml version="1.0" encoding="utf-8"?>
 <p:sld xmlns:a="http://schemas.openxmlformats.org/drawingml/2006/main" xmlns:r="http://schemas.openxmlformats.org/officeDocument/2006/relationships" xmlns:p="http://schemas.openxmlformats.org/presentationml/2006/main">
   <p:cSld>
     <p:spTree>
@@ -30838,7 +31278,7 @@
           <a:p>
             <a:fld id="{E27E2812-4560-4165-A7C7-9C013F955547}" type="slidenum">
               <a:rPr kumimoji="1" lang="ja-JP" altLang="en-US" smtClean="0"/>
-              <a:t>33</a:t>
+              <a:t>34</a:t>
             </a:fld>
             <a:endParaRPr kumimoji="1" lang="ja-JP" altLang="en-US"/>
           </a:p>
@@ -31703,7 +32143,7 @@
 </p:sld>
 </file>
 
-<file path=ppt/slides/slide34.xml><?xml version="1.0" encoding="utf-8"?>
+<file path=ppt/slides/slide35.xml><?xml version="1.0" encoding="utf-8"?>
 <p:sld xmlns:a="http://schemas.openxmlformats.org/drawingml/2006/main" xmlns:r="http://schemas.openxmlformats.org/officeDocument/2006/relationships" xmlns:p="http://schemas.openxmlformats.org/presentationml/2006/main">
   <p:cSld>
     <p:spTree>
@@ -31791,7 +32231,7 @@
           <a:p>
             <a:fld id="{E27E2812-4560-4165-A7C7-9C013F955547}" type="slidenum">
               <a:rPr kumimoji="1" lang="ja-JP" altLang="en-US" smtClean="0"/>
-              <a:t>34</a:t>
+              <a:t>35</a:t>
             </a:fld>
             <a:endParaRPr kumimoji="1" lang="ja-JP" altLang="en-US"/>
           </a:p>
@@ -32876,7 +33316,7 @@
 </p:sld>
 </file>
 
-<file path=ppt/slides/slide35.xml><?xml version="1.0" encoding="utf-8"?>
+<file path=ppt/slides/slide36.xml><?xml version="1.0" encoding="utf-8"?>
 <p:sld xmlns:a="http://schemas.openxmlformats.org/drawingml/2006/main" xmlns:r="http://schemas.openxmlformats.org/officeDocument/2006/relationships" xmlns:p="http://schemas.openxmlformats.org/presentationml/2006/main">
   <p:cSld>
     <p:spTree>
@@ -32952,7 +33392,7 @@
           <a:p>
             <a:fld id="{E27E2812-4560-4165-A7C7-9C013F955547}" type="slidenum">
               <a:rPr kumimoji="1" lang="ja-JP" altLang="en-US" smtClean="0"/>
-              <a:t>35</a:t>
+              <a:t>36</a:t>
             </a:fld>
             <a:endParaRPr kumimoji="1" lang="ja-JP" altLang="en-US"/>
           </a:p>
@@ -33600,7 +34040,7 @@
 </p:sld>
 </file>
 
-<file path=ppt/slides/slide36.xml><?xml version="1.0" encoding="utf-8"?>
+<file path=ppt/slides/slide37.xml><?xml version="1.0" encoding="utf-8"?>
 <p:sld xmlns:a="http://schemas.openxmlformats.org/drawingml/2006/main" xmlns:r="http://schemas.openxmlformats.org/officeDocument/2006/relationships" xmlns:p="http://schemas.openxmlformats.org/presentationml/2006/main">
   <p:cSld>
     <p:spTree>
@@ -33676,7 +34116,7 @@
           <a:p>
             <a:fld id="{E27E2812-4560-4165-A7C7-9C013F955547}" type="slidenum">
               <a:rPr kumimoji="1" lang="ja-JP" altLang="en-US" smtClean="0"/>
-              <a:t>36</a:t>
+              <a:t>37</a:t>
             </a:fld>
             <a:endParaRPr kumimoji="1" lang="ja-JP" altLang="en-US"/>
           </a:p>
@@ -34136,7 +34576,7 @@
 </p:sld>
 </file>
 
-<file path=ppt/slides/slide37.xml><?xml version="1.0" encoding="utf-8"?>
+<file path=ppt/slides/slide38.xml><?xml version="1.0" encoding="utf-8"?>
 <p:sld xmlns:a="http://schemas.openxmlformats.org/drawingml/2006/main" xmlns:r="http://schemas.openxmlformats.org/officeDocument/2006/relationships" xmlns:p="http://schemas.openxmlformats.org/presentationml/2006/main">
   <p:cSld>
     <p:spTree>
@@ -34212,7 +34652,7 @@
           <a:p>
             <a:fld id="{E27E2812-4560-4165-A7C7-9C013F955547}" type="slidenum">
               <a:rPr kumimoji="1" lang="ja-JP" altLang="en-US" smtClean="0"/>
-              <a:t>37</a:t>
+              <a:t>38</a:t>
             </a:fld>
             <a:endParaRPr kumimoji="1" lang="ja-JP" altLang="en-US"/>
           </a:p>
@@ -34619,7 +35059,7 @@
 </p:sld>
 </file>
 
-<file path=ppt/slides/slide38.xml><?xml version="1.0" encoding="utf-8"?>
+<file path=ppt/slides/slide39.xml><?xml version="1.0" encoding="utf-8"?>
 <p:sld xmlns:a="http://schemas.openxmlformats.org/drawingml/2006/main" xmlns:r="http://schemas.openxmlformats.org/officeDocument/2006/relationships" xmlns:p="http://schemas.openxmlformats.org/presentationml/2006/main">
   <p:cSld>
     <p:spTree>
@@ -34695,7 +35135,7 @@
           <a:p>
             <a:fld id="{E27E2812-4560-4165-A7C7-9C013F955547}" type="slidenum">
               <a:rPr kumimoji="1" lang="ja-JP" altLang="en-US" smtClean="0"/>
-              <a:t>38</a:t>
+              <a:t>39</a:t>
             </a:fld>
             <a:endParaRPr kumimoji="1" lang="ja-JP" altLang="en-US"/>
           </a:p>
@@ -35368,7 +35808,7 @@
 </p:sld>
 </file>
 
-<file path=ppt/slides/slide39.xml><?xml version="1.0" encoding="utf-8"?>
+<file path=ppt/slides/slide4.xml><?xml version="1.0" encoding="utf-8"?>
 <p:sld xmlns:a="http://schemas.openxmlformats.org/drawingml/2006/main" xmlns:r="http://schemas.openxmlformats.org/officeDocument/2006/relationships" xmlns:p="http://schemas.openxmlformats.org/presentationml/2006/main">
   <p:cSld>
     <p:spTree>
@@ -35385,12 +35825,52 @@
           <a:chExt cx="0" cy="0"/>
         </a:xfrm>
       </p:grpSpPr>
-      <p:sp>
-        <p:nvSpPr>
-          <p:cNvPr id="2" name="タイトル 1">
-            <a:extLst>
-              <a:ext uri="{FF2B5EF4-FFF2-40B4-BE49-F238E27FC236}">
-                <a16:creationId xmlns:a16="http://schemas.microsoft.com/office/drawing/2014/main" id="{29A39A5C-7FC5-4D89-9A64-C4313BC4C574}"/>
+      <p:pic>
+        <p:nvPicPr>
+          <p:cNvPr id="21" name="図 20">
+            <a:extLst>
+              <a:ext uri="{FF2B5EF4-FFF2-40B4-BE49-F238E27FC236}">
+                <a16:creationId xmlns:a16="http://schemas.microsoft.com/office/drawing/2014/main" id="{5467F2B4-EE6C-4B83-A30F-491B6AD38228}"/>
+              </a:ext>
+            </a:extLst>
+          </p:cNvPr>
+          <p:cNvPicPr>
+            <a:picLocks noChangeAspect="1"/>
+          </p:cNvPicPr>
+          <p:nvPr/>
+        </p:nvPicPr>
+        <p:blipFill>
+          <a:blip r:embed="rId2"/>
+          <a:stretch>
+            <a:fillRect/>
+          </a:stretch>
+        </p:blipFill>
+        <p:spPr>
+          <a:xfrm>
+            <a:off x="4102691" y="1722120"/>
+            <a:ext cx="5972146" cy="4569142"/>
+          </a:xfrm>
+          <a:prstGeom prst="rect">
+            <a:avLst/>
+          </a:prstGeom>
+          <a:ln>
+            <a:noFill/>
+          </a:ln>
+          <a:effectLst>
+            <a:outerShdw blurRad="190500" algn="tl" rotWithShape="0">
+              <a:srgbClr val="000000">
+                <a:alpha val="70000"/>
+              </a:srgbClr>
+            </a:outerShdw>
+          </a:effectLst>
+        </p:spPr>
+      </p:pic>
+      <p:sp>
+        <p:nvSpPr>
+          <p:cNvPr id="4" name="タイトル 3">
+            <a:extLst>
+              <a:ext uri="{FF2B5EF4-FFF2-40B4-BE49-F238E27FC236}">
+                <a16:creationId xmlns:a16="http://schemas.microsoft.com/office/drawing/2014/main" id="{82E76C59-306C-412A-82F5-264135209C2D}"/>
               </a:ext>
             </a:extLst>
           </p:cNvPr>
@@ -35407,26 +35887,241 @@
           <a:lstStyle/>
           <a:p>
             <a:r>
+              <a:rPr lang="en-US" altLang="ja-JP" dirty="0"/>
+              <a:t>Window Overview</a:t>
+            </a:r>
+            <a:endParaRPr lang="ja-JP" altLang="en-US" dirty="0"/>
+          </a:p>
+        </p:txBody>
+      </p:sp>
+      <p:sp>
+        <p:nvSpPr>
+          <p:cNvPr id="11" name="吹き出し: 四角形 10">
+            <a:extLst>
+              <a:ext uri="{FF2B5EF4-FFF2-40B4-BE49-F238E27FC236}">
+                <a16:creationId xmlns:a16="http://schemas.microsoft.com/office/drawing/2014/main" id="{8AC80913-4F34-4838-8E5A-27F150E3689B}"/>
+              </a:ext>
+            </a:extLst>
+          </p:cNvPr>
+          <p:cNvSpPr/>
+          <p:nvPr/>
+        </p:nvSpPr>
+        <p:spPr>
+          <a:xfrm>
+            <a:off x="1829779" y="2062552"/>
+            <a:ext cx="1526291" cy="590496"/>
+          </a:xfrm>
+          <a:prstGeom prst="wedgeRectCallout">
+            <a:avLst>
+              <a:gd name="adj1" fmla="val 109063"/>
+              <a:gd name="adj2" fmla="val 18181"/>
+            </a:avLst>
+          </a:prstGeom>
+        </p:spPr>
+        <p:style>
+          <a:lnRef idx="0">
+            <a:schemeClr val="accent2"/>
+          </a:lnRef>
+          <a:fillRef idx="3">
+            <a:schemeClr val="accent2"/>
+          </a:fillRef>
+          <a:effectRef idx="3">
+            <a:schemeClr val="accent2"/>
+          </a:effectRef>
+          <a:fontRef idx="minor">
+            <a:schemeClr val="lt1"/>
+          </a:fontRef>
+        </p:style>
+        <p:txBody>
+          <a:bodyPr rtlCol="0" anchor="ctr"/>
+          <a:lstStyle/>
+          <a:p>
+            <a:pPr algn="ctr"/>
+            <a:r>
               <a:rPr kumimoji="1" lang="en-US" altLang="ja-JP" dirty="0"/>
-              <a:t>MIDI Implementation Chart 8</a:t>
-            </a:r>
-            <a:br>
+              <a:t>MIDI IN A,B</a:t>
+            </a:r>
+          </a:p>
+          <a:p>
+            <a:pPr algn="ctr"/>
+            <a:r>
               <a:rPr kumimoji="1" lang="en-US" altLang="ja-JP" dirty="0"/>
-            </a:br>
+              <a:t>Selector</a:t>
+            </a:r>
+          </a:p>
+        </p:txBody>
+      </p:sp>
+      <p:sp>
+        <p:nvSpPr>
+          <p:cNvPr id="12" name="吹き出し: 四角形 11">
+            <a:extLst>
+              <a:ext uri="{FF2B5EF4-FFF2-40B4-BE49-F238E27FC236}">
+                <a16:creationId xmlns:a16="http://schemas.microsoft.com/office/drawing/2014/main" id="{5B6F8BFF-B0F2-4620-B704-034D83D119DF}"/>
+              </a:ext>
+            </a:extLst>
+          </p:cNvPr>
+          <p:cNvSpPr/>
+          <p:nvPr/>
+        </p:nvSpPr>
+        <p:spPr>
+          <a:xfrm>
+            <a:off x="1829779" y="2993856"/>
+            <a:ext cx="1526291" cy="870287"/>
+          </a:xfrm>
+          <a:prstGeom prst="wedgeRectCallout">
+            <a:avLst>
+              <a:gd name="adj1" fmla="val 115575"/>
+              <a:gd name="adj2" fmla="val -47625"/>
+            </a:avLst>
+          </a:prstGeom>
+        </p:spPr>
+        <p:style>
+          <a:lnRef idx="0">
+            <a:schemeClr val="accent2"/>
+          </a:lnRef>
+          <a:fillRef idx="3">
+            <a:schemeClr val="accent2"/>
+          </a:fillRef>
+          <a:effectRef idx="3">
+            <a:schemeClr val="accent2"/>
+          </a:effectRef>
+          <a:fontRef idx="minor">
+            <a:schemeClr val="lt1"/>
+          </a:fontRef>
+        </p:style>
+        <p:txBody>
+          <a:bodyPr rtlCol="0" anchor="ctr"/>
+          <a:lstStyle/>
+          <a:p>
+            <a:pPr algn="ctr"/>
             <a:r>
               <a:rPr kumimoji="1" lang="en-US" altLang="ja-JP" dirty="0"/>
-              <a:t>XGM Recording</a:t>
-            </a:r>
-            <a:endParaRPr kumimoji="1" lang="ja-JP" altLang="en-US" dirty="0"/>
+              <a:t>Active Chips</a:t>
+            </a:r>
+          </a:p>
+          <a:p>
+            <a:pPr algn="ctr"/>
+            <a:r>
+              <a:rPr kumimoji="1" lang="en-US" altLang="ja-JP" dirty="0"/>
+              <a:t>(see next)</a:t>
+            </a:r>
           </a:p>
         </p:txBody>
       </p:sp>
       <p:sp>
         <p:nvSpPr>
-          <p:cNvPr id="4" name="スライド番号プレースホルダー 3">
-            <a:extLst>
-              <a:ext uri="{FF2B5EF4-FFF2-40B4-BE49-F238E27FC236}">
-                <a16:creationId xmlns:a16="http://schemas.microsoft.com/office/drawing/2014/main" id="{F527AEA0-7EF4-4546-B495-9F4920BF8281}"/>
+          <p:cNvPr id="13" name="吹き出し: 四角形 12">
+            <a:extLst>
+              <a:ext uri="{FF2B5EF4-FFF2-40B4-BE49-F238E27FC236}">
+                <a16:creationId xmlns:a16="http://schemas.microsoft.com/office/drawing/2014/main" id="{77605064-79D3-4ABE-8F22-049D99FF311D}"/>
+              </a:ext>
+            </a:extLst>
+          </p:cNvPr>
+          <p:cNvSpPr/>
+          <p:nvPr/>
+        </p:nvSpPr>
+        <p:spPr>
+          <a:xfrm>
+            <a:off x="10198474" y="2839514"/>
+            <a:ext cx="1823954" cy="1217331"/>
+          </a:xfrm>
+          <a:prstGeom prst="wedgeRectCallout">
+            <a:avLst>
+              <a:gd name="adj1" fmla="val -91981"/>
+              <a:gd name="adj2" fmla="val 15109"/>
+            </a:avLst>
+          </a:prstGeom>
+        </p:spPr>
+        <p:style>
+          <a:lnRef idx="0">
+            <a:schemeClr val="accent2"/>
+          </a:lnRef>
+          <a:fillRef idx="3">
+            <a:schemeClr val="accent2"/>
+          </a:fillRef>
+          <a:effectRef idx="3">
+            <a:schemeClr val="accent2"/>
+          </a:effectRef>
+          <a:fontRef idx="minor">
+            <a:schemeClr val="lt1"/>
+          </a:fontRef>
+        </p:style>
+        <p:txBody>
+          <a:bodyPr rtlCol="0" anchor="ctr"/>
+          <a:lstStyle/>
+          <a:p>
+            <a:pPr algn="ctr"/>
+            <a:r>
+              <a:rPr kumimoji="1" lang="en-US" altLang="ja-JP" dirty="0"/>
+              <a:t>Chip Parameter Editor</a:t>
+            </a:r>
+          </a:p>
+          <a:p>
+            <a:pPr algn="ctr"/>
+            <a:r>
+              <a:rPr kumimoji="1" lang="en-US" altLang="ja-JP" dirty="0"/>
+              <a:t>(see next)</a:t>
+            </a:r>
+          </a:p>
+        </p:txBody>
+      </p:sp>
+      <p:sp>
+        <p:nvSpPr>
+          <p:cNvPr id="15" name="吹き出し: 四角形 14">
+            <a:extLst>
+              <a:ext uri="{FF2B5EF4-FFF2-40B4-BE49-F238E27FC236}">
+                <a16:creationId xmlns:a16="http://schemas.microsoft.com/office/drawing/2014/main" id="{A2F611AC-2A6C-4DBD-8C55-570467A501EE}"/>
+              </a:ext>
+            </a:extLst>
+          </p:cNvPr>
+          <p:cNvSpPr/>
+          <p:nvPr/>
+        </p:nvSpPr>
+        <p:spPr>
+          <a:xfrm>
+            <a:off x="1822330" y="4702056"/>
+            <a:ext cx="1526291" cy="501889"/>
+          </a:xfrm>
+          <a:prstGeom prst="wedgeRectCallout">
+            <a:avLst>
+              <a:gd name="adj1" fmla="val 104843"/>
+              <a:gd name="adj2" fmla="val 27350"/>
+            </a:avLst>
+          </a:prstGeom>
+        </p:spPr>
+        <p:style>
+          <a:lnRef idx="0">
+            <a:schemeClr val="accent2"/>
+          </a:lnRef>
+          <a:fillRef idx="3">
+            <a:schemeClr val="accent2"/>
+          </a:fillRef>
+          <a:effectRef idx="3">
+            <a:schemeClr val="accent2"/>
+          </a:effectRef>
+          <a:fontRef idx="minor">
+            <a:schemeClr val="lt1"/>
+          </a:fontRef>
+        </p:style>
+        <p:txBody>
+          <a:bodyPr rtlCol="0" anchor="ctr"/>
+          <a:lstStyle/>
+          <a:p>
+            <a:pPr algn="ctr"/>
+            <a:r>
+              <a:rPr kumimoji="1" lang="en-US" altLang="ja-JP"/>
+              <a:t>Tools</a:t>
+            </a:r>
+            <a:endParaRPr kumimoji="1" lang="en-US" altLang="ja-JP" dirty="0"/>
+          </a:p>
+        </p:txBody>
+      </p:sp>
+      <p:sp>
+        <p:nvSpPr>
+          <p:cNvPr id="2" name="スライド番号プレースホルダー 1">
+            <a:extLst>
+              <a:ext uri="{FF2B5EF4-FFF2-40B4-BE49-F238E27FC236}">
+                <a16:creationId xmlns:a16="http://schemas.microsoft.com/office/drawing/2014/main" id="{17DC8FDB-C8A0-4FDF-969E-72729182A65C}"/>
               </a:ext>
             </a:extLst>
           </p:cNvPr>
@@ -35444,7 +36139,114 @@
           <a:p>
             <a:fld id="{E27E2812-4560-4165-A7C7-9C013F955547}" type="slidenum">
               <a:rPr kumimoji="1" lang="ja-JP" altLang="en-US" smtClean="0"/>
-              <a:t>39</a:t>
+              <a:t>4</a:t>
+            </a:fld>
+            <a:endParaRPr kumimoji="1" lang="ja-JP" altLang="en-US"/>
+          </a:p>
+        </p:txBody>
+      </p:sp>
+    </p:spTree>
+    <p:extLst>
+      <p:ext uri="{BB962C8B-B14F-4D97-AF65-F5344CB8AC3E}">
+        <p14:creationId xmlns:p14="http://schemas.microsoft.com/office/powerpoint/2010/main" val="3635328236"/>
+      </p:ext>
+    </p:extLst>
+  </p:cSld>
+  <p:clrMapOvr>
+    <a:masterClrMapping/>
+  </p:clrMapOvr>
+  <mc:AlternateContent xmlns:mc="http://schemas.openxmlformats.org/markup-compatibility/2006" xmlns:p14="http://schemas.microsoft.com/office/powerpoint/2010/main">
+    <mc:Choice Requires="p14">
+      <p:transition spd="med" p14:dur="700">
+        <p:fade/>
+      </p:transition>
+    </mc:Choice>
+    <mc:Fallback xmlns="">
+      <p:transition spd="med">
+        <p:fade/>
+      </p:transition>
+    </mc:Fallback>
+  </mc:AlternateContent>
+</p:sld>
+</file>
+
+<file path=ppt/slides/slide40.xml><?xml version="1.0" encoding="utf-8"?>
+<p:sld xmlns:a="http://schemas.openxmlformats.org/drawingml/2006/main" xmlns:r="http://schemas.openxmlformats.org/officeDocument/2006/relationships" xmlns:p="http://schemas.openxmlformats.org/presentationml/2006/main">
+  <p:cSld>
+    <p:spTree>
+      <p:nvGrpSpPr>
+        <p:cNvPr id="1" name=""/>
+        <p:cNvGrpSpPr/>
+        <p:nvPr/>
+      </p:nvGrpSpPr>
+      <p:grpSpPr>
+        <a:xfrm>
+          <a:off x="0" y="0"/>
+          <a:ext cx="0" cy="0"/>
+          <a:chOff x="0" y="0"/>
+          <a:chExt cx="0" cy="0"/>
+        </a:xfrm>
+      </p:grpSpPr>
+      <p:sp>
+        <p:nvSpPr>
+          <p:cNvPr id="2" name="タイトル 1">
+            <a:extLst>
+              <a:ext uri="{FF2B5EF4-FFF2-40B4-BE49-F238E27FC236}">
+                <a16:creationId xmlns:a16="http://schemas.microsoft.com/office/drawing/2014/main" id="{29A39A5C-7FC5-4D89-9A64-C4313BC4C574}"/>
+              </a:ext>
+            </a:extLst>
+          </p:cNvPr>
+          <p:cNvSpPr>
+            <a:spLocks noGrp="1"/>
+          </p:cNvSpPr>
+          <p:nvPr>
+            <p:ph type="title"/>
+          </p:nvPr>
+        </p:nvSpPr>
+        <p:spPr/>
+        <p:txBody>
+          <a:bodyPr/>
+          <a:lstStyle/>
+          <a:p>
+            <a:r>
+              <a:rPr kumimoji="1" lang="en-US" altLang="ja-JP" dirty="0"/>
+              <a:t>MIDI Implementation Chart 8</a:t>
+            </a:r>
+            <a:br>
+              <a:rPr kumimoji="1" lang="en-US" altLang="ja-JP" dirty="0"/>
+            </a:br>
+            <a:r>
+              <a:rPr kumimoji="1" lang="en-US" altLang="ja-JP" dirty="0"/>
+              <a:t>XGM Recording</a:t>
+            </a:r>
+            <a:endParaRPr kumimoji="1" lang="ja-JP" altLang="en-US" dirty="0"/>
+          </a:p>
+        </p:txBody>
+      </p:sp>
+      <p:sp>
+        <p:nvSpPr>
+          <p:cNvPr id="4" name="スライド番号プレースホルダー 3">
+            <a:extLst>
+              <a:ext uri="{FF2B5EF4-FFF2-40B4-BE49-F238E27FC236}">
+                <a16:creationId xmlns:a16="http://schemas.microsoft.com/office/drawing/2014/main" id="{F527AEA0-7EF4-4546-B495-9F4920BF8281}"/>
+              </a:ext>
+            </a:extLst>
+          </p:cNvPr>
+          <p:cNvSpPr>
+            <a:spLocks noGrp="1"/>
+          </p:cNvSpPr>
+          <p:nvPr>
+            <p:ph type="sldNum" sz="quarter" idx="12"/>
+          </p:nvPr>
+        </p:nvSpPr>
+        <p:spPr/>
+        <p:txBody>
+          <a:bodyPr/>
+          <a:lstStyle/>
+          <a:p>
+            <a:fld id="{E27E2812-4560-4165-A7C7-9C013F955547}" type="slidenum">
+              <a:rPr kumimoji="1" lang="ja-JP" altLang="en-US" smtClean="0"/>
+              <a:t>40</a:t>
             </a:fld>
             <a:endParaRPr kumimoji="1" lang="ja-JP" altLang="en-US"/>
           </a:p>
@@ -35747,369 +36549,7 @@
 </p:sld>
 </file>
 
-<file path=ppt/slides/slide4.xml><?xml version="1.0" encoding="utf-8"?>
-<p:sld xmlns:a="http://schemas.openxmlformats.org/drawingml/2006/main" xmlns:r="http://schemas.openxmlformats.org/officeDocument/2006/relationships" xmlns:p="http://schemas.openxmlformats.org/presentationml/2006/main">
-  <p:cSld>
-    <p:spTree>
-      <p:nvGrpSpPr>
-        <p:cNvPr id="1" name=""/>
-        <p:cNvGrpSpPr/>
-        <p:nvPr/>
-      </p:nvGrpSpPr>
-      <p:grpSpPr>
-        <a:xfrm>
-          <a:off x="0" y="0"/>
-          <a:ext cx="0" cy="0"/>
-          <a:chOff x="0" y="0"/>
-          <a:chExt cx="0" cy="0"/>
-        </a:xfrm>
-      </p:grpSpPr>
-      <p:pic>
-        <p:nvPicPr>
-          <p:cNvPr id="21" name="図 20">
-            <a:extLst>
-              <a:ext uri="{FF2B5EF4-FFF2-40B4-BE49-F238E27FC236}">
-                <a16:creationId xmlns:a16="http://schemas.microsoft.com/office/drawing/2014/main" id="{5467F2B4-EE6C-4B83-A30F-491B6AD38228}"/>
-              </a:ext>
-            </a:extLst>
-          </p:cNvPr>
-          <p:cNvPicPr>
-            <a:picLocks noChangeAspect="1"/>
-          </p:cNvPicPr>
-          <p:nvPr/>
-        </p:nvPicPr>
-        <p:blipFill>
-          <a:blip r:embed="rId2"/>
-          <a:stretch>
-            <a:fillRect/>
-          </a:stretch>
-        </p:blipFill>
-        <p:spPr>
-          <a:xfrm>
-            <a:off x="4102691" y="1722120"/>
-            <a:ext cx="5972146" cy="4569142"/>
-          </a:xfrm>
-          <a:prstGeom prst="rect">
-            <a:avLst/>
-          </a:prstGeom>
-          <a:ln>
-            <a:noFill/>
-          </a:ln>
-          <a:effectLst>
-            <a:outerShdw blurRad="190500" algn="tl" rotWithShape="0">
-              <a:srgbClr val="000000">
-                <a:alpha val="70000"/>
-              </a:srgbClr>
-            </a:outerShdw>
-          </a:effectLst>
-        </p:spPr>
-      </p:pic>
-      <p:sp>
-        <p:nvSpPr>
-          <p:cNvPr id="4" name="タイトル 3">
-            <a:extLst>
-              <a:ext uri="{FF2B5EF4-FFF2-40B4-BE49-F238E27FC236}">
-                <a16:creationId xmlns:a16="http://schemas.microsoft.com/office/drawing/2014/main" id="{82E76C59-306C-412A-82F5-264135209C2D}"/>
-              </a:ext>
-            </a:extLst>
-          </p:cNvPr>
-          <p:cNvSpPr>
-            <a:spLocks noGrp="1"/>
-          </p:cNvSpPr>
-          <p:nvPr>
-            <p:ph type="title"/>
-          </p:nvPr>
-        </p:nvSpPr>
-        <p:spPr/>
-        <p:txBody>
-          <a:bodyPr/>
-          <a:lstStyle/>
-          <a:p>
-            <a:r>
-              <a:rPr lang="en-US" altLang="ja-JP" dirty="0"/>
-              <a:t>Window Overview</a:t>
-            </a:r>
-            <a:endParaRPr lang="ja-JP" altLang="en-US" dirty="0"/>
-          </a:p>
-        </p:txBody>
-      </p:sp>
-      <p:sp>
-        <p:nvSpPr>
-          <p:cNvPr id="11" name="吹き出し: 四角形 10">
-            <a:extLst>
-              <a:ext uri="{FF2B5EF4-FFF2-40B4-BE49-F238E27FC236}">
-                <a16:creationId xmlns:a16="http://schemas.microsoft.com/office/drawing/2014/main" id="{8AC80913-4F34-4838-8E5A-27F150E3689B}"/>
-              </a:ext>
-            </a:extLst>
-          </p:cNvPr>
-          <p:cNvSpPr/>
-          <p:nvPr/>
-        </p:nvSpPr>
-        <p:spPr>
-          <a:xfrm>
-            <a:off x="1829779" y="2062552"/>
-            <a:ext cx="1526291" cy="590496"/>
-          </a:xfrm>
-          <a:prstGeom prst="wedgeRectCallout">
-            <a:avLst>
-              <a:gd name="adj1" fmla="val 109063"/>
-              <a:gd name="adj2" fmla="val 18181"/>
-            </a:avLst>
-          </a:prstGeom>
-        </p:spPr>
-        <p:style>
-          <a:lnRef idx="0">
-            <a:schemeClr val="accent2"/>
-          </a:lnRef>
-          <a:fillRef idx="3">
-            <a:schemeClr val="accent2"/>
-          </a:fillRef>
-          <a:effectRef idx="3">
-            <a:schemeClr val="accent2"/>
-          </a:effectRef>
-          <a:fontRef idx="minor">
-            <a:schemeClr val="lt1"/>
-          </a:fontRef>
-        </p:style>
-        <p:txBody>
-          <a:bodyPr rtlCol="0" anchor="ctr"/>
-          <a:lstStyle/>
-          <a:p>
-            <a:pPr algn="ctr"/>
-            <a:r>
-              <a:rPr kumimoji="1" lang="en-US" altLang="ja-JP" dirty="0"/>
-              <a:t>MIDI IN A,B</a:t>
-            </a:r>
-          </a:p>
-          <a:p>
-            <a:pPr algn="ctr"/>
-            <a:r>
-              <a:rPr kumimoji="1" lang="en-US" altLang="ja-JP" dirty="0"/>
-              <a:t>Selector</a:t>
-            </a:r>
-          </a:p>
-        </p:txBody>
-      </p:sp>
-      <p:sp>
-        <p:nvSpPr>
-          <p:cNvPr id="12" name="吹き出し: 四角形 11">
-            <a:extLst>
-              <a:ext uri="{FF2B5EF4-FFF2-40B4-BE49-F238E27FC236}">
-                <a16:creationId xmlns:a16="http://schemas.microsoft.com/office/drawing/2014/main" id="{5B6F8BFF-B0F2-4620-B704-034D83D119DF}"/>
-              </a:ext>
-            </a:extLst>
-          </p:cNvPr>
-          <p:cNvSpPr/>
-          <p:nvPr/>
-        </p:nvSpPr>
-        <p:spPr>
-          <a:xfrm>
-            <a:off x="1829779" y="2993856"/>
-            <a:ext cx="1526291" cy="870287"/>
-          </a:xfrm>
-          <a:prstGeom prst="wedgeRectCallout">
-            <a:avLst>
-              <a:gd name="adj1" fmla="val 115575"/>
-              <a:gd name="adj2" fmla="val -47625"/>
-            </a:avLst>
-          </a:prstGeom>
-        </p:spPr>
-        <p:style>
-          <a:lnRef idx="0">
-            <a:schemeClr val="accent2"/>
-          </a:lnRef>
-          <a:fillRef idx="3">
-            <a:schemeClr val="accent2"/>
-          </a:fillRef>
-          <a:effectRef idx="3">
-            <a:schemeClr val="accent2"/>
-          </a:effectRef>
-          <a:fontRef idx="minor">
-            <a:schemeClr val="lt1"/>
-          </a:fontRef>
-        </p:style>
-        <p:txBody>
-          <a:bodyPr rtlCol="0" anchor="ctr"/>
-          <a:lstStyle/>
-          <a:p>
-            <a:pPr algn="ctr"/>
-            <a:r>
-              <a:rPr kumimoji="1" lang="en-US" altLang="ja-JP" dirty="0"/>
-              <a:t>Active Chips</a:t>
-            </a:r>
-          </a:p>
-          <a:p>
-            <a:pPr algn="ctr"/>
-            <a:r>
-              <a:rPr kumimoji="1" lang="en-US" altLang="ja-JP" dirty="0"/>
-              <a:t>(see next)</a:t>
-            </a:r>
-          </a:p>
-        </p:txBody>
-      </p:sp>
-      <p:sp>
-        <p:nvSpPr>
-          <p:cNvPr id="13" name="吹き出し: 四角形 12">
-            <a:extLst>
-              <a:ext uri="{FF2B5EF4-FFF2-40B4-BE49-F238E27FC236}">
-                <a16:creationId xmlns:a16="http://schemas.microsoft.com/office/drawing/2014/main" id="{77605064-79D3-4ABE-8F22-049D99FF311D}"/>
-              </a:ext>
-            </a:extLst>
-          </p:cNvPr>
-          <p:cNvSpPr/>
-          <p:nvPr/>
-        </p:nvSpPr>
-        <p:spPr>
-          <a:xfrm>
-            <a:off x="10198474" y="2839514"/>
-            <a:ext cx="1823954" cy="1217331"/>
-          </a:xfrm>
-          <a:prstGeom prst="wedgeRectCallout">
-            <a:avLst>
-              <a:gd name="adj1" fmla="val -91981"/>
-              <a:gd name="adj2" fmla="val 15109"/>
-            </a:avLst>
-          </a:prstGeom>
-        </p:spPr>
-        <p:style>
-          <a:lnRef idx="0">
-            <a:schemeClr val="accent2"/>
-          </a:lnRef>
-          <a:fillRef idx="3">
-            <a:schemeClr val="accent2"/>
-          </a:fillRef>
-          <a:effectRef idx="3">
-            <a:schemeClr val="accent2"/>
-          </a:effectRef>
-          <a:fontRef idx="minor">
-            <a:schemeClr val="lt1"/>
-          </a:fontRef>
-        </p:style>
-        <p:txBody>
-          <a:bodyPr rtlCol="0" anchor="ctr"/>
-          <a:lstStyle/>
-          <a:p>
-            <a:pPr algn="ctr"/>
-            <a:r>
-              <a:rPr kumimoji="1" lang="en-US" altLang="ja-JP" dirty="0"/>
-              <a:t>Chip Parameter Editor</a:t>
-            </a:r>
-          </a:p>
-          <a:p>
-            <a:pPr algn="ctr"/>
-            <a:r>
-              <a:rPr kumimoji="1" lang="en-US" altLang="ja-JP" dirty="0"/>
-              <a:t>(see next)</a:t>
-            </a:r>
-          </a:p>
-        </p:txBody>
-      </p:sp>
-      <p:sp>
-        <p:nvSpPr>
-          <p:cNvPr id="15" name="吹き出し: 四角形 14">
-            <a:extLst>
-              <a:ext uri="{FF2B5EF4-FFF2-40B4-BE49-F238E27FC236}">
-                <a16:creationId xmlns:a16="http://schemas.microsoft.com/office/drawing/2014/main" id="{A2F611AC-2A6C-4DBD-8C55-570467A501EE}"/>
-              </a:ext>
-            </a:extLst>
-          </p:cNvPr>
-          <p:cNvSpPr/>
-          <p:nvPr/>
-        </p:nvSpPr>
-        <p:spPr>
-          <a:xfrm>
-            <a:off x="1822330" y="4702056"/>
-            <a:ext cx="1526291" cy="501889"/>
-          </a:xfrm>
-          <a:prstGeom prst="wedgeRectCallout">
-            <a:avLst>
-              <a:gd name="adj1" fmla="val 104843"/>
-              <a:gd name="adj2" fmla="val 27350"/>
-            </a:avLst>
-          </a:prstGeom>
-        </p:spPr>
-        <p:style>
-          <a:lnRef idx="0">
-            <a:schemeClr val="accent2"/>
-          </a:lnRef>
-          <a:fillRef idx="3">
-            <a:schemeClr val="accent2"/>
-          </a:fillRef>
-          <a:effectRef idx="3">
-            <a:schemeClr val="accent2"/>
-          </a:effectRef>
-          <a:fontRef idx="minor">
-            <a:schemeClr val="lt1"/>
-          </a:fontRef>
-        </p:style>
-        <p:txBody>
-          <a:bodyPr rtlCol="0" anchor="ctr"/>
-          <a:lstStyle/>
-          <a:p>
-            <a:pPr algn="ctr"/>
-            <a:r>
-              <a:rPr kumimoji="1" lang="en-US" altLang="ja-JP"/>
-              <a:t>Tools</a:t>
-            </a:r>
-            <a:endParaRPr kumimoji="1" lang="en-US" altLang="ja-JP" dirty="0"/>
-          </a:p>
-        </p:txBody>
-      </p:sp>
-      <p:sp>
-        <p:nvSpPr>
-          <p:cNvPr id="2" name="スライド番号プレースホルダー 1">
-            <a:extLst>
-              <a:ext uri="{FF2B5EF4-FFF2-40B4-BE49-F238E27FC236}">
-                <a16:creationId xmlns:a16="http://schemas.microsoft.com/office/drawing/2014/main" id="{17DC8FDB-C8A0-4FDF-969E-72729182A65C}"/>
-              </a:ext>
-            </a:extLst>
-          </p:cNvPr>
-          <p:cNvSpPr>
-            <a:spLocks noGrp="1"/>
-          </p:cNvSpPr>
-          <p:nvPr>
-            <p:ph type="sldNum" sz="quarter" idx="12"/>
-          </p:nvPr>
-        </p:nvSpPr>
-        <p:spPr/>
-        <p:txBody>
-          <a:bodyPr/>
-          <a:lstStyle/>
-          <a:p>
-            <a:fld id="{E27E2812-4560-4165-A7C7-9C013F955547}" type="slidenum">
-              <a:rPr kumimoji="1" lang="ja-JP" altLang="en-US" smtClean="0"/>
-              <a:t>4</a:t>
-            </a:fld>
-            <a:endParaRPr kumimoji="1" lang="ja-JP" altLang="en-US"/>
-          </a:p>
-        </p:txBody>
-      </p:sp>
-    </p:spTree>
-    <p:extLst>
-      <p:ext uri="{BB962C8B-B14F-4D97-AF65-F5344CB8AC3E}">
-        <p14:creationId xmlns:p14="http://schemas.microsoft.com/office/powerpoint/2010/main" val="3635328236"/>
-      </p:ext>
-    </p:extLst>
-  </p:cSld>
-  <p:clrMapOvr>
-    <a:masterClrMapping/>
-  </p:clrMapOvr>
-  <mc:AlternateContent xmlns:mc="http://schemas.openxmlformats.org/markup-compatibility/2006" xmlns:p14="http://schemas.microsoft.com/office/powerpoint/2010/main">
-    <mc:Choice Requires="p14">
-      <p:transition spd="med" p14:dur="700">
-        <p:fade/>
-      </p:transition>
-    </mc:Choice>
-    <mc:Fallback xmlns="">
-      <p:transition spd="med">
-        <p:fade/>
-      </p:transition>
-    </mc:Fallback>
-  </mc:AlternateContent>
-</p:sld>
-</file>
-
-<file path=ppt/slides/slide40.xml><?xml version="1.0" encoding="utf-8"?>
+<file path=ppt/slides/slide41.xml><?xml version="1.0" encoding="utf-8"?>
 <p:sld xmlns:a="http://schemas.openxmlformats.org/drawingml/2006/main" xmlns:r="http://schemas.openxmlformats.org/officeDocument/2006/relationships" xmlns:p="http://schemas.openxmlformats.org/presentationml/2006/main">
   <p:cSld>
     <p:spTree>
@@ -36191,7 +36631,7 @@
           <a:p>
             <a:fld id="{E27E2812-4560-4165-A7C7-9C013F955547}" type="slidenum">
               <a:rPr kumimoji="1" lang="ja-JP" altLang="en-US" smtClean="0"/>
-              <a:t>40</a:t>
+              <a:t>41</a:t>
             </a:fld>
             <a:endParaRPr kumimoji="1" lang="ja-JP" altLang="en-US"/>
           </a:p>
@@ -36494,7 +36934,7 @@
 </p:sld>
 </file>
 
-<file path=ppt/slides/slide41.xml><?xml version="1.0" encoding="utf-8"?>
+<file path=ppt/slides/slide42.xml><?xml version="1.0" encoding="utf-8"?>
 <p:sld xmlns:a="http://schemas.openxmlformats.org/drawingml/2006/main" xmlns:r="http://schemas.openxmlformats.org/officeDocument/2006/relationships" xmlns:p="http://schemas.openxmlformats.org/presentationml/2006/main">
   <p:cSld>
     <p:spTree>
@@ -36642,7 +37082,7 @@
           <a:p>
             <a:fld id="{E27E2812-4560-4165-A7C7-9C013F955547}" type="slidenum">
               <a:rPr kumimoji="1" lang="ja-JP" altLang="en-US" smtClean="0"/>
-              <a:t>41</a:t>
+              <a:t>42</a:t>
             </a:fld>
             <a:endParaRPr kumimoji="1" lang="ja-JP" altLang="en-US"/>
           </a:p>
@@ -36833,7 +37273,7 @@
 </p:sld>
 </file>
 
-<file path=ppt/slides/slide42.xml><?xml version="1.0" encoding="utf-8"?>
+<file path=ppt/slides/slide43.xml><?xml version="1.0" encoding="utf-8"?>
 <p:sld xmlns:a="http://schemas.openxmlformats.org/drawingml/2006/main" xmlns:r="http://schemas.openxmlformats.org/officeDocument/2006/relationships" xmlns:p="http://schemas.openxmlformats.org/presentationml/2006/main">
   <p:cSld>
     <p:spTree>
@@ -37183,7 +37623,7 @@
           <a:p>
             <a:fld id="{E27E2812-4560-4165-A7C7-9C013F955547}" type="slidenum">
               <a:rPr kumimoji="1" lang="ja-JP" altLang="en-US" smtClean="0"/>
-              <a:t>42</a:t>
+              <a:t>43</a:t>
             </a:fld>
             <a:endParaRPr kumimoji="1" lang="ja-JP" altLang="en-US"/>
           </a:p>
@@ -38773,7 +39213,7 @@
 </p:sld>
 </file>
 
-<file path=ppt/slides/slide43.xml><?xml version="1.0" encoding="utf-8"?>
+<file path=ppt/slides/slide44.xml><?xml version="1.0" encoding="utf-8"?>
 <p:sld xmlns:a="http://schemas.openxmlformats.org/drawingml/2006/main" xmlns:r="http://schemas.openxmlformats.org/officeDocument/2006/relationships" xmlns:p="http://schemas.openxmlformats.org/presentationml/2006/main">
   <p:cSld>
     <p:spTree>
@@ -38967,7 +39407,7 @@
           <a:p>
             <a:fld id="{E27E2812-4560-4165-A7C7-9C013F955547}" type="slidenum">
               <a:rPr kumimoji="1" lang="ja-JP" altLang="en-US" smtClean="0"/>
-              <a:t>43</a:t>
+              <a:t>44</a:t>
             </a:fld>
             <a:endParaRPr kumimoji="1" lang="ja-JP" altLang="en-US"/>
           </a:p>
@@ -41116,7 +41556,7 @@
 </p:sld>
 </file>
 
-<file path=ppt/slides/slide44.xml><?xml version="1.0" encoding="utf-8"?>
+<file path=ppt/slides/slide45.xml><?xml version="1.0" encoding="utf-8"?>
 <p:sld xmlns:a="http://schemas.openxmlformats.org/drawingml/2006/main" xmlns:r="http://schemas.openxmlformats.org/officeDocument/2006/relationships" xmlns:p="http://schemas.openxmlformats.org/presentationml/2006/main">
   <p:cSld>
     <p:spTree>
@@ -41651,7 +42091,7 @@
           <a:p>
             <a:fld id="{E27E2812-4560-4165-A7C7-9C013F955547}" type="slidenum">
               <a:rPr kumimoji="1" lang="ja-JP" altLang="en-US" smtClean="0"/>
-              <a:t>44</a:t>
+              <a:t>45</a:t>
             </a:fld>
             <a:endParaRPr kumimoji="1" lang="ja-JP" altLang="en-US"/>
           </a:p>

</xml_diff>

<commit_message>
- 6.0.1.0 Supported importing *.sf file to PAULA_8364(AMIGA).   - PAULA_8364(AMIGA) can export a default.vpcm file. VSIF_AMIGA driver can load the default.vpcm file on startup.
</commit_message>
<xml_diff>
--- a/docs/MAmidiMEmo/Manual.pptx
+++ b/docs/MAmidiMEmo/Manual.pptx
@@ -241,7 +241,7 @@
           <a:p>
             <a:fld id="{581C28D8-13B6-41C3-9F5F-0284C569C6F1}" type="datetimeFigureOut">
               <a:rPr kumimoji="1" lang="ja-JP" altLang="en-US" smtClean="0"/>
-              <a:t>2025/4/6</a:t>
+              <a:t>2025/4/8</a:t>
             </a:fld>
             <a:endParaRPr kumimoji="1" lang="ja-JP" altLang="en-US"/>
           </a:p>
@@ -1928,7 +1928,7 @@
           <a:p>
             <a:fld id="{B8625E62-B904-4691-B75E-EC1C32885285}" type="datetime1">
               <a:rPr kumimoji="1" lang="ja-JP" altLang="en-US" smtClean="0"/>
-              <a:t>2025/4/6</a:t>
+              <a:t>2025/4/8</a:t>
             </a:fld>
             <a:endParaRPr kumimoji="1" lang="ja-JP" altLang="en-US"/>
           </a:p>
@@ -2266,7 +2266,7 @@
           <a:p>
             <a:fld id="{A4C87007-2A40-4EFC-90A3-258EFA3C1001}" type="datetime1">
               <a:rPr kumimoji="1" lang="ja-JP" altLang="en-US" smtClean="0"/>
-              <a:t>2025/4/6</a:t>
+              <a:t>2025/4/8</a:t>
             </a:fld>
             <a:endParaRPr kumimoji="1" lang="ja-JP" altLang="en-US"/>
           </a:p>
@@ -2667,7 +2667,7 @@
           <a:p>
             <a:fld id="{0FE0D7FF-9203-4AA3-90FD-622674A14F90}" type="datetime1">
               <a:rPr kumimoji="1" lang="ja-JP" altLang="en-US" smtClean="0"/>
-              <a:t>2025/4/6</a:t>
+              <a:t>2025/4/8</a:t>
             </a:fld>
             <a:endParaRPr kumimoji="1" lang="ja-JP" altLang="en-US"/>
           </a:p>
@@ -3003,7 +3003,7 @@
           <a:p>
             <a:fld id="{D2D6E4D3-BEDB-4F35-876B-5B9AA41BFB5B}" type="datetime1">
               <a:rPr kumimoji="1" lang="ja-JP" altLang="en-US" smtClean="0"/>
-              <a:t>2025/4/6</a:t>
+              <a:t>2025/4/8</a:t>
             </a:fld>
             <a:endParaRPr kumimoji="1" lang="ja-JP" altLang="en-US"/>
           </a:p>
@@ -3323,7 +3323,7 @@
           <a:p>
             <a:fld id="{2ACD896E-FC14-4F25-BC47-18ABAEA9E1FE}" type="datetime1">
               <a:rPr kumimoji="1" lang="ja-JP" altLang="en-US" smtClean="0"/>
-              <a:t>2025/4/6</a:t>
+              <a:t>2025/4/8</a:t>
             </a:fld>
             <a:endParaRPr kumimoji="1" lang="ja-JP" altLang="en-US"/>
           </a:p>
@@ -3719,7 +3719,7 @@
           <a:p>
             <a:fld id="{54FC701B-2185-4987-B8E2-5507664B65F4}" type="datetime1">
               <a:rPr kumimoji="1" lang="ja-JP" altLang="en-US" smtClean="0"/>
-              <a:t>2025/4/6</a:t>
+              <a:t>2025/4/8</a:t>
             </a:fld>
             <a:endParaRPr kumimoji="1" lang="ja-JP" altLang="en-US"/>
           </a:p>
@@ -4008,7 +4008,7 @@
           <a:p>
             <a:fld id="{3FB4CDED-9617-418F-B546-D66B9BB6C35E}" type="datetime1">
               <a:rPr kumimoji="1" lang="ja-JP" altLang="en-US" smtClean="0"/>
-              <a:t>2025/4/6</a:t>
+              <a:t>2025/4/8</a:t>
             </a:fld>
             <a:endParaRPr kumimoji="1" lang="ja-JP" altLang="en-US"/>
           </a:p>
@@ -4302,7 +4302,7 @@
           <a:p>
             <a:fld id="{F5635D40-962A-46D7-8037-3F2900B5EB4D}" type="datetime1">
               <a:rPr kumimoji="1" lang="ja-JP" altLang="en-US" smtClean="0"/>
-              <a:t>2025/4/6</a:t>
+              <a:t>2025/4/8</a:t>
             </a:fld>
             <a:endParaRPr kumimoji="1" lang="ja-JP" altLang="en-US"/>
           </a:p>
@@ -4596,7 +4596,7 @@
           <a:p>
             <a:fld id="{741DA9A2-8356-4FFD-B66A-E38811049858}" type="datetime1">
               <a:rPr kumimoji="1" lang="ja-JP" altLang="en-US" smtClean="0"/>
-              <a:t>2025/4/6</a:t>
+              <a:t>2025/4/8</a:t>
             </a:fld>
             <a:endParaRPr kumimoji="1" lang="ja-JP" altLang="en-US"/>
           </a:p>
@@ -4925,7 +4925,7 @@
           <a:p>
             <a:fld id="{9DDE8989-88B8-4869-97D9-547531F13E13}" type="datetime1">
               <a:rPr kumimoji="1" lang="ja-JP" altLang="en-US" smtClean="0"/>
-              <a:t>2025/4/6</a:t>
+              <a:t>2025/4/8</a:t>
             </a:fld>
             <a:endParaRPr kumimoji="1" lang="ja-JP" altLang="en-US"/>
           </a:p>
@@ -5312,7 +5312,7 @@
           <a:p>
             <a:fld id="{81EC4031-B949-4300-AB3E-1551426E8631}" type="datetime1">
               <a:rPr kumimoji="1" lang="ja-JP" altLang="en-US" smtClean="0"/>
-              <a:t>2025/4/6</a:t>
+              <a:t>2025/4/8</a:t>
             </a:fld>
             <a:endParaRPr kumimoji="1" lang="ja-JP" altLang="en-US"/>
           </a:p>
@@ -5833,7 +5833,7 @@
           <a:p>
             <a:fld id="{F39E755E-A59D-4634-B604-E9BB568B1156}" type="datetime1">
               <a:rPr kumimoji="1" lang="ja-JP" altLang="en-US" smtClean="0"/>
-              <a:t>2025/4/6</a:t>
+              <a:t>2025/4/8</a:t>
             </a:fld>
             <a:endParaRPr kumimoji="1" lang="ja-JP" altLang="en-US"/>
           </a:p>
@@ -6038,7 +6038,7 @@
           <a:p>
             <a:fld id="{61DA38B3-7601-4256-ABFE-386B92B0EDB5}" type="datetime1">
               <a:rPr kumimoji="1" lang="ja-JP" altLang="en-US" smtClean="0"/>
-              <a:t>2025/4/6</a:t>
+              <a:t>2025/4/8</a:t>
             </a:fld>
             <a:endParaRPr kumimoji="1" lang="ja-JP" altLang="en-US"/>
           </a:p>
@@ -6215,7 +6215,7 @@
           <a:p>
             <a:fld id="{5A28ED6D-8A94-4DBA-8EF2-284D1A467CE8}" type="datetime1">
               <a:rPr kumimoji="1" lang="ja-JP" altLang="en-US" smtClean="0"/>
-              <a:t>2025/4/6</a:t>
+              <a:t>2025/4/8</a:t>
             </a:fld>
             <a:endParaRPr kumimoji="1" lang="ja-JP" altLang="en-US"/>
           </a:p>
@@ -6580,7 +6580,7 @@
           <a:p>
             <a:fld id="{B27B0317-28AF-43C5-8944-AADFA89E0149}" type="datetime1">
               <a:rPr kumimoji="1" lang="ja-JP" altLang="en-US" smtClean="0"/>
-              <a:t>2025/4/6</a:t>
+              <a:t>2025/4/8</a:t>
             </a:fld>
             <a:endParaRPr kumimoji="1" lang="ja-JP" altLang="en-US"/>
           </a:p>
@@ -6925,7 +6925,7 @@
           <a:p>
             <a:fld id="{A78D023C-C4FA-4CE8-B5BE-6798898EE377}" type="datetime1">
               <a:rPr kumimoji="1" lang="ja-JP" altLang="en-US" smtClean="0"/>
-              <a:t>2025/4/6</a:t>
+              <a:t>2025/4/8</a:t>
             </a:fld>
             <a:endParaRPr kumimoji="1" lang="ja-JP" altLang="en-US"/>
           </a:p>
@@ -9074,7 +9074,7 @@
           <a:p>
             <a:fld id="{99567159-F4A8-4352-915B-DDBEFEF4A4D6}" type="datetime1">
               <a:rPr kumimoji="1" lang="ja-JP" altLang="en-US" smtClean="0"/>
-              <a:t>2025/4/6</a:t>
+              <a:t>2025/4/8</a:t>
             </a:fld>
             <a:endParaRPr kumimoji="1" lang="ja-JP" altLang="en-US"/>
           </a:p>
@@ -25728,8 +25728,8 @@
         </p:nvSpPr>
         <p:spPr>
           <a:xfrm>
-            <a:off x="2589212" y="2133600"/>
-            <a:ext cx="9602788" cy="3777622"/>
+            <a:off x="2589212" y="2133599"/>
+            <a:ext cx="9602788" cy="4513089"/>
           </a:xfrm>
         </p:spPr>
         <p:txBody>
@@ -25914,6 +25914,66 @@
               </a:rPr>
               <a:t>So, you should not launch other apps and so on.</a:t>
             </a:r>
+          </a:p>
+          <a:p>
+            <a:pPr marL="457200" lvl="1" indent="0">
+              <a:buNone/>
+            </a:pPr>
+            <a:r>
+              <a:rPr lang="en-US" altLang="ja-JP" sz="1400" dirty="0"/>
+              <a:t>NOTE: You can import </a:t>
+            </a:r>
+            <a:r>
+              <a:rPr lang="en-US" altLang="ja-JP" sz="1400" dirty="0" err="1"/>
+              <a:t>SoundFont</a:t>
+            </a:r>
+            <a:r>
+              <a:rPr lang="en-US" altLang="ja-JP" sz="1400" dirty="0"/>
+              <a:t>(*.sf) file and export imported </a:t>
+            </a:r>
+            <a:r>
+              <a:rPr lang="en-US" altLang="ja-JP" sz="1400" dirty="0" err="1"/>
+              <a:t>pcm</a:t>
+            </a:r>
+            <a:r>
+              <a:rPr lang="en-US" altLang="ja-JP" sz="1400" dirty="0"/>
+              <a:t> data to “</a:t>
+            </a:r>
+            <a:r>
+              <a:rPr lang="en-US" altLang="ja-JP" sz="1400" dirty="0" err="1"/>
+              <a:t>default.vpcm</a:t>
+            </a:r>
+            <a:r>
+              <a:rPr lang="en-US" altLang="ja-JP" sz="1400" dirty="0"/>
+              <a:t>” file.</a:t>
+            </a:r>
+            <a:br>
+              <a:rPr lang="en-US" altLang="ja-JP" sz="1400" dirty="0"/>
+            </a:br>
+            <a:r>
+              <a:rPr lang="ja-JP" altLang="en-US" sz="1400" dirty="0"/>
+              <a:t>           </a:t>
+            </a:r>
+            <a:r>
+              <a:rPr lang="en-US" altLang="ja-JP" sz="1400" dirty="0"/>
+              <a:t>And, the VSIF_AMIGA.exe can read the </a:t>
+            </a:r>
+            <a:r>
+              <a:rPr lang="en-US" altLang="ja-JP" sz="1400" dirty="0" err="1"/>
+              <a:t>default.vpcm</a:t>
+            </a:r>
+            <a:r>
+              <a:rPr lang="en-US" altLang="ja-JP" sz="1400" dirty="0"/>
+              <a:t> on startup.</a:t>
+            </a:r>
+            <a:br>
+              <a:rPr lang="en-US" altLang="ja-JP" sz="1400" dirty="0"/>
+            </a:br>
+            <a:endParaRPr lang="en-US" altLang="ja-JP" sz="1400" b="1" u="sng" dirty="0">
+              <a:solidFill>
+                <a:srgbClr val="FF0000"/>
+              </a:solidFill>
+            </a:endParaRPr>
           </a:p>
           <a:p>
             <a:endParaRPr kumimoji="1" lang="en-US" altLang="ja-JP" dirty="0"/>

</xml_diff>